<commit_message>
Fixed slide about cloning
</commit_message>
<xml_diff>
--- a/LinuxTools/VersionControl/version_control_git.pptx
+++ b/LinuxTools/VersionControl/version_control_git.pptx
@@ -346,7 +346,7 @@
           <a:p>
             <a:fld id="{31155545-FFF6-4666-BE18-08518292A6F3}" type="datetimeFigureOut">
               <a:rPr lang="nl-BE" smtClean="0"/>
-              <a:t>2/12/2015</a:t>
+              <a:t>4/12/2015</a:t>
             </a:fld>
             <a:endParaRPr lang="nl-BE"/>
           </a:p>
@@ -516,7 +516,7 @@
           <a:p>
             <a:fld id="{31155545-FFF6-4666-BE18-08518292A6F3}" type="datetimeFigureOut">
               <a:rPr lang="nl-BE" smtClean="0"/>
-              <a:t>2/12/2015</a:t>
+              <a:t>4/12/2015</a:t>
             </a:fld>
             <a:endParaRPr lang="nl-BE"/>
           </a:p>
@@ -696,7 +696,7 @@
           <a:p>
             <a:fld id="{31155545-FFF6-4666-BE18-08518292A6F3}" type="datetimeFigureOut">
               <a:rPr lang="nl-BE" smtClean="0"/>
-              <a:t>2/12/2015</a:t>
+              <a:t>4/12/2015</a:t>
             </a:fld>
             <a:endParaRPr lang="nl-BE"/>
           </a:p>
@@ -866,7 +866,7 @@
           <a:p>
             <a:fld id="{31155545-FFF6-4666-BE18-08518292A6F3}" type="datetimeFigureOut">
               <a:rPr lang="nl-BE" smtClean="0"/>
-              <a:t>2/12/2015</a:t>
+              <a:t>4/12/2015</a:t>
             </a:fld>
             <a:endParaRPr lang="nl-BE"/>
           </a:p>
@@ -1112,7 +1112,7 @@
           <a:p>
             <a:fld id="{31155545-FFF6-4666-BE18-08518292A6F3}" type="datetimeFigureOut">
               <a:rPr lang="nl-BE" smtClean="0"/>
-              <a:t>2/12/2015</a:t>
+              <a:t>4/12/2015</a:t>
             </a:fld>
             <a:endParaRPr lang="nl-BE"/>
           </a:p>
@@ -1400,7 +1400,7 @@
           <a:p>
             <a:fld id="{31155545-FFF6-4666-BE18-08518292A6F3}" type="datetimeFigureOut">
               <a:rPr lang="nl-BE" smtClean="0"/>
-              <a:t>2/12/2015</a:t>
+              <a:t>4/12/2015</a:t>
             </a:fld>
             <a:endParaRPr lang="nl-BE"/>
           </a:p>
@@ -1822,7 +1822,7 @@
           <a:p>
             <a:fld id="{31155545-FFF6-4666-BE18-08518292A6F3}" type="datetimeFigureOut">
               <a:rPr lang="nl-BE" smtClean="0"/>
-              <a:t>2/12/2015</a:t>
+              <a:t>4/12/2015</a:t>
             </a:fld>
             <a:endParaRPr lang="nl-BE"/>
           </a:p>
@@ -1940,7 +1940,7 @@
           <a:p>
             <a:fld id="{31155545-FFF6-4666-BE18-08518292A6F3}" type="datetimeFigureOut">
               <a:rPr lang="nl-BE" smtClean="0"/>
-              <a:t>2/12/2015</a:t>
+              <a:t>4/12/2015</a:t>
             </a:fld>
             <a:endParaRPr lang="nl-BE"/>
           </a:p>
@@ -2035,7 +2035,7 @@
           <a:p>
             <a:fld id="{31155545-FFF6-4666-BE18-08518292A6F3}" type="datetimeFigureOut">
               <a:rPr lang="nl-BE" smtClean="0"/>
-              <a:t>2/12/2015</a:t>
+              <a:t>4/12/2015</a:t>
             </a:fld>
             <a:endParaRPr lang="nl-BE"/>
           </a:p>
@@ -2312,7 +2312,7 @@
           <a:p>
             <a:fld id="{31155545-FFF6-4666-BE18-08518292A6F3}" type="datetimeFigureOut">
               <a:rPr lang="nl-BE" smtClean="0"/>
-              <a:t>2/12/2015</a:t>
+              <a:t>4/12/2015</a:t>
             </a:fld>
             <a:endParaRPr lang="nl-BE"/>
           </a:p>
@@ -2565,7 +2565,7 @@
           <a:p>
             <a:fld id="{31155545-FFF6-4666-BE18-08518292A6F3}" type="datetimeFigureOut">
               <a:rPr lang="nl-BE" smtClean="0"/>
-              <a:t>2/12/2015</a:t>
+              <a:t>4/12/2015</a:t>
             </a:fld>
             <a:endParaRPr lang="nl-BE"/>
           </a:p>
@@ -2778,7 +2778,7 @@
           <a:p>
             <a:fld id="{31155545-FFF6-4666-BE18-08518292A6F3}" type="datetimeFigureOut">
               <a:rPr lang="nl-BE" smtClean="0"/>
-              <a:t>2/12/2015</a:t>
+              <a:t>4/12/2015</a:t>
             </a:fld>
             <a:endParaRPr lang="nl-BE"/>
           </a:p>
@@ -3197,11 +3197,7 @@
           <a:p>
             <a:r>
               <a:rPr lang="en-US" dirty="0" smtClean="0"/>
-              <a:t>Geert Jan </a:t>
-            </a:r>
-            <a:r>
-              <a:rPr lang="en-US" dirty="0" smtClean="0"/>
-              <a:t>Bex</a:t>
+              <a:t>Geert Jan Bex</a:t>
             </a:r>
           </a:p>
           <a:p>
@@ -7661,23 +7657,7 @@
             </a:r>
             <a:r>
               <a:rPr lang="en-US" dirty="0" smtClean="0"/>
-              <a:t>), </a:t>
-            </a:r>
-            <a:r>
-              <a:rPr lang="en-US" dirty="0" smtClean="0"/>
-              <a:t>stage new or modified </a:t>
-            </a:r>
-            <a:r>
-              <a:rPr lang="en-US" dirty="0" smtClean="0"/>
-              <a:t>files for </a:t>
-            </a:r>
-            <a:r>
-              <a:rPr lang="en-US" dirty="0" smtClean="0"/>
-              <a:t>next commit</a:t>
-            </a:r>
-            <a:r>
-              <a:rPr lang="en-US" dirty="0" smtClean="0"/>
-              <a:t/>
+              <a:t>), stage new or modified files for next commit</a:t>
             </a:r>
             <a:br>
               <a:rPr lang="en-US" dirty="0" smtClean="0"/>
@@ -8965,21 +8945,13 @@
           <a:p>
             <a:r>
               <a:rPr lang="en-US" dirty="0" smtClean="0"/>
-              <a:t>Single </a:t>
-            </a:r>
+              <a:t>Single user scenario</a:t>
+            </a:r>
+          </a:p>
+          <a:p>
             <a:r>
               <a:rPr lang="en-US" dirty="0" smtClean="0"/>
-              <a:t>user scenario</a:t>
-            </a:r>
-          </a:p>
-          <a:p>
-            <a:r>
-              <a:rPr lang="en-US" dirty="0" smtClean="0"/>
-              <a:t>Multiple </a:t>
-            </a:r>
-            <a:r>
-              <a:rPr lang="en-US" dirty="0" smtClean="0"/>
-              <a:t>user scenario</a:t>
+              <a:t>Multiple user scenario</a:t>
             </a:r>
           </a:p>
           <a:p>
@@ -8987,16 +8959,11 @@
               <a:rPr lang="en-US" dirty="0" smtClean="0"/>
               <a:t>Demo/hands-on session</a:t>
             </a:r>
-            <a:endParaRPr lang="en-US" dirty="0" smtClean="0"/>
           </a:p>
           <a:p>
             <a:r>
               <a:rPr lang="en-US" dirty="0" smtClean="0"/>
-              <a:t>Getting more </a:t>
-            </a:r>
-            <a:r>
-              <a:rPr lang="en-US" dirty="0" smtClean="0"/>
-              <a:t>information</a:t>
+              <a:t>Getting more information</a:t>
             </a:r>
           </a:p>
           <a:p>
@@ -9004,7 +8971,6 @@
               <a:rPr lang="en-US" dirty="0" smtClean="0"/>
               <a:t>Conclusions</a:t>
             </a:r>
-            <a:endParaRPr lang="en-US" dirty="0" smtClean="0"/>
           </a:p>
         </p:txBody>
       </p:sp>
@@ -9087,11 +9053,7 @@
           <a:p>
             <a:r>
               <a:rPr lang="en-US" dirty="0" smtClean="0"/>
-              <a:t>Status information on your current </a:t>
-            </a:r>
-            <a:r>
-              <a:rPr lang="en-US" dirty="0" smtClean="0"/>
-              <a:t>branch</a:t>
+              <a:t>Status information on your current branch</a:t>
             </a:r>
           </a:p>
           <a:p>
@@ -10073,26 +10035,14 @@
             </a:r>
             <a:r>
               <a:rPr lang="en-US" dirty="0" smtClean="0"/>
-              <a:t> is </a:t>
-            </a:r>
+              <a:t> is somewhat smart about what should be added and what not, e.g.,</a:t>
+            </a:r>
+          </a:p>
+          <a:p>
+            <a:pPr lvl="1"/>
             <a:r>
               <a:rPr lang="en-US" dirty="0" smtClean="0"/>
-              <a:t>somewhat smart about what should be added and what not, e.g.,</a:t>
-            </a:r>
-          </a:p>
-          <a:p>
-            <a:pPr lvl="1"/>
-            <a:r>
-              <a:rPr lang="en-US" dirty="0" smtClean="0"/>
-              <a:t>Backup files </a:t>
-            </a:r>
-            <a:r>
-              <a:rPr lang="en-US" dirty="0" smtClean="0"/>
-              <a:t>are not </a:t>
-            </a:r>
-            <a:r>
-              <a:rPr lang="en-US" dirty="0" smtClean="0"/>
-              <a:t>ignored (e.g., </a:t>
+              <a:t>Backup files are not ignored (e.g., </a:t>
             </a:r>
             <a:r>
               <a:rPr lang="en-US" dirty="0" err="1" smtClean="0">
@@ -10134,11 +10084,7 @@
           <a:p>
             <a:r>
               <a:rPr lang="en-US" dirty="0" smtClean="0"/>
-              <a:t>Needs help for most things, </a:t>
-            </a:r>
-            <a:r>
-              <a:rPr lang="en-US" dirty="0" smtClean="0"/>
-              <a:t>edit file </a:t>
+              <a:t>Needs help for most things, edit file </a:t>
             </a:r>
             <a:r>
               <a:rPr lang="en-US" dirty="0" smtClean="0">
@@ -10156,11 +10102,7 @@
             </a:r>
             <a:r>
               <a:rPr lang="en-US" dirty="0" smtClean="0"/>
-              <a:t> in </a:t>
-            </a:r>
-            <a:r>
-              <a:rPr lang="en-US" dirty="0" smtClean="0"/>
-              <a:t>directory</a:t>
+              <a:t> in directory</a:t>
             </a:r>
           </a:p>
           <a:p>
@@ -10207,14 +10149,7 @@
                 <a:latin typeface="Courier New" panose="02070309020205020404" pitchFamily="49" charset="0"/>
                 <a:cs typeface="Courier New" panose="02070309020205020404" pitchFamily="49" charset="0"/>
               </a:rPr>
-              <a:t> </a:t>
-            </a:r>
-            <a:r>
-              <a:rPr lang="en-US" dirty="0" smtClean="0">
-                <a:latin typeface="Courier New" panose="02070309020205020404" pitchFamily="49" charset="0"/>
-                <a:cs typeface="Courier New" panose="02070309020205020404" pitchFamily="49" charset="0"/>
-              </a:rPr>
-              <a:t>.</a:t>
+              <a:t> .</a:t>
             </a:r>
             <a:r>
               <a:rPr lang="en-US" dirty="0" err="1" smtClean="0">
@@ -10226,10 +10161,6 @@
             <a:r>
               <a:rPr lang="en-US" dirty="0" smtClean="0"/>
               <a:t>, e.g.,</a:t>
-            </a:r>
-            <a:r>
-              <a:rPr lang="en-US" dirty="0" smtClean="0"/>
-              <a:t/>
             </a:r>
             <a:br>
               <a:rPr lang="en-US" dirty="0" smtClean="0"/>
@@ -10794,15 +10725,7 @@
           <a:p>
             <a:r>
               <a:rPr lang="en-US" dirty="0" smtClean="0"/>
-              <a:t>Reverting to state of </a:t>
-            </a:r>
-            <a:r>
-              <a:rPr lang="en-US" dirty="0" smtClean="0"/>
-              <a:t>repository, overwriting</a:t>
-            </a:r>
-            <a:r>
-              <a:rPr lang="en-US" dirty="0" smtClean="0"/>
-              <a:t/>
+              <a:t>Reverting to state of repository, overwriting</a:t>
             </a:r>
             <a:br>
               <a:rPr lang="en-US" dirty="0" smtClean="0"/>
@@ -10825,25 +10748,8 @@
           <a:p>
             <a:r>
               <a:rPr lang="en-US" dirty="0" smtClean="0"/>
-              <a:t>Reverting </a:t>
-            </a:r>
-            <a:r>
-              <a:rPr lang="en-US" dirty="0" smtClean="0"/>
-              <a:t>to </a:t>
-            </a:r>
-            <a:r>
-              <a:rPr lang="en-US" dirty="0" smtClean="0"/>
-              <a:t>the </a:t>
-            </a:r>
-            <a:r>
-              <a:rPr lang="en-US" dirty="0" smtClean="0"/>
-              <a:t>previous </a:t>
-            </a:r>
-            <a:r>
-              <a:rPr lang="en-US" dirty="0" smtClean="0"/>
-              <a:t>revision</a:t>
-            </a:r>
-            <a:endParaRPr lang="en-US" dirty="0" smtClean="0"/>
+              <a:t>Reverting to the previous revision</a:t>
+            </a:r>
           </a:p>
           <a:p>
             <a:pPr lvl="1"/>
@@ -10891,14 +10797,7 @@
                 <a:latin typeface="Courier New" pitchFamily="49" charset="0"/>
                 <a:cs typeface="Courier New" pitchFamily="49" charset="0"/>
               </a:rPr>
-              <a:t>$ </a:t>
-            </a:r>
-            <a:r>
-              <a:rPr lang="nl-BE" dirty="0" smtClean="0">
-                <a:latin typeface="Courier New" pitchFamily="49" charset="0"/>
-                <a:cs typeface="Courier New" pitchFamily="49" charset="0"/>
-              </a:rPr>
-              <a:t>git </a:t>
+              <a:t>$ git </a:t>
             </a:r>
             <a:r>
               <a:rPr lang="nl-BE" dirty="0" err="1" smtClean="0">
@@ -10960,19 +10859,8 @@
                 <a:latin typeface="Courier New" pitchFamily="49" charset="0"/>
                 <a:cs typeface="Courier New" pitchFamily="49" charset="0"/>
               </a:rPr>
-              <a:t>$ </a:t>
-            </a:r>
-            <a:r>
-              <a:rPr lang="nl-BE" dirty="0" smtClean="0">
-                <a:latin typeface="Courier New" pitchFamily="49" charset="0"/>
-                <a:cs typeface="Courier New" pitchFamily="49" charset="0"/>
-              </a:rPr>
-              <a:t>get reset  --hard  HEAD^</a:t>
-            </a:r>
-            <a:endParaRPr lang="nl-BE" dirty="0" smtClean="0">
-              <a:latin typeface="Courier New" pitchFamily="49" charset="0"/>
-              <a:cs typeface="Courier New" pitchFamily="49" charset="0"/>
-            </a:endParaRPr>
+              <a:t>$ get reset  --hard  HEAD^</a:t>
+            </a:r>
           </a:p>
         </p:txBody>
       </p:sp>
@@ -11008,14 +10896,7 @@
                 <a:latin typeface="Courier New" pitchFamily="49" charset="0"/>
                 <a:cs typeface="Courier New" pitchFamily="49" charset="0"/>
               </a:rPr>
-              <a:t>$ </a:t>
-            </a:r>
-            <a:r>
-              <a:rPr lang="nl-BE" dirty="0" smtClean="0">
-                <a:latin typeface="Courier New" pitchFamily="49" charset="0"/>
-                <a:cs typeface="Courier New" pitchFamily="49" charset="0"/>
-              </a:rPr>
-              <a:t>git reset  HEAD  </a:t>
+              <a:t>$ git reset  HEAD  </a:t>
             </a:r>
             <a:r>
               <a:rPr lang="nl-BE" dirty="0" err="1" smtClean="0">
@@ -11401,11 +11282,7 @@
           <a:p>
             <a:r>
               <a:rPr lang="en-US" dirty="0" smtClean="0"/>
-              <a:t>Viewing </a:t>
-            </a:r>
-            <a:r>
-              <a:rPr lang="en-US" dirty="0" smtClean="0"/>
-              <a:t>history</a:t>
+              <a:t>Viewing history</a:t>
             </a:r>
           </a:p>
           <a:p>
@@ -11428,11 +11305,7 @@
             <a:pPr lvl="1"/>
             <a:r>
               <a:rPr lang="en-US" dirty="0" smtClean="0"/>
-              <a:t>Works for directories </a:t>
-            </a:r>
-            <a:r>
-              <a:rPr lang="en-US" dirty="0" smtClean="0"/>
-              <a:t>too</a:t>
+              <a:t>Works for directories too</a:t>
             </a:r>
           </a:p>
           <a:p>
@@ -11507,14 +11380,7 @@
                 <a:latin typeface="Courier New" pitchFamily="49" charset="0"/>
                 <a:cs typeface="Courier New" pitchFamily="49" charset="0"/>
               </a:rPr>
-              <a:t>$ </a:t>
-            </a:r>
-            <a:r>
-              <a:rPr lang="nl-BE" dirty="0" smtClean="0">
-                <a:latin typeface="Courier New" pitchFamily="49" charset="0"/>
-                <a:cs typeface="Courier New" pitchFamily="49" charset="0"/>
-              </a:rPr>
-              <a:t>git </a:t>
+              <a:t>$ git </a:t>
             </a:r>
             <a:r>
               <a:rPr lang="nl-BE" dirty="0" err="1" smtClean="0">
@@ -11576,14 +11442,7 @@
                 <a:latin typeface="Courier New" pitchFamily="49" charset="0"/>
                 <a:cs typeface="Courier New" pitchFamily="49" charset="0"/>
               </a:rPr>
-              <a:t>$ </a:t>
-            </a:r>
-            <a:r>
-              <a:rPr lang="nl-BE" dirty="0" smtClean="0">
-                <a:latin typeface="Courier New" pitchFamily="49" charset="0"/>
-                <a:cs typeface="Courier New" pitchFamily="49" charset="0"/>
-              </a:rPr>
-              <a:t>git log  </a:t>
+              <a:t>$ git log  </a:t>
             </a:r>
             <a:r>
               <a:rPr lang="nl-BE" dirty="0" err="1" smtClean="0">
@@ -11631,14 +11490,7 @@
                 <a:latin typeface="Courier New" pitchFamily="49" charset="0"/>
                 <a:cs typeface="Courier New" pitchFamily="49" charset="0"/>
               </a:rPr>
-              <a:t>$ </a:t>
-            </a:r>
-            <a:r>
-              <a:rPr lang="nl-BE" dirty="0" smtClean="0">
-                <a:latin typeface="Courier New" pitchFamily="49" charset="0"/>
-                <a:cs typeface="Courier New" pitchFamily="49" charset="0"/>
-              </a:rPr>
-              <a:t>git </a:t>
+              <a:t>$ git </a:t>
             </a:r>
             <a:r>
               <a:rPr lang="nl-BE" dirty="0" err="1" smtClean="0">
@@ -12722,14 +12574,7 @@
                 <a:latin typeface="Courier New" pitchFamily="49" charset="0"/>
                 <a:cs typeface="Courier New" pitchFamily="49" charset="0"/>
               </a:rPr>
-              <a:t>$ </a:t>
-            </a:r>
-            <a:r>
-              <a:rPr lang="nl-BE" dirty="0" smtClean="0">
-                <a:latin typeface="Courier New" pitchFamily="49" charset="0"/>
-                <a:cs typeface="Courier New" pitchFamily="49" charset="0"/>
-              </a:rPr>
-              <a:t>git </a:t>
+              <a:t>$ git </a:t>
             </a:r>
             <a:r>
               <a:rPr lang="nl-BE" dirty="0" err="1" smtClean="0">
@@ -13171,23 +13016,8 @@
               <a:rPr lang="en-US" dirty="0" smtClean="0">
                 <a:cs typeface="Courier New" pitchFamily="49" charset="0"/>
               </a:rPr>
-              <a:t>Easy </a:t>
-            </a:r>
-            <a:r>
-              <a:rPr lang="en-US" dirty="0" smtClean="0">
-                <a:cs typeface="Courier New" pitchFamily="49" charset="0"/>
-              </a:rPr>
-              <a:t>to </a:t>
-            </a:r>
-            <a:r>
-              <a:rPr lang="en-US" dirty="0" smtClean="0">
-                <a:cs typeface="Courier New" pitchFamily="49" charset="0"/>
-              </a:rPr>
-              <a:t>use later, especially for diff or branching</a:t>
-            </a:r>
-            <a:endParaRPr lang="en-US" dirty="0" smtClean="0">
-              <a:cs typeface="Courier New" pitchFamily="49" charset="0"/>
-            </a:endParaRPr>
+              <a:t>Easy to use later, especially for diff or branching</a:t>
+            </a:r>
           </a:p>
         </p:txBody>
       </p:sp>
@@ -13223,19 +13053,8 @@
                 <a:latin typeface="Courier New" pitchFamily="49" charset="0"/>
                 <a:cs typeface="Courier New" pitchFamily="49" charset="0"/>
               </a:rPr>
-              <a:t>$ </a:t>
-            </a:r>
-            <a:r>
-              <a:rPr lang="nl-BE" dirty="0" smtClean="0">
-                <a:latin typeface="Courier New" pitchFamily="49" charset="0"/>
-                <a:cs typeface="Courier New" pitchFamily="49" charset="0"/>
-              </a:rPr>
-              <a:t>git tag  1.0</a:t>
-            </a:r>
-            <a:endParaRPr lang="nl-BE" dirty="0" smtClean="0">
-              <a:latin typeface="Courier New" pitchFamily="49" charset="0"/>
-              <a:cs typeface="Courier New" pitchFamily="49" charset="0"/>
-            </a:endParaRPr>
+              <a:t>$ git tag  1.0</a:t>
+            </a:r>
           </a:p>
         </p:txBody>
       </p:sp>
@@ -13271,14 +13090,7 @@
                 <a:latin typeface="Courier New" pitchFamily="49" charset="0"/>
                 <a:cs typeface="Courier New" pitchFamily="49" charset="0"/>
               </a:rPr>
-              <a:t>$ </a:t>
-            </a:r>
-            <a:r>
-              <a:rPr lang="nl-BE" dirty="0" smtClean="0">
-                <a:latin typeface="Courier New" pitchFamily="49" charset="0"/>
-                <a:cs typeface="Courier New" pitchFamily="49" charset="0"/>
-              </a:rPr>
-              <a:t>git </a:t>
+              <a:t>$ git </a:t>
             </a:r>
             <a:r>
               <a:rPr lang="nl-BE" dirty="0" err="1" smtClean="0">
@@ -13294,10 +13106,6 @@
               </a:rPr>
               <a:t>  1.0</a:t>
             </a:r>
-            <a:endParaRPr lang="nl-BE" dirty="0" smtClean="0">
-              <a:latin typeface="Courier New" pitchFamily="49" charset="0"/>
-              <a:cs typeface="Courier New" pitchFamily="49" charset="0"/>
-            </a:endParaRPr>
           </a:p>
         </p:txBody>
       </p:sp>
@@ -14358,11 +14166,7 @@
             </a:r>
             <a:r>
               <a:rPr lang="en-US" dirty="0" smtClean="0"/>
-              <a:t>ultiple </a:t>
-            </a:r>
-            <a:r>
-              <a:rPr lang="en-US" dirty="0" smtClean="0"/>
-              <a:t>user scenario</a:t>
+              <a:t>ultiple user scenario</a:t>
             </a:r>
             <a:endParaRPr lang="nl-BE" dirty="0"/>
           </a:p>
@@ -14508,8 +14312,13 @@
             </a:r>
             <a:r>
               <a:rPr lang="en-US" dirty="0" smtClean="0"/>
-              <a:t> URL</a:t>
-            </a:r>
+              <a:t> </a:t>
+            </a:r>
+            <a:r>
+              <a:rPr lang="en-US" dirty="0" smtClean="0"/>
+              <a:t>URL (SSH)</a:t>
+            </a:r>
+            <a:endParaRPr lang="en-US" dirty="0" smtClean="0"/>
           </a:p>
           <a:p>
             <a:endParaRPr lang="en-US" dirty="0"/>
@@ -14518,8 +14327,13 @@
             <a:pPr lvl="1"/>
             <a:r>
               <a:rPr lang="en-US" dirty="0" smtClean="0"/>
-              <a:t>Creating clone of remote repository, SSH URL</a:t>
-            </a:r>
+              <a:t>Creating clone of remote repository, </a:t>
+            </a:r>
+            <a:r>
+              <a:rPr lang="en-US" dirty="0" smtClean="0"/>
+              <a:t>HTTPS URL</a:t>
+            </a:r>
+            <a:endParaRPr lang="en-US" dirty="0" smtClean="0"/>
           </a:p>
           <a:p>
             <a:pPr lvl="1"/>
@@ -14541,7 +14355,7 @@
         </p:nvSpPr>
         <p:spPr>
           <a:xfrm>
-            <a:off x="1259632" y="3212976"/>
+            <a:off x="395536" y="3212976"/>
             <a:ext cx="7766870" cy="369332"/>
           </a:xfrm>
           <a:prstGeom prst="rect">
@@ -14565,14 +14379,7 @@
                 <a:latin typeface="Courier New" pitchFamily="49" charset="0"/>
                 <a:cs typeface="Courier New" pitchFamily="49" charset="0"/>
               </a:rPr>
-              <a:t>$ </a:t>
-            </a:r>
-            <a:r>
-              <a:rPr lang="nl-BE" dirty="0" smtClean="0">
-                <a:latin typeface="Courier New" pitchFamily="49" charset="0"/>
-                <a:cs typeface="Courier New" pitchFamily="49" charset="0"/>
-              </a:rPr>
-              <a:t>git </a:t>
+              <a:t>$ git </a:t>
             </a:r>
             <a:r>
               <a:rPr lang="nl-BE" dirty="0" err="1" smtClean="0">
@@ -14624,8 +14431,8 @@
         </p:nvSpPr>
         <p:spPr>
           <a:xfrm>
-            <a:off x="1259632" y="4293096"/>
-            <a:ext cx="7766870" cy="369332"/>
+            <a:off x="395536" y="4293096"/>
+            <a:ext cx="8318303" cy="369332"/>
           </a:xfrm>
           <a:prstGeom prst="rect">
             <a:avLst/>
@@ -14648,14 +14455,7 @@
                 <a:latin typeface="Courier New" pitchFamily="49" charset="0"/>
                 <a:cs typeface="Courier New" pitchFamily="49" charset="0"/>
               </a:rPr>
-              <a:t>$ </a:t>
-            </a:r>
-            <a:r>
-              <a:rPr lang="nl-BE" dirty="0" smtClean="0">
-                <a:latin typeface="Courier New" pitchFamily="49" charset="0"/>
-                <a:cs typeface="Courier New" pitchFamily="49" charset="0"/>
-              </a:rPr>
-              <a:t>git </a:t>
+              <a:t>$ git </a:t>
             </a:r>
             <a:r>
               <a:rPr lang="nl-BE" dirty="0" err="1" smtClean="0">
@@ -14672,25 +14472,11 @@
               <a:t>  </a:t>
             </a:r>
             <a:r>
-              <a:rPr lang="nl-BE" dirty="0" err="1">
-                <a:latin typeface="Courier New" pitchFamily="49" charset="0"/>
-                <a:cs typeface="Courier New" pitchFamily="49" charset="0"/>
-              </a:rPr>
-              <a:t>git@github.com:gjbex</a:t>
-            </a:r>
-            <a:r>
               <a:rPr lang="nl-BE" dirty="0">
                 <a:latin typeface="Courier New" pitchFamily="49" charset="0"/>
                 <a:cs typeface="Courier New" pitchFamily="49" charset="0"/>
               </a:rPr>
-              <a:t>/training-</a:t>
-            </a:r>
-            <a:r>
-              <a:rPr lang="nl-BE" dirty="0" err="1">
-                <a:latin typeface="Courier New" pitchFamily="49" charset="0"/>
-                <a:cs typeface="Courier New" pitchFamily="49" charset="0"/>
-              </a:rPr>
-              <a:t>material.git</a:t>
+              <a:t>https://github.com/gjbex/training-material.git</a:t>
             </a:r>
             <a:endParaRPr lang="nl-BE" dirty="0" smtClean="0">
               <a:latin typeface="Courier New" pitchFamily="49" charset="0"/>
@@ -14731,14 +14517,7 @@
                 <a:latin typeface="Courier New" pitchFamily="49" charset="0"/>
                 <a:cs typeface="Courier New" pitchFamily="49" charset="0"/>
               </a:rPr>
-              <a:t>$ </a:t>
-            </a:r>
-            <a:r>
-              <a:rPr lang="nl-BE" dirty="0" smtClean="0">
-                <a:latin typeface="Courier New" pitchFamily="49" charset="0"/>
-                <a:cs typeface="Courier New" pitchFamily="49" charset="0"/>
-              </a:rPr>
-              <a:t>git </a:t>
+              <a:t>$ git </a:t>
             </a:r>
             <a:r>
               <a:rPr lang="nl-BE" dirty="0" err="1" smtClean="0">
@@ -17216,11 +16995,7 @@
             </a:r>
             <a:r>
               <a:rPr lang="en-US" dirty="0" smtClean="0"/>
-              <a:t> </a:t>
-            </a:r>
-            <a:r>
-              <a:rPr lang="en-US" dirty="0" smtClean="0"/>
-              <a:t>version</a:t>
+              <a:t> version</a:t>
             </a:r>
           </a:p>
           <a:p>
@@ -17259,11 +17034,7 @@
             </a:r>
             <a:r>
               <a:rPr lang="en-US" dirty="0" smtClean="0"/>
-              <a:t>), </a:t>
-            </a:r>
-            <a:r>
-              <a:rPr lang="en-US" dirty="0" smtClean="0"/>
-              <a:t>stage for </a:t>
+              <a:t>), stage for </a:t>
             </a:r>
             <a:r>
               <a:rPr lang="en-US" dirty="0" err="1" smtClean="0"/>
@@ -17272,10 +17043,6 @@
             <a:r>
               <a:rPr lang="en-US" dirty="0" smtClean="0"/>
               <a:t> commit</a:t>
-            </a:r>
-            <a:r>
-              <a:rPr lang="en-US" dirty="0" smtClean="0"/>
-              <a:t/>
             </a:r>
             <a:br>
               <a:rPr lang="en-US" dirty="0" smtClean="0"/>
@@ -17341,11 +17108,7 @@
             </a:pPr>
             <a:r>
               <a:rPr lang="en-US" dirty="0" smtClean="0"/>
-              <a:t>Go to step 1, unless </a:t>
-            </a:r>
-            <a:r>
-              <a:rPr lang="en-US" dirty="0" smtClean="0"/>
-              <a:t>done. If so,</a:t>
+              <a:t>Go to step 1, unless done. If so,</a:t>
             </a:r>
             <a:endParaRPr lang="nl-BE" dirty="0"/>
           </a:p>
@@ -17383,14 +17146,7 @@
                 <a:latin typeface="Courier New" pitchFamily="49" charset="0"/>
                 <a:cs typeface="Courier New" pitchFamily="49" charset="0"/>
               </a:rPr>
-              <a:t>$ </a:t>
-            </a:r>
-            <a:r>
-              <a:rPr lang="nl-BE" dirty="0" smtClean="0">
-                <a:latin typeface="Courier New" pitchFamily="49" charset="0"/>
-                <a:cs typeface="Courier New" pitchFamily="49" charset="0"/>
-              </a:rPr>
-              <a:t>git pull  </a:t>
+              <a:t>$ git pull  </a:t>
             </a:r>
             <a:r>
               <a:rPr lang="nl-BE" dirty="0" err="1" smtClean="0">
@@ -17406,10 +17162,6 @@
               </a:rPr>
               <a:t>  master</a:t>
             </a:r>
-            <a:endParaRPr lang="nl-BE" dirty="0" smtClean="0">
-              <a:latin typeface="Courier New" pitchFamily="49" charset="0"/>
-              <a:cs typeface="Courier New" pitchFamily="49" charset="0"/>
-            </a:endParaRPr>
           </a:p>
         </p:txBody>
       </p:sp>
@@ -17445,14 +17197,7 @@
                 <a:latin typeface="Courier New" pitchFamily="49" charset="0"/>
                 <a:cs typeface="Courier New" pitchFamily="49" charset="0"/>
               </a:rPr>
-              <a:t>$ </a:t>
-            </a:r>
-            <a:r>
-              <a:rPr lang="nl-BE" dirty="0" smtClean="0">
-                <a:latin typeface="Courier New" pitchFamily="49" charset="0"/>
-                <a:cs typeface="Courier New" pitchFamily="49" charset="0"/>
-              </a:rPr>
-              <a:t>git </a:t>
+              <a:t>$ git </a:t>
             </a:r>
             <a:r>
               <a:rPr lang="nl-BE" dirty="0" err="1" smtClean="0">
@@ -17466,14 +17211,7 @@
                 <a:latin typeface="Courier New" pitchFamily="49" charset="0"/>
                 <a:cs typeface="Courier New" pitchFamily="49" charset="0"/>
               </a:rPr>
-              <a:t>  </a:t>
-            </a:r>
-            <a:r>
-              <a:rPr lang="nl-BE" dirty="0" smtClean="0">
-                <a:latin typeface="Courier New" pitchFamily="49" charset="0"/>
-                <a:cs typeface="Courier New" pitchFamily="49" charset="0"/>
-              </a:rPr>
-              <a:t>–m '</a:t>
+              <a:t>  –m '</a:t>
             </a:r>
             <a:r>
               <a:rPr lang="nl-BE" dirty="0" err="1" smtClean="0">
@@ -17538,14 +17276,7 @@
                 <a:latin typeface="Courier New" pitchFamily="49" charset="0"/>
                 <a:cs typeface="Courier New" pitchFamily="49" charset="0"/>
               </a:rPr>
-              <a:t>$ </a:t>
-            </a:r>
-            <a:r>
-              <a:rPr lang="nl-BE" dirty="0" smtClean="0">
-                <a:latin typeface="Courier New" pitchFamily="49" charset="0"/>
-                <a:cs typeface="Courier New" pitchFamily="49" charset="0"/>
-              </a:rPr>
-              <a:t>git </a:t>
+              <a:t>$ git </a:t>
             </a:r>
             <a:r>
               <a:rPr lang="nl-BE" dirty="0" err="1" smtClean="0">
@@ -17615,14 +17346,7 @@
                 <a:latin typeface="Courier New" pitchFamily="49" charset="0"/>
                 <a:cs typeface="Courier New" pitchFamily="49" charset="0"/>
               </a:rPr>
-              <a:t>$ </a:t>
-            </a:r>
-            <a:r>
-              <a:rPr lang="nl-BE" dirty="0" smtClean="0">
-                <a:latin typeface="Courier New" pitchFamily="49" charset="0"/>
-                <a:cs typeface="Courier New" pitchFamily="49" charset="0"/>
-              </a:rPr>
-              <a:t>git pull  </a:t>
+              <a:t>$ git pull  </a:t>
             </a:r>
             <a:r>
               <a:rPr lang="nl-BE" dirty="0" err="1" smtClean="0">
@@ -17638,10 +17362,6 @@
               </a:rPr>
               <a:t>  master</a:t>
             </a:r>
-            <a:endParaRPr lang="nl-BE" dirty="0" smtClean="0">
-              <a:latin typeface="Courier New" pitchFamily="49" charset="0"/>
-              <a:cs typeface="Courier New" pitchFamily="49" charset="0"/>
-            </a:endParaRPr>
           </a:p>
         </p:txBody>
       </p:sp>
@@ -17682,14 +17402,7 @@
                 <a:latin typeface="Courier New" pitchFamily="49" charset="0"/>
                 <a:cs typeface="Courier New" pitchFamily="49" charset="0"/>
               </a:rPr>
-              <a:t>$ </a:t>
-            </a:r>
-            <a:r>
-              <a:rPr lang="nl-BE" dirty="0" smtClean="0">
-                <a:latin typeface="Courier New" pitchFamily="49" charset="0"/>
-                <a:cs typeface="Courier New" pitchFamily="49" charset="0"/>
-              </a:rPr>
-              <a:t>git push  </a:t>
+              <a:t>$ git push  </a:t>
             </a:r>
             <a:r>
               <a:rPr lang="nl-BE" dirty="0" err="1" smtClean="0">
@@ -17705,10 +17418,6 @@
               </a:rPr>
               <a:t>  master</a:t>
             </a:r>
-            <a:endParaRPr lang="nl-BE" dirty="0" smtClean="0">
-              <a:latin typeface="Courier New" pitchFamily="49" charset="0"/>
-              <a:cs typeface="Courier New" pitchFamily="49" charset="0"/>
-            </a:endParaRPr>
           </a:p>
         </p:txBody>
       </p:sp>
@@ -18229,11 +17938,7 @@
           <a:p>
             <a:r>
               <a:rPr lang="en-US" dirty="0" smtClean="0"/>
-              <a:t>Pull &amp; </a:t>
-            </a:r>
-            <a:r>
-              <a:rPr lang="en-US" dirty="0" smtClean="0"/>
-              <a:t>conflicts</a:t>
+              <a:t>Pull &amp; conflicts</a:t>
             </a:r>
             <a:endParaRPr lang="nl-BE" dirty="0"/>
           </a:p>
@@ -18258,21 +17963,8 @@
           <a:p>
             <a:r>
               <a:rPr lang="en-US" dirty="0" smtClean="0"/>
-              <a:t>Merge due to pull </a:t>
-            </a:r>
-            <a:r>
-              <a:rPr lang="en-US" dirty="0" smtClean="0"/>
-              <a:t>can </a:t>
-            </a:r>
-            <a:r>
-              <a:rPr lang="en-US" dirty="0" smtClean="0"/>
-              <a:t>result </a:t>
-            </a:r>
-            <a:r>
-              <a:rPr lang="en-US" dirty="0" smtClean="0"/>
-              <a:t>in</a:t>
-            </a:r>
-            <a:endParaRPr lang="en-US" dirty="0" smtClean="0"/>
+              <a:t>Merge due to pull can result in</a:t>
+            </a:r>
           </a:p>
         </p:txBody>
       </p:sp>
@@ -18647,11 +18339,7 @@
           <a:p>
             <a:r>
               <a:rPr lang="en-US" dirty="0" smtClean="0"/>
-              <a:t>Resolving by </a:t>
-            </a:r>
-            <a:r>
-              <a:rPr lang="en-US" dirty="0" smtClean="0"/>
-              <a:t>editing file(s)</a:t>
+              <a:t>Resolving by editing file(s)</a:t>
             </a:r>
             <a:endParaRPr lang="nl-BE" dirty="0"/>
           </a:p>
@@ -18712,15 +18400,7 @@
             </a:r>
             <a:r>
               <a:rPr lang="en-US" dirty="0" smtClean="0"/>
-              <a:t> a bug, so </a:t>
-            </a:r>
-            <a:r>
-              <a:rPr lang="en-US" dirty="0" smtClean="0"/>
-              <a:t>remote version </a:t>
-            </a:r>
-            <a:r>
-              <a:rPr lang="en-US" dirty="0" smtClean="0"/>
-              <a:t>is correct, edit to:</a:t>
+              <a:t> a bug, so remote version is correct, edit to:</a:t>
             </a:r>
           </a:p>
           <a:p>
@@ -18735,11 +18415,7 @@
           <a:p>
             <a:r>
               <a:rPr lang="en-US" dirty="0" smtClean="0"/>
-              <a:t>Resolve all other conflicts, </a:t>
-            </a:r>
-            <a:r>
-              <a:rPr lang="en-US" dirty="0" smtClean="0"/>
-              <a:t>safe, stage, pull, and commit</a:t>
+              <a:t>Resolve all other conflicts, safe, stage, pull, and commit</a:t>
             </a:r>
             <a:endParaRPr lang="nl-BE" dirty="0"/>
           </a:p>
@@ -18814,19 +18490,8 @@
                 <a:latin typeface="Courier New" pitchFamily="49" charset="0"/>
                 <a:cs typeface="Courier New" pitchFamily="49" charset="0"/>
               </a:rPr>
-              <a:t>&lt;&lt;&lt;&lt;&lt;&lt;&lt; </a:t>
-            </a:r>
-            <a:r>
-              <a:rPr lang="en-US" sz="1600" dirty="0" smtClean="0">
-                <a:latin typeface="Courier New" pitchFamily="49" charset="0"/>
-                <a:cs typeface="Courier New" pitchFamily="49" charset="0"/>
-              </a:rPr>
-              <a:t>HEAD</a:t>
-            </a:r>
-            <a:endParaRPr lang="en-US" sz="1600" dirty="0" smtClean="0">
-              <a:latin typeface="Courier New" pitchFamily="49" charset="0"/>
-              <a:cs typeface="Courier New" pitchFamily="49" charset="0"/>
-            </a:endParaRPr>
+              <a:t>&lt;&lt;&lt;&lt;&lt;&lt;&lt; HEAD</a:t>
+            </a:r>
           </a:p>
           <a:p>
             <a:r>
@@ -18945,19 +18610,8 @@
                 <a:latin typeface="Courier New" pitchFamily="49" charset="0"/>
                 <a:cs typeface="Courier New" pitchFamily="49" charset="0"/>
               </a:rPr>
-              <a:t>&gt;&gt;&gt;&gt;&gt;&gt;&gt; </a:t>
-            </a:r>
-            <a:r>
-              <a:rPr lang="en-US" sz="1600" dirty="0" smtClean="0">
-                <a:latin typeface="Courier New" pitchFamily="49" charset="0"/>
-                <a:cs typeface="Courier New" pitchFamily="49" charset="0"/>
-              </a:rPr>
-              <a:t>master</a:t>
-            </a:r>
-            <a:endParaRPr lang="en-US" sz="1600" dirty="0" smtClean="0">
-              <a:latin typeface="Courier New" pitchFamily="49" charset="0"/>
-              <a:cs typeface="Courier New" pitchFamily="49" charset="0"/>
-            </a:endParaRPr>
+              <a:t>&gt;&gt;&gt;&gt;&gt;&gt;&gt; master</a:t>
+            </a:r>
           </a:p>
           <a:p>
             <a:r>
@@ -19678,46 +19332,27 @@
           <a:p>
             <a:r>
               <a:rPr lang="en-US" dirty="0" smtClean="0"/>
-              <a:t>Conflict resolution happens on </a:t>
-            </a:r>
+              <a:t>Conflict resolution happens on local repository</a:t>
+            </a:r>
+          </a:p>
+          <a:p>
+            <a:pPr lvl="1"/>
             <a:r>
               <a:rPr lang="en-US" dirty="0" smtClean="0"/>
-              <a:t>local repository</a:t>
-            </a:r>
-            <a:endParaRPr lang="en-US" dirty="0" smtClean="0"/>
+              <a:t>When done, push</a:t>
+            </a:r>
           </a:p>
           <a:p>
             <a:pPr lvl="1"/>
             <a:r>
               <a:rPr lang="en-US" dirty="0" smtClean="0"/>
-              <a:t>When done, </a:t>
-            </a:r>
+              <a:t>When you mess up, well, everything is in your local repository</a:t>
+            </a:r>
+          </a:p>
+          <a:p>
             <a:r>
               <a:rPr lang="en-US" dirty="0" smtClean="0"/>
-              <a:t>push</a:t>
-            </a:r>
-            <a:endParaRPr lang="en-US" dirty="0" smtClean="0"/>
-          </a:p>
-          <a:p>
-            <a:pPr lvl="1"/>
-            <a:r>
-              <a:rPr lang="en-US" dirty="0" smtClean="0"/>
-              <a:t>When you mess up, well, </a:t>
-            </a:r>
-            <a:r>
-              <a:rPr lang="en-US" dirty="0" smtClean="0"/>
-              <a:t>everything is in your local repository</a:t>
-            </a:r>
-            <a:endParaRPr lang="en-US" dirty="0" smtClean="0"/>
-          </a:p>
-          <a:p>
-            <a:r>
-              <a:rPr lang="en-US" dirty="0" smtClean="0"/>
-              <a:t>Familiarize </a:t>
-            </a:r>
-            <a:r>
-              <a:rPr lang="en-US" dirty="0" smtClean="0"/>
-              <a:t>yourself with the merge process</a:t>
+              <a:t>Familiarize yourself with the merge process</a:t>
             </a:r>
           </a:p>
           <a:p>
@@ -19731,27 +19366,14 @@
             <a:pPr lvl="1"/>
             <a:r>
               <a:rPr lang="en-US" dirty="0" smtClean="0"/>
-              <a:t>It will pay off at some point or other, even in single user </a:t>
-            </a:r>
+              <a:t>It will pay off at some point or other, even in single user scenario, e.g.,</a:t>
+            </a:r>
+          </a:p>
+          <a:p>
+            <a:pPr lvl="2"/>
             <a:r>
               <a:rPr lang="en-US" dirty="0" smtClean="0"/>
-              <a:t>scenario, e.g.,</a:t>
-            </a:r>
-            <a:endParaRPr lang="en-US" dirty="0" smtClean="0"/>
-          </a:p>
-          <a:p>
-            <a:pPr lvl="2"/>
-            <a:r>
-              <a:rPr lang="en-US" dirty="0" smtClean="0"/>
-              <a:t>You </a:t>
-            </a:r>
-            <a:r>
-              <a:rPr lang="en-US" dirty="0" smtClean="0"/>
-              <a:t>work on multiple computers and forgot to </a:t>
-            </a:r>
-            <a:r>
-              <a:rPr lang="en-US" dirty="0" smtClean="0"/>
-              <a:t>pull</a:t>
+              <a:t>You work on multiple computers and forgot to pull</a:t>
             </a:r>
           </a:p>
           <a:p>
@@ -19770,7 +19392,6 @@
               <a:rPr lang="en-US" dirty="0" smtClean="0"/>
               <a:t> is pretty smart about merging</a:t>
             </a:r>
-            <a:endParaRPr lang="en-US" dirty="0" smtClean="0"/>
           </a:p>
         </p:txBody>
       </p:sp>
@@ -20328,13 +19949,8 @@
             </a:r>
             <a:r>
               <a:rPr lang="en-US" dirty="0" smtClean="0"/>
-              <a:t> from </a:t>
-            </a:r>
-            <a:r>
-              <a:rPr lang="en-US" dirty="0" smtClean="0"/>
-              <a:t>master</a:t>
-            </a:r>
-            <a:endParaRPr lang="en-US" dirty="0" smtClean="0"/>
+              <a:t> from master</a:t>
+            </a:r>
           </a:p>
           <a:p>
             <a:pPr lvl="1"/>
@@ -20359,13 +19975,8 @@
             </a:r>
             <a:r>
               <a:rPr lang="en-US" dirty="0" smtClean="0"/>
-              <a:t> from </a:t>
-            </a:r>
-            <a:r>
-              <a:rPr lang="en-US" dirty="0" smtClean="0"/>
-              <a:t>master</a:t>
-            </a:r>
-            <a:endParaRPr lang="en-US" dirty="0" smtClean="0"/>
+              <a:t> from master</a:t>
+            </a:r>
           </a:p>
           <a:p>
             <a:pPr lvl="1"/>
@@ -20390,11 +20001,7 @@
             </a:r>
             <a:r>
               <a:rPr lang="en-US" dirty="0" smtClean="0"/>
-              <a:t> back into </a:t>
-            </a:r>
-            <a:r>
-              <a:rPr lang="en-US" dirty="0" smtClean="0"/>
-              <a:t>master</a:t>
+              <a:t> back into master</a:t>
             </a:r>
             <a:endParaRPr lang="en-US" i="1" dirty="0" smtClean="0"/>
           </a:p>
@@ -20421,11 +20028,7 @@
             </a:r>
             <a:r>
               <a:rPr lang="en-US" dirty="0" smtClean="0"/>
-              <a:t> back into </a:t>
-            </a:r>
-            <a:r>
-              <a:rPr lang="en-US" dirty="0" smtClean="0"/>
-              <a:t>master</a:t>
+              <a:t> back into master</a:t>
             </a:r>
             <a:endParaRPr lang="en-US" dirty="0"/>
           </a:p>
@@ -22445,11 +22048,7 @@
           <a:p>
             <a:r>
               <a:rPr lang="en-US" dirty="0" smtClean="0"/>
-              <a:t>Creating a </a:t>
-            </a:r>
-            <a:r>
-              <a:rPr lang="en-US" dirty="0" smtClean="0"/>
-              <a:t>new branch</a:t>
+              <a:t>Creating a new branch</a:t>
             </a:r>
           </a:p>
           <a:p>
@@ -22457,26 +22056,17 @@
               <a:rPr lang="en-US" dirty="0" smtClean="0"/>
               <a:t>Check out to switch to new branch</a:t>
             </a:r>
-            <a:endParaRPr lang="en-US" dirty="0" smtClean="0"/>
           </a:p>
           <a:p>
             <a:r>
               <a:rPr lang="en-US" dirty="0" smtClean="0"/>
-              <a:t>Usual </a:t>
-            </a:r>
+              <a:t>Usual edit/commit cycle until done</a:t>
+            </a:r>
+          </a:p>
+          <a:p>
             <a:r>
               <a:rPr lang="en-US" dirty="0" smtClean="0"/>
-              <a:t>edit/commit cycle until done</a:t>
-            </a:r>
-          </a:p>
-          <a:p>
-            <a:r>
-              <a:rPr lang="en-US" dirty="0" smtClean="0"/>
-              <a:t>When done, </a:t>
-            </a:r>
-            <a:r>
-              <a:rPr lang="en-US" dirty="0" smtClean="0"/>
-              <a:t>switch to original branch</a:t>
+              <a:t>When done, switch to original branch</a:t>
             </a:r>
           </a:p>
           <a:p>
@@ -22922,13 +22512,8 @@
           <a:p>
             <a:r>
               <a:rPr lang="en-US" dirty="0" smtClean="0"/>
-              <a:t>Creating a </a:t>
-            </a:r>
-            <a:r>
-              <a:rPr lang="en-US" dirty="0" smtClean="0"/>
-              <a:t>branch</a:t>
-            </a:r>
-            <a:endParaRPr lang="en-US" dirty="0" smtClean="0"/>
+              <a:t>Creating a branch</a:t>
+            </a:r>
           </a:p>
           <a:p>
             <a:endParaRPr lang="en-US" dirty="0" smtClean="0"/>
@@ -22938,7 +22523,6 @@
               <a:rPr lang="en-US" dirty="0" smtClean="0"/>
               <a:t>Switch to branch</a:t>
             </a:r>
-            <a:endParaRPr lang="en-US" dirty="0" smtClean="0"/>
           </a:p>
           <a:p>
             <a:endParaRPr lang="en-US" dirty="0" smtClean="0"/>
@@ -22984,14 +22568,7 @@
                 <a:latin typeface="Courier New" pitchFamily="49" charset="0"/>
                 <a:cs typeface="Courier New" pitchFamily="49" charset="0"/>
               </a:rPr>
-              <a:t>$ </a:t>
-            </a:r>
-            <a:r>
-              <a:rPr lang="nl-BE" dirty="0" smtClean="0">
-                <a:latin typeface="Courier New" pitchFamily="49" charset="0"/>
-                <a:cs typeface="Courier New" pitchFamily="49" charset="0"/>
-              </a:rPr>
-              <a:t>git </a:t>
+              <a:t>$ git </a:t>
             </a:r>
             <a:r>
               <a:rPr lang="nl-BE" dirty="0" err="1" smtClean="0">
@@ -23053,14 +22630,7 @@
                 <a:latin typeface="Courier New" pitchFamily="49" charset="0"/>
                 <a:cs typeface="Courier New" pitchFamily="49" charset="0"/>
               </a:rPr>
-              <a:t>$ </a:t>
-            </a:r>
-            <a:r>
-              <a:rPr lang="nl-BE" dirty="0" smtClean="0">
-                <a:latin typeface="Courier New" pitchFamily="49" charset="0"/>
-                <a:cs typeface="Courier New" pitchFamily="49" charset="0"/>
-              </a:rPr>
-              <a:t>git </a:t>
+              <a:t>$ git </a:t>
             </a:r>
             <a:r>
               <a:rPr lang="nl-BE" dirty="0" err="1" smtClean="0">
@@ -23472,11 +23042,7 @@
           <a:p>
             <a:r>
               <a:rPr lang="en-US" dirty="0" smtClean="0"/>
-              <a:t>Merging branch into </a:t>
-            </a:r>
-            <a:r>
-              <a:rPr lang="en-US" dirty="0" smtClean="0"/>
-              <a:t>master</a:t>
+              <a:t>Merging branch into master</a:t>
             </a:r>
             <a:endParaRPr lang="en-US" dirty="0"/>
           </a:p>
@@ -23522,13 +23088,8 @@
             </a:pPr>
             <a:r>
               <a:rPr lang="en-US" dirty="0" smtClean="0"/>
-              <a:t>Merge </a:t>
-            </a:r>
-            <a:r>
-              <a:rPr lang="en-US" dirty="0" smtClean="0"/>
-              <a:t>branch</a:t>
-            </a:r>
-            <a:endParaRPr lang="en-US" dirty="0" smtClean="0"/>
+              <a:t>Merge branch</a:t>
+            </a:r>
           </a:p>
           <a:p>
             <a:pPr marL="514350" indent="-514350">
@@ -23544,13 +23105,8 @@
             </a:pPr>
             <a:r>
               <a:rPr lang="en-US" dirty="0" smtClean="0"/>
-              <a:t>Resolve </a:t>
-            </a:r>
-            <a:r>
-              <a:rPr lang="en-US" dirty="0" smtClean="0"/>
-              <a:t>conflicts, if any</a:t>
-            </a:r>
-            <a:endParaRPr lang="en-US" dirty="0" smtClean="0"/>
+              <a:t>Resolve conflicts, if any</a:t>
+            </a:r>
           </a:p>
           <a:p>
             <a:pPr marL="514350" indent="-514350">
@@ -23617,14 +23173,7 @@
                 <a:latin typeface="Courier New" pitchFamily="49" charset="0"/>
                 <a:cs typeface="Courier New" pitchFamily="49" charset="0"/>
               </a:rPr>
-              <a:t>$ </a:t>
-            </a:r>
-            <a:r>
-              <a:rPr lang="nl-BE" dirty="0" smtClean="0">
-                <a:latin typeface="Courier New" pitchFamily="49" charset="0"/>
-                <a:cs typeface="Courier New" pitchFamily="49" charset="0"/>
-              </a:rPr>
-              <a:t>git </a:t>
+              <a:t>$ git </a:t>
             </a:r>
             <a:r>
               <a:rPr lang="nl-BE" dirty="0" err="1" smtClean="0">
@@ -23640,10 +23189,6 @@
               </a:rPr>
               <a:t>  master</a:t>
             </a:r>
-            <a:endParaRPr lang="nl-BE" dirty="0" smtClean="0">
-              <a:latin typeface="Courier New" pitchFamily="49" charset="0"/>
-              <a:cs typeface="Courier New" pitchFamily="49" charset="0"/>
-            </a:endParaRPr>
           </a:p>
         </p:txBody>
       </p:sp>
@@ -23679,14 +23224,7 @@
                 <a:latin typeface="Courier New" pitchFamily="49" charset="0"/>
                 <a:cs typeface="Courier New" pitchFamily="49" charset="0"/>
               </a:rPr>
-              <a:t>$ </a:t>
-            </a:r>
-            <a:r>
-              <a:rPr lang="nl-BE" dirty="0" smtClean="0">
-                <a:latin typeface="Courier New" pitchFamily="49" charset="0"/>
-                <a:cs typeface="Courier New" pitchFamily="49" charset="0"/>
-              </a:rPr>
-              <a:t>git </a:t>
+              <a:t>$ git </a:t>
             </a:r>
             <a:r>
               <a:rPr lang="nl-BE" dirty="0" err="1" smtClean="0">
@@ -23748,14 +23286,7 @@
                 <a:latin typeface="Courier New" pitchFamily="49" charset="0"/>
                 <a:cs typeface="Courier New" pitchFamily="49" charset="0"/>
               </a:rPr>
-              <a:t>$ </a:t>
-            </a:r>
-            <a:r>
-              <a:rPr lang="nl-BE" dirty="0" smtClean="0">
-                <a:latin typeface="Courier New" pitchFamily="49" charset="0"/>
-                <a:cs typeface="Courier New" pitchFamily="49" charset="0"/>
-              </a:rPr>
-              <a:t>git </a:t>
+              <a:t>$ git </a:t>
             </a:r>
             <a:r>
               <a:rPr lang="nl-BE" dirty="0" err="1" smtClean="0">
@@ -24289,7 +23820,6 @@
               <a:rPr lang="en-US" dirty="0" smtClean="0"/>
               <a:t>master</a:t>
             </a:r>
-            <a:endParaRPr lang="en-US" dirty="0" smtClean="0"/>
           </a:p>
           <a:p>
             <a:pPr lvl="2"/>
@@ -24297,7 +23827,6 @@
               <a:rPr lang="en-US" dirty="0" smtClean="0"/>
               <a:t>Other branches</a:t>
             </a:r>
-            <a:endParaRPr lang="en-US" dirty="0" smtClean="0"/>
           </a:p>
           <a:p>
             <a:pPr lvl="3"/>
@@ -24340,7 +23869,6 @@
               <a:rPr lang="en-US" dirty="0" smtClean="0"/>
               <a:t>…</a:t>
             </a:r>
-            <a:endParaRPr lang="en-US" dirty="0" smtClean="0"/>
           </a:p>
           <a:p>
             <a:pPr lvl="2"/>
@@ -24362,7 +23890,6 @@
               <a:rPr lang="en-US" dirty="0" smtClean="0"/>
               <a:t>release-1.1</a:t>
             </a:r>
-            <a:endParaRPr lang="en-US" dirty="0" smtClean="0"/>
           </a:p>
         </p:txBody>
       </p:sp>
@@ -26217,14 +25744,7 @@
                 <a:latin typeface="Courier New" pitchFamily="49" charset="0"/>
                 <a:cs typeface="Courier New" pitchFamily="49" charset="0"/>
               </a:rPr>
-              <a:t>$ </a:t>
-            </a:r>
-            <a:r>
-              <a:rPr lang="nl-BE" dirty="0" smtClean="0">
-                <a:latin typeface="Courier New" pitchFamily="49" charset="0"/>
-                <a:cs typeface="Courier New" pitchFamily="49" charset="0"/>
-              </a:rPr>
-              <a:t>git </a:t>
+              <a:t>$ git </a:t>
             </a:r>
             <a:r>
               <a:rPr lang="nl-BE" dirty="0" err="1" smtClean="0">
@@ -26272,14 +25792,7 @@
                 <a:latin typeface="Courier New" pitchFamily="49" charset="0"/>
                 <a:cs typeface="Courier New" pitchFamily="49" charset="0"/>
               </a:rPr>
-              <a:t>$ </a:t>
-            </a:r>
-            <a:r>
-              <a:rPr lang="nl-BE" dirty="0" smtClean="0">
-                <a:latin typeface="Courier New" pitchFamily="49" charset="0"/>
-                <a:cs typeface="Courier New" pitchFamily="49" charset="0"/>
-              </a:rPr>
-              <a:t>git </a:t>
+              <a:t>$ git </a:t>
             </a:r>
             <a:r>
               <a:rPr lang="nl-BE" dirty="0" err="1" smtClean="0">
@@ -26295,10 +25808,6 @@
               </a:rPr>
               <a:t>  development</a:t>
             </a:r>
-            <a:endParaRPr lang="nl-BE" dirty="0" smtClean="0">
-              <a:latin typeface="Courier New" pitchFamily="49" charset="0"/>
-              <a:cs typeface="Courier New" pitchFamily="49" charset="0"/>
-            </a:endParaRPr>
           </a:p>
         </p:txBody>
       </p:sp>
@@ -26675,11 +26184,7 @@
             </a:r>
             <a:r>
               <a:rPr lang="en-US" dirty="0" smtClean="0"/>
-              <a:t> </a:t>
-            </a:r>
-            <a:r>
-              <a:rPr lang="en-US" dirty="0" smtClean="0"/>
-              <a:t>web site</a:t>
+              <a:t> web site</a:t>
             </a:r>
           </a:p>
           <a:p>
@@ -26740,11 +26245,7 @@
             </a:r>
             <a:r>
               <a:rPr lang="nl-BE" dirty="0" smtClean="0"/>
-              <a:t> </a:t>
-            </a:r>
-            <a:r>
-              <a:rPr lang="nl-BE" dirty="0" smtClean="0"/>
-              <a:t>git </a:t>
+              <a:t> git </a:t>
             </a:r>
             <a:r>
               <a:rPr lang="nl-BE" dirty="0" err="1" smtClean="0"/>

</xml_diff>

<commit_message>
Added info on amending commit messages
</commit_message>
<xml_diff>
--- a/LinuxTools/VersionControl/version_control_git.pptx
+++ b/LinuxTools/VersionControl/version_control_git.pptx
@@ -349,7 +349,7 @@
           <a:p>
             <a:fld id="{31155545-FFF6-4666-BE18-08518292A6F3}" type="datetimeFigureOut">
               <a:rPr lang="nl-BE" smtClean="0"/>
-              <a:t>5/12/2015</a:t>
+              <a:t>6/12/2015</a:t>
             </a:fld>
             <a:endParaRPr lang="nl-BE"/>
           </a:p>
@@ -519,7 +519,7 @@
           <a:p>
             <a:fld id="{31155545-FFF6-4666-BE18-08518292A6F3}" type="datetimeFigureOut">
               <a:rPr lang="nl-BE" smtClean="0"/>
-              <a:t>5/12/2015</a:t>
+              <a:t>6/12/2015</a:t>
             </a:fld>
             <a:endParaRPr lang="nl-BE"/>
           </a:p>
@@ -699,7 +699,7 @@
           <a:p>
             <a:fld id="{31155545-FFF6-4666-BE18-08518292A6F3}" type="datetimeFigureOut">
               <a:rPr lang="nl-BE" smtClean="0"/>
-              <a:t>5/12/2015</a:t>
+              <a:t>6/12/2015</a:t>
             </a:fld>
             <a:endParaRPr lang="nl-BE"/>
           </a:p>
@@ -869,7 +869,7 @@
           <a:p>
             <a:fld id="{31155545-FFF6-4666-BE18-08518292A6F3}" type="datetimeFigureOut">
               <a:rPr lang="nl-BE" smtClean="0"/>
-              <a:t>5/12/2015</a:t>
+              <a:t>6/12/2015</a:t>
             </a:fld>
             <a:endParaRPr lang="nl-BE"/>
           </a:p>
@@ -1115,7 +1115,7 @@
           <a:p>
             <a:fld id="{31155545-FFF6-4666-BE18-08518292A6F3}" type="datetimeFigureOut">
               <a:rPr lang="nl-BE" smtClean="0"/>
-              <a:t>5/12/2015</a:t>
+              <a:t>6/12/2015</a:t>
             </a:fld>
             <a:endParaRPr lang="nl-BE"/>
           </a:p>
@@ -1403,7 +1403,7 @@
           <a:p>
             <a:fld id="{31155545-FFF6-4666-BE18-08518292A6F3}" type="datetimeFigureOut">
               <a:rPr lang="nl-BE" smtClean="0"/>
-              <a:t>5/12/2015</a:t>
+              <a:t>6/12/2015</a:t>
             </a:fld>
             <a:endParaRPr lang="nl-BE"/>
           </a:p>
@@ -1825,7 +1825,7 @@
           <a:p>
             <a:fld id="{31155545-FFF6-4666-BE18-08518292A6F3}" type="datetimeFigureOut">
               <a:rPr lang="nl-BE" smtClean="0"/>
-              <a:t>5/12/2015</a:t>
+              <a:t>6/12/2015</a:t>
             </a:fld>
             <a:endParaRPr lang="nl-BE"/>
           </a:p>
@@ -1943,7 +1943,7 @@
           <a:p>
             <a:fld id="{31155545-FFF6-4666-BE18-08518292A6F3}" type="datetimeFigureOut">
               <a:rPr lang="nl-BE" smtClean="0"/>
-              <a:t>5/12/2015</a:t>
+              <a:t>6/12/2015</a:t>
             </a:fld>
             <a:endParaRPr lang="nl-BE"/>
           </a:p>
@@ -2038,7 +2038,7 @@
           <a:p>
             <a:fld id="{31155545-FFF6-4666-BE18-08518292A6F3}" type="datetimeFigureOut">
               <a:rPr lang="nl-BE" smtClean="0"/>
-              <a:t>5/12/2015</a:t>
+              <a:t>6/12/2015</a:t>
             </a:fld>
             <a:endParaRPr lang="nl-BE"/>
           </a:p>
@@ -2315,7 +2315,7 @@
           <a:p>
             <a:fld id="{31155545-FFF6-4666-BE18-08518292A6F3}" type="datetimeFigureOut">
               <a:rPr lang="nl-BE" smtClean="0"/>
-              <a:t>5/12/2015</a:t>
+              <a:t>6/12/2015</a:t>
             </a:fld>
             <a:endParaRPr lang="nl-BE"/>
           </a:p>
@@ -2568,7 +2568,7 @@
           <a:p>
             <a:fld id="{31155545-FFF6-4666-BE18-08518292A6F3}" type="datetimeFigureOut">
               <a:rPr lang="nl-BE" smtClean="0"/>
-              <a:t>5/12/2015</a:t>
+              <a:t>6/12/2015</a:t>
             </a:fld>
             <a:endParaRPr lang="nl-BE"/>
           </a:p>
@@ -2781,7 +2781,7 @@
           <a:p>
             <a:fld id="{31155545-FFF6-4666-BE18-08518292A6F3}" type="datetimeFigureOut">
               <a:rPr lang="nl-BE" smtClean="0"/>
-              <a:t>5/12/2015</a:t>
+              <a:t>6/12/2015</a:t>
             </a:fld>
             <a:endParaRPr lang="nl-BE"/>
           </a:p>
@@ -12786,7 +12786,9 @@
         </p:nvSpPr>
         <p:spPr/>
         <p:txBody>
-          <a:bodyPr/>
+          <a:bodyPr>
+            <a:normAutofit fontScale="92500" lnSpcReduction="20000"/>
+          </a:bodyPr>
           <a:lstStyle/>
           <a:p>
             <a:r>
@@ -12812,8 +12814,21 @@
             <a:pPr lvl="1"/>
             <a:r>
               <a:rPr lang="en-US" dirty="0" smtClean="0"/>
-              <a:t>Mainly used to fine-tune commits</a:t>
-            </a:r>
+              <a:t>Mainly used to fine-tune </a:t>
+            </a:r>
+            <a:r>
+              <a:rPr lang="en-US" dirty="0" smtClean="0"/>
+              <a:t>commits</a:t>
+            </a:r>
+          </a:p>
+          <a:p>
+            <a:r>
+              <a:rPr lang="en-US" dirty="0" smtClean="0"/>
+              <a:t>Changing a commit message</a:t>
+            </a:r>
+          </a:p>
+          <a:p>
+            <a:endParaRPr lang="en-US" dirty="0" smtClean="0"/>
           </a:p>
           <a:p>
             <a:r>
@@ -12842,7 +12857,7 @@
         </p:nvSpPr>
         <p:spPr>
           <a:xfrm>
-            <a:off x="1259632" y="2708920"/>
+            <a:off x="1259632" y="2390444"/>
             <a:ext cx="3960440" cy="923330"/>
           </a:xfrm>
           <a:prstGeom prst="rect">
@@ -12937,7 +12952,7 @@
         </p:nvSpPr>
         <p:spPr>
           <a:xfrm>
-            <a:off x="1259632" y="5003884"/>
+            <a:off x="1259632" y="5075892"/>
             <a:ext cx="3960440" cy="369332"/>
           </a:xfrm>
           <a:prstGeom prst="rect">
@@ -12963,6 +12978,68 @@
               </a:rPr>
               <a:t>$ get reset  --hard  HEAD^</a:t>
             </a:r>
+          </a:p>
+        </p:txBody>
+      </p:sp>
+      <p:sp>
+        <p:nvSpPr>
+          <p:cNvPr id="6" name="TextBox 5"/>
+          <p:cNvSpPr txBox="1"/>
+          <p:nvPr/>
+        </p:nvSpPr>
+        <p:spPr>
+          <a:xfrm>
+            <a:off x="1259632" y="4221088"/>
+            <a:ext cx="3960440" cy="369332"/>
+          </a:xfrm>
+          <a:prstGeom prst="rect">
+            <a:avLst/>
+          </a:prstGeom>
+          <a:noFill/>
+          <a:ln>
+            <a:solidFill>
+              <a:schemeClr val="tx1"/>
+            </a:solidFill>
+          </a:ln>
+        </p:spPr>
+        <p:txBody>
+          <a:bodyPr wrap="square" rtlCol="0">
+            <a:spAutoFit/>
+          </a:bodyPr>
+          <a:lstStyle/>
+          <a:p>
+            <a:r>
+              <a:rPr lang="nl-BE" dirty="0" smtClean="0">
+                <a:latin typeface="Courier New" pitchFamily="49" charset="0"/>
+                <a:cs typeface="Courier New" pitchFamily="49" charset="0"/>
+              </a:rPr>
+              <a:t>$ get </a:t>
+            </a:r>
+            <a:r>
+              <a:rPr lang="nl-BE" dirty="0" err="1" smtClean="0">
+                <a:latin typeface="Courier New" pitchFamily="49" charset="0"/>
+                <a:cs typeface="Courier New" pitchFamily="49" charset="0"/>
+              </a:rPr>
+              <a:t>commit</a:t>
+            </a:r>
+            <a:r>
+              <a:rPr lang="nl-BE" dirty="0" smtClean="0">
+                <a:latin typeface="Courier New" pitchFamily="49" charset="0"/>
+                <a:cs typeface="Courier New" pitchFamily="49" charset="0"/>
+              </a:rPr>
+              <a:t>  --</a:t>
+            </a:r>
+            <a:r>
+              <a:rPr lang="nl-BE" dirty="0" err="1" smtClean="0">
+                <a:latin typeface="Courier New" pitchFamily="49" charset="0"/>
+                <a:cs typeface="Courier New" pitchFamily="49" charset="0"/>
+              </a:rPr>
+              <a:t>amend</a:t>
+            </a:r>
+            <a:endParaRPr lang="nl-BE" dirty="0" smtClean="0">
+              <a:latin typeface="Courier New" pitchFamily="49" charset="0"/>
+              <a:cs typeface="Courier New" pitchFamily="49" charset="0"/>
+            </a:endParaRPr>
           </a:p>
         </p:txBody>
       </p:sp>
@@ -13137,15 +13214,64 @@
                                   </p:childTnLst>
                                 </p:cTn>
                               </p:par>
+                            </p:childTnLst>
+                          </p:cTn>
+                        </p:par>
+                      </p:childTnLst>
+                    </p:cTn>
+                  </p:par>
+                  <p:par>
+                    <p:cTn id="15" fill="hold">
+                      <p:stCondLst>
+                        <p:cond delay="indefinite"/>
+                      </p:stCondLst>
+                      <p:childTnLst>
+                        <p:par>
+                          <p:cTn id="16" fill="hold">
+                            <p:stCondLst>
+                              <p:cond delay="0"/>
+                            </p:stCondLst>
+                            <p:childTnLst>
                               <p:par>
-                                <p:cTn id="15" presetID="1" presetClass="entr" presetSubtype="0" fill="hold" grpId="0" nodeType="withEffect">
+                                <p:cTn id="17" presetID="1" presetClass="entr" presetSubtype="0" fill="hold" grpId="0" nodeType="clickEffect">
                                   <p:stCondLst>
                                     <p:cond delay="0"/>
                                   </p:stCondLst>
                                   <p:childTnLst>
                                     <p:set>
                                       <p:cBhvr>
-                                        <p:cTn id="16" dur="1" fill="hold">
+                                        <p:cTn id="18" dur="1" fill="hold">
+                                          <p:stCondLst>
+                                            <p:cond delay="0"/>
+                                          </p:stCondLst>
+                                        </p:cTn>
+                                        <p:tgtEl>
+                                          <p:spTgt spid="3">
+                                            <p:txEl>
+                                              <p:pRg st="6" end="6"/>
+                                            </p:txEl>
+                                          </p:spTgt>
+                                        </p:tgtEl>
+                                        <p:attrNameLst>
+                                          <p:attrName>style.visibility</p:attrName>
+                                        </p:attrNameLst>
+                                      </p:cBhvr>
+                                      <p:to>
+                                        <p:strVal val="visible"/>
+                                      </p:to>
+                                    </p:set>
+                                  </p:childTnLst>
+                                </p:cTn>
+                              </p:par>
+                              <p:par>
+                                <p:cTn id="19" presetID="1" presetClass="entr" presetSubtype="0" fill="hold" grpId="0" nodeType="withEffect">
+                                  <p:stCondLst>
+                                    <p:cond delay="0"/>
+                                  </p:stCondLst>
+                                  <p:childTnLst>
+                                    <p:set>
+                                      <p:cBhvr>
+                                        <p:cTn id="20" dur="1" fill="hold">
                                           <p:stCondLst>
                                             <p:cond delay="0"/>
                                           </p:stCondLst>
@@ -13165,14 +13291,14 @@
                                 </p:cTn>
                               </p:par>
                               <p:par>
-                                <p:cTn id="17" presetID="1" presetClass="entr" presetSubtype="0" fill="hold" grpId="0" nodeType="withEffect">
+                                <p:cTn id="21" presetID="1" presetClass="entr" presetSubtype="0" fill="hold" grpId="0" nodeType="withEffect">
                                   <p:stCondLst>
                                     <p:cond delay="0"/>
                                   </p:stCondLst>
                                   <p:childTnLst>
                                     <p:set>
                                       <p:cBhvr>
-                                        <p:cTn id="18" dur="1" fill="hold">
+                                        <p:cTn id="22" dur="1" fill="hold">
                                           <p:stCondLst>
                                             <p:cond delay="0"/>
                                           </p:stCondLst>
@@ -13180,9 +13306,36 @@
                                         <p:tgtEl>
                                           <p:spTgt spid="3">
                                             <p:txEl>
-                                              <p:pRg st="6" end="6"/>
+                                              <p:pRg st="8" end="8"/>
                                             </p:txEl>
                                           </p:spTgt>
+                                        </p:tgtEl>
+                                        <p:attrNameLst>
+                                          <p:attrName>style.visibility</p:attrName>
+                                        </p:attrNameLst>
+                                      </p:cBhvr>
+                                      <p:to>
+                                        <p:strVal val="visible"/>
+                                      </p:to>
+                                    </p:set>
+                                  </p:childTnLst>
+                                </p:cTn>
+                              </p:par>
+                              <p:par>
+                                <p:cTn id="23" presetID="1" presetClass="entr" presetSubtype="0" fill="hold" grpId="0" nodeType="withEffect">
+                                  <p:stCondLst>
+                                    <p:cond delay="0"/>
+                                  </p:stCondLst>
+                                  <p:childTnLst>
+                                    <p:set>
+                                      <p:cBhvr>
+                                        <p:cTn id="24" dur="1" fill="hold">
+                                          <p:stCondLst>
+                                            <p:cond delay="0"/>
+                                          </p:stCondLst>
+                                        </p:cTn>
+                                        <p:tgtEl>
+                                          <p:spTgt spid="6"/>
                                         </p:tgtEl>
                                         <p:attrNameLst>
                                           <p:attrName>style.visibility</p:attrName>
@@ -13226,6 +13379,7 @@
       <p:bldP spid="3" grpId="0" uiExpand="1" build="p"/>
       <p:bldP spid="4" grpId="0" animBg="1"/>
       <p:bldP spid="5" grpId="0" animBg="1"/>
+      <p:bldP spid="6" grpId="0" animBg="1"/>
     </p:bldLst>
   </p:timing>
 </p:sld>

</xml_diff>

<commit_message>
Added slide on git shortcuts
</commit_message>
<xml_diff>
--- a/LinuxTools/VersionControl/version_control_git.pptx
+++ b/LinuxTools/VersionControl/version_control_git.pptx
@@ -48,10 +48,11 @@
     <p:sldId id="294" r:id="rId42"/>
     <p:sldId id="297" r:id="rId43"/>
     <p:sldId id="304" r:id="rId44"/>
-    <p:sldId id="298" r:id="rId45"/>
-    <p:sldId id="299" r:id="rId46"/>
-    <p:sldId id="300" r:id="rId47"/>
-    <p:sldId id="301" r:id="rId48"/>
+    <p:sldId id="305" r:id="rId45"/>
+    <p:sldId id="298" r:id="rId46"/>
+    <p:sldId id="299" r:id="rId47"/>
+    <p:sldId id="300" r:id="rId48"/>
+    <p:sldId id="301" r:id="rId49"/>
   </p:sldIdLst>
   <p:sldSz cx="9144000" cy="6858000" type="screen4x3"/>
   <p:notesSz cx="6858000" cy="9144000"/>
@@ -12814,11 +12815,7 @@
             <a:pPr lvl="1"/>
             <a:r>
               <a:rPr lang="en-US" dirty="0" smtClean="0"/>
-              <a:t>Mainly used to fine-tune </a:t>
-            </a:r>
-            <a:r>
-              <a:rPr lang="en-US" dirty="0" smtClean="0"/>
-              <a:t>commits</a:t>
+              <a:t>Mainly used to fine-tune commits</a:t>
             </a:r>
           </a:p>
           <a:p>
@@ -27908,20 +27905,20 @@
           <a:p>
             <a:r>
               <a:rPr lang="en-US" dirty="0" smtClean="0"/>
-              <a:t>Getting More information</a:t>
-            </a:r>
-            <a:endParaRPr lang="en-US" dirty="0"/>
+              <a:t>A few shortcuts</a:t>
+            </a:r>
+            <a:endParaRPr lang="nl-BE" dirty="0"/>
           </a:p>
         </p:txBody>
       </p:sp>
       <p:sp>
         <p:nvSpPr>
-          <p:cNvPr id="3" name="Text Placeholder 2"/>
+          <p:cNvPr id="3" name="Content Placeholder 2"/>
           <p:cNvSpPr>
             <a:spLocks noGrp="1"/>
           </p:cNvSpPr>
           <p:nvPr>
-            <p:ph type="body" idx="1"/>
+            <p:ph idx="1"/>
           </p:nvPr>
         </p:nvSpPr>
         <p:spPr/>
@@ -27929,14 +27926,166 @@
           <a:bodyPr/>
           <a:lstStyle/>
           <a:p>
-            <a:endParaRPr lang="en-US"/>
+            <a:r>
+              <a:rPr lang="en-US" dirty="0" smtClean="0"/>
+              <a:t>Commit all modified files</a:t>
+            </a:r>
+          </a:p>
+          <a:p>
+            <a:pPr lvl="1"/>
+            <a:endParaRPr lang="en-US" dirty="0"/>
+          </a:p>
+          <a:p>
+            <a:pPr lvl="1"/>
+            <a:r>
+              <a:rPr lang="en-US" dirty="0" smtClean="0"/>
+              <a:t>Will commit only modified, tracked files</a:t>
+            </a:r>
+          </a:p>
+          <a:p>
+            <a:r>
+              <a:rPr lang="en-US" dirty="0" smtClean="0"/>
+              <a:t>Create new branch and switch to it</a:t>
+            </a:r>
+            <a:endParaRPr lang="nl-BE" dirty="0"/>
+          </a:p>
+        </p:txBody>
+      </p:sp>
+      <p:sp>
+        <p:nvSpPr>
+          <p:cNvPr id="4" name="TextBox 3"/>
+          <p:cNvSpPr txBox="1"/>
+          <p:nvPr/>
+        </p:nvSpPr>
+        <p:spPr>
+          <a:xfrm>
+            <a:off x="1259632" y="2204864"/>
+            <a:ext cx="5904656" cy="369332"/>
+          </a:xfrm>
+          <a:prstGeom prst="rect">
+            <a:avLst/>
+          </a:prstGeom>
+          <a:noFill/>
+          <a:ln>
+            <a:solidFill>
+              <a:schemeClr val="tx1"/>
+            </a:solidFill>
+          </a:ln>
+        </p:spPr>
+        <p:txBody>
+          <a:bodyPr wrap="square" rtlCol="0">
+            <a:spAutoFit/>
+          </a:bodyPr>
+          <a:lstStyle/>
+          <a:p>
+            <a:r>
+              <a:rPr lang="nl-BE" dirty="0" smtClean="0">
+                <a:latin typeface="Courier New" pitchFamily="49" charset="0"/>
+                <a:cs typeface="Courier New" pitchFamily="49" charset="0"/>
+              </a:rPr>
+              <a:t>$ git </a:t>
+            </a:r>
+            <a:r>
+              <a:rPr lang="nl-BE" dirty="0" err="1" smtClean="0">
+                <a:latin typeface="Courier New" pitchFamily="49" charset="0"/>
+                <a:cs typeface="Courier New" pitchFamily="49" charset="0"/>
+              </a:rPr>
+              <a:t>commit</a:t>
+            </a:r>
+            <a:r>
+              <a:rPr lang="nl-BE" dirty="0" smtClean="0">
+                <a:latin typeface="Courier New" pitchFamily="49" charset="0"/>
+                <a:cs typeface="Courier New" pitchFamily="49" charset="0"/>
+              </a:rPr>
+              <a:t>  -a  -m '</a:t>
+            </a:r>
+            <a:r>
+              <a:rPr lang="nl-BE" dirty="0" err="1" smtClean="0">
+                <a:latin typeface="Courier New" pitchFamily="49" charset="0"/>
+                <a:cs typeface="Courier New" pitchFamily="49" charset="0"/>
+              </a:rPr>
+              <a:t>Fixed</a:t>
+            </a:r>
+            <a:r>
+              <a:rPr lang="nl-BE" dirty="0" smtClean="0">
+                <a:latin typeface="Courier New" pitchFamily="49" charset="0"/>
+                <a:cs typeface="Courier New" pitchFamily="49" charset="0"/>
+              </a:rPr>
+              <a:t> x/0 bug'</a:t>
+            </a:r>
+            <a:endParaRPr lang="nl-BE" dirty="0" smtClean="0">
+              <a:latin typeface="Courier New" pitchFamily="49" charset="0"/>
+              <a:cs typeface="Courier New" pitchFamily="49" charset="0"/>
+            </a:endParaRPr>
+          </a:p>
+        </p:txBody>
+      </p:sp>
+      <p:sp>
+        <p:nvSpPr>
+          <p:cNvPr id="5" name="TextBox 4"/>
+          <p:cNvSpPr txBox="1"/>
+          <p:nvPr/>
+        </p:nvSpPr>
+        <p:spPr>
+          <a:xfrm>
+            <a:off x="1259632" y="3789040"/>
+            <a:ext cx="5904656" cy="369332"/>
+          </a:xfrm>
+          <a:prstGeom prst="rect">
+            <a:avLst/>
+          </a:prstGeom>
+          <a:noFill/>
+          <a:ln>
+            <a:solidFill>
+              <a:schemeClr val="tx1"/>
+            </a:solidFill>
+          </a:ln>
+        </p:spPr>
+        <p:txBody>
+          <a:bodyPr wrap="square" rtlCol="0">
+            <a:spAutoFit/>
+          </a:bodyPr>
+          <a:lstStyle/>
+          <a:p>
+            <a:r>
+              <a:rPr lang="nl-BE" dirty="0" smtClean="0">
+                <a:latin typeface="Courier New" pitchFamily="49" charset="0"/>
+                <a:cs typeface="Courier New" pitchFamily="49" charset="0"/>
+              </a:rPr>
+              <a:t>$ git </a:t>
+            </a:r>
+            <a:r>
+              <a:rPr lang="nl-BE" dirty="0" err="1" smtClean="0">
+                <a:latin typeface="Courier New" pitchFamily="49" charset="0"/>
+                <a:cs typeface="Courier New" pitchFamily="49" charset="0"/>
+              </a:rPr>
+              <a:t>checkout</a:t>
+            </a:r>
+            <a:r>
+              <a:rPr lang="nl-BE" dirty="0" smtClean="0">
+                <a:latin typeface="Courier New" pitchFamily="49" charset="0"/>
+                <a:cs typeface="Courier New" pitchFamily="49" charset="0"/>
+              </a:rPr>
+              <a:t>  -b  feature/</a:t>
+            </a:r>
+            <a:r>
+              <a:rPr lang="nl-BE" dirty="0" err="1" smtClean="0">
+                <a:latin typeface="Courier New" pitchFamily="49" charset="0"/>
+                <a:cs typeface="Courier New" pitchFamily="49" charset="0"/>
+              </a:rPr>
+              <a:t>optimization</a:t>
+            </a:r>
+            <a:endParaRPr lang="nl-BE" dirty="0" smtClean="0">
+              <a:latin typeface="Courier New" pitchFamily="49" charset="0"/>
+              <a:cs typeface="Courier New" pitchFamily="49" charset="0"/>
+            </a:endParaRPr>
           </a:p>
         </p:txBody>
       </p:sp>
     </p:spTree>
     <p:extLst>
       <p:ext uri="{BB962C8B-B14F-4D97-AF65-F5344CB8AC3E}">
-        <p14:creationId xmlns:p14="http://schemas.microsoft.com/office/powerpoint/2010/main" val="2688556715"/>
+        <p14:creationId xmlns:p14="http://schemas.microsoft.com/office/powerpoint/2010/main" val="3459632536"/>
       </p:ext>
     </p:extLst>
   </p:cSld>
@@ -27946,9 +28095,111 @@
   <p:timing>
     <p:tnLst>
       <p:par>
-        <p:cTn id="1" dur="indefinite" restart="never" nodeType="tmRoot"/>
+        <p:cTn id="1" dur="indefinite" restart="never" nodeType="tmRoot">
+          <p:childTnLst>
+            <p:seq concurrent="1" nextAc="seek">
+              <p:cTn id="2" dur="indefinite" nodeType="mainSeq">
+                <p:childTnLst>
+                  <p:par>
+                    <p:cTn id="3" fill="hold">
+                      <p:stCondLst>
+                        <p:cond delay="indefinite"/>
+                        <p:cond evt="onBegin" delay="0">
+                          <p:tn val="2"/>
+                        </p:cond>
+                      </p:stCondLst>
+                      <p:childTnLst>
+                        <p:par>
+                          <p:cTn id="4" fill="hold">
+                            <p:stCondLst>
+                              <p:cond delay="0"/>
+                            </p:stCondLst>
+                            <p:childTnLst>
+                              <p:par>
+                                <p:cTn id="5" presetID="1" presetClass="entr" presetSubtype="0" fill="hold" grpId="0" nodeType="withEffect">
+                                  <p:stCondLst>
+                                    <p:cond delay="0"/>
+                                  </p:stCondLst>
+                                  <p:childTnLst>
+                                    <p:set>
+                                      <p:cBhvr>
+                                        <p:cTn id="6" dur="1" fill="hold">
+                                          <p:stCondLst>
+                                            <p:cond delay="0"/>
+                                          </p:stCondLst>
+                                        </p:cTn>
+                                        <p:tgtEl>
+                                          <p:spTgt spid="4"/>
+                                        </p:tgtEl>
+                                        <p:attrNameLst>
+                                          <p:attrName>style.visibility</p:attrName>
+                                        </p:attrNameLst>
+                                      </p:cBhvr>
+                                      <p:to>
+                                        <p:strVal val="visible"/>
+                                      </p:to>
+                                    </p:set>
+                                  </p:childTnLst>
+                                </p:cTn>
+                              </p:par>
+                              <p:par>
+                                <p:cTn id="7" presetID="1" presetClass="entr" presetSubtype="0" fill="hold" grpId="0" nodeType="withEffect">
+                                  <p:stCondLst>
+                                    <p:cond delay="0"/>
+                                  </p:stCondLst>
+                                  <p:childTnLst>
+                                    <p:set>
+                                      <p:cBhvr>
+                                        <p:cTn id="8" dur="1" fill="hold">
+                                          <p:stCondLst>
+                                            <p:cond delay="0"/>
+                                          </p:stCondLst>
+                                        </p:cTn>
+                                        <p:tgtEl>
+                                          <p:spTgt spid="5"/>
+                                        </p:tgtEl>
+                                        <p:attrNameLst>
+                                          <p:attrName>style.visibility</p:attrName>
+                                        </p:attrNameLst>
+                                      </p:cBhvr>
+                                      <p:to>
+                                        <p:strVal val="visible"/>
+                                      </p:to>
+                                    </p:set>
+                                  </p:childTnLst>
+                                </p:cTn>
+                              </p:par>
+                            </p:childTnLst>
+                          </p:cTn>
+                        </p:par>
+                      </p:childTnLst>
+                    </p:cTn>
+                  </p:par>
+                </p:childTnLst>
+              </p:cTn>
+              <p:prevCondLst>
+                <p:cond evt="onPrev" delay="0">
+                  <p:tgtEl>
+                    <p:sldTgt/>
+                  </p:tgtEl>
+                </p:cond>
+              </p:prevCondLst>
+              <p:nextCondLst>
+                <p:cond evt="onNext" delay="0">
+                  <p:tgtEl>
+                    <p:sldTgt/>
+                  </p:tgtEl>
+                </p:cond>
+              </p:nextCondLst>
+            </p:seq>
+          </p:childTnLst>
+        </p:cTn>
       </p:par>
     </p:tnLst>
+    <p:bldLst>
+      <p:bldP spid="4" grpId="0" animBg="1"/>
+      <p:bldP spid="5" grpId="0" animBg="1"/>
+    </p:bldLst>
   </p:timing>
 </p:sld>
 </file>
@@ -27986,155 +28237,36 @@
           <a:lstStyle/>
           <a:p>
             <a:r>
-              <a:rPr lang="en-US" dirty="0" err="1"/>
-              <a:t>g</a:t>
-            </a:r>
-            <a:r>
-              <a:rPr lang="en-US" dirty="0" err="1" smtClean="0"/>
-              <a:t>it</a:t>
-            </a:r>
-            <a:r>
               <a:rPr lang="en-US" dirty="0" smtClean="0"/>
-              <a:t>: the movie</a:t>
-            </a:r>
-            <a:endParaRPr lang="nl-BE" dirty="0"/>
+              <a:t>Getting More information</a:t>
+            </a:r>
+            <a:endParaRPr lang="en-US" dirty="0"/>
           </a:p>
         </p:txBody>
       </p:sp>
       <p:sp>
         <p:nvSpPr>
-          <p:cNvPr id="3" name="Content Placeholder 2"/>
+          <p:cNvPr id="3" name="Text Placeholder 2"/>
           <p:cNvSpPr>
             <a:spLocks noGrp="1"/>
           </p:cNvSpPr>
           <p:nvPr>
-            <p:ph idx="1"/>
+            <p:ph type="body" idx="1"/>
           </p:nvPr>
         </p:nvSpPr>
         <p:spPr/>
         <p:txBody>
-          <a:bodyPr>
-            <a:normAutofit fontScale="92500"/>
-          </a:bodyPr>
+          <a:bodyPr/>
           <a:lstStyle/>
           <a:p>
-            <a:r>
-              <a:rPr lang="en-US" dirty="0" smtClean="0"/>
-              <a:t>Online documentation (including movies)</a:t>
-            </a:r>
-          </a:p>
-          <a:p>
-            <a:pPr lvl="1"/>
-            <a:r>
-              <a:rPr lang="nl-BE" dirty="0" smtClean="0">
-                <a:hlinkClick r:id="rId2"/>
-              </a:rPr>
-              <a:t>http://git-scm.com/documentation</a:t>
-            </a:r>
-            <a:endParaRPr lang="nl-BE" dirty="0" smtClean="0"/>
-          </a:p>
-          <a:p>
-            <a:r>
-              <a:rPr lang="en-US" dirty="0" err="1"/>
-              <a:t>g</a:t>
-            </a:r>
-            <a:r>
-              <a:rPr lang="en-US" dirty="0" err="1" smtClean="0"/>
-              <a:t>it</a:t>
-            </a:r>
-            <a:r>
-              <a:rPr lang="en-US" dirty="0" smtClean="0"/>
-              <a:t> web site</a:t>
-            </a:r>
-          </a:p>
-          <a:p>
-            <a:pPr lvl="1"/>
-            <a:r>
-              <a:rPr lang="nl-BE" dirty="0" smtClean="0">
-                <a:hlinkClick r:id="rId3"/>
-              </a:rPr>
-              <a:t>http://git-scm.com/</a:t>
-            </a:r>
-            <a:endParaRPr lang="nl-BE" dirty="0" smtClean="0"/>
-          </a:p>
-          <a:p>
-            <a:r>
-              <a:rPr lang="en-US" dirty="0" smtClean="0"/>
-              <a:t>Why (the author thinks) you should switch to </a:t>
-            </a:r>
-            <a:r>
-              <a:rPr lang="en-US" dirty="0" err="1" smtClean="0"/>
-              <a:t>git</a:t>
-            </a:r>
-            <a:endParaRPr lang="en-US" dirty="0" smtClean="0"/>
-          </a:p>
-          <a:p>
-            <a:pPr lvl="1"/>
-            <a:r>
-              <a:rPr lang="nl-BE" dirty="0" smtClean="0">
-                <a:hlinkClick r:id="rId4"/>
-              </a:rPr>
-              <a:t>http://blog.teamtreehouse.com/why-you-should-switch-from-subversion-to-git</a:t>
-            </a:r>
-            <a:endParaRPr lang="nl-BE" dirty="0" smtClean="0"/>
-          </a:p>
-          <a:p>
-            <a:r>
-              <a:rPr lang="nl-BE" dirty="0" smtClean="0"/>
-              <a:t>An </a:t>
-            </a:r>
-            <a:r>
-              <a:rPr lang="nl-BE" dirty="0" err="1" smtClean="0"/>
-              <a:t>overview</a:t>
-            </a:r>
-            <a:r>
-              <a:rPr lang="nl-BE" dirty="0" smtClean="0"/>
-              <a:t> of </a:t>
-            </a:r>
-            <a:r>
-              <a:rPr lang="nl-BE" dirty="0" err="1" smtClean="0"/>
-              <a:t>frequently</a:t>
-            </a:r>
-            <a:r>
-              <a:rPr lang="nl-BE" dirty="0" smtClean="0"/>
-              <a:t> </a:t>
-            </a:r>
-            <a:r>
-              <a:rPr lang="nl-BE" dirty="0" err="1" smtClean="0"/>
-              <a:t>used</a:t>
-            </a:r>
-            <a:r>
-              <a:rPr lang="nl-BE" dirty="0" smtClean="0"/>
-              <a:t> git </a:t>
-            </a:r>
-            <a:r>
-              <a:rPr lang="nl-BE" dirty="0" err="1" smtClean="0"/>
-              <a:t>workflows</a:t>
-            </a:r>
-            <a:endParaRPr lang="nl-BE" dirty="0" smtClean="0"/>
-          </a:p>
-          <a:p>
-            <a:pPr lvl="1"/>
-            <a:r>
-              <a:rPr lang="en-US" dirty="0">
-                <a:hlinkClick r:id="rId5"/>
-              </a:rPr>
-              <a:t>https://</a:t>
-            </a:r>
-            <a:r>
-              <a:rPr lang="en-US" dirty="0" smtClean="0">
-                <a:hlinkClick r:id="rId5"/>
-              </a:rPr>
-              <a:t>www.atlassian.com/git/workflows</a:t>
-            </a:r>
-            <a:endParaRPr lang="nl-BE" dirty="0" smtClean="0"/>
+            <a:endParaRPr lang="en-US"/>
           </a:p>
         </p:txBody>
       </p:sp>
     </p:spTree>
     <p:extLst>
       <p:ext uri="{BB962C8B-B14F-4D97-AF65-F5344CB8AC3E}">
-        <p14:creationId xmlns:p14="http://schemas.microsoft.com/office/powerpoint/2010/main" val="2976133738"/>
+        <p14:creationId xmlns:p14="http://schemas.microsoft.com/office/powerpoint/2010/main" val="2688556715"/>
       </p:ext>
     </p:extLst>
   </p:cSld>
@@ -28184,6 +28316,204 @@
           <a:lstStyle/>
           <a:p>
             <a:r>
+              <a:rPr lang="en-US" dirty="0" err="1"/>
+              <a:t>g</a:t>
+            </a:r>
+            <a:r>
+              <a:rPr lang="en-US" dirty="0" err="1" smtClean="0"/>
+              <a:t>it</a:t>
+            </a:r>
+            <a:r>
+              <a:rPr lang="en-US" dirty="0" smtClean="0"/>
+              <a:t>: the movie</a:t>
+            </a:r>
+            <a:endParaRPr lang="nl-BE" dirty="0"/>
+          </a:p>
+        </p:txBody>
+      </p:sp>
+      <p:sp>
+        <p:nvSpPr>
+          <p:cNvPr id="3" name="Content Placeholder 2"/>
+          <p:cNvSpPr>
+            <a:spLocks noGrp="1"/>
+          </p:cNvSpPr>
+          <p:nvPr>
+            <p:ph idx="1"/>
+          </p:nvPr>
+        </p:nvSpPr>
+        <p:spPr/>
+        <p:txBody>
+          <a:bodyPr>
+            <a:normAutofit fontScale="92500"/>
+          </a:bodyPr>
+          <a:lstStyle/>
+          <a:p>
+            <a:r>
+              <a:rPr lang="en-US" dirty="0" smtClean="0"/>
+              <a:t>Online documentation (including movies)</a:t>
+            </a:r>
+          </a:p>
+          <a:p>
+            <a:pPr lvl="1"/>
+            <a:r>
+              <a:rPr lang="nl-BE" dirty="0" smtClean="0">
+                <a:hlinkClick r:id="rId2"/>
+              </a:rPr>
+              <a:t>http://git-scm.com/documentation</a:t>
+            </a:r>
+            <a:endParaRPr lang="nl-BE" dirty="0" smtClean="0"/>
+          </a:p>
+          <a:p>
+            <a:r>
+              <a:rPr lang="en-US" dirty="0" err="1"/>
+              <a:t>g</a:t>
+            </a:r>
+            <a:r>
+              <a:rPr lang="en-US" dirty="0" err="1" smtClean="0"/>
+              <a:t>it</a:t>
+            </a:r>
+            <a:r>
+              <a:rPr lang="en-US" dirty="0" smtClean="0"/>
+              <a:t> web site</a:t>
+            </a:r>
+          </a:p>
+          <a:p>
+            <a:pPr lvl="1"/>
+            <a:r>
+              <a:rPr lang="nl-BE" dirty="0" smtClean="0">
+                <a:hlinkClick r:id="rId3"/>
+              </a:rPr>
+              <a:t>http://git-scm.com/</a:t>
+            </a:r>
+            <a:endParaRPr lang="nl-BE" dirty="0" smtClean="0"/>
+          </a:p>
+          <a:p>
+            <a:r>
+              <a:rPr lang="en-US" dirty="0" smtClean="0"/>
+              <a:t>Why (the author thinks) you should switch to </a:t>
+            </a:r>
+            <a:r>
+              <a:rPr lang="en-US" dirty="0" err="1" smtClean="0"/>
+              <a:t>git</a:t>
+            </a:r>
+            <a:endParaRPr lang="en-US" dirty="0" smtClean="0"/>
+          </a:p>
+          <a:p>
+            <a:pPr lvl="1"/>
+            <a:r>
+              <a:rPr lang="nl-BE" dirty="0" smtClean="0">
+                <a:hlinkClick r:id="rId4"/>
+              </a:rPr>
+              <a:t>http://blog.teamtreehouse.com/why-you-should-switch-from-subversion-to-git</a:t>
+            </a:r>
+            <a:endParaRPr lang="nl-BE" dirty="0" smtClean="0"/>
+          </a:p>
+          <a:p>
+            <a:r>
+              <a:rPr lang="nl-BE" dirty="0" smtClean="0"/>
+              <a:t>An </a:t>
+            </a:r>
+            <a:r>
+              <a:rPr lang="nl-BE" dirty="0" err="1" smtClean="0"/>
+              <a:t>overview</a:t>
+            </a:r>
+            <a:r>
+              <a:rPr lang="nl-BE" dirty="0" smtClean="0"/>
+              <a:t> of </a:t>
+            </a:r>
+            <a:r>
+              <a:rPr lang="nl-BE" dirty="0" err="1" smtClean="0"/>
+              <a:t>frequently</a:t>
+            </a:r>
+            <a:r>
+              <a:rPr lang="nl-BE" dirty="0" smtClean="0"/>
+              <a:t> </a:t>
+            </a:r>
+            <a:r>
+              <a:rPr lang="nl-BE" dirty="0" err="1" smtClean="0"/>
+              <a:t>used</a:t>
+            </a:r>
+            <a:r>
+              <a:rPr lang="nl-BE" dirty="0" smtClean="0"/>
+              <a:t> git </a:t>
+            </a:r>
+            <a:r>
+              <a:rPr lang="nl-BE" dirty="0" err="1" smtClean="0"/>
+              <a:t>workflows</a:t>
+            </a:r>
+            <a:endParaRPr lang="nl-BE" dirty="0" smtClean="0"/>
+          </a:p>
+          <a:p>
+            <a:pPr lvl="1"/>
+            <a:r>
+              <a:rPr lang="en-US" dirty="0">
+                <a:hlinkClick r:id="rId5"/>
+              </a:rPr>
+              <a:t>https://</a:t>
+            </a:r>
+            <a:r>
+              <a:rPr lang="en-US" dirty="0" smtClean="0">
+                <a:hlinkClick r:id="rId5"/>
+              </a:rPr>
+              <a:t>www.atlassian.com/git/workflows</a:t>
+            </a:r>
+            <a:endParaRPr lang="nl-BE" dirty="0" smtClean="0"/>
+          </a:p>
+        </p:txBody>
+      </p:sp>
+    </p:spTree>
+    <p:extLst>
+      <p:ext uri="{BB962C8B-B14F-4D97-AF65-F5344CB8AC3E}">
+        <p14:creationId xmlns:p14="http://schemas.microsoft.com/office/powerpoint/2010/main" val="2976133738"/>
+      </p:ext>
+    </p:extLst>
+  </p:cSld>
+  <p:clrMapOvr>
+    <a:masterClrMapping/>
+  </p:clrMapOvr>
+  <p:timing>
+    <p:tnLst>
+      <p:par>
+        <p:cTn id="1" dur="indefinite" restart="never" nodeType="tmRoot"/>
+      </p:par>
+    </p:tnLst>
+  </p:timing>
+</p:sld>
+</file>
+
+<file path=ppt/slides/slide47.xml><?xml version="1.0" encoding="utf-8"?>
+<p:sld xmlns:a="http://schemas.openxmlformats.org/drawingml/2006/main" xmlns:r="http://schemas.openxmlformats.org/officeDocument/2006/relationships" xmlns:p="http://schemas.openxmlformats.org/presentationml/2006/main">
+  <p:cSld>
+    <p:spTree>
+      <p:nvGrpSpPr>
+        <p:cNvPr id="1" name=""/>
+        <p:cNvGrpSpPr/>
+        <p:nvPr/>
+      </p:nvGrpSpPr>
+      <p:grpSpPr>
+        <a:xfrm>
+          <a:off x="0" y="0"/>
+          <a:ext cx="0" cy="0"/>
+          <a:chOff x="0" y="0"/>
+          <a:chExt cx="0" cy="0"/>
+        </a:xfrm>
+      </p:grpSpPr>
+      <p:sp>
+        <p:nvSpPr>
+          <p:cNvPr id="2" name="Title 1"/>
+          <p:cNvSpPr>
+            <a:spLocks noGrp="1"/>
+          </p:cNvSpPr>
+          <p:nvPr>
+            <p:ph type="title"/>
+          </p:nvPr>
+        </p:nvSpPr>
+        <p:spPr/>
+        <p:txBody>
+          <a:bodyPr/>
+          <a:lstStyle/>
+          <a:p>
+            <a:r>
               <a:rPr lang="en-US" dirty="0" smtClean="0"/>
               <a:t>Conclusions</a:t>
             </a:r>
@@ -28230,7 +28560,7 @@
 </p:sld>
 </file>
 
-<file path=ppt/slides/slide47.xml><?xml version="1.0" encoding="utf-8"?>
+<file path=ppt/slides/slide48.xml><?xml version="1.0" encoding="utf-8"?>
 <p:sld xmlns:a="http://schemas.openxmlformats.org/drawingml/2006/main" xmlns:r="http://schemas.openxmlformats.org/officeDocument/2006/relationships" xmlns:p="http://schemas.openxmlformats.org/presentationml/2006/main">
   <p:cSld>
     <p:spTree>

</xml_diff>

<commit_message>
Added slide on revision history
</commit_message>
<xml_diff>
--- a/LinuxTools/VersionControl/version_control_git.pptx
+++ b/LinuxTools/VersionControl/version_control_git.pptx
@@ -26,33 +26,34 @@
     <p:sldId id="261" r:id="rId20"/>
     <p:sldId id="280" r:id="rId21"/>
     <p:sldId id="302" r:id="rId22"/>
-    <p:sldId id="262" r:id="rId23"/>
-    <p:sldId id="260" r:id="rId24"/>
-    <p:sldId id="278" r:id="rId25"/>
-    <p:sldId id="279" r:id="rId26"/>
-    <p:sldId id="303" r:id="rId27"/>
-    <p:sldId id="281" r:id="rId28"/>
-    <p:sldId id="282" r:id="rId29"/>
-    <p:sldId id="296" r:id="rId30"/>
-    <p:sldId id="283" r:id="rId31"/>
-    <p:sldId id="295" r:id="rId32"/>
-    <p:sldId id="285" r:id="rId33"/>
-    <p:sldId id="284" r:id="rId34"/>
-    <p:sldId id="286" r:id="rId35"/>
-    <p:sldId id="287" r:id="rId36"/>
-    <p:sldId id="288" r:id="rId37"/>
-    <p:sldId id="289" r:id="rId38"/>
-    <p:sldId id="290" r:id="rId39"/>
-    <p:sldId id="291" r:id="rId40"/>
-    <p:sldId id="292" r:id="rId41"/>
-    <p:sldId id="294" r:id="rId42"/>
-    <p:sldId id="297" r:id="rId43"/>
-    <p:sldId id="304" r:id="rId44"/>
-    <p:sldId id="305" r:id="rId45"/>
-    <p:sldId id="298" r:id="rId46"/>
-    <p:sldId id="299" r:id="rId47"/>
-    <p:sldId id="300" r:id="rId48"/>
-    <p:sldId id="301" r:id="rId49"/>
+    <p:sldId id="306" r:id="rId23"/>
+    <p:sldId id="262" r:id="rId24"/>
+    <p:sldId id="260" r:id="rId25"/>
+    <p:sldId id="278" r:id="rId26"/>
+    <p:sldId id="279" r:id="rId27"/>
+    <p:sldId id="303" r:id="rId28"/>
+    <p:sldId id="281" r:id="rId29"/>
+    <p:sldId id="282" r:id="rId30"/>
+    <p:sldId id="296" r:id="rId31"/>
+    <p:sldId id="283" r:id="rId32"/>
+    <p:sldId id="295" r:id="rId33"/>
+    <p:sldId id="285" r:id="rId34"/>
+    <p:sldId id="284" r:id="rId35"/>
+    <p:sldId id="286" r:id="rId36"/>
+    <p:sldId id="287" r:id="rId37"/>
+    <p:sldId id="288" r:id="rId38"/>
+    <p:sldId id="289" r:id="rId39"/>
+    <p:sldId id="290" r:id="rId40"/>
+    <p:sldId id="291" r:id="rId41"/>
+    <p:sldId id="292" r:id="rId42"/>
+    <p:sldId id="294" r:id="rId43"/>
+    <p:sldId id="297" r:id="rId44"/>
+    <p:sldId id="304" r:id="rId45"/>
+    <p:sldId id="305" r:id="rId46"/>
+    <p:sldId id="298" r:id="rId47"/>
+    <p:sldId id="299" r:id="rId48"/>
+    <p:sldId id="300" r:id="rId49"/>
+    <p:sldId id="301" r:id="rId50"/>
   </p:sldIdLst>
   <p:sldSz cx="9144000" cy="6858000" type="screen4x3"/>
   <p:notesSz cx="6858000" cy="9144000"/>
@@ -10166,6 +10167,1847 @@
           <a:chExt cx="0" cy="0"/>
         </a:xfrm>
       </p:grpSpPr>
+      <p:grpSp>
+        <p:nvGrpSpPr>
+          <p:cNvPr id="6" name="Group 5"/>
+          <p:cNvGrpSpPr/>
+          <p:nvPr/>
+        </p:nvGrpSpPr>
+        <p:grpSpPr>
+          <a:xfrm>
+            <a:off x="683568" y="3534521"/>
+            <a:ext cx="1669876" cy="1674354"/>
+            <a:chOff x="683568" y="3534521"/>
+            <a:chExt cx="1669876" cy="1674354"/>
+          </a:xfrm>
+        </p:grpSpPr>
+        <p:sp>
+          <p:nvSpPr>
+            <p:cNvPr id="78" name="TextBox 77"/>
+            <p:cNvSpPr txBox="1"/>
+            <p:nvPr/>
+          </p:nvSpPr>
+          <p:spPr>
+            <a:xfrm>
+              <a:off x="1345332" y="4839543"/>
+              <a:ext cx="381836" cy="369332"/>
+            </a:xfrm>
+            <a:prstGeom prst="rect">
+              <a:avLst/>
+            </a:prstGeom>
+            <a:noFill/>
+          </p:spPr>
+          <p:txBody>
+            <a:bodyPr wrap="none" rtlCol="0">
+              <a:spAutoFit/>
+            </a:bodyPr>
+            <a:lstStyle/>
+            <a:p>
+              <a:r>
+                <a:rPr lang="en-US" dirty="0" smtClean="0"/>
+                <a:t>r1</a:t>
+              </a:r>
+              <a:endParaRPr lang="nl-BE" dirty="0"/>
+            </a:p>
+          </p:txBody>
+        </p:sp>
+        <p:grpSp>
+          <p:nvGrpSpPr>
+            <p:cNvPr id="5" name="Group 4"/>
+            <p:cNvGrpSpPr/>
+            <p:nvPr/>
+          </p:nvGrpSpPr>
+          <p:grpSpPr>
+            <a:xfrm>
+              <a:off x="683568" y="3534521"/>
+              <a:ext cx="1669876" cy="1080120"/>
+              <a:chOff x="683568" y="3534521"/>
+              <a:chExt cx="1669876" cy="1080120"/>
+            </a:xfrm>
+          </p:grpSpPr>
+          <p:sp>
+            <p:nvSpPr>
+              <p:cNvPr id="96" name="Rounded Rectangle 95"/>
+              <p:cNvSpPr/>
+              <p:nvPr/>
+            </p:nvSpPr>
+            <p:spPr>
+              <a:xfrm>
+                <a:off x="683568" y="3534521"/>
+                <a:ext cx="1669876" cy="1080120"/>
+              </a:xfrm>
+              <a:prstGeom prst="roundRect">
+                <a:avLst/>
+              </a:prstGeom>
+              <a:solidFill>
+                <a:schemeClr val="bg1"/>
+              </a:solidFill>
+              <a:ln>
+                <a:solidFill>
+                  <a:schemeClr val="tx1"/>
+                </a:solidFill>
+              </a:ln>
+            </p:spPr>
+            <p:style>
+              <a:lnRef idx="2">
+                <a:schemeClr val="accent1">
+                  <a:shade val="50000"/>
+                </a:schemeClr>
+              </a:lnRef>
+              <a:fillRef idx="1">
+                <a:schemeClr val="accent1"/>
+              </a:fillRef>
+              <a:effectRef idx="0">
+                <a:schemeClr val="accent1"/>
+              </a:effectRef>
+              <a:fontRef idx="minor">
+                <a:schemeClr val="lt1"/>
+              </a:fontRef>
+            </p:style>
+            <p:txBody>
+              <a:bodyPr rtlCol="0" anchor="ctr"/>
+              <a:lstStyle/>
+              <a:p>
+                <a:pPr algn="ctr"/>
+                <a:endParaRPr lang="nl-BE"/>
+              </a:p>
+            </p:txBody>
+          </p:sp>
+          <p:sp>
+            <p:nvSpPr>
+              <p:cNvPr id="102" name="TextBox 101"/>
+              <p:cNvSpPr txBox="1"/>
+              <p:nvPr/>
+            </p:nvSpPr>
+            <p:spPr>
+              <a:xfrm>
+                <a:off x="1129223" y="3542590"/>
+                <a:ext cx="741613" cy="276999"/>
+              </a:xfrm>
+              <a:prstGeom prst="rect">
+                <a:avLst/>
+              </a:prstGeom>
+              <a:noFill/>
+            </p:spPr>
+            <p:txBody>
+              <a:bodyPr wrap="none" rtlCol="0">
+                <a:spAutoFit/>
+              </a:bodyPr>
+              <a:lstStyle/>
+              <a:p>
+                <a:r>
+                  <a:rPr lang="en-US" sz="1200" dirty="0" smtClean="0"/>
+                  <a:t>Project 1</a:t>
+                </a:r>
+                <a:endParaRPr lang="nl-BE" sz="1200" dirty="0"/>
+              </a:p>
+            </p:txBody>
+          </p:sp>
+        </p:grpSp>
+      </p:grpSp>
+      <p:sp>
+        <p:nvSpPr>
+          <p:cNvPr id="2" name="Title 1"/>
+          <p:cNvSpPr>
+            <a:spLocks noGrp="1"/>
+          </p:cNvSpPr>
+          <p:nvPr>
+            <p:ph type="title"/>
+          </p:nvPr>
+        </p:nvSpPr>
+        <p:spPr/>
+        <p:txBody>
+          <a:bodyPr>
+            <a:normAutofit/>
+          </a:bodyPr>
+          <a:lstStyle/>
+          <a:p>
+            <a:r>
+              <a:rPr lang="en-US" dirty="0" smtClean="0"/>
+              <a:t>And meanwhile in the repository…</a:t>
+            </a:r>
+            <a:endParaRPr lang="nl-BE" dirty="0"/>
+          </a:p>
+        </p:txBody>
+      </p:sp>
+      <p:sp>
+        <p:nvSpPr>
+          <p:cNvPr id="3" name="Content Placeholder 2"/>
+          <p:cNvSpPr>
+            <a:spLocks noGrp="1"/>
+          </p:cNvSpPr>
+          <p:nvPr>
+            <p:ph idx="1"/>
+          </p:nvPr>
+        </p:nvSpPr>
+        <p:spPr>
+          <a:xfrm>
+            <a:off x="457200" y="1600201"/>
+            <a:ext cx="8229600" cy="1252735"/>
+          </a:xfrm>
+        </p:spPr>
+        <p:txBody>
+          <a:bodyPr/>
+          <a:lstStyle/>
+          <a:p>
+            <a:r>
+              <a:rPr lang="en-US" sz="2800" dirty="0" smtClean="0"/>
+              <a:t>Each commit </a:t>
+            </a:r>
+            <a:r>
+              <a:rPr lang="en-US" sz="2800" dirty="0" smtClean="0"/>
+              <a:t>generates new revision, </a:t>
+            </a:r>
+            <a:r>
+              <a:rPr lang="en-US" sz="2800" i="1" dirty="0" smtClean="0"/>
+              <a:t>single revision number for everything in </a:t>
+            </a:r>
+            <a:r>
+              <a:rPr lang="en-US" sz="2800" i="1" dirty="0" smtClean="0"/>
+              <a:t>repository</a:t>
+            </a:r>
+            <a:r>
+              <a:rPr lang="en-US" sz="2800" dirty="0" smtClean="0"/>
+              <a:t> at any given time</a:t>
+            </a:r>
+            <a:endParaRPr lang="en-US" sz="2800" dirty="0" smtClean="0"/>
+          </a:p>
+          <a:p>
+            <a:pPr lvl="1"/>
+            <a:endParaRPr lang="nl-BE" dirty="0"/>
+          </a:p>
+        </p:txBody>
+      </p:sp>
+      <p:grpSp>
+        <p:nvGrpSpPr>
+          <p:cNvPr id="99" name="Group 98"/>
+          <p:cNvGrpSpPr/>
+          <p:nvPr/>
+        </p:nvGrpSpPr>
+        <p:grpSpPr>
+          <a:xfrm>
+            <a:off x="1705372" y="5559623"/>
+            <a:ext cx="1296144" cy="461665"/>
+            <a:chOff x="3491880" y="6381328"/>
+            <a:chExt cx="1296144" cy="461665"/>
+          </a:xfrm>
+        </p:grpSpPr>
+        <p:cxnSp>
+          <p:nvCxnSpPr>
+            <p:cNvPr id="97" name="Straight Arrow Connector 96"/>
+            <p:cNvCxnSpPr/>
+            <p:nvPr/>
+          </p:nvCxnSpPr>
+          <p:spPr>
+            <a:xfrm>
+              <a:off x="3491880" y="6381328"/>
+              <a:ext cx="1296144" cy="1588"/>
+            </a:xfrm>
+            <a:prstGeom prst="straightConnector1">
+              <a:avLst/>
+            </a:prstGeom>
+            <a:ln w="63500">
+              <a:solidFill>
+                <a:schemeClr val="tx1"/>
+              </a:solidFill>
+              <a:tailEnd type="stealth" w="lg" len="lg"/>
+            </a:ln>
+          </p:spPr>
+          <p:style>
+            <a:lnRef idx="1">
+              <a:schemeClr val="accent1"/>
+            </a:lnRef>
+            <a:fillRef idx="0">
+              <a:schemeClr val="accent1"/>
+            </a:fillRef>
+            <a:effectRef idx="0">
+              <a:schemeClr val="accent1"/>
+            </a:effectRef>
+            <a:fontRef idx="minor">
+              <a:schemeClr val="tx1"/>
+            </a:fontRef>
+          </p:style>
+        </p:cxnSp>
+        <p:sp>
+          <p:nvSpPr>
+            <p:cNvPr id="98" name="TextBox 97"/>
+            <p:cNvSpPr txBox="1"/>
+            <p:nvPr/>
+          </p:nvSpPr>
+          <p:spPr>
+            <a:xfrm>
+              <a:off x="3707904" y="6381328"/>
+              <a:ext cx="756938" cy="461665"/>
+            </a:xfrm>
+            <a:prstGeom prst="rect">
+              <a:avLst/>
+            </a:prstGeom>
+            <a:noFill/>
+          </p:spPr>
+          <p:txBody>
+            <a:bodyPr wrap="none" rtlCol="0">
+              <a:spAutoFit/>
+            </a:bodyPr>
+            <a:lstStyle/>
+            <a:p>
+              <a:r>
+                <a:rPr lang="en-US" sz="2400" dirty="0" smtClean="0"/>
+                <a:t>time</a:t>
+              </a:r>
+              <a:endParaRPr lang="nl-BE" sz="2400" dirty="0"/>
+            </a:p>
+          </p:txBody>
+        </p:sp>
+      </p:grpSp>
+      <p:grpSp>
+        <p:nvGrpSpPr>
+          <p:cNvPr id="7" name="Group 6"/>
+          <p:cNvGrpSpPr/>
+          <p:nvPr/>
+        </p:nvGrpSpPr>
+        <p:grpSpPr>
+          <a:xfrm>
+            <a:off x="856314" y="3750545"/>
+            <a:ext cx="577644" cy="541772"/>
+            <a:chOff x="856314" y="3750545"/>
+            <a:chExt cx="577644" cy="541772"/>
+          </a:xfrm>
+        </p:grpSpPr>
+        <p:pic>
+          <p:nvPicPr>
+            <p:cNvPr id="100" name="Picture 2" descr="C:\Users\u0065575\AppData\Local\Microsoft\Windows\Temporary Internet Files\Content.IE5\WBWRXN3O\MC900432599[1].png"/>
+            <p:cNvPicPr>
+              <a:picLocks noChangeAspect="1" noChangeArrowheads="1"/>
+            </p:cNvPicPr>
+            <p:nvPr/>
+          </p:nvPicPr>
+          <p:blipFill>
+            <a:blip r:embed="rId2" cstate="print">
+              <a:duotone>
+                <a:prstClr val="black"/>
+                <a:schemeClr val="accent5">
+                  <a:tint val="45000"/>
+                  <a:satMod val="400000"/>
+                </a:schemeClr>
+              </a:duotone>
+            </a:blip>
+            <a:srcRect/>
+            <a:stretch>
+              <a:fillRect/>
+            </a:stretch>
+          </p:blipFill>
+          <p:spPr bwMode="auto">
+            <a:xfrm>
+              <a:off x="856314" y="3750545"/>
+              <a:ext cx="455776" cy="427472"/>
+            </a:xfrm>
+            <a:prstGeom prst="rect">
+              <a:avLst/>
+            </a:prstGeom>
+            <a:noFill/>
+            <a:effectLst>
+              <a:innerShdw blurRad="63500" dist="50800" dir="2700000">
+                <a:prstClr val="black">
+                  <a:alpha val="50000"/>
+                </a:prstClr>
+              </a:innerShdw>
+            </a:effectLst>
+          </p:spPr>
+        </p:pic>
+        <p:pic>
+          <p:nvPicPr>
+            <p:cNvPr id="101" name="Picture 2" descr="C:\Users\u0065575\AppData\Local\Microsoft\Windows\Temporary Internet Files\Content.IE5\WBWRXN3O\MC900432599[1].png"/>
+            <p:cNvPicPr>
+              <a:picLocks noChangeAspect="1" noChangeArrowheads="1"/>
+            </p:cNvPicPr>
+            <p:nvPr/>
+          </p:nvPicPr>
+          <p:blipFill>
+            <a:blip r:embed="rId2" cstate="print">
+              <a:duotone>
+                <a:prstClr val="black"/>
+                <a:schemeClr val="accent5">
+                  <a:tint val="45000"/>
+                  <a:satMod val="400000"/>
+                </a:schemeClr>
+              </a:duotone>
+            </a:blip>
+            <a:srcRect/>
+            <a:stretch>
+              <a:fillRect/>
+            </a:stretch>
+          </p:blipFill>
+          <p:spPr bwMode="auto">
+            <a:xfrm>
+              <a:off x="978182" y="3864845"/>
+              <a:ext cx="455776" cy="427472"/>
+            </a:xfrm>
+            <a:prstGeom prst="rect">
+              <a:avLst/>
+            </a:prstGeom>
+            <a:noFill/>
+            <a:effectLst>
+              <a:innerShdw blurRad="63500" dist="50800" dir="2700000">
+                <a:prstClr val="black">
+                  <a:alpha val="50000"/>
+                </a:prstClr>
+              </a:innerShdw>
+            </a:effectLst>
+          </p:spPr>
+        </p:pic>
+      </p:grpSp>
+      <p:grpSp>
+        <p:nvGrpSpPr>
+          <p:cNvPr id="14" name="Group 13"/>
+          <p:cNvGrpSpPr/>
+          <p:nvPr/>
+        </p:nvGrpSpPr>
+        <p:grpSpPr>
+          <a:xfrm>
+            <a:off x="6076168" y="3039343"/>
+            <a:ext cx="2253940" cy="2169532"/>
+            <a:chOff x="6076168" y="3039343"/>
+            <a:chExt cx="2253940" cy="2169532"/>
+          </a:xfrm>
+        </p:grpSpPr>
+        <p:grpSp>
+          <p:nvGrpSpPr>
+            <p:cNvPr id="13" name="Group 12"/>
+            <p:cNvGrpSpPr/>
+            <p:nvPr/>
+          </p:nvGrpSpPr>
+          <p:grpSpPr>
+            <a:xfrm>
+              <a:off x="6076168" y="3039343"/>
+              <a:ext cx="2253940" cy="2169532"/>
+              <a:chOff x="6076168" y="3039343"/>
+              <a:chExt cx="2253940" cy="2169532"/>
+            </a:xfrm>
+          </p:grpSpPr>
+          <p:grpSp>
+            <p:nvGrpSpPr>
+              <p:cNvPr id="133" name="Group 132"/>
+              <p:cNvGrpSpPr/>
+              <p:nvPr/>
+            </p:nvGrpSpPr>
+            <p:grpSpPr>
+              <a:xfrm>
+                <a:off x="6660232" y="3534107"/>
+                <a:ext cx="1669876" cy="1080120"/>
+                <a:chOff x="7164288" y="3645024"/>
+                <a:chExt cx="1669876" cy="1080120"/>
+              </a:xfrm>
+            </p:grpSpPr>
+            <p:sp>
+              <p:nvSpPr>
+                <p:cNvPr id="134" name="Rounded Rectangle 133"/>
+                <p:cNvSpPr/>
+                <p:nvPr/>
+              </p:nvSpPr>
+              <p:spPr>
+                <a:xfrm>
+                  <a:off x="7164288" y="3645024"/>
+                  <a:ext cx="1669876" cy="1080120"/>
+                </a:xfrm>
+                <a:prstGeom prst="roundRect">
+                  <a:avLst/>
+                </a:prstGeom>
+                <a:solidFill>
+                  <a:schemeClr val="bg1"/>
+                </a:solidFill>
+                <a:ln>
+                  <a:solidFill>
+                    <a:schemeClr val="tx1"/>
+                  </a:solidFill>
+                </a:ln>
+              </p:spPr>
+              <p:style>
+                <a:lnRef idx="2">
+                  <a:schemeClr val="accent1">
+                    <a:shade val="50000"/>
+                  </a:schemeClr>
+                </a:lnRef>
+                <a:fillRef idx="1">
+                  <a:schemeClr val="accent1"/>
+                </a:fillRef>
+                <a:effectRef idx="0">
+                  <a:schemeClr val="accent1"/>
+                </a:effectRef>
+                <a:fontRef idx="minor">
+                  <a:schemeClr val="lt1"/>
+                </a:fontRef>
+              </p:style>
+              <p:txBody>
+                <a:bodyPr rtlCol="0" anchor="ctr"/>
+                <a:lstStyle/>
+                <a:p>
+                  <a:pPr algn="ctr"/>
+                  <a:endParaRPr lang="nl-BE"/>
+                </a:p>
+              </p:txBody>
+            </p:sp>
+            <p:pic>
+              <p:nvPicPr>
+                <p:cNvPr id="135" name="Picture 3" descr="C:\Users\u0065575\AppData\Local\Microsoft\Windows\Temporary Internet Files\Content.IE5\WOTZA2QG\MC900433853[1].png"/>
+                <p:cNvPicPr>
+                  <a:picLocks noChangeAspect="1" noChangeArrowheads="1"/>
+                </p:cNvPicPr>
+                <p:nvPr/>
+              </p:nvPicPr>
+              <p:blipFill>
+                <a:blip r:embed="rId3" cstate="print"/>
+                <a:srcRect/>
+                <a:stretch>
+                  <a:fillRect/>
+                </a:stretch>
+              </p:blipFill>
+              <p:spPr bwMode="auto">
+                <a:xfrm>
+                  <a:off x="7865029" y="3816194"/>
+                  <a:ext cx="623643" cy="584914"/>
+                </a:xfrm>
+                <a:prstGeom prst="rect">
+                  <a:avLst/>
+                </a:prstGeom>
+                <a:noFill/>
+              </p:spPr>
+            </p:pic>
+            <p:sp>
+              <p:nvSpPr>
+                <p:cNvPr id="136" name="TextBox 135"/>
+                <p:cNvSpPr txBox="1"/>
+                <p:nvPr/>
+              </p:nvSpPr>
+              <p:spPr>
+                <a:xfrm>
+                  <a:off x="7609943" y="3653093"/>
+                  <a:ext cx="741613" cy="276999"/>
+                </a:xfrm>
+                <a:prstGeom prst="rect">
+                  <a:avLst/>
+                </a:prstGeom>
+                <a:noFill/>
+              </p:spPr>
+              <p:txBody>
+                <a:bodyPr wrap="none" rtlCol="0">
+                  <a:spAutoFit/>
+                </a:bodyPr>
+                <a:lstStyle/>
+                <a:p>
+                  <a:r>
+                    <a:rPr lang="en-US" sz="1200" dirty="0" smtClean="0"/>
+                    <a:t>Project 1</a:t>
+                  </a:r>
+                  <a:endParaRPr lang="nl-BE" sz="1200" dirty="0"/>
+                </a:p>
+              </p:txBody>
+            </p:sp>
+          </p:grpSp>
+          <p:grpSp>
+            <p:nvGrpSpPr>
+              <p:cNvPr id="137" name="Group 136"/>
+              <p:cNvGrpSpPr/>
+              <p:nvPr/>
+            </p:nvGrpSpPr>
+            <p:grpSpPr>
+              <a:xfrm>
+                <a:off x="6076168" y="3039343"/>
+                <a:ext cx="1536089" cy="2169532"/>
+                <a:chOff x="4980127" y="2564904"/>
+                <a:chExt cx="1536089" cy="2169532"/>
+              </a:xfrm>
+            </p:grpSpPr>
+            <p:sp>
+              <p:nvSpPr>
+                <p:cNvPr id="138" name="TextBox 137"/>
+                <p:cNvSpPr txBox="1"/>
+                <p:nvPr/>
+              </p:nvSpPr>
+              <p:spPr>
+                <a:xfrm>
+                  <a:off x="6134380" y="4365104"/>
+                  <a:ext cx="381836" cy="369332"/>
+                </a:xfrm>
+                <a:prstGeom prst="rect">
+                  <a:avLst/>
+                </a:prstGeom>
+                <a:noFill/>
+              </p:spPr>
+              <p:txBody>
+                <a:bodyPr wrap="none" rtlCol="0">
+                  <a:spAutoFit/>
+                </a:bodyPr>
+                <a:lstStyle/>
+                <a:p>
+                  <a:r>
+                    <a:rPr lang="en-US" dirty="0" smtClean="0"/>
+                    <a:t>r4</a:t>
+                  </a:r>
+                  <a:endParaRPr lang="nl-BE" dirty="0"/>
+                </a:p>
+              </p:txBody>
+            </p:sp>
+            <p:grpSp>
+              <p:nvGrpSpPr>
+                <p:cNvPr id="139" name="Group 138"/>
+                <p:cNvGrpSpPr/>
+                <p:nvPr/>
+              </p:nvGrpSpPr>
+              <p:grpSpPr>
+                <a:xfrm>
+                  <a:off x="4980127" y="2564904"/>
+                  <a:ext cx="900889" cy="1798459"/>
+                  <a:chOff x="1525268" y="3214717"/>
+                  <a:chExt cx="900889" cy="1798459"/>
+                </a:xfrm>
+              </p:grpSpPr>
+              <p:cxnSp>
+                <p:nvCxnSpPr>
+                  <p:cNvPr id="140" name="Straight Connector 139"/>
+                  <p:cNvCxnSpPr/>
+                  <p:nvPr/>
+                </p:nvCxnSpPr>
+                <p:spPr>
+                  <a:xfrm>
+                    <a:off x="1951137" y="3284984"/>
+                    <a:ext cx="0" cy="1728192"/>
+                  </a:xfrm>
+                  <a:prstGeom prst="line">
+                    <a:avLst/>
+                  </a:prstGeom>
+                  <a:ln w="19050">
+                    <a:solidFill>
+                      <a:schemeClr val="tx1"/>
+                    </a:solidFill>
+                    <a:prstDash val="dash"/>
+                  </a:ln>
+                </p:spPr>
+                <p:style>
+                  <a:lnRef idx="1">
+                    <a:schemeClr val="accent1"/>
+                  </a:lnRef>
+                  <a:fillRef idx="0">
+                    <a:schemeClr val="accent1"/>
+                  </a:fillRef>
+                  <a:effectRef idx="0">
+                    <a:schemeClr val="accent1"/>
+                  </a:effectRef>
+                  <a:fontRef idx="minor">
+                    <a:schemeClr val="tx1"/>
+                  </a:fontRef>
+                </p:style>
+              </p:cxnSp>
+              <p:sp>
+                <p:nvSpPr>
+                  <p:cNvPr id="141" name="TextBox 140"/>
+                  <p:cNvSpPr txBox="1"/>
+                  <p:nvPr/>
+                </p:nvSpPr>
+                <p:spPr>
+                  <a:xfrm>
+                    <a:off x="1525268" y="3214717"/>
+                    <a:ext cx="900889" cy="369332"/>
+                  </a:xfrm>
+                  <a:prstGeom prst="rect">
+                    <a:avLst/>
+                  </a:prstGeom>
+                  <a:solidFill>
+                    <a:schemeClr val="bg1"/>
+                  </a:solidFill>
+                  <a:ln>
+                    <a:solidFill>
+                      <a:schemeClr val="tx1"/>
+                    </a:solidFill>
+                  </a:ln>
+                </p:spPr>
+                <p:txBody>
+                  <a:bodyPr wrap="none" rtlCol="0">
+                    <a:spAutoFit/>
+                  </a:bodyPr>
+                  <a:lstStyle/>
+                  <a:p>
+                    <a:pPr algn="ctr"/>
+                    <a:r>
+                      <a:rPr lang="en-US" dirty="0" smtClean="0"/>
+                      <a:t>commit</a:t>
+                    </a:r>
+                    <a:endParaRPr lang="en-US" dirty="0" smtClean="0"/>
+                  </a:p>
+                </p:txBody>
+              </p:sp>
+            </p:grpSp>
+          </p:grpSp>
+        </p:grpSp>
+        <p:pic>
+          <p:nvPicPr>
+            <p:cNvPr id="142" name="Picture 2" descr="C:\Users\u0065575\AppData\Local\Microsoft\Windows\Temporary Internet Files\Content.IE5\WBWRXN3O\MC900432599[1].png"/>
+            <p:cNvPicPr>
+              <a:picLocks noChangeAspect="1" noChangeArrowheads="1"/>
+            </p:cNvPicPr>
+            <p:nvPr/>
+          </p:nvPicPr>
+          <p:blipFill>
+            <a:blip r:embed="rId2" cstate="print"/>
+            <a:srcRect/>
+            <a:stretch>
+              <a:fillRect/>
+            </a:stretch>
+          </p:blipFill>
+          <p:spPr bwMode="auto">
+            <a:xfrm>
+              <a:off x="6794212" y="3759423"/>
+              <a:ext cx="455776" cy="427472"/>
+            </a:xfrm>
+            <a:prstGeom prst="rect">
+              <a:avLst/>
+            </a:prstGeom>
+            <a:noFill/>
+          </p:spPr>
+        </p:pic>
+      </p:grpSp>
+      <p:grpSp>
+        <p:nvGrpSpPr>
+          <p:cNvPr id="10" name="Group 9"/>
+          <p:cNvGrpSpPr/>
+          <p:nvPr/>
+        </p:nvGrpSpPr>
+        <p:grpSpPr>
+          <a:xfrm>
+            <a:off x="2123024" y="3039343"/>
+            <a:ext cx="2232952" cy="2169532"/>
+            <a:chOff x="2123024" y="3039343"/>
+            <a:chExt cx="2232952" cy="2169532"/>
+          </a:xfrm>
+        </p:grpSpPr>
+        <p:grpSp>
+          <p:nvGrpSpPr>
+            <p:cNvPr id="114" name="Group 113"/>
+            <p:cNvGrpSpPr/>
+            <p:nvPr/>
+          </p:nvGrpSpPr>
+          <p:grpSpPr>
+            <a:xfrm>
+              <a:off x="2123024" y="3039343"/>
+              <a:ext cx="1536089" cy="2169532"/>
+              <a:chOff x="4980127" y="2564904"/>
+              <a:chExt cx="1536089" cy="2169532"/>
+            </a:xfrm>
+          </p:grpSpPr>
+          <p:sp>
+            <p:nvSpPr>
+              <p:cNvPr id="81" name="TextBox 80"/>
+              <p:cNvSpPr txBox="1"/>
+              <p:nvPr/>
+            </p:nvSpPr>
+            <p:spPr>
+              <a:xfrm>
+                <a:off x="6134380" y="4365104"/>
+                <a:ext cx="381836" cy="369332"/>
+              </a:xfrm>
+              <a:prstGeom prst="rect">
+                <a:avLst/>
+              </a:prstGeom>
+              <a:noFill/>
+            </p:spPr>
+            <p:txBody>
+              <a:bodyPr wrap="none" rtlCol="0">
+                <a:spAutoFit/>
+              </a:bodyPr>
+              <a:lstStyle/>
+              <a:p>
+                <a:r>
+                  <a:rPr lang="en-US" dirty="0" smtClean="0"/>
+                  <a:t>r2</a:t>
+                </a:r>
+                <a:endParaRPr lang="nl-BE" dirty="0"/>
+              </a:p>
+            </p:txBody>
+          </p:sp>
+          <p:grpSp>
+            <p:nvGrpSpPr>
+              <p:cNvPr id="90" name="Group 89"/>
+              <p:cNvGrpSpPr/>
+              <p:nvPr/>
+            </p:nvGrpSpPr>
+            <p:grpSpPr>
+              <a:xfrm>
+                <a:off x="4980127" y="2564904"/>
+                <a:ext cx="900889" cy="1798459"/>
+                <a:chOff x="1525268" y="3214717"/>
+                <a:chExt cx="900889" cy="1798459"/>
+              </a:xfrm>
+            </p:grpSpPr>
+            <p:cxnSp>
+              <p:nvCxnSpPr>
+                <p:cNvPr id="91" name="Straight Connector 90"/>
+                <p:cNvCxnSpPr/>
+                <p:nvPr/>
+              </p:nvCxnSpPr>
+              <p:spPr>
+                <a:xfrm>
+                  <a:off x="1951137" y="3284984"/>
+                  <a:ext cx="0" cy="1728192"/>
+                </a:xfrm>
+                <a:prstGeom prst="line">
+                  <a:avLst/>
+                </a:prstGeom>
+                <a:ln w="19050">
+                  <a:solidFill>
+                    <a:schemeClr val="tx1"/>
+                  </a:solidFill>
+                  <a:prstDash val="dash"/>
+                </a:ln>
+              </p:spPr>
+              <p:style>
+                <a:lnRef idx="1">
+                  <a:schemeClr val="accent1"/>
+                </a:lnRef>
+                <a:fillRef idx="0">
+                  <a:schemeClr val="accent1"/>
+                </a:fillRef>
+                <a:effectRef idx="0">
+                  <a:schemeClr val="accent1"/>
+                </a:effectRef>
+                <a:fontRef idx="minor">
+                  <a:schemeClr val="tx1"/>
+                </a:fontRef>
+              </p:style>
+            </p:cxnSp>
+            <p:sp>
+              <p:nvSpPr>
+                <p:cNvPr id="92" name="TextBox 91"/>
+                <p:cNvSpPr txBox="1"/>
+                <p:nvPr/>
+              </p:nvSpPr>
+              <p:spPr>
+                <a:xfrm>
+                  <a:off x="1525268" y="3214717"/>
+                  <a:ext cx="900889" cy="369332"/>
+                </a:xfrm>
+                <a:prstGeom prst="rect">
+                  <a:avLst/>
+                </a:prstGeom>
+                <a:solidFill>
+                  <a:schemeClr val="bg1"/>
+                </a:solidFill>
+                <a:ln>
+                  <a:solidFill>
+                    <a:schemeClr val="tx1"/>
+                  </a:solidFill>
+                </a:ln>
+              </p:spPr>
+              <p:txBody>
+                <a:bodyPr wrap="none" rtlCol="0">
+                  <a:spAutoFit/>
+                </a:bodyPr>
+                <a:lstStyle/>
+                <a:p>
+                  <a:pPr algn="ctr"/>
+                  <a:r>
+                    <a:rPr lang="en-US" dirty="0" smtClean="0"/>
+                    <a:t>commit</a:t>
+                  </a:r>
+                  <a:endParaRPr lang="en-US" dirty="0" smtClean="0"/>
+                </a:p>
+              </p:txBody>
+            </p:sp>
+          </p:grpSp>
+        </p:grpSp>
+        <p:grpSp>
+          <p:nvGrpSpPr>
+            <p:cNvPr id="9" name="Group 8"/>
+            <p:cNvGrpSpPr/>
+            <p:nvPr/>
+          </p:nvGrpSpPr>
+          <p:grpSpPr>
+            <a:xfrm>
+              <a:off x="2686100" y="3532181"/>
+              <a:ext cx="1669876" cy="1080120"/>
+              <a:chOff x="2686100" y="3532181"/>
+              <a:chExt cx="1669876" cy="1080120"/>
+            </a:xfrm>
+          </p:grpSpPr>
+          <p:sp>
+            <p:nvSpPr>
+              <p:cNvPr id="116" name="Rounded Rectangle 115"/>
+              <p:cNvSpPr/>
+              <p:nvPr/>
+            </p:nvSpPr>
+            <p:spPr>
+              <a:xfrm>
+                <a:off x="2686100" y="3532181"/>
+                <a:ext cx="1669876" cy="1080120"/>
+              </a:xfrm>
+              <a:prstGeom prst="roundRect">
+                <a:avLst/>
+              </a:prstGeom>
+              <a:solidFill>
+                <a:schemeClr val="bg1"/>
+              </a:solidFill>
+              <a:ln>
+                <a:solidFill>
+                  <a:schemeClr val="tx1"/>
+                </a:solidFill>
+              </a:ln>
+            </p:spPr>
+            <p:style>
+              <a:lnRef idx="2">
+                <a:schemeClr val="accent1">
+                  <a:shade val="50000"/>
+                </a:schemeClr>
+              </a:lnRef>
+              <a:fillRef idx="1">
+                <a:schemeClr val="accent1"/>
+              </a:fillRef>
+              <a:effectRef idx="0">
+                <a:schemeClr val="accent1"/>
+              </a:effectRef>
+              <a:fontRef idx="minor">
+                <a:schemeClr val="lt1"/>
+              </a:fontRef>
+            </p:style>
+            <p:txBody>
+              <a:bodyPr rtlCol="0" anchor="ctr"/>
+              <a:lstStyle/>
+              <a:p>
+                <a:pPr algn="ctr"/>
+                <a:endParaRPr lang="nl-BE"/>
+              </a:p>
+            </p:txBody>
+          </p:sp>
+          <p:pic>
+            <p:nvPicPr>
+              <p:cNvPr id="117" name="Picture 2" descr="C:\Users\u0065575\AppData\Local\Microsoft\Windows\Temporary Internet Files\Content.IE5\WBWRXN3O\MC900432599[1].png"/>
+              <p:cNvPicPr>
+                <a:picLocks noChangeAspect="1" noChangeArrowheads="1"/>
+              </p:cNvPicPr>
+              <p:nvPr/>
+            </p:nvPicPr>
+            <p:blipFill>
+              <a:blip r:embed="rId2" cstate="print"/>
+              <a:srcRect/>
+              <a:stretch>
+                <a:fillRect/>
+              </a:stretch>
+            </p:blipFill>
+            <p:spPr bwMode="auto">
+              <a:xfrm>
+                <a:off x="2858846" y="3748205"/>
+                <a:ext cx="455776" cy="427472"/>
+              </a:xfrm>
+              <a:prstGeom prst="rect">
+                <a:avLst/>
+              </a:prstGeom>
+              <a:noFill/>
+            </p:spPr>
+          </p:pic>
+          <p:sp>
+            <p:nvSpPr>
+              <p:cNvPr id="119" name="TextBox 118"/>
+              <p:cNvSpPr txBox="1"/>
+              <p:nvPr/>
+            </p:nvSpPr>
+            <p:spPr>
+              <a:xfrm>
+                <a:off x="3131755" y="3540250"/>
+                <a:ext cx="741613" cy="276999"/>
+              </a:xfrm>
+              <a:prstGeom prst="rect">
+                <a:avLst/>
+              </a:prstGeom>
+              <a:noFill/>
+            </p:spPr>
+            <p:txBody>
+              <a:bodyPr wrap="none" rtlCol="0">
+                <a:spAutoFit/>
+              </a:bodyPr>
+              <a:lstStyle/>
+              <a:p>
+                <a:r>
+                  <a:rPr lang="en-US" sz="1200" dirty="0" smtClean="0"/>
+                  <a:t>Project 1</a:t>
+                </a:r>
+                <a:endParaRPr lang="nl-BE" sz="1200" dirty="0"/>
+              </a:p>
+            </p:txBody>
+          </p:sp>
+          <p:pic>
+            <p:nvPicPr>
+              <p:cNvPr id="143" name="Picture 2" descr="C:\Users\u0065575\AppData\Local\Microsoft\Windows\Temporary Internet Files\Content.IE5\WBWRXN3O\MC900432599[1].png"/>
+              <p:cNvPicPr>
+                <a:picLocks noChangeAspect="1" noChangeArrowheads="1"/>
+              </p:cNvPicPr>
+              <p:nvPr/>
+            </p:nvPicPr>
+            <p:blipFill>
+              <a:blip r:embed="rId2" cstate="print"/>
+              <a:srcRect/>
+              <a:stretch>
+                <a:fillRect/>
+              </a:stretch>
+            </p:blipFill>
+            <p:spPr bwMode="auto">
+              <a:xfrm>
+                <a:off x="2964096" y="3900605"/>
+                <a:ext cx="455776" cy="427472"/>
+              </a:xfrm>
+              <a:prstGeom prst="rect">
+                <a:avLst/>
+              </a:prstGeom>
+              <a:noFill/>
+            </p:spPr>
+          </p:pic>
+        </p:grpSp>
+      </p:grpSp>
+      <p:grpSp>
+        <p:nvGrpSpPr>
+          <p:cNvPr id="11" name="Group 10"/>
+          <p:cNvGrpSpPr/>
+          <p:nvPr/>
+        </p:nvGrpSpPr>
+        <p:grpSpPr>
+          <a:xfrm>
+            <a:off x="2960413" y="3717032"/>
+            <a:ext cx="1035523" cy="615220"/>
+            <a:chOff x="2960413" y="3717032"/>
+            <a:chExt cx="1035523" cy="615220"/>
+          </a:xfrm>
+        </p:grpSpPr>
+        <p:pic>
+          <p:nvPicPr>
+            <p:cNvPr id="120" name="Picture 2" descr="C:\Users\u0065575\AppData\Local\Microsoft\Windows\Temporary Internet Files\Content.IE5\WBWRXN3O\MC900432599[1].png"/>
+            <p:cNvPicPr>
+              <a:picLocks noChangeAspect="1" noChangeArrowheads="1"/>
+            </p:cNvPicPr>
+            <p:nvPr/>
+          </p:nvPicPr>
+          <p:blipFill>
+            <a:blip r:embed="rId2" cstate="print">
+              <a:duotone>
+                <a:prstClr val="black"/>
+                <a:schemeClr val="accent2">
+                  <a:tint val="45000"/>
+                  <a:satMod val="400000"/>
+                </a:schemeClr>
+              </a:duotone>
+            </a:blip>
+            <a:srcRect/>
+            <a:stretch>
+              <a:fillRect/>
+            </a:stretch>
+          </p:blipFill>
+          <p:spPr bwMode="auto">
+            <a:xfrm>
+              <a:off x="2960413" y="3904780"/>
+              <a:ext cx="455776" cy="427472"/>
+            </a:xfrm>
+            <a:prstGeom prst="rect">
+              <a:avLst/>
+            </a:prstGeom>
+            <a:noFill/>
+            <a:effectLst>
+              <a:innerShdw blurRad="63500" dist="50800" dir="2700000">
+                <a:prstClr val="black">
+                  <a:alpha val="50000"/>
+                </a:prstClr>
+              </a:innerShdw>
+            </a:effectLst>
+          </p:spPr>
+        </p:pic>
+        <p:pic>
+          <p:nvPicPr>
+            <p:cNvPr id="118" name="Picture 3" descr="C:\Users\u0065575\AppData\Local\Microsoft\Windows\Temporary Internet Files\Content.IE5\WOTZA2QG\MC900433853[1].png"/>
+            <p:cNvPicPr>
+              <a:picLocks noChangeAspect="1" noChangeArrowheads="1"/>
+            </p:cNvPicPr>
+            <p:nvPr/>
+          </p:nvPicPr>
+          <p:blipFill>
+            <a:blip r:embed="rId3" cstate="print">
+              <a:duotone>
+                <a:prstClr val="black"/>
+                <a:schemeClr val="accent5">
+                  <a:tint val="45000"/>
+                  <a:satMod val="400000"/>
+                </a:schemeClr>
+              </a:duotone>
+            </a:blip>
+            <a:srcRect/>
+            <a:stretch>
+              <a:fillRect/>
+            </a:stretch>
+          </p:blipFill>
+          <p:spPr bwMode="auto">
+            <a:xfrm>
+              <a:off x="3372293" y="3717032"/>
+              <a:ext cx="623643" cy="584914"/>
+            </a:xfrm>
+            <a:prstGeom prst="rect">
+              <a:avLst/>
+            </a:prstGeom>
+            <a:noFill/>
+            <a:effectLst>
+              <a:innerShdw blurRad="63500" dist="50800" dir="2700000">
+                <a:prstClr val="black">
+                  <a:alpha val="50000"/>
+                </a:prstClr>
+              </a:innerShdw>
+            </a:effectLst>
+          </p:spPr>
+        </p:pic>
+      </p:grpSp>
+      <p:grpSp>
+        <p:nvGrpSpPr>
+          <p:cNvPr id="12" name="Group 11"/>
+          <p:cNvGrpSpPr/>
+          <p:nvPr/>
+        </p:nvGrpSpPr>
+        <p:grpSpPr>
+          <a:xfrm>
+            <a:off x="4067240" y="3059668"/>
+            <a:ext cx="2232952" cy="2169532"/>
+            <a:chOff x="4067240" y="3059668"/>
+            <a:chExt cx="2232952" cy="2169532"/>
+          </a:xfrm>
+        </p:grpSpPr>
+        <p:grpSp>
+          <p:nvGrpSpPr>
+            <p:cNvPr id="144" name="Group 143"/>
+            <p:cNvGrpSpPr/>
+            <p:nvPr/>
+          </p:nvGrpSpPr>
+          <p:grpSpPr>
+            <a:xfrm>
+              <a:off x="4067240" y="3059668"/>
+              <a:ext cx="2232952" cy="2169532"/>
+              <a:chOff x="2123024" y="3039343"/>
+              <a:chExt cx="2232952" cy="2169532"/>
+            </a:xfrm>
+          </p:grpSpPr>
+          <p:grpSp>
+            <p:nvGrpSpPr>
+              <p:cNvPr id="145" name="Group 144"/>
+              <p:cNvGrpSpPr/>
+              <p:nvPr/>
+            </p:nvGrpSpPr>
+            <p:grpSpPr>
+              <a:xfrm>
+                <a:off x="2123024" y="3039343"/>
+                <a:ext cx="1536089" cy="2169532"/>
+                <a:chOff x="4980127" y="2564904"/>
+                <a:chExt cx="1536089" cy="2169532"/>
+              </a:xfrm>
+            </p:grpSpPr>
+            <p:sp>
+              <p:nvSpPr>
+                <p:cNvPr id="151" name="TextBox 150"/>
+                <p:cNvSpPr txBox="1"/>
+                <p:nvPr/>
+              </p:nvSpPr>
+              <p:spPr>
+                <a:xfrm>
+                  <a:off x="6134380" y="4365104"/>
+                  <a:ext cx="381836" cy="369332"/>
+                </a:xfrm>
+                <a:prstGeom prst="rect">
+                  <a:avLst/>
+                </a:prstGeom>
+                <a:noFill/>
+              </p:spPr>
+              <p:txBody>
+                <a:bodyPr wrap="none" rtlCol="0">
+                  <a:spAutoFit/>
+                </a:bodyPr>
+                <a:lstStyle/>
+                <a:p>
+                  <a:r>
+                    <a:rPr lang="en-US" dirty="0" smtClean="0"/>
+                    <a:t>r3</a:t>
+                  </a:r>
+                  <a:endParaRPr lang="nl-BE" dirty="0"/>
+                </a:p>
+              </p:txBody>
+            </p:sp>
+            <p:grpSp>
+              <p:nvGrpSpPr>
+                <p:cNvPr id="152" name="Group 151"/>
+                <p:cNvGrpSpPr/>
+                <p:nvPr/>
+              </p:nvGrpSpPr>
+              <p:grpSpPr>
+                <a:xfrm>
+                  <a:off x="4980127" y="2564904"/>
+                  <a:ext cx="900889" cy="1798459"/>
+                  <a:chOff x="1525268" y="3214717"/>
+                  <a:chExt cx="900889" cy="1798459"/>
+                </a:xfrm>
+              </p:grpSpPr>
+              <p:cxnSp>
+                <p:nvCxnSpPr>
+                  <p:cNvPr id="153" name="Straight Connector 152"/>
+                  <p:cNvCxnSpPr/>
+                  <p:nvPr/>
+                </p:nvCxnSpPr>
+                <p:spPr>
+                  <a:xfrm>
+                    <a:off x="1951137" y="3284984"/>
+                    <a:ext cx="0" cy="1728192"/>
+                  </a:xfrm>
+                  <a:prstGeom prst="line">
+                    <a:avLst/>
+                  </a:prstGeom>
+                  <a:ln w="19050">
+                    <a:solidFill>
+                      <a:schemeClr val="tx1"/>
+                    </a:solidFill>
+                    <a:prstDash val="dash"/>
+                  </a:ln>
+                </p:spPr>
+                <p:style>
+                  <a:lnRef idx="1">
+                    <a:schemeClr val="accent1"/>
+                  </a:lnRef>
+                  <a:fillRef idx="0">
+                    <a:schemeClr val="accent1"/>
+                  </a:fillRef>
+                  <a:effectRef idx="0">
+                    <a:schemeClr val="accent1"/>
+                  </a:effectRef>
+                  <a:fontRef idx="minor">
+                    <a:schemeClr val="tx1"/>
+                  </a:fontRef>
+                </p:style>
+              </p:cxnSp>
+              <p:sp>
+                <p:nvSpPr>
+                  <p:cNvPr id="154" name="TextBox 153"/>
+                  <p:cNvSpPr txBox="1"/>
+                  <p:nvPr/>
+                </p:nvSpPr>
+                <p:spPr>
+                  <a:xfrm>
+                    <a:off x="1525268" y="3214717"/>
+                    <a:ext cx="900889" cy="369332"/>
+                  </a:xfrm>
+                  <a:prstGeom prst="rect">
+                    <a:avLst/>
+                  </a:prstGeom>
+                  <a:solidFill>
+                    <a:schemeClr val="bg1"/>
+                  </a:solidFill>
+                  <a:ln>
+                    <a:solidFill>
+                      <a:schemeClr val="tx1"/>
+                    </a:solidFill>
+                  </a:ln>
+                </p:spPr>
+                <p:txBody>
+                  <a:bodyPr wrap="none" rtlCol="0">
+                    <a:spAutoFit/>
+                  </a:bodyPr>
+                  <a:lstStyle/>
+                  <a:p>
+                    <a:pPr algn="ctr"/>
+                    <a:r>
+                      <a:rPr lang="en-US" dirty="0" smtClean="0"/>
+                      <a:t>commit</a:t>
+                    </a:r>
+                    <a:endParaRPr lang="en-US" dirty="0" smtClean="0"/>
+                  </a:p>
+                </p:txBody>
+              </p:sp>
+            </p:grpSp>
+          </p:grpSp>
+          <p:grpSp>
+            <p:nvGrpSpPr>
+              <p:cNvPr id="146" name="Group 145"/>
+              <p:cNvGrpSpPr/>
+              <p:nvPr/>
+            </p:nvGrpSpPr>
+            <p:grpSpPr>
+              <a:xfrm>
+                <a:off x="2686100" y="3532181"/>
+                <a:ext cx="1669876" cy="1080120"/>
+                <a:chOff x="2686100" y="3532181"/>
+                <a:chExt cx="1669876" cy="1080120"/>
+              </a:xfrm>
+            </p:grpSpPr>
+            <p:sp>
+              <p:nvSpPr>
+                <p:cNvPr id="147" name="Rounded Rectangle 146"/>
+                <p:cNvSpPr/>
+                <p:nvPr/>
+              </p:nvSpPr>
+              <p:spPr>
+                <a:xfrm>
+                  <a:off x="2686100" y="3532181"/>
+                  <a:ext cx="1669876" cy="1080120"/>
+                </a:xfrm>
+                <a:prstGeom prst="roundRect">
+                  <a:avLst/>
+                </a:prstGeom>
+                <a:solidFill>
+                  <a:schemeClr val="bg1"/>
+                </a:solidFill>
+                <a:ln>
+                  <a:solidFill>
+                    <a:schemeClr val="tx1"/>
+                  </a:solidFill>
+                </a:ln>
+              </p:spPr>
+              <p:style>
+                <a:lnRef idx="2">
+                  <a:schemeClr val="accent1">
+                    <a:shade val="50000"/>
+                  </a:schemeClr>
+                </a:lnRef>
+                <a:fillRef idx="1">
+                  <a:schemeClr val="accent1"/>
+                </a:fillRef>
+                <a:effectRef idx="0">
+                  <a:schemeClr val="accent1"/>
+                </a:effectRef>
+                <a:fontRef idx="minor">
+                  <a:schemeClr val="lt1"/>
+                </a:fontRef>
+              </p:style>
+              <p:txBody>
+                <a:bodyPr rtlCol="0" anchor="ctr"/>
+                <a:lstStyle/>
+                <a:p>
+                  <a:pPr algn="ctr"/>
+                  <a:endParaRPr lang="nl-BE"/>
+                </a:p>
+              </p:txBody>
+            </p:sp>
+            <p:pic>
+              <p:nvPicPr>
+                <p:cNvPr id="148" name="Picture 2" descr="C:\Users\u0065575\AppData\Local\Microsoft\Windows\Temporary Internet Files\Content.IE5\WBWRXN3O\MC900432599[1].png"/>
+                <p:cNvPicPr>
+                  <a:picLocks noChangeAspect="1" noChangeArrowheads="1"/>
+                </p:cNvPicPr>
+                <p:nvPr/>
+              </p:nvPicPr>
+              <p:blipFill>
+                <a:blip r:embed="rId2" cstate="print"/>
+                <a:srcRect/>
+                <a:stretch>
+                  <a:fillRect/>
+                </a:stretch>
+              </p:blipFill>
+              <p:spPr bwMode="auto">
+                <a:xfrm>
+                  <a:off x="2858846" y="3748205"/>
+                  <a:ext cx="455776" cy="427472"/>
+                </a:xfrm>
+                <a:prstGeom prst="rect">
+                  <a:avLst/>
+                </a:prstGeom>
+                <a:noFill/>
+              </p:spPr>
+            </p:pic>
+            <p:sp>
+              <p:nvSpPr>
+                <p:cNvPr id="149" name="TextBox 148"/>
+                <p:cNvSpPr txBox="1"/>
+                <p:nvPr/>
+              </p:nvSpPr>
+              <p:spPr>
+                <a:xfrm>
+                  <a:off x="3131755" y="3540250"/>
+                  <a:ext cx="741613" cy="276999"/>
+                </a:xfrm>
+                <a:prstGeom prst="rect">
+                  <a:avLst/>
+                </a:prstGeom>
+                <a:noFill/>
+              </p:spPr>
+              <p:txBody>
+                <a:bodyPr wrap="none" rtlCol="0">
+                  <a:spAutoFit/>
+                </a:bodyPr>
+                <a:lstStyle/>
+                <a:p>
+                  <a:r>
+                    <a:rPr lang="en-US" sz="1200" dirty="0" smtClean="0"/>
+                    <a:t>Project 1</a:t>
+                  </a:r>
+                  <a:endParaRPr lang="nl-BE" sz="1200" dirty="0"/>
+                </a:p>
+              </p:txBody>
+            </p:sp>
+          </p:grpSp>
+        </p:grpSp>
+        <p:pic>
+          <p:nvPicPr>
+            <p:cNvPr id="155" name="Picture 3" descr="C:\Users\u0065575\AppData\Local\Microsoft\Windows\Temporary Internet Files\Content.IE5\WOTZA2QG\MC900433853[1].png"/>
+            <p:cNvPicPr>
+              <a:picLocks noChangeAspect="1" noChangeArrowheads="1"/>
+            </p:cNvPicPr>
+            <p:nvPr/>
+          </p:nvPicPr>
+          <p:blipFill>
+            <a:blip r:embed="rId3" cstate="print"/>
+            <a:srcRect/>
+            <a:stretch>
+              <a:fillRect/>
+            </a:stretch>
+          </p:blipFill>
+          <p:spPr bwMode="auto">
+            <a:xfrm>
+              <a:off x="5292080" y="3717032"/>
+              <a:ext cx="623643" cy="584914"/>
+            </a:xfrm>
+            <a:prstGeom prst="rect">
+              <a:avLst/>
+            </a:prstGeom>
+            <a:noFill/>
+          </p:spPr>
+        </p:pic>
+      </p:grpSp>
+      <p:pic>
+        <p:nvPicPr>
+          <p:cNvPr id="132" name="Picture 2" descr="C:\Users\u0065575\AppData\Local\Microsoft\Windows\Temporary Internet Files\Content.IE5\WBWRXN3O\MC900432599[1].png"/>
+          <p:cNvPicPr>
+            <a:picLocks noChangeAspect="1" noChangeArrowheads="1"/>
+          </p:cNvPicPr>
+          <p:nvPr/>
+        </p:nvPicPr>
+        <p:blipFill>
+          <a:blip r:embed="rId2" cstate="print">
+            <a:duotone>
+              <a:prstClr val="black"/>
+              <a:schemeClr val="accent5">
+                <a:tint val="45000"/>
+                <a:satMod val="400000"/>
+              </a:schemeClr>
+            </a:duotone>
+          </a:blip>
+          <a:srcRect/>
+          <a:stretch>
+            <a:fillRect/>
+          </a:stretch>
+        </p:blipFill>
+        <p:spPr bwMode="auto">
+          <a:xfrm>
+            <a:off x="4812107" y="3778649"/>
+            <a:ext cx="455776" cy="427472"/>
+          </a:xfrm>
+          <a:prstGeom prst="rect">
+            <a:avLst/>
+          </a:prstGeom>
+          <a:noFill/>
+          <a:effectLst>
+            <a:innerShdw blurRad="63500" dist="50800" dir="2700000">
+              <a:prstClr val="black">
+                <a:alpha val="50000"/>
+              </a:prstClr>
+            </a:innerShdw>
+          </a:effectLst>
+        </p:spPr>
+      </p:pic>
+    </p:spTree>
+    <p:extLst>
+      <p:ext uri="{BB962C8B-B14F-4D97-AF65-F5344CB8AC3E}">
+        <p14:creationId xmlns:p14="http://schemas.microsoft.com/office/powerpoint/2010/main" val="1862085812"/>
+      </p:ext>
+    </p:extLst>
+  </p:cSld>
+  <p:clrMapOvr>
+    <a:masterClrMapping/>
+  </p:clrMapOvr>
+  <p:timing>
+    <p:tnLst>
+      <p:par>
+        <p:cTn id="1" dur="indefinite" restart="never" nodeType="tmRoot">
+          <p:childTnLst>
+            <p:seq concurrent="1" nextAc="seek">
+              <p:cTn id="2" dur="indefinite" nodeType="mainSeq">
+                <p:childTnLst>
+                  <p:par>
+                    <p:cTn id="3" fill="hold">
+                      <p:stCondLst>
+                        <p:cond delay="indefinite"/>
+                      </p:stCondLst>
+                      <p:childTnLst>
+                        <p:par>
+                          <p:cTn id="4" fill="hold">
+                            <p:stCondLst>
+                              <p:cond delay="0"/>
+                            </p:stCondLst>
+                            <p:childTnLst>
+                              <p:par>
+                                <p:cTn id="5" presetID="1" presetClass="entr" presetSubtype="0" fill="hold" nodeType="clickEffect">
+                                  <p:stCondLst>
+                                    <p:cond delay="0"/>
+                                  </p:stCondLst>
+                                  <p:childTnLst>
+                                    <p:set>
+                                      <p:cBhvr>
+                                        <p:cTn id="6" dur="1" fill="hold">
+                                          <p:stCondLst>
+                                            <p:cond delay="0"/>
+                                          </p:stCondLst>
+                                        </p:cTn>
+                                        <p:tgtEl>
+                                          <p:spTgt spid="6"/>
+                                        </p:tgtEl>
+                                        <p:attrNameLst>
+                                          <p:attrName>style.visibility</p:attrName>
+                                        </p:attrNameLst>
+                                      </p:cBhvr>
+                                      <p:to>
+                                        <p:strVal val="visible"/>
+                                      </p:to>
+                                    </p:set>
+                                  </p:childTnLst>
+                                </p:cTn>
+                              </p:par>
+                              <p:par>
+                                <p:cTn id="7" presetID="1" presetClass="entr" presetSubtype="0" fill="hold" nodeType="withEffect">
+                                  <p:stCondLst>
+                                    <p:cond delay="0"/>
+                                  </p:stCondLst>
+                                  <p:childTnLst>
+                                    <p:set>
+                                      <p:cBhvr>
+                                        <p:cTn id="8" dur="1" fill="hold">
+                                          <p:stCondLst>
+                                            <p:cond delay="0"/>
+                                          </p:stCondLst>
+                                        </p:cTn>
+                                        <p:tgtEl>
+                                          <p:spTgt spid="99"/>
+                                        </p:tgtEl>
+                                        <p:attrNameLst>
+                                          <p:attrName>style.visibility</p:attrName>
+                                        </p:attrNameLst>
+                                      </p:cBhvr>
+                                      <p:to>
+                                        <p:strVal val="visible"/>
+                                      </p:to>
+                                    </p:set>
+                                  </p:childTnLst>
+                                </p:cTn>
+                              </p:par>
+                            </p:childTnLst>
+                          </p:cTn>
+                        </p:par>
+                      </p:childTnLst>
+                    </p:cTn>
+                  </p:par>
+                  <p:par>
+                    <p:cTn id="9" fill="hold">
+                      <p:stCondLst>
+                        <p:cond delay="indefinite"/>
+                      </p:stCondLst>
+                      <p:childTnLst>
+                        <p:par>
+                          <p:cTn id="10" fill="hold">
+                            <p:stCondLst>
+                              <p:cond delay="0"/>
+                            </p:stCondLst>
+                            <p:childTnLst>
+                              <p:par>
+                                <p:cTn id="11" presetID="1" presetClass="entr" presetSubtype="0" fill="hold" nodeType="clickEffect">
+                                  <p:stCondLst>
+                                    <p:cond delay="0"/>
+                                  </p:stCondLst>
+                                  <p:childTnLst>
+                                    <p:set>
+                                      <p:cBhvr>
+                                        <p:cTn id="12" dur="1" fill="hold">
+                                          <p:stCondLst>
+                                            <p:cond delay="0"/>
+                                          </p:stCondLst>
+                                        </p:cTn>
+                                        <p:tgtEl>
+                                          <p:spTgt spid="7"/>
+                                        </p:tgtEl>
+                                        <p:attrNameLst>
+                                          <p:attrName>style.visibility</p:attrName>
+                                        </p:attrNameLst>
+                                      </p:cBhvr>
+                                      <p:to>
+                                        <p:strVal val="visible"/>
+                                      </p:to>
+                                    </p:set>
+                                  </p:childTnLst>
+                                </p:cTn>
+                              </p:par>
+                            </p:childTnLst>
+                          </p:cTn>
+                        </p:par>
+                      </p:childTnLst>
+                    </p:cTn>
+                  </p:par>
+                  <p:par>
+                    <p:cTn id="13" fill="hold">
+                      <p:stCondLst>
+                        <p:cond delay="indefinite"/>
+                      </p:stCondLst>
+                      <p:childTnLst>
+                        <p:par>
+                          <p:cTn id="14" fill="hold">
+                            <p:stCondLst>
+                              <p:cond delay="0"/>
+                            </p:stCondLst>
+                            <p:childTnLst>
+                              <p:par>
+                                <p:cTn id="15" presetID="1" presetClass="entr" presetSubtype="0" fill="hold" nodeType="clickEffect">
+                                  <p:stCondLst>
+                                    <p:cond delay="0"/>
+                                  </p:stCondLst>
+                                  <p:childTnLst>
+                                    <p:set>
+                                      <p:cBhvr>
+                                        <p:cTn id="16" dur="1" fill="hold">
+                                          <p:stCondLst>
+                                            <p:cond delay="0"/>
+                                          </p:stCondLst>
+                                        </p:cTn>
+                                        <p:tgtEl>
+                                          <p:spTgt spid="10"/>
+                                        </p:tgtEl>
+                                        <p:attrNameLst>
+                                          <p:attrName>style.visibility</p:attrName>
+                                        </p:attrNameLst>
+                                      </p:cBhvr>
+                                      <p:to>
+                                        <p:strVal val="visible"/>
+                                      </p:to>
+                                    </p:set>
+                                  </p:childTnLst>
+                                </p:cTn>
+                              </p:par>
+                            </p:childTnLst>
+                          </p:cTn>
+                        </p:par>
+                      </p:childTnLst>
+                    </p:cTn>
+                  </p:par>
+                  <p:par>
+                    <p:cTn id="17" fill="hold">
+                      <p:stCondLst>
+                        <p:cond delay="indefinite"/>
+                      </p:stCondLst>
+                      <p:childTnLst>
+                        <p:par>
+                          <p:cTn id="18" fill="hold">
+                            <p:stCondLst>
+                              <p:cond delay="0"/>
+                            </p:stCondLst>
+                            <p:childTnLst>
+                              <p:par>
+                                <p:cTn id="19" presetID="1" presetClass="entr" presetSubtype="0" fill="hold" nodeType="clickEffect">
+                                  <p:stCondLst>
+                                    <p:cond delay="0"/>
+                                  </p:stCondLst>
+                                  <p:childTnLst>
+                                    <p:set>
+                                      <p:cBhvr>
+                                        <p:cTn id="20" dur="1" fill="hold">
+                                          <p:stCondLst>
+                                            <p:cond delay="0"/>
+                                          </p:stCondLst>
+                                        </p:cTn>
+                                        <p:tgtEl>
+                                          <p:spTgt spid="11"/>
+                                        </p:tgtEl>
+                                        <p:attrNameLst>
+                                          <p:attrName>style.visibility</p:attrName>
+                                        </p:attrNameLst>
+                                      </p:cBhvr>
+                                      <p:to>
+                                        <p:strVal val="visible"/>
+                                      </p:to>
+                                    </p:set>
+                                  </p:childTnLst>
+                                </p:cTn>
+                              </p:par>
+                            </p:childTnLst>
+                          </p:cTn>
+                        </p:par>
+                      </p:childTnLst>
+                    </p:cTn>
+                  </p:par>
+                  <p:par>
+                    <p:cTn id="21" fill="hold">
+                      <p:stCondLst>
+                        <p:cond delay="indefinite"/>
+                      </p:stCondLst>
+                      <p:childTnLst>
+                        <p:par>
+                          <p:cTn id="22" fill="hold">
+                            <p:stCondLst>
+                              <p:cond delay="0"/>
+                            </p:stCondLst>
+                            <p:childTnLst>
+                              <p:par>
+                                <p:cTn id="23" presetID="1" presetClass="entr" presetSubtype="0" fill="hold" nodeType="clickEffect">
+                                  <p:stCondLst>
+                                    <p:cond delay="0"/>
+                                  </p:stCondLst>
+                                  <p:childTnLst>
+                                    <p:set>
+                                      <p:cBhvr>
+                                        <p:cTn id="24" dur="1" fill="hold">
+                                          <p:stCondLst>
+                                            <p:cond delay="0"/>
+                                          </p:stCondLst>
+                                        </p:cTn>
+                                        <p:tgtEl>
+                                          <p:spTgt spid="12"/>
+                                        </p:tgtEl>
+                                        <p:attrNameLst>
+                                          <p:attrName>style.visibility</p:attrName>
+                                        </p:attrNameLst>
+                                      </p:cBhvr>
+                                      <p:to>
+                                        <p:strVal val="visible"/>
+                                      </p:to>
+                                    </p:set>
+                                  </p:childTnLst>
+                                </p:cTn>
+                              </p:par>
+                            </p:childTnLst>
+                          </p:cTn>
+                        </p:par>
+                      </p:childTnLst>
+                    </p:cTn>
+                  </p:par>
+                  <p:par>
+                    <p:cTn id="25" fill="hold">
+                      <p:stCondLst>
+                        <p:cond delay="indefinite"/>
+                      </p:stCondLst>
+                      <p:childTnLst>
+                        <p:par>
+                          <p:cTn id="26" fill="hold">
+                            <p:stCondLst>
+                              <p:cond delay="0"/>
+                            </p:stCondLst>
+                            <p:childTnLst>
+                              <p:par>
+                                <p:cTn id="27" presetID="1" presetClass="entr" presetSubtype="0" fill="hold" nodeType="clickEffect">
+                                  <p:stCondLst>
+                                    <p:cond delay="0"/>
+                                  </p:stCondLst>
+                                  <p:childTnLst>
+                                    <p:set>
+                                      <p:cBhvr>
+                                        <p:cTn id="28" dur="1" fill="hold">
+                                          <p:stCondLst>
+                                            <p:cond delay="0"/>
+                                          </p:stCondLst>
+                                        </p:cTn>
+                                        <p:tgtEl>
+                                          <p:spTgt spid="132"/>
+                                        </p:tgtEl>
+                                        <p:attrNameLst>
+                                          <p:attrName>style.visibility</p:attrName>
+                                        </p:attrNameLst>
+                                      </p:cBhvr>
+                                      <p:to>
+                                        <p:strVal val="visible"/>
+                                      </p:to>
+                                    </p:set>
+                                  </p:childTnLst>
+                                </p:cTn>
+                              </p:par>
+                            </p:childTnLst>
+                          </p:cTn>
+                        </p:par>
+                      </p:childTnLst>
+                    </p:cTn>
+                  </p:par>
+                  <p:par>
+                    <p:cTn id="29" fill="hold">
+                      <p:stCondLst>
+                        <p:cond delay="indefinite"/>
+                      </p:stCondLst>
+                      <p:childTnLst>
+                        <p:par>
+                          <p:cTn id="30" fill="hold">
+                            <p:stCondLst>
+                              <p:cond delay="0"/>
+                            </p:stCondLst>
+                            <p:childTnLst>
+                              <p:par>
+                                <p:cTn id="31" presetID="1" presetClass="entr" presetSubtype="0" fill="hold" nodeType="clickEffect">
+                                  <p:stCondLst>
+                                    <p:cond delay="0"/>
+                                  </p:stCondLst>
+                                  <p:childTnLst>
+                                    <p:set>
+                                      <p:cBhvr>
+                                        <p:cTn id="32" dur="1" fill="hold">
+                                          <p:stCondLst>
+                                            <p:cond delay="0"/>
+                                          </p:stCondLst>
+                                        </p:cTn>
+                                        <p:tgtEl>
+                                          <p:spTgt spid="14"/>
+                                        </p:tgtEl>
+                                        <p:attrNameLst>
+                                          <p:attrName>style.visibility</p:attrName>
+                                        </p:attrNameLst>
+                                      </p:cBhvr>
+                                      <p:to>
+                                        <p:strVal val="visible"/>
+                                      </p:to>
+                                    </p:set>
+                                  </p:childTnLst>
+                                </p:cTn>
+                              </p:par>
+                            </p:childTnLst>
+                          </p:cTn>
+                        </p:par>
+                      </p:childTnLst>
+                    </p:cTn>
+                  </p:par>
+                </p:childTnLst>
+              </p:cTn>
+              <p:prevCondLst>
+                <p:cond evt="onPrev" delay="0">
+                  <p:tgtEl>
+                    <p:sldTgt/>
+                  </p:tgtEl>
+                </p:cond>
+              </p:prevCondLst>
+              <p:nextCondLst>
+                <p:cond evt="onNext" delay="0">
+                  <p:tgtEl>
+                    <p:sldTgt/>
+                  </p:tgtEl>
+                </p:cond>
+              </p:nextCondLst>
+            </p:seq>
+          </p:childTnLst>
+        </p:cTn>
+      </p:par>
+    </p:tnLst>
+  </p:timing>
+</p:sld>
+</file>
+
+<file path=ppt/slides/slide23.xml><?xml version="1.0" encoding="utf-8"?>
+<p:sld xmlns:a="http://schemas.openxmlformats.org/drawingml/2006/main" xmlns:r="http://schemas.openxmlformats.org/officeDocument/2006/relationships" xmlns:p="http://schemas.openxmlformats.org/presentationml/2006/main">
+  <p:cSld>
+    <p:spTree>
+      <p:nvGrpSpPr>
+        <p:cNvPr id="1" name=""/>
+        <p:cNvGrpSpPr/>
+        <p:nvPr/>
+      </p:nvGrpSpPr>
+      <p:grpSpPr>
+        <a:xfrm>
+          <a:off x="0" y="0"/>
+          <a:ext cx="0" cy="0"/>
+          <a:chOff x="0" y="0"/>
+          <a:chExt cx="0" cy="0"/>
+        </a:xfrm>
+      </p:grpSpPr>
       <p:sp>
         <p:nvSpPr>
           <p:cNvPr id="2" name="Title 1"/>
@@ -10679,7 +12521,7 @@
 </p:sld>
 </file>
 
-<file path=ppt/slides/slide23.xml><?xml version="1.0" encoding="utf-8"?>
+<file path=ppt/slides/slide24.xml><?xml version="1.0" encoding="utf-8"?>
 <p:sld xmlns:a="http://schemas.openxmlformats.org/drawingml/2006/main" xmlns:r="http://schemas.openxmlformats.org/officeDocument/2006/relationships" xmlns:p="http://schemas.openxmlformats.org/presentationml/2006/main">
   <p:cSld>
     <p:spTree>
@@ -10737,7 +12579,7 @@
         </p:spPr>
         <p:txBody>
           <a:bodyPr>
-            <a:normAutofit fontScale="92500"/>
+            <a:normAutofit fontScale="92500" lnSpcReduction="10000"/>
           </a:bodyPr>
           <a:lstStyle/>
           <a:p>
@@ -10788,12 +12630,19 @@
               <a:t>Moves working </a:t>
             </a:r>
             <a:r>
-              <a:rPr lang="en-US" dirty="0" err="1" smtClean="0"/>
-              <a:t>copySchedules</a:t>
-            </a:r>
-            <a:r>
               <a:rPr lang="en-US" dirty="0" smtClean="0"/>
-              <a:t> delete of </a:t>
+              <a:t>copy</a:t>
+            </a:r>
+          </a:p>
+          <a:p>
+            <a:pPr lvl="1"/>
+            <a:r>
+              <a:rPr lang="en-US" dirty="0" smtClean="0"/>
+              <a:t>Schedules </a:t>
+            </a:r>
+            <a:r>
+              <a:rPr lang="en-US" dirty="0" smtClean="0"/>
+              <a:t>delete of </a:t>
             </a:r>
             <a:r>
               <a:rPr lang="en-US" dirty="0" err="1" smtClean="0">
@@ -10896,7 +12745,7 @@
         </p:nvSpPr>
         <p:spPr>
           <a:xfrm>
-            <a:off x="1259632" y="4571836"/>
+            <a:off x="1259632" y="4221088"/>
             <a:ext cx="3631122" cy="369332"/>
           </a:xfrm>
           <a:prstGeom prst="rect">
@@ -11259,33 +13108,15 @@
                                   </p:childTnLst>
                                 </p:cTn>
                               </p:par>
-                            </p:childTnLst>
-                          </p:cTn>
-                        </p:par>
-                      </p:childTnLst>
-                    </p:cTn>
-                  </p:par>
-                  <p:par>
-                    <p:cTn id="21" fill="hold">
-                      <p:stCondLst>
-                        <p:cond delay="indefinite"/>
-                      </p:stCondLst>
-                      <p:childTnLst>
-                        <p:par>
-                          <p:cTn id="22" fill="hold">
-                            <p:stCondLst>
-                              <p:cond delay="0"/>
-                            </p:stCondLst>
-                            <p:childTnLst>
                               <p:par>
-                                <p:cTn id="23" presetID="1" presetClass="entr" presetSubtype="0" fill="hold" grpId="0" nodeType="clickEffect">
+                                <p:cTn id="21" presetID="1" presetClass="entr" presetSubtype="0" fill="hold" grpId="0" nodeType="withEffect">
                                   <p:stCondLst>
                                     <p:cond delay="0"/>
                                   </p:stCondLst>
                                   <p:childTnLst>
                                     <p:set>
                                       <p:cBhvr>
-                                        <p:cTn id="24" dur="1" fill="hold">
+                                        <p:cTn id="22" dur="1" fill="hold">
                                           <p:stCondLst>
                                             <p:cond delay="0"/>
                                           </p:stCondLst>
@@ -11315,26 +13146,75 @@
                     </p:cTn>
                   </p:par>
                   <p:par>
-                    <p:cTn id="25" fill="hold">
+                    <p:cTn id="23" fill="hold">
                       <p:stCondLst>
                         <p:cond delay="indefinite"/>
                       </p:stCondLst>
                       <p:childTnLst>
                         <p:par>
-                          <p:cTn id="26" fill="hold">
+                          <p:cTn id="24" fill="hold">
                             <p:stCondLst>
                               <p:cond delay="0"/>
                             </p:stCondLst>
                             <p:childTnLst>
                               <p:par>
-                                <p:cTn id="27" presetID="1" presetClass="entr" presetSubtype="0" fill="hold" grpId="0" nodeType="clickEffect">
+                                <p:cTn id="25" presetID="1" presetClass="entr" presetSubtype="0" fill="hold" grpId="0" nodeType="clickEffect">
                                   <p:stCondLst>
                                     <p:cond delay="0"/>
                                   </p:stCondLst>
                                   <p:childTnLst>
                                     <p:set>
                                       <p:cBhvr>
-                                        <p:cTn id="28" dur="1" fill="hold">
+                                        <p:cTn id="26" dur="1" fill="hold">
+                                          <p:stCondLst>
+                                            <p:cond delay="0"/>
+                                          </p:stCondLst>
+                                        </p:cTn>
+                                        <p:tgtEl>
+                                          <p:spTgt spid="3">
+                                            <p:txEl>
+                                              <p:pRg st="6" end="6"/>
+                                            </p:txEl>
+                                          </p:spTgt>
+                                        </p:tgtEl>
+                                        <p:attrNameLst>
+                                          <p:attrName>style.visibility</p:attrName>
+                                        </p:attrNameLst>
+                                      </p:cBhvr>
+                                      <p:to>
+                                        <p:strVal val="visible"/>
+                                      </p:to>
+                                    </p:set>
+                                  </p:childTnLst>
+                                </p:cTn>
+                              </p:par>
+                            </p:childTnLst>
+                          </p:cTn>
+                        </p:par>
+                      </p:childTnLst>
+                    </p:cTn>
+                  </p:par>
+                  <p:par>
+                    <p:cTn id="27" fill="hold">
+                      <p:stCondLst>
+                        <p:cond delay="indefinite"/>
+                      </p:stCondLst>
+                      <p:childTnLst>
+                        <p:par>
+                          <p:cTn id="28" fill="hold">
+                            <p:stCondLst>
+                              <p:cond delay="0"/>
+                            </p:stCondLst>
+                            <p:childTnLst>
+                              <p:par>
+                                <p:cTn id="29" presetID="1" presetClass="entr" presetSubtype="0" fill="hold" grpId="0" nodeType="clickEffect">
+                                  <p:stCondLst>
+                                    <p:cond delay="0"/>
+                                  </p:stCondLst>
+                                  <p:childTnLst>
+                                    <p:set>
+                                      <p:cBhvr>
+                                        <p:cTn id="30" dur="1" fill="hold">
                                           <p:stCondLst>
                                             <p:cond delay="0"/>
                                           </p:stCondLst>
@@ -11390,7 +13270,7 @@
 </p:sld>
 </file>
 
-<file path=ppt/slides/slide24.xml><?xml version="1.0" encoding="utf-8"?>
+<file path=ppt/slides/slide25.xml><?xml version="1.0" encoding="utf-8"?>
 <p:sld xmlns:a="http://schemas.openxmlformats.org/drawingml/2006/main" xmlns:r="http://schemas.openxmlformats.org/officeDocument/2006/relationships" xmlns:p="http://schemas.openxmlformats.org/presentationml/2006/main">
   <p:cSld>
     <p:spTree>
@@ -12075,7 +13955,7 @@
 </p:sld>
 </file>
 
-<file path=ppt/slides/slide25.xml><?xml version="1.0" encoding="utf-8"?>
+<file path=ppt/slides/slide26.xml><?xml version="1.0" encoding="utf-8"?>
 <p:sld xmlns:a="http://schemas.openxmlformats.org/drawingml/2006/main" xmlns:r="http://schemas.openxmlformats.org/officeDocument/2006/relationships" xmlns:p="http://schemas.openxmlformats.org/presentationml/2006/main">
   <p:cSld>
     <p:spTree>
@@ -12733,7 +14613,7 @@
 </p:sld>
 </file>
 
-<file path=ppt/slides/slide26.xml><?xml version="1.0" encoding="utf-8"?>
+<file path=ppt/slides/slide27.xml><?xml version="1.0" encoding="utf-8"?>
 <p:sld xmlns:a="http://schemas.openxmlformats.org/drawingml/2006/main" xmlns:r="http://schemas.openxmlformats.org/officeDocument/2006/relationships" xmlns:p="http://schemas.openxmlformats.org/presentationml/2006/main">
   <p:cSld>
     <p:spTree>
@@ -13382,7 +15262,7 @@
 </p:sld>
 </file>
 
-<file path=ppt/slides/slide27.xml><?xml version="1.0" encoding="utf-8"?>
+<file path=ppt/slides/slide28.xml><?xml version="1.0" encoding="utf-8"?>
 <p:sld xmlns:a="http://schemas.openxmlformats.org/drawingml/2006/main" xmlns:r="http://schemas.openxmlformats.org/officeDocument/2006/relationships" xmlns:p="http://schemas.openxmlformats.org/presentationml/2006/main">
   <p:cSld>
     <p:spTree>
@@ -14055,7 +15935,7 @@
 </p:sld>
 </file>
 
-<file path=ppt/slides/slide28.xml><?xml version="1.0" encoding="utf-8"?>
+<file path=ppt/slides/slide29.xml><?xml version="1.0" encoding="utf-8"?>
 <p:sld xmlns:a="http://schemas.openxmlformats.org/drawingml/2006/main" xmlns:r="http://schemas.openxmlformats.org/officeDocument/2006/relationships" xmlns:p="http://schemas.openxmlformats.org/presentationml/2006/main">
   <p:cSld>
     <p:spTree>
@@ -14555,7 +16435,86 @@
 </p:sld>
 </file>
 
-<file path=ppt/slides/slide29.xml><?xml version="1.0" encoding="utf-8"?>
+<file path=ppt/slides/slide3.xml><?xml version="1.0" encoding="utf-8"?>
+<p:sld xmlns:a="http://schemas.openxmlformats.org/drawingml/2006/main" xmlns:r="http://schemas.openxmlformats.org/officeDocument/2006/relationships" xmlns:p="http://schemas.openxmlformats.org/presentationml/2006/main">
+  <p:cSld>
+    <p:spTree>
+      <p:nvGrpSpPr>
+        <p:cNvPr id="1" name=""/>
+        <p:cNvGrpSpPr/>
+        <p:nvPr/>
+      </p:nvGrpSpPr>
+      <p:grpSpPr>
+        <a:xfrm>
+          <a:off x="0" y="0"/>
+          <a:ext cx="0" cy="0"/>
+          <a:chOff x="0" y="0"/>
+          <a:chExt cx="0" cy="0"/>
+        </a:xfrm>
+      </p:grpSpPr>
+      <p:sp>
+        <p:nvSpPr>
+          <p:cNvPr id="2" name="Title 1"/>
+          <p:cNvSpPr>
+            <a:spLocks noGrp="1"/>
+          </p:cNvSpPr>
+          <p:nvPr>
+            <p:ph type="title"/>
+          </p:nvPr>
+        </p:nvSpPr>
+        <p:spPr/>
+        <p:txBody>
+          <a:bodyPr/>
+          <a:lstStyle/>
+          <a:p>
+            <a:r>
+              <a:rPr lang="en-US" dirty="0" smtClean="0"/>
+              <a:t>Motivation</a:t>
+            </a:r>
+            <a:endParaRPr lang="nl-BE" dirty="0"/>
+          </a:p>
+        </p:txBody>
+      </p:sp>
+      <p:sp>
+        <p:nvSpPr>
+          <p:cNvPr id="3" name="Text Placeholder 2"/>
+          <p:cNvSpPr>
+            <a:spLocks noGrp="1"/>
+          </p:cNvSpPr>
+          <p:nvPr>
+            <p:ph type="body" idx="1"/>
+          </p:nvPr>
+        </p:nvSpPr>
+        <p:spPr/>
+        <p:txBody>
+          <a:bodyPr/>
+          <a:lstStyle/>
+          <a:p>
+            <a:endParaRPr lang="nl-BE"/>
+          </a:p>
+        </p:txBody>
+      </p:sp>
+    </p:spTree>
+    <p:extLst>
+      <p:ext uri="{BB962C8B-B14F-4D97-AF65-F5344CB8AC3E}">
+        <p14:creationId xmlns:p14="http://schemas.microsoft.com/office/powerpoint/2010/main" val="292413800"/>
+      </p:ext>
+    </p:extLst>
+  </p:cSld>
+  <p:clrMapOvr>
+    <a:masterClrMapping/>
+  </p:clrMapOvr>
+  <p:timing>
+    <p:tnLst>
+      <p:par>
+        <p:cTn id="1" dur="indefinite" restart="never" nodeType="tmRoot"/>
+      </p:par>
+    </p:tnLst>
+  </p:timing>
+</p:sld>
+</file>
+
+<file path=ppt/slides/slide30.xml><?xml version="1.0" encoding="utf-8"?>
 <p:sld xmlns:a="http://schemas.openxmlformats.org/drawingml/2006/main" xmlns:r="http://schemas.openxmlformats.org/officeDocument/2006/relationships" xmlns:p="http://schemas.openxmlformats.org/presentationml/2006/main">
   <p:cSld>
     <p:spTree>
@@ -15260,7 +17219,7 @@
 </p:sld>
 </file>
 
-<file path=ppt/slides/slide3.xml><?xml version="1.0" encoding="utf-8"?>
+<file path=ppt/slides/slide31.xml><?xml version="1.0" encoding="utf-8"?>
 <p:sld xmlns:a="http://schemas.openxmlformats.org/drawingml/2006/main" xmlns:r="http://schemas.openxmlformats.org/officeDocument/2006/relationships" xmlns:p="http://schemas.openxmlformats.org/presentationml/2006/main">
   <p:cSld>
     <p:spTree>
@@ -15293,85 +17252,6 @@
           <a:lstStyle/>
           <a:p>
             <a:r>
-              <a:rPr lang="en-US" dirty="0" smtClean="0"/>
-              <a:t>Motivation</a:t>
-            </a:r>
-            <a:endParaRPr lang="nl-BE" dirty="0"/>
-          </a:p>
-        </p:txBody>
-      </p:sp>
-      <p:sp>
-        <p:nvSpPr>
-          <p:cNvPr id="3" name="Text Placeholder 2"/>
-          <p:cNvSpPr>
-            <a:spLocks noGrp="1"/>
-          </p:cNvSpPr>
-          <p:nvPr>
-            <p:ph type="body" idx="1"/>
-          </p:nvPr>
-        </p:nvSpPr>
-        <p:spPr/>
-        <p:txBody>
-          <a:bodyPr/>
-          <a:lstStyle/>
-          <a:p>
-            <a:endParaRPr lang="nl-BE"/>
-          </a:p>
-        </p:txBody>
-      </p:sp>
-    </p:spTree>
-    <p:extLst>
-      <p:ext uri="{BB962C8B-B14F-4D97-AF65-F5344CB8AC3E}">
-        <p14:creationId xmlns:p14="http://schemas.microsoft.com/office/powerpoint/2010/main" val="292413800"/>
-      </p:ext>
-    </p:extLst>
-  </p:cSld>
-  <p:clrMapOvr>
-    <a:masterClrMapping/>
-  </p:clrMapOvr>
-  <p:timing>
-    <p:tnLst>
-      <p:par>
-        <p:cTn id="1" dur="indefinite" restart="never" nodeType="tmRoot"/>
-      </p:par>
-    </p:tnLst>
-  </p:timing>
-</p:sld>
-</file>
-
-<file path=ppt/slides/slide30.xml><?xml version="1.0" encoding="utf-8"?>
-<p:sld xmlns:a="http://schemas.openxmlformats.org/drawingml/2006/main" xmlns:r="http://schemas.openxmlformats.org/officeDocument/2006/relationships" xmlns:p="http://schemas.openxmlformats.org/presentationml/2006/main">
-  <p:cSld>
-    <p:spTree>
-      <p:nvGrpSpPr>
-        <p:cNvPr id="1" name=""/>
-        <p:cNvGrpSpPr/>
-        <p:nvPr/>
-      </p:nvGrpSpPr>
-      <p:grpSpPr>
-        <a:xfrm>
-          <a:off x="0" y="0"/>
-          <a:ext cx="0" cy="0"/>
-          <a:chOff x="0" y="0"/>
-          <a:chExt cx="0" cy="0"/>
-        </a:xfrm>
-      </p:grpSpPr>
-      <p:sp>
-        <p:nvSpPr>
-          <p:cNvPr id="2" name="Title 1"/>
-          <p:cNvSpPr>
-            <a:spLocks noGrp="1"/>
-          </p:cNvSpPr>
-          <p:nvPr>
-            <p:ph type="title"/>
-          </p:nvPr>
-        </p:nvSpPr>
-        <p:spPr/>
-        <p:txBody>
-          <a:bodyPr/>
-          <a:lstStyle/>
-          <a:p>
-            <a:r>
               <a:rPr lang="en-US" dirty="0"/>
               <a:t>M</a:t>
             </a:r>
@@ -15422,7 +17302,7 @@
 </p:sld>
 </file>
 
-<file path=ppt/slides/slide31.xml><?xml version="1.0" encoding="utf-8"?>
+<file path=ppt/slides/slide32.xml><?xml version="1.0" encoding="utf-8"?>
 <p:sld xmlns:a="http://schemas.openxmlformats.org/drawingml/2006/main" xmlns:r="http://schemas.openxmlformats.org/officeDocument/2006/relationships" xmlns:p="http://schemas.openxmlformats.org/presentationml/2006/main">
   <p:cSld>
     <p:spTree>
@@ -15925,7 +17805,7 @@
 </p:sld>
 </file>
 
-<file path=ppt/slides/slide32.xml><?xml version="1.0" encoding="utf-8"?>
+<file path=ppt/slides/slide33.xml><?xml version="1.0" encoding="utf-8"?>
 <p:sld xmlns:a="http://schemas.openxmlformats.org/drawingml/2006/main" xmlns:r="http://schemas.openxmlformats.org/officeDocument/2006/relationships" xmlns:p="http://schemas.openxmlformats.org/presentationml/2006/main">
   <p:cSld>
     <p:spTree>
@@ -16896,7 +18776,7 @@
 </p:sld>
 </file>
 
-<file path=ppt/slides/slide33.xml><?xml version="1.0" encoding="utf-8"?>
+<file path=ppt/slides/slide34.xml><?xml version="1.0" encoding="utf-8"?>
 <p:sld xmlns:a="http://schemas.openxmlformats.org/drawingml/2006/main" xmlns:r="http://schemas.openxmlformats.org/officeDocument/2006/relationships" xmlns:p="http://schemas.openxmlformats.org/presentationml/2006/main">
   <p:cSld>
     <p:spTree>
@@ -18877,7 +20757,7 @@
 </p:sld>
 </file>
 
-<file path=ppt/slides/slide34.xml><?xml version="1.0" encoding="utf-8"?>
+<file path=ppt/slides/slide35.xml><?xml version="1.0" encoding="utf-8"?>
 <p:sld xmlns:a="http://schemas.openxmlformats.org/drawingml/2006/main" xmlns:r="http://schemas.openxmlformats.org/officeDocument/2006/relationships" xmlns:p="http://schemas.openxmlformats.org/presentationml/2006/main">
   <p:cSld>
     <p:spTree>
@@ -19278,7 +21158,7 @@
 </p:sld>
 </file>
 
-<file path=ppt/slides/slide35.xml><?xml version="1.0" encoding="utf-8"?>
+<file path=ppt/slides/slide36.xml><?xml version="1.0" encoding="utf-8"?>
 <p:sld xmlns:a="http://schemas.openxmlformats.org/drawingml/2006/main" xmlns:r="http://schemas.openxmlformats.org/officeDocument/2006/relationships" xmlns:p="http://schemas.openxmlformats.org/presentationml/2006/main">
   <p:cSld>
     <p:spTree>
@@ -20246,7 +22126,7 @@
 </p:sld>
 </file>
 
-<file path=ppt/slides/slide36.xml><?xml version="1.0" encoding="utf-8"?>
+<file path=ppt/slides/slide37.xml><?xml version="1.0" encoding="utf-8"?>
 <p:sld xmlns:a="http://schemas.openxmlformats.org/drawingml/2006/main" xmlns:r="http://schemas.openxmlformats.org/officeDocument/2006/relationships" xmlns:p="http://schemas.openxmlformats.org/presentationml/2006/main">
   <p:cSld>
     <p:spTree>
@@ -20822,7 +22702,7 @@
 </p:sld>
 </file>
 
-<file path=ppt/slides/slide37.xml><?xml version="1.0" encoding="utf-8"?>
+<file path=ppt/slides/slide38.xml><?xml version="1.0" encoding="utf-8"?>
 <p:sld xmlns:a="http://schemas.openxmlformats.org/drawingml/2006/main" xmlns:r="http://schemas.openxmlformats.org/officeDocument/2006/relationships" xmlns:p="http://schemas.openxmlformats.org/presentationml/2006/main">
   <p:cSld>
     <p:spTree>
@@ -23050,7 +24930,7 @@
 </p:sld>
 </file>
 
-<file path=ppt/slides/slide38.xml><?xml version="1.0" encoding="utf-8"?>
+<file path=ppt/slides/slide39.xml><?xml version="1.0" encoding="utf-8"?>
 <p:sld xmlns:a="http://schemas.openxmlformats.org/drawingml/2006/main" xmlns:r="http://schemas.openxmlformats.org/officeDocument/2006/relationships" xmlns:p="http://schemas.openxmlformats.org/presentationml/2006/main">
   <p:cSld>
     <p:spTree>
@@ -23569,7 +25449,108 @@
 </p:sld>
 </file>
 
-<file path=ppt/slides/slide39.xml><?xml version="1.0" encoding="utf-8"?>
+<file path=ppt/slides/slide4.xml><?xml version="1.0" encoding="utf-8"?>
+<p:sld xmlns:a="http://schemas.openxmlformats.org/drawingml/2006/main" xmlns:r="http://schemas.openxmlformats.org/officeDocument/2006/relationships" xmlns:p="http://schemas.openxmlformats.org/presentationml/2006/main">
+  <p:cSld>
+    <p:spTree>
+      <p:nvGrpSpPr>
+        <p:cNvPr id="1" name=""/>
+        <p:cNvGrpSpPr/>
+        <p:nvPr/>
+      </p:nvGrpSpPr>
+      <p:grpSpPr>
+        <a:xfrm>
+          <a:off x="0" y="0"/>
+          <a:ext cx="0" cy="0"/>
+          <a:chOff x="0" y="0"/>
+          <a:chExt cx="0" cy="0"/>
+        </a:xfrm>
+      </p:grpSpPr>
+      <p:sp>
+        <p:nvSpPr>
+          <p:cNvPr id="6" name="Title 5"/>
+          <p:cNvSpPr>
+            <a:spLocks noGrp="1"/>
+          </p:cNvSpPr>
+          <p:nvPr>
+            <p:ph type="title"/>
+          </p:nvPr>
+        </p:nvSpPr>
+        <p:spPr/>
+        <p:txBody>
+          <a:bodyPr/>
+          <a:lstStyle/>
+          <a:p>
+            <a:r>
+              <a:rPr lang="en-US" dirty="0" smtClean="0"/>
+              <a:t>It's a beautiful autumn day…</a:t>
+            </a:r>
+            <a:endParaRPr lang="nl-BE" dirty="0"/>
+          </a:p>
+        </p:txBody>
+      </p:sp>
+      <p:pic>
+        <p:nvPicPr>
+          <p:cNvPr id="1026" name="Picture 2" descr="C:\Users\lucg5005\Desktop\DSCF1116.jpg"/>
+          <p:cNvPicPr>
+            <a:picLocks noChangeAspect="1" noChangeArrowheads="1"/>
+          </p:cNvPicPr>
+          <p:nvPr/>
+        </p:nvPicPr>
+        <p:blipFill>
+          <a:blip r:embed="rId2" cstate="print">
+            <a:extLst>
+              <a:ext uri="{28A0092B-C50C-407E-A947-70E740481C1C}">
+                <a14:useLocalDpi xmlns:a14="http://schemas.microsoft.com/office/drawing/2010/main" val="0"/>
+              </a:ext>
+            </a:extLst>
+          </a:blip>
+          <a:srcRect/>
+          <a:stretch>
+            <a:fillRect/>
+          </a:stretch>
+        </p:blipFill>
+        <p:spPr bwMode="auto">
+          <a:xfrm>
+            <a:off x="1219795" y="1279015"/>
+            <a:ext cx="6736581" cy="5390345"/>
+          </a:xfrm>
+          <a:prstGeom prst="rect">
+            <a:avLst/>
+          </a:prstGeom>
+          <a:noFill/>
+          <a:extLst>
+            <a:ext uri="{909E8E84-426E-40DD-AFC4-6F175D3DCCD1}">
+              <a14:hiddenFill xmlns:a14="http://schemas.microsoft.com/office/drawing/2010/main">
+                <a:solidFill>
+                  <a:srgbClr val="FFFFFF"/>
+                </a:solidFill>
+              </a14:hiddenFill>
+            </a:ext>
+          </a:extLst>
+        </p:spPr>
+      </p:pic>
+    </p:spTree>
+    <p:extLst>
+      <p:ext uri="{BB962C8B-B14F-4D97-AF65-F5344CB8AC3E}">
+        <p14:creationId xmlns:p14="http://schemas.microsoft.com/office/powerpoint/2010/main" val="801143544"/>
+      </p:ext>
+    </p:extLst>
+  </p:cSld>
+  <p:clrMapOvr>
+    <a:masterClrMapping/>
+  </p:clrMapOvr>
+  <p:timing>
+    <p:tnLst>
+      <p:par>
+        <p:cTn id="1" dur="indefinite" restart="never" nodeType="tmRoot"/>
+      </p:par>
+    </p:tnLst>
+  </p:timing>
+</p:sld>
+</file>
+
+<file path=ppt/slides/slide40.xml><?xml version="1.0" encoding="utf-8"?>
 <p:sld xmlns:a="http://schemas.openxmlformats.org/drawingml/2006/main" xmlns:r="http://schemas.openxmlformats.org/officeDocument/2006/relationships" xmlns:p="http://schemas.openxmlformats.org/presentationml/2006/main">
   <p:cSld>
     <p:spTree>
@@ -24124,108 +26105,7 @@
 </p:sld>
 </file>
 
-<file path=ppt/slides/slide4.xml><?xml version="1.0" encoding="utf-8"?>
-<p:sld xmlns:a="http://schemas.openxmlformats.org/drawingml/2006/main" xmlns:r="http://schemas.openxmlformats.org/officeDocument/2006/relationships" xmlns:p="http://schemas.openxmlformats.org/presentationml/2006/main">
-  <p:cSld>
-    <p:spTree>
-      <p:nvGrpSpPr>
-        <p:cNvPr id="1" name=""/>
-        <p:cNvGrpSpPr/>
-        <p:nvPr/>
-      </p:nvGrpSpPr>
-      <p:grpSpPr>
-        <a:xfrm>
-          <a:off x="0" y="0"/>
-          <a:ext cx="0" cy="0"/>
-          <a:chOff x="0" y="0"/>
-          <a:chExt cx="0" cy="0"/>
-        </a:xfrm>
-      </p:grpSpPr>
-      <p:sp>
-        <p:nvSpPr>
-          <p:cNvPr id="6" name="Title 5"/>
-          <p:cNvSpPr>
-            <a:spLocks noGrp="1"/>
-          </p:cNvSpPr>
-          <p:nvPr>
-            <p:ph type="title"/>
-          </p:nvPr>
-        </p:nvSpPr>
-        <p:spPr/>
-        <p:txBody>
-          <a:bodyPr/>
-          <a:lstStyle/>
-          <a:p>
-            <a:r>
-              <a:rPr lang="en-US" dirty="0" smtClean="0"/>
-              <a:t>It's a beautiful autumn day…</a:t>
-            </a:r>
-            <a:endParaRPr lang="nl-BE" dirty="0"/>
-          </a:p>
-        </p:txBody>
-      </p:sp>
-      <p:pic>
-        <p:nvPicPr>
-          <p:cNvPr id="1026" name="Picture 2" descr="C:\Users\lucg5005\Desktop\DSCF1116.jpg"/>
-          <p:cNvPicPr>
-            <a:picLocks noChangeAspect="1" noChangeArrowheads="1"/>
-          </p:cNvPicPr>
-          <p:nvPr/>
-        </p:nvPicPr>
-        <p:blipFill>
-          <a:blip r:embed="rId2" cstate="print">
-            <a:extLst>
-              <a:ext uri="{28A0092B-C50C-407E-A947-70E740481C1C}">
-                <a14:useLocalDpi xmlns:a14="http://schemas.microsoft.com/office/drawing/2010/main" val="0"/>
-              </a:ext>
-            </a:extLst>
-          </a:blip>
-          <a:srcRect/>
-          <a:stretch>
-            <a:fillRect/>
-          </a:stretch>
-        </p:blipFill>
-        <p:spPr bwMode="auto">
-          <a:xfrm>
-            <a:off x="1219795" y="1279015"/>
-            <a:ext cx="6736581" cy="5390345"/>
-          </a:xfrm>
-          <a:prstGeom prst="rect">
-            <a:avLst/>
-          </a:prstGeom>
-          <a:noFill/>
-          <a:extLst>
-            <a:ext uri="{909E8E84-426E-40DD-AFC4-6F175D3DCCD1}">
-              <a14:hiddenFill xmlns:a14="http://schemas.microsoft.com/office/drawing/2010/main">
-                <a:solidFill>
-                  <a:srgbClr val="FFFFFF"/>
-                </a:solidFill>
-              </a14:hiddenFill>
-            </a:ext>
-          </a:extLst>
-        </p:spPr>
-      </p:pic>
-    </p:spTree>
-    <p:extLst>
-      <p:ext uri="{BB962C8B-B14F-4D97-AF65-F5344CB8AC3E}">
-        <p14:creationId xmlns:p14="http://schemas.microsoft.com/office/powerpoint/2010/main" val="801143544"/>
-      </p:ext>
-    </p:extLst>
-  </p:cSld>
-  <p:clrMapOvr>
-    <a:masterClrMapping/>
-  </p:clrMapOvr>
-  <p:timing>
-    <p:tnLst>
-      <p:par>
-        <p:cTn id="1" dur="indefinite" restart="never" nodeType="tmRoot"/>
-      </p:par>
-    </p:tnLst>
-  </p:timing>
-</p:sld>
-</file>
-
-<file path=ppt/slides/slide40.xml><?xml version="1.0" encoding="utf-8"?>
+<file path=ppt/slides/slide41.xml><?xml version="1.0" encoding="utf-8"?>
 <p:sld xmlns:a="http://schemas.openxmlformats.org/drawingml/2006/main" xmlns:r="http://schemas.openxmlformats.org/officeDocument/2006/relationships" xmlns:p="http://schemas.openxmlformats.org/presentationml/2006/main">
   <p:cSld>
     <p:spTree>
@@ -24901,7 +26781,7 @@
 </p:sld>
 </file>
 
-<file path=ppt/slides/slide41.xml><?xml version="1.0" encoding="utf-8"?>
+<file path=ppt/slides/slide42.xml><?xml version="1.0" encoding="utf-8"?>
 <p:sld xmlns:a="http://schemas.openxmlformats.org/drawingml/2006/main" xmlns:r="http://schemas.openxmlformats.org/officeDocument/2006/relationships" xmlns:p="http://schemas.openxmlformats.org/presentationml/2006/main">
   <p:cSld>
     <p:spTree>
@@ -26704,7 +28584,7 @@
 </p:sld>
 </file>
 
-<file path=ppt/slides/slide42.xml><?xml version="1.0" encoding="utf-8"?>
+<file path=ppt/slides/slide43.xml><?xml version="1.0" encoding="utf-8"?>
 <p:sld xmlns:a="http://schemas.openxmlformats.org/drawingml/2006/main" xmlns:r="http://schemas.openxmlformats.org/officeDocument/2006/relationships" xmlns:p="http://schemas.openxmlformats.org/presentationml/2006/main">
   <p:cSld>
     <p:spTree>
@@ -27460,7 +29340,7 @@
 </p:sld>
 </file>
 
-<file path=ppt/slides/slide43.xml><?xml version="1.0" encoding="utf-8"?>
+<file path=ppt/slides/slide44.xml><?xml version="1.0" encoding="utf-8"?>
 <p:sld xmlns:a="http://schemas.openxmlformats.org/drawingml/2006/main" xmlns:r="http://schemas.openxmlformats.org/officeDocument/2006/relationships" xmlns:p="http://schemas.openxmlformats.org/presentationml/2006/main">
   <p:cSld>
     <p:spTree>
@@ -27871,7 +29751,7 @@
 </p:sld>
 </file>
 
-<file path=ppt/slides/slide44.xml><?xml version="1.0" encoding="utf-8"?>
+<file path=ppt/slides/slide45.xml><?xml version="1.0" encoding="utf-8"?>
 <p:sld xmlns:a="http://schemas.openxmlformats.org/drawingml/2006/main" xmlns:r="http://schemas.openxmlformats.org/officeDocument/2006/relationships" xmlns:p="http://schemas.openxmlformats.org/presentationml/2006/main">
   <p:cSld>
     <p:spTree>
@@ -28316,85 +30196,6 @@
 </p:sld>
 </file>
 
-<file path=ppt/slides/slide45.xml><?xml version="1.0" encoding="utf-8"?>
-<p:sld xmlns:a="http://schemas.openxmlformats.org/drawingml/2006/main" xmlns:r="http://schemas.openxmlformats.org/officeDocument/2006/relationships" xmlns:p="http://schemas.openxmlformats.org/presentationml/2006/main">
-  <p:cSld>
-    <p:spTree>
-      <p:nvGrpSpPr>
-        <p:cNvPr id="1" name=""/>
-        <p:cNvGrpSpPr/>
-        <p:nvPr/>
-      </p:nvGrpSpPr>
-      <p:grpSpPr>
-        <a:xfrm>
-          <a:off x="0" y="0"/>
-          <a:ext cx="0" cy="0"/>
-          <a:chOff x="0" y="0"/>
-          <a:chExt cx="0" cy="0"/>
-        </a:xfrm>
-      </p:grpSpPr>
-      <p:sp>
-        <p:nvSpPr>
-          <p:cNvPr id="2" name="Title 1"/>
-          <p:cNvSpPr>
-            <a:spLocks noGrp="1"/>
-          </p:cNvSpPr>
-          <p:nvPr>
-            <p:ph type="title"/>
-          </p:nvPr>
-        </p:nvSpPr>
-        <p:spPr/>
-        <p:txBody>
-          <a:bodyPr/>
-          <a:lstStyle/>
-          <a:p>
-            <a:r>
-              <a:rPr lang="en-US" dirty="0" smtClean="0"/>
-              <a:t>Getting More information</a:t>
-            </a:r>
-            <a:endParaRPr lang="en-US" dirty="0"/>
-          </a:p>
-        </p:txBody>
-      </p:sp>
-      <p:sp>
-        <p:nvSpPr>
-          <p:cNvPr id="3" name="Text Placeholder 2"/>
-          <p:cNvSpPr>
-            <a:spLocks noGrp="1"/>
-          </p:cNvSpPr>
-          <p:nvPr>
-            <p:ph type="body" idx="1"/>
-          </p:nvPr>
-        </p:nvSpPr>
-        <p:spPr/>
-        <p:txBody>
-          <a:bodyPr/>
-          <a:lstStyle/>
-          <a:p>
-            <a:endParaRPr lang="en-US"/>
-          </a:p>
-        </p:txBody>
-      </p:sp>
-    </p:spTree>
-    <p:extLst>
-      <p:ext uri="{BB962C8B-B14F-4D97-AF65-F5344CB8AC3E}">
-        <p14:creationId xmlns:p14="http://schemas.microsoft.com/office/powerpoint/2010/main" val="2688556715"/>
-      </p:ext>
-    </p:extLst>
-  </p:cSld>
-  <p:clrMapOvr>
-    <a:masterClrMapping/>
-  </p:clrMapOvr>
-  <p:timing>
-    <p:tnLst>
-      <p:par>
-        <p:cTn id="1" dur="indefinite" restart="never" nodeType="tmRoot"/>
-      </p:par>
-    </p:tnLst>
-  </p:timing>
-</p:sld>
-</file>
-
 <file path=ppt/slides/slide46.xml><?xml version="1.0" encoding="utf-8"?>
 <p:sld xmlns:a="http://schemas.openxmlformats.org/drawingml/2006/main" xmlns:r="http://schemas.openxmlformats.org/officeDocument/2006/relationships" xmlns:p="http://schemas.openxmlformats.org/presentationml/2006/main">
   <p:cSld>
@@ -28428,155 +30229,36 @@
           <a:lstStyle/>
           <a:p>
             <a:r>
-              <a:rPr lang="en-US" dirty="0" err="1"/>
-              <a:t>g</a:t>
-            </a:r>
-            <a:r>
-              <a:rPr lang="en-US" dirty="0" err="1" smtClean="0"/>
-              <a:t>it</a:t>
-            </a:r>
-            <a:r>
               <a:rPr lang="en-US" dirty="0" smtClean="0"/>
-              <a:t>: the movie</a:t>
-            </a:r>
-            <a:endParaRPr lang="nl-BE" dirty="0"/>
+              <a:t>Getting More information</a:t>
+            </a:r>
+            <a:endParaRPr lang="en-US" dirty="0"/>
           </a:p>
         </p:txBody>
       </p:sp>
       <p:sp>
         <p:nvSpPr>
-          <p:cNvPr id="3" name="Content Placeholder 2"/>
+          <p:cNvPr id="3" name="Text Placeholder 2"/>
           <p:cNvSpPr>
             <a:spLocks noGrp="1"/>
           </p:cNvSpPr>
           <p:nvPr>
-            <p:ph idx="1"/>
+            <p:ph type="body" idx="1"/>
           </p:nvPr>
         </p:nvSpPr>
         <p:spPr/>
         <p:txBody>
-          <a:bodyPr>
-            <a:normAutofit fontScale="92500"/>
-          </a:bodyPr>
+          <a:bodyPr/>
           <a:lstStyle/>
           <a:p>
-            <a:r>
-              <a:rPr lang="en-US" dirty="0" smtClean="0"/>
-              <a:t>Online documentation (including movies)</a:t>
-            </a:r>
-          </a:p>
-          <a:p>
-            <a:pPr lvl="1"/>
-            <a:r>
-              <a:rPr lang="nl-BE" dirty="0" smtClean="0">
-                <a:hlinkClick r:id="rId2"/>
-              </a:rPr>
-              <a:t>http://git-scm.com/documentation</a:t>
-            </a:r>
-            <a:endParaRPr lang="nl-BE" dirty="0" smtClean="0"/>
-          </a:p>
-          <a:p>
-            <a:r>
-              <a:rPr lang="en-US" dirty="0" err="1"/>
-              <a:t>g</a:t>
-            </a:r>
-            <a:r>
-              <a:rPr lang="en-US" dirty="0" err="1" smtClean="0"/>
-              <a:t>it</a:t>
-            </a:r>
-            <a:r>
-              <a:rPr lang="en-US" dirty="0" smtClean="0"/>
-              <a:t> web site</a:t>
-            </a:r>
-          </a:p>
-          <a:p>
-            <a:pPr lvl="1"/>
-            <a:r>
-              <a:rPr lang="nl-BE" dirty="0" smtClean="0">
-                <a:hlinkClick r:id="rId3"/>
-              </a:rPr>
-              <a:t>http://git-scm.com/</a:t>
-            </a:r>
-            <a:endParaRPr lang="nl-BE" dirty="0" smtClean="0"/>
-          </a:p>
-          <a:p>
-            <a:r>
-              <a:rPr lang="en-US" dirty="0" smtClean="0"/>
-              <a:t>Why (the author thinks) you should switch to </a:t>
-            </a:r>
-            <a:r>
-              <a:rPr lang="en-US" dirty="0" err="1" smtClean="0"/>
-              <a:t>git</a:t>
-            </a:r>
-            <a:endParaRPr lang="en-US" dirty="0" smtClean="0"/>
-          </a:p>
-          <a:p>
-            <a:pPr lvl="1"/>
-            <a:r>
-              <a:rPr lang="nl-BE" dirty="0" smtClean="0">
-                <a:hlinkClick r:id="rId4"/>
-              </a:rPr>
-              <a:t>http://blog.teamtreehouse.com/why-you-should-switch-from-subversion-to-git</a:t>
-            </a:r>
-            <a:endParaRPr lang="nl-BE" dirty="0" smtClean="0"/>
-          </a:p>
-          <a:p>
-            <a:r>
-              <a:rPr lang="nl-BE" dirty="0" smtClean="0"/>
-              <a:t>An </a:t>
-            </a:r>
-            <a:r>
-              <a:rPr lang="nl-BE" dirty="0" err="1" smtClean="0"/>
-              <a:t>overview</a:t>
-            </a:r>
-            <a:r>
-              <a:rPr lang="nl-BE" dirty="0" smtClean="0"/>
-              <a:t> of </a:t>
-            </a:r>
-            <a:r>
-              <a:rPr lang="nl-BE" dirty="0" err="1" smtClean="0"/>
-              <a:t>frequently</a:t>
-            </a:r>
-            <a:r>
-              <a:rPr lang="nl-BE" dirty="0" smtClean="0"/>
-              <a:t> </a:t>
-            </a:r>
-            <a:r>
-              <a:rPr lang="nl-BE" dirty="0" err="1" smtClean="0"/>
-              <a:t>used</a:t>
-            </a:r>
-            <a:r>
-              <a:rPr lang="nl-BE" dirty="0" smtClean="0"/>
-              <a:t> git </a:t>
-            </a:r>
-            <a:r>
-              <a:rPr lang="nl-BE" dirty="0" err="1" smtClean="0"/>
-              <a:t>workflows</a:t>
-            </a:r>
-            <a:endParaRPr lang="nl-BE" dirty="0" smtClean="0"/>
-          </a:p>
-          <a:p>
-            <a:pPr lvl="1"/>
-            <a:r>
-              <a:rPr lang="en-US" dirty="0">
-                <a:hlinkClick r:id="rId5"/>
-              </a:rPr>
-              <a:t>https://</a:t>
-            </a:r>
-            <a:r>
-              <a:rPr lang="en-US" dirty="0" smtClean="0">
-                <a:hlinkClick r:id="rId5"/>
-              </a:rPr>
-              <a:t>www.atlassian.com/git/workflows</a:t>
-            </a:r>
-            <a:endParaRPr lang="nl-BE" dirty="0" smtClean="0"/>
+            <a:endParaRPr lang="en-US"/>
           </a:p>
         </p:txBody>
       </p:sp>
     </p:spTree>
     <p:extLst>
       <p:ext uri="{BB962C8B-B14F-4D97-AF65-F5344CB8AC3E}">
-        <p14:creationId xmlns:p14="http://schemas.microsoft.com/office/powerpoint/2010/main" val="2976133738"/>
+        <p14:creationId xmlns:p14="http://schemas.microsoft.com/office/powerpoint/2010/main" val="2688556715"/>
       </p:ext>
     </p:extLst>
   </p:cSld>
@@ -28626,6 +30308,204 @@
           <a:lstStyle/>
           <a:p>
             <a:r>
+              <a:rPr lang="en-US" dirty="0" err="1"/>
+              <a:t>g</a:t>
+            </a:r>
+            <a:r>
+              <a:rPr lang="en-US" dirty="0" err="1" smtClean="0"/>
+              <a:t>it</a:t>
+            </a:r>
+            <a:r>
+              <a:rPr lang="en-US" dirty="0" smtClean="0"/>
+              <a:t>: the movie</a:t>
+            </a:r>
+            <a:endParaRPr lang="nl-BE" dirty="0"/>
+          </a:p>
+        </p:txBody>
+      </p:sp>
+      <p:sp>
+        <p:nvSpPr>
+          <p:cNvPr id="3" name="Content Placeholder 2"/>
+          <p:cNvSpPr>
+            <a:spLocks noGrp="1"/>
+          </p:cNvSpPr>
+          <p:nvPr>
+            <p:ph idx="1"/>
+          </p:nvPr>
+        </p:nvSpPr>
+        <p:spPr/>
+        <p:txBody>
+          <a:bodyPr>
+            <a:normAutofit fontScale="92500"/>
+          </a:bodyPr>
+          <a:lstStyle/>
+          <a:p>
+            <a:r>
+              <a:rPr lang="en-US" dirty="0" smtClean="0"/>
+              <a:t>Online documentation (including movies)</a:t>
+            </a:r>
+          </a:p>
+          <a:p>
+            <a:pPr lvl="1"/>
+            <a:r>
+              <a:rPr lang="nl-BE" dirty="0" smtClean="0">
+                <a:hlinkClick r:id="rId2"/>
+              </a:rPr>
+              <a:t>http://git-scm.com/documentation</a:t>
+            </a:r>
+            <a:endParaRPr lang="nl-BE" dirty="0" smtClean="0"/>
+          </a:p>
+          <a:p>
+            <a:r>
+              <a:rPr lang="en-US" dirty="0" err="1"/>
+              <a:t>g</a:t>
+            </a:r>
+            <a:r>
+              <a:rPr lang="en-US" dirty="0" err="1" smtClean="0"/>
+              <a:t>it</a:t>
+            </a:r>
+            <a:r>
+              <a:rPr lang="en-US" dirty="0" smtClean="0"/>
+              <a:t> web site</a:t>
+            </a:r>
+          </a:p>
+          <a:p>
+            <a:pPr lvl="1"/>
+            <a:r>
+              <a:rPr lang="nl-BE" dirty="0" smtClean="0">
+                <a:hlinkClick r:id="rId3"/>
+              </a:rPr>
+              <a:t>http://git-scm.com/</a:t>
+            </a:r>
+            <a:endParaRPr lang="nl-BE" dirty="0" smtClean="0"/>
+          </a:p>
+          <a:p>
+            <a:r>
+              <a:rPr lang="en-US" dirty="0" smtClean="0"/>
+              <a:t>Why (the author thinks) you should switch to </a:t>
+            </a:r>
+            <a:r>
+              <a:rPr lang="en-US" dirty="0" err="1" smtClean="0"/>
+              <a:t>git</a:t>
+            </a:r>
+            <a:endParaRPr lang="en-US" dirty="0" smtClean="0"/>
+          </a:p>
+          <a:p>
+            <a:pPr lvl="1"/>
+            <a:r>
+              <a:rPr lang="nl-BE" dirty="0" smtClean="0">
+                <a:hlinkClick r:id="rId4"/>
+              </a:rPr>
+              <a:t>http://blog.teamtreehouse.com/why-you-should-switch-from-subversion-to-git</a:t>
+            </a:r>
+            <a:endParaRPr lang="nl-BE" dirty="0" smtClean="0"/>
+          </a:p>
+          <a:p>
+            <a:r>
+              <a:rPr lang="nl-BE" dirty="0" smtClean="0"/>
+              <a:t>An </a:t>
+            </a:r>
+            <a:r>
+              <a:rPr lang="nl-BE" dirty="0" err="1" smtClean="0"/>
+              <a:t>overview</a:t>
+            </a:r>
+            <a:r>
+              <a:rPr lang="nl-BE" dirty="0" smtClean="0"/>
+              <a:t> of </a:t>
+            </a:r>
+            <a:r>
+              <a:rPr lang="nl-BE" dirty="0" err="1" smtClean="0"/>
+              <a:t>frequently</a:t>
+            </a:r>
+            <a:r>
+              <a:rPr lang="nl-BE" dirty="0" smtClean="0"/>
+              <a:t> </a:t>
+            </a:r>
+            <a:r>
+              <a:rPr lang="nl-BE" dirty="0" err="1" smtClean="0"/>
+              <a:t>used</a:t>
+            </a:r>
+            <a:r>
+              <a:rPr lang="nl-BE" dirty="0" smtClean="0"/>
+              <a:t> git </a:t>
+            </a:r>
+            <a:r>
+              <a:rPr lang="nl-BE" dirty="0" err="1" smtClean="0"/>
+              <a:t>workflows</a:t>
+            </a:r>
+            <a:endParaRPr lang="nl-BE" dirty="0" smtClean="0"/>
+          </a:p>
+          <a:p>
+            <a:pPr lvl="1"/>
+            <a:r>
+              <a:rPr lang="en-US" dirty="0">
+                <a:hlinkClick r:id="rId5"/>
+              </a:rPr>
+              <a:t>https://</a:t>
+            </a:r>
+            <a:r>
+              <a:rPr lang="en-US" dirty="0" smtClean="0">
+                <a:hlinkClick r:id="rId5"/>
+              </a:rPr>
+              <a:t>www.atlassian.com/git/workflows</a:t>
+            </a:r>
+            <a:endParaRPr lang="nl-BE" dirty="0" smtClean="0"/>
+          </a:p>
+        </p:txBody>
+      </p:sp>
+    </p:spTree>
+    <p:extLst>
+      <p:ext uri="{BB962C8B-B14F-4D97-AF65-F5344CB8AC3E}">
+        <p14:creationId xmlns:p14="http://schemas.microsoft.com/office/powerpoint/2010/main" val="2976133738"/>
+      </p:ext>
+    </p:extLst>
+  </p:cSld>
+  <p:clrMapOvr>
+    <a:masterClrMapping/>
+  </p:clrMapOvr>
+  <p:timing>
+    <p:tnLst>
+      <p:par>
+        <p:cTn id="1" dur="indefinite" restart="never" nodeType="tmRoot"/>
+      </p:par>
+    </p:tnLst>
+  </p:timing>
+</p:sld>
+</file>
+
+<file path=ppt/slides/slide48.xml><?xml version="1.0" encoding="utf-8"?>
+<p:sld xmlns:a="http://schemas.openxmlformats.org/drawingml/2006/main" xmlns:r="http://schemas.openxmlformats.org/officeDocument/2006/relationships" xmlns:p="http://schemas.openxmlformats.org/presentationml/2006/main">
+  <p:cSld>
+    <p:spTree>
+      <p:nvGrpSpPr>
+        <p:cNvPr id="1" name=""/>
+        <p:cNvGrpSpPr/>
+        <p:nvPr/>
+      </p:nvGrpSpPr>
+      <p:grpSpPr>
+        <a:xfrm>
+          <a:off x="0" y="0"/>
+          <a:ext cx="0" cy="0"/>
+          <a:chOff x="0" y="0"/>
+          <a:chExt cx="0" cy="0"/>
+        </a:xfrm>
+      </p:grpSpPr>
+      <p:sp>
+        <p:nvSpPr>
+          <p:cNvPr id="2" name="Title 1"/>
+          <p:cNvSpPr>
+            <a:spLocks noGrp="1"/>
+          </p:cNvSpPr>
+          <p:nvPr>
+            <p:ph type="title"/>
+          </p:nvPr>
+        </p:nvSpPr>
+        <p:spPr/>
+        <p:txBody>
+          <a:bodyPr/>
+          <a:lstStyle/>
+          <a:p>
+            <a:r>
               <a:rPr lang="en-US" dirty="0" smtClean="0"/>
               <a:t>Conclusions</a:t>
             </a:r>
@@ -28672,7 +30552,7 @@
 </p:sld>
 </file>
 
-<file path=ppt/slides/slide48.xml><?xml version="1.0" encoding="utf-8"?>
+<file path=ppt/slides/slide49.xml><?xml version="1.0" encoding="utf-8"?>
 <p:sld xmlns:a="http://schemas.openxmlformats.org/drawingml/2006/main" xmlns:r="http://schemas.openxmlformats.org/officeDocument/2006/relationships" xmlns:p="http://schemas.openxmlformats.org/presentationml/2006/main">
   <p:cSld>
     <p:spTree>

</xml_diff>

<commit_message>
Added slide on interesting features not covered
</commit_message>
<xml_diff>
--- a/LinuxTools/VersionControl/version_control_git.pptx
+++ b/LinuxTools/VersionControl/version_control_git.pptx
@@ -50,10 +50,11 @@
     <p:sldId id="297" r:id="rId44"/>
     <p:sldId id="304" r:id="rId45"/>
     <p:sldId id="305" r:id="rId46"/>
-    <p:sldId id="298" r:id="rId47"/>
-    <p:sldId id="299" r:id="rId48"/>
-    <p:sldId id="300" r:id="rId49"/>
-    <p:sldId id="301" r:id="rId50"/>
+    <p:sldId id="307" r:id="rId47"/>
+    <p:sldId id="298" r:id="rId48"/>
+    <p:sldId id="299" r:id="rId49"/>
+    <p:sldId id="300" r:id="rId50"/>
+    <p:sldId id="301" r:id="rId51"/>
   </p:sldIdLst>
   <p:sldSz cx="9144000" cy="6858000" type="screen4x3"/>
   <p:notesSz cx="6858000" cy="9144000"/>
@@ -10352,25 +10353,16 @@
           <a:p>
             <a:r>
               <a:rPr lang="en-US" sz="2800" dirty="0" smtClean="0"/>
-              <a:t>Each commit </a:t>
-            </a:r>
-            <a:r>
-              <a:rPr lang="en-US" sz="2800" dirty="0" smtClean="0"/>
-              <a:t>generates new revision, </a:t>
+              <a:t>Each commit generates new revision, </a:t>
             </a:r>
             <a:r>
               <a:rPr lang="en-US" sz="2800" i="1" dirty="0" smtClean="0"/>
-              <a:t>single revision number for everything in </a:t>
-            </a:r>
-            <a:r>
-              <a:rPr lang="en-US" sz="2800" i="1" dirty="0" smtClean="0"/>
-              <a:t>repository</a:t>
+              <a:t>single revision number for everything in repository</a:t>
             </a:r>
             <a:r>
               <a:rPr lang="en-US" sz="2800" dirty="0" smtClean="0"/>
               <a:t> at any given time</a:t>
             </a:r>
-            <a:endParaRPr lang="en-US" sz="2800" dirty="0" smtClean="0"/>
           </a:p>
           <a:p>
             <a:pPr lvl="1"/>
@@ -10831,7 +10823,6 @@
                       <a:rPr lang="en-US" dirty="0" smtClean="0"/>
                       <a:t>commit</a:t>
                     </a:r>
-                    <a:endParaRPr lang="en-US" dirty="0" smtClean="0"/>
                   </a:p>
                 </p:txBody>
               </p:sp>
@@ -11007,7 +10998,6 @@
                     <a:rPr lang="en-US" dirty="0" smtClean="0"/>
                     <a:t>commit</a:t>
                   </a:r>
-                  <a:endParaRPr lang="en-US" dirty="0" smtClean="0"/>
                 </a:p>
               </p:txBody>
             </p:sp>
@@ -11412,7 +11402,6 @@
                       <a:rPr lang="en-US" dirty="0" smtClean="0"/>
                       <a:t>commit</a:t>
                     </a:r>
-                    <a:endParaRPr lang="en-US" dirty="0" smtClean="0"/>
                   </a:p>
                 </p:txBody>
               </p:sp>
@@ -12627,22 +12616,14 @@
             <a:pPr lvl="1"/>
             <a:r>
               <a:rPr lang="en-US" dirty="0" smtClean="0"/>
-              <a:t>Moves working </a:t>
-            </a:r>
+              <a:t>Moves working copy</a:t>
+            </a:r>
+          </a:p>
+          <a:p>
+            <a:pPr lvl="1"/>
             <a:r>
               <a:rPr lang="en-US" dirty="0" smtClean="0"/>
-              <a:t>copy</a:t>
-            </a:r>
-          </a:p>
-          <a:p>
-            <a:pPr lvl="1"/>
-            <a:r>
-              <a:rPr lang="en-US" dirty="0" smtClean="0"/>
-              <a:t>Schedules </a:t>
-            </a:r>
-            <a:r>
-              <a:rPr lang="en-US" dirty="0" smtClean="0"/>
-              <a:t>delete of </a:t>
+              <a:t>Schedules delete of </a:t>
             </a:r>
             <a:r>
               <a:rPr lang="en-US" dirty="0" err="1" smtClean="0">
@@ -29893,10 +29874,6 @@
               </a:rPr>
               <a:t> x/0 bug'</a:t>
             </a:r>
-            <a:endParaRPr lang="nl-BE" dirty="0" smtClean="0">
-              <a:latin typeface="Courier New" pitchFamily="49" charset="0"/>
-              <a:cs typeface="Courier New" pitchFamily="49" charset="0"/>
-            </a:endParaRPr>
           </a:p>
         </p:txBody>
       </p:sp>
@@ -30230,363 +30207,7 @@
           <a:p>
             <a:r>
               <a:rPr lang="en-US" dirty="0" smtClean="0"/>
-              <a:t>Getting More information</a:t>
-            </a:r>
-            <a:endParaRPr lang="en-US" dirty="0"/>
-          </a:p>
-        </p:txBody>
-      </p:sp>
-      <p:sp>
-        <p:nvSpPr>
-          <p:cNvPr id="3" name="Text Placeholder 2"/>
-          <p:cNvSpPr>
-            <a:spLocks noGrp="1"/>
-          </p:cNvSpPr>
-          <p:nvPr>
-            <p:ph type="body" idx="1"/>
-          </p:nvPr>
-        </p:nvSpPr>
-        <p:spPr/>
-        <p:txBody>
-          <a:bodyPr/>
-          <a:lstStyle/>
-          <a:p>
-            <a:endParaRPr lang="en-US"/>
-          </a:p>
-        </p:txBody>
-      </p:sp>
-    </p:spTree>
-    <p:extLst>
-      <p:ext uri="{BB962C8B-B14F-4D97-AF65-F5344CB8AC3E}">
-        <p14:creationId xmlns:p14="http://schemas.microsoft.com/office/powerpoint/2010/main" val="2688556715"/>
-      </p:ext>
-    </p:extLst>
-  </p:cSld>
-  <p:clrMapOvr>
-    <a:masterClrMapping/>
-  </p:clrMapOvr>
-  <p:timing>
-    <p:tnLst>
-      <p:par>
-        <p:cTn id="1" dur="indefinite" restart="never" nodeType="tmRoot"/>
-      </p:par>
-    </p:tnLst>
-  </p:timing>
-</p:sld>
-</file>
-
-<file path=ppt/slides/slide47.xml><?xml version="1.0" encoding="utf-8"?>
-<p:sld xmlns:a="http://schemas.openxmlformats.org/drawingml/2006/main" xmlns:r="http://schemas.openxmlformats.org/officeDocument/2006/relationships" xmlns:p="http://schemas.openxmlformats.org/presentationml/2006/main">
-  <p:cSld>
-    <p:spTree>
-      <p:nvGrpSpPr>
-        <p:cNvPr id="1" name=""/>
-        <p:cNvGrpSpPr/>
-        <p:nvPr/>
-      </p:nvGrpSpPr>
-      <p:grpSpPr>
-        <a:xfrm>
-          <a:off x="0" y="0"/>
-          <a:ext cx="0" cy="0"/>
-          <a:chOff x="0" y="0"/>
-          <a:chExt cx="0" cy="0"/>
-        </a:xfrm>
-      </p:grpSpPr>
-      <p:sp>
-        <p:nvSpPr>
-          <p:cNvPr id="2" name="Title 1"/>
-          <p:cNvSpPr>
-            <a:spLocks noGrp="1"/>
-          </p:cNvSpPr>
-          <p:nvPr>
-            <p:ph type="title"/>
-          </p:nvPr>
-        </p:nvSpPr>
-        <p:spPr/>
-        <p:txBody>
-          <a:bodyPr/>
-          <a:lstStyle/>
-          <a:p>
-            <a:r>
-              <a:rPr lang="en-US" dirty="0" err="1"/>
-              <a:t>g</a:t>
-            </a:r>
-            <a:r>
-              <a:rPr lang="en-US" dirty="0" err="1" smtClean="0"/>
-              <a:t>it</a:t>
-            </a:r>
-            <a:r>
-              <a:rPr lang="en-US" dirty="0" smtClean="0"/>
-              <a:t>: the movie</a:t>
-            </a:r>
-            <a:endParaRPr lang="nl-BE" dirty="0"/>
-          </a:p>
-        </p:txBody>
-      </p:sp>
-      <p:sp>
-        <p:nvSpPr>
-          <p:cNvPr id="3" name="Content Placeholder 2"/>
-          <p:cNvSpPr>
-            <a:spLocks noGrp="1"/>
-          </p:cNvSpPr>
-          <p:nvPr>
-            <p:ph idx="1"/>
-          </p:nvPr>
-        </p:nvSpPr>
-        <p:spPr/>
-        <p:txBody>
-          <a:bodyPr>
-            <a:normAutofit fontScale="92500"/>
-          </a:bodyPr>
-          <a:lstStyle/>
-          <a:p>
-            <a:r>
-              <a:rPr lang="en-US" dirty="0" smtClean="0"/>
-              <a:t>Online documentation (including movies)</a:t>
-            </a:r>
-          </a:p>
-          <a:p>
-            <a:pPr lvl="1"/>
-            <a:r>
-              <a:rPr lang="nl-BE" dirty="0" smtClean="0">
-                <a:hlinkClick r:id="rId2"/>
-              </a:rPr>
-              <a:t>http://git-scm.com/documentation</a:t>
-            </a:r>
-            <a:endParaRPr lang="nl-BE" dirty="0" smtClean="0"/>
-          </a:p>
-          <a:p>
-            <a:r>
-              <a:rPr lang="en-US" dirty="0" err="1"/>
-              <a:t>g</a:t>
-            </a:r>
-            <a:r>
-              <a:rPr lang="en-US" dirty="0" err="1" smtClean="0"/>
-              <a:t>it</a:t>
-            </a:r>
-            <a:r>
-              <a:rPr lang="en-US" dirty="0" smtClean="0"/>
-              <a:t> web site</a:t>
-            </a:r>
-          </a:p>
-          <a:p>
-            <a:pPr lvl="1"/>
-            <a:r>
-              <a:rPr lang="nl-BE" dirty="0" smtClean="0">
-                <a:hlinkClick r:id="rId3"/>
-              </a:rPr>
-              <a:t>http://git-scm.com/</a:t>
-            </a:r>
-            <a:endParaRPr lang="nl-BE" dirty="0" smtClean="0"/>
-          </a:p>
-          <a:p>
-            <a:r>
-              <a:rPr lang="en-US" dirty="0" smtClean="0"/>
-              <a:t>Why (the author thinks) you should switch to </a:t>
-            </a:r>
-            <a:r>
-              <a:rPr lang="en-US" dirty="0" err="1" smtClean="0"/>
-              <a:t>git</a:t>
-            </a:r>
-            <a:endParaRPr lang="en-US" dirty="0" smtClean="0"/>
-          </a:p>
-          <a:p>
-            <a:pPr lvl="1"/>
-            <a:r>
-              <a:rPr lang="nl-BE" dirty="0" smtClean="0">
-                <a:hlinkClick r:id="rId4"/>
-              </a:rPr>
-              <a:t>http://blog.teamtreehouse.com/why-you-should-switch-from-subversion-to-git</a:t>
-            </a:r>
-            <a:endParaRPr lang="nl-BE" dirty="0" smtClean="0"/>
-          </a:p>
-          <a:p>
-            <a:r>
-              <a:rPr lang="nl-BE" dirty="0" smtClean="0"/>
-              <a:t>An </a:t>
-            </a:r>
-            <a:r>
-              <a:rPr lang="nl-BE" dirty="0" err="1" smtClean="0"/>
-              <a:t>overview</a:t>
-            </a:r>
-            <a:r>
-              <a:rPr lang="nl-BE" dirty="0" smtClean="0"/>
-              <a:t> of </a:t>
-            </a:r>
-            <a:r>
-              <a:rPr lang="nl-BE" dirty="0" err="1" smtClean="0"/>
-              <a:t>frequently</a:t>
-            </a:r>
-            <a:r>
-              <a:rPr lang="nl-BE" dirty="0" smtClean="0"/>
-              <a:t> </a:t>
-            </a:r>
-            <a:r>
-              <a:rPr lang="nl-BE" dirty="0" err="1" smtClean="0"/>
-              <a:t>used</a:t>
-            </a:r>
-            <a:r>
-              <a:rPr lang="nl-BE" dirty="0" smtClean="0"/>
-              <a:t> git </a:t>
-            </a:r>
-            <a:r>
-              <a:rPr lang="nl-BE" dirty="0" err="1" smtClean="0"/>
-              <a:t>workflows</a:t>
-            </a:r>
-            <a:endParaRPr lang="nl-BE" dirty="0" smtClean="0"/>
-          </a:p>
-          <a:p>
-            <a:pPr lvl="1"/>
-            <a:r>
-              <a:rPr lang="en-US" dirty="0">
-                <a:hlinkClick r:id="rId5"/>
-              </a:rPr>
-              <a:t>https://</a:t>
-            </a:r>
-            <a:r>
-              <a:rPr lang="en-US" dirty="0" smtClean="0">
-                <a:hlinkClick r:id="rId5"/>
-              </a:rPr>
-              <a:t>www.atlassian.com/git/workflows</a:t>
-            </a:r>
-            <a:endParaRPr lang="nl-BE" dirty="0" smtClean="0"/>
-          </a:p>
-        </p:txBody>
-      </p:sp>
-    </p:spTree>
-    <p:extLst>
-      <p:ext uri="{BB962C8B-B14F-4D97-AF65-F5344CB8AC3E}">
-        <p14:creationId xmlns:p14="http://schemas.microsoft.com/office/powerpoint/2010/main" val="2976133738"/>
-      </p:ext>
-    </p:extLst>
-  </p:cSld>
-  <p:clrMapOvr>
-    <a:masterClrMapping/>
-  </p:clrMapOvr>
-  <p:timing>
-    <p:tnLst>
-      <p:par>
-        <p:cTn id="1" dur="indefinite" restart="never" nodeType="tmRoot"/>
-      </p:par>
-    </p:tnLst>
-  </p:timing>
-</p:sld>
-</file>
-
-<file path=ppt/slides/slide48.xml><?xml version="1.0" encoding="utf-8"?>
-<p:sld xmlns:a="http://schemas.openxmlformats.org/drawingml/2006/main" xmlns:r="http://schemas.openxmlformats.org/officeDocument/2006/relationships" xmlns:p="http://schemas.openxmlformats.org/presentationml/2006/main">
-  <p:cSld>
-    <p:spTree>
-      <p:nvGrpSpPr>
-        <p:cNvPr id="1" name=""/>
-        <p:cNvGrpSpPr/>
-        <p:nvPr/>
-      </p:nvGrpSpPr>
-      <p:grpSpPr>
-        <a:xfrm>
-          <a:off x="0" y="0"/>
-          <a:ext cx="0" cy="0"/>
-          <a:chOff x="0" y="0"/>
-          <a:chExt cx="0" cy="0"/>
-        </a:xfrm>
-      </p:grpSpPr>
-      <p:sp>
-        <p:nvSpPr>
-          <p:cNvPr id="2" name="Title 1"/>
-          <p:cNvSpPr>
-            <a:spLocks noGrp="1"/>
-          </p:cNvSpPr>
-          <p:nvPr>
-            <p:ph type="title"/>
-          </p:nvPr>
-        </p:nvSpPr>
-        <p:spPr/>
-        <p:txBody>
-          <a:bodyPr/>
-          <a:lstStyle/>
-          <a:p>
-            <a:r>
-              <a:rPr lang="en-US" dirty="0" smtClean="0"/>
-              <a:t>Conclusions</a:t>
-            </a:r>
-            <a:endParaRPr lang="nl-BE" dirty="0"/>
-          </a:p>
-        </p:txBody>
-      </p:sp>
-      <p:sp>
-        <p:nvSpPr>
-          <p:cNvPr id="3" name="Text Placeholder 2"/>
-          <p:cNvSpPr>
-            <a:spLocks noGrp="1"/>
-          </p:cNvSpPr>
-          <p:nvPr>
-            <p:ph type="body" idx="1"/>
-          </p:nvPr>
-        </p:nvSpPr>
-        <p:spPr/>
-        <p:txBody>
-          <a:bodyPr/>
-          <a:lstStyle/>
-          <a:p>
-            <a:endParaRPr lang="nl-BE"/>
-          </a:p>
-        </p:txBody>
-      </p:sp>
-    </p:spTree>
-    <p:extLst>
-      <p:ext uri="{BB962C8B-B14F-4D97-AF65-F5344CB8AC3E}">
-        <p14:creationId xmlns:p14="http://schemas.microsoft.com/office/powerpoint/2010/main" val="2763237186"/>
-      </p:ext>
-    </p:extLst>
-  </p:cSld>
-  <p:clrMapOvr>
-    <a:masterClrMapping/>
-  </p:clrMapOvr>
-  <p:timing>
-    <p:tnLst>
-      <p:par>
-        <p:cTn id="1" dur="indefinite" restart="never" nodeType="tmRoot"/>
-      </p:par>
-    </p:tnLst>
-  </p:timing>
-</p:sld>
-</file>
-
-<file path=ppt/slides/slide49.xml><?xml version="1.0" encoding="utf-8"?>
-<p:sld xmlns:a="http://schemas.openxmlformats.org/drawingml/2006/main" xmlns:r="http://schemas.openxmlformats.org/officeDocument/2006/relationships" xmlns:p="http://schemas.openxmlformats.org/presentationml/2006/main">
-  <p:cSld>
-    <p:spTree>
-      <p:nvGrpSpPr>
-        <p:cNvPr id="1" name=""/>
-        <p:cNvGrpSpPr/>
-        <p:nvPr/>
-      </p:nvGrpSpPr>
-      <p:grpSpPr>
-        <a:xfrm>
-          <a:off x="0" y="0"/>
-          <a:ext cx="0" cy="0"/>
-          <a:chOff x="0" y="0"/>
-          <a:chExt cx="0" cy="0"/>
-        </a:xfrm>
-      </p:grpSpPr>
-      <p:sp>
-        <p:nvSpPr>
-          <p:cNvPr id="2" name="Title 1"/>
-          <p:cNvSpPr>
-            <a:spLocks noGrp="1"/>
-          </p:cNvSpPr>
-          <p:nvPr>
-            <p:ph type="title"/>
-          </p:nvPr>
-        </p:nvSpPr>
-        <p:spPr/>
-        <p:txBody>
-          <a:bodyPr/>
-          <a:lstStyle/>
-          <a:p>
-            <a:r>
-              <a:rPr lang="en-US" dirty="0" smtClean="0"/>
-              <a:t>Conclusions</a:t>
+              <a:t>And even more…</a:t>
             </a:r>
             <a:endParaRPr lang="nl-BE" dirty="0"/>
           </a:p>
@@ -30609,57 +30230,191 @@
           <a:p>
             <a:r>
               <a:rPr lang="en-US" dirty="0" smtClean="0"/>
-              <a:t>Contributes to the scientific method</a:t>
-            </a:r>
-          </a:p>
-          <a:p>
-            <a:pPr lvl="1"/>
+              <a:t>Searching through history, methodically</a:t>
+            </a:r>
+          </a:p>
+          <a:p>
+            <a:endParaRPr lang="en-US" dirty="0"/>
+          </a:p>
+          <a:p>
             <a:r>
               <a:rPr lang="en-US" dirty="0" smtClean="0"/>
-              <a:t>Helps ensure reproducibility</a:t>
-            </a:r>
+              <a:t>Stashing non-committed staged changes</a:t>
+            </a:r>
+          </a:p>
+          <a:p>
+            <a:endParaRPr lang="en-US" dirty="0"/>
           </a:p>
           <a:p>
             <a:r>
               <a:rPr lang="en-US" dirty="0" smtClean="0"/>
-              <a:t>Record of change</a:t>
-            </a:r>
-          </a:p>
-          <a:p>
-            <a:pPr lvl="1"/>
-            <a:r>
-              <a:rPr lang="en-US" dirty="0" smtClean="0"/>
-              <a:t>What was changed?</a:t>
-            </a:r>
-          </a:p>
-          <a:p>
-            <a:pPr lvl="1"/>
-            <a:r>
-              <a:rPr lang="en-US" dirty="0" smtClean="0"/>
-              <a:t>When was it changed?</a:t>
-            </a:r>
-          </a:p>
-          <a:p>
-            <a:pPr lvl="1"/>
-            <a:r>
-              <a:rPr lang="en-US" dirty="0" smtClean="0"/>
-              <a:t>Who changed it?</a:t>
-            </a:r>
-          </a:p>
-          <a:p>
-            <a:pPr lvl="1"/>
-            <a:r>
-              <a:rPr lang="en-US" dirty="0" smtClean="0"/>
-              <a:t>Why was it changed?</a:t>
-            </a:r>
-            <a:endParaRPr lang="nl-BE" dirty="0"/>
+              <a:t>Micro-managing commits</a:t>
+            </a:r>
+          </a:p>
+        </p:txBody>
+      </p:sp>
+      <p:sp>
+        <p:nvSpPr>
+          <p:cNvPr id="4" name="TextBox 3"/>
+          <p:cNvSpPr txBox="1"/>
+          <p:nvPr/>
+        </p:nvSpPr>
+        <p:spPr>
+          <a:xfrm>
+            <a:off x="1259632" y="2204864"/>
+            <a:ext cx="3600400" cy="369332"/>
+          </a:xfrm>
+          <a:prstGeom prst="rect">
+            <a:avLst/>
+          </a:prstGeom>
+          <a:noFill/>
+          <a:ln>
+            <a:solidFill>
+              <a:schemeClr val="tx1"/>
+            </a:solidFill>
+          </a:ln>
+        </p:spPr>
+        <p:txBody>
+          <a:bodyPr wrap="square" rtlCol="0">
+            <a:spAutoFit/>
+          </a:bodyPr>
+          <a:lstStyle/>
+          <a:p>
+            <a:r>
+              <a:rPr lang="nl-BE" dirty="0" smtClean="0">
+                <a:latin typeface="Courier New" pitchFamily="49" charset="0"/>
+                <a:cs typeface="Courier New" pitchFamily="49" charset="0"/>
+              </a:rPr>
+              <a:t>$ git </a:t>
+            </a:r>
+            <a:r>
+              <a:rPr lang="nl-BE" dirty="0" err="1" smtClean="0">
+                <a:latin typeface="Courier New" pitchFamily="49" charset="0"/>
+                <a:cs typeface="Courier New" pitchFamily="49" charset="0"/>
+              </a:rPr>
+              <a:t>bisect</a:t>
+            </a:r>
+            <a:r>
+              <a:rPr lang="nl-BE" dirty="0" smtClean="0">
+                <a:latin typeface="Courier New" pitchFamily="49" charset="0"/>
+                <a:cs typeface="Courier New" pitchFamily="49" charset="0"/>
+              </a:rPr>
+              <a:t>  …</a:t>
+            </a:r>
+            <a:endParaRPr lang="nl-BE" dirty="0" smtClean="0">
+              <a:latin typeface="Courier New" pitchFamily="49" charset="0"/>
+              <a:cs typeface="Courier New" pitchFamily="49" charset="0"/>
+            </a:endParaRPr>
+          </a:p>
+        </p:txBody>
+      </p:sp>
+      <p:sp>
+        <p:nvSpPr>
+          <p:cNvPr id="5" name="TextBox 4"/>
+          <p:cNvSpPr txBox="1"/>
+          <p:nvPr/>
+        </p:nvSpPr>
+        <p:spPr>
+          <a:xfrm>
+            <a:off x="1259632" y="3356992"/>
+            <a:ext cx="3600400" cy="369332"/>
+          </a:xfrm>
+          <a:prstGeom prst="rect">
+            <a:avLst/>
+          </a:prstGeom>
+          <a:noFill/>
+          <a:ln>
+            <a:solidFill>
+              <a:schemeClr val="tx1"/>
+            </a:solidFill>
+          </a:ln>
+        </p:spPr>
+        <p:txBody>
+          <a:bodyPr wrap="square" rtlCol="0">
+            <a:spAutoFit/>
+          </a:bodyPr>
+          <a:lstStyle/>
+          <a:p>
+            <a:r>
+              <a:rPr lang="nl-BE" dirty="0" smtClean="0">
+                <a:latin typeface="Courier New" pitchFamily="49" charset="0"/>
+                <a:cs typeface="Courier New" pitchFamily="49" charset="0"/>
+              </a:rPr>
+              <a:t>$ git </a:t>
+            </a:r>
+            <a:r>
+              <a:rPr lang="nl-BE" dirty="0" smtClean="0">
+                <a:latin typeface="Courier New" pitchFamily="49" charset="0"/>
+                <a:cs typeface="Courier New" pitchFamily="49" charset="0"/>
+              </a:rPr>
+              <a:t>stash  …</a:t>
+            </a:r>
+            <a:endParaRPr lang="nl-BE" dirty="0" smtClean="0">
+              <a:latin typeface="Courier New" pitchFamily="49" charset="0"/>
+              <a:cs typeface="Courier New" pitchFamily="49" charset="0"/>
+            </a:endParaRPr>
+          </a:p>
+        </p:txBody>
+      </p:sp>
+      <p:sp>
+        <p:nvSpPr>
+          <p:cNvPr id="6" name="TextBox 5"/>
+          <p:cNvSpPr txBox="1"/>
+          <p:nvPr/>
+        </p:nvSpPr>
+        <p:spPr>
+          <a:xfrm>
+            <a:off x="1259632" y="4509120"/>
+            <a:ext cx="3600400" cy="369332"/>
+          </a:xfrm>
+          <a:prstGeom prst="rect">
+            <a:avLst/>
+          </a:prstGeom>
+          <a:noFill/>
+          <a:ln>
+            <a:solidFill>
+              <a:schemeClr val="tx1"/>
+            </a:solidFill>
+          </a:ln>
+        </p:spPr>
+        <p:txBody>
+          <a:bodyPr wrap="square" rtlCol="0">
+            <a:spAutoFit/>
+          </a:bodyPr>
+          <a:lstStyle/>
+          <a:p>
+            <a:r>
+              <a:rPr lang="nl-BE" dirty="0" smtClean="0">
+                <a:latin typeface="Courier New" pitchFamily="49" charset="0"/>
+                <a:cs typeface="Courier New" pitchFamily="49" charset="0"/>
+              </a:rPr>
+              <a:t>$ git </a:t>
+            </a:r>
+            <a:r>
+              <a:rPr lang="nl-BE" dirty="0" err="1" smtClean="0">
+                <a:latin typeface="Courier New" pitchFamily="49" charset="0"/>
+                <a:cs typeface="Courier New" pitchFamily="49" charset="0"/>
+              </a:rPr>
+              <a:t>add</a:t>
+            </a:r>
+            <a:r>
+              <a:rPr lang="nl-BE" dirty="0" smtClean="0">
+                <a:latin typeface="Courier New" pitchFamily="49" charset="0"/>
+                <a:cs typeface="Courier New" pitchFamily="49" charset="0"/>
+              </a:rPr>
+              <a:t>  -p  …</a:t>
+            </a:r>
+            <a:endParaRPr lang="nl-BE" dirty="0" smtClean="0">
+              <a:latin typeface="Courier New" pitchFamily="49" charset="0"/>
+              <a:cs typeface="Courier New" pitchFamily="49" charset="0"/>
+            </a:endParaRPr>
           </a:p>
         </p:txBody>
       </p:sp>
     </p:spTree>
     <p:extLst>
       <p:ext uri="{BB962C8B-B14F-4D97-AF65-F5344CB8AC3E}">
-        <p14:creationId xmlns:p14="http://schemas.microsoft.com/office/powerpoint/2010/main" val="2241158897"/>
+        <p14:creationId xmlns:p14="http://schemas.microsoft.com/office/powerpoint/2010/main" val="3877190761"/>
       </p:ext>
     </p:extLst>
   </p:cSld>
@@ -30734,11 +30489,7 @@
                                           </p:stCondLst>
                                         </p:cTn>
                                         <p:tgtEl>
-                                          <p:spTgt spid="3">
-                                            <p:txEl>
-                                              <p:pRg st="1" end="1"/>
-                                            </p:txEl>
-                                          </p:spTgt>
+                                          <p:spTgt spid="4"/>
                                         </p:tgtEl>
                                         <p:attrNameLst>
                                           <p:attrName>style.visibility</p:attrName>
@@ -30814,11 +30565,7 @@
                                           </p:stCondLst>
                                         </p:cTn>
                                         <p:tgtEl>
-                                          <p:spTgt spid="3">
-                                            <p:txEl>
-                                              <p:pRg st="3" end="3"/>
-                                            </p:txEl>
-                                          </p:spTgt>
+                                          <p:spTgt spid="5"/>
                                         </p:tgtEl>
                                         <p:attrNameLst>
                                           <p:attrName>style.visibility</p:attrName>
@@ -30831,39 +30578,26 @@
                                   </p:childTnLst>
                                 </p:cTn>
                               </p:par>
+                            </p:childTnLst>
+                          </p:cTn>
+                        </p:par>
+                      </p:childTnLst>
+                    </p:cTn>
+                  </p:par>
+                  <p:par>
+                    <p:cTn id="15" fill="hold">
+                      <p:stCondLst>
+                        <p:cond delay="indefinite"/>
+                      </p:stCondLst>
+                      <p:childTnLst>
+                        <p:par>
+                          <p:cTn id="16" fill="hold">
+                            <p:stCondLst>
+                              <p:cond delay="0"/>
+                            </p:stCondLst>
+                            <p:childTnLst>
                               <p:par>
-                                <p:cTn id="15" presetID="1" presetClass="entr" presetSubtype="0" fill="hold" grpId="0" nodeType="withEffect">
-                                  <p:stCondLst>
-                                    <p:cond delay="0"/>
-                                  </p:stCondLst>
-                                  <p:childTnLst>
-                                    <p:set>
-                                      <p:cBhvr>
-                                        <p:cTn id="16" dur="1" fill="hold">
-                                          <p:stCondLst>
-                                            <p:cond delay="0"/>
-                                          </p:stCondLst>
-                                        </p:cTn>
-                                        <p:tgtEl>
-                                          <p:spTgt spid="3">
-                                            <p:txEl>
-                                              <p:pRg st="4" end="4"/>
-                                            </p:txEl>
-                                          </p:spTgt>
-                                        </p:tgtEl>
-                                        <p:attrNameLst>
-                                          <p:attrName>style.visibility</p:attrName>
-                                        </p:attrNameLst>
-                                      </p:cBhvr>
-                                      <p:to>
-                                        <p:strVal val="visible"/>
-                                      </p:to>
-                                    </p:set>
-                                  </p:childTnLst>
-                                </p:cTn>
-                              </p:par>
-                              <p:par>
-                                <p:cTn id="17" presetID="1" presetClass="entr" presetSubtype="0" fill="hold" grpId="0" nodeType="withEffect">
+                                <p:cTn id="17" presetID="1" presetClass="entr" presetSubtype="0" fill="hold" grpId="0" nodeType="clickEffect">
                                   <p:stCondLst>
                                     <p:cond delay="0"/>
                                   </p:stCondLst>
@@ -30878,7 +30612,7 @@
                                         <p:tgtEl>
                                           <p:spTgt spid="3">
                                             <p:txEl>
-                                              <p:pRg st="5" end="5"/>
+                                              <p:pRg st="4" end="4"/>
                                             </p:txEl>
                                           </p:spTgt>
                                         </p:tgtEl>
@@ -30907,11 +30641,7 @@
                                           </p:stCondLst>
                                         </p:cTn>
                                         <p:tgtEl>
-                                          <p:spTgt spid="3">
-                                            <p:txEl>
-                                              <p:pRg st="6" end="6"/>
-                                            </p:txEl>
-                                          </p:spTgt>
+                                          <p:spTgt spid="6"/>
                                         </p:tgtEl>
                                         <p:attrNameLst>
                                           <p:attrName>style.visibility</p:attrName>
@@ -30953,7 +30683,366 @@
     </p:tnLst>
     <p:bldLst>
       <p:bldP spid="3" grpId="0" uiExpand="1" build="p"/>
+      <p:bldP spid="4" grpId="0" animBg="1"/>
+      <p:bldP spid="5" grpId="0" animBg="1"/>
+      <p:bldP spid="6" grpId="0" animBg="1"/>
     </p:bldLst>
+  </p:timing>
+</p:sld>
+</file>
+
+<file path=ppt/slides/slide47.xml><?xml version="1.0" encoding="utf-8"?>
+<p:sld xmlns:a="http://schemas.openxmlformats.org/drawingml/2006/main" xmlns:r="http://schemas.openxmlformats.org/officeDocument/2006/relationships" xmlns:p="http://schemas.openxmlformats.org/presentationml/2006/main">
+  <p:cSld>
+    <p:spTree>
+      <p:nvGrpSpPr>
+        <p:cNvPr id="1" name=""/>
+        <p:cNvGrpSpPr/>
+        <p:nvPr/>
+      </p:nvGrpSpPr>
+      <p:grpSpPr>
+        <a:xfrm>
+          <a:off x="0" y="0"/>
+          <a:ext cx="0" cy="0"/>
+          <a:chOff x="0" y="0"/>
+          <a:chExt cx="0" cy="0"/>
+        </a:xfrm>
+      </p:grpSpPr>
+      <p:sp>
+        <p:nvSpPr>
+          <p:cNvPr id="2" name="Title 1"/>
+          <p:cNvSpPr>
+            <a:spLocks noGrp="1"/>
+          </p:cNvSpPr>
+          <p:nvPr>
+            <p:ph type="title"/>
+          </p:nvPr>
+        </p:nvSpPr>
+        <p:spPr/>
+        <p:txBody>
+          <a:bodyPr/>
+          <a:lstStyle/>
+          <a:p>
+            <a:r>
+              <a:rPr lang="en-US" dirty="0" smtClean="0"/>
+              <a:t>Getting More information</a:t>
+            </a:r>
+            <a:endParaRPr lang="en-US" dirty="0"/>
+          </a:p>
+        </p:txBody>
+      </p:sp>
+      <p:sp>
+        <p:nvSpPr>
+          <p:cNvPr id="3" name="Text Placeholder 2"/>
+          <p:cNvSpPr>
+            <a:spLocks noGrp="1"/>
+          </p:cNvSpPr>
+          <p:nvPr>
+            <p:ph type="body" idx="1"/>
+          </p:nvPr>
+        </p:nvSpPr>
+        <p:spPr/>
+        <p:txBody>
+          <a:bodyPr/>
+          <a:lstStyle/>
+          <a:p>
+            <a:endParaRPr lang="en-US"/>
+          </a:p>
+        </p:txBody>
+      </p:sp>
+    </p:spTree>
+    <p:extLst>
+      <p:ext uri="{BB962C8B-B14F-4D97-AF65-F5344CB8AC3E}">
+        <p14:creationId xmlns:p14="http://schemas.microsoft.com/office/powerpoint/2010/main" val="2688556715"/>
+      </p:ext>
+    </p:extLst>
+  </p:cSld>
+  <p:clrMapOvr>
+    <a:masterClrMapping/>
+  </p:clrMapOvr>
+  <p:timing>
+    <p:tnLst>
+      <p:par>
+        <p:cTn id="1" dur="indefinite" restart="never" nodeType="tmRoot"/>
+      </p:par>
+    </p:tnLst>
+  </p:timing>
+</p:sld>
+</file>
+
+<file path=ppt/slides/slide48.xml><?xml version="1.0" encoding="utf-8"?>
+<p:sld xmlns:a="http://schemas.openxmlformats.org/drawingml/2006/main" xmlns:r="http://schemas.openxmlformats.org/officeDocument/2006/relationships" xmlns:p="http://schemas.openxmlformats.org/presentationml/2006/main">
+  <p:cSld>
+    <p:spTree>
+      <p:nvGrpSpPr>
+        <p:cNvPr id="1" name=""/>
+        <p:cNvGrpSpPr/>
+        <p:nvPr/>
+      </p:nvGrpSpPr>
+      <p:grpSpPr>
+        <a:xfrm>
+          <a:off x="0" y="0"/>
+          <a:ext cx="0" cy="0"/>
+          <a:chOff x="0" y="0"/>
+          <a:chExt cx="0" cy="0"/>
+        </a:xfrm>
+      </p:grpSpPr>
+      <p:sp>
+        <p:nvSpPr>
+          <p:cNvPr id="2" name="Title 1"/>
+          <p:cNvSpPr>
+            <a:spLocks noGrp="1"/>
+          </p:cNvSpPr>
+          <p:nvPr>
+            <p:ph type="title"/>
+          </p:nvPr>
+        </p:nvSpPr>
+        <p:spPr/>
+        <p:txBody>
+          <a:bodyPr/>
+          <a:lstStyle/>
+          <a:p>
+            <a:r>
+              <a:rPr lang="en-US" dirty="0" err="1"/>
+              <a:t>g</a:t>
+            </a:r>
+            <a:r>
+              <a:rPr lang="en-US" dirty="0" err="1" smtClean="0"/>
+              <a:t>it</a:t>
+            </a:r>
+            <a:r>
+              <a:rPr lang="en-US" dirty="0" smtClean="0"/>
+              <a:t>: the movie</a:t>
+            </a:r>
+            <a:endParaRPr lang="nl-BE" dirty="0"/>
+          </a:p>
+        </p:txBody>
+      </p:sp>
+      <p:sp>
+        <p:nvSpPr>
+          <p:cNvPr id="3" name="Content Placeholder 2"/>
+          <p:cNvSpPr>
+            <a:spLocks noGrp="1"/>
+          </p:cNvSpPr>
+          <p:nvPr>
+            <p:ph idx="1"/>
+          </p:nvPr>
+        </p:nvSpPr>
+        <p:spPr/>
+        <p:txBody>
+          <a:bodyPr>
+            <a:normAutofit fontScale="92500"/>
+          </a:bodyPr>
+          <a:lstStyle/>
+          <a:p>
+            <a:r>
+              <a:rPr lang="en-US" dirty="0" smtClean="0"/>
+              <a:t>Online documentation (including movies)</a:t>
+            </a:r>
+          </a:p>
+          <a:p>
+            <a:pPr lvl="1"/>
+            <a:r>
+              <a:rPr lang="nl-BE" dirty="0" smtClean="0">
+                <a:hlinkClick r:id="rId2"/>
+              </a:rPr>
+              <a:t>http://git-scm.com/documentation</a:t>
+            </a:r>
+            <a:endParaRPr lang="nl-BE" dirty="0" smtClean="0"/>
+          </a:p>
+          <a:p>
+            <a:r>
+              <a:rPr lang="en-US" dirty="0" err="1"/>
+              <a:t>g</a:t>
+            </a:r>
+            <a:r>
+              <a:rPr lang="en-US" dirty="0" err="1" smtClean="0"/>
+              <a:t>it</a:t>
+            </a:r>
+            <a:r>
+              <a:rPr lang="en-US" dirty="0" smtClean="0"/>
+              <a:t> web site</a:t>
+            </a:r>
+          </a:p>
+          <a:p>
+            <a:pPr lvl="1"/>
+            <a:r>
+              <a:rPr lang="nl-BE" dirty="0" smtClean="0">
+                <a:hlinkClick r:id="rId3"/>
+              </a:rPr>
+              <a:t>http://git-scm.com/</a:t>
+            </a:r>
+            <a:endParaRPr lang="nl-BE" dirty="0" smtClean="0"/>
+          </a:p>
+          <a:p>
+            <a:r>
+              <a:rPr lang="en-US" dirty="0" smtClean="0"/>
+              <a:t>Why (the author thinks) you should switch to </a:t>
+            </a:r>
+            <a:r>
+              <a:rPr lang="en-US" dirty="0" err="1" smtClean="0"/>
+              <a:t>git</a:t>
+            </a:r>
+            <a:endParaRPr lang="en-US" dirty="0" smtClean="0"/>
+          </a:p>
+          <a:p>
+            <a:pPr lvl="1"/>
+            <a:r>
+              <a:rPr lang="nl-BE" dirty="0" smtClean="0">
+                <a:hlinkClick r:id="rId4"/>
+              </a:rPr>
+              <a:t>http://blog.teamtreehouse.com/why-you-should-switch-from-subversion-to-git</a:t>
+            </a:r>
+            <a:endParaRPr lang="nl-BE" dirty="0" smtClean="0"/>
+          </a:p>
+          <a:p>
+            <a:r>
+              <a:rPr lang="nl-BE" dirty="0" smtClean="0"/>
+              <a:t>An </a:t>
+            </a:r>
+            <a:r>
+              <a:rPr lang="nl-BE" dirty="0" err="1" smtClean="0"/>
+              <a:t>overview</a:t>
+            </a:r>
+            <a:r>
+              <a:rPr lang="nl-BE" dirty="0" smtClean="0"/>
+              <a:t> of </a:t>
+            </a:r>
+            <a:r>
+              <a:rPr lang="nl-BE" dirty="0" err="1" smtClean="0"/>
+              <a:t>frequently</a:t>
+            </a:r>
+            <a:r>
+              <a:rPr lang="nl-BE" dirty="0" smtClean="0"/>
+              <a:t> </a:t>
+            </a:r>
+            <a:r>
+              <a:rPr lang="nl-BE" dirty="0" err="1" smtClean="0"/>
+              <a:t>used</a:t>
+            </a:r>
+            <a:r>
+              <a:rPr lang="nl-BE" dirty="0" smtClean="0"/>
+              <a:t> git </a:t>
+            </a:r>
+            <a:r>
+              <a:rPr lang="nl-BE" dirty="0" err="1" smtClean="0"/>
+              <a:t>workflows</a:t>
+            </a:r>
+            <a:endParaRPr lang="nl-BE" dirty="0" smtClean="0"/>
+          </a:p>
+          <a:p>
+            <a:pPr lvl="1"/>
+            <a:r>
+              <a:rPr lang="en-US" dirty="0">
+                <a:hlinkClick r:id="rId5"/>
+              </a:rPr>
+              <a:t>https://</a:t>
+            </a:r>
+            <a:r>
+              <a:rPr lang="en-US" dirty="0" smtClean="0">
+                <a:hlinkClick r:id="rId5"/>
+              </a:rPr>
+              <a:t>www.atlassian.com/git/workflows</a:t>
+            </a:r>
+            <a:endParaRPr lang="nl-BE" dirty="0" smtClean="0"/>
+          </a:p>
+        </p:txBody>
+      </p:sp>
+    </p:spTree>
+    <p:extLst>
+      <p:ext uri="{BB962C8B-B14F-4D97-AF65-F5344CB8AC3E}">
+        <p14:creationId xmlns:p14="http://schemas.microsoft.com/office/powerpoint/2010/main" val="2976133738"/>
+      </p:ext>
+    </p:extLst>
+  </p:cSld>
+  <p:clrMapOvr>
+    <a:masterClrMapping/>
+  </p:clrMapOvr>
+  <p:timing>
+    <p:tnLst>
+      <p:par>
+        <p:cTn id="1" dur="indefinite" restart="never" nodeType="tmRoot"/>
+      </p:par>
+    </p:tnLst>
+  </p:timing>
+</p:sld>
+</file>
+
+<file path=ppt/slides/slide49.xml><?xml version="1.0" encoding="utf-8"?>
+<p:sld xmlns:a="http://schemas.openxmlformats.org/drawingml/2006/main" xmlns:r="http://schemas.openxmlformats.org/officeDocument/2006/relationships" xmlns:p="http://schemas.openxmlformats.org/presentationml/2006/main">
+  <p:cSld>
+    <p:spTree>
+      <p:nvGrpSpPr>
+        <p:cNvPr id="1" name=""/>
+        <p:cNvGrpSpPr/>
+        <p:nvPr/>
+      </p:nvGrpSpPr>
+      <p:grpSpPr>
+        <a:xfrm>
+          <a:off x="0" y="0"/>
+          <a:ext cx="0" cy="0"/>
+          <a:chOff x="0" y="0"/>
+          <a:chExt cx="0" cy="0"/>
+        </a:xfrm>
+      </p:grpSpPr>
+      <p:sp>
+        <p:nvSpPr>
+          <p:cNvPr id="2" name="Title 1"/>
+          <p:cNvSpPr>
+            <a:spLocks noGrp="1"/>
+          </p:cNvSpPr>
+          <p:nvPr>
+            <p:ph type="title"/>
+          </p:nvPr>
+        </p:nvSpPr>
+        <p:spPr/>
+        <p:txBody>
+          <a:bodyPr/>
+          <a:lstStyle/>
+          <a:p>
+            <a:r>
+              <a:rPr lang="en-US" dirty="0" smtClean="0"/>
+              <a:t>Conclusions</a:t>
+            </a:r>
+            <a:endParaRPr lang="nl-BE" dirty="0"/>
+          </a:p>
+        </p:txBody>
+      </p:sp>
+      <p:sp>
+        <p:nvSpPr>
+          <p:cNvPr id="3" name="Text Placeholder 2"/>
+          <p:cNvSpPr>
+            <a:spLocks noGrp="1"/>
+          </p:cNvSpPr>
+          <p:nvPr>
+            <p:ph type="body" idx="1"/>
+          </p:nvPr>
+        </p:nvSpPr>
+        <p:spPr/>
+        <p:txBody>
+          <a:bodyPr/>
+          <a:lstStyle/>
+          <a:p>
+            <a:endParaRPr lang="nl-BE"/>
+          </a:p>
+        </p:txBody>
+      </p:sp>
+    </p:spTree>
+    <p:extLst>
+      <p:ext uri="{BB962C8B-B14F-4D97-AF65-F5344CB8AC3E}">
+        <p14:creationId xmlns:p14="http://schemas.microsoft.com/office/powerpoint/2010/main" val="2763237186"/>
+      </p:ext>
+    </p:extLst>
+  </p:cSld>
+  <p:clrMapOvr>
+    <a:masterClrMapping/>
+  </p:clrMapOvr>
+  <p:timing>
+    <p:tnLst>
+      <p:par>
+        <p:cTn id="1" dur="indefinite" restart="never" nodeType="tmRoot"/>
+      </p:par>
+    </p:tnLst>
   </p:timing>
 </p:sld>
 </file>
@@ -31392,6 +31481,412 @@
                                           <p:spTgt spid="3">
                                             <p:txEl>
                                               <p:pRg st="7" end="7"/>
+                                            </p:txEl>
+                                          </p:spTgt>
+                                        </p:tgtEl>
+                                        <p:attrNameLst>
+                                          <p:attrName>style.visibility</p:attrName>
+                                        </p:attrNameLst>
+                                      </p:cBhvr>
+                                      <p:to>
+                                        <p:strVal val="visible"/>
+                                      </p:to>
+                                    </p:set>
+                                  </p:childTnLst>
+                                </p:cTn>
+                              </p:par>
+                            </p:childTnLst>
+                          </p:cTn>
+                        </p:par>
+                      </p:childTnLst>
+                    </p:cTn>
+                  </p:par>
+                </p:childTnLst>
+              </p:cTn>
+              <p:prevCondLst>
+                <p:cond evt="onPrev" delay="0">
+                  <p:tgtEl>
+                    <p:sldTgt/>
+                  </p:tgtEl>
+                </p:cond>
+              </p:prevCondLst>
+              <p:nextCondLst>
+                <p:cond evt="onNext" delay="0">
+                  <p:tgtEl>
+                    <p:sldTgt/>
+                  </p:tgtEl>
+                </p:cond>
+              </p:nextCondLst>
+            </p:seq>
+          </p:childTnLst>
+        </p:cTn>
+      </p:par>
+    </p:tnLst>
+    <p:bldLst>
+      <p:bldP spid="3" grpId="0" uiExpand="1" build="p"/>
+    </p:bldLst>
+  </p:timing>
+</p:sld>
+</file>
+
+<file path=ppt/slides/slide50.xml><?xml version="1.0" encoding="utf-8"?>
+<p:sld xmlns:a="http://schemas.openxmlformats.org/drawingml/2006/main" xmlns:r="http://schemas.openxmlformats.org/officeDocument/2006/relationships" xmlns:p="http://schemas.openxmlformats.org/presentationml/2006/main">
+  <p:cSld>
+    <p:spTree>
+      <p:nvGrpSpPr>
+        <p:cNvPr id="1" name=""/>
+        <p:cNvGrpSpPr/>
+        <p:nvPr/>
+      </p:nvGrpSpPr>
+      <p:grpSpPr>
+        <a:xfrm>
+          <a:off x="0" y="0"/>
+          <a:ext cx="0" cy="0"/>
+          <a:chOff x="0" y="0"/>
+          <a:chExt cx="0" cy="0"/>
+        </a:xfrm>
+      </p:grpSpPr>
+      <p:sp>
+        <p:nvSpPr>
+          <p:cNvPr id="2" name="Title 1"/>
+          <p:cNvSpPr>
+            <a:spLocks noGrp="1"/>
+          </p:cNvSpPr>
+          <p:nvPr>
+            <p:ph type="title"/>
+          </p:nvPr>
+        </p:nvSpPr>
+        <p:spPr/>
+        <p:txBody>
+          <a:bodyPr/>
+          <a:lstStyle/>
+          <a:p>
+            <a:r>
+              <a:rPr lang="en-US" dirty="0" smtClean="0"/>
+              <a:t>Conclusions</a:t>
+            </a:r>
+            <a:endParaRPr lang="nl-BE" dirty="0"/>
+          </a:p>
+        </p:txBody>
+      </p:sp>
+      <p:sp>
+        <p:nvSpPr>
+          <p:cNvPr id="3" name="Content Placeholder 2"/>
+          <p:cNvSpPr>
+            <a:spLocks noGrp="1"/>
+          </p:cNvSpPr>
+          <p:nvPr>
+            <p:ph idx="1"/>
+          </p:nvPr>
+        </p:nvSpPr>
+        <p:spPr/>
+        <p:txBody>
+          <a:bodyPr/>
+          <a:lstStyle/>
+          <a:p>
+            <a:r>
+              <a:rPr lang="en-US" dirty="0" smtClean="0"/>
+              <a:t>Contributes to the scientific method</a:t>
+            </a:r>
+          </a:p>
+          <a:p>
+            <a:pPr lvl="1"/>
+            <a:r>
+              <a:rPr lang="en-US" dirty="0" smtClean="0"/>
+              <a:t>Helps ensure reproducibility</a:t>
+            </a:r>
+          </a:p>
+          <a:p>
+            <a:r>
+              <a:rPr lang="en-US" dirty="0" smtClean="0"/>
+              <a:t>Record of change</a:t>
+            </a:r>
+          </a:p>
+          <a:p>
+            <a:pPr lvl="1"/>
+            <a:r>
+              <a:rPr lang="en-US" dirty="0" smtClean="0"/>
+              <a:t>What was changed?</a:t>
+            </a:r>
+          </a:p>
+          <a:p>
+            <a:pPr lvl="1"/>
+            <a:r>
+              <a:rPr lang="en-US" dirty="0" smtClean="0"/>
+              <a:t>When was it changed?</a:t>
+            </a:r>
+          </a:p>
+          <a:p>
+            <a:pPr lvl="1"/>
+            <a:r>
+              <a:rPr lang="en-US" dirty="0" smtClean="0"/>
+              <a:t>Who changed it?</a:t>
+            </a:r>
+          </a:p>
+          <a:p>
+            <a:pPr lvl="1"/>
+            <a:r>
+              <a:rPr lang="en-US" dirty="0" smtClean="0"/>
+              <a:t>Why was it changed?</a:t>
+            </a:r>
+            <a:endParaRPr lang="nl-BE" dirty="0"/>
+          </a:p>
+        </p:txBody>
+      </p:sp>
+    </p:spTree>
+    <p:extLst>
+      <p:ext uri="{BB962C8B-B14F-4D97-AF65-F5344CB8AC3E}">
+        <p14:creationId xmlns:p14="http://schemas.microsoft.com/office/powerpoint/2010/main" val="2241158897"/>
+      </p:ext>
+    </p:extLst>
+  </p:cSld>
+  <p:clrMapOvr>
+    <a:masterClrMapping/>
+  </p:clrMapOvr>
+  <p:timing>
+    <p:tnLst>
+      <p:par>
+        <p:cTn id="1" dur="indefinite" restart="never" nodeType="tmRoot">
+          <p:childTnLst>
+            <p:seq concurrent="1" nextAc="seek">
+              <p:cTn id="2" dur="indefinite" nodeType="mainSeq">
+                <p:childTnLst>
+                  <p:par>
+                    <p:cTn id="3" fill="hold">
+                      <p:stCondLst>
+                        <p:cond delay="indefinite"/>
+                        <p:cond evt="onBegin" delay="0">
+                          <p:tn val="2"/>
+                        </p:cond>
+                      </p:stCondLst>
+                      <p:childTnLst>
+                        <p:par>
+                          <p:cTn id="4" fill="hold">
+                            <p:stCondLst>
+                              <p:cond delay="0"/>
+                            </p:stCondLst>
+                            <p:childTnLst>
+                              <p:par>
+                                <p:cTn id="5" presetID="1" presetClass="entr" presetSubtype="0" fill="hold" grpId="0" nodeType="withEffect">
+                                  <p:stCondLst>
+                                    <p:cond delay="0"/>
+                                  </p:stCondLst>
+                                  <p:childTnLst>
+                                    <p:set>
+                                      <p:cBhvr>
+                                        <p:cTn id="6" dur="1" fill="hold">
+                                          <p:stCondLst>
+                                            <p:cond delay="0"/>
+                                          </p:stCondLst>
+                                        </p:cTn>
+                                        <p:tgtEl>
+                                          <p:spTgt spid="3">
+                                            <p:txEl>
+                                              <p:pRg st="0" end="0"/>
+                                            </p:txEl>
+                                          </p:spTgt>
+                                        </p:tgtEl>
+                                        <p:attrNameLst>
+                                          <p:attrName>style.visibility</p:attrName>
+                                        </p:attrNameLst>
+                                      </p:cBhvr>
+                                      <p:to>
+                                        <p:strVal val="visible"/>
+                                      </p:to>
+                                    </p:set>
+                                  </p:childTnLst>
+                                </p:cTn>
+                              </p:par>
+                              <p:par>
+                                <p:cTn id="7" presetID="1" presetClass="entr" presetSubtype="0" fill="hold" grpId="0" nodeType="withEffect">
+                                  <p:stCondLst>
+                                    <p:cond delay="0"/>
+                                  </p:stCondLst>
+                                  <p:childTnLst>
+                                    <p:set>
+                                      <p:cBhvr>
+                                        <p:cTn id="8" dur="1" fill="hold">
+                                          <p:stCondLst>
+                                            <p:cond delay="0"/>
+                                          </p:stCondLst>
+                                        </p:cTn>
+                                        <p:tgtEl>
+                                          <p:spTgt spid="3">
+                                            <p:txEl>
+                                              <p:pRg st="1" end="1"/>
+                                            </p:txEl>
+                                          </p:spTgt>
+                                        </p:tgtEl>
+                                        <p:attrNameLst>
+                                          <p:attrName>style.visibility</p:attrName>
+                                        </p:attrNameLst>
+                                      </p:cBhvr>
+                                      <p:to>
+                                        <p:strVal val="visible"/>
+                                      </p:to>
+                                    </p:set>
+                                  </p:childTnLst>
+                                </p:cTn>
+                              </p:par>
+                            </p:childTnLst>
+                          </p:cTn>
+                        </p:par>
+                      </p:childTnLst>
+                    </p:cTn>
+                  </p:par>
+                  <p:par>
+                    <p:cTn id="9" fill="hold">
+                      <p:stCondLst>
+                        <p:cond delay="indefinite"/>
+                      </p:stCondLst>
+                      <p:childTnLst>
+                        <p:par>
+                          <p:cTn id="10" fill="hold">
+                            <p:stCondLst>
+                              <p:cond delay="0"/>
+                            </p:stCondLst>
+                            <p:childTnLst>
+                              <p:par>
+                                <p:cTn id="11" presetID="1" presetClass="entr" presetSubtype="0" fill="hold" grpId="0" nodeType="clickEffect">
+                                  <p:stCondLst>
+                                    <p:cond delay="0"/>
+                                  </p:stCondLst>
+                                  <p:childTnLst>
+                                    <p:set>
+                                      <p:cBhvr>
+                                        <p:cTn id="12" dur="1" fill="hold">
+                                          <p:stCondLst>
+                                            <p:cond delay="0"/>
+                                          </p:stCondLst>
+                                        </p:cTn>
+                                        <p:tgtEl>
+                                          <p:spTgt spid="3">
+                                            <p:txEl>
+                                              <p:pRg st="2" end="2"/>
+                                            </p:txEl>
+                                          </p:spTgt>
+                                        </p:tgtEl>
+                                        <p:attrNameLst>
+                                          <p:attrName>style.visibility</p:attrName>
+                                        </p:attrNameLst>
+                                      </p:cBhvr>
+                                      <p:to>
+                                        <p:strVal val="visible"/>
+                                      </p:to>
+                                    </p:set>
+                                  </p:childTnLst>
+                                </p:cTn>
+                              </p:par>
+                              <p:par>
+                                <p:cTn id="13" presetID="1" presetClass="entr" presetSubtype="0" fill="hold" grpId="0" nodeType="withEffect">
+                                  <p:stCondLst>
+                                    <p:cond delay="0"/>
+                                  </p:stCondLst>
+                                  <p:childTnLst>
+                                    <p:set>
+                                      <p:cBhvr>
+                                        <p:cTn id="14" dur="1" fill="hold">
+                                          <p:stCondLst>
+                                            <p:cond delay="0"/>
+                                          </p:stCondLst>
+                                        </p:cTn>
+                                        <p:tgtEl>
+                                          <p:spTgt spid="3">
+                                            <p:txEl>
+                                              <p:pRg st="3" end="3"/>
+                                            </p:txEl>
+                                          </p:spTgt>
+                                        </p:tgtEl>
+                                        <p:attrNameLst>
+                                          <p:attrName>style.visibility</p:attrName>
+                                        </p:attrNameLst>
+                                      </p:cBhvr>
+                                      <p:to>
+                                        <p:strVal val="visible"/>
+                                      </p:to>
+                                    </p:set>
+                                  </p:childTnLst>
+                                </p:cTn>
+                              </p:par>
+                              <p:par>
+                                <p:cTn id="15" presetID="1" presetClass="entr" presetSubtype="0" fill="hold" grpId="0" nodeType="withEffect">
+                                  <p:stCondLst>
+                                    <p:cond delay="0"/>
+                                  </p:stCondLst>
+                                  <p:childTnLst>
+                                    <p:set>
+                                      <p:cBhvr>
+                                        <p:cTn id="16" dur="1" fill="hold">
+                                          <p:stCondLst>
+                                            <p:cond delay="0"/>
+                                          </p:stCondLst>
+                                        </p:cTn>
+                                        <p:tgtEl>
+                                          <p:spTgt spid="3">
+                                            <p:txEl>
+                                              <p:pRg st="4" end="4"/>
+                                            </p:txEl>
+                                          </p:spTgt>
+                                        </p:tgtEl>
+                                        <p:attrNameLst>
+                                          <p:attrName>style.visibility</p:attrName>
+                                        </p:attrNameLst>
+                                      </p:cBhvr>
+                                      <p:to>
+                                        <p:strVal val="visible"/>
+                                      </p:to>
+                                    </p:set>
+                                  </p:childTnLst>
+                                </p:cTn>
+                              </p:par>
+                              <p:par>
+                                <p:cTn id="17" presetID="1" presetClass="entr" presetSubtype="0" fill="hold" grpId="0" nodeType="withEffect">
+                                  <p:stCondLst>
+                                    <p:cond delay="0"/>
+                                  </p:stCondLst>
+                                  <p:childTnLst>
+                                    <p:set>
+                                      <p:cBhvr>
+                                        <p:cTn id="18" dur="1" fill="hold">
+                                          <p:stCondLst>
+                                            <p:cond delay="0"/>
+                                          </p:stCondLst>
+                                        </p:cTn>
+                                        <p:tgtEl>
+                                          <p:spTgt spid="3">
+                                            <p:txEl>
+                                              <p:pRg st="5" end="5"/>
+                                            </p:txEl>
+                                          </p:spTgt>
+                                        </p:tgtEl>
+                                        <p:attrNameLst>
+                                          <p:attrName>style.visibility</p:attrName>
+                                        </p:attrNameLst>
+                                      </p:cBhvr>
+                                      <p:to>
+                                        <p:strVal val="visible"/>
+                                      </p:to>
+                                    </p:set>
+                                  </p:childTnLst>
+                                </p:cTn>
+                              </p:par>
+                              <p:par>
+                                <p:cTn id="19" presetID="1" presetClass="entr" presetSubtype="0" fill="hold" grpId="0" nodeType="withEffect">
+                                  <p:stCondLst>
+                                    <p:cond delay="0"/>
+                                  </p:stCondLst>
+                                  <p:childTnLst>
+                                    <p:set>
+                                      <p:cBhvr>
+                                        <p:cTn id="20" dur="1" fill="hold">
+                                          <p:stCondLst>
+                                            <p:cond delay="0"/>
+                                          </p:stCondLst>
+                                        </p:cTn>
+                                        <p:tgtEl>
+                                          <p:spTgt spid="3">
+                                            <p:txEl>
+                                              <p:pRg st="6" end="6"/>
                                             </p:txEl>
                                           </p:spTgt>
                                         </p:tgtEl>

</xml_diff>

<commit_message>
Added slide on use of git show; fixed a few typos
</commit_message>
<xml_diff>
--- a/LinuxTools/VersionControl/version_control_git.pptx
+++ b/LinuxTools/VersionControl/version_control_git.pptx
@@ -33,28 +33,29 @@
     <p:sldId id="279" r:id="rId27"/>
     <p:sldId id="303" r:id="rId28"/>
     <p:sldId id="281" r:id="rId29"/>
-    <p:sldId id="282" r:id="rId30"/>
-    <p:sldId id="296" r:id="rId31"/>
-    <p:sldId id="283" r:id="rId32"/>
-    <p:sldId id="295" r:id="rId33"/>
-    <p:sldId id="285" r:id="rId34"/>
-    <p:sldId id="284" r:id="rId35"/>
-    <p:sldId id="286" r:id="rId36"/>
-    <p:sldId id="287" r:id="rId37"/>
-    <p:sldId id="288" r:id="rId38"/>
-    <p:sldId id="289" r:id="rId39"/>
-    <p:sldId id="290" r:id="rId40"/>
-    <p:sldId id="291" r:id="rId41"/>
-    <p:sldId id="292" r:id="rId42"/>
-    <p:sldId id="294" r:id="rId43"/>
-    <p:sldId id="297" r:id="rId44"/>
-    <p:sldId id="304" r:id="rId45"/>
-    <p:sldId id="305" r:id="rId46"/>
-    <p:sldId id="307" r:id="rId47"/>
-    <p:sldId id="298" r:id="rId48"/>
-    <p:sldId id="299" r:id="rId49"/>
-    <p:sldId id="300" r:id="rId50"/>
-    <p:sldId id="301" r:id="rId51"/>
+    <p:sldId id="308" r:id="rId30"/>
+    <p:sldId id="282" r:id="rId31"/>
+    <p:sldId id="296" r:id="rId32"/>
+    <p:sldId id="283" r:id="rId33"/>
+    <p:sldId id="295" r:id="rId34"/>
+    <p:sldId id="285" r:id="rId35"/>
+    <p:sldId id="284" r:id="rId36"/>
+    <p:sldId id="286" r:id="rId37"/>
+    <p:sldId id="287" r:id="rId38"/>
+    <p:sldId id="288" r:id="rId39"/>
+    <p:sldId id="289" r:id="rId40"/>
+    <p:sldId id="290" r:id="rId41"/>
+    <p:sldId id="291" r:id="rId42"/>
+    <p:sldId id="292" r:id="rId43"/>
+    <p:sldId id="294" r:id="rId44"/>
+    <p:sldId id="297" r:id="rId45"/>
+    <p:sldId id="304" r:id="rId46"/>
+    <p:sldId id="305" r:id="rId47"/>
+    <p:sldId id="307" r:id="rId48"/>
+    <p:sldId id="298" r:id="rId49"/>
+    <p:sldId id="299" r:id="rId50"/>
+    <p:sldId id="300" r:id="rId51"/>
+    <p:sldId id="301" r:id="rId52"/>
   </p:sldIdLst>
   <p:sldSz cx="9144000" cy="6858000" type="screen4x3"/>
   <p:notesSz cx="6858000" cy="9144000"/>
@@ -352,7 +353,7 @@
           <a:p>
             <a:fld id="{31155545-FFF6-4666-BE18-08518292A6F3}" type="datetimeFigureOut">
               <a:rPr lang="nl-BE" smtClean="0"/>
-              <a:t>6/12/2015</a:t>
+              <a:t>7/12/2015</a:t>
             </a:fld>
             <a:endParaRPr lang="nl-BE"/>
           </a:p>
@@ -522,7 +523,7 @@
           <a:p>
             <a:fld id="{31155545-FFF6-4666-BE18-08518292A6F3}" type="datetimeFigureOut">
               <a:rPr lang="nl-BE" smtClean="0"/>
-              <a:t>6/12/2015</a:t>
+              <a:t>7/12/2015</a:t>
             </a:fld>
             <a:endParaRPr lang="nl-BE"/>
           </a:p>
@@ -702,7 +703,7 @@
           <a:p>
             <a:fld id="{31155545-FFF6-4666-BE18-08518292A6F3}" type="datetimeFigureOut">
               <a:rPr lang="nl-BE" smtClean="0"/>
-              <a:t>6/12/2015</a:t>
+              <a:t>7/12/2015</a:t>
             </a:fld>
             <a:endParaRPr lang="nl-BE"/>
           </a:p>
@@ -872,7 +873,7 @@
           <a:p>
             <a:fld id="{31155545-FFF6-4666-BE18-08518292A6F3}" type="datetimeFigureOut">
               <a:rPr lang="nl-BE" smtClean="0"/>
-              <a:t>6/12/2015</a:t>
+              <a:t>7/12/2015</a:t>
             </a:fld>
             <a:endParaRPr lang="nl-BE"/>
           </a:p>
@@ -1118,7 +1119,7 @@
           <a:p>
             <a:fld id="{31155545-FFF6-4666-BE18-08518292A6F3}" type="datetimeFigureOut">
               <a:rPr lang="nl-BE" smtClean="0"/>
-              <a:t>6/12/2015</a:t>
+              <a:t>7/12/2015</a:t>
             </a:fld>
             <a:endParaRPr lang="nl-BE"/>
           </a:p>
@@ -1406,7 +1407,7 @@
           <a:p>
             <a:fld id="{31155545-FFF6-4666-BE18-08518292A6F3}" type="datetimeFigureOut">
               <a:rPr lang="nl-BE" smtClean="0"/>
-              <a:t>6/12/2015</a:t>
+              <a:t>7/12/2015</a:t>
             </a:fld>
             <a:endParaRPr lang="nl-BE"/>
           </a:p>
@@ -1828,7 +1829,7 @@
           <a:p>
             <a:fld id="{31155545-FFF6-4666-BE18-08518292A6F3}" type="datetimeFigureOut">
               <a:rPr lang="nl-BE" smtClean="0"/>
-              <a:t>6/12/2015</a:t>
+              <a:t>7/12/2015</a:t>
             </a:fld>
             <a:endParaRPr lang="nl-BE"/>
           </a:p>
@@ -1946,7 +1947,7 @@
           <a:p>
             <a:fld id="{31155545-FFF6-4666-BE18-08518292A6F3}" type="datetimeFigureOut">
               <a:rPr lang="nl-BE" smtClean="0"/>
-              <a:t>6/12/2015</a:t>
+              <a:t>7/12/2015</a:t>
             </a:fld>
             <a:endParaRPr lang="nl-BE"/>
           </a:p>
@@ -2041,7 +2042,7 @@
           <a:p>
             <a:fld id="{31155545-FFF6-4666-BE18-08518292A6F3}" type="datetimeFigureOut">
               <a:rPr lang="nl-BE" smtClean="0"/>
-              <a:t>6/12/2015</a:t>
+              <a:t>7/12/2015</a:t>
             </a:fld>
             <a:endParaRPr lang="nl-BE"/>
           </a:p>
@@ -2318,7 +2319,7 @@
           <a:p>
             <a:fld id="{31155545-FFF6-4666-BE18-08518292A6F3}" type="datetimeFigureOut">
               <a:rPr lang="nl-BE" smtClean="0"/>
-              <a:t>6/12/2015</a:t>
+              <a:t>7/12/2015</a:t>
             </a:fld>
             <a:endParaRPr lang="nl-BE"/>
           </a:p>
@@ -2571,7 +2572,7 @@
           <a:p>
             <a:fld id="{31155545-FFF6-4666-BE18-08518292A6F3}" type="datetimeFigureOut">
               <a:rPr lang="nl-BE" smtClean="0"/>
-              <a:t>6/12/2015</a:t>
+              <a:t>7/12/2015</a:t>
             </a:fld>
             <a:endParaRPr lang="nl-BE"/>
           </a:p>
@@ -2784,7 +2785,7 @@
           <a:p>
             <a:fld id="{31155545-FFF6-4666-BE18-08518292A6F3}" type="datetimeFigureOut">
               <a:rPr lang="nl-BE" smtClean="0"/>
-              <a:t>6/12/2015</a:t>
+              <a:t>7/12/2015</a:t>
             </a:fld>
             <a:endParaRPr lang="nl-BE"/>
           </a:p>
@@ -8789,7 +8790,7 @@
         <p:spPr/>
         <p:txBody>
           <a:bodyPr>
-            <a:normAutofit fontScale="92500" lnSpcReduction="20000"/>
+            <a:normAutofit fontScale="92500" lnSpcReduction="10000"/>
           </a:bodyPr>
           <a:lstStyle/>
           <a:p>
@@ -8802,7 +8803,15 @@
             <a:pPr lvl="1"/>
             <a:r>
               <a:rPr lang="en-US" dirty="0" smtClean="0"/>
-              <a:t>Shows revision numbers and messages associated with </a:t>
+              <a:t>Shows revision </a:t>
+            </a:r>
+            <a:r>
+              <a:rPr lang="en-US" dirty="0" smtClean="0"/>
+              <a:t>IDs and </a:t>
+            </a:r>
+            <a:r>
+              <a:rPr lang="en-US" dirty="0" smtClean="0"/>
+              <a:t>messages associated with </a:t>
             </a:r>
             <a:r>
               <a:rPr lang="en-US" dirty="0" err="1" smtClean="0"/>
@@ -8831,7 +8840,15 @@
             <a:pPr lvl="1"/>
             <a:r>
               <a:rPr lang="en-US" dirty="0"/>
-              <a:t>Compares file to latest repository version</a:t>
+              <a:t>Compares file to latest </a:t>
+            </a:r>
+            <a:r>
+              <a:rPr lang="en-US" dirty="0" smtClean="0"/>
+              <a:t>repo </a:t>
+            </a:r>
+            <a:r>
+              <a:rPr lang="en-US" dirty="0"/>
+              <a:t>version</a:t>
             </a:r>
           </a:p>
           <a:p>
@@ -8842,8 +8859,36 @@
             <a:pPr lvl="1"/>
             <a:r>
               <a:rPr lang="en-US" dirty="0"/>
-              <a:t>Compares revision 29 in repository to working copy</a:t>
-            </a:r>
+              <a:t>Compares revision </a:t>
+            </a:r>
+            <a:r>
+              <a:rPr lang="en-US" dirty="0" smtClean="0">
+                <a:latin typeface="Courier New" panose="02070309020205020404" pitchFamily="49" charset="0"/>
+                <a:cs typeface="Courier New" panose="02070309020205020404" pitchFamily="49" charset="0"/>
+              </a:rPr>
+              <a:t>2ad89a3</a:t>
+            </a:r>
+            <a:r>
+              <a:rPr lang="en-US" dirty="0" smtClean="0"/>
+              <a:t> </a:t>
+            </a:r>
+            <a:r>
+              <a:rPr lang="en-US" dirty="0"/>
+              <a:t>in </a:t>
+            </a:r>
+            <a:r>
+              <a:rPr lang="en-US" dirty="0" smtClean="0"/>
+              <a:t>repo </a:t>
+            </a:r>
+            <a:r>
+              <a:rPr lang="en-US" dirty="0"/>
+              <a:t>to </a:t>
+            </a:r>
+            <a:r>
+              <a:rPr lang="en-US" dirty="0" smtClean="0"/>
+              <a:t>current file</a:t>
+            </a:r>
+            <a:endParaRPr lang="en-US" dirty="0"/>
           </a:p>
           <a:p>
             <a:pPr lvl="1"/>
@@ -8931,7 +8976,7 @@
         </p:nvSpPr>
         <p:spPr>
           <a:xfrm>
-            <a:off x="1160628" y="2729702"/>
+            <a:off x="1160628" y="2564904"/>
             <a:ext cx="2390398" cy="369332"/>
           </a:xfrm>
           <a:prstGeom prst="rect">
@@ -8980,7 +9025,7 @@
         <p:spPr>
           <a:xfrm>
             <a:off x="1160628" y="5208418"/>
-            <a:ext cx="4320413" cy="369332"/>
+            <a:ext cx="3768980" cy="369332"/>
           </a:xfrm>
           <a:prstGeom prst="rect">
             <a:avLst/>
@@ -9020,11 +9065,11 @@
               <a:t>  </a:t>
             </a:r>
             <a:r>
-              <a:rPr lang="nl-BE" dirty="0">
+              <a:rPr lang="nl-BE" dirty="0" smtClean="0">
                 <a:latin typeface="Courier New" pitchFamily="49" charset="0"/>
                 <a:cs typeface="Courier New" pitchFamily="49" charset="0"/>
               </a:rPr>
-              <a:t>2ad89a3f34c  </a:t>
+              <a:t>2ad89a3  </a:t>
             </a:r>
             <a:r>
               <a:rPr lang="nl-BE" dirty="0" err="1" smtClean="0">
@@ -9048,7 +9093,7 @@
         </p:nvSpPr>
         <p:spPr>
           <a:xfrm>
-            <a:off x="1187624" y="6021288"/>
+            <a:off x="1187624" y="6135687"/>
             <a:ext cx="6967164" cy="461665"/>
           </a:xfrm>
           <a:prstGeom prst="rect">
@@ -9083,10 +9128,10 @@
         </p:nvGrpSpPr>
         <p:grpSpPr>
           <a:xfrm>
-            <a:off x="2825386" y="2636912"/>
-            <a:ext cx="5851070" cy="2910122"/>
-            <a:chOff x="2825386" y="2636912"/>
-            <a:chExt cx="5851070" cy="2910122"/>
+            <a:off x="2804120" y="2636912"/>
+            <a:ext cx="5872336" cy="2910122"/>
+            <a:chOff x="2804120" y="2636912"/>
+            <a:chExt cx="5872336" cy="2910122"/>
           </a:xfrm>
         </p:grpSpPr>
         <p:sp>
@@ -9097,8 +9142,8 @@
           </p:nvSpPr>
           <p:spPr>
             <a:xfrm>
-              <a:off x="2825386" y="5239134"/>
-              <a:ext cx="1633042" cy="307900"/>
+              <a:off x="2804120" y="5239134"/>
+              <a:ext cx="1170550" cy="307900"/>
             </a:xfrm>
             <a:prstGeom prst="rect">
               <a:avLst/>
@@ -9145,8 +9190,8 @@
           </p:nvCxnSpPr>
           <p:spPr>
             <a:xfrm flipH="1">
-              <a:off x="3641907" y="3160132"/>
-              <a:ext cx="3145154" cy="2079002"/>
+              <a:off x="3389395" y="3160132"/>
+              <a:ext cx="3397666" cy="2079002"/>
             </a:xfrm>
             <a:prstGeom prst="straightConnector1">
               <a:avLst/>
@@ -9223,9 +9268,9 @@
             <p:nvPr/>
           </p:nvCxnSpPr>
           <p:spPr>
-            <a:xfrm flipV="1">
-              <a:off x="3551026" y="2898522"/>
-              <a:ext cx="1346639" cy="15846"/>
+            <a:xfrm>
+              <a:off x="3551026" y="2749570"/>
+              <a:ext cx="1346639" cy="148952"/>
             </a:xfrm>
             <a:prstGeom prst="straightConnector1">
               <a:avLst/>
@@ -14834,7 +14879,21 @@
                 <a:latin typeface="Courier New" pitchFamily="49" charset="0"/>
                 <a:cs typeface="Courier New" pitchFamily="49" charset="0"/>
               </a:rPr>
-              <a:t>$ get reset  --hard  HEAD^</a:t>
+              <a:t>$ </a:t>
+            </a:r>
+            <a:r>
+              <a:rPr lang="nl-BE" dirty="0" smtClean="0">
+                <a:latin typeface="Courier New" pitchFamily="49" charset="0"/>
+                <a:cs typeface="Courier New" pitchFamily="49" charset="0"/>
+              </a:rPr>
+              <a:t>git </a:t>
+            </a:r>
+            <a:r>
+              <a:rPr lang="nl-BE" dirty="0" smtClean="0">
+                <a:latin typeface="Courier New" pitchFamily="49" charset="0"/>
+                <a:cs typeface="Courier New" pitchFamily="49" charset="0"/>
+              </a:rPr>
+              <a:t>reset  --hard  HEAD^</a:t>
             </a:r>
           </a:p>
         </p:txBody>
@@ -14871,7 +14930,14 @@
                 <a:latin typeface="Courier New" pitchFamily="49" charset="0"/>
                 <a:cs typeface="Courier New" pitchFamily="49" charset="0"/>
               </a:rPr>
-              <a:t>$ get </a:t>
+              <a:t>$ </a:t>
+            </a:r>
+            <a:r>
+              <a:rPr lang="nl-BE" dirty="0" smtClean="0">
+                <a:latin typeface="Courier New" pitchFamily="49" charset="0"/>
+                <a:cs typeface="Courier New" pitchFamily="49" charset="0"/>
+              </a:rPr>
+              <a:t>git </a:t>
             </a:r>
             <a:r>
               <a:rPr lang="nl-BE" dirty="0" err="1" smtClean="0">
@@ -15950,6 +16016,810 @@
           <a:p>
             <a:r>
               <a:rPr lang="en-US" dirty="0" smtClean="0"/>
+              <a:t>Let's peek</a:t>
+            </a:r>
+            <a:endParaRPr lang="nl-BE" dirty="0"/>
+          </a:p>
+        </p:txBody>
+      </p:sp>
+      <p:sp>
+        <p:nvSpPr>
+          <p:cNvPr id="3" name="Content Placeholder 2"/>
+          <p:cNvSpPr>
+            <a:spLocks noGrp="1"/>
+          </p:cNvSpPr>
+          <p:nvPr>
+            <p:ph idx="1"/>
+          </p:nvPr>
+        </p:nvSpPr>
+        <p:spPr/>
+        <p:txBody>
+          <a:bodyPr/>
+          <a:lstStyle/>
+          <a:p>
+            <a:r>
+              <a:rPr lang="en-US" dirty="0" smtClean="0"/>
+              <a:t>Show previous revision of file</a:t>
+            </a:r>
+          </a:p>
+          <a:p>
+            <a:endParaRPr lang="en-US" dirty="0"/>
+          </a:p>
+          <a:p>
+            <a:r>
+              <a:rPr lang="en-US" dirty="0" smtClean="0"/>
+              <a:t>Show file at certain date</a:t>
+            </a:r>
+          </a:p>
+          <a:p>
+            <a:endParaRPr lang="en-US" dirty="0"/>
+          </a:p>
+          <a:p>
+            <a:r>
+              <a:rPr lang="en-US" dirty="0" smtClean="0"/>
+              <a:t>Show what happened during a commit</a:t>
+            </a:r>
+          </a:p>
+          <a:p>
+            <a:pPr lvl="1"/>
+            <a:r>
+              <a:rPr lang="en-US" dirty="0"/>
+              <a:t>L</a:t>
+            </a:r>
+            <a:r>
+              <a:rPr lang="en-US" dirty="0" smtClean="0"/>
+              <a:t>ast commit</a:t>
+            </a:r>
+          </a:p>
+          <a:p>
+            <a:pPr lvl="1"/>
+            <a:endParaRPr lang="en-US" dirty="0"/>
+          </a:p>
+          <a:p>
+            <a:pPr lvl="1"/>
+            <a:r>
+              <a:rPr lang="en-US" dirty="0" smtClean="0"/>
+              <a:t>Some commit</a:t>
+            </a:r>
+            <a:endParaRPr lang="nl-BE" dirty="0"/>
+          </a:p>
+        </p:txBody>
+      </p:sp>
+      <p:sp>
+        <p:nvSpPr>
+          <p:cNvPr id="4" name="TextBox 3"/>
+          <p:cNvSpPr txBox="1"/>
+          <p:nvPr/>
+        </p:nvSpPr>
+        <p:spPr>
+          <a:xfrm>
+            <a:off x="1259632" y="2204864"/>
+            <a:ext cx="5040560" cy="369332"/>
+          </a:xfrm>
+          <a:prstGeom prst="rect">
+            <a:avLst/>
+          </a:prstGeom>
+          <a:noFill/>
+          <a:ln>
+            <a:solidFill>
+              <a:schemeClr val="tx1"/>
+            </a:solidFill>
+          </a:ln>
+        </p:spPr>
+        <p:txBody>
+          <a:bodyPr wrap="square" rtlCol="0">
+            <a:spAutoFit/>
+          </a:bodyPr>
+          <a:lstStyle/>
+          <a:p>
+            <a:r>
+              <a:rPr lang="nl-BE" dirty="0" smtClean="0">
+                <a:latin typeface="Courier New" pitchFamily="49" charset="0"/>
+                <a:cs typeface="Courier New" pitchFamily="49" charset="0"/>
+              </a:rPr>
+              <a:t>$ </a:t>
+            </a:r>
+            <a:r>
+              <a:rPr lang="nl-BE" dirty="0" smtClean="0">
+                <a:latin typeface="Courier New" pitchFamily="49" charset="0"/>
+                <a:cs typeface="Courier New" pitchFamily="49" charset="0"/>
+              </a:rPr>
+              <a:t>git </a:t>
+            </a:r>
+            <a:r>
+              <a:rPr lang="nl-BE" dirty="0">
+                <a:latin typeface="Courier New" pitchFamily="49" charset="0"/>
+                <a:cs typeface="Courier New" pitchFamily="49" charset="0"/>
+              </a:rPr>
+              <a:t>show  </a:t>
+            </a:r>
+            <a:r>
+              <a:rPr lang="nl-BE" dirty="0" smtClean="0">
+                <a:latin typeface="Courier New" pitchFamily="49" charset="0"/>
+                <a:cs typeface="Courier New" pitchFamily="49" charset="0"/>
+              </a:rPr>
+              <a:t>0ba188919fe:eq.c</a:t>
+            </a:r>
+            <a:endParaRPr lang="nl-BE" dirty="0" smtClean="0">
+              <a:latin typeface="Courier New" pitchFamily="49" charset="0"/>
+              <a:cs typeface="Courier New" pitchFamily="49" charset="0"/>
+            </a:endParaRPr>
+          </a:p>
+        </p:txBody>
+      </p:sp>
+      <p:sp>
+        <p:nvSpPr>
+          <p:cNvPr id="5" name="TextBox 4"/>
+          <p:cNvSpPr txBox="1"/>
+          <p:nvPr/>
+        </p:nvSpPr>
+        <p:spPr>
+          <a:xfrm>
+            <a:off x="1259632" y="3419708"/>
+            <a:ext cx="5040560" cy="369332"/>
+          </a:xfrm>
+          <a:prstGeom prst="rect">
+            <a:avLst/>
+          </a:prstGeom>
+          <a:noFill/>
+          <a:ln>
+            <a:solidFill>
+              <a:schemeClr val="tx1"/>
+            </a:solidFill>
+          </a:ln>
+        </p:spPr>
+        <p:txBody>
+          <a:bodyPr wrap="square" rtlCol="0">
+            <a:spAutoFit/>
+          </a:bodyPr>
+          <a:lstStyle/>
+          <a:p>
+            <a:r>
+              <a:rPr lang="nl-BE" dirty="0" smtClean="0">
+                <a:latin typeface="Courier New" pitchFamily="49" charset="0"/>
+                <a:cs typeface="Courier New" pitchFamily="49" charset="0"/>
+              </a:rPr>
+              <a:t>$ </a:t>
+            </a:r>
+            <a:r>
+              <a:rPr lang="nl-BE" dirty="0" smtClean="0">
+                <a:latin typeface="Courier New" pitchFamily="49" charset="0"/>
+                <a:cs typeface="Courier New" pitchFamily="49" charset="0"/>
+              </a:rPr>
+              <a:t>git </a:t>
+            </a:r>
+            <a:r>
+              <a:rPr lang="nl-BE" dirty="0">
+                <a:latin typeface="Courier New" pitchFamily="49" charset="0"/>
+                <a:cs typeface="Courier New" pitchFamily="49" charset="0"/>
+              </a:rPr>
+              <a:t>show  </a:t>
+            </a:r>
+            <a:r>
+              <a:rPr lang="nl-BE" dirty="0" smtClean="0">
+                <a:latin typeface="Courier New" pitchFamily="49" charset="0"/>
+                <a:cs typeface="Courier New" pitchFamily="49" charset="0"/>
+              </a:rPr>
+              <a:t>HEAD@{2015-09-01}:</a:t>
+            </a:r>
+            <a:r>
+              <a:rPr lang="nl-BE" dirty="0" err="1" smtClean="0">
+                <a:latin typeface="Courier New" pitchFamily="49" charset="0"/>
+                <a:cs typeface="Courier New" pitchFamily="49" charset="0"/>
+              </a:rPr>
+              <a:t>eq.c</a:t>
+            </a:r>
+            <a:endParaRPr lang="nl-BE" dirty="0" smtClean="0">
+              <a:latin typeface="Courier New" pitchFamily="49" charset="0"/>
+              <a:cs typeface="Courier New" pitchFamily="49" charset="0"/>
+            </a:endParaRPr>
+          </a:p>
+        </p:txBody>
+      </p:sp>
+      <p:sp>
+        <p:nvSpPr>
+          <p:cNvPr id="6" name="TextBox 5"/>
+          <p:cNvSpPr txBox="1"/>
+          <p:nvPr/>
+        </p:nvSpPr>
+        <p:spPr>
+          <a:xfrm>
+            <a:off x="1259632" y="5075892"/>
+            <a:ext cx="5040560" cy="369332"/>
+          </a:xfrm>
+          <a:prstGeom prst="rect">
+            <a:avLst/>
+          </a:prstGeom>
+          <a:noFill/>
+          <a:ln>
+            <a:solidFill>
+              <a:schemeClr val="tx1"/>
+            </a:solidFill>
+          </a:ln>
+        </p:spPr>
+        <p:txBody>
+          <a:bodyPr wrap="square" rtlCol="0">
+            <a:spAutoFit/>
+          </a:bodyPr>
+          <a:lstStyle/>
+          <a:p>
+            <a:r>
+              <a:rPr lang="nl-BE" dirty="0" smtClean="0">
+                <a:latin typeface="Courier New" pitchFamily="49" charset="0"/>
+                <a:cs typeface="Courier New" pitchFamily="49" charset="0"/>
+              </a:rPr>
+              <a:t>$ </a:t>
+            </a:r>
+            <a:r>
+              <a:rPr lang="nl-BE" dirty="0" smtClean="0">
+                <a:latin typeface="Courier New" pitchFamily="49" charset="0"/>
+                <a:cs typeface="Courier New" pitchFamily="49" charset="0"/>
+              </a:rPr>
+              <a:t>git </a:t>
+            </a:r>
+            <a:r>
+              <a:rPr lang="nl-BE" dirty="0">
+                <a:latin typeface="Courier New" pitchFamily="49" charset="0"/>
+                <a:cs typeface="Courier New" pitchFamily="49" charset="0"/>
+              </a:rPr>
+              <a:t>show  </a:t>
+            </a:r>
+            <a:r>
+              <a:rPr lang="nl-BE" dirty="0" smtClean="0">
+                <a:latin typeface="Courier New" pitchFamily="49" charset="0"/>
+                <a:cs typeface="Courier New" pitchFamily="49" charset="0"/>
+              </a:rPr>
+              <a:t>HEAD</a:t>
+            </a:r>
+            <a:endParaRPr lang="nl-BE" dirty="0" smtClean="0">
+              <a:latin typeface="Courier New" pitchFamily="49" charset="0"/>
+              <a:cs typeface="Courier New" pitchFamily="49" charset="0"/>
+            </a:endParaRPr>
+          </a:p>
+        </p:txBody>
+      </p:sp>
+      <p:sp>
+        <p:nvSpPr>
+          <p:cNvPr id="7" name="TextBox 6"/>
+          <p:cNvSpPr txBox="1"/>
+          <p:nvPr/>
+        </p:nvSpPr>
+        <p:spPr>
+          <a:xfrm>
+            <a:off x="1259632" y="6084004"/>
+            <a:ext cx="5040560" cy="369332"/>
+          </a:xfrm>
+          <a:prstGeom prst="rect">
+            <a:avLst/>
+          </a:prstGeom>
+          <a:noFill/>
+          <a:ln>
+            <a:solidFill>
+              <a:schemeClr val="tx1"/>
+            </a:solidFill>
+          </a:ln>
+        </p:spPr>
+        <p:txBody>
+          <a:bodyPr wrap="square" rtlCol="0">
+            <a:spAutoFit/>
+          </a:bodyPr>
+          <a:lstStyle/>
+          <a:p>
+            <a:r>
+              <a:rPr lang="nl-BE" dirty="0" smtClean="0">
+                <a:latin typeface="Courier New" pitchFamily="49" charset="0"/>
+                <a:cs typeface="Courier New" pitchFamily="49" charset="0"/>
+              </a:rPr>
+              <a:t>$ </a:t>
+            </a:r>
+            <a:r>
+              <a:rPr lang="nl-BE" dirty="0" smtClean="0">
+                <a:latin typeface="Courier New" pitchFamily="49" charset="0"/>
+                <a:cs typeface="Courier New" pitchFamily="49" charset="0"/>
+              </a:rPr>
+              <a:t>git </a:t>
+            </a:r>
+            <a:r>
+              <a:rPr lang="nl-BE" dirty="0">
+                <a:latin typeface="Courier New" pitchFamily="49" charset="0"/>
+                <a:cs typeface="Courier New" pitchFamily="49" charset="0"/>
+              </a:rPr>
+              <a:t>show </a:t>
+            </a:r>
+            <a:r>
+              <a:rPr lang="nl-BE" dirty="0" smtClean="0">
+                <a:latin typeface="Courier New" pitchFamily="49" charset="0"/>
+                <a:cs typeface="Courier New" pitchFamily="49" charset="0"/>
+              </a:rPr>
+              <a:t>0ba188919fe</a:t>
+            </a:r>
+            <a:endParaRPr lang="nl-BE" dirty="0" smtClean="0">
+              <a:latin typeface="Courier New" pitchFamily="49" charset="0"/>
+              <a:cs typeface="Courier New" pitchFamily="49" charset="0"/>
+            </a:endParaRPr>
+          </a:p>
+        </p:txBody>
+      </p:sp>
+    </p:spTree>
+    <p:extLst>
+      <p:ext uri="{BB962C8B-B14F-4D97-AF65-F5344CB8AC3E}">
+        <p14:creationId xmlns:p14="http://schemas.microsoft.com/office/powerpoint/2010/main" val="634044721"/>
+      </p:ext>
+    </p:extLst>
+  </p:cSld>
+  <p:clrMapOvr>
+    <a:masterClrMapping/>
+  </p:clrMapOvr>
+  <p:timing>
+    <p:tnLst>
+      <p:par>
+        <p:cTn id="1" dur="indefinite" restart="never" nodeType="tmRoot">
+          <p:childTnLst>
+            <p:seq concurrent="1" nextAc="seek">
+              <p:cTn id="2" dur="indefinite" nodeType="mainSeq">
+                <p:childTnLst>
+                  <p:par>
+                    <p:cTn id="3" fill="hold">
+                      <p:stCondLst>
+                        <p:cond delay="indefinite"/>
+                      </p:stCondLst>
+                      <p:childTnLst>
+                        <p:par>
+                          <p:cTn id="4" fill="hold">
+                            <p:stCondLst>
+                              <p:cond delay="0"/>
+                            </p:stCondLst>
+                            <p:childTnLst>
+                              <p:par>
+                                <p:cTn id="5" presetID="1" presetClass="entr" presetSubtype="0" fill="hold" grpId="0" nodeType="clickEffect">
+                                  <p:stCondLst>
+                                    <p:cond delay="0"/>
+                                  </p:stCondLst>
+                                  <p:childTnLst>
+                                    <p:set>
+                                      <p:cBhvr>
+                                        <p:cTn id="6" dur="1" fill="hold">
+                                          <p:stCondLst>
+                                            <p:cond delay="0"/>
+                                          </p:stCondLst>
+                                        </p:cTn>
+                                        <p:tgtEl>
+                                          <p:spTgt spid="3">
+                                            <p:txEl>
+                                              <p:pRg st="0" end="0"/>
+                                            </p:txEl>
+                                          </p:spTgt>
+                                        </p:tgtEl>
+                                        <p:attrNameLst>
+                                          <p:attrName>style.visibility</p:attrName>
+                                        </p:attrNameLst>
+                                      </p:cBhvr>
+                                      <p:to>
+                                        <p:strVal val="visible"/>
+                                      </p:to>
+                                    </p:set>
+                                  </p:childTnLst>
+                                </p:cTn>
+                              </p:par>
+                              <p:par>
+                                <p:cTn id="7" presetID="1" presetClass="entr" presetSubtype="0" fill="hold" grpId="0" nodeType="withEffect">
+                                  <p:stCondLst>
+                                    <p:cond delay="0"/>
+                                  </p:stCondLst>
+                                  <p:childTnLst>
+                                    <p:set>
+                                      <p:cBhvr>
+                                        <p:cTn id="8" dur="1" fill="hold">
+                                          <p:stCondLst>
+                                            <p:cond delay="0"/>
+                                          </p:stCondLst>
+                                        </p:cTn>
+                                        <p:tgtEl>
+                                          <p:spTgt spid="4"/>
+                                        </p:tgtEl>
+                                        <p:attrNameLst>
+                                          <p:attrName>style.visibility</p:attrName>
+                                        </p:attrNameLst>
+                                      </p:cBhvr>
+                                      <p:to>
+                                        <p:strVal val="visible"/>
+                                      </p:to>
+                                    </p:set>
+                                  </p:childTnLst>
+                                </p:cTn>
+                              </p:par>
+                            </p:childTnLst>
+                          </p:cTn>
+                        </p:par>
+                      </p:childTnLst>
+                    </p:cTn>
+                  </p:par>
+                  <p:par>
+                    <p:cTn id="9" fill="hold">
+                      <p:stCondLst>
+                        <p:cond delay="indefinite"/>
+                      </p:stCondLst>
+                      <p:childTnLst>
+                        <p:par>
+                          <p:cTn id="10" fill="hold">
+                            <p:stCondLst>
+                              <p:cond delay="0"/>
+                            </p:stCondLst>
+                            <p:childTnLst>
+                              <p:par>
+                                <p:cTn id="11" presetID="1" presetClass="entr" presetSubtype="0" fill="hold" grpId="0" nodeType="clickEffect">
+                                  <p:stCondLst>
+                                    <p:cond delay="0"/>
+                                  </p:stCondLst>
+                                  <p:childTnLst>
+                                    <p:set>
+                                      <p:cBhvr>
+                                        <p:cTn id="12" dur="1" fill="hold">
+                                          <p:stCondLst>
+                                            <p:cond delay="0"/>
+                                          </p:stCondLst>
+                                        </p:cTn>
+                                        <p:tgtEl>
+                                          <p:spTgt spid="3">
+                                            <p:txEl>
+                                              <p:pRg st="2" end="2"/>
+                                            </p:txEl>
+                                          </p:spTgt>
+                                        </p:tgtEl>
+                                        <p:attrNameLst>
+                                          <p:attrName>style.visibility</p:attrName>
+                                        </p:attrNameLst>
+                                      </p:cBhvr>
+                                      <p:to>
+                                        <p:strVal val="visible"/>
+                                      </p:to>
+                                    </p:set>
+                                  </p:childTnLst>
+                                </p:cTn>
+                              </p:par>
+                              <p:par>
+                                <p:cTn id="13" presetID="1" presetClass="entr" presetSubtype="0" fill="hold" grpId="0" nodeType="withEffect">
+                                  <p:stCondLst>
+                                    <p:cond delay="0"/>
+                                  </p:stCondLst>
+                                  <p:childTnLst>
+                                    <p:set>
+                                      <p:cBhvr>
+                                        <p:cTn id="14" dur="1" fill="hold">
+                                          <p:stCondLst>
+                                            <p:cond delay="0"/>
+                                          </p:stCondLst>
+                                        </p:cTn>
+                                        <p:tgtEl>
+                                          <p:spTgt spid="5"/>
+                                        </p:tgtEl>
+                                        <p:attrNameLst>
+                                          <p:attrName>style.visibility</p:attrName>
+                                        </p:attrNameLst>
+                                      </p:cBhvr>
+                                      <p:to>
+                                        <p:strVal val="visible"/>
+                                      </p:to>
+                                    </p:set>
+                                  </p:childTnLst>
+                                </p:cTn>
+                              </p:par>
+                            </p:childTnLst>
+                          </p:cTn>
+                        </p:par>
+                      </p:childTnLst>
+                    </p:cTn>
+                  </p:par>
+                  <p:par>
+                    <p:cTn id="15" fill="hold">
+                      <p:stCondLst>
+                        <p:cond delay="indefinite"/>
+                      </p:stCondLst>
+                      <p:childTnLst>
+                        <p:par>
+                          <p:cTn id="16" fill="hold">
+                            <p:stCondLst>
+                              <p:cond delay="0"/>
+                            </p:stCondLst>
+                            <p:childTnLst>
+                              <p:par>
+                                <p:cTn id="17" presetID="1" presetClass="entr" presetSubtype="0" fill="hold" grpId="0" nodeType="clickEffect">
+                                  <p:stCondLst>
+                                    <p:cond delay="0"/>
+                                  </p:stCondLst>
+                                  <p:childTnLst>
+                                    <p:set>
+                                      <p:cBhvr>
+                                        <p:cTn id="18" dur="1" fill="hold">
+                                          <p:stCondLst>
+                                            <p:cond delay="0"/>
+                                          </p:stCondLst>
+                                        </p:cTn>
+                                        <p:tgtEl>
+                                          <p:spTgt spid="3">
+                                            <p:txEl>
+                                              <p:pRg st="4" end="4"/>
+                                            </p:txEl>
+                                          </p:spTgt>
+                                        </p:tgtEl>
+                                        <p:attrNameLst>
+                                          <p:attrName>style.visibility</p:attrName>
+                                        </p:attrNameLst>
+                                      </p:cBhvr>
+                                      <p:to>
+                                        <p:strVal val="visible"/>
+                                      </p:to>
+                                    </p:set>
+                                  </p:childTnLst>
+                                </p:cTn>
+                              </p:par>
+                              <p:par>
+                                <p:cTn id="19" presetID="1" presetClass="entr" presetSubtype="0" fill="hold" grpId="0" nodeType="withEffect">
+                                  <p:stCondLst>
+                                    <p:cond delay="0"/>
+                                  </p:stCondLst>
+                                  <p:childTnLst>
+                                    <p:set>
+                                      <p:cBhvr>
+                                        <p:cTn id="20" dur="1" fill="hold">
+                                          <p:stCondLst>
+                                            <p:cond delay="0"/>
+                                          </p:stCondLst>
+                                        </p:cTn>
+                                        <p:tgtEl>
+                                          <p:spTgt spid="3">
+                                            <p:txEl>
+                                              <p:pRg st="5" end="5"/>
+                                            </p:txEl>
+                                          </p:spTgt>
+                                        </p:tgtEl>
+                                        <p:attrNameLst>
+                                          <p:attrName>style.visibility</p:attrName>
+                                        </p:attrNameLst>
+                                      </p:cBhvr>
+                                      <p:to>
+                                        <p:strVal val="visible"/>
+                                      </p:to>
+                                    </p:set>
+                                  </p:childTnLst>
+                                </p:cTn>
+                              </p:par>
+                              <p:par>
+                                <p:cTn id="21" presetID="1" presetClass="entr" presetSubtype="0" fill="hold" grpId="0" nodeType="withEffect">
+                                  <p:stCondLst>
+                                    <p:cond delay="0"/>
+                                  </p:stCondLst>
+                                  <p:childTnLst>
+                                    <p:set>
+                                      <p:cBhvr>
+                                        <p:cTn id="22" dur="1" fill="hold">
+                                          <p:stCondLst>
+                                            <p:cond delay="0"/>
+                                          </p:stCondLst>
+                                        </p:cTn>
+                                        <p:tgtEl>
+                                          <p:spTgt spid="6"/>
+                                        </p:tgtEl>
+                                        <p:attrNameLst>
+                                          <p:attrName>style.visibility</p:attrName>
+                                        </p:attrNameLst>
+                                      </p:cBhvr>
+                                      <p:to>
+                                        <p:strVal val="visible"/>
+                                      </p:to>
+                                    </p:set>
+                                  </p:childTnLst>
+                                </p:cTn>
+                              </p:par>
+                              <p:par>
+                                <p:cTn id="23" presetID="1" presetClass="entr" presetSubtype="0" fill="hold" grpId="0" nodeType="withEffect">
+                                  <p:stCondLst>
+                                    <p:cond delay="0"/>
+                                  </p:stCondLst>
+                                  <p:childTnLst>
+                                    <p:set>
+                                      <p:cBhvr>
+                                        <p:cTn id="24" dur="1" fill="hold">
+                                          <p:stCondLst>
+                                            <p:cond delay="0"/>
+                                          </p:stCondLst>
+                                        </p:cTn>
+                                        <p:tgtEl>
+                                          <p:spTgt spid="3">
+                                            <p:txEl>
+                                              <p:pRg st="7" end="7"/>
+                                            </p:txEl>
+                                          </p:spTgt>
+                                        </p:tgtEl>
+                                        <p:attrNameLst>
+                                          <p:attrName>style.visibility</p:attrName>
+                                        </p:attrNameLst>
+                                      </p:cBhvr>
+                                      <p:to>
+                                        <p:strVal val="visible"/>
+                                      </p:to>
+                                    </p:set>
+                                  </p:childTnLst>
+                                </p:cTn>
+                              </p:par>
+                              <p:par>
+                                <p:cTn id="25" presetID="1" presetClass="entr" presetSubtype="0" fill="hold" grpId="0" nodeType="withEffect">
+                                  <p:stCondLst>
+                                    <p:cond delay="0"/>
+                                  </p:stCondLst>
+                                  <p:childTnLst>
+                                    <p:set>
+                                      <p:cBhvr>
+                                        <p:cTn id="26" dur="1" fill="hold">
+                                          <p:stCondLst>
+                                            <p:cond delay="0"/>
+                                          </p:stCondLst>
+                                        </p:cTn>
+                                        <p:tgtEl>
+                                          <p:spTgt spid="7"/>
+                                        </p:tgtEl>
+                                        <p:attrNameLst>
+                                          <p:attrName>style.visibility</p:attrName>
+                                        </p:attrNameLst>
+                                      </p:cBhvr>
+                                      <p:to>
+                                        <p:strVal val="visible"/>
+                                      </p:to>
+                                    </p:set>
+                                  </p:childTnLst>
+                                </p:cTn>
+                              </p:par>
+                            </p:childTnLst>
+                          </p:cTn>
+                        </p:par>
+                      </p:childTnLst>
+                    </p:cTn>
+                  </p:par>
+                </p:childTnLst>
+              </p:cTn>
+              <p:prevCondLst>
+                <p:cond evt="onPrev" delay="0">
+                  <p:tgtEl>
+                    <p:sldTgt/>
+                  </p:tgtEl>
+                </p:cond>
+              </p:prevCondLst>
+              <p:nextCondLst>
+                <p:cond evt="onNext" delay="0">
+                  <p:tgtEl>
+                    <p:sldTgt/>
+                  </p:tgtEl>
+                </p:cond>
+              </p:nextCondLst>
+            </p:seq>
+          </p:childTnLst>
+        </p:cTn>
+      </p:par>
+    </p:tnLst>
+    <p:bldLst>
+      <p:bldP spid="3" grpId="0" uiExpand="1" build="p"/>
+      <p:bldP spid="4" grpId="0" animBg="1"/>
+      <p:bldP spid="5" grpId="0" animBg="1"/>
+      <p:bldP spid="6" grpId="0" animBg="1"/>
+      <p:bldP spid="7" grpId="0" animBg="1"/>
+    </p:bldLst>
+  </p:timing>
+</p:sld>
+</file>
+
+<file path=ppt/slides/slide3.xml><?xml version="1.0" encoding="utf-8"?>
+<p:sld xmlns:a="http://schemas.openxmlformats.org/drawingml/2006/main" xmlns:r="http://schemas.openxmlformats.org/officeDocument/2006/relationships" xmlns:p="http://schemas.openxmlformats.org/presentationml/2006/main">
+  <p:cSld>
+    <p:spTree>
+      <p:nvGrpSpPr>
+        <p:cNvPr id="1" name=""/>
+        <p:cNvGrpSpPr/>
+        <p:nvPr/>
+      </p:nvGrpSpPr>
+      <p:grpSpPr>
+        <a:xfrm>
+          <a:off x="0" y="0"/>
+          <a:ext cx="0" cy="0"/>
+          <a:chOff x="0" y="0"/>
+          <a:chExt cx="0" cy="0"/>
+        </a:xfrm>
+      </p:grpSpPr>
+      <p:sp>
+        <p:nvSpPr>
+          <p:cNvPr id="2" name="Title 1"/>
+          <p:cNvSpPr>
+            <a:spLocks noGrp="1"/>
+          </p:cNvSpPr>
+          <p:nvPr>
+            <p:ph type="title"/>
+          </p:nvPr>
+        </p:nvSpPr>
+        <p:spPr/>
+        <p:txBody>
+          <a:bodyPr/>
+          <a:lstStyle/>
+          <a:p>
+            <a:r>
+              <a:rPr lang="en-US" dirty="0" smtClean="0"/>
+              <a:t>Motivation</a:t>
+            </a:r>
+            <a:endParaRPr lang="nl-BE" dirty="0"/>
+          </a:p>
+        </p:txBody>
+      </p:sp>
+      <p:sp>
+        <p:nvSpPr>
+          <p:cNvPr id="3" name="Text Placeholder 2"/>
+          <p:cNvSpPr>
+            <a:spLocks noGrp="1"/>
+          </p:cNvSpPr>
+          <p:nvPr>
+            <p:ph type="body" idx="1"/>
+          </p:nvPr>
+        </p:nvSpPr>
+        <p:spPr/>
+        <p:txBody>
+          <a:bodyPr/>
+          <a:lstStyle/>
+          <a:p>
+            <a:endParaRPr lang="nl-BE"/>
+          </a:p>
+        </p:txBody>
+      </p:sp>
+    </p:spTree>
+    <p:extLst>
+      <p:ext uri="{BB962C8B-B14F-4D97-AF65-F5344CB8AC3E}">
+        <p14:creationId xmlns:p14="http://schemas.microsoft.com/office/powerpoint/2010/main" val="292413800"/>
+      </p:ext>
+    </p:extLst>
+  </p:cSld>
+  <p:clrMapOvr>
+    <a:masterClrMapping/>
+  </p:clrMapOvr>
+  <p:timing>
+    <p:tnLst>
+      <p:par>
+        <p:cTn id="1" dur="indefinite" restart="never" nodeType="tmRoot"/>
+      </p:par>
+    </p:tnLst>
+  </p:timing>
+</p:sld>
+</file>
+
+<file path=ppt/slides/slide30.xml><?xml version="1.0" encoding="utf-8"?>
+<p:sld xmlns:a="http://schemas.openxmlformats.org/drawingml/2006/main" xmlns:r="http://schemas.openxmlformats.org/officeDocument/2006/relationships" xmlns:p="http://schemas.openxmlformats.org/presentationml/2006/main">
+  <p:cSld>
+    <p:spTree>
+      <p:nvGrpSpPr>
+        <p:cNvPr id="1" name=""/>
+        <p:cNvGrpSpPr/>
+        <p:nvPr/>
+      </p:nvGrpSpPr>
+      <p:grpSpPr>
+        <a:xfrm>
+          <a:off x="0" y="0"/>
+          <a:ext cx="0" cy="0"/>
+          <a:chOff x="0" y="0"/>
+          <a:chExt cx="0" cy="0"/>
+        </a:xfrm>
+      </p:grpSpPr>
+      <p:sp>
+        <p:nvSpPr>
+          <p:cNvPr id="2" name="Title 1"/>
+          <p:cNvSpPr>
+            <a:spLocks noGrp="1"/>
+          </p:cNvSpPr>
+          <p:nvPr>
+            <p:ph type="title"/>
+          </p:nvPr>
+        </p:nvSpPr>
+        <p:spPr/>
+        <p:txBody>
+          <a:bodyPr/>
+          <a:lstStyle/>
+          <a:p>
+            <a:r>
+              <a:rPr lang="en-US" dirty="0" smtClean="0"/>
               <a:t>Tag, you're "it"! More semantics</a:t>
             </a:r>
             <a:endParaRPr lang="nl-BE" dirty="0"/>
@@ -16416,86 +17286,7 @@
 </p:sld>
 </file>
 
-<file path=ppt/slides/slide3.xml><?xml version="1.0" encoding="utf-8"?>
-<p:sld xmlns:a="http://schemas.openxmlformats.org/drawingml/2006/main" xmlns:r="http://schemas.openxmlformats.org/officeDocument/2006/relationships" xmlns:p="http://schemas.openxmlformats.org/presentationml/2006/main">
-  <p:cSld>
-    <p:spTree>
-      <p:nvGrpSpPr>
-        <p:cNvPr id="1" name=""/>
-        <p:cNvGrpSpPr/>
-        <p:nvPr/>
-      </p:nvGrpSpPr>
-      <p:grpSpPr>
-        <a:xfrm>
-          <a:off x="0" y="0"/>
-          <a:ext cx="0" cy="0"/>
-          <a:chOff x="0" y="0"/>
-          <a:chExt cx="0" cy="0"/>
-        </a:xfrm>
-      </p:grpSpPr>
-      <p:sp>
-        <p:nvSpPr>
-          <p:cNvPr id="2" name="Title 1"/>
-          <p:cNvSpPr>
-            <a:spLocks noGrp="1"/>
-          </p:cNvSpPr>
-          <p:nvPr>
-            <p:ph type="title"/>
-          </p:nvPr>
-        </p:nvSpPr>
-        <p:spPr/>
-        <p:txBody>
-          <a:bodyPr/>
-          <a:lstStyle/>
-          <a:p>
-            <a:r>
-              <a:rPr lang="en-US" dirty="0" smtClean="0"/>
-              <a:t>Motivation</a:t>
-            </a:r>
-            <a:endParaRPr lang="nl-BE" dirty="0"/>
-          </a:p>
-        </p:txBody>
-      </p:sp>
-      <p:sp>
-        <p:nvSpPr>
-          <p:cNvPr id="3" name="Text Placeholder 2"/>
-          <p:cNvSpPr>
-            <a:spLocks noGrp="1"/>
-          </p:cNvSpPr>
-          <p:nvPr>
-            <p:ph type="body" idx="1"/>
-          </p:nvPr>
-        </p:nvSpPr>
-        <p:spPr/>
-        <p:txBody>
-          <a:bodyPr/>
-          <a:lstStyle/>
-          <a:p>
-            <a:endParaRPr lang="nl-BE"/>
-          </a:p>
-        </p:txBody>
-      </p:sp>
-    </p:spTree>
-    <p:extLst>
-      <p:ext uri="{BB962C8B-B14F-4D97-AF65-F5344CB8AC3E}">
-        <p14:creationId xmlns:p14="http://schemas.microsoft.com/office/powerpoint/2010/main" val="292413800"/>
-      </p:ext>
-    </p:extLst>
-  </p:cSld>
-  <p:clrMapOvr>
-    <a:masterClrMapping/>
-  </p:clrMapOvr>
-  <p:timing>
-    <p:tnLst>
-      <p:par>
-        <p:cTn id="1" dur="indefinite" restart="never" nodeType="tmRoot"/>
-      </p:par>
-    </p:tnLst>
-  </p:timing>
-</p:sld>
-</file>
-
-<file path=ppt/slides/slide30.xml><?xml version="1.0" encoding="utf-8"?>
+<file path=ppt/slides/slide31.xml><?xml version="1.0" encoding="utf-8"?>
 <p:sld xmlns:a="http://schemas.openxmlformats.org/drawingml/2006/main" xmlns:r="http://schemas.openxmlformats.org/officeDocument/2006/relationships" xmlns:p="http://schemas.openxmlformats.org/presentationml/2006/main">
   <p:cSld>
     <p:spTree>
@@ -17200,7 +17991,7 @@
 </p:sld>
 </file>
 
-<file path=ppt/slides/slide31.xml><?xml version="1.0" encoding="utf-8"?>
+<file path=ppt/slides/slide32.xml><?xml version="1.0" encoding="utf-8"?>
 <p:sld xmlns:a="http://schemas.openxmlformats.org/drawingml/2006/main" xmlns:r="http://schemas.openxmlformats.org/officeDocument/2006/relationships" xmlns:p="http://schemas.openxmlformats.org/presentationml/2006/main">
   <p:cSld>
     <p:spTree>
@@ -17283,7 +18074,7 @@
 </p:sld>
 </file>
 
-<file path=ppt/slides/slide32.xml><?xml version="1.0" encoding="utf-8"?>
+<file path=ppt/slides/slide33.xml><?xml version="1.0" encoding="utf-8"?>
 <p:sld xmlns:a="http://schemas.openxmlformats.org/drawingml/2006/main" xmlns:r="http://schemas.openxmlformats.org/officeDocument/2006/relationships" xmlns:p="http://schemas.openxmlformats.org/presentationml/2006/main">
   <p:cSld>
     <p:spTree>
@@ -17786,7 +18577,7 @@
 </p:sld>
 </file>
 
-<file path=ppt/slides/slide33.xml><?xml version="1.0" encoding="utf-8"?>
+<file path=ppt/slides/slide34.xml><?xml version="1.0" encoding="utf-8"?>
 <p:sld xmlns:a="http://schemas.openxmlformats.org/drawingml/2006/main" xmlns:r="http://schemas.openxmlformats.org/officeDocument/2006/relationships" xmlns:p="http://schemas.openxmlformats.org/presentationml/2006/main">
   <p:cSld>
     <p:spTree>
@@ -18757,7 +19548,7 @@
 </p:sld>
 </file>
 
-<file path=ppt/slides/slide34.xml><?xml version="1.0" encoding="utf-8"?>
+<file path=ppt/slides/slide35.xml><?xml version="1.0" encoding="utf-8"?>
 <p:sld xmlns:a="http://schemas.openxmlformats.org/drawingml/2006/main" xmlns:r="http://schemas.openxmlformats.org/officeDocument/2006/relationships" xmlns:p="http://schemas.openxmlformats.org/presentationml/2006/main">
   <p:cSld>
     <p:spTree>
@@ -20738,7 +21529,7 @@
 </p:sld>
 </file>
 
-<file path=ppt/slides/slide35.xml><?xml version="1.0" encoding="utf-8"?>
+<file path=ppt/slides/slide36.xml><?xml version="1.0" encoding="utf-8"?>
 <p:sld xmlns:a="http://schemas.openxmlformats.org/drawingml/2006/main" xmlns:r="http://schemas.openxmlformats.org/officeDocument/2006/relationships" xmlns:p="http://schemas.openxmlformats.org/presentationml/2006/main">
   <p:cSld>
     <p:spTree>
@@ -21139,7 +21930,7 @@
 </p:sld>
 </file>
 
-<file path=ppt/slides/slide36.xml><?xml version="1.0" encoding="utf-8"?>
+<file path=ppt/slides/slide37.xml><?xml version="1.0" encoding="utf-8"?>
 <p:sld xmlns:a="http://schemas.openxmlformats.org/drawingml/2006/main" xmlns:r="http://schemas.openxmlformats.org/officeDocument/2006/relationships" xmlns:p="http://schemas.openxmlformats.org/presentationml/2006/main">
   <p:cSld>
     <p:spTree>
@@ -22107,7 +22898,7 @@
 </p:sld>
 </file>
 
-<file path=ppt/slides/slide37.xml><?xml version="1.0" encoding="utf-8"?>
+<file path=ppt/slides/slide38.xml><?xml version="1.0" encoding="utf-8"?>
 <p:sld xmlns:a="http://schemas.openxmlformats.org/drawingml/2006/main" xmlns:r="http://schemas.openxmlformats.org/officeDocument/2006/relationships" xmlns:p="http://schemas.openxmlformats.org/presentationml/2006/main">
   <p:cSld>
     <p:spTree>
@@ -22683,7 +23474,7 @@
 </p:sld>
 </file>
 
-<file path=ppt/slides/slide38.xml><?xml version="1.0" encoding="utf-8"?>
+<file path=ppt/slides/slide39.xml><?xml version="1.0" encoding="utf-8"?>
 <p:sld xmlns:a="http://schemas.openxmlformats.org/drawingml/2006/main" xmlns:r="http://schemas.openxmlformats.org/officeDocument/2006/relationships" xmlns:p="http://schemas.openxmlformats.org/presentationml/2006/main">
   <p:cSld>
     <p:spTree>
@@ -24911,7 +25702,108 @@
 </p:sld>
 </file>
 
-<file path=ppt/slides/slide39.xml><?xml version="1.0" encoding="utf-8"?>
+<file path=ppt/slides/slide4.xml><?xml version="1.0" encoding="utf-8"?>
+<p:sld xmlns:a="http://schemas.openxmlformats.org/drawingml/2006/main" xmlns:r="http://schemas.openxmlformats.org/officeDocument/2006/relationships" xmlns:p="http://schemas.openxmlformats.org/presentationml/2006/main">
+  <p:cSld>
+    <p:spTree>
+      <p:nvGrpSpPr>
+        <p:cNvPr id="1" name=""/>
+        <p:cNvGrpSpPr/>
+        <p:nvPr/>
+      </p:nvGrpSpPr>
+      <p:grpSpPr>
+        <a:xfrm>
+          <a:off x="0" y="0"/>
+          <a:ext cx="0" cy="0"/>
+          <a:chOff x="0" y="0"/>
+          <a:chExt cx="0" cy="0"/>
+        </a:xfrm>
+      </p:grpSpPr>
+      <p:sp>
+        <p:nvSpPr>
+          <p:cNvPr id="6" name="Title 5"/>
+          <p:cNvSpPr>
+            <a:spLocks noGrp="1"/>
+          </p:cNvSpPr>
+          <p:nvPr>
+            <p:ph type="title"/>
+          </p:nvPr>
+        </p:nvSpPr>
+        <p:spPr/>
+        <p:txBody>
+          <a:bodyPr/>
+          <a:lstStyle/>
+          <a:p>
+            <a:r>
+              <a:rPr lang="en-US" dirty="0" smtClean="0"/>
+              <a:t>It's a beautiful autumn day…</a:t>
+            </a:r>
+            <a:endParaRPr lang="nl-BE" dirty="0"/>
+          </a:p>
+        </p:txBody>
+      </p:sp>
+      <p:pic>
+        <p:nvPicPr>
+          <p:cNvPr id="1026" name="Picture 2" descr="C:\Users\lucg5005\Desktop\DSCF1116.jpg"/>
+          <p:cNvPicPr>
+            <a:picLocks noChangeAspect="1" noChangeArrowheads="1"/>
+          </p:cNvPicPr>
+          <p:nvPr/>
+        </p:nvPicPr>
+        <p:blipFill>
+          <a:blip r:embed="rId2" cstate="print">
+            <a:extLst>
+              <a:ext uri="{28A0092B-C50C-407E-A947-70E740481C1C}">
+                <a14:useLocalDpi xmlns:a14="http://schemas.microsoft.com/office/drawing/2010/main" val="0"/>
+              </a:ext>
+            </a:extLst>
+          </a:blip>
+          <a:srcRect/>
+          <a:stretch>
+            <a:fillRect/>
+          </a:stretch>
+        </p:blipFill>
+        <p:spPr bwMode="auto">
+          <a:xfrm>
+            <a:off x="1219795" y="1279015"/>
+            <a:ext cx="6736581" cy="5390345"/>
+          </a:xfrm>
+          <a:prstGeom prst="rect">
+            <a:avLst/>
+          </a:prstGeom>
+          <a:noFill/>
+          <a:extLst>
+            <a:ext uri="{909E8E84-426E-40DD-AFC4-6F175D3DCCD1}">
+              <a14:hiddenFill xmlns:a14="http://schemas.microsoft.com/office/drawing/2010/main">
+                <a:solidFill>
+                  <a:srgbClr val="FFFFFF"/>
+                </a:solidFill>
+              </a14:hiddenFill>
+            </a:ext>
+          </a:extLst>
+        </p:spPr>
+      </p:pic>
+    </p:spTree>
+    <p:extLst>
+      <p:ext uri="{BB962C8B-B14F-4D97-AF65-F5344CB8AC3E}">
+        <p14:creationId xmlns:p14="http://schemas.microsoft.com/office/powerpoint/2010/main" val="801143544"/>
+      </p:ext>
+    </p:extLst>
+  </p:cSld>
+  <p:clrMapOvr>
+    <a:masterClrMapping/>
+  </p:clrMapOvr>
+  <p:timing>
+    <p:tnLst>
+      <p:par>
+        <p:cTn id="1" dur="indefinite" restart="never" nodeType="tmRoot"/>
+      </p:par>
+    </p:tnLst>
+  </p:timing>
+</p:sld>
+</file>
+
+<file path=ppt/slides/slide40.xml><?xml version="1.0" encoding="utf-8"?>
 <p:sld xmlns:a="http://schemas.openxmlformats.org/drawingml/2006/main" xmlns:r="http://schemas.openxmlformats.org/officeDocument/2006/relationships" xmlns:p="http://schemas.openxmlformats.org/presentationml/2006/main">
   <p:cSld>
     <p:spTree>
@@ -25430,108 +26322,7 @@
 </p:sld>
 </file>
 
-<file path=ppt/slides/slide4.xml><?xml version="1.0" encoding="utf-8"?>
-<p:sld xmlns:a="http://schemas.openxmlformats.org/drawingml/2006/main" xmlns:r="http://schemas.openxmlformats.org/officeDocument/2006/relationships" xmlns:p="http://schemas.openxmlformats.org/presentationml/2006/main">
-  <p:cSld>
-    <p:spTree>
-      <p:nvGrpSpPr>
-        <p:cNvPr id="1" name=""/>
-        <p:cNvGrpSpPr/>
-        <p:nvPr/>
-      </p:nvGrpSpPr>
-      <p:grpSpPr>
-        <a:xfrm>
-          <a:off x="0" y="0"/>
-          <a:ext cx="0" cy="0"/>
-          <a:chOff x="0" y="0"/>
-          <a:chExt cx="0" cy="0"/>
-        </a:xfrm>
-      </p:grpSpPr>
-      <p:sp>
-        <p:nvSpPr>
-          <p:cNvPr id="6" name="Title 5"/>
-          <p:cNvSpPr>
-            <a:spLocks noGrp="1"/>
-          </p:cNvSpPr>
-          <p:nvPr>
-            <p:ph type="title"/>
-          </p:nvPr>
-        </p:nvSpPr>
-        <p:spPr/>
-        <p:txBody>
-          <a:bodyPr/>
-          <a:lstStyle/>
-          <a:p>
-            <a:r>
-              <a:rPr lang="en-US" dirty="0" smtClean="0"/>
-              <a:t>It's a beautiful autumn day…</a:t>
-            </a:r>
-            <a:endParaRPr lang="nl-BE" dirty="0"/>
-          </a:p>
-        </p:txBody>
-      </p:sp>
-      <p:pic>
-        <p:nvPicPr>
-          <p:cNvPr id="1026" name="Picture 2" descr="C:\Users\lucg5005\Desktop\DSCF1116.jpg"/>
-          <p:cNvPicPr>
-            <a:picLocks noChangeAspect="1" noChangeArrowheads="1"/>
-          </p:cNvPicPr>
-          <p:nvPr/>
-        </p:nvPicPr>
-        <p:blipFill>
-          <a:blip r:embed="rId2" cstate="print">
-            <a:extLst>
-              <a:ext uri="{28A0092B-C50C-407E-A947-70E740481C1C}">
-                <a14:useLocalDpi xmlns:a14="http://schemas.microsoft.com/office/drawing/2010/main" val="0"/>
-              </a:ext>
-            </a:extLst>
-          </a:blip>
-          <a:srcRect/>
-          <a:stretch>
-            <a:fillRect/>
-          </a:stretch>
-        </p:blipFill>
-        <p:spPr bwMode="auto">
-          <a:xfrm>
-            <a:off x="1219795" y="1279015"/>
-            <a:ext cx="6736581" cy="5390345"/>
-          </a:xfrm>
-          <a:prstGeom prst="rect">
-            <a:avLst/>
-          </a:prstGeom>
-          <a:noFill/>
-          <a:extLst>
-            <a:ext uri="{909E8E84-426E-40DD-AFC4-6F175D3DCCD1}">
-              <a14:hiddenFill xmlns:a14="http://schemas.microsoft.com/office/drawing/2010/main">
-                <a:solidFill>
-                  <a:srgbClr val="FFFFFF"/>
-                </a:solidFill>
-              </a14:hiddenFill>
-            </a:ext>
-          </a:extLst>
-        </p:spPr>
-      </p:pic>
-    </p:spTree>
-    <p:extLst>
-      <p:ext uri="{BB962C8B-B14F-4D97-AF65-F5344CB8AC3E}">
-        <p14:creationId xmlns:p14="http://schemas.microsoft.com/office/powerpoint/2010/main" val="801143544"/>
-      </p:ext>
-    </p:extLst>
-  </p:cSld>
-  <p:clrMapOvr>
-    <a:masterClrMapping/>
-  </p:clrMapOvr>
-  <p:timing>
-    <p:tnLst>
-      <p:par>
-        <p:cTn id="1" dur="indefinite" restart="never" nodeType="tmRoot"/>
-      </p:par>
-    </p:tnLst>
-  </p:timing>
-</p:sld>
-</file>
-
-<file path=ppt/slides/slide40.xml><?xml version="1.0" encoding="utf-8"?>
+<file path=ppt/slides/slide41.xml><?xml version="1.0" encoding="utf-8"?>
 <p:sld xmlns:a="http://schemas.openxmlformats.org/drawingml/2006/main" xmlns:r="http://schemas.openxmlformats.org/officeDocument/2006/relationships" xmlns:p="http://schemas.openxmlformats.org/presentationml/2006/main">
   <p:cSld>
     <p:spTree>
@@ -26086,7 +26877,7 @@
 </p:sld>
 </file>
 
-<file path=ppt/slides/slide41.xml><?xml version="1.0" encoding="utf-8"?>
+<file path=ppt/slides/slide42.xml><?xml version="1.0" encoding="utf-8"?>
 <p:sld xmlns:a="http://schemas.openxmlformats.org/drawingml/2006/main" xmlns:r="http://schemas.openxmlformats.org/officeDocument/2006/relationships" xmlns:p="http://schemas.openxmlformats.org/presentationml/2006/main">
   <p:cSld>
     <p:spTree>
@@ -26762,7 +27553,7 @@
 </p:sld>
 </file>
 
-<file path=ppt/slides/slide42.xml><?xml version="1.0" encoding="utf-8"?>
+<file path=ppt/slides/slide43.xml><?xml version="1.0" encoding="utf-8"?>
 <p:sld xmlns:a="http://schemas.openxmlformats.org/drawingml/2006/main" xmlns:r="http://schemas.openxmlformats.org/officeDocument/2006/relationships" xmlns:p="http://schemas.openxmlformats.org/presentationml/2006/main">
   <p:cSld>
     <p:spTree>
@@ -28565,7 +29356,7 @@
 </p:sld>
 </file>
 
-<file path=ppt/slides/slide43.xml><?xml version="1.0" encoding="utf-8"?>
+<file path=ppt/slides/slide44.xml><?xml version="1.0" encoding="utf-8"?>
 <p:sld xmlns:a="http://schemas.openxmlformats.org/drawingml/2006/main" xmlns:r="http://schemas.openxmlformats.org/officeDocument/2006/relationships" xmlns:p="http://schemas.openxmlformats.org/presentationml/2006/main">
   <p:cSld>
     <p:spTree>
@@ -29321,7 +30112,7 @@
 </p:sld>
 </file>
 
-<file path=ppt/slides/slide44.xml><?xml version="1.0" encoding="utf-8"?>
+<file path=ppt/slides/slide45.xml><?xml version="1.0" encoding="utf-8"?>
 <p:sld xmlns:a="http://schemas.openxmlformats.org/drawingml/2006/main" xmlns:r="http://schemas.openxmlformats.org/officeDocument/2006/relationships" xmlns:p="http://schemas.openxmlformats.org/presentationml/2006/main">
   <p:cSld>
     <p:spTree>
@@ -29732,7 +30523,7 @@
 </p:sld>
 </file>
 
-<file path=ppt/slides/slide45.xml><?xml version="1.0" encoding="utf-8"?>
+<file path=ppt/slides/slide46.xml><?xml version="1.0" encoding="utf-8"?>
 <p:sld xmlns:a="http://schemas.openxmlformats.org/drawingml/2006/main" xmlns:r="http://schemas.openxmlformats.org/officeDocument/2006/relationships" xmlns:p="http://schemas.openxmlformats.org/presentationml/2006/main">
   <p:cSld>
     <p:spTree>
@@ -30173,7 +30964,7 @@
 </p:sld>
 </file>
 
-<file path=ppt/slides/slide46.xml><?xml version="1.0" encoding="utf-8"?>
+<file path=ppt/slides/slide47.xml><?xml version="1.0" encoding="utf-8"?>
 <p:sld xmlns:a="http://schemas.openxmlformats.org/drawingml/2006/main" xmlns:r="http://schemas.openxmlformats.org/officeDocument/2006/relationships" xmlns:p="http://schemas.openxmlformats.org/presentationml/2006/main">
   <p:cSld>
     <p:spTree>
@@ -30301,10 +31092,6 @@
               </a:rPr>
               <a:t>  …</a:t>
             </a:r>
-            <a:endParaRPr lang="nl-BE" dirty="0" smtClean="0">
-              <a:latin typeface="Courier New" pitchFamily="49" charset="0"/>
-              <a:cs typeface="Courier New" pitchFamily="49" charset="0"/>
-            </a:endParaRPr>
           </a:p>
         </p:txBody>
       </p:sp>
@@ -30340,19 +31127,8 @@
                 <a:latin typeface="Courier New" pitchFamily="49" charset="0"/>
                 <a:cs typeface="Courier New" pitchFamily="49" charset="0"/>
               </a:rPr>
-              <a:t>$ git </a:t>
-            </a:r>
-            <a:r>
-              <a:rPr lang="nl-BE" dirty="0" smtClean="0">
-                <a:latin typeface="Courier New" pitchFamily="49" charset="0"/>
-                <a:cs typeface="Courier New" pitchFamily="49" charset="0"/>
-              </a:rPr>
-              <a:t>stash  …</a:t>
-            </a:r>
-            <a:endParaRPr lang="nl-BE" dirty="0" smtClean="0">
-              <a:latin typeface="Courier New" pitchFamily="49" charset="0"/>
-              <a:cs typeface="Courier New" pitchFamily="49" charset="0"/>
-            </a:endParaRPr>
+              <a:t>$ git stash  …</a:t>
+            </a:r>
           </a:p>
         </p:txBody>
       </p:sp>
@@ -30404,10 +31180,6 @@
               </a:rPr>
               <a:t>  -p  …</a:t>
             </a:r>
-            <a:endParaRPr lang="nl-BE" dirty="0" smtClean="0">
-              <a:latin typeface="Courier New" pitchFamily="49" charset="0"/>
-              <a:cs typeface="Courier New" pitchFamily="49" charset="0"/>
-            </a:endParaRPr>
           </a:p>
         </p:txBody>
       </p:sp>
@@ -30691,85 +31463,6 @@
 </p:sld>
 </file>
 
-<file path=ppt/slides/slide47.xml><?xml version="1.0" encoding="utf-8"?>
-<p:sld xmlns:a="http://schemas.openxmlformats.org/drawingml/2006/main" xmlns:r="http://schemas.openxmlformats.org/officeDocument/2006/relationships" xmlns:p="http://schemas.openxmlformats.org/presentationml/2006/main">
-  <p:cSld>
-    <p:spTree>
-      <p:nvGrpSpPr>
-        <p:cNvPr id="1" name=""/>
-        <p:cNvGrpSpPr/>
-        <p:nvPr/>
-      </p:nvGrpSpPr>
-      <p:grpSpPr>
-        <a:xfrm>
-          <a:off x="0" y="0"/>
-          <a:ext cx="0" cy="0"/>
-          <a:chOff x="0" y="0"/>
-          <a:chExt cx="0" cy="0"/>
-        </a:xfrm>
-      </p:grpSpPr>
-      <p:sp>
-        <p:nvSpPr>
-          <p:cNvPr id="2" name="Title 1"/>
-          <p:cNvSpPr>
-            <a:spLocks noGrp="1"/>
-          </p:cNvSpPr>
-          <p:nvPr>
-            <p:ph type="title"/>
-          </p:nvPr>
-        </p:nvSpPr>
-        <p:spPr/>
-        <p:txBody>
-          <a:bodyPr/>
-          <a:lstStyle/>
-          <a:p>
-            <a:r>
-              <a:rPr lang="en-US" dirty="0" smtClean="0"/>
-              <a:t>Getting More information</a:t>
-            </a:r>
-            <a:endParaRPr lang="en-US" dirty="0"/>
-          </a:p>
-        </p:txBody>
-      </p:sp>
-      <p:sp>
-        <p:nvSpPr>
-          <p:cNvPr id="3" name="Text Placeholder 2"/>
-          <p:cNvSpPr>
-            <a:spLocks noGrp="1"/>
-          </p:cNvSpPr>
-          <p:nvPr>
-            <p:ph type="body" idx="1"/>
-          </p:nvPr>
-        </p:nvSpPr>
-        <p:spPr/>
-        <p:txBody>
-          <a:bodyPr/>
-          <a:lstStyle/>
-          <a:p>
-            <a:endParaRPr lang="en-US"/>
-          </a:p>
-        </p:txBody>
-      </p:sp>
-    </p:spTree>
-    <p:extLst>
-      <p:ext uri="{BB962C8B-B14F-4D97-AF65-F5344CB8AC3E}">
-        <p14:creationId xmlns:p14="http://schemas.microsoft.com/office/powerpoint/2010/main" val="2688556715"/>
-      </p:ext>
-    </p:extLst>
-  </p:cSld>
-  <p:clrMapOvr>
-    <a:masterClrMapping/>
-  </p:clrMapOvr>
-  <p:timing>
-    <p:tnLst>
-      <p:par>
-        <p:cTn id="1" dur="indefinite" restart="never" nodeType="tmRoot"/>
-      </p:par>
-    </p:tnLst>
-  </p:timing>
-</p:sld>
-</file>
-
 <file path=ppt/slides/slide48.xml><?xml version="1.0" encoding="utf-8"?>
 <p:sld xmlns:a="http://schemas.openxmlformats.org/drawingml/2006/main" xmlns:r="http://schemas.openxmlformats.org/officeDocument/2006/relationships" xmlns:p="http://schemas.openxmlformats.org/presentationml/2006/main">
   <p:cSld>
@@ -30803,155 +31496,36 @@
           <a:lstStyle/>
           <a:p>
             <a:r>
-              <a:rPr lang="en-US" dirty="0" err="1"/>
-              <a:t>g</a:t>
-            </a:r>
-            <a:r>
-              <a:rPr lang="en-US" dirty="0" err="1" smtClean="0"/>
-              <a:t>it</a:t>
-            </a:r>
-            <a:r>
               <a:rPr lang="en-US" dirty="0" smtClean="0"/>
-              <a:t>: the movie</a:t>
-            </a:r>
-            <a:endParaRPr lang="nl-BE" dirty="0"/>
+              <a:t>Getting More information</a:t>
+            </a:r>
+            <a:endParaRPr lang="en-US" dirty="0"/>
           </a:p>
         </p:txBody>
       </p:sp>
       <p:sp>
         <p:nvSpPr>
-          <p:cNvPr id="3" name="Content Placeholder 2"/>
+          <p:cNvPr id="3" name="Text Placeholder 2"/>
           <p:cNvSpPr>
             <a:spLocks noGrp="1"/>
           </p:cNvSpPr>
           <p:nvPr>
-            <p:ph idx="1"/>
+            <p:ph type="body" idx="1"/>
           </p:nvPr>
         </p:nvSpPr>
         <p:spPr/>
         <p:txBody>
-          <a:bodyPr>
-            <a:normAutofit fontScale="92500"/>
-          </a:bodyPr>
+          <a:bodyPr/>
           <a:lstStyle/>
           <a:p>
-            <a:r>
-              <a:rPr lang="en-US" dirty="0" smtClean="0"/>
-              <a:t>Online documentation (including movies)</a:t>
-            </a:r>
-          </a:p>
-          <a:p>
-            <a:pPr lvl="1"/>
-            <a:r>
-              <a:rPr lang="nl-BE" dirty="0" smtClean="0">
-                <a:hlinkClick r:id="rId2"/>
-              </a:rPr>
-              <a:t>http://git-scm.com/documentation</a:t>
-            </a:r>
-            <a:endParaRPr lang="nl-BE" dirty="0" smtClean="0"/>
-          </a:p>
-          <a:p>
-            <a:r>
-              <a:rPr lang="en-US" dirty="0" err="1"/>
-              <a:t>g</a:t>
-            </a:r>
-            <a:r>
-              <a:rPr lang="en-US" dirty="0" err="1" smtClean="0"/>
-              <a:t>it</a:t>
-            </a:r>
-            <a:r>
-              <a:rPr lang="en-US" dirty="0" smtClean="0"/>
-              <a:t> web site</a:t>
-            </a:r>
-          </a:p>
-          <a:p>
-            <a:pPr lvl="1"/>
-            <a:r>
-              <a:rPr lang="nl-BE" dirty="0" smtClean="0">
-                <a:hlinkClick r:id="rId3"/>
-              </a:rPr>
-              <a:t>http://git-scm.com/</a:t>
-            </a:r>
-            <a:endParaRPr lang="nl-BE" dirty="0" smtClean="0"/>
-          </a:p>
-          <a:p>
-            <a:r>
-              <a:rPr lang="en-US" dirty="0" smtClean="0"/>
-              <a:t>Why (the author thinks) you should switch to </a:t>
-            </a:r>
-            <a:r>
-              <a:rPr lang="en-US" dirty="0" err="1" smtClean="0"/>
-              <a:t>git</a:t>
-            </a:r>
-            <a:endParaRPr lang="en-US" dirty="0" smtClean="0"/>
-          </a:p>
-          <a:p>
-            <a:pPr lvl="1"/>
-            <a:r>
-              <a:rPr lang="nl-BE" dirty="0" smtClean="0">
-                <a:hlinkClick r:id="rId4"/>
-              </a:rPr>
-              <a:t>http://blog.teamtreehouse.com/why-you-should-switch-from-subversion-to-git</a:t>
-            </a:r>
-            <a:endParaRPr lang="nl-BE" dirty="0" smtClean="0"/>
-          </a:p>
-          <a:p>
-            <a:r>
-              <a:rPr lang="nl-BE" dirty="0" smtClean="0"/>
-              <a:t>An </a:t>
-            </a:r>
-            <a:r>
-              <a:rPr lang="nl-BE" dirty="0" err="1" smtClean="0"/>
-              <a:t>overview</a:t>
-            </a:r>
-            <a:r>
-              <a:rPr lang="nl-BE" dirty="0" smtClean="0"/>
-              <a:t> of </a:t>
-            </a:r>
-            <a:r>
-              <a:rPr lang="nl-BE" dirty="0" err="1" smtClean="0"/>
-              <a:t>frequently</a:t>
-            </a:r>
-            <a:r>
-              <a:rPr lang="nl-BE" dirty="0" smtClean="0"/>
-              <a:t> </a:t>
-            </a:r>
-            <a:r>
-              <a:rPr lang="nl-BE" dirty="0" err="1" smtClean="0"/>
-              <a:t>used</a:t>
-            </a:r>
-            <a:r>
-              <a:rPr lang="nl-BE" dirty="0" smtClean="0"/>
-              <a:t> git </a:t>
-            </a:r>
-            <a:r>
-              <a:rPr lang="nl-BE" dirty="0" err="1" smtClean="0"/>
-              <a:t>workflows</a:t>
-            </a:r>
-            <a:endParaRPr lang="nl-BE" dirty="0" smtClean="0"/>
-          </a:p>
-          <a:p>
-            <a:pPr lvl="1"/>
-            <a:r>
-              <a:rPr lang="en-US" dirty="0">
-                <a:hlinkClick r:id="rId5"/>
-              </a:rPr>
-              <a:t>https://</a:t>
-            </a:r>
-            <a:r>
-              <a:rPr lang="en-US" dirty="0" smtClean="0">
-                <a:hlinkClick r:id="rId5"/>
-              </a:rPr>
-              <a:t>www.atlassian.com/git/workflows</a:t>
-            </a:r>
-            <a:endParaRPr lang="nl-BE" dirty="0" smtClean="0"/>
+            <a:endParaRPr lang="en-US"/>
           </a:p>
         </p:txBody>
       </p:sp>
     </p:spTree>
     <p:extLst>
       <p:ext uri="{BB962C8B-B14F-4D97-AF65-F5344CB8AC3E}">
-        <p14:creationId xmlns:p14="http://schemas.microsoft.com/office/powerpoint/2010/main" val="2976133738"/>
+        <p14:creationId xmlns:p14="http://schemas.microsoft.com/office/powerpoint/2010/main" val="2688556715"/>
       </p:ext>
     </p:extLst>
   </p:cSld>
@@ -31001,8 +31575,16 @@
           <a:lstStyle/>
           <a:p>
             <a:r>
+              <a:rPr lang="en-US" dirty="0" err="1"/>
+              <a:t>g</a:t>
+            </a:r>
+            <a:r>
+              <a:rPr lang="en-US" dirty="0" err="1" smtClean="0"/>
+              <a:t>it</a:t>
+            </a:r>
+            <a:r>
               <a:rPr lang="en-US" dirty="0" smtClean="0"/>
-              <a:t>Conclusions</a:t>
+              <a:t>: the movie</a:t>
             </a:r>
             <a:endParaRPr lang="nl-BE" dirty="0"/>
           </a:p>
@@ -31010,27 +31592,138 @@
       </p:sp>
       <p:sp>
         <p:nvSpPr>
-          <p:cNvPr id="3" name="Text Placeholder 2"/>
+          <p:cNvPr id="3" name="Content Placeholder 2"/>
           <p:cNvSpPr>
             <a:spLocks noGrp="1"/>
           </p:cNvSpPr>
           <p:nvPr>
-            <p:ph type="body" idx="1"/>
+            <p:ph idx="1"/>
           </p:nvPr>
         </p:nvSpPr>
         <p:spPr/>
         <p:txBody>
-          <a:bodyPr/>
+          <a:bodyPr>
+            <a:normAutofit fontScale="92500"/>
+          </a:bodyPr>
           <a:lstStyle/>
           <a:p>
-            <a:endParaRPr lang="nl-BE"/>
+            <a:r>
+              <a:rPr lang="en-US" dirty="0" smtClean="0"/>
+              <a:t>Online documentation (including movies)</a:t>
+            </a:r>
+          </a:p>
+          <a:p>
+            <a:pPr lvl="1"/>
+            <a:r>
+              <a:rPr lang="nl-BE" dirty="0" smtClean="0">
+                <a:hlinkClick r:id="rId2"/>
+              </a:rPr>
+              <a:t>http://git-scm.com/documentation</a:t>
+            </a:r>
+            <a:endParaRPr lang="nl-BE" dirty="0" smtClean="0"/>
+          </a:p>
+          <a:p>
+            <a:r>
+              <a:rPr lang="en-US" dirty="0" err="1"/>
+              <a:t>g</a:t>
+            </a:r>
+            <a:r>
+              <a:rPr lang="en-US" dirty="0" err="1" smtClean="0"/>
+              <a:t>it</a:t>
+            </a:r>
+            <a:r>
+              <a:rPr lang="en-US" dirty="0" smtClean="0"/>
+              <a:t> web site</a:t>
+            </a:r>
+          </a:p>
+          <a:p>
+            <a:pPr lvl="1"/>
+            <a:r>
+              <a:rPr lang="nl-BE" dirty="0" smtClean="0">
+                <a:hlinkClick r:id="rId3"/>
+              </a:rPr>
+              <a:t>http://git-scm.com/</a:t>
+            </a:r>
+            <a:endParaRPr lang="nl-BE" dirty="0" smtClean="0"/>
+          </a:p>
+          <a:p>
+            <a:r>
+              <a:rPr lang="en-US" dirty="0" smtClean="0"/>
+              <a:t>Why (the author thinks) you should switch to </a:t>
+            </a:r>
+            <a:r>
+              <a:rPr lang="en-US" dirty="0" err="1" smtClean="0"/>
+              <a:t>git</a:t>
+            </a:r>
+            <a:endParaRPr lang="en-US" dirty="0" smtClean="0"/>
+          </a:p>
+          <a:p>
+            <a:pPr lvl="1"/>
+            <a:r>
+              <a:rPr lang="nl-BE" dirty="0" smtClean="0">
+                <a:hlinkClick r:id="rId4"/>
+              </a:rPr>
+              <a:t>http://blog.teamtreehouse.com/why-you-should-switch-from-subversion-to-git</a:t>
+            </a:r>
+            <a:endParaRPr lang="nl-BE" dirty="0" smtClean="0"/>
+          </a:p>
+          <a:p>
+            <a:r>
+              <a:rPr lang="nl-BE" dirty="0" smtClean="0"/>
+              <a:t>An </a:t>
+            </a:r>
+            <a:r>
+              <a:rPr lang="nl-BE" dirty="0" err="1" smtClean="0"/>
+              <a:t>overview</a:t>
+            </a:r>
+            <a:r>
+              <a:rPr lang="nl-BE" dirty="0" smtClean="0"/>
+              <a:t> of </a:t>
+            </a:r>
+            <a:r>
+              <a:rPr lang="nl-BE" dirty="0" err="1" smtClean="0"/>
+              <a:t>frequently</a:t>
+            </a:r>
+            <a:r>
+              <a:rPr lang="nl-BE" dirty="0" smtClean="0"/>
+              <a:t> </a:t>
+            </a:r>
+            <a:r>
+              <a:rPr lang="nl-BE" dirty="0" err="1" smtClean="0"/>
+              <a:t>used</a:t>
+            </a:r>
+            <a:r>
+              <a:rPr lang="nl-BE" dirty="0" smtClean="0"/>
+              <a:t> git </a:t>
+            </a:r>
+            <a:r>
+              <a:rPr lang="nl-BE" dirty="0" err="1" smtClean="0"/>
+              <a:t>workflows</a:t>
+            </a:r>
+            <a:endParaRPr lang="nl-BE" dirty="0" smtClean="0"/>
+          </a:p>
+          <a:p>
+            <a:pPr lvl="1"/>
+            <a:r>
+              <a:rPr lang="en-US" dirty="0">
+                <a:hlinkClick r:id="rId5"/>
+              </a:rPr>
+              <a:t>https://</a:t>
+            </a:r>
+            <a:r>
+              <a:rPr lang="en-US" dirty="0" smtClean="0">
+                <a:hlinkClick r:id="rId5"/>
+              </a:rPr>
+              <a:t>www.atlassian.com/git/workflows</a:t>
+            </a:r>
+            <a:endParaRPr lang="nl-BE" dirty="0" smtClean="0"/>
           </a:p>
         </p:txBody>
       </p:sp>
     </p:spTree>
     <p:extLst>
       <p:ext uri="{BB962C8B-B14F-4D97-AF65-F5344CB8AC3E}">
-        <p14:creationId xmlns:p14="http://schemas.microsoft.com/office/powerpoint/2010/main" val="2763237186"/>
+        <p14:creationId xmlns:p14="http://schemas.microsoft.com/office/powerpoint/2010/main" val="2976133738"/>
       </p:ext>
     </p:extLst>
   </p:cSld>
@@ -31530,6 +32223,85 @@
 </file>
 
 <file path=ppt/slides/slide50.xml><?xml version="1.0" encoding="utf-8"?>
+<p:sld xmlns:a="http://schemas.openxmlformats.org/drawingml/2006/main" xmlns:r="http://schemas.openxmlformats.org/officeDocument/2006/relationships" xmlns:p="http://schemas.openxmlformats.org/presentationml/2006/main">
+  <p:cSld>
+    <p:spTree>
+      <p:nvGrpSpPr>
+        <p:cNvPr id="1" name=""/>
+        <p:cNvGrpSpPr/>
+        <p:nvPr/>
+      </p:nvGrpSpPr>
+      <p:grpSpPr>
+        <a:xfrm>
+          <a:off x="0" y="0"/>
+          <a:ext cx="0" cy="0"/>
+          <a:chOff x="0" y="0"/>
+          <a:chExt cx="0" cy="0"/>
+        </a:xfrm>
+      </p:grpSpPr>
+      <p:sp>
+        <p:nvSpPr>
+          <p:cNvPr id="2" name="Title 1"/>
+          <p:cNvSpPr>
+            <a:spLocks noGrp="1"/>
+          </p:cNvSpPr>
+          <p:nvPr>
+            <p:ph type="title"/>
+          </p:nvPr>
+        </p:nvSpPr>
+        <p:spPr/>
+        <p:txBody>
+          <a:bodyPr/>
+          <a:lstStyle/>
+          <a:p>
+            <a:r>
+              <a:rPr lang="en-US" dirty="0" smtClean="0"/>
+              <a:t>Conclusions</a:t>
+            </a:r>
+            <a:endParaRPr lang="nl-BE" dirty="0"/>
+          </a:p>
+        </p:txBody>
+      </p:sp>
+      <p:sp>
+        <p:nvSpPr>
+          <p:cNvPr id="3" name="Text Placeholder 2"/>
+          <p:cNvSpPr>
+            <a:spLocks noGrp="1"/>
+          </p:cNvSpPr>
+          <p:nvPr>
+            <p:ph type="body" idx="1"/>
+          </p:nvPr>
+        </p:nvSpPr>
+        <p:spPr/>
+        <p:txBody>
+          <a:bodyPr/>
+          <a:lstStyle/>
+          <a:p>
+            <a:endParaRPr lang="nl-BE"/>
+          </a:p>
+        </p:txBody>
+      </p:sp>
+    </p:spTree>
+    <p:extLst>
+      <p:ext uri="{BB962C8B-B14F-4D97-AF65-F5344CB8AC3E}">
+        <p14:creationId xmlns:p14="http://schemas.microsoft.com/office/powerpoint/2010/main" val="2763237186"/>
+      </p:ext>
+    </p:extLst>
+  </p:cSld>
+  <p:clrMapOvr>
+    <a:masterClrMapping/>
+  </p:clrMapOvr>
+  <p:timing>
+    <p:tnLst>
+      <p:par>
+        <p:cTn id="1" dur="indefinite" restart="never" nodeType="tmRoot"/>
+      </p:par>
+    </p:tnLst>
+  </p:timing>
+</p:sld>
+</file>
+
+<file path=ppt/slides/slide51.xml><?xml version="1.0" encoding="utf-8"?>
 <p:sld xmlns:a="http://schemas.openxmlformats.org/drawingml/2006/main" xmlns:r="http://schemas.openxmlformats.org/officeDocument/2006/relationships" xmlns:p="http://schemas.openxmlformats.org/presentationml/2006/main">
   <p:cSld>
     <p:spTree>

</xml_diff>

<commit_message>
Added sections to presentation; added how to add description to branch with git
</commit_message>
<xml_diff>
--- a/LinuxTools/VersionControl/version_control_git.pptx
+++ b/LinuxTools/VersionControl/version_control_git.pptx
@@ -52,10 +52,9 @@
     <p:sldId id="304" r:id="rId46"/>
     <p:sldId id="305" r:id="rId47"/>
     <p:sldId id="307" r:id="rId48"/>
-    <p:sldId id="298" r:id="rId49"/>
+    <p:sldId id="300" r:id="rId49"/>
     <p:sldId id="299" r:id="rId50"/>
-    <p:sldId id="300" r:id="rId51"/>
-    <p:sldId id="301" r:id="rId52"/>
+    <p:sldId id="301" r:id="rId51"/>
   </p:sldIdLst>
   <p:sldSz cx="9144000" cy="6858000" type="screen4x3"/>
   <p:notesSz cx="6858000" cy="9144000"/>
@@ -154,6 +153,96 @@
       </a:defRPr>
     </a:lvl9pPr>
   </p:defaultTextStyle>
+  <p:extLst>
+    <p:ext uri="{521415D9-36F7-43E2-AB2F-B90AF26B5E84}">
+      <p14:sectionLst xmlns:p14="http://schemas.microsoft.com/office/powerpoint/2010/main">
+        <p14:section name="Default Section" id="{57FEB93D-333E-4FC5-B05F-B473373F365D}">
+          <p14:sldIdLst>
+            <p14:sldId id="256"/>
+            <p14:sldId id="276"/>
+          </p14:sldIdLst>
+        </p14:section>
+        <p14:section name="Introduction" id="{408F4C3B-B9DF-4CDE-B4EF-7CCA20540640}">
+          <p14:sldIdLst>
+            <p14:sldId id="264"/>
+            <p14:sldId id="265"/>
+            <p14:sldId id="266"/>
+            <p14:sldId id="267"/>
+            <p14:sldId id="268"/>
+            <p14:sldId id="269"/>
+            <p14:sldId id="270"/>
+            <p14:sldId id="271"/>
+            <p14:sldId id="272"/>
+            <p14:sldId id="273"/>
+            <p14:sldId id="274"/>
+            <p14:sldId id="275"/>
+          </p14:sldIdLst>
+        </p14:section>
+        <p14:section name="Single user scenario" id="{6FF706D2-031A-4285-AC18-D9A61FC311FC}">
+          <p14:sldIdLst>
+            <p14:sldId id="277"/>
+            <p14:sldId id="257"/>
+            <p14:sldId id="258"/>
+            <p14:sldId id="259"/>
+            <p14:sldId id="261"/>
+            <p14:sldId id="280"/>
+            <p14:sldId id="302"/>
+            <p14:sldId id="306"/>
+            <p14:sldId id="262"/>
+            <p14:sldId id="260"/>
+            <p14:sldId id="278"/>
+            <p14:sldId id="279"/>
+            <p14:sldId id="303"/>
+            <p14:sldId id="281"/>
+            <p14:sldId id="308"/>
+            <p14:sldId id="282"/>
+            <p14:sldId id="296"/>
+          </p14:sldIdLst>
+        </p14:section>
+        <p14:section name="Multiple user scenario" id="{990CF91C-3B68-4976-BEDF-DCC87682E0DD}">
+          <p14:sldIdLst>
+            <p14:sldId id="283"/>
+            <p14:sldId id="295"/>
+            <p14:sldId id="285"/>
+            <p14:sldId id="284"/>
+            <p14:sldId id="286"/>
+            <p14:sldId id="287"/>
+            <p14:sldId id="288"/>
+            <p14:sldId id="289"/>
+            <p14:sldId id="290"/>
+            <p14:sldId id="291"/>
+            <p14:sldId id="292"/>
+            <p14:sldId id="294"/>
+            <p14:sldId id="297"/>
+            <p14:sldId id="304"/>
+            <p14:sldId id="305"/>
+            <p14:sldId id="307"/>
+          </p14:sldIdLst>
+        </p14:section>
+        <p14:section name="Conclusions" id="{DDEBC1E0-752D-48F0-A4FC-55A760B7B208}">
+          <p14:sldIdLst>
+            <p14:sldId id="300"/>
+            <p14:sldId id="299"/>
+            <p14:sldId id="301"/>
+          </p14:sldIdLst>
+        </p14:section>
+      </p14:sectionLst>
+    </p:ext>
+    <p:ext uri="{EFAFB233-063F-42B5-8137-9DF3F51BA10A}">
+      <p15:sldGuideLst xmlns:p15="http://schemas.microsoft.com/office/powerpoint/2012/main">
+        <p15:guide id="1" orient="horz" pos="2160">
+          <p15:clr>
+            <a:srgbClr val="A4A3A4"/>
+          </p15:clr>
+        </p15:guide>
+        <p15:guide id="2" pos="2880">
+          <p15:clr>
+            <a:srgbClr val="A4A3A4"/>
+          </p15:clr>
+        </p15:guide>
+      </p15:sldGuideLst>
+    </p:ext>
+  </p:extLst>
 </p:presentation>
 </file>
 
@@ -353,7 +442,7 @@
           <a:p>
             <a:fld id="{31155545-FFF6-4666-BE18-08518292A6F3}" type="datetimeFigureOut">
               <a:rPr lang="nl-BE" smtClean="0"/>
-              <a:t>7/12/2015</a:t>
+              <a:t>2016-01-05</a:t>
             </a:fld>
             <a:endParaRPr lang="nl-BE"/>
           </a:p>
@@ -523,7 +612,7 @@
           <a:p>
             <a:fld id="{31155545-FFF6-4666-BE18-08518292A6F3}" type="datetimeFigureOut">
               <a:rPr lang="nl-BE" smtClean="0"/>
-              <a:t>7/12/2015</a:t>
+              <a:t>2016-01-05</a:t>
             </a:fld>
             <a:endParaRPr lang="nl-BE"/>
           </a:p>
@@ -703,7 +792,7 @@
           <a:p>
             <a:fld id="{31155545-FFF6-4666-BE18-08518292A6F3}" type="datetimeFigureOut">
               <a:rPr lang="nl-BE" smtClean="0"/>
-              <a:t>7/12/2015</a:t>
+              <a:t>2016-01-05</a:t>
             </a:fld>
             <a:endParaRPr lang="nl-BE"/>
           </a:p>
@@ -873,7 +962,7 @@
           <a:p>
             <a:fld id="{31155545-FFF6-4666-BE18-08518292A6F3}" type="datetimeFigureOut">
               <a:rPr lang="nl-BE" smtClean="0"/>
-              <a:t>7/12/2015</a:t>
+              <a:t>2016-01-05</a:t>
             </a:fld>
             <a:endParaRPr lang="nl-BE"/>
           </a:p>
@@ -1119,7 +1208,7 @@
           <a:p>
             <a:fld id="{31155545-FFF6-4666-BE18-08518292A6F3}" type="datetimeFigureOut">
               <a:rPr lang="nl-BE" smtClean="0"/>
-              <a:t>7/12/2015</a:t>
+              <a:t>2016-01-05</a:t>
             </a:fld>
             <a:endParaRPr lang="nl-BE"/>
           </a:p>
@@ -1407,7 +1496,7 @@
           <a:p>
             <a:fld id="{31155545-FFF6-4666-BE18-08518292A6F3}" type="datetimeFigureOut">
               <a:rPr lang="nl-BE" smtClean="0"/>
-              <a:t>7/12/2015</a:t>
+              <a:t>2016-01-05</a:t>
             </a:fld>
             <a:endParaRPr lang="nl-BE"/>
           </a:p>
@@ -1829,7 +1918,7 @@
           <a:p>
             <a:fld id="{31155545-FFF6-4666-BE18-08518292A6F3}" type="datetimeFigureOut">
               <a:rPr lang="nl-BE" smtClean="0"/>
-              <a:t>7/12/2015</a:t>
+              <a:t>2016-01-05</a:t>
             </a:fld>
             <a:endParaRPr lang="nl-BE"/>
           </a:p>
@@ -1947,7 +2036,7 @@
           <a:p>
             <a:fld id="{31155545-FFF6-4666-BE18-08518292A6F3}" type="datetimeFigureOut">
               <a:rPr lang="nl-BE" smtClean="0"/>
-              <a:t>7/12/2015</a:t>
+              <a:t>2016-01-05</a:t>
             </a:fld>
             <a:endParaRPr lang="nl-BE"/>
           </a:p>
@@ -2042,7 +2131,7 @@
           <a:p>
             <a:fld id="{31155545-FFF6-4666-BE18-08518292A6F3}" type="datetimeFigureOut">
               <a:rPr lang="nl-BE" smtClean="0"/>
-              <a:t>7/12/2015</a:t>
+              <a:t>2016-01-05</a:t>
             </a:fld>
             <a:endParaRPr lang="nl-BE"/>
           </a:p>
@@ -2319,7 +2408,7 @@
           <a:p>
             <a:fld id="{31155545-FFF6-4666-BE18-08518292A6F3}" type="datetimeFigureOut">
               <a:rPr lang="nl-BE" smtClean="0"/>
-              <a:t>7/12/2015</a:t>
+              <a:t>2016-01-05</a:t>
             </a:fld>
             <a:endParaRPr lang="nl-BE"/>
           </a:p>
@@ -2572,7 +2661,7 @@
           <a:p>
             <a:fld id="{31155545-FFF6-4666-BE18-08518292A6F3}" type="datetimeFigureOut">
               <a:rPr lang="nl-BE" smtClean="0"/>
-              <a:t>7/12/2015</a:t>
+              <a:t>2016-01-05</a:t>
             </a:fld>
             <a:endParaRPr lang="nl-BE"/>
           </a:p>
@@ -2785,7 +2874,7 @@
           <a:p>
             <a:fld id="{31155545-FFF6-4666-BE18-08518292A6F3}" type="datetimeFigureOut">
               <a:rPr lang="nl-BE" smtClean="0"/>
-              <a:t>7/12/2015</a:t>
+              <a:t>2016-01-05</a:t>
             </a:fld>
             <a:endParaRPr lang="nl-BE"/>
           </a:p>
@@ -8803,15 +8892,7 @@
             <a:pPr lvl="1"/>
             <a:r>
               <a:rPr lang="en-US" dirty="0" smtClean="0"/>
-              <a:t>Shows revision </a:t>
-            </a:r>
-            <a:r>
-              <a:rPr lang="en-US" dirty="0" smtClean="0"/>
-              <a:t>IDs and </a:t>
-            </a:r>
-            <a:r>
-              <a:rPr lang="en-US" dirty="0" smtClean="0"/>
-              <a:t>messages associated with </a:t>
+              <a:t>Shows revision IDs and messages associated with </a:t>
             </a:r>
             <a:r>
               <a:rPr lang="en-US" dirty="0" err="1" smtClean="0"/>
@@ -9062,14 +9143,7 @@
                 <a:latin typeface="Courier New" pitchFamily="49" charset="0"/>
                 <a:cs typeface="Courier New" pitchFamily="49" charset="0"/>
               </a:rPr>
-              <a:t>  </a:t>
-            </a:r>
-            <a:r>
-              <a:rPr lang="nl-BE" dirty="0" smtClean="0">
-                <a:latin typeface="Courier New" pitchFamily="49" charset="0"/>
-                <a:cs typeface="Courier New" pitchFamily="49" charset="0"/>
-              </a:rPr>
-              <a:t>2ad89a3  </a:t>
+              <a:t>  2ad89a3  </a:t>
             </a:r>
             <a:r>
               <a:rPr lang="nl-BE" dirty="0" err="1" smtClean="0">
@@ -14879,21 +14953,7 @@
                 <a:latin typeface="Courier New" pitchFamily="49" charset="0"/>
                 <a:cs typeface="Courier New" pitchFamily="49" charset="0"/>
               </a:rPr>
-              <a:t>$ </a:t>
-            </a:r>
-            <a:r>
-              <a:rPr lang="nl-BE" dirty="0" smtClean="0">
-                <a:latin typeface="Courier New" pitchFamily="49" charset="0"/>
-                <a:cs typeface="Courier New" pitchFamily="49" charset="0"/>
-              </a:rPr>
-              <a:t>git </a:t>
-            </a:r>
-            <a:r>
-              <a:rPr lang="nl-BE" dirty="0" smtClean="0">
-                <a:latin typeface="Courier New" pitchFamily="49" charset="0"/>
-                <a:cs typeface="Courier New" pitchFamily="49" charset="0"/>
-              </a:rPr>
-              <a:t>reset  --hard  HEAD^</a:t>
+              <a:t>$ git reset  --hard  HEAD^</a:t>
             </a:r>
           </a:p>
         </p:txBody>
@@ -14930,14 +14990,7 @@
                 <a:latin typeface="Courier New" pitchFamily="49" charset="0"/>
                 <a:cs typeface="Courier New" pitchFamily="49" charset="0"/>
               </a:rPr>
-              <a:t>$ </a:t>
-            </a:r>
-            <a:r>
-              <a:rPr lang="nl-BE" dirty="0" smtClean="0">
-                <a:latin typeface="Courier New" pitchFamily="49" charset="0"/>
-                <a:cs typeface="Courier New" pitchFamily="49" charset="0"/>
-              </a:rPr>
-              <a:t>git </a:t>
+              <a:t>$ git </a:t>
             </a:r>
             <a:r>
               <a:rPr lang="nl-BE" dirty="0" err="1" smtClean="0">
@@ -16117,33 +16170,22 @@
                 <a:latin typeface="Courier New" pitchFamily="49" charset="0"/>
                 <a:cs typeface="Courier New" pitchFamily="49" charset="0"/>
               </a:rPr>
-              <a:t>$ </a:t>
+              <a:t>$ git </a:t>
+            </a:r>
+            <a:r>
+              <a:rPr lang="nl-BE" dirty="0">
+                <a:latin typeface="Courier New" pitchFamily="49" charset="0"/>
+                <a:cs typeface="Courier New" pitchFamily="49" charset="0"/>
+              </a:rPr>
+              <a:t>show  </a:t>
             </a:r>
             <a:r>
               <a:rPr lang="nl-BE" dirty="0" smtClean="0">
                 <a:latin typeface="Courier New" pitchFamily="49" charset="0"/>
                 <a:cs typeface="Courier New" pitchFamily="49" charset="0"/>
               </a:rPr>
-              <a:t>git </a:t>
-            </a:r>
-            <a:r>
-              <a:rPr lang="nl-BE" dirty="0">
-                <a:latin typeface="Courier New" pitchFamily="49" charset="0"/>
-                <a:cs typeface="Courier New" pitchFamily="49" charset="0"/>
-              </a:rPr>
-              <a:t>show  </a:t>
-            </a:r>
-            <a:r>
-              <a:rPr lang="nl-BE" dirty="0" smtClean="0">
-                <a:latin typeface="Courier New" pitchFamily="49" charset="0"/>
-                <a:cs typeface="Courier New" pitchFamily="49" charset="0"/>
-              </a:rPr>
               <a:t>0ba188919fe:eq.c</a:t>
             </a:r>
-            <a:endParaRPr lang="nl-BE" dirty="0" smtClean="0">
-              <a:latin typeface="Courier New" pitchFamily="49" charset="0"/>
-              <a:cs typeface="Courier New" pitchFamily="49" charset="0"/>
-            </a:endParaRPr>
           </a:p>
         </p:txBody>
       </p:sp>
@@ -16179,14 +16221,7 @@
                 <a:latin typeface="Courier New" pitchFamily="49" charset="0"/>
                 <a:cs typeface="Courier New" pitchFamily="49" charset="0"/>
               </a:rPr>
-              <a:t>$ </a:t>
-            </a:r>
-            <a:r>
-              <a:rPr lang="nl-BE" dirty="0" smtClean="0">
-                <a:latin typeface="Courier New" pitchFamily="49" charset="0"/>
-                <a:cs typeface="Courier New" pitchFamily="49" charset="0"/>
-              </a:rPr>
-              <a:t>git </a:t>
+              <a:t>$ git </a:t>
             </a:r>
             <a:r>
               <a:rPr lang="nl-BE" dirty="0">
@@ -16248,33 +16283,22 @@
                 <a:latin typeface="Courier New" pitchFamily="49" charset="0"/>
                 <a:cs typeface="Courier New" pitchFamily="49" charset="0"/>
               </a:rPr>
-              <a:t>$ </a:t>
+              <a:t>$ git </a:t>
+            </a:r>
+            <a:r>
+              <a:rPr lang="nl-BE" dirty="0">
+                <a:latin typeface="Courier New" pitchFamily="49" charset="0"/>
+                <a:cs typeface="Courier New" pitchFamily="49" charset="0"/>
+              </a:rPr>
+              <a:t>show  </a:t>
             </a:r>
             <a:r>
               <a:rPr lang="nl-BE" dirty="0" smtClean="0">
                 <a:latin typeface="Courier New" pitchFamily="49" charset="0"/>
                 <a:cs typeface="Courier New" pitchFamily="49" charset="0"/>
               </a:rPr>
-              <a:t>git </a:t>
-            </a:r>
-            <a:r>
-              <a:rPr lang="nl-BE" dirty="0">
-                <a:latin typeface="Courier New" pitchFamily="49" charset="0"/>
-                <a:cs typeface="Courier New" pitchFamily="49" charset="0"/>
-              </a:rPr>
-              <a:t>show  </a:t>
-            </a:r>
-            <a:r>
-              <a:rPr lang="nl-BE" dirty="0" smtClean="0">
-                <a:latin typeface="Courier New" pitchFamily="49" charset="0"/>
-                <a:cs typeface="Courier New" pitchFamily="49" charset="0"/>
-              </a:rPr>
               <a:t>HEAD</a:t>
             </a:r>
-            <a:endParaRPr lang="nl-BE" dirty="0" smtClean="0">
-              <a:latin typeface="Courier New" pitchFamily="49" charset="0"/>
-              <a:cs typeface="Courier New" pitchFamily="49" charset="0"/>
-            </a:endParaRPr>
           </a:p>
         </p:txBody>
       </p:sp>
@@ -16310,33 +16334,22 @@
                 <a:latin typeface="Courier New" pitchFamily="49" charset="0"/>
                 <a:cs typeface="Courier New" pitchFamily="49" charset="0"/>
               </a:rPr>
-              <a:t>$ </a:t>
+              <a:t>$ git </a:t>
+            </a:r>
+            <a:r>
+              <a:rPr lang="nl-BE" dirty="0">
+                <a:latin typeface="Courier New" pitchFamily="49" charset="0"/>
+                <a:cs typeface="Courier New" pitchFamily="49" charset="0"/>
+              </a:rPr>
+              <a:t>show </a:t>
             </a:r>
             <a:r>
               <a:rPr lang="nl-BE" dirty="0" smtClean="0">
                 <a:latin typeface="Courier New" pitchFamily="49" charset="0"/>
                 <a:cs typeface="Courier New" pitchFamily="49" charset="0"/>
               </a:rPr>
-              <a:t>git </a:t>
-            </a:r>
-            <a:r>
-              <a:rPr lang="nl-BE" dirty="0">
-                <a:latin typeface="Courier New" pitchFamily="49" charset="0"/>
-                <a:cs typeface="Courier New" pitchFamily="49" charset="0"/>
-              </a:rPr>
-              <a:t>show </a:t>
-            </a:r>
-            <a:r>
-              <a:rPr lang="nl-BE" dirty="0" smtClean="0">
-                <a:latin typeface="Courier New" pitchFamily="49" charset="0"/>
-                <a:cs typeface="Courier New" pitchFamily="49" charset="0"/>
-              </a:rPr>
               <a:t>0ba188919fe</a:t>
             </a:r>
-            <a:endParaRPr lang="nl-BE" dirty="0" smtClean="0">
-              <a:latin typeface="Courier New" pitchFamily="49" charset="0"/>
-              <a:cs typeface="Courier New" pitchFamily="49" charset="0"/>
-            </a:endParaRPr>
           </a:p>
         </p:txBody>
       </p:sp>
@@ -31039,8 +31052,22 @@
           <a:p>
             <a:r>
               <a:rPr lang="en-US" dirty="0" smtClean="0"/>
-              <a:t>Micro-managing commits</a:t>
-            </a:r>
+              <a:t>Micro-managing </a:t>
+            </a:r>
+            <a:r>
+              <a:rPr lang="en-US" dirty="0" smtClean="0"/>
+              <a:t>commits</a:t>
+            </a:r>
+          </a:p>
+          <a:p>
+            <a:endParaRPr lang="en-US" dirty="0"/>
+          </a:p>
+          <a:p>
+            <a:r>
+              <a:rPr lang="en-US" dirty="0" smtClean="0"/>
+              <a:t>Added description to branch</a:t>
+            </a:r>
+            <a:endParaRPr lang="en-US" dirty="0" smtClean="0"/>
           </a:p>
         </p:txBody>
       </p:sp>
@@ -31052,7 +31079,7 @@
         </p:nvSpPr>
         <p:spPr>
           <a:xfrm>
-            <a:off x="1259632" y="2204864"/>
+            <a:off x="899592" y="2204864"/>
             <a:ext cx="3600400" cy="369332"/>
           </a:xfrm>
           <a:prstGeom prst="rect">
@@ -31103,7 +31130,7 @@
         </p:nvSpPr>
         <p:spPr>
           <a:xfrm>
-            <a:off x="1259632" y="3356992"/>
+            <a:off x="899592" y="3356992"/>
             <a:ext cx="3600400" cy="369332"/>
           </a:xfrm>
           <a:prstGeom prst="rect">
@@ -31140,7 +31167,7 @@
         </p:nvSpPr>
         <p:spPr>
           <a:xfrm>
-            <a:off x="1259632" y="4509120"/>
+            <a:off x="899592" y="4509120"/>
             <a:ext cx="3600400" cy="369332"/>
           </a:xfrm>
           <a:prstGeom prst="rect">
@@ -31180,6 +31207,179 @@
               </a:rPr>
               <a:t>  -p  …</a:t>
             </a:r>
+          </a:p>
+        </p:txBody>
+      </p:sp>
+      <p:sp>
+        <p:nvSpPr>
+          <p:cNvPr id="7" name="TextBox 6"/>
+          <p:cNvSpPr txBox="1"/>
+          <p:nvPr/>
+        </p:nvSpPr>
+        <p:spPr>
+          <a:xfrm>
+            <a:off x="899592" y="5678500"/>
+            <a:ext cx="6552728" cy="369332"/>
+          </a:xfrm>
+          <a:prstGeom prst="rect">
+            <a:avLst/>
+          </a:prstGeom>
+          <a:noFill/>
+          <a:ln>
+            <a:solidFill>
+              <a:schemeClr val="tx1"/>
+            </a:solidFill>
+          </a:ln>
+        </p:spPr>
+        <p:txBody>
+          <a:bodyPr wrap="square" rtlCol="0">
+            <a:spAutoFit/>
+          </a:bodyPr>
+          <a:lstStyle/>
+          <a:p>
+            <a:r>
+              <a:rPr lang="nl-BE" dirty="0" smtClean="0">
+                <a:latin typeface="Courier New" pitchFamily="49" charset="0"/>
+                <a:cs typeface="Courier New" pitchFamily="49" charset="0"/>
+              </a:rPr>
+              <a:t>$ git </a:t>
+            </a:r>
+            <a:r>
+              <a:rPr lang="nl-BE" dirty="0" err="1" smtClean="0">
+                <a:latin typeface="Courier New" pitchFamily="49" charset="0"/>
+                <a:cs typeface="Courier New" pitchFamily="49" charset="0"/>
+              </a:rPr>
+              <a:t>branch</a:t>
+            </a:r>
+            <a:r>
+              <a:rPr lang="nl-BE" dirty="0" smtClean="0">
+                <a:latin typeface="Courier New" pitchFamily="49" charset="0"/>
+                <a:cs typeface="Courier New" pitchFamily="49" charset="0"/>
+              </a:rPr>
+              <a:t>  --</a:t>
+            </a:r>
+            <a:r>
+              <a:rPr lang="nl-BE" dirty="0" err="1" smtClean="0">
+                <a:latin typeface="Courier New" pitchFamily="49" charset="0"/>
+                <a:cs typeface="Courier New" pitchFamily="49" charset="0"/>
+              </a:rPr>
+              <a:t>edit-description</a:t>
+            </a:r>
+            <a:endParaRPr lang="nl-BE" dirty="0" smtClean="0">
+              <a:latin typeface="Courier New" pitchFamily="49" charset="0"/>
+              <a:cs typeface="Courier New" pitchFamily="49" charset="0"/>
+            </a:endParaRPr>
+          </a:p>
+        </p:txBody>
+      </p:sp>
+      <p:sp>
+        <p:nvSpPr>
+          <p:cNvPr id="8" name="TextBox 7"/>
+          <p:cNvSpPr txBox="1"/>
+          <p:nvPr/>
+        </p:nvSpPr>
+        <p:spPr>
+          <a:xfrm>
+            <a:off x="899592" y="6237312"/>
+            <a:ext cx="6552728" cy="369332"/>
+          </a:xfrm>
+          <a:prstGeom prst="rect">
+            <a:avLst/>
+          </a:prstGeom>
+          <a:noFill/>
+          <a:ln>
+            <a:solidFill>
+              <a:schemeClr val="tx1"/>
+            </a:solidFill>
+          </a:ln>
+        </p:spPr>
+        <p:txBody>
+          <a:bodyPr wrap="square" rtlCol="0">
+            <a:spAutoFit/>
+          </a:bodyPr>
+          <a:lstStyle/>
+          <a:p>
+            <a:r>
+              <a:rPr lang="nl-BE" dirty="0" smtClean="0">
+                <a:latin typeface="Courier New" pitchFamily="49" charset="0"/>
+                <a:cs typeface="Courier New" pitchFamily="49" charset="0"/>
+              </a:rPr>
+              <a:t>$ git </a:t>
+            </a:r>
+            <a:r>
+              <a:rPr lang="nl-BE" dirty="0" err="1" smtClean="0">
+                <a:latin typeface="Courier New" pitchFamily="49" charset="0"/>
+                <a:cs typeface="Courier New" pitchFamily="49" charset="0"/>
+              </a:rPr>
+              <a:t>config</a:t>
+            </a:r>
+            <a:r>
+              <a:rPr lang="nl-BE" dirty="0" smtClean="0">
+                <a:latin typeface="Courier New" pitchFamily="49" charset="0"/>
+                <a:cs typeface="Courier New" pitchFamily="49" charset="0"/>
+              </a:rPr>
+              <a:t>  </a:t>
+            </a:r>
+            <a:r>
+              <a:rPr lang="nl-BE" dirty="0" err="1" smtClean="0">
+                <a:latin typeface="Courier New" pitchFamily="49" charset="0"/>
+                <a:cs typeface="Courier New" pitchFamily="49" charset="0"/>
+              </a:rPr>
+              <a:t>branch</a:t>
+            </a:r>
+            <a:r>
+              <a:rPr lang="nl-BE" dirty="0" smtClean="0">
+                <a:latin typeface="Courier New" pitchFamily="49" charset="0"/>
+                <a:cs typeface="Courier New" pitchFamily="49" charset="0"/>
+              </a:rPr>
+              <a:t>.&lt;</a:t>
+            </a:r>
+            <a:r>
+              <a:rPr lang="nl-BE" dirty="0" err="1" smtClean="0">
+                <a:latin typeface="Courier New" pitchFamily="49" charset="0"/>
+                <a:cs typeface="Courier New" pitchFamily="49" charset="0"/>
+              </a:rPr>
+              <a:t>branch-name.description</a:t>
+            </a:r>
+            <a:endParaRPr lang="nl-BE" dirty="0" smtClean="0">
+              <a:latin typeface="Courier New" pitchFamily="49" charset="0"/>
+              <a:cs typeface="Courier New" pitchFamily="49" charset="0"/>
+            </a:endParaRPr>
+          </a:p>
+        </p:txBody>
+      </p:sp>
+      <p:sp>
+        <p:nvSpPr>
+          <p:cNvPr id="9" name="TextBox 8"/>
+          <p:cNvSpPr txBox="1"/>
+          <p:nvPr/>
+        </p:nvSpPr>
+        <p:spPr>
+          <a:xfrm>
+            <a:off x="7168547" y="5157192"/>
+            <a:ext cx="1723933" cy="369332"/>
+          </a:xfrm>
+          <a:prstGeom prst="rect">
+            <a:avLst/>
+          </a:prstGeom>
+          <a:noFill/>
+          <a:ln>
+            <a:solidFill>
+              <a:schemeClr val="tx1"/>
+            </a:solidFill>
+          </a:ln>
+        </p:spPr>
+        <p:txBody>
+          <a:bodyPr wrap="none" rtlCol="0">
+            <a:spAutoFit/>
+          </a:bodyPr>
+          <a:lstStyle/>
+          <a:p>
+            <a:r>
+              <a:rPr lang="en-US" dirty="0" smtClean="0"/>
+              <a:t>Note: only local!</a:t>
+            </a:r>
+            <a:endParaRPr lang="nl-BE" dirty="0"/>
           </a:p>
         </p:txBody>
       </p:sp>
@@ -31432,6 +31632,154 @@
                       </p:childTnLst>
                     </p:cTn>
                   </p:par>
+                  <p:par>
+                    <p:cTn id="21" fill="hold">
+                      <p:stCondLst>
+                        <p:cond delay="indefinite"/>
+                      </p:stCondLst>
+                      <p:childTnLst>
+                        <p:par>
+                          <p:cTn id="22" fill="hold">
+                            <p:stCondLst>
+                              <p:cond delay="0"/>
+                            </p:stCondLst>
+                            <p:childTnLst>
+                              <p:par>
+                                <p:cTn id="23" presetID="1" presetClass="entr" presetSubtype="0" fill="hold" grpId="0" nodeType="clickEffect">
+                                  <p:stCondLst>
+                                    <p:cond delay="0"/>
+                                  </p:stCondLst>
+                                  <p:childTnLst>
+                                    <p:set>
+                                      <p:cBhvr>
+                                        <p:cTn id="24" dur="1" fill="hold">
+                                          <p:stCondLst>
+                                            <p:cond delay="0"/>
+                                          </p:stCondLst>
+                                        </p:cTn>
+                                        <p:tgtEl>
+                                          <p:spTgt spid="3">
+                                            <p:txEl>
+                                              <p:pRg st="6" end="6"/>
+                                            </p:txEl>
+                                          </p:spTgt>
+                                        </p:tgtEl>
+                                        <p:attrNameLst>
+                                          <p:attrName>style.visibility</p:attrName>
+                                        </p:attrNameLst>
+                                      </p:cBhvr>
+                                      <p:to>
+                                        <p:strVal val="visible"/>
+                                      </p:to>
+                                    </p:set>
+                                  </p:childTnLst>
+                                </p:cTn>
+                              </p:par>
+                              <p:par>
+                                <p:cTn id="25" presetID="1" presetClass="entr" presetSubtype="0" fill="hold" grpId="0" nodeType="withEffect">
+                                  <p:stCondLst>
+                                    <p:cond delay="0"/>
+                                  </p:stCondLst>
+                                  <p:childTnLst>
+                                    <p:set>
+                                      <p:cBhvr>
+                                        <p:cTn id="26" dur="1" fill="hold">
+                                          <p:stCondLst>
+                                            <p:cond delay="0"/>
+                                          </p:stCondLst>
+                                        </p:cTn>
+                                        <p:tgtEl>
+                                          <p:spTgt spid="7"/>
+                                        </p:tgtEl>
+                                        <p:attrNameLst>
+                                          <p:attrName>style.visibility</p:attrName>
+                                        </p:attrNameLst>
+                                      </p:cBhvr>
+                                      <p:to>
+                                        <p:strVal val="visible"/>
+                                      </p:to>
+                                    </p:set>
+                                  </p:childTnLst>
+                                </p:cTn>
+                              </p:par>
+                              <p:par>
+                                <p:cTn id="27" presetID="1" presetClass="entr" presetSubtype="0" fill="hold" grpId="0" nodeType="withEffect">
+                                  <p:stCondLst>
+                                    <p:cond delay="0"/>
+                                  </p:stCondLst>
+                                  <p:childTnLst>
+                                    <p:set>
+                                      <p:cBhvr>
+                                        <p:cTn id="28" dur="1" fill="hold">
+                                          <p:stCondLst>
+                                            <p:cond delay="0"/>
+                                          </p:stCondLst>
+                                        </p:cTn>
+                                        <p:tgtEl>
+                                          <p:spTgt spid="8"/>
+                                        </p:tgtEl>
+                                        <p:attrNameLst>
+                                          <p:attrName>style.visibility</p:attrName>
+                                        </p:attrNameLst>
+                                      </p:cBhvr>
+                                      <p:to>
+                                        <p:strVal val="visible"/>
+                                      </p:to>
+                                    </p:set>
+                                  </p:childTnLst>
+                                </p:cTn>
+                              </p:par>
+                            </p:childTnLst>
+                          </p:cTn>
+                        </p:par>
+                      </p:childTnLst>
+                    </p:cTn>
+                  </p:par>
+                  <p:par>
+                    <p:cTn id="29" fill="hold">
+                      <p:stCondLst>
+                        <p:cond delay="indefinite"/>
+                      </p:stCondLst>
+                      <p:childTnLst>
+                        <p:par>
+                          <p:cTn id="30" fill="hold">
+                            <p:stCondLst>
+                              <p:cond delay="0"/>
+                            </p:stCondLst>
+                            <p:childTnLst>
+                              <p:par>
+                                <p:cTn id="31" presetID="1" presetClass="entr" presetSubtype="0" fill="hold" grpId="0" nodeType="clickEffect">
+                                  <p:stCondLst>
+                                    <p:cond delay="0"/>
+                                  </p:stCondLst>
+                                  <p:childTnLst>
+                                    <p:set>
+                                      <p:cBhvr>
+                                        <p:cTn id="32" dur="1" fill="hold">
+                                          <p:stCondLst>
+                                            <p:cond delay="0"/>
+                                          </p:stCondLst>
+                                        </p:cTn>
+                                        <p:tgtEl>
+                                          <p:spTgt spid="9"/>
+                                        </p:tgtEl>
+                                        <p:attrNameLst>
+                                          <p:attrName>style.visibility</p:attrName>
+                                        </p:attrNameLst>
+                                      </p:cBhvr>
+                                      <p:to>
+                                        <p:strVal val="visible"/>
+                                      </p:to>
+                                    </p:set>
+                                  </p:childTnLst>
+                                </p:cTn>
+                              </p:par>
+                            </p:childTnLst>
+                          </p:cTn>
+                        </p:par>
+                      </p:childTnLst>
+                    </p:cTn>
+                  </p:par>
                 </p:childTnLst>
               </p:cTn>
               <p:prevCondLst>
@@ -31458,6 +31806,9 @@
       <p:bldP spid="4" grpId="0" animBg="1"/>
       <p:bldP spid="5" grpId="0" animBg="1"/>
       <p:bldP spid="6" grpId="0" animBg="1"/>
+      <p:bldP spid="7" grpId="0" animBg="1"/>
+      <p:bldP spid="8" grpId="0" animBg="1"/>
+      <p:bldP spid="9" grpId="0" animBg="1"/>
     </p:bldLst>
   </p:timing>
 </p:sld>
@@ -31497,9 +31848,9 @@
           <a:p>
             <a:r>
               <a:rPr lang="en-US" dirty="0" smtClean="0"/>
-              <a:t>Getting More information</a:t>
-            </a:r>
-            <a:endParaRPr lang="en-US" dirty="0"/>
+              <a:t>Conclusions</a:t>
+            </a:r>
+            <a:endParaRPr lang="nl-BE" dirty="0"/>
           </a:p>
         </p:txBody>
       </p:sp>
@@ -31518,14 +31869,14 @@
           <a:bodyPr/>
           <a:lstStyle/>
           <a:p>
-            <a:endParaRPr lang="en-US"/>
+            <a:endParaRPr lang="nl-BE"/>
           </a:p>
         </p:txBody>
       </p:sp>
     </p:spTree>
     <p:extLst>
       <p:ext uri="{BB962C8B-B14F-4D97-AF65-F5344CB8AC3E}">
-        <p14:creationId xmlns:p14="http://schemas.microsoft.com/office/powerpoint/2010/main" val="2688556715"/>
+        <p14:creationId xmlns:p14="http://schemas.microsoft.com/office/powerpoint/2010/main" val="2763237186"/>
       </p:ext>
     </p:extLst>
   </p:cSld>
@@ -32223,85 +32574,6 @@
 </file>
 
 <file path=ppt/slides/slide50.xml><?xml version="1.0" encoding="utf-8"?>
-<p:sld xmlns:a="http://schemas.openxmlformats.org/drawingml/2006/main" xmlns:r="http://schemas.openxmlformats.org/officeDocument/2006/relationships" xmlns:p="http://schemas.openxmlformats.org/presentationml/2006/main">
-  <p:cSld>
-    <p:spTree>
-      <p:nvGrpSpPr>
-        <p:cNvPr id="1" name=""/>
-        <p:cNvGrpSpPr/>
-        <p:nvPr/>
-      </p:nvGrpSpPr>
-      <p:grpSpPr>
-        <a:xfrm>
-          <a:off x="0" y="0"/>
-          <a:ext cx="0" cy="0"/>
-          <a:chOff x="0" y="0"/>
-          <a:chExt cx="0" cy="0"/>
-        </a:xfrm>
-      </p:grpSpPr>
-      <p:sp>
-        <p:nvSpPr>
-          <p:cNvPr id="2" name="Title 1"/>
-          <p:cNvSpPr>
-            <a:spLocks noGrp="1"/>
-          </p:cNvSpPr>
-          <p:nvPr>
-            <p:ph type="title"/>
-          </p:nvPr>
-        </p:nvSpPr>
-        <p:spPr/>
-        <p:txBody>
-          <a:bodyPr/>
-          <a:lstStyle/>
-          <a:p>
-            <a:r>
-              <a:rPr lang="en-US" dirty="0" smtClean="0"/>
-              <a:t>Conclusions</a:t>
-            </a:r>
-            <a:endParaRPr lang="nl-BE" dirty="0"/>
-          </a:p>
-        </p:txBody>
-      </p:sp>
-      <p:sp>
-        <p:nvSpPr>
-          <p:cNvPr id="3" name="Text Placeholder 2"/>
-          <p:cNvSpPr>
-            <a:spLocks noGrp="1"/>
-          </p:cNvSpPr>
-          <p:nvPr>
-            <p:ph type="body" idx="1"/>
-          </p:nvPr>
-        </p:nvSpPr>
-        <p:spPr/>
-        <p:txBody>
-          <a:bodyPr/>
-          <a:lstStyle/>
-          <a:p>
-            <a:endParaRPr lang="nl-BE"/>
-          </a:p>
-        </p:txBody>
-      </p:sp>
-    </p:spTree>
-    <p:extLst>
-      <p:ext uri="{BB962C8B-B14F-4D97-AF65-F5344CB8AC3E}">
-        <p14:creationId xmlns:p14="http://schemas.microsoft.com/office/powerpoint/2010/main" val="2763237186"/>
-      </p:ext>
-    </p:extLst>
-  </p:cSld>
-  <p:clrMapOvr>
-    <a:masterClrMapping/>
-  </p:clrMapOvr>
-  <p:timing>
-    <p:tnLst>
-      <p:par>
-        <p:cTn id="1" dur="indefinite" restart="never" nodeType="tmRoot"/>
-      </p:par>
-    </p:tnLst>
-  </p:timing>
-</p:sld>
-</file>
-
-<file path=ppt/slides/slide51.xml><?xml version="1.0" encoding="utf-8"?>
 <p:sld xmlns:a="http://schemas.openxmlformats.org/drawingml/2006/main" xmlns:r="http://schemas.openxmlformats.org/officeDocument/2006/relationships" xmlns:p="http://schemas.openxmlformats.org/presentationml/2006/main">
   <p:cSld>
     <p:spTree>

</xml_diff>

<commit_message>
Added cherry-picking command; added slides on creating archives
</commit_message>
<xml_diff>
--- a/LinuxTools/VersionControl/version_control_git.pptx
+++ b/LinuxTools/VersionControl/version_control_git.pptx
@@ -52,9 +52,10 @@
     <p:sldId id="304" r:id="rId46"/>
     <p:sldId id="305" r:id="rId47"/>
     <p:sldId id="307" r:id="rId48"/>
-    <p:sldId id="300" r:id="rId49"/>
-    <p:sldId id="299" r:id="rId50"/>
-    <p:sldId id="301" r:id="rId51"/>
+    <p:sldId id="309" r:id="rId49"/>
+    <p:sldId id="300" r:id="rId50"/>
+    <p:sldId id="299" r:id="rId51"/>
+    <p:sldId id="301" r:id="rId52"/>
   </p:sldIdLst>
   <p:sldSz cx="9144000" cy="6858000" type="screen4x3"/>
   <p:notesSz cx="6858000" cy="9144000"/>
@@ -217,6 +218,7 @@
             <p14:sldId id="304"/>
             <p14:sldId id="305"/>
             <p14:sldId id="307"/>
+            <p14:sldId id="309"/>
           </p14:sldIdLst>
         </p14:section>
         <p14:section name="Conclusions" id="{DDEBC1E0-752D-48F0-A4FC-55A760B7B208}">
@@ -442,7 +444,7 @@
           <a:p>
             <a:fld id="{31155545-FFF6-4666-BE18-08518292A6F3}" type="datetimeFigureOut">
               <a:rPr lang="nl-BE" smtClean="0"/>
-              <a:t>2016-01-05</a:t>
+              <a:t>2016-01-13</a:t>
             </a:fld>
             <a:endParaRPr lang="nl-BE"/>
           </a:p>
@@ -612,7 +614,7 @@
           <a:p>
             <a:fld id="{31155545-FFF6-4666-BE18-08518292A6F3}" type="datetimeFigureOut">
               <a:rPr lang="nl-BE" smtClean="0"/>
-              <a:t>2016-01-05</a:t>
+              <a:t>2016-01-13</a:t>
             </a:fld>
             <a:endParaRPr lang="nl-BE"/>
           </a:p>
@@ -792,7 +794,7 @@
           <a:p>
             <a:fld id="{31155545-FFF6-4666-BE18-08518292A6F3}" type="datetimeFigureOut">
               <a:rPr lang="nl-BE" smtClean="0"/>
-              <a:t>2016-01-05</a:t>
+              <a:t>2016-01-13</a:t>
             </a:fld>
             <a:endParaRPr lang="nl-BE"/>
           </a:p>
@@ -962,7 +964,7 @@
           <a:p>
             <a:fld id="{31155545-FFF6-4666-BE18-08518292A6F3}" type="datetimeFigureOut">
               <a:rPr lang="nl-BE" smtClean="0"/>
-              <a:t>2016-01-05</a:t>
+              <a:t>2016-01-13</a:t>
             </a:fld>
             <a:endParaRPr lang="nl-BE"/>
           </a:p>
@@ -1208,7 +1210,7 @@
           <a:p>
             <a:fld id="{31155545-FFF6-4666-BE18-08518292A6F3}" type="datetimeFigureOut">
               <a:rPr lang="nl-BE" smtClean="0"/>
-              <a:t>2016-01-05</a:t>
+              <a:t>2016-01-13</a:t>
             </a:fld>
             <a:endParaRPr lang="nl-BE"/>
           </a:p>
@@ -1496,7 +1498,7 @@
           <a:p>
             <a:fld id="{31155545-FFF6-4666-BE18-08518292A6F3}" type="datetimeFigureOut">
               <a:rPr lang="nl-BE" smtClean="0"/>
-              <a:t>2016-01-05</a:t>
+              <a:t>2016-01-13</a:t>
             </a:fld>
             <a:endParaRPr lang="nl-BE"/>
           </a:p>
@@ -1918,7 +1920,7 @@
           <a:p>
             <a:fld id="{31155545-FFF6-4666-BE18-08518292A6F3}" type="datetimeFigureOut">
               <a:rPr lang="nl-BE" smtClean="0"/>
-              <a:t>2016-01-05</a:t>
+              <a:t>2016-01-13</a:t>
             </a:fld>
             <a:endParaRPr lang="nl-BE"/>
           </a:p>
@@ -2036,7 +2038,7 @@
           <a:p>
             <a:fld id="{31155545-FFF6-4666-BE18-08518292A6F3}" type="datetimeFigureOut">
               <a:rPr lang="nl-BE" smtClean="0"/>
-              <a:t>2016-01-05</a:t>
+              <a:t>2016-01-13</a:t>
             </a:fld>
             <a:endParaRPr lang="nl-BE"/>
           </a:p>
@@ -2131,7 +2133,7 @@
           <a:p>
             <a:fld id="{31155545-FFF6-4666-BE18-08518292A6F3}" type="datetimeFigureOut">
               <a:rPr lang="nl-BE" smtClean="0"/>
-              <a:t>2016-01-05</a:t>
+              <a:t>2016-01-13</a:t>
             </a:fld>
             <a:endParaRPr lang="nl-BE"/>
           </a:p>
@@ -2408,7 +2410,7 @@
           <a:p>
             <a:fld id="{31155545-FFF6-4666-BE18-08518292A6F3}" type="datetimeFigureOut">
               <a:rPr lang="nl-BE" smtClean="0"/>
-              <a:t>2016-01-05</a:t>
+              <a:t>2016-01-13</a:t>
             </a:fld>
             <a:endParaRPr lang="nl-BE"/>
           </a:p>
@@ -2661,7 +2663,7 @@
           <a:p>
             <a:fld id="{31155545-FFF6-4666-BE18-08518292A6F3}" type="datetimeFigureOut">
               <a:rPr lang="nl-BE" smtClean="0"/>
-              <a:t>2016-01-05</a:t>
+              <a:t>2016-01-13</a:t>
             </a:fld>
             <a:endParaRPr lang="nl-BE"/>
           </a:p>
@@ -2874,7 +2876,7 @@
           <a:p>
             <a:fld id="{31155545-FFF6-4666-BE18-08518292A6F3}" type="datetimeFigureOut">
               <a:rPr lang="nl-BE" smtClean="0"/>
-              <a:t>2016-01-05</a:t>
+              <a:t>2016-01-13</a:t>
             </a:fld>
             <a:endParaRPr lang="nl-BE"/>
           </a:p>
@@ -31056,8 +31058,9 @@
             </a:r>
             <a:r>
               <a:rPr lang="en-US" dirty="0" smtClean="0"/>
-              <a:t>commits</a:t>
-            </a:r>
+              <a:t>commits/merges</a:t>
+            </a:r>
+            <a:endParaRPr lang="en-US" dirty="0" smtClean="0"/>
           </a:p>
           <a:p>
             <a:endParaRPr lang="en-US" dirty="0"/>
@@ -31067,7 +31070,6 @@
               <a:rPr lang="en-US" dirty="0" smtClean="0"/>
               <a:t>Added description to branch</a:t>
             </a:r>
-            <a:endParaRPr lang="en-US" dirty="0" smtClean="0"/>
           </a:p>
         </p:txBody>
       </p:sp>
@@ -31079,7 +31081,7 @@
         </p:nvSpPr>
         <p:spPr>
           <a:xfrm>
-            <a:off x="899592" y="2204864"/>
+            <a:off x="683568" y="2204864"/>
             <a:ext cx="3600400" cy="369332"/>
           </a:xfrm>
           <a:prstGeom prst="rect">
@@ -31130,7 +31132,7 @@
         </p:nvSpPr>
         <p:spPr>
           <a:xfrm>
-            <a:off x="899592" y="3356992"/>
+            <a:off x="683568" y="3356992"/>
             <a:ext cx="3600400" cy="369332"/>
           </a:xfrm>
           <a:prstGeom prst="rect">
@@ -31167,7 +31169,7 @@
         </p:nvSpPr>
         <p:spPr>
           <a:xfrm>
-            <a:off x="899592" y="4509120"/>
+            <a:off x="683568" y="4509120"/>
             <a:ext cx="3600400" cy="369332"/>
           </a:xfrm>
           <a:prstGeom prst="rect">
@@ -31218,7 +31220,7 @@
         </p:nvSpPr>
         <p:spPr>
           <a:xfrm>
-            <a:off x="899592" y="5678500"/>
+            <a:off x="683568" y="5678500"/>
             <a:ext cx="6552728" cy="369332"/>
           </a:xfrm>
           <a:prstGeom prst="rect">
@@ -31280,7 +31282,7 @@
         </p:nvSpPr>
         <p:spPr>
           <a:xfrm>
-            <a:off x="899592" y="6237312"/>
+            <a:off x="683568" y="6237312"/>
             <a:ext cx="6552728" cy="369332"/>
           </a:xfrm>
           <a:prstGeom prst="rect">
@@ -31356,7 +31358,7 @@
         </p:nvSpPr>
         <p:spPr>
           <a:xfrm>
-            <a:off x="7168547" y="5157192"/>
+            <a:off x="6952523" y="5157192"/>
             <a:ext cx="1723933" cy="369332"/>
           </a:xfrm>
           <a:prstGeom prst="rect">
@@ -31380,6 +31382,68 @@
               <a:t>Note: only local!</a:t>
             </a:r>
             <a:endParaRPr lang="nl-BE" dirty="0"/>
+          </a:p>
+        </p:txBody>
+      </p:sp>
+      <p:sp>
+        <p:nvSpPr>
+          <p:cNvPr id="10" name="TextBox 9"/>
+          <p:cNvSpPr txBox="1"/>
+          <p:nvPr/>
+        </p:nvSpPr>
+        <p:spPr>
+          <a:xfrm>
+            <a:off x="4355976" y="4509120"/>
+            <a:ext cx="4557192" cy="369332"/>
+          </a:xfrm>
+          <a:prstGeom prst="rect">
+            <a:avLst/>
+          </a:prstGeom>
+          <a:noFill/>
+          <a:ln>
+            <a:solidFill>
+              <a:schemeClr val="tx1"/>
+            </a:solidFill>
+          </a:ln>
+        </p:spPr>
+        <p:txBody>
+          <a:bodyPr wrap="square" rtlCol="0">
+            <a:spAutoFit/>
+          </a:bodyPr>
+          <a:lstStyle/>
+          <a:p>
+            <a:r>
+              <a:rPr lang="nl-BE" dirty="0" smtClean="0">
+                <a:latin typeface="Courier New" pitchFamily="49" charset="0"/>
+                <a:cs typeface="Courier New" pitchFamily="49" charset="0"/>
+              </a:rPr>
+              <a:t>$ git </a:t>
+            </a:r>
+            <a:r>
+              <a:rPr lang="nl-BE" dirty="0" err="1" smtClean="0">
+                <a:latin typeface="Courier New" pitchFamily="49" charset="0"/>
+                <a:cs typeface="Courier New" pitchFamily="49" charset="0"/>
+              </a:rPr>
+              <a:t>cherry-pick</a:t>
+            </a:r>
+            <a:r>
+              <a:rPr lang="nl-BE" dirty="0">
+                <a:latin typeface="Courier New" pitchFamily="49" charset="0"/>
+                <a:cs typeface="Courier New" pitchFamily="49" charset="0"/>
+              </a:rPr>
+              <a:t> </a:t>
+            </a:r>
+            <a:r>
+              <a:rPr lang="nl-BE" dirty="0" smtClean="0">
+                <a:latin typeface="Courier New" pitchFamily="49" charset="0"/>
+                <a:cs typeface="Courier New" pitchFamily="49" charset="0"/>
+              </a:rPr>
+              <a:t> 0ba188919fec</a:t>
+            </a:r>
+            <a:endParaRPr lang="nl-BE" dirty="0" smtClean="0">
+              <a:latin typeface="Courier New" pitchFamily="49" charset="0"/>
+              <a:cs typeface="Courier New" pitchFamily="49" charset="0"/>
+            </a:endParaRPr>
           </a:p>
         </p:txBody>
       </p:sp>
@@ -31626,43 +31690,21 @@
                                   </p:childTnLst>
                                 </p:cTn>
                               </p:par>
-                            </p:childTnLst>
-                          </p:cTn>
-                        </p:par>
-                      </p:childTnLst>
-                    </p:cTn>
-                  </p:par>
-                  <p:par>
-                    <p:cTn id="21" fill="hold">
-                      <p:stCondLst>
-                        <p:cond delay="indefinite"/>
-                      </p:stCondLst>
-                      <p:childTnLst>
-                        <p:par>
-                          <p:cTn id="22" fill="hold">
-                            <p:stCondLst>
-                              <p:cond delay="0"/>
-                            </p:stCondLst>
-                            <p:childTnLst>
                               <p:par>
-                                <p:cTn id="23" presetID="1" presetClass="entr" presetSubtype="0" fill="hold" grpId="0" nodeType="clickEffect">
+                                <p:cTn id="21" presetID="1" presetClass="entr" presetSubtype="0" fill="hold" grpId="0" nodeType="withEffect">
                                   <p:stCondLst>
                                     <p:cond delay="0"/>
                                   </p:stCondLst>
                                   <p:childTnLst>
                                     <p:set>
                                       <p:cBhvr>
-                                        <p:cTn id="24" dur="1" fill="hold">
+                                        <p:cTn id="22" dur="1" fill="hold">
                                           <p:stCondLst>
                                             <p:cond delay="0"/>
                                           </p:stCondLst>
                                         </p:cTn>
                                         <p:tgtEl>
-                                          <p:spTgt spid="3">
-                                            <p:txEl>
-                                              <p:pRg st="6" end="6"/>
-                                            </p:txEl>
-                                          </p:spTgt>
+                                          <p:spTgt spid="10"/>
                                         </p:tgtEl>
                                         <p:attrNameLst>
                                           <p:attrName>style.visibility</p:attrName>
@@ -31675,8 +31717,26 @@
                                   </p:childTnLst>
                                 </p:cTn>
                               </p:par>
+                            </p:childTnLst>
+                          </p:cTn>
+                        </p:par>
+                      </p:childTnLst>
+                    </p:cTn>
+                  </p:par>
+                  <p:par>
+                    <p:cTn id="23" fill="hold">
+                      <p:stCondLst>
+                        <p:cond delay="indefinite"/>
+                      </p:stCondLst>
+                      <p:childTnLst>
+                        <p:par>
+                          <p:cTn id="24" fill="hold">
+                            <p:stCondLst>
+                              <p:cond delay="0"/>
+                            </p:stCondLst>
+                            <p:childTnLst>
                               <p:par>
-                                <p:cTn id="25" presetID="1" presetClass="entr" presetSubtype="0" fill="hold" grpId="0" nodeType="withEffect">
+                                <p:cTn id="25" presetID="1" presetClass="entr" presetSubtype="0" fill="hold" grpId="0" nodeType="clickEffect">
                                   <p:stCondLst>
                                     <p:cond delay="0"/>
                                   </p:stCondLst>
@@ -31689,7 +31749,11 @@
                                           </p:stCondLst>
                                         </p:cTn>
                                         <p:tgtEl>
-                                          <p:spTgt spid="7"/>
+                                          <p:spTgt spid="3">
+                                            <p:txEl>
+                                              <p:pRg st="6" end="6"/>
+                                            </p:txEl>
+                                          </p:spTgt>
                                         </p:tgtEl>
                                         <p:attrNameLst>
                                           <p:attrName>style.visibility</p:attrName>
@@ -31716,6 +31780,33 @@
                                           </p:stCondLst>
                                         </p:cTn>
                                         <p:tgtEl>
+                                          <p:spTgt spid="7"/>
+                                        </p:tgtEl>
+                                        <p:attrNameLst>
+                                          <p:attrName>style.visibility</p:attrName>
+                                        </p:attrNameLst>
+                                      </p:cBhvr>
+                                      <p:to>
+                                        <p:strVal val="visible"/>
+                                      </p:to>
+                                    </p:set>
+                                  </p:childTnLst>
+                                </p:cTn>
+                              </p:par>
+                              <p:par>
+                                <p:cTn id="29" presetID="1" presetClass="entr" presetSubtype="0" fill="hold" grpId="0" nodeType="withEffect">
+                                  <p:stCondLst>
+                                    <p:cond delay="0"/>
+                                  </p:stCondLst>
+                                  <p:childTnLst>
+                                    <p:set>
+                                      <p:cBhvr>
+                                        <p:cTn id="30" dur="1" fill="hold">
+                                          <p:stCondLst>
+                                            <p:cond delay="0"/>
+                                          </p:stCondLst>
+                                        </p:cTn>
+                                        <p:tgtEl>
                                           <p:spTgt spid="8"/>
                                         </p:tgtEl>
                                         <p:attrNameLst>
@@ -31729,26 +31820,8 @@
                                   </p:childTnLst>
                                 </p:cTn>
                               </p:par>
-                            </p:childTnLst>
-                          </p:cTn>
-                        </p:par>
-                      </p:childTnLst>
-                    </p:cTn>
-                  </p:par>
-                  <p:par>
-                    <p:cTn id="29" fill="hold">
-                      <p:stCondLst>
-                        <p:cond delay="indefinite"/>
-                      </p:stCondLst>
-                      <p:childTnLst>
-                        <p:par>
-                          <p:cTn id="30" fill="hold">
-                            <p:stCondLst>
-                              <p:cond delay="0"/>
-                            </p:stCondLst>
-                            <p:childTnLst>
                               <p:par>
-                                <p:cTn id="31" presetID="1" presetClass="entr" presetSubtype="0" fill="hold" grpId="0" nodeType="clickEffect">
+                                <p:cTn id="31" presetID="1" presetClass="entr" presetSubtype="0" fill="hold" grpId="0" nodeType="withEffect">
                                   <p:stCondLst>
                                     <p:cond delay="0"/>
                                   </p:stCondLst>
@@ -31809,6 +31882,7 @@
       <p:bldP spid="7" grpId="0" animBg="1"/>
       <p:bldP spid="8" grpId="0" animBg="1"/>
       <p:bldP spid="9" grpId="0" animBg="1"/>
+      <p:bldP spid="10" grpId="0" animBg="1"/>
     </p:bldLst>
   </p:timing>
 </p:sld>
@@ -31848,7 +31922,7 @@
           <a:p>
             <a:r>
               <a:rPr lang="en-US" dirty="0" smtClean="0"/>
-              <a:t>Conclusions</a:t>
+              <a:t>Creating archives</a:t>
             </a:r>
             <a:endParaRPr lang="nl-BE" dirty="0"/>
           </a:p>
@@ -31856,12 +31930,12 @@
       </p:sp>
       <p:sp>
         <p:nvSpPr>
-          <p:cNvPr id="3" name="Text Placeholder 2"/>
+          <p:cNvPr id="3" name="Content Placeholder 2"/>
           <p:cNvSpPr>
             <a:spLocks noGrp="1"/>
           </p:cNvSpPr>
           <p:nvPr>
-            <p:ph type="body" idx="1"/>
+            <p:ph idx="1"/>
           </p:nvPr>
         </p:nvSpPr>
         <p:spPr/>
@@ -31869,14 +31943,201 @@
           <a:bodyPr/>
           <a:lstStyle/>
           <a:p>
-            <a:endParaRPr lang="nl-BE"/>
+            <a:r>
+              <a:rPr lang="en-US" dirty="0" smtClean="0"/>
+              <a:t>Export branch files to archive file</a:t>
+            </a:r>
+          </a:p>
+          <a:p>
+            <a:endParaRPr lang="en-US" dirty="0"/>
+          </a:p>
+          <a:p>
+            <a:endParaRPr lang="en-US" dirty="0" smtClean="0"/>
+          </a:p>
+          <a:p>
+            <a:r>
+              <a:rPr lang="en-US" dirty="0" smtClean="0"/>
+              <a:t>Export to zip</a:t>
+            </a:r>
+          </a:p>
+          <a:p>
+            <a:endParaRPr lang="en-US" dirty="0"/>
+          </a:p>
+          <a:p>
+            <a:endParaRPr lang="en-US" dirty="0" smtClean="0"/>
+          </a:p>
+          <a:p>
+            <a:r>
+              <a:rPr lang="en-US" dirty="0" smtClean="0"/>
+              <a:t>On GitHub: create releases</a:t>
+            </a:r>
+            <a:endParaRPr lang="nl-BE" dirty="0"/>
+          </a:p>
+        </p:txBody>
+      </p:sp>
+      <p:sp>
+        <p:nvSpPr>
+          <p:cNvPr id="4" name="TextBox 3"/>
+          <p:cNvSpPr txBox="1"/>
+          <p:nvPr/>
+        </p:nvSpPr>
+        <p:spPr>
+          <a:xfrm>
+            <a:off x="611560" y="2267580"/>
+            <a:ext cx="7992888" cy="369332"/>
+          </a:xfrm>
+          <a:prstGeom prst="rect">
+            <a:avLst/>
+          </a:prstGeom>
+          <a:noFill/>
+          <a:ln>
+            <a:solidFill>
+              <a:schemeClr val="tx1"/>
+            </a:solidFill>
+          </a:ln>
+        </p:spPr>
+        <p:txBody>
+          <a:bodyPr wrap="square" rtlCol="0">
+            <a:spAutoFit/>
+          </a:bodyPr>
+          <a:lstStyle/>
+          <a:p>
+            <a:r>
+              <a:rPr lang="nl-BE" dirty="0" smtClean="0">
+                <a:latin typeface="Courier New" pitchFamily="49" charset="0"/>
+                <a:cs typeface="Courier New" pitchFamily="49" charset="0"/>
+              </a:rPr>
+              <a:t>$ git </a:t>
+            </a:r>
+            <a:r>
+              <a:rPr lang="nl-BE" dirty="0" err="1" smtClean="0">
+                <a:latin typeface="Courier New" pitchFamily="49" charset="0"/>
+                <a:cs typeface="Courier New" pitchFamily="49" charset="0"/>
+              </a:rPr>
+              <a:t>archive</a:t>
+            </a:r>
+            <a:r>
+              <a:rPr lang="nl-BE" dirty="0" smtClean="0">
+                <a:latin typeface="Courier New" pitchFamily="49" charset="0"/>
+                <a:cs typeface="Courier New" pitchFamily="49" charset="0"/>
+              </a:rPr>
+              <a:t>  master  |  </a:t>
+            </a:r>
+            <a:r>
+              <a:rPr lang="nl-BE" dirty="0" err="1" smtClean="0">
+                <a:latin typeface="Courier New" pitchFamily="49" charset="0"/>
+                <a:cs typeface="Courier New" pitchFamily="49" charset="0"/>
+              </a:rPr>
+              <a:t>gzip</a:t>
+            </a:r>
+            <a:r>
+              <a:rPr lang="nl-BE" dirty="0" smtClean="0">
+                <a:latin typeface="Courier New" pitchFamily="49" charset="0"/>
+                <a:cs typeface="Courier New" pitchFamily="49" charset="0"/>
+              </a:rPr>
+              <a:t>  &gt;  ~/my_project.tar.gz</a:t>
+            </a:r>
+            <a:endParaRPr lang="nl-BE" dirty="0" smtClean="0">
+              <a:latin typeface="Courier New" pitchFamily="49" charset="0"/>
+              <a:cs typeface="Courier New" pitchFamily="49" charset="0"/>
+            </a:endParaRPr>
+          </a:p>
+        </p:txBody>
+      </p:sp>
+      <p:sp>
+        <p:nvSpPr>
+          <p:cNvPr id="5" name="TextBox 4"/>
+          <p:cNvSpPr txBox="1"/>
+          <p:nvPr/>
+        </p:nvSpPr>
+        <p:spPr>
+          <a:xfrm>
+            <a:off x="611560" y="4058372"/>
+            <a:ext cx="7992888" cy="369332"/>
+          </a:xfrm>
+          <a:prstGeom prst="rect">
+            <a:avLst/>
+          </a:prstGeom>
+          <a:noFill/>
+          <a:ln>
+            <a:solidFill>
+              <a:schemeClr val="tx1"/>
+            </a:solidFill>
+          </a:ln>
+        </p:spPr>
+        <p:txBody>
+          <a:bodyPr wrap="square" rtlCol="0">
+            <a:spAutoFit/>
+          </a:bodyPr>
+          <a:lstStyle/>
+          <a:p>
+            <a:r>
+              <a:rPr lang="nl-BE" dirty="0" smtClean="0">
+                <a:latin typeface="Courier New" pitchFamily="49" charset="0"/>
+                <a:cs typeface="Courier New" pitchFamily="49" charset="0"/>
+              </a:rPr>
+              <a:t>$ git </a:t>
+            </a:r>
+            <a:r>
+              <a:rPr lang="nl-BE" dirty="0" err="1" smtClean="0">
+                <a:latin typeface="Courier New" pitchFamily="49" charset="0"/>
+                <a:cs typeface="Courier New" pitchFamily="49" charset="0"/>
+              </a:rPr>
+              <a:t>archive</a:t>
+            </a:r>
+            <a:r>
+              <a:rPr lang="nl-BE" dirty="0" smtClean="0">
+                <a:latin typeface="Courier New" pitchFamily="49" charset="0"/>
+                <a:cs typeface="Courier New" pitchFamily="49" charset="0"/>
+              </a:rPr>
+              <a:t>  --format=zip  master  &gt;  ~/my_project.zip</a:t>
+            </a:r>
+            <a:endParaRPr lang="nl-BE" dirty="0" smtClean="0">
+              <a:latin typeface="Courier New" pitchFamily="49" charset="0"/>
+              <a:cs typeface="Courier New" pitchFamily="49" charset="0"/>
+            </a:endParaRPr>
+          </a:p>
+        </p:txBody>
+      </p:sp>
+      <p:sp>
+        <p:nvSpPr>
+          <p:cNvPr id="6" name="TextBox 5"/>
+          <p:cNvSpPr txBox="1"/>
+          <p:nvPr/>
+        </p:nvSpPr>
+        <p:spPr>
+          <a:xfrm>
+            <a:off x="3131840" y="2852936"/>
+            <a:ext cx="2697149" cy="461665"/>
+          </a:xfrm>
+          <a:prstGeom prst="rect">
+            <a:avLst/>
+          </a:prstGeom>
+          <a:noFill/>
+          <a:ln>
+            <a:solidFill>
+              <a:schemeClr val="tx1"/>
+            </a:solidFill>
+          </a:ln>
+        </p:spPr>
+        <p:txBody>
+          <a:bodyPr wrap="none" rtlCol="0">
+            <a:spAutoFit/>
+          </a:bodyPr>
+          <a:lstStyle/>
+          <a:p>
+            <a:r>
+              <a:rPr lang="en-US" sz="2400" dirty="0" smtClean="0"/>
+              <a:t>Default format is tar</a:t>
+            </a:r>
+            <a:endParaRPr lang="nl-BE" sz="2400" dirty="0"/>
           </a:p>
         </p:txBody>
       </p:sp>
     </p:spTree>
     <p:extLst>
       <p:ext uri="{BB962C8B-B14F-4D97-AF65-F5344CB8AC3E}">
-        <p14:creationId xmlns:p14="http://schemas.microsoft.com/office/powerpoint/2010/main" val="2763237186"/>
+        <p14:creationId xmlns:p14="http://schemas.microsoft.com/office/powerpoint/2010/main" val="3767473925"/>
       </p:ext>
     </p:extLst>
   </p:cSld>
@@ -31886,9 +32147,287 @@
   <p:timing>
     <p:tnLst>
       <p:par>
-        <p:cTn id="1" dur="indefinite" restart="never" nodeType="tmRoot"/>
+        <p:cTn id="1" dur="indefinite" restart="never" nodeType="tmRoot">
+          <p:childTnLst>
+            <p:seq concurrent="1" nextAc="seek">
+              <p:cTn id="2" dur="indefinite" nodeType="mainSeq">
+                <p:childTnLst>
+                  <p:par>
+                    <p:cTn id="3" fill="hold">
+                      <p:stCondLst>
+                        <p:cond delay="indefinite"/>
+                        <p:cond evt="onBegin" delay="0">
+                          <p:tn val="2"/>
+                        </p:cond>
+                      </p:stCondLst>
+                      <p:childTnLst>
+                        <p:par>
+                          <p:cTn id="4" fill="hold">
+                            <p:stCondLst>
+                              <p:cond delay="0"/>
+                            </p:stCondLst>
+                            <p:childTnLst>
+                              <p:par>
+                                <p:cTn id="5" presetID="1" presetClass="entr" presetSubtype="0" fill="hold" grpId="0" nodeType="withEffect">
+                                  <p:stCondLst>
+                                    <p:cond delay="0"/>
+                                  </p:stCondLst>
+                                  <p:childTnLst>
+                                    <p:set>
+                                      <p:cBhvr>
+                                        <p:cTn id="6" dur="1" fill="hold">
+                                          <p:stCondLst>
+                                            <p:cond delay="0"/>
+                                          </p:stCondLst>
+                                        </p:cTn>
+                                        <p:tgtEl>
+                                          <p:spTgt spid="3">
+                                            <p:txEl>
+                                              <p:pRg st="0" end="0"/>
+                                            </p:txEl>
+                                          </p:spTgt>
+                                        </p:tgtEl>
+                                        <p:attrNameLst>
+                                          <p:attrName>style.visibility</p:attrName>
+                                        </p:attrNameLst>
+                                      </p:cBhvr>
+                                      <p:to>
+                                        <p:strVal val="visible"/>
+                                      </p:to>
+                                    </p:set>
+                                  </p:childTnLst>
+                                </p:cTn>
+                              </p:par>
+                              <p:par>
+                                <p:cTn id="7" presetID="1" presetClass="entr" presetSubtype="0" fill="hold" grpId="0" nodeType="withEffect">
+                                  <p:stCondLst>
+                                    <p:cond delay="0"/>
+                                  </p:stCondLst>
+                                  <p:childTnLst>
+                                    <p:set>
+                                      <p:cBhvr>
+                                        <p:cTn id="8" dur="1" fill="hold">
+                                          <p:stCondLst>
+                                            <p:cond delay="0"/>
+                                          </p:stCondLst>
+                                        </p:cTn>
+                                        <p:tgtEl>
+                                          <p:spTgt spid="4"/>
+                                        </p:tgtEl>
+                                        <p:attrNameLst>
+                                          <p:attrName>style.visibility</p:attrName>
+                                        </p:attrNameLst>
+                                      </p:cBhvr>
+                                      <p:to>
+                                        <p:strVal val="visible"/>
+                                      </p:to>
+                                    </p:set>
+                                  </p:childTnLst>
+                                </p:cTn>
+                              </p:par>
+                            </p:childTnLst>
+                          </p:cTn>
+                        </p:par>
+                      </p:childTnLst>
+                    </p:cTn>
+                  </p:par>
+                  <p:par>
+                    <p:cTn id="9" fill="hold">
+                      <p:stCondLst>
+                        <p:cond delay="indefinite"/>
+                      </p:stCondLst>
+                      <p:childTnLst>
+                        <p:par>
+                          <p:cTn id="10" fill="hold">
+                            <p:stCondLst>
+                              <p:cond delay="0"/>
+                            </p:stCondLst>
+                            <p:childTnLst>
+                              <p:par>
+                                <p:cTn id="11" presetID="1" presetClass="entr" presetSubtype="0" fill="hold" grpId="0" nodeType="clickEffect">
+                                  <p:stCondLst>
+                                    <p:cond delay="0"/>
+                                  </p:stCondLst>
+                                  <p:childTnLst>
+                                    <p:set>
+                                      <p:cBhvr>
+                                        <p:cTn id="12" dur="1" fill="hold">
+                                          <p:stCondLst>
+                                            <p:cond delay="0"/>
+                                          </p:stCondLst>
+                                        </p:cTn>
+                                        <p:tgtEl>
+                                          <p:spTgt spid="6"/>
+                                        </p:tgtEl>
+                                        <p:attrNameLst>
+                                          <p:attrName>style.visibility</p:attrName>
+                                        </p:attrNameLst>
+                                      </p:cBhvr>
+                                      <p:to>
+                                        <p:strVal val="visible"/>
+                                      </p:to>
+                                    </p:set>
+                                  </p:childTnLst>
+                                </p:cTn>
+                              </p:par>
+                            </p:childTnLst>
+                          </p:cTn>
+                        </p:par>
+                      </p:childTnLst>
+                    </p:cTn>
+                  </p:par>
+                  <p:par>
+                    <p:cTn id="13" fill="hold">
+                      <p:stCondLst>
+                        <p:cond delay="indefinite"/>
+                      </p:stCondLst>
+                      <p:childTnLst>
+                        <p:par>
+                          <p:cTn id="14" fill="hold">
+                            <p:stCondLst>
+                              <p:cond delay="0"/>
+                            </p:stCondLst>
+                            <p:childTnLst>
+                              <p:par>
+                                <p:cTn id="15" presetID="1" presetClass="entr" presetSubtype="0" fill="hold" grpId="0" nodeType="clickEffect">
+                                  <p:stCondLst>
+                                    <p:cond delay="0"/>
+                                  </p:stCondLst>
+                                  <p:childTnLst>
+                                    <p:set>
+                                      <p:cBhvr>
+                                        <p:cTn id="16" dur="1" fill="hold">
+                                          <p:stCondLst>
+                                            <p:cond delay="0"/>
+                                          </p:stCondLst>
+                                        </p:cTn>
+                                        <p:tgtEl>
+                                          <p:spTgt spid="3">
+                                            <p:txEl>
+                                              <p:pRg st="3" end="3"/>
+                                            </p:txEl>
+                                          </p:spTgt>
+                                        </p:tgtEl>
+                                        <p:attrNameLst>
+                                          <p:attrName>style.visibility</p:attrName>
+                                        </p:attrNameLst>
+                                      </p:cBhvr>
+                                      <p:to>
+                                        <p:strVal val="visible"/>
+                                      </p:to>
+                                    </p:set>
+                                  </p:childTnLst>
+                                </p:cTn>
+                              </p:par>
+                              <p:par>
+                                <p:cTn id="17" presetID="1" presetClass="entr" presetSubtype="0" fill="hold" grpId="0" nodeType="withEffect">
+                                  <p:stCondLst>
+                                    <p:cond delay="0"/>
+                                  </p:stCondLst>
+                                  <p:childTnLst>
+                                    <p:set>
+                                      <p:cBhvr>
+                                        <p:cTn id="18" dur="1" fill="hold">
+                                          <p:stCondLst>
+                                            <p:cond delay="0"/>
+                                          </p:stCondLst>
+                                        </p:cTn>
+                                        <p:tgtEl>
+                                          <p:spTgt spid="5"/>
+                                        </p:tgtEl>
+                                        <p:attrNameLst>
+                                          <p:attrName>style.visibility</p:attrName>
+                                        </p:attrNameLst>
+                                      </p:cBhvr>
+                                      <p:to>
+                                        <p:strVal val="visible"/>
+                                      </p:to>
+                                    </p:set>
+                                  </p:childTnLst>
+                                </p:cTn>
+                              </p:par>
+                            </p:childTnLst>
+                          </p:cTn>
+                        </p:par>
+                      </p:childTnLst>
+                    </p:cTn>
+                  </p:par>
+                  <p:par>
+                    <p:cTn id="19" fill="hold">
+                      <p:stCondLst>
+                        <p:cond delay="indefinite"/>
+                      </p:stCondLst>
+                      <p:childTnLst>
+                        <p:par>
+                          <p:cTn id="20" fill="hold">
+                            <p:stCondLst>
+                              <p:cond delay="0"/>
+                            </p:stCondLst>
+                            <p:childTnLst>
+                              <p:par>
+                                <p:cTn id="21" presetID="1" presetClass="entr" presetSubtype="0" fill="hold" grpId="0" nodeType="clickEffect">
+                                  <p:stCondLst>
+                                    <p:cond delay="0"/>
+                                  </p:stCondLst>
+                                  <p:childTnLst>
+                                    <p:set>
+                                      <p:cBhvr>
+                                        <p:cTn id="22" dur="1" fill="hold">
+                                          <p:stCondLst>
+                                            <p:cond delay="0"/>
+                                          </p:stCondLst>
+                                        </p:cTn>
+                                        <p:tgtEl>
+                                          <p:spTgt spid="3">
+                                            <p:txEl>
+                                              <p:pRg st="6" end="6"/>
+                                            </p:txEl>
+                                          </p:spTgt>
+                                        </p:tgtEl>
+                                        <p:attrNameLst>
+                                          <p:attrName>style.visibility</p:attrName>
+                                        </p:attrNameLst>
+                                      </p:cBhvr>
+                                      <p:to>
+                                        <p:strVal val="visible"/>
+                                      </p:to>
+                                    </p:set>
+                                  </p:childTnLst>
+                                </p:cTn>
+                              </p:par>
+                            </p:childTnLst>
+                          </p:cTn>
+                        </p:par>
+                      </p:childTnLst>
+                    </p:cTn>
+                  </p:par>
+                </p:childTnLst>
+              </p:cTn>
+              <p:prevCondLst>
+                <p:cond evt="onPrev" delay="0">
+                  <p:tgtEl>
+                    <p:sldTgt/>
+                  </p:tgtEl>
+                </p:cond>
+              </p:prevCondLst>
+              <p:nextCondLst>
+                <p:cond evt="onNext" delay="0">
+                  <p:tgtEl>
+                    <p:sldTgt/>
+                  </p:tgtEl>
+                </p:cond>
+              </p:nextCondLst>
+            </p:seq>
+          </p:childTnLst>
+        </p:cTn>
       </p:par>
     </p:tnLst>
+    <p:bldLst>
+      <p:bldP spid="3" grpId="0" uiExpand="1" build="p"/>
+      <p:bldP spid="4" grpId="0" animBg="1"/>
+      <p:bldP spid="5" grpId="0" animBg="1"/>
+      <p:bldP spid="6" grpId="0" animBg="1"/>
+    </p:bldLst>
   </p:timing>
 </p:sld>
 </file>
@@ -31926,16 +32465,8 @@
           <a:lstStyle/>
           <a:p>
             <a:r>
-              <a:rPr lang="en-US" dirty="0" err="1"/>
-              <a:t>g</a:t>
-            </a:r>
-            <a:r>
-              <a:rPr lang="en-US" dirty="0" err="1" smtClean="0"/>
-              <a:t>it</a:t>
-            </a:r>
-            <a:r>
               <a:rPr lang="en-US" dirty="0" smtClean="0"/>
-              <a:t>: the movie</a:t>
+              <a:t>Conclusions</a:t>
             </a:r>
             <a:endParaRPr lang="nl-BE" dirty="0"/>
           </a:p>
@@ -31943,138 +32474,27 @@
       </p:sp>
       <p:sp>
         <p:nvSpPr>
-          <p:cNvPr id="3" name="Content Placeholder 2"/>
+          <p:cNvPr id="3" name="Text Placeholder 2"/>
           <p:cNvSpPr>
             <a:spLocks noGrp="1"/>
           </p:cNvSpPr>
           <p:nvPr>
-            <p:ph idx="1"/>
+            <p:ph type="body" idx="1"/>
           </p:nvPr>
         </p:nvSpPr>
         <p:spPr/>
         <p:txBody>
-          <a:bodyPr>
-            <a:normAutofit fontScale="92500"/>
-          </a:bodyPr>
+          <a:bodyPr/>
           <a:lstStyle/>
           <a:p>
-            <a:r>
-              <a:rPr lang="en-US" dirty="0" smtClean="0"/>
-              <a:t>Online documentation (including movies)</a:t>
-            </a:r>
-          </a:p>
-          <a:p>
-            <a:pPr lvl="1"/>
-            <a:r>
-              <a:rPr lang="nl-BE" dirty="0" smtClean="0">
-                <a:hlinkClick r:id="rId2"/>
-              </a:rPr>
-              <a:t>http://git-scm.com/documentation</a:t>
-            </a:r>
-            <a:endParaRPr lang="nl-BE" dirty="0" smtClean="0"/>
-          </a:p>
-          <a:p>
-            <a:r>
-              <a:rPr lang="en-US" dirty="0" err="1"/>
-              <a:t>g</a:t>
-            </a:r>
-            <a:r>
-              <a:rPr lang="en-US" dirty="0" err="1" smtClean="0"/>
-              <a:t>it</a:t>
-            </a:r>
-            <a:r>
-              <a:rPr lang="en-US" dirty="0" smtClean="0"/>
-              <a:t> web site</a:t>
-            </a:r>
-          </a:p>
-          <a:p>
-            <a:pPr lvl="1"/>
-            <a:r>
-              <a:rPr lang="nl-BE" dirty="0" smtClean="0">
-                <a:hlinkClick r:id="rId3"/>
-              </a:rPr>
-              <a:t>http://git-scm.com/</a:t>
-            </a:r>
-            <a:endParaRPr lang="nl-BE" dirty="0" smtClean="0"/>
-          </a:p>
-          <a:p>
-            <a:r>
-              <a:rPr lang="en-US" dirty="0" smtClean="0"/>
-              <a:t>Why (the author thinks) you should switch to </a:t>
-            </a:r>
-            <a:r>
-              <a:rPr lang="en-US" dirty="0" err="1" smtClean="0"/>
-              <a:t>git</a:t>
-            </a:r>
-            <a:endParaRPr lang="en-US" dirty="0" smtClean="0"/>
-          </a:p>
-          <a:p>
-            <a:pPr lvl="1"/>
-            <a:r>
-              <a:rPr lang="nl-BE" dirty="0" smtClean="0">
-                <a:hlinkClick r:id="rId4"/>
-              </a:rPr>
-              <a:t>http://blog.teamtreehouse.com/why-you-should-switch-from-subversion-to-git</a:t>
-            </a:r>
-            <a:endParaRPr lang="nl-BE" dirty="0" smtClean="0"/>
-          </a:p>
-          <a:p>
-            <a:r>
-              <a:rPr lang="nl-BE" dirty="0" smtClean="0"/>
-              <a:t>An </a:t>
-            </a:r>
-            <a:r>
-              <a:rPr lang="nl-BE" dirty="0" err="1" smtClean="0"/>
-              <a:t>overview</a:t>
-            </a:r>
-            <a:r>
-              <a:rPr lang="nl-BE" dirty="0" smtClean="0"/>
-              <a:t> of </a:t>
-            </a:r>
-            <a:r>
-              <a:rPr lang="nl-BE" dirty="0" err="1" smtClean="0"/>
-              <a:t>frequently</a:t>
-            </a:r>
-            <a:r>
-              <a:rPr lang="nl-BE" dirty="0" smtClean="0"/>
-              <a:t> </a:t>
-            </a:r>
-            <a:r>
-              <a:rPr lang="nl-BE" dirty="0" err="1" smtClean="0"/>
-              <a:t>used</a:t>
-            </a:r>
-            <a:r>
-              <a:rPr lang="nl-BE" dirty="0" smtClean="0"/>
-              <a:t> git </a:t>
-            </a:r>
-            <a:r>
-              <a:rPr lang="nl-BE" dirty="0" err="1" smtClean="0"/>
-              <a:t>workflows</a:t>
-            </a:r>
-            <a:endParaRPr lang="nl-BE" dirty="0" smtClean="0"/>
-          </a:p>
-          <a:p>
-            <a:pPr lvl="1"/>
-            <a:r>
-              <a:rPr lang="en-US" dirty="0">
-                <a:hlinkClick r:id="rId5"/>
-              </a:rPr>
-              <a:t>https://</a:t>
-            </a:r>
-            <a:r>
-              <a:rPr lang="en-US" dirty="0" smtClean="0">
-                <a:hlinkClick r:id="rId5"/>
-              </a:rPr>
-              <a:t>www.atlassian.com/git/workflows</a:t>
-            </a:r>
-            <a:endParaRPr lang="nl-BE" dirty="0" smtClean="0"/>
+            <a:endParaRPr lang="nl-BE"/>
           </a:p>
         </p:txBody>
       </p:sp>
     </p:spTree>
     <p:extLst>
       <p:ext uri="{BB962C8B-B14F-4D97-AF65-F5344CB8AC3E}">
-        <p14:creationId xmlns:p14="http://schemas.microsoft.com/office/powerpoint/2010/main" val="2976133738"/>
+        <p14:creationId xmlns:p14="http://schemas.microsoft.com/office/powerpoint/2010/main" val="2763237186"/>
       </p:ext>
     </p:extLst>
   </p:cSld>
@@ -32574,6 +32994,204 @@
 </file>
 
 <file path=ppt/slides/slide50.xml><?xml version="1.0" encoding="utf-8"?>
+<p:sld xmlns:a="http://schemas.openxmlformats.org/drawingml/2006/main" xmlns:r="http://schemas.openxmlformats.org/officeDocument/2006/relationships" xmlns:p="http://schemas.openxmlformats.org/presentationml/2006/main">
+  <p:cSld>
+    <p:spTree>
+      <p:nvGrpSpPr>
+        <p:cNvPr id="1" name=""/>
+        <p:cNvGrpSpPr/>
+        <p:nvPr/>
+      </p:nvGrpSpPr>
+      <p:grpSpPr>
+        <a:xfrm>
+          <a:off x="0" y="0"/>
+          <a:ext cx="0" cy="0"/>
+          <a:chOff x="0" y="0"/>
+          <a:chExt cx="0" cy="0"/>
+        </a:xfrm>
+      </p:grpSpPr>
+      <p:sp>
+        <p:nvSpPr>
+          <p:cNvPr id="2" name="Title 1"/>
+          <p:cNvSpPr>
+            <a:spLocks noGrp="1"/>
+          </p:cNvSpPr>
+          <p:nvPr>
+            <p:ph type="title"/>
+          </p:nvPr>
+        </p:nvSpPr>
+        <p:spPr/>
+        <p:txBody>
+          <a:bodyPr/>
+          <a:lstStyle/>
+          <a:p>
+            <a:r>
+              <a:rPr lang="en-US" dirty="0" err="1"/>
+              <a:t>g</a:t>
+            </a:r>
+            <a:r>
+              <a:rPr lang="en-US" dirty="0" err="1" smtClean="0"/>
+              <a:t>it</a:t>
+            </a:r>
+            <a:r>
+              <a:rPr lang="en-US" dirty="0" smtClean="0"/>
+              <a:t>: the movie</a:t>
+            </a:r>
+            <a:endParaRPr lang="nl-BE" dirty="0"/>
+          </a:p>
+        </p:txBody>
+      </p:sp>
+      <p:sp>
+        <p:nvSpPr>
+          <p:cNvPr id="3" name="Content Placeholder 2"/>
+          <p:cNvSpPr>
+            <a:spLocks noGrp="1"/>
+          </p:cNvSpPr>
+          <p:nvPr>
+            <p:ph idx="1"/>
+          </p:nvPr>
+        </p:nvSpPr>
+        <p:spPr/>
+        <p:txBody>
+          <a:bodyPr>
+            <a:normAutofit fontScale="92500"/>
+          </a:bodyPr>
+          <a:lstStyle/>
+          <a:p>
+            <a:r>
+              <a:rPr lang="en-US" dirty="0" smtClean="0"/>
+              <a:t>Online documentation (including movies)</a:t>
+            </a:r>
+          </a:p>
+          <a:p>
+            <a:pPr lvl="1"/>
+            <a:r>
+              <a:rPr lang="nl-BE" dirty="0" smtClean="0">
+                <a:hlinkClick r:id="rId2"/>
+              </a:rPr>
+              <a:t>http://git-scm.com/documentation</a:t>
+            </a:r>
+            <a:endParaRPr lang="nl-BE" dirty="0" smtClean="0"/>
+          </a:p>
+          <a:p>
+            <a:r>
+              <a:rPr lang="en-US" dirty="0" err="1"/>
+              <a:t>g</a:t>
+            </a:r>
+            <a:r>
+              <a:rPr lang="en-US" dirty="0" err="1" smtClean="0"/>
+              <a:t>it</a:t>
+            </a:r>
+            <a:r>
+              <a:rPr lang="en-US" dirty="0" smtClean="0"/>
+              <a:t> web site</a:t>
+            </a:r>
+          </a:p>
+          <a:p>
+            <a:pPr lvl="1"/>
+            <a:r>
+              <a:rPr lang="nl-BE" dirty="0" smtClean="0">
+                <a:hlinkClick r:id="rId3"/>
+              </a:rPr>
+              <a:t>http://git-scm.com/</a:t>
+            </a:r>
+            <a:endParaRPr lang="nl-BE" dirty="0" smtClean="0"/>
+          </a:p>
+          <a:p>
+            <a:r>
+              <a:rPr lang="en-US" dirty="0" smtClean="0"/>
+              <a:t>Why (the author thinks) you should switch to </a:t>
+            </a:r>
+            <a:r>
+              <a:rPr lang="en-US" dirty="0" err="1" smtClean="0"/>
+              <a:t>git</a:t>
+            </a:r>
+            <a:endParaRPr lang="en-US" dirty="0" smtClean="0"/>
+          </a:p>
+          <a:p>
+            <a:pPr lvl="1"/>
+            <a:r>
+              <a:rPr lang="nl-BE" dirty="0" smtClean="0">
+                <a:hlinkClick r:id="rId4"/>
+              </a:rPr>
+              <a:t>http://blog.teamtreehouse.com/why-you-should-switch-from-subversion-to-git</a:t>
+            </a:r>
+            <a:endParaRPr lang="nl-BE" dirty="0" smtClean="0"/>
+          </a:p>
+          <a:p>
+            <a:r>
+              <a:rPr lang="nl-BE" dirty="0" smtClean="0"/>
+              <a:t>An </a:t>
+            </a:r>
+            <a:r>
+              <a:rPr lang="nl-BE" dirty="0" err="1" smtClean="0"/>
+              <a:t>overview</a:t>
+            </a:r>
+            <a:r>
+              <a:rPr lang="nl-BE" dirty="0" smtClean="0"/>
+              <a:t> of </a:t>
+            </a:r>
+            <a:r>
+              <a:rPr lang="nl-BE" dirty="0" err="1" smtClean="0"/>
+              <a:t>frequently</a:t>
+            </a:r>
+            <a:r>
+              <a:rPr lang="nl-BE" dirty="0" smtClean="0"/>
+              <a:t> </a:t>
+            </a:r>
+            <a:r>
+              <a:rPr lang="nl-BE" dirty="0" err="1" smtClean="0"/>
+              <a:t>used</a:t>
+            </a:r>
+            <a:r>
+              <a:rPr lang="nl-BE" dirty="0" smtClean="0"/>
+              <a:t> git </a:t>
+            </a:r>
+            <a:r>
+              <a:rPr lang="nl-BE" dirty="0" err="1" smtClean="0"/>
+              <a:t>workflows</a:t>
+            </a:r>
+            <a:endParaRPr lang="nl-BE" dirty="0" smtClean="0"/>
+          </a:p>
+          <a:p>
+            <a:pPr lvl="1"/>
+            <a:r>
+              <a:rPr lang="en-US" dirty="0">
+                <a:hlinkClick r:id="rId5"/>
+              </a:rPr>
+              <a:t>https://</a:t>
+            </a:r>
+            <a:r>
+              <a:rPr lang="en-US" dirty="0" smtClean="0">
+                <a:hlinkClick r:id="rId5"/>
+              </a:rPr>
+              <a:t>www.atlassian.com/git/workflows</a:t>
+            </a:r>
+            <a:endParaRPr lang="nl-BE" dirty="0" smtClean="0"/>
+          </a:p>
+        </p:txBody>
+      </p:sp>
+    </p:spTree>
+    <p:extLst>
+      <p:ext uri="{BB962C8B-B14F-4D97-AF65-F5344CB8AC3E}">
+        <p14:creationId xmlns:p14="http://schemas.microsoft.com/office/powerpoint/2010/main" val="2976133738"/>
+      </p:ext>
+    </p:extLst>
+  </p:cSld>
+  <p:clrMapOvr>
+    <a:masterClrMapping/>
+  </p:clrMapOvr>
+  <p:timing>
+    <p:tnLst>
+      <p:par>
+        <p:cTn id="1" dur="indefinite" restart="never" nodeType="tmRoot"/>
+      </p:par>
+    </p:tnLst>
+  </p:timing>
+</p:sld>
+</file>
+
+<file path=ppt/slides/slide51.xml><?xml version="1.0" encoding="utf-8"?>
 <p:sld xmlns:a="http://schemas.openxmlformats.org/drawingml/2006/main" xmlns:r="http://schemas.openxmlformats.org/officeDocument/2006/relationships" xmlns:p="http://schemas.openxmlformats.org/presentationml/2006/main">
   <p:cSld>
     <p:spTree>

</xml_diff>

<commit_message>
Added slide on git-related tools
</commit_message>
<xml_diff>
--- a/LinuxTools/VersionControl/version_control_git.pptx
+++ b/LinuxTools/VersionControl/version_control_git.pptx
@@ -56,6 +56,7 @@
     <p:sldId id="300" r:id="rId50"/>
     <p:sldId id="299" r:id="rId51"/>
     <p:sldId id="301" r:id="rId52"/>
+    <p:sldId id="310" r:id="rId53"/>
   </p:sldIdLst>
   <p:sldSz cx="9144000" cy="6858000" type="screen4x3"/>
   <p:notesSz cx="6858000" cy="9144000"/>
@@ -226,6 +227,7 @@
             <p14:sldId id="300"/>
             <p14:sldId id="299"/>
             <p14:sldId id="301"/>
+            <p14:sldId id="310"/>
           </p14:sldIdLst>
         </p14:section>
       </p14:sectionLst>
@@ -31054,13 +31056,8 @@
           <a:p>
             <a:r>
               <a:rPr lang="en-US" dirty="0" smtClean="0"/>
-              <a:t>Micro-managing </a:t>
-            </a:r>
-            <a:r>
-              <a:rPr lang="en-US" dirty="0" smtClean="0"/>
-              <a:t>commits/merges</a:t>
-            </a:r>
-            <a:endParaRPr lang="en-US" dirty="0" smtClean="0"/>
+              <a:t>Micro-managing commits/merges</a:t>
+            </a:r>
           </a:p>
           <a:p>
             <a:endParaRPr lang="en-US" dirty="0"/>
@@ -31440,10 +31437,6 @@
               </a:rPr>
               <a:t> 0ba188919fec</a:t>
             </a:r>
-            <a:endParaRPr lang="nl-BE" dirty="0" smtClean="0">
-              <a:latin typeface="Courier New" pitchFamily="49" charset="0"/>
-              <a:cs typeface="Courier New" pitchFamily="49" charset="0"/>
-            </a:endParaRPr>
           </a:p>
         </p:txBody>
       </p:sp>
@@ -32037,10 +32030,6 @@
               </a:rPr>
               <a:t>  &gt;  ~/my_project.tar.gz</a:t>
             </a:r>
-            <a:endParaRPr lang="nl-BE" dirty="0" smtClean="0">
-              <a:latin typeface="Courier New" pitchFamily="49" charset="0"/>
-              <a:cs typeface="Courier New" pitchFamily="49" charset="0"/>
-            </a:endParaRPr>
           </a:p>
         </p:txBody>
       </p:sp>
@@ -32092,10 +32081,6 @@
               </a:rPr>
               <a:t>  --format=zip  master  &gt;  ~/my_project.zip</a:t>
             </a:r>
-            <a:endParaRPr lang="nl-BE" dirty="0" smtClean="0">
-              <a:latin typeface="Courier New" pitchFamily="49" charset="0"/>
-              <a:cs typeface="Courier New" pitchFamily="49" charset="0"/>
-            </a:endParaRPr>
           </a:p>
         </p:txBody>
       </p:sp>
@@ -33594,6 +33579,296 @@
       <p:bldP spid="3" grpId="0" uiExpand="1" build="p"/>
     </p:bldLst>
   </p:timing>
+</p:sld>
+</file>
+
+<file path=ppt/slides/slide52.xml><?xml version="1.0" encoding="utf-8"?>
+<p:sld xmlns:a="http://schemas.openxmlformats.org/drawingml/2006/main" xmlns:r="http://schemas.openxmlformats.org/officeDocument/2006/relationships" xmlns:p="http://schemas.openxmlformats.org/presentationml/2006/main">
+  <p:cSld>
+    <p:spTree>
+      <p:nvGrpSpPr>
+        <p:cNvPr id="1" name=""/>
+        <p:cNvGrpSpPr/>
+        <p:nvPr/>
+      </p:nvGrpSpPr>
+      <p:grpSpPr>
+        <a:xfrm>
+          <a:off x="0" y="0"/>
+          <a:ext cx="0" cy="0"/>
+          <a:chOff x="0" y="0"/>
+          <a:chExt cx="0" cy="0"/>
+        </a:xfrm>
+      </p:grpSpPr>
+      <p:sp>
+        <p:nvSpPr>
+          <p:cNvPr id="2" name="Title 1"/>
+          <p:cNvSpPr>
+            <a:spLocks noGrp="1"/>
+          </p:cNvSpPr>
+          <p:nvPr>
+            <p:ph type="title"/>
+          </p:nvPr>
+        </p:nvSpPr>
+        <p:spPr/>
+        <p:txBody>
+          <a:bodyPr/>
+          <a:lstStyle/>
+          <a:p>
+            <a:r>
+              <a:rPr lang="en-US" dirty="0" smtClean="0"/>
+              <a:t>Software &amp; tools</a:t>
+            </a:r>
+            <a:endParaRPr lang="nl-BE" dirty="0"/>
+          </a:p>
+        </p:txBody>
+      </p:sp>
+      <p:sp>
+        <p:nvSpPr>
+          <p:cNvPr id="3" name="Content Placeholder 2"/>
+          <p:cNvSpPr>
+            <a:spLocks noGrp="1"/>
+          </p:cNvSpPr>
+          <p:nvPr>
+            <p:ph idx="1"/>
+          </p:nvPr>
+        </p:nvSpPr>
+        <p:spPr>
+          <a:xfrm>
+            <a:off x="457200" y="1600201"/>
+            <a:ext cx="8229600" cy="5069159"/>
+          </a:xfrm>
+        </p:spPr>
+        <p:txBody>
+          <a:bodyPr>
+            <a:normAutofit fontScale="92500" lnSpcReduction="20000"/>
+          </a:bodyPr>
+          <a:lstStyle/>
+          <a:p>
+            <a:r>
+              <a:rPr lang="en-US" dirty="0" err="1" smtClean="0"/>
+              <a:t>git</a:t>
+            </a:r>
+            <a:r>
+              <a:rPr lang="en-US" dirty="0" smtClean="0"/>
+              <a:t> comes </a:t>
+            </a:r>
+            <a:r>
+              <a:rPr lang="en-US" smtClean="0"/>
+              <a:t>with most </a:t>
+            </a:r>
+            <a:r>
+              <a:rPr lang="en-US" dirty="0" smtClean="0"/>
+              <a:t>Linux distributions</a:t>
+            </a:r>
+          </a:p>
+          <a:p>
+            <a:r>
+              <a:rPr lang="en-US" dirty="0" smtClean="0"/>
+              <a:t>Website &amp; downloads: </a:t>
+            </a:r>
+            <a:r>
+              <a:rPr lang="en-US" dirty="0">
+                <a:hlinkClick r:id="rId2"/>
+              </a:rPr>
+              <a:t>https://git-scm.com</a:t>
+            </a:r>
+            <a:r>
+              <a:rPr lang="en-US" dirty="0" smtClean="0">
+                <a:hlinkClick r:id="rId2"/>
+              </a:rPr>
+              <a:t>/</a:t>
+            </a:r>
+            <a:r>
+              <a:rPr lang="en-US" dirty="0" smtClean="0"/>
+              <a:t> </a:t>
+            </a:r>
+          </a:p>
+          <a:p>
+            <a:r>
+              <a:rPr lang="en-US" dirty="0" smtClean="0"/>
+              <a:t>Desktop clients</a:t>
+            </a:r>
+          </a:p>
+          <a:p>
+            <a:pPr lvl="1"/>
+            <a:r>
+              <a:rPr lang="nl-BE" dirty="0"/>
+              <a:t>GitHub Desktop: </a:t>
+            </a:r>
+            <a:r>
+              <a:rPr lang="nl-BE" dirty="0">
+                <a:hlinkClick r:id="rId3"/>
+              </a:rPr>
+              <a:t>https://desktop.github.com</a:t>
+            </a:r>
+            <a:r>
+              <a:rPr lang="nl-BE" dirty="0" smtClean="0">
+                <a:hlinkClick r:id="rId3"/>
+              </a:rPr>
+              <a:t>/</a:t>
+            </a:r>
+            <a:r>
+              <a:rPr lang="nl-BE" dirty="0" smtClean="0"/>
+              <a:t> (Windows/</a:t>
+            </a:r>
+            <a:r>
+              <a:rPr lang="nl-BE" dirty="0" err="1" smtClean="0"/>
+              <a:t>MacOS</a:t>
+            </a:r>
+            <a:r>
+              <a:rPr lang="nl-BE" dirty="0" smtClean="0"/>
+              <a:t> X)</a:t>
+            </a:r>
+          </a:p>
+          <a:p>
+            <a:pPr lvl="1"/>
+            <a:r>
+              <a:rPr lang="en-US" dirty="0" err="1" smtClean="0"/>
+              <a:t>TortoiseGit</a:t>
+            </a:r>
+            <a:r>
+              <a:rPr lang="en-US" dirty="0"/>
+              <a:t>: </a:t>
+            </a:r>
+            <a:r>
+              <a:rPr lang="en-US" dirty="0">
+                <a:hlinkClick r:id="rId4"/>
+              </a:rPr>
+              <a:t>https://tortoisegit.org</a:t>
+            </a:r>
+            <a:r>
+              <a:rPr lang="en-US" dirty="0" smtClean="0">
+                <a:hlinkClick r:id="rId4"/>
+              </a:rPr>
+              <a:t>/</a:t>
+            </a:r>
+            <a:r>
+              <a:rPr lang="en-US" dirty="0" smtClean="0"/>
+              <a:t> (Windows)</a:t>
+            </a:r>
+          </a:p>
+          <a:p>
+            <a:pPr lvl="1"/>
+            <a:r>
+              <a:rPr lang="en-US" dirty="0" err="1"/>
+              <a:t>g</a:t>
+            </a:r>
+            <a:r>
+              <a:rPr lang="en-US" dirty="0" err="1" smtClean="0"/>
+              <a:t>it</a:t>
+            </a:r>
+            <a:r>
+              <a:rPr lang="en-US" dirty="0" smtClean="0"/>
+              <a:t>-cola</a:t>
+            </a:r>
+            <a:r>
+              <a:rPr lang="en-US" dirty="0"/>
+              <a:t>: </a:t>
+            </a:r>
+            <a:r>
+              <a:rPr lang="en-US" dirty="0">
+                <a:hlinkClick r:id="rId5"/>
+              </a:rPr>
+              <a:t>http://git-cola.github.io</a:t>
+            </a:r>
+            <a:r>
+              <a:rPr lang="en-US" dirty="0" smtClean="0">
+                <a:hlinkClick r:id="rId5"/>
+              </a:rPr>
+              <a:t>/</a:t>
+            </a:r>
+            <a:r>
+              <a:rPr lang="en-US" dirty="0" smtClean="0"/>
+              <a:t> (Linux/Windows/</a:t>
+            </a:r>
+            <a:r>
+              <a:rPr lang="en-US" dirty="0" err="1" smtClean="0"/>
+              <a:t>MacOS</a:t>
+            </a:r>
+            <a:r>
+              <a:rPr lang="en-US" dirty="0" smtClean="0"/>
+              <a:t> X)</a:t>
+            </a:r>
+          </a:p>
+          <a:p>
+            <a:r>
+              <a:rPr lang="en-US" dirty="0" err="1" smtClean="0"/>
+              <a:t>vcsh</a:t>
+            </a:r>
+            <a:r>
+              <a:rPr lang="en-US" dirty="0" smtClean="0"/>
+              <a:t>, </a:t>
+            </a:r>
+            <a:r>
+              <a:rPr lang="en-US" dirty="0"/>
+              <a:t>version control for configuration files </a:t>
+            </a:r>
+            <a:r>
+              <a:rPr lang="en-US" dirty="0" smtClean="0"/>
+              <a:t>: </a:t>
+            </a:r>
+            <a:r>
+              <a:rPr lang="en-US" dirty="0">
+                <a:hlinkClick r:id="rId6"/>
+              </a:rPr>
+              <a:t>https://</a:t>
+            </a:r>
+            <a:r>
+              <a:rPr lang="en-US" dirty="0" smtClean="0">
+                <a:hlinkClick r:id="rId6"/>
+              </a:rPr>
+              <a:t>github.com/RichiH/vcsh</a:t>
+            </a:r>
+            <a:r>
+              <a:rPr lang="en-US" dirty="0" smtClean="0"/>
+              <a:t> (Linux)</a:t>
+            </a:r>
+          </a:p>
+          <a:p>
+            <a:r>
+              <a:rPr lang="en-US" dirty="0" smtClean="0"/>
+              <a:t>git-prompt.sh, show </a:t>
+            </a:r>
+            <a:r>
+              <a:rPr lang="en-US" dirty="0" err="1" smtClean="0"/>
+              <a:t>git</a:t>
+            </a:r>
+            <a:r>
+              <a:rPr lang="en-US" dirty="0" smtClean="0"/>
+              <a:t> info in command line prompt: </a:t>
+            </a:r>
+            <a:r>
+              <a:rPr lang="en-US" dirty="0">
+                <a:hlinkClick r:id="rId7"/>
+              </a:rPr>
+              <a:t>http://git-prompt.sh</a:t>
+            </a:r>
+            <a:r>
+              <a:rPr lang="en-US" dirty="0" smtClean="0">
+                <a:hlinkClick r:id="rId7"/>
+              </a:rPr>
+              <a:t>/</a:t>
+            </a:r>
+            <a:r>
+              <a:rPr lang="en-US" dirty="0" smtClean="0"/>
+              <a:t> (Linux)</a:t>
+            </a:r>
+          </a:p>
+          <a:p>
+            <a:endParaRPr lang="nl-BE" dirty="0"/>
+          </a:p>
+        </p:txBody>
+      </p:sp>
+    </p:spTree>
+    <p:extLst>
+      <p:ext uri="{BB962C8B-B14F-4D97-AF65-F5344CB8AC3E}">
+        <p14:creationId xmlns:p14="http://schemas.microsoft.com/office/powerpoint/2010/main" val="3855217261"/>
+      </p:ext>
+    </p:extLst>
+  </p:cSld>
+  <p:clrMapOvr>
+    <a:masterClrMapping/>
+  </p:clrMapOvr>
 </p:sld>
 </file>
 

</xml_diff>

<commit_message>
Added numbers to slides
</commit_message>
<xml_diff>
--- a/LinuxTools/VersionControl/version_control_git.pptx
+++ b/LinuxTools/VersionControl/version_control_git.pptx
@@ -1,9 +1,12 @@
 
 <file path=ppt/presentation.xml><?xml version="1.0" encoding="utf-8"?>
-<p:presentation xmlns:a="http://schemas.openxmlformats.org/drawingml/2006/main" xmlns:r="http://schemas.openxmlformats.org/officeDocument/2006/relationships" xmlns:p="http://schemas.openxmlformats.org/presentationml/2006/main" saveSubsetFonts="1">
+<p:presentation xmlns:a="http://schemas.openxmlformats.org/drawingml/2006/main" xmlns:r="http://schemas.openxmlformats.org/officeDocument/2006/relationships" xmlns:p="http://schemas.openxmlformats.org/presentationml/2006/main" showSpecialPlsOnTitleSld="0" saveSubsetFonts="1">
   <p:sldMasterIdLst>
     <p:sldMasterId id="2147483648" r:id="rId1"/>
   </p:sldMasterIdLst>
+  <p:notesMasterIdLst>
+    <p:notesMasterId r:id="rId54"/>
+  </p:notesMasterIdLst>
   <p:sldIdLst>
     <p:sldId id="256" r:id="rId2"/>
     <p:sldId id="276" r:id="rId3"/>
@@ -265,6 +268,440 @@
 </p:cmLst>
 </file>
 
+<file path=ppt/notesMasters/notesMaster1.xml><?xml version="1.0" encoding="utf-8"?>
+<p:notesMaster xmlns:a="http://schemas.openxmlformats.org/drawingml/2006/main" xmlns:r="http://schemas.openxmlformats.org/officeDocument/2006/relationships" xmlns:p="http://schemas.openxmlformats.org/presentationml/2006/main">
+  <p:cSld>
+    <p:bg>
+      <p:bgRef idx="1001">
+        <a:schemeClr val="bg1"/>
+      </p:bgRef>
+    </p:bg>
+    <p:spTree>
+      <p:nvGrpSpPr>
+        <p:cNvPr id="1" name=""/>
+        <p:cNvGrpSpPr/>
+        <p:nvPr/>
+      </p:nvGrpSpPr>
+      <p:grpSpPr>
+        <a:xfrm>
+          <a:off x="0" y="0"/>
+          <a:ext cx="0" cy="0"/>
+          <a:chOff x="0" y="0"/>
+          <a:chExt cx="0" cy="0"/>
+        </a:xfrm>
+      </p:grpSpPr>
+      <p:sp>
+        <p:nvSpPr>
+          <p:cNvPr id="2" name="Header Placeholder 1"/>
+          <p:cNvSpPr>
+            <a:spLocks noGrp="1"/>
+          </p:cNvSpPr>
+          <p:nvPr>
+            <p:ph type="hdr" sz="quarter"/>
+          </p:nvPr>
+        </p:nvSpPr>
+        <p:spPr>
+          <a:xfrm>
+            <a:off x="0" y="0"/>
+            <a:ext cx="2971800" cy="458788"/>
+          </a:xfrm>
+          <a:prstGeom prst="rect">
+            <a:avLst/>
+          </a:prstGeom>
+        </p:spPr>
+        <p:txBody>
+          <a:bodyPr vert="horz" lIns="91440" tIns="45720" rIns="91440" bIns="45720" rtlCol="0"/>
+          <a:lstStyle>
+            <a:lvl1pPr algn="l">
+              <a:defRPr sz="1200"/>
+            </a:lvl1pPr>
+          </a:lstStyle>
+          <a:p>
+            <a:endParaRPr lang="nl-BE"/>
+          </a:p>
+        </p:txBody>
+      </p:sp>
+      <p:sp>
+        <p:nvSpPr>
+          <p:cNvPr id="3" name="Date Placeholder 2"/>
+          <p:cNvSpPr>
+            <a:spLocks noGrp="1"/>
+          </p:cNvSpPr>
+          <p:nvPr>
+            <p:ph type="dt" idx="1"/>
+          </p:nvPr>
+        </p:nvSpPr>
+        <p:spPr>
+          <a:xfrm>
+            <a:off x="3884613" y="0"/>
+            <a:ext cx="2971800" cy="458788"/>
+          </a:xfrm>
+          <a:prstGeom prst="rect">
+            <a:avLst/>
+          </a:prstGeom>
+        </p:spPr>
+        <p:txBody>
+          <a:bodyPr vert="horz" lIns="91440" tIns="45720" rIns="91440" bIns="45720" rtlCol="0"/>
+          <a:lstStyle>
+            <a:lvl1pPr algn="r">
+              <a:defRPr sz="1200"/>
+            </a:lvl1pPr>
+          </a:lstStyle>
+          <a:p>
+            <a:fld id="{11D3E7B2-0861-45F0-B59E-BA867D5C805D}" type="datetimeFigureOut">
+              <a:rPr lang="nl-BE" smtClean="0"/>
+              <a:t>2016-01-13</a:t>
+            </a:fld>
+            <a:endParaRPr lang="nl-BE"/>
+          </a:p>
+        </p:txBody>
+      </p:sp>
+      <p:sp>
+        <p:nvSpPr>
+          <p:cNvPr id="4" name="Slide Image Placeholder 3"/>
+          <p:cNvSpPr>
+            <a:spLocks noGrp="1" noRot="1" noChangeAspect="1"/>
+          </p:cNvSpPr>
+          <p:nvPr>
+            <p:ph type="sldImg" idx="2"/>
+          </p:nvPr>
+        </p:nvSpPr>
+        <p:spPr>
+          <a:xfrm>
+            <a:off x="1371600" y="1143000"/>
+            <a:ext cx="4114800" cy="3086100"/>
+          </a:xfrm>
+          <a:prstGeom prst="rect">
+            <a:avLst/>
+          </a:prstGeom>
+          <a:noFill/>
+          <a:ln w="12700">
+            <a:solidFill>
+              <a:prstClr val="black"/>
+            </a:solidFill>
+          </a:ln>
+        </p:spPr>
+        <p:txBody>
+          <a:bodyPr vert="horz" lIns="91440" tIns="45720" rIns="91440" bIns="45720" rtlCol="0" anchor="ctr"/>
+          <a:lstStyle/>
+          <a:p>
+            <a:endParaRPr lang="nl-BE"/>
+          </a:p>
+        </p:txBody>
+      </p:sp>
+      <p:sp>
+        <p:nvSpPr>
+          <p:cNvPr id="5" name="Notes Placeholder 4"/>
+          <p:cNvSpPr>
+            <a:spLocks noGrp="1"/>
+          </p:cNvSpPr>
+          <p:nvPr>
+            <p:ph type="body" sz="quarter" idx="3"/>
+          </p:nvPr>
+        </p:nvSpPr>
+        <p:spPr>
+          <a:xfrm>
+            <a:off x="685800" y="4400550"/>
+            <a:ext cx="5486400" cy="3600450"/>
+          </a:xfrm>
+          <a:prstGeom prst="rect">
+            <a:avLst/>
+          </a:prstGeom>
+        </p:spPr>
+        <p:txBody>
+          <a:bodyPr vert="horz" lIns="91440" tIns="45720" rIns="91440" bIns="45720" rtlCol="0"/>
+          <a:lstStyle/>
+          <a:p>
+            <a:pPr lvl="0"/>
+            <a:r>
+              <a:rPr lang="en-US" smtClean="0"/>
+              <a:t>Click to edit Master text styles</a:t>
+            </a:r>
+          </a:p>
+          <a:p>
+            <a:pPr lvl="1"/>
+            <a:r>
+              <a:rPr lang="en-US" smtClean="0"/>
+              <a:t>Second level</a:t>
+            </a:r>
+          </a:p>
+          <a:p>
+            <a:pPr lvl="2"/>
+            <a:r>
+              <a:rPr lang="en-US" smtClean="0"/>
+              <a:t>Third level</a:t>
+            </a:r>
+          </a:p>
+          <a:p>
+            <a:pPr lvl="3"/>
+            <a:r>
+              <a:rPr lang="en-US" smtClean="0"/>
+              <a:t>Fourth level</a:t>
+            </a:r>
+          </a:p>
+          <a:p>
+            <a:pPr lvl="4"/>
+            <a:r>
+              <a:rPr lang="en-US" smtClean="0"/>
+              <a:t>Fifth level</a:t>
+            </a:r>
+            <a:endParaRPr lang="nl-BE"/>
+          </a:p>
+        </p:txBody>
+      </p:sp>
+      <p:sp>
+        <p:nvSpPr>
+          <p:cNvPr id="6" name="Footer Placeholder 5"/>
+          <p:cNvSpPr>
+            <a:spLocks noGrp="1"/>
+          </p:cNvSpPr>
+          <p:nvPr>
+            <p:ph type="ftr" sz="quarter" idx="4"/>
+          </p:nvPr>
+        </p:nvSpPr>
+        <p:spPr>
+          <a:xfrm>
+            <a:off x="0" y="8685213"/>
+            <a:ext cx="2971800" cy="458787"/>
+          </a:xfrm>
+          <a:prstGeom prst="rect">
+            <a:avLst/>
+          </a:prstGeom>
+        </p:spPr>
+        <p:txBody>
+          <a:bodyPr vert="horz" lIns="91440" tIns="45720" rIns="91440" bIns="45720" rtlCol="0" anchor="b"/>
+          <a:lstStyle>
+            <a:lvl1pPr algn="l">
+              <a:defRPr sz="1200"/>
+            </a:lvl1pPr>
+          </a:lstStyle>
+          <a:p>
+            <a:endParaRPr lang="nl-BE"/>
+          </a:p>
+        </p:txBody>
+      </p:sp>
+      <p:sp>
+        <p:nvSpPr>
+          <p:cNvPr id="7" name="Slide Number Placeholder 6"/>
+          <p:cNvSpPr>
+            <a:spLocks noGrp="1"/>
+          </p:cNvSpPr>
+          <p:nvPr>
+            <p:ph type="sldNum" sz="quarter" idx="5"/>
+          </p:nvPr>
+        </p:nvSpPr>
+        <p:spPr>
+          <a:xfrm>
+            <a:off x="3884613" y="8685213"/>
+            <a:ext cx="2971800" cy="458787"/>
+          </a:xfrm>
+          <a:prstGeom prst="rect">
+            <a:avLst/>
+          </a:prstGeom>
+        </p:spPr>
+        <p:txBody>
+          <a:bodyPr vert="horz" lIns="91440" tIns="45720" rIns="91440" bIns="45720" rtlCol="0" anchor="b"/>
+          <a:lstStyle>
+            <a:lvl1pPr algn="r">
+              <a:defRPr sz="1200"/>
+            </a:lvl1pPr>
+          </a:lstStyle>
+          <a:p>
+            <a:fld id="{1A571F42-F258-455F-A3F1-D2E86FDFEB4C}" type="slidenum">
+              <a:rPr lang="nl-BE" smtClean="0"/>
+              <a:t>‹#›</a:t>
+            </a:fld>
+            <a:endParaRPr lang="nl-BE"/>
+          </a:p>
+        </p:txBody>
+      </p:sp>
+    </p:spTree>
+    <p:extLst>
+      <p:ext uri="{BB962C8B-B14F-4D97-AF65-F5344CB8AC3E}">
+        <p14:creationId xmlns:p14="http://schemas.microsoft.com/office/powerpoint/2010/main" val="3308318306"/>
+      </p:ext>
+    </p:extLst>
+  </p:cSld>
+  <p:clrMap bg1="lt1" tx1="dk1" bg2="lt2" tx2="dk2" accent1="accent1" accent2="accent2" accent3="accent3" accent4="accent4" accent5="accent5" accent6="accent6" hlink="hlink" folHlink="folHlink"/>
+  <p:notesStyle>
+    <a:lvl1pPr marL="0" algn="l" defTabSz="914400" rtl="0" eaLnBrk="1" latinLnBrk="0" hangingPunct="1">
+      <a:defRPr sz="1200" kern="1200">
+        <a:solidFill>
+          <a:schemeClr val="tx1"/>
+        </a:solidFill>
+        <a:latin typeface="+mn-lt"/>
+        <a:ea typeface="+mn-ea"/>
+        <a:cs typeface="+mn-cs"/>
+      </a:defRPr>
+    </a:lvl1pPr>
+    <a:lvl2pPr marL="457200" algn="l" defTabSz="914400" rtl="0" eaLnBrk="1" latinLnBrk="0" hangingPunct="1">
+      <a:defRPr sz="1200" kern="1200">
+        <a:solidFill>
+          <a:schemeClr val="tx1"/>
+        </a:solidFill>
+        <a:latin typeface="+mn-lt"/>
+        <a:ea typeface="+mn-ea"/>
+        <a:cs typeface="+mn-cs"/>
+      </a:defRPr>
+    </a:lvl2pPr>
+    <a:lvl3pPr marL="914400" algn="l" defTabSz="914400" rtl="0" eaLnBrk="1" latinLnBrk="0" hangingPunct="1">
+      <a:defRPr sz="1200" kern="1200">
+        <a:solidFill>
+          <a:schemeClr val="tx1"/>
+        </a:solidFill>
+        <a:latin typeface="+mn-lt"/>
+        <a:ea typeface="+mn-ea"/>
+        <a:cs typeface="+mn-cs"/>
+      </a:defRPr>
+    </a:lvl3pPr>
+    <a:lvl4pPr marL="1371600" algn="l" defTabSz="914400" rtl="0" eaLnBrk="1" latinLnBrk="0" hangingPunct="1">
+      <a:defRPr sz="1200" kern="1200">
+        <a:solidFill>
+          <a:schemeClr val="tx1"/>
+        </a:solidFill>
+        <a:latin typeface="+mn-lt"/>
+        <a:ea typeface="+mn-ea"/>
+        <a:cs typeface="+mn-cs"/>
+      </a:defRPr>
+    </a:lvl4pPr>
+    <a:lvl5pPr marL="1828800" algn="l" defTabSz="914400" rtl="0" eaLnBrk="1" latinLnBrk="0" hangingPunct="1">
+      <a:defRPr sz="1200" kern="1200">
+        <a:solidFill>
+          <a:schemeClr val="tx1"/>
+        </a:solidFill>
+        <a:latin typeface="+mn-lt"/>
+        <a:ea typeface="+mn-ea"/>
+        <a:cs typeface="+mn-cs"/>
+      </a:defRPr>
+    </a:lvl5pPr>
+    <a:lvl6pPr marL="2286000" algn="l" defTabSz="914400" rtl="0" eaLnBrk="1" latinLnBrk="0" hangingPunct="1">
+      <a:defRPr sz="1200" kern="1200">
+        <a:solidFill>
+          <a:schemeClr val="tx1"/>
+        </a:solidFill>
+        <a:latin typeface="+mn-lt"/>
+        <a:ea typeface="+mn-ea"/>
+        <a:cs typeface="+mn-cs"/>
+      </a:defRPr>
+    </a:lvl6pPr>
+    <a:lvl7pPr marL="2743200" algn="l" defTabSz="914400" rtl="0" eaLnBrk="1" latinLnBrk="0" hangingPunct="1">
+      <a:defRPr sz="1200" kern="1200">
+        <a:solidFill>
+          <a:schemeClr val="tx1"/>
+        </a:solidFill>
+        <a:latin typeface="+mn-lt"/>
+        <a:ea typeface="+mn-ea"/>
+        <a:cs typeface="+mn-cs"/>
+      </a:defRPr>
+    </a:lvl7pPr>
+    <a:lvl8pPr marL="3200400" algn="l" defTabSz="914400" rtl="0" eaLnBrk="1" latinLnBrk="0" hangingPunct="1">
+      <a:defRPr sz="1200" kern="1200">
+        <a:solidFill>
+          <a:schemeClr val="tx1"/>
+        </a:solidFill>
+        <a:latin typeface="+mn-lt"/>
+        <a:ea typeface="+mn-ea"/>
+        <a:cs typeface="+mn-cs"/>
+      </a:defRPr>
+    </a:lvl8pPr>
+    <a:lvl9pPr marL="3657600" algn="l" defTabSz="914400" rtl="0" eaLnBrk="1" latinLnBrk="0" hangingPunct="1">
+      <a:defRPr sz="1200" kern="1200">
+        <a:solidFill>
+          <a:schemeClr val="tx1"/>
+        </a:solidFill>
+        <a:latin typeface="+mn-lt"/>
+        <a:ea typeface="+mn-ea"/>
+        <a:cs typeface="+mn-cs"/>
+      </a:defRPr>
+    </a:lvl9pPr>
+  </p:notesStyle>
+</p:notesMaster>
+</file>
+
+<file path=ppt/notesSlides/notesSlide1.xml><?xml version="1.0" encoding="utf-8"?>
+<p:notes xmlns:a="http://schemas.openxmlformats.org/drawingml/2006/main" xmlns:r="http://schemas.openxmlformats.org/officeDocument/2006/relationships" xmlns:p="http://schemas.openxmlformats.org/presentationml/2006/main">
+  <p:cSld>
+    <p:spTree>
+      <p:nvGrpSpPr>
+        <p:cNvPr id="1" name=""/>
+        <p:cNvGrpSpPr/>
+        <p:nvPr/>
+      </p:nvGrpSpPr>
+      <p:grpSpPr>
+        <a:xfrm>
+          <a:off x="0" y="0"/>
+          <a:ext cx="0" cy="0"/>
+          <a:chOff x="0" y="0"/>
+          <a:chExt cx="0" cy="0"/>
+        </a:xfrm>
+      </p:grpSpPr>
+      <p:sp>
+        <p:nvSpPr>
+          <p:cNvPr id="2" name="Slide Image Placeholder 1"/>
+          <p:cNvSpPr>
+            <a:spLocks noGrp="1" noRot="1" noChangeAspect="1"/>
+          </p:cNvSpPr>
+          <p:nvPr>
+            <p:ph type="sldImg"/>
+          </p:nvPr>
+        </p:nvSpPr>
+        <p:spPr/>
+      </p:sp>
+      <p:sp>
+        <p:nvSpPr>
+          <p:cNvPr id="3" name="Notes Placeholder 2"/>
+          <p:cNvSpPr>
+            <a:spLocks noGrp="1"/>
+          </p:cNvSpPr>
+          <p:nvPr>
+            <p:ph type="body" idx="1"/>
+          </p:nvPr>
+        </p:nvSpPr>
+        <p:spPr/>
+        <p:txBody>
+          <a:bodyPr/>
+          <a:lstStyle/>
+          <a:p>
+            <a:endParaRPr lang="nl-BE"/>
+          </a:p>
+        </p:txBody>
+      </p:sp>
+      <p:sp>
+        <p:nvSpPr>
+          <p:cNvPr id="4" name="Slide Number Placeholder 3"/>
+          <p:cNvSpPr>
+            <a:spLocks noGrp="1"/>
+          </p:cNvSpPr>
+          <p:nvPr>
+            <p:ph type="sldNum" sz="quarter" idx="10"/>
+          </p:nvPr>
+        </p:nvSpPr>
+        <p:spPr/>
+        <p:txBody>
+          <a:bodyPr/>
+          <a:lstStyle/>
+          <a:p>
+            <a:fld id="{1A571F42-F258-455F-A3F1-D2E86FDFEB4C}" type="slidenum">
+              <a:rPr lang="nl-BE" smtClean="0"/>
+              <a:t>52</a:t>
+            </a:fld>
+            <a:endParaRPr lang="nl-BE"/>
+          </a:p>
+        </p:txBody>
+      </p:sp>
+    </p:spTree>
+    <p:extLst>
+      <p:ext uri="{BB962C8B-B14F-4D97-AF65-F5344CB8AC3E}">
+        <p14:creationId xmlns:p14="http://schemas.microsoft.com/office/powerpoint/2010/main" val="2608529918"/>
+      </p:ext>
+    </p:extLst>
+  </p:cSld>
+  <p:clrMapOvr>
+    <a:masterClrMapping/>
+  </p:clrMapOvr>
+</p:notes>
+</file>
+
 <file path=ppt/slideLayouts/slideLayout1.xml><?xml version="1.0" encoding="utf-8"?>
 <p:sldLayout xmlns:a="http://schemas.openxmlformats.org/drawingml/2006/main" xmlns:r="http://schemas.openxmlformats.org/officeDocument/2006/relationships" xmlns:p="http://schemas.openxmlformats.org/presentationml/2006/main" type="title" preserve="1">
   <p:cSld name="Title Slide">
@@ -444,7 +881,7 @@
           <a:bodyPr/>
           <a:lstStyle/>
           <a:p>
-            <a:fld id="{31155545-FFF6-4666-BE18-08518292A6F3}" type="datetimeFigureOut">
+            <a:fld id="{208C4982-2142-4DAC-808C-52C1A6ABA40A}" type="datetime1">
               <a:rPr lang="nl-BE" smtClean="0"/>
               <a:t>2016-01-13</a:t>
             </a:fld>
@@ -614,7 +1051,7 @@
           <a:bodyPr/>
           <a:lstStyle/>
           <a:p>
-            <a:fld id="{31155545-FFF6-4666-BE18-08518292A6F3}" type="datetimeFigureOut">
+            <a:fld id="{596A4774-AA95-4CEA-9215-BE91EC5FD3A2}" type="datetime1">
               <a:rPr lang="nl-BE" smtClean="0"/>
               <a:t>2016-01-13</a:t>
             </a:fld>
@@ -794,7 +1231,7 @@
           <a:bodyPr/>
           <a:lstStyle/>
           <a:p>
-            <a:fld id="{31155545-FFF6-4666-BE18-08518292A6F3}" type="datetimeFigureOut">
+            <a:fld id="{E3C938DE-9D5A-4A9D-B2A9-9053FBBA636A}" type="datetime1">
               <a:rPr lang="nl-BE" smtClean="0"/>
               <a:t>2016-01-13</a:t>
             </a:fld>
@@ -964,7 +1401,7 @@
           <a:bodyPr/>
           <a:lstStyle/>
           <a:p>
-            <a:fld id="{31155545-FFF6-4666-BE18-08518292A6F3}" type="datetimeFigureOut">
+            <a:fld id="{70B73439-F632-4142-A813-39A8890A9414}" type="datetime1">
               <a:rPr lang="nl-BE" smtClean="0"/>
               <a:t>2016-01-13</a:t>
             </a:fld>
@@ -1210,7 +1647,7 @@
           <a:bodyPr/>
           <a:lstStyle/>
           <a:p>
-            <a:fld id="{31155545-FFF6-4666-BE18-08518292A6F3}" type="datetimeFigureOut">
+            <a:fld id="{2DA105E3-7574-4472-893A-A0C7A919BAE6}" type="datetime1">
               <a:rPr lang="nl-BE" smtClean="0"/>
               <a:t>2016-01-13</a:t>
             </a:fld>
@@ -1498,7 +1935,7 @@
           <a:bodyPr/>
           <a:lstStyle/>
           <a:p>
-            <a:fld id="{31155545-FFF6-4666-BE18-08518292A6F3}" type="datetimeFigureOut">
+            <a:fld id="{184B200F-AF61-4171-AE34-7A4B12E0FBA3}" type="datetime1">
               <a:rPr lang="nl-BE" smtClean="0"/>
               <a:t>2016-01-13</a:t>
             </a:fld>
@@ -1920,7 +2357,7 @@
           <a:bodyPr/>
           <a:lstStyle/>
           <a:p>
-            <a:fld id="{31155545-FFF6-4666-BE18-08518292A6F3}" type="datetimeFigureOut">
+            <a:fld id="{4DDD3743-DAF8-4465-AEC2-93735E02B3D0}" type="datetime1">
               <a:rPr lang="nl-BE" smtClean="0"/>
               <a:t>2016-01-13</a:t>
             </a:fld>
@@ -2038,7 +2475,7 @@
           <a:bodyPr/>
           <a:lstStyle/>
           <a:p>
-            <a:fld id="{31155545-FFF6-4666-BE18-08518292A6F3}" type="datetimeFigureOut">
+            <a:fld id="{0E48E2E9-C147-459B-ACCB-D6DDC51735D3}" type="datetime1">
               <a:rPr lang="nl-BE" smtClean="0"/>
               <a:t>2016-01-13</a:t>
             </a:fld>
@@ -2133,7 +2570,7 @@
           <a:bodyPr/>
           <a:lstStyle/>
           <a:p>
-            <a:fld id="{31155545-FFF6-4666-BE18-08518292A6F3}" type="datetimeFigureOut">
+            <a:fld id="{C92A24F5-0967-4B11-849A-0009476290B5}" type="datetime1">
               <a:rPr lang="nl-BE" smtClean="0"/>
               <a:t>2016-01-13</a:t>
             </a:fld>
@@ -2410,7 +2847,7 @@
           <a:bodyPr/>
           <a:lstStyle/>
           <a:p>
-            <a:fld id="{31155545-FFF6-4666-BE18-08518292A6F3}" type="datetimeFigureOut">
+            <a:fld id="{CAAB6B0C-E333-4316-A6EC-161EFC5CB4BD}" type="datetime1">
               <a:rPr lang="nl-BE" smtClean="0"/>
               <a:t>2016-01-13</a:t>
             </a:fld>
@@ -2663,7 +3100,7 @@
           <a:bodyPr/>
           <a:lstStyle/>
           <a:p>
-            <a:fld id="{31155545-FFF6-4666-BE18-08518292A6F3}" type="datetimeFigureOut">
+            <a:fld id="{5AC2428B-24E8-4004-8AB4-EA69DDAD1475}" type="datetime1">
               <a:rPr lang="nl-BE" smtClean="0"/>
               <a:t>2016-01-13</a:t>
             </a:fld>
@@ -2876,7 +3313,7 @@
             </a:lvl1pPr>
           </a:lstStyle>
           <a:p>
-            <a:fld id="{31155545-FFF6-4666-BE18-08518292A6F3}" type="datetimeFigureOut">
+            <a:fld id="{063E4CA3-87AF-44C9-B256-93720A95DFC3}" type="datetime1">
               <a:rPr lang="nl-BE" smtClean="0"/>
               <a:t>2016-01-13</a:t>
             </a:fld>
@@ -2983,6 +3420,7 @@
     <p:sldLayoutId id="2147483658" r:id="rId10"/>
     <p:sldLayoutId id="2147483659" r:id="rId11"/>
   </p:sldLayoutIdLst>
+  <p:hf hdr="0" ftr="0" dt="0"/>
   <p:txStyles>
     <p:titleStyle>
       <a:lvl1pPr algn="ctr" defTabSz="914400" rtl="0" eaLnBrk="1" latinLnBrk="0" hangingPunct="1">
@@ -3439,6 +3877,29 @@
           </a:p>
         </p:txBody>
       </p:sp>
+      <p:sp>
+        <p:nvSpPr>
+          <p:cNvPr id="4" name="Slide Number Placeholder 3"/>
+          <p:cNvSpPr>
+            <a:spLocks noGrp="1"/>
+          </p:cNvSpPr>
+          <p:nvPr>
+            <p:ph type="sldNum" sz="quarter" idx="12"/>
+          </p:nvPr>
+        </p:nvSpPr>
+        <p:spPr/>
+        <p:txBody>
+          <a:bodyPr/>
+          <a:lstStyle/>
+          <a:p>
+            <a:fld id="{BB52A05A-A776-4391-ACD7-D6BC34D3145C}" type="slidenum">
+              <a:rPr lang="nl-BE" smtClean="0"/>
+              <a:t>10</a:t>
+            </a:fld>
+            <a:endParaRPr lang="nl-BE"/>
+          </a:p>
+        </p:txBody>
+      </p:sp>
     </p:spTree>
     <p:extLst>
       <p:ext uri="{BB962C8B-B14F-4D97-AF65-F5344CB8AC3E}">
@@ -3639,6 +4100,29 @@
           </a:p>
           <a:p>
             <a:endParaRPr lang="nl-BE" dirty="0"/>
+          </a:p>
+        </p:txBody>
+      </p:sp>
+      <p:sp>
+        <p:nvSpPr>
+          <p:cNvPr id="4" name="Slide Number Placeholder 3"/>
+          <p:cNvSpPr>
+            <a:spLocks noGrp="1"/>
+          </p:cNvSpPr>
+          <p:nvPr>
+            <p:ph type="sldNum" sz="quarter" idx="12"/>
+          </p:nvPr>
+        </p:nvSpPr>
+        <p:spPr/>
+        <p:txBody>
+          <a:bodyPr/>
+          <a:lstStyle/>
+          <a:p>
+            <a:fld id="{BB52A05A-A776-4391-ACD7-D6BC34D3145C}" type="slidenum">
+              <a:rPr lang="nl-BE" smtClean="0"/>
+              <a:t>11</a:t>
+            </a:fld>
+            <a:endParaRPr lang="nl-BE"/>
           </a:p>
         </p:txBody>
       </p:sp>
@@ -5864,6 +6348,29 @@
           </a:p>
         </p:txBody>
       </p:sp>
+      <p:sp>
+        <p:nvSpPr>
+          <p:cNvPr id="9" name="Slide Number Placeholder 8"/>
+          <p:cNvSpPr>
+            <a:spLocks noGrp="1"/>
+          </p:cNvSpPr>
+          <p:nvPr>
+            <p:ph type="sldNum" sz="quarter" idx="12"/>
+          </p:nvPr>
+        </p:nvSpPr>
+        <p:spPr/>
+        <p:txBody>
+          <a:bodyPr/>
+          <a:lstStyle/>
+          <a:p>
+            <a:fld id="{BB52A05A-A776-4391-ACD7-D6BC34D3145C}" type="slidenum">
+              <a:rPr lang="nl-BE" smtClean="0"/>
+              <a:t>12</a:t>
+            </a:fld>
+            <a:endParaRPr lang="nl-BE"/>
+          </a:p>
+        </p:txBody>
+      </p:sp>
     </p:spTree>
     <p:extLst>
       <p:ext uri="{BB962C8B-B14F-4D97-AF65-F5344CB8AC3E}">
@@ -5995,6 +6502,29 @@
               <a:t>Can be single remote repository, or multiple</a:t>
             </a:r>
             <a:endParaRPr lang="nl-BE" dirty="0"/>
+          </a:p>
+        </p:txBody>
+      </p:sp>
+      <p:sp>
+        <p:nvSpPr>
+          <p:cNvPr id="4" name="Slide Number Placeholder 3"/>
+          <p:cNvSpPr>
+            <a:spLocks noGrp="1"/>
+          </p:cNvSpPr>
+          <p:nvPr>
+            <p:ph type="sldNum" sz="quarter" idx="12"/>
+          </p:nvPr>
+        </p:nvSpPr>
+        <p:spPr/>
+        <p:txBody>
+          <a:bodyPr/>
+          <a:lstStyle/>
+          <a:p>
+            <a:fld id="{BB52A05A-A776-4391-ACD7-D6BC34D3145C}" type="slidenum">
+              <a:rPr lang="nl-BE" smtClean="0"/>
+              <a:t>13</a:t>
+            </a:fld>
+            <a:endParaRPr lang="nl-BE"/>
           </a:p>
         </p:txBody>
       </p:sp>
@@ -6214,6 +6744,29 @@
           </a:p>
         </p:txBody>
       </p:sp>
+      <p:sp>
+        <p:nvSpPr>
+          <p:cNvPr id="5" name="Slide Number Placeholder 4"/>
+          <p:cNvSpPr>
+            <a:spLocks noGrp="1"/>
+          </p:cNvSpPr>
+          <p:nvPr>
+            <p:ph type="sldNum" sz="quarter" idx="12"/>
+          </p:nvPr>
+        </p:nvSpPr>
+        <p:spPr/>
+        <p:txBody>
+          <a:bodyPr/>
+          <a:lstStyle/>
+          <a:p>
+            <a:fld id="{BB52A05A-A776-4391-ACD7-D6BC34D3145C}" type="slidenum">
+              <a:rPr lang="nl-BE" smtClean="0"/>
+              <a:t>14</a:t>
+            </a:fld>
+            <a:endParaRPr lang="nl-BE"/>
+          </a:p>
+        </p:txBody>
+      </p:sp>
     </p:spTree>
     <p:extLst>
       <p:ext uri="{BB962C8B-B14F-4D97-AF65-F5344CB8AC3E}">
@@ -6289,6 +6842,29 @@
           <a:bodyPr/>
           <a:lstStyle/>
           <a:p>
+            <a:endParaRPr lang="nl-BE"/>
+          </a:p>
+        </p:txBody>
+      </p:sp>
+      <p:sp>
+        <p:nvSpPr>
+          <p:cNvPr id="4" name="Slide Number Placeholder 3"/>
+          <p:cNvSpPr>
+            <a:spLocks noGrp="1"/>
+          </p:cNvSpPr>
+          <p:nvPr>
+            <p:ph type="sldNum" sz="quarter" idx="12"/>
+          </p:nvPr>
+        </p:nvSpPr>
+        <p:spPr/>
+        <p:txBody>
+          <a:bodyPr/>
+          <a:lstStyle/>
+          <a:p>
+            <a:fld id="{BB52A05A-A776-4391-ACD7-D6BC34D3145C}" type="slidenum">
+              <a:rPr lang="nl-BE" smtClean="0"/>
+              <a:t>15</a:t>
+            </a:fld>
             <a:endParaRPr lang="nl-BE"/>
           </a:p>
         </p:txBody>
@@ -6792,6 +7368,29 @@
               <a:t>Once for project!</a:t>
             </a:r>
             <a:endParaRPr lang="nl-BE" sz="4000" dirty="0"/>
+          </a:p>
+        </p:txBody>
+      </p:sp>
+      <p:sp>
+        <p:nvSpPr>
+          <p:cNvPr id="2" name="Slide Number Placeholder 1"/>
+          <p:cNvSpPr>
+            <a:spLocks noGrp="1"/>
+          </p:cNvSpPr>
+          <p:nvPr>
+            <p:ph type="sldNum" sz="quarter" idx="12"/>
+          </p:nvPr>
+        </p:nvSpPr>
+        <p:spPr/>
+        <p:txBody>
+          <a:bodyPr/>
+          <a:lstStyle/>
+          <a:p>
+            <a:fld id="{BB52A05A-A776-4391-ACD7-D6BC34D3145C}" type="slidenum">
+              <a:rPr lang="nl-BE" smtClean="0"/>
+              <a:t>16</a:t>
+            </a:fld>
+            <a:endParaRPr lang="nl-BE"/>
           </a:p>
         </p:txBody>
       </p:sp>
@@ -7396,6 +7995,29 @@
           </a:p>
         </p:txBody>
       </p:sp>
+      <p:sp>
+        <p:nvSpPr>
+          <p:cNvPr id="4" name="Slide Number Placeholder 3"/>
+          <p:cNvSpPr>
+            <a:spLocks noGrp="1"/>
+          </p:cNvSpPr>
+          <p:nvPr>
+            <p:ph type="sldNum" sz="quarter" idx="12"/>
+          </p:nvPr>
+        </p:nvSpPr>
+        <p:spPr/>
+        <p:txBody>
+          <a:bodyPr/>
+          <a:lstStyle/>
+          <a:p>
+            <a:fld id="{BB52A05A-A776-4391-ACD7-D6BC34D3145C}" type="slidenum">
+              <a:rPr lang="nl-BE" smtClean="0"/>
+              <a:t>17</a:t>
+            </a:fld>
+            <a:endParaRPr lang="nl-BE"/>
+          </a:p>
+        </p:txBody>
+      </p:sp>
     </p:spTree>
     <p:extLst>
       <p:ext uri="{BB962C8B-B14F-4D97-AF65-F5344CB8AC3E}">
@@ -7969,6 +8591,29 @@
               <a:t>Step 2 affects repository</a:t>
             </a:r>
             <a:endParaRPr lang="nl-BE" sz="2400" dirty="0"/>
+          </a:p>
+        </p:txBody>
+      </p:sp>
+      <p:sp>
+        <p:nvSpPr>
+          <p:cNvPr id="4" name="Slide Number Placeholder 3"/>
+          <p:cNvSpPr>
+            <a:spLocks noGrp="1"/>
+          </p:cNvSpPr>
+          <p:nvPr>
+            <p:ph type="sldNum" sz="quarter" idx="12"/>
+          </p:nvPr>
+        </p:nvSpPr>
+        <p:spPr/>
+        <p:txBody>
+          <a:bodyPr/>
+          <a:lstStyle/>
+          <a:p>
+            <a:fld id="{BB52A05A-A776-4391-ACD7-D6BC34D3145C}" type="slidenum">
+              <a:rPr lang="nl-BE" smtClean="0"/>
+              <a:t>18</a:t>
+            </a:fld>
+            <a:endParaRPr lang="nl-BE"/>
           </a:p>
         </p:txBody>
       </p:sp>
@@ -8543,6 +9188,29 @@
           </a:p>
         </p:txBody>
       </p:sp>
+      <p:sp>
+        <p:nvSpPr>
+          <p:cNvPr id="5" name="Slide Number Placeholder 4"/>
+          <p:cNvSpPr>
+            <a:spLocks noGrp="1"/>
+          </p:cNvSpPr>
+          <p:nvPr>
+            <p:ph type="sldNum" sz="quarter" idx="12"/>
+          </p:nvPr>
+        </p:nvSpPr>
+        <p:spPr/>
+        <p:txBody>
+          <a:bodyPr/>
+          <a:lstStyle/>
+          <a:p>
+            <a:fld id="{BB52A05A-A776-4391-ACD7-D6BC34D3145C}" type="slidenum">
+              <a:rPr lang="nl-BE" smtClean="0"/>
+              <a:t>19</a:t>
+            </a:fld>
+            <a:endParaRPr lang="nl-BE"/>
+          </a:p>
+        </p:txBody>
+      </p:sp>
     </p:spTree>
     <p:extLst>
       <p:ext uri="{BB962C8B-B14F-4D97-AF65-F5344CB8AC3E}">
@@ -8810,6 +9478,29 @@
           </a:p>
         </p:txBody>
       </p:sp>
+      <p:sp>
+        <p:nvSpPr>
+          <p:cNvPr id="4" name="Slide Number Placeholder 3"/>
+          <p:cNvSpPr>
+            <a:spLocks noGrp="1"/>
+          </p:cNvSpPr>
+          <p:nvPr>
+            <p:ph type="sldNum" sz="quarter" idx="12"/>
+          </p:nvPr>
+        </p:nvSpPr>
+        <p:spPr/>
+        <p:txBody>
+          <a:bodyPr/>
+          <a:lstStyle/>
+          <a:p>
+            <a:fld id="{BB52A05A-A776-4391-ACD7-D6BC34D3145C}" type="slidenum">
+              <a:rPr lang="nl-BE" smtClean="0"/>
+              <a:t>2</a:t>
+            </a:fld>
+            <a:endParaRPr lang="nl-BE"/>
+          </a:p>
+        </p:txBody>
+      </p:sp>
     </p:spTree>
     <p:extLst>
       <p:ext uri="{BB962C8B-B14F-4D97-AF65-F5344CB8AC3E}">
@@ -9373,6 +10064,29 @@
           </p:style>
         </p:cxnSp>
       </p:grpSp>
+      <p:sp>
+        <p:nvSpPr>
+          <p:cNvPr id="9" name="Slide Number Placeholder 8"/>
+          <p:cNvSpPr>
+            <a:spLocks noGrp="1"/>
+          </p:cNvSpPr>
+          <p:nvPr>
+            <p:ph type="sldNum" sz="quarter" idx="12"/>
+          </p:nvPr>
+        </p:nvSpPr>
+        <p:spPr/>
+        <p:txBody>
+          <a:bodyPr/>
+          <a:lstStyle/>
+          <a:p>
+            <a:fld id="{BB52A05A-A776-4391-ACD7-D6BC34D3145C}" type="slidenum">
+              <a:rPr lang="nl-BE" smtClean="0"/>
+              <a:t>20</a:t>
+            </a:fld>
+            <a:endParaRPr lang="nl-BE"/>
+          </a:p>
+        </p:txBody>
+      </p:sp>
     </p:spTree>
     <p:extLst>
       <p:ext uri="{BB962C8B-B14F-4D97-AF65-F5344CB8AC3E}">
@@ -9996,6 +10710,29 @@
               <a:latin typeface="Courier New" panose="02070309020205020404" pitchFamily="49" charset="0"/>
               <a:cs typeface="Courier New" panose="02070309020205020404" pitchFamily="49" charset="0"/>
             </a:endParaRPr>
+          </a:p>
+        </p:txBody>
+      </p:sp>
+      <p:sp>
+        <p:nvSpPr>
+          <p:cNvPr id="4" name="Slide Number Placeholder 3"/>
+          <p:cNvSpPr>
+            <a:spLocks noGrp="1"/>
+          </p:cNvSpPr>
+          <p:nvPr>
+            <p:ph type="sldNum" sz="quarter" idx="12"/>
+          </p:nvPr>
+        </p:nvSpPr>
+        <p:spPr/>
+        <p:txBody>
+          <a:bodyPr/>
+          <a:lstStyle/>
+          <a:p>
+            <a:fld id="{BB52A05A-A776-4391-ACD7-D6BC34D3145C}" type="slidenum">
+              <a:rPr lang="nl-BE" smtClean="0"/>
+              <a:t>21</a:t>
+            </a:fld>
+            <a:endParaRPr lang="nl-BE"/>
           </a:p>
         </p:txBody>
       </p:sp>
@@ -11718,6 +12455,29 @@
           </a:effectLst>
         </p:spPr>
       </p:pic>
+      <p:sp>
+        <p:nvSpPr>
+          <p:cNvPr id="4" name="Slide Number Placeholder 3"/>
+          <p:cNvSpPr>
+            <a:spLocks noGrp="1"/>
+          </p:cNvSpPr>
+          <p:nvPr>
+            <p:ph type="sldNum" sz="quarter" idx="12"/>
+          </p:nvPr>
+        </p:nvSpPr>
+        <p:spPr/>
+        <p:txBody>
+          <a:bodyPr/>
+          <a:lstStyle/>
+          <a:p>
+            <a:fld id="{BB52A05A-A776-4391-ACD7-D6BC34D3145C}" type="slidenum">
+              <a:rPr lang="nl-BE" smtClean="0"/>
+              <a:t>22</a:t>
+            </a:fld>
+            <a:endParaRPr lang="nl-BE"/>
+          </a:p>
+        </p:txBody>
+      </p:sp>
     </p:spTree>
     <p:extLst>
       <p:ext uri="{BB962C8B-B14F-4D97-AF65-F5344CB8AC3E}">
@@ -12241,6 +13001,29 @@
               <a:t>Use branches (see later)</a:t>
             </a:r>
             <a:endParaRPr lang="nl-BE" sz="2400" dirty="0"/>
+          </a:p>
+        </p:txBody>
+      </p:sp>
+      <p:sp>
+        <p:nvSpPr>
+          <p:cNvPr id="5" name="Slide Number Placeholder 4"/>
+          <p:cNvSpPr>
+            <a:spLocks noGrp="1"/>
+          </p:cNvSpPr>
+          <p:nvPr>
+            <p:ph type="sldNum" sz="quarter" idx="12"/>
+          </p:nvPr>
+        </p:nvSpPr>
+        <p:spPr/>
+        <p:txBody>
+          <a:bodyPr/>
+          <a:lstStyle/>
+          <a:p>
+            <a:fld id="{BB52A05A-A776-4391-ACD7-D6BC34D3145C}" type="slidenum">
+              <a:rPr lang="nl-BE" smtClean="0"/>
+              <a:t>23</a:t>
+            </a:fld>
+            <a:endParaRPr lang="nl-BE"/>
           </a:p>
         </p:txBody>
       </p:sp>
@@ -12949,6 +13732,29 @@
               <a:t> commands!</a:t>
             </a:r>
             <a:endParaRPr lang="nl-BE" sz="3200" dirty="0"/>
+          </a:p>
+        </p:txBody>
+      </p:sp>
+      <p:sp>
+        <p:nvSpPr>
+          <p:cNvPr id="6" name="Slide Number Placeholder 5"/>
+          <p:cNvSpPr>
+            <a:spLocks noGrp="1"/>
+          </p:cNvSpPr>
+          <p:nvPr>
+            <p:ph type="sldNum" sz="quarter" idx="12"/>
+          </p:nvPr>
+        </p:nvSpPr>
+        <p:spPr/>
+        <p:txBody>
+          <a:bodyPr/>
+          <a:lstStyle/>
+          <a:p>
+            <a:fld id="{BB52A05A-A776-4391-ACD7-D6BC34D3145C}" type="slidenum">
+              <a:rPr lang="nl-BE" smtClean="0"/>
+              <a:t>24</a:t>
+            </a:fld>
+            <a:endParaRPr lang="nl-BE"/>
           </a:p>
         </p:txBody>
       </p:sp>
@@ -13701,6 +14507,29 @@
           </a:p>
         </p:txBody>
       </p:sp>
+      <p:sp>
+        <p:nvSpPr>
+          <p:cNvPr id="6" name="Slide Number Placeholder 5"/>
+          <p:cNvSpPr>
+            <a:spLocks noGrp="1"/>
+          </p:cNvSpPr>
+          <p:nvPr>
+            <p:ph type="sldNum" sz="quarter" idx="12"/>
+          </p:nvPr>
+        </p:nvSpPr>
+        <p:spPr/>
+        <p:txBody>
+          <a:bodyPr/>
+          <a:lstStyle/>
+          <a:p>
+            <a:fld id="{BB52A05A-A776-4391-ACD7-D6BC34D3145C}" type="slidenum">
+              <a:rPr lang="nl-BE" smtClean="0"/>
+              <a:t>25</a:t>
+            </a:fld>
+            <a:endParaRPr lang="nl-BE"/>
+          </a:p>
+        </p:txBody>
+      </p:sp>
     </p:spTree>
     <p:extLst>
       <p:ext uri="{BB962C8B-B14F-4D97-AF65-F5344CB8AC3E}">
@@ -14388,6 +15217,29 @@
           </a:p>
         </p:txBody>
       </p:sp>
+      <p:sp>
+        <p:nvSpPr>
+          <p:cNvPr id="4" name="Slide Number Placeholder 3"/>
+          <p:cNvSpPr>
+            <a:spLocks noGrp="1"/>
+          </p:cNvSpPr>
+          <p:nvPr>
+            <p:ph type="sldNum" sz="quarter" idx="12"/>
+          </p:nvPr>
+        </p:nvSpPr>
+        <p:spPr/>
+        <p:txBody>
+          <a:bodyPr/>
+          <a:lstStyle/>
+          <a:p>
+            <a:fld id="{BB52A05A-A776-4391-ACD7-D6BC34D3145C}" type="slidenum">
+              <a:rPr lang="nl-BE" smtClean="0"/>
+              <a:t>26</a:t>
+            </a:fld>
+            <a:endParaRPr lang="nl-BE"/>
+          </a:p>
+        </p:txBody>
+      </p:sp>
     </p:spTree>
     <p:extLst>
       <p:ext uri="{BB962C8B-B14F-4D97-AF65-F5344CB8AC3E}">
@@ -15021,6 +15873,29 @@
               <a:latin typeface="Courier New" pitchFamily="49" charset="0"/>
               <a:cs typeface="Courier New" pitchFamily="49" charset="0"/>
             </a:endParaRPr>
+          </a:p>
+        </p:txBody>
+      </p:sp>
+      <p:sp>
+        <p:nvSpPr>
+          <p:cNvPr id="7" name="Slide Number Placeholder 6"/>
+          <p:cNvSpPr>
+            <a:spLocks noGrp="1"/>
+          </p:cNvSpPr>
+          <p:nvPr>
+            <p:ph type="sldNum" sz="quarter" idx="12"/>
+          </p:nvPr>
+        </p:nvSpPr>
+        <p:spPr/>
+        <p:txBody>
+          <a:bodyPr/>
+          <a:lstStyle/>
+          <a:p>
+            <a:fld id="{BB52A05A-A776-4391-ACD7-D6BC34D3145C}" type="slidenum">
+              <a:rPr lang="nl-BE" smtClean="0"/>
+              <a:t>27</a:t>
+            </a:fld>
+            <a:endParaRPr lang="nl-BE"/>
           </a:p>
         </p:txBody>
       </p:sp>
@@ -15902,6 +16777,29 @@
           </a:p>
         </p:txBody>
       </p:sp>
+      <p:sp>
+        <p:nvSpPr>
+          <p:cNvPr id="10" name="Slide Number Placeholder 9"/>
+          <p:cNvSpPr>
+            <a:spLocks noGrp="1"/>
+          </p:cNvSpPr>
+          <p:nvPr>
+            <p:ph type="sldNum" sz="quarter" idx="12"/>
+          </p:nvPr>
+        </p:nvSpPr>
+        <p:spPr/>
+        <p:txBody>
+          <a:bodyPr/>
+          <a:lstStyle/>
+          <a:p>
+            <a:fld id="{BB52A05A-A776-4391-ACD7-D6BC34D3145C}" type="slidenum">
+              <a:rPr lang="nl-BE" smtClean="0"/>
+              <a:t>28</a:t>
+            </a:fld>
+            <a:endParaRPr lang="nl-BE"/>
+          </a:p>
+        </p:txBody>
+      </p:sp>
     </p:spTree>
     <p:extLst>
       <p:ext uri="{BB962C8B-B14F-4D97-AF65-F5344CB8AC3E}">
@@ -16354,6 +17252,29 @@
               </a:rPr>
               <a:t>0ba188919fe</a:t>
             </a:r>
+          </a:p>
+        </p:txBody>
+      </p:sp>
+      <p:sp>
+        <p:nvSpPr>
+          <p:cNvPr id="8" name="Slide Number Placeholder 7"/>
+          <p:cNvSpPr>
+            <a:spLocks noGrp="1"/>
+          </p:cNvSpPr>
+          <p:nvPr>
+            <p:ph type="sldNum" sz="quarter" idx="12"/>
+          </p:nvPr>
+        </p:nvSpPr>
+        <p:spPr/>
+        <p:txBody>
+          <a:bodyPr/>
+          <a:lstStyle/>
+          <a:p>
+            <a:fld id="{BB52A05A-A776-4391-ACD7-D6BC34D3145C}" type="slidenum">
+              <a:rPr lang="nl-BE" smtClean="0"/>
+              <a:t>29</a:t>
+            </a:fld>
+            <a:endParaRPr lang="nl-BE"/>
           </a:p>
         </p:txBody>
       </p:sp>
@@ -16783,6 +17704,29 @@
           </a:p>
         </p:txBody>
       </p:sp>
+      <p:sp>
+        <p:nvSpPr>
+          <p:cNvPr id="4" name="Slide Number Placeholder 3"/>
+          <p:cNvSpPr>
+            <a:spLocks noGrp="1"/>
+          </p:cNvSpPr>
+          <p:nvPr>
+            <p:ph type="sldNum" sz="quarter" idx="12"/>
+          </p:nvPr>
+        </p:nvSpPr>
+        <p:spPr/>
+        <p:txBody>
+          <a:bodyPr/>
+          <a:lstStyle/>
+          <a:p>
+            <a:fld id="{BB52A05A-A776-4391-ACD7-D6BC34D3145C}" type="slidenum">
+              <a:rPr lang="nl-BE" smtClean="0"/>
+              <a:t>3</a:t>
+            </a:fld>
+            <a:endParaRPr lang="nl-BE"/>
+          </a:p>
+        </p:txBody>
+      </p:sp>
     </p:spTree>
     <p:extLst>
       <p:ext uri="{BB962C8B-B14F-4D97-AF65-F5344CB8AC3E}">
@@ -16986,6 +17930,29 @@
               </a:rPr>
               <a:t>  1.0</a:t>
             </a:r>
+          </a:p>
+        </p:txBody>
+      </p:sp>
+      <p:sp>
+        <p:nvSpPr>
+          <p:cNvPr id="4" name="Slide Number Placeholder 3"/>
+          <p:cNvSpPr>
+            <a:spLocks noGrp="1"/>
+          </p:cNvSpPr>
+          <p:nvPr>
+            <p:ph type="sldNum" sz="quarter" idx="12"/>
+          </p:nvPr>
+        </p:nvSpPr>
+        <p:spPr/>
+        <p:txBody>
+          <a:bodyPr/>
+          <a:lstStyle/>
+          <a:p>
+            <a:fld id="{BB52A05A-A776-4391-ACD7-D6BC34D3145C}" type="slidenum">
+              <a:rPr lang="nl-BE" smtClean="0"/>
+              <a:t>30</a:t>
+            </a:fld>
+            <a:endParaRPr lang="nl-BE"/>
           </a:p>
         </p:txBody>
       </p:sp>
@@ -17787,6 +18754,29 @@
           </a:p>
         </p:txBody>
       </p:sp>
+      <p:sp>
+        <p:nvSpPr>
+          <p:cNvPr id="6" name="Slide Number Placeholder 5"/>
+          <p:cNvSpPr>
+            <a:spLocks noGrp="1"/>
+          </p:cNvSpPr>
+          <p:nvPr>
+            <p:ph type="sldNum" sz="quarter" idx="12"/>
+          </p:nvPr>
+        </p:nvSpPr>
+        <p:spPr/>
+        <p:txBody>
+          <a:bodyPr/>
+          <a:lstStyle/>
+          <a:p>
+            <a:fld id="{BB52A05A-A776-4391-ACD7-D6BC34D3145C}" type="slidenum">
+              <a:rPr lang="nl-BE" smtClean="0"/>
+              <a:t>31</a:t>
+            </a:fld>
+            <a:endParaRPr lang="nl-BE"/>
+          </a:p>
+        </p:txBody>
+      </p:sp>
     </p:spTree>
     <p:extLst>
       <p:ext uri="{BB962C8B-B14F-4D97-AF65-F5344CB8AC3E}">
@@ -18071,6 +19061,29 @@
           </a:p>
         </p:txBody>
       </p:sp>
+      <p:sp>
+        <p:nvSpPr>
+          <p:cNvPr id="4" name="Slide Number Placeholder 3"/>
+          <p:cNvSpPr>
+            <a:spLocks noGrp="1"/>
+          </p:cNvSpPr>
+          <p:nvPr>
+            <p:ph type="sldNum" sz="quarter" idx="12"/>
+          </p:nvPr>
+        </p:nvSpPr>
+        <p:spPr/>
+        <p:txBody>
+          <a:bodyPr/>
+          <a:lstStyle/>
+          <a:p>
+            <a:fld id="{BB52A05A-A776-4391-ACD7-D6BC34D3145C}" type="slidenum">
+              <a:rPr lang="nl-BE" smtClean="0"/>
+              <a:t>32</a:t>
+            </a:fld>
+            <a:endParaRPr lang="nl-BE"/>
+          </a:p>
+        </p:txBody>
+      </p:sp>
     </p:spTree>
     <p:extLst>
       <p:ext uri="{BB962C8B-B14F-4D97-AF65-F5344CB8AC3E}">
@@ -18339,6 +19352,29 @@
               <a:latin typeface="Courier New" pitchFamily="49" charset="0"/>
               <a:cs typeface="Courier New" pitchFamily="49" charset="0"/>
             </a:endParaRPr>
+          </a:p>
+        </p:txBody>
+      </p:sp>
+      <p:sp>
+        <p:nvSpPr>
+          <p:cNvPr id="6" name="Slide Number Placeholder 5"/>
+          <p:cNvSpPr>
+            <a:spLocks noGrp="1"/>
+          </p:cNvSpPr>
+          <p:nvPr>
+            <p:ph type="sldNum" sz="quarter" idx="12"/>
+          </p:nvPr>
+        </p:nvSpPr>
+        <p:spPr/>
+        <p:txBody>
+          <a:bodyPr/>
+          <a:lstStyle/>
+          <a:p>
+            <a:fld id="{BB52A05A-A776-4391-ACD7-D6BC34D3145C}" type="slidenum">
+              <a:rPr lang="nl-BE" smtClean="0"/>
+              <a:t>33</a:t>
+            </a:fld>
+            <a:endParaRPr lang="nl-BE"/>
           </a:p>
         </p:txBody>
       </p:sp>
@@ -19079,6 +20115,29 @@
               </a:rPr>
               <a:t>  master</a:t>
             </a:r>
+          </a:p>
+        </p:txBody>
+      </p:sp>
+      <p:sp>
+        <p:nvSpPr>
+          <p:cNvPr id="5" name="Slide Number Placeholder 4"/>
+          <p:cNvSpPr>
+            <a:spLocks noGrp="1"/>
+          </p:cNvSpPr>
+          <p:nvPr>
+            <p:ph type="sldNum" sz="quarter" idx="12"/>
+          </p:nvPr>
+        </p:nvSpPr>
+        <p:spPr/>
+        <p:txBody>
+          <a:bodyPr/>
+          <a:lstStyle/>
+          <a:p>
+            <a:fld id="{BB52A05A-A776-4391-ACD7-D6BC34D3145C}" type="slidenum">
+              <a:rPr lang="nl-BE" smtClean="0"/>
+              <a:t>34</a:t>
+            </a:fld>
+            <a:endParaRPr lang="nl-BE"/>
           </a:p>
         </p:txBody>
       </p:sp>
@@ -21233,6 +22292,29 @@
           </p:txBody>
         </p:sp>
       </p:grpSp>
+      <p:sp>
+        <p:nvSpPr>
+          <p:cNvPr id="3" name="Slide Number Placeholder 2"/>
+          <p:cNvSpPr>
+            <a:spLocks noGrp="1"/>
+          </p:cNvSpPr>
+          <p:nvPr>
+            <p:ph type="sldNum" sz="quarter" idx="12"/>
+          </p:nvPr>
+        </p:nvSpPr>
+        <p:spPr/>
+        <p:txBody>
+          <a:bodyPr/>
+          <a:lstStyle/>
+          <a:p>
+            <a:fld id="{BB52A05A-A776-4391-ACD7-D6BC34D3145C}" type="slidenum">
+              <a:rPr lang="nl-BE" smtClean="0"/>
+              <a:t>35</a:t>
+            </a:fld>
+            <a:endParaRPr lang="nl-BE"/>
+          </a:p>
+        </p:txBody>
+      </p:sp>
     </p:spTree>
     <p:extLst>
       <p:ext uri="{BB962C8B-B14F-4D97-AF65-F5344CB8AC3E}">
@@ -21775,6 +22857,29 @@
           </a:p>
         </p:txBody>
       </p:sp>
+      <p:sp>
+        <p:nvSpPr>
+          <p:cNvPr id="4" name="Slide Number Placeholder 3"/>
+          <p:cNvSpPr>
+            <a:spLocks noGrp="1"/>
+          </p:cNvSpPr>
+          <p:nvPr>
+            <p:ph type="sldNum" sz="quarter" idx="12"/>
+          </p:nvPr>
+        </p:nvSpPr>
+        <p:spPr/>
+        <p:txBody>
+          <a:bodyPr/>
+          <a:lstStyle/>
+          <a:p>
+            <a:fld id="{BB52A05A-A776-4391-ACD7-D6BC34D3145C}" type="slidenum">
+              <a:rPr lang="nl-BE" smtClean="0"/>
+              <a:t>36</a:t>
+            </a:fld>
+            <a:endParaRPr lang="nl-BE"/>
+          </a:p>
+        </p:txBody>
+      </p:sp>
     </p:spTree>
     <p:extLst>
       <p:ext uri="{BB962C8B-B14F-4D97-AF65-F5344CB8AC3E}">
@@ -22606,6 +23711,29 @@
               </a:rPr>
               <a:t> – 1]);</a:t>
             </a:r>
+          </a:p>
+        </p:txBody>
+      </p:sp>
+      <p:sp>
+        <p:nvSpPr>
+          <p:cNvPr id="5" name="Slide Number Placeholder 4"/>
+          <p:cNvSpPr>
+            <a:spLocks noGrp="1"/>
+          </p:cNvSpPr>
+          <p:nvPr>
+            <p:ph type="sldNum" sz="quarter" idx="12"/>
+          </p:nvPr>
+        </p:nvSpPr>
+        <p:spPr/>
+        <p:txBody>
+          <a:bodyPr/>
+          <a:lstStyle/>
+          <a:p>
+            <a:fld id="{BB52A05A-A776-4391-ACD7-D6BC34D3145C}" type="slidenum">
+              <a:rPr lang="nl-BE" smtClean="0"/>
+              <a:t>37</a:t>
+            </a:fld>
+            <a:endParaRPr lang="nl-BE"/>
           </a:p>
         </p:txBody>
       </p:sp>
@@ -23034,6 +24162,29 @@
               <a:rPr lang="en-US" dirty="0" smtClean="0"/>
               <a:t> is pretty smart about merging</a:t>
             </a:r>
+          </a:p>
+        </p:txBody>
+      </p:sp>
+      <p:sp>
+        <p:nvSpPr>
+          <p:cNvPr id="4" name="Slide Number Placeholder 3"/>
+          <p:cNvSpPr>
+            <a:spLocks noGrp="1"/>
+          </p:cNvSpPr>
+          <p:nvPr>
+            <p:ph type="sldNum" sz="quarter" idx="12"/>
+          </p:nvPr>
+        </p:nvSpPr>
+        <p:spPr/>
+        <p:txBody>
+          <a:bodyPr/>
+          <a:lstStyle/>
+          <a:p>
+            <a:fld id="{BB52A05A-A776-4391-ACD7-D6BC34D3145C}" type="slidenum">
+              <a:rPr lang="nl-BE" smtClean="0"/>
+              <a:t>38</a:t>
+            </a:fld>
+            <a:endParaRPr lang="nl-BE"/>
           </a:p>
         </p:txBody>
       </p:sp>
@@ -24936,6 +26087,29 @@
           </a:p>
         </p:txBody>
       </p:sp>
+      <p:sp>
+        <p:nvSpPr>
+          <p:cNvPr id="10" name="Slide Number Placeholder 9"/>
+          <p:cNvSpPr>
+            <a:spLocks noGrp="1"/>
+          </p:cNvSpPr>
+          <p:nvPr>
+            <p:ph type="sldNum" sz="quarter" idx="12"/>
+          </p:nvPr>
+        </p:nvSpPr>
+        <p:spPr/>
+        <p:txBody>
+          <a:bodyPr/>
+          <a:lstStyle/>
+          <a:p>
+            <a:fld id="{BB52A05A-A776-4391-ACD7-D6BC34D3145C}" type="slidenum">
+              <a:rPr lang="nl-BE" smtClean="0"/>
+              <a:t>39</a:t>
+            </a:fld>
+            <a:endParaRPr lang="nl-BE"/>
+          </a:p>
+        </p:txBody>
+      </p:sp>
     </p:spTree>
     <p:extLst>
       <p:ext uri="{BB962C8B-B14F-4D97-AF65-F5344CB8AC3E}">
@@ -25800,6 +26974,29 @@
           </a:extLst>
         </p:spPr>
       </p:pic>
+      <p:sp>
+        <p:nvSpPr>
+          <p:cNvPr id="2" name="Slide Number Placeholder 1"/>
+          <p:cNvSpPr>
+            <a:spLocks noGrp="1"/>
+          </p:cNvSpPr>
+          <p:nvPr>
+            <p:ph type="sldNum" sz="quarter" idx="12"/>
+          </p:nvPr>
+        </p:nvSpPr>
+        <p:spPr/>
+        <p:txBody>
+          <a:bodyPr/>
+          <a:lstStyle/>
+          <a:p>
+            <a:fld id="{BB52A05A-A776-4391-ACD7-D6BC34D3145C}" type="slidenum">
+              <a:rPr lang="nl-BE" smtClean="0"/>
+              <a:t>4</a:t>
+            </a:fld>
+            <a:endParaRPr lang="nl-BE"/>
+          </a:p>
+        </p:txBody>
+      </p:sp>
     </p:spTree>
     <p:extLst>
       <p:ext uri="{BB962C8B-B14F-4D97-AF65-F5344CB8AC3E}">
@@ -25947,6 +27144,29 @@
               <a:t>Branches are short-lived, single purpose</a:t>
             </a:r>
             <a:endParaRPr lang="nl-BE" sz="2800" dirty="0"/>
+          </a:p>
+        </p:txBody>
+      </p:sp>
+      <p:sp>
+        <p:nvSpPr>
+          <p:cNvPr id="5" name="Slide Number Placeholder 4"/>
+          <p:cNvSpPr>
+            <a:spLocks noGrp="1"/>
+          </p:cNvSpPr>
+          <p:nvPr>
+            <p:ph type="sldNum" sz="quarter" idx="12"/>
+          </p:nvPr>
+        </p:nvSpPr>
+        <p:spPr/>
+        <p:txBody>
+          <a:bodyPr/>
+          <a:lstStyle/>
+          <a:p>
+            <a:fld id="{BB52A05A-A776-4391-ACD7-D6BC34D3145C}" type="slidenum">
+              <a:rPr lang="nl-BE" smtClean="0"/>
+              <a:t>40</a:t>
+            </a:fld>
+            <a:endParaRPr lang="nl-BE"/>
           </a:p>
         </p:txBody>
       </p:sp>
@@ -26596,6 +27816,29 @@
           </a:p>
         </p:txBody>
       </p:sp>
+      <p:sp>
+        <p:nvSpPr>
+          <p:cNvPr id="7" name="Slide Number Placeholder 6"/>
+          <p:cNvSpPr>
+            <a:spLocks noGrp="1"/>
+          </p:cNvSpPr>
+          <p:nvPr>
+            <p:ph type="sldNum" sz="quarter" idx="12"/>
+          </p:nvPr>
+        </p:nvSpPr>
+        <p:spPr/>
+        <p:txBody>
+          <a:bodyPr/>
+          <a:lstStyle/>
+          <a:p>
+            <a:fld id="{BB52A05A-A776-4391-ACD7-D6BC34D3145C}" type="slidenum">
+              <a:rPr lang="nl-BE" smtClean="0"/>
+              <a:t>41</a:t>
+            </a:fld>
+            <a:endParaRPr lang="nl-BE"/>
+          </a:p>
+        </p:txBody>
+      </p:sp>
     </p:spTree>
     <p:extLst>
       <p:ext uri="{BB962C8B-B14F-4D97-AF65-F5344CB8AC3E}">
@@ -27189,6 +28432,29 @@
               <a:latin typeface="Courier New" pitchFamily="49" charset="0"/>
               <a:cs typeface="Courier New" pitchFamily="49" charset="0"/>
             </a:endParaRPr>
+          </a:p>
+        </p:txBody>
+      </p:sp>
+      <p:sp>
+        <p:nvSpPr>
+          <p:cNvPr id="6" name="Slide Number Placeholder 5"/>
+          <p:cNvSpPr>
+            <a:spLocks noGrp="1"/>
+          </p:cNvSpPr>
+          <p:nvPr>
+            <p:ph type="sldNum" sz="quarter" idx="12"/>
+          </p:nvPr>
+        </p:nvSpPr>
+        <p:spPr/>
+        <p:txBody>
+          <a:bodyPr/>
+          <a:lstStyle/>
+          <a:p>
+            <a:fld id="{BB52A05A-A776-4391-ACD7-D6BC34D3145C}" type="slidenum">
+              <a:rPr lang="nl-BE" smtClean="0"/>
+              <a:t>42</a:t>
+            </a:fld>
+            <a:endParaRPr lang="nl-BE"/>
           </a:p>
         </p:txBody>
       </p:sp>
@@ -28617,6 +29883,29 @@
           </a:p>
         </p:txBody>
       </p:sp>
+      <p:sp>
+        <p:nvSpPr>
+          <p:cNvPr id="3" name="Slide Number Placeholder 2"/>
+          <p:cNvSpPr>
+            <a:spLocks noGrp="1"/>
+          </p:cNvSpPr>
+          <p:nvPr>
+            <p:ph type="sldNum" sz="quarter" idx="12"/>
+          </p:nvPr>
+        </p:nvSpPr>
+        <p:spPr/>
+        <p:txBody>
+          <a:bodyPr/>
+          <a:lstStyle/>
+          <a:p>
+            <a:fld id="{BB52A05A-A776-4391-ACD7-D6BC34D3145C}" type="slidenum">
+              <a:rPr lang="nl-BE" smtClean="0"/>
+              <a:t>43</a:t>
+            </a:fld>
+            <a:endParaRPr lang="nl-BE"/>
+          </a:p>
+        </p:txBody>
+      </p:sp>
     </p:spTree>
     <p:extLst>
       <p:ext uri="{BB962C8B-B14F-4D97-AF65-F5344CB8AC3E}">
@@ -29795,6 +31084,29 @@
           </a:p>
         </p:txBody>
       </p:sp>
+      <p:sp>
+        <p:nvSpPr>
+          <p:cNvPr id="12" name="Slide Number Placeholder 11"/>
+          <p:cNvSpPr>
+            <a:spLocks noGrp="1"/>
+          </p:cNvSpPr>
+          <p:nvPr>
+            <p:ph type="sldNum" sz="quarter" idx="12"/>
+          </p:nvPr>
+        </p:nvSpPr>
+        <p:spPr/>
+        <p:txBody>
+          <a:bodyPr/>
+          <a:lstStyle/>
+          <a:p>
+            <a:fld id="{BB52A05A-A776-4391-ACD7-D6BC34D3145C}" type="slidenum">
+              <a:rPr lang="nl-BE" smtClean="0"/>
+              <a:t>44</a:t>
+            </a:fld>
+            <a:endParaRPr lang="nl-BE"/>
+          </a:p>
+        </p:txBody>
+      </p:sp>
     </p:spTree>
     <p:extLst>
       <p:ext uri="{BB962C8B-B14F-4D97-AF65-F5344CB8AC3E}">
@@ -30337,6 +31649,29 @@
           </a:p>
         </p:txBody>
       </p:sp>
+      <p:sp>
+        <p:nvSpPr>
+          <p:cNvPr id="6" name="Slide Number Placeholder 5"/>
+          <p:cNvSpPr>
+            <a:spLocks noGrp="1"/>
+          </p:cNvSpPr>
+          <p:nvPr>
+            <p:ph type="sldNum" sz="quarter" idx="12"/>
+          </p:nvPr>
+        </p:nvSpPr>
+        <p:spPr/>
+        <p:txBody>
+          <a:bodyPr/>
+          <a:lstStyle/>
+          <a:p>
+            <a:fld id="{BB52A05A-A776-4391-ACD7-D6BC34D3145C}" type="slidenum">
+              <a:rPr lang="nl-BE" smtClean="0"/>
+              <a:t>45</a:t>
+            </a:fld>
+            <a:endParaRPr lang="nl-BE"/>
+          </a:p>
+        </p:txBody>
+      </p:sp>
     </p:spTree>
     <p:extLst>
       <p:ext uri="{BB962C8B-B14F-4D97-AF65-F5344CB8AC3E}">
@@ -30744,6 +32079,29 @@
               <a:latin typeface="Courier New" pitchFamily="49" charset="0"/>
               <a:cs typeface="Courier New" pitchFamily="49" charset="0"/>
             </a:endParaRPr>
+          </a:p>
+        </p:txBody>
+      </p:sp>
+      <p:sp>
+        <p:nvSpPr>
+          <p:cNvPr id="6" name="Slide Number Placeholder 5"/>
+          <p:cNvSpPr>
+            <a:spLocks noGrp="1"/>
+          </p:cNvSpPr>
+          <p:nvPr>
+            <p:ph type="sldNum" sz="quarter" idx="12"/>
+          </p:nvPr>
+        </p:nvSpPr>
+        <p:spPr/>
+        <p:txBody>
+          <a:bodyPr/>
+          <a:lstStyle/>
+          <a:p>
+            <a:fld id="{BB52A05A-A776-4391-ACD7-D6BC34D3145C}" type="slidenum">
+              <a:rPr lang="nl-BE" smtClean="0"/>
+              <a:t>46</a:t>
+            </a:fld>
+            <a:endParaRPr lang="nl-BE"/>
           </a:p>
         </p:txBody>
       </p:sp>
@@ -31437,6 +32795,29 @@
               </a:rPr>
               <a:t> 0ba188919fec</a:t>
             </a:r>
+          </a:p>
+        </p:txBody>
+      </p:sp>
+      <p:sp>
+        <p:nvSpPr>
+          <p:cNvPr id="11" name="Slide Number Placeholder 10"/>
+          <p:cNvSpPr>
+            <a:spLocks noGrp="1"/>
+          </p:cNvSpPr>
+          <p:nvPr>
+            <p:ph type="sldNum" sz="quarter" idx="12"/>
+          </p:nvPr>
+        </p:nvSpPr>
+        <p:spPr/>
+        <p:txBody>
+          <a:bodyPr/>
+          <a:lstStyle/>
+          <a:p>
+            <a:fld id="{BB52A05A-A776-4391-ACD7-D6BC34D3145C}" type="slidenum">
+              <a:rPr lang="nl-BE" smtClean="0"/>
+              <a:t>47</a:t>
+            </a:fld>
+            <a:endParaRPr lang="nl-BE"/>
           </a:p>
         </p:txBody>
       </p:sp>
@@ -32119,6 +33500,29 @@
           </a:p>
         </p:txBody>
       </p:sp>
+      <p:sp>
+        <p:nvSpPr>
+          <p:cNvPr id="7" name="Slide Number Placeholder 6"/>
+          <p:cNvSpPr>
+            <a:spLocks noGrp="1"/>
+          </p:cNvSpPr>
+          <p:nvPr>
+            <p:ph type="sldNum" sz="quarter" idx="12"/>
+          </p:nvPr>
+        </p:nvSpPr>
+        <p:spPr/>
+        <p:txBody>
+          <a:bodyPr/>
+          <a:lstStyle/>
+          <a:p>
+            <a:fld id="{BB52A05A-A776-4391-ACD7-D6BC34D3145C}" type="slidenum">
+              <a:rPr lang="nl-BE" smtClean="0"/>
+              <a:t>48</a:t>
+            </a:fld>
+            <a:endParaRPr lang="nl-BE"/>
+          </a:p>
+        </p:txBody>
+      </p:sp>
     </p:spTree>
     <p:extLst>
       <p:ext uri="{BB962C8B-B14F-4D97-AF65-F5344CB8AC3E}">
@@ -32476,6 +33880,29 @@
           </a:p>
         </p:txBody>
       </p:sp>
+      <p:sp>
+        <p:nvSpPr>
+          <p:cNvPr id="4" name="Slide Number Placeholder 3"/>
+          <p:cNvSpPr>
+            <a:spLocks noGrp="1"/>
+          </p:cNvSpPr>
+          <p:nvPr>
+            <p:ph type="sldNum" sz="quarter" idx="12"/>
+          </p:nvPr>
+        </p:nvSpPr>
+        <p:spPr/>
+        <p:txBody>
+          <a:bodyPr/>
+          <a:lstStyle/>
+          <a:p>
+            <a:fld id="{BB52A05A-A776-4391-ACD7-D6BC34D3145C}" type="slidenum">
+              <a:rPr lang="nl-BE" smtClean="0"/>
+              <a:t>49</a:t>
+            </a:fld>
+            <a:endParaRPr lang="nl-BE"/>
+          </a:p>
+        </p:txBody>
+      </p:sp>
     </p:spTree>
     <p:extLst>
       <p:ext uri="{BB962C8B-B14F-4D97-AF65-F5344CB8AC3E}">
@@ -32624,6 +34051,29 @@
           <a:p>
             <a:pPr lvl="1"/>
             <a:endParaRPr lang="nl-BE" dirty="0"/>
+          </a:p>
+        </p:txBody>
+      </p:sp>
+      <p:sp>
+        <p:nvSpPr>
+          <p:cNvPr id="4" name="Slide Number Placeholder 3"/>
+          <p:cNvSpPr>
+            <a:spLocks noGrp="1"/>
+          </p:cNvSpPr>
+          <p:nvPr>
+            <p:ph type="sldNum" sz="quarter" idx="12"/>
+          </p:nvPr>
+        </p:nvSpPr>
+        <p:spPr/>
+        <p:txBody>
+          <a:bodyPr/>
+          <a:lstStyle/>
+          <a:p>
+            <a:fld id="{BB52A05A-A776-4391-ACD7-D6BC34D3145C}" type="slidenum">
+              <a:rPr lang="nl-BE" smtClean="0"/>
+              <a:t>5</a:t>
+            </a:fld>
+            <a:endParaRPr lang="nl-BE"/>
           </a:p>
         </p:txBody>
       </p:sp>
@@ -33156,6 +34606,29 @@
           </a:p>
         </p:txBody>
       </p:sp>
+      <p:sp>
+        <p:nvSpPr>
+          <p:cNvPr id="4" name="Slide Number Placeholder 3"/>
+          <p:cNvSpPr>
+            <a:spLocks noGrp="1"/>
+          </p:cNvSpPr>
+          <p:nvPr>
+            <p:ph type="sldNum" sz="quarter" idx="12"/>
+          </p:nvPr>
+        </p:nvSpPr>
+        <p:spPr/>
+        <p:txBody>
+          <a:bodyPr/>
+          <a:lstStyle/>
+          <a:p>
+            <a:fld id="{BB52A05A-A776-4391-ACD7-D6BC34D3145C}" type="slidenum">
+              <a:rPr lang="nl-BE" smtClean="0"/>
+              <a:t>50</a:t>
+            </a:fld>
+            <a:endParaRPr lang="nl-BE"/>
+          </a:p>
+        </p:txBody>
+      </p:sp>
     </p:spTree>
     <p:extLst>
       <p:ext uri="{BB962C8B-B14F-4D97-AF65-F5344CB8AC3E}">
@@ -33277,6 +34750,29 @@
               <a:t>Why was it changed?</a:t>
             </a:r>
             <a:endParaRPr lang="nl-BE" dirty="0"/>
+          </a:p>
+        </p:txBody>
+      </p:sp>
+      <p:sp>
+        <p:nvSpPr>
+          <p:cNvPr id="4" name="Slide Number Placeholder 3"/>
+          <p:cNvSpPr>
+            <a:spLocks noGrp="1"/>
+          </p:cNvSpPr>
+          <p:nvPr>
+            <p:ph type="sldNum" sz="quarter" idx="12"/>
+          </p:nvPr>
+        </p:nvSpPr>
+        <p:spPr/>
+        <p:txBody>
+          <a:bodyPr/>
+          <a:lstStyle/>
+          <a:p>
+            <a:fld id="{BB52A05A-A776-4391-ACD7-D6BC34D3145C}" type="slidenum">
+              <a:rPr lang="nl-BE" smtClean="0"/>
+              <a:t>51</a:t>
+            </a:fld>
+            <a:endParaRPr lang="nl-BE"/>
           </a:p>
         </p:txBody>
       </p:sp>
@@ -33668,13 +35164,13 @@
             </a:r>
             <a:r>
               <a:rPr lang="en-US" dirty="0">
-                <a:hlinkClick r:id="rId2"/>
+                <a:hlinkClick r:id="rId3"/>
               </a:rPr>
               <a:t>https://git-scm.com</a:t>
             </a:r>
             <a:r>
               <a:rPr lang="en-US" dirty="0" smtClean="0">
-                <a:hlinkClick r:id="rId2"/>
+                <a:hlinkClick r:id="rId3"/>
               </a:rPr>
               <a:t>/</a:t>
             </a:r>
@@ -33697,13 +35193,13 @@
             </a:r>
             <a:r>
               <a:rPr lang="nl-BE" dirty="0">
-                <a:hlinkClick r:id="rId3"/>
+                <a:hlinkClick r:id="rId4"/>
               </a:rPr>
               <a:t>https://desktop.github.com</a:t>
             </a:r>
             <a:r>
               <a:rPr lang="nl-BE" dirty="0" smtClean="0">
-                <a:hlinkClick r:id="rId3"/>
+                <a:hlinkClick r:id="rId4"/>
               </a:rPr>
               <a:t>/</a:t>
             </a:r>
@@ -33732,13 +35228,13 @@
             </a:r>
             <a:r>
               <a:rPr lang="en-US" dirty="0">
-                <a:hlinkClick r:id="rId4"/>
+                <a:hlinkClick r:id="rId5"/>
               </a:rPr>
               <a:t>https://tortoisegit.org</a:t>
             </a:r>
             <a:r>
               <a:rPr lang="en-US" dirty="0" smtClean="0">
-                <a:hlinkClick r:id="rId4"/>
+                <a:hlinkClick r:id="rId5"/>
               </a:rPr>
               <a:t>/</a:t>
             </a:r>
@@ -33767,13 +35263,13 @@
             </a:r>
             <a:r>
               <a:rPr lang="en-US" dirty="0">
-                <a:hlinkClick r:id="rId5"/>
+                <a:hlinkClick r:id="rId6"/>
               </a:rPr>
               <a:t>http://git-cola.github.io</a:t>
             </a:r>
             <a:r>
               <a:rPr lang="en-US" dirty="0" smtClean="0">
-                <a:hlinkClick r:id="rId5"/>
+                <a:hlinkClick r:id="rId6"/>
               </a:rPr>
               <a:t>/</a:t>
             </a:r>
@@ -33809,13 +35305,13 @@
             </a:r>
             <a:r>
               <a:rPr lang="en-US" dirty="0">
-                <a:hlinkClick r:id="rId6"/>
+                <a:hlinkClick r:id="rId7"/>
               </a:rPr>
               <a:t>https://</a:t>
             </a:r>
             <a:r>
               <a:rPr lang="en-US" dirty="0" smtClean="0">
-                <a:hlinkClick r:id="rId6"/>
+                <a:hlinkClick r:id="rId7"/>
               </a:rPr>
               <a:t>github.com/RichiH/vcsh</a:t>
             </a:r>
@@ -33839,13 +35335,13 @@
             </a:r>
             <a:r>
               <a:rPr lang="en-US" dirty="0">
-                <a:hlinkClick r:id="rId7"/>
+                <a:hlinkClick r:id="rId8"/>
               </a:rPr>
               <a:t>http://git-prompt.sh</a:t>
             </a:r>
             <a:r>
               <a:rPr lang="en-US" dirty="0" smtClean="0">
-                <a:hlinkClick r:id="rId7"/>
+                <a:hlinkClick r:id="rId8"/>
               </a:rPr>
               <a:t>/</a:t>
             </a:r>
@@ -33856,6 +35352,29 @@
           </a:p>
           <a:p>
             <a:endParaRPr lang="nl-BE" dirty="0"/>
+          </a:p>
+        </p:txBody>
+      </p:sp>
+      <p:sp>
+        <p:nvSpPr>
+          <p:cNvPr id="4" name="Slide Number Placeholder 3"/>
+          <p:cNvSpPr>
+            <a:spLocks noGrp="1"/>
+          </p:cNvSpPr>
+          <p:nvPr>
+            <p:ph type="sldNum" sz="quarter" idx="12"/>
+          </p:nvPr>
+        </p:nvSpPr>
+        <p:spPr/>
+        <p:txBody>
+          <a:bodyPr/>
+          <a:lstStyle/>
+          <a:p>
+            <a:fld id="{BB52A05A-A776-4391-ACD7-D6BC34D3145C}" type="slidenum">
+              <a:rPr lang="nl-BE" smtClean="0"/>
+              <a:t>52</a:t>
+            </a:fld>
+            <a:endParaRPr lang="nl-BE"/>
           </a:p>
         </p:txBody>
       </p:sp>
@@ -33983,6 +35502,29 @@
               <a:t> source code)</a:t>
             </a:r>
             <a:endParaRPr lang="nl-BE" dirty="0"/>
+          </a:p>
+        </p:txBody>
+      </p:sp>
+      <p:sp>
+        <p:nvSpPr>
+          <p:cNvPr id="4" name="Slide Number Placeholder 3"/>
+          <p:cNvSpPr>
+            <a:spLocks noGrp="1"/>
+          </p:cNvSpPr>
+          <p:nvPr>
+            <p:ph type="sldNum" sz="quarter" idx="12"/>
+          </p:nvPr>
+        </p:nvSpPr>
+        <p:spPr/>
+        <p:txBody>
+          <a:bodyPr/>
+          <a:lstStyle/>
+          <a:p>
+            <a:fld id="{BB52A05A-A776-4391-ACD7-D6BC34D3145C}" type="slidenum">
+              <a:rPr lang="nl-BE" smtClean="0"/>
+              <a:t>6</a:t>
+            </a:fld>
+            <a:endParaRPr lang="nl-BE"/>
           </a:p>
         </p:txBody>
       </p:sp>
@@ -35036,6 +36578,29 @@
           </p:txBody>
         </p:sp>
       </p:grpSp>
+      <p:sp>
+        <p:nvSpPr>
+          <p:cNvPr id="13" name="Slide Number Placeholder 12"/>
+          <p:cNvSpPr>
+            <a:spLocks noGrp="1"/>
+          </p:cNvSpPr>
+          <p:nvPr>
+            <p:ph type="sldNum" sz="quarter" idx="12"/>
+          </p:nvPr>
+        </p:nvSpPr>
+        <p:spPr/>
+        <p:txBody>
+          <a:bodyPr/>
+          <a:lstStyle/>
+          <a:p>
+            <a:fld id="{BB52A05A-A776-4391-ACD7-D6BC34D3145C}" type="slidenum">
+              <a:rPr lang="nl-BE" smtClean="0"/>
+              <a:t>7</a:t>
+            </a:fld>
+            <a:endParaRPr lang="nl-BE"/>
+          </a:p>
+        </p:txBody>
+      </p:sp>
     </p:spTree>
     <p:extLst>
       <p:ext uri="{BB962C8B-B14F-4D97-AF65-F5344CB8AC3E}">
@@ -35402,6 +36967,29 @@
               <a:rPr lang="en-US" dirty="0" smtClean="0"/>
               <a:t>Somewhat rigid</a:t>
             </a:r>
+          </a:p>
+        </p:txBody>
+      </p:sp>
+      <p:sp>
+        <p:nvSpPr>
+          <p:cNvPr id="4" name="Slide Number Placeholder 3"/>
+          <p:cNvSpPr>
+            <a:spLocks noGrp="1"/>
+          </p:cNvSpPr>
+          <p:nvPr>
+            <p:ph type="sldNum" sz="quarter" idx="12"/>
+          </p:nvPr>
+        </p:nvSpPr>
+        <p:spPr/>
+        <p:txBody>
+          <a:bodyPr/>
+          <a:lstStyle/>
+          <a:p>
+            <a:fld id="{BB52A05A-A776-4391-ACD7-D6BC34D3145C}" type="slidenum">
+              <a:rPr lang="nl-BE" smtClean="0"/>
+              <a:t>8</a:t>
+            </a:fld>
+            <a:endParaRPr lang="nl-BE"/>
           </a:p>
         </p:txBody>
       </p:sp>
@@ -37419,6 +39007,29 @@
           </a:p>
         </p:txBody>
       </p:sp>
+      <p:sp>
+        <p:nvSpPr>
+          <p:cNvPr id="3" name="Slide Number Placeholder 2"/>
+          <p:cNvSpPr>
+            <a:spLocks noGrp="1"/>
+          </p:cNvSpPr>
+          <p:nvPr>
+            <p:ph type="sldNum" sz="quarter" idx="12"/>
+          </p:nvPr>
+        </p:nvSpPr>
+        <p:spPr/>
+        <p:txBody>
+          <a:bodyPr/>
+          <a:lstStyle/>
+          <a:p>
+            <a:fld id="{BB52A05A-A776-4391-ACD7-D6BC34D3145C}" type="slidenum">
+              <a:rPr lang="nl-BE" smtClean="0"/>
+              <a:t>9</a:t>
+            </a:fld>
+            <a:endParaRPr lang="nl-BE"/>
+          </a:p>
+        </p:txBody>
+      </p:sp>
     </p:spTree>
     <p:extLst>
       <p:ext uri="{BB962C8B-B14F-4D97-AF65-F5344CB8AC3E}">
@@ -37722,4 +39333,265 @@
   <a:objectDefaults/>
   <a:extraClrSchemeLst/>
 </a:theme>
+</file>
+
+<file path=ppt/theme/theme2.xml><?xml version="1.0" encoding="utf-8"?>
+<a:theme xmlns:a="http://schemas.openxmlformats.org/drawingml/2006/main" name="Office Theme">
+  <a:themeElements>
+    <a:clrScheme name="Office">
+      <a:dk1>
+        <a:sysClr val="windowText" lastClr="000000"/>
+      </a:dk1>
+      <a:lt1>
+        <a:sysClr val="window" lastClr="FFFFFF"/>
+      </a:lt1>
+      <a:dk2>
+        <a:srgbClr val="44546A"/>
+      </a:dk2>
+      <a:lt2>
+        <a:srgbClr val="E7E6E6"/>
+      </a:lt2>
+      <a:accent1>
+        <a:srgbClr val="5B9BD5"/>
+      </a:accent1>
+      <a:accent2>
+        <a:srgbClr val="ED7D31"/>
+      </a:accent2>
+      <a:accent3>
+        <a:srgbClr val="A5A5A5"/>
+      </a:accent3>
+      <a:accent4>
+        <a:srgbClr val="FFC000"/>
+      </a:accent4>
+      <a:accent5>
+        <a:srgbClr val="4472C4"/>
+      </a:accent5>
+      <a:accent6>
+        <a:srgbClr val="70AD47"/>
+      </a:accent6>
+      <a:hlink>
+        <a:srgbClr val="0563C1"/>
+      </a:hlink>
+      <a:folHlink>
+        <a:srgbClr val="954F72"/>
+      </a:folHlink>
+    </a:clrScheme>
+    <a:fontScheme name="Office">
+      <a:majorFont>
+        <a:latin typeface="Calibri Light" panose="020F0302020204030204"/>
+        <a:ea typeface=""/>
+        <a:cs typeface=""/>
+        <a:font script="Jpan" typeface="ＭＳ Ｐゴシック"/>
+        <a:font script="Hang" typeface="맑은 고딕"/>
+        <a:font script="Hans" typeface="宋体"/>
+        <a:font script="Hant" typeface="新細明體"/>
+        <a:font script="Arab" typeface="Times New Roman"/>
+        <a:font script="Hebr" typeface="Times New Roman"/>
+        <a:font script="Thai" typeface="Angsana New"/>
+        <a:font script="Ethi" typeface="Nyala"/>
+        <a:font script="Beng" typeface="Vrinda"/>
+        <a:font script="Gujr" typeface="Shruti"/>
+        <a:font script="Khmr" typeface="MoolBoran"/>
+        <a:font script="Knda" typeface="Tunga"/>
+        <a:font script="Guru" typeface="Raavi"/>
+        <a:font script="Cans" typeface="Euphemia"/>
+        <a:font script="Cher" typeface="Plantagenet Cherokee"/>
+        <a:font script="Yiii" typeface="Microsoft Yi Baiti"/>
+        <a:font script="Tibt" typeface="Microsoft Himalaya"/>
+        <a:font script="Thaa" typeface="MV Boli"/>
+        <a:font script="Deva" typeface="Mangal"/>
+        <a:font script="Telu" typeface="Gautami"/>
+        <a:font script="Taml" typeface="Latha"/>
+        <a:font script="Syrc" typeface="Estrangelo Edessa"/>
+        <a:font script="Orya" typeface="Kalinga"/>
+        <a:font script="Mlym" typeface="Kartika"/>
+        <a:font script="Laoo" typeface="DokChampa"/>
+        <a:font script="Sinh" typeface="Iskoola Pota"/>
+        <a:font script="Mong" typeface="Mongolian Baiti"/>
+        <a:font script="Viet" typeface="Times New Roman"/>
+        <a:font script="Uigh" typeface="Microsoft Uighur"/>
+        <a:font script="Geor" typeface="Sylfaen"/>
+      </a:majorFont>
+      <a:minorFont>
+        <a:latin typeface="Calibri" panose="020F0502020204030204"/>
+        <a:ea typeface=""/>
+        <a:cs typeface=""/>
+        <a:font script="Jpan" typeface="ＭＳ Ｐゴシック"/>
+        <a:font script="Hang" typeface="맑은 고딕"/>
+        <a:font script="Hans" typeface="宋体"/>
+        <a:font script="Hant" typeface="新細明體"/>
+        <a:font script="Arab" typeface="Arial"/>
+        <a:font script="Hebr" typeface="Arial"/>
+        <a:font script="Thai" typeface="Cordia New"/>
+        <a:font script="Ethi" typeface="Nyala"/>
+        <a:font script="Beng" typeface="Vrinda"/>
+        <a:font script="Gujr" typeface="Shruti"/>
+        <a:font script="Khmr" typeface="DaunPenh"/>
+        <a:font script="Knda" typeface="Tunga"/>
+        <a:font script="Guru" typeface="Raavi"/>
+        <a:font script="Cans" typeface="Euphemia"/>
+        <a:font script="Cher" typeface="Plantagenet Cherokee"/>
+        <a:font script="Yiii" typeface="Microsoft Yi Baiti"/>
+        <a:font script="Tibt" typeface="Microsoft Himalaya"/>
+        <a:font script="Thaa" typeface="MV Boli"/>
+        <a:font script="Deva" typeface="Mangal"/>
+        <a:font script="Telu" typeface="Gautami"/>
+        <a:font script="Taml" typeface="Latha"/>
+        <a:font script="Syrc" typeface="Estrangelo Edessa"/>
+        <a:font script="Orya" typeface="Kalinga"/>
+        <a:font script="Mlym" typeface="Kartika"/>
+        <a:font script="Laoo" typeface="DokChampa"/>
+        <a:font script="Sinh" typeface="Iskoola Pota"/>
+        <a:font script="Mong" typeface="Mongolian Baiti"/>
+        <a:font script="Viet" typeface="Arial"/>
+        <a:font script="Uigh" typeface="Microsoft Uighur"/>
+        <a:font script="Geor" typeface="Sylfaen"/>
+      </a:minorFont>
+    </a:fontScheme>
+    <a:fmtScheme name="Office">
+      <a:fillStyleLst>
+        <a:solidFill>
+          <a:schemeClr val="phClr"/>
+        </a:solidFill>
+        <a:gradFill rotWithShape="1">
+          <a:gsLst>
+            <a:gs pos="0">
+              <a:schemeClr val="phClr">
+                <a:lumMod val="110000"/>
+                <a:satMod val="105000"/>
+                <a:tint val="67000"/>
+              </a:schemeClr>
+            </a:gs>
+            <a:gs pos="50000">
+              <a:schemeClr val="phClr">
+                <a:lumMod val="105000"/>
+                <a:satMod val="103000"/>
+                <a:tint val="73000"/>
+              </a:schemeClr>
+            </a:gs>
+            <a:gs pos="100000">
+              <a:schemeClr val="phClr">
+                <a:lumMod val="105000"/>
+                <a:satMod val="109000"/>
+                <a:tint val="81000"/>
+              </a:schemeClr>
+            </a:gs>
+          </a:gsLst>
+          <a:lin ang="5400000" scaled="0"/>
+        </a:gradFill>
+        <a:gradFill rotWithShape="1">
+          <a:gsLst>
+            <a:gs pos="0">
+              <a:schemeClr val="phClr">
+                <a:satMod val="103000"/>
+                <a:lumMod val="102000"/>
+                <a:tint val="94000"/>
+              </a:schemeClr>
+            </a:gs>
+            <a:gs pos="50000">
+              <a:schemeClr val="phClr">
+                <a:satMod val="110000"/>
+                <a:lumMod val="100000"/>
+                <a:shade val="100000"/>
+              </a:schemeClr>
+            </a:gs>
+            <a:gs pos="100000">
+              <a:schemeClr val="phClr">
+                <a:lumMod val="99000"/>
+                <a:satMod val="120000"/>
+                <a:shade val="78000"/>
+              </a:schemeClr>
+            </a:gs>
+          </a:gsLst>
+          <a:lin ang="5400000" scaled="0"/>
+        </a:gradFill>
+      </a:fillStyleLst>
+      <a:lnStyleLst>
+        <a:ln w="6350" cap="flat" cmpd="sng" algn="ctr">
+          <a:solidFill>
+            <a:schemeClr val="phClr"/>
+          </a:solidFill>
+          <a:prstDash val="solid"/>
+          <a:miter lim="800000"/>
+        </a:ln>
+        <a:ln w="12700" cap="flat" cmpd="sng" algn="ctr">
+          <a:solidFill>
+            <a:schemeClr val="phClr"/>
+          </a:solidFill>
+          <a:prstDash val="solid"/>
+          <a:miter lim="800000"/>
+        </a:ln>
+        <a:ln w="19050" cap="flat" cmpd="sng" algn="ctr">
+          <a:solidFill>
+            <a:schemeClr val="phClr"/>
+          </a:solidFill>
+          <a:prstDash val="solid"/>
+          <a:miter lim="800000"/>
+        </a:ln>
+      </a:lnStyleLst>
+      <a:effectStyleLst>
+        <a:effectStyle>
+          <a:effectLst/>
+        </a:effectStyle>
+        <a:effectStyle>
+          <a:effectLst/>
+        </a:effectStyle>
+        <a:effectStyle>
+          <a:effectLst>
+            <a:outerShdw blurRad="57150" dist="19050" dir="5400000" algn="ctr" rotWithShape="0">
+              <a:srgbClr val="000000">
+                <a:alpha val="63000"/>
+              </a:srgbClr>
+            </a:outerShdw>
+          </a:effectLst>
+        </a:effectStyle>
+      </a:effectStyleLst>
+      <a:bgFillStyleLst>
+        <a:solidFill>
+          <a:schemeClr val="phClr"/>
+        </a:solidFill>
+        <a:solidFill>
+          <a:schemeClr val="phClr">
+            <a:tint val="95000"/>
+            <a:satMod val="170000"/>
+          </a:schemeClr>
+        </a:solidFill>
+        <a:gradFill rotWithShape="1">
+          <a:gsLst>
+            <a:gs pos="0">
+              <a:schemeClr val="phClr">
+                <a:tint val="93000"/>
+                <a:satMod val="150000"/>
+                <a:shade val="98000"/>
+                <a:lumMod val="102000"/>
+              </a:schemeClr>
+            </a:gs>
+            <a:gs pos="50000">
+              <a:schemeClr val="phClr">
+                <a:tint val="98000"/>
+                <a:satMod val="130000"/>
+                <a:shade val="90000"/>
+                <a:lumMod val="103000"/>
+              </a:schemeClr>
+            </a:gs>
+            <a:gs pos="100000">
+              <a:schemeClr val="phClr">
+                <a:shade val="63000"/>
+                <a:satMod val="120000"/>
+              </a:schemeClr>
+            </a:gs>
+          </a:gsLst>
+          <a:lin ang="5400000" scaled="0"/>
+        </a:gradFill>
+      </a:bgFillStyleLst>
+    </a:fmtScheme>
+  </a:themeElements>
+  <a:objectDefaults/>
+  <a:extraClrSchemeLst/>
+  <a:extLst>
+    <a:ext uri="{05A4C25C-085E-4340-85A3-A5531E510DB2}">
+      <thm15:themeFamily xmlns:thm15="http://schemas.microsoft.com/office/thememl/2012/main" name="Office Theme" id="{62F939B6-93AF-4DB8-9C6B-D6C7DFDC589F}" vid="{4A3C46E8-61CC-4603-A589-7422A47A8E4A}"/>
+    </a:ext>
+  </a:extLst>
+</a:theme>
 </file>
</xml_diff>

<commit_message>
Added remark on remote branch tracking
</commit_message>
<xml_diff>
--- a/LinuxTools/VersionControl/version_control_git.pptx
+++ b/LinuxTools/VersionControl/version_control_git.pptx
@@ -350,7 +350,7 @@
           <a:p>
             <a:fld id="{11D3E7B2-0861-45F0-B59E-BA867D5C805D}" type="datetimeFigureOut">
               <a:rPr lang="nl-BE" smtClean="0"/>
-              <a:t>2016-01-13</a:t>
+              <a:t>2016-01-20</a:t>
             </a:fld>
             <a:endParaRPr lang="nl-BE"/>
           </a:p>
@@ -883,7 +883,7 @@
           <a:p>
             <a:fld id="{208C4982-2142-4DAC-808C-52C1A6ABA40A}" type="datetime1">
               <a:rPr lang="nl-BE" smtClean="0"/>
-              <a:t>2016-01-13</a:t>
+              <a:t>2016-01-20</a:t>
             </a:fld>
             <a:endParaRPr lang="nl-BE"/>
           </a:p>
@@ -1053,7 +1053,7 @@
           <a:p>
             <a:fld id="{596A4774-AA95-4CEA-9215-BE91EC5FD3A2}" type="datetime1">
               <a:rPr lang="nl-BE" smtClean="0"/>
-              <a:t>2016-01-13</a:t>
+              <a:t>2016-01-20</a:t>
             </a:fld>
             <a:endParaRPr lang="nl-BE"/>
           </a:p>
@@ -1233,7 +1233,7 @@
           <a:p>
             <a:fld id="{E3C938DE-9D5A-4A9D-B2A9-9053FBBA636A}" type="datetime1">
               <a:rPr lang="nl-BE" smtClean="0"/>
-              <a:t>2016-01-13</a:t>
+              <a:t>2016-01-20</a:t>
             </a:fld>
             <a:endParaRPr lang="nl-BE"/>
           </a:p>
@@ -1403,7 +1403,7 @@
           <a:p>
             <a:fld id="{70B73439-F632-4142-A813-39A8890A9414}" type="datetime1">
               <a:rPr lang="nl-BE" smtClean="0"/>
-              <a:t>2016-01-13</a:t>
+              <a:t>2016-01-20</a:t>
             </a:fld>
             <a:endParaRPr lang="nl-BE"/>
           </a:p>
@@ -1649,7 +1649,7 @@
           <a:p>
             <a:fld id="{2DA105E3-7574-4472-893A-A0C7A919BAE6}" type="datetime1">
               <a:rPr lang="nl-BE" smtClean="0"/>
-              <a:t>2016-01-13</a:t>
+              <a:t>2016-01-20</a:t>
             </a:fld>
             <a:endParaRPr lang="nl-BE"/>
           </a:p>
@@ -1937,7 +1937,7 @@
           <a:p>
             <a:fld id="{184B200F-AF61-4171-AE34-7A4B12E0FBA3}" type="datetime1">
               <a:rPr lang="nl-BE" smtClean="0"/>
-              <a:t>2016-01-13</a:t>
+              <a:t>2016-01-20</a:t>
             </a:fld>
             <a:endParaRPr lang="nl-BE"/>
           </a:p>
@@ -2359,7 +2359,7 @@
           <a:p>
             <a:fld id="{4DDD3743-DAF8-4465-AEC2-93735E02B3D0}" type="datetime1">
               <a:rPr lang="nl-BE" smtClean="0"/>
-              <a:t>2016-01-13</a:t>
+              <a:t>2016-01-20</a:t>
             </a:fld>
             <a:endParaRPr lang="nl-BE"/>
           </a:p>
@@ -2477,7 +2477,7 @@
           <a:p>
             <a:fld id="{0E48E2E9-C147-459B-ACCB-D6DDC51735D3}" type="datetime1">
               <a:rPr lang="nl-BE" smtClean="0"/>
-              <a:t>2016-01-13</a:t>
+              <a:t>2016-01-20</a:t>
             </a:fld>
             <a:endParaRPr lang="nl-BE"/>
           </a:p>
@@ -2572,7 +2572,7 @@
           <a:p>
             <a:fld id="{C92A24F5-0967-4B11-849A-0009476290B5}" type="datetime1">
               <a:rPr lang="nl-BE" smtClean="0"/>
-              <a:t>2016-01-13</a:t>
+              <a:t>2016-01-20</a:t>
             </a:fld>
             <a:endParaRPr lang="nl-BE"/>
           </a:p>
@@ -2849,7 +2849,7 @@
           <a:p>
             <a:fld id="{CAAB6B0C-E333-4316-A6EC-161EFC5CB4BD}" type="datetime1">
               <a:rPr lang="nl-BE" smtClean="0"/>
-              <a:t>2016-01-13</a:t>
+              <a:t>2016-01-20</a:t>
             </a:fld>
             <a:endParaRPr lang="nl-BE"/>
           </a:p>
@@ -3102,7 +3102,7 @@
           <a:p>
             <a:fld id="{5AC2428B-24E8-4004-8AB4-EA69DDAD1475}" type="datetime1">
               <a:rPr lang="nl-BE" smtClean="0"/>
-              <a:t>2016-01-13</a:t>
+              <a:t>2016-01-20</a:t>
             </a:fld>
             <a:endParaRPr lang="nl-BE"/>
           </a:p>
@@ -3315,7 +3315,7 @@
           <a:p>
             <a:fld id="{063E4CA3-87AF-44C9-B256-93720A95DFC3}" type="datetime1">
               <a:rPr lang="nl-BE" smtClean="0"/>
-              <a:t>2016-01-13</a:t>
+              <a:t>2016-01-20</a:t>
             </a:fld>
             <a:endParaRPr lang="nl-BE"/>
           </a:p>
@@ -30737,7 +30737,20 @@
           <a:p>
             <a:r>
               <a:rPr lang="en-US" dirty="0" smtClean="0"/>
-              <a:t>Fetch and create specific branch, e.g.,</a:t>
+              <a:t>Fetch and create specific branch, e.g</a:t>
+            </a:r>
+            <a:r>
+              <a:rPr lang="en-US" dirty="0" smtClean="0"/>
+              <a:t>.,</a:t>
+            </a:r>
+          </a:p>
+          <a:p>
+            <a:endParaRPr lang="en-US" dirty="0"/>
+          </a:p>
+          <a:p>
+            <a:r>
+              <a:rPr lang="en-US" dirty="0" smtClean="0"/>
+              <a:t>Track remote branch, e.g.,</a:t>
             </a:r>
             <a:endParaRPr lang="nl-BE" dirty="0"/>
           </a:p>
@@ -30799,7 +30812,7 @@
         </p:nvSpPr>
         <p:spPr>
           <a:xfrm>
-            <a:off x="1259632" y="4592616"/>
+            <a:off x="1259632" y="4454364"/>
             <a:ext cx="6250429" cy="369332"/>
           </a:xfrm>
           <a:prstGeom prst="rect">
@@ -30875,10 +30888,10 @@
         </p:nvGrpSpPr>
         <p:grpSpPr>
           <a:xfrm>
-            <a:off x="6506369" y="5105964"/>
-            <a:ext cx="2530127" cy="699300"/>
-            <a:chOff x="3707904" y="1721588"/>
-            <a:chExt cx="2530127" cy="699300"/>
+            <a:off x="6396824" y="4869217"/>
+            <a:ext cx="2295056" cy="369332"/>
+            <a:chOff x="3598359" y="1623093"/>
+            <a:chExt cx="2295056" cy="369332"/>
           </a:xfrm>
         </p:grpSpPr>
         <p:cxnSp>
@@ -30891,8 +30904,8 @@
           </p:nvCxnSpPr>
           <p:spPr>
             <a:xfrm flipH="1" flipV="1">
-              <a:off x="3707904" y="1721588"/>
-              <a:ext cx="720080" cy="514634"/>
+              <a:off x="3598359" y="1623093"/>
+              <a:ext cx="485009" cy="184666"/>
             </a:xfrm>
             <a:prstGeom prst="straightConnector1">
               <a:avLst/>
@@ -30927,7 +30940,7 @@
           </p:nvSpPr>
           <p:spPr>
             <a:xfrm>
-              <a:off x="4427984" y="2051556"/>
+              <a:off x="4083368" y="1623093"/>
               <a:ext cx="1810047" cy="369332"/>
             </a:xfrm>
             <a:prstGeom prst="rect">
@@ -30958,10 +30971,10 @@
         </p:nvGrpSpPr>
         <p:grpSpPr>
           <a:xfrm>
-            <a:off x="2771800" y="5105964"/>
-            <a:ext cx="2232248" cy="699300"/>
-            <a:chOff x="4427984" y="1721588"/>
-            <a:chExt cx="2232248" cy="699300"/>
+            <a:off x="2267744" y="4874924"/>
+            <a:ext cx="2448272" cy="369332"/>
+            <a:chOff x="3923928" y="1628800"/>
+            <a:chExt cx="2448272" cy="369332"/>
           </a:xfrm>
         </p:grpSpPr>
         <p:cxnSp>
@@ -30974,8 +30987,8 @@
           </p:nvCxnSpPr>
           <p:spPr>
             <a:xfrm flipV="1">
-              <a:off x="6492524" y="1721588"/>
-              <a:ext cx="167708" cy="514634"/>
+              <a:off x="5988468" y="1628800"/>
+              <a:ext cx="383732" cy="184666"/>
             </a:xfrm>
             <a:prstGeom prst="straightConnector1">
               <a:avLst/>
@@ -31010,7 +31023,7 @@
           </p:nvSpPr>
           <p:spPr>
             <a:xfrm>
-              <a:off x="4427984" y="2051556"/>
+              <a:off x="3923928" y="1628800"/>
               <a:ext cx="2064540" cy="369332"/>
             </a:xfrm>
             <a:prstGeom prst="rect">
@@ -31104,6 +31117,89 @@
               <a:t>44</a:t>
             </a:fld>
             <a:endParaRPr lang="nl-BE"/>
+          </a:p>
+        </p:txBody>
+      </p:sp>
+      <p:sp>
+        <p:nvSpPr>
+          <p:cNvPr id="18" name="TextBox 17"/>
+          <p:cNvSpPr txBox="1"/>
+          <p:nvPr/>
+        </p:nvSpPr>
+        <p:spPr>
+          <a:xfrm>
+            <a:off x="1259632" y="5661248"/>
+            <a:ext cx="6250429" cy="369332"/>
+          </a:xfrm>
+          <a:prstGeom prst="rect">
+            <a:avLst/>
+          </a:prstGeom>
+          <a:noFill/>
+          <a:ln>
+            <a:solidFill>
+              <a:schemeClr val="tx1"/>
+            </a:solidFill>
+          </a:ln>
+        </p:spPr>
+        <p:txBody>
+          <a:bodyPr wrap="square" rtlCol="0">
+            <a:spAutoFit/>
+          </a:bodyPr>
+          <a:lstStyle/>
+          <a:p>
+            <a:r>
+              <a:rPr lang="nl-BE" dirty="0" smtClean="0">
+                <a:latin typeface="Courier New" pitchFamily="49" charset="0"/>
+                <a:cs typeface="Courier New" pitchFamily="49" charset="0"/>
+              </a:rPr>
+              <a:t>$ git </a:t>
+            </a:r>
+            <a:r>
+              <a:rPr lang="nl-BE" dirty="0" err="1" smtClean="0">
+                <a:latin typeface="Courier New" pitchFamily="49" charset="0"/>
+                <a:cs typeface="Courier New" pitchFamily="49" charset="0"/>
+              </a:rPr>
+              <a:t>branch</a:t>
+            </a:r>
+            <a:r>
+              <a:rPr lang="nl-BE" dirty="0" smtClean="0">
+                <a:latin typeface="Courier New" pitchFamily="49" charset="0"/>
+                <a:cs typeface="Courier New" pitchFamily="49" charset="0"/>
+              </a:rPr>
+              <a:t>  </a:t>
+            </a:r>
+            <a:r>
+              <a:rPr lang="nl-BE" dirty="0" smtClean="0">
+                <a:latin typeface="Courier New" pitchFamily="49" charset="0"/>
+                <a:cs typeface="Courier New" pitchFamily="49" charset="0"/>
+              </a:rPr>
+              <a:t>-u </a:t>
+            </a:r>
+            <a:r>
+              <a:rPr lang="nl-BE" dirty="0" err="1" smtClean="0">
+                <a:latin typeface="Courier New" pitchFamily="49" charset="0"/>
+                <a:cs typeface="Courier New" pitchFamily="49" charset="0"/>
+              </a:rPr>
+              <a:t>origin</a:t>
+            </a:r>
+            <a:r>
+              <a:rPr lang="nl-BE" dirty="0">
+                <a:latin typeface="Courier New" pitchFamily="49" charset="0"/>
+                <a:cs typeface="Courier New" pitchFamily="49" charset="0"/>
+              </a:rPr>
+              <a:t>/</a:t>
+            </a:r>
+            <a:r>
+              <a:rPr lang="nl-BE" dirty="0" smtClean="0">
+                <a:latin typeface="Courier New" pitchFamily="49" charset="0"/>
+                <a:cs typeface="Courier New" pitchFamily="49" charset="0"/>
+              </a:rPr>
+              <a:t>development</a:t>
+            </a:r>
+            <a:endParaRPr lang="nl-BE" dirty="0" smtClean="0">
+              <a:latin typeface="Courier New" pitchFamily="49" charset="0"/>
+              <a:cs typeface="Courier New" pitchFamily="49" charset="0"/>
+            </a:endParaRPr>
           </a:p>
         </p:txBody>
       </p:sp>
@@ -31296,15 +31392,64 @@
                                   </p:childTnLst>
                                 </p:cTn>
                               </p:par>
+                            </p:childTnLst>
+                          </p:cTn>
+                        </p:par>
+                      </p:childTnLst>
+                    </p:cTn>
+                  </p:par>
+                  <p:par>
+                    <p:cTn id="17" fill="hold">
+                      <p:stCondLst>
+                        <p:cond delay="indefinite"/>
+                      </p:stCondLst>
+                      <p:childTnLst>
+                        <p:par>
+                          <p:cTn id="18" fill="hold">
+                            <p:stCondLst>
+                              <p:cond delay="0"/>
+                            </p:stCondLst>
+                            <p:childTnLst>
                               <p:par>
-                                <p:cTn id="17" presetID="1" presetClass="entr" presetSubtype="0" fill="hold" grpId="0" nodeType="withEffect">
+                                <p:cTn id="19" presetID="1" presetClass="entr" presetSubtype="0" fill="hold" grpId="0" nodeType="clickEffect">
                                   <p:stCondLst>
                                     <p:cond delay="0"/>
                                   </p:stCondLst>
                                   <p:childTnLst>
                                     <p:set>
                                       <p:cBhvr>
-                                        <p:cTn id="18" dur="1" fill="hold">
+                                        <p:cTn id="20" dur="1" fill="hold">
+                                          <p:stCondLst>
+                                            <p:cond delay="0"/>
+                                          </p:stCondLst>
+                                        </p:cTn>
+                                        <p:tgtEl>
+                                          <p:spTgt spid="3">
+                                            <p:txEl>
+                                              <p:pRg st="6" end="6"/>
+                                            </p:txEl>
+                                          </p:spTgt>
+                                        </p:tgtEl>
+                                        <p:attrNameLst>
+                                          <p:attrName>style.visibility</p:attrName>
+                                        </p:attrNameLst>
+                                      </p:cBhvr>
+                                      <p:to>
+                                        <p:strVal val="visible"/>
+                                      </p:to>
+                                    </p:set>
+                                  </p:childTnLst>
+                                </p:cTn>
+                              </p:par>
+                              <p:par>
+                                <p:cTn id="21" presetID="1" presetClass="entr" presetSubtype="0" fill="hold" grpId="0" nodeType="withEffect">
+                                  <p:stCondLst>
+                                    <p:cond delay="0"/>
+                                  </p:stCondLst>
+                                  <p:childTnLst>
+                                    <p:set>
+                                      <p:cBhvr>
+                                        <p:cTn id="22" dur="1" fill="hold">
                                           <p:stCondLst>
                                             <p:cond delay="0"/>
                                           </p:stCondLst>
@@ -31324,14 +31469,14 @@
                                 </p:cTn>
                               </p:par>
                               <p:par>
-                                <p:cTn id="19" presetID="1" presetClass="entr" presetSubtype="0" fill="hold" nodeType="withEffect">
+                                <p:cTn id="23" presetID="1" presetClass="entr" presetSubtype="0" fill="hold" nodeType="withEffect">
                                   <p:stCondLst>
                                     <p:cond delay="0"/>
                                   </p:stCondLst>
                                   <p:childTnLst>
                                     <p:set>
                                       <p:cBhvr>
-                                        <p:cTn id="20" dur="1" fill="hold">
+                                        <p:cTn id="24" dur="1" fill="hold">
                                           <p:stCondLst>
                                             <p:cond delay="0"/>
                                           </p:stCondLst>
@@ -31351,14 +31496,14 @@
                                 </p:cTn>
                               </p:par>
                               <p:par>
-                                <p:cTn id="21" presetID="1" presetClass="entr" presetSubtype="0" fill="hold" nodeType="withEffect">
+                                <p:cTn id="25" presetID="1" presetClass="entr" presetSubtype="0" fill="hold" nodeType="withEffect">
                                   <p:stCondLst>
                                     <p:cond delay="0"/>
                                   </p:stCondLst>
                                   <p:childTnLst>
                                     <p:set>
                                       <p:cBhvr>
-                                        <p:cTn id="22" dur="1" fill="hold">
+                                        <p:cTn id="26" dur="1" fill="hold">
                                           <p:stCondLst>
                                             <p:cond delay="0"/>
                                           </p:stCondLst>
@@ -31378,20 +31523,47 @@
                                 </p:cTn>
                               </p:par>
                               <p:par>
-                                <p:cTn id="23" presetID="1" presetClass="entr" presetSubtype="0" fill="hold" grpId="0" nodeType="withEffect">
+                                <p:cTn id="27" presetID="1" presetClass="entr" presetSubtype="0" fill="hold" grpId="0" nodeType="withEffect">
                                   <p:stCondLst>
                                     <p:cond delay="0"/>
                                   </p:stCondLst>
                                   <p:childTnLst>
                                     <p:set>
                                       <p:cBhvr>
-                                        <p:cTn id="24" dur="1" fill="hold">
+                                        <p:cTn id="28" dur="1" fill="hold">
                                           <p:stCondLst>
                                             <p:cond delay="0"/>
                                           </p:stCondLst>
                                         </p:cTn>
                                         <p:tgtEl>
                                           <p:spTgt spid="15"/>
+                                        </p:tgtEl>
+                                        <p:attrNameLst>
+                                          <p:attrName>style.visibility</p:attrName>
+                                        </p:attrNameLst>
+                                      </p:cBhvr>
+                                      <p:to>
+                                        <p:strVal val="visible"/>
+                                      </p:to>
+                                    </p:set>
+                                  </p:childTnLst>
+                                </p:cTn>
+                              </p:par>
+                              <p:par>
+                                <p:cTn id="29" presetID="1" presetClass="entr" presetSubtype="0" fill="hold" grpId="0" nodeType="withEffect">
+                                  <p:stCondLst>
+                                    <p:cond delay="0"/>
+                                  </p:stCondLst>
+                                  <p:childTnLst>
+                                    <p:set>
+                                      <p:cBhvr>
+                                        <p:cTn id="30" dur="1" fill="hold">
+                                          <p:stCondLst>
+                                            <p:cond delay="0"/>
+                                          </p:stCondLst>
+                                        </p:cTn>
+                                        <p:tgtEl>
+                                          <p:spTgt spid="18"/>
                                         </p:tgtEl>
                                         <p:attrNameLst>
                                           <p:attrName>style.visibility</p:attrName>
@@ -31436,6 +31608,7 @@
       <p:bldP spid="4" grpId="0" uiExpand="1" animBg="1"/>
       <p:bldP spid="5" grpId="0" animBg="1"/>
       <p:bldP spid="15" grpId="0" animBg="1"/>
+      <p:bldP spid="18" grpId="0" animBg="1"/>
     </p:bldLst>
   </p:timing>
 </p:sld>

</xml_diff>

<commit_message>
Added slide on no-commit merges
</commit_message>
<xml_diff>
--- a/LinuxTools/VersionControl/version_control_git.pptx
+++ b/LinuxTools/VersionControl/version_control_git.pptx
@@ -5,7 +5,7 @@
     <p:sldMasterId id="2147483648" r:id="rId1"/>
   </p:sldMasterIdLst>
   <p:notesMasterIdLst>
-    <p:notesMasterId r:id="rId54"/>
+    <p:notesMasterId r:id="rId55"/>
   </p:notesMasterIdLst>
   <p:sldIdLst>
     <p:sldId id="256" r:id="rId2"/>
@@ -50,16 +50,17 @@
     <p:sldId id="290" r:id="rId41"/>
     <p:sldId id="291" r:id="rId42"/>
     <p:sldId id="292" r:id="rId43"/>
-    <p:sldId id="294" r:id="rId44"/>
-    <p:sldId id="297" r:id="rId45"/>
-    <p:sldId id="304" r:id="rId46"/>
-    <p:sldId id="305" r:id="rId47"/>
-    <p:sldId id="307" r:id="rId48"/>
-    <p:sldId id="309" r:id="rId49"/>
-    <p:sldId id="300" r:id="rId50"/>
-    <p:sldId id="299" r:id="rId51"/>
-    <p:sldId id="301" r:id="rId52"/>
-    <p:sldId id="310" r:id="rId53"/>
+    <p:sldId id="311" r:id="rId44"/>
+    <p:sldId id="294" r:id="rId45"/>
+    <p:sldId id="297" r:id="rId46"/>
+    <p:sldId id="304" r:id="rId47"/>
+    <p:sldId id="305" r:id="rId48"/>
+    <p:sldId id="307" r:id="rId49"/>
+    <p:sldId id="309" r:id="rId50"/>
+    <p:sldId id="300" r:id="rId51"/>
+    <p:sldId id="299" r:id="rId52"/>
+    <p:sldId id="301" r:id="rId53"/>
+    <p:sldId id="310" r:id="rId54"/>
   </p:sldIdLst>
   <p:sldSz cx="9144000" cy="6858000" type="screen4x3"/>
   <p:notesSz cx="6858000" cy="9144000"/>
@@ -217,6 +218,7 @@
             <p14:sldId id="290"/>
             <p14:sldId id="291"/>
             <p14:sldId id="292"/>
+            <p14:sldId id="311"/>
             <p14:sldId id="294"/>
             <p14:sldId id="297"/>
             <p14:sldId id="304"/>
@@ -350,7 +352,7 @@
           <a:p>
             <a:fld id="{11D3E7B2-0861-45F0-B59E-BA867D5C805D}" type="datetimeFigureOut">
               <a:rPr lang="nl-BE" smtClean="0"/>
-              <a:t>2016-01-20</a:t>
+              <a:t>2016-04-21</a:t>
             </a:fld>
             <a:endParaRPr lang="nl-BE"/>
           </a:p>
@@ -683,7 +685,7 @@
           <a:p>
             <a:fld id="{1A571F42-F258-455F-A3F1-D2E86FDFEB4C}" type="slidenum">
               <a:rPr lang="nl-BE" smtClean="0"/>
-              <a:t>52</a:t>
+              <a:t>53</a:t>
             </a:fld>
             <a:endParaRPr lang="nl-BE"/>
           </a:p>
@@ -883,7 +885,7 @@
           <a:p>
             <a:fld id="{208C4982-2142-4DAC-808C-52C1A6ABA40A}" type="datetime1">
               <a:rPr lang="nl-BE" smtClean="0"/>
-              <a:t>2016-01-20</a:t>
+              <a:t>2016-04-21</a:t>
             </a:fld>
             <a:endParaRPr lang="nl-BE"/>
           </a:p>
@@ -1053,7 +1055,7 @@
           <a:p>
             <a:fld id="{596A4774-AA95-4CEA-9215-BE91EC5FD3A2}" type="datetime1">
               <a:rPr lang="nl-BE" smtClean="0"/>
-              <a:t>2016-01-20</a:t>
+              <a:t>2016-04-21</a:t>
             </a:fld>
             <a:endParaRPr lang="nl-BE"/>
           </a:p>
@@ -1233,7 +1235,7 @@
           <a:p>
             <a:fld id="{E3C938DE-9D5A-4A9D-B2A9-9053FBBA636A}" type="datetime1">
               <a:rPr lang="nl-BE" smtClean="0"/>
-              <a:t>2016-01-20</a:t>
+              <a:t>2016-04-21</a:t>
             </a:fld>
             <a:endParaRPr lang="nl-BE"/>
           </a:p>
@@ -1403,7 +1405,7 @@
           <a:p>
             <a:fld id="{70B73439-F632-4142-A813-39A8890A9414}" type="datetime1">
               <a:rPr lang="nl-BE" smtClean="0"/>
-              <a:t>2016-01-20</a:t>
+              <a:t>2016-04-21</a:t>
             </a:fld>
             <a:endParaRPr lang="nl-BE"/>
           </a:p>
@@ -1649,7 +1651,7 @@
           <a:p>
             <a:fld id="{2DA105E3-7574-4472-893A-A0C7A919BAE6}" type="datetime1">
               <a:rPr lang="nl-BE" smtClean="0"/>
-              <a:t>2016-01-20</a:t>
+              <a:t>2016-04-21</a:t>
             </a:fld>
             <a:endParaRPr lang="nl-BE"/>
           </a:p>
@@ -1937,7 +1939,7 @@
           <a:p>
             <a:fld id="{184B200F-AF61-4171-AE34-7A4B12E0FBA3}" type="datetime1">
               <a:rPr lang="nl-BE" smtClean="0"/>
-              <a:t>2016-01-20</a:t>
+              <a:t>2016-04-21</a:t>
             </a:fld>
             <a:endParaRPr lang="nl-BE"/>
           </a:p>
@@ -2359,7 +2361,7 @@
           <a:p>
             <a:fld id="{4DDD3743-DAF8-4465-AEC2-93735E02B3D0}" type="datetime1">
               <a:rPr lang="nl-BE" smtClean="0"/>
-              <a:t>2016-01-20</a:t>
+              <a:t>2016-04-21</a:t>
             </a:fld>
             <a:endParaRPr lang="nl-BE"/>
           </a:p>
@@ -2477,7 +2479,7 @@
           <a:p>
             <a:fld id="{0E48E2E9-C147-459B-ACCB-D6DDC51735D3}" type="datetime1">
               <a:rPr lang="nl-BE" smtClean="0"/>
-              <a:t>2016-01-20</a:t>
+              <a:t>2016-04-21</a:t>
             </a:fld>
             <a:endParaRPr lang="nl-BE"/>
           </a:p>
@@ -2572,7 +2574,7 @@
           <a:p>
             <a:fld id="{C92A24F5-0967-4B11-849A-0009476290B5}" type="datetime1">
               <a:rPr lang="nl-BE" smtClean="0"/>
-              <a:t>2016-01-20</a:t>
+              <a:t>2016-04-21</a:t>
             </a:fld>
             <a:endParaRPr lang="nl-BE"/>
           </a:p>
@@ -2849,7 +2851,7 @@
           <a:p>
             <a:fld id="{CAAB6B0C-E333-4316-A6EC-161EFC5CB4BD}" type="datetime1">
               <a:rPr lang="nl-BE" smtClean="0"/>
-              <a:t>2016-01-20</a:t>
+              <a:t>2016-04-21</a:t>
             </a:fld>
             <a:endParaRPr lang="nl-BE"/>
           </a:p>
@@ -3102,7 +3104,7 @@
           <a:p>
             <a:fld id="{5AC2428B-24E8-4004-8AB4-EA69DDAD1475}" type="datetime1">
               <a:rPr lang="nl-BE" smtClean="0"/>
-              <a:t>2016-01-20</a:t>
+              <a:t>2016-04-21</a:t>
             </a:fld>
             <a:endParaRPr lang="nl-BE"/>
           </a:p>
@@ -3315,7 +3317,7 @@
           <a:p>
             <a:fld id="{063E4CA3-87AF-44C9-B256-93720A95DFC3}" type="datetime1">
               <a:rPr lang="nl-BE" smtClean="0"/>
-              <a:t>2016-01-20</a:t>
+              <a:t>2016-04-21</a:t>
             </a:fld>
             <a:endParaRPr lang="nl-BE"/>
           </a:p>
@@ -28870,6 +28872,581 @@
           <a:p>
             <a:r>
               <a:rPr lang="en-US" dirty="0" smtClean="0"/>
+              <a:t>Having cold feet?</a:t>
+            </a:r>
+            <a:endParaRPr lang="nl-BE" dirty="0"/>
+          </a:p>
+        </p:txBody>
+      </p:sp>
+      <p:sp>
+        <p:nvSpPr>
+          <p:cNvPr id="3" name="Content Placeholder 2"/>
+          <p:cNvSpPr>
+            <a:spLocks noGrp="1"/>
+          </p:cNvSpPr>
+          <p:nvPr>
+            <p:ph idx="1"/>
+          </p:nvPr>
+        </p:nvSpPr>
+        <p:spPr/>
+        <p:txBody>
+          <a:bodyPr/>
+          <a:lstStyle/>
+          <a:p>
+            <a:r>
+              <a:rPr lang="en-US" dirty="0" smtClean="0"/>
+              <a:t>Try a merge without commit</a:t>
+            </a:r>
+          </a:p>
+          <a:p>
+            <a:endParaRPr lang="en-US" dirty="0"/>
+          </a:p>
+          <a:p>
+            <a:r>
+              <a:rPr lang="en-US" dirty="0" smtClean="0"/>
+              <a:t>Reports on success/problems</a:t>
+            </a:r>
+          </a:p>
+          <a:p>
+            <a:r>
+              <a:rPr lang="en-US" dirty="0" smtClean="0"/>
+              <a:t>If okay, commit</a:t>
+            </a:r>
+          </a:p>
+          <a:p>
+            <a:endParaRPr lang="en-US" dirty="0"/>
+          </a:p>
+          <a:p>
+            <a:r>
+              <a:rPr lang="en-US" dirty="0" smtClean="0"/>
+              <a:t>If not okay, reset</a:t>
+            </a:r>
+          </a:p>
+        </p:txBody>
+      </p:sp>
+      <p:sp>
+        <p:nvSpPr>
+          <p:cNvPr id="4" name="Slide Number Placeholder 3"/>
+          <p:cNvSpPr>
+            <a:spLocks noGrp="1"/>
+          </p:cNvSpPr>
+          <p:nvPr>
+            <p:ph type="sldNum" sz="quarter" idx="12"/>
+          </p:nvPr>
+        </p:nvSpPr>
+        <p:spPr/>
+        <p:txBody>
+          <a:bodyPr/>
+          <a:lstStyle/>
+          <a:p>
+            <a:fld id="{BB52A05A-A776-4391-ACD7-D6BC34D3145C}" type="slidenum">
+              <a:rPr lang="nl-BE" smtClean="0"/>
+              <a:t>43</a:t>
+            </a:fld>
+            <a:endParaRPr lang="nl-BE"/>
+          </a:p>
+        </p:txBody>
+      </p:sp>
+      <p:sp>
+        <p:nvSpPr>
+          <p:cNvPr id="5" name="TextBox 4"/>
+          <p:cNvSpPr txBox="1"/>
+          <p:nvPr/>
+        </p:nvSpPr>
+        <p:spPr>
+          <a:xfrm>
+            <a:off x="683568" y="2276872"/>
+            <a:ext cx="8003232" cy="369332"/>
+          </a:xfrm>
+          <a:prstGeom prst="rect">
+            <a:avLst/>
+          </a:prstGeom>
+          <a:noFill/>
+          <a:ln>
+            <a:solidFill>
+              <a:schemeClr val="tx1"/>
+            </a:solidFill>
+          </a:ln>
+        </p:spPr>
+        <p:txBody>
+          <a:bodyPr wrap="square" rtlCol="0">
+            <a:spAutoFit/>
+          </a:bodyPr>
+          <a:lstStyle/>
+          <a:p>
+            <a:r>
+              <a:rPr lang="nl-BE" dirty="0" smtClean="0">
+                <a:latin typeface="Courier New" pitchFamily="49" charset="0"/>
+                <a:cs typeface="Courier New" pitchFamily="49" charset="0"/>
+              </a:rPr>
+              <a:t>$ git </a:t>
+            </a:r>
+            <a:r>
+              <a:rPr lang="nl-BE" dirty="0" err="1" smtClean="0">
+                <a:latin typeface="Courier New" pitchFamily="49" charset="0"/>
+                <a:cs typeface="Courier New" pitchFamily="49" charset="0"/>
+              </a:rPr>
+              <a:t>merge</a:t>
+            </a:r>
+            <a:r>
+              <a:rPr lang="nl-BE" dirty="0" smtClean="0">
+                <a:latin typeface="Courier New" pitchFamily="49" charset="0"/>
+                <a:cs typeface="Courier New" pitchFamily="49" charset="0"/>
+              </a:rPr>
+              <a:t>  --no-</a:t>
+            </a:r>
+            <a:r>
+              <a:rPr lang="nl-BE" dirty="0" err="1" smtClean="0">
+                <a:latin typeface="Courier New" pitchFamily="49" charset="0"/>
+                <a:cs typeface="Courier New" pitchFamily="49" charset="0"/>
+              </a:rPr>
+              <a:t>commit</a:t>
+            </a:r>
+            <a:r>
+              <a:rPr lang="nl-BE" dirty="0" smtClean="0">
+                <a:latin typeface="Courier New" pitchFamily="49" charset="0"/>
+                <a:cs typeface="Courier New" pitchFamily="49" charset="0"/>
+              </a:rPr>
+              <a:t>  -</a:t>
+            </a:r>
+            <a:r>
+              <a:rPr lang="nl-BE" dirty="0" err="1" smtClean="0">
+                <a:latin typeface="Courier New" pitchFamily="49" charset="0"/>
+                <a:cs typeface="Courier New" pitchFamily="49" charset="0"/>
+              </a:rPr>
+              <a:t>nn</a:t>
+            </a:r>
+            <a:r>
+              <a:rPr lang="nl-BE" dirty="0">
+                <a:latin typeface="Courier New" pitchFamily="49" charset="0"/>
+                <a:cs typeface="Courier New" pitchFamily="49" charset="0"/>
+              </a:rPr>
+              <a:t>-ff feature/</a:t>
+            </a:r>
+            <a:r>
+              <a:rPr lang="nl-BE" dirty="0" err="1">
+                <a:latin typeface="Courier New" pitchFamily="49" charset="0"/>
+                <a:cs typeface="Courier New" pitchFamily="49" charset="0"/>
+              </a:rPr>
+              <a:t>gradient_descent</a:t>
+            </a:r>
+            <a:endParaRPr lang="nl-BE" dirty="0" smtClean="0">
+              <a:latin typeface="Courier New" pitchFamily="49" charset="0"/>
+              <a:cs typeface="Courier New" pitchFamily="49" charset="0"/>
+            </a:endParaRPr>
+          </a:p>
+        </p:txBody>
+      </p:sp>
+      <p:sp>
+        <p:nvSpPr>
+          <p:cNvPr id="6" name="TextBox 5"/>
+          <p:cNvSpPr txBox="1"/>
+          <p:nvPr/>
+        </p:nvSpPr>
+        <p:spPr>
+          <a:xfrm>
+            <a:off x="683568" y="4016851"/>
+            <a:ext cx="8003232" cy="369332"/>
+          </a:xfrm>
+          <a:prstGeom prst="rect">
+            <a:avLst/>
+          </a:prstGeom>
+          <a:noFill/>
+          <a:ln>
+            <a:solidFill>
+              <a:schemeClr val="tx1"/>
+            </a:solidFill>
+          </a:ln>
+        </p:spPr>
+        <p:txBody>
+          <a:bodyPr wrap="square" rtlCol="0">
+            <a:spAutoFit/>
+          </a:bodyPr>
+          <a:lstStyle/>
+          <a:p>
+            <a:r>
+              <a:rPr lang="nl-BE" dirty="0" smtClean="0">
+                <a:latin typeface="Courier New" pitchFamily="49" charset="0"/>
+                <a:cs typeface="Courier New" pitchFamily="49" charset="0"/>
+              </a:rPr>
+              <a:t>$ git </a:t>
+            </a:r>
+            <a:r>
+              <a:rPr lang="nl-BE" dirty="0" err="1" smtClean="0">
+                <a:latin typeface="Courier New" pitchFamily="49" charset="0"/>
+                <a:cs typeface="Courier New" pitchFamily="49" charset="0"/>
+              </a:rPr>
+              <a:t>commit</a:t>
+            </a:r>
+            <a:r>
+              <a:rPr lang="nl-BE" dirty="0" smtClean="0">
+                <a:latin typeface="Courier New" pitchFamily="49" charset="0"/>
+                <a:cs typeface="Courier New" pitchFamily="49" charset="0"/>
+              </a:rPr>
+              <a:t>  -m '</a:t>
+            </a:r>
+            <a:r>
+              <a:rPr lang="nl-BE" dirty="0" err="1" smtClean="0">
+                <a:latin typeface="Courier New" pitchFamily="49" charset="0"/>
+                <a:cs typeface="Courier New" pitchFamily="49" charset="0"/>
+              </a:rPr>
+              <a:t>merged</a:t>
+            </a:r>
+            <a:r>
+              <a:rPr lang="nl-BE" dirty="0" smtClean="0">
+                <a:latin typeface="Courier New" pitchFamily="49" charset="0"/>
+                <a:cs typeface="Courier New" pitchFamily="49" charset="0"/>
+              </a:rPr>
+              <a:t> in </a:t>
+            </a:r>
+            <a:r>
+              <a:rPr lang="nl-BE" dirty="0" err="1" smtClean="0">
+                <a:latin typeface="Courier New" pitchFamily="49" charset="0"/>
+                <a:cs typeface="Courier New" pitchFamily="49" charset="0"/>
+              </a:rPr>
+              <a:t>gradient</a:t>
+            </a:r>
+            <a:r>
+              <a:rPr lang="nl-BE" dirty="0" smtClean="0">
+                <a:latin typeface="Courier New" pitchFamily="49" charset="0"/>
+                <a:cs typeface="Courier New" pitchFamily="49" charset="0"/>
+              </a:rPr>
+              <a:t> </a:t>
+            </a:r>
+            <a:r>
+              <a:rPr lang="nl-BE" dirty="0" err="1" smtClean="0">
+                <a:latin typeface="Courier New" pitchFamily="49" charset="0"/>
+                <a:cs typeface="Courier New" pitchFamily="49" charset="0"/>
+              </a:rPr>
+              <a:t>descent</a:t>
+            </a:r>
+            <a:r>
+              <a:rPr lang="nl-BE" dirty="0" smtClean="0">
+                <a:latin typeface="Courier New" pitchFamily="49" charset="0"/>
+                <a:cs typeface="Courier New" pitchFamily="49" charset="0"/>
+              </a:rPr>
+              <a:t> code'</a:t>
+            </a:r>
+            <a:endParaRPr lang="nl-BE" dirty="0" smtClean="0">
+              <a:latin typeface="Courier New" pitchFamily="49" charset="0"/>
+              <a:cs typeface="Courier New" pitchFamily="49" charset="0"/>
+            </a:endParaRPr>
+          </a:p>
+        </p:txBody>
+      </p:sp>
+      <p:sp>
+        <p:nvSpPr>
+          <p:cNvPr id="7" name="TextBox 6"/>
+          <p:cNvSpPr txBox="1"/>
+          <p:nvPr/>
+        </p:nvSpPr>
+        <p:spPr>
+          <a:xfrm>
+            <a:off x="683568" y="5229200"/>
+            <a:ext cx="8003232" cy="369332"/>
+          </a:xfrm>
+          <a:prstGeom prst="rect">
+            <a:avLst/>
+          </a:prstGeom>
+          <a:noFill/>
+          <a:ln>
+            <a:solidFill>
+              <a:schemeClr val="tx1"/>
+            </a:solidFill>
+          </a:ln>
+        </p:spPr>
+        <p:txBody>
+          <a:bodyPr wrap="square" rtlCol="0">
+            <a:spAutoFit/>
+          </a:bodyPr>
+          <a:lstStyle/>
+          <a:p>
+            <a:r>
+              <a:rPr lang="nl-BE" dirty="0" smtClean="0">
+                <a:latin typeface="Courier New" pitchFamily="49" charset="0"/>
+                <a:cs typeface="Courier New" pitchFamily="49" charset="0"/>
+              </a:rPr>
+              <a:t>$ git </a:t>
+            </a:r>
+            <a:r>
+              <a:rPr lang="nl-BE" dirty="0" smtClean="0">
+                <a:latin typeface="Courier New" pitchFamily="49" charset="0"/>
+                <a:cs typeface="Courier New" pitchFamily="49" charset="0"/>
+              </a:rPr>
+              <a:t>reset  --hard  ORIG_HEAD</a:t>
+            </a:r>
+            <a:endParaRPr lang="nl-BE" dirty="0" smtClean="0">
+              <a:latin typeface="Courier New" pitchFamily="49" charset="0"/>
+              <a:cs typeface="Courier New" pitchFamily="49" charset="0"/>
+            </a:endParaRPr>
+          </a:p>
+        </p:txBody>
+      </p:sp>
+      <p:sp>
+        <p:nvSpPr>
+          <p:cNvPr id="8" name="TextBox 7"/>
+          <p:cNvSpPr txBox="1"/>
+          <p:nvPr/>
+        </p:nvSpPr>
+        <p:spPr>
+          <a:xfrm>
+            <a:off x="1403648" y="5877272"/>
+            <a:ext cx="5517536" cy="523220"/>
+          </a:xfrm>
+          <a:prstGeom prst="rect">
+            <a:avLst/>
+          </a:prstGeom>
+          <a:noFill/>
+          <a:ln>
+            <a:solidFill>
+              <a:schemeClr val="tx1"/>
+            </a:solidFill>
+          </a:ln>
+        </p:spPr>
+        <p:txBody>
+          <a:bodyPr wrap="none" rtlCol="0">
+            <a:spAutoFit/>
+          </a:bodyPr>
+          <a:lstStyle/>
+          <a:p>
+            <a:r>
+              <a:rPr lang="en-US" sz="2800" dirty="0" smtClean="0"/>
+              <a:t>If there are local changes, first stash!</a:t>
+            </a:r>
+            <a:endParaRPr lang="nl-BE" sz="2800" dirty="0"/>
+          </a:p>
+        </p:txBody>
+      </p:sp>
+    </p:spTree>
+    <p:extLst>
+      <p:ext uri="{BB962C8B-B14F-4D97-AF65-F5344CB8AC3E}">
+        <p14:creationId xmlns:p14="http://schemas.microsoft.com/office/powerpoint/2010/main" val="158828442"/>
+      </p:ext>
+    </p:extLst>
+  </p:cSld>
+  <p:clrMapOvr>
+    <a:masterClrMapping/>
+  </p:clrMapOvr>
+  <p:timing>
+    <p:tnLst>
+      <p:par>
+        <p:cTn id="1" dur="indefinite" restart="never" nodeType="tmRoot">
+          <p:childTnLst>
+            <p:seq concurrent="1" nextAc="seek">
+              <p:cTn id="2" dur="indefinite" nodeType="mainSeq">
+                <p:childTnLst>
+                  <p:par>
+                    <p:cTn id="3" fill="hold">
+                      <p:stCondLst>
+                        <p:cond delay="indefinite"/>
+                        <p:cond evt="onBegin" delay="0">
+                          <p:tn val="2"/>
+                        </p:cond>
+                      </p:stCondLst>
+                      <p:childTnLst>
+                        <p:par>
+                          <p:cTn id="4" fill="hold">
+                            <p:stCondLst>
+                              <p:cond delay="0"/>
+                            </p:stCondLst>
+                            <p:childTnLst>
+                              <p:par>
+                                <p:cTn id="5" presetID="1" presetClass="entr" presetSubtype="0" fill="hold" grpId="0" nodeType="withEffect">
+                                  <p:stCondLst>
+                                    <p:cond delay="0"/>
+                                  </p:stCondLst>
+                                  <p:childTnLst>
+                                    <p:set>
+                                      <p:cBhvr>
+                                        <p:cTn id="6" dur="1" fill="hold">
+                                          <p:stCondLst>
+                                            <p:cond delay="0"/>
+                                          </p:stCondLst>
+                                        </p:cTn>
+                                        <p:tgtEl>
+                                          <p:spTgt spid="5"/>
+                                        </p:tgtEl>
+                                        <p:attrNameLst>
+                                          <p:attrName>style.visibility</p:attrName>
+                                        </p:attrNameLst>
+                                      </p:cBhvr>
+                                      <p:to>
+                                        <p:strVal val="visible"/>
+                                      </p:to>
+                                    </p:set>
+                                  </p:childTnLst>
+                                </p:cTn>
+                              </p:par>
+                              <p:par>
+                                <p:cTn id="7" presetID="1" presetClass="entr" presetSubtype="0" fill="hold" grpId="0" nodeType="withEffect">
+                                  <p:stCondLst>
+                                    <p:cond delay="0"/>
+                                  </p:stCondLst>
+                                  <p:childTnLst>
+                                    <p:set>
+                                      <p:cBhvr>
+                                        <p:cTn id="8" dur="1" fill="hold">
+                                          <p:stCondLst>
+                                            <p:cond delay="0"/>
+                                          </p:stCondLst>
+                                        </p:cTn>
+                                        <p:tgtEl>
+                                          <p:spTgt spid="6"/>
+                                        </p:tgtEl>
+                                        <p:attrNameLst>
+                                          <p:attrName>style.visibility</p:attrName>
+                                        </p:attrNameLst>
+                                      </p:cBhvr>
+                                      <p:to>
+                                        <p:strVal val="visible"/>
+                                      </p:to>
+                                    </p:set>
+                                  </p:childTnLst>
+                                </p:cTn>
+                              </p:par>
+                              <p:par>
+                                <p:cTn id="9" presetID="1" presetClass="entr" presetSubtype="0" fill="hold" grpId="0" nodeType="withEffect">
+                                  <p:stCondLst>
+                                    <p:cond delay="0"/>
+                                  </p:stCondLst>
+                                  <p:childTnLst>
+                                    <p:set>
+                                      <p:cBhvr>
+                                        <p:cTn id="10" dur="1" fill="hold">
+                                          <p:stCondLst>
+                                            <p:cond delay="0"/>
+                                          </p:stCondLst>
+                                        </p:cTn>
+                                        <p:tgtEl>
+                                          <p:spTgt spid="7"/>
+                                        </p:tgtEl>
+                                        <p:attrNameLst>
+                                          <p:attrName>style.visibility</p:attrName>
+                                        </p:attrNameLst>
+                                      </p:cBhvr>
+                                      <p:to>
+                                        <p:strVal val="visible"/>
+                                      </p:to>
+                                    </p:set>
+                                  </p:childTnLst>
+                                </p:cTn>
+                              </p:par>
+                            </p:childTnLst>
+                          </p:cTn>
+                        </p:par>
+                      </p:childTnLst>
+                    </p:cTn>
+                  </p:par>
+                  <p:par>
+                    <p:cTn id="11" fill="hold">
+                      <p:stCondLst>
+                        <p:cond delay="indefinite"/>
+                      </p:stCondLst>
+                      <p:childTnLst>
+                        <p:par>
+                          <p:cTn id="12" fill="hold">
+                            <p:stCondLst>
+                              <p:cond delay="0"/>
+                            </p:stCondLst>
+                            <p:childTnLst>
+                              <p:par>
+                                <p:cTn id="13" presetID="1" presetClass="entr" presetSubtype="0" fill="hold" grpId="0" nodeType="clickEffect">
+                                  <p:stCondLst>
+                                    <p:cond delay="0"/>
+                                  </p:stCondLst>
+                                  <p:childTnLst>
+                                    <p:set>
+                                      <p:cBhvr>
+                                        <p:cTn id="14" dur="1" fill="hold">
+                                          <p:stCondLst>
+                                            <p:cond delay="0"/>
+                                          </p:stCondLst>
+                                        </p:cTn>
+                                        <p:tgtEl>
+                                          <p:spTgt spid="8"/>
+                                        </p:tgtEl>
+                                        <p:attrNameLst>
+                                          <p:attrName>style.visibility</p:attrName>
+                                        </p:attrNameLst>
+                                      </p:cBhvr>
+                                      <p:to>
+                                        <p:strVal val="visible"/>
+                                      </p:to>
+                                    </p:set>
+                                  </p:childTnLst>
+                                </p:cTn>
+                              </p:par>
+                            </p:childTnLst>
+                          </p:cTn>
+                        </p:par>
+                      </p:childTnLst>
+                    </p:cTn>
+                  </p:par>
+                </p:childTnLst>
+              </p:cTn>
+              <p:prevCondLst>
+                <p:cond evt="onPrev" delay="0">
+                  <p:tgtEl>
+                    <p:sldTgt/>
+                  </p:tgtEl>
+                </p:cond>
+              </p:prevCondLst>
+              <p:nextCondLst>
+                <p:cond evt="onNext" delay="0">
+                  <p:tgtEl>
+                    <p:sldTgt/>
+                  </p:tgtEl>
+                </p:cond>
+              </p:nextCondLst>
+            </p:seq>
+          </p:childTnLst>
+        </p:cTn>
+      </p:par>
+    </p:tnLst>
+    <p:bldLst>
+      <p:bldP spid="5" grpId="0" animBg="1"/>
+      <p:bldP spid="6" grpId="0" animBg="1"/>
+      <p:bldP spid="7" grpId="0" animBg="1"/>
+      <p:bldP spid="8" grpId="0" animBg="1"/>
+    </p:bldLst>
+  </p:timing>
+</p:sld>
+</file>
+
+<file path=ppt/slides/slide44.xml><?xml version="1.0" encoding="utf-8"?>
+<p:sld xmlns:a="http://schemas.openxmlformats.org/drawingml/2006/main" xmlns:r="http://schemas.openxmlformats.org/officeDocument/2006/relationships" xmlns:p="http://schemas.openxmlformats.org/presentationml/2006/main">
+  <p:cSld>
+    <p:spTree>
+      <p:nvGrpSpPr>
+        <p:cNvPr id="1" name=""/>
+        <p:cNvGrpSpPr/>
+        <p:nvPr/>
+      </p:nvGrpSpPr>
+      <p:grpSpPr>
+        <a:xfrm>
+          <a:off x="0" y="0"/>
+          <a:ext cx="0" cy="0"/>
+          <a:chOff x="0" y="0"/>
+          <a:chExt cx="0" cy="0"/>
+        </a:xfrm>
+      </p:grpSpPr>
+      <p:sp>
+        <p:nvSpPr>
+          <p:cNvPr id="2" name="Title 1"/>
+          <p:cNvSpPr>
+            <a:spLocks noGrp="1"/>
+          </p:cNvSpPr>
+          <p:nvPr>
+            <p:ph type="title"/>
+          </p:nvPr>
+        </p:nvSpPr>
+        <p:spPr/>
+        <p:txBody>
+          <a:bodyPr/>
+          <a:lstStyle/>
+          <a:p>
+            <a:r>
+              <a:rPr lang="en-US" dirty="0" smtClean="0"/>
               <a:t>Branching policies</a:t>
             </a:r>
             <a:endParaRPr lang="nl-BE" dirty="0"/>
@@ -29900,7 +30477,7 @@
           <a:p>
             <a:fld id="{BB52A05A-A776-4391-ACD7-D6BC34D3145C}" type="slidenum">
               <a:rPr lang="nl-BE" smtClean="0"/>
-              <a:t>43</a:t>
+              <a:t>44</a:t>
             </a:fld>
             <a:endParaRPr lang="nl-BE"/>
           </a:p>
@@ -30662,7 +31239,7 @@
 </p:sld>
 </file>
 
-<file path=ppt/slides/slide44.xml><?xml version="1.0" encoding="utf-8"?>
+<file path=ppt/slides/slide45.xml><?xml version="1.0" encoding="utf-8"?>
 <p:sld xmlns:a="http://schemas.openxmlformats.org/drawingml/2006/main" xmlns:r="http://schemas.openxmlformats.org/officeDocument/2006/relationships" xmlns:p="http://schemas.openxmlformats.org/presentationml/2006/main">
   <p:cSld>
     <p:spTree>
@@ -30737,11 +31314,7 @@
           <a:p>
             <a:r>
               <a:rPr lang="en-US" dirty="0" smtClean="0"/>
-              <a:t>Fetch and create specific branch, e.g</a:t>
-            </a:r>
-            <a:r>
-              <a:rPr lang="en-US" dirty="0" smtClean="0"/>
-              <a:t>.,</a:t>
+              <a:t>Fetch and create specific branch, e.g.,</a:t>
             </a:r>
           </a:p>
           <a:p>
@@ -31114,7 +31687,7 @@
           <a:p>
             <a:fld id="{BB52A05A-A776-4391-ACD7-D6BC34D3145C}" type="slidenum">
               <a:rPr lang="nl-BE" smtClean="0"/>
-              <a:t>44</a:t>
+              <a:t>45</a:t>
             </a:fld>
             <a:endParaRPr lang="nl-BE"/>
           </a:p>
@@ -31166,40 +31739,29 @@
                 <a:latin typeface="Courier New" pitchFamily="49" charset="0"/>
                 <a:cs typeface="Courier New" pitchFamily="49" charset="0"/>
               </a:rPr>
-              <a:t>  </a:t>
+              <a:t>  -u </a:t>
+            </a:r>
+            <a:r>
+              <a:rPr lang="nl-BE" dirty="0" err="1" smtClean="0">
+                <a:latin typeface="Courier New" pitchFamily="49" charset="0"/>
+                <a:cs typeface="Courier New" pitchFamily="49" charset="0"/>
+              </a:rPr>
+              <a:t>origin</a:t>
+            </a:r>
+            <a:r>
+              <a:rPr lang="nl-BE" dirty="0">
+                <a:latin typeface="Courier New" pitchFamily="49" charset="0"/>
+                <a:cs typeface="Courier New" pitchFamily="49" charset="0"/>
+              </a:rPr>
+              <a:t>/</a:t>
             </a:r>
             <a:r>
               <a:rPr lang="nl-BE" dirty="0" smtClean="0">
                 <a:latin typeface="Courier New" pitchFamily="49" charset="0"/>
                 <a:cs typeface="Courier New" pitchFamily="49" charset="0"/>
               </a:rPr>
-              <a:t>-u </a:t>
-            </a:r>
-            <a:r>
-              <a:rPr lang="nl-BE" dirty="0" err="1" smtClean="0">
-                <a:latin typeface="Courier New" pitchFamily="49" charset="0"/>
-                <a:cs typeface="Courier New" pitchFamily="49" charset="0"/>
-              </a:rPr>
-              <a:t>origin</a:t>
-            </a:r>
-            <a:r>
-              <a:rPr lang="nl-BE" dirty="0">
-                <a:latin typeface="Courier New" pitchFamily="49" charset="0"/>
-                <a:cs typeface="Courier New" pitchFamily="49" charset="0"/>
-              </a:rPr>
-              <a:t>/</a:t>
-            </a:r>
-            <a:r>
-              <a:rPr lang="nl-BE" dirty="0" smtClean="0">
-                <a:latin typeface="Courier New" pitchFamily="49" charset="0"/>
-                <a:cs typeface="Courier New" pitchFamily="49" charset="0"/>
-              </a:rPr>
               <a:t>development</a:t>
             </a:r>
-            <a:endParaRPr lang="nl-BE" dirty="0" smtClean="0">
-              <a:latin typeface="Courier New" pitchFamily="49" charset="0"/>
-              <a:cs typeface="Courier New" pitchFamily="49" charset="0"/>
-            </a:endParaRPr>
           </a:p>
         </p:txBody>
       </p:sp>
@@ -31614,7 +32176,7 @@
 </p:sld>
 </file>
 
-<file path=ppt/slides/slide45.xml><?xml version="1.0" encoding="utf-8"?>
+<file path=ppt/slides/slide46.xml><?xml version="1.0" encoding="utf-8"?>
 <p:sld xmlns:a="http://schemas.openxmlformats.org/drawingml/2006/main" xmlns:r="http://schemas.openxmlformats.org/officeDocument/2006/relationships" xmlns:p="http://schemas.openxmlformats.org/presentationml/2006/main">
   <p:cSld>
     <p:spTree>
@@ -31839,7 +32401,7 @@
           <a:p>
             <a:fld id="{BB52A05A-A776-4391-ACD7-D6BC34D3145C}" type="slidenum">
               <a:rPr lang="nl-BE" smtClean="0"/>
-              <a:t>45</a:t>
+              <a:t>46</a:t>
             </a:fld>
             <a:endParaRPr lang="nl-BE"/>
           </a:p>
@@ -32048,7 +32610,7 @@
 </p:sld>
 </file>
 
-<file path=ppt/slides/slide46.xml><?xml version="1.0" encoding="utf-8"?>
+<file path=ppt/slides/slide47.xml><?xml version="1.0" encoding="utf-8"?>
 <p:sld xmlns:a="http://schemas.openxmlformats.org/drawingml/2006/main" xmlns:r="http://schemas.openxmlformats.org/officeDocument/2006/relationships" xmlns:p="http://schemas.openxmlformats.org/presentationml/2006/main">
   <p:cSld>
     <p:spTree>
@@ -32272,7 +32834,7 @@
           <a:p>
             <a:fld id="{BB52A05A-A776-4391-ACD7-D6BC34D3145C}" type="slidenum">
               <a:rPr lang="nl-BE" smtClean="0"/>
-              <a:t>46</a:t>
+              <a:t>47</a:t>
             </a:fld>
             <a:endParaRPr lang="nl-BE"/>
           </a:p>
@@ -32512,7 +33074,7 @@
 </p:sld>
 </file>
 
-<file path=ppt/slides/slide47.xml><?xml version="1.0" encoding="utf-8"?>
+<file path=ppt/slides/slide48.xml><?xml version="1.0" encoding="utf-8"?>
 <p:sld xmlns:a="http://schemas.openxmlformats.org/drawingml/2006/main" xmlns:r="http://schemas.openxmlformats.org/officeDocument/2006/relationships" xmlns:p="http://schemas.openxmlformats.org/presentationml/2006/main">
   <p:cSld>
     <p:spTree>
@@ -32988,7 +33550,7 @@
           <a:p>
             <a:fld id="{BB52A05A-A776-4391-ACD7-D6BC34D3145C}" type="slidenum">
               <a:rPr lang="nl-BE" smtClean="0"/>
-              <a:t>47</a:t>
+              <a:t>48</a:t>
             </a:fld>
             <a:endParaRPr lang="nl-BE"/>
           </a:p>
@@ -33435,7 +33997,7 @@
 </p:sld>
 </file>
 
-<file path=ppt/slides/slide48.xml><?xml version="1.0" encoding="utf-8"?>
+<file path=ppt/slides/slide49.xml><?xml version="1.0" encoding="utf-8"?>
 <p:sld xmlns:a="http://schemas.openxmlformats.org/drawingml/2006/main" xmlns:r="http://schemas.openxmlformats.org/officeDocument/2006/relationships" xmlns:p="http://schemas.openxmlformats.org/presentationml/2006/main">
   <p:cSld>
     <p:spTree>
@@ -33690,7 +34252,7 @@
           <a:p>
             <a:fld id="{BB52A05A-A776-4391-ACD7-D6BC34D3145C}" type="slidenum">
               <a:rPr lang="nl-BE" smtClean="0"/>
-              <a:t>48</a:t>
+              <a:t>49</a:t>
             </a:fld>
             <a:endParaRPr lang="nl-BE"/>
           </a:p>
@@ -33990,108 +34552,6 @@
       <p:bldP spid="5" grpId="0" animBg="1"/>
       <p:bldP spid="6" grpId="0" animBg="1"/>
     </p:bldLst>
-  </p:timing>
-</p:sld>
-</file>
-
-<file path=ppt/slides/slide49.xml><?xml version="1.0" encoding="utf-8"?>
-<p:sld xmlns:a="http://schemas.openxmlformats.org/drawingml/2006/main" xmlns:r="http://schemas.openxmlformats.org/officeDocument/2006/relationships" xmlns:p="http://schemas.openxmlformats.org/presentationml/2006/main">
-  <p:cSld>
-    <p:spTree>
-      <p:nvGrpSpPr>
-        <p:cNvPr id="1" name=""/>
-        <p:cNvGrpSpPr/>
-        <p:nvPr/>
-      </p:nvGrpSpPr>
-      <p:grpSpPr>
-        <a:xfrm>
-          <a:off x="0" y="0"/>
-          <a:ext cx="0" cy="0"/>
-          <a:chOff x="0" y="0"/>
-          <a:chExt cx="0" cy="0"/>
-        </a:xfrm>
-      </p:grpSpPr>
-      <p:sp>
-        <p:nvSpPr>
-          <p:cNvPr id="2" name="Title 1"/>
-          <p:cNvSpPr>
-            <a:spLocks noGrp="1"/>
-          </p:cNvSpPr>
-          <p:nvPr>
-            <p:ph type="title"/>
-          </p:nvPr>
-        </p:nvSpPr>
-        <p:spPr/>
-        <p:txBody>
-          <a:bodyPr/>
-          <a:lstStyle/>
-          <a:p>
-            <a:r>
-              <a:rPr lang="en-US" dirty="0" smtClean="0"/>
-              <a:t>Conclusions</a:t>
-            </a:r>
-            <a:endParaRPr lang="nl-BE" dirty="0"/>
-          </a:p>
-        </p:txBody>
-      </p:sp>
-      <p:sp>
-        <p:nvSpPr>
-          <p:cNvPr id="3" name="Text Placeholder 2"/>
-          <p:cNvSpPr>
-            <a:spLocks noGrp="1"/>
-          </p:cNvSpPr>
-          <p:nvPr>
-            <p:ph type="body" idx="1"/>
-          </p:nvPr>
-        </p:nvSpPr>
-        <p:spPr/>
-        <p:txBody>
-          <a:bodyPr/>
-          <a:lstStyle/>
-          <a:p>
-            <a:endParaRPr lang="nl-BE"/>
-          </a:p>
-        </p:txBody>
-      </p:sp>
-      <p:sp>
-        <p:nvSpPr>
-          <p:cNvPr id="4" name="Slide Number Placeholder 3"/>
-          <p:cNvSpPr>
-            <a:spLocks noGrp="1"/>
-          </p:cNvSpPr>
-          <p:nvPr>
-            <p:ph type="sldNum" sz="quarter" idx="12"/>
-          </p:nvPr>
-        </p:nvSpPr>
-        <p:spPr/>
-        <p:txBody>
-          <a:bodyPr/>
-          <a:lstStyle/>
-          <a:p>
-            <a:fld id="{BB52A05A-A776-4391-ACD7-D6BC34D3145C}" type="slidenum">
-              <a:rPr lang="nl-BE" smtClean="0"/>
-              <a:t>49</a:t>
-            </a:fld>
-            <a:endParaRPr lang="nl-BE"/>
-          </a:p>
-        </p:txBody>
-      </p:sp>
-    </p:spTree>
-    <p:extLst>
-      <p:ext uri="{BB962C8B-B14F-4D97-AF65-F5344CB8AC3E}">
-        <p14:creationId xmlns:p14="http://schemas.microsoft.com/office/powerpoint/2010/main" val="2763237186"/>
-      </p:ext>
-    </p:extLst>
-  </p:cSld>
-  <p:clrMapOvr>
-    <a:masterClrMapping/>
-  </p:clrMapOvr>
-  <p:timing>
-    <p:tnLst>
-      <p:par>
-        <p:cTn id="1" dur="indefinite" restart="never" nodeType="tmRoot"/>
-      </p:par>
-    </p:tnLst>
   </p:timing>
 </p:sld>
 </file>
@@ -34634,16 +35094,8 @@
           <a:lstStyle/>
           <a:p>
             <a:r>
-              <a:rPr lang="en-US" dirty="0" err="1"/>
-              <a:t>g</a:t>
-            </a:r>
-            <a:r>
-              <a:rPr lang="en-US" dirty="0" err="1" smtClean="0"/>
-              <a:t>it</a:t>
-            </a:r>
-            <a:r>
               <a:rPr lang="en-US" dirty="0" smtClean="0"/>
-              <a:t>: the movie</a:t>
+              <a:t>Conclusions</a:t>
             </a:r>
             <a:endParaRPr lang="nl-BE" dirty="0"/>
           </a:p>
@@ -34651,131 +35103,20 @@
       </p:sp>
       <p:sp>
         <p:nvSpPr>
-          <p:cNvPr id="3" name="Content Placeholder 2"/>
+          <p:cNvPr id="3" name="Text Placeholder 2"/>
           <p:cNvSpPr>
             <a:spLocks noGrp="1"/>
           </p:cNvSpPr>
           <p:nvPr>
-            <p:ph idx="1"/>
+            <p:ph type="body" idx="1"/>
           </p:nvPr>
         </p:nvSpPr>
         <p:spPr/>
         <p:txBody>
-          <a:bodyPr>
-            <a:normAutofit fontScale="92500"/>
-          </a:bodyPr>
+          <a:bodyPr/>
           <a:lstStyle/>
           <a:p>
-            <a:r>
-              <a:rPr lang="en-US" dirty="0" smtClean="0"/>
-              <a:t>Online documentation (including movies)</a:t>
-            </a:r>
-          </a:p>
-          <a:p>
-            <a:pPr lvl="1"/>
-            <a:r>
-              <a:rPr lang="nl-BE" dirty="0" smtClean="0">
-                <a:hlinkClick r:id="rId2"/>
-              </a:rPr>
-              <a:t>http://git-scm.com/documentation</a:t>
-            </a:r>
-            <a:endParaRPr lang="nl-BE" dirty="0" smtClean="0"/>
-          </a:p>
-          <a:p>
-            <a:r>
-              <a:rPr lang="en-US" dirty="0" err="1"/>
-              <a:t>g</a:t>
-            </a:r>
-            <a:r>
-              <a:rPr lang="en-US" dirty="0" err="1" smtClean="0"/>
-              <a:t>it</a:t>
-            </a:r>
-            <a:r>
-              <a:rPr lang="en-US" dirty="0" smtClean="0"/>
-              <a:t> web site</a:t>
-            </a:r>
-          </a:p>
-          <a:p>
-            <a:pPr lvl="1"/>
-            <a:r>
-              <a:rPr lang="nl-BE" dirty="0" smtClean="0">
-                <a:hlinkClick r:id="rId3"/>
-              </a:rPr>
-              <a:t>http://git-scm.com/</a:t>
-            </a:r>
-            <a:endParaRPr lang="nl-BE" dirty="0" smtClean="0"/>
-          </a:p>
-          <a:p>
-            <a:r>
-              <a:rPr lang="en-US" dirty="0" smtClean="0"/>
-              <a:t>Why (the author thinks) you should switch to </a:t>
-            </a:r>
-            <a:r>
-              <a:rPr lang="en-US" dirty="0" err="1" smtClean="0"/>
-              <a:t>git</a:t>
-            </a:r>
-            <a:endParaRPr lang="en-US" dirty="0" smtClean="0"/>
-          </a:p>
-          <a:p>
-            <a:pPr lvl="1"/>
-            <a:r>
-              <a:rPr lang="nl-BE" dirty="0" smtClean="0">
-                <a:hlinkClick r:id="rId4"/>
-              </a:rPr>
-              <a:t>http://blog.teamtreehouse.com/why-you-should-switch-from-subversion-to-git</a:t>
-            </a:r>
-            <a:endParaRPr lang="nl-BE" dirty="0" smtClean="0"/>
-          </a:p>
-          <a:p>
-            <a:r>
-              <a:rPr lang="nl-BE" dirty="0" smtClean="0"/>
-              <a:t>An </a:t>
-            </a:r>
-            <a:r>
-              <a:rPr lang="nl-BE" dirty="0" err="1" smtClean="0"/>
-              <a:t>overview</a:t>
-            </a:r>
-            <a:r>
-              <a:rPr lang="nl-BE" dirty="0" smtClean="0"/>
-              <a:t> of </a:t>
-            </a:r>
-            <a:r>
-              <a:rPr lang="nl-BE" dirty="0" err="1" smtClean="0"/>
-              <a:t>frequently</a:t>
-            </a:r>
-            <a:r>
-              <a:rPr lang="nl-BE" dirty="0" smtClean="0"/>
-              <a:t> </a:t>
-            </a:r>
-            <a:r>
-              <a:rPr lang="nl-BE" dirty="0" err="1" smtClean="0"/>
-              <a:t>used</a:t>
-            </a:r>
-            <a:r>
-              <a:rPr lang="nl-BE" dirty="0" smtClean="0"/>
-              <a:t> git </a:t>
-            </a:r>
-            <a:r>
-              <a:rPr lang="nl-BE" dirty="0" err="1" smtClean="0"/>
-              <a:t>workflows</a:t>
-            </a:r>
-            <a:endParaRPr lang="nl-BE" dirty="0" smtClean="0"/>
-          </a:p>
-          <a:p>
-            <a:pPr lvl="1"/>
-            <a:r>
-              <a:rPr lang="en-US" dirty="0">
-                <a:hlinkClick r:id="rId5"/>
-              </a:rPr>
-              <a:t>https://</a:t>
-            </a:r>
-            <a:r>
-              <a:rPr lang="en-US" dirty="0" smtClean="0">
-                <a:hlinkClick r:id="rId5"/>
-              </a:rPr>
-              <a:t>www.atlassian.com/git/workflows</a:t>
-            </a:r>
-            <a:endParaRPr lang="nl-BE" dirty="0" smtClean="0"/>
+            <a:endParaRPr lang="nl-BE"/>
           </a:p>
         </p:txBody>
       </p:sp>
@@ -34805,7 +35146,7 @@
     </p:spTree>
     <p:extLst>
       <p:ext uri="{BB962C8B-B14F-4D97-AF65-F5344CB8AC3E}">
-        <p14:creationId xmlns:p14="http://schemas.microsoft.com/office/powerpoint/2010/main" val="2976133738"/>
+        <p14:creationId xmlns:p14="http://schemas.microsoft.com/office/powerpoint/2010/main" val="2763237186"/>
       </p:ext>
     </p:extLst>
   </p:cSld>
@@ -34855,6 +35196,227 @@
           <a:lstStyle/>
           <a:p>
             <a:r>
+              <a:rPr lang="en-US" dirty="0" err="1"/>
+              <a:t>g</a:t>
+            </a:r>
+            <a:r>
+              <a:rPr lang="en-US" dirty="0" err="1" smtClean="0"/>
+              <a:t>it</a:t>
+            </a:r>
+            <a:r>
+              <a:rPr lang="en-US" dirty="0" smtClean="0"/>
+              <a:t>: the movie</a:t>
+            </a:r>
+            <a:endParaRPr lang="nl-BE" dirty="0"/>
+          </a:p>
+        </p:txBody>
+      </p:sp>
+      <p:sp>
+        <p:nvSpPr>
+          <p:cNvPr id="3" name="Content Placeholder 2"/>
+          <p:cNvSpPr>
+            <a:spLocks noGrp="1"/>
+          </p:cNvSpPr>
+          <p:nvPr>
+            <p:ph idx="1"/>
+          </p:nvPr>
+        </p:nvSpPr>
+        <p:spPr/>
+        <p:txBody>
+          <a:bodyPr>
+            <a:normAutofit fontScale="92500"/>
+          </a:bodyPr>
+          <a:lstStyle/>
+          <a:p>
+            <a:r>
+              <a:rPr lang="en-US" dirty="0" smtClean="0"/>
+              <a:t>Online documentation (including movies)</a:t>
+            </a:r>
+          </a:p>
+          <a:p>
+            <a:pPr lvl="1"/>
+            <a:r>
+              <a:rPr lang="nl-BE" dirty="0" smtClean="0">
+                <a:hlinkClick r:id="rId2"/>
+              </a:rPr>
+              <a:t>http://git-scm.com/documentation</a:t>
+            </a:r>
+            <a:endParaRPr lang="nl-BE" dirty="0" smtClean="0"/>
+          </a:p>
+          <a:p>
+            <a:r>
+              <a:rPr lang="en-US" dirty="0" err="1"/>
+              <a:t>g</a:t>
+            </a:r>
+            <a:r>
+              <a:rPr lang="en-US" dirty="0" err="1" smtClean="0"/>
+              <a:t>it</a:t>
+            </a:r>
+            <a:r>
+              <a:rPr lang="en-US" dirty="0" smtClean="0"/>
+              <a:t> web site</a:t>
+            </a:r>
+          </a:p>
+          <a:p>
+            <a:pPr lvl="1"/>
+            <a:r>
+              <a:rPr lang="nl-BE" dirty="0" smtClean="0">
+                <a:hlinkClick r:id="rId3"/>
+              </a:rPr>
+              <a:t>http://git-scm.com/</a:t>
+            </a:r>
+            <a:endParaRPr lang="nl-BE" dirty="0" smtClean="0"/>
+          </a:p>
+          <a:p>
+            <a:r>
+              <a:rPr lang="en-US" dirty="0" smtClean="0"/>
+              <a:t>Why (the author thinks) you should switch to </a:t>
+            </a:r>
+            <a:r>
+              <a:rPr lang="en-US" dirty="0" err="1" smtClean="0"/>
+              <a:t>git</a:t>
+            </a:r>
+            <a:endParaRPr lang="en-US" dirty="0" smtClean="0"/>
+          </a:p>
+          <a:p>
+            <a:pPr lvl="1"/>
+            <a:r>
+              <a:rPr lang="nl-BE" dirty="0" smtClean="0">
+                <a:hlinkClick r:id="rId4"/>
+              </a:rPr>
+              <a:t>http://blog.teamtreehouse.com/why-you-should-switch-from-subversion-to-git</a:t>
+            </a:r>
+            <a:endParaRPr lang="nl-BE" dirty="0" smtClean="0"/>
+          </a:p>
+          <a:p>
+            <a:r>
+              <a:rPr lang="nl-BE" dirty="0" smtClean="0"/>
+              <a:t>An </a:t>
+            </a:r>
+            <a:r>
+              <a:rPr lang="nl-BE" dirty="0" err="1" smtClean="0"/>
+              <a:t>overview</a:t>
+            </a:r>
+            <a:r>
+              <a:rPr lang="nl-BE" dirty="0" smtClean="0"/>
+              <a:t> of </a:t>
+            </a:r>
+            <a:r>
+              <a:rPr lang="nl-BE" dirty="0" err="1" smtClean="0"/>
+              <a:t>frequently</a:t>
+            </a:r>
+            <a:r>
+              <a:rPr lang="nl-BE" dirty="0" smtClean="0"/>
+              <a:t> </a:t>
+            </a:r>
+            <a:r>
+              <a:rPr lang="nl-BE" dirty="0" err="1" smtClean="0"/>
+              <a:t>used</a:t>
+            </a:r>
+            <a:r>
+              <a:rPr lang="nl-BE" dirty="0" smtClean="0"/>
+              <a:t> git </a:t>
+            </a:r>
+            <a:r>
+              <a:rPr lang="nl-BE" dirty="0" err="1" smtClean="0"/>
+              <a:t>workflows</a:t>
+            </a:r>
+            <a:endParaRPr lang="nl-BE" dirty="0" smtClean="0"/>
+          </a:p>
+          <a:p>
+            <a:pPr lvl="1"/>
+            <a:r>
+              <a:rPr lang="en-US" dirty="0">
+                <a:hlinkClick r:id="rId5"/>
+              </a:rPr>
+              <a:t>https://</a:t>
+            </a:r>
+            <a:r>
+              <a:rPr lang="en-US" dirty="0" smtClean="0">
+                <a:hlinkClick r:id="rId5"/>
+              </a:rPr>
+              <a:t>www.atlassian.com/git/workflows</a:t>
+            </a:r>
+            <a:endParaRPr lang="nl-BE" dirty="0" smtClean="0"/>
+          </a:p>
+        </p:txBody>
+      </p:sp>
+      <p:sp>
+        <p:nvSpPr>
+          <p:cNvPr id="4" name="Slide Number Placeholder 3"/>
+          <p:cNvSpPr>
+            <a:spLocks noGrp="1"/>
+          </p:cNvSpPr>
+          <p:nvPr>
+            <p:ph type="sldNum" sz="quarter" idx="12"/>
+          </p:nvPr>
+        </p:nvSpPr>
+        <p:spPr/>
+        <p:txBody>
+          <a:bodyPr/>
+          <a:lstStyle/>
+          <a:p>
+            <a:fld id="{BB52A05A-A776-4391-ACD7-D6BC34D3145C}" type="slidenum">
+              <a:rPr lang="nl-BE" smtClean="0"/>
+              <a:t>51</a:t>
+            </a:fld>
+            <a:endParaRPr lang="nl-BE"/>
+          </a:p>
+        </p:txBody>
+      </p:sp>
+    </p:spTree>
+    <p:extLst>
+      <p:ext uri="{BB962C8B-B14F-4D97-AF65-F5344CB8AC3E}">
+        <p14:creationId xmlns:p14="http://schemas.microsoft.com/office/powerpoint/2010/main" val="2976133738"/>
+      </p:ext>
+    </p:extLst>
+  </p:cSld>
+  <p:clrMapOvr>
+    <a:masterClrMapping/>
+  </p:clrMapOvr>
+  <p:timing>
+    <p:tnLst>
+      <p:par>
+        <p:cTn id="1" dur="indefinite" restart="never" nodeType="tmRoot"/>
+      </p:par>
+    </p:tnLst>
+  </p:timing>
+</p:sld>
+</file>
+
+<file path=ppt/slides/slide52.xml><?xml version="1.0" encoding="utf-8"?>
+<p:sld xmlns:a="http://schemas.openxmlformats.org/drawingml/2006/main" xmlns:r="http://schemas.openxmlformats.org/officeDocument/2006/relationships" xmlns:p="http://schemas.openxmlformats.org/presentationml/2006/main">
+  <p:cSld>
+    <p:spTree>
+      <p:nvGrpSpPr>
+        <p:cNvPr id="1" name=""/>
+        <p:cNvGrpSpPr/>
+        <p:nvPr/>
+      </p:nvGrpSpPr>
+      <p:grpSpPr>
+        <a:xfrm>
+          <a:off x="0" y="0"/>
+          <a:ext cx="0" cy="0"/>
+          <a:chOff x="0" y="0"/>
+          <a:chExt cx="0" cy="0"/>
+        </a:xfrm>
+      </p:grpSpPr>
+      <p:sp>
+        <p:nvSpPr>
+          <p:cNvPr id="2" name="Title 1"/>
+          <p:cNvSpPr>
+            <a:spLocks noGrp="1"/>
+          </p:cNvSpPr>
+          <p:nvPr>
+            <p:ph type="title"/>
+          </p:nvPr>
+        </p:nvSpPr>
+        <p:spPr/>
+        <p:txBody>
+          <a:bodyPr/>
+          <a:lstStyle/>
+          <a:p>
+            <a:r>
               <a:rPr lang="en-US" dirty="0" smtClean="0"/>
               <a:t>Conclusions</a:t>
             </a:r>
@@ -34943,7 +35505,7 @@
           <a:p>
             <a:fld id="{BB52A05A-A776-4391-ACD7-D6BC34D3145C}" type="slidenum">
               <a:rPr lang="nl-BE" smtClean="0"/>
-              <a:t>51</a:t>
+              <a:t>52</a:t>
             </a:fld>
             <a:endParaRPr lang="nl-BE"/>
           </a:p>
@@ -35251,7 +35813,7 @@
 </p:sld>
 </file>
 
-<file path=ppt/slides/slide52.xml><?xml version="1.0" encoding="utf-8"?>
+<file path=ppt/slides/slide53.xml><?xml version="1.0" encoding="utf-8"?>
 <p:sld xmlns:a="http://schemas.openxmlformats.org/drawingml/2006/main" xmlns:r="http://schemas.openxmlformats.org/officeDocument/2006/relationships" xmlns:p="http://schemas.openxmlformats.org/presentationml/2006/main">
   <p:cSld>
     <p:spTree>
@@ -35545,7 +36107,7 @@
           <a:p>
             <a:fld id="{BB52A05A-A776-4391-ACD7-D6BC34D3145C}" type="slidenum">
               <a:rPr lang="nl-BE" smtClean="0"/>
-              <a:t>52</a:t>
+              <a:t>53</a:t>
             </a:fld>
             <a:endParaRPr lang="nl-BE"/>
           </a:p>

</xml_diff>

<commit_message>
Added slide on stashing
</commit_message>
<xml_diff>
--- a/LinuxTools/VersionControl/version_control_git.pptx
+++ b/LinuxTools/VersionControl/version_control_git.pptx
@@ -5,7 +5,7 @@
     <p:sldMasterId id="2147483648" r:id="rId1"/>
   </p:sldMasterIdLst>
   <p:notesMasterIdLst>
-    <p:notesMasterId r:id="rId55"/>
+    <p:notesMasterId r:id="rId56"/>
   </p:notesMasterIdLst>
   <p:sldIdLst>
     <p:sldId id="256" r:id="rId2"/>
@@ -55,12 +55,13 @@
     <p:sldId id="297" r:id="rId46"/>
     <p:sldId id="304" r:id="rId47"/>
     <p:sldId id="305" r:id="rId48"/>
-    <p:sldId id="307" r:id="rId49"/>
-    <p:sldId id="309" r:id="rId50"/>
-    <p:sldId id="300" r:id="rId51"/>
-    <p:sldId id="301" r:id="rId52"/>
-    <p:sldId id="299" r:id="rId53"/>
-    <p:sldId id="310" r:id="rId54"/>
+    <p:sldId id="312" r:id="rId49"/>
+    <p:sldId id="307" r:id="rId50"/>
+    <p:sldId id="309" r:id="rId51"/>
+    <p:sldId id="300" r:id="rId52"/>
+    <p:sldId id="301" r:id="rId53"/>
+    <p:sldId id="299" r:id="rId54"/>
+    <p:sldId id="310" r:id="rId55"/>
   </p:sldIdLst>
   <p:sldSz cx="9144000" cy="6858000" type="screen4x3"/>
   <p:notesSz cx="6858000" cy="9144000"/>
@@ -223,6 +224,7 @@
             <p14:sldId id="297"/>
             <p14:sldId id="304"/>
             <p14:sldId id="305"/>
+            <p14:sldId id="312"/>
             <p14:sldId id="307"/>
             <p14:sldId id="309"/>
           </p14:sldIdLst>
@@ -352,7 +354,7 @@
           <a:p>
             <a:fld id="{11D3E7B2-0861-45F0-B59E-BA867D5C805D}" type="datetimeFigureOut">
               <a:rPr lang="nl-BE" smtClean="0"/>
-              <a:t>15/06/2016</a:t>
+              <a:t>1/12/2016</a:t>
             </a:fld>
             <a:endParaRPr lang="nl-BE"/>
           </a:p>
@@ -685,7 +687,7 @@
           <a:p>
             <a:fld id="{1A571F42-F258-455F-A3F1-D2E86FDFEB4C}" type="slidenum">
               <a:rPr lang="nl-BE" smtClean="0"/>
-              <a:t>53</a:t>
+              <a:t>54</a:t>
             </a:fld>
             <a:endParaRPr lang="nl-BE"/>
           </a:p>
@@ -885,7 +887,7 @@
           <a:p>
             <a:fld id="{208C4982-2142-4DAC-808C-52C1A6ABA40A}" type="datetime1">
               <a:rPr lang="nl-BE" smtClean="0"/>
-              <a:t>15/06/2016</a:t>
+              <a:t>1/12/2016</a:t>
             </a:fld>
             <a:endParaRPr lang="nl-BE"/>
           </a:p>
@@ -1055,7 +1057,7 @@
           <a:p>
             <a:fld id="{596A4774-AA95-4CEA-9215-BE91EC5FD3A2}" type="datetime1">
               <a:rPr lang="nl-BE" smtClean="0"/>
-              <a:t>15/06/2016</a:t>
+              <a:t>1/12/2016</a:t>
             </a:fld>
             <a:endParaRPr lang="nl-BE"/>
           </a:p>
@@ -1235,7 +1237,7 @@
           <a:p>
             <a:fld id="{E3C938DE-9D5A-4A9D-B2A9-9053FBBA636A}" type="datetime1">
               <a:rPr lang="nl-BE" smtClean="0"/>
-              <a:t>15/06/2016</a:t>
+              <a:t>1/12/2016</a:t>
             </a:fld>
             <a:endParaRPr lang="nl-BE"/>
           </a:p>
@@ -1405,7 +1407,7 @@
           <a:p>
             <a:fld id="{70B73439-F632-4142-A813-39A8890A9414}" type="datetime1">
               <a:rPr lang="nl-BE" smtClean="0"/>
-              <a:t>15/06/2016</a:t>
+              <a:t>1/12/2016</a:t>
             </a:fld>
             <a:endParaRPr lang="nl-BE"/>
           </a:p>
@@ -1651,7 +1653,7 @@
           <a:p>
             <a:fld id="{2DA105E3-7574-4472-893A-A0C7A919BAE6}" type="datetime1">
               <a:rPr lang="nl-BE" smtClean="0"/>
-              <a:t>15/06/2016</a:t>
+              <a:t>1/12/2016</a:t>
             </a:fld>
             <a:endParaRPr lang="nl-BE"/>
           </a:p>
@@ -1939,7 +1941,7 @@
           <a:p>
             <a:fld id="{184B200F-AF61-4171-AE34-7A4B12E0FBA3}" type="datetime1">
               <a:rPr lang="nl-BE" smtClean="0"/>
-              <a:t>15/06/2016</a:t>
+              <a:t>1/12/2016</a:t>
             </a:fld>
             <a:endParaRPr lang="nl-BE"/>
           </a:p>
@@ -2361,7 +2363,7 @@
           <a:p>
             <a:fld id="{4DDD3743-DAF8-4465-AEC2-93735E02B3D0}" type="datetime1">
               <a:rPr lang="nl-BE" smtClean="0"/>
-              <a:t>15/06/2016</a:t>
+              <a:t>1/12/2016</a:t>
             </a:fld>
             <a:endParaRPr lang="nl-BE"/>
           </a:p>
@@ -2479,7 +2481,7 @@
           <a:p>
             <a:fld id="{0E48E2E9-C147-459B-ACCB-D6DDC51735D3}" type="datetime1">
               <a:rPr lang="nl-BE" smtClean="0"/>
-              <a:t>15/06/2016</a:t>
+              <a:t>1/12/2016</a:t>
             </a:fld>
             <a:endParaRPr lang="nl-BE"/>
           </a:p>
@@ -2574,7 +2576,7 @@
           <a:p>
             <a:fld id="{C92A24F5-0967-4B11-849A-0009476290B5}" type="datetime1">
               <a:rPr lang="nl-BE" smtClean="0"/>
-              <a:t>15/06/2016</a:t>
+              <a:t>1/12/2016</a:t>
             </a:fld>
             <a:endParaRPr lang="nl-BE"/>
           </a:p>
@@ -2851,7 +2853,7 @@
           <a:p>
             <a:fld id="{CAAB6B0C-E333-4316-A6EC-161EFC5CB4BD}" type="datetime1">
               <a:rPr lang="nl-BE" smtClean="0"/>
-              <a:t>15/06/2016</a:t>
+              <a:t>1/12/2016</a:t>
             </a:fld>
             <a:endParaRPr lang="nl-BE"/>
           </a:p>
@@ -3104,7 +3106,7 @@
           <a:p>
             <a:fld id="{5AC2428B-24E8-4004-8AB4-EA69DDAD1475}" type="datetime1">
               <a:rPr lang="nl-BE" smtClean="0"/>
-              <a:t>15/06/2016</a:t>
+              <a:t>1/12/2016</a:t>
             </a:fld>
             <a:endParaRPr lang="nl-BE"/>
           </a:p>
@@ -3317,7 +3319,7 @@
           <a:p>
             <a:fld id="{063E4CA3-87AF-44C9-B256-93720A95DFC3}" type="datetime1">
               <a:rPr lang="nl-BE" smtClean="0"/>
-              <a:t>15/06/2016</a:t>
+              <a:t>1/12/2016</a:t>
             </a:fld>
             <a:endParaRPr lang="nl-BE"/>
           </a:p>
@@ -33384,6 +33386,843 @@
           <a:p>
             <a:r>
               <a:rPr lang="en-US" dirty="0" smtClean="0"/>
+              <a:t>Stashing</a:t>
+            </a:r>
+            <a:endParaRPr lang="en-US" dirty="0"/>
+          </a:p>
+        </p:txBody>
+      </p:sp>
+      <p:sp>
+        <p:nvSpPr>
+          <p:cNvPr id="3" name="Content Placeholder 2"/>
+          <p:cNvSpPr>
+            <a:spLocks noGrp="1"/>
+          </p:cNvSpPr>
+          <p:nvPr>
+            <p:ph idx="1"/>
+          </p:nvPr>
+        </p:nvSpPr>
+        <p:spPr/>
+        <p:txBody>
+          <a:bodyPr>
+            <a:normAutofit fontScale="92500" lnSpcReduction="20000"/>
+          </a:bodyPr>
+          <a:lstStyle/>
+          <a:p>
+            <a:r>
+              <a:rPr lang="en-US" dirty="0" smtClean="0"/>
+              <a:t>Problem: branch contains modified, tracked files: can't checkout other branch</a:t>
+            </a:r>
+          </a:p>
+          <a:p>
+            <a:r>
+              <a:rPr lang="en-US" dirty="0" smtClean="0"/>
+              <a:t>Solution: stash</a:t>
+            </a:r>
+          </a:p>
+          <a:p>
+            <a:pPr lvl="1"/>
+            <a:r>
+              <a:rPr lang="en-US" dirty="0" smtClean="0"/>
+              <a:t>stash changes in my-original-branch</a:t>
+            </a:r>
+          </a:p>
+          <a:p>
+            <a:pPr lvl="1"/>
+            <a:endParaRPr lang="en-US" dirty="0"/>
+          </a:p>
+          <a:p>
+            <a:pPr lvl="1"/>
+            <a:r>
+              <a:rPr lang="en-US" dirty="0" smtClean="0"/>
+              <a:t>checkout other branch</a:t>
+            </a:r>
+          </a:p>
+          <a:p>
+            <a:pPr lvl="1"/>
+            <a:endParaRPr lang="en-US" dirty="0"/>
+          </a:p>
+          <a:p>
+            <a:pPr lvl="1"/>
+            <a:r>
+              <a:rPr lang="en-US" dirty="0" smtClean="0"/>
+              <a:t>do work</a:t>
+            </a:r>
+          </a:p>
+          <a:p>
+            <a:pPr lvl="1"/>
+            <a:r>
+              <a:rPr lang="en-US" dirty="0" smtClean="0"/>
+              <a:t>checkout original branch</a:t>
+            </a:r>
+          </a:p>
+          <a:p>
+            <a:pPr lvl="1"/>
+            <a:endParaRPr lang="en-US" dirty="0"/>
+          </a:p>
+          <a:p>
+            <a:pPr lvl="1"/>
+            <a:r>
+              <a:rPr lang="en-US" dirty="0" err="1" smtClean="0"/>
+              <a:t>unstash</a:t>
+            </a:r>
+            <a:endParaRPr lang="en-US" dirty="0"/>
+          </a:p>
+        </p:txBody>
+      </p:sp>
+      <p:sp>
+        <p:nvSpPr>
+          <p:cNvPr id="4" name="Slide Number Placeholder 3"/>
+          <p:cNvSpPr>
+            <a:spLocks noGrp="1"/>
+          </p:cNvSpPr>
+          <p:nvPr>
+            <p:ph type="sldNum" sz="quarter" idx="12"/>
+          </p:nvPr>
+        </p:nvSpPr>
+        <p:spPr/>
+        <p:txBody>
+          <a:bodyPr/>
+          <a:lstStyle/>
+          <a:p>
+            <a:fld id="{BB52A05A-A776-4391-ACD7-D6BC34D3145C}" type="slidenum">
+              <a:rPr lang="nl-BE" smtClean="0"/>
+              <a:t>48</a:t>
+            </a:fld>
+            <a:endParaRPr lang="nl-BE"/>
+          </a:p>
+        </p:txBody>
+      </p:sp>
+      <p:sp>
+        <p:nvSpPr>
+          <p:cNvPr id="6" name="TextBox 5"/>
+          <p:cNvSpPr txBox="1"/>
+          <p:nvPr/>
+        </p:nvSpPr>
+        <p:spPr>
+          <a:xfrm>
+            <a:off x="1416224" y="4077072"/>
+            <a:ext cx="4883968" cy="369332"/>
+          </a:xfrm>
+          <a:prstGeom prst="rect">
+            <a:avLst/>
+          </a:prstGeom>
+          <a:noFill/>
+          <a:ln>
+            <a:solidFill>
+              <a:schemeClr val="tx1"/>
+            </a:solidFill>
+          </a:ln>
+        </p:spPr>
+        <p:txBody>
+          <a:bodyPr wrap="square" rtlCol="0">
+            <a:spAutoFit/>
+          </a:bodyPr>
+          <a:lstStyle/>
+          <a:p>
+            <a:r>
+              <a:rPr lang="nl-BE" dirty="0" smtClean="0">
+                <a:latin typeface="Courier New" pitchFamily="49" charset="0"/>
+                <a:cs typeface="Courier New" pitchFamily="49" charset="0"/>
+              </a:rPr>
+              <a:t>$ git </a:t>
+            </a:r>
+            <a:r>
+              <a:rPr lang="nl-BE" dirty="0" smtClean="0">
+                <a:latin typeface="Courier New" pitchFamily="49" charset="0"/>
+                <a:cs typeface="Courier New" pitchFamily="49" charset="0"/>
+              </a:rPr>
+              <a:t>checkout some-other-branch</a:t>
+            </a:r>
+            <a:endParaRPr lang="nl-BE" dirty="0" smtClean="0">
+              <a:latin typeface="Courier New" pitchFamily="49" charset="0"/>
+              <a:cs typeface="Courier New" pitchFamily="49" charset="0"/>
+            </a:endParaRPr>
+          </a:p>
+        </p:txBody>
+      </p:sp>
+      <p:sp>
+        <p:nvSpPr>
+          <p:cNvPr id="7" name="TextBox 6"/>
+          <p:cNvSpPr txBox="1"/>
+          <p:nvPr/>
+        </p:nvSpPr>
+        <p:spPr>
+          <a:xfrm>
+            <a:off x="1446134" y="5229200"/>
+            <a:ext cx="4883968" cy="369332"/>
+          </a:xfrm>
+          <a:prstGeom prst="rect">
+            <a:avLst/>
+          </a:prstGeom>
+          <a:noFill/>
+          <a:ln>
+            <a:solidFill>
+              <a:schemeClr val="tx1"/>
+            </a:solidFill>
+          </a:ln>
+        </p:spPr>
+        <p:txBody>
+          <a:bodyPr wrap="square" rtlCol="0">
+            <a:spAutoFit/>
+          </a:bodyPr>
+          <a:lstStyle/>
+          <a:p>
+            <a:r>
+              <a:rPr lang="nl-BE" dirty="0" smtClean="0">
+                <a:latin typeface="Courier New" pitchFamily="49" charset="0"/>
+                <a:cs typeface="Courier New" pitchFamily="49" charset="0"/>
+              </a:rPr>
+              <a:t>$ git </a:t>
+            </a:r>
+            <a:r>
+              <a:rPr lang="nl-BE" dirty="0" smtClean="0">
+                <a:latin typeface="Courier New" pitchFamily="49" charset="0"/>
+                <a:cs typeface="Courier New" pitchFamily="49" charset="0"/>
+              </a:rPr>
+              <a:t>checkout my-original-branch</a:t>
+            </a:r>
+            <a:endParaRPr lang="nl-BE" dirty="0" smtClean="0">
+              <a:latin typeface="Courier New" pitchFamily="49" charset="0"/>
+              <a:cs typeface="Courier New" pitchFamily="49" charset="0"/>
+            </a:endParaRPr>
+          </a:p>
+        </p:txBody>
+      </p:sp>
+      <p:sp>
+        <p:nvSpPr>
+          <p:cNvPr id="8" name="TextBox 7"/>
+          <p:cNvSpPr txBox="1"/>
+          <p:nvPr/>
+        </p:nvSpPr>
+        <p:spPr>
+          <a:xfrm>
+            <a:off x="1446134" y="6056591"/>
+            <a:ext cx="4883968" cy="369332"/>
+          </a:xfrm>
+          <a:prstGeom prst="rect">
+            <a:avLst/>
+          </a:prstGeom>
+          <a:noFill/>
+          <a:ln>
+            <a:solidFill>
+              <a:schemeClr val="tx1"/>
+            </a:solidFill>
+          </a:ln>
+        </p:spPr>
+        <p:txBody>
+          <a:bodyPr wrap="square" rtlCol="0">
+            <a:spAutoFit/>
+          </a:bodyPr>
+          <a:lstStyle/>
+          <a:p>
+            <a:r>
+              <a:rPr lang="nl-BE" dirty="0" smtClean="0">
+                <a:latin typeface="Courier New" pitchFamily="49" charset="0"/>
+                <a:cs typeface="Courier New" pitchFamily="49" charset="0"/>
+              </a:rPr>
+              <a:t>$ git </a:t>
+            </a:r>
+            <a:r>
+              <a:rPr lang="nl-BE" dirty="0" smtClean="0">
+                <a:latin typeface="Courier New" pitchFamily="49" charset="0"/>
+                <a:cs typeface="Courier New" pitchFamily="49" charset="0"/>
+              </a:rPr>
+              <a:t>stash pop</a:t>
+            </a:r>
+            <a:endParaRPr lang="nl-BE" dirty="0" smtClean="0">
+              <a:latin typeface="Courier New" pitchFamily="49" charset="0"/>
+              <a:cs typeface="Courier New" pitchFamily="49" charset="0"/>
+            </a:endParaRPr>
+          </a:p>
+        </p:txBody>
+      </p:sp>
+      <p:sp>
+        <p:nvSpPr>
+          <p:cNvPr id="9" name="TextBox 8"/>
+          <p:cNvSpPr txBox="1"/>
+          <p:nvPr/>
+        </p:nvSpPr>
+        <p:spPr>
+          <a:xfrm>
+            <a:off x="1416224" y="3262956"/>
+            <a:ext cx="4883968" cy="369332"/>
+          </a:xfrm>
+          <a:prstGeom prst="rect">
+            <a:avLst/>
+          </a:prstGeom>
+          <a:noFill/>
+          <a:ln>
+            <a:solidFill>
+              <a:schemeClr val="tx1"/>
+            </a:solidFill>
+          </a:ln>
+        </p:spPr>
+        <p:txBody>
+          <a:bodyPr wrap="square" rtlCol="0">
+            <a:spAutoFit/>
+          </a:bodyPr>
+          <a:lstStyle/>
+          <a:p>
+            <a:r>
+              <a:rPr lang="nl-BE" dirty="0" smtClean="0">
+                <a:latin typeface="Courier New" pitchFamily="49" charset="0"/>
+                <a:cs typeface="Courier New" pitchFamily="49" charset="0"/>
+              </a:rPr>
+              <a:t>$ git </a:t>
+            </a:r>
+            <a:r>
+              <a:rPr lang="nl-BE" dirty="0" smtClean="0">
+                <a:latin typeface="Courier New" pitchFamily="49" charset="0"/>
+                <a:cs typeface="Courier New" pitchFamily="49" charset="0"/>
+              </a:rPr>
+              <a:t>stash</a:t>
+            </a:r>
+            <a:endParaRPr lang="nl-BE" dirty="0" smtClean="0">
+              <a:latin typeface="Courier New" pitchFamily="49" charset="0"/>
+              <a:cs typeface="Courier New" pitchFamily="49" charset="0"/>
+            </a:endParaRPr>
+          </a:p>
+        </p:txBody>
+      </p:sp>
+    </p:spTree>
+    <p:extLst>
+      <p:ext uri="{BB962C8B-B14F-4D97-AF65-F5344CB8AC3E}">
+        <p14:creationId xmlns:p14="http://schemas.microsoft.com/office/powerpoint/2010/main" val="2247031093"/>
+      </p:ext>
+    </p:extLst>
+  </p:cSld>
+  <p:clrMapOvr>
+    <a:masterClrMapping/>
+  </p:clrMapOvr>
+  <p:timing>
+    <p:tnLst>
+      <p:par>
+        <p:cTn id="1" dur="indefinite" restart="never" nodeType="tmRoot">
+          <p:childTnLst>
+            <p:seq concurrent="1" nextAc="seek">
+              <p:cTn id="2" dur="indefinite" nodeType="mainSeq">
+                <p:childTnLst>
+                  <p:par>
+                    <p:cTn id="3" fill="hold">
+                      <p:stCondLst>
+                        <p:cond delay="indefinite"/>
+                        <p:cond evt="onBegin" delay="0">
+                          <p:tn val="2"/>
+                        </p:cond>
+                      </p:stCondLst>
+                      <p:childTnLst>
+                        <p:par>
+                          <p:cTn id="4" fill="hold">
+                            <p:stCondLst>
+                              <p:cond delay="0"/>
+                            </p:stCondLst>
+                            <p:childTnLst>
+                              <p:par>
+                                <p:cTn id="5" presetID="1" presetClass="entr" presetSubtype="0" fill="hold" grpId="0" nodeType="withEffect">
+                                  <p:stCondLst>
+                                    <p:cond delay="0"/>
+                                  </p:stCondLst>
+                                  <p:childTnLst>
+                                    <p:set>
+                                      <p:cBhvr>
+                                        <p:cTn id="6" dur="1" fill="hold">
+                                          <p:stCondLst>
+                                            <p:cond delay="0"/>
+                                          </p:stCondLst>
+                                        </p:cTn>
+                                        <p:tgtEl>
+                                          <p:spTgt spid="3">
+                                            <p:txEl>
+                                              <p:pRg st="0" end="0"/>
+                                            </p:txEl>
+                                          </p:spTgt>
+                                        </p:tgtEl>
+                                        <p:attrNameLst>
+                                          <p:attrName>style.visibility</p:attrName>
+                                        </p:attrNameLst>
+                                      </p:cBhvr>
+                                      <p:to>
+                                        <p:strVal val="visible"/>
+                                      </p:to>
+                                    </p:set>
+                                  </p:childTnLst>
+                                </p:cTn>
+                              </p:par>
+                            </p:childTnLst>
+                          </p:cTn>
+                        </p:par>
+                      </p:childTnLst>
+                    </p:cTn>
+                  </p:par>
+                  <p:par>
+                    <p:cTn id="7" fill="hold">
+                      <p:stCondLst>
+                        <p:cond delay="indefinite"/>
+                      </p:stCondLst>
+                      <p:childTnLst>
+                        <p:par>
+                          <p:cTn id="8" fill="hold">
+                            <p:stCondLst>
+                              <p:cond delay="0"/>
+                            </p:stCondLst>
+                            <p:childTnLst>
+                              <p:par>
+                                <p:cTn id="9" presetID="1" presetClass="entr" presetSubtype="0" fill="hold" grpId="0" nodeType="clickEffect">
+                                  <p:stCondLst>
+                                    <p:cond delay="0"/>
+                                  </p:stCondLst>
+                                  <p:childTnLst>
+                                    <p:set>
+                                      <p:cBhvr>
+                                        <p:cTn id="10" dur="1" fill="hold">
+                                          <p:stCondLst>
+                                            <p:cond delay="0"/>
+                                          </p:stCondLst>
+                                        </p:cTn>
+                                        <p:tgtEl>
+                                          <p:spTgt spid="3">
+                                            <p:txEl>
+                                              <p:pRg st="1" end="1"/>
+                                            </p:txEl>
+                                          </p:spTgt>
+                                        </p:tgtEl>
+                                        <p:attrNameLst>
+                                          <p:attrName>style.visibility</p:attrName>
+                                        </p:attrNameLst>
+                                      </p:cBhvr>
+                                      <p:to>
+                                        <p:strVal val="visible"/>
+                                      </p:to>
+                                    </p:set>
+                                  </p:childTnLst>
+                                </p:cTn>
+                              </p:par>
+                            </p:childTnLst>
+                          </p:cTn>
+                        </p:par>
+                      </p:childTnLst>
+                    </p:cTn>
+                  </p:par>
+                  <p:par>
+                    <p:cTn id="11" fill="hold">
+                      <p:stCondLst>
+                        <p:cond delay="indefinite"/>
+                      </p:stCondLst>
+                      <p:childTnLst>
+                        <p:par>
+                          <p:cTn id="12" fill="hold">
+                            <p:stCondLst>
+                              <p:cond delay="0"/>
+                            </p:stCondLst>
+                            <p:childTnLst>
+                              <p:par>
+                                <p:cTn id="13" presetID="1" presetClass="entr" presetSubtype="0" fill="hold" grpId="0" nodeType="clickEffect">
+                                  <p:stCondLst>
+                                    <p:cond delay="0"/>
+                                  </p:stCondLst>
+                                  <p:childTnLst>
+                                    <p:set>
+                                      <p:cBhvr>
+                                        <p:cTn id="14" dur="1" fill="hold">
+                                          <p:stCondLst>
+                                            <p:cond delay="0"/>
+                                          </p:stCondLst>
+                                        </p:cTn>
+                                        <p:tgtEl>
+                                          <p:spTgt spid="3">
+                                            <p:txEl>
+                                              <p:pRg st="2" end="2"/>
+                                            </p:txEl>
+                                          </p:spTgt>
+                                        </p:tgtEl>
+                                        <p:attrNameLst>
+                                          <p:attrName>style.visibility</p:attrName>
+                                        </p:attrNameLst>
+                                      </p:cBhvr>
+                                      <p:to>
+                                        <p:strVal val="visible"/>
+                                      </p:to>
+                                    </p:set>
+                                  </p:childTnLst>
+                                </p:cTn>
+                              </p:par>
+                              <p:par>
+                                <p:cTn id="15" presetID="1" presetClass="entr" presetSubtype="0" fill="hold" grpId="0" nodeType="withEffect">
+                                  <p:stCondLst>
+                                    <p:cond delay="0"/>
+                                  </p:stCondLst>
+                                  <p:childTnLst>
+                                    <p:set>
+                                      <p:cBhvr>
+                                        <p:cTn id="16" dur="1" fill="hold">
+                                          <p:stCondLst>
+                                            <p:cond delay="0"/>
+                                          </p:stCondLst>
+                                        </p:cTn>
+                                        <p:tgtEl>
+                                          <p:spTgt spid="9"/>
+                                        </p:tgtEl>
+                                        <p:attrNameLst>
+                                          <p:attrName>style.visibility</p:attrName>
+                                        </p:attrNameLst>
+                                      </p:cBhvr>
+                                      <p:to>
+                                        <p:strVal val="visible"/>
+                                      </p:to>
+                                    </p:set>
+                                  </p:childTnLst>
+                                </p:cTn>
+                              </p:par>
+                            </p:childTnLst>
+                          </p:cTn>
+                        </p:par>
+                      </p:childTnLst>
+                    </p:cTn>
+                  </p:par>
+                  <p:par>
+                    <p:cTn id="17" fill="hold">
+                      <p:stCondLst>
+                        <p:cond delay="indefinite"/>
+                      </p:stCondLst>
+                      <p:childTnLst>
+                        <p:par>
+                          <p:cTn id="18" fill="hold">
+                            <p:stCondLst>
+                              <p:cond delay="0"/>
+                            </p:stCondLst>
+                            <p:childTnLst>
+                              <p:par>
+                                <p:cTn id="19" presetID="1" presetClass="entr" presetSubtype="0" fill="hold" grpId="0" nodeType="clickEffect">
+                                  <p:stCondLst>
+                                    <p:cond delay="0"/>
+                                  </p:stCondLst>
+                                  <p:childTnLst>
+                                    <p:set>
+                                      <p:cBhvr>
+                                        <p:cTn id="20" dur="1" fill="hold">
+                                          <p:stCondLst>
+                                            <p:cond delay="0"/>
+                                          </p:stCondLst>
+                                        </p:cTn>
+                                        <p:tgtEl>
+                                          <p:spTgt spid="3">
+                                            <p:txEl>
+                                              <p:pRg st="4" end="4"/>
+                                            </p:txEl>
+                                          </p:spTgt>
+                                        </p:tgtEl>
+                                        <p:attrNameLst>
+                                          <p:attrName>style.visibility</p:attrName>
+                                        </p:attrNameLst>
+                                      </p:cBhvr>
+                                      <p:to>
+                                        <p:strVal val="visible"/>
+                                      </p:to>
+                                    </p:set>
+                                  </p:childTnLst>
+                                </p:cTn>
+                              </p:par>
+                              <p:par>
+                                <p:cTn id="21" presetID="1" presetClass="entr" presetSubtype="0" fill="hold" grpId="0" nodeType="withEffect">
+                                  <p:stCondLst>
+                                    <p:cond delay="0"/>
+                                  </p:stCondLst>
+                                  <p:childTnLst>
+                                    <p:set>
+                                      <p:cBhvr>
+                                        <p:cTn id="22" dur="1" fill="hold">
+                                          <p:stCondLst>
+                                            <p:cond delay="0"/>
+                                          </p:stCondLst>
+                                        </p:cTn>
+                                        <p:tgtEl>
+                                          <p:spTgt spid="6"/>
+                                        </p:tgtEl>
+                                        <p:attrNameLst>
+                                          <p:attrName>style.visibility</p:attrName>
+                                        </p:attrNameLst>
+                                      </p:cBhvr>
+                                      <p:to>
+                                        <p:strVal val="visible"/>
+                                      </p:to>
+                                    </p:set>
+                                  </p:childTnLst>
+                                </p:cTn>
+                              </p:par>
+                            </p:childTnLst>
+                          </p:cTn>
+                        </p:par>
+                      </p:childTnLst>
+                    </p:cTn>
+                  </p:par>
+                  <p:par>
+                    <p:cTn id="23" fill="hold">
+                      <p:stCondLst>
+                        <p:cond delay="indefinite"/>
+                      </p:stCondLst>
+                      <p:childTnLst>
+                        <p:par>
+                          <p:cTn id="24" fill="hold">
+                            <p:stCondLst>
+                              <p:cond delay="0"/>
+                            </p:stCondLst>
+                            <p:childTnLst>
+                              <p:par>
+                                <p:cTn id="25" presetID="1" presetClass="entr" presetSubtype="0" fill="hold" grpId="0" nodeType="clickEffect">
+                                  <p:stCondLst>
+                                    <p:cond delay="0"/>
+                                  </p:stCondLst>
+                                  <p:childTnLst>
+                                    <p:set>
+                                      <p:cBhvr>
+                                        <p:cTn id="26" dur="1" fill="hold">
+                                          <p:stCondLst>
+                                            <p:cond delay="0"/>
+                                          </p:stCondLst>
+                                        </p:cTn>
+                                        <p:tgtEl>
+                                          <p:spTgt spid="3">
+                                            <p:txEl>
+                                              <p:pRg st="6" end="6"/>
+                                            </p:txEl>
+                                          </p:spTgt>
+                                        </p:tgtEl>
+                                        <p:attrNameLst>
+                                          <p:attrName>style.visibility</p:attrName>
+                                        </p:attrNameLst>
+                                      </p:cBhvr>
+                                      <p:to>
+                                        <p:strVal val="visible"/>
+                                      </p:to>
+                                    </p:set>
+                                  </p:childTnLst>
+                                </p:cTn>
+                              </p:par>
+                            </p:childTnLst>
+                          </p:cTn>
+                        </p:par>
+                      </p:childTnLst>
+                    </p:cTn>
+                  </p:par>
+                  <p:par>
+                    <p:cTn id="27" fill="hold">
+                      <p:stCondLst>
+                        <p:cond delay="indefinite"/>
+                      </p:stCondLst>
+                      <p:childTnLst>
+                        <p:par>
+                          <p:cTn id="28" fill="hold">
+                            <p:stCondLst>
+                              <p:cond delay="0"/>
+                            </p:stCondLst>
+                            <p:childTnLst>
+                              <p:par>
+                                <p:cTn id="29" presetID="1" presetClass="entr" presetSubtype="0" fill="hold" grpId="0" nodeType="clickEffect">
+                                  <p:stCondLst>
+                                    <p:cond delay="0"/>
+                                  </p:stCondLst>
+                                  <p:childTnLst>
+                                    <p:set>
+                                      <p:cBhvr>
+                                        <p:cTn id="30" dur="1" fill="hold">
+                                          <p:stCondLst>
+                                            <p:cond delay="0"/>
+                                          </p:stCondLst>
+                                        </p:cTn>
+                                        <p:tgtEl>
+                                          <p:spTgt spid="3">
+                                            <p:txEl>
+                                              <p:pRg st="7" end="7"/>
+                                            </p:txEl>
+                                          </p:spTgt>
+                                        </p:tgtEl>
+                                        <p:attrNameLst>
+                                          <p:attrName>style.visibility</p:attrName>
+                                        </p:attrNameLst>
+                                      </p:cBhvr>
+                                      <p:to>
+                                        <p:strVal val="visible"/>
+                                      </p:to>
+                                    </p:set>
+                                  </p:childTnLst>
+                                </p:cTn>
+                              </p:par>
+                              <p:par>
+                                <p:cTn id="31" presetID="1" presetClass="entr" presetSubtype="0" fill="hold" grpId="0" nodeType="withEffect">
+                                  <p:stCondLst>
+                                    <p:cond delay="0"/>
+                                  </p:stCondLst>
+                                  <p:childTnLst>
+                                    <p:set>
+                                      <p:cBhvr>
+                                        <p:cTn id="32" dur="1" fill="hold">
+                                          <p:stCondLst>
+                                            <p:cond delay="0"/>
+                                          </p:stCondLst>
+                                        </p:cTn>
+                                        <p:tgtEl>
+                                          <p:spTgt spid="7"/>
+                                        </p:tgtEl>
+                                        <p:attrNameLst>
+                                          <p:attrName>style.visibility</p:attrName>
+                                        </p:attrNameLst>
+                                      </p:cBhvr>
+                                      <p:to>
+                                        <p:strVal val="visible"/>
+                                      </p:to>
+                                    </p:set>
+                                  </p:childTnLst>
+                                </p:cTn>
+                              </p:par>
+                            </p:childTnLst>
+                          </p:cTn>
+                        </p:par>
+                      </p:childTnLst>
+                    </p:cTn>
+                  </p:par>
+                  <p:par>
+                    <p:cTn id="33" fill="hold">
+                      <p:stCondLst>
+                        <p:cond delay="indefinite"/>
+                      </p:stCondLst>
+                      <p:childTnLst>
+                        <p:par>
+                          <p:cTn id="34" fill="hold">
+                            <p:stCondLst>
+                              <p:cond delay="0"/>
+                            </p:stCondLst>
+                            <p:childTnLst>
+                              <p:par>
+                                <p:cTn id="35" presetID="1" presetClass="entr" presetSubtype="0" fill="hold" grpId="0" nodeType="clickEffect">
+                                  <p:stCondLst>
+                                    <p:cond delay="0"/>
+                                  </p:stCondLst>
+                                  <p:childTnLst>
+                                    <p:set>
+                                      <p:cBhvr>
+                                        <p:cTn id="36" dur="1" fill="hold">
+                                          <p:stCondLst>
+                                            <p:cond delay="0"/>
+                                          </p:stCondLst>
+                                        </p:cTn>
+                                        <p:tgtEl>
+                                          <p:spTgt spid="3">
+                                            <p:txEl>
+                                              <p:pRg st="9" end="9"/>
+                                            </p:txEl>
+                                          </p:spTgt>
+                                        </p:tgtEl>
+                                        <p:attrNameLst>
+                                          <p:attrName>style.visibility</p:attrName>
+                                        </p:attrNameLst>
+                                      </p:cBhvr>
+                                      <p:to>
+                                        <p:strVal val="visible"/>
+                                      </p:to>
+                                    </p:set>
+                                  </p:childTnLst>
+                                </p:cTn>
+                              </p:par>
+                              <p:par>
+                                <p:cTn id="37" presetID="1" presetClass="entr" presetSubtype="0" fill="hold" grpId="0" nodeType="withEffect">
+                                  <p:stCondLst>
+                                    <p:cond delay="0"/>
+                                  </p:stCondLst>
+                                  <p:childTnLst>
+                                    <p:set>
+                                      <p:cBhvr>
+                                        <p:cTn id="38" dur="1" fill="hold">
+                                          <p:stCondLst>
+                                            <p:cond delay="0"/>
+                                          </p:stCondLst>
+                                        </p:cTn>
+                                        <p:tgtEl>
+                                          <p:spTgt spid="8"/>
+                                        </p:tgtEl>
+                                        <p:attrNameLst>
+                                          <p:attrName>style.visibility</p:attrName>
+                                        </p:attrNameLst>
+                                      </p:cBhvr>
+                                      <p:to>
+                                        <p:strVal val="visible"/>
+                                      </p:to>
+                                    </p:set>
+                                  </p:childTnLst>
+                                </p:cTn>
+                              </p:par>
+                            </p:childTnLst>
+                          </p:cTn>
+                        </p:par>
+                      </p:childTnLst>
+                    </p:cTn>
+                  </p:par>
+                </p:childTnLst>
+              </p:cTn>
+              <p:prevCondLst>
+                <p:cond evt="onPrev" delay="0">
+                  <p:tgtEl>
+                    <p:sldTgt/>
+                  </p:tgtEl>
+                </p:cond>
+              </p:prevCondLst>
+              <p:nextCondLst>
+                <p:cond evt="onNext" delay="0">
+                  <p:tgtEl>
+                    <p:sldTgt/>
+                  </p:tgtEl>
+                </p:cond>
+              </p:nextCondLst>
+            </p:seq>
+          </p:childTnLst>
+        </p:cTn>
+      </p:par>
+    </p:tnLst>
+    <p:bldLst>
+      <p:bldP spid="3" grpId="0" uiExpand="1" build="p" bldLvl="2"/>
+      <p:bldP spid="6" grpId="0" animBg="1"/>
+      <p:bldP spid="7" grpId="0" animBg="1"/>
+      <p:bldP spid="8" grpId="0" animBg="1"/>
+      <p:bldP spid="9" grpId="0" animBg="1"/>
+    </p:bldLst>
+  </p:timing>
+</p:sld>
+</file>
+
+<file path=ppt/slides/slide49.xml><?xml version="1.0" encoding="utf-8"?>
+<p:sld xmlns:a="http://schemas.openxmlformats.org/drawingml/2006/main" xmlns:r="http://schemas.openxmlformats.org/officeDocument/2006/relationships" xmlns:p="http://schemas.openxmlformats.org/presentationml/2006/main">
+  <p:cSld>
+    <p:spTree>
+      <p:nvGrpSpPr>
+        <p:cNvPr id="1" name=""/>
+        <p:cNvGrpSpPr/>
+        <p:nvPr/>
+      </p:nvGrpSpPr>
+      <p:grpSpPr>
+        <a:xfrm>
+          <a:off x="0" y="0"/>
+          <a:ext cx="0" cy="0"/>
+          <a:chOff x="0" y="0"/>
+          <a:chExt cx="0" cy="0"/>
+        </a:xfrm>
+      </p:grpSpPr>
+      <p:sp>
+        <p:nvSpPr>
+          <p:cNvPr id="2" name="Title 1"/>
+          <p:cNvSpPr>
+            <a:spLocks noGrp="1"/>
+          </p:cNvSpPr>
+          <p:nvPr>
+            <p:ph type="title"/>
+          </p:nvPr>
+        </p:nvSpPr>
+        <p:spPr/>
+        <p:txBody>
+          <a:bodyPr/>
+          <a:lstStyle/>
+          <a:p>
+            <a:r>
+              <a:rPr lang="en-US" dirty="0" smtClean="0"/>
               <a:t>And even more…</a:t>
             </a:r>
             <a:endParaRPr lang="nl-BE" dirty="0"/>
@@ -33416,16 +34255,11 @@
           <a:p>
             <a:r>
               <a:rPr lang="en-US" dirty="0" smtClean="0"/>
-              <a:t>Stashing non-committed staged changes</a:t>
-            </a:r>
-          </a:p>
-          <a:p>
-            <a:endParaRPr lang="en-US" dirty="0"/>
-          </a:p>
-          <a:p>
+              <a:t>Micro-managing </a:t>
+            </a:r>
             <a:r>
               <a:rPr lang="en-US" dirty="0" smtClean="0"/>
-              <a:t>Micro-managing commits/merges</a:t>
+              <a:t>commits/merges</a:t>
             </a:r>
           </a:p>
           <a:p>
@@ -33492,13 +34326,13 @@
       </p:sp>
       <p:sp>
         <p:nvSpPr>
-          <p:cNvPr id="5" name="TextBox 4"/>
+          <p:cNvPr id="6" name="TextBox 5"/>
           <p:cNvSpPr txBox="1"/>
           <p:nvPr/>
         </p:nvSpPr>
         <p:spPr>
           <a:xfrm>
-            <a:off x="683568" y="3356992"/>
+            <a:off x="687597" y="3423705"/>
             <a:ext cx="3600400" cy="369332"/>
           </a:xfrm>
           <a:prstGeom prst="rect">
@@ -33522,43 +34356,6 @@
                 <a:latin typeface="Courier New" pitchFamily="49" charset="0"/>
                 <a:cs typeface="Courier New" pitchFamily="49" charset="0"/>
               </a:rPr>
-              <a:t>$ git stash  …</a:t>
-            </a:r>
-          </a:p>
-        </p:txBody>
-      </p:sp>
-      <p:sp>
-        <p:nvSpPr>
-          <p:cNvPr id="6" name="TextBox 5"/>
-          <p:cNvSpPr txBox="1"/>
-          <p:nvPr/>
-        </p:nvSpPr>
-        <p:spPr>
-          <a:xfrm>
-            <a:off x="683568" y="4509120"/>
-            <a:ext cx="3600400" cy="369332"/>
-          </a:xfrm>
-          <a:prstGeom prst="rect">
-            <a:avLst/>
-          </a:prstGeom>
-          <a:noFill/>
-          <a:ln>
-            <a:solidFill>
-              <a:schemeClr val="tx1"/>
-            </a:solidFill>
-          </a:ln>
-        </p:spPr>
-        <p:txBody>
-          <a:bodyPr wrap="square" rtlCol="0">
-            <a:spAutoFit/>
-          </a:bodyPr>
-          <a:lstStyle/>
-          <a:p>
-            <a:r>
-              <a:rPr lang="nl-BE" dirty="0" smtClean="0">
-                <a:latin typeface="Courier New" pitchFamily="49" charset="0"/>
-                <a:cs typeface="Courier New" pitchFamily="49" charset="0"/>
-              </a:rPr>
               <a:t>$ git </a:t>
             </a:r>
             <a:r>
@@ -33586,7 +34383,7 @@
         </p:nvSpPr>
         <p:spPr>
           <a:xfrm>
-            <a:off x="683568" y="5678500"/>
+            <a:off x="683568" y="4580263"/>
             <a:ext cx="6552728" cy="369332"/>
           </a:xfrm>
           <a:prstGeom prst="rect">
@@ -33648,7 +34445,7 @@
         </p:nvSpPr>
         <p:spPr>
           <a:xfrm>
-            <a:off x="683568" y="6237312"/>
+            <a:off x="683568" y="5139075"/>
             <a:ext cx="6552728" cy="369332"/>
           </a:xfrm>
           <a:prstGeom prst="rect">
@@ -33724,13 +34521,15 @@
         </p:nvSpPr>
         <p:spPr>
           <a:xfrm>
-            <a:off x="6952523" y="5157192"/>
+            <a:off x="7078065" y="5367489"/>
             <a:ext cx="1723933" cy="369332"/>
           </a:xfrm>
           <a:prstGeom prst="rect">
             <a:avLst/>
           </a:prstGeom>
-          <a:noFill/>
+          <a:solidFill>
+            <a:schemeClr val="bg1"/>
+          </a:solidFill>
           <a:ln>
             <a:solidFill>
               <a:schemeClr val="tx1"/>
@@ -33759,7 +34558,7 @@
         </p:nvSpPr>
         <p:spPr>
           <a:xfrm>
-            <a:off x="4355976" y="4509120"/>
+            <a:off x="4360005" y="3423705"/>
             <a:ext cx="4557192" cy="369332"/>
           </a:xfrm>
           <a:prstGeom prst="rect">
@@ -33826,7 +34625,7 @@
           <a:p>
             <a:fld id="{BB52A05A-A776-4391-ACD7-D6BC34D3145C}" type="slidenum">
               <a:rPr lang="nl-BE" smtClean="0"/>
-              <a:t>48</a:t>
+              <a:t>49</a:t>
             </a:fld>
             <a:endParaRPr lang="nl-BE"/>
           </a:p>
@@ -33986,7 +34785,34 @@
                                           </p:stCondLst>
                                         </p:cTn>
                                         <p:tgtEl>
-                                          <p:spTgt spid="5"/>
+                                          <p:spTgt spid="6"/>
+                                        </p:tgtEl>
+                                        <p:attrNameLst>
+                                          <p:attrName>style.visibility</p:attrName>
+                                        </p:attrNameLst>
+                                      </p:cBhvr>
+                                      <p:to>
+                                        <p:strVal val="visible"/>
+                                      </p:to>
+                                    </p:set>
+                                  </p:childTnLst>
+                                </p:cTn>
+                              </p:par>
+                              <p:par>
+                                <p:cTn id="15" presetID="1" presetClass="entr" presetSubtype="0" fill="hold" grpId="0" nodeType="withEffect">
+                                  <p:stCondLst>
+                                    <p:cond delay="0"/>
+                                  </p:stCondLst>
+                                  <p:childTnLst>
+                                    <p:set>
+                                      <p:cBhvr>
+                                        <p:cTn id="16" dur="1" fill="hold">
+                                          <p:stCondLst>
+                                            <p:cond delay="0"/>
+                                          </p:stCondLst>
+                                        </p:cTn>
+                                        <p:tgtEl>
+                                          <p:spTgt spid="10"/>
                                         </p:tgtEl>
                                         <p:attrNameLst>
                                           <p:attrName>style.visibility</p:attrName>
@@ -34006,50 +34832,19 @@
                     </p:cTn>
                   </p:par>
                   <p:par>
-                    <p:cTn id="15" fill="hold">
+                    <p:cTn id="17" fill="hold">
                       <p:stCondLst>
                         <p:cond delay="indefinite"/>
                       </p:stCondLst>
                       <p:childTnLst>
                         <p:par>
-                          <p:cTn id="16" fill="hold">
+                          <p:cTn id="18" fill="hold">
                             <p:stCondLst>
                               <p:cond delay="0"/>
                             </p:stCondLst>
                             <p:childTnLst>
                               <p:par>
-                                <p:cTn id="17" presetID="1" presetClass="entr" presetSubtype="0" fill="hold" grpId="0" nodeType="clickEffect">
-                                  <p:stCondLst>
-                                    <p:cond delay="0"/>
-                                  </p:stCondLst>
-                                  <p:childTnLst>
-                                    <p:set>
-                                      <p:cBhvr>
-                                        <p:cTn id="18" dur="1" fill="hold">
-                                          <p:stCondLst>
-                                            <p:cond delay="0"/>
-                                          </p:stCondLst>
-                                        </p:cTn>
-                                        <p:tgtEl>
-                                          <p:spTgt spid="3">
-                                            <p:txEl>
-                                              <p:pRg st="4" end="4"/>
-                                            </p:txEl>
-                                          </p:spTgt>
-                                        </p:tgtEl>
-                                        <p:attrNameLst>
-                                          <p:attrName>style.visibility</p:attrName>
-                                        </p:attrNameLst>
-                                      </p:cBhvr>
-                                      <p:to>
-                                        <p:strVal val="visible"/>
-                                      </p:to>
-                                    </p:set>
-                                  </p:childTnLst>
-                                </p:cTn>
-                              </p:par>
-                              <p:par>
-                                <p:cTn id="19" presetID="1" presetClass="entr" presetSubtype="0" fill="hold" grpId="0" nodeType="withEffect">
+                                <p:cTn id="19" presetID="1" presetClass="entr" presetSubtype="0" fill="hold" grpId="0" nodeType="clickEffect">
                                   <p:stCondLst>
                                     <p:cond delay="0"/>
                                   </p:stCondLst>
@@ -34062,7 +34857,11 @@
                                           </p:stCondLst>
                                         </p:cTn>
                                         <p:tgtEl>
-                                          <p:spTgt spid="6"/>
+                                          <p:spTgt spid="3">
+                                            <p:txEl>
+                                              <p:pRg st="4" end="4"/>
+                                            </p:txEl>
+                                          </p:spTgt>
                                         </p:tgtEl>
                                         <p:attrNameLst>
                                           <p:attrName>style.visibility</p:attrName>
@@ -34089,82 +34888,6 @@
                                           </p:stCondLst>
                                         </p:cTn>
                                         <p:tgtEl>
-                                          <p:spTgt spid="10"/>
-                                        </p:tgtEl>
-                                        <p:attrNameLst>
-                                          <p:attrName>style.visibility</p:attrName>
-                                        </p:attrNameLst>
-                                      </p:cBhvr>
-                                      <p:to>
-                                        <p:strVal val="visible"/>
-                                      </p:to>
-                                    </p:set>
-                                  </p:childTnLst>
-                                </p:cTn>
-                              </p:par>
-                            </p:childTnLst>
-                          </p:cTn>
-                        </p:par>
-                      </p:childTnLst>
-                    </p:cTn>
-                  </p:par>
-                  <p:par>
-                    <p:cTn id="23" fill="hold">
-                      <p:stCondLst>
-                        <p:cond delay="indefinite"/>
-                      </p:stCondLst>
-                      <p:childTnLst>
-                        <p:par>
-                          <p:cTn id="24" fill="hold">
-                            <p:stCondLst>
-                              <p:cond delay="0"/>
-                            </p:stCondLst>
-                            <p:childTnLst>
-                              <p:par>
-                                <p:cTn id="25" presetID="1" presetClass="entr" presetSubtype="0" fill="hold" grpId="0" nodeType="clickEffect">
-                                  <p:stCondLst>
-                                    <p:cond delay="0"/>
-                                  </p:stCondLst>
-                                  <p:childTnLst>
-                                    <p:set>
-                                      <p:cBhvr>
-                                        <p:cTn id="26" dur="1" fill="hold">
-                                          <p:stCondLst>
-                                            <p:cond delay="0"/>
-                                          </p:stCondLst>
-                                        </p:cTn>
-                                        <p:tgtEl>
-                                          <p:spTgt spid="3">
-                                            <p:txEl>
-                                              <p:pRg st="6" end="6"/>
-                                            </p:txEl>
-                                          </p:spTgt>
-                                        </p:tgtEl>
-                                        <p:attrNameLst>
-                                          <p:attrName>style.visibility</p:attrName>
-                                        </p:attrNameLst>
-                                      </p:cBhvr>
-                                      <p:to>
-                                        <p:strVal val="visible"/>
-                                      </p:to>
-                                    </p:set>
-                                  </p:childTnLst>
-                                </p:cTn>
-                              </p:par>
-                              <p:par>
-                                <p:cTn id="27" presetID="1" presetClass="entr" presetSubtype="0" fill="hold" grpId="0" nodeType="withEffect">
-                                  <p:stCondLst>
-                                    <p:cond delay="0"/>
-                                  </p:stCondLst>
-                                  <p:childTnLst>
-                                    <p:set>
-                                      <p:cBhvr>
-                                        <p:cTn id="28" dur="1" fill="hold">
-                                          <p:stCondLst>
-                                            <p:cond delay="0"/>
-                                          </p:stCondLst>
-                                        </p:cTn>
-                                        <p:tgtEl>
                                           <p:spTgt spid="7"/>
                                         </p:tgtEl>
                                         <p:attrNameLst>
@@ -34179,14 +34902,14 @@
                                 </p:cTn>
                               </p:par>
                               <p:par>
-                                <p:cTn id="29" presetID="1" presetClass="entr" presetSubtype="0" fill="hold" grpId="0" nodeType="withEffect">
+                                <p:cTn id="23" presetID="1" presetClass="entr" presetSubtype="0" fill="hold" grpId="0" nodeType="withEffect">
                                   <p:stCondLst>
                                     <p:cond delay="0"/>
                                   </p:stCondLst>
                                   <p:childTnLst>
                                     <p:set>
                                       <p:cBhvr>
-                                        <p:cTn id="30" dur="1" fill="hold">
+                                        <p:cTn id="24" dur="1" fill="hold">
                                           <p:stCondLst>
                                             <p:cond delay="0"/>
                                           </p:stCondLst>
@@ -34206,14 +34929,14 @@
                                 </p:cTn>
                               </p:par>
                               <p:par>
-                                <p:cTn id="31" presetID="1" presetClass="entr" presetSubtype="0" fill="hold" grpId="0" nodeType="withEffect">
+                                <p:cTn id="25" presetID="1" presetClass="entr" presetSubtype="0" fill="hold" grpId="0" nodeType="withEffect">
                                   <p:stCondLst>
                                     <p:cond delay="0"/>
                                   </p:stCondLst>
                                   <p:childTnLst>
                                     <p:set>
                                       <p:cBhvr>
-                                        <p:cTn id="32" dur="1" fill="hold">
+                                        <p:cTn id="26" dur="1" fill="hold">
                                           <p:stCondLst>
                                             <p:cond delay="0"/>
                                           </p:stCondLst>
@@ -34262,571 +34985,11 @@
     <p:bldLst>
       <p:bldP spid="3" grpId="0" uiExpand="1" build="p"/>
       <p:bldP spid="4" grpId="0" animBg="1"/>
-      <p:bldP spid="5" grpId="0" animBg="1"/>
       <p:bldP spid="6" grpId="0" animBg="1"/>
       <p:bldP spid="7" grpId="0" animBg="1"/>
       <p:bldP spid="8" grpId="0" animBg="1"/>
       <p:bldP spid="9" grpId="0" animBg="1"/>
       <p:bldP spid="10" grpId="0" animBg="1"/>
-    </p:bldLst>
-  </p:timing>
-</p:sld>
-</file>
-
-<file path=ppt/slides/slide49.xml><?xml version="1.0" encoding="utf-8"?>
-<p:sld xmlns:a="http://schemas.openxmlformats.org/drawingml/2006/main" xmlns:r="http://schemas.openxmlformats.org/officeDocument/2006/relationships" xmlns:p="http://schemas.openxmlformats.org/presentationml/2006/main">
-  <p:cSld>
-    <p:spTree>
-      <p:nvGrpSpPr>
-        <p:cNvPr id="1" name=""/>
-        <p:cNvGrpSpPr/>
-        <p:nvPr/>
-      </p:nvGrpSpPr>
-      <p:grpSpPr>
-        <a:xfrm>
-          <a:off x="0" y="0"/>
-          <a:ext cx="0" cy="0"/>
-          <a:chOff x="0" y="0"/>
-          <a:chExt cx="0" cy="0"/>
-        </a:xfrm>
-      </p:grpSpPr>
-      <p:sp>
-        <p:nvSpPr>
-          <p:cNvPr id="2" name="Title 1"/>
-          <p:cNvSpPr>
-            <a:spLocks noGrp="1"/>
-          </p:cNvSpPr>
-          <p:nvPr>
-            <p:ph type="title"/>
-          </p:nvPr>
-        </p:nvSpPr>
-        <p:spPr/>
-        <p:txBody>
-          <a:bodyPr/>
-          <a:lstStyle/>
-          <a:p>
-            <a:r>
-              <a:rPr lang="en-US" dirty="0" smtClean="0"/>
-              <a:t>Creating archives</a:t>
-            </a:r>
-            <a:endParaRPr lang="nl-BE" dirty="0"/>
-          </a:p>
-        </p:txBody>
-      </p:sp>
-      <p:sp>
-        <p:nvSpPr>
-          <p:cNvPr id="3" name="Content Placeholder 2"/>
-          <p:cNvSpPr>
-            <a:spLocks noGrp="1"/>
-          </p:cNvSpPr>
-          <p:nvPr>
-            <p:ph idx="1"/>
-          </p:nvPr>
-        </p:nvSpPr>
-        <p:spPr/>
-        <p:txBody>
-          <a:bodyPr/>
-          <a:lstStyle/>
-          <a:p>
-            <a:r>
-              <a:rPr lang="en-US" dirty="0" smtClean="0"/>
-              <a:t>Export branch files to archive file</a:t>
-            </a:r>
-          </a:p>
-          <a:p>
-            <a:endParaRPr lang="en-US" dirty="0"/>
-          </a:p>
-          <a:p>
-            <a:endParaRPr lang="en-US" dirty="0" smtClean="0"/>
-          </a:p>
-          <a:p>
-            <a:r>
-              <a:rPr lang="en-US" dirty="0" smtClean="0"/>
-              <a:t>Export to zip</a:t>
-            </a:r>
-          </a:p>
-          <a:p>
-            <a:endParaRPr lang="en-US" dirty="0"/>
-          </a:p>
-          <a:p>
-            <a:endParaRPr lang="en-US" dirty="0" smtClean="0"/>
-          </a:p>
-          <a:p>
-            <a:r>
-              <a:rPr lang="en-US" dirty="0" smtClean="0"/>
-              <a:t>On GitHub: create releases</a:t>
-            </a:r>
-            <a:endParaRPr lang="nl-BE" dirty="0"/>
-          </a:p>
-        </p:txBody>
-      </p:sp>
-      <p:sp>
-        <p:nvSpPr>
-          <p:cNvPr id="4" name="TextBox 3"/>
-          <p:cNvSpPr txBox="1"/>
-          <p:nvPr/>
-        </p:nvSpPr>
-        <p:spPr>
-          <a:xfrm>
-            <a:off x="611560" y="2267580"/>
-            <a:ext cx="7992888" cy="369332"/>
-          </a:xfrm>
-          <a:prstGeom prst="rect">
-            <a:avLst/>
-          </a:prstGeom>
-          <a:noFill/>
-          <a:ln>
-            <a:solidFill>
-              <a:schemeClr val="tx1"/>
-            </a:solidFill>
-          </a:ln>
-        </p:spPr>
-        <p:txBody>
-          <a:bodyPr wrap="square" rtlCol="0">
-            <a:spAutoFit/>
-          </a:bodyPr>
-          <a:lstStyle/>
-          <a:p>
-            <a:r>
-              <a:rPr lang="nl-BE" dirty="0" smtClean="0">
-                <a:latin typeface="Courier New" pitchFamily="49" charset="0"/>
-                <a:cs typeface="Courier New" pitchFamily="49" charset="0"/>
-              </a:rPr>
-              <a:t>$ git </a:t>
-            </a:r>
-            <a:r>
-              <a:rPr lang="nl-BE" dirty="0" err="1" smtClean="0">
-                <a:latin typeface="Courier New" pitchFamily="49" charset="0"/>
-                <a:cs typeface="Courier New" pitchFamily="49" charset="0"/>
-              </a:rPr>
-              <a:t>archive</a:t>
-            </a:r>
-            <a:r>
-              <a:rPr lang="nl-BE" dirty="0" smtClean="0">
-                <a:latin typeface="Courier New" pitchFamily="49" charset="0"/>
-                <a:cs typeface="Courier New" pitchFamily="49" charset="0"/>
-              </a:rPr>
-              <a:t>  master  |  </a:t>
-            </a:r>
-            <a:r>
-              <a:rPr lang="nl-BE" dirty="0" err="1" smtClean="0">
-                <a:latin typeface="Courier New" pitchFamily="49" charset="0"/>
-                <a:cs typeface="Courier New" pitchFamily="49" charset="0"/>
-              </a:rPr>
-              <a:t>gzip</a:t>
-            </a:r>
-            <a:r>
-              <a:rPr lang="nl-BE" dirty="0" smtClean="0">
-                <a:latin typeface="Courier New" pitchFamily="49" charset="0"/>
-                <a:cs typeface="Courier New" pitchFamily="49" charset="0"/>
-              </a:rPr>
-              <a:t>  &gt;  ~/my_project.tar.gz</a:t>
-            </a:r>
-          </a:p>
-        </p:txBody>
-      </p:sp>
-      <p:sp>
-        <p:nvSpPr>
-          <p:cNvPr id="5" name="TextBox 4"/>
-          <p:cNvSpPr txBox="1"/>
-          <p:nvPr/>
-        </p:nvSpPr>
-        <p:spPr>
-          <a:xfrm>
-            <a:off x="611560" y="4058372"/>
-            <a:ext cx="7992888" cy="369332"/>
-          </a:xfrm>
-          <a:prstGeom prst="rect">
-            <a:avLst/>
-          </a:prstGeom>
-          <a:noFill/>
-          <a:ln>
-            <a:solidFill>
-              <a:schemeClr val="tx1"/>
-            </a:solidFill>
-          </a:ln>
-        </p:spPr>
-        <p:txBody>
-          <a:bodyPr wrap="square" rtlCol="0">
-            <a:spAutoFit/>
-          </a:bodyPr>
-          <a:lstStyle/>
-          <a:p>
-            <a:r>
-              <a:rPr lang="nl-BE" dirty="0" smtClean="0">
-                <a:latin typeface="Courier New" pitchFamily="49" charset="0"/>
-                <a:cs typeface="Courier New" pitchFamily="49" charset="0"/>
-              </a:rPr>
-              <a:t>$ git </a:t>
-            </a:r>
-            <a:r>
-              <a:rPr lang="nl-BE" dirty="0" err="1" smtClean="0">
-                <a:latin typeface="Courier New" pitchFamily="49" charset="0"/>
-                <a:cs typeface="Courier New" pitchFamily="49" charset="0"/>
-              </a:rPr>
-              <a:t>archive</a:t>
-            </a:r>
-            <a:r>
-              <a:rPr lang="nl-BE" dirty="0" smtClean="0">
-                <a:latin typeface="Courier New" pitchFamily="49" charset="0"/>
-                <a:cs typeface="Courier New" pitchFamily="49" charset="0"/>
-              </a:rPr>
-              <a:t>  --format=zip  master  &gt;  ~/my_project.zip</a:t>
-            </a:r>
-          </a:p>
-        </p:txBody>
-      </p:sp>
-      <p:sp>
-        <p:nvSpPr>
-          <p:cNvPr id="6" name="TextBox 5"/>
-          <p:cNvSpPr txBox="1"/>
-          <p:nvPr/>
-        </p:nvSpPr>
-        <p:spPr>
-          <a:xfrm>
-            <a:off x="3131840" y="2852936"/>
-            <a:ext cx="2697149" cy="461665"/>
-          </a:xfrm>
-          <a:prstGeom prst="rect">
-            <a:avLst/>
-          </a:prstGeom>
-          <a:noFill/>
-          <a:ln>
-            <a:solidFill>
-              <a:schemeClr val="tx1"/>
-            </a:solidFill>
-          </a:ln>
-        </p:spPr>
-        <p:txBody>
-          <a:bodyPr wrap="none" rtlCol="0">
-            <a:spAutoFit/>
-          </a:bodyPr>
-          <a:lstStyle/>
-          <a:p>
-            <a:r>
-              <a:rPr lang="en-US" sz="2400" dirty="0" smtClean="0"/>
-              <a:t>Default format is tar</a:t>
-            </a:r>
-            <a:endParaRPr lang="nl-BE" sz="2400" dirty="0"/>
-          </a:p>
-        </p:txBody>
-      </p:sp>
-      <p:sp>
-        <p:nvSpPr>
-          <p:cNvPr id="7" name="Slide Number Placeholder 6"/>
-          <p:cNvSpPr>
-            <a:spLocks noGrp="1"/>
-          </p:cNvSpPr>
-          <p:nvPr>
-            <p:ph type="sldNum" sz="quarter" idx="12"/>
-          </p:nvPr>
-        </p:nvSpPr>
-        <p:spPr/>
-        <p:txBody>
-          <a:bodyPr/>
-          <a:lstStyle/>
-          <a:p>
-            <a:fld id="{BB52A05A-A776-4391-ACD7-D6BC34D3145C}" type="slidenum">
-              <a:rPr lang="nl-BE" smtClean="0"/>
-              <a:t>49</a:t>
-            </a:fld>
-            <a:endParaRPr lang="nl-BE"/>
-          </a:p>
-        </p:txBody>
-      </p:sp>
-    </p:spTree>
-    <p:extLst>
-      <p:ext uri="{BB962C8B-B14F-4D97-AF65-F5344CB8AC3E}">
-        <p14:creationId xmlns:p14="http://schemas.microsoft.com/office/powerpoint/2010/main" val="3767473925"/>
-      </p:ext>
-    </p:extLst>
-  </p:cSld>
-  <p:clrMapOvr>
-    <a:masterClrMapping/>
-  </p:clrMapOvr>
-  <p:timing>
-    <p:tnLst>
-      <p:par>
-        <p:cTn id="1" dur="indefinite" restart="never" nodeType="tmRoot">
-          <p:childTnLst>
-            <p:seq concurrent="1" nextAc="seek">
-              <p:cTn id="2" dur="indefinite" nodeType="mainSeq">
-                <p:childTnLst>
-                  <p:par>
-                    <p:cTn id="3" fill="hold">
-                      <p:stCondLst>
-                        <p:cond delay="indefinite"/>
-                        <p:cond evt="onBegin" delay="0">
-                          <p:tn val="2"/>
-                        </p:cond>
-                      </p:stCondLst>
-                      <p:childTnLst>
-                        <p:par>
-                          <p:cTn id="4" fill="hold">
-                            <p:stCondLst>
-                              <p:cond delay="0"/>
-                            </p:stCondLst>
-                            <p:childTnLst>
-                              <p:par>
-                                <p:cTn id="5" presetID="1" presetClass="entr" presetSubtype="0" fill="hold" grpId="0" nodeType="withEffect">
-                                  <p:stCondLst>
-                                    <p:cond delay="0"/>
-                                  </p:stCondLst>
-                                  <p:childTnLst>
-                                    <p:set>
-                                      <p:cBhvr>
-                                        <p:cTn id="6" dur="1" fill="hold">
-                                          <p:stCondLst>
-                                            <p:cond delay="0"/>
-                                          </p:stCondLst>
-                                        </p:cTn>
-                                        <p:tgtEl>
-                                          <p:spTgt spid="3">
-                                            <p:txEl>
-                                              <p:pRg st="0" end="0"/>
-                                            </p:txEl>
-                                          </p:spTgt>
-                                        </p:tgtEl>
-                                        <p:attrNameLst>
-                                          <p:attrName>style.visibility</p:attrName>
-                                        </p:attrNameLst>
-                                      </p:cBhvr>
-                                      <p:to>
-                                        <p:strVal val="visible"/>
-                                      </p:to>
-                                    </p:set>
-                                  </p:childTnLst>
-                                </p:cTn>
-                              </p:par>
-                              <p:par>
-                                <p:cTn id="7" presetID="1" presetClass="entr" presetSubtype="0" fill="hold" grpId="0" nodeType="withEffect">
-                                  <p:stCondLst>
-                                    <p:cond delay="0"/>
-                                  </p:stCondLst>
-                                  <p:childTnLst>
-                                    <p:set>
-                                      <p:cBhvr>
-                                        <p:cTn id="8" dur="1" fill="hold">
-                                          <p:stCondLst>
-                                            <p:cond delay="0"/>
-                                          </p:stCondLst>
-                                        </p:cTn>
-                                        <p:tgtEl>
-                                          <p:spTgt spid="4"/>
-                                        </p:tgtEl>
-                                        <p:attrNameLst>
-                                          <p:attrName>style.visibility</p:attrName>
-                                        </p:attrNameLst>
-                                      </p:cBhvr>
-                                      <p:to>
-                                        <p:strVal val="visible"/>
-                                      </p:to>
-                                    </p:set>
-                                  </p:childTnLst>
-                                </p:cTn>
-                              </p:par>
-                            </p:childTnLst>
-                          </p:cTn>
-                        </p:par>
-                      </p:childTnLst>
-                    </p:cTn>
-                  </p:par>
-                  <p:par>
-                    <p:cTn id="9" fill="hold">
-                      <p:stCondLst>
-                        <p:cond delay="indefinite"/>
-                      </p:stCondLst>
-                      <p:childTnLst>
-                        <p:par>
-                          <p:cTn id="10" fill="hold">
-                            <p:stCondLst>
-                              <p:cond delay="0"/>
-                            </p:stCondLst>
-                            <p:childTnLst>
-                              <p:par>
-                                <p:cTn id="11" presetID="1" presetClass="entr" presetSubtype="0" fill="hold" grpId="0" nodeType="clickEffect">
-                                  <p:stCondLst>
-                                    <p:cond delay="0"/>
-                                  </p:stCondLst>
-                                  <p:childTnLst>
-                                    <p:set>
-                                      <p:cBhvr>
-                                        <p:cTn id="12" dur="1" fill="hold">
-                                          <p:stCondLst>
-                                            <p:cond delay="0"/>
-                                          </p:stCondLst>
-                                        </p:cTn>
-                                        <p:tgtEl>
-                                          <p:spTgt spid="6"/>
-                                        </p:tgtEl>
-                                        <p:attrNameLst>
-                                          <p:attrName>style.visibility</p:attrName>
-                                        </p:attrNameLst>
-                                      </p:cBhvr>
-                                      <p:to>
-                                        <p:strVal val="visible"/>
-                                      </p:to>
-                                    </p:set>
-                                  </p:childTnLst>
-                                </p:cTn>
-                              </p:par>
-                            </p:childTnLst>
-                          </p:cTn>
-                        </p:par>
-                      </p:childTnLst>
-                    </p:cTn>
-                  </p:par>
-                  <p:par>
-                    <p:cTn id="13" fill="hold">
-                      <p:stCondLst>
-                        <p:cond delay="indefinite"/>
-                      </p:stCondLst>
-                      <p:childTnLst>
-                        <p:par>
-                          <p:cTn id="14" fill="hold">
-                            <p:stCondLst>
-                              <p:cond delay="0"/>
-                            </p:stCondLst>
-                            <p:childTnLst>
-                              <p:par>
-                                <p:cTn id="15" presetID="1" presetClass="entr" presetSubtype="0" fill="hold" grpId="0" nodeType="clickEffect">
-                                  <p:stCondLst>
-                                    <p:cond delay="0"/>
-                                  </p:stCondLst>
-                                  <p:childTnLst>
-                                    <p:set>
-                                      <p:cBhvr>
-                                        <p:cTn id="16" dur="1" fill="hold">
-                                          <p:stCondLst>
-                                            <p:cond delay="0"/>
-                                          </p:stCondLst>
-                                        </p:cTn>
-                                        <p:tgtEl>
-                                          <p:spTgt spid="3">
-                                            <p:txEl>
-                                              <p:pRg st="3" end="3"/>
-                                            </p:txEl>
-                                          </p:spTgt>
-                                        </p:tgtEl>
-                                        <p:attrNameLst>
-                                          <p:attrName>style.visibility</p:attrName>
-                                        </p:attrNameLst>
-                                      </p:cBhvr>
-                                      <p:to>
-                                        <p:strVal val="visible"/>
-                                      </p:to>
-                                    </p:set>
-                                  </p:childTnLst>
-                                </p:cTn>
-                              </p:par>
-                              <p:par>
-                                <p:cTn id="17" presetID="1" presetClass="entr" presetSubtype="0" fill="hold" grpId="0" nodeType="withEffect">
-                                  <p:stCondLst>
-                                    <p:cond delay="0"/>
-                                  </p:stCondLst>
-                                  <p:childTnLst>
-                                    <p:set>
-                                      <p:cBhvr>
-                                        <p:cTn id="18" dur="1" fill="hold">
-                                          <p:stCondLst>
-                                            <p:cond delay="0"/>
-                                          </p:stCondLst>
-                                        </p:cTn>
-                                        <p:tgtEl>
-                                          <p:spTgt spid="5"/>
-                                        </p:tgtEl>
-                                        <p:attrNameLst>
-                                          <p:attrName>style.visibility</p:attrName>
-                                        </p:attrNameLst>
-                                      </p:cBhvr>
-                                      <p:to>
-                                        <p:strVal val="visible"/>
-                                      </p:to>
-                                    </p:set>
-                                  </p:childTnLst>
-                                </p:cTn>
-                              </p:par>
-                            </p:childTnLst>
-                          </p:cTn>
-                        </p:par>
-                      </p:childTnLst>
-                    </p:cTn>
-                  </p:par>
-                  <p:par>
-                    <p:cTn id="19" fill="hold">
-                      <p:stCondLst>
-                        <p:cond delay="indefinite"/>
-                      </p:stCondLst>
-                      <p:childTnLst>
-                        <p:par>
-                          <p:cTn id="20" fill="hold">
-                            <p:stCondLst>
-                              <p:cond delay="0"/>
-                            </p:stCondLst>
-                            <p:childTnLst>
-                              <p:par>
-                                <p:cTn id="21" presetID="1" presetClass="entr" presetSubtype="0" fill="hold" grpId="0" nodeType="clickEffect">
-                                  <p:stCondLst>
-                                    <p:cond delay="0"/>
-                                  </p:stCondLst>
-                                  <p:childTnLst>
-                                    <p:set>
-                                      <p:cBhvr>
-                                        <p:cTn id="22" dur="1" fill="hold">
-                                          <p:stCondLst>
-                                            <p:cond delay="0"/>
-                                          </p:stCondLst>
-                                        </p:cTn>
-                                        <p:tgtEl>
-                                          <p:spTgt spid="3">
-                                            <p:txEl>
-                                              <p:pRg st="6" end="6"/>
-                                            </p:txEl>
-                                          </p:spTgt>
-                                        </p:tgtEl>
-                                        <p:attrNameLst>
-                                          <p:attrName>style.visibility</p:attrName>
-                                        </p:attrNameLst>
-                                      </p:cBhvr>
-                                      <p:to>
-                                        <p:strVal val="visible"/>
-                                      </p:to>
-                                    </p:set>
-                                  </p:childTnLst>
-                                </p:cTn>
-                              </p:par>
-                            </p:childTnLst>
-                          </p:cTn>
-                        </p:par>
-                      </p:childTnLst>
-                    </p:cTn>
-                  </p:par>
-                </p:childTnLst>
-              </p:cTn>
-              <p:prevCondLst>
-                <p:cond evt="onPrev" delay="0">
-                  <p:tgtEl>
-                    <p:sldTgt/>
-                  </p:tgtEl>
-                </p:cond>
-              </p:prevCondLst>
-              <p:nextCondLst>
-                <p:cond evt="onNext" delay="0">
-                  <p:tgtEl>
-                    <p:sldTgt/>
-                  </p:tgtEl>
-                </p:cond>
-              </p:nextCondLst>
-            </p:seq>
-          </p:childTnLst>
-        </p:cTn>
-      </p:par>
-    </p:tnLst>
-    <p:bldLst>
-      <p:bldP spid="3" grpId="0" uiExpand="1" build="p"/>
-      <p:bldP spid="4" grpId="0" animBg="1"/>
-      <p:bldP spid="5" grpId="0" animBg="1"/>
-      <p:bldP spid="6" grpId="0" animBg="1"/>
     </p:bldLst>
   </p:timing>
 </p:sld>
@@ -35371,7 +35534,7 @@
           <a:p>
             <a:r>
               <a:rPr lang="en-US" dirty="0" smtClean="0"/>
-              <a:t>Conclusions</a:t>
+              <a:t>Creating archives</a:t>
             </a:r>
             <a:endParaRPr lang="nl-BE" dirty="0"/>
           </a:p>
@@ -35379,12 +35542,12 @@
       </p:sp>
       <p:sp>
         <p:nvSpPr>
-          <p:cNvPr id="3" name="Text Placeholder 2"/>
+          <p:cNvPr id="3" name="Content Placeholder 2"/>
           <p:cNvSpPr>
             <a:spLocks noGrp="1"/>
           </p:cNvSpPr>
           <p:nvPr>
-            <p:ph type="body" idx="1"/>
+            <p:ph idx="1"/>
           </p:nvPr>
         </p:nvSpPr>
         <p:spPr/>
@@ -35392,13 +35555,192 @@
           <a:bodyPr/>
           <a:lstStyle/>
           <a:p>
-            <a:endParaRPr lang="nl-BE"/>
+            <a:r>
+              <a:rPr lang="en-US" dirty="0" smtClean="0"/>
+              <a:t>Export branch files to archive file</a:t>
+            </a:r>
+          </a:p>
+          <a:p>
+            <a:endParaRPr lang="en-US" dirty="0"/>
+          </a:p>
+          <a:p>
+            <a:endParaRPr lang="en-US" dirty="0" smtClean="0"/>
+          </a:p>
+          <a:p>
+            <a:r>
+              <a:rPr lang="en-US" dirty="0" smtClean="0"/>
+              <a:t>Export to zip</a:t>
+            </a:r>
+          </a:p>
+          <a:p>
+            <a:endParaRPr lang="en-US" dirty="0"/>
+          </a:p>
+          <a:p>
+            <a:endParaRPr lang="en-US" dirty="0" smtClean="0"/>
+          </a:p>
+          <a:p>
+            <a:r>
+              <a:rPr lang="en-US" dirty="0" smtClean="0"/>
+              <a:t>On GitHub: create releases</a:t>
+            </a:r>
+            <a:endParaRPr lang="nl-BE" dirty="0"/>
           </a:p>
         </p:txBody>
       </p:sp>
       <p:sp>
         <p:nvSpPr>
-          <p:cNvPr id="4" name="Slide Number Placeholder 3"/>
+          <p:cNvPr id="4" name="TextBox 3"/>
+          <p:cNvSpPr txBox="1"/>
+          <p:nvPr/>
+        </p:nvSpPr>
+        <p:spPr>
+          <a:xfrm>
+            <a:off x="611560" y="2267580"/>
+            <a:ext cx="7992888" cy="369332"/>
+          </a:xfrm>
+          <a:prstGeom prst="rect">
+            <a:avLst/>
+          </a:prstGeom>
+          <a:noFill/>
+          <a:ln>
+            <a:solidFill>
+              <a:schemeClr val="tx1"/>
+            </a:solidFill>
+          </a:ln>
+        </p:spPr>
+        <p:txBody>
+          <a:bodyPr wrap="square" rtlCol="0">
+            <a:spAutoFit/>
+          </a:bodyPr>
+          <a:lstStyle/>
+          <a:p>
+            <a:r>
+              <a:rPr lang="nl-BE" dirty="0" smtClean="0">
+                <a:latin typeface="Courier New" pitchFamily="49" charset="0"/>
+                <a:cs typeface="Courier New" pitchFamily="49" charset="0"/>
+              </a:rPr>
+              <a:t>$ git </a:t>
+            </a:r>
+            <a:r>
+              <a:rPr lang="nl-BE" dirty="0" err="1" smtClean="0">
+                <a:latin typeface="Courier New" pitchFamily="49" charset="0"/>
+                <a:cs typeface="Courier New" pitchFamily="49" charset="0"/>
+              </a:rPr>
+              <a:t>archive</a:t>
+            </a:r>
+            <a:r>
+              <a:rPr lang="nl-BE" dirty="0" smtClean="0">
+                <a:latin typeface="Courier New" pitchFamily="49" charset="0"/>
+                <a:cs typeface="Courier New" pitchFamily="49" charset="0"/>
+              </a:rPr>
+              <a:t>  master  |  </a:t>
+            </a:r>
+            <a:r>
+              <a:rPr lang="nl-BE" dirty="0" err="1" smtClean="0">
+                <a:latin typeface="Courier New" pitchFamily="49" charset="0"/>
+                <a:cs typeface="Courier New" pitchFamily="49" charset="0"/>
+              </a:rPr>
+              <a:t>gzip</a:t>
+            </a:r>
+            <a:r>
+              <a:rPr lang="nl-BE" dirty="0" smtClean="0">
+                <a:latin typeface="Courier New" pitchFamily="49" charset="0"/>
+                <a:cs typeface="Courier New" pitchFamily="49" charset="0"/>
+              </a:rPr>
+              <a:t>  &gt;  ~/my_project.tar.gz</a:t>
+            </a:r>
+          </a:p>
+        </p:txBody>
+      </p:sp>
+      <p:sp>
+        <p:nvSpPr>
+          <p:cNvPr id="5" name="TextBox 4"/>
+          <p:cNvSpPr txBox="1"/>
+          <p:nvPr/>
+        </p:nvSpPr>
+        <p:spPr>
+          <a:xfrm>
+            <a:off x="611560" y="4058372"/>
+            <a:ext cx="7992888" cy="369332"/>
+          </a:xfrm>
+          <a:prstGeom prst="rect">
+            <a:avLst/>
+          </a:prstGeom>
+          <a:noFill/>
+          <a:ln>
+            <a:solidFill>
+              <a:schemeClr val="tx1"/>
+            </a:solidFill>
+          </a:ln>
+        </p:spPr>
+        <p:txBody>
+          <a:bodyPr wrap="square" rtlCol="0">
+            <a:spAutoFit/>
+          </a:bodyPr>
+          <a:lstStyle/>
+          <a:p>
+            <a:r>
+              <a:rPr lang="nl-BE" dirty="0" smtClean="0">
+                <a:latin typeface="Courier New" pitchFamily="49" charset="0"/>
+                <a:cs typeface="Courier New" pitchFamily="49" charset="0"/>
+              </a:rPr>
+              <a:t>$ git </a:t>
+            </a:r>
+            <a:r>
+              <a:rPr lang="nl-BE" dirty="0" err="1" smtClean="0">
+                <a:latin typeface="Courier New" pitchFamily="49" charset="0"/>
+                <a:cs typeface="Courier New" pitchFamily="49" charset="0"/>
+              </a:rPr>
+              <a:t>archive</a:t>
+            </a:r>
+            <a:r>
+              <a:rPr lang="nl-BE" dirty="0" smtClean="0">
+                <a:latin typeface="Courier New" pitchFamily="49" charset="0"/>
+                <a:cs typeface="Courier New" pitchFamily="49" charset="0"/>
+              </a:rPr>
+              <a:t>  --format=zip  master  &gt;  ~/my_project.zip</a:t>
+            </a:r>
+          </a:p>
+        </p:txBody>
+      </p:sp>
+      <p:sp>
+        <p:nvSpPr>
+          <p:cNvPr id="6" name="TextBox 5"/>
+          <p:cNvSpPr txBox="1"/>
+          <p:nvPr/>
+        </p:nvSpPr>
+        <p:spPr>
+          <a:xfrm>
+            <a:off x="3131840" y="2852936"/>
+            <a:ext cx="2697149" cy="461665"/>
+          </a:xfrm>
+          <a:prstGeom prst="rect">
+            <a:avLst/>
+          </a:prstGeom>
+          <a:noFill/>
+          <a:ln>
+            <a:solidFill>
+              <a:schemeClr val="tx1"/>
+            </a:solidFill>
+          </a:ln>
+        </p:spPr>
+        <p:txBody>
+          <a:bodyPr wrap="none" rtlCol="0">
+            <a:spAutoFit/>
+          </a:bodyPr>
+          <a:lstStyle/>
+          <a:p>
+            <a:r>
+              <a:rPr lang="en-US" sz="2400" dirty="0" smtClean="0"/>
+              <a:t>Default format is tar</a:t>
+            </a:r>
+            <a:endParaRPr lang="nl-BE" sz="2400" dirty="0"/>
+          </a:p>
+        </p:txBody>
+      </p:sp>
+      <p:sp>
+        <p:nvSpPr>
+          <p:cNvPr id="7" name="Slide Number Placeholder 6"/>
           <p:cNvSpPr>
             <a:spLocks noGrp="1"/>
           </p:cNvSpPr>
@@ -35422,7 +35764,7 @@
     </p:spTree>
     <p:extLst>
       <p:ext uri="{BB962C8B-B14F-4D97-AF65-F5344CB8AC3E}">
-        <p14:creationId xmlns:p14="http://schemas.microsoft.com/office/powerpoint/2010/main" val="2763237186"/>
+        <p14:creationId xmlns:p14="http://schemas.microsoft.com/office/powerpoint/2010/main" val="3767473925"/>
       </p:ext>
     </p:extLst>
   </p:cSld>
@@ -35432,9 +35774,287 @@
   <p:timing>
     <p:tnLst>
       <p:par>
-        <p:cTn id="1" dur="indefinite" restart="never" nodeType="tmRoot"/>
+        <p:cTn id="1" dur="indefinite" restart="never" nodeType="tmRoot">
+          <p:childTnLst>
+            <p:seq concurrent="1" nextAc="seek">
+              <p:cTn id="2" dur="indefinite" nodeType="mainSeq">
+                <p:childTnLst>
+                  <p:par>
+                    <p:cTn id="3" fill="hold">
+                      <p:stCondLst>
+                        <p:cond delay="indefinite"/>
+                        <p:cond evt="onBegin" delay="0">
+                          <p:tn val="2"/>
+                        </p:cond>
+                      </p:stCondLst>
+                      <p:childTnLst>
+                        <p:par>
+                          <p:cTn id="4" fill="hold">
+                            <p:stCondLst>
+                              <p:cond delay="0"/>
+                            </p:stCondLst>
+                            <p:childTnLst>
+                              <p:par>
+                                <p:cTn id="5" presetID="1" presetClass="entr" presetSubtype="0" fill="hold" grpId="0" nodeType="withEffect">
+                                  <p:stCondLst>
+                                    <p:cond delay="0"/>
+                                  </p:stCondLst>
+                                  <p:childTnLst>
+                                    <p:set>
+                                      <p:cBhvr>
+                                        <p:cTn id="6" dur="1" fill="hold">
+                                          <p:stCondLst>
+                                            <p:cond delay="0"/>
+                                          </p:stCondLst>
+                                        </p:cTn>
+                                        <p:tgtEl>
+                                          <p:spTgt spid="3">
+                                            <p:txEl>
+                                              <p:pRg st="0" end="0"/>
+                                            </p:txEl>
+                                          </p:spTgt>
+                                        </p:tgtEl>
+                                        <p:attrNameLst>
+                                          <p:attrName>style.visibility</p:attrName>
+                                        </p:attrNameLst>
+                                      </p:cBhvr>
+                                      <p:to>
+                                        <p:strVal val="visible"/>
+                                      </p:to>
+                                    </p:set>
+                                  </p:childTnLst>
+                                </p:cTn>
+                              </p:par>
+                              <p:par>
+                                <p:cTn id="7" presetID="1" presetClass="entr" presetSubtype="0" fill="hold" grpId="0" nodeType="withEffect">
+                                  <p:stCondLst>
+                                    <p:cond delay="0"/>
+                                  </p:stCondLst>
+                                  <p:childTnLst>
+                                    <p:set>
+                                      <p:cBhvr>
+                                        <p:cTn id="8" dur="1" fill="hold">
+                                          <p:stCondLst>
+                                            <p:cond delay="0"/>
+                                          </p:stCondLst>
+                                        </p:cTn>
+                                        <p:tgtEl>
+                                          <p:spTgt spid="4"/>
+                                        </p:tgtEl>
+                                        <p:attrNameLst>
+                                          <p:attrName>style.visibility</p:attrName>
+                                        </p:attrNameLst>
+                                      </p:cBhvr>
+                                      <p:to>
+                                        <p:strVal val="visible"/>
+                                      </p:to>
+                                    </p:set>
+                                  </p:childTnLst>
+                                </p:cTn>
+                              </p:par>
+                            </p:childTnLst>
+                          </p:cTn>
+                        </p:par>
+                      </p:childTnLst>
+                    </p:cTn>
+                  </p:par>
+                  <p:par>
+                    <p:cTn id="9" fill="hold">
+                      <p:stCondLst>
+                        <p:cond delay="indefinite"/>
+                      </p:stCondLst>
+                      <p:childTnLst>
+                        <p:par>
+                          <p:cTn id="10" fill="hold">
+                            <p:stCondLst>
+                              <p:cond delay="0"/>
+                            </p:stCondLst>
+                            <p:childTnLst>
+                              <p:par>
+                                <p:cTn id="11" presetID="1" presetClass="entr" presetSubtype="0" fill="hold" grpId="0" nodeType="clickEffect">
+                                  <p:stCondLst>
+                                    <p:cond delay="0"/>
+                                  </p:stCondLst>
+                                  <p:childTnLst>
+                                    <p:set>
+                                      <p:cBhvr>
+                                        <p:cTn id="12" dur="1" fill="hold">
+                                          <p:stCondLst>
+                                            <p:cond delay="0"/>
+                                          </p:stCondLst>
+                                        </p:cTn>
+                                        <p:tgtEl>
+                                          <p:spTgt spid="6"/>
+                                        </p:tgtEl>
+                                        <p:attrNameLst>
+                                          <p:attrName>style.visibility</p:attrName>
+                                        </p:attrNameLst>
+                                      </p:cBhvr>
+                                      <p:to>
+                                        <p:strVal val="visible"/>
+                                      </p:to>
+                                    </p:set>
+                                  </p:childTnLst>
+                                </p:cTn>
+                              </p:par>
+                            </p:childTnLst>
+                          </p:cTn>
+                        </p:par>
+                      </p:childTnLst>
+                    </p:cTn>
+                  </p:par>
+                  <p:par>
+                    <p:cTn id="13" fill="hold">
+                      <p:stCondLst>
+                        <p:cond delay="indefinite"/>
+                      </p:stCondLst>
+                      <p:childTnLst>
+                        <p:par>
+                          <p:cTn id="14" fill="hold">
+                            <p:stCondLst>
+                              <p:cond delay="0"/>
+                            </p:stCondLst>
+                            <p:childTnLst>
+                              <p:par>
+                                <p:cTn id="15" presetID="1" presetClass="entr" presetSubtype="0" fill="hold" grpId="0" nodeType="clickEffect">
+                                  <p:stCondLst>
+                                    <p:cond delay="0"/>
+                                  </p:stCondLst>
+                                  <p:childTnLst>
+                                    <p:set>
+                                      <p:cBhvr>
+                                        <p:cTn id="16" dur="1" fill="hold">
+                                          <p:stCondLst>
+                                            <p:cond delay="0"/>
+                                          </p:stCondLst>
+                                        </p:cTn>
+                                        <p:tgtEl>
+                                          <p:spTgt spid="3">
+                                            <p:txEl>
+                                              <p:pRg st="3" end="3"/>
+                                            </p:txEl>
+                                          </p:spTgt>
+                                        </p:tgtEl>
+                                        <p:attrNameLst>
+                                          <p:attrName>style.visibility</p:attrName>
+                                        </p:attrNameLst>
+                                      </p:cBhvr>
+                                      <p:to>
+                                        <p:strVal val="visible"/>
+                                      </p:to>
+                                    </p:set>
+                                  </p:childTnLst>
+                                </p:cTn>
+                              </p:par>
+                              <p:par>
+                                <p:cTn id="17" presetID="1" presetClass="entr" presetSubtype="0" fill="hold" grpId="0" nodeType="withEffect">
+                                  <p:stCondLst>
+                                    <p:cond delay="0"/>
+                                  </p:stCondLst>
+                                  <p:childTnLst>
+                                    <p:set>
+                                      <p:cBhvr>
+                                        <p:cTn id="18" dur="1" fill="hold">
+                                          <p:stCondLst>
+                                            <p:cond delay="0"/>
+                                          </p:stCondLst>
+                                        </p:cTn>
+                                        <p:tgtEl>
+                                          <p:spTgt spid="5"/>
+                                        </p:tgtEl>
+                                        <p:attrNameLst>
+                                          <p:attrName>style.visibility</p:attrName>
+                                        </p:attrNameLst>
+                                      </p:cBhvr>
+                                      <p:to>
+                                        <p:strVal val="visible"/>
+                                      </p:to>
+                                    </p:set>
+                                  </p:childTnLst>
+                                </p:cTn>
+                              </p:par>
+                            </p:childTnLst>
+                          </p:cTn>
+                        </p:par>
+                      </p:childTnLst>
+                    </p:cTn>
+                  </p:par>
+                  <p:par>
+                    <p:cTn id="19" fill="hold">
+                      <p:stCondLst>
+                        <p:cond delay="indefinite"/>
+                      </p:stCondLst>
+                      <p:childTnLst>
+                        <p:par>
+                          <p:cTn id="20" fill="hold">
+                            <p:stCondLst>
+                              <p:cond delay="0"/>
+                            </p:stCondLst>
+                            <p:childTnLst>
+                              <p:par>
+                                <p:cTn id="21" presetID="1" presetClass="entr" presetSubtype="0" fill="hold" grpId="0" nodeType="clickEffect">
+                                  <p:stCondLst>
+                                    <p:cond delay="0"/>
+                                  </p:stCondLst>
+                                  <p:childTnLst>
+                                    <p:set>
+                                      <p:cBhvr>
+                                        <p:cTn id="22" dur="1" fill="hold">
+                                          <p:stCondLst>
+                                            <p:cond delay="0"/>
+                                          </p:stCondLst>
+                                        </p:cTn>
+                                        <p:tgtEl>
+                                          <p:spTgt spid="3">
+                                            <p:txEl>
+                                              <p:pRg st="6" end="6"/>
+                                            </p:txEl>
+                                          </p:spTgt>
+                                        </p:tgtEl>
+                                        <p:attrNameLst>
+                                          <p:attrName>style.visibility</p:attrName>
+                                        </p:attrNameLst>
+                                      </p:cBhvr>
+                                      <p:to>
+                                        <p:strVal val="visible"/>
+                                      </p:to>
+                                    </p:set>
+                                  </p:childTnLst>
+                                </p:cTn>
+                              </p:par>
+                            </p:childTnLst>
+                          </p:cTn>
+                        </p:par>
+                      </p:childTnLst>
+                    </p:cTn>
+                  </p:par>
+                </p:childTnLst>
+              </p:cTn>
+              <p:prevCondLst>
+                <p:cond evt="onPrev" delay="0">
+                  <p:tgtEl>
+                    <p:sldTgt/>
+                  </p:tgtEl>
+                </p:cond>
+              </p:prevCondLst>
+              <p:nextCondLst>
+                <p:cond evt="onNext" delay="0">
+                  <p:tgtEl>
+                    <p:sldTgt/>
+                  </p:tgtEl>
+                </p:cond>
+              </p:nextCondLst>
+            </p:seq>
+          </p:childTnLst>
+        </p:cTn>
       </p:par>
     </p:tnLst>
+    <p:bldLst>
+      <p:bldP spid="3" grpId="0" uiExpand="1" build="p"/>
+      <p:bldP spid="4" grpId="0" animBg="1"/>
+      <p:bldP spid="5" grpId="0" animBg="1"/>
+      <p:bldP spid="6" grpId="0" animBg="1"/>
+    </p:bldLst>
   </p:timing>
 </p:sld>
 </file>
@@ -35481,12 +36101,12 @@
       </p:sp>
       <p:sp>
         <p:nvSpPr>
-          <p:cNvPr id="3" name="Content Placeholder 2"/>
+          <p:cNvPr id="3" name="Text Placeholder 2"/>
           <p:cNvSpPr>
             <a:spLocks noGrp="1"/>
           </p:cNvSpPr>
           <p:nvPr>
-            <p:ph idx="1"/>
+            <p:ph type="body" idx="1"/>
           </p:nvPr>
         </p:nvSpPr>
         <p:spPr/>
@@ -35494,52 +36114,7 @@
           <a:bodyPr/>
           <a:lstStyle/>
           <a:p>
-            <a:r>
-              <a:rPr lang="en-US" dirty="0" smtClean="0"/>
-              <a:t>Contributes to the scientific method</a:t>
-            </a:r>
-          </a:p>
-          <a:p>
-            <a:pPr lvl="1"/>
-            <a:r>
-              <a:rPr lang="en-US" dirty="0" smtClean="0"/>
-              <a:t>Helps ensure reproducibility</a:t>
-            </a:r>
-          </a:p>
-          <a:p>
-            <a:r>
-              <a:rPr lang="en-US" dirty="0" smtClean="0"/>
-              <a:t>Record of change</a:t>
-            </a:r>
-          </a:p>
-          <a:p>
-            <a:pPr lvl="1"/>
-            <a:r>
-              <a:rPr lang="en-US" dirty="0" smtClean="0"/>
-              <a:t>What was changed?</a:t>
-            </a:r>
-          </a:p>
-          <a:p>
-            <a:pPr lvl="1"/>
-            <a:r>
-              <a:rPr lang="en-US" dirty="0" smtClean="0"/>
-              <a:t>When was it changed?</a:t>
-            </a:r>
-          </a:p>
-          <a:p>
-            <a:pPr lvl="1"/>
-            <a:r>
-              <a:rPr lang="en-US" dirty="0" smtClean="0"/>
-              <a:t>Who changed it?</a:t>
-            </a:r>
-          </a:p>
-          <a:p>
-            <a:pPr lvl="1"/>
-            <a:r>
-              <a:rPr lang="en-US" dirty="0" smtClean="0"/>
-              <a:t>Why was it changed?</a:t>
-            </a:r>
-            <a:endParaRPr lang="nl-BE" dirty="0"/>
+            <a:endParaRPr lang="nl-BE"/>
           </a:p>
         </p:txBody>
       </p:sp>
@@ -35561,6 +36136,153 @@
             <a:fld id="{BB52A05A-A776-4391-ACD7-D6BC34D3145C}" type="slidenum">
               <a:rPr lang="nl-BE" smtClean="0"/>
               <a:t>51</a:t>
+            </a:fld>
+            <a:endParaRPr lang="nl-BE"/>
+          </a:p>
+        </p:txBody>
+      </p:sp>
+    </p:spTree>
+    <p:extLst>
+      <p:ext uri="{BB962C8B-B14F-4D97-AF65-F5344CB8AC3E}">
+        <p14:creationId xmlns:p14="http://schemas.microsoft.com/office/powerpoint/2010/main" val="2763237186"/>
+      </p:ext>
+    </p:extLst>
+  </p:cSld>
+  <p:clrMapOvr>
+    <a:masterClrMapping/>
+  </p:clrMapOvr>
+  <p:timing>
+    <p:tnLst>
+      <p:par>
+        <p:cTn id="1" dur="indefinite" restart="never" nodeType="tmRoot"/>
+      </p:par>
+    </p:tnLst>
+  </p:timing>
+</p:sld>
+</file>
+
+<file path=ppt/slides/slide52.xml><?xml version="1.0" encoding="utf-8"?>
+<p:sld xmlns:a="http://schemas.openxmlformats.org/drawingml/2006/main" xmlns:r="http://schemas.openxmlformats.org/officeDocument/2006/relationships" xmlns:p="http://schemas.openxmlformats.org/presentationml/2006/main">
+  <p:cSld>
+    <p:spTree>
+      <p:nvGrpSpPr>
+        <p:cNvPr id="1" name=""/>
+        <p:cNvGrpSpPr/>
+        <p:nvPr/>
+      </p:nvGrpSpPr>
+      <p:grpSpPr>
+        <a:xfrm>
+          <a:off x="0" y="0"/>
+          <a:ext cx="0" cy="0"/>
+          <a:chOff x="0" y="0"/>
+          <a:chExt cx="0" cy="0"/>
+        </a:xfrm>
+      </p:grpSpPr>
+      <p:sp>
+        <p:nvSpPr>
+          <p:cNvPr id="2" name="Title 1"/>
+          <p:cNvSpPr>
+            <a:spLocks noGrp="1"/>
+          </p:cNvSpPr>
+          <p:nvPr>
+            <p:ph type="title"/>
+          </p:nvPr>
+        </p:nvSpPr>
+        <p:spPr/>
+        <p:txBody>
+          <a:bodyPr/>
+          <a:lstStyle/>
+          <a:p>
+            <a:r>
+              <a:rPr lang="en-US" dirty="0" smtClean="0"/>
+              <a:t>Conclusions</a:t>
+            </a:r>
+            <a:endParaRPr lang="nl-BE" dirty="0"/>
+          </a:p>
+        </p:txBody>
+      </p:sp>
+      <p:sp>
+        <p:nvSpPr>
+          <p:cNvPr id="3" name="Content Placeholder 2"/>
+          <p:cNvSpPr>
+            <a:spLocks noGrp="1"/>
+          </p:cNvSpPr>
+          <p:nvPr>
+            <p:ph idx="1"/>
+          </p:nvPr>
+        </p:nvSpPr>
+        <p:spPr/>
+        <p:txBody>
+          <a:bodyPr/>
+          <a:lstStyle/>
+          <a:p>
+            <a:r>
+              <a:rPr lang="en-US" dirty="0" smtClean="0"/>
+              <a:t>Contributes to the scientific method</a:t>
+            </a:r>
+          </a:p>
+          <a:p>
+            <a:pPr lvl="1"/>
+            <a:r>
+              <a:rPr lang="en-US" dirty="0" smtClean="0"/>
+              <a:t>Helps ensure reproducibility</a:t>
+            </a:r>
+          </a:p>
+          <a:p>
+            <a:r>
+              <a:rPr lang="en-US" dirty="0" smtClean="0"/>
+              <a:t>Record of change</a:t>
+            </a:r>
+          </a:p>
+          <a:p>
+            <a:pPr lvl="1"/>
+            <a:r>
+              <a:rPr lang="en-US" dirty="0" smtClean="0"/>
+              <a:t>What was changed?</a:t>
+            </a:r>
+          </a:p>
+          <a:p>
+            <a:pPr lvl="1"/>
+            <a:r>
+              <a:rPr lang="en-US" dirty="0" smtClean="0"/>
+              <a:t>When was it changed?</a:t>
+            </a:r>
+          </a:p>
+          <a:p>
+            <a:pPr lvl="1"/>
+            <a:r>
+              <a:rPr lang="en-US" dirty="0" smtClean="0"/>
+              <a:t>Who changed it?</a:t>
+            </a:r>
+          </a:p>
+          <a:p>
+            <a:pPr lvl="1"/>
+            <a:r>
+              <a:rPr lang="en-US" dirty="0" smtClean="0"/>
+              <a:t>Why was it changed?</a:t>
+            </a:r>
+            <a:endParaRPr lang="nl-BE" dirty="0"/>
+          </a:p>
+        </p:txBody>
+      </p:sp>
+      <p:sp>
+        <p:nvSpPr>
+          <p:cNvPr id="4" name="Slide Number Placeholder 3"/>
+          <p:cNvSpPr>
+            <a:spLocks noGrp="1"/>
+          </p:cNvSpPr>
+          <p:nvPr>
+            <p:ph type="sldNum" sz="quarter" idx="12"/>
+          </p:nvPr>
+        </p:nvSpPr>
+        <p:spPr/>
+        <p:txBody>
+          <a:bodyPr/>
+          <a:lstStyle/>
+          <a:p>
+            <a:fld id="{BB52A05A-A776-4391-ACD7-D6BC34D3145C}" type="slidenum">
+              <a:rPr lang="nl-BE" smtClean="0"/>
+              <a:t>52</a:t>
             </a:fld>
             <a:endParaRPr lang="nl-BE"/>
           </a:p>
@@ -35868,219 +36590,6 @@
 </p:sld>
 </file>
 
-<file path=ppt/slides/slide52.xml><?xml version="1.0" encoding="utf-8"?>
-<p:sld xmlns:a="http://schemas.openxmlformats.org/drawingml/2006/main" xmlns:r="http://schemas.openxmlformats.org/officeDocument/2006/relationships" xmlns:p="http://schemas.openxmlformats.org/presentationml/2006/main">
-  <p:cSld>
-    <p:spTree>
-      <p:nvGrpSpPr>
-        <p:cNvPr id="1" name=""/>
-        <p:cNvGrpSpPr/>
-        <p:nvPr/>
-      </p:nvGrpSpPr>
-      <p:grpSpPr>
-        <a:xfrm>
-          <a:off x="0" y="0"/>
-          <a:ext cx="0" cy="0"/>
-          <a:chOff x="0" y="0"/>
-          <a:chExt cx="0" cy="0"/>
-        </a:xfrm>
-      </p:grpSpPr>
-      <p:sp>
-        <p:nvSpPr>
-          <p:cNvPr id="2" name="Title 1"/>
-          <p:cNvSpPr>
-            <a:spLocks noGrp="1"/>
-          </p:cNvSpPr>
-          <p:nvPr>
-            <p:ph type="title"/>
-          </p:nvPr>
-        </p:nvSpPr>
-        <p:spPr/>
-        <p:txBody>
-          <a:bodyPr/>
-          <a:lstStyle/>
-          <a:p>
-            <a:r>
-              <a:rPr lang="en-US" dirty="0" smtClean="0"/>
-              <a:t>References</a:t>
-            </a:r>
-            <a:endParaRPr lang="nl-BE" dirty="0"/>
-          </a:p>
-        </p:txBody>
-      </p:sp>
-      <p:sp>
-        <p:nvSpPr>
-          <p:cNvPr id="3" name="Content Placeholder 2"/>
-          <p:cNvSpPr>
-            <a:spLocks noGrp="1"/>
-          </p:cNvSpPr>
-          <p:nvPr>
-            <p:ph idx="1"/>
-          </p:nvPr>
-        </p:nvSpPr>
-        <p:spPr/>
-        <p:txBody>
-          <a:bodyPr>
-            <a:normAutofit fontScale="92500"/>
-          </a:bodyPr>
-          <a:lstStyle/>
-          <a:p>
-            <a:r>
-              <a:rPr lang="en-US" dirty="0" smtClean="0"/>
-              <a:t>Online documentation (including movies)</a:t>
-            </a:r>
-          </a:p>
-          <a:p>
-            <a:pPr lvl="1"/>
-            <a:r>
-              <a:rPr lang="nl-BE" dirty="0" smtClean="0">
-                <a:hlinkClick r:id="rId2"/>
-              </a:rPr>
-              <a:t>http://git-scm.com/documentation</a:t>
-            </a:r>
-            <a:endParaRPr lang="nl-BE" dirty="0" smtClean="0"/>
-          </a:p>
-          <a:p>
-            <a:r>
-              <a:rPr lang="en-US" dirty="0" err="1"/>
-              <a:t>g</a:t>
-            </a:r>
-            <a:r>
-              <a:rPr lang="en-US" dirty="0" err="1" smtClean="0"/>
-              <a:t>it</a:t>
-            </a:r>
-            <a:r>
-              <a:rPr lang="en-US" dirty="0" smtClean="0"/>
-              <a:t> web site</a:t>
-            </a:r>
-          </a:p>
-          <a:p>
-            <a:pPr lvl="1"/>
-            <a:r>
-              <a:rPr lang="nl-BE" dirty="0" smtClean="0">
-                <a:hlinkClick r:id="rId3"/>
-              </a:rPr>
-              <a:t>http://git-scm.com/</a:t>
-            </a:r>
-            <a:endParaRPr lang="nl-BE" dirty="0" smtClean="0"/>
-          </a:p>
-          <a:p>
-            <a:r>
-              <a:rPr lang="en-US" dirty="0" smtClean="0"/>
-              <a:t>Why (the author thinks) you should switch to </a:t>
-            </a:r>
-            <a:r>
-              <a:rPr lang="en-US" dirty="0" err="1" smtClean="0"/>
-              <a:t>git</a:t>
-            </a:r>
-            <a:endParaRPr lang="en-US" dirty="0" smtClean="0"/>
-          </a:p>
-          <a:p>
-            <a:pPr lvl="1"/>
-            <a:r>
-              <a:rPr lang="nl-BE" dirty="0" smtClean="0">
-                <a:hlinkClick r:id="rId4"/>
-              </a:rPr>
-              <a:t>http://blog.teamtreehouse.com/why-you-should-switch-from-subversion-to-git</a:t>
-            </a:r>
-            <a:endParaRPr lang="nl-BE" dirty="0" smtClean="0"/>
-          </a:p>
-          <a:p>
-            <a:r>
-              <a:rPr lang="nl-BE" dirty="0" smtClean="0"/>
-              <a:t>An </a:t>
-            </a:r>
-            <a:r>
-              <a:rPr lang="nl-BE" dirty="0" err="1" smtClean="0"/>
-              <a:t>overview</a:t>
-            </a:r>
-            <a:r>
-              <a:rPr lang="nl-BE" dirty="0" smtClean="0"/>
-              <a:t> of </a:t>
-            </a:r>
-            <a:r>
-              <a:rPr lang="nl-BE" dirty="0" err="1" smtClean="0"/>
-              <a:t>frequently</a:t>
-            </a:r>
-            <a:r>
-              <a:rPr lang="nl-BE" dirty="0" smtClean="0"/>
-              <a:t> </a:t>
-            </a:r>
-            <a:r>
-              <a:rPr lang="nl-BE" dirty="0" err="1" smtClean="0"/>
-              <a:t>used</a:t>
-            </a:r>
-            <a:r>
-              <a:rPr lang="nl-BE" dirty="0" smtClean="0"/>
-              <a:t> git </a:t>
-            </a:r>
-            <a:r>
-              <a:rPr lang="nl-BE" dirty="0" err="1" smtClean="0"/>
-              <a:t>workflows</a:t>
-            </a:r>
-            <a:endParaRPr lang="nl-BE" dirty="0" smtClean="0"/>
-          </a:p>
-          <a:p>
-            <a:pPr lvl="1"/>
-            <a:r>
-              <a:rPr lang="en-US" dirty="0">
-                <a:hlinkClick r:id="rId5"/>
-              </a:rPr>
-              <a:t>https://</a:t>
-            </a:r>
-            <a:r>
-              <a:rPr lang="en-US" dirty="0" smtClean="0">
-                <a:hlinkClick r:id="rId5"/>
-              </a:rPr>
-              <a:t>www.atlassian.com/git/workflows</a:t>
-            </a:r>
-            <a:endParaRPr lang="nl-BE" dirty="0" smtClean="0"/>
-          </a:p>
-        </p:txBody>
-      </p:sp>
-      <p:sp>
-        <p:nvSpPr>
-          <p:cNvPr id="4" name="Slide Number Placeholder 3"/>
-          <p:cNvSpPr>
-            <a:spLocks noGrp="1"/>
-          </p:cNvSpPr>
-          <p:nvPr>
-            <p:ph type="sldNum" sz="quarter" idx="12"/>
-          </p:nvPr>
-        </p:nvSpPr>
-        <p:spPr/>
-        <p:txBody>
-          <a:bodyPr/>
-          <a:lstStyle/>
-          <a:p>
-            <a:fld id="{BB52A05A-A776-4391-ACD7-D6BC34D3145C}" type="slidenum">
-              <a:rPr lang="nl-BE" smtClean="0"/>
-              <a:t>52</a:t>
-            </a:fld>
-            <a:endParaRPr lang="nl-BE"/>
-          </a:p>
-        </p:txBody>
-      </p:sp>
-    </p:spTree>
-    <p:extLst>
-      <p:ext uri="{BB962C8B-B14F-4D97-AF65-F5344CB8AC3E}">
-        <p14:creationId xmlns:p14="http://schemas.microsoft.com/office/powerpoint/2010/main" val="2976133738"/>
-      </p:ext>
-    </p:extLst>
-  </p:cSld>
-  <p:clrMapOvr>
-    <a:masterClrMapping/>
-  </p:clrMapOvr>
-  <p:timing>
-    <p:tnLst>
-      <p:par>
-        <p:cTn id="1" dur="indefinite" restart="never" nodeType="tmRoot"/>
-      </p:par>
-    </p:tnLst>
-  </p:timing>
-</p:sld>
-</file>
-
 <file path=ppt/slides/slide53.xml><?xml version="1.0" encoding="utf-8"?>
 <p:sld xmlns:a="http://schemas.openxmlformats.org/drawingml/2006/main" xmlns:r="http://schemas.openxmlformats.org/officeDocument/2006/relationships" xmlns:p="http://schemas.openxmlformats.org/presentationml/2006/main">
   <p:cSld>
@@ -36115,6 +36624,219 @@
           <a:p>
             <a:r>
               <a:rPr lang="en-US" dirty="0" smtClean="0"/>
+              <a:t>References</a:t>
+            </a:r>
+            <a:endParaRPr lang="nl-BE" dirty="0"/>
+          </a:p>
+        </p:txBody>
+      </p:sp>
+      <p:sp>
+        <p:nvSpPr>
+          <p:cNvPr id="3" name="Content Placeholder 2"/>
+          <p:cNvSpPr>
+            <a:spLocks noGrp="1"/>
+          </p:cNvSpPr>
+          <p:nvPr>
+            <p:ph idx="1"/>
+          </p:nvPr>
+        </p:nvSpPr>
+        <p:spPr/>
+        <p:txBody>
+          <a:bodyPr>
+            <a:normAutofit fontScale="92500"/>
+          </a:bodyPr>
+          <a:lstStyle/>
+          <a:p>
+            <a:r>
+              <a:rPr lang="en-US" dirty="0" smtClean="0"/>
+              <a:t>Online documentation (including movies)</a:t>
+            </a:r>
+          </a:p>
+          <a:p>
+            <a:pPr lvl="1"/>
+            <a:r>
+              <a:rPr lang="nl-BE" dirty="0" smtClean="0">
+                <a:hlinkClick r:id="rId2"/>
+              </a:rPr>
+              <a:t>http://git-scm.com/documentation</a:t>
+            </a:r>
+            <a:endParaRPr lang="nl-BE" dirty="0" smtClean="0"/>
+          </a:p>
+          <a:p>
+            <a:r>
+              <a:rPr lang="en-US" dirty="0" err="1"/>
+              <a:t>g</a:t>
+            </a:r>
+            <a:r>
+              <a:rPr lang="en-US" dirty="0" err="1" smtClean="0"/>
+              <a:t>it</a:t>
+            </a:r>
+            <a:r>
+              <a:rPr lang="en-US" dirty="0" smtClean="0"/>
+              <a:t> web site</a:t>
+            </a:r>
+          </a:p>
+          <a:p>
+            <a:pPr lvl="1"/>
+            <a:r>
+              <a:rPr lang="nl-BE" dirty="0" smtClean="0">
+                <a:hlinkClick r:id="rId3"/>
+              </a:rPr>
+              <a:t>http://git-scm.com/</a:t>
+            </a:r>
+            <a:endParaRPr lang="nl-BE" dirty="0" smtClean="0"/>
+          </a:p>
+          <a:p>
+            <a:r>
+              <a:rPr lang="en-US" dirty="0" smtClean="0"/>
+              <a:t>Why (the author thinks) you should switch to </a:t>
+            </a:r>
+            <a:r>
+              <a:rPr lang="en-US" dirty="0" err="1" smtClean="0"/>
+              <a:t>git</a:t>
+            </a:r>
+            <a:endParaRPr lang="en-US" dirty="0" smtClean="0"/>
+          </a:p>
+          <a:p>
+            <a:pPr lvl="1"/>
+            <a:r>
+              <a:rPr lang="nl-BE" dirty="0" smtClean="0">
+                <a:hlinkClick r:id="rId4"/>
+              </a:rPr>
+              <a:t>http://blog.teamtreehouse.com/why-you-should-switch-from-subversion-to-git</a:t>
+            </a:r>
+            <a:endParaRPr lang="nl-BE" dirty="0" smtClean="0"/>
+          </a:p>
+          <a:p>
+            <a:r>
+              <a:rPr lang="nl-BE" dirty="0" smtClean="0"/>
+              <a:t>An </a:t>
+            </a:r>
+            <a:r>
+              <a:rPr lang="nl-BE" dirty="0" err="1" smtClean="0"/>
+              <a:t>overview</a:t>
+            </a:r>
+            <a:r>
+              <a:rPr lang="nl-BE" dirty="0" smtClean="0"/>
+              <a:t> of </a:t>
+            </a:r>
+            <a:r>
+              <a:rPr lang="nl-BE" dirty="0" err="1" smtClean="0"/>
+              <a:t>frequently</a:t>
+            </a:r>
+            <a:r>
+              <a:rPr lang="nl-BE" dirty="0" smtClean="0"/>
+              <a:t> </a:t>
+            </a:r>
+            <a:r>
+              <a:rPr lang="nl-BE" dirty="0" err="1" smtClean="0"/>
+              <a:t>used</a:t>
+            </a:r>
+            <a:r>
+              <a:rPr lang="nl-BE" dirty="0" smtClean="0"/>
+              <a:t> git </a:t>
+            </a:r>
+            <a:r>
+              <a:rPr lang="nl-BE" dirty="0" err="1" smtClean="0"/>
+              <a:t>workflows</a:t>
+            </a:r>
+            <a:endParaRPr lang="nl-BE" dirty="0" smtClean="0"/>
+          </a:p>
+          <a:p>
+            <a:pPr lvl="1"/>
+            <a:r>
+              <a:rPr lang="en-US" dirty="0">
+                <a:hlinkClick r:id="rId5"/>
+              </a:rPr>
+              <a:t>https://</a:t>
+            </a:r>
+            <a:r>
+              <a:rPr lang="en-US" dirty="0" smtClean="0">
+                <a:hlinkClick r:id="rId5"/>
+              </a:rPr>
+              <a:t>www.atlassian.com/git/workflows</a:t>
+            </a:r>
+            <a:endParaRPr lang="nl-BE" dirty="0" smtClean="0"/>
+          </a:p>
+        </p:txBody>
+      </p:sp>
+      <p:sp>
+        <p:nvSpPr>
+          <p:cNvPr id="4" name="Slide Number Placeholder 3"/>
+          <p:cNvSpPr>
+            <a:spLocks noGrp="1"/>
+          </p:cNvSpPr>
+          <p:nvPr>
+            <p:ph type="sldNum" sz="quarter" idx="12"/>
+          </p:nvPr>
+        </p:nvSpPr>
+        <p:spPr/>
+        <p:txBody>
+          <a:bodyPr/>
+          <a:lstStyle/>
+          <a:p>
+            <a:fld id="{BB52A05A-A776-4391-ACD7-D6BC34D3145C}" type="slidenum">
+              <a:rPr lang="nl-BE" smtClean="0"/>
+              <a:t>53</a:t>
+            </a:fld>
+            <a:endParaRPr lang="nl-BE"/>
+          </a:p>
+        </p:txBody>
+      </p:sp>
+    </p:spTree>
+    <p:extLst>
+      <p:ext uri="{BB962C8B-B14F-4D97-AF65-F5344CB8AC3E}">
+        <p14:creationId xmlns:p14="http://schemas.microsoft.com/office/powerpoint/2010/main" val="2976133738"/>
+      </p:ext>
+    </p:extLst>
+  </p:cSld>
+  <p:clrMapOvr>
+    <a:masterClrMapping/>
+  </p:clrMapOvr>
+  <p:timing>
+    <p:tnLst>
+      <p:par>
+        <p:cTn id="1" dur="indefinite" restart="never" nodeType="tmRoot"/>
+      </p:par>
+    </p:tnLst>
+  </p:timing>
+</p:sld>
+</file>
+
+<file path=ppt/slides/slide54.xml><?xml version="1.0" encoding="utf-8"?>
+<p:sld xmlns:a="http://schemas.openxmlformats.org/drawingml/2006/main" xmlns:r="http://schemas.openxmlformats.org/officeDocument/2006/relationships" xmlns:p="http://schemas.openxmlformats.org/presentationml/2006/main">
+  <p:cSld>
+    <p:spTree>
+      <p:nvGrpSpPr>
+        <p:cNvPr id="1" name=""/>
+        <p:cNvGrpSpPr/>
+        <p:nvPr/>
+      </p:nvGrpSpPr>
+      <p:grpSpPr>
+        <a:xfrm>
+          <a:off x="0" y="0"/>
+          <a:ext cx="0" cy="0"/>
+          <a:chOff x="0" y="0"/>
+          <a:chExt cx="0" cy="0"/>
+        </a:xfrm>
+      </p:grpSpPr>
+      <p:sp>
+        <p:nvSpPr>
+          <p:cNvPr id="2" name="Title 1"/>
+          <p:cNvSpPr>
+            <a:spLocks noGrp="1"/>
+          </p:cNvSpPr>
+          <p:nvPr>
+            <p:ph type="title"/>
+          </p:nvPr>
+        </p:nvSpPr>
+        <p:spPr/>
+        <p:txBody>
+          <a:bodyPr/>
+          <a:lstStyle/>
+          <a:p>
+            <a:r>
+              <a:rPr lang="en-US" dirty="0" smtClean="0"/>
               <a:t>Software &amp; tools</a:t>
             </a:r>
             <a:endParaRPr lang="nl-BE" dirty="0"/>
@@ -36375,7 +37097,7 @@
           <a:p>
             <a:fld id="{BB52A05A-A776-4391-ACD7-D6BC34D3145C}" type="slidenum">
               <a:rPr lang="nl-BE" smtClean="0"/>
-              <a:t>53</a:t>
+              <a:t>54</a:t>
             </a:fld>
             <a:endParaRPr lang="nl-BE"/>
           </a:p>

</xml_diff>

<commit_message>
Fixes for tags/branch names; merge workflow
</commit_message>
<xml_diff>
--- a/LinuxTools/VersionControl/version_control_git.pptx
+++ b/LinuxTools/VersionControl/version_control_git.pptx
@@ -354,7 +354,7 @@
           <a:p>
             <a:fld id="{11D3E7B2-0861-45F0-B59E-BA867D5C805D}" type="datetimeFigureOut">
               <a:rPr lang="nl-BE" smtClean="0"/>
-              <a:t>1/12/2016</a:t>
+              <a:t>13/12/2016</a:t>
             </a:fld>
             <a:endParaRPr lang="nl-BE"/>
           </a:p>
@@ -887,7 +887,7 @@
           <a:p>
             <a:fld id="{208C4982-2142-4DAC-808C-52C1A6ABA40A}" type="datetime1">
               <a:rPr lang="nl-BE" smtClean="0"/>
-              <a:t>1/12/2016</a:t>
+              <a:t>13/12/2016</a:t>
             </a:fld>
             <a:endParaRPr lang="nl-BE"/>
           </a:p>
@@ -1057,7 +1057,7 @@
           <a:p>
             <a:fld id="{596A4774-AA95-4CEA-9215-BE91EC5FD3A2}" type="datetime1">
               <a:rPr lang="nl-BE" smtClean="0"/>
-              <a:t>1/12/2016</a:t>
+              <a:t>13/12/2016</a:t>
             </a:fld>
             <a:endParaRPr lang="nl-BE"/>
           </a:p>
@@ -1237,7 +1237,7 @@
           <a:p>
             <a:fld id="{E3C938DE-9D5A-4A9D-B2A9-9053FBBA636A}" type="datetime1">
               <a:rPr lang="nl-BE" smtClean="0"/>
-              <a:t>1/12/2016</a:t>
+              <a:t>13/12/2016</a:t>
             </a:fld>
             <a:endParaRPr lang="nl-BE"/>
           </a:p>
@@ -1407,7 +1407,7 @@
           <a:p>
             <a:fld id="{70B73439-F632-4142-A813-39A8890A9414}" type="datetime1">
               <a:rPr lang="nl-BE" smtClean="0"/>
-              <a:t>1/12/2016</a:t>
+              <a:t>13/12/2016</a:t>
             </a:fld>
             <a:endParaRPr lang="nl-BE"/>
           </a:p>
@@ -1653,7 +1653,7 @@
           <a:p>
             <a:fld id="{2DA105E3-7574-4472-893A-A0C7A919BAE6}" type="datetime1">
               <a:rPr lang="nl-BE" smtClean="0"/>
-              <a:t>1/12/2016</a:t>
+              <a:t>13/12/2016</a:t>
             </a:fld>
             <a:endParaRPr lang="nl-BE"/>
           </a:p>
@@ -1941,7 +1941,7 @@
           <a:p>
             <a:fld id="{184B200F-AF61-4171-AE34-7A4B12E0FBA3}" type="datetime1">
               <a:rPr lang="nl-BE" smtClean="0"/>
-              <a:t>1/12/2016</a:t>
+              <a:t>13/12/2016</a:t>
             </a:fld>
             <a:endParaRPr lang="nl-BE"/>
           </a:p>
@@ -2363,7 +2363,7 @@
           <a:p>
             <a:fld id="{4DDD3743-DAF8-4465-AEC2-93735E02B3D0}" type="datetime1">
               <a:rPr lang="nl-BE" smtClean="0"/>
-              <a:t>1/12/2016</a:t>
+              <a:t>13/12/2016</a:t>
             </a:fld>
             <a:endParaRPr lang="nl-BE"/>
           </a:p>
@@ -2481,7 +2481,7 @@
           <a:p>
             <a:fld id="{0E48E2E9-C147-459B-ACCB-D6DDC51735D3}" type="datetime1">
               <a:rPr lang="nl-BE" smtClean="0"/>
-              <a:t>1/12/2016</a:t>
+              <a:t>13/12/2016</a:t>
             </a:fld>
             <a:endParaRPr lang="nl-BE"/>
           </a:p>
@@ -2576,7 +2576,7 @@
           <a:p>
             <a:fld id="{C92A24F5-0967-4B11-849A-0009476290B5}" type="datetime1">
               <a:rPr lang="nl-BE" smtClean="0"/>
-              <a:t>1/12/2016</a:t>
+              <a:t>13/12/2016</a:t>
             </a:fld>
             <a:endParaRPr lang="nl-BE"/>
           </a:p>
@@ -2853,7 +2853,7 @@
           <a:p>
             <a:fld id="{CAAB6B0C-E333-4316-A6EC-161EFC5CB4BD}" type="datetime1">
               <a:rPr lang="nl-BE" smtClean="0"/>
-              <a:t>1/12/2016</a:t>
+              <a:t>13/12/2016</a:t>
             </a:fld>
             <a:endParaRPr lang="nl-BE"/>
           </a:p>
@@ -3106,7 +3106,7 @@
           <a:p>
             <a:fld id="{5AC2428B-24E8-4004-8AB4-EA69DDAD1475}" type="datetime1">
               <a:rPr lang="nl-BE" smtClean="0"/>
-              <a:t>1/12/2016</a:t>
+              <a:t>13/12/2016</a:t>
             </a:fld>
             <a:endParaRPr lang="nl-BE"/>
           </a:p>
@@ -3319,7 +3319,7 @@
           <a:p>
             <a:fld id="{063E4CA3-87AF-44C9-B256-93720A95DFC3}" type="datetime1">
               <a:rPr lang="nl-BE" smtClean="0"/>
-              <a:t>1/12/2016</a:t>
+              <a:t>13/12/2016</a:t>
             </a:fld>
             <a:endParaRPr lang="nl-BE"/>
           </a:p>
@@ -28314,7 +28314,11 @@
             </a:pPr>
             <a:r>
               <a:rPr lang="en-US" dirty="0" smtClean="0"/>
-              <a:t>Resolve conflicts, if any</a:t>
+              <a:t>I</a:t>
+            </a:r>
+            <a:r>
+              <a:rPr lang="en-US" dirty="0" smtClean="0"/>
+              <a:t>f conflicts, resolve, commit</a:t>
             </a:r>
           </a:p>
           <a:p>
@@ -28322,10 +28326,7 @@
               <a:buFont typeface="+mj-lt"/>
               <a:buAutoNum type="arabicPeriod"/>
             </a:pPr>
-            <a:r>
-              <a:rPr lang="en-US" dirty="0" smtClean="0"/>
-              <a:t>Commit</a:t>
-            </a:r>
+            <a:endParaRPr lang="en-US" dirty="0" smtClean="0"/>
           </a:p>
           <a:p>
             <a:pPr marL="514350" indent="-514350">
@@ -28461,7 +28462,7 @@
         </p:nvSpPr>
         <p:spPr>
           <a:xfrm>
-            <a:off x="1187624" y="5723964"/>
+            <a:off x="1187624" y="4643844"/>
             <a:ext cx="5836854" cy="369332"/>
           </a:xfrm>
           <a:prstGeom prst="rect">
@@ -28788,55 +28789,6 @@
                                         <p:tgtEl>
                                           <p:spTgt spid="3">
                                             <p:txEl>
-                                              <p:pRg st="5" end="5"/>
-                                            </p:txEl>
-                                          </p:spTgt>
-                                        </p:tgtEl>
-                                        <p:attrNameLst>
-                                          <p:attrName>style.visibility</p:attrName>
-                                        </p:attrNameLst>
-                                      </p:cBhvr>
-                                      <p:to>
-                                        <p:strVal val="visible"/>
-                                      </p:to>
-                                    </p:set>
-                                  </p:childTnLst>
-                                </p:cTn>
-                              </p:par>
-                            </p:childTnLst>
-                          </p:cTn>
-                        </p:par>
-                      </p:childTnLst>
-                    </p:cTn>
-                  </p:par>
-                  <p:par>
-                    <p:cTn id="23" fill="hold">
-                      <p:stCondLst>
-                        <p:cond delay="indefinite"/>
-                      </p:stCondLst>
-                      <p:childTnLst>
-                        <p:par>
-                          <p:cTn id="24" fill="hold">
-                            <p:stCondLst>
-                              <p:cond delay="0"/>
-                            </p:stCondLst>
-                            <p:childTnLst>
-                              <p:par>
-                                <p:cTn id="25" presetID="1" presetClass="entr" presetSubtype="0" fill="hold" grpId="0" nodeType="clickEffect">
-                                  <p:stCondLst>
-                                    <p:cond delay="0"/>
-                                  </p:stCondLst>
-                                  <p:childTnLst>
-                                    <p:set>
-                                      <p:cBhvr>
-                                        <p:cTn id="26" dur="1" fill="hold">
-                                          <p:stCondLst>
-                                            <p:cond delay="0"/>
-                                          </p:stCondLst>
-                                        </p:cTn>
-                                        <p:tgtEl>
-                                          <p:spTgt spid="3">
-                                            <p:txEl>
                                               <p:pRg st="6" end="6"/>
                                             </p:txEl>
                                           </p:spTgt>
@@ -28853,14 +28805,14 @@
                                 </p:cTn>
                               </p:par>
                               <p:par>
-                                <p:cTn id="27" presetID="1" presetClass="entr" presetSubtype="0" fill="hold" grpId="0" nodeType="withEffect">
+                                <p:cTn id="23" presetID="1" presetClass="entr" presetSubtype="0" fill="hold" grpId="0" nodeType="withEffect">
                                   <p:stCondLst>
                                     <p:cond delay="0"/>
                                   </p:stCondLst>
                                   <p:childTnLst>
                                     <p:set>
                                       <p:cBhvr>
-                                        <p:cTn id="28" dur="1" fill="hold">
+                                        <p:cTn id="24" dur="1" fill="hold">
                                           <p:stCondLst>
                                             <p:cond delay="0"/>
                                           </p:stCondLst>
@@ -29786,22 +29738,34 @@
             <a:pPr lvl="2"/>
             <a:r>
               <a:rPr lang="en-US" dirty="0" smtClean="0"/>
-              <a:t>Tags</a:t>
-            </a:r>
+              <a:t>Tags, e.g., releases</a:t>
+            </a:r>
+            <a:endParaRPr lang="en-US" dirty="0" smtClean="0"/>
           </a:p>
           <a:p>
             <a:pPr lvl="3"/>
             <a:r>
-              <a:rPr lang="en-US" dirty="0" smtClean="0"/>
-              <a:t>release-1.0</a:t>
-            </a:r>
+              <a:rPr lang="en-US" dirty="0" smtClean="0">
+                <a:latin typeface="Courier New" panose="02070309020205020404" pitchFamily="49" charset="0"/>
+                <a:cs typeface="Courier New" panose="02070309020205020404" pitchFamily="49" charset="0"/>
+              </a:rPr>
+              <a:t>1.0</a:t>
+            </a:r>
+            <a:endParaRPr lang="en-US" dirty="0" smtClean="0"/>
           </a:p>
           <a:p>
             <a:pPr lvl="3"/>
             <a:r>
-              <a:rPr lang="en-US" dirty="0" smtClean="0"/>
-              <a:t>release-1.1</a:t>
-            </a:r>
+              <a:rPr lang="en-US" dirty="0" smtClean="0">
+                <a:latin typeface="Courier New" panose="02070309020205020404" pitchFamily="49" charset="0"/>
+                <a:cs typeface="Courier New" panose="02070309020205020404" pitchFamily="49" charset="0"/>
+              </a:rPr>
+              <a:t>1.1</a:t>
+            </a:r>
+            <a:endParaRPr lang="en-US" dirty="0" smtClean="0">
+              <a:latin typeface="Courier New" panose="02070309020205020404" pitchFamily="49" charset="0"/>
+              <a:cs typeface="Courier New" panose="02070309020205020404" pitchFamily="49" charset="0"/>
+            </a:endParaRPr>
           </a:p>
         </p:txBody>
       </p:sp>
@@ -32537,7 +32501,7 @@
         <p:spPr>
           <a:xfrm>
             <a:off x="1259632" y="2276872"/>
-            <a:ext cx="4752528" cy="369332"/>
+            <a:ext cx="6264696" cy="369332"/>
           </a:xfrm>
           <a:prstGeom prst="rect">
             <a:avLst/>
@@ -32560,35 +32524,21 @@
                 <a:latin typeface="Courier New" pitchFamily="49" charset="0"/>
                 <a:cs typeface="Courier New" pitchFamily="49" charset="0"/>
               </a:rPr>
-              <a:t>$ git </a:t>
-            </a:r>
-            <a:r>
-              <a:rPr lang="nl-BE" dirty="0" err="1" smtClean="0">
-                <a:latin typeface="Courier New" pitchFamily="49" charset="0"/>
-                <a:cs typeface="Courier New" pitchFamily="49" charset="0"/>
-              </a:rPr>
-              <a:t>branch</a:t>
+              <a:t>$ git branch  </a:t>
             </a:r>
             <a:r>
               <a:rPr lang="nl-BE" dirty="0" smtClean="0">
                 <a:latin typeface="Courier New" pitchFamily="49" charset="0"/>
                 <a:cs typeface="Courier New" pitchFamily="49" charset="0"/>
               </a:rPr>
-              <a:t>  </a:t>
-            </a:r>
-            <a:r>
-              <a:rPr lang="nl-BE" dirty="0" err="1" smtClean="0">
-                <a:latin typeface="Courier New" pitchFamily="49" charset="0"/>
-                <a:cs typeface="Courier New" pitchFamily="49" charset="0"/>
-              </a:rPr>
-              <a:t>bugfix</a:t>
+              <a:t>bugfix/memory_leak  </a:t>
             </a:r>
             <a:r>
               <a:rPr lang="nl-BE" dirty="0" smtClean="0">
                 <a:latin typeface="Courier New" pitchFamily="49" charset="0"/>
                 <a:cs typeface="Courier New" pitchFamily="49" charset="0"/>
               </a:rPr>
-              <a:t>  4fje24jd</a:t>
+              <a:t>4fje24jd</a:t>
             </a:r>
           </a:p>
         </p:txBody>
@@ -32601,8 +32551,8 @@
         </p:nvSpPr>
         <p:spPr>
           <a:xfrm>
-            <a:off x="1259632" y="3419708"/>
-            <a:ext cx="4752528" cy="369332"/>
+            <a:off x="1259632" y="3491716"/>
+            <a:ext cx="6264696" cy="369332"/>
           </a:xfrm>
           <a:prstGeom prst="rect">
             <a:avLst/>
@@ -32625,40 +32575,22 @@
                 <a:latin typeface="Courier New" pitchFamily="49" charset="0"/>
                 <a:cs typeface="Courier New" pitchFamily="49" charset="0"/>
               </a:rPr>
-              <a:t>$ git </a:t>
-            </a:r>
-            <a:r>
-              <a:rPr lang="nl-BE" dirty="0" err="1" smtClean="0">
-                <a:latin typeface="Courier New" pitchFamily="49" charset="0"/>
-                <a:cs typeface="Courier New" pitchFamily="49" charset="0"/>
-              </a:rPr>
-              <a:t>branch</a:t>
+              <a:t>$ git branch  </a:t>
             </a:r>
             <a:r>
               <a:rPr lang="nl-BE" dirty="0" smtClean="0">
                 <a:latin typeface="Courier New" pitchFamily="49" charset="0"/>
                 <a:cs typeface="Courier New" pitchFamily="49" charset="0"/>
               </a:rPr>
-              <a:t>  </a:t>
-            </a:r>
-            <a:r>
-              <a:rPr lang="nl-BE" dirty="0" err="1" smtClean="0">
+              <a:t>bugfix/memory_leak  </a:t>
+            </a:r>
+            <a:r>
+              <a:rPr lang="nl-BE" dirty="0" smtClean="0">
                 <a:latin typeface="Courier New" pitchFamily="49" charset="0"/>
                 <a:cs typeface="Courier New" pitchFamily="49" charset="0"/>
               </a:rPr>
-              <a:t>bugfix</a:t>
-            </a:r>
-            <a:r>
-              <a:rPr lang="nl-BE" smtClean="0">
-                <a:latin typeface="Courier New" pitchFamily="49" charset="0"/>
-                <a:cs typeface="Courier New" pitchFamily="49" charset="0"/>
-              </a:rPr>
-              <a:t>  1.0</a:t>
-            </a:r>
-            <a:endParaRPr lang="nl-BE" dirty="0" smtClean="0">
-              <a:latin typeface="Courier New" pitchFamily="49" charset="0"/>
-              <a:cs typeface="Courier New" pitchFamily="49" charset="0"/>
-            </a:endParaRPr>
+              <a:t>1.0</a:t>
+            </a:r>
           </a:p>
         </p:txBody>
       </p:sp>
@@ -33525,19 +33457,8 @@
                 <a:latin typeface="Courier New" pitchFamily="49" charset="0"/>
                 <a:cs typeface="Courier New" pitchFamily="49" charset="0"/>
               </a:rPr>
-              <a:t>$ git </a:t>
-            </a:r>
-            <a:r>
-              <a:rPr lang="nl-BE" dirty="0" smtClean="0">
-                <a:latin typeface="Courier New" pitchFamily="49" charset="0"/>
-                <a:cs typeface="Courier New" pitchFamily="49" charset="0"/>
-              </a:rPr>
-              <a:t>checkout some-other-branch</a:t>
-            </a:r>
-            <a:endParaRPr lang="nl-BE" dirty="0" smtClean="0">
-              <a:latin typeface="Courier New" pitchFamily="49" charset="0"/>
-              <a:cs typeface="Courier New" pitchFamily="49" charset="0"/>
-            </a:endParaRPr>
+              <a:t>$ git checkout some-other-branch</a:t>
+            </a:r>
           </a:p>
         </p:txBody>
       </p:sp>
@@ -33573,19 +33494,8 @@
                 <a:latin typeface="Courier New" pitchFamily="49" charset="0"/>
                 <a:cs typeface="Courier New" pitchFamily="49" charset="0"/>
               </a:rPr>
-              <a:t>$ git </a:t>
-            </a:r>
-            <a:r>
-              <a:rPr lang="nl-BE" dirty="0" smtClean="0">
-                <a:latin typeface="Courier New" pitchFamily="49" charset="0"/>
-                <a:cs typeface="Courier New" pitchFamily="49" charset="0"/>
-              </a:rPr>
-              <a:t>checkout my-original-branch</a:t>
-            </a:r>
-            <a:endParaRPr lang="nl-BE" dirty="0" smtClean="0">
-              <a:latin typeface="Courier New" pitchFamily="49" charset="0"/>
-              <a:cs typeface="Courier New" pitchFamily="49" charset="0"/>
-            </a:endParaRPr>
+              <a:t>$ git checkout my-original-branch</a:t>
+            </a:r>
           </a:p>
         </p:txBody>
       </p:sp>
@@ -33621,19 +33531,8 @@
                 <a:latin typeface="Courier New" pitchFamily="49" charset="0"/>
                 <a:cs typeface="Courier New" pitchFamily="49" charset="0"/>
               </a:rPr>
-              <a:t>$ git </a:t>
-            </a:r>
-            <a:r>
-              <a:rPr lang="nl-BE" dirty="0" smtClean="0">
-                <a:latin typeface="Courier New" pitchFamily="49" charset="0"/>
-                <a:cs typeface="Courier New" pitchFamily="49" charset="0"/>
-              </a:rPr>
-              <a:t>stash pop</a:t>
-            </a:r>
-            <a:endParaRPr lang="nl-BE" dirty="0" smtClean="0">
-              <a:latin typeface="Courier New" pitchFamily="49" charset="0"/>
-              <a:cs typeface="Courier New" pitchFamily="49" charset="0"/>
-            </a:endParaRPr>
+              <a:t>$ git stash pop</a:t>
+            </a:r>
           </a:p>
         </p:txBody>
       </p:sp>
@@ -33669,19 +33568,8 @@
                 <a:latin typeface="Courier New" pitchFamily="49" charset="0"/>
                 <a:cs typeface="Courier New" pitchFamily="49" charset="0"/>
               </a:rPr>
-              <a:t>$ git </a:t>
-            </a:r>
-            <a:r>
-              <a:rPr lang="nl-BE" dirty="0" smtClean="0">
-                <a:latin typeface="Courier New" pitchFamily="49" charset="0"/>
-                <a:cs typeface="Courier New" pitchFamily="49" charset="0"/>
-              </a:rPr>
-              <a:t>stash</a:t>
-            </a:r>
-            <a:endParaRPr lang="nl-BE" dirty="0" smtClean="0">
-              <a:latin typeface="Courier New" pitchFamily="49" charset="0"/>
-              <a:cs typeface="Courier New" pitchFamily="49" charset="0"/>
-            </a:endParaRPr>
+              <a:t>$ git stash</a:t>
+            </a:r>
           </a:p>
         </p:txBody>
       </p:sp>
@@ -34255,11 +34143,7 @@
           <a:p>
             <a:r>
               <a:rPr lang="en-US" dirty="0" smtClean="0"/>
-              <a:t>Micro-managing </a:t>
-            </a:r>
-            <a:r>
-              <a:rPr lang="en-US" dirty="0" smtClean="0"/>
-              <a:t>commits/merges</a:t>
+              <a:t>Micro-managing commits/merges</a:t>
             </a:r>
           </a:p>
           <a:p>

</xml_diff>

<commit_message>
Added slide on version control services
</commit_message>
<xml_diff>
--- a/LinuxTools/VersionControl/version_control_git.pptx
+++ b/LinuxTools/VersionControl/version_control_git.pptx
@@ -5,7 +5,7 @@
     <p:sldMasterId id="2147483648" r:id="rId1"/>
   </p:sldMasterIdLst>
   <p:notesMasterIdLst>
-    <p:notesMasterId r:id="rId56"/>
+    <p:notesMasterId r:id="rId57"/>
   </p:notesMasterIdLst>
   <p:sldIdLst>
     <p:sldId id="256" r:id="rId2"/>
@@ -62,6 +62,7 @@
     <p:sldId id="301" r:id="rId53"/>
     <p:sldId id="299" r:id="rId54"/>
     <p:sldId id="310" r:id="rId55"/>
+    <p:sldId id="313" r:id="rId56"/>
   </p:sldIdLst>
   <p:sldSz cx="9144000" cy="6858000" type="screen4x3"/>
   <p:notesSz cx="6858000" cy="9144000"/>
@@ -235,6 +236,7 @@
             <p14:sldId id="301"/>
             <p14:sldId id="299"/>
             <p14:sldId id="310"/>
+            <p14:sldId id="313"/>
           </p14:sldIdLst>
         </p14:section>
       </p14:sectionLst>
@@ -354,7 +356,7 @@
           <a:p>
             <a:fld id="{11D3E7B2-0861-45F0-B59E-BA867D5C805D}" type="datetimeFigureOut">
               <a:rPr lang="nl-BE" smtClean="0"/>
-              <a:t>13/12/2016</a:t>
+              <a:t>2016-12-19</a:t>
             </a:fld>
             <a:endParaRPr lang="nl-BE"/>
           </a:p>
@@ -887,7 +889,7 @@
           <a:p>
             <a:fld id="{208C4982-2142-4DAC-808C-52C1A6ABA40A}" type="datetime1">
               <a:rPr lang="nl-BE" smtClean="0"/>
-              <a:t>13/12/2016</a:t>
+              <a:t>2016-12-19</a:t>
             </a:fld>
             <a:endParaRPr lang="nl-BE"/>
           </a:p>
@@ -1057,7 +1059,7 @@
           <a:p>
             <a:fld id="{596A4774-AA95-4CEA-9215-BE91EC5FD3A2}" type="datetime1">
               <a:rPr lang="nl-BE" smtClean="0"/>
-              <a:t>13/12/2016</a:t>
+              <a:t>2016-12-19</a:t>
             </a:fld>
             <a:endParaRPr lang="nl-BE"/>
           </a:p>
@@ -1237,7 +1239,7 @@
           <a:p>
             <a:fld id="{E3C938DE-9D5A-4A9D-B2A9-9053FBBA636A}" type="datetime1">
               <a:rPr lang="nl-BE" smtClean="0"/>
-              <a:t>13/12/2016</a:t>
+              <a:t>2016-12-19</a:t>
             </a:fld>
             <a:endParaRPr lang="nl-BE"/>
           </a:p>
@@ -1407,7 +1409,7 @@
           <a:p>
             <a:fld id="{70B73439-F632-4142-A813-39A8890A9414}" type="datetime1">
               <a:rPr lang="nl-BE" smtClean="0"/>
-              <a:t>13/12/2016</a:t>
+              <a:t>2016-12-19</a:t>
             </a:fld>
             <a:endParaRPr lang="nl-BE"/>
           </a:p>
@@ -1653,7 +1655,7 @@
           <a:p>
             <a:fld id="{2DA105E3-7574-4472-893A-A0C7A919BAE6}" type="datetime1">
               <a:rPr lang="nl-BE" smtClean="0"/>
-              <a:t>13/12/2016</a:t>
+              <a:t>2016-12-19</a:t>
             </a:fld>
             <a:endParaRPr lang="nl-BE"/>
           </a:p>
@@ -1941,7 +1943,7 @@
           <a:p>
             <a:fld id="{184B200F-AF61-4171-AE34-7A4B12E0FBA3}" type="datetime1">
               <a:rPr lang="nl-BE" smtClean="0"/>
-              <a:t>13/12/2016</a:t>
+              <a:t>2016-12-19</a:t>
             </a:fld>
             <a:endParaRPr lang="nl-BE"/>
           </a:p>
@@ -2363,7 +2365,7 @@
           <a:p>
             <a:fld id="{4DDD3743-DAF8-4465-AEC2-93735E02B3D0}" type="datetime1">
               <a:rPr lang="nl-BE" smtClean="0"/>
-              <a:t>13/12/2016</a:t>
+              <a:t>2016-12-19</a:t>
             </a:fld>
             <a:endParaRPr lang="nl-BE"/>
           </a:p>
@@ -2481,7 +2483,7 @@
           <a:p>
             <a:fld id="{0E48E2E9-C147-459B-ACCB-D6DDC51735D3}" type="datetime1">
               <a:rPr lang="nl-BE" smtClean="0"/>
-              <a:t>13/12/2016</a:t>
+              <a:t>2016-12-19</a:t>
             </a:fld>
             <a:endParaRPr lang="nl-BE"/>
           </a:p>
@@ -2576,7 +2578,7 @@
           <a:p>
             <a:fld id="{C92A24F5-0967-4B11-849A-0009476290B5}" type="datetime1">
               <a:rPr lang="nl-BE" smtClean="0"/>
-              <a:t>13/12/2016</a:t>
+              <a:t>2016-12-19</a:t>
             </a:fld>
             <a:endParaRPr lang="nl-BE"/>
           </a:p>
@@ -2853,7 +2855,7 @@
           <a:p>
             <a:fld id="{CAAB6B0C-E333-4316-A6EC-161EFC5CB4BD}" type="datetime1">
               <a:rPr lang="nl-BE" smtClean="0"/>
-              <a:t>13/12/2016</a:t>
+              <a:t>2016-12-19</a:t>
             </a:fld>
             <a:endParaRPr lang="nl-BE"/>
           </a:p>
@@ -3106,7 +3108,7 @@
           <a:p>
             <a:fld id="{5AC2428B-24E8-4004-8AB4-EA69DDAD1475}" type="datetime1">
               <a:rPr lang="nl-BE" smtClean="0"/>
-              <a:t>13/12/2016</a:t>
+              <a:t>2016-12-19</a:t>
             </a:fld>
             <a:endParaRPr lang="nl-BE"/>
           </a:p>
@@ -3319,7 +3321,7 @@
           <a:p>
             <a:fld id="{063E4CA3-87AF-44C9-B256-93720A95DFC3}" type="datetime1">
               <a:rPr lang="nl-BE" smtClean="0"/>
-              <a:t>13/12/2016</a:t>
+              <a:t>2016-12-19</a:t>
             </a:fld>
             <a:endParaRPr lang="nl-BE"/>
           </a:p>
@@ -28314,11 +28316,7 @@
             </a:pPr>
             <a:r>
               <a:rPr lang="en-US" dirty="0" smtClean="0"/>
-              <a:t>I</a:t>
-            </a:r>
-            <a:r>
-              <a:rPr lang="en-US" dirty="0" smtClean="0"/>
-              <a:t>f conflicts, resolve, commit</a:t>
+              <a:t>If conflicts, resolve, commit</a:t>
             </a:r>
           </a:p>
           <a:p>
@@ -29740,7 +29738,6 @@
               <a:rPr lang="en-US" dirty="0" smtClean="0"/>
               <a:t>Tags, e.g., releases</a:t>
             </a:r>
-            <a:endParaRPr lang="en-US" dirty="0" smtClean="0"/>
           </a:p>
           <a:p>
             <a:pPr lvl="3"/>
@@ -29762,10 +29759,6 @@
               </a:rPr>
               <a:t>1.1</a:t>
             </a:r>
-            <a:endParaRPr lang="en-US" dirty="0" smtClean="0">
-              <a:latin typeface="Courier New" panose="02070309020205020404" pitchFamily="49" charset="0"/>
-              <a:cs typeface="Courier New" panose="02070309020205020404" pitchFamily="49" charset="0"/>
-            </a:endParaRPr>
           </a:p>
         </p:txBody>
       </p:sp>
@@ -32524,21 +32517,7 @@
                 <a:latin typeface="Courier New" pitchFamily="49" charset="0"/>
                 <a:cs typeface="Courier New" pitchFamily="49" charset="0"/>
               </a:rPr>
-              <a:t>$ git branch  </a:t>
-            </a:r>
-            <a:r>
-              <a:rPr lang="nl-BE" dirty="0" smtClean="0">
-                <a:latin typeface="Courier New" pitchFamily="49" charset="0"/>
-                <a:cs typeface="Courier New" pitchFamily="49" charset="0"/>
-              </a:rPr>
-              <a:t>bugfix/memory_leak  </a:t>
-            </a:r>
-            <a:r>
-              <a:rPr lang="nl-BE" dirty="0" smtClean="0">
-                <a:latin typeface="Courier New" pitchFamily="49" charset="0"/>
-                <a:cs typeface="Courier New" pitchFamily="49" charset="0"/>
-              </a:rPr>
-              <a:t>4fje24jd</a:t>
+              <a:t>$ git branch  bugfix/memory_leak  4fje24jd</a:t>
             </a:r>
           </a:p>
         </p:txBody>
@@ -32575,21 +32554,7 @@
                 <a:latin typeface="Courier New" pitchFamily="49" charset="0"/>
                 <a:cs typeface="Courier New" pitchFamily="49" charset="0"/>
               </a:rPr>
-              <a:t>$ git branch  </a:t>
-            </a:r>
-            <a:r>
-              <a:rPr lang="nl-BE" dirty="0" smtClean="0">
-                <a:latin typeface="Courier New" pitchFamily="49" charset="0"/>
-                <a:cs typeface="Courier New" pitchFamily="49" charset="0"/>
-              </a:rPr>
-              <a:t>bugfix/memory_leak  </a:t>
-            </a:r>
-            <a:r>
-              <a:rPr lang="nl-BE" dirty="0" smtClean="0">
-                <a:latin typeface="Courier New" pitchFamily="49" charset="0"/>
-                <a:cs typeface="Courier New" pitchFamily="49" charset="0"/>
-              </a:rPr>
-              <a:t>1.0</a:t>
+              <a:t>$ git branch  bugfix/memory_leak  1.0</a:t>
             </a:r>
           </a:p>
         </p:txBody>
@@ -37004,6 +36969,193 @@
       </p:par>
     </p:tnLst>
   </p:timing>
+</p:sld>
+</file>
+
+<file path=ppt/slides/slide55.xml><?xml version="1.0" encoding="utf-8"?>
+<p:sld xmlns:a="http://schemas.openxmlformats.org/drawingml/2006/main" xmlns:r="http://schemas.openxmlformats.org/officeDocument/2006/relationships" xmlns:p="http://schemas.openxmlformats.org/presentationml/2006/main">
+  <p:cSld>
+    <p:spTree>
+      <p:nvGrpSpPr>
+        <p:cNvPr id="1" name=""/>
+        <p:cNvGrpSpPr/>
+        <p:nvPr/>
+      </p:nvGrpSpPr>
+      <p:grpSpPr>
+        <a:xfrm>
+          <a:off x="0" y="0"/>
+          <a:ext cx="0" cy="0"/>
+          <a:chOff x="0" y="0"/>
+          <a:chExt cx="0" cy="0"/>
+        </a:xfrm>
+      </p:grpSpPr>
+      <p:sp>
+        <p:nvSpPr>
+          <p:cNvPr id="2" name="Title 1"/>
+          <p:cNvSpPr>
+            <a:spLocks noGrp="1"/>
+          </p:cNvSpPr>
+          <p:nvPr>
+            <p:ph type="title"/>
+          </p:nvPr>
+        </p:nvSpPr>
+        <p:spPr/>
+        <p:txBody>
+          <a:bodyPr/>
+          <a:lstStyle/>
+          <a:p>
+            <a:r>
+              <a:rPr lang="en-US" dirty="0" smtClean="0"/>
+              <a:t>Services</a:t>
+            </a:r>
+            <a:endParaRPr lang="nl-BE" dirty="0"/>
+          </a:p>
+        </p:txBody>
+      </p:sp>
+      <p:sp>
+        <p:nvSpPr>
+          <p:cNvPr id="3" name="Content Placeholder 2"/>
+          <p:cNvSpPr>
+            <a:spLocks noGrp="1"/>
+          </p:cNvSpPr>
+          <p:nvPr>
+            <p:ph idx="1"/>
+          </p:nvPr>
+        </p:nvSpPr>
+        <p:spPr/>
+        <p:txBody>
+          <a:bodyPr>
+            <a:normAutofit fontScale="85000" lnSpcReduction="10000"/>
+          </a:bodyPr>
+          <a:lstStyle/>
+          <a:p>
+            <a:r>
+              <a:rPr lang="en-US" dirty="0" smtClean="0"/>
+              <a:t>KU Leuven: </a:t>
+            </a:r>
+            <a:r>
+              <a:rPr lang="en-US" dirty="0">
+                <a:hlinkClick r:id="rId2"/>
+              </a:rPr>
+              <a:t>SVS </a:t>
+            </a:r>
+            <a:r>
+              <a:rPr lang="en-US" dirty="0" smtClean="0">
+                <a:hlinkClick r:id="rId2"/>
+              </a:rPr>
+              <a:t>service</a:t>
+            </a:r>
+            <a:endParaRPr lang="en-US" dirty="0" smtClean="0"/>
+          </a:p>
+          <a:p>
+            <a:pPr lvl="1"/>
+            <a:r>
+              <a:rPr lang="en-US" dirty="0" smtClean="0"/>
+              <a:t>Issue tracking, wiki, hosted </a:t>
+            </a:r>
+            <a:r>
+              <a:rPr lang="en-US" dirty="0" err="1" smtClean="0"/>
+              <a:t>on-premise</a:t>
+            </a:r>
+            <a:endParaRPr lang="en-US" sz="1600" dirty="0" smtClean="0"/>
+          </a:p>
+          <a:p>
+            <a:r>
+              <a:rPr lang="en-US" dirty="0" smtClean="0">
+                <a:hlinkClick r:id="rId3"/>
+              </a:rPr>
+              <a:t>GitHub</a:t>
+            </a:r>
+            <a:endParaRPr lang="en-US" dirty="0" smtClean="0"/>
+          </a:p>
+          <a:p>
+            <a:pPr lvl="1"/>
+            <a:r>
+              <a:rPr lang="en-US" dirty="0" smtClean="0"/>
+              <a:t>Issue tracking, pull requests, code reviews, wiki, release management, forking, non-free </a:t>
+            </a:r>
+            <a:r>
+              <a:rPr lang="en-US" smtClean="0"/>
+              <a:t>private repositories</a:t>
+            </a:r>
+            <a:endParaRPr lang="en-US" dirty="0" smtClean="0"/>
+          </a:p>
+          <a:p>
+            <a:r>
+              <a:rPr lang="en-US" dirty="0" err="1" smtClean="0">
+                <a:hlinkClick r:id="rId4"/>
+              </a:rPr>
+              <a:t>GitLab</a:t>
+            </a:r>
+            <a:endParaRPr lang="en-US" dirty="0" smtClean="0"/>
+          </a:p>
+          <a:p>
+            <a:pPr lvl="1"/>
+            <a:r>
+              <a:rPr lang="en-US" dirty="0" smtClean="0"/>
+              <a:t>Issue tracking, pull requests, fine grained access control, wiki, release management, forking, private repositories</a:t>
+            </a:r>
+          </a:p>
+          <a:p>
+            <a:r>
+              <a:rPr lang="en-US" dirty="0" err="1" smtClean="0">
+                <a:hlinkClick r:id="rId5"/>
+              </a:rPr>
+              <a:t>BitBucket</a:t>
+            </a:r>
+            <a:endParaRPr lang="en-US" dirty="0" smtClean="0"/>
+          </a:p>
+          <a:p>
+            <a:pPr lvl="1"/>
+            <a:r>
+              <a:rPr lang="en-US" dirty="0"/>
+              <a:t>Issue tracking, pull requests, fine grained access control, wiki, release management, </a:t>
+            </a:r>
+            <a:r>
+              <a:rPr lang="en-US" dirty="0" smtClean="0"/>
+              <a:t>forking, private repositories</a:t>
+            </a:r>
+            <a:endParaRPr lang="en-US" dirty="0"/>
+          </a:p>
+          <a:p>
+            <a:pPr lvl="1"/>
+            <a:endParaRPr lang="nl-BE" dirty="0"/>
+          </a:p>
+        </p:txBody>
+      </p:sp>
+      <p:sp>
+        <p:nvSpPr>
+          <p:cNvPr id="4" name="Slide Number Placeholder 3"/>
+          <p:cNvSpPr>
+            <a:spLocks noGrp="1"/>
+          </p:cNvSpPr>
+          <p:nvPr>
+            <p:ph type="sldNum" sz="quarter" idx="12"/>
+          </p:nvPr>
+        </p:nvSpPr>
+        <p:spPr/>
+        <p:txBody>
+          <a:bodyPr/>
+          <a:lstStyle/>
+          <a:p>
+            <a:fld id="{BB52A05A-A776-4391-ACD7-D6BC34D3145C}" type="slidenum">
+              <a:rPr lang="nl-BE" smtClean="0"/>
+              <a:t>55</a:t>
+            </a:fld>
+            <a:endParaRPr lang="nl-BE"/>
+          </a:p>
+        </p:txBody>
+      </p:sp>
+    </p:spTree>
+    <p:extLst>
+      <p:ext uri="{BB962C8B-B14F-4D97-AF65-F5344CB8AC3E}">
+        <p14:creationId xmlns:p14="http://schemas.microsoft.com/office/powerpoint/2010/main" val="1818079738"/>
+      </p:ext>
+    </p:extLst>
+  </p:cSld>
+  <p:clrMapOvr>
+    <a:masterClrMapping/>
+  </p:clrMapOvr>
 </p:sld>
 </file>
 

</xml_diff>

<commit_message>
Added slides on how to contribute/receive contributions
</commit_message>
<xml_diff>
--- a/LinuxTools/VersionControl/version_control_git.pptx
+++ b/LinuxTools/VersionControl/version_control_git.pptx
@@ -5,7 +5,7 @@
     <p:sldMasterId id="2147483648" r:id="rId1"/>
   </p:sldMasterIdLst>
   <p:notesMasterIdLst>
-    <p:notesMasterId r:id="rId57"/>
+    <p:notesMasterId r:id="rId60"/>
   </p:notesMasterIdLst>
   <p:sldIdLst>
     <p:sldId id="256" r:id="rId2"/>
@@ -58,11 +58,14 @@
     <p:sldId id="312" r:id="rId49"/>
     <p:sldId id="307" r:id="rId50"/>
     <p:sldId id="309" r:id="rId51"/>
-    <p:sldId id="300" r:id="rId52"/>
-    <p:sldId id="301" r:id="rId53"/>
-    <p:sldId id="299" r:id="rId54"/>
-    <p:sldId id="310" r:id="rId55"/>
-    <p:sldId id="313" r:id="rId56"/>
+    <p:sldId id="314" r:id="rId52"/>
+    <p:sldId id="315" r:id="rId53"/>
+    <p:sldId id="316" r:id="rId54"/>
+    <p:sldId id="300" r:id="rId55"/>
+    <p:sldId id="301" r:id="rId56"/>
+    <p:sldId id="299" r:id="rId57"/>
+    <p:sldId id="310" r:id="rId58"/>
+    <p:sldId id="313" r:id="rId59"/>
   </p:sldIdLst>
   <p:sldSz cx="9144000" cy="6858000" type="screen4x3"/>
   <p:notesSz cx="6858000" cy="9144000"/>
@@ -228,6 +231,9 @@
             <p14:sldId id="312"/>
             <p14:sldId id="307"/>
             <p14:sldId id="309"/>
+            <p14:sldId id="314"/>
+            <p14:sldId id="315"/>
+            <p14:sldId id="316"/>
           </p14:sldIdLst>
         </p14:section>
         <p14:section name="Conclusions" id="{DDEBC1E0-752D-48F0-A4FC-55A760B7B208}">
@@ -689,7 +695,7 @@
           <a:p>
             <a:fld id="{1A571F42-F258-455F-A3F1-D2E86FDFEB4C}" type="slidenum">
               <a:rPr lang="nl-BE" smtClean="0"/>
-              <a:t>54</a:t>
+              <a:t>57</a:t>
             </a:fld>
             <a:endParaRPr lang="nl-BE"/>
           </a:p>
@@ -35942,7 +35948,7 @@
           <a:p>
             <a:r>
               <a:rPr lang="en-US" dirty="0" smtClean="0"/>
-              <a:t>Conclusions</a:t>
+              <a:t>Contributing</a:t>
             </a:r>
             <a:endParaRPr lang="nl-BE" dirty="0"/>
           </a:p>
@@ -35993,7 +35999,7 @@
     </p:spTree>
     <p:extLst>
       <p:ext uri="{BB962C8B-B14F-4D97-AF65-F5344CB8AC3E}">
-        <p14:creationId xmlns:p14="http://schemas.microsoft.com/office/powerpoint/2010/main" val="2763237186"/>
+        <p14:creationId xmlns:p14="http://schemas.microsoft.com/office/powerpoint/2010/main" val="2575227797"/>
       </p:ext>
     </p:extLst>
   </p:cSld>
@@ -36044,7 +36050,629 @@
           <a:p>
             <a:r>
               <a:rPr lang="en-US" dirty="0" smtClean="0"/>
-              <a:t>Conclusions</a:t>
+              <a:t>Contributing</a:t>
+            </a:r>
+            <a:endParaRPr lang="nl-BE" dirty="0"/>
+          </a:p>
+        </p:txBody>
+      </p:sp>
+      <p:sp>
+        <p:nvSpPr>
+          <p:cNvPr id="3" name="Content Placeholder 2"/>
+          <p:cNvSpPr>
+            <a:spLocks noGrp="1"/>
+          </p:cNvSpPr>
+          <p:nvPr>
+            <p:ph idx="1"/>
+          </p:nvPr>
+        </p:nvSpPr>
+        <p:spPr/>
+        <p:txBody>
+          <a:bodyPr>
+            <a:normAutofit lnSpcReduction="10000"/>
+          </a:bodyPr>
+          <a:lstStyle/>
+          <a:p>
+            <a:r>
+              <a:rPr lang="en-US" dirty="0" smtClean="0"/>
+              <a:t>Contribute to someone else's project, e.g.,</a:t>
+            </a:r>
+          </a:p>
+          <a:p>
+            <a:pPr lvl="1"/>
+            <a:r>
+              <a:rPr lang="en-US" dirty="0" smtClean="0"/>
+              <a:t>Open source project</a:t>
+            </a:r>
+          </a:p>
+          <a:p>
+            <a:pPr lvl="1"/>
+            <a:r>
+              <a:rPr lang="en-US" dirty="0" smtClean="0"/>
+              <a:t>Research project you're involved in</a:t>
+            </a:r>
+          </a:p>
+          <a:p>
+            <a:r>
+              <a:rPr lang="en-US" dirty="0" smtClean="0"/>
+              <a:t>Can be done without write access to project</a:t>
+            </a:r>
+          </a:p>
+          <a:p>
+            <a:pPr lvl="1"/>
+            <a:r>
+              <a:rPr lang="en-US" dirty="0" smtClean="0"/>
+              <a:t>Create your own copy by forking</a:t>
+            </a:r>
+          </a:p>
+          <a:p>
+            <a:pPr lvl="1"/>
+            <a:r>
+              <a:rPr lang="en-US" dirty="0" smtClean="0"/>
+              <a:t>Create a branch for implementation</a:t>
+            </a:r>
+          </a:p>
+          <a:p>
+            <a:pPr lvl="1"/>
+            <a:r>
+              <a:rPr lang="en-US" dirty="0" smtClean="0"/>
+              <a:t>Implement, test</a:t>
+            </a:r>
+          </a:p>
+          <a:p>
+            <a:pPr lvl="1"/>
+            <a:r>
+              <a:rPr lang="en-US" dirty="0" smtClean="0"/>
+              <a:t>Create a pull request for your branch against original repository</a:t>
+            </a:r>
+            <a:endParaRPr lang="nl-BE" dirty="0"/>
+          </a:p>
+        </p:txBody>
+      </p:sp>
+      <p:sp>
+        <p:nvSpPr>
+          <p:cNvPr id="4" name="Slide Number Placeholder 3"/>
+          <p:cNvSpPr>
+            <a:spLocks noGrp="1"/>
+          </p:cNvSpPr>
+          <p:nvPr>
+            <p:ph type="sldNum" sz="quarter" idx="12"/>
+          </p:nvPr>
+        </p:nvSpPr>
+        <p:spPr/>
+        <p:txBody>
+          <a:bodyPr/>
+          <a:lstStyle/>
+          <a:p>
+            <a:fld id="{BB52A05A-A776-4391-ACD7-D6BC34D3145C}" type="slidenum">
+              <a:rPr lang="nl-BE" smtClean="0"/>
+              <a:t>52</a:t>
+            </a:fld>
+            <a:endParaRPr lang="nl-BE"/>
+          </a:p>
+        </p:txBody>
+      </p:sp>
+      <p:sp>
+        <p:nvSpPr>
+          <p:cNvPr id="5" name="TextBox 4"/>
+          <p:cNvSpPr txBox="1"/>
+          <p:nvPr/>
+        </p:nvSpPr>
+        <p:spPr>
+          <a:xfrm>
+            <a:off x="270181" y="5864553"/>
+            <a:ext cx="8603637" cy="523220"/>
+          </a:xfrm>
+          <a:prstGeom prst="rect">
+            <a:avLst/>
+          </a:prstGeom>
+          <a:noFill/>
+          <a:ln>
+            <a:solidFill>
+              <a:schemeClr val="tx1"/>
+            </a:solidFill>
+          </a:ln>
+        </p:spPr>
+        <p:txBody>
+          <a:bodyPr wrap="none" rtlCol="0">
+            <a:spAutoFit/>
+          </a:bodyPr>
+          <a:lstStyle/>
+          <a:p>
+            <a:r>
+              <a:rPr lang="en-US" sz="2800" dirty="0" smtClean="0"/>
+              <a:t>Note: repository should be hosted by service, e.g., GitHub</a:t>
+            </a:r>
+            <a:endParaRPr lang="nl-BE" sz="2800" dirty="0"/>
+          </a:p>
+        </p:txBody>
+      </p:sp>
+    </p:spTree>
+    <p:extLst>
+      <p:ext uri="{BB962C8B-B14F-4D97-AF65-F5344CB8AC3E}">
+        <p14:creationId xmlns:p14="http://schemas.microsoft.com/office/powerpoint/2010/main" val="774053781"/>
+      </p:ext>
+    </p:extLst>
+  </p:cSld>
+  <p:clrMapOvr>
+    <a:masterClrMapping/>
+  </p:clrMapOvr>
+  <p:timing>
+    <p:tnLst>
+      <p:par>
+        <p:cTn id="1" dur="indefinite" restart="never" nodeType="tmRoot">
+          <p:childTnLst>
+            <p:seq concurrent="1" nextAc="seek">
+              <p:cTn id="2" dur="indefinite" nodeType="mainSeq">
+                <p:childTnLst>
+                  <p:par>
+                    <p:cTn id="3" fill="hold">
+                      <p:stCondLst>
+                        <p:cond delay="indefinite"/>
+                        <p:cond evt="onBegin" delay="0">
+                          <p:tn val="2"/>
+                        </p:cond>
+                      </p:stCondLst>
+                      <p:childTnLst>
+                        <p:par>
+                          <p:cTn id="4" fill="hold">
+                            <p:stCondLst>
+                              <p:cond delay="0"/>
+                            </p:stCondLst>
+                            <p:childTnLst>
+                              <p:par>
+                                <p:cTn id="5" presetID="1" presetClass="entr" presetSubtype="0" fill="hold" grpId="0" nodeType="withEffect">
+                                  <p:stCondLst>
+                                    <p:cond delay="0"/>
+                                  </p:stCondLst>
+                                  <p:childTnLst>
+                                    <p:set>
+                                      <p:cBhvr>
+                                        <p:cTn id="6" dur="1" fill="hold">
+                                          <p:stCondLst>
+                                            <p:cond delay="0"/>
+                                          </p:stCondLst>
+                                        </p:cTn>
+                                        <p:tgtEl>
+                                          <p:spTgt spid="3">
+                                            <p:txEl>
+                                              <p:pRg st="0" end="0"/>
+                                            </p:txEl>
+                                          </p:spTgt>
+                                        </p:tgtEl>
+                                        <p:attrNameLst>
+                                          <p:attrName>style.visibility</p:attrName>
+                                        </p:attrNameLst>
+                                      </p:cBhvr>
+                                      <p:to>
+                                        <p:strVal val="visible"/>
+                                      </p:to>
+                                    </p:set>
+                                  </p:childTnLst>
+                                </p:cTn>
+                              </p:par>
+                              <p:par>
+                                <p:cTn id="7" presetID="1" presetClass="entr" presetSubtype="0" fill="hold" grpId="0" nodeType="withEffect">
+                                  <p:stCondLst>
+                                    <p:cond delay="0"/>
+                                  </p:stCondLst>
+                                  <p:childTnLst>
+                                    <p:set>
+                                      <p:cBhvr>
+                                        <p:cTn id="8" dur="1" fill="hold">
+                                          <p:stCondLst>
+                                            <p:cond delay="0"/>
+                                          </p:stCondLst>
+                                        </p:cTn>
+                                        <p:tgtEl>
+                                          <p:spTgt spid="3">
+                                            <p:txEl>
+                                              <p:pRg st="1" end="1"/>
+                                            </p:txEl>
+                                          </p:spTgt>
+                                        </p:tgtEl>
+                                        <p:attrNameLst>
+                                          <p:attrName>style.visibility</p:attrName>
+                                        </p:attrNameLst>
+                                      </p:cBhvr>
+                                      <p:to>
+                                        <p:strVal val="visible"/>
+                                      </p:to>
+                                    </p:set>
+                                  </p:childTnLst>
+                                </p:cTn>
+                              </p:par>
+                              <p:par>
+                                <p:cTn id="9" presetID="1" presetClass="entr" presetSubtype="0" fill="hold" grpId="0" nodeType="withEffect">
+                                  <p:stCondLst>
+                                    <p:cond delay="0"/>
+                                  </p:stCondLst>
+                                  <p:childTnLst>
+                                    <p:set>
+                                      <p:cBhvr>
+                                        <p:cTn id="10" dur="1" fill="hold">
+                                          <p:stCondLst>
+                                            <p:cond delay="0"/>
+                                          </p:stCondLst>
+                                        </p:cTn>
+                                        <p:tgtEl>
+                                          <p:spTgt spid="3">
+                                            <p:txEl>
+                                              <p:pRg st="2" end="2"/>
+                                            </p:txEl>
+                                          </p:spTgt>
+                                        </p:tgtEl>
+                                        <p:attrNameLst>
+                                          <p:attrName>style.visibility</p:attrName>
+                                        </p:attrNameLst>
+                                      </p:cBhvr>
+                                      <p:to>
+                                        <p:strVal val="visible"/>
+                                      </p:to>
+                                    </p:set>
+                                  </p:childTnLst>
+                                </p:cTn>
+                              </p:par>
+                            </p:childTnLst>
+                          </p:cTn>
+                        </p:par>
+                      </p:childTnLst>
+                    </p:cTn>
+                  </p:par>
+                  <p:par>
+                    <p:cTn id="11" fill="hold">
+                      <p:stCondLst>
+                        <p:cond delay="indefinite"/>
+                      </p:stCondLst>
+                      <p:childTnLst>
+                        <p:par>
+                          <p:cTn id="12" fill="hold">
+                            <p:stCondLst>
+                              <p:cond delay="0"/>
+                            </p:stCondLst>
+                            <p:childTnLst>
+                              <p:par>
+                                <p:cTn id="13" presetID="1" presetClass="entr" presetSubtype="0" fill="hold" grpId="0" nodeType="clickEffect">
+                                  <p:stCondLst>
+                                    <p:cond delay="0"/>
+                                  </p:stCondLst>
+                                  <p:childTnLst>
+                                    <p:set>
+                                      <p:cBhvr>
+                                        <p:cTn id="14" dur="1" fill="hold">
+                                          <p:stCondLst>
+                                            <p:cond delay="0"/>
+                                          </p:stCondLst>
+                                        </p:cTn>
+                                        <p:tgtEl>
+                                          <p:spTgt spid="3">
+                                            <p:txEl>
+                                              <p:pRg st="3" end="3"/>
+                                            </p:txEl>
+                                          </p:spTgt>
+                                        </p:tgtEl>
+                                        <p:attrNameLst>
+                                          <p:attrName>style.visibility</p:attrName>
+                                        </p:attrNameLst>
+                                      </p:cBhvr>
+                                      <p:to>
+                                        <p:strVal val="visible"/>
+                                      </p:to>
+                                    </p:set>
+                                  </p:childTnLst>
+                                </p:cTn>
+                              </p:par>
+                            </p:childTnLst>
+                          </p:cTn>
+                        </p:par>
+                      </p:childTnLst>
+                    </p:cTn>
+                  </p:par>
+                  <p:par>
+                    <p:cTn id="15" fill="hold">
+                      <p:stCondLst>
+                        <p:cond delay="indefinite"/>
+                      </p:stCondLst>
+                      <p:childTnLst>
+                        <p:par>
+                          <p:cTn id="16" fill="hold">
+                            <p:stCondLst>
+                              <p:cond delay="0"/>
+                            </p:stCondLst>
+                            <p:childTnLst>
+                              <p:par>
+                                <p:cTn id="17" presetID="1" presetClass="entr" presetSubtype="0" fill="hold" grpId="0" nodeType="clickEffect">
+                                  <p:stCondLst>
+                                    <p:cond delay="0"/>
+                                  </p:stCondLst>
+                                  <p:childTnLst>
+                                    <p:set>
+                                      <p:cBhvr>
+                                        <p:cTn id="18" dur="1" fill="hold">
+                                          <p:stCondLst>
+                                            <p:cond delay="0"/>
+                                          </p:stCondLst>
+                                        </p:cTn>
+                                        <p:tgtEl>
+                                          <p:spTgt spid="3">
+                                            <p:txEl>
+                                              <p:pRg st="4" end="4"/>
+                                            </p:txEl>
+                                          </p:spTgt>
+                                        </p:tgtEl>
+                                        <p:attrNameLst>
+                                          <p:attrName>style.visibility</p:attrName>
+                                        </p:attrNameLst>
+                                      </p:cBhvr>
+                                      <p:to>
+                                        <p:strVal val="visible"/>
+                                      </p:to>
+                                    </p:set>
+                                  </p:childTnLst>
+                                </p:cTn>
+                              </p:par>
+                            </p:childTnLst>
+                          </p:cTn>
+                        </p:par>
+                      </p:childTnLst>
+                    </p:cTn>
+                  </p:par>
+                  <p:par>
+                    <p:cTn id="19" fill="hold">
+                      <p:stCondLst>
+                        <p:cond delay="indefinite"/>
+                      </p:stCondLst>
+                      <p:childTnLst>
+                        <p:par>
+                          <p:cTn id="20" fill="hold">
+                            <p:stCondLst>
+                              <p:cond delay="0"/>
+                            </p:stCondLst>
+                            <p:childTnLst>
+                              <p:par>
+                                <p:cTn id="21" presetID="1" presetClass="entr" presetSubtype="0" fill="hold" grpId="0" nodeType="clickEffect">
+                                  <p:stCondLst>
+                                    <p:cond delay="0"/>
+                                  </p:stCondLst>
+                                  <p:childTnLst>
+                                    <p:set>
+                                      <p:cBhvr>
+                                        <p:cTn id="22" dur="1" fill="hold">
+                                          <p:stCondLst>
+                                            <p:cond delay="0"/>
+                                          </p:stCondLst>
+                                        </p:cTn>
+                                        <p:tgtEl>
+                                          <p:spTgt spid="3">
+                                            <p:txEl>
+                                              <p:pRg st="5" end="5"/>
+                                            </p:txEl>
+                                          </p:spTgt>
+                                        </p:tgtEl>
+                                        <p:attrNameLst>
+                                          <p:attrName>style.visibility</p:attrName>
+                                        </p:attrNameLst>
+                                      </p:cBhvr>
+                                      <p:to>
+                                        <p:strVal val="visible"/>
+                                      </p:to>
+                                    </p:set>
+                                  </p:childTnLst>
+                                </p:cTn>
+                              </p:par>
+                            </p:childTnLst>
+                          </p:cTn>
+                        </p:par>
+                      </p:childTnLst>
+                    </p:cTn>
+                  </p:par>
+                  <p:par>
+                    <p:cTn id="23" fill="hold">
+                      <p:stCondLst>
+                        <p:cond delay="indefinite"/>
+                      </p:stCondLst>
+                      <p:childTnLst>
+                        <p:par>
+                          <p:cTn id="24" fill="hold">
+                            <p:stCondLst>
+                              <p:cond delay="0"/>
+                            </p:stCondLst>
+                            <p:childTnLst>
+                              <p:par>
+                                <p:cTn id="25" presetID="1" presetClass="entr" presetSubtype="0" fill="hold" grpId="0" nodeType="clickEffect">
+                                  <p:stCondLst>
+                                    <p:cond delay="0"/>
+                                  </p:stCondLst>
+                                  <p:childTnLst>
+                                    <p:set>
+                                      <p:cBhvr>
+                                        <p:cTn id="26" dur="1" fill="hold">
+                                          <p:stCondLst>
+                                            <p:cond delay="0"/>
+                                          </p:stCondLst>
+                                        </p:cTn>
+                                        <p:tgtEl>
+                                          <p:spTgt spid="3">
+                                            <p:txEl>
+                                              <p:pRg st="6" end="6"/>
+                                            </p:txEl>
+                                          </p:spTgt>
+                                        </p:tgtEl>
+                                        <p:attrNameLst>
+                                          <p:attrName>style.visibility</p:attrName>
+                                        </p:attrNameLst>
+                                      </p:cBhvr>
+                                      <p:to>
+                                        <p:strVal val="visible"/>
+                                      </p:to>
+                                    </p:set>
+                                  </p:childTnLst>
+                                </p:cTn>
+                              </p:par>
+                            </p:childTnLst>
+                          </p:cTn>
+                        </p:par>
+                      </p:childTnLst>
+                    </p:cTn>
+                  </p:par>
+                  <p:par>
+                    <p:cTn id="27" fill="hold">
+                      <p:stCondLst>
+                        <p:cond delay="indefinite"/>
+                      </p:stCondLst>
+                      <p:childTnLst>
+                        <p:par>
+                          <p:cTn id="28" fill="hold">
+                            <p:stCondLst>
+                              <p:cond delay="0"/>
+                            </p:stCondLst>
+                            <p:childTnLst>
+                              <p:par>
+                                <p:cTn id="29" presetID="1" presetClass="entr" presetSubtype="0" fill="hold" grpId="0" nodeType="clickEffect">
+                                  <p:stCondLst>
+                                    <p:cond delay="0"/>
+                                  </p:stCondLst>
+                                  <p:childTnLst>
+                                    <p:set>
+                                      <p:cBhvr>
+                                        <p:cTn id="30" dur="1" fill="hold">
+                                          <p:stCondLst>
+                                            <p:cond delay="0"/>
+                                          </p:stCondLst>
+                                        </p:cTn>
+                                        <p:tgtEl>
+                                          <p:spTgt spid="3">
+                                            <p:txEl>
+                                              <p:pRg st="7" end="7"/>
+                                            </p:txEl>
+                                          </p:spTgt>
+                                        </p:tgtEl>
+                                        <p:attrNameLst>
+                                          <p:attrName>style.visibility</p:attrName>
+                                        </p:attrNameLst>
+                                      </p:cBhvr>
+                                      <p:to>
+                                        <p:strVal val="visible"/>
+                                      </p:to>
+                                    </p:set>
+                                  </p:childTnLst>
+                                </p:cTn>
+                              </p:par>
+                            </p:childTnLst>
+                          </p:cTn>
+                        </p:par>
+                      </p:childTnLst>
+                    </p:cTn>
+                  </p:par>
+                  <p:par>
+                    <p:cTn id="31" fill="hold">
+                      <p:stCondLst>
+                        <p:cond delay="indefinite"/>
+                      </p:stCondLst>
+                      <p:childTnLst>
+                        <p:par>
+                          <p:cTn id="32" fill="hold">
+                            <p:stCondLst>
+                              <p:cond delay="0"/>
+                            </p:stCondLst>
+                            <p:childTnLst>
+                              <p:par>
+                                <p:cTn id="33" presetID="1" presetClass="entr" presetSubtype="0" fill="hold" grpId="0" nodeType="clickEffect">
+                                  <p:stCondLst>
+                                    <p:cond delay="0"/>
+                                  </p:stCondLst>
+                                  <p:childTnLst>
+                                    <p:set>
+                                      <p:cBhvr>
+                                        <p:cTn id="34" dur="1" fill="hold">
+                                          <p:stCondLst>
+                                            <p:cond delay="0"/>
+                                          </p:stCondLst>
+                                        </p:cTn>
+                                        <p:tgtEl>
+                                          <p:spTgt spid="5"/>
+                                        </p:tgtEl>
+                                        <p:attrNameLst>
+                                          <p:attrName>style.visibility</p:attrName>
+                                        </p:attrNameLst>
+                                      </p:cBhvr>
+                                      <p:to>
+                                        <p:strVal val="visible"/>
+                                      </p:to>
+                                    </p:set>
+                                  </p:childTnLst>
+                                </p:cTn>
+                              </p:par>
+                            </p:childTnLst>
+                          </p:cTn>
+                        </p:par>
+                      </p:childTnLst>
+                    </p:cTn>
+                  </p:par>
+                </p:childTnLst>
+              </p:cTn>
+              <p:prevCondLst>
+                <p:cond evt="onPrev" delay="0">
+                  <p:tgtEl>
+                    <p:sldTgt/>
+                  </p:tgtEl>
+                </p:cond>
+              </p:prevCondLst>
+              <p:nextCondLst>
+                <p:cond evt="onNext" delay="0">
+                  <p:tgtEl>
+                    <p:sldTgt/>
+                  </p:tgtEl>
+                </p:cond>
+              </p:nextCondLst>
+            </p:seq>
+          </p:childTnLst>
+        </p:cTn>
+      </p:par>
+    </p:tnLst>
+    <p:bldLst>
+      <p:bldP spid="3" grpId="0" uiExpand="1" build="p" bldLvl="2"/>
+      <p:bldP spid="5" grpId="0" animBg="1"/>
+    </p:bldLst>
+  </p:timing>
+</p:sld>
+</file>
+
+<file path=ppt/slides/slide53.xml><?xml version="1.0" encoding="utf-8"?>
+<p:sld xmlns:a="http://schemas.openxmlformats.org/drawingml/2006/main" xmlns:r="http://schemas.openxmlformats.org/officeDocument/2006/relationships" xmlns:p="http://schemas.openxmlformats.org/presentationml/2006/main">
+  <p:cSld>
+    <p:spTree>
+      <p:nvGrpSpPr>
+        <p:cNvPr id="1" name=""/>
+        <p:cNvGrpSpPr/>
+        <p:nvPr/>
+      </p:nvGrpSpPr>
+      <p:grpSpPr>
+        <a:xfrm>
+          <a:off x="0" y="0"/>
+          <a:ext cx="0" cy="0"/>
+          <a:chOff x="0" y="0"/>
+          <a:chExt cx="0" cy="0"/>
+        </a:xfrm>
+      </p:grpSpPr>
+      <p:sp>
+        <p:nvSpPr>
+          <p:cNvPr id="2" name="Title 1"/>
+          <p:cNvSpPr>
+            <a:spLocks noGrp="1"/>
+          </p:cNvSpPr>
+          <p:nvPr>
+            <p:ph type="title"/>
+          </p:nvPr>
+        </p:nvSpPr>
+        <p:spPr/>
+        <p:txBody>
+          <a:bodyPr/>
+          <a:lstStyle/>
+          <a:p>
+            <a:r>
+              <a:rPr lang="en-US" dirty="0" smtClean="0"/>
+              <a:t>Receiving contribution</a:t>
             </a:r>
             <a:endParaRPr lang="nl-BE" dirty="0"/>
           </a:p>
@@ -36067,49 +36695,52 @@
           <a:p>
             <a:r>
               <a:rPr lang="en-US" dirty="0" smtClean="0"/>
-              <a:t>Contributes to the scientific method</a:t>
+              <a:t>Someone forked your repository to contribute</a:t>
+            </a:r>
+          </a:p>
+          <a:p>
+            <a:r>
+              <a:rPr lang="en-US" dirty="0" smtClean="0"/>
+              <a:t>You receive pull request</a:t>
             </a:r>
           </a:p>
           <a:p>
             <a:pPr lvl="1"/>
             <a:r>
               <a:rPr lang="en-US" dirty="0" smtClean="0"/>
-              <a:t>Helps ensure reproducibility</a:t>
-            </a:r>
-          </a:p>
-          <a:p>
+              <a:t>Evaluate contribution</a:t>
+            </a:r>
+          </a:p>
+          <a:p>
+            <a:pPr lvl="2"/>
             <a:r>
               <a:rPr lang="en-US" dirty="0" smtClean="0"/>
-              <a:t>Record of change</a:t>
+              <a:t>Code review</a:t>
+            </a:r>
+          </a:p>
+          <a:p>
+            <a:pPr lvl="2"/>
+            <a:r>
+              <a:rPr lang="en-US" dirty="0" smtClean="0"/>
+              <a:t>Extensive tests</a:t>
             </a:r>
           </a:p>
           <a:p>
             <a:pPr lvl="1"/>
             <a:r>
               <a:rPr lang="en-US" dirty="0" smtClean="0"/>
-              <a:t>What was changed?</a:t>
+              <a:t>If okay, merge remote branch into, e.g., master or development</a:t>
             </a:r>
           </a:p>
           <a:p>
             <a:pPr lvl="1"/>
             <a:r>
               <a:rPr lang="en-US" dirty="0" smtClean="0"/>
-              <a:t>When was it changed?</a:t>
+              <a:t>If not okay, provide feedback, delete pull request</a:t>
             </a:r>
           </a:p>
           <a:p>
             <a:pPr lvl="1"/>
-            <a:r>
-              <a:rPr lang="en-US" dirty="0" smtClean="0"/>
-              <a:t>Who changed it?</a:t>
-            </a:r>
-          </a:p>
-          <a:p>
-            <a:pPr lvl="1"/>
-            <a:r>
-              <a:rPr lang="en-US" dirty="0" smtClean="0"/>
-              <a:t>Why was it changed?</a:t>
-            </a:r>
             <a:endParaRPr lang="nl-BE" dirty="0"/>
           </a:p>
         </p:txBody>
@@ -36131,7 +36762,673 @@
           <a:p>
             <a:fld id="{BB52A05A-A776-4391-ACD7-D6BC34D3145C}" type="slidenum">
               <a:rPr lang="nl-BE" smtClean="0"/>
-              <a:t>52</a:t>
+              <a:t>53</a:t>
+            </a:fld>
+            <a:endParaRPr lang="nl-BE"/>
+          </a:p>
+        </p:txBody>
+      </p:sp>
+      <p:sp>
+        <p:nvSpPr>
+          <p:cNvPr id="5" name="TextBox 4"/>
+          <p:cNvSpPr txBox="1"/>
+          <p:nvPr/>
+        </p:nvSpPr>
+        <p:spPr>
+          <a:xfrm>
+            <a:off x="1043608" y="5930116"/>
+            <a:ext cx="7092519" cy="523220"/>
+          </a:xfrm>
+          <a:prstGeom prst="rect">
+            <a:avLst/>
+          </a:prstGeom>
+          <a:noFill/>
+          <a:ln>
+            <a:solidFill>
+              <a:schemeClr val="tx1"/>
+            </a:solidFill>
+          </a:ln>
+        </p:spPr>
+        <p:txBody>
+          <a:bodyPr wrap="none" rtlCol="0">
+            <a:spAutoFit/>
+          </a:bodyPr>
+          <a:lstStyle/>
+          <a:p>
+            <a:r>
+              <a:rPr lang="en-US" sz="2800" dirty="0" smtClean="0"/>
+              <a:t>You retain complete control over contributions!</a:t>
+            </a:r>
+            <a:endParaRPr lang="nl-BE" sz="2800" dirty="0"/>
+          </a:p>
+        </p:txBody>
+      </p:sp>
+    </p:spTree>
+    <p:extLst>
+      <p:ext uri="{BB962C8B-B14F-4D97-AF65-F5344CB8AC3E}">
+        <p14:creationId xmlns:p14="http://schemas.microsoft.com/office/powerpoint/2010/main" val="4079303064"/>
+      </p:ext>
+    </p:extLst>
+  </p:cSld>
+  <p:clrMapOvr>
+    <a:masterClrMapping/>
+  </p:clrMapOvr>
+  <p:timing>
+    <p:tnLst>
+      <p:par>
+        <p:cTn id="1" dur="indefinite" restart="never" nodeType="tmRoot">
+          <p:childTnLst>
+            <p:seq concurrent="1" nextAc="seek">
+              <p:cTn id="2" dur="indefinite" nodeType="mainSeq">
+                <p:childTnLst>
+                  <p:par>
+                    <p:cTn id="3" fill="hold">
+                      <p:stCondLst>
+                        <p:cond delay="indefinite"/>
+                        <p:cond evt="onBegin" delay="0">
+                          <p:tn val="2"/>
+                        </p:cond>
+                      </p:stCondLst>
+                      <p:childTnLst>
+                        <p:par>
+                          <p:cTn id="4" fill="hold">
+                            <p:stCondLst>
+                              <p:cond delay="0"/>
+                            </p:stCondLst>
+                            <p:childTnLst>
+                              <p:par>
+                                <p:cTn id="5" presetID="1" presetClass="entr" presetSubtype="0" fill="hold" grpId="0" nodeType="withEffect">
+                                  <p:stCondLst>
+                                    <p:cond delay="0"/>
+                                  </p:stCondLst>
+                                  <p:childTnLst>
+                                    <p:set>
+                                      <p:cBhvr>
+                                        <p:cTn id="6" dur="1" fill="hold">
+                                          <p:stCondLst>
+                                            <p:cond delay="0"/>
+                                          </p:stCondLst>
+                                        </p:cTn>
+                                        <p:tgtEl>
+                                          <p:spTgt spid="3">
+                                            <p:txEl>
+                                              <p:pRg st="0" end="0"/>
+                                            </p:txEl>
+                                          </p:spTgt>
+                                        </p:tgtEl>
+                                        <p:attrNameLst>
+                                          <p:attrName>style.visibility</p:attrName>
+                                        </p:attrNameLst>
+                                      </p:cBhvr>
+                                      <p:to>
+                                        <p:strVal val="visible"/>
+                                      </p:to>
+                                    </p:set>
+                                  </p:childTnLst>
+                                </p:cTn>
+                              </p:par>
+                            </p:childTnLst>
+                          </p:cTn>
+                        </p:par>
+                      </p:childTnLst>
+                    </p:cTn>
+                  </p:par>
+                  <p:par>
+                    <p:cTn id="7" fill="hold">
+                      <p:stCondLst>
+                        <p:cond delay="indefinite"/>
+                      </p:stCondLst>
+                      <p:childTnLst>
+                        <p:par>
+                          <p:cTn id="8" fill="hold">
+                            <p:stCondLst>
+                              <p:cond delay="0"/>
+                            </p:stCondLst>
+                            <p:childTnLst>
+                              <p:par>
+                                <p:cTn id="9" presetID="1" presetClass="entr" presetSubtype="0" fill="hold" grpId="0" nodeType="clickEffect">
+                                  <p:stCondLst>
+                                    <p:cond delay="0"/>
+                                  </p:stCondLst>
+                                  <p:childTnLst>
+                                    <p:set>
+                                      <p:cBhvr>
+                                        <p:cTn id="10" dur="1" fill="hold">
+                                          <p:stCondLst>
+                                            <p:cond delay="0"/>
+                                          </p:stCondLst>
+                                        </p:cTn>
+                                        <p:tgtEl>
+                                          <p:spTgt spid="3">
+                                            <p:txEl>
+                                              <p:pRg st="1" end="1"/>
+                                            </p:txEl>
+                                          </p:spTgt>
+                                        </p:tgtEl>
+                                        <p:attrNameLst>
+                                          <p:attrName>style.visibility</p:attrName>
+                                        </p:attrNameLst>
+                                      </p:cBhvr>
+                                      <p:to>
+                                        <p:strVal val="visible"/>
+                                      </p:to>
+                                    </p:set>
+                                  </p:childTnLst>
+                                </p:cTn>
+                              </p:par>
+                            </p:childTnLst>
+                          </p:cTn>
+                        </p:par>
+                      </p:childTnLst>
+                    </p:cTn>
+                  </p:par>
+                  <p:par>
+                    <p:cTn id="11" fill="hold">
+                      <p:stCondLst>
+                        <p:cond delay="indefinite"/>
+                      </p:stCondLst>
+                      <p:childTnLst>
+                        <p:par>
+                          <p:cTn id="12" fill="hold">
+                            <p:stCondLst>
+                              <p:cond delay="0"/>
+                            </p:stCondLst>
+                            <p:childTnLst>
+                              <p:par>
+                                <p:cTn id="13" presetID="1" presetClass="entr" presetSubtype="0" fill="hold" grpId="0" nodeType="clickEffect">
+                                  <p:stCondLst>
+                                    <p:cond delay="0"/>
+                                  </p:stCondLst>
+                                  <p:childTnLst>
+                                    <p:set>
+                                      <p:cBhvr>
+                                        <p:cTn id="14" dur="1" fill="hold">
+                                          <p:stCondLst>
+                                            <p:cond delay="0"/>
+                                          </p:stCondLst>
+                                        </p:cTn>
+                                        <p:tgtEl>
+                                          <p:spTgt spid="3">
+                                            <p:txEl>
+                                              <p:pRg st="2" end="2"/>
+                                            </p:txEl>
+                                          </p:spTgt>
+                                        </p:tgtEl>
+                                        <p:attrNameLst>
+                                          <p:attrName>style.visibility</p:attrName>
+                                        </p:attrNameLst>
+                                      </p:cBhvr>
+                                      <p:to>
+                                        <p:strVal val="visible"/>
+                                      </p:to>
+                                    </p:set>
+                                  </p:childTnLst>
+                                </p:cTn>
+                              </p:par>
+                              <p:par>
+                                <p:cTn id="15" presetID="1" presetClass="entr" presetSubtype="0" fill="hold" grpId="0" nodeType="withEffect">
+                                  <p:stCondLst>
+                                    <p:cond delay="0"/>
+                                  </p:stCondLst>
+                                  <p:childTnLst>
+                                    <p:set>
+                                      <p:cBhvr>
+                                        <p:cTn id="16" dur="1" fill="hold">
+                                          <p:stCondLst>
+                                            <p:cond delay="0"/>
+                                          </p:stCondLst>
+                                        </p:cTn>
+                                        <p:tgtEl>
+                                          <p:spTgt spid="3">
+                                            <p:txEl>
+                                              <p:pRg st="3" end="3"/>
+                                            </p:txEl>
+                                          </p:spTgt>
+                                        </p:tgtEl>
+                                        <p:attrNameLst>
+                                          <p:attrName>style.visibility</p:attrName>
+                                        </p:attrNameLst>
+                                      </p:cBhvr>
+                                      <p:to>
+                                        <p:strVal val="visible"/>
+                                      </p:to>
+                                    </p:set>
+                                  </p:childTnLst>
+                                </p:cTn>
+                              </p:par>
+                              <p:par>
+                                <p:cTn id="17" presetID="1" presetClass="entr" presetSubtype="0" fill="hold" grpId="0" nodeType="withEffect">
+                                  <p:stCondLst>
+                                    <p:cond delay="0"/>
+                                  </p:stCondLst>
+                                  <p:childTnLst>
+                                    <p:set>
+                                      <p:cBhvr>
+                                        <p:cTn id="18" dur="1" fill="hold">
+                                          <p:stCondLst>
+                                            <p:cond delay="0"/>
+                                          </p:stCondLst>
+                                        </p:cTn>
+                                        <p:tgtEl>
+                                          <p:spTgt spid="3">
+                                            <p:txEl>
+                                              <p:pRg st="4" end="4"/>
+                                            </p:txEl>
+                                          </p:spTgt>
+                                        </p:tgtEl>
+                                        <p:attrNameLst>
+                                          <p:attrName>style.visibility</p:attrName>
+                                        </p:attrNameLst>
+                                      </p:cBhvr>
+                                      <p:to>
+                                        <p:strVal val="visible"/>
+                                      </p:to>
+                                    </p:set>
+                                  </p:childTnLst>
+                                </p:cTn>
+                              </p:par>
+                            </p:childTnLst>
+                          </p:cTn>
+                        </p:par>
+                      </p:childTnLst>
+                    </p:cTn>
+                  </p:par>
+                  <p:par>
+                    <p:cTn id="19" fill="hold">
+                      <p:stCondLst>
+                        <p:cond delay="indefinite"/>
+                      </p:stCondLst>
+                      <p:childTnLst>
+                        <p:par>
+                          <p:cTn id="20" fill="hold">
+                            <p:stCondLst>
+                              <p:cond delay="0"/>
+                            </p:stCondLst>
+                            <p:childTnLst>
+                              <p:par>
+                                <p:cTn id="21" presetID="1" presetClass="entr" presetSubtype="0" fill="hold" grpId="0" nodeType="clickEffect">
+                                  <p:stCondLst>
+                                    <p:cond delay="0"/>
+                                  </p:stCondLst>
+                                  <p:childTnLst>
+                                    <p:set>
+                                      <p:cBhvr>
+                                        <p:cTn id="22" dur="1" fill="hold">
+                                          <p:stCondLst>
+                                            <p:cond delay="0"/>
+                                          </p:stCondLst>
+                                        </p:cTn>
+                                        <p:tgtEl>
+                                          <p:spTgt spid="3">
+                                            <p:txEl>
+                                              <p:pRg st="5" end="5"/>
+                                            </p:txEl>
+                                          </p:spTgt>
+                                        </p:tgtEl>
+                                        <p:attrNameLst>
+                                          <p:attrName>style.visibility</p:attrName>
+                                        </p:attrNameLst>
+                                      </p:cBhvr>
+                                      <p:to>
+                                        <p:strVal val="visible"/>
+                                      </p:to>
+                                    </p:set>
+                                  </p:childTnLst>
+                                </p:cTn>
+                              </p:par>
+                            </p:childTnLst>
+                          </p:cTn>
+                        </p:par>
+                      </p:childTnLst>
+                    </p:cTn>
+                  </p:par>
+                  <p:par>
+                    <p:cTn id="23" fill="hold">
+                      <p:stCondLst>
+                        <p:cond delay="indefinite"/>
+                      </p:stCondLst>
+                      <p:childTnLst>
+                        <p:par>
+                          <p:cTn id="24" fill="hold">
+                            <p:stCondLst>
+                              <p:cond delay="0"/>
+                            </p:stCondLst>
+                            <p:childTnLst>
+                              <p:par>
+                                <p:cTn id="25" presetID="1" presetClass="entr" presetSubtype="0" fill="hold" grpId="0" nodeType="clickEffect">
+                                  <p:stCondLst>
+                                    <p:cond delay="0"/>
+                                  </p:stCondLst>
+                                  <p:childTnLst>
+                                    <p:set>
+                                      <p:cBhvr>
+                                        <p:cTn id="26" dur="1" fill="hold">
+                                          <p:stCondLst>
+                                            <p:cond delay="0"/>
+                                          </p:stCondLst>
+                                        </p:cTn>
+                                        <p:tgtEl>
+                                          <p:spTgt spid="3">
+                                            <p:txEl>
+                                              <p:pRg st="6" end="6"/>
+                                            </p:txEl>
+                                          </p:spTgt>
+                                        </p:tgtEl>
+                                        <p:attrNameLst>
+                                          <p:attrName>style.visibility</p:attrName>
+                                        </p:attrNameLst>
+                                      </p:cBhvr>
+                                      <p:to>
+                                        <p:strVal val="visible"/>
+                                      </p:to>
+                                    </p:set>
+                                  </p:childTnLst>
+                                </p:cTn>
+                              </p:par>
+                            </p:childTnLst>
+                          </p:cTn>
+                        </p:par>
+                      </p:childTnLst>
+                    </p:cTn>
+                  </p:par>
+                  <p:par>
+                    <p:cTn id="27" fill="hold">
+                      <p:stCondLst>
+                        <p:cond delay="indefinite"/>
+                      </p:stCondLst>
+                      <p:childTnLst>
+                        <p:par>
+                          <p:cTn id="28" fill="hold">
+                            <p:stCondLst>
+                              <p:cond delay="0"/>
+                            </p:stCondLst>
+                            <p:childTnLst>
+                              <p:par>
+                                <p:cTn id="29" presetID="1" presetClass="entr" presetSubtype="0" fill="hold" grpId="0" nodeType="clickEffect">
+                                  <p:stCondLst>
+                                    <p:cond delay="0"/>
+                                  </p:stCondLst>
+                                  <p:childTnLst>
+                                    <p:set>
+                                      <p:cBhvr>
+                                        <p:cTn id="30" dur="1" fill="hold">
+                                          <p:stCondLst>
+                                            <p:cond delay="0"/>
+                                          </p:stCondLst>
+                                        </p:cTn>
+                                        <p:tgtEl>
+                                          <p:spTgt spid="5"/>
+                                        </p:tgtEl>
+                                        <p:attrNameLst>
+                                          <p:attrName>style.visibility</p:attrName>
+                                        </p:attrNameLst>
+                                      </p:cBhvr>
+                                      <p:to>
+                                        <p:strVal val="visible"/>
+                                      </p:to>
+                                    </p:set>
+                                  </p:childTnLst>
+                                </p:cTn>
+                              </p:par>
+                            </p:childTnLst>
+                          </p:cTn>
+                        </p:par>
+                      </p:childTnLst>
+                    </p:cTn>
+                  </p:par>
+                </p:childTnLst>
+              </p:cTn>
+              <p:prevCondLst>
+                <p:cond evt="onPrev" delay="0">
+                  <p:tgtEl>
+                    <p:sldTgt/>
+                  </p:tgtEl>
+                </p:cond>
+              </p:prevCondLst>
+              <p:nextCondLst>
+                <p:cond evt="onNext" delay="0">
+                  <p:tgtEl>
+                    <p:sldTgt/>
+                  </p:tgtEl>
+                </p:cond>
+              </p:nextCondLst>
+            </p:seq>
+          </p:childTnLst>
+        </p:cTn>
+      </p:par>
+    </p:tnLst>
+    <p:bldLst>
+      <p:bldP spid="3" grpId="0" uiExpand="1" build="p" bldLvl="2"/>
+      <p:bldP spid="5" grpId="0" animBg="1"/>
+    </p:bldLst>
+  </p:timing>
+</p:sld>
+</file>
+
+<file path=ppt/slides/slide54.xml><?xml version="1.0" encoding="utf-8"?>
+<p:sld xmlns:a="http://schemas.openxmlformats.org/drawingml/2006/main" xmlns:r="http://schemas.openxmlformats.org/officeDocument/2006/relationships" xmlns:p="http://schemas.openxmlformats.org/presentationml/2006/main">
+  <p:cSld>
+    <p:spTree>
+      <p:nvGrpSpPr>
+        <p:cNvPr id="1" name=""/>
+        <p:cNvGrpSpPr/>
+        <p:nvPr/>
+      </p:nvGrpSpPr>
+      <p:grpSpPr>
+        <a:xfrm>
+          <a:off x="0" y="0"/>
+          <a:ext cx="0" cy="0"/>
+          <a:chOff x="0" y="0"/>
+          <a:chExt cx="0" cy="0"/>
+        </a:xfrm>
+      </p:grpSpPr>
+      <p:sp>
+        <p:nvSpPr>
+          <p:cNvPr id="2" name="Title 1"/>
+          <p:cNvSpPr>
+            <a:spLocks noGrp="1"/>
+          </p:cNvSpPr>
+          <p:nvPr>
+            <p:ph type="title"/>
+          </p:nvPr>
+        </p:nvSpPr>
+        <p:spPr/>
+        <p:txBody>
+          <a:bodyPr/>
+          <a:lstStyle/>
+          <a:p>
+            <a:r>
+              <a:rPr lang="en-US" dirty="0" smtClean="0"/>
+              <a:t>Conclusions</a:t>
+            </a:r>
+            <a:endParaRPr lang="nl-BE" dirty="0"/>
+          </a:p>
+        </p:txBody>
+      </p:sp>
+      <p:sp>
+        <p:nvSpPr>
+          <p:cNvPr id="3" name="Text Placeholder 2"/>
+          <p:cNvSpPr>
+            <a:spLocks noGrp="1"/>
+          </p:cNvSpPr>
+          <p:nvPr>
+            <p:ph type="body" idx="1"/>
+          </p:nvPr>
+        </p:nvSpPr>
+        <p:spPr/>
+        <p:txBody>
+          <a:bodyPr/>
+          <a:lstStyle/>
+          <a:p>
+            <a:endParaRPr lang="nl-BE"/>
+          </a:p>
+        </p:txBody>
+      </p:sp>
+      <p:sp>
+        <p:nvSpPr>
+          <p:cNvPr id="4" name="Slide Number Placeholder 3"/>
+          <p:cNvSpPr>
+            <a:spLocks noGrp="1"/>
+          </p:cNvSpPr>
+          <p:nvPr>
+            <p:ph type="sldNum" sz="quarter" idx="12"/>
+          </p:nvPr>
+        </p:nvSpPr>
+        <p:spPr/>
+        <p:txBody>
+          <a:bodyPr/>
+          <a:lstStyle/>
+          <a:p>
+            <a:fld id="{BB52A05A-A776-4391-ACD7-D6BC34D3145C}" type="slidenum">
+              <a:rPr lang="nl-BE" smtClean="0"/>
+              <a:t>54</a:t>
+            </a:fld>
+            <a:endParaRPr lang="nl-BE"/>
+          </a:p>
+        </p:txBody>
+      </p:sp>
+    </p:spTree>
+    <p:extLst>
+      <p:ext uri="{BB962C8B-B14F-4D97-AF65-F5344CB8AC3E}">
+        <p14:creationId xmlns:p14="http://schemas.microsoft.com/office/powerpoint/2010/main" val="2763237186"/>
+      </p:ext>
+    </p:extLst>
+  </p:cSld>
+  <p:clrMapOvr>
+    <a:masterClrMapping/>
+  </p:clrMapOvr>
+  <p:timing>
+    <p:tnLst>
+      <p:par>
+        <p:cTn id="1" dur="indefinite" restart="never" nodeType="tmRoot"/>
+      </p:par>
+    </p:tnLst>
+  </p:timing>
+</p:sld>
+</file>
+
+<file path=ppt/slides/slide55.xml><?xml version="1.0" encoding="utf-8"?>
+<p:sld xmlns:a="http://schemas.openxmlformats.org/drawingml/2006/main" xmlns:r="http://schemas.openxmlformats.org/officeDocument/2006/relationships" xmlns:p="http://schemas.openxmlformats.org/presentationml/2006/main">
+  <p:cSld>
+    <p:spTree>
+      <p:nvGrpSpPr>
+        <p:cNvPr id="1" name=""/>
+        <p:cNvGrpSpPr/>
+        <p:nvPr/>
+      </p:nvGrpSpPr>
+      <p:grpSpPr>
+        <a:xfrm>
+          <a:off x="0" y="0"/>
+          <a:ext cx="0" cy="0"/>
+          <a:chOff x="0" y="0"/>
+          <a:chExt cx="0" cy="0"/>
+        </a:xfrm>
+      </p:grpSpPr>
+      <p:sp>
+        <p:nvSpPr>
+          <p:cNvPr id="2" name="Title 1"/>
+          <p:cNvSpPr>
+            <a:spLocks noGrp="1"/>
+          </p:cNvSpPr>
+          <p:nvPr>
+            <p:ph type="title"/>
+          </p:nvPr>
+        </p:nvSpPr>
+        <p:spPr/>
+        <p:txBody>
+          <a:bodyPr/>
+          <a:lstStyle/>
+          <a:p>
+            <a:r>
+              <a:rPr lang="en-US" dirty="0" smtClean="0"/>
+              <a:t>Conclusions</a:t>
+            </a:r>
+            <a:endParaRPr lang="nl-BE" dirty="0"/>
+          </a:p>
+        </p:txBody>
+      </p:sp>
+      <p:sp>
+        <p:nvSpPr>
+          <p:cNvPr id="3" name="Content Placeholder 2"/>
+          <p:cNvSpPr>
+            <a:spLocks noGrp="1"/>
+          </p:cNvSpPr>
+          <p:nvPr>
+            <p:ph idx="1"/>
+          </p:nvPr>
+        </p:nvSpPr>
+        <p:spPr/>
+        <p:txBody>
+          <a:bodyPr/>
+          <a:lstStyle/>
+          <a:p>
+            <a:r>
+              <a:rPr lang="en-US" dirty="0" smtClean="0"/>
+              <a:t>Contributes to the scientific method</a:t>
+            </a:r>
+          </a:p>
+          <a:p>
+            <a:pPr lvl="1"/>
+            <a:r>
+              <a:rPr lang="en-US" dirty="0" smtClean="0"/>
+              <a:t>Helps ensure reproducibility</a:t>
+            </a:r>
+          </a:p>
+          <a:p>
+            <a:r>
+              <a:rPr lang="en-US" dirty="0" smtClean="0"/>
+              <a:t>Record of change</a:t>
+            </a:r>
+          </a:p>
+          <a:p>
+            <a:pPr lvl="1"/>
+            <a:r>
+              <a:rPr lang="en-US" dirty="0" smtClean="0"/>
+              <a:t>What was changed?</a:t>
+            </a:r>
+          </a:p>
+          <a:p>
+            <a:pPr lvl="1"/>
+            <a:r>
+              <a:rPr lang="en-US" dirty="0" smtClean="0"/>
+              <a:t>When was it changed?</a:t>
+            </a:r>
+          </a:p>
+          <a:p>
+            <a:pPr lvl="1"/>
+            <a:r>
+              <a:rPr lang="en-US" dirty="0" smtClean="0"/>
+              <a:t>Who changed it?</a:t>
+            </a:r>
+          </a:p>
+          <a:p>
+            <a:pPr lvl="1"/>
+            <a:r>
+              <a:rPr lang="en-US" dirty="0" smtClean="0"/>
+              <a:t>Why was it changed?</a:t>
+            </a:r>
+            <a:endParaRPr lang="nl-BE" dirty="0"/>
+          </a:p>
+        </p:txBody>
+      </p:sp>
+      <p:sp>
+        <p:nvSpPr>
+          <p:cNvPr id="4" name="Slide Number Placeholder 3"/>
+          <p:cNvSpPr>
+            <a:spLocks noGrp="1"/>
+          </p:cNvSpPr>
+          <p:nvPr>
+            <p:ph type="sldNum" sz="quarter" idx="12"/>
+          </p:nvPr>
+        </p:nvSpPr>
+        <p:spPr/>
+        <p:txBody>
+          <a:bodyPr/>
+          <a:lstStyle/>
+          <a:p>
+            <a:fld id="{BB52A05A-A776-4391-ACD7-D6BC34D3145C}" type="slidenum">
+              <a:rPr lang="nl-BE" smtClean="0"/>
+              <a:t>55</a:t>
             </a:fld>
             <a:endParaRPr lang="nl-BE"/>
           </a:p>
@@ -36439,7 +37736,7 @@
 </p:sld>
 </file>
 
-<file path=ppt/slides/slide53.xml><?xml version="1.0" encoding="utf-8"?>
+<file path=ppt/slides/slide56.xml><?xml version="1.0" encoding="utf-8"?>
 <p:sld xmlns:a="http://schemas.openxmlformats.org/drawingml/2006/main" xmlns:r="http://schemas.openxmlformats.org/officeDocument/2006/relationships" xmlns:p="http://schemas.openxmlformats.org/presentationml/2006/main">
   <p:cSld>
     <p:spTree>
@@ -36626,7 +37923,7 @@
           <a:p>
             <a:fld id="{BB52A05A-A776-4391-ACD7-D6BC34D3145C}" type="slidenum">
               <a:rPr lang="nl-BE" smtClean="0"/>
-              <a:t>53</a:t>
+              <a:t>56</a:t>
             </a:fld>
             <a:endParaRPr lang="nl-BE"/>
           </a:p>
@@ -36652,7 +37949,7 @@
 </p:sld>
 </file>
 
-<file path=ppt/slides/slide54.xml><?xml version="1.0" encoding="utf-8"?>
+<file path=ppt/slides/slide57.xml><?xml version="1.0" encoding="utf-8"?>
 <p:sld xmlns:a="http://schemas.openxmlformats.org/drawingml/2006/main" xmlns:r="http://schemas.openxmlformats.org/officeDocument/2006/relationships" xmlns:p="http://schemas.openxmlformats.org/presentationml/2006/main">
   <p:cSld>
     <p:spTree>
@@ -36946,7 +38243,7 @@
           <a:p>
             <a:fld id="{BB52A05A-A776-4391-ACD7-D6BC34D3145C}" type="slidenum">
               <a:rPr lang="nl-BE" smtClean="0"/>
-              <a:t>54</a:t>
+              <a:t>57</a:t>
             </a:fld>
             <a:endParaRPr lang="nl-BE"/>
           </a:p>
@@ -36972,7 +38269,7 @@
 </p:sld>
 </file>
 
-<file path=ppt/slides/slide55.xml><?xml version="1.0" encoding="utf-8"?>
+<file path=ppt/slides/slide58.xml><?xml version="1.0" encoding="utf-8"?>
 <p:sld xmlns:a="http://schemas.openxmlformats.org/drawingml/2006/main" xmlns:r="http://schemas.openxmlformats.org/officeDocument/2006/relationships" xmlns:p="http://schemas.openxmlformats.org/presentationml/2006/main">
   <p:cSld>
     <p:spTree>
@@ -37072,13 +38369,8 @@
             <a:pPr lvl="1"/>
             <a:r>
               <a:rPr lang="en-US" dirty="0" smtClean="0"/>
-              <a:t>Issue tracking, pull requests, code reviews, wiki, release management, forking, non-free </a:t>
-            </a:r>
-            <a:r>
-              <a:rPr lang="en-US" smtClean="0"/>
-              <a:t>private repositories</a:t>
-            </a:r>
-            <a:endParaRPr lang="en-US" dirty="0" smtClean="0"/>
+              <a:t>Issue tracking, pull requests, code reviews, wiki, release management, forking, non-free private repositories</a:t>
+            </a:r>
           </a:p>
           <a:p>
             <a:r>
@@ -37140,7 +38432,7 @@
           <a:p>
             <a:fld id="{BB52A05A-A776-4391-ACD7-D6BC34D3145C}" type="slidenum">
               <a:rPr lang="nl-BE" smtClean="0"/>
-              <a:t>55</a:t>
+              <a:t>58</a:t>
             </a:fld>
             <a:endParaRPr lang="nl-BE"/>
           </a:p>
@@ -37156,6 +38448,362 @@
   <p:clrMapOvr>
     <a:masterClrMapping/>
   </p:clrMapOvr>
+  <p:timing>
+    <p:tnLst>
+      <p:par>
+        <p:cTn id="1" dur="indefinite" restart="never" nodeType="tmRoot">
+          <p:childTnLst>
+            <p:seq concurrent="1" nextAc="seek">
+              <p:cTn id="2" dur="indefinite" nodeType="mainSeq">
+                <p:childTnLst>
+                  <p:par>
+                    <p:cTn id="3" fill="hold">
+                      <p:stCondLst>
+                        <p:cond delay="indefinite"/>
+                        <p:cond evt="onBegin" delay="0">
+                          <p:tn val="2"/>
+                        </p:cond>
+                      </p:stCondLst>
+                      <p:childTnLst>
+                        <p:par>
+                          <p:cTn id="4" fill="hold">
+                            <p:stCondLst>
+                              <p:cond delay="0"/>
+                            </p:stCondLst>
+                            <p:childTnLst>
+                              <p:par>
+                                <p:cTn id="5" presetID="1" presetClass="entr" presetSubtype="0" fill="hold" grpId="0" nodeType="withEffect">
+                                  <p:stCondLst>
+                                    <p:cond delay="0"/>
+                                  </p:stCondLst>
+                                  <p:childTnLst>
+                                    <p:set>
+                                      <p:cBhvr>
+                                        <p:cTn id="6" dur="1" fill="hold">
+                                          <p:stCondLst>
+                                            <p:cond delay="0"/>
+                                          </p:stCondLst>
+                                        </p:cTn>
+                                        <p:tgtEl>
+                                          <p:spTgt spid="3">
+                                            <p:txEl>
+                                              <p:pRg st="0" end="0"/>
+                                            </p:txEl>
+                                          </p:spTgt>
+                                        </p:tgtEl>
+                                        <p:attrNameLst>
+                                          <p:attrName>style.visibility</p:attrName>
+                                        </p:attrNameLst>
+                                      </p:cBhvr>
+                                      <p:to>
+                                        <p:strVal val="visible"/>
+                                      </p:to>
+                                    </p:set>
+                                  </p:childTnLst>
+                                </p:cTn>
+                              </p:par>
+                              <p:par>
+                                <p:cTn id="7" presetID="1" presetClass="entr" presetSubtype="0" fill="hold" grpId="0" nodeType="withEffect">
+                                  <p:stCondLst>
+                                    <p:cond delay="0"/>
+                                  </p:stCondLst>
+                                  <p:childTnLst>
+                                    <p:set>
+                                      <p:cBhvr>
+                                        <p:cTn id="8" dur="1" fill="hold">
+                                          <p:stCondLst>
+                                            <p:cond delay="0"/>
+                                          </p:stCondLst>
+                                        </p:cTn>
+                                        <p:tgtEl>
+                                          <p:spTgt spid="3">
+                                            <p:txEl>
+                                              <p:pRg st="1" end="1"/>
+                                            </p:txEl>
+                                          </p:spTgt>
+                                        </p:tgtEl>
+                                        <p:attrNameLst>
+                                          <p:attrName>style.visibility</p:attrName>
+                                        </p:attrNameLst>
+                                      </p:cBhvr>
+                                      <p:to>
+                                        <p:strVal val="visible"/>
+                                      </p:to>
+                                    </p:set>
+                                  </p:childTnLst>
+                                </p:cTn>
+                              </p:par>
+                            </p:childTnLst>
+                          </p:cTn>
+                        </p:par>
+                      </p:childTnLst>
+                    </p:cTn>
+                  </p:par>
+                  <p:par>
+                    <p:cTn id="9" fill="hold">
+                      <p:stCondLst>
+                        <p:cond delay="indefinite"/>
+                      </p:stCondLst>
+                      <p:childTnLst>
+                        <p:par>
+                          <p:cTn id="10" fill="hold">
+                            <p:stCondLst>
+                              <p:cond delay="0"/>
+                            </p:stCondLst>
+                            <p:childTnLst>
+                              <p:par>
+                                <p:cTn id="11" presetID="1" presetClass="entr" presetSubtype="0" fill="hold" grpId="0" nodeType="clickEffect">
+                                  <p:stCondLst>
+                                    <p:cond delay="0"/>
+                                  </p:stCondLst>
+                                  <p:childTnLst>
+                                    <p:set>
+                                      <p:cBhvr>
+                                        <p:cTn id="12" dur="1" fill="hold">
+                                          <p:stCondLst>
+                                            <p:cond delay="0"/>
+                                          </p:stCondLst>
+                                        </p:cTn>
+                                        <p:tgtEl>
+                                          <p:spTgt spid="3">
+                                            <p:txEl>
+                                              <p:pRg st="2" end="2"/>
+                                            </p:txEl>
+                                          </p:spTgt>
+                                        </p:tgtEl>
+                                        <p:attrNameLst>
+                                          <p:attrName>style.visibility</p:attrName>
+                                        </p:attrNameLst>
+                                      </p:cBhvr>
+                                      <p:to>
+                                        <p:strVal val="visible"/>
+                                      </p:to>
+                                    </p:set>
+                                  </p:childTnLst>
+                                </p:cTn>
+                              </p:par>
+                              <p:par>
+                                <p:cTn id="13" presetID="1" presetClass="entr" presetSubtype="0" fill="hold" grpId="0" nodeType="withEffect">
+                                  <p:stCondLst>
+                                    <p:cond delay="0"/>
+                                  </p:stCondLst>
+                                  <p:childTnLst>
+                                    <p:set>
+                                      <p:cBhvr>
+                                        <p:cTn id="14" dur="1" fill="hold">
+                                          <p:stCondLst>
+                                            <p:cond delay="0"/>
+                                          </p:stCondLst>
+                                        </p:cTn>
+                                        <p:tgtEl>
+                                          <p:spTgt spid="3">
+                                            <p:txEl>
+                                              <p:pRg st="3" end="3"/>
+                                            </p:txEl>
+                                          </p:spTgt>
+                                        </p:tgtEl>
+                                        <p:attrNameLst>
+                                          <p:attrName>style.visibility</p:attrName>
+                                        </p:attrNameLst>
+                                      </p:cBhvr>
+                                      <p:to>
+                                        <p:strVal val="visible"/>
+                                      </p:to>
+                                    </p:set>
+                                  </p:childTnLst>
+                                </p:cTn>
+                              </p:par>
+                            </p:childTnLst>
+                          </p:cTn>
+                        </p:par>
+                      </p:childTnLst>
+                    </p:cTn>
+                  </p:par>
+                  <p:par>
+                    <p:cTn id="15" fill="hold">
+                      <p:stCondLst>
+                        <p:cond delay="indefinite"/>
+                      </p:stCondLst>
+                      <p:childTnLst>
+                        <p:par>
+                          <p:cTn id="16" fill="hold">
+                            <p:stCondLst>
+                              <p:cond delay="0"/>
+                            </p:stCondLst>
+                            <p:childTnLst>
+                              <p:par>
+                                <p:cTn id="17" presetID="1" presetClass="entr" presetSubtype="0" fill="hold" grpId="0" nodeType="clickEffect">
+                                  <p:stCondLst>
+                                    <p:cond delay="0"/>
+                                  </p:stCondLst>
+                                  <p:childTnLst>
+                                    <p:set>
+                                      <p:cBhvr>
+                                        <p:cTn id="18" dur="1" fill="hold">
+                                          <p:stCondLst>
+                                            <p:cond delay="0"/>
+                                          </p:stCondLst>
+                                        </p:cTn>
+                                        <p:tgtEl>
+                                          <p:spTgt spid="3">
+                                            <p:txEl>
+                                              <p:pRg st="4" end="4"/>
+                                            </p:txEl>
+                                          </p:spTgt>
+                                        </p:tgtEl>
+                                        <p:attrNameLst>
+                                          <p:attrName>style.visibility</p:attrName>
+                                        </p:attrNameLst>
+                                      </p:cBhvr>
+                                      <p:to>
+                                        <p:strVal val="visible"/>
+                                      </p:to>
+                                    </p:set>
+                                  </p:childTnLst>
+                                </p:cTn>
+                              </p:par>
+                              <p:par>
+                                <p:cTn id="19" presetID="1" presetClass="entr" presetSubtype="0" fill="hold" grpId="0" nodeType="withEffect">
+                                  <p:stCondLst>
+                                    <p:cond delay="0"/>
+                                  </p:stCondLst>
+                                  <p:childTnLst>
+                                    <p:set>
+                                      <p:cBhvr>
+                                        <p:cTn id="20" dur="1" fill="hold">
+                                          <p:stCondLst>
+                                            <p:cond delay="0"/>
+                                          </p:stCondLst>
+                                        </p:cTn>
+                                        <p:tgtEl>
+                                          <p:spTgt spid="3">
+                                            <p:txEl>
+                                              <p:pRg st="5" end="5"/>
+                                            </p:txEl>
+                                          </p:spTgt>
+                                        </p:tgtEl>
+                                        <p:attrNameLst>
+                                          <p:attrName>style.visibility</p:attrName>
+                                        </p:attrNameLst>
+                                      </p:cBhvr>
+                                      <p:to>
+                                        <p:strVal val="visible"/>
+                                      </p:to>
+                                    </p:set>
+                                  </p:childTnLst>
+                                </p:cTn>
+                              </p:par>
+                            </p:childTnLst>
+                          </p:cTn>
+                        </p:par>
+                      </p:childTnLst>
+                    </p:cTn>
+                  </p:par>
+                  <p:par>
+                    <p:cTn id="21" fill="hold">
+                      <p:stCondLst>
+                        <p:cond delay="indefinite"/>
+                      </p:stCondLst>
+                      <p:childTnLst>
+                        <p:par>
+                          <p:cTn id="22" fill="hold">
+                            <p:stCondLst>
+                              <p:cond delay="0"/>
+                            </p:stCondLst>
+                            <p:childTnLst>
+                              <p:par>
+                                <p:cTn id="23" presetID="1" presetClass="entr" presetSubtype="0" fill="hold" grpId="0" nodeType="clickEffect">
+                                  <p:stCondLst>
+                                    <p:cond delay="0"/>
+                                  </p:stCondLst>
+                                  <p:childTnLst>
+                                    <p:set>
+                                      <p:cBhvr>
+                                        <p:cTn id="24" dur="1" fill="hold">
+                                          <p:stCondLst>
+                                            <p:cond delay="0"/>
+                                          </p:stCondLst>
+                                        </p:cTn>
+                                        <p:tgtEl>
+                                          <p:spTgt spid="3">
+                                            <p:txEl>
+                                              <p:pRg st="6" end="6"/>
+                                            </p:txEl>
+                                          </p:spTgt>
+                                        </p:tgtEl>
+                                        <p:attrNameLst>
+                                          <p:attrName>style.visibility</p:attrName>
+                                        </p:attrNameLst>
+                                      </p:cBhvr>
+                                      <p:to>
+                                        <p:strVal val="visible"/>
+                                      </p:to>
+                                    </p:set>
+                                  </p:childTnLst>
+                                </p:cTn>
+                              </p:par>
+                              <p:par>
+                                <p:cTn id="25" presetID="1" presetClass="entr" presetSubtype="0" fill="hold" grpId="0" nodeType="withEffect">
+                                  <p:stCondLst>
+                                    <p:cond delay="0"/>
+                                  </p:stCondLst>
+                                  <p:childTnLst>
+                                    <p:set>
+                                      <p:cBhvr>
+                                        <p:cTn id="26" dur="1" fill="hold">
+                                          <p:stCondLst>
+                                            <p:cond delay="0"/>
+                                          </p:stCondLst>
+                                        </p:cTn>
+                                        <p:tgtEl>
+                                          <p:spTgt spid="3">
+                                            <p:txEl>
+                                              <p:pRg st="7" end="7"/>
+                                            </p:txEl>
+                                          </p:spTgt>
+                                        </p:tgtEl>
+                                        <p:attrNameLst>
+                                          <p:attrName>style.visibility</p:attrName>
+                                        </p:attrNameLst>
+                                      </p:cBhvr>
+                                      <p:to>
+                                        <p:strVal val="visible"/>
+                                      </p:to>
+                                    </p:set>
+                                  </p:childTnLst>
+                                </p:cTn>
+                              </p:par>
+                            </p:childTnLst>
+                          </p:cTn>
+                        </p:par>
+                      </p:childTnLst>
+                    </p:cTn>
+                  </p:par>
+                </p:childTnLst>
+              </p:cTn>
+              <p:prevCondLst>
+                <p:cond evt="onPrev" delay="0">
+                  <p:tgtEl>
+                    <p:sldTgt/>
+                  </p:tgtEl>
+                </p:cond>
+              </p:prevCondLst>
+              <p:nextCondLst>
+                <p:cond evt="onNext" delay="0">
+                  <p:tgtEl>
+                    <p:sldTgt/>
+                  </p:tgtEl>
+                </p:cond>
+              </p:nextCondLst>
+            </p:seq>
+          </p:childTnLst>
+        </p:cTn>
+      </p:par>
+    </p:tnLst>
+    <p:bldLst>
+      <p:bldP spid="3" grpId="0" uiExpand="1" build="p"/>
+    </p:bldLst>
+  </p:timing>
 </p:sld>
 </file>
 

</xml_diff>

<commit_message>
Added more comments on diffs
</commit_message>
<xml_diff>
--- a/LinuxTools/VersionControl/version_control_git.pptx
+++ b/LinuxTools/VersionControl/version_control_git.pptx
@@ -5,7 +5,7 @@
     <p:sldMasterId id="2147483648" r:id="rId1"/>
   </p:sldMasterIdLst>
   <p:notesMasterIdLst>
-    <p:notesMasterId r:id="rId63"/>
+    <p:notesMasterId r:id="rId62"/>
   </p:notesMasterIdLst>
   <p:sldIdLst>
     <p:sldId id="256" r:id="rId2"/>
@@ -29,46 +29,45 @@
     <p:sldId id="261" r:id="rId20"/>
     <p:sldId id="280" r:id="rId21"/>
     <p:sldId id="318" r:id="rId22"/>
-    <p:sldId id="319" r:id="rId23"/>
-    <p:sldId id="317" r:id="rId24"/>
-    <p:sldId id="281" r:id="rId25"/>
-    <p:sldId id="302" r:id="rId26"/>
-    <p:sldId id="306" r:id="rId27"/>
-    <p:sldId id="262" r:id="rId28"/>
-    <p:sldId id="260" r:id="rId29"/>
-    <p:sldId id="278" r:id="rId30"/>
-    <p:sldId id="279" r:id="rId31"/>
-    <p:sldId id="303" r:id="rId32"/>
-    <p:sldId id="308" r:id="rId33"/>
-    <p:sldId id="282" r:id="rId34"/>
-    <p:sldId id="296" r:id="rId35"/>
-    <p:sldId id="283" r:id="rId36"/>
-    <p:sldId id="295" r:id="rId37"/>
-    <p:sldId id="285" r:id="rId38"/>
-    <p:sldId id="284" r:id="rId39"/>
-    <p:sldId id="286" r:id="rId40"/>
-    <p:sldId id="287" r:id="rId41"/>
-    <p:sldId id="288" r:id="rId42"/>
-    <p:sldId id="289" r:id="rId43"/>
-    <p:sldId id="290" r:id="rId44"/>
-    <p:sldId id="291" r:id="rId45"/>
-    <p:sldId id="292" r:id="rId46"/>
-    <p:sldId id="311" r:id="rId47"/>
-    <p:sldId id="294" r:id="rId48"/>
-    <p:sldId id="297" r:id="rId49"/>
-    <p:sldId id="304" r:id="rId50"/>
-    <p:sldId id="305" r:id="rId51"/>
-    <p:sldId id="312" r:id="rId52"/>
-    <p:sldId id="307" r:id="rId53"/>
-    <p:sldId id="309" r:id="rId54"/>
-    <p:sldId id="314" r:id="rId55"/>
-    <p:sldId id="315" r:id="rId56"/>
-    <p:sldId id="316" r:id="rId57"/>
-    <p:sldId id="300" r:id="rId58"/>
-    <p:sldId id="301" r:id="rId59"/>
-    <p:sldId id="299" r:id="rId60"/>
-    <p:sldId id="310" r:id="rId61"/>
-    <p:sldId id="313" r:id="rId62"/>
+    <p:sldId id="317" r:id="rId23"/>
+    <p:sldId id="281" r:id="rId24"/>
+    <p:sldId id="302" r:id="rId25"/>
+    <p:sldId id="306" r:id="rId26"/>
+    <p:sldId id="262" r:id="rId27"/>
+    <p:sldId id="260" r:id="rId28"/>
+    <p:sldId id="278" r:id="rId29"/>
+    <p:sldId id="279" r:id="rId30"/>
+    <p:sldId id="303" r:id="rId31"/>
+    <p:sldId id="308" r:id="rId32"/>
+    <p:sldId id="282" r:id="rId33"/>
+    <p:sldId id="296" r:id="rId34"/>
+    <p:sldId id="283" r:id="rId35"/>
+    <p:sldId id="295" r:id="rId36"/>
+    <p:sldId id="285" r:id="rId37"/>
+    <p:sldId id="284" r:id="rId38"/>
+    <p:sldId id="286" r:id="rId39"/>
+    <p:sldId id="287" r:id="rId40"/>
+    <p:sldId id="288" r:id="rId41"/>
+    <p:sldId id="289" r:id="rId42"/>
+    <p:sldId id="290" r:id="rId43"/>
+    <p:sldId id="291" r:id="rId44"/>
+    <p:sldId id="292" r:id="rId45"/>
+    <p:sldId id="311" r:id="rId46"/>
+    <p:sldId id="294" r:id="rId47"/>
+    <p:sldId id="297" r:id="rId48"/>
+    <p:sldId id="304" r:id="rId49"/>
+    <p:sldId id="305" r:id="rId50"/>
+    <p:sldId id="312" r:id="rId51"/>
+    <p:sldId id="307" r:id="rId52"/>
+    <p:sldId id="309" r:id="rId53"/>
+    <p:sldId id="314" r:id="rId54"/>
+    <p:sldId id="315" r:id="rId55"/>
+    <p:sldId id="316" r:id="rId56"/>
+    <p:sldId id="300" r:id="rId57"/>
+    <p:sldId id="301" r:id="rId58"/>
+    <p:sldId id="299" r:id="rId59"/>
+    <p:sldId id="310" r:id="rId60"/>
+    <p:sldId id="313" r:id="rId61"/>
   </p:sldIdLst>
   <p:sldSz cx="9144000" cy="6858000" type="screen4x3"/>
   <p:notesSz cx="6858000" cy="9144000"/>
@@ -201,7 +200,6 @@
             <p14:sldId id="261"/>
             <p14:sldId id="280"/>
             <p14:sldId id="318"/>
-            <p14:sldId id="319"/>
             <p14:sldId id="317"/>
             <p14:sldId id="281"/>
             <p14:sldId id="302"/>
@@ -701,7 +699,7 @@
           <a:p>
             <a:fld id="{1A571F42-F258-455F-A3F1-D2E86FDFEB4C}" type="slidenum">
               <a:rPr lang="nl-BE" smtClean="0"/>
-              <a:t>60</a:t>
+              <a:t>59</a:t>
             </a:fld>
             <a:endParaRPr lang="nl-BE"/>
           </a:p>
@@ -9039,47 +9037,19 @@
         <p:spPr/>
         <p:txBody>
           <a:bodyPr>
-            <a:normAutofit fontScale="92500"/>
+            <a:normAutofit/>
           </a:bodyPr>
           <a:lstStyle/>
           <a:p>
             <a:r>
               <a:rPr lang="en-US" dirty="0" smtClean="0"/>
-              <a:t>Status information on your current branch</a:t>
-            </a:r>
-          </a:p>
-          <a:p>
-            <a:endParaRPr lang="en-US" dirty="0"/>
-          </a:p>
-          <a:p>
+              <a:t>Status information on your current </a:t>
+            </a:r>
+            <a:r>
+              <a:rPr lang="en-US" dirty="0" smtClean="0"/>
+              <a:t>branch</a:t>
+            </a:r>
             <a:endParaRPr lang="en-US" dirty="0" smtClean="0"/>
-          </a:p>
-          <a:p>
-            <a:endParaRPr lang="en-US" dirty="0"/>
-          </a:p>
-          <a:p>
-            <a:endParaRPr lang="en-US" dirty="0" smtClean="0"/>
-          </a:p>
-          <a:p>
-            <a:endParaRPr lang="en-US" dirty="0"/>
-          </a:p>
-          <a:p>
-            <a:endParaRPr lang="en-US" dirty="0" smtClean="0"/>
-          </a:p>
-          <a:p>
-            <a:r>
-              <a:rPr lang="en-US" dirty="0" smtClean="0"/>
-              <a:t>Note: </a:t>
-            </a:r>
-            <a:r>
-              <a:rPr lang="en-US" dirty="0" err="1" smtClean="0"/>
-              <a:t>git</a:t>
-            </a:r>
-            <a:r>
-              <a:rPr lang="en-US" dirty="0" smtClean="0"/>
-              <a:t> is pretty verbose and offers suggestions</a:t>
-            </a:r>
-            <a:endParaRPr lang="nl-BE" dirty="0"/>
           </a:p>
         </p:txBody>
       </p:sp>
@@ -9092,7 +9062,7 @@
         <p:spPr>
           <a:xfrm>
             <a:off x="1214206" y="2276872"/>
-            <a:ext cx="6526146" cy="2862322"/>
+            <a:ext cx="6526146" cy="3416320"/>
           </a:xfrm>
           <a:prstGeom prst="rect">
             <a:avLst/>
@@ -9149,12 +9119,99 @@
           </a:p>
           <a:p>
             <a:r>
+              <a:rPr lang="en-US" dirty="0" smtClean="0">
+                <a:latin typeface="Courier New" panose="02070309020205020404" pitchFamily="49" charset="0"/>
+                <a:cs typeface="Courier New" panose="02070309020205020404" pitchFamily="49" charset="0"/>
+              </a:rPr>
+              <a:t>Changes </a:t>
+            </a:r>
+            <a:r>
               <a:rPr lang="en-US" dirty="0">
                 <a:latin typeface="Courier New" panose="02070309020205020404" pitchFamily="49" charset="0"/>
                 <a:cs typeface="Courier New" panose="02070309020205020404" pitchFamily="49" charset="0"/>
               </a:rPr>
-              <a:t>Initial commit</a:t>
-            </a:r>
+              <a:t>to be committed:</a:t>
+            </a:r>
+          </a:p>
+          <a:p>
+            <a:r>
+              <a:rPr lang="en-US" dirty="0">
+                <a:latin typeface="Courier New" panose="02070309020205020404" pitchFamily="49" charset="0"/>
+                <a:cs typeface="Courier New" panose="02070309020205020404" pitchFamily="49" charset="0"/>
+              </a:rPr>
+              <a:t>  (use "</a:t>
+            </a:r>
+            <a:r>
+              <a:rPr lang="en-US" dirty="0" err="1">
+                <a:latin typeface="Courier New" panose="02070309020205020404" pitchFamily="49" charset="0"/>
+                <a:cs typeface="Courier New" panose="02070309020205020404" pitchFamily="49" charset="0"/>
+              </a:rPr>
+              <a:t>git</a:t>
+            </a:r>
+            <a:r>
+              <a:rPr lang="en-US" dirty="0">
+                <a:latin typeface="Courier New" panose="02070309020205020404" pitchFamily="49" charset="0"/>
+                <a:cs typeface="Courier New" panose="02070309020205020404" pitchFamily="49" charset="0"/>
+              </a:rPr>
+              <a:t> </a:t>
+            </a:r>
+            <a:r>
+              <a:rPr lang="en-US" dirty="0" err="1">
+                <a:latin typeface="Courier New" panose="02070309020205020404" pitchFamily="49" charset="0"/>
+                <a:cs typeface="Courier New" panose="02070309020205020404" pitchFamily="49" charset="0"/>
+              </a:rPr>
+              <a:t>rm</a:t>
+            </a:r>
+            <a:r>
+              <a:rPr lang="en-US" dirty="0">
+                <a:latin typeface="Courier New" panose="02070309020205020404" pitchFamily="49" charset="0"/>
+                <a:cs typeface="Courier New" panose="02070309020205020404" pitchFamily="49" charset="0"/>
+              </a:rPr>
+              <a:t> --cached &lt;file&gt;..." to </a:t>
+            </a:r>
+            <a:r>
+              <a:rPr lang="en-US" dirty="0" err="1">
+                <a:latin typeface="Courier New" panose="02070309020205020404" pitchFamily="49" charset="0"/>
+                <a:cs typeface="Courier New" panose="02070309020205020404" pitchFamily="49" charset="0"/>
+              </a:rPr>
+              <a:t>unstage</a:t>
+            </a:r>
+            <a:r>
+              <a:rPr lang="en-US" dirty="0">
+                <a:latin typeface="Courier New" panose="02070309020205020404" pitchFamily="49" charset="0"/>
+                <a:cs typeface="Courier New" panose="02070309020205020404" pitchFamily="49" charset="0"/>
+              </a:rPr>
+              <a:t>)</a:t>
+            </a:r>
+          </a:p>
+          <a:p>
+            <a:r>
+              <a:rPr lang="en-US" dirty="0">
+                <a:latin typeface="Courier New" panose="02070309020205020404" pitchFamily="49" charset="0"/>
+                <a:cs typeface="Courier New" panose="02070309020205020404" pitchFamily="49" charset="0"/>
+              </a:rPr>
+              <a:t>	new file:   README.md</a:t>
+            </a:r>
+          </a:p>
+          <a:p>
+            <a:r>
+              <a:rPr lang="en-US" dirty="0">
+                <a:latin typeface="Courier New" panose="02070309020205020404" pitchFamily="49" charset="0"/>
+                <a:cs typeface="Courier New" panose="02070309020205020404" pitchFamily="49" charset="0"/>
+              </a:rPr>
+              <a:t>	new file:   </a:t>
+            </a:r>
+            <a:r>
+              <a:rPr lang="en-US" dirty="0" err="1" smtClean="0">
+                <a:latin typeface="Courier New" panose="02070309020205020404" pitchFamily="49" charset="0"/>
+                <a:cs typeface="Courier New" panose="02070309020205020404" pitchFamily="49" charset="0"/>
+              </a:rPr>
+              <a:t>eq.c</a:t>
+            </a:r>
+            <a:endParaRPr lang="en-US" dirty="0" smtClean="0">
+              <a:latin typeface="Courier New" panose="02070309020205020404" pitchFamily="49" charset="0"/>
+              <a:cs typeface="Courier New" panose="02070309020205020404" pitchFamily="49" charset="0"/>
+            </a:endParaRPr>
           </a:p>
           <a:p>
             <a:endParaRPr lang="en-US" dirty="0">
@@ -9168,7 +9225,7 @@
                 <a:latin typeface="Courier New" panose="02070309020205020404" pitchFamily="49" charset="0"/>
                 <a:cs typeface="Courier New" panose="02070309020205020404" pitchFamily="49" charset="0"/>
               </a:rPr>
-              <a:t>Changes to be committed:</a:t>
+              <a:t>Untracked files:</a:t>
             </a:r>
           </a:p>
           <a:p>
@@ -9191,66 +9248,50 @@
                 <a:latin typeface="Courier New" panose="02070309020205020404" pitchFamily="49" charset="0"/>
                 <a:cs typeface="Courier New" panose="02070309020205020404" pitchFamily="49" charset="0"/>
               </a:rPr>
-              <a:t> </a:t>
-            </a:r>
-            <a:r>
-              <a:rPr lang="en-US" dirty="0" err="1">
+              <a:t> add &lt;file&gt;..." to include in </a:t>
+            </a:r>
+            <a:r>
+              <a:rPr lang="en-US" dirty="0" smtClean="0">
                 <a:latin typeface="Courier New" panose="02070309020205020404" pitchFamily="49" charset="0"/>
                 <a:cs typeface="Courier New" panose="02070309020205020404" pitchFamily="49" charset="0"/>
               </a:rPr>
-              <a:t>rm</a:t>
+              <a:t>what</a:t>
+            </a:r>
+            <a:br>
+              <a:rPr lang="en-US" dirty="0" smtClean="0">
+                <a:latin typeface="Courier New" panose="02070309020205020404" pitchFamily="49" charset="0"/>
+                <a:cs typeface="Courier New" panose="02070309020205020404" pitchFamily="49" charset="0"/>
+              </a:rPr>
+            </a:br>
+            <a:r>
+              <a:rPr lang="en-US" dirty="0" smtClean="0">
+                <a:latin typeface="Courier New" panose="02070309020205020404" pitchFamily="49" charset="0"/>
+                <a:cs typeface="Courier New" panose="02070309020205020404" pitchFamily="49" charset="0"/>
+              </a:rPr>
+              <a:t>   will </a:t>
             </a:r>
             <a:r>
               <a:rPr lang="en-US" dirty="0">
                 <a:latin typeface="Courier New" panose="02070309020205020404" pitchFamily="49" charset="0"/>
                 <a:cs typeface="Courier New" panose="02070309020205020404" pitchFamily="49" charset="0"/>
               </a:rPr>
-              <a:t> --cached &lt;file&gt;..." to </a:t>
-            </a:r>
-            <a:r>
-              <a:rPr lang="en-US" dirty="0" err="1">
-                <a:latin typeface="Courier New" panose="02070309020205020404" pitchFamily="49" charset="0"/>
-                <a:cs typeface="Courier New" panose="02070309020205020404" pitchFamily="49" charset="0"/>
-              </a:rPr>
-              <a:t>unstage</a:t>
-            </a:r>
+              <a:t>be committed)</a:t>
+            </a:r>
+          </a:p>
+          <a:p>
             <a:r>
               <a:rPr lang="en-US" dirty="0">
                 <a:latin typeface="Courier New" panose="02070309020205020404" pitchFamily="49" charset="0"/>
                 <a:cs typeface="Courier New" panose="02070309020205020404" pitchFamily="49" charset="0"/>
               </a:rPr>
-              <a:t>)</a:t>
-            </a:r>
-          </a:p>
-          <a:p>
-            <a:endParaRPr lang="en-US" dirty="0">
-              <a:latin typeface="Courier New" panose="02070309020205020404" pitchFamily="49" charset="0"/>
-              <a:cs typeface="Courier New" panose="02070309020205020404" pitchFamily="49" charset="0"/>
-            </a:endParaRPr>
-          </a:p>
-          <a:p>
-            <a:r>
-              <a:rPr lang="en-US" dirty="0">
+              <a:t>	</a:t>
+            </a:r>
+            <a:r>
+              <a:rPr lang="en-US" dirty="0" smtClean="0">
                 <a:latin typeface="Courier New" panose="02070309020205020404" pitchFamily="49" charset="0"/>
                 <a:cs typeface="Courier New" panose="02070309020205020404" pitchFamily="49" charset="0"/>
               </a:rPr>
-              <a:t>	new file:   README.md</a:t>
-            </a:r>
-          </a:p>
-          <a:p>
-            <a:r>
-              <a:rPr lang="en-US" dirty="0">
-                <a:latin typeface="Courier New" panose="02070309020205020404" pitchFamily="49" charset="0"/>
-                <a:cs typeface="Courier New" panose="02070309020205020404" pitchFamily="49" charset="0"/>
-              </a:rPr>
-              <a:t>	new file:   </a:t>
-            </a:r>
-            <a:r>
-              <a:rPr lang="en-US" dirty="0" err="1" smtClean="0">
-                <a:latin typeface="Courier New" panose="02070309020205020404" pitchFamily="49" charset="0"/>
-                <a:cs typeface="Courier New" panose="02070309020205020404" pitchFamily="49" charset="0"/>
-              </a:rPr>
-              <a:t>eq.c</a:t>
+              <a:t>TODO.md</a:t>
             </a:r>
             <a:endParaRPr lang="en-US" dirty="0">
               <a:latin typeface="Courier New" panose="02070309020205020404" pitchFamily="49" charset="0"/>
@@ -9279,6 +9320,53 @@
               <a:t>19</a:t>
             </a:fld>
             <a:endParaRPr lang="nl-BE"/>
+          </a:p>
+        </p:txBody>
+      </p:sp>
+      <p:sp>
+        <p:nvSpPr>
+          <p:cNvPr id="6" name="TextBox 5"/>
+          <p:cNvSpPr txBox="1"/>
+          <p:nvPr/>
+        </p:nvSpPr>
+        <p:spPr>
+          <a:xfrm>
+            <a:off x="683568" y="6044363"/>
+            <a:ext cx="6271012" cy="461665"/>
+          </a:xfrm>
+          <a:prstGeom prst="rect">
+            <a:avLst/>
+          </a:prstGeom>
+          <a:noFill/>
+          <a:ln>
+            <a:solidFill>
+              <a:schemeClr val="tx1"/>
+            </a:solidFill>
+          </a:ln>
+        </p:spPr>
+        <p:txBody>
+          <a:bodyPr wrap="none" rtlCol="0">
+            <a:spAutoFit/>
+          </a:bodyPr>
+          <a:lstStyle/>
+          <a:p>
+            <a:r>
+              <a:rPr lang="en-US" sz="2400" dirty="0"/>
+              <a:t>Note: </a:t>
+            </a:r>
+            <a:r>
+              <a:rPr lang="en-US" sz="2400" dirty="0" err="1"/>
+              <a:t>git</a:t>
+            </a:r>
+            <a:r>
+              <a:rPr lang="en-US" sz="2400" dirty="0"/>
+              <a:t> is pretty verbose and offers </a:t>
+            </a:r>
+            <a:r>
+              <a:rPr lang="en-US" sz="2400" dirty="0" smtClean="0"/>
+              <a:t>suggestions</a:t>
+            </a:r>
+            <a:endParaRPr lang="nl-BE" sz="2400" dirty="0"/>
           </a:p>
         </p:txBody>
       </p:sp>
@@ -9405,11 +9493,7 @@
                                           </p:stCondLst>
                                         </p:cTn>
                                         <p:tgtEl>
-                                          <p:spTgt spid="3">
-                                            <p:txEl>
-                                              <p:pRg st="7" end="7"/>
-                                            </p:txEl>
-                                          </p:spTgt>
+                                          <p:spTgt spid="6"/>
                                         </p:tgtEl>
                                         <p:attrNameLst>
                                           <p:attrName>style.visibility</p:attrName>
@@ -9452,6 +9536,7 @@
     <p:bldLst>
       <p:bldP spid="3" grpId="0" uiExpand="1" build="p"/>
       <p:bldP spid="4" grpId="0" animBg="1"/>
+      <p:bldP spid="6" grpId="0" animBg="1"/>
     </p:bldLst>
   </p:timing>
 </p:sld>
@@ -10875,7 +10960,7 @@
           <a:p>
             <a:r>
               <a:rPr lang="en-US" dirty="0" smtClean="0"/>
-              <a:t>Formatting log output</a:t>
+              <a:t>Customizing log output</a:t>
             </a:r>
             <a:endParaRPr lang="en-US" dirty="0"/>
           </a:p>
@@ -11217,6 +11302,41 @@
               <a:latin typeface="Courier New" panose="02070309020205020404" pitchFamily="49" charset="0"/>
               <a:cs typeface="Courier New" panose="02070309020205020404" pitchFamily="49" charset="0"/>
             </a:endParaRPr>
+          </a:p>
+        </p:txBody>
+      </p:sp>
+      <p:sp>
+        <p:nvSpPr>
+          <p:cNvPr id="7" name="TextBox 6"/>
+          <p:cNvSpPr txBox="1"/>
+          <p:nvPr/>
+        </p:nvSpPr>
+        <p:spPr>
+          <a:xfrm>
+            <a:off x="1619672" y="6126982"/>
+            <a:ext cx="5904656" cy="461665"/>
+          </a:xfrm>
+          <a:prstGeom prst="rect">
+            <a:avLst/>
+          </a:prstGeom>
+          <a:noFill/>
+          <a:ln>
+            <a:solidFill>
+              <a:srgbClr val="C00000"/>
+            </a:solidFill>
+          </a:ln>
+        </p:spPr>
+        <p:txBody>
+          <a:bodyPr wrap="square" rtlCol="0">
+            <a:spAutoFit/>
+          </a:bodyPr>
+          <a:lstStyle/>
+          <a:p>
+            <a:r>
+              <a:rPr lang="en-US" sz="2400" dirty="0" smtClean="0"/>
+              <a:t>Filter by author, revision range, date range, …</a:t>
+            </a:r>
+            <a:endParaRPr lang="en-US" sz="2400" dirty="0"/>
           </a:p>
         </p:txBody>
       </p:sp>
@@ -11522,6 +11642,51 @@
                       </p:childTnLst>
                     </p:cTn>
                   </p:par>
+                  <p:par>
+                    <p:cTn id="25" fill="hold">
+                      <p:stCondLst>
+                        <p:cond delay="indefinite"/>
+                      </p:stCondLst>
+                      <p:childTnLst>
+                        <p:par>
+                          <p:cTn id="26" fill="hold">
+                            <p:stCondLst>
+                              <p:cond delay="0"/>
+                            </p:stCondLst>
+                            <p:childTnLst>
+                              <p:par>
+                                <p:cTn id="27" presetID="1" presetClass="entr" presetSubtype="0" fill="hold" grpId="0" nodeType="clickEffect">
+                                  <p:stCondLst>
+                                    <p:cond delay="0"/>
+                                  </p:stCondLst>
+                                  <p:childTnLst>
+                                    <p:set>
+                                      <p:cBhvr>
+                                        <p:cTn id="28" dur="1" fill="hold">
+                                          <p:stCondLst>
+                                            <p:cond delay="0"/>
+                                          </p:stCondLst>
+                                        </p:cTn>
+                                        <p:tgtEl>
+                                          <p:spTgt spid="7"/>
+                                        </p:tgtEl>
+                                        <p:attrNameLst>
+                                          <p:attrName>style.visibility</p:attrName>
+                                        </p:attrNameLst>
+                                      </p:cBhvr>
+                                      <p:to>
+                                        <p:strVal val="visible"/>
+                                      </p:to>
+                                    </p:set>
+                                  </p:childTnLst>
+                                </p:cTn>
+                              </p:par>
+                            </p:childTnLst>
+                          </p:cTn>
+                        </p:par>
+                      </p:childTnLst>
+                    </p:cTn>
+                  </p:par>
                 </p:childTnLst>
               </p:cTn>
               <p:prevCondLst>
@@ -11547,6 +11712,7 @@
       <p:bldP spid="3" grpId="0" uiExpand="1" build="p" bldLvl="2"/>
       <p:bldP spid="5" grpId="0" animBg="1"/>
       <p:bldP spid="6" grpId="0" animBg="1"/>
+      <p:bldP spid="7" grpId="0" animBg="1"/>
     </p:bldLst>
   </p:timing>
 </p:sld>
@@ -11604,10 +11770,88 @@
         </p:nvSpPr>
         <p:spPr/>
         <p:txBody>
-          <a:bodyPr/>
+          <a:bodyPr>
+            <a:normAutofit/>
+          </a:bodyPr>
           <a:lstStyle/>
           <a:p>
-            <a:endParaRPr lang="en-US"/>
+            <a:r>
+              <a:rPr lang="en-US" dirty="0"/>
+              <a:t>Examining </a:t>
+            </a:r>
+            <a:r>
+              <a:rPr lang="en-US" dirty="0" smtClean="0"/>
+              <a:t>changes</a:t>
+            </a:r>
+          </a:p>
+          <a:p>
+            <a:pPr lvl="1"/>
+            <a:r>
+              <a:rPr lang="en-US" dirty="0" smtClean="0"/>
+              <a:t>For specific revision </a:t>
+            </a:r>
+            <a:r>
+              <a:rPr lang="en-US" dirty="0" smtClean="0">
+                <a:latin typeface="Courier New" panose="02070309020205020404" pitchFamily="49" charset="0"/>
+                <a:cs typeface="Courier New" panose="02070309020205020404" pitchFamily="49" charset="0"/>
+              </a:rPr>
+              <a:t>2ad89a3</a:t>
+            </a:r>
+            <a:endParaRPr lang="en-US" dirty="0" smtClean="0"/>
+          </a:p>
+          <a:p>
+            <a:pPr lvl="1"/>
+            <a:endParaRPr lang="en-US" dirty="0"/>
+          </a:p>
+          <a:p>
+            <a:pPr lvl="1"/>
+            <a:r>
+              <a:rPr lang="en-US" dirty="0" smtClean="0"/>
+              <a:t>Compare current file</a:t>
+            </a:r>
+          </a:p>
+          <a:p>
+            <a:pPr lvl="2"/>
+            <a:r>
+              <a:rPr lang="en-US" dirty="0" smtClean="0"/>
+              <a:t>to </a:t>
+            </a:r>
+            <a:r>
+              <a:rPr lang="en-US" dirty="0"/>
+              <a:t>latest repo version</a:t>
+            </a:r>
+          </a:p>
+          <a:p>
+            <a:pPr lvl="1"/>
+            <a:endParaRPr lang="en-US" dirty="0"/>
+          </a:p>
+          <a:p>
+            <a:pPr lvl="2"/>
+            <a:r>
+              <a:rPr lang="en-US" dirty="0" smtClean="0"/>
+              <a:t>to revision </a:t>
+            </a:r>
+            <a:r>
+              <a:rPr lang="en-US" dirty="0" smtClean="0">
+                <a:latin typeface="Courier New" panose="02070309020205020404" pitchFamily="49" charset="0"/>
+                <a:cs typeface="Courier New" panose="02070309020205020404" pitchFamily="49" charset="0"/>
+              </a:rPr>
+              <a:t>2ad89a3</a:t>
+            </a:r>
+          </a:p>
+          <a:p>
+            <a:pPr lvl="2"/>
+            <a:endParaRPr lang="en-US" dirty="0"/>
+          </a:p>
+          <a:p>
+            <a:pPr lvl="2"/>
+            <a:r>
+              <a:rPr lang="en-US" dirty="0"/>
+              <a:t>Works for directories as well</a:t>
+            </a:r>
+          </a:p>
+          <a:p>
+            <a:endParaRPr lang="en-US" dirty="0"/>
           </a:p>
         </p:txBody>
       </p:sp>
@@ -11634,154 +11878,6 @@
           </a:p>
         </p:txBody>
       </p:sp>
-    </p:spTree>
-    <p:extLst>
-      <p:ext uri="{BB962C8B-B14F-4D97-AF65-F5344CB8AC3E}">
-        <p14:creationId xmlns:p14="http://schemas.microsoft.com/office/powerpoint/2010/main" val="4201386725"/>
-      </p:ext>
-    </p:extLst>
-  </p:cSld>
-  <p:clrMapOvr>
-    <a:masterClrMapping/>
-  </p:clrMapOvr>
-  <p:timing>
-    <p:tnLst>
-      <p:par>
-        <p:cTn id="1" dur="indefinite" restart="never" nodeType="tmRoot"/>
-      </p:par>
-    </p:tnLst>
-  </p:timing>
-</p:sld>
-</file>
-
-<file path=ppt/slides/slide23.xml><?xml version="1.0" encoding="utf-8"?>
-<p:sld xmlns:a="http://schemas.openxmlformats.org/drawingml/2006/main" xmlns:r="http://schemas.openxmlformats.org/officeDocument/2006/relationships" xmlns:p="http://schemas.openxmlformats.org/presentationml/2006/main">
-  <p:cSld>
-    <p:spTree>
-      <p:nvGrpSpPr>
-        <p:cNvPr id="1" name=""/>
-        <p:cNvGrpSpPr/>
-        <p:nvPr/>
-      </p:nvGrpSpPr>
-      <p:grpSpPr>
-        <a:xfrm>
-          <a:off x="0" y="0"/>
-          <a:ext cx="0" cy="0"/>
-          <a:chOff x="0" y="0"/>
-          <a:chExt cx="0" cy="0"/>
-        </a:xfrm>
-      </p:grpSpPr>
-      <p:sp>
-        <p:nvSpPr>
-          <p:cNvPr id="2" name="Title 1"/>
-          <p:cNvSpPr>
-            <a:spLocks noGrp="1"/>
-          </p:cNvSpPr>
-          <p:nvPr>
-            <p:ph type="title"/>
-          </p:nvPr>
-        </p:nvSpPr>
-        <p:spPr/>
-        <p:txBody>
-          <a:bodyPr/>
-          <a:lstStyle/>
-          <a:p>
-            <a:r>
-              <a:rPr lang="en-US" dirty="0" smtClean="0"/>
-              <a:t>What changed?</a:t>
-            </a:r>
-            <a:endParaRPr lang="en-US" dirty="0"/>
-          </a:p>
-        </p:txBody>
-      </p:sp>
-      <p:sp>
-        <p:nvSpPr>
-          <p:cNvPr id="3" name="Content Placeholder 2"/>
-          <p:cNvSpPr>
-            <a:spLocks noGrp="1"/>
-          </p:cNvSpPr>
-          <p:nvPr>
-            <p:ph idx="1"/>
-          </p:nvPr>
-        </p:nvSpPr>
-        <p:spPr/>
-        <p:txBody>
-          <a:bodyPr/>
-          <a:lstStyle/>
-          <a:p>
-            <a:r>
-              <a:rPr lang="en-US" dirty="0"/>
-              <a:t>Examining changes</a:t>
-            </a:r>
-          </a:p>
-          <a:p>
-            <a:pPr lvl="1"/>
-            <a:r>
-              <a:rPr lang="en-US" dirty="0"/>
-              <a:t>Compares file to latest repo version</a:t>
-            </a:r>
-          </a:p>
-          <a:p>
-            <a:pPr lvl="1"/>
-            <a:endParaRPr lang="en-US" dirty="0"/>
-          </a:p>
-          <a:p>
-            <a:pPr lvl="1"/>
-            <a:r>
-              <a:rPr lang="en-US" dirty="0"/>
-              <a:t>Compares revision </a:t>
-            </a:r>
-            <a:r>
-              <a:rPr lang="en-US" dirty="0">
-                <a:latin typeface="Courier New" panose="02070309020205020404" pitchFamily="49" charset="0"/>
-                <a:cs typeface="Courier New" panose="02070309020205020404" pitchFamily="49" charset="0"/>
-              </a:rPr>
-              <a:t>2ad89a3</a:t>
-            </a:r>
-            <a:r>
-              <a:rPr lang="en-US" dirty="0"/>
-              <a:t> in repo to current file</a:t>
-            </a:r>
-          </a:p>
-          <a:p>
-            <a:pPr lvl="1"/>
-            <a:endParaRPr lang="en-US" dirty="0"/>
-          </a:p>
-          <a:p>
-            <a:pPr lvl="1"/>
-            <a:r>
-              <a:rPr lang="en-US" dirty="0"/>
-              <a:t>Works for directories as well</a:t>
-            </a:r>
-          </a:p>
-          <a:p>
-            <a:endParaRPr lang="en-US" dirty="0"/>
-          </a:p>
-        </p:txBody>
-      </p:sp>
-      <p:sp>
-        <p:nvSpPr>
-          <p:cNvPr id="4" name="Slide Number Placeholder 3"/>
-          <p:cNvSpPr>
-            <a:spLocks noGrp="1"/>
-          </p:cNvSpPr>
-          <p:nvPr>
-            <p:ph type="sldNum" sz="quarter" idx="12"/>
-          </p:nvPr>
-        </p:nvSpPr>
-        <p:spPr/>
-        <p:txBody>
-          <a:bodyPr/>
-          <a:lstStyle/>
-          <a:p>
-            <a:fld id="{BB52A05A-A776-4391-ACD7-D6BC34D3145C}" type="slidenum">
-              <a:rPr lang="nl-BE" smtClean="0"/>
-              <a:t>23</a:t>
-            </a:fld>
-            <a:endParaRPr lang="nl-BE"/>
-          </a:p>
-        </p:txBody>
-      </p:sp>
       <p:sp>
         <p:nvSpPr>
           <p:cNvPr id="5" name="TextBox 4"/>
@@ -11790,7 +11886,7 @@
         </p:nvSpPr>
         <p:spPr>
           <a:xfrm>
-            <a:off x="1187624" y="2780928"/>
+            <a:off x="1115616" y="4215957"/>
             <a:ext cx="3768980" cy="369332"/>
           </a:xfrm>
           <a:prstGeom prst="rect">
@@ -11852,7 +11948,7 @@
         </p:nvSpPr>
         <p:spPr>
           <a:xfrm>
-            <a:off x="1187624" y="4146322"/>
+            <a:off x="1115616" y="5069415"/>
             <a:ext cx="3768980" cy="369332"/>
           </a:xfrm>
           <a:prstGeom prst="rect">
@@ -11914,10 +12010,10 @@
         </p:nvGrpSpPr>
         <p:grpSpPr>
           <a:xfrm>
-            <a:off x="2814464" y="3653649"/>
-            <a:ext cx="3727243" cy="835407"/>
-            <a:chOff x="2804120" y="4690361"/>
-            <a:chExt cx="3727243" cy="835407"/>
+            <a:off x="3675356" y="2667628"/>
+            <a:ext cx="3255735" cy="759098"/>
+            <a:chOff x="3275628" y="4392928"/>
+            <a:chExt cx="3255735" cy="759098"/>
           </a:xfrm>
         </p:grpSpPr>
         <p:sp>
@@ -11928,7 +12024,7 @@
           </p:nvSpPr>
           <p:spPr>
             <a:xfrm>
-              <a:off x="2804120" y="5217868"/>
+              <a:off x="3275628" y="4392928"/>
               <a:ext cx="1170550" cy="307900"/>
             </a:xfrm>
             <a:prstGeom prst="rect">
@@ -11975,9 +12071,9 @@
             <p:nvPr/>
           </p:nvCxnSpPr>
           <p:spPr>
-            <a:xfrm flipH="1">
-              <a:off x="3974670" y="4921194"/>
-              <a:ext cx="1056667" cy="450624"/>
+            <a:xfrm flipH="1" flipV="1">
+              <a:off x="4446178" y="4546878"/>
+              <a:ext cx="585159" cy="374316"/>
             </a:xfrm>
             <a:prstGeom prst="straightConnector1">
               <a:avLst/>
@@ -12053,6 +12149,65 @@
           </p:txBody>
         </p:sp>
       </p:grpSp>
+      <p:sp>
+        <p:nvSpPr>
+          <p:cNvPr id="17" name="TextBox 16"/>
+          <p:cNvSpPr txBox="1"/>
+          <p:nvPr/>
+        </p:nvSpPr>
+        <p:spPr>
+          <a:xfrm>
+            <a:off x="1115616" y="2636912"/>
+            <a:ext cx="3768980" cy="369332"/>
+          </a:xfrm>
+          <a:prstGeom prst="rect">
+            <a:avLst/>
+          </a:prstGeom>
+          <a:noFill/>
+          <a:ln>
+            <a:solidFill>
+              <a:schemeClr val="tx1"/>
+            </a:solidFill>
+          </a:ln>
+        </p:spPr>
+        <p:txBody>
+          <a:bodyPr wrap="square" rtlCol="0">
+            <a:spAutoFit/>
+          </a:bodyPr>
+          <a:lstStyle/>
+          <a:p>
+            <a:r>
+              <a:rPr lang="nl-BE" dirty="0" smtClean="0">
+                <a:latin typeface="Courier New" pitchFamily="49" charset="0"/>
+                <a:cs typeface="Courier New" pitchFamily="49" charset="0"/>
+              </a:rPr>
+              <a:t>$ git </a:t>
+            </a:r>
+            <a:r>
+              <a:rPr lang="nl-BE" dirty="0" smtClean="0">
+                <a:latin typeface="Courier New" pitchFamily="49" charset="0"/>
+                <a:cs typeface="Courier New" pitchFamily="49" charset="0"/>
+              </a:rPr>
+              <a:t>log  -1  -p  </a:t>
+            </a:r>
+            <a:r>
+              <a:rPr lang="en-US" dirty="0" smtClean="0">
+                <a:latin typeface="Courier New" panose="02070309020205020404" pitchFamily="49" charset="0"/>
+                <a:cs typeface="Courier New" panose="02070309020205020404" pitchFamily="49" charset="0"/>
+              </a:rPr>
+              <a:t>2ad89a3</a:t>
+            </a:r>
+            <a:r>
+              <a:rPr lang="en-US" dirty="0" smtClean="0"/>
+              <a:t> </a:t>
+            </a:r>
+            <a:endParaRPr lang="nl-BE" dirty="0" smtClean="0">
+              <a:latin typeface="Courier New" pitchFamily="49" charset="0"/>
+              <a:cs typeface="Courier New" pitchFamily="49" charset="0"/>
+            </a:endParaRPr>
+          </a:p>
+        </p:txBody>
+      </p:sp>
     </p:spTree>
     <p:extLst>
       <p:ext uri="{BB962C8B-B14F-4D97-AF65-F5344CB8AC3E}">
@@ -12148,26 +12303,39 @@
                                   </p:childTnLst>
                                 </p:cTn>
                               </p:par>
-                            </p:childTnLst>
-                          </p:cTn>
-                        </p:par>
-                      </p:childTnLst>
-                    </p:cTn>
-                  </p:par>
-                  <p:par>
-                    <p:cTn id="9" fill="hold">
-                      <p:stCondLst>
-                        <p:cond delay="indefinite"/>
-                      </p:stCondLst>
-                      <p:childTnLst>
-                        <p:par>
-                          <p:cTn id="10" fill="hold">
-                            <p:stCondLst>
-                              <p:cond delay="0"/>
-                            </p:stCondLst>
-                            <p:childTnLst>
                               <p:par>
-                                <p:cTn id="11" presetID="1" presetClass="entr" presetSubtype="0" fill="hold" grpId="0" nodeType="clickEffect">
+                                <p:cTn id="9" presetID="1" presetClass="entr" presetSubtype="0" fill="hold" grpId="0" nodeType="withEffect">
+                                  <p:stCondLst>
+                                    <p:cond delay="0"/>
+                                  </p:stCondLst>
+                                  <p:childTnLst>
+                                    <p:set>
+                                      <p:cBhvr>
+                                        <p:cTn id="10" dur="1" fill="hold">
+                                          <p:stCondLst>
+                                            <p:cond delay="0"/>
+                                          </p:stCondLst>
+                                        </p:cTn>
+                                        <p:tgtEl>
+                                          <p:spTgt spid="3">
+                                            <p:txEl>
+                                              <p:pRg st="3" end="3"/>
+                                            </p:txEl>
+                                          </p:spTgt>
+                                        </p:tgtEl>
+                                        <p:attrNameLst>
+                                          <p:attrName>style.visibility</p:attrName>
+                                        </p:attrNameLst>
+                                      </p:cBhvr>
+                                      <p:to>
+                                        <p:strVal val="visible"/>
+                                      </p:to>
+                                    </p:set>
+                                  </p:childTnLst>
+                                </p:cTn>
+                              </p:par>
+                              <p:par>
+                                <p:cTn id="11" presetID="1" presetClass="entr" presetSubtype="0" fill="hold" grpId="0" nodeType="withEffect">
                                   <p:stCondLst>
                                     <p:cond delay="0"/>
                                   </p:stCondLst>
@@ -12182,7 +12350,7 @@
                                         <p:tgtEl>
                                           <p:spTgt spid="3">
                                             <p:txEl>
-                                              <p:pRg st="3" end="3"/>
+                                              <p:pRg st="4" end="4"/>
                                             </p:txEl>
                                           </p:spTgt>
                                         </p:tgtEl>
@@ -12211,6 +12379,37 @@
                                           </p:stCondLst>
                                         </p:cTn>
                                         <p:tgtEl>
+                                          <p:spTgt spid="3">
+                                            <p:txEl>
+                                              <p:pRg st="6" end="6"/>
+                                            </p:txEl>
+                                          </p:spTgt>
+                                        </p:tgtEl>
+                                        <p:attrNameLst>
+                                          <p:attrName>style.visibility</p:attrName>
+                                        </p:attrNameLst>
+                                      </p:cBhvr>
+                                      <p:to>
+                                        <p:strVal val="visible"/>
+                                      </p:to>
+                                    </p:set>
+                                  </p:childTnLst>
+                                </p:cTn>
+                              </p:par>
+                              <p:par>
+                                <p:cTn id="15" presetID="1" presetClass="entr" presetSubtype="0" fill="hold" grpId="0" nodeType="withEffect">
+                                  <p:stCondLst>
+                                    <p:cond delay="0"/>
+                                  </p:stCondLst>
+                                  <p:childTnLst>
+                                    <p:set>
+                                      <p:cBhvr>
+                                        <p:cTn id="16" dur="1" fill="hold">
+                                          <p:stCondLst>
+                                            <p:cond delay="0"/>
+                                          </p:stCondLst>
+                                        </p:cTn>
+                                        <p:tgtEl>
                                           <p:spTgt spid="6"/>
                                         </p:tgtEl>
                                         <p:attrNameLst>
@@ -12231,26 +12430,26 @@
                     </p:cTn>
                   </p:par>
                   <p:par>
-                    <p:cTn id="15" fill="hold">
+                    <p:cTn id="17" fill="hold">
                       <p:stCondLst>
                         <p:cond delay="indefinite"/>
                       </p:stCondLst>
                       <p:childTnLst>
                         <p:par>
-                          <p:cTn id="16" fill="hold">
+                          <p:cTn id="18" fill="hold">
                             <p:stCondLst>
                               <p:cond delay="0"/>
                             </p:stCondLst>
                             <p:childTnLst>
                               <p:par>
-                                <p:cTn id="17" presetID="1" presetClass="entr" presetSubtype="0" fill="hold" nodeType="clickEffect">
+                                <p:cTn id="19" presetID="1" presetClass="entr" presetSubtype="0" fill="hold" nodeType="clickEffect">
                                   <p:stCondLst>
                                     <p:cond delay="0"/>
                                   </p:stCondLst>
                                   <p:childTnLst>
                                     <p:set>
                                       <p:cBhvr>
-                                        <p:cTn id="18" dur="1" fill="hold">
+                                        <p:cTn id="20" dur="1" fill="hold">
                                           <p:stCondLst>
                                             <p:cond delay="0"/>
                                           </p:stCondLst>
@@ -12269,26 +12468,8 @@
                                   </p:childTnLst>
                                 </p:cTn>
                               </p:par>
-                            </p:childTnLst>
-                          </p:cTn>
-                        </p:par>
-                      </p:childTnLst>
-                    </p:cTn>
-                  </p:par>
-                  <p:par>
-                    <p:cTn id="19" fill="hold">
-                      <p:stCondLst>
-                        <p:cond delay="indefinite"/>
-                      </p:stCondLst>
-                      <p:childTnLst>
-                        <p:par>
-                          <p:cTn id="20" fill="hold">
-                            <p:stCondLst>
-                              <p:cond delay="0"/>
-                            </p:stCondLst>
-                            <p:childTnLst>
                               <p:par>
-                                <p:cTn id="21" presetID="1" presetClass="entr" presetSubtype="0" fill="hold" grpId="0" nodeType="clickEffect">
+                                <p:cTn id="21" presetID="1" presetClass="entr" presetSubtype="0" fill="hold" grpId="0" nodeType="withEffect">
                                   <p:stCondLst>
                                     <p:cond delay="0"/>
                                   </p:stCondLst>
@@ -12303,7 +12484,7 @@
                                         <p:tgtEl>
                                           <p:spTgt spid="3">
                                             <p:txEl>
-                                              <p:pRg st="5" end="5"/>
+                                              <p:pRg st="8" end="8"/>
                                             </p:txEl>
                                           </p:spTgt>
                                         </p:tgtEl>
@@ -12353,7 +12534,7 @@
 </p:sld>
 </file>
 
-<file path=ppt/slides/slide24.xml><?xml version="1.0" encoding="utf-8"?>
+<file path=ppt/slides/slide23.xml><?xml version="1.0" encoding="utf-8"?>
 <p:sld xmlns:a="http://schemas.openxmlformats.org/drawingml/2006/main" xmlns:r="http://schemas.openxmlformats.org/officeDocument/2006/relationships" xmlns:p="http://schemas.openxmlformats.org/presentationml/2006/main">
   <p:cSld>
     <p:spTree>
@@ -12906,7 +13087,7 @@
           <a:p>
             <a:fld id="{BB52A05A-A776-4391-ACD7-D6BC34D3145C}" type="slidenum">
               <a:rPr lang="nl-BE" smtClean="0"/>
-              <a:t>24</a:t>
+              <a:t>23</a:t>
             </a:fld>
             <a:endParaRPr lang="nl-BE"/>
           </a:p>
@@ -13049,7 +13230,7 @@
 </p:sld>
 </file>
 
-<file path=ppt/slides/slide25.xml><?xml version="1.0" encoding="utf-8"?>
+<file path=ppt/slides/slide24.xml><?xml version="1.0" encoding="utf-8"?>
 <p:sld xmlns:a="http://schemas.openxmlformats.org/drawingml/2006/main" xmlns:r="http://schemas.openxmlformats.org/officeDocument/2006/relationships" xmlns:p="http://schemas.openxmlformats.org/presentationml/2006/main">
   <p:cSld>
     <p:spTree>
@@ -13179,7 +13360,7 @@
           <a:p>
             <a:fld id="{BB52A05A-A776-4391-ACD7-D6BC34D3145C}" type="slidenum">
               <a:rPr lang="nl-BE" smtClean="0"/>
-              <a:t>25</a:t>
+              <a:t>24</a:t>
             </a:fld>
             <a:endParaRPr lang="nl-BE"/>
           </a:p>
@@ -13460,7 +13641,7 @@
 </p:sld>
 </file>
 
-<file path=ppt/slides/slide26.xml><?xml version="1.0" encoding="utf-8"?>
+<file path=ppt/slides/slide25.xml><?xml version="1.0" encoding="utf-8"?>
 <p:sld xmlns:a="http://schemas.openxmlformats.org/drawingml/2006/main" xmlns:r="http://schemas.openxmlformats.org/officeDocument/2006/relationships" xmlns:p="http://schemas.openxmlformats.org/presentationml/2006/main">
   <p:cSld>
     <p:spTree>
@@ -14921,7 +15102,7 @@
           <a:p>
             <a:fld id="{BB52A05A-A776-4391-ACD7-D6BC34D3145C}" type="slidenum">
               <a:rPr lang="nl-BE" smtClean="0"/>
-              <a:t>26</a:t>
+              <a:t>25</a:t>
             </a:fld>
             <a:endParaRPr lang="nl-BE"/>
           </a:p>
@@ -15312,7 +15493,7 @@
 </p:sld>
 </file>
 
-<file path=ppt/slides/slide27.xml><?xml version="1.0" encoding="utf-8"?>
+<file path=ppt/slides/slide26.xml><?xml version="1.0" encoding="utf-8"?>
 <p:sld xmlns:a="http://schemas.openxmlformats.org/drawingml/2006/main" xmlns:r="http://schemas.openxmlformats.org/officeDocument/2006/relationships" xmlns:p="http://schemas.openxmlformats.org/presentationml/2006/main">
   <p:cSld>
     <p:spTree>
@@ -15470,7 +15651,7 @@
           <a:p>
             <a:fld id="{BB52A05A-A776-4391-ACD7-D6BC34D3145C}" type="slidenum">
               <a:rPr lang="nl-BE" smtClean="0"/>
-              <a:t>27</a:t>
+              <a:t>26</a:t>
             </a:fld>
             <a:endParaRPr lang="nl-BE"/>
           </a:p>
@@ -15847,7 +16028,7 @@
 </p:sld>
 </file>
 
-<file path=ppt/slides/slide28.xml><?xml version="1.0" encoding="utf-8"?>
+<file path=ppt/slides/slide27.xml><?xml version="1.0" encoding="utf-8"?>
 <p:sld xmlns:a="http://schemas.openxmlformats.org/drawingml/2006/main" xmlns:r="http://schemas.openxmlformats.org/officeDocument/2006/relationships" xmlns:p="http://schemas.openxmlformats.org/presentationml/2006/main">
   <p:cSld>
     <p:spTree>
@@ -16183,7 +16364,7 @@
           <a:p>
             <a:fld id="{BB52A05A-A776-4391-ACD7-D6BC34D3145C}" type="slidenum">
               <a:rPr lang="nl-BE" smtClean="0"/>
-              <a:t>28</a:t>
+              <a:t>27</a:t>
             </a:fld>
             <a:endParaRPr lang="nl-BE"/>
           </a:p>
@@ -16611,7 +16792,7 @@
 </p:sld>
 </file>
 
-<file path=ppt/slides/slide29.xml><?xml version="1.0" encoding="utf-8"?>
+<file path=ppt/slides/slide28.xml><?xml version="1.0" encoding="utf-8"?>
 <p:sld xmlns:a="http://schemas.openxmlformats.org/drawingml/2006/main" xmlns:r="http://schemas.openxmlformats.org/officeDocument/2006/relationships" xmlns:p="http://schemas.openxmlformats.org/presentationml/2006/main">
   <p:cSld>
     <p:spTree>
@@ -16955,7 +17136,7 @@
           <a:p>
             <a:fld id="{BB52A05A-A776-4391-ACD7-D6BC34D3145C}" type="slidenum">
               <a:rPr lang="nl-BE" smtClean="0"/>
-              <a:t>29</a:t>
+              <a:t>28</a:t>
             </a:fld>
             <a:endParaRPr lang="nl-BE"/>
           </a:p>
@@ -17319,7 +17500,7 @@
 </p:sld>
 </file>
 
-<file path=ppt/slides/slide3.xml><?xml version="1.0" encoding="utf-8"?>
+<file path=ppt/slides/slide29.xml><?xml version="1.0" encoding="utf-8"?>
 <p:sld xmlns:a="http://schemas.openxmlformats.org/drawingml/2006/main" xmlns:r="http://schemas.openxmlformats.org/officeDocument/2006/relationships" xmlns:p="http://schemas.openxmlformats.org/presentationml/2006/main">
   <p:cSld>
     <p:spTree>
@@ -17352,108 +17533,6 @@
           <a:lstStyle/>
           <a:p>
             <a:r>
-              <a:rPr lang="en-US" dirty="0" smtClean="0"/>
-              <a:t>Motivation</a:t>
-            </a:r>
-            <a:endParaRPr lang="nl-BE" dirty="0"/>
-          </a:p>
-        </p:txBody>
-      </p:sp>
-      <p:sp>
-        <p:nvSpPr>
-          <p:cNvPr id="3" name="Text Placeholder 2"/>
-          <p:cNvSpPr>
-            <a:spLocks noGrp="1"/>
-          </p:cNvSpPr>
-          <p:nvPr>
-            <p:ph type="body" idx="1"/>
-          </p:nvPr>
-        </p:nvSpPr>
-        <p:spPr/>
-        <p:txBody>
-          <a:bodyPr/>
-          <a:lstStyle/>
-          <a:p>
-            <a:endParaRPr lang="nl-BE"/>
-          </a:p>
-        </p:txBody>
-      </p:sp>
-      <p:sp>
-        <p:nvSpPr>
-          <p:cNvPr id="4" name="Slide Number Placeholder 3"/>
-          <p:cNvSpPr>
-            <a:spLocks noGrp="1"/>
-          </p:cNvSpPr>
-          <p:nvPr>
-            <p:ph type="sldNum" sz="quarter" idx="12"/>
-          </p:nvPr>
-        </p:nvSpPr>
-        <p:spPr/>
-        <p:txBody>
-          <a:bodyPr/>
-          <a:lstStyle/>
-          <a:p>
-            <a:fld id="{BB52A05A-A776-4391-ACD7-D6BC34D3145C}" type="slidenum">
-              <a:rPr lang="nl-BE" smtClean="0"/>
-              <a:t>3</a:t>
-            </a:fld>
-            <a:endParaRPr lang="nl-BE"/>
-          </a:p>
-        </p:txBody>
-      </p:sp>
-    </p:spTree>
-    <p:extLst>
-      <p:ext uri="{BB962C8B-B14F-4D97-AF65-F5344CB8AC3E}">
-        <p14:creationId xmlns:p14="http://schemas.microsoft.com/office/powerpoint/2010/main" val="292413800"/>
-      </p:ext>
-    </p:extLst>
-  </p:cSld>
-  <p:clrMapOvr>
-    <a:masterClrMapping/>
-  </p:clrMapOvr>
-  <p:timing>
-    <p:tnLst>
-      <p:par>
-        <p:cTn id="1" dur="indefinite" restart="never" nodeType="tmRoot"/>
-      </p:par>
-    </p:tnLst>
-  </p:timing>
-</p:sld>
-</file>
-
-<file path=ppt/slides/slide30.xml><?xml version="1.0" encoding="utf-8"?>
-<p:sld xmlns:a="http://schemas.openxmlformats.org/drawingml/2006/main" xmlns:r="http://schemas.openxmlformats.org/officeDocument/2006/relationships" xmlns:p="http://schemas.openxmlformats.org/presentationml/2006/main">
-  <p:cSld>
-    <p:spTree>
-      <p:nvGrpSpPr>
-        <p:cNvPr id="1" name=""/>
-        <p:cNvGrpSpPr/>
-        <p:nvPr/>
-      </p:nvGrpSpPr>
-      <p:grpSpPr>
-        <a:xfrm>
-          <a:off x="0" y="0"/>
-          <a:ext cx="0" cy="0"/>
-          <a:chOff x="0" y="0"/>
-          <a:chExt cx="0" cy="0"/>
-        </a:xfrm>
-      </p:grpSpPr>
-      <p:sp>
-        <p:nvSpPr>
-          <p:cNvPr id="2" name="Title 1"/>
-          <p:cNvSpPr>
-            <a:spLocks noGrp="1"/>
-          </p:cNvSpPr>
-          <p:nvPr>
-            <p:ph type="title"/>
-          </p:nvPr>
-        </p:nvSpPr>
-        <p:spPr/>
-        <p:txBody>
-          <a:bodyPr/>
-          <a:lstStyle/>
-          <a:p>
-            <a:r>
               <a:rPr lang="en-US" dirty="0"/>
               <a:t>C</a:t>
             </a:r>
@@ -17767,7 +17846,7 @@
           <a:p>
             <a:fld id="{BB52A05A-A776-4391-ACD7-D6BC34D3145C}" type="slidenum">
               <a:rPr lang="nl-BE" smtClean="0"/>
-              <a:t>30</a:t>
+              <a:t>29</a:t>
             </a:fld>
             <a:endParaRPr lang="nl-BE"/>
           </a:p>
@@ -18102,7 +18181,109 @@
 </p:sld>
 </file>
 
-<file path=ppt/slides/slide31.xml><?xml version="1.0" encoding="utf-8"?>
+<file path=ppt/slides/slide3.xml><?xml version="1.0" encoding="utf-8"?>
+<p:sld xmlns:a="http://schemas.openxmlformats.org/drawingml/2006/main" xmlns:r="http://schemas.openxmlformats.org/officeDocument/2006/relationships" xmlns:p="http://schemas.openxmlformats.org/presentationml/2006/main">
+  <p:cSld>
+    <p:spTree>
+      <p:nvGrpSpPr>
+        <p:cNvPr id="1" name=""/>
+        <p:cNvGrpSpPr/>
+        <p:nvPr/>
+      </p:nvGrpSpPr>
+      <p:grpSpPr>
+        <a:xfrm>
+          <a:off x="0" y="0"/>
+          <a:ext cx="0" cy="0"/>
+          <a:chOff x="0" y="0"/>
+          <a:chExt cx="0" cy="0"/>
+        </a:xfrm>
+      </p:grpSpPr>
+      <p:sp>
+        <p:nvSpPr>
+          <p:cNvPr id="2" name="Title 1"/>
+          <p:cNvSpPr>
+            <a:spLocks noGrp="1"/>
+          </p:cNvSpPr>
+          <p:nvPr>
+            <p:ph type="title"/>
+          </p:nvPr>
+        </p:nvSpPr>
+        <p:spPr/>
+        <p:txBody>
+          <a:bodyPr/>
+          <a:lstStyle/>
+          <a:p>
+            <a:r>
+              <a:rPr lang="en-US" dirty="0" smtClean="0"/>
+              <a:t>Motivation</a:t>
+            </a:r>
+            <a:endParaRPr lang="nl-BE" dirty="0"/>
+          </a:p>
+        </p:txBody>
+      </p:sp>
+      <p:sp>
+        <p:nvSpPr>
+          <p:cNvPr id="3" name="Text Placeholder 2"/>
+          <p:cNvSpPr>
+            <a:spLocks noGrp="1"/>
+          </p:cNvSpPr>
+          <p:nvPr>
+            <p:ph type="body" idx="1"/>
+          </p:nvPr>
+        </p:nvSpPr>
+        <p:spPr/>
+        <p:txBody>
+          <a:bodyPr/>
+          <a:lstStyle/>
+          <a:p>
+            <a:endParaRPr lang="nl-BE"/>
+          </a:p>
+        </p:txBody>
+      </p:sp>
+      <p:sp>
+        <p:nvSpPr>
+          <p:cNvPr id="4" name="Slide Number Placeholder 3"/>
+          <p:cNvSpPr>
+            <a:spLocks noGrp="1"/>
+          </p:cNvSpPr>
+          <p:nvPr>
+            <p:ph type="sldNum" sz="quarter" idx="12"/>
+          </p:nvPr>
+        </p:nvSpPr>
+        <p:spPr/>
+        <p:txBody>
+          <a:bodyPr/>
+          <a:lstStyle/>
+          <a:p>
+            <a:fld id="{BB52A05A-A776-4391-ACD7-D6BC34D3145C}" type="slidenum">
+              <a:rPr lang="nl-BE" smtClean="0"/>
+              <a:t>3</a:t>
+            </a:fld>
+            <a:endParaRPr lang="nl-BE"/>
+          </a:p>
+        </p:txBody>
+      </p:sp>
+    </p:spTree>
+    <p:extLst>
+      <p:ext uri="{BB962C8B-B14F-4D97-AF65-F5344CB8AC3E}">
+        <p14:creationId xmlns:p14="http://schemas.microsoft.com/office/powerpoint/2010/main" val="292413800"/>
+      </p:ext>
+    </p:extLst>
+  </p:cSld>
+  <p:clrMapOvr>
+    <a:masterClrMapping/>
+  </p:clrMapOvr>
+  <p:timing>
+    <p:tnLst>
+      <p:par>
+        <p:cTn id="1" dur="indefinite" restart="never" nodeType="tmRoot"/>
+      </p:par>
+    </p:tnLst>
+  </p:timing>
+</p:sld>
+</file>
+
+<file path=ppt/slides/slide30.xml><?xml version="1.0" encoding="utf-8"?>
 <p:sld xmlns:a="http://schemas.openxmlformats.org/drawingml/2006/main" xmlns:r="http://schemas.openxmlformats.org/officeDocument/2006/relationships" xmlns:p="http://schemas.openxmlformats.org/presentationml/2006/main">
   <p:cSld>
     <p:spTree>
@@ -18430,7 +18611,7 @@
           <a:p>
             <a:fld id="{BB52A05A-A776-4391-ACD7-D6BC34D3145C}" type="slidenum">
               <a:rPr lang="nl-BE" smtClean="0"/>
-              <a:t>31</a:t>
+              <a:t>30</a:t>
             </a:fld>
             <a:endParaRPr lang="nl-BE"/>
           </a:p>
@@ -18796,7 +18977,7 @@
 </p:sld>
 </file>
 
-<file path=ppt/slides/slide32.xml><?xml version="1.0" encoding="utf-8"?>
+<file path=ppt/slides/slide31.xml><?xml version="1.0" encoding="utf-8"?>
 <p:sld xmlns:a="http://schemas.openxmlformats.org/drawingml/2006/main" xmlns:r="http://schemas.openxmlformats.org/officeDocument/2006/relationships" xmlns:p="http://schemas.openxmlformats.org/presentationml/2006/main">
   <p:cSld>
     <p:spTree>
@@ -19131,7 +19312,7 @@
           <a:p>
             <a:fld id="{BB52A05A-A776-4391-ACD7-D6BC34D3145C}" type="slidenum">
               <a:rPr lang="nl-BE" smtClean="0"/>
-              <a:t>32</a:t>
+              <a:t>31</a:t>
             </a:fld>
             <a:endParaRPr lang="nl-BE"/>
           </a:p>
@@ -19507,7 +19688,7 @@
 </p:sld>
 </file>
 
-<file path=ppt/slides/slide33.xml><?xml version="1.0" encoding="utf-8"?>
+<file path=ppt/slides/slide32.xml><?xml version="1.0" encoding="utf-8"?>
 <p:sld xmlns:a="http://schemas.openxmlformats.org/drawingml/2006/main" xmlns:r="http://schemas.openxmlformats.org/officeDocument/2006/relationships" xmlns:p="http://schemas.openxmlformats.org/presentationml/2006/main">
   <p:cSld>
     <p:spTree>
@@ -19710,7 +19891,7 @@
           <a:p>
             <a:fld id="{BB52A05A-A776-4391-ACD7-D6BC34D3145C}" type="slidenum">
               <a:rPr lang="nl-BE" smtClean="0"/>
-              <a:t>33</a:t>
+              <a:t>32</a:t>
             </a:fld>
             <a:endParaRPr lang="nl-BE"/>
           </a:p>
@@ -20030,7 +20211,7 @@
 </p:sld>
 </file>
 
-<file path=ppt/slides/slide34.xml><?xml version="1.0" encoding="utf-8"?>
+<file path=ppt/slides/slide33.xml><?xml version="1.0" encoding="utf-8"?>
 <p:sld xmlns:a="http://schemas.openxmlformats.org/drawingml/2006/main" xmlns:r="http://schemas.openxmlformats.org/officeDocument/2006/relationships" xmlns:p="http://schemas.openxmlformats.org/presentationml/2006/main">
   <p:cSld>
     <p:spTree>
@@ -20531,7 +20712,7 @@
           <a:p>
             <a:fld id="{BB52A05A-A776-4391-ACD7-D6BC34D3145C}" type="slidenum">
               <a:rPr lang="nl-BE" smtClean="0"/>
-              <a:t>34</a:t>
+              <a:t>33</a:t>
             </a:fld>
             <a:endParaRPr lang="nl-BE"/>
           </a:p>
@@ -20758,6 +20939,112 @@
 </p:sld>
 </file>
 
+<file path=ppt/slides/slide34.xml><?xml version="1.0" encoding="utf-8"?>
+<p:sld xmlns:a="http://schemas.openxmlformats.org/drawingml/2006/main" xmlns:r="http://schemas.openxmlformats.org/officeDocument/2006/relationships" xmlns:p="http://schemas.openxmlformats.org/presentationml/2006/main">
+  <p:cSld>
+    <p:spTree>
+      <p:nvGrpSpPr>
+        <p:cNvPr id="1" name=""/>
+        <p:cNvGrpSpPr/>
+        <p:nvPr/>
+      </p:nvGrpSpPr>
+      <p:grpSpPr>
+        <a:xfrm>
+          <a:off x="0" y="0"/>
+          <a:ext cx="0" cy="0"/>
+          <a:chOff x="0" y="0"/>
+          <a:chExt cx="0" cy="0"/>
+        </a:xfrm>
+      </p:grpSpPr>
+      <p:sp>
+        <p:nvSpPr>
+          <p:cNvPr id="2" name="Title 1"/>
+          <p:cNvSpPr>
+            <a:spLocks noGrp="1"/>
+          </p:cNvSpPr>
+          <p:nvPr>
+            <p:ph type="title"/>
+          </p:nvPr>
+        </p:nvSpPr>
+        <p:spPr/>
+        <p:txBody>
+          <a:bodyPr/>
+          <a:lstStyle/>
+          <a:p>
+            <a:r>
+              <a:rPr lang="en-US" dirty="0"/>
+              <a:t>M</a:t>
+            </a:r>
+            <a:r>
+              <a:rPr lang="en-US" dirty="0" smtClean="0"/>
+              <a:t>ultiple user scenario</a:t>
+            </a:r>
+            <a:endParaRPr lang="nl-BE" dirty="0"/>
+          </a:p>
+        </p:txBody>
+      </p:sp>
+      <p:sp>
+        <p:nvSpPr>
+          <p:cNvPr id="3" name="Text Placeholder 2"/>
+          <p:cNvSpPr>
+            <a:spLocks noGrp="1"/>
+          </p:cNvSpPr>
+          <p:nvPr>
+            <p:ph type="body" idx="1"/>
+          </p:nvPr>
+        </p:nvSpPr>
+        <p:spPr/>
+        <p:txBody>
+          <a:bodyPr/>
+          <a:lstStyle/>
+          <a:p>
+            <a:endParaRPr lang="nl-BE"/>
+          </a:p>
+        </p:txBody>
+      </p:sp>
+      <p:sp>
+        <p:nvSpPr>
+          <p:cNvPr id="4" name="Slide Number Placeholder 3"/>
+          <p:cNvSpPr>
+            <a:spLocks noGrp="1"/>
+          </p:cNvSpPr>
+          <p:nvPr>
+            <p:ph type="sldNum" sz="quarter" idx="12"/>
+          </p:nvPr>
+        </p:nvSpPr>
+        <p:spPr/>
+        <p:txBody>
+          <a:bodyPr/>
+          <a:lstStyle/>
+          <a:p>
+            <a:fld id="{BB52A05A-A776-4391-ACD7-D6BC34D3145C}" type="slidenum">
+              <a:rPr lang="nl-BE" smtClean="0"/>
+              <a:t>34</a:t>
+            </a:fld>
+            <a:endParaRPr lang="nl-BE"/>
+          </a:p>
+        </p:txBody>
+      </p:sp>
+    </p:spTree>
+    <p:extLst>
+      <p:ext uri="{BB962C8B-B14F-4D97-AF65-F5344CB8AC3E}">
+        <p14:creationId xmlns:p14="http://schemas.microsoft.com/office/powerpoint/2010/main" val="2635007595"/>
+      </p:ext>
+    </p:extLst>
+  </p:cSld>
+  <p:clrMapOvr>
+    <a:masterClrMapping/>
+  </p:clrMapOvr>
+  <p:timing>
+    <p:tnLst>
+      <p:par>
+        <p:cTn id="1" dur="indefinite" restart="never" nodeType="tmRoot"/>
+      </p:par>
+    </p:tnLst>
+  </p:timing>
+</p:sld>
+</file>
+
 <file path=ppt/slides/slide35.xml><?xml version="1.0" encoding="utf-8"?>
 <p:sld xmlns:a="http://schemas.openxmlformats.org/drawingml/2006/main" xmlns:r="http://schemas.openxmlformats.org/officeDocument/2006/relationships" xmlns:p="http://schemas.openxmlformats.org/presentationml/2006/main">
   <p:cSld>
@@ -20791,112 +21078,6 @@
           <a:lstStyle/>
           <a:p>
             <a:r>
-              <a:rPr lang="en-US" dirty="0"/>
-              <a:t>M</a:t>
-            </a:r>
-            <a:r>
-              <a:rPr lang="en-US" dirty="0" smtClean="0"/>
-              <a:t>ultiple user scenario</a:t>
-            </a:r>
-            <a:endParaRPr lang="nl-BE" dirty="0"/>
-          </a:p>
-        </p:txBody>
-      </p:sp>
-      <p:sp>
-        <p:nvSpPr>
-          <p:cNvPr id="3" name="Text Placeholder 2"/>
-          <p:cNvSpPr>
-            <a:spLocks noGrp="1"/>
-          </p:cNvSpPr>
-          <p:nvPr>
-            <p:ph type="body" idx="1"/>
-          </p:nvPr>
-        </p:nvSpPr>
-        <p:spPr/>
-        <p:txBody>
-          <a:bodyPr/>
-          <a:lstStyle/>
-          <a:p>
-            <a:endParaRPr lang="nl-BE"/>
-          </a:p>
-        </p:txBody>
-      </p:sp>
-      <p:sp>
-        <p:nvSpPr>
-          <p:cNvPr id="4" name="Slide Number Placeholder 3"/>
-          <p:cNvSpPr>
-            <a:spLocks noGrp="1"/>
-          </p:cNvSpPr>
-          <p:nvPr>
-            <p:ph type="sldNum" sz="quarter" idx="12"/>
-          </p:nvPr>
-        </p:nvSpPr>
-        <p:spPr/>
-        <p:txBody>
-          <a:bodyPr/>
-          <a:lstStyle/>
-          <a:p>
-            <a:fld id="{BB52A05A-A776-4391-ACD7-D6BC34D3145C}" type="slidenum">
-              <a:rPr lang="nl-BE" smtClean="0"/>
-              <a:t>35</a:t>
-            </a:fld>
-            <a:endParaRPr lang="nl-BE"/>
-          </a:p>
-        </p:txBody>
-      </p:sp>
-    </p:spTree>
-    <p:extLst>
-      <p:ext uri="{BB962C8B-B14F-4D97-AF65-F5344CB8AC3E}">
-        <p14:creationId xmlns:p14="http://schemas.microsoft.com/office/powerpoint/2010/main" val="2635007595"/>
-      </p:ext>
-    </p:extLst>
-  </p:cSld>
-  <p:clrMapOvr>
-    <a:masterClrMapping/>
-  </p:clrMapOvr>
-  <p:timing>
-    <p:tnLst>
-      <p:par>
-        <p:cTn id="1" dur="indefinite" restart="never" nodeType="tmRoot"/>
-      </p:par>
-    </p:tnLst>
-  </p:timing>
-</p:sld>
-</file>
-
-<file path=ppt/slides/slide36.xml><?xml version="1.0" encoding="utf-8"?>
-<p:sld xmlns:a="http://schemas.openxmlformats.org/drawingml/2006/main" xmlns:r="http://schemas.openxmlformats.org/officeDocument/2006/relationships" xmlns:p="http://schemas.openxmlformats.org/presentationml/2006/main">
-  <p:cSld>
-    <p:spTree>
-      <p:nvGrpSpPr>
-        <p:cNvPr id="1" name=""/>
-        <p:cNvGrpSpPr/>
-        <p:nvPr/>
-      </p:nvGrpSpPr>
-      <p:grpSpPr>
-        <a:xfrm>
-          <a:off x="0" y="0"/>
-          <a:ext cx="0" cy="0"/>
-          <a:chOff x="0" y="0"/>
-          <a:chExt cx="0" cy="0"/>
-        </a:xfrm>
-      </p:grpSpPr>
-      <p:sp>
-        <p:nvSpPr>
-          <p:cNvPr id="2" name="Title 1"/>
-          <p:cNvSpPr>
-            <a:spLocks noGrp="1"/>
-          </p:cNvSpPr>
-          <p:nvPr>
-            <p:ph type="title"/>
-          </p:nvPr>
-        </p:nvSpPr>
-        <p:spPr/>
-        <p:txBody>
-          <a:bodyPr/>
-          <a:lstStyle/>
-          <a:p>
-            <a:r>
               <a:rPr lang="en-US" dirty="0" smtClean="0"/>
               <a:t>Remote repositories: clones</a:t>
             </a:r>
@@ -21132,7 +21313,7 @@
           <a:p>
             <a:fld id="{BB52A05A-A776-4391-ACD7-D6BC34D3145C}" type="slidenum">
               <a:rPr lang="nl-BE" smtClean="0"/>
-              <a:t>36</a:t>
+              <a:t>35</a:t>
             </a:fld>
             <a:endParaRPr lang="nl-BE"/>
           </a:p>
@@ -21390,7 +21571,7 @@
 </p:sld>
 </file>
 
-<file path=ppt/slides/slide37.xml><?xml version="1.0" encoding="utf-8"?>
+<file path=ppt/slides/slide36.xml><?xml version="1.0" encoding="utf-8"?>
 <p:sld xmlns:a="http://schemas.openxmlformats.org/drawingml/2006/main" xmlns:r="http://schemas.openxmlformats.org/officeDocument/2006/relationships" xmlns:p="http://schemas.openxmlformats.org/presentationml/2006/main">
   <p:cSld>
     <p:spTree>
@@ -21895,7 +22076,7 @@
           <a:p>
             <a:fld id="{BB52A05A-A776-4391-ACD7-D6BC34D3145C}" type="slidenum">
               <a:rPr lang="nl-BE" smtClean="0"/>
-              <a:t>37</a:t>
+              <a:t>36</a:t>
             </a:fld>
             <a:endParaRPr lang="nl-BE"/>
           </a:p>
@@ -22384,7 +22565,7 @@
 </p:sld>
 </file>
 
-<file path=ppt/slides/slide38.xml><?xml version="1.0" encoding="utf-8"?>
+<file path=ppt/slides/slide37.xml><?xml version="1.0" encoding="utf-8"?>
 <p:sld xmlns:a="http://schemas.openxmlformats.org/drawingml/2006/main" xmlns:r="http://schemas.openxmlformats.org/officeDocument/2006/relationships" xmlns:p="http://schemas.openxmlformats.org/presentationml/2006/main">
   <p:cSld>
     <p:spTree>
@@ -24069,7 +24250,7 @@
           <a:p>
             <a:fld id="{BB52A05A-A776-4391-ACD7-D6BC34D3145C}" type="slidenum">
               <a:rPr lang="nl-BE" smtClean="0"/>
-              <a:t>38</a:t>
+              <a:t>37</a:t>
             </a:fld>
             <a:endParaRPr lang="nl-BE"/>
           </a:p>
@@ -24388,7 +24569,7 @@
 </p:sld>
 </file>
 
-<file path=ppt/slides/slide39.xml><?xml version="1.0" encoding="utf-8"?>
+<file path=ppt/slides/slide38.xml><?xml version="1.0" encoding="utf-8"?>
 <p:sld xmlns:a="http://schemas.openxmlformats.org/drawingml/2006/main" xmlns:r="http://schemas.openxmlformats.org/officeDocument/2006/relationships" xmlns:p="http://schemas.openxmlformats.org/presentationml/2006/main">
   <p:cSld>
     <p:spTree>
@@ -24634,7 +24815,7 @@
           <a:p>
             <a:fld id="{BB52A05A-A776-4391-ACD7-D6BC34D3145C}" type="slidenum">
               <a:rPr lang="nl-BE" smtClean="0"/>
-              <a:t>39</a:t>
+              <a:t>38</a:t>
             </a:fld>
             <a:endParaRPr lang="nl-BE"/>
           </a:p>
@@ -24812,131 +24993,7 @@
 </p:sld>
 </file>
 
-<file path=ppt/slides/slide4.xml><?xml version="1.0" encoding="utf-8"?>
-<p:sld xmlns:a="http://schemas.openxmlformats.org/drawingml/2006/main" xmlns:r="http://schemas.openxmlformats.org/officeDocument/2006/relationships" xmlns:p="http://schemas.openxmlformats.org/presentationml/2006/main">
-  <p:cSld>
-    <p:spTree>
-      <p:nvGrpSpPr>
-        <p:cNvPr id="1" name=""/>
-        <p:cNvGrpSpPr/>
-        <p:nvPr/>
-      </p:nvGrpSpPr>
-      <p:grpSpPr>
-        <a:xfrm>
-          <a:off x="0" y="0"/>
-          <a:ext cx="0" cy="0"/>
-          <a:chOff x="0" y="0"/>
-          <a:chExt cx="0" cy="0"/>
-        </a:xfrm>
-      </p:grpSpPr>
-      <p:sp>
-        <p:nvSpPr>
-          <p:cNvPr id="6" name="Title 5"/>
-          <p:cNvSpPr>
-            <a:spLocks noGrp="1"/>
-          </p:cNvSpPr>
-          <p:nvPr>
-            <p:ph type="title"/>
-          </p:nvPr>
-        </p:nvSpPr>
-        <p:spPr/>
-        <p:txBody>
-          <a:bodyPr/>
-          <a:lstStyle/>
-          <a:p>
-            <a:r>
-              <a:rPr lang="en-US" dirty="0" smtClean="0"/>
-              <a:t>It's a beautiful autumn day…</a:t>
-            </a:r>
-            <a:endParaRPr lang="nl-BE" dirty="0"/>
-          </a:p>
-        </p:txBody>
-      </p:sp>
-      <p:pic>
-        <p:nvPicPr>
-          <p:cNvPr id="1026" name="Picture 2" descr="C:\Users\lucg5005\Desktop\DSCF1116.jpg"/>
-          <p:cNvPicPr>
-            <a:picLocks noChangeAspect="1" noChangeArrowheads="1"/>
-          </p:cNvPicPr>
-          <p:nvPr/>
-        </p:nvPicPr>
-        <p:blipFill>
-          <a:blip r:embed="rId2" cstate="print">
-            <a:extLst>
-              <a:ext uri="{28A0092B-C50C-407E-A947-70E740481C1C}">
-                <a14:useLocalDpi xmlns:a14="http://schemas.microsoft.com/office/drawing/2010/main" val="0"/>
-              </a:ext>
-            </a:extLst>
-          </a:blip>
-          <a:srcRect/>
-          <a:stretch>
-            <a:fillRect/>
-          </a:stretch>
-        </p:blipFill>
-        <p:spPr bwMode="auto">
-          <a:xfrm>
-            <a:off x="1219795" y="1279015"/>
-            <a:ext cx="6736581" cy="5390345"/>
-          </a:xfrm>
-          <a:prstGeom prst="rect">
-            <a:avLst/>
-          </a:prstGeom>
-          <a:noFill/>
-          <a:extLst>
-            <a:ext uri="{909E8E84-426E-40DD-AFC4-6F175D3DCCD1}">
-              <a14:hiddenFill xmlns:a14="http://schemas.microsoft.com/office/drawing/2010/main">
-                <a:solidFill>
-                  <a:srgbClr val="FFFFFF"/>
-                </a:solidFill>
-              </a14:hiddenFill>
-            </a:ext>
-          </a:extLst>
-        </p:spPr>
-      </p:pic>
-      <p:sp>
-        <p:nvSpPr>
-          <p:cNvPr id="2" name="Slide Number Placeholder 1"/>
-          <p:cNvSpPr>
-            <a:spLocks noGrp="1"/>
-          </p:cNvSpPr>
-          <p:nvPr>
-            <p:ph type="sldNum" sz="quarter" idx="12"/>
-          </p:nvPr>
-        </p:nvSpPr>
-        <p:spPr/>
-        <p:txBody>
-          <a:bodyPr/>
-          <a:lstStyle/>
-          <a:p>
-            <a:fld id="{BB52A05A-A776-4391-ACD7-D6BC34D3145C}" type="slidenum">
-              <a:rPr lang="nl-BE" smtClean="0"/>
-              <a:t>4</a:t>
-            </a:fld>
-            <a:endParaRPr lang="nl-BE"/>
-          </a:p>
-        </p:txBody>
-      </p:sp>
-    </p:spTree>
-    <p:extLst>
-      <p:ext uri="{BB962C8B-B14F-4D97-AF65-F5344CB8AC3E}">
-        <p14:creationId xmlns:p14="http://schemas.microsoft.com/office/powerpoint/2010/main" val="801143544"/>
-      </p:ext>
-    </p:extLst>
-  </p:cSld>
-  <p:clrMapOvr>
-    <a:masterClrMapping/>
-  </p:clrMapOvr>
-  <p:timing>
-    <p:tnLst>
-      <p:par>
-        <p:cTn id="1" dur="indefinite" restart="never" nodeType="tmRoot"/>
-      </p:par>
-    </p:tnLst>
-  </p:timing>
-</p:sld>
-</file>
-
-<file path=ppt/slides/slide40.xml><?xml version="1.0" encoding="utf-8"?>
+<file path=ppt/slides/slide39.xml><?xml version="1.0" encoding="utf-8"?>
 <p:sld xmlns:a="http://schemas.openxmlformats.org/drawingml/2006/main" xmlns:r="http://schemas.openxmlformats.org/officeDocument/2006/relationships" xmlns:p="http://schemas.openxmlformats.org/presentationml/2006/main">
   <p:cSld>
     <p:spTree>
@@ -25615,7 +25672,7 @@
           <a:p>
             <a:fld id="{BB52A05A-A776-4391-ACD7-D6BC34D3145C}" type="slidenum">
               <a:rPr lang="nl-BE" smtClean="0"/>
-              <a:t>40</a:t>
+              <a:t>39</a:t>
             </a:fld>
             <a:endParaRPr lang="nl-BE"/>
           </a:p>
@@ -25927,7 +25984,131 @@
 </p:sld>
 </file>
 
-<file path=ppt/slides/slide41.xml><?xml version="1.0" encoding="utf-8"?>
+<file path=ppt/slides/slide4.xml><?xml version="1.0" encoding="utf-8"?>
+<p:sld xmlns:a="http://schemas.openxmlformats.org/drawingml/2006/main" xmlns:r="http://schemas.openxmlformats.org/officeDocument/2006/relationships" xmlns:p="http://schemas.openxmlformats.org/presentationml/2006/main">
+  <p:cSld>
+    <p:spTree>
+      <p:nvGrpSpPr>
+        <p:cNvPr id="1" name=""/>
+        <p:cNvGrpSpPr/>
+        <p:nvPr/>
+      </p:nvGrpSpPr>
+      <p:grpSpPr>
+        <a:xfrm>
+          <a:off x="0" y="0"/>
+          <a:ext cx="0" cy="0"/>
+          <a:chOff x="0" y="0"/>
+          <a:chExt cx="0" cy="0"/>
+        </a:xfrm>
+      </p:grpSpPr>
+      <p:sp>
+        <p:nvSpPr>
+          <p:cNvPr id="6" name="Title 5"/>
+          <p:cNvSpPr>
+            <a:spLocks noGrp="1"/>
+          </p:cNvSpPr>
+          <p:nvPr>
+            <p:ph type="title"/>
+          </p:nvPr>
+        </p:nvSpPr>
+        <p:spPr/>
+        <p:txBody>
+          <a:bodyPr/>
+          <a:lstStyle/>
+          <a:p>
+            <a:r>
+              <a:rPr lang="en-US" dirty="0" smtClean="0"/>
+              <a:t>It's a beautiful autumn day…</a:t>
+            </a:r>
+            <a:endParaRPr lang="nl-BE" dirty="0"/>
+          </a:p>
+        </p:txBody>
+      </p:sp>
+      <p:pic>
+        <p:nvPicPr>
+          <p:cNvPr id="1026" name="Picture 2" descr="C:\Users\lucg5005\Desktop\DSCF1116.jpg"/>
+          <p:cNvPicPr>
+            <a:picLocks noChangeAspect="1" noChangeArrowheads="1"/>
+          </p:cNvPicPr>
+          <p:nvPr/>
+        </p:nvPicPr>
+        <p:blipFill>
+          <a:blip r:embed="rId2" cstate="print">
+            <a:extLst>
+              <a:ext uri="{28A0092B-C50C-407E-A947-70E740481C1C}">
+                <a14:useLocalDpi xmlns:a14="http://schemas.microsoft.com/office/drawing/2010/main" val="0"/>
+              </a:ext>
+            </a:extLst>
+          </a:blip>
+          <a:srcRect/>
+          <a:stretch>
+            <a:fillRect/>
+          </a:stretch>
+        </p:blipFill>
+        <p:spPr bwMode="auto">
+          <a:xfrm>
+            <a:off x="1219795" y="1279015"/>
+            <a:ext cx="6736581" cy="5390345"/>
+          </a:xfrm>
+          <a:prstGeom prst="rect">
+            <a:avLst/>
+          </a:prstGeom>
+          <a:noFill/>
+          <a:extLst>
+            <a:ext uri="{909E8E84-426E-40DD-AFC4-6F175D3DCCD1}">
+              <a14:hiddenFill xmlns:a14="http://schemas.microsoft.com/office/drawing/2010/main">
+                <a:solidFill>
+                  <a:srgbClr val="FFFFFF"/>
+                </a:solidFill>
+              </a14:hiddenFill>
+            </a:ext>
+          </a:extLst>
+        </p:spPr>
+      </p:pic>
+      <p:sp>
+        <p:nvSpPr>
+          <p:cNvPr id="2" name="Slide Number Placeholder 1"/>
+          <p:cNvSpPr>
+            <a:spLocks noGrp="1"/>
+          </p:cNvSpPr>
+          <p:nvPr>
+            <p:ph type="sldNum" sz="quarter" idx="12"/>
+          </p:nvPr>
+        </p:nvSpPr>
+        <p:spPr/>
+        <p:txBody>
+          <a:bodyPr/>
+          <a:lstStyle/>
+          <a:p>
+            <a:fld id="{BB52A05A-A776-4391-ACD7-D6BC34D3145C}" type="slidenum">
+              <a:rPr lang="nl-BE" smtClean="0"/>
+              <a:t>4</a:t>
+            </a:fld>
+            <a:endParaRPr lang="nl-BE"/>
+          </a:p>
+        </p:txBody>
+      </p:sp>
+    </p:spTree>
+    <p:extLst>
+      <p:ext uri="{BB962C8B-B14F-4D97-AF65-F5344CB8AC3E}">
+        <p14:creationId xmlns:p14="http://schemas.microsoft.com/office/powerpoint/2010/main" val="801143544"/>
+      </p:ext>
+    </p:extLst>
+  </p:cSld>
+  <p:clrMapOvr>
+    <a:masterClrMapping/>
+  </p:clrMapOvr>
+  <p:timing>
+    <p:tnLst>
+      <p:par>
+        <p:cTn id="1" dur="indefinite" restart="never" nodeType="tmRoot"/>
+      </p:par>
+    </p:tnLst>
+  </p:timing>
+</p:sld>
+</file>
+
+<file path=ppt/slides/slide40.xml><?xml version="1.0" encoding="utf-8"?>
 <p:sld xmlns:a="http://schemas.openxmlformats.org/drawingml/2006/main" xmlns:r="http://schemas.openxmlformats.org/officeDocument/2006/relationships" xmlns:p="http://schemas.openxmlformats.org/presentationml/2006/main">
   <p:cSld>
     <p:spTree>
@@ -26066,7 +26247,7 @@
           <a:p>
             <a:fld id="{BB52A05A-A776-4391-ACD7-D6BC34D3145C}" type="slidenum">
               <a:rPr lang="nl-BE" smtClean="0"/>
-              <a:t>41</a:t>
+              <a:t>40</a:t>
             </a:fld>
             <a:endParaRPr lang="nl-BE"/>
           </a:p>
@@ -26526,7 +26707,7 @@
 </p:sld>
 </file>
 
-<file path=ppt/slides/slide42.xml><?xml version="1.0" encoding="utf-8"?>
+<file path=ppt/slides/slide41.xml><?xml version="1.0" encoding="utf-8"?>
 <p:sld xmlns:a="http://schemas.openxmlformats.org/drawingml/2006/main" xmlns:r="http://schemas.openxmlformats.org/officeDocument/2006/relationships" xmlns:p="http://schemas.openxmlformats.org/presentationml/2006/main">
   <p:cSld>
     <p:spTree>
@@ -27988,7 +28169,7 @@
           <a:p>
             <a:fld id="{BB52A05A-A776-4391-ACD7-D6BC34D3145C}" type="slidenum">
               <a:rPr lang="nl-BE" smtClean="0"/>
-              <a:t>42</a:t>
+              <a:t>41</a:t>
             </a:fld>
             <a:endParaRPr lang="nl-BE"/>
           </a:p>
@@ -28777,7 +28958,7 @@
 </p:sld>
 </file>
 
-<file path=ppt/slides/slide43.xml><?xml version="1.0" encoding="utf-8"?>
+<file path=ppt/slides/slide42.xml><?xml version="1.0" encoding="utf-8"?>
 <p:sld xmlns:a="http://schemas.openxmlformats.org/drawingml/2006/main" xmlns:r="http://schemas.openxmlformats.org/officeDocument/2006/relationships" xmlns:p="http://schemas.openxmlformats.org/presentationml/2006/main">
   <p:cSld>
     <p:spTree>
@@ -28924,7 +29105,7 @@
           <a:p>
             <a:fld id="{BB52A05A-A776-4391-ACD7-D6BC34D3145C}" type="slidenum">
               <a:rPr lang="nl-BE" smtClean="0"/>
-              <a:t>43</a:t>
+              <a:t>42</a:t>
             </a:fld>
             <a:endParaRPr lang="nl-BE"/>
           </a:p>
@@ -29319,7 +29500,7 @@
 </p:sld>
 </file>
 
-<file path=ppt/slides/slide44.xml><?xml version="1.0" encoding="utf-8"?>
+<file path=ppt/slides/slide43.xml><?xml version="1.0" encoding="utf-8"?>
 <p:sld xmlns:a="http://schemas.openxmlformats.org/drawingml/2006/main" xmlns:r="http://schemas.openxmlformats.org/officeDocument/2006/relationships" xmlns:p="http://schemas.openxmlformats.org/presentationml/2006/main">
   <p:cSld>
     <p:spTree>
@@ -29609,7 +29790,7 @@
           <a:p>
             <a:fld id="{BB52A05A-A776-4391-ACD7-D6BC34D3145C}" type="slidenum">
               <a:rPr lang="nl-BE" smtClean="0"/>
-              <a:t>44</a:t>
+              <a:t>43</a:t>
             </a:fld>
             <a:endParaRPr lang="nl-BE"/>
           </a:p>
@@ -29913,7 +30094,7 @@
 </p:sld>
 </file>
 
-<file path=ppt/slides/slide45.xml><?xml version="1.0" encoding="utf-8"?>
+<file path=ppt/slides/slide44.xml><?xml version="1.0" encoding="utf-8"?>
 <p:sld xmlns:a="http://schemas.openxmlformats.org/drawingml/2006/main" xmlns:r="http://schemas.openxmlformats.org/officeDocument/2006/relationships" xmlns:p="http://schemas.openxmlformats.org/presentationml/2006/main">
   <p:cSld>
     <p:spTree>
@@ -30225,7 +30406,7 @@
           <a:p>
             <a:fld id="{BB52A05A-A776-4391-ACD7-D6BC34D3145C}" type="slidenum">
               <a:rPr lang="nl-BE" smtClean="0"/>
-              <a:t>45</a:t>
+              <a:t>44</a:t>
             </a:fld>
             <a:endParaRPr lang="nl-BE"/>
           </a:p>
@@ -30560,7 +30741,7 @@
 </p:sld>
 </file>
 
-<file path=ppt/slides/slide46.xml><?xml version="1.0" encoding="utf-8"?>
+<file path=ppt/slides/slide45.xml><?xml version="1.0" encoding="utf-8"?>
 <p:sld xmlns:a="http://schemas.openxmlformats.org/drawingml/2006/main" xmlns:r="http://schemas.openxmlformats.org/officeDocument/2006/relationships" xmlns:p="http://schemas.openxmlformats.org/presentationml/2006/main">
   <p:cSld>
     <p:spTree>
@@ -30663,7 +30844,7 @@
           <a:p>
             <a:fld id="{BB52A05A-A776-4391-ACD7-D6BC34D3145C}" type="slidenum">
               <a:rPr lang="nl-BE" smtClean="0"/>
-              <a:t>46</a:t>
+              <a:t>45</a:t>
             </a:fld>
             <a:endParaRPr lang="nl-BE"/>
           </a:p>
@@ -31299,7 +31480,7 @@
 </p:sld>
 </file>
 
-<file path=ppt/slides/slide47.xml><?xml version="1.0" encoding="utf-8"?>
+<file path=ppt/slides/slide46.xml><?xml version="1.0" encoding="utf-8"?>
 <p:sld xmlns:a="http://schemas.openxmlformats.org/drawingml/2006/main" xmlns:r="http://schemas.openxmlformats.org/officeDocument/2006/relationships" xmlns:p="http://schemas.openxmlformats.org/presentationml/2006/main">
   <p:cSld>
     <p:spTree>
@@ -32370,7 +32551,7 @@
           <a:p>
             <a:fld id="{BB52A05A-A776-4391-ACD7-D6BC34D3145C}" type="slidenum">
               <a:rPr lang="nl-BE" smtClean="0"/>
-              <a:t>47</a:t>
+              <a:t>46</a:t>
             </a:fld>
             <a:endParaRPr lang="nl-BE"/>
           </a:p>
@@ -33132,7 +33313,7 @@
 </p:sld>
 </file>
 
-<file path=ppt/slides/slide48.xml><?xml version="1.0" encoding="utf-8"?>
+<file path=ppt/slides/slide47.xml><?xml version="1.0" encoding="utf-8"?>
 <p:sld xmlns:a="http://schemas.openxmlformats.org/drawingml/2006/main" xmlns:r="http://schemas.openxmlformats.org/officeDocument/2006/relationships" xmlns:p="http://schemas.openxmlformats.org/presentationml/2006/main">
   <p:cSld>
     <p:spTree>
@@ -33580,7 +33761,7 @@
           <a:p>
             <a:fld id="{BB52A05A-A776-4391-ACD7-D6BC34D3145C}" type="slidenum">
               <a:rPr lang="nl-BE" smtClean="0"/>
-              <a:t>48</a:t>
+              <a:t>47</a:t>
             </a:fld>
             <a:endParaRPr lang="nl-BE"/>
           </a:p>
@@ -34105,7 +34286,7 @@
 </p:sld>
 </file>
 
-<file path=ppt/slides/slide49.xml><?xml version="1.0" encoding="utf-8"?>
+<file path=ppt/slides/slide48.xml><?xml version="1.0" encoding="utf-8"?>
 <p:sld xmlns:a="http://schemas.openxmlformats.org/drawingml/2006/main" xmlns:r="http://schemas.openxmlformats.org/officeDocument/2006/relationships" xmlns:p="http://schemas.openxmlformats.org/presentationml/2006/main">
   <p:cSld>
     <p:spTree>
@@ -34270,7 +34451,7 @@
           <a:p>
             <a:fld id="{BB52A05A-A776-4391-ACD7-D6BC34D3145C}" type="slidenum">
               <a:rPr lang="nl-BE" smtClean="0"/>
-              <a:t>49</a:t>
+              <a:t>48</a:t>
             </a:fld>
             <a:endParaRPr lang="nl-BE"/>
           </a:p>
@@ -34425,6 +34606,470 @@
                                     <p:set>
                                       <p:cBhvr>
                                         <p:cTn id="14" dur="1" fill="hold">
+                                          <p:stCondLst>
+                                            <p:cond delay="0"/>
+                                          </p:stCondLst>
+                                        </p:cTn>
+                                        <p:tgtEl>
+                                          <p:spTgt spid="5"/>
+                                        </p:tgtEl>
+                                        <p:attrNameLst>
+                                          <p:attrName>style.visibility</p:attrName>
+                                        </p:attrNameLst>
+                                      </p:cBhvr>
+                                      <p:to>
+                                        <p:strVal val="visible"/>
+                                      </p:to>
+                                    </p:set>
+                                  </p:childTnLst>
+                                </p:cTn>
+                              </p:par>
+                            </p:childTnLst>
+                          </p:cTn>
+                        </p:par>
+                      </p:childTnLst>
+                    </p:cTn>
+                  </p:par>
+                </p:childTnLst>
+              </p:cTn>
+              <p:prevCondLst>
+                <p:cond evt="onPrev" delay="0">
+                  <p:tgtEl>
+                    <p:sldTgt/>
+                  </p:tgtEl>
+                </p:cond>
+              </p:prevCondLst>
+              <p:nextCondLst>
+                <p:cond evt="onNext" delay="0">
+                  <p:tgtEl>
+                    <p:sldTgt/>
+                  </p:tgtEl>
+                </p:cond>
+              </p:nextCondLst>
+            </p:seq>
+          </p:childTnLst>
+        </p:cTn>
+      </p:par>
+    </p:tnLst>
+    <p:bldLst>
+      <p:bldP spid="3" grpId="0" uiExpand="1" build="p"/>
+      <p:bldP spid="4" grpId="0" animBg="1"/>
+      <p:bldP spid="5" grpId="0" animBg="1"/>
+    </p:bldLst>
+  </p:timing>
+</p:sld>
+</file>
+
+<file path=ppt/slides/slide49.xml><?xml version="1.0" encoding="utf-8"?>
+<p:sld xmlns:a="http://schemas.openxmlformats.org/drawingml/2006/main" xmlns:r="http://schemas.openxmlformats.org/officeDocument/2006/relationships" xmlns:p="http://schemas.openxmlformats.org/presentationml/2006/main">
+  <p:cSld>
+    <p:spTree>
+      <p:nvGrpSpPr>
+        <p:cNvPr id="1" name=""/>
+        <p:cNvGrpSpPr/>
+        <p:nvPr/>
+      </p:nvGrpSpPr>
+      <p:grpSpPr>
+        <a:xfrm>
+          <a:off x="0" y="0"/>
+          <a:ext cx="0" cy="0"/>
+          <a:chOff x="0" y="0"/>
+          <a:chExt cx="0" cy="0"/>
+        </a:xfrm>
+      </p:grpSpPr>
+      <p:sp>
+        <p:nvSpPr>
+          <p:cNvPr id="2" name="Title 1"/>
+          <p:cNvSpPr>
+            <a:spLocks noGrp="1"/>
+          </p:cNvSpPr>
+          <p:nvPr>
+            <p:ph type="title"/>
+          </p:nvPr>
+        </p:nvSpPr>
+        <p:spPr/>
+        <p:txBody>
+          <a:bodyPr/>
+          <a:lstStyle/>
+          <a:p>
+            <a:r>
+              <a:rPr lang="en-US" dirty="0" smtClean="0"/>
+              <a:t>A few shortcuts</a:t>
+            </a:r>
+            <a:endParaRPr lang="nl-BE" dirty="0"/>
+          </a:p>
+        </p:txBody>
+      </p:sp>
+      <p:sp>
+        <p:nvSpPr>
+          <p:cNvPr id="3" name="Content Placeholder 2"/>
+          <p:cNvSpPr>
+            <a:spLocks noGrp="1"/>
+          </p:cNvSpPr>
+          <p:nvPr>
+            <p:ph idx="1"/>
+          </p:nvPr>
+        </p:nvSpPr>
+        <p:spPr/>
+        <p:txBody>
+          <a:bodyPr/>
+          <a:lstStyle/>
+          <a:p>
+            <a:r>
+              <a:rPr lang="en-US" dirty="0" smtClean="0"/>
+              <a:t>Commit all modified files</a:t>
+            </a:r>
+          </a:p>
+          <a:p>
+            <a:pPr lvl="1"/>
+            <a:endParaRPr lang="en-US" dirty="0"/>
+          </a:p>
+          <a:p>
+            <a:pPr lvl="1"/>
+            <a:r>
+              <a:rPr lang="en-US" dirty="0" smtClean="0"/>
+              <a:t>Will commit only modified, tracked files</a:t>
+            </a:r>
+          </a:p>
+          <a:p>
+            <a:r>
+              <a:rPr lang="en-US" dirty="0" smtClean="0"/>
+              <a:t>Create new branch and switch to it</a:t>
+            </a:r>
+            <a:endParaRPr lang="nl-BE" dirty="0"/>
+          </a:p>
+        </p:txBody>
+      </p:sp>
+      <p:sp>
+        <p:nvSpPr>
+          <p:cNvPr id="4" name="TextBox 3"/>
+          <p:cNvSpPr txBox="1"/>
+          <p:nvPr/>
+        </p:nvSpPr>
+        <p:spPr>
+          <a:xfrm>
+            <a:off x="1259632" y="2204864"/>
+            <a:ext cx="5904656" cy="369332"/>
+          </a:xfrm>
+          <a:prstGeom prst="rect">
+            <a:avLst/>
+          </a:prstGeom>
+          <a:noFill/>
+          <a:ln>
+            <a:solidFill>
+              <a:schemeClr val="tx1"/>
+            </a:solidFill>
+          </a:ln>
+        </p:spPr>
+        <p:txBody>
+          <a:bodyPr wrap="square" rtlCol="0">
+            <a:spAutoFit/>
+          </a:bodyPr>
+          <a:lstStyle/>
+          <a:p>
+            <a:r>
+              <a:rPr lang="nl-BE" dirty="0" smtClean="0">
+                <a:latin typeface="Courier New" pitchFamily="49" charset="0"/>
+                <a:cs typeface="Courier New" pitchFamily="49" charset="0"/>
+              </a:rPr>
+              <a:t>$ git </a:t>
+            </a:r>
+            <a:r>
+              <a:rPr lang="nl-BE" dirty="0" err="1" smtClean="0">
+                <a:latin typeface="Courier New" pitchFamily="49" charset="0"/>
+                <a:cs typeface="Courier New" pitchFamily="49" charset="0"/>
+              </a:rPr>
+              <a:t>commit</a:t>
+            </a:r>
+            <a:r>
+              <a:rPr lang="nl-BE" dirty="0" smtClean="0">
+                <a:latin typeface="Courier New" pitchFamily="49" charset="0"/>
+                <a:cs typeface="Courier New" pitchFamily="49" charset="0"/>
+              </a:rPr>
+              <a:t>  -a  -m '</a:t>
+            </a:r>
+            <a:r>
+              <a:rPr lang="nl-BE" dirty="0" err="1" smtClean="0">
+                <a:latin typeface="Courier New" pitchFamily="49" charset="0"/>
+                <a:cs typeface="Courier New" pitchFamily="49" charset="0"/>
+              </a:rPr>
+              <a:t>Fixed</a:t>
+            </a:r>
+            <a:r>
+              <a:rPr lang="nl-BE" dirty="0" smtClean="0">
+                <a:latin typeface="Courier New" pitchFamily="49" charset="0"/>
+                <a:cs typeface="Courier New" pitchFamily="49" charset="0"/>
+              </a:rPr>
+              <a:t> x/0 bug'</a:t>
+            </a:r>
+          </a:p>
+        </p:txBody>
+      </p:sp>
+      <p:sp>
+        <p:nvSpPr>
+          <p:cNvPr id="5" name="TextBox 4"/>
+          <p:cNvSpPr txBox="1"/>
+          <p:nvPr/>
+        </p:nvSpPr>
+        <p:spPr>
+          <a:xfrm>
+            <a:off x="1259632" y="3789040"/>
+            <a:ext cx="5904656" cy="369332"/>
+          </a:xfrm>
+          <a:prstGeom prst="rect">
+            <a:avLst/>
+          </a:prstGeom>
+          <a:noFill/>
+          <a:ln>
+            <a:solidFill>
+              <a:schemeClr val="tx1"/>
+            </a:solidFill>
+          </a:ln>
+        </p:spPr>
+        <p:txBody>
+          <a:bodyPr wrap="square" rtlCol="0">
+            <a:spAutoFit/>
+          </a:bodyPr>
+          <a:lstStyle/>
+          <a:p>
+            <a:r>
+              <a:rPr lang="nl-BE" dirty="0" smtClean="0">
+                <a:latin typeface="Courier New" pitchFamily="49" charset="0"/>
+                <a:cs typeface="Courier New" pitchFamily="49" charset="0"/>
+              </a:rPr>
+              <a:t>$ git </a:t>
+            </a:r>
+            <a:r>
+              <a:rPr lang="nl-BE" dirty="0" err="1" smtClean="0">
+                <a:latin typeface="Courier New" pitchFamily="49" charset="0"/>
+                <a:cs typeface="Courier New" pitchFamily="49" charset="0"/>
+              </a:rPr>
+              <a:t>checkout</a:t>
+            </a:r>
+            <a:r>
+              <a:rPr lang="nl-BE" dirty="0" smtClean="0">
+                <a:latin typeface="Courier New" pitchFamily="49" charset="0"/>
+                <a:cs typeface="Courier New" pitchFamily="49" charset="0"/>
+              </a:rPr>
+              <a:t>  -b  feature/</a:t>
+            </a:r>
+            <a:r>
+              <a:rPr lang="nl-BE" dirty="0" err="1" smtClean="0">
+                <a:latin typeface="Courier New" pitchFamily="49" charset="0"/>
+                <a:cs typeface="Courier New" pitchFamily="49" charset="0"/>
+              </a:rPr>
+              <a:t>optimization</a:t>
+            </a:r>
+            <a:endParaRPr lang="nl-BE" dirty="0" smtClean="0">
+              <a:latin typeface="Courier New" pitchFamily="49" charset="0"/>
+              <a:cs typeface="Courier New" pitchFamily="49" charset="0"/>
+            </a:endParaRPr>
+          </a:p>
+        </p:txBody>
+      </p:sp>
+      <p:sp>
+        <p:nvSpPr>
+          <p:cNvPr id="6" name="Slide Number Placeholder 5"/>
+          <p:cNvSpPr>
+            <a:spLocks noGrp="1"/>
+          </p:cNvSpPr>
+          <p:nvPr>
+            <p:ph type="sldNum" sz="quarter" idx="12"/>
+          </p:nvPr>
+        </p:nvSpPr>
+        <p:spPr/>
+        <p:txBody>
+          <a:bodyPr/>
+          <a:lstStyle/>
+          <a:p>
+            <a:fld id="{BB52A05A-A776-4391-ACD7-D6BC34D3145C}" type="slidenum">
+              <a:rPr lang="nl-BE" smtClean="0"/>
+              <a:t>49</a:t>
+            </a:fld>
+            <a:endParaRPr lang="nl-BE"/>
+          </a:p>
+        </p:txBody>
+      </p:sp>
+    </p:spTree>
+    <p:extLst>
+      <p:ext uri="{BB962C8B-B14F-4D97-AF65-F5344CB8AC3E}">
+        <p14:creationId xmlns:p14="http://schemas.microsoft.com/office/powerpoint/2010/main" val="3459632536"/>
+      </p:ext>
+    </p:extLst>
+  </p:cSld>
+  <p:clrMapOvr>
+    <a:masterClrMapping/>
+  </p:clrMapOvr>
+  <p:timing>
+    <p:tnLst>
+      <p:par>
+        <p:cTn id="1" dur="indefinite" restart="never" nodeType="tmRoot">
+          <p:childTnLst>
+            <p:seq concurrent="1" nextAc="seek">
+              <p:cTn id="2" dur="indefinite" nodeType="mainSeq">
+                <p:childTnLst>
+                  <p:par>
+                    <p:cTn id="3" fill="hold">
+                      <p:stCondLst>
+                        <p:cond delay="indefinite"/>
+                        <p:cond evt="onBegin" delay="0">
+                          <p:tn val="2"/>
+                        </p:cond>
+                      </p:stCondLst>
+                      <p:childTnLst>
+                        <p:par>
+                          <p:cTn id="4" fill="hold">
+                            <p:stCondLst>
+                              <p:cond delay="0"/>
+                            </p:stCondLst>
+                            <p:childTnLst>
+                              <p:par>
+                                <p:cTn id="5" presetID="1" presetClass="entr" presetSubtype="0" fill="hold" grpId="0" nodeType="withEffect">
+                                  <p:stCondLst>
+                                    <p:cond delay="0"/>
+                                  </p:stCondLst>
+                                  <p:childTnLst>
+                                    <p:set>
+                                      <p:cBhvr>
+                                        <p:cTn id="6" dur="1" fill="hold">
+                                          <p:stCondLst>
+                                            <p:cond delay="0"/>
+                                          </p:stCondLst>
+                                        </p:cTn>
+                                        <p:tgtEl>
+                                          <p:spTgt spid="3">
+                                            <p:txEl>
+                                              <p:pRg st="0" end="0"/>
+                                            </p:txEl>
+                                          </p:spTgt>
+                                        </p:tgtEl>
+                                        <p:attrNameLst>
+                                          <p:attrName>style.visibility</p:attrName>
+                                        </p:attrNameLst>
+                                      </p:cBhvr>
+                                      <p:to>
+                                        <p:strVal val="visible"/>
+                                      </p:to>
+                                    </p:set>
+                                  </p:childTnLst>
+                                </p:cTn>
+                              </p:par>
+                              <p:par>
+                                <p:cTn id="7" presetID="1" presetClass="entr" presetSubtype="0" fill="hold" grpId="0" nodeType="withEffect">
+                                  <p:stCondLst>
+                                    <p:cond delay="0"/>
+                                  </p:stCondLst>
+                                  <p:childTnLst>
+                                    <p:set>
+                                      <p:cBhvr>
+                                        <p:cTn id="8" dur="1" fill="hold">
+                                          <p:stCondLst>
+                                            <p:cond delay="0"/>
+                                          </p:stCondLst>
+                                        </p:cTn>
+                                        <p:tgtEl>
+                                          <p:spTgt spid="4"/>
+                                        </p:tgtEl>
+                                        <p:attrNameLst>
+                                          <p:attrName>style.visibility</p:attrName>
+                                        </p:attrNameLst>
+                                      </p:cBhvr>
+                                      <p:to>
+                                        <p:strVal val="visible"/>
+                                      </p:to>
+                                    </p:set>
+                                  </p:childTnLst>
+                                </p:cTn>
+                              </p:par>
+                              <p:par>
+                                <p:cTn id="9" presetID="1" presetClass="entr" presetSubtype="0" fill="hold" grpId="0" nodeType="withEffect">
+                                  <p:stCondLst>
+                                    <p:cond delay="0"/>
+                                  </p:stCondLst>
+                                  <p:childTnLst>
+                                    <p:set>
+                                      <p:cBhvr>
+                                        <p:cTn id="10" dur="1" fill="hold">
+                                          <p:stCondLst>
+                                            <p:cond delay="0"/>
+                                          </p:stCondLst>
+                                        </p:cTn>
+                                        <p:tgtEl>
+                                          <p:spTgt spid="3">
+                                            <p:txEl>
+                                              <p:pRg st="2" end="2"/>
+                                            </p:txEl>
+                                          </p:spTgt>
+                                        </p:tgtEl>
+                                        <p:attrNameLst>
+                                          <p:attrName>style.visibility</p:attrName>
+                                        </p:attrNameLst>
+                                      </p:cBhvr>
+                                      <p:to>
+                                        <p:strVal val="visible"/>
+                                      </p:to>
+                                    </p:set>
+                                  </p:childTnLst>
+                                </p:cTn>
+                              </p:par>
+                            </p:childTnLst>
+                          </p:cTn>
+                        </p:par>
+                      </p:childTnLst>
+                    </p:cTn>
+                  </p:par>
+                  <p:par>
+                    <p:cTn id="11" fill="hold">
+                      <p:stCondLst>
+                        <p:cond delay="indefinite"/>
+                      </p:stCondLst>
+                      <p:childTnLst>
+                        <p:par>
+                          <p:cTn id="12" fill="hold">
+                            <p:stCondLst>
+                              <p:cond delay="0"/>
+                            </p:stCondLst>
+                            <p:childTnLst>
+                              <p:par>
+                                <p:cTn id="13" presetID="1" presetClass="entr" presetSubtype="0" fill="hold" grpId="0" nodeType="clickEffect">
+                                  <p:stCondLst>
+                                    <p:cond delay="0"/>
+                                  </p:stCondLst>
+                                  <p:childTnLst>
+                                    <p:set>
+                                      <p:cBhvr>
+                                        <p:cTn id="14" dur="1" fill="hold">
+                                          <p:stCondLst>
+                                            <p:cond delay="0"/>
+                                          </p:stCondLst>
+                                        </p:cTn>
+                                        <p:tgtEl>
+                                          <p:spTgt spid="3">
+                                            <p:txEl>
+                                              <p:pRg st="3" end="3"/>
+                                            </p:txEl>
+                                          </p:spTgt>
+                                        </p:tgtEl>
+                                        <p:attrNameLst>
+                                          <p:attrName>style.visibility</p:attrName>
+                                        </p:attrNameLst>
+                                      </p:cBhvr>
+                                      <p:to>
+                                        <p:strVal val="visible"/>
+                                      </p:to>
+                                    </p:set>
+                                  </p:childTnLst>
+                                </p:cTn>
+                              </p:par>
+                              <p:par>
+                                <p:cTn id="15" presetID="1" presetClass="entr" presetSubtype="0" fill="hold" grpId="0" nodeType="withEffect">
+                                  <p:stCondLst>
+                                    <p:cond delay="0"/>
+                                  </p:stCondLst>
+                                  <p:childTnLst>
+                                    <p:set>
+                                      <p:cBhvr>
+                                        <p:cTn id="16" dur="1" fill="hold">
                                           <p:stCondLst>
                                             <p:cond delay="0"/>
                                           </p:stCondLst>
@@ -35018,470 +35663,6 @@
           <a:p>
             <a:r>
               <a:rPr lang="en-US" dirty="0" smtClean="0"/>
-              <a:t>A few shortcuts</a:t>
-            </a:r>
-            <a:endParaRPr lang="nl-BE" dirty="0"/>
-          </a:p>
-        </p:txBody>
-      </p:sp>
-      <p:sp>
-        <p:nvSpPr>
-          <p:cNvPr id="3" name="Content Placeholder 2"/>
-          <p:cNvSpPr>
-            <a:spLocks noGrp="1"/>
-          </p:cNvSpPr>
-          <p:nvPr>
-            <p:ph idx="1"/>
-          </p:nvPr>
-        </p:nvSpPr>
-        <p:spPr/>
-        <p:txBody>
-          <a:bodyPr/>
-          <a:lstStyle/>
-          <a:p>
-            <a:r>
-              <a:rPr lang="en-US" dirty="0" smtClean="0"/>
-              <a:t>Commit all modified files</a:t>
-            </a:r>
-          </a:p>
-          <a:p>
-            <a:pPr lvl="1"/>
-            <a:endParaRPr lang="en-US" dirty="0"/>
-          </a:p>
-          <a:p>
-            <a:pPr lvl="1"/>
-            <a:r>
-              <a:rPr lang="en-US" dirty="0" smtClean="0"/>
-              <a:t>Will commit only modified, tracked files</a:t>
-            </a:r>
-          </a:p>
-          <a:p>
-            <a:r>
-              <a:rPr lang="en-US" dirty="0" smtClean="0"/>
-              <a:t>Create new branch and switch to it</a:t>
-            </a:r>
-            <a:endParaRPr lang="nl-BE" dirty="0"/>
-          </a:p>
-        </p:txBody>
-      </p:sp>
-      <p:sp>
-        <p:nvSpPr>
-          <p:cNvPr id="4" name="TextBox 3"/>
-          <p:cNvSpPr txBox="1"/>
-          <p:nvPr/>
-        </p:nvSpPr>
-        <p:spPr>
-          <a:xfrm>
-            <a:off x="1259632" y="2204864"/>
-            <a:ext cx="5904656" cy="369332"/>
-          </a:xfrm>
-          <a:prstGeom prst="rect">
-            <a:avLst/>
-          </a:prstGeom>
-          <a:noFill/>
-          <a:ln>
-            <a:solidFill>
-              <a:schemeClr val="tx1"/>
-            </a:solidFill>
-          </a:ln>
-        </p:spPr>
-        <p:txBody>
-          <a:bodyPr wrap="square" rtlCol="0">
-            <a:spAutoFit/>
-          </a:bodyPr>
-          <a:lstStyle/>
-          <a:p>
-            <a:r>
-              <a:rPr lang="nl-BE" dirty="0" smtClean="0">
-                <a:latin typeface="Courier New" pitchFamily="49" charset="0"/>
-                <a:cs typeface="Courier New" pitchFamily="49" charset="0"/>
-              </a:rPr>
-              <a:t>$ git </a:t>
-            </a:r>
-            <a:r>
-              <a:rPr lang="nl-BE" dirty="0" err="1" smtClean="0">
-                <a:latin typeface="Courier New" pitchFamily="49" charset="0"/>
-                <a:cs typeface="Courier New" pitchFamily="49" charset="0"/>
-              </a:rPr>
-              <a:t>commit</a:t>
-            </a:r>
-            <a:r>
-              <a:rPr lang="nl-BE" dirty="0" smtClean="0">
-                <a:latin typeface="Courier New" pitchFamily="49" charset="0"/>
-                <a:cs typeface="Courier New" pitchFamily="49" charset="0"/>
-              </a:rPr>
-              <a:t>  -a  -m '</a:t>
-            </a:r>
-            <a:r>
-              <a:rPr lang="nl-BE" dirty="0" err="1" smtClean="0">
-                <a:latin typeface="Courier New" pitchFamily="49" charset="0"/>
-                <a:cs typeface="Courier New" pitchFamily="49" charset="0"/>
-              </a:rPr>
-              <a:t>Fixed</a:t>
-            </a:r>
-            <a:r>
-              <a:rPr lang="nl-BE" dirty="0" smtClean="0">
-                <a:latin typeface="Courier New" pitchFamily="49" charset="0"/>
-                <a:cs typeface="Courier New" pitchFamily="49" charset="0"/>
-              </a:rPr>
-              <a:t> x/0 bug'</a:t>
-            </a:r>
-          </a:p>
-        </p:txBody>
-      </p:sp>
-      <p:sp>
-        <p:nvSpPr>
-          <p:cNvPr id="5" name="TextBox 4"/>
-          <p:cNvSpPr txBox="1"/>
-          <p:nvPr/>
-        </p:nvSpPr>
-        <p:spPr>
-          <a:xfrm>
-            <a:off x="1259632" y="3789040"/>
-            <a:ext cx="5904656" cy="369332"/>
-          </a:xfrm>
-          <a:prstGeom prst="rect">
-            <a:avLst/>
-          </a:prstGeom>
-          <a:noFill/>
-          <a:ln>
-            <a:solidFill>
-              <a:schemeClr val="tx1"/>
-            </a:solidFill>
-          </a:ln>
-        </p:spPr>
-        <p:txBody>
-          <a:bodyPr wrap="square" rtlCol="0">
-            <a:spAutoFit/>
-          </a:bodyPr>
-          <a:lstStyle/>
-          <a:p>
-            <a:r>
-              <a:rPr lang="nl-BE" dirty="0" smtClean="0">
-                <a:latin typeface="Courier New" pitchFamily="49" charset="0"/>
-                <a:cs typeface="Courier New" pitchFamily="49" charset="0"/>
-              </a:rPr>
-              <a:t>$ git </a:t>
-            </a:r>
-            <a:r>
-              <a:rPr lang="nl-BE" dirty="0" err="1" smtClean="0">
-                <a:latin typeface="Courier New" pitchFamily="49" charset="0"/>
-                <a:cs typeface="Courier New" pitchFamily="49" charset="0"/>
-              </a:rPr>
-              <a:t>checkout</a:t>
-            </a:r>
-            <a:r>
-              <a:rPr lang="nl-BE" dirty="0" smtClean="0">
-                <a:latin typeface="Courier New" pitchFamily="49" charset="0"/>
-                <a:cs typeface="Courier New" pitchFamily="49" charset="0"/>
-              </a:rPr>
-              <a:t>  -b  feature/</a:t>
-            </a:r>
-            <a:r>
-              <a:rPr lang="nl-BE" dirty="0" err="1" smtClean="0">
-                <a:latin typeface="Courier New" pitchFamily="49" charset="0"/>
-                <a:cs typeface="Courier New" pitchFamily="49" charset="0"/>
-              </a:rPr>
-              <a:t>optimization</a:t>
-            </a:r>
-            <a:endParaRPr lang="nl-BE" dirty="0" smtClean="0">
-              <a:latin typeface="Courier New" pitchFamily="49" charset="0"/>
-              <a:cs typeface="Courier New" pitchFamily="49" charset="0"/>
-            </a:endParaRPr>
-          </a:p>
-        </p:txBody>
-      </p:sp>
-      <p:sp>
-        <p:nvSpPr>
-          <p:cNvPr id="6" name="Slide Number Placeholder 5"/>
-          <p:cNvSpPr>
-            <a:spLocks noGrp="1"/>
-          </p:cNvSpPr>
-          <p:nvPr>
-            <p:ph type="sldNum" sz="quarter" idx="12"/>
-          </p:nvPr>
-        </p:nvSpPr>
-        <p:spPr/>
-        <p:txBody>
-          <a:bodyPr/>
-          <a:lstStyle/>
-          <a:p>
-            <a:fld id="{BB52A05A-A776-4391-ACD7-D6BC34D3145C}" type="slidenum">
-              <a:rPr lang="nl-BE" smtClean="0"/>
-              <a:t>50</a:t>
-            </a:fld>
-            <a:endParaRPr lang="nl-BE"/>
-          </a:p>
-        </p:txBody>
-      </p:sp>
-    </p:spTree>
-    <p:extLst>
-      <p:ext uri="{BB962C8B-B14F-4D97-AF65-F5344CB8AC3E}">
-        <p14:creationId xmlns:p14="http://schemas.microsoft.com/office/powerpoint/2010/main" val="3459632536"/>
-      </p:ext>
-    </p:extLst>
-  </p:cSld>
-  <p:clrMapOvr>
-    <a:masterClrMapping/>
-  </p:clrMapOvr>
-  <p:timing>
-    <p:tnLst>
-      <p:par>
-        <p:cTn id="1" dur="indefinite" restart="never" nodeType="tmRoot">
-          <p:childTnLst>
-            <p:seq concurrent="1" nextAc="seek">
-              <p:cTn id="2" dur="indefinite" nodeType="mainSeq">
-                <p:childTnLst>
-                  <p:par>
-                    <p:cTn id="3" fill="hold">
-                      <p:stCondLst>
-                        <p:cond delay="indefinite"/>
-                        <p:cond evt="onBegin" delay="0">
-                          <p:tn val="2"/>
-                        </p:cond>
-                      </p:stCondLst>
-                      <p:childTnLst>
-                        <p:par>
-                          <p:cTn id="4" fill="hold">
-                            <p:stCondLst>
-                              <p:cond delay="0"/>
-                            </p:stCondLst>
-                            <p:childTnLst>
-                              <p:par>
-                                <p:cTn id="5" presetID="1" presetClass="entr" presetSubtype="0" fill="hold" grpId="0" nodeType="withEffect">
-                                  <p:stCondLst>
-                                    <p:cond delay="0"/>
-                                  </p:stCondLst>
-                                  <p:childTnLst>
-                                    <p:set>
-                                      <p:cBhvr>
-                                        <p:cTn id="6" dur="1" fill="hold">
-                                          <p:stCondLst>
-                                            <p:cond delay="0"/>
-                                          </p:stCondLst>
-                                        </p:cTn>
-                                        <p:tgtEl>
-                                          <p:spTgt spid="3">
-                                            <p:txEl>
-                                              <p:pRg st="0" end="0"/>
-                                            </p:txEl>
-                                          </p:spTgt>
-                                        </p:tgtEl>
-                                        <p:attrNameLst>
-                                          <p:attrName>style.visibility</p:attrName>
-                                        </p:attrNameLst>
-                                      </p:cBhvr>
-                                      <p:to>
-                                        <p:strVal val="visible"/>
-                                      </p:to>
-                                    </p:set>
-                                  </p:childTnLst>
-                                </p:cTn>
-                              </p:par>
-                              <p:par>
-                                <p:cTn id="7" presetID="1" presetClass="entr" presetSubtype="0" fill="hold" grpId="0" nodeType="withEffect">
-                                  <p:stCondLst>
-                                    <p:cond delay="0"/>
-                                  </p:stCondLst>
-                                  <p:childTnLst>
-                                    <p:set>
-                                      <p:cBhvr>
-                                        <p:cTn id="8" dur="1" fill="hold">
-                                          <p:stCondLst>
-                                            <p:cond delay="0"/>
-                                          </p:stCondLst>
-                                        </p:cTn>
-                                        <p:tgtEl>
-                                          <p:spTgt spid="4"/>
-                                        </p:tgtEl>
-                                        <p:attrNameLst>
-                                          <p:attrName>style.visibility</p:attrName>
-                                        </p:attrNameLst>
-                                      </p:cBhvr>
-                                      <p:to>
-                                        <p:strVal val="visible"/>
-                                      </p:to>
-                                    </p:set>
-                                  </p:childTnLst>
-                                </p:cTn>
-                              </p:par>
-                              <p:par>
-                                <p:cTn id="9" presetID="1" presetClass="entr" presetSubtype="0" fill="hold" grpId="0" nodeType="withEffect">
-                                  <p:stCondLst>
-                                    <p:cond delay="0"/>
-                                  </p:stCondLst>
-                                  <p:childTnLst>
-                                    <p:set>
-                                      <p:cBhvr>
-                                        <p:cTn id="10" dur="1" fill="hold">
-                                          <p:stCondLst>
-                                            <p:cond delay="0"/>
-                                          </p:stCondLst>
-                                        </p:cTn>
-                                        <p:tgtEl>
-                                          <p:spTgt spid="3">
-                                            <p:txEl>
-                                              <p:pRg st="2" end="2"/>
-                                            </p:txEl>
-                                          </p:spTgt>
-                                        </p:tgtEl>
-                                        <p:attrNameLst>
-                                          <p:attrName>style.visibility</p:attrName>
-                                        </p:attrNameLst>
-                                      </p:cBhvr>
-                                      <p:to>
-                                        <p:strVal val="visible"/>
-                                      </p:to>
-                                    </p:set>
-                                  </p:childTnLst>
-                                </p:cTn>
-                              </p:par>
-                            </p:childTnLst>
-                          </p:cTn>
-                        </p:par>
-                      </p:childTnLst>
-                    </p:cTn>
-                  </p:par>
-                  <p:par>
-                    <p:cTn id="11" fill="hold">
-                      <p:stCondLst>
-                        <p:cond delay="indefinite"/>
-                      </p:stCondLst>
-                      <p:childTnLst>
-                        <p:par>
-                          <p:cTn id="12" fill="hold">
-                            <p:stCondLst>
-                              <p:cond delay="0"/>
-                            </p:stCondLst>
-                            <p:childTnLst>
-                              <p:par>
-                                <p:cTn id="13" presetID="1" presetClass="entr" presetSubtype="0" fill="hold" grpId="0" nodeType="clickEffect">
-                                  <p:stCondLst>
-                                    <p:cond delay="0"/>
-                                  </p:stCondLst>
-                                  <p:childTnLst>
-                                    <p:set>
-                                      <p:cBhvr>
-                                        <p:cTn id="14" dur="1" fill="hold">
-                                          <p:stCondLst>
-                                            <p:cond delay="0"/>
-                                          </p:stCondLst>
-                                        </p:cTn>
-                                        <p:tgtEl>
-                                          <p:spTgt spid="3">
-                                            <p:txEl>
-                                              <p:pRg st="3" end="3"/>
-                                            </p:txEl>
-                                          </p:spTgt>
-                                        </p:tgtEl>
-                                        <p:attrNameLst>
-                                          <p:attrName>style.visibility</p:attrName>
-                                        </p:attrNameLst>
-                                      </p:cBhvr>
-                                      <p:to>
-                                        <p:strVal val="visible"/>
-                                      </p:to>
-                                    </p:set>
-                                  </p:childTnLst>
-                                </p:cTn>
-                              </p:par>
-                              <p:par>
-                                <p:cTn id="15" presetID="1" presetClass="entr" presetSubtype="0" fill="hold" grpId="0" nodeType="withEffect">
-                                  <p:stCondLst>
-                                    <p:cond delay="0"/>
-                                  </p:stCondLst>
-                                  <p:childTnLst>
-                                    <p:set>
-                                      <p:cBhvr>
-                                        <p:cTn id="16" dur="1" fill="hold">
-                                          <p:stCondLst>
-                                            <p:cond delay="0"/>
-                                          </p:stCondLst>
-                                        </p:cTn>
-                                        <p:tgtEl>
-                                          <p:spTgt spid="5"/>
-                                        </p:tgtEl>
-                                        <p:attrNameLst>
-                                          <p:attrName>style.visibility</p:attrName>
-                                        </p:attrNameLst>
-                                      </p:cBhvr>
-                                      <p:to>
-                                        <p:strVal val="visible"/>
-                                      </p:to>
-                                    </p:set>
-                                  </p:childTnLst>
-                                </p:cTn>
-                              </p:par>
-                            </p:childTnLst>
-                          </p:cTn>
-                        </p:par>
-                      </p:childTnLst>
-                    </p:cTn>
-                  </p:par>
-                </p:childTnLst>
-              </p:cTn>
-              <p:prevCondLst>
-                <p:cond evt="onPrev" delay="0">
-                  <p:tgtEl>
-                    <p:sldTgt/>
-                  </p:tgtEl>
-                </p:cond>
-              </p:prevCondLst>
-              <p:nextCondLst>
-                <p:cond evt="onNext" delay="0">
-                  <p:tgtEl>
-                    <p:sldTgt/>
-                  </p:tgtEl>
-                </p:cond>
-              </p:nextCondLst>
-            </p:seq>
-          </p:childTnLst>
-        </p:cTn>
-      </p:par>
-    </p:tnLst>
-    <p:bldLst>
-      <p:bldP spid="3" grpId="0" uiExpand="1" build="p"/>
-      <p:bldP spid="4" grpId="0" animBg="1"/>
-      <p:bldP spid="5" grpId="0" animBg="1"/>
-    </p:bldLst>
-  </p:timing>
-</p:sld>
-</file>
-
-<file path=ppt/slides/slide51.xml><?xml version="1.0" encoding="utf-8"?>
-<p:sld xmlns:a="http://schemas.openxmlformats.org/drawingml/2006/main" xmlns:r="http://schemas.openxmlformats.org/officeDocument/2006/relationships" xmlns:p="http://schemas.openxmlformats.org/presentationml/2006/main">
-  <p:cSld>
-    <p:spTree>
-      <p:nvGrpSpPr>
-        <p:cNvPr id="1" name=""/>
-        <p:cNvGrpSpPr/>
-        <p:nvPr/>
-      </p:nvGrpSpPr>
-      <p:grpSpPr>
-        <a:xfrm>
-          <a:off x="0" y="0"/>
-          <a:ext cx="0" cy="0"/>
-          <a:chOff x="0" y="0"/>
-          <a:chExt cx="0" cy="0"/>
-        </a:xfrm>
-      </p:grpSpPr>
-      <p:sp>
-        <p:nvSpPr>
-          <p:cNvPr id="2" name="Title 1"/>
-          <p:cNvSpPr>
-            <a:spLocks noGrp="1"/>
-          </p:cNvSpPr>
-          <p:nvPr>
-            <p:ph type="title"/>
-          </p:nvPr>
-        </p:nvSpPr>
-        <p:spPr/>
-        <p:txBody>
-          <a:bodyPr/>
-          <a:lstStyle/>
-          <a:p>
-            <a:r>
-              <a:rPr lang="en-US" dirty="0" smtClean="0"/>
               <a:t>Stashing</a:t>
             </a:r>
             <a:endParaRPr lang="en-US" dirty="0"/>
@@ -35583,7 +35764,7 @@
           <a:p>
             <a:fld id="{BB52A05A-A776-4391-ACD7-D6BC34D3145C}" type="slidenum">
               <a:rPr lang="nl-BE" smtClean="0"/>
-              <a:t>51</a:t>
+              <a:t>50</a:t>
             </a:fld>
             <a:endParaRPr lang="nl-BE"/>
           </a:p>
@@ -36241,7 +36422,7 @@
 </p:sld>
 </file>
 
-<file path=ppt/slides/slide52.xml><?xml version="1.0" encoding="utf-8"?>
+<file path=ppt/slides/slide51.xml><?xml version="1.0" encoding="utf-8"?>
 <p:sld xmlns:a="http://schemas.openxmlformats.org/drawingml/2006/main" xmlns:r="http://schemas.openxmlformats.org/officeDocument/2006/relationships" xmlns:p="http://schemas.openxmlformats.org/presentationml/2006/main">
   <p:cSld>
     <p:spTree>
@@ -36316,8 +36497,25 @@
           <a:p>
             <a:r>
               <a:rPr lang="en-US" dirty="0" smtClean="0"/>
-              <a:t>Added description to branch</a:t>
-            </a:r>
+              <a:t>Adding </a:t>
+            </a:r>
+            <a:r>
+              <a:rPr lang="en-US" dirty="0" smtClean="0"/>
+              <a:t>description to </a:t>
+            </a:r>
+            <a:r>
+              <a:rPr lang="en-US" dirty="0" smtClean="0"/>
+              <a:t>branch</a:t>
+            </a:r>
+          </a:p>
+          <a:p>
+            <a:endParaRPr lang="en-US" dirty="0"/>
+          </a:p>
+          <a:p>
+            <a:endParaRPr lang="en-US" dirty="0" smtClean="0"/>
+          </a:p>
+          <a:p>
+            <a:endParaRPr lang="en-US" dirty="0" smtClean="0"/>
           </a:p>
         </p:txBody>
       </p:sp>
@@ -36673,7 +36871,7 @@
           <a:p>
             <a:fld id="{BB52A05A-A776-4391-ACD7-D6BC34D3145C}" type="slidenum">
               <a:rPr lang="nl-BE" smtClean="0"/>
-              <a:t>52</a:t>
+              <a:t>51</a:t>
             </a:fld>
             <a:endParaRPr lang="nl-BE"/>
           </a:p>
@@ -37043,7 +37241,7 @@
 </p:sld>
 </file>
 
-<file path=ppt/slides/slide53.xml><?xml version="1.0" encoding="utf-8"?>
+<file path=ppt/slides/slide52.xml><?xml version="1.0" encoding="utf-8"?>
 <p:sld xmlns:a="http://schemas.openxmlformats.org/drawingml/2006/main" xmlns:r="http://schemas.openxmlformats.org/officeDocument/2006/relationships" xmlns:p="http://schemas.openxmlformats.org/presentationml/2006/main">
   <p:cSld>
     <p:spTree>
@@ -37298,7 +37496,7 @@
           <a:p>
             <a:fld id="{BB52A05A-A776-4391-ACD7-D6BC34D3145C}" type="slidenum">
               <a:rPr lang="nl-BE" smtClean="0"/>
-              <a:t>53</a:t>
+              <a:t>52</a:t>
             </a:fld>
             <a:endParaRPr lang="nl-BE"/>
           </a:p>
@@ -37602,6 +37800,108 @@
 </p:sld>
 </file>
 
+<file path=ppt/slides/slide53.xml><?xml version="1.0" encoding="utf-8"?>
+<p:sld xmlns:a="http://schemas.openxmlformats.org/drawingml/2006/main" xmlns:r="http://schemas.openxmlformats.org/officeDocument/2006/relationships" xmlns:p="http://schemas.openxmlformats.org/presentationml/2006/main">
+  <p:cSld>
+    <p:spTree>
+      <p:nvGrpSpPr>
+        <p:cNvPr id="1" name=""/>
+        <p:cNvGrpSpPr/>
+        <p:nvPr/>
+      </p:nvGrpSpPr>
+      <p:grpSpPr>
+        <a:xfrm>
+          <a:off x="0" y="0"/>
+          <a:ext cx="0" cy="0"/>
+          <a:chOff x="0" y="0"/>
+          <a:chExt cx="0" cy="0"/>
+        </a:xfrm>
+      </p:grpSpPr>
+      <p:sp>
+        <p:nvSpPr>
+          <p:cNvPr id="2" name="Title 1"/>
+          <p:cNvSpPr>
+            <a:spLocks noGrp="1"/>
+          </p:cNvSpPr>
+          <p:nvPr>
+            <p:ph type="title"/>
+          </p:nvPr>
+        </p:nvSpPr>
+        <p:spPr/>
+        <p:txBody>
+          <a:bodyPr/>
+          <a:lstStyle/>
+          <a:p>
+            <a:r>
+              <a:rPr lang="en-US" dirty="0" smtClean="0"/>
+              <a:t>Contributing</a:t>
+            </a:r>
+            <a:endParaRPr lang="nl-BE" dirty="0"/>
+          </a:p>
+        </p:txBody>
+      </p:sp>
+      <p:sp>
+        <p:nvSpPr>
+          <p:cNvPr id="3" name="Text Placeholder 2"/>
+          <p:cNvSpPr>
+            <a:spLocks noGrp="1"/>
+          </p:cNvSpPr>
+          <p:nvPr>
+            <p:ph type="body" idx="1"/>
+          </p:nvPr>
+        </p:nvSpPr>
+        <p:spPr/>
+        <p:txBody>
+          <a:bodyPr/>
+          <a:lstStyle/>
+          <a:p>
+            <a:endParaRPr lang="nl-BE"/>
+          </a:p>
+        </p:txBody>
+      </p:sp>
+      <p:sp>
+        <p:nvSpPr>
+          <p:cNvPr id="4" name="Slide Number Placeholder 3"/>
+          <p:cNvSpPr>
+            <a:spLocks noGrp="1"/>
+          </p:cNvSpPr>
+          <p:nvPr>
+            <p:ph type="sldNum" sz="quarter" idx="12"/>
+          </p:nvPr>
+        </p:nvSpPr>
+        <p:spPr/>
+        <p:txBody>
+          <a:bodyPr/>
+          <a:lstStyle/>
+          <a:p>
+            <a:fld id="{BB52A05A-A776-4391-ACD7-D6BC34D3145C}" type="slidenum">
+              <a:rPr lang="nl-BE" smtClean="0"/>
+              <a:t>53</a:t>
+            </a:fld>
+            <a:endParaRPr lang="nl-BE"/>
+          </a:p>
+        </p:txBody>
+      </p:sp>
+    </p:spTree>
+    <p:extLst>
+      <p:ext uri="{BB962C8B-B14F-4D97-AF65-F5344CB8AC3E}">
+        <p14:creationId xmlns:p14="http://schemas.microsoft.com/office/powerpoint/2010/main" val="2575227797"/>
+      </p:ext>
+    </p:extLst>
+  </p:cSld>
+  <p:clrMapOvr>
+    <a:masterClrMapping/>
+  </p:clrMapOvr>
+  <p:timing>
+    <p:tnLst>
+      <p:par>
+        <p:cTn id="1" dur="indefinite" restart="never" nodeType="tmRoot"/>
+      </p:par>
+    </p:tnLst>
+  </p:timing>
+</p:sld>
+</file>
+
 <file path=ppt/slides/slide54.xml><?xml version="1.0" encoding="utf-8"?>
 <p:sld xmlns:a="http://schemas.openxmlformats.org/drawingml/2006/main" xmlns:r="http://schemas.openxmlformats.org/officeDocument/2006/relationships" xmlns:p="http://schemas.openxmlformats.org/presentationml/2006/main">
   <p:cSld>
@@ -37644,20 +37944,74 @@
       </p:sp>
       <p:sp>
         <p:nvSpPr>
-          <p:cNvPr id="3" name="Text Placeholder 2"/>
+          <p:cNvPr id="3" name="Content Placeholder 2"/>
           <p:cNvSpPr>
             <a:spLocks noGrp="1"/>
           </p:cNvSpPr>
           <p:nvPr>
-            <p:ph type="body" idx="1"/>
+            <p:ph idx="1"/>
           </p:nvPr>
         </p:nvSpPr>
         <p:spPr/>
         <p:txBody>
-          <a:bodyPr/>
+          <a:bodyPr>
+            <a:normAutofit lnSpcReduction="10000"/>
+          </a:bodyPr>
           <a:lstStyle/>
           <a:p>
-            <a:endParaRPr lang="nl-BE"/>
+            <a:r>
+              <a:rPr lang="en-US" dirty="0" smtClean="0"/>
+              <a:t>Contribute to someone else's project, e.g.,</a:t>
+            </a:r>
+          </a:p>
+          <a:p>
+            <a:pPr lvl="1"/>
+            <a:r>
+              <a:rPr lang="en-US" dirty="0" smtClean="0"/>
+              <a:t>Open source project</a:t>
+            </a:r>
+          </a:p>
+          <a:p>
+            <a:pPr lvl="1"/>
+            <a:r>
+              <a:rPr lang="en-US" dirty="0" smtClean="0"/>
+              <a:t>Research project you're involved in</a:t>
+            </a:r>
+          </a:p>
+          <a:p>
+            <a:r>
+              <a:rPr lang="en-US" dirty="0" smtClean="0"/>
+              <a:t>Can be done without write access to project</a:t>
+            </a:r>
+          </a:p>
+          <a:p>
+            <a:pPr lvl="1"/>
+            <a:r>
+              <a:rPr lang="en-US" dirty="0" smtClean="0"/>
+              <a:t>Create your own copy by forking</a:t>
+            </a:r>
+          </a:p>
+          <a:p>
+            <a:pPr lvl="1"/>
+            <a:r>
+              <a:rPr lang="en-US" dirty="0" smtClean="0"/>
+              <a:t>Create a branch for implementation</a:t>
+            </a:r>
+          </a:p>
+          <a:p>
+            <a:pPr lvl="1"/>
+            <a:r>
+              <a:rPr lang="en-US" dirty="0" smtClean="0"/>
+              <a:t>Implement, test</a:t>
+            </a:r>
+          </a:p>
+          <a:p>
+            <a:pPr lvl="1"/>
+            <a:r>
+              <a:rPr lang="en-US" dirty="0" smtClean="0"/>
+              <a:t>Create a pull request for your branch against original repository</a:t>
+            </a:r>
+            <a:endParaRPr lang="nl-BE" dirty="0"/>
           </a:p>
         </p:txBody>
       </p:sp>
@@ -37679,162 +38033,6 @@
             <a:fld id="{BB52A05A-A776-4391-ACD7-D6BC34D3145C}" type="slidenum">
               <a:rPr lang="nl-BE" smtClean="0"/>
               <a:t>54</a:t>
-            </a:fld>
-            <a:endParaRPr lang="nl-BE"/>
-          </a:p>
-        </p:txBody>
-      </p:sp>
-    </p:spTree>
-    <p:extLst>
-      <p:ext uri="{BB962C8B-B14F-4D97-AF65-F5344CB8AC3E}">
-        <p14:creationId xmlns:p14="http://schemas.microsoft.com/office/powerpoint/2010/main" val="2575227797"/>
-      </p:ext>
-    </p:extLst>
-  </p:cSld>
-  <p:clrMapOvr>
-    <a:masterClrMapping/>
-  </p:clrMapOvr>
-  <p:timing>
-    <p:tnLst>
-      <p:par>
-        <p:cTn id="1" dur="indefinite" restart="never" nodeType="tmRoot"/>
-      </p:par>
-    </p:tnLst>
-  </p:timing>
-</p:sld>
-</file>
-
-<file path=ppt/slides/slide55.xml><?xml version="1.0" encoding="utf-8"?>
-<p:sld xmlns:a="http://schemas.openxmlformats.org/drawingml/2006/main" xmlns:r="http://schemas.openxmlformats.org/officeDocument/2006/relationships" xmlns:p="http://schemas.openxmlformats.org/presentationml/2006/main">
-  <p:cSld>
-    <p:spTree>
-      <p:nvGrpSpPr>
-        <p:cNvPr id="1" name=""/>
-        <p:cNvGrpSpPr/>
-        <p:nvPr/>
-      </p:nvGrpSpPr>
-      <p:grpSpPr>
-        <a:xfrm>
-          <a:off x="0" y="0"/>
-          <a:ext cx="0" cy="0"/>
-          <a:chOff x="0" y="0"/>
-          <a:chExt cx="0" cy="0"/>
-        </a:xfrm>
-      </p:grpSpPr>
-      <p:sp>
-        <p:nvSpPr>
-          <p:cNvPr id="2" name="Title 1"/>
-          <p:cNvSpPr>
-            <a:spLocks noGrp="1"/>
-          </p:cNvSpPr>
-          <p:nvPr>
-            <p:ph type="title"/>
-          </p:nvPr>
-        </p:nvSpPr>
-        <p:spPr/>
-        <p:txBody>
-          <a:bodyPr/>
-          <a:lstStyle/>
-          <a:p>
-            <a:r>
-              <a:rPr lang="en-US" dirty="0" smtClean="0"/>
-              <a:t>Contributing</a:t>
-            </a:r>
-            <a:endParaRPr lang="nl-BE" dirty="0"/>
-          </a:p>
-        </p:txBody>
-      </p:sp>
-      <p:sp>
-        <p:nvSpPr>
-          <p:cNvPr id="3" name="Content Placeholder 2"/>
-          <p:cNvSpPr>
-            <a:spLocks noGrp="1"/>
-          </p:cNvSpPr>
-          <p:nvPr>
-            <p:ph idx="1"/>
-          </p:nvPr>
-        </p:nvSpPr>
-        <p:spPr/>
-        <p:txBody>
-          <a:bodyPr>
-            <a:normAutofit lnSpcReduction="10000"/>
-          </a:bodyPr>
-          <a:lstStyle/>
-          <a:p>
-            <a:r>
-              <a:rPr lang="en-US" dirty="0" smtClean="0"/>
-              <a:t>Contribute to someone else's project, e.g.,</a:t>
-            </a:r>
-          </a:p>
-          <a:p>
-            <a:pPr lvl="1"/>
-            <a:r>
-              <a:rPr lang="en-US" dirty="0" smtClean="0"/>
-              <a:t>Open source project</a:t>
-            </a:r>
-          </a:p>
-          <a:p>
-            <a:pPr lvl="1"/>
-            <a:r>
-              <a:rPr lang="en-US" dirty="0" smtClean="0"/>
-              <a:t>Research project you're involved in</a:t>
-            </a:r>
-          </a:p>
-          <a:p>
-            <a:r>
-              <a:rPr lang="en-US" dirty="0" smtClean="0"/>
-              <a:t>Can be done without write access to project</a:t>
-            </a:r>
-          </a:p>
-          <a:p>
-            <a:pPr lvl="1"/>
-            <a:r>
-              <a:rPr lang="en-US" dirty="0" smtClean="0"/>
-              <a:t>Create your own copy by forking</a:t>
-            </a:r>
-          </a:p>
-          <a:p>
-            <a:pPr lvl="1"/>
-            <a:r>
-              <a:rPr lang="en-US" dirty="0" smtClean="0"/>
-              <a:t>Create a branch for implementation</a:t>
-            </a:r>
-          </a:p>
-          <a:p>
-            <a:pPr lvl="1"/>
-            <a:r>
-              <a:rPr lang="en-US" dirty="0" smtClean="0"/>
-              <a:t>Implement, test</a:t>
-            </a:r>
-          </a:p>
-          <a:p>
-            <a:pPr lvl="1"/>
-            <a:r>
-              <a:rPr lang="en-US" dirty="0" smtClean="0"/>
-              <a:t>Create a pull request for your branch against original repository</a:t>
-            </a:r>
-            <a:endParaRPr lang="nl-BE" dirty="0"/>
-          </a:p>
-        </p:txBody>
-      </p:sp>
-      <p:sp>
-        <p:nvSpPr>
-          <p:cNvPr id="4" name="Slide Number Placeholder 3"/>
-          <p:cNvSpPr>
-            <a:spLocks noGrp="1"/>
-          </p:cNvSpPr>
-          <p:nvPr>
-            <p:ph type="sldNum" sz="quarter" idx="12"/>
-          </p:nvPr>
-        </p:nvSpPr>
-        <p:spPr/>
-        <p:txBody>
-          <a:bodyPr/>
-          <a:lstStyle/>
-          <a:p>
-            <a:fld id="{BB52A05A-A776-4391-ACD7-D6BC34D3145C}" type="slidenum">
-              <a:rPr lang="nl-BE" smtClean="0"/>
-              <a:t>55</a:t>
             </a:fld>
             <a:endParaRPr lang="nl-BE"/>
           </a:p>
@@ -38326,7 +38524,7 @@
 </p:sld>
 </file>
 
-<file path=ppt/slides/slide56.xml><?xml version="1.0" encoding="utf-8"?>
+<file path=ppt/slides/slide55.xml><?xml version="1.0" encoding="utf-8"?>
 <p:sld xmlns:a="http://schemas.openxmlformats.org/drawingml/2006/main" xmlns:r="http://schemas.openxmlformats.org/officeDocument/2006/relationships" xmlns:p="http://schemas.openxmlformats.org/presentationml/2006/main">
   <p:cSld>
     <p:spTree>
@@ -38450,7 +38648,7 @@
           <a:p>
             <a:fld id="{BB52A05A-A776-4391-ACD7-D6BC34D3145C}" type="slidenum">
               <a:rPr lang="nl-BE" smtClean="0"/>
-              <a:t>56</a:t>
+              <a:t>55</a:t>
             </a:fld>
             <a:endParaRPr lang="nl-BE"/>
           </a:p>
@@ -38893,6 +39091,108 @@
 </p:sld>
 </file>
 
+<file path=ppt/slides/slide56.xml><?xml version="1.0" encoding="utf-8"?>
+<p:sld xmlns:a="http://schemas.openxmlformats.org/drawingml/2006/main" xmlns:r="http://schemas.openxmlformats.org/officeDocument/2006/relationships" xmlns:p="http://schemas.openxmlformats.org/presentationml/2006/main">
+  <p:cSld>
+    <p:spTree>
+      <p:nvGrpSpPr>
+        <p:cNvPr id="1" name=""/>
+        <p:cNvGrpSpPr/>
+        <p:nvPr/>
+      </p:nvGrpSpPr>
+      <p:grpSpPr>
+        <a:xfrm>
+          <a:off x="0" y="0"/>
+          <a:ext cx="0" cy="0"/>
+          <a:chOff x="0" y="0"/>
+          <a:chExt cx="0" cy="0"/>
+        </a:xfrm>
+      </p:grpSpPr>
+      <p:sp>
+        <p:nvSpPr>
+          <p:cNvPr id="2" name="Title 1"/>
+          <p:cNvSpPr>
+            <a:spLocks noGrp="1"/>
+          </p:cNvSpPr>
+          <p:nvPr>
+            <p:ph type="title"/>
+          </p:nvPr>
+        </p:nvSpPr>
+        <p:spPr/>
+        <p:txBody>
+          <a:bodyPr/>
+          <a:lstStyle/>
+          <a:p>
+            <a:r>
+              <a:rPr lang="en-US" dirty="0" smtClean="0"/>
+              <a:t>Conclusions</a:t>
+            </a:r>
+            <a:endParaRPr lang="nl-BE" dirty="0"/>
+          </a:p>
+        </p:txBody>
+      </p:sp>
+      <p:sp>
+        <p:nvSpPr>
+          <p:cNvPr id="3" name="Text Placeholder 2"/>
+          <p:cNvSpPr>
+            <a:spLocks noGrp="1"/>
+          </p:cNvSpPr>
+          <p:nvPr>
+            <p:ph type="body" idx="1"/>
+          </p:nvPr>
+        </p:nvSpPr>
+        <p:spPr/>
+        <p:txBody>
+          <a:bodyPr/>
+          <a:lstStyle/>
+          <a:p>
+            <a:endParaRPr lang="nl-BE"/>
+          </a:p>
+        </p:txBody>
+      </p:sp>
+      <p:sp>
+        <p:nvSpPr>
+          <p:cNvPr id="4" name="Slide Number Placeholder 3"/>
+          <p:cNvSpPr>
+            <a:spLocks noGrp="1"/>
+          </p:cNvSpPr>
+          <p:nvPr>
+            <p:ph type="sldNum" sz="quarter" idx="12"/>
+          </p:nvPr>
+        </p:nvSpPr>
+        <p:spPr/>
+        <p:txBody>
+          <a:bodyPr/>
+          <a:lstStyle/>
+          <a:p>
+            <a:fld id="{BB52A05A-A776-4391-ACD7-D6BC34D3145C}" type="slidenum">
+              <a:rPr lang="nl-BE" smtClean="0"/>
+              <a:t>56</a:t>
+            </a:fld>
+            <a:endParaRPr lang="nl-BE"/>
+          </a:p>
+        </p:txBody>
+      </p:sp>
+    </p:spTree>
+    <p:extLst>
+      <p:ext uri="{BB962C8B-B14F-4D97-AF65-F5344CB8AC3E}">
+        <p14:creationId xmlns:p14="http://schemas.microsoft.com/office/powerpoint/2010/main" val="2763237186"/>
+      </p:ext>
+    </p:extLst>
+  </p:cSld>
+  <p:clrMapOvr>
+    <a:masterClrMapping/>
+  </p:clrMapOvr>
+  <p:timing>
+    <p:tnLst>
+      <p:par>
+        <p:cTn id="1" dur="indefinite" restart="never" nodeType="tmRoot"/>
+      </p:par>
+    </p:tnLst>
+  </p:timing>
+</p:sld>
+</file>
+
 <file path=ppt/slides/slide57.xml><?xml version="1.0" encoding="utf-8"?>
 <p:sld xmlns:a="http://schemas.openxmlformats.org/drawingml/2006/main" xmlns:r="http://schemas.openxmlformats.org/officeDocument/2006/relationships" xmlns:p="http://schemas.openxmlformats.org/presentationml/2006/main">
   <p:cSld>
@@ -38935,12 +39235,12 @@
       </p:sp>
       <p:sp>
         <p:nvSpPr>
-          <p:cNvPr id="3" name="Text Placeholder 2"/>
+          <p:cNvPr id="3" name="Content Placeholder 2"/>
           <p:cNvSpPr>
             <a:spLocks noGrp="1"/>
           </p:cNvSpPr>
           <p:nvPr>
-            <p:ph type="body" idx="1"/>
+            <p:ph idx="1"/>
           </p:nvPr>
         </p:nvSpPr>
         <p:spPr/>
@@ -38948,7 +39248,52 @@
           <a:bodyPr/>
           <a:lstStyle/>
           <a:p>
-            <a:endParaRPr lang="nl-BE"/>
+            <a:r>
+              <a:rPr lang="en-US" dirty="0" smtClean="0"/>
+              <a:t>Contributes to the scientific method</a:t>
+            </a:r>
+          </a:p>
+          <a:p>
+            <a:pPr lvl="1"/>
+            <a:r>
+              <a:rPr lang="en-US" dirty="0" smtClean="0"/>
+              <a:t>Helps ensure reproducibility</a:t>
+            </a:r>
+          </a:p>
+          <a:p>
+            <a:r>
+              <a:rPr lang="en-US" dirty="0" smtClean="0"/>
+              <a:t>Record of change</a:t>
+            </a:r>
+          </a:p>
+          <a:p>
+            <a:pPr lvl="1"/>
+            <a:r>
+              <a:rPr lang="en-US" dirty="0" smtClean="0"/>
+              <a:t>What was changed?</a:t>
+            </a:r>
+          </a:p>
+          <a:p>
+            <a:pPr lvl="1"/>
+            <a:r>
+              <a:rPr lang="en-US" dirty="0" smtClean="0"/>
+              <a:t>When was it changed?</a:t>
+            </a:r>
+          </a:p>
+          <a:p>
+            <a:pPr lvl="1"/>
+            <a:r>
+              <a:rPr lang="en-US" dirty="0" smtClean="0"/>
+              <a:t>Who changed it?</a:t>
+            </a:r>
+          </a:p>
+          <a:p>
+            <a:pPr lvl="1"/>
+            <a:r>
+              <a:rPr lang="en-US" dirty="0" smtClean="0"/>
+              <a:t>Why was it changed?</a:t>
+            </a:r>
+            <a:endParaRPr lang="nl-BE" dirty="0"/>
           </a:p>
         </p:txBody>
       </p:sp>
@@ -38970,153 +39315,6 @@
             <a:fld id="{BB52A05A-A776-4391-ACD7-D6BC34D3145C}" type="slidenum">
               <a:rPr lang="nl-BE" smtClean="0"/>
               <a:t>57</a:t>
-            </a:fld>
-            <a:endParaRPr lang="nl-BE"/>
-          </a:p>
-        </p:txBody>
-      </p:sp>
-    </p:spTree>
-    <p:extLst>
-      <p:ext uri="{BB962C8B-B14F-4D97-AF65-F5344CB8AC3E}">
-        <p14:creationId xmlns:p14="http://schemas.microsoft.com/office/powerpoint/2010/main" val="2763237186"/>
-      </p:ext>
-    </p:extLst>
-  </p:cSld>
-  <p:clrMapOvr>
-    <a:masterClrMapping/>
-  </p:clrMapOvr>
-  <p:timing>
-    <p:tnLst>
-      <p:par>
-        <p:cTn id="1" dur="indefinite" restart="never" nodeType="tmRoot"/>
-      </p:par>
-    </p:tnLst>
-  </p:timing>
-</p:sld>
-</file>
-
-<file path=ppt/slides/slide58.xml><?xml version="1.0" encoding="utf-8"?>
-<p:sld xmlns:a="http://schemas.openxmlformats.org/drawingml/2006/main" xmlns:r="http://schemas.openxmlformats.org/officeDocument/2006/relationships" xmlns:p="http://schemas.openxmlformats.org/presentationml/2006/main">
-  <p:cSld>
-    <p:spTree>
-      <p:nvGrpSpPr>
-        <p:cNvPr id="1" name=""/>
-        <p:cNvGrpSpPr/>
-        <p:nvPr/>
-      </p:nvGrpSpPr>
-      <p:grpSpPr>
-        <a:xfrm>
-          <a:off x="0" y="0"/>
-          <a:ext cx="0" cy="0"/>
-          <a:chOff x="0" y="0"/>
-          <a:chExt cx="0" cy="0"/>
-        </a:xfrm>
-      </p:grpSpPr>
-      <p:sp>
-        <p:nvSpPr>
-          <p:cNvPr id="2" name="Title 1"/>
-          <p:cNvSpPr>
-            <a:spLocks noGrp="1"/>
-          </p:cNvSpPr>
-          <p:nvPr>
-            <p:ph type="title"/>
-          </p:nvPr>
-        </p:nvSpPr>
-        <p:spPr/>
-        <p:txBody>
-          <a:bodyPr/>
-          <a:lstStyle/>
-          <a:p>
-            <a:r>
-              <a:rPr lang="en-US" dirty="0" smtClean="0"/>
-              <a:t>Conclusions</a:t>
-            </a:r>
-            <a:endParaRPr lang="nl-BE" dirty="0"/>
-          </a:p>
-        </p:txBody>
-      </p:sp>
-      <p:sp>
-        <p:nvSpPr>
-          <p:cNvPr id="3" name="Content Placeholder 2"/>
-          <p:cNvSpPr>
-            <a:spLocks noGrp="1"/>
-          </p:cNvSpPr>
-          <p:nvPr>
-            <p:ph idx="1"/>
-          </p:nvPr>
-        </p:nvSpPr>
-        <p:spPr/>
-        <p:txBody>
-          <a:bodyPr/>
-          <a:lstStyle/>
-          <a:p>
-            <a:r>
-              <a:rPr lang="en-US" dirty="0" smtClean="0"/>
-              <a:t>Contributes to the scientific method</a:t>
-            </a:r>
-          </a:p>
-          <a:p>
-            <a:pPr lvl="1"/>
-            <a:r>
-              <a:rPr lang="en-US" dirty="0" smtClean="0"/>
-              <a:t>Helps ensure reproducibility</a:t>
-            </a:r>
-          </a:p>
-          <a:p>
-            <a:r>
-              <a:rPr lang="en-US" dirty="0" smtClean="0"/>
-              <a:t>Record of change</a:t>
-            </a:r>
-          </a:p>
-          <a:p>
-            <a:pPr lvl="1"/>
-            <a:r>
-              <a:rPr lang="en-US" dirty="0" smtClean="0"/>
-              <a:t>What was changed?</a:t>
-            </a:r>
-          </a:p>
-          <a:p>
-            <a:pPr lvl="1"/>
-            <a:r>
-              <a:rPr lang="en-US" dirty="0" smtClean="0"/>
-              <a:t>When was it changed?</a:t>
-            </a:r>
-          </a:p>
-          <a:p>
-            <a:pPr lvl="1"/>
-            <a:r>
-              <a:rPr lang="en-US" dirty="0" smtClean="0"/>
-              <a:t>Who changed it?</a:t>
-            </a:r>
-          </a:p>
-          <a:p>
-            <a:pPr lvl="1"/>
-            <a:r>
-              <a:rPr lang="en-US" dirty="0" smtClean="0"/>
-              <a:t>Why was it changed?</a:t>
-            </a:r>
-            <a:endParaRPr lang="nl-BE" dirty="0"/>
-          </a:p>
-        </p:txBody>
-      </p:sp>
-      <p:sp>
-        <p:nvSpPr>
-          <p:cNvPr id="4" name="Slide Number Placeholder 3"/>
-          <p:cNvSpPr>
-            <a:spLocks noGrp="1"/>
-          </p:cNvSpPr>
-          <p:nvPr>
-            <p:ph type="sldNum" sz="quarter" idx="12"/>
-          </p:nvPr>
-        </p:nvSpPr>
-        <p:spPr/>
-        <p:txBody>
-          <a:bodyPr/>
-          <a:lstStyle/>
-          <a:p>
-            <a:fld id="{BB52A05A-A776-4391-ACD7-D6BC34D3145C}" type="slidenum">
-              <a:rPr lang="nl-BE" smtClean="0"/>
-              <a:t>58</a:t>
             </a:fld>
             <a:endParaRPr lang="nl-BE"/>
           </a:p>
@@ -39424,6 +39622,219 @@
 </p:sld>
 </file>
 
+<file path=ppt/slides/slide58.xml><?xml version="1.0" encoding="utf-8"?>
+<p:sld xmlns:a="http://schemas.openxmlformats.org/drawingml/2006/main" xmlns:r="http://schemas.openxmlformats.org/officeDocument/2006/relationships" xmlns:p="http://schemas.openxmlformats.org/presentationml/2006/main">
+  <p:cSld>
+    <p:spTree>
+      <p:nvGrpSpPr>
+        <p:cNvPr id="1" name=""/>
+        <p:cNvGrpSpPr/>
+        <p:nvPr/>
+      </p:nvGrpSpPr>
+      <p:grpSpPr>
+        <a:xfrm>
+          <a:off x="0" y="0"/>
+          <a:ext cx="0" cy="0"/>
+          <a:chOff x="0" y="0"/>
+          <a:chExt cx="0" cy="0"/>
+        </a:xfrm>
+      </p:grpSpPr>
+      <p:sp>
+        <p:nvSpPr>
+          <p:cNvPr id="2" name="Title 1"/>
+          <p:cNvSpPr>
+            <a:spLocks noGrp="1"/>
+          </p:cNvSpPr>
+          <p:nvPr>
+            <p:ph type="title"/>
+          </p:nvPr>
+        </p:nvSpPr>
+        <p:spPr/>
+        <p:txBody>
+          <a:bodyPr/>
+          <a:lstStyle/>
+          <a:p>
+            <a:r>
+              <a:rPr lang="en-US" dirty="0" smtClean="0"/>
+              <a:t>References</a:t>
+            </a:r>
+            <a:endParaRPr lang="nl-BE" dirty="0"/>
+          </a:p>
+        </p:txBody>
+      </p:sp>
+      <p:sp>
+        <p:nvSpPr>
+          <p:cNvPr id="3" name="Content Placeholder 2"/>
+          <p:cNvSpPr>
+            <a:spLocks noGrp="1"/>
+          </p:cNvSpPr>
+          <p:nvPr>
+            <p:ph idx="1"/>
+          </p:nvPr>
+        </p:nvSpPr>
+        <p:spPr/>
+        <p:txBody>
+          <a:bodyPr>
+            <a:normAutofit fontScale="92500"/>
+          </a:bodyPr>
+          <a:lstStyle/>
+          <a:p>
+            <a:r>
+              <a:rPr lang="en-US" dirty="0" smtClean="0"/>
+              <a:t>Online documentation (including movies)</a:t>
+            </a:r>
+          </a:p>
+          <a:p>
+            <a:pPr lvl="1"/>
+            <a:r>
+              <a:rPr lang="nl-BE" dirty="0" smtClean="0">
+                <a:hlinkClick r:id="rId2"/>
+              </a:rPr>
+              <a:t>http://git-scm.com/documentation</a:t>
+            </a:r>
+            <a:endParaRPr lang="nl-BE" dirty="0" smtClean="0"/>
+          </a:p>
+          <a:p>
+            <a:r>
+              <a:rPr lang="en-US" dirty="0" err="1"/>
+              <a:t>g</a:t>
+            </a:r>
+            <a:r>
+              <a:rPr lang="en-US" dirty="0" err="1" smtClean="0"/>
+              <a:t>it</a:t>
+            </a:r>
+            <a:r>
+              <a:rPr lang="en-US" dirty="0" smtClean="0"/>
+              <a:t> web site</a:t>
+            </a:r>
+          </a:p>
+          <a:p>
+            <a:pPr lvl="1"/>
+            <a:r>
+              <a:rPr lang="nl-BE" dirty="0" smtClean="0">
+                <a:hlinkClick r:id="rId3"/>
+              </a:rPr>
+              <a:t>http://git-scm.com/</a:t>
+            </a:r>
+            <a:endParaRPr lang="nl-BE" dirty="0" smtClean="0"/>
+          </a:p>
+          <a:p>
+            <a:r>
+              <a:rPr lang="en-US" dirty="0" smtClean="0"/>
+              <a:t>Why (the author thinks) you should switch to </a:t>
+            </a:r>
+            <a:r>
+              <a:rPr lang="en-US" dirty="0" err="1" smtClean="0"/>
+              <a:t>git</a:t>
+            </a:r>
+            <a:endParaRPr lang="en-US" dirty="0" smtClean="0"/>
+          </a:p>
+          <a:p>
+            <a:pPr lvl="1"/>
+            <a:r>
+              <a:rPr lang="nl-BE" dirty="0" smtClean="0">
+                <a:hlinkClick r:id="rId4"/>
+              </a:rPr>
+              <a:t>http://blog.teamtreehouse.com/why-you-should-switch-from-subversion-to-git</a:t>
+            </a:r>
+            <a:endParaRPr lang="nl-BE" dirty="0" smtClean="0"/>
+          </a:p>
+          <a:p>
+            <a:r>
+              <a:rPr lang="nl-BE" dirty="0" smtClean="0"/>
+              <a:t>An </a:t>
+            </a:r>
+            <a:r>
+              <a:rPr lang="nl-BE" dirty="0" err="1" smtClean="0"/>
+              <a:t>overview</a:t>
+            </a:r>
+            <a:r>
+              <a:rPr lang="nl-BE" dirty="0" smtClean="0"/>
+              <a:t> of </a:t>
+            </a:r>
+            <a:r>
+              <a:rPr lang="nl-BE" dirty="0" err="1" smtClean="0"/>
+              <a:t>frequently</a:t>
+            </a:r>
+            <a:r>
+              <a:rPr lang="nl-BE" dirty="0" smtClean="0"/>
+              <a:t> </a:t>
+            </a:r>
+            <a:r>
+              <a:rPr lang="nl-BE" dirty="0" err="1" smtClean="0"/>
+              <a:t>used</a:t>
+            </a:r>
+            <a:r>
+              <a:rPr lang="nl-BE" dirty="0" smtClean="0"/>
+              <a:t> git </a:t>
+            </a:r>
+            <a:r>
+              <a:rPr lang="nl-BE" dirty="0" err="1" smtClean="0"/>
+              <a:t>workflows</a:t>
+            </a:r>
+            <a:endParaRPr lang="nl-BE" dirty="0" smtClean="0"/>
+          </a:p>
+          <a:p>
+            <a:pPr lvl="1"/>
+            <a:r>
+              <a:rPr lang="en-US" dirty="0">
+                <a:hlinkClick r:id="rId5"/>
+              </a:rPr>
+              <a:t>https://</a:t>
+            </a:r>
+            <a:r>
+              <a:rPr lang="en-US" dirty="0" smtClean="0">
+                <a:hlinkClick r:id="rId5"/>
+              </a:rPr>
+              <a:t>www.atlassian.com/git/workflows</a:t>
+            </a:r>
+            <a:endParaRPr lang="nl-BE" dirty="0" smtClean="0"/>
+          </a:p>
+        </p:txBody>
+      </p:sp>
+      <p:sp>
+        <p:nvSpPr>
+          <p:cNvPr id="4" name="Slide Number Placeholder 3"/>
+          <p:cNvSpPr>
+            <a:spLocks noGrp="1"/>
+          </p:cNvSpPr>
+          <p:nvPr>
+            <p:ph type="sldNum" sz="quarter" idx="12"/>
+          </p:nvPr>
+        </p:nvSpPr>
+        <p:spPr/>
+        <p:txBody>
+          <a:bodyPr/>
+          <a:lstStyle/>
+          <a:p>
+            <a:fld id="{BB52A05A-A776-4391-ACD7-D6BC34D3145C}" type="slidenum">
+              <a:rPr lang="nl-BE" smtClean="0"/>
+              <a:t>58</a:t>
+            </a:fld>
+            <a:endParaRPr lang="nl-BE"/>
+          </a:p>
+        </p:txBody>
+      </p:sp>
+    </p:spTree>
+    <p:extLst>
+      <p:ext uri="{BB962C8B-B14F-4D97-AF65-F5344CB8AC3E}">
+        <p14:creationId xmlns:p14="http://schemas.microsoft.com/office/powerpoint/2010/main" val="2976133738"/>
+      </p:ext>
+    </p:extLst>
+  </p:cSld>
+  <p:clrMapOvr>
+    <a:masterClrMapping/>
+  </p:clrMapOvr>
+  <p:timing>
+    <p:tnLst>
+      <p:par>
+        <p:cTn id="1" dur="indefinite" restart="never" nodeType="tmRoot"/>
+      </p:par>
+    </p:tnLst>
+  </p:timing>
+</p:sld>
+</file>
+
 <file path=ppt/slides/slide59.xml><?xml version="1.0" encoding="utf-8"?>
 <p:sld xmlns:a="http://schemas.openxmlformats.org/drawingml/2006/main" xmlns:r="http://schemas.openxmlformats.org/officeDocument/2006/relationships" xmlns:p="http://schemas.openxmlformats.org/presentationml/2006/main">
   <p:cSld>
@@ -39458,7 +39869,7 @@
           <a:p>
             <a:r>
               <a:rPr lang="en-US" dirty="0" smtClean="0"/>
-              <a:t>References</a:t>
+              <a:t>Software &amp; tools</a:t>
             </a:r>
             <a:endParaRPr lang="nl-BE" dirty="0"/>
           </a:p>
@@ -39474,29 +39885,123 @@
             <p:ph idx="1"/>
           </p:nvPr>
         </p:nvSpPr>
-        <p:spPr/>
+        <p:spPr>
+          <a:xfrm>
+            <a:off x="457200" y="1600201"/>
+            <a:ext cx="8229600" cy="5069159"/>
+          </a:xfrm>
+        </p:spPr>
         <p:txBody>
           <a:bodyPr>
-            <a:normAutofit fontScale="92500"/>
+            <a:normAutofit fontScale="92500" lnSpcReduction="20000"/>
           </a:bodyPr>
           <a:lstStyle/>
           <a:p>
             <a:r>
+              <a:rPr lang="en-US" dirty="0" err="1" smtClean="0"/>
+              <a:t>git</a:t>
+            </a:r>
+            <a:r>
               <a:rPr lang="en-US" dirty="0" smtClean="0"/>
-              <a:t>Online documentation (including movies)</a:t>
+              <a:t> comes </a:t>
+            </a:r>
+            <a:r>
+              <a:rPr lang="en-US" smtClean="0"/>
+              <a:t>with most </a:t>
+            </a:r>
+            <a:r>
+              <a:rPr lang="en-US" dirty="0" smtClean="0"/>
+              <a:t>Linux distributions</a:t>
+            </a:r>
+          </a:p>
+          <a:p>
+            <a:r>
+              <a:rPr lang="en-US" dirty="0" smtClean="0"/>
+              <a:t>Website &amp; downloads: </a:t>
+            </a:r>
+            <a:r>
+              <a:rPr lang="en-US" dirty="0">
+                <a:hlinkClick r:id="rId3"/>
+              </a:rPr>
+              <a:t>https://git-scm.com</a:t>
+            </a:r>
+            <a:r>
+              <a:rPr lang="en-US" dirty="0" smtClean="0">
+                <a:hlinkClick r:id="rId3"/>
+              </a:rPr>
+              <a:t>/</a:t>
+            </a:r>
+            <a:r>
+              <a:rPr lang="en-US" dirty="0" smtClean="0"/>
+              <a:t> </a:t>
+            </a:r>
+          </a:p>
+          <a:p>
+            <a:r>
+              <a:rPr lang="en-US" dirty="0" smtClean="0"/>
+              <a:t>Desktop clients</a:t>
             </a:r>
           </a:p>
           <a:p>
             <a:pPr lvl="1"/>
             <a:r>
+              <a:rPr lang="nl-BE" dirty="0"/>
+              <a:t>GitHub Desktop: </a:t>
+            </a:r>
+            <a:r>
+              <a:rPr lang="nl-BE" dirty="0">
+                <a:hlinkClick r:id="rId4"/>
+              </a:rPr>
+              <a:t>https://desktop.github.com</a:t>
+            </a:r>
+            <a:r>
               <a:rPr lang="nl-BE" dirty="0" smtClean="0">
-                <a:hlinkClick r:id="rId2"/>
-              </a:rPr>
-              <a:t>http://git-scm.com/documentation</a:t>
-            </a:r>
-            <a:endParaRPr lang="nl-BE" dirty="0" smtClean="0"/>
-          </a:p>
-          <a:p>
+                <a:hlinkClick r:id="rId4"/>
+              </a:rPr>
+              <a:t>/</a:t>
+            </a:r>
+            <a:r>
+              <a:rPr lang="nl-BE" dirty="0" smtClean="0"/>
+              <a:t> (Windows/</a:t>
+            </a:r>
+            <a:r>
+              <a:rPr lang="nl-BE" dirty="0" err="1" smtClean="0"/>
+              <a:t>MacOS</a:t>
+            </a:r>
+            <a:r>
+              <a:rPr lang="nl-BE" dirty="0" smtClean="0"/>
+              <a:t> X)</a:t>
+            </a:r>
+          </a:p>
+          <a:p>
+            <a:pPr lvl="1"/>
+            <a:r>
+              <a:rPr lang="en-US" dirty="0" err="1" smtClean="0"/>
+              <a:t>TortoiseGit</a:t>
+            </a:r>
+            <a:r>
+              <a:rPr lang="en-US" dirty="0"/>
+              <a:t>: </a:t>
+            </a:r>
+            <a:r>
+              <a:rPr lang="en-US" dirty="0">
+                <a:hlinkClick r:id="rId5"/>
+              </a:rPr>
+              <a:t>https://tortoisegit.org</a:t>
+            </a:r>
+            <a:r>
+              <a:rPr lang="en-US" dirty="0" smtClean="0">
+                <a:hlinkClick r:id="rId5"/>
+              </a:rPr>
+              <a:t>/</a:t>
+            </a:r>
+            <a:r>
+              <a:rPr lang="en-US" dirty="0" smtClean="0"/>
+              <a:t> (Windows)</a:t>
+            </a:r>
+          </a:p>
+          <a:p>
+            <a:pPr lvl="1"/>
             <a:r>
               <a:rPr lang="en-US" dirty="0" err="1"/>
               <a:t>g</a:t>
@@ -39507,90 +40012,103 @@
             </a:r>
             <a:r>
               <a:rPr lang="en-US" dirty="0" smtClean="0"/>
-              <a:t> web site</a:t>
-            </a:r>
-          </a:p>
-          <a:p>
-            <a:pPr lvl="1"/>
-            <a:r>
-              <a:rPr lang="nl-BE" dirty="0" smtClean="0">
-                <a:hlinkClick r:id="rId3"/>
-              </a:rPr>
-              <a:t>http://git-scm.com/</a:t>
-            </a:r>
-            <a:endParaRPr lang="nl-BE" dirty="0" smtClean="0"/>
-          </a:p>
-          <a:p>
+              <a:t>-cola</a:t>
+            </a:r>
+            <a:r>
+              <a:rPr lang="en-US" dirty="0"/>
+              <a:t>: </a:t>
+            </a:r>
+            <a:r>
+              <a:rPr lang="en-US" dirty="0">
+                <a:hlinkClick r:id="rId6"/>
+              </a:rPr>
+              <a:t>http://git-cola.github.io</a:t>
+            </a:r>
+            <a:r>
+              <a:rPr lang="en-US" dirty="0" smtClean="0">
+                <a:hlinkClick r:id="rId6"/>
+              </a:rPr>
+              <a:t>/</a:t>
+            </a:r>
             <a:r>
               <a:rPr lang="en-US" dirty="0" smtClean="0"/>
-              <a:t>Why (the author thinks) you should switch to </a:t>
+              <a:t> (Linux/Windows/</a:t>
+            </a:r>
+            <a:r>
+              <a:rPr lang="en-US" dirty="0" err="1" smtClean="0"/>
+              <a:t>MacOS</a:t>
+            </a:r>
+            <a:r>
+              <a:rPr lang="en-US" dirty="0" smtClean="0"/>
+              <a:t> X)</a:t>
+            </a:r>
+          </a:p>
+          <a:p>
+            <a:r>
+              <a:rPr lang="en-US" dirty="0" err="1" smtClean="0"/>
+              <a:t>vcsh</a:t>
+            </a:r>
+            <a:r>
+              <a:rPr lang="en-US" dirty="0" smtClean="0"/>
+              <a:t>, </a:t>
+            </a:r>
+            <a:r>
+              <a:rPr lang="en-US" dirty="0"/>
+              <a:t>version control for configuration files </a:t>
+            </a:r>
+            <a:r>
+              <a:rPr lang="en-US" dirty="0" smtClean="0"/>
+              <a:t>: </a:t>
+            </a:r>
+            <a:r>
+              <a:rPr lang="en-US" dirty="0">
+                <a:hlinkClick r:id="rId7"/>
+              </a:rPr>
+              <a:t>https://</a:t>
+            </a:r>
+            <a:r>
+              <a:rPr lang="en-US" dirty="0" smtClean="0">
+                <a:hlinkClick r:id="rId7"/>
+              </a:rPr>
+              <a:t>github.com/RichiH/vcsh</a:t>
+            </a:r>
+            <a:r>
+              <a:rPr lang="en-US" dirty="0" smtClean="0"/>
+              <a:t> (Linux)</a:t>
+            </a:r>
+          </a:p>
+          <a:p>
+            <a:r>
+              <a:rPr lang="en-US" dirty="0" smtClean="0"/>
+              <a:t>git-prompt.sh, show </a:t>
             </a:r>
             <a:r>
               <a:rPr lang="en-US" dirty="0" err="1" smtClean="0"/>
               <a:t>git</a:t>
             </a:r>
-            <a:endParaRPr lang="en-US" dirty="0" smtClean="0"/>
-          </a:p>
-          <a:p>
-            <a:pPr lvl="1"/>
-            <a:r>
-              <a:rPr lang="nl-BE" dirty="0" smtClean="0">
-                <a:hlinkClick r:id="rId4"/>
-              </a:rPr>
-              <a:t>http://blog.teamtreehouse.com/why-you-should-switch-from-subversion-to-git</a:t>
-            </a:r>
-            <a:endParaRPr lang="nl-BE" dirty="0" smtClean="0"/>
-          </a:p>
-          <a:p>
-            <a:r>
-              <a:rPr lang="nl-BE" dirty="0" smtClean="0"/>
-              <a:t>An </a:t>
-            </a:r>
-            <a:r>
-              <a:rPr lang="nl-BE" dirty="0" err="1" smtClean="0"/>
-              <a:t>overview</a:t>
-            </a:r>
-            <a:r>
-              <a:rPr lang="nl-BE" dirty="0" smtClean="0"/>
-              <a:t> of </a:t>
-            </a:r>
-            <a:r>
-              <a:rPr lang="nl-BE" dirty="0" err="1" smtClean="0"/>
-              <a:t>frequently</a:t>
-            </a:r>
-            <a:r>
-              <a:rPr lang="nl-BE" dirty="0" smtClean="0"/>
-              <a:t> </a:t>
-            </a:r>
-            <a:r>
-              <a:rPr lang="nl-BE" dirty="0" err="1" smtClean="0"/>
-              <a:t>used</a:t>
-            </a:r>
-            <a:r>
-              <a:rPr lang="nl-BE" dirty="0" smtClean="0"/>
-              <a:t> git </a:t>
-            </a:r>
-            <a:r>
-              <a:rPr lang="nl-BE" dirty="0" err="1" smtClean="0"/>
-              <a:t>workflows</a:t>
-            </a:r>
-            <a:endParaRPr lang="nl-BE" dirty="0" smtClean="0"/>
-          </a:p>
-          <a:p>
-            <a:pPr lvl="1"/>
+            <a:r>
+              <a:rPr lang="en-US" dirty="0" smtClean="0"/>
+              <a:t> info in command line prompt: </a:t>
+            </a:r>
             <a:r>
               <a:rPr lang="en-US" dirty="0">
-                <a:hlinkClick r:id="rId5"/>
-              </a:rPr>
-              <a:t>https://</a:t>
+                <a:hlinkClick r:id="rId8"/>
+              </a:rPr>
+              <a:t>http://git-prompt.sh</a:t>
             </a:r>
             <a:r>
               <a:rPr lang="en-US" dirty="0" smtClean="0">
-                <a:hlinkClick r:id="rId5"/>
-              </a:rPr>
-              <a:t>www.atlassian.com/git/workflows</a:t>
-            </a:r>
-            <a:endParaRPr lang="nl-BE" dirty="0" smtClean="0"/>
+                <a:hlinkClick r:id="rId8"/>
+              </a:rPr>
+              <a:t>/</a:t>
+            </a:r>
+            <a:r>
+              <a:rPr lang="en-US" dirty="0" smtClean="0"/>
+              <a:t> (Linux)</a:t>
+            </a:r>
+          </a:p>
+          <a:p>
+            <a:endParaRPr lang="nl-BE" dirty="0"/>
           </a:p>
         </p:txBody>
       </p:sp>
@@ -39620,7 +40138,7 @@
     </p:spTree>
     <p:extLst>
       <p:ext uri="{BB962C8B-B14F-4D97-AF65-F5344CB8AC3E}">
-        <p14:creationId xmlns:p14="http://schemas.microsoft.com/office/powerpoint/2010/main" val="2976133738"/>
+        <p14:creationId xmlns:p14="http://schemas.microsoft.com/office/powerpoint/2010/main" val="3855217261"/>
       </p:ext>
     </p:extLst>
   </p:cSld>
@@ -40200,326 +40718,6 @@
           <a:p>
             <a:r>
               <a:rPr lang="en-US" dirty="0" smtClean="0"/>
-              <a:t>Software &amp; tools</a:t>
-            </a:r>
-            <a:endParaRPr lang="nl-BE" dirty="0"/>
-          </a:p>
-        </p:txBody>
-      </p:sp>
-      <p:sp>
-        <p:nvSpPr>
-          <p:cNvPr id="3" name="Content Placeholder 2"/>
-          <p:cNvSpPr>
-            <a:spLocks noGrp="1"/>
-          </p:cNvSpPr>
-          <p:nvPr>
-            <p:ph idx="1"/>
-          </p:nvPr>
-        </p:nvSpPr>
-        <p:spPr>
-          <a:xfrm>
-            <a:off x="457200" y="1600201"/>
-            <a:ext cx="8229600" cy="5069159"/>
-          </a:xfrm>
-        </p:spPr>
-        <p:txBody>
-          <a:bodyPr>
-            <a:normAutofit fontScale="92500" lnSpcReduction="20000"/>
-          </a:bodyPr>
-          <a:lstStyle/>
-          <a:p>
-            <a:r>
-              <a:rPr lang="en-US" dirty="0" err="1" smtClean="0"/>
-              <a:t>git</a:t>
-            </a:r>
-            <a:r>
-              <a:rPr lang="en-US" dirty="0" smtClean="0"/>
-              <a:t> comes </a:t>
-            </a:r>
-            <a:r>
-              <a:rPr lang="en-US" smtClean="0"/>
-              <a:t>with most </a:t>
-            </a:r>
-            <a:r>
-              <a:rPr lang="en-US" dirty="0" smtClean="0"/>
-              <a:t>Linux distributions</a:t>
-            </a:r>
-          </a:p>
-          <a:p>
-            <a:r>
-              <a:rPr lang="en-US" dirty="0" smtClean="0"/>
-              <a:t>Website &amp; downloads: </a:t>
-            </a:r>
-            <a:r>
-              <a:rPr lang="en-US" dirty="0">
-                <a:hlinkClick r:id="rId3"/>
-              </a:rPr>
-              <a:t>https://git-scm.com</a:t>
-            </a:r>
-            <a:r>
-              <a:rPr lang="en-US" dirty="0" smtClean="0">
-                <a:hlinkClick r:id="rId3"/>
-              </a:rPr>
-              <a:t>/</a:t>
-            </a:r>
-            <a:r>
-              <a:rPr lang="en-US" dirty="0" smtClean="0"/>
-              <a:t> </a:t>
-            </a:r>
-          </a:p>
-          <a:p>
-            <a:r>
-              <a:rPr lang="en-US" dirty="0" smtClean="0"/>
-              <a:t>Desktop clients</a:t>
-            </a:r>
-          </a:p>
-          <a:p>
-            <a:pPr lvl="1"/>
-            <a:r>
-              <a:rPr lang="nl-BE" dirty="0"/>
-              <a:t>GitHub Desktop: </a:t>
-            </a:r>
-            <a:r>
-              <a:rPr lang="nl-BE" dirty="0">
-                <a:hlinkClick r:id="rId4"/>
-              </a:rPr>
-              <a:t>https://desktop.github.com</a:t>
-            </a:r>
-            <a:r>
-              <a:rPr lang="nl-BE" dirty="0" smtClean="0">
-                <a:hlinkClick r:id="rId4"/>
-              </a:rPr>
-              <a:t>/</a:t>
-            </a:r>
-            <a:r>
-              <a:rPr lang="nl-BE" dirty="0" smtClean="0"/>
-              <a:t> (Windows/</a:t>
-            </a:r>
-            <a:r>
-              <a:rPr lang="nl-BE" dirty="0" err="1" smtClean="0"/>
-              <a:t>MacOS</a:t>
-            </a:r>
-            <a:r>
-              <a:rPr lang="nl-BE" dirty="0" smtClean="0"/>
-              <a:t> X)</a:t>
-            </a:r>
-          </a:p>
-          <a:p>
-            <a:pPr lvl="1"/>
-            <a:r>
-              <a:rPr lang="en-US" dirty="0" err="1" smtClean="0"/>
-              <a:t>TortoiseGit</a:t>
-            </a:r>
-            <a:r>
-              <a:rPr lang="en-US" dirty="0"/>
-              <a:t>: </a:t>
-            </a:r>
-            <a:r>
-              <a:rPr lang="en-US" dirty="0">
-                <a:hlinkClick r:id="rId5"/>
-              </a:rPr>
-              <a:t>https://tortoisegit.org</a:t>
-            </a:r>
-            <a:r>
-              <a:rPr lang="en-US" dirty="0" smtClean="0">
-                <a:hlinkClick r:id="rId5"/>
-              </a:rPr>
-              <a:t>/</a:t>
-            </a:r>
-            <a:r>
-              <a:rPr lang="en-US" dirty="0" smtClean="0"/>
-              <a:t> (Windows)</a:t>
-            </a:r>
-          </a:p>
-          <a:p>
-            <a:pPr lvl="1"/>
-            <a:r>
-              <a:rPr lang="en-US" dirty="0" err="1"/>
-              <a:t>g</a:t>
-            </a:r>
-            <a:r>
-              <a:rPr lang="en-US" dirty="0" err="1" smtClean="0"/>
-              <a:t>it</a:t>
-            </a:r>
-            <a:r>
-              <a:rPr lang="en-US" dirty="0" smtClean="0"/>
-              <a:t>-cola</a:t>
-            </a:r>
-            <a:r>
-              <a:rPr lang="en-US" dirty="0"/>
-              <a:t>: </a:t>
-            </a:r>
-            <a:r>
-              <a:rPr lang="en-US" dirty="0">
-                <a:hlinkClick r:id="rId6"/>
-              </a:rPr>
-              <a:t>http://git-cola.github.io</a:t>
-            </a:r>
-            <a:r>
-              <a:rPr lang="en-US" dirty="0" smtClean="0">
-                <a:hlinkClick r:id="rId6"/>
-              </a:rPr>
-              <a:t>/</a:t>
-            </a:r>
-            <a:r>
-              <a:rPr lang="en-US" dirty="0" smtClean="0"/>
-              <a:t> (Linux/Windows/</a:t>
-            </a:r>
-            <a:r>
-              <a:rPr lang="en-US" dirty="0" err="1" smtClean="0"/>
-              <a:t>MacOS</a:t>
-            </a:r>
-            <a:r>
-              <a:rPr lang="en-US" dirty="0" smtClean="0"/>
-              <a:t> X)</a:t>
-            </a:r>
-          </a:p>
-          <a:p>
-            <a:r>
-              <a:rPr lang="en-US" dirty="0" err="1" smtClean="0"/>
-              <a:t>vcsh</a:t>
-            </a:r>
-            <a:r>
-              <a:rPr lang="en-US" dirty="0" smtClean="0"/>
-              <a:t>, </a:t>
-            </a:r>
-            <a:r>
-              <a:rPr lang="en-US" dirty="0"/>
-              <a:t>version control for configuration files </a:t>
-            </a:r>
-            <a:r>
-              <a:rPr lang="en-US" dirty="0" smtClean="0"/>
-              <a:t>: </a:t>
-            </a:r>
-            <a:r>
-              <a:rPr lang="en-US" dirty="0">
-                <a:hlinkClick r:id="rId7"/>
-              </a:rPr>
-              <a:t>https://</a:t>
-            </a:r>
-            <a:r>
-              <a:rPr lang="en-US" dirty="0" smtClean="0">
-                <a:hlinkClick r:id="rId7"/>
-              </a:rPr>
-              <a:t>github.com/RichiH/vcsh</a:t>
-            </a:r>
-            <a:r>
-              <a:rPr lang="en-US" dirty="0" smtClean="0"/>
-              <a:t> (Linux)</a:t>
-            </a:r>
-          </a:p>
-          <a:p>
-            <a:r>
-              <a:rPr lang="en-US" dirty="0" smtClean="0"/>
-              <a:t>git-prompt.sh, show </a:t>
-            </a:r>
-            <a:r>
-              <a:rPr lang="en-US" dirty="0" err="1" smtClean="0"/>
-              <a:t>git</a:t>
-            </a:r>
-            <a:r>
-              <a:rPr lang="en-US" dirty="0" smtClean="0"/>
-              <a:t> info in command line prompt: </a:t>
-            </a:r>
-            <a:r>
-              <a:rPr lang="en-US" dirty="0">
-                <a:hlinkClick r:id="rId8"/>
-              </a:rPr>
-              <a:t>http://git-prompt.sh</a:t>
-            </a:r>
-            <a:r>
-              <a:rPr lang="en-US" dirty="0" smtClean="0">
-                <a:hlinkClick r:id="rId8"/>
-              </a:rPr>
-              <a:t>/</a:t>
-            </a:r>
-            <a:r>
-              <a:rPr lang="en-US" dirty="0" smtClean="0"/>
-              <a:t> (Linux)</a:t>
-            </a:r>
-          </a:p>
-          <a:p>
-            <a:endParaRPr lang="nl-BE" dirty="0"/>
-          </a:p>
-        </p:txBody>
-      </p:sp>
-      <p:sp>
-        <p:nvSpPr>
-          <p:cNvPr id="4" name="Slide Number Placeholder 3"/>
-          <p:cNvSpPr>
-            <a:spLocks noGrp="1"/>
-          </p:cNvSpPr>
-          <p:nvPr>
-            <p:ph type="sldNum" sz="quarter" idx="12"/>
-          </p:nvPr>
-        </p:nvSpPr>
-        <p:spPr/>
-        <p:txBody>
-          <a:bodyPr/>
-          <a:lstStyle/>
-          <a:p>
-            <a:fld id="{BB52A05A-A776-4391-ACD7-D6BC34D3145C}" type="slidenum">
-              <a:rPr lang="nl-BE" smtClean="0"/>
-              <a:t>60</a:t>
-            </a:fld>
-            <a:endParaRPr lang="nl-BE"/>
-          </a:p>
-        </p:txBody>
-      </p:sp>
-    </p:spTree>
-    <p:extLst>
-      <p:ext uri="{BB962C8B-B14F-4D97-AF65-F5344CB8AC3E}">
-        <p14:creationId xmlns:p14="http://schemas.microsoft.com/office/powerpoint/2010/main" val="3855217261"/>
-      </p:ext>
-    </p:extLst>
-  </p:cSld>
-  <p:clrMapOvr>
-    <a:masterClrMapping/>
-  </p:clrMapOvr>
-  <p:timing>
-    <p:tnLst>
-      <p:par>
-        <p:cTn id="1" dur="indefinite" restart="never" nodeType="tmRoot"/>
-      </p:par>
-    </p:tnLst>
-  </p:timing>
-</p:sld>
-</file>
-
-<file path=ppt/slides/slide61.xml><?xml version="1.0" encoding="utf-8"?>
-<p:sld xmlns:a="http://schemas.openxmlformats.org/drawingml/2006/main" xmlns:r="http://schemas.openxmlformats.org/officeDocument/2006/relationships" xmlns:p="http://schemas.openxmlformats.org/presentationml/2006/main">
-  <p:cSld>
-    <p:spTree>
-      <p:nvGrpSpPr>
-        <p:cNvPr id="1" name=""/>
-        <p:cNvGrpSpPr/>
-        <p:nvPr/>
-      </p:nvGrpSpPr>
-      <p:grpSpPr>
-        <a:xfrm>
-          <a:off x="0" y="0"/>
-          <a:ext cx="0" cy="0"/>
-          <a:chOff x="0" y="0"/>
-          <a:chExt cx="0" cy="0"/>
-        </a:xfrm>
-      </p:grpSpPr>
-      <p:sp>
-        <p:nvSpPr>
-          <p:cNvPr id="2" name="Title 1"/>
-          <p:cNvSpPr>
-            <a:spLocks noGrp="1"/>
-          </p:cNvSpPr>
-          <p:nvPr>
-            <p:ph type="title"/>
-          </p:nvPr>
-        </p:nvSpPr>
-        <p:spPr/>
-        <p:txBody>
-          <a:bodyPr/>
-          <a:lstStyle/>
-          <a:p>
-            <a:r>
-              <a:rPr lang="en-US" dirty="0" smtClean="0"/>
               <a:t>Services</a:t>
             </a:r>
             <a:endParaRPr lang="nl-BE" dirty="0"/>
@@ -40649,7 +40847,7 @@
           <a:p>
             <a:fld id="{BB52A05A-A776-4391-ACD7-D6BC34D3145C}" type="slidenum">
               <a:rPr lang="nl-BE" smtClean="0"/>
-              <a:t>61</a:t>
+              <a:t>60</a:t>
             </a:fld>
             <a:endParaRPr lang="nl-BE"/>
           </a:p>

</xml_diff>

<commit_message>
Added remark on log search
</commit_message>
<xml_diff>
--- a/LinuxTools/VersionControl/version_control_git.pptx
+++ b/LinuxTools/VersionControl/version_control_git.pptx
@@ -36474,12 +36474,27 @@
         </p:nvSpPr>
         <p:spPr/>
         <p:txBody>
-          <a:bodyPr/>
+          <a:bodyPr>
+            <a:normAutofit lnSpcReduction="10000"/>
+          </a:bodyPr>
           <a:lstStyle/>
           <a:p>
             <a:r>
               <a:rPr lang="en-US" dirty="0" smtClean="0"/>
-              <a:t>Searching through history, methodically</a:t>
+              <a:t>Searching for revision that introduced line of code</a:t>
+            </a:r>
+          </a:p>
+          <a:p>
+            <a:endParaRPr lang="en-US" dirty="0" smtClean="0"/>
+          </a:p>
+          <a:p>
+            <a:r>
+              <a:rPr lang="en-US" dirty="0" smtClean="0"/>
+              <a:t>Searching </a:t>
+            </a:r>
+            <a:r>
+              <a:rPr lang="en-US" dirty="0" smtClean="0"/>
+              <a:t>through history, methodically</a:t>
             </a:r>
           </a:p>
           <a:p>
@@ -36527,7 +36542,58 @@
         </p:nvSpPr>
         <p:spPr>
           <a:xfrm>
-            <a:off x="683568" y="2204864"/>
+            <a:off x="683568" y="3645024"/>
+            <a:ext cx="4032448" cy="369332"/>
+          </a:xfrm>
+          <a:prstGeom prst="rect">
+            <a:avLst/>
+          </a:prstGeom>
+          <a:noFill/>
+          <a:ln>
+            <a:solidFill>
+              <a:schemeClr val="tx1"/>
+            </a:solidFill>
+          </a:ln>
+        </p:spPr>
+        <p:txBody>
+          <a:bodyPr wrap="square" rtlCol="0">
+            <a:spAutoFit/>
+          </a:bodyPr>
+          <a:lstStyle/>
+          <a:p>
+            <a:r>
+              <a:rPr lang="nl-BE" dirty="0" smtClean="0">
+                <a:latin typeface="Courier New" pitchFamily="49" charset="0"/>
+                <a:cs typeface="Courier New" pitchFamily="49" charset="0"/>
+              </a:rPr>
+              <a:t>$ git </a:t>
+            </a:r>
+            <a:r>
+              <a:rPr lang="nl-BE" dirty="0" err="1" smtClean="0">
+                <a:latin typeface="Courier New" pitchFamily="49" charset="0"/>
+                <a:cs typeface="Courier New" pitchFamily="49" charset="0"/>
+              </a:rPr>
+              <a:t>bisect</a:t>
+            </a:r>
+            <a:r>
+              <a:rPr lang="nl-BE" dirty="0" smtClean="0">
+                <a:latin typeface="Courier New" pitchFamily="49" charset="0"/>
+                <a:cs typeface="Courier New" pitchFamily="49" charset="0"/>
+              </a:rPr>
+              <a:t>  …</a:t>
+            </a:r>
+          </a:p>
+        </p:txBody>
+      </p:sp>
+      <p:sp>
+        <p:nvSpPr>
+          <p:cNvPr id="6" name="TextBox 5"/>
+          <p:cNvSpPr txBox="1"/>
+          <p:nvPr/>
+        </p:nvSpPr>
+        <p:spPr>
+          <a:xfrm>
+            <a:off x="687597" y="4725144"/>
             <a:ext cx="3600400" cy="369332"/>
           </a:xfrm>
           <a:prstGeom prst="rect">
@@ -36558,57 +36624,6 @@
                 <a:latin typeface="Courier New" pitchFamily="49" charset="0"/>
                 <a:cs typeface="Courier New" pitchFamily="49" charset="0"/>
               </a:rPr>
-              <a:t>bisect</a:t>
-            </a:r>
-            <a:r>
-              <a:rPr lang="nl-BE" dirty="0" smtClean="0">
-                <a:latin typeface="Courier New" pitchFamily="49" charset="0"/>
-                <a:cs typeface="Courier New" pitchFamily="49" charset="0"/>
-              </a:rPr>
-              <a:t>  …</a:t>
-            </a:r>
-          </a:p>
-        </p:txBody>
-      </p:sp>
-      <p:sp>
-        <p:nvSpPr>
-          <p:cNvPr id="6" name="TextBox 5"/>
-          <p:cNvSpPr txBox="1"/>
-          <p:nvPr/>
-        </p:nvSpPr>
-        <p:spPr>
-          <a:xfrm>
-            <a:off x="687597" y="3423705"/>
-            <a:ext cx="3600400" cy="369332"/>
-          </a:xfrm>
-          <a:prstGeom prst="rect">
-            <a:avLst/>
-          </a:prstGeom>
-          <a:noFill/>
-          <a:ln>
-            <a:solidFill>
-              <a:schemeClr val="tx1"/>
-            </a:solidFill>
-          </a:ln>
-        </p:spPr>
-        <p:txBody>
-          <a:bodyPr wrap="square" rtlCol="0">
-            <a:spAutoFit/>
-          </a:bodyPr>
-          <a:lstStyle/>
-          <a:p>
-            <a:r>
-              <a:rPr lang="nl-BE" dirty="0" smtClean="0">
-                <a:latin typeface="Courier New" pitchFamily="49" charset="0"/>
-                <a:cs typeface="Courier New" pitchFamily="49" charset="0"/>
-              </a:rPr>
-              <a:t>$ git </a:t>
-            </a:r>
-            <a:r>
-              <a:rPr lang="nl-BE" dirty="0" err="1" smtClean="0">
-                <a:latin typeface="Courier New" pitchFamily="49" charset="0"/>
-                <a:cs typeface="Courier New" pitchFamily="49" charset="0"/>
-              </a:rPr>
               <a:t>add</a:t>
             </a:r>
             <a:r>
@@ -36629,7 +36644,7 @@
         </p:nvSpPr>
         <p:spPr>
           <a:xfrm>
-            <a:off x="683568" y="4580263"/>
+            <a:off x="683568" y="5805264"/>
             <a:ext cx="6552728" cy="369332"/>
           </a:xfrm>
           <a:prstGeom prst="rect">
@@ -36691,7 +36706,7 @@
         </p:nvSpPr>
         <p:spPr>
           <a:xfrm>
-            <a:off x="683568" y="5139075"/>
+            <a:off x="683568" y="6364076"/>
             <a:ext cx="6552728" cy="369332"/>
           </a:xfrm>
           <a:prstGeom prst="rect">
@@ -36767,7 +36782,7 @@
         </p:nvSpPr>
         <p:spPr>
           <a:xfrm>
-            <a:off x="7078065" y="5367489"/>
+            <a:off x="6962867" y="6026664"/>
             <a:ext cx="1723933" cy="369332"/>
           </a:xfrm>
           <a:prstGeom prst="rect">
@@ -36804,7 +36819,7 @@
         </p:nvSpPr>
         <p:spPr>
           <a:xfrm>
-            <a:off x="4360005" y="3423705"/>
+            <a:off x="4360005" y="4725144"/>
             <a:ext cx="4557192" cy="369332"/>
           </a:xfrm>
           <a:prstGeom prst="rect">
@@ -36874,6 +36889,54 @@
               <a:t>51</a:t>
             </a:fld>
             <a:endParaRPr lang="nl-BE"/>
+          </a:p>
+        </p:txBody>
+      </p:sp>
+      <p:sp>
+        <p:nvSpPr>
+          <p:cNvPr id="12" name="TextBox 11"/>
+          <p:cNvSpPr txBox="1"/>
+          <p:nvPr/>
+        </p:nvSpPr>
+        <p:spPr>
+          <a:xfrm>
+            <a:off x="683568" y="2616613"/>
+            <a:ext cx="4032448" cy="369332"/>
+          </a:xfrm>
+          <a:prstGeom prst="rect">
+            <a:avLst/>
+          </a:prstGeom>
+          <a:noFill/>
+          <a:ln>
+            <a:solidFill>
+              <a:schemeClr val="tx1"/>
+            </a:solidFill>
+          </a:ln>
+        </p:spPr>
+        <p:txBody>
+          <a:bodyPr wrap="square" rtlCol="0">
+            <a:spAutoFit/>
+          </a:bodyPr>
+          <a:lstStyle/>
+          <a:p>
+            <a:r>
+              <a:rPr lang="nl-BE" dirty="0" smtClean="0">
+                <a:latin typeface="Courier New" pitchFamily="49" charset="0"/>
+                <a:cs typeface="Courier New" pitchFamily="49" charset="0"/>
+              </a:rPr>
+              <a:t>$ git </a:t>
+            </a:r>
+            <a:r>
+              <a:rPr lang="nl-BE" dirty="0" smtClean="0">
+                <a:latin typeface="Courier New" pitchFamily="49" charset="0"/>
+                <a:cs typeface="Courier New" pitchFamily="49" charset="0"/>
+              </a:rPr>
+              <a:t>log  -S 'double sqr('</a:t>
+            </a:r>
+            <a:endParaRPr lang="nl-BE" dirty="0" smtClean="0">
+              <a:latin typeface="Courier New" pitchFamily="49" charset="0"/>
+              <a:cs typeface="Courier New" pitchFamily="49" charset="0"/>
+            </a:endParaRPr>
           </a:p>
         </p:txBody>
       </p:sp>
@@ -36955,7 +37018,7 @@
                                           </p:stCondLst>
                                         </p:cTn>
                                         <p:tgtEl>
-                                          <p:spTgt spid="4"/>
+                                          <p:spTgt spid="12"/>
                                         </p:tgtEl>
                                         <p:attrNameLst>
                                           <p:attrName>style.visibility</p:attrName>
@@ -37031,34 +37094,7 @@
                                           </p:stCondLst>
                                         </p:cTn>
                                         <p:tgtEl>
-                                          <p:spTgt spid="6"/>
-                                        </p:tgtEl>
-                                        <p:attrNameLst>
-                                          <p:attrName>style.visibility</p:attrName>
-                                        </p:attrNameLst>
-                                      </p:cBhvr>
-                                      <p:to>
-                                        <p:strVal val="visible"/>
-                                      </p:to>
-                                    </p:set>
-                                  </p:childTnLst>
-                                </p:cTn>
-                              </p:par>
-                              <p:par>
-                                <p:cTn id="15" presetID="1" presetClass="entr" presetSubtype="0" fill="hold" grpId="0" nodeType="withEffect">
-                                  <p:stCondLst>
-                                    <p:cond delay="0"/>
-                                  </p:stCondLst>
-                                  <p:childTnLst>
-                                    <p:set>
-                                      <p:cBhvr>
-                                        <p:cTn id="16" dur="1" fill="hold">
-                                          <p:stCondLst>
-                                            <p:cond delay="0"/>
-                                          </p:stCondLst>
-                                        </p:cTn>
-                                        <p:tgtEl>
-                                          <p:spTgt spid="10"/>
+                                          <p:spTgt spid="4"/>
                                         </p:tgtEl>
                                         <p:attrNameLst>
                                           <p:attrName>style.visibility</p:attrName>
@@ -37078,19 +37114,50 @@
                     </p:cTn>
                   </p:par>
                   <p:par>
-                    <p:cTn id="17" fill="hold">
+                    <p:cTn id="15" fill="hold">
                       <p:stCondLst>
                         <p:cond delay="indefinite"/>
                       </p:stCondLst>
                       <p:childTnLst>
                         <p:par>
-                          <p:cTn id="18" fill="hold">
+                          <p:cTn id="16" fill="hold">
                             <p:stCondLst>
                               <p:cond delay="0"/>
                             </p:stCondLst>
                             <p:childTnLst>
                               <p:par>
-                                <p:cTn id="19" presetID="1" presetClass="entr" presetSubtype="0" fill="hold" grpId="0" nodeType="clickEffect">
+                                <p:cTn id="17" presetID="1" presetClass="entr" presetSubtype="0" fill="hold" grpId="0" nodeType="clickEffect">
+                                  <p:stCondLst>
+                                    <p:cond delay="0"/>
+                                  </p:stCondLst>
+                                  <p:childTnLst>
+                                    <p:set>
+                                      <p:cBhvr>
+                                        <p:cTn id="18" dur="1" fill="hold">
+                                          <p:stCondLst>
+                                            <p:cond delay="0"/>
+                                          </p:stCondLst>
+                                        </p:cTn>
+                                        <p:tgtEl>
+                                          <p:spTgt spid="3">
+                                            <p:txEl>
+                                              <p:pRg st="4" end="4"/>
+                                            </p:txEl>
+                                          </p:spTgt>
+                                        </p:tgtEl>
+                                        <p:attrNameLst>
+                                          <p:attrName>style.visibility</p:attrName>
+                                        </p:attrNameLst>
+                                      </p:cBhvr>
+                                      <p:to>
+                                        <p:strVal val="visible"/>
+                                      </p:to>
+                                    </p:set>
+                                  </p:childTnLst>
+                                </p:cTn>
+                              </p:par>
+                              <p:par>
+                                <p:cTn id="19" presetID="1" presetClass="entr" presetSubtype="0" fill="hold" grpId="0" nodeType="withEffect">
                                   <p:stCondLst>
                                     <p:cond delay="0"/>
                                   </p:stCondLst>
@@ -37103,11 +37170,7 @@
                                           </p:stCondLst>
                                         </p:cTn>
                                         <p:tgtEl>
-                                          <p:spTgt spid="3">
-                                            <p:txEl>
-                                              <p:pRg st="4" end="4"/>
-                                            </p:txEl>
-                                          </p:spTgt>
+                                          <p:spTgt spid="6"/>
                                         </p:tgtEl>
                                         <p:attrNameLst>
                                           <p:attrName>style.visibility</p:attrName>
@@ -37134,6 +37197,82 @@
                                           </p:stCondLst>
                                         </p:cTn>
                                         <p:tgtEl>
+                                          <p:spTgt spid="10"/>
+                                        </p:tgtEl>
+                                        <p:attrNameLst>
+                                          <p:attrName>style.visibility</p:attrName>
+                                        </p:attrNameLst>
+                                      </p:cBhvr>
+                                      <p:to>
+                                        <p:strVal val="visible"/>
+                                      </p:to>
+                                    </p:set>
+                                  </p:childTnLst>
+                                </p:cTn>
+                              </p:par>
+                            </p:childTnLst>
+                          </p:cTn>
+                        </p:par>
+                      </p:childTnLst>
+                    </p:cTn>
+                  </p:par>
+                  <p:par>
+                    <p:cTn id="23" fill="hold">
+                      <p:stCondLst>
+                        <p:cond delay="indefinite"/>
+                      </p:stCondLst>
+                      <p:childTnLst>
+                        <p:par>
+                          <p:cTn id="24" fill="hold">
+                            <p:stCondLst>
+                              <p:cond delay="0"/>
+                            </p:stCondLst>
+                            <p:childTnLst>
+                              <p:par>
+                                <p:cTn id="25" presetID="1" presetClass="entr" presetSubtype="0" fill="hold" grpId="0" nodeType="clickEffect">
+                                  <p:stCondLst>
+                                    <p:cond delay="0"/>
+                                  </p:stCondLst>
+                                  <p:childTnLst>
+                                    <p:set>
+                                      <p:cBhvr>
+                                        <p:cTn id="26" dur="1" fill="hold">
+                                          <p:stCondLst>
+                                            <p:cond delay="0"/>
+                                          </p:stCondLst>
+                                        </p:cTn>
+                                        <p:tgtEl>
+                                          <p:spTgt spid="3">
+                                            <p:txEl>
+                                              <p:pRg st="6" end="6"/>
+                                            </p:txEl>
+                                          </p:spTgt>
+                                        </p:tgtEl>
+                                        <p:attrNameLst>
+                                          <p:attrName>style.visibility</p:attrName>
+                                        </p:attrNameLst>
+                                      </p:cBhvr>
+                                      <p:to>
+                                        <p:strVal val="visible"/>
+                                      </p:to>
+                                    </p:set>
+                                  </p:childTnLst>
+                                </p:cTn>
+                              </p:par>
+                              <p:par>
+                                <p:cTn id="27" presetID="1" presetClass="entr" presetSubtype="0" fill="hold" grpId="0" nodeType="withEffect">
+                                  <p:stCondLst>
+                                    <p:cond delay="0"/>
+                                  </p:stCondLst>
+                                  <p:childTnLst>
+                                    <p:set>
+                                      <p:cBhvr>
+                                        <p:cTn id="28" dur="1" fill="hold">
+                                          <p:stCondLst>
+                                            <p:cond delay="0"/>
+                                          </p:stCondLst>
+                                        </p:cTn>
+                                        <p:tgtEl>
                                           <p:spTgt spid="7"/>
                                         </p:tgtEl>
                                         <p:attrNameLst>
@@ -37148,14 +37287,14 @@
                                 </p:cTn>
                               </p:par>
                               <p:par>
-                                <p:cTn id="23" presetID="1" presetClass="entr" presetSubtype="0" fill="hold" grpId="0" nodeType="withEffect">
+                                <p:cTn id="29" presetID="1" presetClass="entr" presetSubtype="0" fill="hold" grpId="0" nodeType="withEffect">
                                   <p:stCondLst>
                                     <p:cond delay="0"/>
                                   </p:stCondLst>
                                   <p:childTnLst>
                                     <p:set>
                                       <p:cBhvr>
-                                        <p:cTn id="24" dur="1" fill="hold">
+                                        <p:cTn id="30" dur="1" fill="hold">
                                           <p:stCondLst>
                                             <p:cond delay="0"/>
                                           </p:stCondLst>
@@ -37174,15 +37313,33 @@
                                   </p:childTnLst>
                                 </p:cTn>
                               </p:par>
+                            </p:childTnLst>
+                          </p:cTn>
+                        </p:par>
+                      </p:childTnLst>
+                    </p:cTn>
+                  </p:par>
+                  <p:par>
+                    <p:cTn id="31" fill="hold">
+                      <p:stCondLst>
+                        <p:cond delay="indefinite"/>
+                      </p:stCondLst>
+                      <p:childTnLst>
+                        <p:par>
+                          <p:cTn id="32" fill="hold">
+                            <p:stCondLst>
+                              <p:cond delay="0"/>
+                            </p:stCondLst>
+                            <p:childTnLst>
                               <p:par>
-                                <p:cTn id="25" presetID="1" presetClass="entr" presetSubtype="0" fill="hold" grpId="0" nodeType="withEffect">
+                                <p:cTn id="33" presetID="1" presetClass="entr" presetSubtype="0" fill="hold" grpId="0" nodeType="clickEffect">
                                   <p:stCondLst>
                                     <p:cond delay="0"/>
                                   </p:stCondLst>
                                   <p:childTnLst>
                                     <p:set>
                                       <p:cBhvr>
-                                        <p:cTn id="26" dur="1" fill="hold">
+                                        <p:cTn id="34" dur="1" fill="hold">
                                           <p:stCondLst>
                                             <p:cond delay="0"/>
                                           </p:stCondLst>
@@ -37236,6 +37393,7 @@
       <p:bldP spid="8" grpId="0" animBg="1"/>
       <p:bldP spid="9" grpId="0" animBg="1"/>
       <p:bldP spid="10" grpId="0" animBg="1"/>
+      <p:bldP spid="12" grpId="0" animBg="1"/>
     </p:bldLst>
   </p:timing>
 </p:sld>

</xml_diff>

<commit_message>
Added reference to blog post on commit messages
</commit_message>
<xml_diff>
--- a/LinuxTools/VersionControl/version_control_git.pptx
+++ b/LinuxTools/VersionControl/version_control_git.pptx
@@ -366,7 +366,7 @@
           <a:p>
             <a:fld id="{11D3E7B2-0861-45F0-B59E-BA867D5C805D}" type="datetimeFigureOut">
               <a:rPr lang="nl-BE" smtClean="0"/>
-              <a:t>29/04/2017</a:t>
+              <a:t>9/08/2017</a:t>
             </a:fld>
             <a:endParaRPr lang="nl-BE"/>
           </a:p>
@@ -899,7 +899,7 @@
           <a:p>
             <a:fld id="{208C4982-2142-4DAC-808C-52C1A6ABA40A}" type="datetime1">
               <a:rPr lang="nl-BE" smtClean="0"/>
-              <a:t>29/04/2017</a:t>
+              <a:t>9/08/2017</a:t>
             </a:fld>
             <a:endParaRPr lang="nl-BE"/>
           </a:p>
@@ -1069,7 +1069,7 @@
           <a:p>
             <a:fld id="{596A4774-AA95-4CEA-9215-BE91EC5FD3A2}" type="datetime1">
               <a:rPr lang="nl-BE" smtClean="0"/>
-              <a:t>29/04/2017</a:t>
+              <a:t>9/08/2017</a:t>
             </a:fld>
             <a:endParaRPr lang="nl-BE"/>
           </a:p>
@@ -1249,7 +1249,7 @@
           <a:p>
             <a:fld id="{E3C938DE-9D5A-4A9D-B2A9-9053FBBA636A}" type="datetime1">
               <a:rPr lang="nl-BE" smtClean="0"/>
-              <a:t>29/04/2017</a:t>
+              <a:t>9/08/2017</a:t>
             </a:fld>
             <a:endParaRPr lang="nl-BE"/>
           </a:p>
@@ -1419,7 +1419,7 @@
           <a:p>
             <a:fld id="{70B73439-F632-4142-A813-39A8890A9414}" type="datetime1">
               <a:rPr lang="nl-BE" smtClean="0"/>
-              <a:t>29/04/2017</a:t>
+              <a:t>9/08/2017</a:t>
             </a:fld>
             <a:endParaRPr lang="nl-BE"/>
           </a:p>
@@ -1665,7 +1665,7 @@
           <a:p>
             <a:fld id="{2DA105E3-7574-4472-893A-A0C7A919BAE6}" type="datetime1">
               <a:rPr lang="nl-BE" smtClean="0"/>
-              <a:t>29/04/2017</a:t>
+              <a:t>9/08/2017</a:t>
             </a:fld>
             <a:endParaRPr lang="nl-BE"/>
           </a:p>
@@ -1953,7 +1953,7 @@
           <a:p>
             <a:fld id="{184B200F-AF61-4171-AE34-7A4B12E0FBA3}" type="datetime1">
               <a:rPr lang="nl-BE" smtClean="0"/>
-              <a:t>29/04/2017</a:t>
+              <a:t>9/08/2017</a:t>
             </a:fld>
             <a:endParaRPr lang="nl-BE"/>
           </a:p>
@@ -2375,7 +2375,7 @@
           <a:p>
             <a:fld id="{4DDD3743-DAF8-4465-AEC2-93735E02B3D0}" type="datetime1">
               <a:rPr lang="nl-BE" smtClean="0"/>
-              <a:t>29/04/2017</a:t>
+              <a:t>9/08/2017</a:t>
             </a:fld>
             <a:endParaRPr lang="nl-BE"/>
           </a:p>
@@ -2493,7 +2493,7 @@
           <a:p>
             <a:fld id="{0E48E2E9-C147-459B-ACCB-D6DDC51735D3}" type="datetime1">
               <a:rPr lang="nl-BE" smtClean="0"/>
-              <a:t>29/04/2017</a:t>
+              <a:t>9/08/2017</a:t>
             </a:fld>
             <a:endParaRPr lang="nl-BE"/>
           </a:p>
@@ -2588,7 +2588,7 @@
           <a:p>
             <a:fld id="{C92A24F5-0967-4B11-849A-0009476290B5}" type="datetime1">
               <a:rPr lang="nl-BE" smtClean="0"/>
-              <a:t>29/04/2017</a:t>
+              <a:t>9/08/2017</a:t>
             </a:fld>
             <a:endParaRPr lang="nl-BE"/>
           </a:p>
@@ -2865,7 +2865,7 @@
           <a:p>
             <a:fld id="{CAAB6B0C-E333-4316-A6EC-161EFC5CB4BD}" type="datetime1">
               <a:rPr lang="nl-BE" smtClean="0"/>
-              <a:t>29/04/2017</a:t>
+              <a:t>9/08/2017</a:t>
             </a:fld>
             <a:endParaRPr lang="nl-BE"/>
           </a:p>
@@ -3118,7 +3118,7 @@
           <a:p>
             <a:fld id="{5AC2428B-24E8-4004-8AB4-EA69DDAD1475}" type="datetime1">
               <a:rPr lang="nl-BE" smtClean="0"/>
-              <a:t>29/04/2017</a:t>
+              <a:t>9/08/2017</a:t>
             </a:fld>
             <a:endParaRPr lang="nl-BE"/>
           </a:p>
@@ -3331,7 +3331,7 @@
           <a:p>
             <a:fld id="{063E4CA3-87AF-44C9-B256-93720A95DFC3}" type="datetime1">
               <a:rPr lang="nl-BE" smtClean="0"/>
-              <a:t>29/04/2017</a:t>
+              <a:t>9/08/2017</a:t>
             </a:fld>
             <a:endParaRPr lang="nl-BE"/>
           </a:p>
@@ -7997,7 +7997,9 @@
         </p:nvSpPr>
         <p:spPr/>
         <p:txBody>
-          <a:bodyPr/>
+          <a:bodyPr>
+            <a:normAutofit lnSpcReduction="10000"/>
+          </a:bodyPr>
           <a:lstStyle/>
           <a:p>
             <a:r>
@@ -8055,8 +8057,31 @@
             <a:pPr lvl="1"/>
             <a:r>
               <a:rPr lang="en-US" dirty="0" smtClean="0"/>
-              <a:t>Very useful when developing as a team</a:t>
-            </a:r>
+              <a:t>Very useful when developing as a </a:t>
+            </a:r>
+            <a:r>
+              <a:rPr lang="en-US" dirty="0" smtClean="0"/>
+              <a:t>team</a:t>
+            </a:r>
+          </a:p>
+          <a:p>
+            <a:r>
+              <a:rPr lang="en-US" dirty="0">
+                <a:hlinkClick r:id="rId2"/>
+              </a:rPr>
+              <a:t>https://chris.beams.io/posts/git-commit</a:t>
+            </a:r>
+            <a:r>
+              <a:rPr lang="en-US" dirty="0" smtClean="0">
+                <a:hlinkClick r:id="rId2"/>
+              </a:rPr>
+              <a:t>/</a:t>
+            </a:r>
+            <a:r>
+              <a:rPr lang="en-US" dirty="0" smtClean="0"/>
+              <a:t> </a:t>
+            </a:r>
+            <a:endParaRPr lang="en-US" dirty="0" smtClean="0"/>
           </a:p>
           <a:p>
             <a:pPr lvl="1"/>
@@ -8310,6 +8335,55 @@
                                           <p:spTgt spid="3">
                                             <p:txEl>
                                               <p:pRg st="5" end="5"/>
+                                            </p:txEl>
+                                          </p:spTgt>
+                                        </p:tgtEl>
+                                        <p:attrNameLst>
+                                          <p:attrName>style.visibility</p:attrName>
+                                        </p:attrNameLst>
+                                      </p:cBhvr>
+                                      <p:to>
+                                        <p:strVal val="visible"/>
+                                      </p:to>
+                                    </p:set>
+                                  </p:childTnLst>
+                                </p:cTn>
+                              </p:par>
+                            </p:childTnLst>
+                          </p:cTn>
+                        </p:par>
+                      </p:childTnLst>
+                    </p:cTn>
+                  </p:par>
+                  <p:par>
+                    <p:cTn id="19" fill="hold">
+                      <p:stCondLst>
+                        <p:cond delay="indefinite"/>
+                      </p:stCondLst>
+                      <p:childTnLst>
+                        <p:par>
+                          <p:cTn id="20" fill="hold">
+                            <p:stCondLst>
+                              <p:cond delay="0"/>
+                            </p:stCondLst>
+                            <p:childTnLst>
+                              <p:par>
+                                <p:cTn id="21" presetID="1" presetClass="entr" presetSubtype="0" fill="hold" grpId="0" nodeType="clickEffect">
+                                  <p:stCondLst>
+                                    <p:cond delay="0"/>
+                                  </p:stCondLst>
+                                  <p:childTnLst>
+                                    <p:set>
+                                      <p:cBhvr>
+                                        <p:cTn id="22" dur="1" fill="hold">
+                                          <p:stCondLst>
+                                            <p:cond delay="0"/>
+                                          </p:stCondLst>
+                                        </p:cTn>
+                                        <p:tgtEl>
+                                          <p:spTgt spid="3">
+                                            <p:txEl>
+                                              <p:pRg st="6" end="6"/>
                                             </p:txEl>
                                           </p:spTgt>
                                         </p:tgtEl>
@@ -9043,13 +9117,8 @@
           <a:p>
             <a:r>
               <a:rPr lang="en-US" dirty="0" smtClean="0"/>
-              <a:t>Status information on your current </a:t>
-            </a:r>
-            <a:r>
-              <a:rPr lang="en-US" dirty="0" smtClean="0"/>
-              <a:t>branch</a:t>
-            </a:r>
-            <a:endParaRPr lang="en-US" dirty="0" smtClean="0"/>
+              <a:t>Status information on your current branch</a:t>
+            </a:r>
           </a:p>
         </p:txBody>
       </p:sp>
@@ -9711,11 +9780,7 @@
           <a:p>
             <a:r>
               <a:rPr lang="en-US" dirty="0" smtClean="0"/>
-              <a:t>Who, When </a:t>
-            </a:r>
-            <a:r>
-              <a:rPr lang="en-US" dirty="0" smtClean="0"/>
-              <a:t>&amp; Why, oh why?</a:t>
+              <a:t>Who, When &amp; Why, oh why?</a:t>
             </a:r>
             <a:endParaRPr lang="nl-BE" dirty="0"/>
           </a:p>
@@ -9783,17 +9848,8 @@
             <a:pPr lvl="1"/>
             <a:r>
               <a:rPr lang="en-US" dirty="0" smtClean="0"/>
-              <a:t>Works </a:t>
-            </a:r>
-            <a:r>
-              <a:rPr lang="en-US" dirty="0" smtClean="0"/>
-              <a:t>for directories </a:t>
-            </a:r>
-            <a:r>
-              <a:rPr lang="en-US" dirty="0" smtClean="0"/>
-              <a:t>and entire repo as well</a:t>
-            </a:r>
-            <a:endParaRPr lang="en-US" dirty="0" smtClean="0"/>
+              <a:t>Works for directories and entire repo as well</a:t>
+            </a:r>
           </a:p>
           <a:p>
             <a:endParaRPr lang="nl-BE" dirty="0"/>
@@ -12130,15 +12186,7 @@
                     <a:srgbClr val="0070C0"/>
                   </a:solidFill>
                 </a:rPr>
-                <a:t>revision </a:t>
-              </a:r>
-              <a:r>
-                <a:rPr lang="en-US" sz="2400" dirty="0" smtClean="0">
-                  <a:solidFill>
-                    <a:srgbClr val="0070C0"/>
-                  </a:solidFill>
-                </a:rPr>
-                <a:t>ID</a:t>
+                <a:t>revision ID</a:t>
               </a:r>
               <a:endParaRPr lang="nl-BE" sz="2400" dirty="0">
                 <a:solidFill>
@@ -12181,14 +12229,7 @@
                 <a:latin typeface="Courier New" pitchFamily="49" charset="0"/>
                 <a:cs typeface="Courier New" pitchFamily="49" charset="0"/>
               </a:rPr>
-              <a:t>$ git </a:t>
-            </a:r>
-            <a:r>
-              <a:rPr lang="nl-BE" dirty="0" smtClean="0">
-                <a:latin typeface="Courier New" pitchFamily="49" charset="0"/>
-                <a:cs typeface="Courier New" pitchFamily="49" charset="0"/>
-              </a:rPr>
-              <a:t>log  -1  -p  </a:t>
+              <a:t>$ git log  -1  -p  </a:t>
             </a:r>
             <a:r>
               <a:rPr lang="en-US" dirty="0" smtClean="0">
@@ -36490,11 +36531,7 @@
           <a:p>
             <a:r>
               <a:rPr lang="en-US" dirty="0" smtClean="0"/>
-              <a:t>Searching </a:t>
-            </a:r>
-            <a:r>
-              <a:rPr lang="en-US" dirty="0" smtClean="0"/>
-              <a:t>through history, methodically</a:t>
+              <a:t>Searching through history, methodically</a:t>
             </a:r>
           </a:p>
           <a:p>
@@ -36512,15 +36549,7 @@
           <a:p>
             <a:r>
               <a:rPr lang="en-US" dirty="0" smtClean="0"/>
-              <a:t>Adding </a:t>
-            </a:r>
-            <a:r>
-              <a:rPr lang="en-US" dirty="0" smtClean="0"/>
-              <a:t>description to </a:t>
-            </a:r>
-            <a:r>
-              <a:rPr lang="en-US" dirty="0" smtClean="0"/>
-              <a:t>branch</a:t>
+              <a:t>Adding description to branch</a:t>
             </a:r>
           </a:p>
           <a:p>
@@ -36924,19 +36953,8 @@
                 <a:latin typeface="Courier New" pitchFamily="49" charset="0"/>
                 <a:cs typeface="Courier New" pitchFamily="49" charset="0"/>
               </a:rPr>
-              <a:t>$ git </a:t>
-            </a:r>
-            <a:r>
-              <a:rPr lang="nl-BE" dirty="0" smtClean="0">
-                <a:latin typeface="Courier New" pitchFamily="49" charset="0"/>
-                <a:cs typeface="Courier New" pitchFamily="49" charset="0"/>
-              </a:rPr>
-              <a:t>log  -S 'double sqr('</a:t>
-            </a:r>
-            <a:endParaRPr lang="nl-BE" dirty="0" smtClean="0">
-              <a:latin typeface="Courier New" pitchFamily="49" charset="0"/>
-              <a:cs typeface="Courier New" pitchFamily="49" charset="0"/>
-            </a:endParaRPr>
+              <a:t>$ git log  -S 'double sqr('</a:t>
+            </a:r>
           </a:p>
         </p:txBody>
       </p:sp>
@@ -39833,7 +39851,7 @@
         <p:spPr/>
         <p:txBody>
           <a:bodyPr>
-            <a:normAutofit fontScale="92500"/>
+            <a:normAutofit fontScale="85000" lnSpcReduction="20000"/>
           </a:bodyPr>
           <a:lstStyle/>
           <a:p>
@@ -39900,51 +39918,52 @@
           <a:p>
             <a:r>
               <a:rPr lang="nl-BE" dirty="0" smtClean="0"/>
-              <a:t>An </a:t>
-            </a:r>
-            <a:r>
-              <a:rPr lang="nl-BE" dirty="0" err="1" smtClean="0"/>
-              <a:t>overview</a:t>
+              <a:t>Overview </a:t>
             </a:r>
             <a:r>
               <a:rPr lang="nl-BE" dirty="0" smtClean="0"/>
-              <a:t> of </a:t>
-            </a:r>
-            <a:r>
-              <a:rPr lang="nl-BE" dirty="0" err="1" smtClean="0"/>
-              <a:t>frequently</a:t>
+              <a:t>of frequently used git workflows</a:t>
+            </a:r>
+          </a:p>
+          <a:p>
+            <a:pPr lvl="1"/>
+            <a:r>
+              <a:rPr lang="en-US" dirty="0">
+                <a:hlinkClick r:id="rId5"/>
+              </a:rPr>
+              <a:t>https://</a:t>
+            </a:r>
+            <a:r>
+              <a:rPr lang="en-US" dirty="0" smtClean="0">
+                <a:hlinkClick r:id="rId5"/>
+              </a:rPr>
+              <a:t>www.atlassian.com/git/workflows</a:t>
+            </a:r>
+            <a:endParaRPr lang="en-US" dirty="0" smtClean="0"/>
+          </a:p>
+          <a:p>
+            <a:r>
+              <a:rPr lang="nl-BE" dirty="0" smtClean="0"/>
+              <a:t>Blog post on "good" commit messages</a:t>
+            </a:r>
+          </a:p>
+          <a:p>
+            <a:pPr lvl="1"/>
+            <a:r>
+              <a:rPr lang="nl-BE" dirty="0">
+                <a:hlinkClick r:id="rId6"/>
+              </a:rPr>
+              <a:t>https://chris.beams.io/posts/git-commit</a:t>
+            </a:r>
+            <a:r>
+              <a:rPr lang="nl-BE" dirty="0" smtClean="0">
+                <a:hlinkClick r:id="rId6"/>
+              </a:rPr>
+              <a:t>/</a:t>
             </a:r>
             <a:r>
               <a:rPr lang="nl-BE" dirty="0" smtClean="0"/>
               <a:t> </a:t>
-            </a:r>
-            <a:r>
-              <a:rPr lang="nl-BE" dirty="0" err="1" smtClean="0"/>
-              <a:t>used</a:t>
-            </a:r>
-            <a:r>
-              <a:rPr lang="nl-BE" dirty="0" smtClean="0"/>
-              <a:t> git </a:t>
-            </a:r>
-            <a:r>
-              <a:rPr lang="nl-BE" dirty="0" err="1" smtClean="0"/>
-              <a:t>workflows</a:t>
-            </a:r>
-            <a:endParaRPr lang="nl-BE" dirty="0" smtClean="0"/>
-          </a:p>
-          <a:p>
-            <a:pPr lvl="1"/>
-            <a:r>
-              <a:rPr lang="en-US" dirty="0">
-                <a:hlinkClick r:id="rId5"/>
-              </a:rPr>
-              <a:t>https://</a:t>
-            </a:r>
-            <a:r>
-              <a:rPr lang="en-US" dirty="0" smtClean="0">
-                <a:hlinkClick r:id="rId5"/>
-              </a:rPr>
-              <a:t>www.atlassian.com/git/workflows</a:t>
             </a:r>
             <a:endParaRPr lang="nl-BE" dirty="0" smtClean="0"/>
           </a:p>

</xml_diff>

<commit_message>
Add reference to Pro git book
</commit_message>
<xml_diff>
--- a/LinuxTools/VersionControl/version_control_git.pptx
+++ b/LinuxTools/VersionControl/version_control_git.pptx
@@ -8057,11 +8057,7 @@
             <a:pPr lvl="1"/>
             <a:r>
               <a:rPr lang="en-US" dirty="0" smtClean="0"/>
-              <a:t>Very useful when developing as a </a:t>
-            </a:r>
-            <a:r>
-              <a:rPr lang="en-US" dirty="0" smtClean="0"/>
-              <a:t>team</a:t>
+              <a:t>Very useful when developing as a team</a:t>
             </a:r>
           </a:p>
           <a:p>
@@ -8081,7 +8077,6 @@
               <a:rPr lang="en-US" dirty="0" smtClean="0"/>
               <a:t> </a:t>
             </a:r>
-            <a:endParaRPr lang="en-US" dirty="0" smtClean="0"/>
           </a:p>
           <a:p>
             <a:pPr lvl="1"/>
@@ -39857,16 +39852,26 @@
           <a:p>
             <a:r>
               <a:rPr lang="en-US" dirty="0" smtClean="0"/>
-              <a:t>Online documentation (including movies)</a:t>
-            </a:r>
-          </a:p>
-          <a:p>
-            <a:pPr lvl="1"/>
-            <a:r>
-              <a:rPr lang="nl-BE" dirty="0" smtClean="0">
+              <a:t>Online documentation (including </a:t>
+            </a:r>
+            <a:r>
+              <a:rPr lang="en-US" dirty="0" smtClean="0"/>
+              <a:t>movies)</a:t>
+            </a:r>
+            <a:br>
+              <a:rPr lang="en-US" dirty="0" smtClean="0"/>
+            </a:br>
+            <a:r>
+              <a:rPr lang="nl-BE" sz="2300" dirty="0" smtClean="0">
                 <a:hlinkClick r:id="rId2"/>
               </a:rPr>
-              <a:t>http://git-scm.com/documentation</a:t>
+              <a:t>http</a:t>
+            </a:r>
+            <a:r>
+              <a:rPr lang="nl-BE" sz="2300" dirty="0" smtClean="0">
+                <a:hlinkClick r:id="rId2"/>
+              </a:rPr>
+              <a:t>://git-scm.com/documentation</a:t>
             </a:r>
             <a:endParaRPr lang="nl-BE" dirty="0" smtClean="0"/>
           </a:p>
@@ -39881,16 +39886,62 @@
             </a:r>
             <a:r>
               <a:rPr lang="en-US" dirty="0" smtClean="0"/>
-              <a:t> web site</a:t>
-            </a:r>
-          </a:p>
-          <a:p>
-            <a:pPr lvl="1"/>
-            <a:r>
-              <a:rPr lang="nl-BE" dirty="0" smtClean="0">
+              <a:t> web </a:t>
+            </a:r>
+            <a:r>
+              <a:rPr lang="en-US" dirty="0" smtClean="0"/>
+              <a:t>site</a:t>
+            </a:r>
+            <a:br>
+              <a:rPr lang="en-US" dirty="0" smtClean="0"/>
+            </a:br>
+            <a:r>
+              <a:rPr lang="nl-BE" sz="2400" dirty="0" smtClean="0">
                 <a:hlinkClick r:id="rId3"/>
               </a:rPr>
-              <a:t>http://git-scm.com/</a:t>
+              <a:t>http</a:t>
+            </a:r>
+            <a:r>
+              <a:rPr lang="nl-BE" sz="2400" dirty="0" smtClean="0">
+                <a:hlinkClick r:id="rId3"/>
+              </a:rPr>
+              <a:t>://git-scm.com</a:t>
+            </a:r>
+            <a:r>
+              <a:rPr lang="nl-BE" sz="2400" dirty="0" smtClean="0">
+                <a:hlinkClick r:id="rId3"/>
+              </a:rPr>
+              <a:t>/</a:t>
+            </a:r>
+            <a:endParaRPr lang="nl-BE" dirty="0" smtClean="0"/>
+          </a:p>
+          <a:p>
+            <a:r>
+              <a:rPr lang="nl-BE" dirty="0" smtClean="0"/>
+              <a:t>Pro git </a:t>
+            </a:r>
+            <a:r>
+              <a:rPr lang="nl-BE" dirty="0"/>
+              <a:t>online book</a:t>
+            </a:r>
+            <a:br>
+              <a:rPr lang="nl-BE" dirty="0"/>
+            </a:br>
+            <a:r>
+              <a:rPr lang="nl-BE" sz="2100" dirty="0">
+                <a:hlinkClick r:id="rId4"/>
+              </a:rPr>
+              <a:t>https://git-scm.com/book/en/v2</a:t>
+            </a:r>
+            <a:r>
+              <a:rPr lang="nl-BE" sz="2100" dirty="0" smtClean="0">
+                <a:hlinkClick r:id="rId4"/>
+              </a:rPr>
+              <a:t>/</a:t>
+            </a:r>
+            <a:r>
+              <a:rPr lang="nl-BE" sz="2100" dirty="0" smtClean="0"/>
+              <a:t> </a:t>
             </a:r>
             <a:endParaRPr lang="nl-BE" dirty="0" smtClean="0"/>
           </a:p>
@@ -39903,66 +39954,91 @@
               <a:rPr lang="en-US" dirty="0" err="1" smtClean="0"/>
               <a:t>git</a:t>
             </a:r>
+            <a:r>
+              <a:rPr lang="en-US" dirty="0" smtClean="0"/>
+              <a:t/>
+            </a:r>
+            <a:br>
+              <a:rPr lang="en-US" dirty="0" smtClean="0"/>
+            </a:br>
+            <a:r>
+              <a:rPr lang="nl-BE" sz="2300" dirty="0" smtClean="0">
+                <a:hlinkClick r:id="rId5"/>
+              </a:rPr>
+              <a:t>http</a:t>
+            </a:r>
+            <a:r>
+              <a:rPr lang="nl-BE" sz="2300" dirty="0" smtClean="0">
+                <a:hlinkClick r:id="rId5"/>
+              </a:rPr>
+              <a:t>://blog.teamtreehouse.com/why-you-should-switch-from-subversion-to-git</a:t>
+            </a:r>
+            <a:endParaRPr lang="nl-BE" dirty="0" smtClean="0"/>
+          </a:p>
+          <a:p>
+            <a:r>
+              <a:rPr lang="nl-BE" dirty="0" smtClean="0"/>
+              <a:t>Overview of frequently used git </a:t>
+            </a:r>
+            <a:r>
+              <a:rPr lang="nl-BE" dirty="0" smtClean="0"/>
+              <a:t>workflows</a:t>
+            </a:r>
+            <a:br>
+              <a:rPr lang="nl-BE" dirty="0" smtClean="0"/>
+            </a:br>
+            <a:r>
+              <a:rPr lang="en-US" sz="2100" dirty="0" smtClean="0">
+                <a:hlinkClick r:id="rId6"/>
+              </a:rPr>
+              <a:t>https</a:t>
+            </a:r>
+            <a:r>
+              <a:rPr lang="en-US" sz="2100" dirty="0">
+                <a:hlinkClick r:id="rId6"/>
+              </a:rPr>
+              <a:t>://</a:t>
+            </a:r>
+            <a:r>
+              <a:rPr lang="en-US" sz="2100" dirty="0" smtClean="0">
+                <a:hlinkClick r:id="rId6"/>
+              </a:rPr>
+              <a:t>www.atlassian.com/git/workflows</a:t>
+            </a:r>
             <a:endParaRPr lang="en-US" dirty="0" smtClean="0"/>
           </a:p>
           <a:p>
-            <a:pPr lvl="1"/>
-            <a:r>
-              <a:rPr lang="nl-BE" dirty="0" smtClean="0">
-                <a:hlinkClick r:id="rId4"/>
-              </a:rPr>
-              <a:t>http://blog.teamtreehouse.com/why-you-should-switch-from-subversion-to-git</a:t>
-            </a:r>
-            <a:endParaRPr lang="nl-BE" dirty="0" smtClean="0"/>
-          </a:p>
-          <a:p>
             <a:r>
               <a:rPr lang="nl-BE" dirty="0" smtClean="0"/>
-              <a:t>Overview </a:t>
+              <a:t>Blog post on "good" commit </a:t>
             </a:r>
             <a:r>
               <a:rPr lang="nl-BE" dirty="0" smtClean="0"/>
-              <a:t>of frequently used git workflows</a:t>
-            </a:r>
-          </a:p>
-          <a:p>
-            <a:pPr lvl="1"/>
-            <a:r>
-              <a:rPr lang="en-US" dirty="0">
-                <a:hlinkClick r:id="rId5"/>
-              </a:rPr>
-              <a:t>https://</a:t>
-            </a:r>
-            <a:r>
-              <a:rPr lang="en-US" dirty="0" smtClean="0">
-                <a:hlinkClick r:id="rId5"/>
-              </a:rPr>
-              <a:t>www.atlassian.com/git/workflows</a:t>
-            </a:r>
-            <a:endParaRPr lang="en-US" dirty="0" smtClean="0"/>
-          </a:p>
-          <a:p>
-            <a:r>
+              <a:t>messages</a:t>
+            </a:r>
+            <a:br>
               <a:rPr lang="nl-BE" dirty="0" smtClean="0"/>
-              <a:t>Blog post on "good" commit messages</a:t>
-            </a:r>
-          </a:p>
-          <a:p>
-            <a:pPr lvl="1"/>
-            <a:r>
-              <a:rPr lang="nl-BE" dirty="0">
-                <a:hlinkClick r:id="rId6"/>
-              </a:rPr>
-              <a:t>https://chris.beams.io/posts/git-commit</a:t>
-            </a:r>
-            <a:r>
-              <a:rPr lang="nl-BE" dirty="0" smtClean="0">
-                <a:hlinkClick r:id="rId6"/>
+            </a:br>
+            <a:r>
+              <a:rPr lang="nl-BE" sz="2100" dirty="0" smtClean="0">
+                <a:hlinkClick r:id="rId7"/>
+              </a:rPr>
+              <a:t>https</a:t>
+            </a:r>
+            <a:r>
+              <a:rPr lang="nl-BE" sz="2100" dirty="0">
+                <a:hlinkClick r:id="rId7"/>
+              </a:rPr>
+              <a:t>://chris.beams.io/posts/git-commit</a:t>
+            </a:r>
+            <a:r>
+              <a:rPr lang="nl-BE" sz="2100" dirty="0" smtClean="0">
+                <a:hlinkClick r:id="rId7"/>
               </a:rPr>
               <a:t>/</a:t>
             </a:r>
             <a:r>
-              <a:rPr lang="nl-BE" dirty="0" smtClean="0"/>
+              <a:rPr lang="nl-BE" sz="2100" dirty="0" smtClean="0"/>
               <a:t> </a:t>
             </a:r>
             <a:endParaRPr lang="nl-BE" dirty="0" smtClean="0"/>
@@ -40080,15 +40156,7 @@
             </a:r>
             <a:r>
               <a:rPr lang="en-US" dirty="0" smtClean="0"/>
-              <a:t> comes </a:t>
-            </a:r>
-            <a:r>
-              <a:rPr lang="en-US" smtClean="0"/>
-              <a:t>with most </a:t>
-            </a:r>
-            <a:r>
-              <a:rPr lang="en-US" dirty="0" smtClean="0"/>
-              <a:t>Linux distributions</a:t>
+              <a:t> comes with most Linux distributions</a:t>
             </a:r>
           </a:p>
           <a:p>
@@ -40231,11 +40299,11 @@
             </a:r>
             <a:r>
               <a:rPr lang="en-US" dirty="0"/>
-              <a:t>version control for configuration files </a:t>
+              <a:t>version control for configuration </a:t>
             </a:r>
             <a:r>
               <a:rPr lang="en-US" dirty="0" smtClean="0"/>
-              <a:t>: </a:t>
+              <a:t>files: </a:t>
             </a:r>
             <a:r>
               <a:rPr lang="en-US" dirty="0">
@@ -40940,11 +41008,7 @@
             <a:pPr lvl="1"/>
             <a:r>
               <a:rPr lang="en-US" dirty="0" smtClean="0"/>
-              <a:t>Issue tracking, wiki, hosted </a:t>
-            </a:r>
-            <a:r>
-              <a:rPr lang="en-US" dirty="0" smtClean="0"/>
-              <a:t>on premise</a:t>
+              <a:t>Issue tracking, wiki, hosted on premise</a:t>
             </a:r>
             <a:endParaRPr lang="en-US" sz="1600" dirty="0" smtClean="0"/>
           </a:p>

</xml_diff>

<commit_message>
Add slide on seven rules of commit messages
</commit_message>
<xml_diff>
--- a/LinuxTools/VersionControl/version_control_git.pptx
+++ b/LinuxTools/VersionControl/version_control_git.pptx
@@ -5,7 +5,7 @@
     <p:sldMasterId id="2147483648" r:id="rId1"/>
   </p:sldMasterIdLst>
   <p:notesMasterIdLst>
-    <p:notesMasterId r:id="rId62"/>
+    <p:notesMasterId r:id="rId63"/>
   </p:notesMasterIdLst>
   <p:sldIdLst>
     <p:sldId id="256" r:id="rId2"/>
@@ -25,49 +25,50 @@
     <p:sldId id="277" r:id="rId16"/>
     <p:sldId id="257" r:id="rId17"/>
     <p:sldId id="258" r:id="rId18"/>
-    <p:sldId id="259" r:id="rId19"/>
-    <p:sldId id="261" r:id="rId20"/>
-    <p:sldId id="280" r:id="rId21"/>
-    <p:sldId id="318" r:id="rId22"/>
-    <p:sldId id="317" r:id="rId23"/>
-    <p:sldId id="281" r:id="rId24"/>
-    <p:sldId id="302" r:id="rId25"/>
-    <p:sldId id="306" r:id="rId26"/>
-    <p:sldId id="262" r:id="rId27"/>
-    <p:sldId id="260" r:id="rId28"/>
-    <p:sldId id="278" r:id="rId29"/>
-    <p:sldId id="279" r:id="rId30"/>
-    <p:sldId id="303" r:id="rId31"/>
-    <p:sldId id="308" r:id="rId32"/>
-    <p:sldId id="282" r:id="rId33"/>
-    <p:sldId id="296" r:id="rId34"/>
-    <p:sldId id="283" r:id="rId35"/>
-    <p:sldId id="295" r:id="rId36"/>
-    <p:sldId id="285" r:id="rId37"/>
-    <p:sldId id="284" r:id="rId38"/>
-    <p:sldId id="286" r:id="rId39"/>
-    <p:sldId id="287" r:id="rId40"/>
-    <p:sldId id="288" r:id="rId41"/>
-    <p:sldId id="289" r:id="rId42"/>
-    <p:sldId id="290" r:id="rId43"/>
-    <p:sldId id="291" r:id="rId44"/>
-    <p:sldId id="292" r:id="rId45"/>
-    <p:sldId id="311" r:id="rId46"/>
-    <p:sldId id="294" r:id="rId47"/>
-    <p:sldId id="297" r:id="rId48"/>
-    <p:sldId id="304" r:id="rId49"/>
-    <p:sldId id="305" r:id="rId50"/>
-    <p:sldId id="312" r:id="rId51"/>
-    <p:sldId id="307" r:id="rId52"/>
-    <p:sldId id="309" r:id="rId53"/>
-    <p:sldId id="314" r:id="rId54"/>
-    <p:sldId id="315" r:id="rId55"/>
-    <p:sldId id="316" r:id="rId56"/>
-    <p:sldId id="300" r:id="rId57"/>
-    <p:sldId id="301" r:id="rId58"/>
-    <p:sldId id="299" r:id="rId59"/>
-    <p:sldId id="310" r:id="rId60"/>
-    <p:sldId id="313" r:id="rId61"/>
+    <p:sldId id="319" r:id="rId19"/>
+    <p:sldId id="259" r:id="rId20"/>
+    <p:sldId id="261" r:id="rId21"/>
+    <p:sldId id="280" r:id="rId22"/>
+    <p:sldId id="318" r:id="rId23"/>
+    <p:sldId id="317" r:id="rId24"/>
+    <p:sldId id="281" r:id="rId25"/>
+    <p:sldId id="302" r:id="rId26"/>
+    <p:sldId id="306" r:id="rId27"/>
+    <p:sldId id="262" r:id="rId28"/>
+    <p:sldId id="260" r:id="rId29"/>
+    <p:sldId id="278" r:id="rId30"/>
+    <p:sldId id="279" r:id="rId31"/>
+    <p:sldId id="303" r:id="rId32"/>
+    <p:sldId id="308" r:id="rId33"/>
+    <p:sldId id="282" r:id="rId34"/>
+    <p:sldId id="296" r:id="rId35"/>
+    <p:sldId id="283" r:id="rId36"/>
+    <p:sldId id="295" r:id="rId37"/>
+    <p:sldId id="285" r:id="rId38"/>
+    <p:sldId id="284" r:id="rId39"/>
+    <p:sldId id="286" r:id="rId40"/>
+    <p:sldId id="287" r:id="rId41"/>
+    <p:sldId id="288" r:id="rId42"/>
+    <p:sldId id="289" r:id="rId43"/>
+    <p:sldId id="290" r:id="rId44"/>
+    <p:sldId id="291" r:id="rId45"/>
+    <p:sldId id="292" r:id="rId46"/>
+    <p:sldId id="311" r:id="rId47"/>
+    <p:sldId id="294" r:id="rId48"/>
+    <p:sldId id="297" r:id="rId49"/>
+    <p:sldId id="304" r:id="rId50"/>
+    <p:sldId id="305" r:id="rId51"/>
+    <p:sldId id="312" r:id="rId52"/>
+    <p:sldId id="307" r:id="rId53"/>
+    <p:sldId id="309" r:id="rId54"/>
+    <p:sldId id="314" r:id="rId55"/>
+    <p:sldId id="315" r:id="rId56"/>
+    <p:sldId id="316" r:id="rId57"/>
+    <p:sldId id="300" r:id="rId58"/>
+    <p:sldId id="301" r:id="rId59"/>
+    <p:sldId id="299" r:id="rId60"/>
+    <p:sldId id="310" r:id="rId61"/>
+    <p:sldId id="313" r:id="rId62"/>
   </p:sldIdLst>
   <p:sldSz cx="9144000" cy="6858000" type="screen4x3"/>
   <p:notesSz cx="6858000" cy="9144000"/>
@@ -196,6 +197,7 @@
             <p14:sldId id="277"/>
             <p14:sldId id="257"/>
             <p14:sldId id="258"/>
+            <p14:sldId id="319"/>
             <p14:sldId id="259"/>
             <p14:sldId id="261"/>
             <p14:sldId id="280"/>
@@ -699,7 +701,7 @@
           <a:p>
             <a:fld id="{1A571F42-F258-455F-A3F1-D2E86FDFEB4C}" type="slidenum">
               <a:rPr lang="nl-BE" smtClean="0"/>
-              <a:t>59</a:t>
+              <a:t>60</a:t>
             </a:fld>
             <a:endParaRPr lang="nl-BE"/>
           </a:p>
@@ -7998,7 +8000,7 @@
         <p:spPr/>
         <p:txBody>
           <a:bodyPr>
-            <a:normAutofit lnSpcReduction="10000"/>
+            <a:normAutofit/>
           </a:bodyPr>
           <a:lstStyle/>
           <a:p>
@@ -8057,26 +8059,13 @@
             <a:pPr lvl="1"/>
             <a:r>
               <a:rPr lang="en-US" dirty="0" smtClean="0"/>
-              <a:t>Very useful when developing as a team</a:t>
-            </a:r>
-          </a:p>
-          <a:p>
-            <a:r>
-              <a:rPr lang="en-US" dirty="0">
-                <a:hlinkClick r:id="rId2"/>
-              </a:rPr>
-              <a:t>https://chris.beams.io/posts/git-commit</a:t>
-            </a:r>
-            <a:r>
-              <a:rPr lang="en-US" dirty="0" smtClean="0">
-                <a:hlinkClick r:id="rId2"/>
-              </a:rPr>
-              <a:t>/</a:t>
+              <a:t>Very useful when developing as a </a:t>
             </a:r>
             <a:r>
               <a:rPr lang="en-US" dirty="0" smtClean="0"/>
-              <a:t> </a:t>
-            </a:r>
+              <a:t>team </a:t>
+            </a:r>
+            <a:endParaRPr lang="en-US" dirty="0" smtClean="0"/>
           </a:p>
           <a:p>
             <a:pPr lvl="1"/>
@@ -8350,55 +8339,6 @@
                       </p:childTnLst>
                     </p:cTn>
                   </p:par>
-                  <p:par>
-                    <p:cTn id="19" fill="hold">
-                      <p:stCondLst>
-                        <p:cond delay="indefinite"/>
-                      </p:stCondLst>
-                      <p:childTnLst>
-                        <p:par>
-                          <p:cTn id="20" fill="hold">
-                            <p:stCondLst>
-                              <p:cond delay="0"/>
-                            </p:stCondLst>
-                            <p:childTnLst>
-                              <p:par>
-                                <p:cTn id="21" presetID="1" presetClass="entr" presetSubtype="0" fill="hold" grpId="0" nodeType="clickEffect">
-                                  <p:stCondLst>
-                                    <p:cond delay="0"/>
-                                  </p:stCondLst>
-                                  <p:childTnLst>
-                                    <p:set>
-                                      <p:cBhvr>
-                                        <p:cTn id="22" dur="1" fill="hold">
-                                          <p:stCondLst>
-                                            <p:cond delay="0"/>
-                                          </p:stCondLst>
-                                        </p:cTn>
-                                        <p:tgtEl>
-                                          <p:spTgt spid="3">
-                                            <p:txEl>
-                                              <p:pRg st="6" end="6"/>
-                                            </p:txEl>
-                                          </p:spTgt>
-                                        </p:tgtEl>
-                                        <p:attrNameLst>
-                                          <p:attrName>style.visibility</p:attrName>
-                                        </p:attrNameLst>
-                                      </p:cBhvr>
-                                      <p:to>
-                                        <p:strVal val="visible"/>
-                                      </p:to>
-                                    </p:set>
-                                  </p:childTnLst>
-                                </p:cTn>
-                              </p:par>
-                            </p:childTnLst>
-                          </p:cTn>
-                        </p:par>
-                      </p:childTnLst>
-                    </p:cTn>
-                  </p:par>
                 </p:childTnLst>
               </p:cTn>
               <p:prevCondLst>
@@ -8456,6 +8396,225 @@
         </p:nvSpPr>
         <p:spPr/>
         <p:txBody>
+          <a:bodyPr>
+            <a:normAutofit/>
+          </a:bodyPr>
+          <a:lstStyle/>
+          <a:p>
+            <a:r>
+              <a:rPr lang="en-US" dirty="0" smtClean="0"/>
+              <a:t>Seven rules</a:t>
+            </a:r>
+            <a:endParaRPr lang="en-US" dirty="0"/>
+          </a:p>
+        </p:txBody>
+      </p:sp>
+      <p:sp>
+        <p:nvSpPr>
+          <p:cNvPr id="3" name="Content Placeholder 2"/>
+          <p:cNvSpPr>
+            <a:spLocks noGrp="1"/>
+          </p:cNvSpPr>
+          <p:nvPr>
+            <p:ph idx="1"/>
+          </p:nvPr>
+        </p:nvSpPr>
+        <p:spPr/>
+        <p:txBody>
+          <a:bodyPr>
+            <a:normAutofit/>
+          </a:bodyPr>
+          <a:lstStyle/>
+          <a:p>
+            <a:r>
+              <a:rPr lang="en-US" dirty="0" smtClean="0"/>
+              <a:t>Seven rules for commit messages</a:t>
+            </a:r>
+            <a:br>
+              <a:rPr lang="en-US" dirty="0" smtClean="0"/>
+            </a:br>
+            <a:r>
+              <a:rPr lang="en-US" sz="2000" dirty="0">
+                <a:hlinkClick r:id="rId2"/>
+              </a:rPr>
+              <a:t>https://chris.beams.io/posts/git-commit</a:t>
+            </a:r>
+            <a:r>
+              <a:rPr lang="en-US" sz="2000" dirty="0" smtClean="0">
+                <a:hlinkClick r:id="rId2"/>
+              </a:rPr>
+              <a:t>/</a:t>
+            </a:r>
+            <a:endParaRPr lang="en-US" dirty="0" smtClean="0"/>
+          </a:p>
+          <a:p>
+            <a:pPr marL="971550" lvl="1" indent="-514350">
+              <a:buFont typeface="+mj-lt"/>
+              <a:buAutoNum type="arabicPeriod"/>
+            </a:pPr>
+            <a:r>
+              <a:rPr lang="en-US" dirty="0" smtClean="0"/>
+              <a:t>separate subject from body with blank line</a:t>
+            </a:r>
+          </a:p>
+          <a:p>
+            <a:pPr marL="971550" lvl="1" indent="-514350">
+              <a:buFont typeface="+mj-lt"/>
+              <a:buAutoNum type="arabicPeriod"/>
+            </a:pPr>
+            <a:r>
+              <a:rPr lang="en-US" dirty="0" smtClean="0"/>
+              <a:t>limit subject to 50 characters</a:t>
+            </a:r>
+          </a:p>
+          <a:p>
+            <a:pPr marL="971550" lvl="1" indent="-514350">
+              <a:buFont typeface="+mj-lt"/>
+              <a:buAutoNum type="arabicPeriod"/>
+            </a:pPr>
+            <a:r>
+              <a:rPr lang="en-US" dirty="0" smtClean="0"/>
+              <a:t>capitalize subject line</a:t>
+            </a:r>
+          </a:p>
+          <a:p>
+            <a:pPr marL="971550" lvl="1" indent="-514350">
+              <a:buFont typeface="+mj-lt"/>
+              <a:buAutoNum type="arabicPeriod"/>
+            </a:pPr>
+            <a:r>
+              <a:rPr lang="en-US" dirty="0" smtClean="0"/>
+              <a:t>do not end subject line with period</a:t>
+            </a:r>
+          </a:p>
+          <a:p>
+            <a:pPr marL="971550" lvl="1" indent="-514350">
+              <a:buFont typeface="+mj-lt"/>
+              <a:buAutoNum type="arabicPeriod"/>
+            </a:pPr>
+            <a:r>
+              <a:rPr lang="en-US" dirty="0" smtClean="0"/>
+              <a:t>use  imperative mood in subject line</a:t>
+            </a:r>
+          </a:p>
+          <a:p>
+            <a:pPr marL="971550" lvl="1" indent="-514350">
+              <a:buFont typeface="+mj-lt"/>
+              <a:buAutoNum type="arabicPeriod"/>
+            </a:pPr>
+            <a:r>
+              <a:rPr lang="en-US" dirty="0" smtClean="0"/>
+              <a:t>wrap body at 72 characters</a:t>
+            </a:r>
+          </a:p>
+          <a:p>
+            <a:pPr marL="971550" lvl="1" indent="-514350">
+              <a:buFont typeface="+mj-lt"/>
+              <a:buAutoNum type="arabicPeriod"/>
+            </a:pPr>
+            <a:r>
+              <a:rPr lang="en-US" dirty="0" smtClean="0"/>
+              <a:t>use body to explain </a:t>
+            </a:r>
+            <a:r>
+              <a:rPr lang="en-US" i="1" dirty="0" smtClean="0"/>
+              <a:t>what</a:t>
+            </a:r>
+            <a:r>
+              <a:rPr lang="en-US" dirty="0" smtClean="0"/>
+              <a:t> &amp; </a:t>
+            </a:r>
+            <a:r>
+              <a:rPr lang="en-US" i="1" dirty="0" smtClean="0"/>
+              <a:t>why</a:t>
+            </a:r>
+            <a:r>
+              <a:rPr lang="en-US" dirty="0" smtClean="0"/>
+              <a:t> rather than </a:t>
+            </a:r>
+            <a:r>
+              <a:rPr lang="en-US" i="1" dirty="0" smtClean="0"/>
+              <a:t>how</a:t>
+            </a:r>
+          </a:p>
+          <a:p>
+            <a:pPr lvl="1"/>
+            <a:endParaRPr lang="en-US" dirty="0"/>
+          </a:p>
+        </p:txBody>
+      </p:sp>
+      <p:sp>
+        <p:nvSpPr>
+          <p:cNvPr id="4" name="Slide Number Placeholder 3"/>
+          <p:cNvSpPr>
+            <a:spLocks noGrp="1"/>
+          </p:cNvSpPr>
+          <p:nvPr>
+            <p:ph type="sldNum" sz="quarter" idx="12"/>
+          </p:nvPr>
+        </p:nvSpPr>
+        <p:spPr/>
+        <p:txBody>
+          <a:bodyPr/>
+          <a:lstStyle/>
+          <a:p>
+            <a:fld id="{BB52A05A-A776-4391-ACD7-D6BC34D3145C}" type="slidenum">
+              <a:rPr lang="nl-BE" smtClean="0"/>
+              <a:t>18</a:t>
+            </a:fld>
+            <a:endParaRPr lang="nl-BE"/>
+          </a:p>
+        </p:txBody>
+      </p:sp>
+    </p:spTree>
+    <p:extLst>
+      <p:ext uri="{BB962C8B-B14F-4D97-AF65-F5344CB8AC3E}">
+        <p14:creationId xmlns:p14="http://schemas.microsoft.com/office/powerpoint/2010/main" val="492693782"/>
+      </p:ext>
+    </p:extLst>
+  </p:cSld>
+  <p:clrMapOvr>
+    <a:masterClrMapping/>
+  </p:clrMapOvr>
+  <p:timing>
+    <p:tnLst>
+      <p:par>
+        <p:cTn id="1" dur="indefinite" restart="never" nodeType="tmRoot"/>
+      </p:par>
+    </p:tnLst>
+  </p:timing>
+</p:sld>
+</file>
+
+<file path=ppt/slides/slide19.xml><?xml version="1.0" encoding="utf-8"?>
+<p:sld xmlns:a="http://schemas.openxmlformats.org/drawingml/2006/main" xmlns:r="http://schemas.openxmlformats.org/officeDocument/2006/relationships" xmlns:p="http://schemas.openxmlformats.org/presentationml/2006/main">
+  <p:cSld>
+    <p:spTree>
+      <p:nvGrpSpPr>
+        <p:cNvPr id="1" name=""/>
+        <p:cNvGrpSpPr/>
+        <p:nvPr/>
+      </p:nvGrpSpPr>
+      <p:grpSpPr>
+        <a:xfrm>
+          <a:off x="0" y="0"/>
+          <a:ext cx="0" cy="0"/>
+          <a:chOff x="0" y="0"/>
+          <a:chExt cx="0" cy="0"/>
+        </a:xfrm>
+      </p:grpSpPr>
+      <p:sp>
+        <p:nvSpPr>
+          <p:cNvPr id="2" name="Title 1"/>
+          <p:cNvSpPr>
+            <a:spLocks noGrp="1"/>
+          </p:cNvSpPr>
+          <p:nvPr>
+            <p:ph type="title"/>
+          </p:nvPr>
+        </p:nvSpPr>
+        <p:spPr/>
+        <p:txBody>
           <a:bodyPr/>
           <a:lstStyle/>
           <a:p>
@@ -8749,7 +8908,7 @@
           <a:p>
             <a:fld id="{BB52A05A-A776-4391-ACD7-D6BC34D3145C}" type="slidenum">
               <a:rPr lang="nl-BE" smtClean="0"/>
-              <a:t>18</a:t>
+              <a:t>19</a:t>
             </a:fld>
             <a:endParaRPr lang="nl-BE"/>
           </a:p>
@@ -9053,7 +9212,7 @@
 </p:sld>
 </file>
 
-<file path=ppt/slides/slide19.xml><?xml version="1.0" encoding="utf-8"?>
+<file path=ppt/slides/slide2.xml><?xml version="1.0" encoding="utf-8"?>
 <p:sld xmlns:a="http://schemas.openxmlformats.org/drawingml/2006/main" xmlns:r="http://schemas.openxmlformats.org/officeDocument/2006/relationships" xmlns:p="http://schemas.openxmlformats.org/presentationml/2006/main">
   <p:cSld>
     <p:spTree>
@@ -9087,6 +9246,141 @@
           <a:p>
             <a:r>
               <a:rPr lang="en-US" dirty="0" smtClean="0"/>
+              <a:t>Overview</a:t>
+            </a:r>
+            <a:endParaRPr lang="nl-BE" dirty="0"/>
+          </a:p>
+        </p:txBody>
+      </p:sp>
+      <p:sp>
+        <p:nvSpPr>
+          <p:cNvPr id="3" name="Content Placeholder 2"/>
+          <p:cNvSpPr>
+            <a:spLocks noGrp="1"/>
+          </p:cNvSpPr>
+          <p:nvPr>
+            <p:ph idx="1"/>
+          </p:nvPr>
+        </p:nvSpPr>
+        <p:spPr/>
+        <p:txBody>
+          <a:bodyPr/>
+          <a:lstStyle/>
+          <a:p>
+            <a:r>
+              <a:rPr lang="en-US" dirty="0" smtClean="0"/>
+              <a:t>Motivation</a:t>
+            </a:r>
+          </a:p>
+          <a:p>
+            <a:r>
+              <a:rPr lang="en-US" dirty="0" smtClean="0"/>
+              <a:t>Single user scenario</a:t>
+            </a:r>
+          </a:p>
+          <a:p>
+            <a:r>
+              <a:rPr lang="en-US" dirty="0" smtClean="0"/>
+              <a:t>Multiple user scenario</a:t>
+            </a:r>
+          </a:p>
+          <a:p>
+            <a:r>
+              <a:rPr lang="en-US" dirty="0" smtClean="0"/>
+              <a:t>Demo/hands-on session</a:t>
+            </a:r>
+          </a:p>
+          <a:p>
+            <a:r>
+              <a:rPr lang="en-US" dirty="0" smtClean="0"/>
+              <a:t>Getting more information</a:t>
+            </a:r>
+          </a:p>
+          <a:p>
+            <a:r>
+              <a:rPr lang="en-US" dirty="0" smtClean="0"/>
+              <a:t>Conclusions</a:t>
+            </a:r>
+          </a:p>
+        </p:txBody>
+      </p:sp>
+      <p:sp>
+        <p:nvSpPr>
+          <p:cNvPr id="4" name="Slide Number Placeholder 3"/>
+          <p:cNvSpPr>
+            <a:spLocks noGrp="1"/>
+          </p:cNvSpPr>
+          <p:nvPr>
+            <p:ph type="sldNum" sz="quarter" idx="12"/>
+          </p:nvPr>
+        </p:nvSpPr>
+        <p:spPr/>
+        <p:txBody>
+          <a:bodyPr/>
+          <a:lstStyle/>
+          <a:p>
+            <a:fld id="{BB52A05A-A776-4391-ACD7-D6BC34D3145C}" type="slidenum">
+              <a:rPr lang="nl-BE" smtClean="0"/>
+              <a:t>2</a:t>
+            </a:fld>
+            <a:endParaRPr lang="nl-BE"/>
+          </a:p>
+        </p:txBody>
+      </p:sp>
+    </p:spTree>
+    <p:extLst>
+      <p:ext uri="{BB962C8B-B14F-4D97-AF65-F5344CB8AC3E}">
+        <p14:creationId xmlns:p14="http://schemas.microsoft.com/office/powerpoint/2010/main" val="2007369851"/>
+      </p:ext>
+    </p:extLst>
+  </p:cSld>
+  <p:clrMapOvr>
+    <a:masterClrMapping/>
+  </p:clrMapOvr>
+  <p:timing>
+    <p:tnLst>
+      <p:par>
+        <p:cTn id="1" dur="indefinite" restart="never" nodeType="tmRoot"/>
+      </p:par>
+    </p:tnLst>
+  </p:timing>
+</p:sld>
+</file>
+
+<file path=ppt/slides/slide20.xml><?xml version="1.0" encoding="utf-8"?>
+<p:sld xmlns:a="http://schemas.openxmlformats.org/drawingml/2006/main" xmlns:r="http://schemas.openxmlformats.org/officeDocument/2006/relationships" xmlns:p="http://schemas.openxmlformats.org/presentationml/2006/main">
+  <p:cSld>
+    <p:spTree>
+      <p:nvGrpSpPr>
+        <p:cNvPr id="1" name=""/>
+        <p:cNvGrpSpPr/>
+        <p:nvPr/>
+      </p:nvGrpSpPr>
+      <p:grpSpPr>
+        <a:xfrm>
+          <a:off x="0" y="0"/>
+          <a:ext cx="0" cy="0"/>
+          <a:chOff x="0" y="0"/>
+          <a:chExt cx="0" cy="0"/>
+        </a:xfrm>
+      </p:grpSpPr>
+      <p:sp>
+        <p:nvSpPr>
+          <p:cNvPr id="2" name="Title 1"/>
+          <p:cNvSpPr>
+            <a:spLocks noGrp="1"/>
+          </p:cNvSpPr>
+          <p:nvPr>
+            <p:ph type="title"/>
+          </p:nvPr>
+        </p:nvSpPr>
+        <p:spPr/>
+        <p:txBody>
+          <a:bodyPr/>
+          <a:lstStyle/>
+          <a:p>
+            <a:r>
+              <a:rPr lang="en-US" dirty="0" smtClean="0"/>
               <a:t>What is the status?</a:t>
             </a:r>
             <a:endParaRPr lang="nl-BE" dirty="0"/>
@@ -9381,7 +9675,7 @@
           <a:p>
             <a:fld id="{BB52A05A-A776-4391-ACD7-D6BC34D3145C}" type="slidenum">
               <a:rPr lang="nl-BE" smtClean="0"/>
-              <a:t>19</a:t>
+              <a:t>20</a:t>
             </a:fld>
             <a:endParaRPr lang="nl-BE"/>
           </a:p>
@@ -9606,7 +9900,7 @@
 </p:sld>
 </file>
 
-<file path=ppt/slides/slide2.xml><?xml version="1.0" encoding="utf-8"?>
+<file path=ppt/slides/slide21.xml><?xml version="1.0" encoding="utf-8"?>
 <p:sld xmlns:a="http://schemas.openxmlformats.org/drawingml/2006/main" xmlns:r="http://schemas.openxmlformats.org/officeDocument/2006/relationships" xmlns:p="http://schemas.openxmlformats.org/presentationml/2006/main">
   <p:cSld>
     <p:spTree>
@@ -9640,141 +9934,6 @@
           <a:p>
             <a:r>
               <a:rPr lang="en-US" dirty="0" smtClean="0"/>
-              <a:t>Overview</a:t>
-            </a:r>
-            <a:endParaRPr lang="nl-BE" dirty="0"/>
-          </a:p>
-        </p:txBody>
-      </p:sp>
-      <p:sp>
-        <p:nvSpPr>
-          <p:cNvPr id="3" name="Content Placeholder 2"/>
-          <p:cNvSpPr>
-            <a:spLocks noGrp="1"/>
-          </p:cNvSpPr>
-          <p:nvPr>
-            <p:ph idx="1"/>
-          </p:nvPr>
-        </p:nvSpPr>
-        <p:spPr/>
-        <p:txBody>
-          <a:bodyPr/>
-          <a:lstStyle/>
-          <a:p>
-            <a:r>
-              <a:rPr lang="en-US" dirty="0" smtClean="0"/>
-              <a:t>Motivation</a:t>
-            </a:r>
-          </a:p>
-          <a:p>
-            <a:r>
-              <a:rPr lang="en-US" dirty="0" smtClean="0"/>
-              <a:t>Single user scenario</a:t>
-            </a:r>
-          </a:p>
-          <a:p>
-            <a:r>
-              <a:rPr lang="en-US" dirty="0" smtClean="0"/>
-              <a:t>Multiple user scenario</a:t>
-            </a:r>
-          </a:p>
-          <a:p>
-            <a:r>
-              <a:rPr lang="en-US" dirty="0" smtClean="0"/>
-              <a:t>Demo/hands-on session</a:t>
-            </a:r>
-          </a:p>
-          <a:p>
-            <a:r>
-              <a:rPr lang="en-US" dirty="0" smtClean="0"/>
-              <a:t>Getting more information</a:t>
-            </a:r>
-          </a:p>
-          <a:p>
-            <a:r>
-              <a:rPr lang="en-US" dirty="0" smtClean="0"/>
-              <a:t>Conclusions</a:t>
-            </a:r>
-          </a:p>
-        </p:txBody>
-      </p:sp>
-      <p:sp>
-        <p:nvSpPr>
-          <p:cNvPr id="4" name="Slide Number Placeholder 3"/>
-          <p:cNvSpPr>
-            <a:spLocks noGrp="1"/>
-          </p:cNvSpPr>
-          <p:nvPr>
-            <p:ph type="sldNum" sz="quarter" idx="12"/>
-          </p:nvPr>
-        </p:nvSpPr>
-        <p:spPr/>
-        <p:txBody>
-          <a:bodyPr/>
-          <a:lstStyle/>
-          <a:p>
-            <a:fld id="{BB52A05A-A776-4391-ACD7-D6BC34D3145C}" type="slidenum">
-              <a:rPr lang="nl-BE" smtClean="0"/>
-              <a:t>2</a:t>
-            </a:fld>
-            <a:endParaRPr lang="nl-BE"/>
-          </a:p>
-        </p:txBody>
-      </p:sp>
-    </p:spTree>
-    <p:extLst>
-      <p:ext uri="{BB962C8B-B14F-4D97-AF65-F5344CB8AC3E}">
-        <p14:creationId xmlns:p14="http://schemas.microsoft.com/office/powerpoint/2010/main" val="2007369851"/>
-      </p:ext>
-    </p:extLst>
-  </p:cSld>
-  <p:clrMapOvr>
-    <a:masterClrMapping/>
-  </p:clrMapOvr>
-  <p:timing>
-    <p:tnLst>
-      <p:par>
-        <p:cTn id="1" dur="indefinite" restart="never" nodeType="tmRoot"/>
-      </p:par>
-    </p:tnLst>
-  </p:timing>
-</p:sld>
-</file>
-
-<file path=ppt/slides/slide20.xml><?xml version="1.0" encoding="utf-8"?>
-<p:sld xmlns:a="http://schemas.openxmlformats.org/drawingml/2006/main" xmlns:r="http://schemas.openxmlformats.org/officeDocument/2006/relationships" xmlns:p="http://schemas.openxmlformats.org/presentationml/2006/main">
-  <p:cSld>
-    <p:spTree>
-      <p:nvGrpSpPr>
-        <p:cNvPr id="1" name=""/>
-        <p:cNvGrpSpPr/>
-        <p:nvPr/>
-      </p:nvGrpSpPr>
-      <p:grpSpPr>
-        <a:xfrm>
-          <a:off x="0" y="0"/>
-          <a:ext cx="0" cy="0"/>
-          <a:chOff x="0" y="0"/>
-          <a:chExt cx="0" cy="0"/>
-        </a:xfrm>
-      </p:grpSpPr>
-      <p:sp>
-        <p:nvSpPr>
-          <p:cNvPr id="2" name="Title 1"/>
-          <p:cNvSpPr>
-            <a:spLocks noGrp="1"/>
-          </p:cNvSpPr>
-          <p:nvPr>
-            <p:ph type="title"/>
-          </p:nvPr>
-        </p:nvSpPr>
-        <p:spPr/>
-        <p:txBody>
-          <a:bodyPr/>
-          <a:lstStyle/>
-          <a:p>
-            <a:r>
-              <a:rPr lang="en-US" dirty="0" smtClean="0"/>
               <a:t>Who, When &amp; Why, oh why?</a:t>
             </a:r>
             <a:endParaRPr lang="nl-BE" dirty="0"/>
@@ -9868,7 +10027,7 @@
           <a:p>
             <a:fld id="{BB52A05A-A776-4391-ACD7-D6BC34D3145C}" type="slidenum">
               <a:rPr lang="nl-BE" smtClean="0"/>
-              <a:t>20</a:t>
+              <a:t>21</a:t>
             </a:fld>
             <a:endParaRPr lang="nl-BE"/>
           </a:p>
@@ -10977,7 +11136,7 @@
 </p:sld>
 </file>
 
-<file path=ppt/slides/slide21.xml><?xml version="1.0" encoding="utf-8"?>
+<file path=ppt/slides/slide22.xml><?xml version="1.0" encoding="utf-8"?>
 <p:sld xmlns:a="http://schemas.openxmlformats.org/drawingml/2006/main" xmlns:r="http://schemas.openxmlformats.org/officeDocument/2006/relationships" xmlns:p="http://schemas.openxmlformats.org/presentationml/2006/main">
   <p:cSld>
     <p:spTree>
@@ -11130,7 +11289,7 @@
           <a:p>
             <a:fld id="{BB52A05A-A776-4391-ACD7-D6BC34D3145C}" type="slidenum">
               <a:rPr lang="nl-BE" smtClean="0"/>
-              <a:t>21</a:t>
+              <a:t>22</a:t>
             </a:fld>
             <a:endParaRPr lang="nl-BE"/>
           </a:p>
@@ -11769,7 +11928,7 @@
 </p:sld>
 </file>
 
-<file path=ppt/slides/slide22.xml><?xml version="1.0" encoding="utf-8"?>
+<file path=ppt/slides/slide23.xml><?xml version="1.0" encoding="utf-8"?>
 <p:sld xmlns:a="http://schemas.openxmlformats.org/drawingml/2006/main" xmlns:r="http://schemas.openxmlformats.org/officeDocument/2006/relationships" xmlns:p="http://schemas.openxmlformats.org/presentationml/2006/main">
   <p:cSld>
     <p:spTree>
@@ -11923,7 +12082,7 @@
           <a:p>
             <a:fld id="{BB52A05A-A776-4391-ACD7-D6BC34D3145C}" type="slidenum">
               <a:rPr lang="nl-BE" smtClean="0"/>
-              <a:t>22</a:t>
+              <a:t>23</a:t>
             </a:fld>
             <a:endParaRPr lang="nl-BE"/>
           </a:p>
@@ -12570,7 +12729,7 @@
 </p:sld>
 </file>
 
-<file path=ppt/slides/slide23.xml><?xml version="1.0" encoding="utf-8"?>
+<file path=ppt/slides/slide24.xml><?xml version="1.0" encoding="utf-8"?>
 <p:sld xmlns:a="http://schemas.openxmlformats.org/drawingml/2006/main" xmlns:r="http://schemas.openxmlformats.org/officeDocument/2006/relationships" xmlns:p="http://schemas.openxmlformats.org/presentationml/2006/main">
   <p:cSld>
     <p:spTree>
@@ -13123,7 +13282,7 @@
           <a:p>
             <a:fld id="{BB52A05A-A776-4391-ACD7-D6BC34D3145C}" type="slidenum">
               <a:rPr lang="nl-BE" smtClean="0"/>
-              <a:t>23</a:t>
+              <a:t>24</a:t>
             </a:fld>
             <a:endParaRPr lang="nl-BE"/>
           </a:p>
@@ -13266,7 +13425,7 @@
 </p:sld>
 </file>
 
-<file path=ppt/slides/slide24.xml><?xml version="1.0" encoding="utf-8"?>
+<file path=ppt/slides/slide25.xml><?xml version="1.0" encoding="utf-8"?>
 <p:sld xmlns:a="http://schemas.openxmlformats.org/drawingml/2006/main" xmlns:r="http://schemas.openxmlformats.org/officeDocument/2006/relationships" xmlns:p="http://schemas.openxmlformats.org/presentationml/2006/main">
   <p:cSld>
     <p:spTree>
@@ -13396,7 +13555,7 @@
           <a:p>
             <a:fld id="{BB52A05A-A776-4391-ACD7-D6BC34D3145C}" type="slidenum">
               <a:rPr lang="nl-BE" smtClean="0"/>
-              <a:t>24</a:t>
+              <a:t>25</a:t>
             </a:fld>
             <a:endParaRPr lang="nl-BE"/>
           </a:p>
@@ -13677,7 +13836,7 @@
 </p:sld>
 </file>
 
-<file path=ppt/slides/slide25.xml><?xml version="1.0" encoding="utf-8"?>
+<file path=ppt/slides/slide26.xml><?xml version="1.0" encoding="utf-8"?>
 <p:sld xmlns:a="http://schemas.openxmlformats.org/drawingml/2006/main" xmlns:r="http://schemas.openxmlformats.org/officeDocument/2006/relationships" xmlns:p="http://schemas.openxmlformats.org/presentationml/2006/main">
   <p:cSld>
     <p:spTree>
@@ -15138,7 +15297,7 @@
           <a:p>
             <a:fld id="{BB52A05A-A776-4391-ACD7-D6BC34D3145C}" type="slidenum">
               <a:rPr lang="nl-BE" smtClean="0"/>
-              <a:t>25</a:t>
+              <a:t>26</a:t>
             </a:fld>
             <a:endParaRPr lang="nl-BE"/>
           </a:p>
@@ -15529,7 +15688,7 @@
 </p:sld>
 </file>
 
-<file path=ppt/slides/slide26.xml><?xml version="1.0" encoding="utf-8"?>
+<file path=ppt/slides/slide27.xml><?xml version="1.0" encoding="utf-8"?>
 <p:sld xmlns:a="http://schemas.openxmlformats.org/drawingml/2006/main" xmlns:r="http://schemas.openxmlformats.org/officeDocument/2006/relationships" xmlns:p="http://schemas.openxmlformats.org/presentationml/2006/main">
   <p:cSld>
     <p:spTree>
@@ -15687,7 +15846,7 @@
           <a:p>
             <a:fld id="{BB52A05A-A776-4391-ACD7-D6BC34D3145C}" type="slidenum">
               <a:rPr lang="nl-BE" smtClean="0"/>
-              <a:t>26</a:t>
+              <a:t>27</a:t>
             </a:fld>
             <a:endParaRPr lang="nl-BE"/>
           </a:p>
@@ -16064,7 +16223,7 @@
 </p:sld>
 </file>
 
-<file path=ppt/slides/slide27.xml><?xml version="1.0" encoding="utf-8"?>
+<file path=ppt/slides/slide28.xml><?xml version="1.0" encoding="utf-8"?>
 <p:sld xmlns:a="http://schemas.openxmlformats.org/drawingml/2006/main" xmlns:r="http://schemas.openxmlformats.org/officeDocument/2006/relationships" xmlns:p="http://schemas.openxmlformats.org/presentationml/2006/main">
   <p:cSld>
     <p:spTree>
@@ -16400,7 +16559,7 @@
           <a:p>
             <a:fld id="{BB52A05A-A776-4391-ACD7-D6BC34D3145C}" type="slidenum">
               <a:rPr lang="nl-BE" smtClean="0"/>
-              <a:t>27</a:t>
+              <a:t>28</a:t>
             </a:fld>
             <a:endParaRPr lang="nl-BE"/>
           </a:p>
@@ -16828,7 +16987,7 @@
 </p:sld>
 </file>
 
-<file path=ppt/slides/slide28.xml><?xml version="1.0" encoding="utf-8"?>
+<file path=ppt/slides/slide29.xml><?xml version="1.0" encoding="utf-8"?>
 <p:sld xmlns:a="http://schemas.openxmlformats.org/drawingml/2006/main" xmlns:r="http://schemas.openxmlformats.org/officeDocument/2006/relationships" xmlns:p="http://schemas.openxmlformats.org/presentationml/2006/main">
   <p:cSld>
     <p:spTree>
@@ -17172,7 +17331,7 @@
           <a:p>
             <a:fld id="{BB52A05A-A776-4391-ACD7-D6BC34D3145C}" type="slidenum">
               <a:rPr lang="nl-BE" smtClean="0"/>
-              <a:t>28</a:t>
+              <a:t>29</a:t>
             </a:fld>
             <a:endParaRPr lang="nl-BE"/>
           </a:p>
@@ -17536,7 +17695,7 @@
 </p:sld>
 </file>
 
-<file path=ppt/slides/slide29.xml><?xml version="1.0" encoding="utf-8"?>
+<file path=ppt/slides/slide3.xml><?xml version="1.0" encoding="utf-8"?>
 <p:sld xmlns:a="http://schemas.openxmlformats.org/drawingml/2006/main" xmlns:r="http://schemas.openxmlformats.org/officeDocument/2006/relationships" xmlns:p="http://schemas.openxmlformats.org/presentationml/2006/main">
   <p:cSld>
     <p:spTree>
@@ -17569,6 +17728,108 @@
           <a:lstStyle/>
           <a:p>
             <a:r>
+              <a:rPr lang="en-US" dirty="0" smtClean="0"/>
+              <a:t>Motivation</a:t>
+            </a:r>
+            <a:endParaRPr lang="nl-BE" dirty="0"/>
+          </a:p>
+        </p:txBody>
+      </p:sp>
+      <p:sp>
+        <p:nvSpPr>
+          <p:cNvPr id="3" name="Text Placeholder 2"/>
+          <p:cNvSpPr>
+            <a:spLocks noGrp="1"/>
+          </p:cNvSpPr>
+          <p:nvPr>
+            <p:ph type="body" idx="1"/>
+          </p:nvPr>
+        </p:nvSpPr>
+        <p:spPr/>
+        <p:txBody>
+          <a:bodyPr/>
+          <a:lstStyle/>
+          <a:p>
+            <a:endParaRPr lang="nl-BE"/>
+          </a:p>
+        </p:txBody>
+      </p:sp>
+      <p:sp>
+        <p:nvSpPr>
+          <p:cNvPr id="4" name="Slide Number Placeholder 3"/>
+          <p:cNvSpPr>
+            <a:spLocks noGrp="1"/>
+          </p:cNvSpPr>
+          <p:nvPr>
+            <p:ph type="sldNum" sz="quarter" idx="12"/>
+          </p:nvPr>
+        </p:nvSpPr>
+        <p:spPr/>
+        <p:txBody>
+          <a:bodyPr/>
+          <a:lstStyle/>
+          <a:p>
+            <a:fld id="{BB52A05A-A776-4391-ACD7-D6BC34D3145C}" type="slidenum">
+              <a:rPr lang="nl-BE" smtClean="0"/>
+              <a:t>3</a:t>
+            </a:fld>
+            <a:endParaRPr lang="nl-BE"/>
+          </a:p>
+        </p:txBody>
+      </p:sp>
+    </p:spTree>
+    <p:extLst>
+      <p:ext uri="{BB962C8B-B14F-4D97-AF65-F5344CB8AC3E}">
+        <p14:creationId xmlns:p14="http://schemas.microsoft.com/office/powerpoint/2010/main" val="292413800"/>
+      </p:ext>
+    </p:extLst>
+  </p:cSld>
+  <p:clrMapOvr>
+    <a:masterClrMapping/>
+  </p:clrMapOvr>
+  <p:timing>
+    <p:tnLst>
+      <p:par>
+        <p:cTn id="1" dur="indefinite" restart="never" nodeType="tmRoot"/>
+      </p:par>
+    </p:tnLst>
+  </p:timing>
+</p:sld>
+</file>
+
+<file path=ppt/slides/slide30.xml><?xml version="1.0" encoding="utf-8"?>
+<p:sld xmlns:a="http://schemas.openxmlformats.org/drawingml/2006/main" xmlns:r="http://schemas.openxmlformats.org/officeDocument/2006/relationships" xmlns:p="http://schemas.openxmlformats.org/presentationml/2006/main">
+  <p:cSld>
+    <p:spTree>
+      <p:nvGrpSpPr>
+        <p:cNvPr id="1" name=""/>
+        <p:cNvGrpSpPr/>
+        <p:nvPr/>
+      </p:nvGrpSpPr>
+      <p:grpSpPr>
+        <a:xfrm>
+          <a:off x="0" y="0"/>
+          <a:ext cx="0" cy="0"/>
+          <a:chOff x="0" y="0"/>
+          <a:chExt cx="0" cy="0"/>
+        </a:xfrm>
+      </p:grpSpPr>
+      <p:sp>
+        <p:nvSpPr>
+          <p:cNvPr id="2" name="Title 1"/>
+          <p:cNvSpPr>
+            <a:spLocks noGrp="1"/>
+          </p:cNvSpPr>
+          <p:nvPr>
+            <p:ph type="title"/>
+          </p:nvPr>
+        </p:nvSpPr>
+        <p:spPr/>
+        <p:txBody>
+          <a:bodyPr/>
+          <a:lstStyle/>
+          <a:p>
+            <a:r>
               <a:rPr lang="en-US" dirty="0"/>
               <a:t>C</a:t>
             </a:r>
@@ -17882,7 +18143,7 @@
           <a:p>
             <a:fld id="{BB52A05A-A776-4391-ACD7-D6BC34D3145C}" type="slidenum">
               <a:rPr lang="nl-BE" smtClean="0"/>
-              <a:t>29</a:t>
+              <a:t>30</a:t>
             </a:fld>
             <a:endParaRPr lang="nl-BE"/>
           </a:p>
@@ -18217,109 +18478,7 @@
 </p:sld>
 </file>
 
-<file path=ppt/slides/slide3.xml><?xml version="1.0" encoding="utf-8"?>
-<p:sld xmlns:a="http://schemas.openxmlformats.org/drawingml/2006/main" xmlns:r="http://schemas.openxmlformats.org/officeDocument/2006/relationships" xmlns:p="http://schemas.openxmlformats.org/presentationml/2006/main">
-  <p:cSld>
-    <p:spTree>
-      <p:nvGrpSpPr>
-        <p:cNvPr id="1" name=""/>
-        <p:cNvGrpSpPr/>
-        <p:nvPr/>
-      </p:nvGrpSpPr>
-      <p:grpSpPr>
-        <a:xfrm>
-          <a:off x="0" y="0"/>
-          <a:ext cx="0" cy="0"/>
-          <a:chOff x="0" y="0"/>
-          <a:chExt cx="0" cy="0"/>
-        </a:xfrm>
-      </p:grpSpPr>
-      <p:sp>
-        <p:nvSpPr>
-          <p:cNvPr id="2" name="Title 1"/>
-          <p:cNvSpPr>
-            <a:spLocks noGrp="1"/>
-          </p:cNvSpPr>
-          <p:nvPr>
-            <p:ph type="title"/>
-          </p:nvPr>
-        </p:nvSpPr>
-        <p:spPr/>
-        <p:txBody>
-          <a:bodyPr/>
-          <a:lstStyle/>
-          <a:p>
-            <a:r>
-              <a:rPr lang="en-US" dirty="0" smtClean="0"/>
-              <a:t>Motivation</a:t>
-            </a:r>
-            <a:endParaRPr lang="nl-BE" dirty="0"/>
-          </a:p>
-        </p:txBody>
-      </p:sp>
-      <p:sp>
-        <p:nvSpPr>
-          <p:cNvPr id="3" name="Text Placeholder 2"/>
-          <p:cNvSpPr>
-            <a:spLocks noGrp="1"/>
-          </p:cNvSpPr>
-          <p:nvPr>
-            <p:ph type="body" idx="1"/>
-          </p:nvPr>
-        </p:nvSpPr>
-        <p:spPr/>
-        <p:txBody>
-          <a:bodyPr/>
-          <a:lstStyle/>
-          <a:p>
-            <a:endParaRPr lang="nl-BE"/>
-          </a:p>
-        </p:txBody>
-      </p:sp>
-      <p:sp>
-        <p:nvSpPr>
-          <p:cNvPr id="4" name="Slide Number Placeholder 3"/>
-          <p:cNvSpPr>
-            <a:spLocks noGrp="1"/>
-          </p:cNvSpPr>
-          <p:nvPr>
-            <p:ph type="sldNum" sz="quarter" idx="12"/>
-          </p:nvPr>
-        </p:nvSpPr>
-        <p:spPr/>
-        <p:txBody>
-          <a:bodyPr/>
-          <a:lstStyle/>
-          <a:p>
-            <a:fld id="{BB52A05A-A776-4391-ACD7-D6BC34D3145C}" type="slidenum">
-              <a:rPr lang="nl-BE" smtClean="0"/>
-              <a:t>3</a:t>
-            </a:fld>
-            <a:endParaRPr lang="nl-BE"/>
-          </a:p>
-        </p:txBody>
-      </p:sp>
-    </p:spTree>
-    <p:extLst>
-      <p:ext uri="{BB962C8B-B14F-4D97-AF65-F5344CB8AC3E}">
-        <p14:creationId xmlns:p14="http://schemas.microsoft.com/office/powerpoint/2010/main" val="292413800"/>
-      </p:ext>
-    </p:extLst>
-  </p:cSld>
-  <p:clrMapOvr>
-    <a:masterClrMapping/>
-  </p:clrMapOvr>
-  <p:timing>
-    <p:tnLst>
-      <p:par>
-        <p:cTn id="1" dur="indefinite" restart="never" nodeType="tmRoot"/>
-      </p:par>
-    </p:tnLst>
-  </p:timing>
-</p:sld>
-</file>
-
-<file path=ppt/slides/slide30.xml><?xml version="1.0" encoding="utf-8"?>
+<file path=ppt/slides/slide31.xml><?xml version="1.0" encoding="utf-8"?>
 <p:sld xmlns:a="http://schemas.openxmlformats.org/drawingml/2006/main" xmlns:r="http://schemas.openxmlformats.org/officeDocument/2006/relationships" xmlns:p="http://schemas.openxmlformats.org/presentationml/2006/main">
   <p:cSld>
     <p:spTree>
@@ -18647,7 +18806,7 @@
           <a:p>
             <a:fld id="{BB52A05A-A776-4391-ACD7-D6BC34D3145C}" type="slidenum">
               <a:rPr lang="nl-BE" smtClean="0"/>
-              <a:t>30</a:t>
+              <a:t>31</a:t>
             </a:fld>
             <a:endParaRPr lang="nl-BE"/>
           </a:p>
@@ -19013,7 +19172,7 @@
 </p:sld>
 </file>
 
-<file path=ppt/slides/slide31.xml><?xml version="1.0" encoding="utf-8"?>
+<file path=ppt/slides/slide32.xml><?xml version="1.0" encoding="utf-8"?>
 <p:sld xmlns:a="http://schemas.openxmlformats.org/drawingml/2006/main" xmlns:r="http://schemas.openxmlformats.org/officeDocument/2006/relationships" xmlns:p="http://schemas.openxmlformats.org/presentationml/2006/main">
   <p:cSld>
     <p:spTree>
@@ -19348,7 +19507,7 @@
           <a:p>
             <a:fld id="{BB52A05A-A776-4391-ACD7-D6BC34D3145C}" type="slidenum">
               <a:rPr lang="nl-BE" smtClean="0"/>
-              <a:t>31</a:t>
+              <a:t>32</a:t>
             </a:fld>
             <a:endParaRPr lang="nl-BE"/>
           </a:p>
@@ -19724,7 +19883,7 @@
 </p:sld>
 </file>
 
-<file path=ppt/slides/slide32.xml><?xml version="1.0" encoding="utf-8"?>
+<file path=ppt/slides/slide33.xml><?xml version="1.0" encoding="utf-8"?>
 <p:sld xmlns:a="http://schemas.openxmlformats.org/drawingml/2006/main" xmlns:r="http://schemas.openxmlformats.org/officeDocument/2006/relationships" xmlns:p="http://schemas.openxmlformats.org/presentationml/2006/main">
   <p:cSld>
     <p:spTree>
@@ -19927,7 +20086,7 @@
           <a:p>
             <a:fld id="{BB52A05A-A776-4391-ACD7-D6BC34D3145C}" type="slidenum">
               <a:rPr lang="nl-BE" smtClean="0"/>
-              <a:t>32</a:t>
+              <a:t>33</a:t>
             </a:fld>
             <a:endParaRPr lang="nl-BE"/>
           </a:p>
@@ -20247,7 +20406,7 @@
 </p:sld>
 </file>
 
-<file path=ppt/slides/slide33.xml><?xml version="1.0" encoding="utf-8"?>
+<file path=ppt/slides/slide34.xml><?xml version="1.0" encoding="utf-8"?>
 <p:sld xmlns:a="http://schemas.openxmlformats.org/drawingml/2006/main" xmlns:r="http://schemas.openxmlformats.org/officeDocument/2006/relationships" xmlns:p="http://schemas.openxmlformats.org/presentationml/2006/main">
   <p:cSld>
     <p:spTree>
@@ -20748,7 +20907,7 @@
           <a:p>
             <a:fld id="{BB52A05A-A776-4391-ACD7-D6BC34D3145C}" type="slidenum">
               <a:rPr lang="nl-BE" smtClean="0"/>
-              <a:t>33</a:t>
+              <a:t>34</a:t>
             </a:fld>
             <a:endParaRPr lang="nl-BE"/>
           </a:p>
@@ -20975,112 +21134,6 @@
 </p:sld>
 </file>
 
-<file path=ppt/slides/slide34.xml><?xml version="1.0" encoding="utf-8"?>
-<p:sld xmlns:a="http://schemas.openxmlformats.org/drawingml/2006/main" xmlns:r="http://schemas.openxmlformats.org/officeDocument/2006/relationships" xmlns:p="http://schemas.openxmlformats.org/presentationml/2006/main">
-  <p:cSld>
-    <p:spTree>
-      <p:nvGrpSpPr>
-        <p:cNvPr id="1" name=""/>
-        <p:cNvGrpSpPr/>
-        <p:nvPr/>
-      </p:nvGrpSpPr>
-      <p:grpSpPr>
-        <a:xfrm>
-          <a:off x="0" y="0"/>
-          <a:ext cx="0" cy="0"/>
-          <a:chOff x="0" y="0"/>
-          <a:chExt cx="0" cy="0"/>
-        </a:xfrm>
-      </p:grpSpPr>
-      <p:sp>
-        <p:nvSpPr>
-          <p:cNvPr id="2" name="Title 1"/>
-          <p:cNvSpPr>
-            <a:spLocks noGrp="1"/>
-          </p:cNvSpPr>
-          <p:nvPr>
-            <p:ph type="title"/>
-          </p:nvPr>
-        </p:nvSpPr>
-        <p:spPr/>
-        <p:txBody>
-          <a:bodyPr/>
-          <a:lstStyle/>
-          <a:p>
-            <a:r>
-              <a:rPr lang="en-US" dirty="0"/>
-              <a:t>M</a:t>
-            </a:r>
-            <a:r>
-              <a:rPr lang="en-US" dirty="0" smtClean="0"/>
-              <a:t>ultiple user scenario</a:t>
-            </a:r>
-            <a:endParaRPr lang="nl-BE" dirty="0"/>
-          </a:p>
-        </p:txBody>
-      </p:sp>
-      <p:sp>
-        <p:nvSpPr>
-          <p:cNvPr id="3" name="Text Placeholder 2"/>
-          <p:cNvSpPr>
-            <a:spLocks noGrp="1"/>
-          </p:cNvSpPr>
-          <p:nvPr>
-            <p:ph type="body" idx="1"/>
-          </p:nvPr>
-        </p:nvSpPr>
-        <p:spPr/>
-        <p:txBody>
-          <a:bodyPr/>
-          <a:lstStyle/>
-          <a:p>
-            <a:endParaRPr lang="nl-BE"/>
-          </a:p>
-        </p:txBody>
-      </p:sp>
-      <p:sp>
-        <p:nvSpPr>
-          <p:cNvPr id="4" name="Slide Number Placeholder 3"/>
-          <p:cNvSpPr>
-            <a:spLocks noGrp="1"/>
-          </p:cNvSpPr>
-          <p:nvPr>
-            <p:ph type="sldNum" sz="quarter" idx="12"/>
-          </p:nvPr>
-        </p:nvSpPr>
-        <p:spPr/>
-        <p:txBody>
-          <a:bodyPr/>
-          <a:lstStyle/>
-          <a:p>
-            <a:fld id="{BB52A05A-A776-4391-ACD7-D6BC34D3145C}" type="slidenum">
-              <a:rPr lang="nl-BE" smtClean="0"/>
-              <a:t>34</a:t>
-            </a:fld>
-            <a:endParaRPr lang="nl-BE"/>
-          </a:p>
-        </p:txBody>
-      </p:sp>
-    </p:spTree>
-    <p:extLst>
-      <p:ext uri="{BB962C8B-B14F-4D97-AF65-F5344CB8AC3E}">
-        <p14:creationId xmlns:p14="http://schemas.microsoft.com/office/powerpoint/2010/main" val="2635007595"/>
-      </p:ext>
-    </p:extLst>
-  </p:cSld>
-  <p:clrMapOvr>
-    <a:masterClrMapping/>
-  </p:clrMapOvr>
-  <p:timing>
-    <p:tnLst>
-      <p:par>
-        <p:cTn id="1" dur="indefinite" restart="never" nodeType="tmRoot"/>
-      </p:par>
-    </p:tnLst>
-  </p:timing>
-</p:sld>
-</file>
-
 <file path=ppt/slides/slide35.xml><?xml version="1.0" encoding="utf-8"?>
 <p:sld xmlns:a="http://schemas.openxmlformats.org/drawingml/2006/main" xmlns:r="http://schemas.openxmlformats.org/officeDocument/2006/relationships" xmlns:p="http://schemas.openxmlformats.org/presentationml/2006/main">
   <p:cSld>
@@ -21114,6 +21167,112 @@
           <a:lstStyle/>
           <a:p>
             <a:r>
+              <a:rPr lang="en-US" dirty="0"/>
+              <a:t>M</a:t>
+            </a:r>
+            <a:r>
+              <a:rPr lang="en-US" dirty="0" smtClean="0"/>
+              <a:t>ultiple user scenario</a:t>
+            </a:r>
+            <a:endParaRPr lang="nl-BE" dirty="0"/>
+          </a:p>
+        </p:txBody>
+      </p:sp>
+      <p:sp>
+        <p:nvSpPr>
+          <p:cNvPr id="3" name="Text Placeholder 2"/>
+          <p:cNvSpPr>
+            <a:spLocks noGrp="1"/>
+          </p:cNvSpPr>
+          <p:nvPr>
+            <p:ph type="body" idx="1"/>
+          </p:nvPr>
+        </p:nvSpPr>
+        <p:spPr/>
+        <p:txBody>
+          <a:bodyPr/>
+          <a:lstStyle/>
+          <a:p>
+            <a:endParaRPr lang="nl-BE"/>
+          </a:p>
+        </p:txBody>
+      </p:sp>
+      <p:sp>
+        <p:nvSpPr>
+          <p:cNvPr id="4" name="Slide Number Placeholder 3"/>
+          <p:cNvSpPr>
+            <a:spLocks noGrp="1"/>
+          </p:cNvSpPr>
+          <p:nvPr>
+            <p:ph type="sldNum" sz="quarter" idx="12"/>
+          </p:nvPr>
+        </p:nvSpPr>
+        <p:spPr/>
+        <p:txBody>
+          <a:bodyPr/>
+          <a:lstStyle/>
+          <a:p>
+            <a:fld id="{BB52A05A-A776-4391-ACD7-D6BC34D3145C}" type="slidenum">
+              <a:rPr lang="nl-BE" smtClean="0"/>
+              <a:t>35</a:t>
+            </a:fld>
+            <a:endParaRPr lang="nl-BE"/>
+          </a:p>
+        </p:txBody>
+      </p:sp>
+    </p:spTree>
+    <p:extLst>
+      <p:ext uri="{BB962C8B-B14F-4D97-AF65-F5344CB8AC3E}">
+        <p14:creationId xmlns:p14="http://schemas.microsoft.com/office/powerpoint/2010/main" val="2635007595"/>
+      </p:ext>
+    </p:extLst>
+  </p:cSld>
+  <p:clrMapOvr>
+    <a:masterClrMapping/>
+  </p:clrMapOvr>
+  <p:timing>
+    <p:tnLst>
+      <p:par>
+        <p:cTn id="1" dur="indefinite" restart="never" nodeType="tmRoot"/>
+      </p:par>
+    </p:tnLst>
+  </p:timing>
+</p:sld>
+</file>
+
+<file path=ppt/slides/slide36.xml><?xml version="1.0" encoding="utf-8"?>
+<p:sld xmlns:a="http://schemas.openxmlformats.org/drawingml/2006/main" xmlns:r="http://schemas.openxmlformats.org/officeDocument/2006/relationships" xmlns:p="http://schemas.openxmlformats.org/presentationml/2006/main">
+  <p:cSld>
+    <p:spTree>
+      <p:nvGrpSpPr>
+        <p:cNvPr id="1" name=""/>
+        <p:cNvGrpSpPr/>
+        <p:nvPr/>
+      </p:nvGrpSpPr>
+      <p:grpSpPr>
+        <a:xfrm>
+          <a:off x="0" y="0"/>
+          <a:ext cx="0" cy="0"/>
+          <a:chOff x="0" y="0"/>
+          <a:chExt cx="0" cy="0"/>
+        </a:xfrm>
+      </p:grpSpPr>
+      <p:sp>
+        <p:nvSpPr>
+          <p:cNvPr id="2" name="Title 1"/>
+          <p:cNvSpPr>
+            <a:spLocks noGrp="1"/>
+          </p:cNvSpPr>
+          <p:nvPr>
+            <p:ph type="title"/>
+          </p:nvPr>
+        </p:nvSpPr>
+        <p:spPr/>
+        <p:txBody>
+          <a:bodyPr/>
+          <a:lstStyle/>
+          <a:p>
+            <a:r>
               <a:rPr lang="en-US" dirty="0" smtClean="0"/>
               <a:t>Remote repositories: clones</a:t>
             </a:r>
@@ -21349,7 +21508,7 @@
           <a:p>
             <a:fld id="{BB52A05A-A776-4391-ACD7-D6BC34D3145C}" type="slidenum">
               <a:rPr lang="nl-BE" smtClean="0"/>
-              <a:t>35</a:t>
+              <a:t>36</a:t>
             </a:fld>
             <a:endParaRPr lang="nl-BE"/>
           </a:p>
@@ -21607,7 +21766,7 @@
 </p:sld>
 </file>
 
-<file path=ppt/slides/slide36.xml><?xml version="1.0" encoding="utf-8"?>
+<file path=ppt/slides/slide37.xml><?xml version="1.0" encoding="utf-8"?>
 <p:sld xmlns:a="http://schemas.openxmlformats.org/drawingml/2006/main" xmlns:r="http://schemas.openxmlformats.org/officeDocument/2006/relationships" xmlns:p="http://schemas.openxmlformats.org/presentationml/2006/main">
   <p:cSld>
     <p:spTree>
@@ -22112,7 +22271,7 @@
           <a:p>
             <a:fld id="{BB52A05A-A776-4391-ACD7-D6BC34D3145C}" type="slidenum">
               <a:rPr lang="nl-BE" smtClean="0"/>
-              <a:t>36</a:t>
+              <a:t>37</a:t>
             </a:fld>
             <a:endParaRPr lang="nl-BE"/>
           </a:p>
@@ -22601,7 +22760,7 @@
 </p:sld>
 </file>
 
-<file path=ppt/slides/slide37.xml><?xml version="1.0" encoding="utf-8"?>
+<file path=ppt/slides/slide38.xml><?xml version="1.0" encoding="utf-8"?>
 <p:sld xmlns:a="http://schemas.openxmlformats.org/drawingml/2006/main" xmlns:r="http://schemas.openxmlformats.org/officeDocument/2006/relationships" xmlns:p="http://schemas.openxmlformats.org/presentationml/2006/main">
   <p:cSld>
     <p:spTree>
@@ -24286,7 +24445,7 @@
           <a:p>
             <a:fld id="{BB52A05A-A776-4391-ACD7-D6BC34D3145C}" type="slidenum">
               <a:rPr lang="nl-BE" smtClean="0"/>
-              <a:t>37</a:t>
+              <a:t>38</a:t>
             </a:fld>
             <a:endParaRPr lang="nl-BE"/>
           </a:p>
@@ -24605,7 +24764,7 @@
 </p:sld>
 </file>
 
-<file path=ppt/slides/slide38.xml><?xml version="1.0" encoding="utf-8"?>
+<file path=ppt/slides/slide39.xml><?xml version="1.0" encoding="utf-8"?>
 <p:sld xmlns:a="http://schemas.openxmlformats.org/drawingml/2006/main" xmlns:r="http://schemas.openxmlformats.org/officeDocument/2006/relationships" xmlns:p="http://schemas.openxmlformats.org/presentationml/2006/main">
   <p:cSld>
     <p:spTree>
@@ -24851,7 +25010,7 @@
           <a:p>
             <a:fld id="{BB52A05A-A776-4391-ACD7-D6BC34D3145C}" type="slidenum">
               <a:rPr lang="nl-BE" smtClean="0"/>
-              <a:t>38</a:t>
+              <a:t>39</a:t>
             </a:fld>
             <a:endParaRPr lang="nl-BE"/>
           </a:p>
@@ -25029,7 +25188,131 @@
 </p:sld>
 </file>
 
-<file path=ppt/slides/slide39.xml><?xml version="1.0" encoding="utf-8"?>
+<file path=ppt/slides/slide4.xml><?xml version="1.0" encoding="utf-8"?>
+<p:sld xmlns:a="http://schemas.openxmlformats.org/drawingml/2006/main" xmlns:r="http://schemas.openxmlformats.org/officeDocument/2006/relationships" xmlns:p="http://schemas.openxmlformats.org/presentationml/2006/main">
+  <p:cSld>
+    <p:spTree>
+      <p:nvGrpSpPr>
+        <p:cNvPr id="1" name=""/>
+        <p:cNvGrpSpPr/>
+        <p:nvPr/>
+      </p:nvGrpSpPr>
+      <p:grpSpPr>
+        <a:xfrm>
+          <a:off x="0" y="0"/>
+          <a:ext cx="0" cy="0"/>
+          <a:chOff x="0" y="0"/>
+          <a:chExt cx="0" cy="0"/>
+        </a:xfrm>
+      </p:grpSpPr>
+      <p:sp>
+        <p:nvSpPr>
+          <p:cNvPr id="6" name="Title 5"/>
+          <p:cNvSpPr>
+            <a:spLocks noGrp="1"/>
+          </p:cNvSpPr>
+          <p:nvPr>
+            <p:ph type="title"/>
+          </p:nvPr>
+        </p:nvSpPr>
+        <p:spPr/>
+        <p:txBody>
+          <a:bodyPr/>
+          <a:lstStyle/>
+          <a:p>
+            <a:r>
+              <a:rPr lang="en-US" dirty="0" smtClean="0"/>
+              <a:t>It's a beautiful autumn day…</a:t>
+            </a:r>
+            <a:endParaRPr lang="nl-BE" dirty="0"/>
+          </a:p>
+        </p:txBody>
+      </p:sp>
+      <p:pic>
+        <p:nvPicPr>
+          <p:cNvPr id="1026" name="Picture 2" descr="C:\Users\lucg5005\Desktop\DSCF1116.jpg"/>
+          <p:cNvPicPr>
+            <a:picLocks noChangeAspect="1" noChangeArrowheads="1"/>
+          </p:cNvPicPr>
+          <p:nvPr/>
+        </p:nvPicPr>
+        <p:blipFill>
+          <a:blip r:embed="rId2" cstate="print">
+            <a:extLst>
+              <a:ext uri="{28A0092B-C50C-407E-A947-70E740481C1C}">
+                <a14:useLocalDpi xmlns:a14="http://schemas.microsoft.com/office/drawing/2010/main" val="0"/>
+              </a:ext>
+            </a:extLst>
+          </a:blip>
+          <a:srcRect/>
+          <a:stretch>
+            <a:fillRect/>
+          </a:stretch>
+        </p:blipFill>
+        <p:spPr bwMode="auto">
+          <a:xfrm>
+            <a:off x="1219795" y="1279015"/>
+            <a:ext cx="6736581" cy="5390345"/>
+          </a:xfrm>
+          <a:prstGeom prst="rect">
+            <a:avLst/>
+          </a:prstGeom>
+          <a:noFill/>
+          <a:extLst>
+            <a:ext uri="{909E8E84-426E-40DD-AFC4-6F175D3DCCD1}">
+              <a14:hiddenFill xmlns:a14="http://schemas.microsoft.com/office/drawing/2010/main">
+                <a:solidFill>
+                  <a:srgbClr val="FFFFFF"/>
+                </a:solidFill>
+              </a14:hiddenFill>
+            </a:ext>
+          </a:extLst>
+        </p:spPr>
+      </p:pic>
+      <p:sp>
+        <p:nvSpPr>
+          <p:cNvPr id="2" name="Slide Number Placeholder 1"/>
+          <p:cNvSpPr>
+            <a:spLocks noGrp="1"/>
+          </p:cNvSpPr>
+          <p:nvPr>
+            <p:ph type="sldNum" sz="quarter" idx="12"/>
+          </p:nvPr>
+        </p:nvSpPr>
+        <p:spPr/>
+        <p:txBody>
+          <a:bodyPr/>
+          <a:lstStyle/>
+          <a:p>
+            <a:fld id="{BB52A05A-A776-4391-ACD7-D6BC34D3145C}" type="slidenum">
+              <a:rPr lang="nl-BE" smtClean="0"/>
+              <a:t>4</a:t>
+            </a:fld>
+            <a:endParaRPr lang="nl-BE"/>
+          </a:p>
+        </p:txBody>
+      </p:sp>
+    </p:spTree>
+    <p:extLst>
+      <p:ext uri="{BB962C8B-B14F-4D97-AF65-F5344CB8AC3E}">
+        <p14:creationId xmlns:p14="http://schemas.microsoft.com/office/powerpoint/2010/main" val="801143544"/>
+      </p:ext>
+    </p:extLst>
+  </p:cSld>
+  <p:clrMapOvr>
+    <a:masterClrMapping/>
+  </p:clrMapOvr>
+  <p:timing>
+    <p:tnLst>
+      <p:par>
+        <p:cTn id="1" dur="indefinite" restart="never" nodeType="tmRoot"/>
+      </p:par>
+    </p:tnLst>
+  </p:timing>
+</p:sld>
+</file>
+
+<file path=ppt/slides/slide40.xml><?xml version="1.0" encoding="utf-8"?>
 <p:sld xmlns:a="http://schemas.openxmlformats.org/drawingml/2006/main" xmlns:r="http://schemas.openxmlformats.org/officeDocument/2006/relationships" xmlns:p="http://schemas.openxmlformats.org/presentationml/2006/main">
   <p:cSld>
     <p:spTree>
@@ -25708,7 +25991,7 @@
           <a:p>
             <a:fld id="{BB52A05A-A776-4391-ACD7-D6BC34D3145C}" type="slidenum">
               <a:rPr lang="nl-BE" smtClean="0"/>
-              <a:t>39</a:t>
+              <a:t>40</a:t>
             </a:fld>
             <a:endParaRPr lang="nl-BE"/>
           </a:p>
@@ -26020,131 +26303,7 @@
 </p:sld>
 </file>
 
-<file path=ppt/slides/slide4.xml><?xml version="1.0" encoding="utf-8"?>
-<p:sld xmlns:a="http://schemas.openxmlformats.org/drawingml/2006/main" xmlns:r="http://schemas.openxmlformats.org/officeDocument/2006/relationships" xmlns:p="http://schemas.openxmlformats.org/presentationml/2006/main">
-  <p:cSld>
-    <p:spTree>
-      <p:nvGrpSpPr>
-        <p:cNvPr id="1" name=""/>
-        <p:cNvGrpSpPr/>
-        <p:nvPr/>
-      </p:nvGrpSpPr>
-      <p:grpSpPr>
-        <a:xfrm>
-          <a:off x="0" y="0"/>
-          <a:ext cx="0" cy="0"/>
-          <a:chOff x="0" y="0"/>
-          <a:chExt cx="0" cy="0"/>
-        </a:xfrm>
-      </p:grpSpPr>
-      <p:sp>
-        <p:nvSpPr>
-          <p:cNvPr id="6" name="Title 5"/>
-          <p:cNvSpPr>
-            <a:spLocks noGrp="1"/>
-          </p:cNvSpPr>
-          <p:nvPr>
-            <p:ph type="title"/>
-          </p:nvPr>
-        </p:nvSpPr>
-        <p:spPr/>
-        <p:txBody>
-          <a:bodyPr/>
-          <a:lstStyle/>
-          <a:p>
-            <a:r>
-              <a:rPr lang="en-US" dirty="0" smtClean="0"/>
-              <a:t>It's a beautiful autumn day…</a:t>
-            </a:r>
-            <a:endParaRPr lang="nl-BE" dirty="0"/>
-          </a:p>
-        </p:txBody>
-      </p:sp>
-      <p:pic>
-        <p:nvPicPr>
-          <p:cNvPr id="1026" name="Picture 2" descr="C:\Users\lucg5005\Desktop\DSCF1116.jpg"/>
-          <p:cNvPicPr>
-            <a:picLocks noChangeAspect="1" noChangeArrowheads="1"/>
-          </p:cNvPicPr>
-          <p:nvPr/>
-        </p:nvPicPr>
-        <p:blipFill>
-          <a:blip r:embed="rId2" cstate="print">
-            <a:extLst>
-              <a:ext uri="{28A0092B-C50C-407E-A947-70E740481C1C}">
-                <a14:useLocalDpi xmlns:a14="http://schemas.microsoft.com/office/drawing/2010/main" val="0"/>
-              </a:ext>
-            </a:extLst>
-          </a:blip>
-          <a:srcRect/>
-          <a:stretch>
-            <a:fillRect/>
-          </a:stretch>
-        </p:blipFill>
-        <p:spPr bwMode="auto">
-          <a:xfrm>
-            <a:off x="1219795" y="1279015"/>
-            <a:ext cx="6736581" cy="5390345"/>
-          </a:xfrm>
-          <a:prstGeom prst="rect">
-            <a:avLst/>
-          </a:prstGeom>
-          <a:noFill/>
-          <a:extLst>
-            <a:ext uri="{909E8E84-426E-40DD-AFC4-6F175D3DCCD1}">
-              <a14:hiddenFill xmlns:a14="http://schemas.microsoft.com/office/drawing/2010/main">
-                <a:solidFill>
-                  <a:srgbClr val="FFFFFF"/>
-                </a:solidFill>
-              </a14:hiddenFill>
-            </a:ext>
-          </a:extLst>
-        </p:spPr>
-      </p:pic>
-      <p:sp>
-        <p:nvSpPr>
-          <p:cNvPr id="2" name="Slide Number Placeholder 1"/>
-          <p:cNvSpPr>
-            <a:spLocks noGrp="1"/>
-          </p:cNvSpPr>
-          <p:nvPr>
-            <p:ph type="sldNum" sz="quarter" idx="12"/>
-          </p:nvPr>
-        </p:nvSpPr>
-        <p:spPr/>
-        <p:txBody>
-          <a:bodyPr/>
-          <a:lstStyle/>
-          <a:p>
-            <a:fld id="{BB52A05A-A776-4391-ACD7-D6BC34D3145C}" type="slidenum">
-              <a:rPr lang="nl-BE" smtClean="0"/>
-              <a:t>4</a:t>
-            </a:fld>
-            <a:endParaRPr lang="nl-BE"/>
-          </a:p>
-        </p:txBody>
-      </p:sp>
-    </p:spTree>
-    <p:extLst>
-      <p:ext uri="{BB962C8B-B14F-4D97-AF65-F5344CB8AC3E}">
-        <p14:creationId xmlns:p14="http://schemas.microsoft.com/office/powerpoint/2010/main" val="801143544"/>
-      </p:ext>
-    </p:extLst>
-  </p:cSld>
-  <p:clrMapOvr>
-    <a:masterClrMapping/>
-  </p:clrMapOvr>
-  <p:timing>
-    <p:tnLst>
-      <p:par>
-        <p:cTn id="1" dur="indefinite" restart="never" nodeType="tmRoot"/>
-      </p:par>
-    </p:tnLst>
-  </p:timing>
-</p:sld>
-</file>
-
-<file path=ppt/slides/slide40.xml><?xml version="1.0" encoding="utf-8"?>
+<file path=ppt/slides/slide41.xml><?xml version="1.0" encoding="utf-8"?>
 <p:sld xmlns:a="http://schemas.openxmlformats.org/drawingml/2006/main" xmlns:r="http://schemas.openxmlformats.org/officeDocument/2006/relationships" xmlns:p="http://schemas.openxmlformats.org/presentationml/2006/main">
   <p:cSld>
     <p:spTree>
@@ -26283,7 +26442,7 @@
           <a:p>
             <a:fld id="{BB52A05A-A776-4391-ACD7-D6BC34D3145C}" type="slidenum">
               <a:rPr lang="nl-BE" smtClean="0"/>
-              <a:t>40</a:t>
+              <a:t>41</a:t>
             </a:fld>
             <a:endParaRPr lang="nl-BE"/>
           </a:p>
@@ -26743,7 +26902,7 @@
 </p:sld>
 </file>
 
-<file path=ppt/slides/slide41.xml><?xml version="1.0" encoding="utf-8"?>
+<file path=ppt/slides/slide42.xml><?xml version="1.0" encoding="utf-8"?>
 <p:sld xmlns:a="http://schemas.openxmlformats.org/drawingml/2006/main" xmlns:r="http://schemas.openxmlformats.org/officeDocument/2006/relationships" xmlns:p="http://schemas.openxmlformats.org/presentationml/2006/main">
   <p:cSld>
     <p:spTree>
@@ -28205,7 +28364,7 @@
           <a:p>
             <a:fld id="{BB52A05A-A776-4391-ACD7-D6BC34D3145C}" type="slidenum">
               <a:rPr lang="nl-BE" smtClean="0"/>
-              <a:t>41</a:t>
+              <a:t>42</a:t>
             </a:fld>
             <a:endParaRPr lang="nl-BE"/>
           </a:p>
@@ -28994,7 +29153,7 @@
 </p:sld>
 </file>
 
-<file path=ppt/slides/slide42.xml><?xml version="1.0" encoding="utf-8"?>
+<file path=ppt/slides/slide43.xml><?xml version="1.0" encoding="utf-8"?>
 <p:sld xmlns:a="http://schemas.openxmlformats.org/drawingml/2006/main" xmlns:r="http://schemas.openxmlformats.org/officeDocument/2006/relationships" xmlns:p="http://schemas.openxmlformats.org/presentationml/2006/main">
   <p:cSld>
     <p:spTree>
@@ -29141,7 +29300,7 @@
           <a:p>
             <a:fld id="{BB52A05A-A776-4391-ACD7-D6BC34D3145C}" type="slidenum">
               <a:rPr lang="nl-BE" smtClean="0"/>
-              <a:t>42</a:t>
+              <a:t>43</a:t>
             </a:fld>
             <a:endParaRPr lang="nl-BE"/>
           </a:p>
@@ -29536,7 +29695,7 @@
 </p:sld>
 </file>
 
-<file path=ppt/slides/slide43.xml><?xml version="1.0" encoding="utf-8"?>
+<file path=ppt/slides/slide44.xml><?xml version="1.0" encoding="utf-8"?>
 <p:sld xmlns:a="http://schemas.openxmlformats.org/drawingml/2006/main" xmlns:r="http://schemas.openxmlformats.org/officeDocument/2006/relationships" xmlns:p="http://schemas.openxmlformats.org/presentationml/2006/main">
   <p:cSld>
     <p:spTree>
@@ -29826,7 +29985,7 @@
           <a:p>
             <a:fld id="{BB52A05A-A776-4391-ACD7-D6BC34D3145C}" type="slidenum">
               <a:rPr lang="nl-BE" smtClean="0"/>
-              <a:t>43</a:t>
+              <a:t>44</a:t>
             </a:fld>
             <a:endParaRPr lang="nl-BE"/>
           </a:p>
@@ -30130,7 +30289,7 @@
 </p:sld>
 </file>
 
-<file path=ppt/slides/slide44.xml><?xml version="1.0" encoding="utf-8"?>
+<file path=ppt/slides/slide45.xml><?xml version="1.0" encoding="utf-8"?>
 <p:sld xmlns:a="http://schemas.openxmlformats.org/drawingml/2006/main" xmlns:r="http://schemas.openxmlformats.org/officeDocument/2006/relationships" xmlns:p="http://schemas.openxmlformats.org/presentationml/2006/main">
   <p:cSld>
     <p:spTree>
@@ -30442,7 +30601,7 @@
           <a:p>
             <a:fld id="{BB52A05A-A776-4391-ACD7-D6BC34D3145C}" type="slidenum">
               <a:rPr lang="nl-BE" smtClean="0"/>
-              <a:t>44</a:t>
+              <a:t>45</a:t>
             </a:fld>
             <a:endParaRPr lang="nl-BE"/>
           </a:p>
@@ -30777,7 +30936,7 @@
 </p:sld>
 </file>
 
-<file path=ppt/slides/slide45.xml><?xml version="1.0" encoding="utf-8"?>
+<file path=ppt/slides/slide46.xml><?xml version="1.0" encoding="utf-8"?>
 <p:sld xmlns:a="http://schemas.openxmlformats.org/drawingml/2006/main" xmlns:r="http://schemas.openxmlformats.org/officeDocument/2006/relationships" xmlns:p="http://schemas.openxmlformats.org/presentationml/2006/main">
   <p:cSld>
     <p:spTree>
@@ -30880,7 +31039,7 @@
           <a:p>
             <a:fld id="{BB52A05A-A776-4391-ACD7-D6BC34D3145C}" type="slidenum">
               <a:rPr lang="nl-BE" smtClean="0"/>
-              <a:t>45</a:t>
+              <a:t>46</a:t>
             </a:fld>
             <a:endParaRPr lang="nl-BE"/>
           </a:p>
@@ -31516,7 +31675,7 @@
 </p:sld>
 </file>
 
-<file path=ppt/slides/slide46.xml><?xml version="1.0" encoding="utf-8"?>
+<file path=ppt/slides/slide47.xml><?xml version="1.0" encoding="utf-8"?>
 <p:sld xmlns:a="http://schemas.openxmlformats.org/drawingml/2006/main" xmlns:r="http://schemas.openxmlformats.org/officeDocument/2006/relationships" xmlns:p="http://schemas.openxmlformats.org/presentationml/2006/main">
   <p:cSld>
     <p:spTree>
@@ -32587,7 +32746,7 @@
           <a:p>
             <a:fld id="{BB52A05A-A776-4391-ACD7-D6BC34D3145C}" type="slidenum">
               <a:rPr lang="nl-BE" smtClean="0"/>
-              <a:t>46</a:t>
+              <a:t>47</a:t>
             </a:fld>
             <a:endParaRPr lang="nl-BE"/>
           </a:p>
@@ -33349,7 +33508,7 @@
 </p:sld>
 </file>
 
-<file path=ppt/slides/slide47.xml><?xml version="1.0" encoding="utf-8"?>
+<file path=ppt/slides/slide48.xml><?xml version="1.0" encoding="utf-8"?>
 <p:sld xmlns:a="http://schemas.openxmlformats.org/drawingml/2006/main" xmlns:r="http://schemas.openxmlformats.org/officeDocument/2006/relationships" xmlns:p="http://schemas.openxmlformats.org/presentationml/2006/main">
   <p:cSld>
     <p:spTree>
@@ -33797,7 +33956,7 @@
           <a:p>
             <a:fld id="{BB52A05A-A776-4391-ACD7-D6BC34D3145C}" type="slidenum">
               <a:rPr lang="nl-BE" smtClean="0"/>
-              <a:t>47</a:t>
+              <a:t>48</a:t>
             </a:fld>
             <a:endParaRPr lang="nl-BE"/>
           </a:p>
@@ -34322,7 +34481,7 @@
 </p:sld>
 </file>
 
-<file path=ppt/slides/slide48.xml><?xml version="1.0" encoding="utf-8"?>
+<file path=ppt/slides/slide49.xml><?xml version="1.0" encoding="utf-8"?>
 <p:sld xmlns:a="http://schemas.openxmlformats.org/drawingml/2006/main" xmlns:r="http://schemas.openxmlformats.org/officeDocument/2006/relationships" xmlns:p="http://schemas.openxmlformats.org/presentationml/2006/main">
   <p:cSld>
     <p:spTree>
@@ -34487,7 +34646,7 @@
           <a:p>
             <a:fld id="{BB52A05A-A776-4391-ACD7-D6BC34D3145C}" type="slidenum">
               <a:rPr lang="nl-BE" smtClean="0"/>
-              <a:t>48</a:t>
+              <a:t>49</a:t>
             </a:fld>
             <a:endParaRPr lang="nl-BE"/>
           </a:p>
@@ -34642,470 +34801,6 @@
                                     <p:set>
                                       <p:cBhvr>
                                         <p:cTn id="14" dur="1" fill="hold">
-                                          <p:stCondLst>
-                                            <p:cond delay="0"/>
-                                          </p:stCondLst>
-                                        </p:cTn>
-                                        <p:tgtEl>
-                                          <p:spTgt spid="5"/>
-                                        </p:tgtEl>
-                                        <p:attrNameLst>
-                                          <p:attrName>style.visibility</p:attrName>
-                                        </p:attrNameLst>
-                                      </p:cBhvr>
-                                      <p:to>
-                                        <p:strVal val="visible"/>
-                                      </p:to>
-                                    </p:set>
-                                  </p:childTnLst>
-                                </p:cTn>
-                              </p:par>
-                            </p:childTnLst>
-                          </p:cTn>
-                        </p:par>
-                      </p:childTnLst>
-                    </p:cTn>
-                  </p:par>
-                </p:childTnLst>
-              </p:cTn>
-              <p:prevCondLst>
-                <p:cond evt="onPrev" delay="0">
-                  <p:tgtEl>
-                    <p:sldTgt/>
-                  </p:tgtEl>
-                </p:cond>
-              </p:prevCondLst>
-              <p:nextCondLst>
-                <p:cond evt="onNext" delay="0">
-                  <p:tgtEl>
-                    <p:sldTgt/>
-                  </p:tgtEl>
-                </p:cond>
-              </p:nextCondLst>
-            </p:seq>
-          </p:childTnLst>
-        </p:cTn>
-      </p:par>
-    </p:tnLst>
-    <p:bldLst>
-      <p:bldP spid="3" grpId="0" uiExpand="1" build="p"/>
-      <p:bldP spid="4" grpId="0" animBg="1"/>
-      <p:bldP spid="5" grpId="0" animBg="1"/>
-    </p:bldLst>
-  </p:timing>
-</p:sld>
-</file>
-
-<file path=ppt/slides/slide49.xml><?xml version="1.0" encoding="utf-8"?>
-<p:sld xmlns:a="http://schemas.openxmlformats.org/drawingml/2006/main" xmlns:r="http://schemas.openxmlformats.org/officeDocument/2006/relationships" xmlns:p="http://schemas.openxmlformats.org/presentationml/2006/main">
-  <p:cSld>
-    <p:spTree>
-      <p:nvGrpSpPr>
-        <p:cNvPr id="1" name=""/>
-        <p:cNvGrpSpPr/>
-        <p:nvPr/>
-      </p:nvGrpSpPr>
-      <p:grpSpPr>
-        <a:xfrm>
-          <a:off x="0" y="0"/>
-          <a:ext cx="0" cy="0"/>
-          <a:chOff x="0" y="0"/>
-          <a:chExt cx="0" cy="0"/>
-        </a:xfrm>
-      </p:grpSpPr>
-      <p:sp>
-        <p:nvSpPr>
-          <p:cNvPr id="2" name="Title 1"/>
-          <p:cNvSpPr>
-            <a:spLocks noGrp="1"/>
-          </p:cNvSpPr>
-          <p:nvPr>
-            <p:ph type="title"/>
-          </p:nvPr>
-        </p:nvSpPr>
-        <p:spPr/>
-        <p:txBody>
-          <a:bodyPr/>
-          <a:lstStyle/>
-          <a:p>
-            <a:r>
-              <a:rPr lang="en-US" dirty="0" smtClean="0"/>
-              <a:t>A few shortcuts</a:t>
-            </a:r>
-            <a:endParaRPr lang="nl-BE" dirty="0"/>
-          </a:p>
-        </p:txBody>
-      </p:sp>
-      <p:sp>
-        <p:nvSpPr>
-          <p:cNvPr id="3" name="Content Placeholder 2"/>
-          <p:cNvSpPr>
-            <a:spLocks noGrp="1"/>
-          </p:cNvSpPr>
-          <p:nvPr>
-            <p:ph idx="1"/>
-          </p:nvPr>
-        </p:nvSpPr>
-        <p:spPr/>
-        <p:txBody>
-          <a:bodyPr/>
-          <a:lstStyle/>
-          <a:p>
-            <a:r>
-              <a:rPr lang="en-US" dirty="0" smtClean="0"/>
-              <a:t>Commit all modified files</a:t>
-            </a:r>
-          </a:p>
-          <a:p>
-            <a:pPr lvl="1"/>
-            <a:endParaRPr lang="en-US" dirty="0"/>
-          </a:p>
-          <a:p>
-            <a:pPr lvl="1"/>
-            <a:r>
-              <a:rPr lang="en-US" dirty="0" smtClean="0"/>
-              <a:t>Will commit only modified, tracked files</a:t>
-            </a:r>
-          </a:p>
-          <a:p>
-            <a:r>
-              <a:rPr lang="en-US" dirty="0" smtClean="0"/>
-              <a:t>Create new branch and switch to it</a:t>
-            </a:r>
-            <a:endParaRPr lang="nl-BE" dirty="0"/>
-          </a:p>
-        </p:txBody>
-      </p:sp>
-      <p:sp>
-        <p:nvSpPr>
-          <p:cNvPr id="4" name="TextBox 3"/>
-          <p:cNvSpPr txBox="1"/>
-          <p:nvPr/>
-        </p:nvSpPr>
-        <p:spPr>
-          <a:xfrm>
-            <a:off x="1259632" y="2204864"/>
-            <a:ext cx="5904656" cy="369332"/>
-          </a:xfrm>
-          <a:prstGeom prst="rect">
-            <a:avLst/>
-          </a:prstGeom>
-          <a:noFill/>
-          <a:ln>
-            <a:solidFill>
-              <a:schemeClr val="tx1"/>
-            </a:solidFill>
-          </a:ln>
-        </p:spPr>
-        <p:txBody>
-          <a:bodyPr wrap="square" rtlCol="0">
-            <a:spAutoFit/>
-          </a:bodyPr>
-          <a:lstStyle/>
-          <a:p>
-            <a:r>
-              <a:rPr lang="nl-BE" dirty="0" smtClean="0">
-                <a:latin typeface="Courier New" pitchFamily="49" charset="0"/>
-                <a:cs typeface="Courier New" pitchFamily="49" charset="0"/>
-              </a:rPr>
-              <a:t>$ git </a:t>
-            </a:r>
-            <a:r>
-              <a:rPr lang="nl-BE" dirty="0" err="1" smtClean="0">
-                <a:latin typeface="Courier New" pitchFamily="49" charset="0"/>
-                <a:cs typeface="Courier New" pitchFamily="49" charset="0"/>
-              </a:rPr>
-              <a:t>commit</a:t>
-            </a:r>
-            <a:r>
-              <a:rPr lang="nl-BE" dirty="0" smtClean="0">
-                <a:latin typeface="Courier New" pitchFamily="49" charset="0"/>
-                <a:cs typeface="Courier New" pitchFamily="49" charset="0"/>
-              </a:rPr>
-              <a:t>  -a  -m '</a:t>
-            </a:r>
-            <a:r>
-              <a:rPr lang="nl-BE" dirty="0" err="1" smtClean="0">
-                <a:latin typeface="Courier New" pitchFamily="49" charset="0"/>
-                <a:cs typeface="Courier New" pitchFamily="49" charset="0"/>
-              </a:rPr>
-              <a:t>Fixed</a:t>
-            </a:r>
-            <a:r>
-              <a:rPr lang="nl-BE" dirty="0" smtClean="0">
-                <a:latin typeface="Courier New" pitchFamily="49" charset="0"/>
-                <a:cs typeface="Courier New" pitchFamily="49" charset="0"/>
-              </a:rPr>
-              <a:t> x/0 bug'</a:t>
-            </a:r>
-          </a:p>
-        </p:txBody>
-      </p:sp>
-      <p:sp>
-        <p:nvSpPr>
-          <p:cNvPr id="5" name="TextBox 4"/>
-          <p:cNvSpPr txBox="1"/>
-          <p:nvPr/>
-        </p:nvSpPr>
-        <p:spPr>
-          <a:xfrm>
-            <a:off x="1259632" y="3789040"/>
-            <a:ext cx="5904656" cy="369332"/>
-          </a:xfrm>
-          <a:prstGeom prst="rect">
-            <a:avLst/>
-          </a:prstGeom>
-          <a:noFill/>
-          <a:ln>
-            <a:solidFill>
-              <a:schemeClr val="tx1"/>
-            </a:solidFill>
-          </a:ln>
-        </p:spPr>
-        <p:txBody>
-          <a:bodyPr wrap="square" rtlCol="0">
-            <a:spAutoFit/>
-          </a:bodyPr>
-          <a:lstStyle/>
-          <a:p>
-            <a:r>
-              <a:rPr lang="nl-BE" dirty="0" smtClean="0">
-                <a:latin typeface="Courier New" pitchFamily="49" charset="0"/>
-                <a:cs typeface="Courier New" pitchFamily="49" charset="0"/>
-              </a:rPr>
-              <a:t>$ git </a:t>
-            </a:r>
-            <a:r>
-              <a:rPr lang="nl-BE" dirty="0" err="1" smtClean="0">
-                <a:latin typeface="Courier New" pitchFamily="49" charset="0"/>
-                <a:cs typeface="Courier New" pitchFamily="49" charset="0"/>
-              </a:rPr>
-              <a:t>checkout</a:t>
-            </a:r>
-            <a:r>
-              <a:rPr lang="nl-BE" dirty="0" smtClean="0">
-                <a:latin typeface="Courier New" pitchFamily="49" charset="0"/>
-                <a:cs typeface="Courier New" pitchFamily="49" charset="0"/>
-              </a:rPr>
-              <a:t>  -b  feature/</a:t>
-            </a:r>
-            <a:r>
-              <a:rPr lang="nl-BE" dirty="0" err="1" smtClean="0">
-                <a:latin typeface="Courier New" pitchFamily="49" charset="0"/>
-                <a:cs typeface="Courier New" pitchFamily="49" charset="0"/>
-              </a:rPr>
-              <a:t>optimization</a:t>
-            </a:r>
-            <a:endParaRPr lang="nl-BE" dirty="0" smtClean="0">
-              <a:latin typeface="Courier New" pitchFamily="49" charset="0"/>
-              <a:cs typeface="Courier New" pitchFamily="49" charset="0"/>
-            </a:endParaRPr>
-          </a:p>
-        </p:txBody>
-      </p:sp>
-      <p:sp>
-        <p:nvSpPr>
-          <p:cNvPr id="6" name="Slide Number Placeholder 5"/>
-          <p:cNvSpPr>
-            <a:spLocks noGrp="1"/>
-          </p:cNvSpPr>
-          <p:nvPr>
-            <p:ph type="sldNum" sz="quarter" idx="12"/>
-          </p:nvPr>
-        </p:nvSpPr>
-        <p:spPr/>
-        <p:txBody>
-          <a:bodyPr/>
-          <a:lstStyle/>
-          <a:p>
-            <a:fld id="{BB52A05A-A776-4391-ACD7-D6BC34D3145C}" type="slidenum">
-              <a:rPr lang="nl-BE" smtClean="0"/>
-              <a:t>49</a:t>
-            </a:fld>
-            <a:endParaRPr lang="nl-BE"/>
-          </a:p>
-        </p:txBody>
-      </p:sp>
-    </p:spTree>
-    <p:extLst>
-      <p:ext uri="{BB962C8B-B14F-4D97-AF65-F5344CB8AC3E}">
-        <p14:creationId xmlns:p14="http://schemas.microsoft.com/office/powerpoint/2010/main" val="3459632536"/>
-      </p:ext>
-    </p:extLst>
-  </p:cSld>
-  <p:clrMapOvr>
-    <a:masterClrMapping/>
-  </p:clrMapOvr>
-  <p:timing>
-    <p:tnLst>
-      <p:par>
-        <p:cTn id="1" dur="indefinite" restart="never" nodeType="tmRoot">
-          <p:childTnLst>
-            <p:seq concurrent="1" nextAc="seek">
-              <p:cTn id="2" dur="indefinite" nodeType="mainSeq">
-                <p:childTnLst>
-                  <p:par>
-                    <p:cTn id="3" fill="hold">
-                      <p:stCondLst>
-                        <p:cond delay="indefinite"/>
-                        <p:cond evt="onBegin" delay="0">
-                          <p:tn val="2"/>
-                        </p:cond>
-                      </p:stCondLst>
-                      <p:childTnLst>
-                        <p:par>
-                          <p:cTn id="4" fill="hold">
-                            <p:stCondLst>
-                              <p:cond delay="0"/>
-                            </p:stCondLst>
-                            <p:childTnLst>
-                              <p:par>
-                                <p:cTn id="5" presetID="1" presetClass="entr" presetSubtype="0" fill="hold" grpId="0" nodeType="withEffect">
-                                  <p:stCondLst>
-                                    <p:cond delay="0"/>
-                                  </p:stCondLst>
-                                  <p:childTnLst>
-                                    <p:set>
-                                      <p:cBhvr>
-                                        <p:cTn id="6" dur="1" fill="hold">
-                                          <p:stCondLst>
-                                            <p:cond delay="0"/>
-                                          </p:stCondLst>
-                                        </p:cTn>
-                                        <p:tgtEl>
-                                          <p:spTgt spid="3">
-                                            <p:txEl>
-                                              <p:pRg st="0" end="0"/>
-                                            </p:txEl>
-                                          </p:spTgt>
-                                        </p:tgtEl>
-                                        <p:attrNameLst>
-                                          <p:attrName>style.visibility</p:attrName>
-                                        </p:attrNameLst>
-                                      </p:cBhvr>
-                                      <p:to>
-                                        <p:strVal val="visible"/>
-                                      </p:to>
-                                    </p:set>
-                                  </p:childTnLst>
-                                </p:cTn>
-                              </p:par>
-                              <p:par>
-                                <p:cTn id="7" presetID="1" presetClass="entr" presetSubtype="0" fill="hold" grpId="0" nodeType="withEffect">
-                                  <p:stCondLst>
-                                    <p:cond delay="0"/>
-                                  </p:stCondLst>
-                                  <p:childTnLst>
-                                    <p:set>
-                                      <p:cBhvr>
-                                        <p:cTn id="8" dur="1" fill="hold">
-                                          <p:stCondLst>
-                                            <p:cond delay="0"/>
-                                          </p:stCondLst>
-                                        </p:cTn>
-                                        <p:tgtEl>
-                                          <p:spTgt spid="4"/>
-                                        </p:tgtEl>
-                                        <p:attrNameLst>
-                                          <p:attrName>style.visibility</p:attrName>
-                                        </p:attrNameLst>
-                                      </p:cBhvr>
-                                      <p:to>
-                                        <p:strVal val="visible"/>
-                                      </p:to>
-                                    </p:set>
-                                  </p:childTnLst>
-                                </p:cTn>
-                              </p:par>
-                              <p:par>
-                                <p:cTn id="9" presetID="1" presetClass="entr" presetSubtype="0" fill="hold" grpId="0" nodeType="withEffect">
-                                  <p:stCondLst>
-                                    <p:cond delay="0"/>
-                                  </p:stCondLst>
-                                  <p:childTnLst>
-                                    <p:set>
-                                      <p:cBhvr>
-                                        <p:cTn id="10" dur="1" fill="hold">
-                                          <p:stCondLst>
-                                            <p:cond delay="0"/>
-                                          </p:stCondLst>
-                                        </p:cTn>
-                                        <p:tgtEl>
-                                          <p:spTgt spid="3">
-                                            <p:txEl>
-                                              <p:pRg st="2" end="2"/>
-                                            </p:txEl>
-                                          </p:spTgt>
-                                        </p:tgtEl>
-                                        <p:attrNameLst>
-                                          <p:attrName>style.visibility</p:attrName>
-                                        </p:attrNameLst>
-                                      </p:cBhvr>
-                                      <p:to>
-                                        <p:strVal val="visible"/>
-                                      </p:to>
-                                    </p:set>
-                                  </p:childTnLst>
-                                </p:cTn>
-                              </p:par>
-                            </p:childTnLst>
-                          </p:cTn>
-                        </p:par>
-                      </p:childTnLst>
-                    </p:cTn>
-                  </p:par>
-                  <p:par>
-                    <p:cTn id="11" fill="hold">
-                      <p:stCondLst>
-                        <p:cond delay="indefinite"/>
-                      </p:stCondLst>
-                      <p:childTnLst>
-                        <p:par>
-                          <p:cTn id="12" fill="hold">
-                            <p:stCondLst>
-                              <p:cond delay="0"/>
-                            </p:stCondLst>
-                            <p:childTnLst>
-                              <p:par>
-                                <p:cTn id="13" presetID="1" presetClass="entr" presetSubtype="0" fill="hold" grpId="0" nodeType="clickEffect">
-                                  <p:stCondLst>
-                                    <p:cond delay="0"/>
-                                  </p:stCondLst>
-                                  <p:childTnLst>
-                                    <p:set>
-                                      <p:cBhvr>
-                                        <p:cTn id="14" dur="1" fill="hold">
-                                          <p:stCondLst>
-                                            <p:cond delay="0"/>
-                                          </p:stCondLst>
-                                        </p:cTn>
-                                        <p:tgtEl>
-                                          <p:spTgt spid="3">
-                                            <p:txEl>
-                                              <p:pRg st="3" end="3"/>
-                                            </p:txEl>
-                                          </p:spTgt>
-                                        </p:tgtEl>
-                                        <p:attrNameLst>
-                                          <p:attrName>style.visibility</p:attrName>
-                                        </p:attrNameLst>
-                                      </p:cBhvr>
-                                      <p:to>
-                                        <p:strVal val="visible"/>
-                                      </p:to>
-                                    </p:set>
-                                  </p:childTnLst>
-                                </p:cTn>
-                              </p:par>
-                              <p:par>
-                                <p:cTn id="15" presetID="1" presetClass="entr" presetSubtype="0" fill="hold" grpId="0" nodeType="withEffect">
-                                  <p:stCondLst>
-                                    <p:cond delay="0"/>
-                                  </p:stCondLst>
-                                  <p:childTnLst>
-                                    <p:set>
-                                      <p:cBhvr>
-                                        <p:cTn id="16" dur="1" fill="hold">
                                           <p:stCondLst>
                                             <p:cond delay="0"/>
                                           </p:stCondLst>
@@ -35699,6 +35394,470 @@
           <a:p>
             <a:r>
               <a:rPr lang="en-US" dirty="0" smtClean="0"/>
+              <a:t>A few shortcuts</a:t>
+            </a:r>
+            <a:endParaRPr lang="nl-BE" dirty="0"/>
+          </a:p>
+        </p:txBody>
+      </p:sp>
+      <p:sp>
+        <p:nvSpPr>
+          <p:cNvPr id="3" name="Content Placeholder 2"/>
+          <p:cNvSpPr>
+            <a:spLocks noGrp="1"/>
+          </p:cNvSpPr>
+          <p:nvPr>
+            <p:ph idx="1"/>
+          </p:nvPr>
+        </p:nvSpPr>
+        <p:spPr/>
+        <p:txBody>
+          <a:bodyPr/>
+          <a:lstStyle/>
+          <a:p>
+            <a:r>
+              <a:rPr lang="en-US" dirty="0" smtClean="0"/>
+              <a:t>Commit all modified files</a:t>
+            </a:r>
+          </a:p>
+          <a:p>
+            <a:pPr lvl="1"/>
+            <a:endParaRPr lang="en-US" dirty="0"/>
+          </a:p>
+          <a:p>
+            <a:pPr lvl="1"/>
+            <a:r>
+              <a:rPr lang="en-US" dirty="0" smtClean="0"/>
+              <a:t>Will commit only modified, tracked files</a:t>
+            </a:r>
+          </a:p>
+          <a:p>
+            <a:r>
+              <a:rPr lang="en-US" dirty="0" smtClean="0"/>
+              <a:t>Create new branch and switch to it</a:t>
+            </a:r>
+            <a:endParaRPr lang="nl-BE" dirty="0"/>
+          </a:p>
+        </p:txBody>
+      </p:sp>
+      <p:sp>
+        <p:nvSpPr>
+          <p:cNvPr id="4" name="TextBox 3"/>
+          <p:cNvSpPr txBox="1"/>
+          <p:nvPr/>
+        </p:nvSpPr>
+        <p:spPr>
+          <a:xfrm>
+            <a:off x="1259632" y="2204864"/>
+            <a:ext cx="5904656" cy="369332"/>
+          </a:xfrm>
+          <a:prstGeom prst="rect">
+            <a:avLst/>
+          </a:prstGeom>
+          <a:noFill/>
+          <a:ln>
+            <a:solidFill>
+              <a:schemeClr val="tx1"/>
+            </a:solidFill>
+          </a:ln>
+        </p:spPr>
+        <p:txBody>
+          <a:bodyPr wrap="square" rtlCol="0">
+            <a:spAutoFit/>
+          </a:bodyPr>
+          <a:lstStyle/>
+          <a:p>
+            <a:r>
+              <a:rPr lang="nl-BE" dirty="0" smtClean="0">
+                <a:latin typeface="Courier New" pitchFamily="49" charset="0"/>
+                <a:cs typeface="Courier New" pitchFamily="49" charset="0"/>
+              </a:rPr>
+              <a:t>$ git </a:t>
+            </a:r>
+            <a:r>
+              <a:rPr lang="nl-BE" dirty="0" err="1" smtClean="0">
+                <a:latin typeface="Courier New" pitchFamily="49" charset="0"/>
+                <a:cs typeface="Courier New" pitchFamily="49" charset="0"/>
+              </a:rPr>
+              <a:t>commit</a:t>
+            </a:r>
+            <a:r>
+              <a:rPr lang="nl-BE" dirty="0" smtClean="0">
+                <a:latin typeface="Courier New" pitchFamily="49" charset="0"/>
+                <a:cs typeface="Courier New" pitchFamily="49" charset="0"/>
+              </a:rPr>
+              <a:t>  -a  -m '</a:t>
+            </a:r>
+            <a:r>
+              <a:rPr lang="nl-BE" dirty="0" err="1" smtClean="0">
+                <a:latin typeface="Courier New" pitchFamily="49" charset="0"/>
+                <a:cs typeface="Courier New" pitchFamily="49" charset="0"/>
+              </a:rPr>
+              <a:t>Fixed</a:t>
+            </a:r>
+            <a:r>
+              <a:rPr lang="nl-BE" dirty="0" smtClean="0">
+                <a:latin typeface="Courier New" pitchFamily="49" charset="0"/>
+                <a:cs typeface="Courier New" pitchFamily="49" charset="0"/>
+              </a:rPr>
+              <a:t> x/0 bug'</a:t>
+            </a:r>
+          </a:p>
+        </p:txBody>
+      </p:sp>
+      <p:sp>
+        <p:nvSpPr>
+          <p:cNvPr id="5" name="TextBox 4"/>
+          <p:cNvSpPr txBox="1"/>
+          <p:nvPr/>
+        </p:nvSpPr>
+        <p:spPr>
+          <a:xfrm>
+            <a:off x="1259632" y="3789040"/>
+            <a:ext cx="5904656" cy="369332"/>
+          </a:xfrm>
+          <a:prstGeom prst="rect">
+            <a:avLst/>
+          </a:prstGeom>
+          <a:noFill/>
+          <a:ln>
+            <a:solidFill>
+              <a:schemeClr val="tx1"/>
+            </a:solidFill>
+          </a:ln>
+        </p:spPr>
+        <p:txBody>
+          <a:bodyPr wrap="square" rtlCol="0">
+            <a:spAutoFit/>
+          </a:bodyPr>
+          <a:lstStyle/>
+          <a:p>
+            <a:r>
+              <a:rPr lang="nl-BE" dirty="0" smtClean="0">
+                <a:latin typeface="Courier New" pitchFamily="49" charset="0"/>
+                <a:cs typeface="Courier New" pitchFamily="49" charset="0"/>
+              </a:rPr>
+              <a:t>$ git </a:t>
+            </a:r>
+            <a:r>
+              <a:rPr lang="nl-BE" dirty="0" err="1" smtClean="0">
+                <a:latin typeface="Courier New" pitchFamily="49" charset="0"/>
+                <a:cs typeface="Courier New" pitchFamily="49" charset="0"/>
+              </a:rPr>
+              <a:t>checkout</a:t>
+            </a:r>
+            <a:r>
+              <a:rPr lang="nl-BE" dirty="0" smtClean="0">
+                <a:latin typeface="Courier New" pitchFamily="49" charset="0"/>
+                <a:cs typeface="Courier New" pitchFamily="49" charset="0"/>
+              </a:rPr>
+              <a:t>  -b  feature/</a:t>
+            </a:r>
+            <a:r>
+              <a:rPr lang="nl-BE" dirty="0" err="1" smtClean="0">
+                <a:latin typeface="Courier New" pitchFamily="49" charset="0"/>
+                <a:cs typeface="Courier New" pitchFamily="49" charset="0"/>
+              </a:rPr>
+              <a:t>optimization</a:t>
+            </a:r>
+            <a:endParaRPr lang="nl-BE" dirty="0" smtClean="0">
+              <a:latin typeface="Courier New" pitchFamily="49" charset="0"/>
+              <a:cs typeface="Courier New" pitchFamily="49" charset="0"/>
+            </a:endParaRPr>
+          </a:p>
+        </p:txBody>
+      </p:sp>
+      <p:sp>
+        <p:nvSpPr>
+          <p:cNvPr id="6" name="Slide Number Placeholder 5"/>
+          <p:cNvSpPr>
+            <a:spLocks noGrp="1"/>
+          </p:cNvSpPr>
+          <p:nvPr>
+            <p:ph type="sldNum" sz="quarter" idx="12"/>
+          </p:nvPr>
+        </p:nvSpPr>
+        <p:spPr/>
+        <p:txBody>
+          <a:bodyPr/>
+          <a:lstStyle/>
+          <a:p>
+            <a:fld id="{BB52A05A-A776-4391-ACD7-D6BC34D3145C}" type="slidenum">
+              <a:rPr lang="nl-BE" smtClean="0"/>
+              <a:t>50</a:t>
+            </a:fld>
+            <a:endParaRPr lang="nl-BE"/>
+          </a:p>
+        </p:txBody>
+      </p:sp>
+    </p:spTree>
+    <p:extLst>
+      <p:ext uri="{BB962C8B-B14F-4D97-AF65-F5344CB8AC3E}">
+        <p14:creationId xmlns:p14="http://schemas.microsoft.com/office/powerpoint/2010/main" val="3459632536"/>
+      </p:ext>
+    </p:extLst>
+  </p:cSld>
+  <p:clrMapOvr>
+    <a:masterClrMapping/>
+  </p:clrMapOvr>
+  <p:timing>
+    <p:tnLst>
+      <p:par>
+        <p:cTn id="1" dur="indefinite" restart="never" nodeType="tmRoot">
+          <p:childTnLst>
+            <p:seq concurrent="1" nextAc="seek">
+              <p:cTn id="2" dur="indefinite" nodeType="mainSeq">
+                <p:childTnLst>
+                  <p:par>
+                    <p:cTn id="3" fill="hold">
+                      <p:stCondLst>
+                        <p:cond delay="indefinite"/>
+                        <p:cond evt="onBegin" delay="0">
+                          <p:tn val="2"/>
+                        </p:cond>
+                      </p:stCondLst>
+                      <p:childTnLst>
+                        <p:par>
+                          <p:cTn id="4" fill="hold">
+                            <p:stCondLst>
+                              <p:cond delay="0"/>
+                            </p:stCondLst>
+                            <p:childTnLst>
+                              <p:par>
+                                <p:cTn id="5" presetID="1" presetClass="entr" presetSubtype="0" fill="hold" grpId="0" nodeType="withEffect">
+                                  <p:stCondLst>
+                                    <p:cond delay="0"/>
+                                  </p:stCondLst>
+                                  <p:childTnLst>
+                                    <p:set>
+                                      <p:cBhvr>
+                                        <p:cTn id="6" dur="1" fill="hold">
+                                          <p:stCondLst>
+                                            <p:cond delay="0"/>
+                                          </p:stCondLst>
+                                        </p:cTn>
+                                        <p:tgtEl>
+                                          <p:spTgt spid="3">
+                                            <p:txEl>
+                                              <p:pRg st="0" end="0"/>
+                                            </p:txEl>
+                                          </p:spTgt>
+                                        </p:tgtEl>
+                                        <p:attrNameLst>
+                                          <p:attrName>style.visibility</p:attrName>
+                                        </p:attrNameLst>
+                                      </p:cBhvr>
+                                      <p:to>
+                                        <p:strVal val="visible"/>
+                                      </p:to>
+                                    </p:set>
+                                  </p:childTnLst>
+                                </p:cTn>
+                              </p:par>
+                              <p:par>
+                                <p:cTn id="7" presetID="1" presetClass="entr" presetSubtype="0" fill="hold" grpId="0" nodeType="withEffect">
+                                  <p:stCondLst>
+                                    <p:cond delay="0"/>
+                                  </p:stCondLst>
+                                  <p:childTnLst>
+                                    <p:set>
+                                      <p:cBhvr>
+                                        <p:cTn id="8" dur="1" fill="hold">
+                                          <p:stCondLst>
+                                            <p:cond delay="0"/>
+                                          </p:stCondLst>
+                                        </p:cTn>
+                                        <p:tgtEl>
+                                          <p:spTgt spid="4"/>
+                                        </p:tgtEl>
+                                        <p:attrNameLst>
+                                          <p:attrName>style.visibility</p:attrName>
+                                        </p:attrNameLst>
+                                      </p:cBhvr>
+                                      <p:to>
+                                        <p:strVal val="visible"/>
+                                      </p:to>
+                                    </p:set>
+                                  </p:childTnLst>
+                                </p:cTn>
+                              </p:par>
+                              <p:par>
+                                <p:cTn id="9" presetID="1" presetClass="entr" presetSubtype="0" fill="hold" grpId="0" nodeType="withEffect">
+                                  <p:stCondLst>
+                                    <p:cond delay="0"/>
+                                  </p:stCondLst>
+                                  <p:childTnLst>
+                                    <p:set>
+                                      <p:cBhvr>
+                                        <p:cTn id="10" dur="1" fill="hold">
+                                          <p:stCondLst>
+                                            <p:cond delay="0"/>
+                                          </p:stCondLst>
+                                        </p:cTn>
+                                        <p:tgtEl>
+                                          <p:spTgt spid="3">
+                                            <p:txEl>
+                                              <p:pRg st="2" end="2"/>
+                                            </p:txEl>
+                                          </p:spTgt>
+                                        </p:tgtEl>
+                                        <p:attrNameLst>
+                                          <p:attrName>style.visibility</p:attrName>
+                                        </p:attrNameLst>
+                                      </p:cBhvr>
+                                      <p:to>
+                                        <p:strVal val="visible"/>
+                                      </p:to>
+                                    </p:set>
+                                  </p:childTnLst>
+                                </p:cTn>
+                              </p:par>
+                            </p:childTnLst>
+                          </p:cTn>
+                        </p:par>
+                      </p:childTnLst>
+                    </p:cTn>
+                  </p:par>
+                  <p:par>
+                    <p:cTn id="11" fill="hold">
+                      <p:stCondLst>
+                        <p:cond delay="indefinite"/>
+                      </p:stCondLst>
+                      <p:childTnLst>
+                        <p:par>
+                          <p:cTn id="12" fill="hold">
+                            <p:stCondLst>
+                              <p:cond delay="0"/>
+                            </p:stCondLst>
+                            <p:childTnLst>
+                              <p:par>
+                                <p:cTn id="13" presetID="1" presetClass="entr" presetSubtype="0" fill="hold" grpId="0" nodeType="clickEffect">
+                                  <p:stCondLst>
+                                    <p:cond delay="0"/>
+                                  </p:stCondLst>
+                                  <p:childTnLst>
+                                    <p:set>
+                                      <p:cBhvr>
+                                        <p:cTn id="14" dur="1" fill="hold">
+                                          <p:stCondLst>
+                                            <p:cond delay="0"/>
+                                          </p:stCondLst>
+                                        </p:cTn>
+                                        <p:tgtEl>
+                                          <p:spTgt spid="3">
+                                            <p:txEl>
+                                              <p:pRg st="3" end="3"/>
+                                            </p:txEl>
+                                          </p:spTgt>
+                                        </p:tgtEl>
+                                        <p:attrNameLst>
+                                          <p:attrName>style.visibility</p:attrName>
+                                        </p:attrNameLst>
+                                      </p:cBhvr>
+                                      <p:to>
+                                        <p:strVal val="visible"/>
+                                      </p:to>
+                                    </p:set>
+                                  </p:childTnLst>
+                                </p:cTn>
+                              </p:par>
+                              <p:par>
+                                <p:cTn id="15" presetID="1" presetClass="entr" presetSubtype="0" fill="hold" grpId="0" nodeType="withEffect">
+                                  <p:stCondLst>
+                                    <p:cond delay="0"/>
+                                  </p:stCondLst>
+                                  <p:childTnLst>
+                                    <p:set>
+                                      <p:cBhvr>
+                                        <p:cTn id="16" dur="1" fill="hold">
+                                          <p:stCondLst>
+                                            <p:cond delay="0"/>
+                                          </p:stCondLst>
+                                        </p:cTn>
+                                        <p:tgtEl>
+                                          <p:spTgt spid="5"/>
+                                        </p:tgtEl>
+                                        <p:attrNameLst>
+                                          <p:attrName>style.visibility</p:attrName>
+                                        </p:attrNameLst>
+                                      </p:cBhvr>
+                                      <p:to>
+                                        <p:strVal val="visible"/>
+                                      </p:to>
+                                    </p:set>
+                                  </p:childTnLst>
+                                </p:cTn>
+                              </p:par>
+                            </p:childTnLst>
+                          </p:cTn>
+                        </p:par>
+                      </p:childTnLst>
+                    </p:cTn>
+                  </p:par>
+                </p:childTnLst>
+              </p:cTn>
+              <p:prevCondLst>
+                <p:cond evt="onPrev" delay="0">
+                  <p:tgtEl>
+                    <p:sldTgt/>
+                  </p:tgtEl>
+                </p:cond>
+              </p:prevCondLst>
+              <p:nextCondLst>
+                <p:cond evt="onNext" delay="0">
+                  <p:tgtEl>
+                    <p:sldTgt/>
+                  </p:tgtEl>
+                </p:cond>
+              </p:nextCondLst>
+            </p:seq>
+          </p:childTnLst>
+        </p:cTn>
+      </p:par>
+    </p:tnLst>
+    <p:bldLst>
+      <p:bldP spid="3" grpId="0" uiExpand="1" build="p"/>
+      <p:bldP spid="4" grpId="0" animBg="1"/>
+      <p:bldP spid="5" grpId="0" animBg="1"/>
+    </p:bldLst>
+  </p:timing>
+</p:sld>
+</file>
+
+<file path=ppt/slides/slide51.xml><?xml version="1.0" encoding="utf-8"?>
+<p:sld xmlns:a="http://schemas.openxmlformats.org/drawingml/2006/main" xmlns:r="http://schemas.openxmlformats.org/officeDocument/2006/relationships" xmlns:p="http://schemas.openxmlformats.org/presentationml/2006/main">
+  <p:cSld>
+    <p:spTree>
+      <p:nvGrpSpPr>
+        <p:cNvPr id="1" name=""/>
+        <p:cNvGrpSpPr/>
+        <p:nvPr/>
+      </p:nvGrpSpPr>
+      <p:grpSpPr>
+        <a:xfrm>
+          <a:off x="0" y="0"/>
+          <a:ext cx="0" cy="0"/>
+          <a:chOff x="0" y="0"/>
+          <a:chExt cx="0" cy="0"/>
+        </a:xfrm>
+      </p:grpSpPr>
+      <p:sp>
+        <p:nvSpPr>
+          <p:cNvPr id="2" name="Title 1"/>
+          <p:cNvSpPr>
+            <a:spLocks noGrp="1"/>
+          </p:cNvSpPr>
+          <p:nvPr>
+            <p:ph type="title"/>
+          </p:nvPr>
+        </p:nvSpPr>
+        <p:spPr/>
+        <p:txBody>
+          <a:bodyPr/>
+          <a:lstStyle/>
+          <a:p>
+            <a:r>
+              <a:rPr lang="en-US" dirty="0" smtClean="0"/>
               <a:t>Stashing</a:t>
             </a:r>
             <a:endParaRPr lang="en-US" dirty="0"/>
@@ -35800,7 +35959,7 @@
           <a:p>
             <a:fld id="{BB52A05A-A776-4391-ACD7-D6BC34D3145C}" type="slidenum">
               <a:rPr lang="nl-BE" smtClean="0"/>
-              <a:t>50</a:t>
+              <a:t>51</a:t>
             </a:fld>
             <a:endParaRPr lang="nl-BE"/>
           </a:p>
@@ -36458,7 +36617,7 @@
 </p:sld>
 </file>
 
-<file path=ppt/slides/slide51.xml><?xml version="1.0" encoding="utf-8"?>
+<file path=ppt/slides/slide52.xml><?xml version="1.0" encoding="utf-8"?>
 <p:sld xmlns:a="http://schemas.openxmlformats.org/drawingml/2006/main" xmlns:r="http://schemas.openxmlformats.org/officeDocument/2006/relationships" xmlns:p="http://schemas.openxmlformats.org/presentationml/2006/main">
   <p:cSld>
     <p:spTree>
@@ -36910,7 +37069,7 @@
           <a:p>
             <a:fld id="{BB52A05A-A776-4391-ACD7-D6BC34D3145C}" type="slidenum">
               <a:rPr lang="nl-BE" smtClean="0"/>
-              <a:t>51</a:t>
+              <a:t>52</a:t>
             </a:fld>
             <a:endParaRPr lang="nl-BE"/>
           </a:p>
@@ -37412,7 +37571,7 @@
 </p:sld>
 </file>
 
-<file path=ppt/slides/slide52.xml><?xml version="1.0" encoding="utf-8"?>
+<file path=ppt/slides/slide53.xml><?xml version="1.0" encoding="utf-8"?>
 <p:sld xmlns:a="http://schemas.openxmlformats.org/drawingml/2006/main" xmlns:r="http://schemas.openxmlformats.org/officeDocument/2006/relationships" xmlns:p="http://schemas.openxmlformats.org/presentationml/2006/main">
   <p:cSld>
     <p:spTree>
@@ -37667,7 +37826,7 @@
           <a:p>
             <a:fld id="{BB52A05A-A776-4391-ACD7-D6BC34D3145C}" type="slidenum">
               <a:rPr lang="nl-BE" smtClean="0"/>
-              <a:t>52</a:t>
+              <a:t>53</a:t>
             </a:fld>
             <a:endParaRPr lang="nl-BE"/>
           </a:p>
@@ -37971,108 +38130,6 @@
 </p:sld>
 </file>
 
-<file path=ppt/slides/slide53.xml><?xml version="1.0" encoding="utf-8"?>
-<p:sld xmlns:a="http://schemas.openxmlformats.org/drawingml/2006/main" xmlns:r="http://schemas.openxmlformats.org/officeDocument/2006/relationships" xmlns:p="http://schemas.openxmlformats.org/presentationml/2006/main">
-  <p:cSld>
-    <p:spTree>
-      <p:nvGrpSpPr>
-        <p:cNvPr id="1" name=""/>
-        <p:cNvGrpSpPr/>
-        <p:nvPr/>
-      </p:nvGrpSpPr>
-      <p:grpSpPr>
-        <a:xfrm>
-          <a:off x="0" y="0"/>
-          <a:ext cx="0" cy="0"/>
-          <a:chOff x="0" y="0"/>
-          <a:chExt cx="0" cy="0"/>
-        </a:xfrm>
-      </p:grpSpPr>
-      <p:sp>
-        <p:nvSpPr>
-          <p:cNvPr id="2" name="Title 1"/>
-          <p:cNvSpPr>
-            <a:spLocks noGrp="1"/>
-          </p:cNvSpPr>
-          <p:nvPr>
-            <p:ph type="title"/>
-          </p:nvPr>
-        </p:nvSpPr>
-        <p:spPr/>
-        <p:txBody>
-          <a:bodyPr/>
-          <a:lstStyle/>
-          <a:p>
-            <a:r>
-              <a:rPr lang="en-US" dirty="0" smtClean="0"/>
-              <a:t>Contributing</a:t>
-            </a:r>
-            <a:endParaRPr lang="nl-BE" dirty="0"/>
-          </a:p>
-        </p:txBody>
-      </p:sp>
-      <p:sp>
-        <p:nvSpPr>
-          <p:cNvPr id="3" name="Text Placeholder 2"/>
-          <p:cNvSpPr>
-            <a:spLocks noGrp="1"/>
-          </p:cNvSpPr>
-          <p:nvPr>
-            <p:ph type="body" idx="1"/>
-          </p:nvPr>
-        </p:nvSpPr>
-        <p:spPr/>
-        <p:txBody>
-          <a:bodyPr/>
-          <a:lstStyle/>
-          <a:p>
-            <a:endParaRPr lang="nl-BE"/>
-          </a:p>
-        </p:txBody>
-      </p:sp>
-      <p:sp>
-        <p:nvSpPr>
-          <p:cNvPr id="4" name="Slide Number Placeholder 3"/>
-          <p:cNvSpPr>
-            <a:spLocks noGrp="1"/>
-          </p:cNvSpPr>
-          <p:nvPr>
-            <p:ph type="sldNum" sz="quarter" idx="12"/>
-          </p:nvPr>
-        </p:nvSpPr>
-        <p:spPr/>
-        <p:txBody>
-          <a:bodyPr/>
-          <a:lstStyle/>
-          <a:p>
-            <a:fld id="{BB52A05A-A776-4391-ACD7-D6BC34D3145C}" type="slidenum">
-              <a:rPr lang="nl-BE" smtClean="0"/>
-              <a:t>53</a:t>
-            </a:fld>
-            <a:endParaRPr lang="nl-BE"/>
-          </a:p>
-        </p:txBody>
-      </p:sp>
-    </p:spTree>
-    <p:extLst>
-      <p:ext uri="{BB962C8B-B14F-4D97-AF65-F5344CB8AC3E}">
-        <p14:creationId xmlns:p14="http://schemas.microsoft.com/office/powerpoint/2010/main" val="2575227797"/>
-      </p:ext>
-    </p:extLst>
-  </p:cSld>
-  <p:clrMapOvr>
-    <a:masterClrMapping/>
-  </p:clrMapOvr>
-  <p:timing>
-    <p:tnLst>
-      <p:par>
-        <p:cTn id="1" dur="indefinite" restart="never" nodeType="tmRoot"/>
-      </p:par>
-    </p:tnLst>
-  </p:timing>
-</p:sld>
-</file>
-
 <file path=ppt/slides/slide54.xml><?xml version="1.0" encoding="utf-8"?>
 <p:sld xmlns:a="http://schemas.openxmlformats.org/drawingml/2006/main" xmlns:r="http://schemas.openxmlformats.org/officeDocument/2006/relationships" xmlns:p="http://schemas.openxmlformats.org/presentationml/2006/main">
   <p:cSld>
@@ -38115,74 +38172,20 @@
       </p:sp>
       <p:sp>
         <p:nvSpPr>
-          <p:cNvPr id="3" name="Content Placeholder 2"/>
+          <p:cNvPr id="3" name="Text Placeholder 2"/>
           <p:cNvSpPr>
             <a:spLocks noGrp="1"/>
           </p:cNvSpPr>
           <p:nvPr>
-            <p:ph idx="1"/>
+            <p:ph type="body" idx="1"/>
           </p:nvPr>
         </p:nvSpPr>
         <p:spPr/>
         <p:txBody>
-          <a:bodyPr>
-            <a:normAutofit lnSpcReduction="10000"/>
-          </a:bodyPr>
+          <a:bodyPr/>
           <a:lstStyle/>
           <a:p>
-            <a:r>
-              <a:rPr lang="en-US" dirty="0" smtClean="0"/>
-              <a:t>Contribute to someone else's project, e.g.,</a:t>
-            </a:r>
-          </a:p>
-          <a:p>
-            <a:pPr lvl="1"/>
-            <a:r>
-              <a:rPr lang="en-US" dirty="0" smtClean="0"/>
-              <a:t>Open source project</a:t>
-            </a:r>
-          </a:p>
-          <a:p>
-            <a:pPr lvl="1"/>
-            <a:r>
-              <a:rPr lang="en-US" dirty="0" smtClean="0"/>
-              <a:t>Research project you're involved in</a:t>
-            </a:r>
-          </a:p>
-          <a:p>
-            <a:r>
-              <a:rPr lang="en-US" dirty="0" smtClean="0"/>
-              <a:t>Can be done without write access to project</a:t>
-            </a:r>
-          </a:p>
-          <a:p>
-            <a:pPr lvl="1"/>
-            <a:r>
-              <a:rPr lang="en-US" dirty="0" smtClean="0"/>
-              <a:t>Create your own copy by forking</a:t>
-            </a:r>
-          </a:p>
-          <a:p>
-            <a:pPr lvl="1"/>
-            <a:r>
-              <a:rPr lang="en-US" dirty="0" smtClean="0"/>
-              <a:t>Create a branch for implementation</a:t>
-            </a:r>
-          </a:p>
-          <a:p>
-            <a:pPr lvl="1"/>
-            <a:r>
-              <a:rPr lang="en-US" dirty="0" smtClean="0"/>
-              <a:t>Implement, test</a:t>
-            </a:r>
-          </a:p>
-          <a:p>
-            <a:pPr lvl="1"/>
-            <a:r>
-              <a:rPr lang="en-US" dirty="0" smtClean="0"/>
-              <a:t>Create a pull request for your branch against original repository</a:t>
-            </a:r>
-            <a:endParaRPr lang="nl-BE" dirty="0"/>
+            <a:endParaRPr lang="nl-BE"/>
           </a:p>
         </p:txBody>
       </p:sp>
@@ -38204,6 +38207,162 @@
             <a:fld id="{BB52A05A-A776-4391-ACD7-D6BC34D3145C}" type="slidenum">
               <a:rPr lang="nl-BE" smtClean="0"/>
               <a:t>54</a:t>
+            </a:fld>
+            <a:endParaRPr lang="nl-BE"/>
+          </a:p>
+        </p:txBody>
+      </p:sp>
+    </p:spTree>
+    <p:extLst>
+      <p:ext uri="{BB962C8B-B14F-4D97-AF65-F5344CB8AC3E}">
+        <p14:creationId xmlns:p14="http://schemas.microsoft.com/office/powerpoint/2010/main" val="2575227797"/>
+      </p:ext>
+    </p:extLst>
+  </p:cSld>
+  <p:clrMapOvr>
+    <a:masterClrMapping/>
+  </p:clrMapOvr>
+  <p:timing>
+    <p:tnLst>
+      <p:par>
+        <p:cTn id="1" dur="indefinite" restart="never" nodeType="tmRoot"/>
+      </p:par>
+    </p:tnLst>
+  </p:timing>
+</p:sld>
+</file>
+
+<file path=ppt/slides/slide55.xml><?xml version="1.0" encoding="utf-8"?>
+<p:sld xmlns:a="http://schemas.openxmlformats.org/drawingml/2006/main" xmlns:r="http://schemas.openxmlformats.org/officeDocument/2006/relationships" xmlns:p="http://schemas.openxmlformats.org/presentationml/2006/main">
+  <p:cSld>
+    <p:spTree>
+      <p:nvGrpSpPr>
+        <p:cNvPr id="1" name=""/>
+        <p:cNvGrpSpPr/>
+        <p:nvPr/>
+      </p:nvGrpSpPr>
+      <p:grpSpPr>
+        <a:xfrm>
+          <a:off x="0" y="0"/>
+          <a:ext cx="0" cy="0"/>
+          <a:chOff x="0" y="0"/>
+          <a:chExt cx="0" cy="0"/>
+        </a:xfrm>
+      </p:grpSpPr>
+      <p:sp>
+        <p:nvSpPr>
+          <p:cNvPr id="2" name="Title 1"/>
+          <p:cNvSpPr>
+            <a:spLocks noGrp="1"/>
+          </p:cNvSpPr>
+          <p:nvPr>
+            <p:ph type="title"/>
+          </p:nvPr>
+        </p:nvSpPr>
+        <p:spPr/>
+        <p:txBody>
+          <a:bodyPr/>
+          <a:lstStyle/>
+          <a:p>
+            <a:r>
+              <a:rPr lang="en-US" dirty="0" smtClean="0"/>
+              <a:t>Contributing</a:t>
+            </a:r>
+            <a:endParaRPr lang="nl-BE" dirty="0"/>
+          </a:p>
+        </p:txBody>
+      </p:sp>
+      <p:sp>
+        <p:nvSpPr>
+          <p:cNvPr id="3" name="Content Placeholder 2"/>
+          <p:cNvSpPr>
+            <a:spLocks noGrp="1"/>
+          </p:cNvSpPr>
+          <p:nvPr>
+            <p:ph idx="1"/>
+          </p:nvPr>
+        </p:nvSpPr>
+        <p:spPr/>
+        <p:txBody>
+          <a:bodyPr>
+            <a:normAutofit lnSpcReduction="10000"/>
+          </a:bodyPr>
+          <a:lstStyle/>
+          <a:p>
+            <a:r>
+              <a:rPr lang="en-US" dirty="0" smtClean="0"/>
+              <a:t>Contribute to someone else's project, e.g.,</a:t>
+            </a:r>
+          </a:p>
+          <a:p>
+            <a:pPr lvl="1"/>
+            <a:r>
+              <a:rPr lang="en-US" dirty="0" smtClean="0"/>
+              <a:t>Open source project</a:t>
+            </a:r>
+          </a:p>
+          <a:p>
+            <a:pPr lvl="1"/>
+            <a:r>
+              <a:rPr lang="en-US" dirty="0" smtClean="0"/>
+              <a:t>Research project you're involved in</a:t>
+            </a:r>
+          </a:p>
+          <a:p>
+            <a:r>
+              <a:rPr lang="en-US" dirty="0" smtClean="0"/>
+              <a:t>Can be done without write access to project</a:t>
+            </a:r>
+          </a:p>
+          <a:p>
+            <a:pPr lvl="1"/>
+            <a:r>
+              <a:rPr lang="en-US" dirty="0" smtClean="0"/>
+              <a:t>Create your own copy by forking</a:t>
+            </a:r>
+          </a:p>
+          <a:p>
+            <a:pPr lvl="1"/>
+            <a:r>
+              <a:rPr lang="en-US" dirty="0" smtClean="0"/>
+              <a:t>Create a branch for implementation</a:t>
+            </a:r>
+          </a:p>
+          <a:p>
+            <a:pPr lvl="1"/>
+            <a:r>
+              <a:rPr lang="en-US" dirty="0" smtClean="0"/>
+              <a:t>Implement, test</a:t>
+            </a:r>
+          </a:p>
+          <a:p>
+            <a:pPr lvl="1"/>
+            <a:r>
+              <a:rPr lang="en-US" dirty="0" smtClean="0"/>
+              <a:t>Create a pull request for your branch against original repository</a:t>
+            </a:r>
+            <a:endParaRPr lang="nl-BE" dirty="0"/>
+          </a:p>
+        </p:txBody>
+      </p:sp>
+      <p:sp>
+        <p:nvSpPr>
+          <p:cNvPr id="4" name="Slide Number Placeholder 3"/>
+          <p:cNvSpPr>
+            <a:spLocks noGrp="1"/>
+          </p:cNvSpPr>
+          <p:nvPr>
+            <p:ph type="sldNum" sz="quarter" idx="12"/>
+          </p:nvPr>
+        </p:nvSpPr>
+        <p:spPr/>
+        <p:txBody>
+          <a:bodyPr/>
+          <a:lstStyle/>
+          <a:p>
+            <a:fld id="{BB52A05A-A776-4391-ACD7-D6BC34D3145C}" type="slidenum">
+              <a:rPr lang="nl-BE" smtClean="0"/>
+              <a:t>55</a:t>
             </a:fld>
             <a:endParaRPr lang="nl-BE"/>
           </a:p>
@@ -38695,7 +38854,7 @@
 </p:sld>
 </file>
 
-<file path=ppt/slides/slide55.xml><?xml version="1.0" encoding="utf-8"?>
+<file path=ppt/slides/slide56.xml><?xml version="1.0" encoding="utf-8"?>
 <p:sld xmlns:a="http://schemas.openxmlformats.org/drawingml/2006/main" xmlns:r="http://schemas.openxmlformats.org/officeDocument/2006/relationships" xmlns:p="http://schemas.openxmlformats.org/presentationml/2006/main">
   <p:cSld>
     <p:spTree>
@@ -38819,7 +38978,7 @@
           <a:p>
             <a:fld id="{BB52A05A-A776-4391-ACD7-D6BC34D3145C}" type="slidenum">
               <a:rPr lang="nl-BE" smtClean="0"/>
-              <a:t>55</a:t>
+              <a:t>56</a:t>
             </a:fld>
             <a:endParaRPr lang="nl-BE"/>
           </a:p>
@@ -39262,108 +39421,6 @@
 </p:sld>
 </file>
 
-<file path=ppt/slides/slide56.xml><?xml version="1.0" encoding="utf-8"?>
-<p:sld xmlns:a="http://schemas.openxmlformats.org/drawingml/2006/main" xmlns:r="http://schemas.openxmlformats.org/officeDocument/2006/relationships" xmlns:p="http://schemas.openxmlformats.org/presentationml/2006/main">
-  <p:cSld>
-    <p:spTree>
-      <p:nvGrpSpPr>
-        <p:cNvPr id="1" name=""/>
-        <p:cNvGrpSpPr/>
-        <p:nvPr/>
-      </p:nvGrpSpPr>
-      <p:grpSpPr>
-        <a:xfrm>
-          <a:off x="0" y="0"/>
-          <a:ext cx="0" cy="0"/>
-          <a:chOff x="0" y="0"/>
-          <a:chExt cx="0" cy="0"/>
-        </a:xfrm>
-      </p:grpSpPr>
-      <p:sp>
-        <p:nvSpPr>
-          <p:cNvPr id="2" name="Title 1"/>
-          <p:cNvSpPr>
-            <a:spLocks noGrp="1"/>
-          </p:cNvSpPr>
-          <p:nvPr>
-            <p:ph type="title"/>
-          </p:nvPr>
-        </p:nvSpPr>
-        <p:spPr/>
-        <p:txBody>
-          <a:bodyPr/>
-          <a:lstStyle/>
-          <a:p>
-            <a:r>
-              <a:rPr lang="en-US" dirty="0" smtClean="0"/>
-              <a:t>Conclusions</a:t>
-            </a:r>
-            <a:endParaRPr lang="nl-BE" dirty="0"/>
-          </a:p>
-        </p:txBody>
-      </p:sp>
-      <p:sp>
-        <p:nvSpPr>
-          <p:cNvPr id="3" name="Text Placeholder 2"/>
-          <p:cNvSpPr>
-            <a:spLocks noGrp="1"/>
-          </p:cNvSpPr>
-          <p:nvPr>
-            <p:ph type="body" idx="1"/>
-          </p:nvPr>
-        </p:nvSpPr>
-        <p:spPr/>
-        <p:txBody>
-          <a:bodyPr/>
-          <a:lstStyle/>
-          <a:p>
-            <a:endParaRPr lang="nl-BE"/>
-          </a:p>
-        </p:txBody>
-      </p:sp>
-      <p:sp>
-        <p:nvSpPr>
-          <p:cNvPr id="4" name="Slide Number Placeholder 3"/>
-          <p:cNvSpPr>
-            <a:spLocks noGrp="1"/>
-          </p:cNvSpPr>
-          <p:nvPr>
-            <p:ph type="sldNum" sz="quarter" idx="12"/>
-          </p:nvPr>
-        </p:nvSpPr>
-        <p:spPr/>
-        <p:txBody>
-          <a:bodyPr/>
-          <a:lstStyle/>
-          <a:p>
-            <a:fld id="{BB52A05A-A776-4391-ACD7-D6BC34D3145C}" type="slidenum">
-              <a:rPr lang="nl-BE" smtClean="0"/>
-              <a:t>56</a:t>
-            </a:fld>
-            <a:endParaRPr lang="nl-BE"/>
-          </a:p>
-        </p:txBody>
-      </p:sp>
-    </p:spTree>
-    <p:extLst>
-      <p:ext uri="{BB962C8B-B14F-4D97-AF65-F5344CB8AC3E}">
-        <p14:creationId xmlns:p14="http://schemas.microsoft.com/office/powerpoint/2010/main" val="2763237186"/>
-      </p:ext>
-    </p:extLst>
-  </p:cSld>
-  <p:clrMapOvr>
-    <a:masterClrMapping/>
-  </p:clrMapOvr>
-  <p:timing>
-    <p:tnLst>
-      <p:par>
-        <p:cTn id="1" dur="indefinite" restart="never" nodeType="tmRoot"/>
-      </p:par>
-    </p:tnLst>
-  </p:timing>
-</p:sld>
-</file>
-
 <file path=ppt/slides/slide57.xml><?xml version="1.0" encoding="utf-8"?>
 <p:sld xmlns:a="http://schemas.openxmlformats.org/drawingml/2006/main" xmlns:r="http://schemas.openxmlformats.org/officeDocument/2006/relationships" xmlns:p="http://schemas.openxmlformats.org/presentationml/2006/main">
   <p:cSld>
@@ -39406,12 +39463,12 @@
       </p:sp>
       <p:sp>
         <p:nvSpPr>
-          <p:cNvPr id="3" name="Content Placeholder 2"/>
+          <p:cNvPr id="3" name="Text Placeholder 2"/>
           <p:cNvSpPr>
             <a:spLocks noGrp="1"/>
           </p:cNvSpPr>
           <p:nvPr>
-            <p:ph idx="1"/>
+            <p:ph type="body" idx="1"/>
           </p:nvPr>
         </p:nvSpPr>
         <p:spPr/>
@@ -39419,52 +39476,7 @@
           <a:bodyPr/>
           <a:lstStyle/>
           <a:p>
-            <a:r>
-              <a:rPr lang="en-US" dirty="0" smtClean="0"/>
-              <a:t>Contributes to the scientific method</a:t>
-            </a:r>
-          </a:p>
-          <a:p>
-            <a:pPr lvl="1"/>
-            <a:r>
-              <a:rPr lang="en-US" dirty="0" smtClean="0"/>
-              <a:t>Helps ensure reproducibility</a:t>
-            </a:r>
-          </a:p>
-          <a:p>
-            <a:r>
-              <a:rPr lang="en-US" dirty="0" smtClean="0"/>
-              <a:t>Record of change</a:t>
-            </a:r>
-          </a:p>
-          <a:p>
-            <a:pPr lvl="1"/>
-            <a:r>
-              <a:rPr lang="en-US" dirty="0" smtClean="0"/>
-              <a:t>What was changed?</a:t>
-            </a:r>
-          </a:p>
-          <a:p>
-            <a:pPr lvl="1"/>
-            <a:r>
-              <a:rPr lang="en-US" dirty="0" smtClean="0"/>
-              <a:t>When was it changed?</a:t>
-            </a:r>
-          </a:p>
-          <a:p>
-            <a:pPr lvl="1"/>
-            <a:r>
-              <a:rPr lang="en-US" dirty="0" smtClean="0"/>
-              <a:t>Who changed it?</a:t>
-            </a:r>
-          </a:p>
-          <a:p>
-            <a:pPr lvl="1"/>
-            <a:r>
-              <a:rPr lang="en-US" dirty="0" smtClean="0"/>
-              <a:t>Why was it changed?</a:t>
-            </a:r>
-            <a:endParaRPr lang="nl-BE" dirty="0"/>
+            <a:endParaRPr lang="nl-BE"/>
           </a:p>
         </p:txBody>
       </p:sp>
@@ -39486,6 +39498,153 @@
             <a:fld id="{BB52A05A-A776-4391-ACD7-D6BC34D3145C}" type="slidenum">
               <a:rPr lang="nl-BE" smtClean="0"/>
               <a:t>57</a:t>
+            </a:fld>
+            <a:endParaRPr lang="nl-BE"/>
+          </a:p>
+        </p:txBody>
+      </p:sp>
+    </p:spTree>
+    <p:extLst>
+      <p:ext uri="{BB962C8B-B14F-4D97-AF65-F5344CB8AC3E}">
+        <p14:creationId xmlns:p14="http://schemas.microsoft.com/office/powerpoint/2010/main" val="2763237186"/>
+      </p:ext>
+    </p:extLst>
+  </p:cSld>
+  <p:clrMapOvr>
+    <a:masterClrMapping/>
+  </p:clrMapOvr>
+  <p:timing>
+    <p:tnLst>
+      <p:par>
+        <p:cTn id="1" dur="indefinite" restart="never" nodeType="tmRoot"/>
+      </p:par>
+    </p:tnLst>
+  </p:timing>
+</p:sld>
+</file>
+
+<file path=ppt/slides/slide58.xml><?xml version="1.0" encoding="utf-8"?>
+<p:sld xmlns:a="http://schemas.openxmlformats.org/drawingml/2006/main" xmlns:r="http://schemas.openxmlformats.org/officeDocument/2006/relationships" xmlns:p="http://schemas.openxmlformats.org/presentationml/2006/main">
+  <p:cSld>
+    <p:spTree>
+      <p:nvGrpSpPr>
+        <p:cNvPr id="1" name=""/>
+        <p:cNvGrpSpPr/>
+        <p:nvPr/>
+      </p:nvGrpSpPr>
+      <p:grpSpPr>
+        <a:xfrm>
+          <a:off x="0" y="0"/>
+          <a:ext cx="0" cy="0"/>
+          <a:chOff x="0" y="0"/>
+          <a:chExt cx="0" cy="0"/>
+        </a:xfrm>
+      </p:grpSpPr>
+      <p:sp>
+        <p:nvSpPr>
+          <p:cNvPr id="2" name="Title 1"/>
+          <p:cNvSpPr>
+            <a:spLocks noGrp="1"/>
+          </p:cNvSpPr>
+          <p:nvPr>
+            <p:ph type="title"/>
+          </p:nvPr>
+        </p:nvSpPr>
+        <p:spPr/>
+        <p:txBody>
+          <a:bodyPr/>
+          <a:lstStyle/>
+          <a:p>
+            <a:r>
+              <a:rPr lang="en-US" dirty="0" smtClean="0"/>
+              <a:t>Conclusions</a:t>
+            </a:r>
+            <a:endParaRPr lang="nl-BE" dirty="0"/>
+          </a:p>
+        </p:txBody>
+      </p:sp>
+      <p:sp>
+        <p:nvSpPr>
+          <p:cNvPr id="3" name="Content Placeholder 2"/>
+          <p:cNvSpPr>
+            <a:spLocks noGrp="1"/>
+          </p:cNvSpPr>
+          <p:nvPr>
+            <p:ph idx="1"/>
+          </p:nvPr>
+        </p:nvSpPr>
+        <p:spPr/>
+        <p:txBody>
+          <a:bodyPr/>
+          <a:lstStyle/>
+          <a:p>
+            <a:r>
+              <a:rPr lang="en-US" dirty="0" smtClean="0"/>
+              <a:t>Contributes to the scientific method</a:t>
+            </a:r>
+          </a:p>
+          <a:p>
+            <a:pPr lvl="1"/>
+            <a:r>
+              <a:rPr lang="en-US" dirty="0" smtClean="0"/>
+              <a:t>Helps ensure reproducibility</a:t>
+            </a:r>
+          </a:p>
+          <a:p>
+            <a:r>
+              <a:rPr lang="en-US" dirty="0" smtClean="0"/>
+              <a:t>Record of change</a:t>
+            </a:r>
+          </a:p>
+          <a:p>
+            <a:pPr lvl="1"/>
+            <a:r>
+              <a:rPr lang="en-US" dirty="0" smtClean="0"/>
+              <a:t>What was changed?</a:t>
+            </a:r>
+          </a:p>
+          <a:p>
+            <a:pPr lvl="1"/>
+            <a:r>
+              <a:rPr lang="en-US" dirty="0" smtClean="0"/>
+              <a:t>When was it changed?</a:t>
+            </a:r>
+          </a:p>
+          <a:p>
+            <a:pPr lvl="1"/>
+            <a:r>
+              <a:rPr lang="en-US" dirty="0" smtClean="0"/>
+              <a:t>Who changed it?</a:t>
+            </a:r>
+          </a:p>
+          <a:p>
+            <a:pPr lvl="1"/>
+            <a:r>
+              <a:rPr lang="en-US" dirty="0" smtClean="0"/>
+              <a:t>Why was it changed?</a:t>
+            </a:r>
+            <a:endParaRPr lang="nl-BE" dirty="0"/>
+          </a:p>
+        </p:txBody>
+      </p:sp>
+      <p:sp>
+        <p:nvSpPr>
+          <p:cNvPr id="4" name="Slide Number Placeholder 3"/>
+          <p:cNvSpPr>
+            <a:spLocks noGrp="1"/>
+          </p:cNvSpPr>
+          <p:nvPr>
+            <p:ph type="sldNum" sz="quarter" idx="12"/>
+          </p:nvPr>
+        </p:nvSpPr>
+        <p:spPr/>
+        <p:txBody>
+          <a:bodyPr/>
+          <a:lstStyle/>
+          <a:p>
+            <a:fld id="{BB52A05A-A776-4391-ACD7-D6BC34D3145C}" type="slidenum">
+              <a:rPr lang="nl-BE" smtClean="0"/>
+              <a:t>58</a:t>
             </a:fld>
             <a:endParaRPr lang="nl-BE"/>
           </a:p>
@@ -39793,301 +39952,6 @@
 </p:sld>
 </file>
 
-<file path=ppt/slides/slide58.xml><?xml version="1.0" encoding="utf-8"?>
-<p:sld xmlns:a="http://schemas.openxmlformats.org/drawingml/2006/main" xmlns:r="http://schemas.openxmlformats.org/officeDocument/2006/relationships" xmlns:p="http://schemas.openxmlformats.org/presentationml/2006/main">
-  <p:cSld>
-    <p:spTree>
-      <p:nvGrpSpPr>
-        <p:cNvPr id="1" name=""/>
-        <p:cNvGrpSpPr/>
-        <p:nvPr/>
-      </p:nvGrpSpPr>
-      <p:grpSpPr>
-        <a:xfrm>
-          <a:off x="0" y="0"/>
-          <a:ext cx="0" cy="0"/>
-          <a:chOff x="0" y="0"/>
-          <a:chExt cx="0" cy="0"/>
-        </a:xfrm>
-      </p:grpSpPr>
-      <p:sp>
-        <p:nvSpPr>
-          <p:cNvPr id="2" name="Title 1"/>
-          <p:cNvSpPr>
-            <a:spLocks noGrp="1"/>
-          </p:cNvSpPr>
-          <p:nvPr>
-            <p:ph type="title"/>
-          </p:nvPr>
-        </p:nvSpPr>
-        <p:spPr/>
-        <p:txBody>
-          <a:bodyPr/>
-          <a:lstStyle/>
-          <a:p>
-            <a:r>
-              <a:rPr lang="en-US" dirty="0" smtClean="0"/>
-              <a:t>References</a:t>
-            </a:r>
-            <a:endParaRPr lang="nl-BE" dirty="0"/>
-          </a:p>
-        </p:txBody>
-      </p:sp>
-      <p:sp>
-        <p:nvSpPr>
-          <p:cNvPr id="3" name="Content Placeholder 2"/>
-          <p:cNvSpPr>
-            <a:spLocks noGrp="1"/>
-          </p:cNvSpPr>
-          <p:nvPr>
-            <p:ph idx="1"/>
-          </p:nvPr>
-        </p:nvSpPr>
-        <p:spPr/>
-        <p:txBody>
-          <a:bodyPr>
-            <a:normAutofit fontScale="85000" lnSpcReduction="20000"/>
-          </a:bodyPr>
-          <a:lstStyle/>
-          <a:p>
-            <a:r>
-              <a:rPr lang="en-US" dirty="0" smtClean="0"/>
-              <a:t>Online documentation (including </a:t>
-            </a:r>
-            <a:r>
-              <a:rPr lang="en-US" dirty="0" smtClean="0"/>
-              <a:t>movies)</a:t>
-            </a:r>
-            <a:br>
-              <a:rPr lang="en-US" dirty="0" smtClean="0"/>
-            </a:br>
-            <a:r>
-              <a:rPr lang="nl-BE" sz="2300" dirty="0" smtClean="0">
-                <a:hlinkClick r:id="rId2"/>
-              </a:rPr>
-              <a:t>http</a:t>
-            </a:r>
-            <a:r>
-              <a:rPr lang="nl-BE" sz="2300" dirty="0" smtClean="0">
-                <a:hlinkClick r:id="rId2"/>
-              </a:rPr>
-              <a:t>://git-scm.com/documentation</a:t>
-            </a:r>
-            <a:endParaRPr lang="nl-BE" dirty="0" smtClean="0"/>
-          </a:p>
-          <a:p>
-            <a:r>
-              <a:rPr lang="en-US" dirty="0" err="1"/>
-              <a:t>g</a:t>
-            </a:r>
-            <a:r>
-              <a:rPr lang="en-US" dirty="0" err="1" smtClean="0"/>
-              <a:t>it</a:t>
-            </a:r>
-            <a:r>
-              <a:rPr lang="en-US" dirty="0" smtClean="0"/>
-              <a:t> web </a:t>
-            </a:r>
-            <a:r>
-              <a:rPr lang="en-US" dirty="0" smtClean="0"/>
-              <a:t>site</a:t>
-            </a:r>
-            <a:br>
-              <a:rPr lang="en-US" dirty="0" smtClean="0"/>
-            </a:br>
-            <a:r>
-              <a:rPr lang="nl-BE" sz="2400" dirty="0" smtClean="0">
-                <a:hlinkClick r:id="rId3"/>
-              </a:rPr>
-              <a:t>http</a:t>
-            </a:r>
-            <a:r>
-              <a:rPr lang="nl-BE" sz="2400" dirty="0" smtClean="0">
-                <a:hlinkClick r:id="rId3"/>
-              </a:rPr>
-              <a:t>://git-scm.com</a:t>
-            </a:r>
-            <a:r>
-              <a:rPr lang="nl-BE" sz="2400" dirty="0" smtClean="0">
-                <a:hlinkClick r:id="rId3"/>
-              </a:rPr>
-              <a:t>/</a:t>
-            </a:r>
-            <a:endParaRPr lang="nl-BE" dirty="0" smtClean="0"/>
-          </a:p>
-          <a:p>
-            <a:r>
-              <a:rPr lang="nl-BE" dirty="0" smtClean="0"/>
-              <a:t>Pro git </a:t>
-            </a:r>
-            <a:r>
-              <a:rPr lang="nl-BE" dirty="0"/>
-              <a:t>online book</a:t>
-            </a:r>
-            <a:br>
-              <a:rPr lang="nl-BE" dirty="0"/>
-            </a:br>
-            <a:r>
-              <a:rPr lang="nl-BE" sz="2100" dirty="0">
-                <a:hlinkClick r:id="rId4"/>
-              </a:rPr>
-              <a:t>https://git-scm.com/book/en/v2</a:t>
-            </a:r>
-            <a:r>
-              <a:rPr lang="nl-BE" sz="2100" dirty="0" smtClean="0">
-                <a:hlinkClick r:id="rId4"/>
-              </a:rPr>
-              <a:t>/</a:t>
-            </a:r>
-            <a:r>
-              <a:rPr lang="nl-BE" sz="2100" dirty="0" smtClean="0"/>
-              <a:t> </a:t>
-            </a:r>
-            <a:endParaRPr lang="nl-BE" dirty="0" smtClean="0"/>
-          </a:p>
-          <a:p>
-            <a:r>
-              <a:rPr lang="en-US" dirty="0" smtClean="0"/>
-              <a:t>Why (the author thinks) you should switch to </a:t>
-            </a:r>
-            <a:r>
-              <a:rPr lang="en-US" dirty="0" err="1" smtClean="0"/>
-              <a:t>git</a:t>
-            </a:r>
-            <a:r>
-              <a:rPr lang="en-US" dirty="0" smtClean="0"/>
-              <a:t/>
-            </a:r>
-            <a:br>
-              <a:rPr lang="en-US" dirty="0" smtClean="0"/>
-            </a:br>
-            <a:r>
-              <a:rPr lang="nl-BE" sz="2300" dirty="0" smtClean="0">
-                <a:hlinkClick r:id="rId5"/>
-              </a:rPr>
-              <a:t>http</a:t>
-            </a:r>
-            <a:r>
-              <a:rPr lang="nl-BE" sz="2300" dirty="0" smtClean="0">
-                <a:hlinkClick r:id="rId5"/>
-              </a:rPr>
-              <a:t>://blog.teamtreehouse.com/why-you-should-switch-from-subversion-to-git</a:t>
-            </a:r>
-            <a:endParaRPr lang="nl-BE" dirty="0" smtClean="0"/>
-          </a:p>
-          <a:p>
-            <a:r>
-              <a:rPr lang="nl-BE" dirty="0" smtClean="0"/>
-              <a:t>Overview of frequently used git </a:t>
-            </a:r>
-            <a:r>
-              <a:rPr lang="nl-BE" dirty="0" smtClean="0"/>
-              <a:t>workflows</a:t>
-            </a:r>
-            <a:br>
-              <a:rPr lang="nl-BE" dirty="0" smtClean="0"/>
-            </a:br>
-            <a:r>
-              <a:rPr lang="en-US" sz="2100" dirty="0" smtClean="0">
-                <a:hlinkClick r:id="rId6"/>
-              </a:rPr>
-              <a:t>https</a:t>
-            </a:r>
-            <a:r>
-              <a:rPr lang="en-US" sz="2100" dirty="0">
-                <a:hlinkClick r:id="rId6"/>
-              </a:rPr>
-              <a:t>://</a:t>
-            </a:r>
-            <a:r>
-              <a:rPr lang="en-US" sz="2100" dirty="0" smtClean="0">
-                <a:hlinkClick r:id="rId6"/>
-              </a:rPr>
-              <a:t>www.atlassian.com/git/workflows</a:t>
-            </a:r>
-            <a:endParaRPr lang="en-US" dirty="0" smtClean="0"/>
-          </a:p>
-          <a:p>
-            <a:r>
-              <a:rPr lang="nl-BE" dirty="0" smtClean="0"/>
-              <a:t>Blog post on "good" commit </a:t>
-            </a:r>
-            <a:r>
-              <a:rPr lang="nl-BE" dirty="0" smtClean="0"/>
-              <a:t>messages</a:t>
-            </a:r>
-            <a:br>
-              <a:rPr lang="nl-BE" dirty="0" smtClean="0"/>
-            </a:br>
-            <a:r>
-              <a:rPr lang="nl-BE" sz="2100" dirty="0" smtClean="0">
-                <a:hlinkClick r:id="rId7"/>
-              </a:rPr>
-              <a:t>https</a:t>
-            </a:r>
-            <a:r>
-              <a:rPr lang="nl-BE" sz="2100" dirty="0">
-                <a:hlinkClick r:id="rId7"/>
-              </a:rPr>
-              <a:t>://chris.beams.io/posts/git-commit</a:t>
-            </a:r>
-            <a:r>
-              <a:rPr lang="nl-BE" sz="2100" dirty="0" smtClean="0">
-                <a:hlinkClick r:id="rId7"/>
-              </a:rPr>
-              <a:t>/</a:t>
-            </a:r>
-            <a:r>
-              <a:rPr lang="nl-BE" sz="2100" dirty="0" smtClean="0"/>
-              <a:t> </a:t>
-            </a:r>
-            <a:endParaRPr lang="nl-BE" dirty="0" smtClean="0"/>
-          </a:p>
-        </p:txBody>
-      </p:sp>
-      <p:sp>
-        <p:nvSpPr>
-          <p:cNvPr id="4" name="Slide Number Placeholder 3"/>
-          <p:cNvSpPr>
-            <a:spLocks noGrp="1"/>
-          </p:cNvSpPr>
-          <p:nvPr>
-            <p:ph type="sldNum" sz="quarter" idx="12"/>
-          </p:nvPr>
-        </p:nvSpPr>
-        <p:spPr/>
-        <p:txBody>
-          <a:bodyPr/>
-          <a:lstStyle/>
-          <a:p>
-            <a:fld id="{BB52A05A-A776-4391-ACD7-D6BC34D3145C}" type="slidenum">
-              <a:rPr lang="nl-BE" smtClean="0"/>
-              <a:t>58</a:t>
-            </a:fld>
-            <a:endParaRPr lang="nl-BE"/>
-          </a:p>
-        </p:txBody>
-      </p:sp>
-    </p:spTree>
-    <p:extLst>
-      <p:ext uri="{BB962C8B-B14F-4D97-AF65-F5344CB8AC3E}">
-        <p14:creationId xmlns:p14="http://schemas.microsoft.com/office/powerpoint/2010/main" val="2976133738"/>
-      </p:ext>
-    </p:extLst>
-  </p:cSld>
-  <p:clrMapOvr>
-    <a:masterClrMapping/>
-  </p:clrMapOvr>
-  <p:timing>
-    <p:tnLst>
-      <p:par>
-        <p:cTn id="1" dur="indefinite" restart="never" nodeType="tmRoot"/>
-      </p:par>
-    </p:tnLst>
-  </p:timing>
-</p:sld>
-</file>
-
 <file path=ppt/slides/slide59.xml><?xml version="1.0" encoding="utf-8"?>
 <p:sld xmlns:a="http://schemas.openxmlformats.org/drawingml/2006/main" xmlns:r="http://schemas.openxmlformats.org/officeDocument/2006/relationships" xmlns:p="http://schemas.openxmlformats.org/presentationml/2006/main">
   <p:cSld>
@@ -40122,7 +39986,7 @@
           <a:p>
             <a:r>
               <a:rPr lang="en-US" dirty="0" smtClean="0"/>
-              <a:t>Software &amp; tools</a:t>
+              <a:t>References</a:t>
             </a:r>
             <a:endParaRPr lang="nl-BE" dirty="0"/>
           </a:p>
@@ -40138,222 +40002,205 @@
             <p:ph idx="1"/>
           </p:nvPr>
         </p:nvSpPr>
-        <p:spPr>
-          <a:xfrm>
-            <a:off x="457200" y="1600201"/>
-            <a:ext cx="8229600" cy="5069159"/>
-          </a:xfrm>
-        </p:spPr>
+        <p:spPr/>
         <p:txBody>
           <a:bodyPr>
-            <a:normAutofit fontScale="92500" lnSpcReduction="20000"/>
+            <a:normAutofit fontScale="85000" lnSpcReduction="20000"/>
           </a:bodyPr>
           <a:lstStyle/>
           <a:p>
             <a:r>
+              <a:rPr lang="en-US" dirty="0" smtClean="0"/>
+              <a:t>Online documentation (including </a:t>
+            </a:r>
+            <a:r>
+              <a:rPr lang="en-US" dirty="0" smtClean="0"/>
+              <a:t>movies)</a:t>
+            </a:r>
+            <a:br>
+              <a:rPr lang="en-US" dirty="0" smtClean="0"/>
+            </a:br>
+            <a:r>
+              <a:rPr lang="nl-BE" sz="2300" dirty="0" smtClean="0">
+                <a:hlinkClick r:id="rId2"/>
+              </a:rPr>
+              <a:t>http</a:t>
+            </a:r>
+            <a:r>
+              <a:rPr lang="nl-BE" sz="2300" dirty="0" smtClean="0">
+                <a:hlinkClick r:id="rId2"/>
+              </a:rPr>
+              <a:t>://git-scm.com/documentation</a:t>
+            </a:r>
+            <a:endParaRPr lang="nl-BE" dirty="0" smtClean="0"/>
+          </a:p>
+          <a:p>
+            <a:r>
+              <a:rPr lang="en-US" dirty="0" err="1"/>
+              <a:t>g</a:t>
+            </a:r>
+            <a:r>
+              <a:rPr lang="en-US" dirty="0" err="1" smtClean="0"/>
+              <a:t>it</a:t>
+            </a:r>
+            <a:r>
+              <a:rPr lang="en-US" dirty="0" smtClean="0"/>
+              <a:t> web </a:t>
+            </a:r>
+            <a:r>
+              <a:rPr lang="en-US" dirty="0" smtClean="0"/>
+              <a:t>site</a:t>
+            </a:r>
+            <a:br>
+              <a:rPr lang="en-US" dirty="0" smtClean="0"/>
+            </a:br>
+            <a:r>
+              <a:rPr lang="nl-BE" sz="2400" dirty="0" smtClean="0">
+                <a:hlinkClick r:id="rId3"/>
+              </a:rPr>
+              <a:t>http</a:t>
+            </a:r>
+            <a:r>
+              <a:rPr lang="nl-BE" sz="2400" dirty="0" smtClean="0">
+                <a:hlinkClick r:id="rId3"/>
+              </a:rPr>
+              <a:t>://git-scm.com</a:t>
+            </a:r>
+            <a:r>
+              <a:rPr lang="nl-BE" sz="2400" dirty="0" smtClean="0">
+                <a:hlinkClick r:id="rId3"/>
+              </a:rPr>
+              <a:t>/</a:t>
+            </a:r>
+            <a:endParaRPr lang="nl-BE" dirty="0" smtClean="0"/>
+          </a:p>
+          <a:p>
+            <a:r>
+              <a:rPr lang="nl-BE" dirty="0" smtClean="0"/>
+              <a:t>Pro git </a:t>
+            </a:r>
+            <a:r>
+              <a:rPr lang="nl-BE" dirty="0"/>
+              <a:t>online book</a:t>
+            </a:r>
+            <a:br>
+              <a:rPr lang="nl-BE" dirty="0"/>
+            </a:br>
+            <a:r>
+              <a:rPr lang="nl-BE" sz="2100" dirty="0">
+                <a:hlinkClick r:id="rId4"/>
+              </a:rPr>
+              <a:t>https://git-scm.com/book/en/v2</a:t>
+            </a:r>
+            <a:r>
+              <a:rPr lang="nl-BE" sz="2100" dirty="0" smtClean="0">
+                <a:hlinkClick r:id="rId4"/>
+              </a:rPr>
+              <a:t>/</a:t>
+            </a:r>
+            <a:r>
+              <a:rPr lang="nl-BE" sz="2100" dirty="0" smtClean="0"/>
+              <a:t> </a:t>
+            </a:r>
+            <a:endParaRPr lang="nl-BE" dirty="0" smtClean="0"/>
+          </a:p>
+          <a:p>
+            <a:r>
+              <a:rPr lang="en-US" dirty="0" smtClean="0"/>
+              <a:t>Why (the author thinks) you should switch to </a:t>
+            </a:r>
+            <a:r>
               <a:rPr lang="en-US" dirty="0" err="1" smtClean="0"/>
               <a:t>git</a:t>
             </a:r>
             <a:r>
               <a:rPr lang="en-US" dirty="0" smtClean="0"/>
-              <a:t> comes with most Linux distributions</a:t>
-            </a:r>
-          </a:p>
-          <a:p>
-            <a:r>
+              <a:t/>
+            </a:r>
+            <a:br>
               <a:rPr lang="en-US" dirty="0" smtClean="0"/>
-              <a:t>Website &amp; downloads: </a:t>
-            </a:r>
-            <a:r>
-              <a:rPr lang="en-US" dirty="0">
-                <a:hlinkClick r:id="rId3"/>
-              </a:rPr>
-              <a:t>https://git-scm.com</a:t>
-            </a:r>
-            <a:r>
-              <a:rPr lang="en-US" dirty="0" smtClean="0">
-                <a:hlinkClick r:id="rId3"/>
+            </a:br>
+            <a:r>
+              <a:rPr lang="nl-BE" sz="2300" dirty="0" smtClean="0">
+                <a:hlinkClick r:id="rId5"/>
+              </a:rPr>
+              <a:t>http</a:t>
+            </a:r>
+            <a:r>
+              <a:rPr lang="nl-BE" sz="2300" dirty="0" smtClean="0">
+                <a:hlinkClick r:id="rId5"/>
+              </a:rPr>
+              <a:t>://blog.teamtreehouse.com/why-you-should-switch-from-subversion-to-git</a:t>
+            </a:r>
+            <a:endParaRPr lang="nl-BE" dirty="0" smtClean="0"/>
+          </a:p>
+          <a:p>
+            <a:r>
+              <a:rPr lang="nl-BE" dirty="0" smtClean="0"/>
+              <a:t>Overview of frequently used git </a:t>
+            </a:r>
+            <a:r>
+              <a:rPr lang="nl-BE" dirty="0" smtClean="0"/>
+              <a:t>workflows</a:t>
+            </a:r>
+            <a:br>
+              <a:rPr lang="nl-BE" dirty="0" smtClean="0"/>
+            </a:br>
+            <a:r>
+              <a:rPr lang="en-US" sz="2100" dirty="0" smtClean="0">
+                <a:hlinkClick r:id="rId6"/>
+              </a:rPr>
+              <a:t>https</a:t>
+            </a:r>
+            <a:r>
+              <a:rPr lang="en-US" sz="2100" dirty="0">
+                <a:hlinkClick r:id="rId6"/>
+              </a:rPr>
+              <a:t>://</a:t>
+            </a:r>
+            <a:r>
+              <a:rPr lang="en-US" sz="2100" dirty="0" smtClean="0">
+                <a:hlinkClick r:id="rId6"/>
+              </a:rPr>
+              <a:t>www.atlassian.com/git/workflows</a:t>
+            </a:r>
+            <a:endParaRPr lang="en-US" dirty="0" smtClean="0"/>
+          </a:p>
+          <a:p>
+            <a:r>
+              <a:rPr lang="nl-BE" dirty="0" smtClean="0"/>
+              <a:t>Blog post on "good" commit </a:t>
+            </a:r>
+            <a:r>
+              <a:rPr lang="nl-BE" dirty="0" smtClean="0"/>
+              <a:t>messages</a:t>
+            </a:r>
+            <a:br>
+              <a:rPr lang="nl-BE" dirty="0" smtClean="0"/>
+            </a:br>
+            <a:r>
+              <a:rPr lang="nl-BE" sz="2100" dirty="0" smtClean="0">
+                <a:hlinkClick r:id="rId7"/>
+              </a:rPr>
+              <a:t>https</a:t>
+            </a:r>
+            <a:r>
+              <a:rPr lang="nl-BE" sz="2100" dirty="0">
+                <a:hlinkClick r:id="rId7"/>
+              </a:rPr>
+              <a:t>://chris.beams.io/posts/git-commit</a:t>
+            </a:r>
+            <a:r>
+              <a:rPr lang="nl-BE" sz="2100" dirty="0" smtClean="0">
+                <a:hlinkClick r:id="rId7"/>
               </a:rPr>
               <a:t>/</a:t>
             </a:r>
             <a:r>
-              <a:rPr lang="en-US" dirty="0" smtClean="0"/>
+              <a:rPr lang="nl-BE" sz="2100" dirty="0" smtClean="0"/>
               <a:t> </a:t>
             </a:r>
-          </a:p>
-          <a:p>
-            <a:r>
-              <a:rPr lang="en-US" dirty="0" smtClean="0"/>
-              <a:t>Desktop clients</a:t>
-            </a:r>
-          </a:p>
-          <a:p>
-            <a:pPr lvl="1"/>
-            <a:r>
-              <a:rPr lang="nl-BE" dirty="0"/>
-              <a:t>GitHub Desktop: </a:t>
-            </a:r>
-            <a:r>
-              <a:rPr lang="nl-BE" dirty="0">
-                <a:hlinkClick r:id="rId4"/>
-              </a:rPr>
-              <a:t>https://desktop.github.com</a:t>
-            </a:r>
-            <a:r>
-              <a:rPr lang="nl-BE" dirty="0" smtClean="0">
-                <a:hlinkClick r:id="rId4"/>
-              </a:rPr>
-              <a:t>/</a:t>
-            </a:r>
-            <a:r>
-              <a:rPr lang="nl-BE" dirty="0" smtClean="0"/>
-              <a:t> (Windows/</a:t>
-            </a:r>
-            <a:r>
-              <a:rPr lang="nl-BE" dirty="0" err="1" smtClean="0"/>
-              <a:t>MacOS</a:t>
-            </a:r>
-            <a:r>
-              <a:rPr lang="nl-BE" dirty="0" smtClean="0"/>
-              <a:t> X)</a:t>
-            </a:r>
-          </a:p>
-          <a:p>
-            <a:pPr lvl="1"/>
-            <a:r>
-              <a:rPr lang="en-US" dirty="0" err="1" smtClean="0"/>
-              <a:t>TortoiseGit</a:t>
-            </a:r>
-            <a:r>
-              <a:rPr lang="en-US" dirty="0"/>
-              <a:t>: </a:t>
-            </a:r>
-            <a:r>
-              <a:rPr lang="en-US" dirty="0">
-                <a:hlinkClick r:id="rId5"/>
-              </a:rPr>
-              <a:t>https://tortoisegit.org</a:t>
-            </a:r>
-            <a:r>
-              <a:rPr lang="en-US" dirty="0" smtClean="0">
-                <a:hlinkClick r:id="rId5"/>
-              </a:rPr>
-              <a:t>/</a:t>
-            </a:r>
-            <a:r>
-              <a:rPr lang="en-US" dirty="0" smtClean="0"/>
-              <a:t> (Windows)</a:t>
-            </a:r>
-          </a:p>
-          <a:p>
-            <a:pPr lvl="1"/>
-            <a:r>
-              <a:rPr lang="en-US" dirty="0" err="1"/>
-              <a:t>g</a:t>
-            </a:r>
-            <a:r>
-              <a:rPr lang="en-US" dirty="0" err="1" smtClean="0"/>
-              <a:t>it</a:t>
-            </a:r>
-            <a:r>
-              <a:rPr lang="en-US" dirty="0" smtClean="0"/>
-              <a:t>-cola</a:t>
-            </a:r>
-            <a:r>
-              <a:rPr lang="en-US" dirty="0"/>
-              <a:t>: </a:t>
-            </a:r>
-            <a:r>
-              <a:rPr lang="en-US" dirty="0">
-                <a:hlinkClick r:id="rId6"/>
-              </a:rPr>
-              <a:t>http://git-cola.github.io</a:t>
-            </a:r>
-            <a:r>
-              <a:rPr lang="en-US" dirty="0" smtClean="0">
-                <a:hlinkClick r:id="rId6"/>
-              </a:rPr>
-              <a:t>/</a:t>
-            </a:r>
-            <a:r>
-              <a:rPr lang="en-US" dirty="0" smtClean="0"/>
-              <a:t> (Linux/Windows/</a:t>
-            </a:r>
-            <a:r>
-              <a:rPr lang="en-US" dirty="0" err="1" smtClean="0"/>
-              <a:t>MacOS</a:t>
-            </a:r>
-            <a:r>
-              <a:rPr lang="en-US" dirty="0" smtClean="0"/>
-              <a:t> X)</a:t>
-            </a:r>
-          </a:p>
-          <a:p>
-            <a:r>
-              <a:rPr lang="en-US" dirty="0" err="1" smtClean="0"/>
-              <a:t>vcsh</a:t>
-            </a:r>
-            <a:r>
-              <a:rPr lang="en-US" dirty="0" smtClean="0"/>
-              <a:t>, </a:t>
-            </a:r>
-            <a:r>
-              <a:rPr lang="en-US" dirty="0"/>
-              <a:t>version control for configuration </a:t>
-            </a:r>
-            <a:r>
-              <a:rPr lang="en-US" dirty="0" smtClean="0"/>
-              <a:t>files: </a:t>
-            </a:r>
-            <a:r>
-              <a:rPr lang="en-US" dirty="0">
-                <a:hlinkClick r:id="rId7"/>
-              </a:rPr>
-              <a:t>https://</a:t>
-            </a:r>
-            <a:r>
-              <a:rPr lang="en-US" dirty="0" smtClean="0">
-                <a:hlinkClick r:id="rId7"/>
-              </a:rPr>
-              <a:t>github.com/RichiH/vcsh</a:t>
-            </a:r>
-            <a:r>
-              <a:rPr lang="en-US" dirty="0" smtClean="0"/>
-              <a:t> (Linux)</a:t>
-            </a:r>
-          </a:p>
-          <a:p>
-            <a:r>
-              <a:rPr lang="en-US" dirty="0" smtClean="0"/>
-              <a:t>git-prompt.sh, show </a:t>
-            </a:r>
-            <a:r>
-              <a:rPr lang="en-US" dirty="0" err="1" smtClean="0"/>
-              <a:t>git</a:t>
-            </a:r>
-            <a:r>
-              <a:rPr lang="en-US" dirty="0" smtClean="0"/>
-              <a:t> info in command line prompt: </a:t>
-            </a:r>
-            <a:r>
-              <a:rPr lang="en-US" dirty="0">
-                <a:hlinkClick r:id="rId8"/>
-              </a:rPr>
-              <a:t>http://git-prompt.sh</a:t>
-            </a:r>
-            <a:r>
-              <a:rPr lang="en-US" dirty="0" smtClean="0">
-                <a:hlinkClick r:id="rId8"/>
-              </a:rPr>
-              <a:t>/</a:t>
-            </a:r>
-            <a:r>
-              <a:rPr lang="en-US" dirty="0" smtClean="0"/>
-              <a:t> (Linux)</a:t>
-            </a:r>
-          </a:p>
-          <a:p>
-            <a:endParaRPr lang="nl-BE" dirty="0"/>
+            <a:endParaRPr lang="nl-BE" dirty="0" smtClean="0"/>
           </a:p>
         </p:txBody>
       </p:sp>
@@ -40383,7 +40230,7 @@
     </p:spTree>
     <p:extLst>
       <p:ext uri="{BB962C8B-B14F-4D97-AF65-F5344CB8AC3E}">
-        <p14:creationId xmlns:p14="http://schemas.microsoft.com/office/powerpoint/2010/main" val="3855217261"/>
+        <p14:creationId xmlns:p14="http://schemas.microsoft.com/office/powerpoint/2010/main" val="2976133738"/>
       </p:ext>
     </p:extLst>
   </p:cSld>
@@ -40963,6 +40810,318 @@
           <a:p>
             <a:r>
               <a:rPr lang="en-US" dirty="0" smtClean="0"/>
+              <a:t>Software &amp; tools</a:t>
+            </a:r>
+            <a:endParaRPr lang="nl-BE" dirty="0"/>
+          </a:p>
+        </p:txBody>
+      </p:sp>
+      <p:sp>
+        <p:nvSpPr>
+          <p:cNvPr id="3" name="Content Placeholder 2"/>
+          <p:cNvSpPr>
+            <a:spLocks noGrp="1"/>
+          </p:cNvSpPr>
+          <p:nvPr>
+            <p:ph idx="1"/>
+          </p:nvPr>
+        </p:nvSpPr>
+        <p:spPr>
+          <a:xfrm>
+            <a:off x="457200" y="1600201"/>
+            <a:ext cx="8229600" cy="5069159"/>
+          </a:xfrm>
+        </p:spPr>
+        <p:txBody>
+          <a:bodyPr>
+            <a:normAutofit fontScale="92500" lnSpcReduction="20000"/>
+          </a:bodyPr>
+          <a:lstStyle/>
+          <a:p>
+            <a:r>
+              <a:rPr lang="en-US" dirty="0" err="1" smtClean="0"/>
+              <a:t>git</a:t>
+            </a:r>
+            <a:r>
+              <a:rPr lang="en-US" dirty="0" smtClean="0"/>
+              <a:t> comes with most Linux distributions</a:t>
+            </a:r>
+          </a:p>
+          <a:p>
+            <a:r>
+              <a:rPr lang="en-US" dirty="0" smtClean="0"/>
+              <a:t>Website &amp; downloads: </a:t>
+            </a:r>
+            <a:r>
+              <a:rPr lang="en-US" dirty="0">
+                <a:hlinkClick r:id="rId3"/>
+              </a:rPr>
+              <a:t>https://git-scm.com</a:t>
+            </a:r>
+            <a:r>
+              <a:rPr lang="en-US" dirty="0" smtClean="0">
+                <a:hlinkClick r:id="rId3"/>
+              </a:rPr>
+              <a:t>/</a:t>
+            </a:r>
+            <a:r>
+              <a:rPr lang="en-US" dirty="0" smtClean="0"/>
+              <a:t> </a:t>
+            </a:r>
+          </a:p>
+          <a:p>
+            <a:r>
+              <a:rPr lang="en-US" dirty="0" smtClean="0"/>
+              <a:t>Desktop clients</a:t>
+            </a:r>
+          </a:p>
+          <a:p>
+            <a:pPr lvl="1"/>
+            <a:r>
+              <a:rPr lang="nl-BE" dirty="0"/>
+              <a:t>GitHub Desktop: </a:t>
+            </a:r>
+            <a:r>
+              <a:rPr lang="nl-BE" dirty="0">
+                <a:hlinkClick r:id="rId4"/>
+              </a:rPr>
+              <a:t>https://desktop.github.com</a:t>
+            </a:r>
+            <a:r>
+              <a:rPr lang="nl-BE" dirty="0" smtClean="0">
+                <a:hlinkClick r:id="rId4"/>
+              </a:rPr>
+              <a:t>/</a:t>
+            </a:r>
+            <a:r>
+              <a:rPr lang="nl-BE" dirty="0" smtClean="0"/>
+              <a:t> (Windows/</a:t>
+            </a:r>
+            <a:r>
+              <a:rPr lang="nl-BE" dirty="0" err="1" smtClean="0"/>
+              <a:t>MacOS</a:t>
+            </a:r>
+            <a:r>
+              <a:rPr lang="nl-BE" dirty="0" smtClean="0"/>
+              <a:t> X)</a:t>
+            </a:r>
+          </a:p>
+          <a:p>
+            <a:pPr lvl="1"/>
+            <a:r>
+              <a:rPr lang="en-US" dirty="0" err="1" smtClean="0"/>
+              <a:t>TortoiseGit</a:t>
+            </a:r>
+            <a:r>
+              <a:rPr lang="en-US" dirty="0"/>
+              <a:t>: </a:t>
+            </a:r>
+            <a:r>
+              <a:rPr lang="en-US" dirty="0">
+                <a:hlinkClick r:id="rId5"/>
+              </a:rPr>
+              <a:t>https://tortoisegit.org</a:t>
+            </a:r>
+            <a:r>
+              <a:rPr lang="en-US" dirty="0" smtClean="0">
+                <a:hlinkClick r:id="rId5"/>
+              </a:rPr>
+              <a:t>/</a:t>
+            </a:r>
+            <a:r>
+              <a:rPr lang="en-US" dirty="0" smtClean="0"/>
+              <a:t> (Windows)</a:t>
+            </a:r>
+          </a:p>
+          <a:p>
+            <a:pPr lvl="1"/>
+            <a:r>
+              <a:rPr lang="en-US" dirty="0" err="1"/>
+              <a:t>g</a:t>
+            </a:r>
+            <a:r>
+              <a:rPr lang="en-US" dirty="0" err="1" smtClean="0"/>
+              <a:t>it</a:t>
+            </a:r>
+            <a:r>
+              <a:rPr lang="en-US" dirty="0" smtClean="0"/>
+              <a:t>-cola</a:t>
+            </a:r>
+            <a:r>
+              <a:rPr lang="en-US" dirty="0"/>
+              <a:t>: </a:t>
+            </a:r>
+            <a:r>
+              <a:rPr lang="en-US" dirty="0">
+                <a:hlinkClick r:id="rId6"/>
+              </a:rPr>
+              <a:t>http://git-cola.github.io</a:t>
+            </a:r>
+            <a:r>
+              <a:rPr lang="en-US" dirty="0" smtClean="0">
+                <a:hlinkClick r:id="rId6"/>
+              </a:rPr>
+              <a:t>/</a:t>
+            </a:r>
+            <a:r>
+              <a:rPr lang="en-US" dirty="0" smtClean="0"/>
+              <a:t> (Linux/Windows/</a:t>
+            </a:r>
+            <a:r>
+              <a:rPr lang="en-US" dirty="0" err="1" smtClean="0"/>
+              <a:t>MacOS</a:t>
+            </a:r>
+            <a:r>
+              <a:rPr lang="en-US" dirty="0" smtClean="0"/>
+              <a:t> X)</a:t>
+            </a:r>
+          </a:p>
+          <a:p>
+            <a:r>
+              <a:rPr lang="en-US" dirty="0" err="1" smtClean="0"/>
+              <a:t>vcsh</a:t>
+            </a:r>
+            <a:r>
+              <a:rPr lang="en-US" dirty="0" smtClean="0"/>
+              <a:t>, </a:t>
+            </a:r>
+            <a:r>
+              <a:rPr lang="en-US" dirty="0"/>
+              <a:t>version control for configuration </a:t>
+            </a:r>
+            <a:r>
+              <a:rPr lang="en-US" dirty="0" smtClean="0"/>
+              <a:t>files: </a:t>
+            </a:r>
+            <a:r>
+              <a:rPr lang="en-US" dirty="0">
+                <a:hlinkClick r:id="rId7"/>
+              </a:rPr>
+              <a:t>https://</a:t>
+            </a:r>
+            <a:r>
+              <a:rPr lang="en-US" dirty="0" smtClean="0">
+                <a:hlinkClick r:id="rId7"/>
+              </a:rPr>
+              <a:t>github.com/RichiH/vcsh</a:t>
+            </a:r>
+            <a:r>
+              <a:rPr lang="en-US" dirty="0" smtClean="0"/>
+              <a:t> (Linux)</a:t>
+            </a:r>
+          </a:p>
+          <a:p>
+            <a:r>
+              <a:rPr lang="en-US" dirty="0" smtClean="0"/>
+              <a:t>git-prompt.sh, show </a:t>
+            </a:r>
+            <a:r>
+              <a:rPr lang="en-US" dirty="0" err="1" smtClean="0"/>
+              <a:t>git</a:t>
+            </a:r>
+            <a:r>
+              <a:rPr lang="en-US" dirty="0" smtClean="0"/>
+              <a:t> info in command line prompt: </a:t>
+            </a:r>
+            <a:r>
+              <a:rPr lang="en-US" dirty="0">
+                <a:hlinkClick r:id="rId8"/>
+              </a:rPr>
+              <a:t>http://git-prompt.sh</a:t>
+            </a:r>
+            <a:r>
+              <a:rPr lang="en-US" dirty="0" smtClean="0">
+                <a:hlinkClick r:id="rId8"/>
+              </a:rPr>
+              <a:t>/</a:t>
+            </a:r>
+            <a:r>
+              <a:rPr lang="en-US" dirty="0" smtClean="0"/>
+              <a:t> (Linux)</a:t>
+            </a:r>
+          </a:p>
+          <a:p>
+            <a:endParaRPr lang="nl-BE" dirty="0"/>
+          </a:p>
+        </p:txBody>
+      </p:sp>
+      <p:sp>
+        <p:nvSpPr>
+          <p:cNvPr id="4" name="Slide Number Placeholder 3"/>
+          <p:cNvSpPr>
+            <a:spLocks noGrp="1"/>
+          </p:cNvSpPr>
+          <p:nvPr>
+            <p:ph type="sldNum" sz="quarter" idx="12"/>
+          </p:nvPr>
+        </p:nvSpPr>
+        <p:spPr/>
+        <p:txBody>
+          <a:bodyPr/>
+          <a:lstStyle/>
+          <a:p>
+            <a:fld id="{BB52A05A-A776-4391-ACD7-D6BC34D3145C}" type="slidenum">
+              <a:rPr lang="nl-BE" smtClean="0"/>
+              <a:t>60</a:t>
+            </a:fld>
+            <a:endParaRPr lang="nl-BE"/>
+          </a:p>
+        </p:txBody>
+      </p:sp>
+    </p:spTree>
+    <p:extLst>
+      <p:ext uri="{BB962C8B-B14F-4D97-AF65-F5344CB8AC3E}">
+        <p14:creationId xmlns:p14="http://schemas.microsoft.com/office/powerpoint/2010/main" val="3855217261"/>
+      </p:ext>
+    </p:extLst>
+  </p:cSld>
+  <p:clrMapOvr>
+    <a:masterClrMapping/>
+  </p:clrMapOvr>
+  <p:timing>
+    <p:tnLst>
+      <p:par>
+        <p:cTn id="1" dur="indefinite" restart="never" nodeType="tmRoot"/>
+      </p:par>
+    </p:tnLst>
+  </p:timing>
+</p:sld>
+</file>
+
+<file path=ppt/slides/slide61.xml><?xml version="1.0" encoding="utf-8"?>
+<p:sld xmlns:a="http://schemas.openxmlformats.org/drawingml/2006/main" xmlns:r="http://schemas.openxmlformats.org/officeDocument/2006/relationships" xmlns:p="http://schemas.openxmlformats.org/presentationml/2006/main">
+  <p:cSld>
+    <p:spTree>
+      <p:nvGrpSpPr>
+        <p:cNvPr id="1" name=""/>
+        <p:cNvGrpSpPr/>
+        <p:nvPr/>
+      </p:nvGrpSpPr>
+      <p:grpSpPr>
+        <a:xfrm>
+          <a:off x="0" y="0"/>
+          <a:ext cx="0" cy="0"/>
+          <a:chOff x="0" y="0"/>
+          <a:chExt cx="0" cy="0"/>
+        </a:xfrm>
+      </p:grpSpPr>
+      <p:sp>
+        <p:nvSpPr>
+          <p:cNvPr id="2" name="Title 1"/>
+          <p:cNvSpPr>
+            <a:spLocks noGrp="1"/>
+          </p:cNvSpPr>
+          <p:nvPr>
+            <p:ph type="title"/>
+          </p:nvPr>
+        </p:nvSpPr>
+        <p:spPr/>
+        <p:txBody>
+          <a:bodyPr/>
+          <a:lstStyle/>
+          <a:p>
+            <a:r>
+              <a:rPr lang="en-US" dirty="0" smtClean="0"/>
               <a:t>Services</a:t>
             </a:r>
             <a:endParaRPr lang="nl-BE" dirty="0"/>
@@ -41088,7 +41247,7 @@
           <a:p>
             <a:fld id="{BB52A05A-A776-4391-ACD7-D6BC34D3145C}" type="slidenum">
               <a:rPr lang="nl-BE" smtClean="0"/>
-              <a:t>60</a:t>
+              <a:t>61</a:t>
             </a:fld>
             <a:endParaRPr lang="nl-BE"/>
           </a:p>

</xml_diff>

<commit_message>
Make sample commit messages consistent with rules
</commit_message>
<xml_diff>
--- a/LinuxTools/VersionControl/version_control_git.pptx
+++ b/LinuxTools/VersionControl/version_control_git.pptx
@@ -8721,7 +8721,7 @@
         <p:spPr>
           <a:xfrm>
             <a:off x="1259632" y="4869160"/>
-            <a:ext cx="7353295" cy="369332"/>
+            <a:ext cx="6250429" cy="369332"/>
           </a:xfrm>
           <a:prstGeom prst="rect">
             <a:avLst/>
@@ -8744,50 +8744,19 @@
                 <a:latin typeface="Courier New" pitchFamily="49" charset="0"/>
                 <a:cs typeface="Courier New" pitchFamily="49" charset="0"/>
               </a:rPr>
-              <a:t>$ git </a:t>
-            </a:r>
-            <a:r>
-              <a:rPr lang="nl-BE" dirty="0" err="1" smtClean="0">
-                <a:latin typeface="Courier New" pitchFamily="49" charset="0"/>
-                <a:cs typeface="Courier New" pitchFamily="49" charset="0"/>
-              </a:rPr>
-              <a:t>commit</a:t>
+              <a:t>$ git commit  –m </a:t>
             </a:r>
             <a:r>
               <a:rPr lang="nl-BE" dirty="0" smtClean="0">
                 <a:latin typeface="Courier New" pitchFamily="49" charset="0"/>
                 <a:cs typeface="Courier New" pitchFamily="49" charset="0"/>
               </a:rPr>
-              <a:t>  –m '</a:t>
-            </a:r>
-            <a:r>
-              <a:rPr lang="nl-BE" dirty="0" err="1" smtClean="0">
-                <a:latin typeface="Courier New" pitchFamily="49" charset="0"/>
-                <a:cs typeface="Courier New" pitchFamily="49" charset="0"/>
-              </a:rPr>
-              <a:t>simulation</a:t>
-            </a:r>
-            <a:r>
-              <a:rPr lang="nl-BE" dirty="0" smtClean="0">
-                <a:latin typeface="Courier New" pitchFamily="49" charset="0"/>
-                <a:cs typeface="Courier New" pitchFamily="49" charset="0"/>
-              </a:rPr>
-              <a:t>: </a:t>
-            </a:r>
-            <a:r>
-              <a:rPr lang="nl-BE" dirty="0" err="1" smtClean="0">
-                <a:latin typeface="Courier New" pitchFamily="49" charset="0"/>
-                <a:cs typeface="Courier New" pitchFamily="49" charset="0"/>
-              </a:rPr>
-              <a:t>implemented</a:t>
-            </a:r>
-            <a:r>
-              <a:rPr lang="nl-BE" dirty="0" smtClean="0">
-                <a:latin typeface="Courier New" pitchFamily="49" charset="0"/>
-                <a:cs typeface="Courier New" pitchFamily="49" charset="0"/>
-              </a:rPr>
-              <a:t> feature x'</a:t>
-            </a:r>
+              <a:t>'Introduce square function'</a:t>
+            </a:r>
+            <a:endParaRPr lang="nl-BE" dirty="0" smtClean="0">
+              <a:latin typeface="Courier New" pitchFamily="49" charset="0"/>
+              <a:cs typeface="Courier New" pitchFamily="49" charset="0"/>
+            </a:endParaRPr>
           </a:p>
         </p:txBody>
       </p:sp>
@@ -10154,7 +10123,21 @@
                 <a:latin typeface="Courier New" panose="02070309020205020404" pitchFamily="49" charset="0"/>
                 <a:cs typeface="Courier New" panose="02070309020205020404" pitchFamily="49" charset="0"/>
               </a:rPr>
-              <a:t>    Introduced square </a:t>
+              <a:t>    </a:t>
+            </a:r>
+            <a:r>
+              <a:rPr lang="en-US" sz="1400" dirty="0" smtClean="0">
+                <a:latin typeface="Courier New" panose="02070309020205020404" pitchFamily="49" charset="0"/>
+                <a:cs typeface="Courier New" panose="02070309020205020404" pitchFamily="49" charset="0"/>
+              </a:rPr>
+              <a:t>Introduce </a:t>
+            </a:r>
+            <a:r>
+              <a:rPr lang="en-US" sz="1400" dirty="0">
+                <a:latin typeface="Courier New" panose="02070309020205020404" pitchFamily="49" charset="0"/>
+                <a:cs typeface="Courier New" panose="02070309020205020404" pitchFamily="49" charset="0"/>
+              </a:rPr>
+              <a:t>square </a:t>
             </a:r>
             <a:r>
               <a:rPr lang="en-US" sz="1400" dirty="0" smtClean="0">
@@ -10225,14 +10208,14 @@
                 <a:latin typeface="Courier New" panose="02070309020205020404" pitchFamily="49" charset="0"/>
                 <a:cs typeface="Courier New" panose="02070309020205020404" pitchFamily="49" charset="0"/>
               </a:rPr>
-              <a:t>    Constants declared </a:t>
-            </a:r>
-            <a:r>
-              <a:rPr lang="en-US" sz="1400" dirty="0" err="1" smtClean="0">
+              <a:t>    </a:t>
+            </a:r>
+            <a:r>
+              <a:rPr lang="en-US" sz="1400" dirty="0" smtClean="0">
                 <a:latin typeface="Courier New" panose="02070309020205020404" pitchFamily="49" charset="0"/>
                 <a:cs typeface="Courier New" panose="02070309020205020404" pitchFamily="49" charset="0"/>
               </a:rPr>
-              <a:t>const</a:t>
+              <a:t>Declare constants as such</a:t>
             </a:r>
             <a:endParaRPr lang="en-US" sz="1400" dirty="0" smtClean="0">
               <a:latin typeface="Courier New" panose="02070309020205020404" pitchFamily="49" charset="0"/>
@@ -11380,23 +11363,37 @@
                 <a:latin typeface="Courier New" panose="02070309020205020404" pitchFamily="49" charset="0"/>
                 <a:cs typeface="Courier New" panose="02070309020205020404" pitchFamily="49" charset="0"/>
               </a:rPr>
-              <a:t>769cdd7 Introduced square function</a:t>
-            </a:r>
-          </a:p>
-          <a:p>
+              <a:t>769cdd7 </a:t>
+            </a:r>
+            <a:r>
+              <a:rPr lang="en-US" sz="1600" dirty="0" smtClean="0">
+                <a:latin typeface="Courier New" panose="02070309020205020404" pitchFamily="49" charset="0"/>
+                <a:cs typeface="Courier New" panose="02070309020205020404" pitchFamily="49" charset="0"/>
+              </a:rPr>
+              <a:t>Introduce </a:t>
+            </a:r>
             <a:r>
               <a:rPr lang="en-US" sz="1600" dirty="0">
                 <a:latin typeface="Courier New" panose="02070309020205020404" pitchFamily="49" charset="0"/>
                 <a:cs typeface="Courier New" panose="02070309020205020404" pitchFamily="49" charset="0"/>
               </a:rPr>
-              <a:t>689d513 Constants declared </a:t>
-            </a:r>
-            <a:r>
-              <a:rPr lang="en-US" sz="1600" dirty="0" err="1">
+              <a:t>square function</a:t>
+            </a:r>
+          </a:p>
+          <a:p>
+            <a:r>
+              <a:rPr lang="en-US" sz="1600" dirty="0">
                 <a:latin typeface="Courier New" panose="02070309020205020404" pitchFamily="49" charset="0"/>
                 <a:cs typeface="Courier New" panose="02070309020205020404" pitchFamily="49" charset="0"/>
               </a:rPr>
-              <a:t>const</a:t>
+              <a:t>689d513 </a:t>
+            </a:r>
+            <a:r>
+              <a:rPr lang="en-US" sz="1600" dirty="0" smtClean="0">
+                <a:latin typeface="Courier New" panose="02070309020205020404" pitchFamily="49" charset="0"/>
+                <a:cs typeface="Courier New" panose="02070309020205020404" pitchFamily="49" charset="0"/>
+              </a:rPr>
+              <a:t>Declare constants as such</a:t>
             </a:r>
             <a:endParaRPr lang="en-US" sz="1600" dirty="0">
               <a:latin typeface="Courier New" panose="02070309020205020404" pitchFamily="49" charset="0"/>
@@ -11499,14 +11496,14 @@
                 <a:latin typeface="Courier New" panose="02070309020205020404" pitchFamily="49" charset="0"/>
                 <a:cs typeface="Courier New" panose="02070309020205020404" pitchFamily="49" charset="0"/>
               </a:rPr>
-              <a:t>689d513 Constants declared </a:t>
-            </a:r>
-            <a:r>
-              <a:rPr lang="en-US" sz="1600" dirty="0" err="1">
+              <a:t>689d513 </a:t>
+            </a:r>
+            <a:r>
+              <a:rPr lang="en-US" sz="1600" dirty="0" smtClean="0">
                 <a:latin typeface="Courier New" panose="02070309020205020404" pitchFamily="49" charset="0"/>
                 <a:cs typeface="Courier New" panose="02070309020205020404" pitchFamily="49" charset="0"/>
               </a:rPr>
-              <a:t>const</a:t>
+              <a:t>Declare constants as such</a:t>
             </a:r>
             <a:endParaRPr lang="en-US" sz="1600" dirty="0">
               <a:latin typeface="Courier New" panose="02070309020205020404" pitchFamily="49" charset="0"/>
@@ -22007,7 +22004,7 @@
         <p:spPr>
           <a:xfrm>
             <a:off x="1259632" y="5167583"/>
-            <a:ext cx="7353295" cy="369332"/>
+            <a:ext cx="6250429" cy="369332"/>
           </a:xfrm>
           <a:prstGeom prst="rect">
             <a:avLst/>
@@ -22030,50 +22027,19 @@
                 <a:latin typeface="Courier New" pitchFamily="49" charset="0"/>
                 <a:cs typeface="Courier New" pitchFamily="49" charset="0"/>
               </a:rPr>
-              <a:t>$ git </a:t>
-            </a:r>
-            <a:r>
-              <a:rPr lang="nl-BE" dirty="0" err="1" smtClean="0">
-                <a:latin typeface="Courier New" pitchFamily="49" charset="0"/>
-                <a:cs typeface="Courier New" pitchFamily="49" charset="0"/>
-              </a:rPr>
-              <a:t>commit</a:t>
+              <a:t>$ git commit  –m </a:t>
             </a:r>
             <a:r>
               <a:rPr lang="nl-BE" dirty="0" smtClean="0">
                 <a:latin typeface="Courier New" pitchFamily="49" charset="0"/>
                 <a:cs typeface="Courier New" pitchFamily="49" charset="0"/>
               </a:rPr>
-              <a:t>  –m '</a:t>
-            </a:r>
-            <a:r>
-              <a:rPr lang="nl-BE" dirty="0" err="1" smtClean="0">
-                <a:latin typeface="Courier New" pitchFamily="49" charset="0"/>
-                <a:cs typeface="Courier New" pitchFamily="49" charset="0"/>
-              </a:rPr>
-              <a:t>simulation</a:t>
-            </a:r>
-            <a:r>
-              <a:rPr lang="nl-BE" dirty="0" smtClean="0">
-                <a:latin typeface="Courier New" pitchFamily="49" charset="0"/>
-                <a:cs typeface="Courier New" pitchFamily="49" charset="0"/>
-              </a:rPr>
-              <a:t>: </a:t>
-            </a:r>
-            <a:r>
-              <a:rPr lang="nl-BE" dirty="0" err="1" smtClean="0">
-                <a:latin typeface="Courier New" pitchFamily="49" charset="0"/>
-                <a:cs typeface="Courier New" pitchFamily="49" charset="0"/>
-              </a:rPr>
-              <a:t>implemented</a:t>
-            </a:r>
-            <a:r>
-              <a:rPr lang="nl-BE" dirty="0" smtClean="0">
-                <a:latin typeface="Courier New" pitchFamily="49" charset="0"/>
-                <a:cs typeface="Courier New" pitchFamily="49" charset="0"/>
-              </a:rPr>
-              <a:t> feature x'</a:t>
-            </a:r>
+              <a:t>'Introduce square function'</a:t>
+            </a:r>
+            <a:endParaRPr lang="nl-BE" dirty="0" smtClean="0">
+              <a:latin typeface="Courier New" pitchFamily="49" charset="0"/>
+              <a:cs typeface="Courier New" pitchFamily="49" charset="0"/>
+            </a:endParaRPr>
           </a:p>
         </p:txBody>
       </p:sp>
@@ -31167,63 +31133,21 @@
                 <a:latin typeface="Courier New" pitchFamily="49" charset="0"/>
                 <a:cs typeface="Courier New" pitchFamily="49" charset="0"/>
               </a:rPr>
-              <a:t>$ git </a:t>
-            </a:r>
-            <a:r>
-              <a:rPr lang="nl-BE" dirty="0" err="1" smtClean="0">
-                <a:latin typeface="Courier New" pitchFamily="49" charset="0"/>
-                <a:cs typeface="Courier New" pitchFamily="49" charset="0"/>
-              </a:rPr>
-              <a:t>commit</a:t>
+              <a:t>$ git commit  -m </a:t>
             </a:r>
             <a:r>
               <a:rPr lang="nl-BE" dirty="0" smtClean="0">
                 <a:latin typeface="Courier New" pitchFamily="49" charset="0"/>
                 <a:cs typeface="Courier New" pitchFamily="49" charset="0"/>
               </a:rPr>
-              <a:t>  -m '</a:t>
-            </a:r>
-            <a:r>
-              <a:rPr lang="nl-BE" dirty="0" err="1" smtClean="0">
-                <a:latin typeface="Courier New" pitchFamily="49" charset="0"/>
-                <a:cs typeface="Courier New" pitchFamily="49" charset="0"/>
-              </a:rPr>
-              <a:t>merged</a:t>
+              <a:t>'Merge </a:t>
             </a:r>
             <a:r>
               <a:rPr lang="nl-BE" dirty="0" smtClean="0">
                 <a:latin typeface="Courier New" pitchFamily="49" charset="0"/>
                 <a:cs typeface="Courier New" pitchFamily="49" charset="0"/>
               </a:rPr>
-              <a:t> in </a:t>
-            </a:r>
-            <a:r>
-              <a:rPr lang="nl-BE" dirty="0" err="1" smtClean="0">
-                <a:latin typeface="Courier New" pitchFamily="49" charset="0"/>
-                <a:cs typeface="Courier New" pitchFamily="49" charset="0"/>
-              </a:rPr>
-              <a:t>gradient</a:t>
-            </a:r>
-            <a:r>
-              <a:rPr lang="nl-BE" dirty="0" smtClean="0">
-                <a:latin typeface="Courier New" pitchFamily="49" charset="0"/>
-                <a:cs typeface="Courier New" pitchFamily="49" charset="0"/>
-              </a:rPr>
-              <a:t> </a:t>
-            </a:r>
-            <a:r>
-              <a:rPr lang="nl-BE" dirty="0" err="1" smtClean="0">
-                <a:latin typeface="Courier New" pitchFamily="49" charset="0"/>
-                <a:cs typeface="Courier New" pitchFamily="49" charset="0"/>
-              </a:rPr>
-              <a:t>descent</a:t>
-            </a:r>
-            <a:r>
-              <a:rPr lang="nl-BE" dirty="0" smtClean="0">
-                <a:latin typeface="Courier New" pitchFamily="49" charset="0"/>
-                <a:cs typeface="Courier New" pitchFamily="49" charset="0"/>
-              </a:rPr>
-              <a:t> code'</a:t>
+              <a:t>in gradient descent code'</a:t>
             </a:r>
           </a:p>
         </p:txBody>
@@ -35449,7 +35373,7 @@
         <p:spPr>
           <a:xfrm>
             <a:off x="1259632" y="2204864"/>
-            <a:ext cx="5904656" cy="369332"/>
+            <a:ext cx="6192688" cy="369332"/>
           </a:xfrm>
           <a:prstGeom prst="rect">
             <a:avLst/>
@@ -35472,35 +35396,21 @@
                 <a:latin typeface="Courier New" pitchFamily="49" charset="0"/>
                 <a:cs typeface="Courier New" pitchFamily="49" charset="0"/>
               </a:rPr>
-              <a:t>$ git </a:t>
-            </a:r>
-            <a:r>
-              <a:rPr lang="nl-BE" dirty="0" err="1" smtClean="0">
-                <a:latin typeface="Courier New" pitchFamily="49" charset="0"/>
-                <a:cs typeface="Courier New" pitchFamily="49" charset="0"/>
-              </a:rPr>
-              <a:t>commit</a:t>
+              <a:t>$ git commit  -a  -m </a:t>
             </a:r>
             <a:r>
               <a:rPr lang="nl-BE" dirty="0" smtClean="0">
                 <a:latin typeface="Courier New" pitchFamily="49" charset="0"/>
                 <a:cs typeface="Courier New" pitchFamily="49" charset="0"/>
               </a:rPr>
-              <a:t>  -a  -m '</a:t>
-            </a:r>
-            <a:r>
-              <a:rPr lang="nl-BE" dirty="0" err="1" smtClean="0">
-                <a:latin typeface="Courier New" pitchFamily="49" charset="0"/>
-                <a:cs typeface="Courier New" pitchFamily="49" charset="0"/>
-              </a:rPr>
-              <a:t>Fixed</a:t>
+              <a:t>'Fix divide by 0 </a:t>
             </a:r>
             <a:r>
               <a:rPr lang="nl-BE" dirty="0" smtClean="0">
                 <a:latin typeface="Courier New" pitchFamily="49" charset="0"/>
                 <a:cs typeface="Courier New" pitchFamily="49" charset="0"/>
               </a:rPr>
-              <a:t> x/0 bug'</a:t>
+              <a:t>bug'</a:t>
             </a:r>
           </a:p>
         </p:txBody>
@@ -35514,7 +35424,7 @@
         <p:spPr>
           <a:xfrm>
             <a:off x="1259632" y="3789040"/>
-            <a:ext cx="5904656" cy="369332"/>
+            <a:ext cx="6192688" cy="369332"/>
           </a:xfrm>
           <a:prstGeom prst="rect">
             <a:avLst/>

</xml_diff>

<commit_message>
Move commit message slides for better motivation
</commit_message>
<xml_diff>
--- a/LinuxTools/VersionControl/version_control_git.pptx
+++ b/LinuxTools/VersionControl/version_control_git.pptx
@@ -24,11 +24,11 @@
     <p:sldId id="275" r:id="rId15"/>
     <p:sldId id="277" r:id="rId16"/>
     <p:sldId id="257" r:id="rId17"/>
-    <p:sldId id="258" r:id="rId18"/>
-    <p:sldId id="319" r:id="rId19"/>
-    <p:sldId id="259" r:id="rId20"/>
-    <p:sldId id="261" r:id="rId21"/>
-    <p:sldId id="280" r:id="rId22"/>
+    <p:sldId id="259" r:id="rId18"/>
+    <p:sldId id="261" r:id="rId19"/>
+    <p:sldId id="280" r:id="rId20"/>
+    <p:sldId id="258" r:id="rId21"/>
+    <p:sldId id="319" r:id="rId22"/>
     <p:sldId id="318" r:id="rId23"/>
     <p:sldId id="317" r:id="rId24"/>
     <p:sldId id="281" r:id="rId25"/>
@@ -196,11 +196,11 @@
           <p14:sldIdLst>
             <p14:sldId id="277"/>
             <p14:sldId id="257"/>
-            <p14:sldId id="258"/>
-            <p14:sldId id="319"/>
             <p14:sldId id="259"/>
             <p14:sldId id="261"/>
             <p14:sldId id="280"/>
+            <p14:sldId id="258"/>
+            <p14:sldId id="319"/>
             <p14:sldId id="318"/>
             <p14:sldId id="317"/>
             <p14:sldId id="281"/>
@@ -7980,645 +7980,6 @@
           <a:lstStyle/>
           <a:p>
             <a:r>
-              <a:rPr lang="en-US" dirty="0" smtClean="0"/>
-              <a:t>Intermezzo: comment!</a:t>
-            </a:r>
-            <a:endParaRPr lang="nl-BE" dirty="0"/>
-          </a:p>
-        </p:txBody>
-      </p:sp>
-      <p:sp>
-        <p:nvSpPr>
-          <p:cNvPr id="3" name="Content Placeholder 2"/>
-          <p:cNvSpPr>
-            <a:spLocks noGrp="1"/>
-          </p:cNvSpPr>
-          <p:nvPr>
-            <p:ph idx="1"/>
-          </p:nvPr>
-        </p:nvSpPr>
-        <p:spPr/>
-        <p:txBody>
-          <a:bodyPr>
-            <a:normAutofit/>
-          </a:bodyPr>
-          <a:lstStyle/>
-          <a:p>
-            <a:r>
-              <a:rPr lang="en-US" dirty="0" smtClean="0"/>
-              <a:t>Note the </a:t>
-            </a:r>
-            <a:r>
-              <a:rPr lang="en-US" dirty="0" smtClean="0">
-                <a:latin typeface="Courier New" pitchFamily="49" charset="0"/>
-                <a:cs typeface="Courier New" pitchFamily="49" charset="0"/>
-              </a:rPr>
-              <a:t>–m</a:t>
-            </a:r>
-            <a:r>
-              <a:rPr lang="en-US" dirty="0" smtClean="0"/>
-              <a:t> option used with many </a:t>
-            </a:r>
-            <a:r>
-              <a:rPr lang="en-US" dirty="0" err="1" smtClean="0"/>
-              <a:t>git</a:t>
-            </a:r>
-            <a:r>
-              <a:rPr lang="en-US" dirty="0" smtClean="0"/>
-              <a:t> commands</a:t>
-            </a:r>
-          </a:p>
-          <a:p>
-            <a:pPr lvl="1"/>
-            <a:r>
-              <a:rPr lang="en-US" dirty="0" smtClean="0"/>
-              <a:t>Message that describes the current action, or the reason for it</a:t>
-            </a:r>
-          </a:p>
-          <a:p>
-            <a:r>
-              <a:rPr lang="en-US" dirty="0" smtClean="0"/>
-              <a:t>Document the semantics of your actions</a:t>
-            </a:r>
-          </a:p>
-          <a:p>
-            <a:pPr lvl="1"/>
-            <a:r>
-              <a:rPr lang="en-US" dirty="0" smtClean="0"/>
-              <a:t>Use meaningful messages!</a:t>
-            </a:r>
-          </a:p>
-          <a:p>
-            <a:pPr lvl="1"/>
-            <a:r>
-              <a:rPr lang="en-US" dirty="0" smtClean="0"/>
-              <a:t>If used well, answer the "why" questions</a:t>
-            </a:r>
-          </a:p>
-          <a:p>
-            <a:pPr lvl="1"/>
-            <a:r>
-              <a:rPr lang="en-US" dirty="0" smtClean="0"/>
-              <a:t>Very useful when developing as a </a:t>
-            </a:r>
-            <a:r>
-              <a:rPr lang="en-US" dirty="0" smtClean="0"/>
-              <a:t>team </a:t>
-            </a:r>
-            <a:endParaRPr lang="en-US" dirty="0" smtClean="0"/>
-          </a:p>
-          <a:p>
-            <a:pPr lvl="1"/>
-            <a:endParaRPr lang="nl-BE" dirty="0"/>
-          </a:p>
-        </p:txBody>
-      </p:sp>
-      <p:sp>
-        <p:nvSpPr>
-          <p:cNvPr id="4" name="Slide Number Placeholder 3"/>
-          <p:cNvSpPr>
-            <a:spLocks noGrp="1"/>
-          </p:cNvSpPr>
-          <p:nvPr>
-            <p:ph type="sldNum" sz="quarter" idx="12"/>
-          </p:nvPr>
-        </p:nvSpPr>
-        <p:spPr/>
-        <p:txBody>
-          <a:bodyPr/>
-          <a:lstStyle/>
-          <a:p>
-            <a:fld id="{BB52A05A-A776-4391-ACD7-D6BC34D3145C}" type="slidenum">
-              <a:rPr lang="nl-BE" smtClean="0"/>
-              <a:t>17</a:t>
-            </a:fld>
-            <a:endParaRPr lang="nl-BE"/>
-          </a:p>
-        </p:txBody>
-      </p:sp>
-    </p:spTree>
-    <p:extLst>
-      <p:ext uri="{BB962C8B-B14F-4D97-AF65-F5344CB8AC3E}">
-        <p14:creationId xmlns:p14="http://schemas.microsoft.com/office/powerpoint/2010/main" val="3073049295"/>
-      </p:ext>
-    </p:extLst>
-  </p:cSld>
-  <p:clrMapOvr>
-    <a:masterClrMapping/>
-  </p:clrMapOvr>
-  <p:timing>
-    <p:tnLst>
-      <p:par>
-        <p:cTn id="1" dur="indefinite" restart="never" nodeType="tmRoot">
-          <p:childTnLst>
-            <p:seq concurrent="1" nextAc="seek">
-              <p:cTn id="2" dur="indefinite" nodeType="mainSeq">
-                <p:childTnLst>
-                  <p:par>
-                    <p:cTn id="3" fill="hold">
-                      <p:stCondLst>
-                        <p:cond delay="indefinite"/>
-                        <p:cond evt="onBegin" delay="0">
-                          <p:tn val="2"/>
-                        </p:cond>
-                      </p:stCondLst>
-                      <p:childTnLst>
-                        <p:par>
-                          <p:cTn id="4" fill="hold">
-                            <p:stCondLst>
-                              <p:cond delay="0"/>
-                            </p:stCondLst>
-                            <p:childTnLst>
-                              <p:par>
-                                <p:cTn id="5" presetID="1" presetClass="entr" presetSubtype="0" fill="hold" grpId="0" nodeType="withEffect">
-                                  <p:stCondLst>
-                                    <p:cond delay="0"/>
-                                  </p:stCondLst>
-                                  <p:childTnLst>
-                                    <p:set>
-                                      <p:cBhvr>
-                                        <p:cTn id="6" dur="1" fill="hold">
-                                          <p:stCondLst>
-                                            <p:cond delay="0"/>
-                                          </p:stCondLst>
-                                        </p:cTn>
-                                        <p:tgtEl>
-                                          <p:spTgt spid="3">
-                                            <p:txEl>
-                                              <p:pRg st="0" end="0"/>
-                                            </p:txEl>
-                                          </p:spTgt>
-                                        </p:tgtEl>
-                                        <p:attrNameLst>
-                                          <p:attrName>style.visibility</p:attrName>
-                                        </p:attrNameLst>
-                                      </p:cBhvr>
-                                      <p:to>
-                                        <p:strVal val="visible"/>
-                                      </p:to>
-                                    </p:set>
-                                  </p:childTnLst>
-                                </p:cTn>
-                              </p:par>
-                              <p:par>
-                                <p:cTn id="7" presetID="1" presetClass="entr" presetSubtype="0" fill="hold" grpId="0" nodeType="withEffect">
-                                  <p:stCondLst>
-                                    <p:cond delay="0"/>
-                                  </p:stCondLst>
-                                  <p:childTnLst>
-                                    <p:set>
-                                      <p:cBhvr>
-                                        <p:cTn id="8" dur="1" fill="hold">
-                                          <p:stCondLst>
-                                            <p:cond delay="0"/>
-                                          </p:stCondLst>
-                                        </p:cTn>
-                                        <p:tgtEl>
-                                          <p:spTgt spid="3">
-                                            <p:txEl>
-                                              <p:pRg st="1" end="1"/>
-                                            </p:txEl>
-                                          </p:spTgt>
-                                        </p:tgtEl>
-                                        <p:attrNameLst>
-                                          <p:attrName>style.visibility</p:attrName>
-                                        </p:attrNameLst>
-                                      </p:cBhvr>
-                                      <p:to>
-                                        <p:strVal val="visible"/>
-                                      </p:to>
-                                    </p:set>
-                                  </p:childTnLst>
-                                </p:cTn>
-                              </p:par>
-                            </p:childTnLst>
-                          </p:cTn>
-                        </p:par>
-                      </p:childTnLst>
-                    </p:cTn>
-                  </p:par>
-                  <p:par>
-                    <p:cTn id="9" fill="hold">
-                      <p:stCondLst>
-                        <p:cond delay="indefinite"/>
-                      </p:stCondLst>
-                      <p:childTnLst>
-                        <p:par>
-                          <p:cTn id="10" fill="hold">
-                            <p:stCondLst>
-                              <p:cond delay="0"/>
-                            </p:stCondLst>
-                            <p:childTnLst>
-                              <p:par>
-                                <p:cTn id="11" presetID="1" presetClass="entr" presetSubtype="0" fill="hold" grpId="0" nodeType="clickEffect">
-                                  <p:stCondLst>
-                                    <p:cond delay="0"/>
-                                  </p:stCondLst>
-                                  <p:childTnLst>
-                                    <p:set>
-                                      <p:cBhvr>
-                                        <p:cTn id="12" dur="1" fill="hold">
-                                          <p:stCondLst>
-                                            <p:cond delay="0"/>
-                                          </p:stCondLst>
-                                        </p:cTn>
-                                        <p:tgtEl>
-                                          <p:spTgt spid="3">
-                                            <p:txEl>
-                                              <p:pRg st="2" end="2"/>
-                                            </p:txEl>
-                                          </p:spTgt>
-                                        </p:tgtEl>
-                                        <p:attrNameLst>
-                                          <p:attrName>style.visibility</p:attrName>
-                                        </p:attrNameLst>
-                                      </p:cBhvr>
-                                      <p:to>
-                                        <p:strVal val="visible"/>
-                                      </p:to>
-                                    </p:set>
-                                  </p:childTnLst>
-                                </p:cTn>
-                              </p:par>
-                              <p:par>
-                                <p:cTn id="13" presetID="1" presetClass="entr" presetSubtype="0" fill="hold" grpId="0" nodeType="withEffect">
-                                  <p:stCondLst>
-                                    <p:cond delay="0"/>
-                                  </p:stCondLst>
-                                  <p:childTnLst>
-                                    <p:set>
-                                      <p:cBhvr>
-                                        <p:cTn id="14" dur="1" fill="hold">
-                                          <p:stCondLst>
-                                            <p:cond delay="0"/>
-                                          </p:stCondLst>
-                                        </p:cTn>
-                                        <p:tgtEl>
-                                          <p:spTgt spid="3">
-                                            <p:txEl>
-                                              <p:pRg st="3" end="3"/>
-                                            </p:txEl>
-                                          </p:spTgt>
-                                        </p:tgtEl>
-                                        <p:attrNameLst>
-                                          <p:attrName>style.visibility</p:attrName>
-                                        </p:attrNameLst>
-                                      </p:cBhvr>
-                                      <p:to>
-                                        <p:strVal val="visible"/>
-                                      </p:to>
-                                    </p:set>
-                                  </p:childTnLst>
-                                </p:cTn>
-                              </p:par>
-                              <p:par>
-                                <p:cTn id="15" presetID="1" presetClass="entr" presetSubtype="0" fill="hold" grpId="0" nodeType="withEffect">
-                                  <p:stCondLst>
-                                    <p:cond delay="0"/>
-                                  </p:stCondLst>
-                                  <p:childTnLst>
-                                    <p:set>
-                                      <p:cBhvr>
-                                        <p:cTn id="16" dur="1" fill="hold">
-                                          <p:stCondLst>
-                                            <p:cond delay="0"/>
-                                          </p:stCondLst>
-                                        </p:cTn>
-                                        <p:tgtEl>
-                                          <p:spTgt spid="3">
-                                            <p:txEl>
-                                              <p:pRg st="4" end="4"/>
-                                            </p:txEl>
-                                          </p:spTgt>
-                                        </p:tgtEl>
-                                        <p:attrNameLst>
-                                          <p:attrName>style.visibility</p:attrName>
-                                        </p:attrNameLst>
-                                      </p:cBhvr>
-                                      <p:to>
-                                        <p:strVal val="visible"/>
-                                      </p:to>
-                                    </p:set>
-                                  </p:childTnLst>
-                                </p:cTn>
-                              </p:par>
-                              <p:par>
-                                <p:cTn id="17" presetID="1" presetClass="entr" presetSubtype="0" fill="hold" grpId="0" nodeType="withEffect">
-                                  <p:stCondLst>
-                                    <p:cond delay="0"/>
-                                  </p:stCondLst>
-                                  <p:childTnLst>
-                                    <p:set>
-                                      <p:cBhvr>
-                                        <p:cTn id="18" dur="1" fill="hold">
-                                          <p:stCondLst>
-                                            <p:cond delay="0"/>
-                                          </p:stCondLst>
-                                        </p:cTn>
-                                        <p:tgtEl>
-                                          <p:spTgt spid="3">
-                                            <p:txEl>
-                                              <p:pRg st="5" end="5"/>
-                                            </p:txEl>
-                                          </p:spTgt>
-                                        </p:tgtEl>
-                                        <p:attrNameLst>
-                                          <p:attrName>style.visibility</p:attrName>
-                                        </p:attrNameLst>
-                                      </p:cBhvr>
-                                      <p:to>
-                                        <p:strVal val="visible"/>
-                                      </p:to>
-                                    </p:set>
-                                  </p:childTnLst>
-                                </p:cTn>
-                              </p:par>
-                            </p:childTnLst>
-                          </p:cTn>
-                        </p:par>
-                      </p:childTnLst>
-                    </p:cTn>
-                  </p:par>
-                </p:childTnLst>
-              </p:cTn>
-              <p:prevCondLst>
-                <p:cond evt="onPrev" delay="0">
-                  <p:tgtEl>
-                    <p:sldTgt/>
-                  </p:tgtEl>
-                </p:cond>
-              </p:prevCondLst>
-              <p:nextCondLst>
-                <p:cond evt="onNext" delay="0">
-                  <p:tgtEl>
-                    <p:sldTgt/>
-                  </p:tgtEl>
-                </p:cond>
-              </p:nextCondLst>
-            </p:seq>
-          </p:childTnLst>
-        </p:cTn>
-      </p:par>
-    </p:tnLst>
-    <p:bldLst>
-      <p:bldP spid="3" grpId="0" uiExpand="1" build="p"/>
-    </p:bldLst>
-  </p:timing>
-</p:sld>
-</file>
-
-<file path=ppt/slides/slide18.xml><?xml version="1.0" encoding="utf-8"?>
-<p:sld xmlns:a="http://schemas.openxmlformats.org/drawingml/2006/main" xmlns:r="http://schemas.openxmlformats.org/officeDocument/2006/relationships" xmlns:p="http://schemas.openxmlformats.org/presentationml/2006/main">
-  <p:cSld>
-    <p:spTree>
-      <p:nvGrpSpPr>
-        <p:cNvPr id="1" name=""/>
-        <p:cNvGrpSpPr/>
-        <p:nvPr/>
-      </p:nvGrpSpPr>
-      <p:grpSpPr>
-        <a:xfrm>
-          <a:off x="0" y="0"/>
-          <a:ext cx="0" cy="0"/>
-          <a:chOff x="0" y="0"/>
-          <a:chExt cx="0" cy="0"/>
-        </a:xfrm>
-      </p:grpSpPr>
-      <p:sp>
-        <p:nvSpPr>
-          <p:cNvPr id="2" name="Title 1"/>
-          <p:cNvSpPr>
-            <a:spLocks noGrp="1"/>
-          </p:cNvSpPr>
-          <p:nvPr>
-            <p:ph type="title"/>
-          </p:nvPr>
-        </p:nvSpPr>
-        <p:spPr/>
-        <p:txBody>
-          <a:bodyPr>
-            <a:normAutofit/>
-          </a:bodyPr>
-          <a:lstStyle/>
-          <a:p>
-            <a:r>
-              <a:rPr lang="en-US" dirty="0" smtClean="0"/>
-              <a:t>Seven rules</a:t>
-            </a:r>
-            <a:endParaRPr lang="en-US" dirty="0"/>
-          </a:p>
-        </p:txBody>
-      </p:sp>
-      <p:sp>
-        <p:nvSpPr>
-          <p:cNvPr id="3" name="Content Placeholder 2"/>
-          <p:cNvSpPr>
-            <a:spLocks noGrp="1"/>
-          </p:cNvSpPr>
-          <p:nvPr>
-            <p:ph idx="1"/>
-          </p:nvPr>
-        </p:nvSpPr>
-        <p:spPr/>
-        <p:txBody>
-          <a:bodyPr>
-            <a:normAutofit/>
-          </a:bodyPr>
-          <a:lstStyle/>
-          <a:p>
-            <a:r>
-              <a:rPr lang="en-US" dirty="0" smtClean="0"/>
-              <a:t>Seven rules for commit messages</a:t>
-            </a:r>
-            <a:br>
-              <a:rPr lang="en-US" dirty="0" smtClean="0"/>
-            </a:br>
-            <a:r>
-              <a:rPr lang="en-US" sz="2000" dirty="0">
-                <a:hlinkClick r:id="rId2"/>
-              </a:rPr>
-              <a:t>https://chris.beams.io/posts/git-commit</a:t>
-            </a:r>
-            <a:r>
-              <a:rPr lang="en-US" sz="2000" dirty="0" smtClean="0">
-                <a:hlinkClick r:id="rId2"/>
-              </a:rPr>
-              <a:t>/</a:t>
-            </a:r>
-            <a:endParaRPr lang="en-US" dirty="0" smtClean="0"/>
-          </a:p>
-          <a:p>
-            <a:pPr marL="971550" lvl="1" indent="-514350">
-              <a:buFont typeface="+mj-lt"/>
-              <a:buAutoNum type="arabicPeriod"/>
-            </a:pPr>
-            <a:r>
-              <a:rPr lang="en-US" dirty="0" smtClean="0"/>
-              <a:t>separate subject from body with blank line</a:t>
-            </a:r>
-          </a:p>
-          <a:p>
-            <a:pPr marL="971550" lvl="1" indent="-514350">
-              <a:buFont typeface="+mj-lt"/>
-              <a:buAutoNum type="arabicPeriod"/>
-            </a:pPr>
-            <a:r>
-              <a:rPr lang="en-US" dirty="0" smtClean="0"/>
-              <a:t>limit subject to 50 characters</a:t>
-            </a:r>
-          </a:p>
-          <a:p>
-            <a:pPr marL="971550" lvl="1" indent="-514350">
-              <a:buFont typeface="+mj-lt"/>
-              <a:buAutoNum type="arabicPeriod"/>
-            </a:pPr>
-            <a:r>
-              <a:rPr lang="en-US" dirty="0" smtClean="0"/>
-              <a:t>capitalize subject line</a:t>
-            </a:r>
-          </a:p>
-          <a:p>
-            <a:pPr marL="971550" lvl="1" indent="-514350">
-              <a:buFont typeface="+mj-lt"/>
-              <a:buAutoNum type="arabicPeriod"/>
-            </a:pPr>
-            <a:r>
-              <a:rPr lang="en-US" dirty="0" smtClean="0"/>
-              <a:t>do not end subject line with period</a:t>
-            </a:r>
-          </a:p>
-          <a:p>
-            <a:pPr marL="971550" lvl="1" indent="-514350">
-              <a:buFont typeface="+mj-lt"/>
-              <a:buAutoNum type="arabicPeriod"/>
-            </a:pPr>
-            <a:r>
-              <a:rPr lang="en-US" dirty="0" smtClean="0"/>
-              <a:t>use  imperative mood in subject line</a:t>
-            </a:r>
-          </a:p>
-          <a:p>
-            <a:pPr marL="971550" lvl="1" indent="-514350">
-              <a:buFont typeface="+mj-lt"/>
-              <a:buAutoNum type="arabicPeriod"/>
-            </a:pPr>
-            <a:r>
-              <a:rPr lang="en-US" dirty="0" smtClean="0"/>
-              <a:t>wrap body at 72 characters</a:t>
-            </a:r>
-          </a:p>
-          <a:p>
-            <a:pPr marL="971550" lvl="1" indent="-514350">
-              <a:buFont typeface="+mj-lt"/>
-              <a:buAutoNum type="arabicPeriod"/>
-            </a:pPr>
-            <a:r>
-              <a:rPr lang="en-US" dirty="0" smtClean="0"/>
-              <a:t>use body to explain </a:t>
-            </a:r>
-            <a:r>
-              <a:rPr lang="en-US" i="1" dirty="0" smtClean="0"/>
-              <a:t>what</a:t>
-            </a:r>
-            <a:r>
-              <a:rPr lang="en-US" dirty="0" smtClean="0"/>
-              <a:t> &amp; </a:t>
-            </a:r>
-            <a:r>
-              <a:rPr lang="en-US" i="1" dirty="0" smtClean="0"/>
-              <a:t>why</a:t>
-            </a:r>
-            <a:r>
-              <a:rPr lang="en-US" dirty="0" smtClean="0"/>
-              <a:t> rather than </a:t>
-            </a:r>
-            <a:r>
-              <a:rPr lang="en-US" i="1" dirty="0" smtClean="0"/>
-              <a:t>how</a:t>
-            </a:r>
-          </a:p>
-          <a:p>
-            <a:pPr lvl="1"/>
-            <a:endParaRPr lang="en-US" dirty="0"/>
-          </a:p>
-        </p:txBody>
-      </p:sp>
-      <p:sp>
-        <p:nvSpPr>
-          <p:cNvPr id="4" name="Slide Number Placeholder 3"/>
-          <p:cNvSpPr>
-            <a:spLocks noGrp="1"/>
-          </p:cNvSpPr>
-          <p:nvPr>
-            <p:ph type="sldNum" sz="quarter" idx="12"/>
-          </p:nvPr>
-        </p:nvSpPr>
-        <p:spPr/>
-        <p:txBody>
-          <a:bodyPr/>
-          <a:lstStyle/>
-          <a:p>
-            <a:fld id="{BB52A05A-A776-4391-ACD7-D6BC34D3145C}" type="slidenum">
-              <a:rPr lang="nl-BE" smtClean="0"/>
-              <a:t>18</a:t>
-            </a:fld>
-            <a:endParaRPr lang="nl-BE"/>
-          </a:p>
-        </p:txBody>
-      </p:sp>
-    </p:spTree>
-    <p:extLst>
-      <p:ext uri="{BB962C8B-B14F-4D97-AF65-F5344CB8AC3E}">
-        <p14:creationId xmlns:p14="http://schemas.microsoft.com/office/powerpoint/2010/main" val="492693782"/>
-      </p:ext>
-    </p:extLst>
-  </p:cSld>
-  <p:clrMapOvr>
-    <a:masterClrMapping/>
-  </p:clrMapOvr>
-  <p:timing>
-    <p:tnLst>
-      <p:par>
-        <p:cTn id="1" dur="indefinite" restart="never" nodeType="tmRoot"/>
-      </p:par>
-    </p:tnLst>
-  </p:timing>
-</p:sld>
-</file>
-
-<file path=ppt/slides/slide19.xml><?xml version="1.0" encoding="utf-8"?>
-<p:sld xmlns:a="http://schemas.openxmlformats.org/drawingml/2006/main" xmlns:r="http://schemas.openxmlformats.org/officeDocument/2006/relationships" xmlns:p="http://schemas.openxmlformats.org/presentationml/2006/main">
-  <p:cSld>
-    <p:spTree>
-      <p:nvGrpSpPr>
-        <p:cNvPr id="1" name=""/>
-        <p:cNvGrpSpPr/>
-        <p:nvPr/>
-      </p:nvGrpSpPr>
-      <p:grpSpPr>
-        <a:xfrm>
-          <a:off x="0" y="0"/>
-          <a:ext cx="0" cy="0"/>
-          <a:chOff x="0" y="0"/>
-          <a:chExt cx="0" cy="0"/>
-        </a:xfrm>
-      </p:grpSpPr>
-      <p:sp>
-        <p:nvSpPr>
-          <p:cNvPr id="2" name="Title 1"/>
-          <p:cNvSpPr>
-            <a:spLocks noGrp="1"/>
-          </p:cNvSpPr>
-          <p:nvPr>
-            <p:ph type="title"/>
-          </p:nvPr>
-        </p:nvSpPr>
-        <p:spPr/>
-        <p:txBody>
-          <a:bodyPr/>
-          <a:lstStyle/>
-          <a:p>
-            <a:r>
               <a:rPr lang="en-US" dirty="0"/>
               <a:t>S</a:t>
             </a:r>
@@ -8877,7 +8238,7 @@
           <a:p>
             <a:fld id="{BB52A05A-A776-4391-ACD7-D6BC34D3145C}" type="slidenum">
               <a:rPr lang="nl-BE" smtClean="0"/>
-              <a:t>19</a:t>
+              <a:t>17</a:t>
             </a:fld>
             <a:endParaRPr lang="nl-BE"/>
           </a:p>
@@ -9181,7 +8542,7 @@
 </p:sld>
 </file>
 
-<file path=ppt/slides/slide2.xml><?xml version="1.0" encoding="utf-8"?>
+<file path=ppt/slides/slide18.xml><?xml version="1.0" encoding="utf-8"?>
 <p:sld xmlns:a="http://schemas.openxmlformats.org/drawingml/2006/main" xmlns:r="http://schemas.openxmlformats.org/officeDocument/2006/relationships" xmlns:p="http://schemas.openxmlformats.org/presentationml/2006/main">
   <p:cSld>
     <p:spTree>
@@ -9215,141 +8576,6 @@
           <a:p>
             <a:r>
               <a:rPr lang="en-US" dirty="0" smtClean="0"/>
-              <a:t>Overview</a:t>
-            </a:r>
-            <a:endParaRPr lang="nl-BE" dirty="0"/>
-          </a:p>
-        </p:txBody>
-      </p:sp>
-      <p:sp>
-        <p:nvSpPr>
-          <p:cNvPr id="3" name="Content Placeholder 2"/>
-          <p:cNvSpPr>
-            <a:spLocks noGrp="1"/>
-          </p:cNvSpPr>
-          <p:nvPr>
-            <p:ph idx="1"/>
-          </p:nvPr>
-        </p:nvSpPr>
-        <p:spPr/>
-        <p:txBody>
-          <a:bodyPr/>
-          <a:lstStyle/>
-          <a:p>
-            <a:r>
-              <a:rPr lang="en-US" dirty="0" smtClean="0"/>
-              <a:t>Motivation</a:t>
-            </a:r>
-          </a:p>
-          <a:p>
-            <a:r>
-              <a:rPr lang="en-US" dirty="0" smtClean="0"/>
-              <a:t>Single user scenario</a:t>
-            </a:r>
-          </a:p>
-          <a:p>
-            <a:r>
-              <a:rPr lang="en-US" dirty="0" smtClean="0"/>
-              <a:t>Multiple user scenario</a:t>
-            </a:r>
-          </a:p>
-          <a:p>
-            <a:r>
-              <a:rPr lang="en-US" dirty="0" smtClean="0"/>
-              <a:t>Demo/hands-on session</a:t>
-            </a:r>
-          </a:p>
-          <a:p>
-            <a:r>
-              <a:rPr lang="en-US" dirty="0" smtClean="0"/>
-              <a:t>Getting more information</a:t>
-            </a:r>
-          </a:p>
-          <a:p>
-            <a:r>
-              <a:rPr lang="en-US" dirty="0" smtClean="0"/>
-              <a:t>Conclusions</a:t>
-            </a:r>
-          </a:p>
-        </p:txBody>
-      </p:sp>
-      <p:sp>
-        <p:nvSpPr>
-          <p:cNvPr id="4" name="Slide Number Placeholder 3"/>
-          <p:cNvSpPr>
-            <a:spLocks noGrp="1"/>
-          </p:cNvSpPr>
-          <p:nvPr>
-            <p:ph type="sldNum" sz="quarter" idx="12"/>
-          </p:nvPr>
-        </p:nvSpPr>
-        <p:spPr/>
-        <p:txBody>
-          <a:bodyPr/>
-          <a:lstStyle/>
-          <a:p>
-            <a:fld id="{BB52A05A-A776-4391-ACD7-D6BC34D3145C}" type="slidenum">
-              <a:rPr lang="nl-BE" smtClean="0"/>
-              <a:t>2</a:t>
-            </a:fld>
-            <a:endParaRPr lang="nl-BE"/>
-          </a:p>
-        </p:txBody>
-      </p:sp>
-    </p:spTree>
-    <p:extLst>
-      <p:ext uri="{BB962C8B-B14F-4D97-AF65-F5344CB8AC3E}">
-        <p14:creationId xmlns:p14="http://schemas.microsoft.com/office/powerpoint/2010/main" val="2007369851"/>
-      </p:ext>
-    </p:extLst>
-  </p:cSld>
-  <p:clrMapOvr>
-    <a:masterClrMapping/>
-  </p:clrMapOvr>
-  <p:timing>
-    <p:tnLst>
-      <p:par>
-        <p:cTn id="1" dur="indefinite" restart="never" nodeType="tmRoot"/>
-      </p:par>
-    </p:tnLst>
-  </p:timing>
-</p:sld>
-</file>
-
-<file path=ppt/slides/slide20.xml><?xml version="1.0" encoding="utf-8"?>
-<p:sld xmlns:a="http://schemas.openxmlformats.org/drawingml/2006/main" xmlns:r="http://schemas.openxmlformats.org/officeDocument/2006/relationships" xmlns:p="http://schemas.openxmlformats.org/presentationml/2006/main">
-  <p:cSld>
-    <p:spTree>
-      <p:nvGrpSpPr>
-        <p:cNvPr id="1" name=""/>
-        <p:cNvGrpSpPr/>
-        <p:nvPr/>
-      </p:nvGrpSpPr>
-      <p:grpSpPr>
-        <a:xfrm>
-          <a:off x="0" y="0"/>
-          <a:ext cx="0" cy="0"/>
-          <a:chOff x="0" y="0"/>
-          <a:chExt cx="0" cy="0"/>
-        </a:xfrm>
-      </p:grpSpPr>
-      <p:sp>
-        <p:nvSpPr>
-          <p:cNvPr id="2" name="Title 1"/>
-          <p:cNvSpPr>
-            <a:spLocks noGrp="1"/>
-          </p:cNvSpPr>
-          <p:nvPr>
-            <p:ph type="title"/>
-          </p:nvPr>
-        </p:nvSpPr>
-        <p:spPr/>
-        <p:txBody>
-          <a:bodyPr/>
-          <a:lstStyle/>
-          <a:p>
-            <a:r>
-              <a:rPr lang="en-US" dirty="0" smtClean="0"/>
               <a:t>What is the status?</a:t>
             </a:r>
             <a:endParaRPr lang="nl-BE" dirty="0"/>
@@ -9644,7 +8870,7 @@
           <a:p>
             <a:fld id="{BB52A05A-A776-4391-ACD7-D6BC34D3145C}" type="slidenum">
               <a:rPr lang="nl-BE" smtClean="0"/>
-              <a:t>20</a:t>
+              <a:t>18</a:t>
             </a:fld>
             <a:endParaRPr lang="nl-BE"/>
           </a:p>
@@ -9869,7 +9095,7 @@
 </p:sld>
 </file>
 
-<file path=ppt/slides/slide21.xml><?xml version="1.0" encoding="utf-8"?>
+<file path=ppt/slides/slide19.xml><?xml version="1.0" encoding="utf-8"?>
 <p:sld xmlns:a="http://schemas.openxmlformats.org/drawingml/2006/main" xmlns:r="http://schemas.openxmlformats.org/officeDocument/2006/relationships" xmlns:p="http://schemas.openxmlformats.org/presentationml/2006/main">
   <p:cSld>
     <p:spTree>
@@ -9996,7 +9222,7 @@
           <a:p>
             <a:fld id="{BB52A05A-A776-4391-ACD7-D6BC34D3145C}" type="slidenum">
               <a:rPr lang="nl-BE" smtClean="0"/>
-              <a:t>21</a:t>
+              <a:t>19</a:t>
             </a:fld>
             <a:endParaRPr lang="nl-BE"/>
           </a:p>
@@ -11115,6 +10341,780 @@
       <p:bldP spid="3" grpId="0" uiExpand="1" build="p"/>
       <p:bldP spid="32" grpId="0" animBg="1"/>
     </p:bldLst>
+  </p:timing>
+</p:sld>
+</file>
+
+<file path=ppt/slides/slide2.xml><?xml version="1.0" encoding="utf-8"?>
+<p:sld xmlns:a="http://schemas.openxmlformats.org/drawingml/2006/main" xmlns:r="http://schemas.openxmlformats.org/officeDocument/2006/relationships" xmlns:p="http://schemas.openxmlformats.org/presentationml/2006/main">
+  <p:cSld>
+    <p:spTree>
+      <p:nvGrpSpPr>
+        <p:cNvPr id="1" name=""/>
+        <p:cNvGrpSpPr/>
+        <p:nvPr/>
+      </p:nvGrpSpPr>
+      <p:grpSpPr>
+        <a:xfrm>
+          <a:off x="0" y="0"/>
+          <a:ext cx="0" cy="0"/>
+          <a:chOff x="0" y="0"/>
+          <a:chExt cx="0" cy="0"/>
+        </a:xfrm>
+      </p:grpSpPr>
+      <p:sp>
+        <p:nvSpPr>
+          <p:cNvPr id="2" name="Title 1"/>
+          <p:cNvSpPr>
+            <a:spLocks noGrp="1"/>
+          </p:cNvSpPr>
+          <p:nvPr>
+            <p:ph type="title"/>
+          </p:nvPr>
+        </p:nvSpPr>
+        <p:spPr/>
+        <p:txBody>
+          <a:bodyPr/>
+          <a:lstStyle/>
+          <a:p>
+            <a:r>
+              <a:rPr lang="en-US" dirty="0" smtClean="0"/>
+              <a:t>Overview</a:t>
+            </a:r>
+            <a:endParaRPr lang="nl-BE" dirty="0"/>
+          </a:p>
+        </p:txBody>
+      </p:sp>
+      <p:sp>
+        <p:nvSpPr>
+          <p:cNvPr id="3" name="Content Placeholder 2"/>
+          <p:cNvSpPr>
+            <a:spLocks noGrp="1"/>
+          </p:cNvSpPr>
+          <p:nvPr>
+            <p:ph idx="1"/>
+          </p:nvPr>
+        </p:nvSpPr>
+        <p:spPr/>
+        <p:txBody>
+          <a:bodyPr/>
+          <a:lstStyle/>
+          <a:p>
+            <a:r>
+              <a:rPr lang="en-US" dirty="0" smtClean="0"/>
+              <a:t>Motivation</a:t>
+            </a:r>
+          </a:p>
+          <a:p>
+            <a:r>
+              <a:rPr lang="en-US" dirty="0" smtClean="0"/>
+              <a:t>Single user scenario</a:t>
+            </a:r>
+          </a:p>
+          <a:p>
+            <a:r>
+              <a:rPr lang="en-US" dirty="0" smtClean="0"/>
+              <a:t>Multiple user scenario</a:t>
+            </a:r>
+          </a:p>
+          <a:p>
+            <a:r>
+              <a:rPr lang="en-US" dirty="0" smtClean="0"/>
+              <a:t>Demo/hands-on session</a:t>
+            </a:r>
+          </a:p>
+          <a:p>
+            <a:r>
+              <a:rPr lang="en-US" dirty="0" smtClean="0"/>
+              <a:t>Getting more information</a:t>
+            </a:r>
+          </a:p>
+          <a:p>
+            <a:r>
+              <a:rPr lang="en-US" dirty="0" smtClean="0"/>
+              <a:t>Conclusions</a:t>
+            </a:r>
+          </a:p>
+        </p:txBody>
+      </p:sp>
+      <p:sp>
+        <p:nvSpPr>
+          <p:cNvPr id="4" name="Slide Number Placeholder 3"/>
+          <p:cNvSpPr>
+            <a:spLocks noGrp="1"/>
+          </p:cNvSpPr>
+          <p:nvPr>
+            <p:ph type="sldNum" sz="quarter" idx="12"/>
+          </p:nvPr>
+        </p:nvSpPr>
+        <p:spPr/>
+        <p:txBody>
+          <a:bodyPr/>
+          <a:lstStyle/>
+          <a:p>
+            <a:fld id="{BB52A05A-A776-4391-ACD7-D6BC34D3145C}" type="slidenum">
+              <a:rPr lang="nl-BE" smtClean="0"/>
+              <a:t>2</a:t>
+            </a:fld>
+            <a:endParaRPr lang="nl-BE"/>
+          </a:p>
+        </p:txBody>
+      </p:sp>
+    </p:spTree>
+    <p:extLst>
+      <p:ext uri="{BB962C8B-B14F-4D97-AF65-F5344CB8AC3E}">
+        <p14:creationId xmlns:p14="http://schemas.microsoft.com/office/powerpoint/2010/main" val="2007369851"/>
+      </p:ext>
+    </p:extLst>
+  </p:cSld>
+  <p:clrMapOvr>
+    <a:masterClrMapping/>
+  </p:clrMapOvr>
+  <p:timing>
+    <p:tnLst>
+      <p:par>
+        <p:cTn id="1" dur="indefinite" restart="never" nodeType="tmRoot"/>
+      </p:par>
+    </p:tnLst>
+  </p:timing>
+</p:sld>
+</file>
+
+<file path=ppt/slides/slide20.xml><?xml version="1.0" encoding="utf-8"?>
+<p:sld xmlns:a="http://schemas.openxmlformats.org/drawingml/2006/main" xmlns:r="http://schemas.openxmlformats.org/officeDocument/2006/relationships" xmlns:p="http://schemas.openxmlformats.org/presentationml/2006/main">
+  <p:cSld>
+    <p:spTree>
+      <p:nvGrpSpPr>
+        <p:cNvPr id="1" name=""/>
+        <p:cNvGrpSpPr/>
+        <p:nvPr/>
+      </p:nvGrpSpPr>
+      <p:grpSpPr>
+        <a:xfrm>
+          <a:off x="0" y="0"/>
+          <a:ext cx="0" cy="0"/>
+          <a:chOff x="0" y="0"/>
+          <a:chExt cx="0" cy="0"/>
+        </a:xfrm>
+      </p:grpSpPr>
+      <p:sp>
+        <p:nvSpPr>
+          <p:cNvPr id="2" name="Title 1"/>
+          <p:cNvSpPr>
+            <a:spLocks noGrp="1"/>
+          </p:cNvSpPr>
+          <p:nvPr>
+            <p:ph type="title"/>
+          </p:nvPr>
+        </p:nvSpPr>
+        <p:spPr/>
+        <p:txBody>
+          <a:bodyPr/>
+          <a:lstStyle/>
+          <a:p>
+            <a:r>
+              <a:rPr lang="en-US" dirty="0" smtClean="0"/>
+              <a:t>Intermezzo: comment!</a:t>
+            </a:r>
+            <a:endParaRPr lang="nl-BE" dirty="0"/>
+          </a:p>
+        </p:txBody>
+      </p:sp>
+      <p:sp>
+        <p:nvSpPr>
+          <p:cNvPr id="3" name="Content Placeholder 2"/>
+          <p:cNvSpPr>
+            <a:spLocks noGrp="1"/>
+          </p:cNvSpPr>
+          <p:nvPr>
+            <p:ph idx="1"/>
+          </p:nvPr>
+        </p:nvSpPr>
+        <p:spPr/>
+        <p:txBody>
+          <a:bodyPr>
+            <a:normAutofit/>
+          </a:bodyPr>
+          <a:lstStyle/>
+          <a:p>
+            <a:r>
+              <a:rPr lang="en-US" dirty="0" smtClean="0"/>
+              <a:t>Note the </a:t>
+            </a:r>
+            <a:r>
+              <a:rPr lang="en-US" dirty="0" smtClean="0">
+                <a:latin typeface="Courier New" pitchFamily="49" charset="0"/>
+                <a:cs typeface="Courier New" pitchFamily="49" charset="0"/>
+              </a:rPr>
+              <a:t>–m</a:t>
+            </a:r>
+            <a:r>
+              <a:rPr lang="en-US" dirty="0" smtClean="0"/>
+              <a:t> option used with many </a:t>
+            </a:r>
+            <a:r>
+              <a:rPr lang="en-US" dirty="0" err="1" smtClean="0"/>
+              <a:t>git</a:t>
+            </a:r>
+            <a:r>
+              <a:rPr lang="en-US" dirty="0" smtClean="0"/>
+              <a:t> commands</a:t>
+            </a:r>
+          </a:p>
+          <a:p>
+            <a:pPr lvl="1"/>
+            <a:r>
+              <a:rPr lang="en-US" dirty="0" smtClean="0"/>
+              <a:t>Message that describes the current action, or the reason for it</a:t>
+            </a:r>
+          </a:p>
+          <a:p>
+            <a:r>
+              <a:rPr lang="en-US" dirty="0" smtClean="0"/>
+              <a:t>Document the semantics of your actions</a:t>
+            </a:r>
+          </a:p>
+          <a:p>
+            <a:pPr lvl="1"/>
+            <a:r>
+              <a:rPr lang="en-US" dirty="0" smtClean="0"/>
+              <a:t>Use meaningful messages!</a:t>
+            </a:r>
+          </a:p>
+          <a:p>
+            <a:pPr lvl="1"/>
+            <a:r>
+              <a:rPr lang="en-US" dirty="0" smtClean="0"/>
+              <a:t>If used well, answer the "why" questions</a:t>
+            </a:r>
+          </a:p>
+          <a:p>
+            <a:pPr lvl="1"/>
+            <a:r>
+              <a:rPr lang="en-US" dirty="0" smtClean="0"/>
+              <a:t>Very useful when developing as a </a:t>
+            </a:r>
+            <a:r>
+              <a:rPr lang="en-US" dirty="0" smtClean="0"/>
+              <a:t>team </a:t>
+            </a:r>
+            <a:endParaRPr lang="en-US" dirty="0" smtClean="0"/>
+          </a:p>
+          <a:p>
+            <a:pPr lvl="1"/>
+            <a:endParaRPr lang="nl-BE" dirty="0"/>
+          </a:p>
+        </p:txBody>
+      </p:sp>
+      <p:sp>
+        <p:nvSpPr>
+          <p:cNvPr id="4" name="Slide Number Placeholder 3"/>
+          <p:cNvSpPr>
+            <a:spLocks noGrp="1"/>
+          </p:cNvSpPr>
+          <p:nvPr>
+            <p:ph type="sldNum" sz="quarter" idx="12"/>
+          </p:nvPr>
+        </p:nvSpPr>
+        <p:spPr/>
+        <p:txBody>
+          <a:bodyPr/>
+          <a:lstStyle/>
+          <a:p>
+            <a:fld id="{BB52A05A-A776-4391-ACD7-D6BC34D3145C}" type="slidenum">
+              <a:rPr lang="nl-BE" smtClean="0"/>
+              <a:t>20</a:t>
+            </a:fld>
+            <a:endParaRPr lang="nl-BE"/>
+          </a:p>
+        </p:txBody>
+      </p:sp>
+    </p:spTree>
+    <p:extLst>
+      <p:ext uri="{BB962C8B-B14F-4D97-AF65-F5344CB8AC3E}">
+        <p14:creationId xmlns:p14="http://schemas.microsoft.com/office/powerpoint/2010/main" val="3073049295"/>
+      </p:ext>
+    </p:extLst>
+  </p:cSld>
+  <p:clrMapOvr>
+    <a:masterClrMapping/>
+  </p:clrMapOvr>
+  <p:timing>
+    <p:tnLst>
+      <p:par>
+        <p:cTn id="1" dur="indefinite" restart="never" nodeType="tmRoot">
+          <p:childTnLst>
+            <p:seq concurrent="1" nextAc="seek">
+              <p:cTn id="2" dur="indefinite" nodeType="mainSeq">
+                <p:childTnLst>
+                  <p:par>
+                    <p:cTn id="3" fill="hold">
+                      <p:stCondLst>
+                        <p:cond delay="indefinite"/>
+                        <p:cond evt="onBegin" delay="0">
+                          <p:tn val="2"/>
+                        </p:cond>
+                      </p:stCondLst>
+                      <p:childTnLst>
+                        <p:par>
+                          <p:cTn id="4" fill="hold">
+                            <p:stCondLst>
+                              <p:cond delay="0"/>
+                            </p:stCondLst>
+                            <p:childTnLst>
+                              <p:par>
+                                <p:cTn id="5" presetID="1" presetClass="entr" presetSubtype="0" fill="hold" grpId="0" nodeType="withEffect">
+                                  <p:stCondLst>
+                                    <p:cond delay="0"/>
+                                  </p:stCondLst>
+                                  <p:childTnLst>
+                                    <p:set>
+                                      <p:cBhvr>
+                                        <p:cTn id="6" dur="1" fill="hold">
+                                          <p:stCondLst>
+                                            <p:cond delay="0"/>
+                                          </p:stCondLst>
+                                        </p:cTn>
+                                        <p:tgtEl>
+                                          <p:spTgt spid="3">
+                                            <p:txEl>
+                                              <p:pRg st="0" end="0"/>
+                                            </p:txEl>
+                                          </p:spTgt>
+                                        </p:tgtEl>
+                                        <p:attrNameLst>
+                                          <p:attrName>style.visibility</p:attrName>
+                                        </p:attrNameLst>
+                                      </p:cBhvr>
+                                      <p:to>
+                                        <p:strVal val="visible"/>
+                                      </p:to>
+                                    </p:set>
+                                  </p:childTnLst>
+                                </p:cTn>
+                              </p:par>
+                              <p:par>
+                                <p:cTn id="7" presetID="1" presetClass="entr" presetSubtype="0" fill="hold" grpId="0" nodeType="withEffect">
+                                  <p:stCondLst>
+                                    <p:cond delay="0"/>
+                                  </p:stCondLst>
+                                  <p:childTnLst>
+                                    <p:set>
+                                      <p:cBhvr>
+                                        <p:cTn id="8" dur="1" fill="hold">
+                                          <p:stCondLst>
+                                            <p:cond delay="0"/>
+                                          </p:stCondLst>
+                                        </p:cTn>
+                                        <p:tgtEl>
+                                          <p:spTgt spid="3">
+                                            <p:txEl>
+                                              <p:pRg st="1" end="1"/>
+                                            </p:txEl>
+                                          </p:spTgt>
+                                        </p:tgtEl>
+                                        <p:attrNameLst>
+                                          <p:attrName>style.visibility</p:attrName>
+                                        </p:attrNameLst>
+                                      </p:cBhvr>
+                                      <p:to>
+                                        <p:strVal val="visible"/>
+                                      </p:to>
+                                    </p:set>
+                                  </p:childTnLst>
+                                </p:cTn>
+                              </p:par>
+                            </p:childTnLst>
+                          </p:cTn>
+                        </p:par>
+                      </p:childTnLst>
+                    </p:cTn>
+                  </p:par>
+                  <p:par>
+                    <p:cTn id="9" fill="hold">
+                      <p:stCondLst>
+                        <p:cond delay="indefinite"/>
+                      </p:stCondLst>
+                      <p:childTnLst>
+                        <p:par>
+                          <p:cTn id="10" fill="hold">
+                            <p:stCondLst>
+                              <p:cond delay="0"/>
+                            </p:stCondLst>
+                            <p:childTnLst>
+                              <p:par>
+                                <p:cTn id="11" presetID="1" presetClass="entr" presetSubtype="0" fill="hold" grpId="0" nodeType="clickEffect">
+                                  <p:stCondLst>
+                                    <p:cond delay="0"/>
+                                  </p:stCondLst>
+                                  <p:childTnLst>
+                                    <p:set>
+                                      <p:cBhvr>
+                                        <p:cTn id="12" dur="1" fill="hold">
+                                          <p:stCondLst>
+                                            <p:cond delay="0"/>
+                                          </p:stCondLst>
+                                        </p:cTn>
+                                        <p:tgtEl>
+                                          <p:spTgt spid="3">
+                                            <p:txEl>
+                                              <p:pRg st="2" end="2"/>
+                                            </p:txEl>
+                                          </p:spTgt>
+                                        </p:tgtEl>
+                                        <p:attrNameLst>
+                                          <p:attrName>style.visibility</p:attrName>
+                                        </p:attrNameLst>
+                                      </p:cBhvr>
+                                      <p:to>
+                                        <p:strVal val="visible"/>
+                                      </p:to>
+                                    </p:set>
+                                  </p:childTnLst>
+                                </p:cTn>
+                              </p:par>
+                              <p:par>
+                                <p:cTn id="13" presetID="1" presetClass="entr" presetSubtype="0" fill="hold" grpId="0" nodeType="withEffect">
+                                  <p:stCondLst>
+                                    <p:cond delay="0"/>
+                                  </p:stCondLst>
+                                  <p:childTnLst>
+                                    <p:set>
+                                      <p:cBhvr>
+                                        <p:cTn id="14" dur="1" fill="hold">
+                                          <p:stCondLst>
+                                            <p:cond delay="0"/>
+                                          </p:stCondLst>
+                                        </p:cTn>
+                                        <p:tgtEl>
+                                          <p:spTgt spid="3">
+                                            <p:txEl>
+                                              <p:pRg st="3" end="3"/>
+                                            </p:txEl>
+                                          </p:spTgt>
+                                        </p:tgtEl>
+                                        <p:attrNameLst>
+                                          <p:attrName>style.visibility</p:attrName>
+                                        </p:attrNameLst>
+                                      </p:cBhvr>
+                                      <p:to>
+                                        <p:strVal val="visible"/>
+                                      </p:to>
+                                    </p:set>
+                                  </p:childTnLst>
+                                </p:cTn>
+                              </p:par>
+                              <p:par>
+                                <p:cTn id="15" presetID="1" presetClass="entr" presetSubtype="0" fill="hold" grpId="0" nodeType="withEffect">
+                                  <p:stCondLst>
+                                    <p:cond delay="0"/>
+                                  </p:stCondLst>
+                                  <p:childTnLst>
+                                    <p:set>
+                                      <p:cBhvr>
+                                        <p:cTn id="16" dur="1" fill="hold">
+                                          <p:stCondLst>
+                                            <p:cond delay="0"/>
+                                          </p:stCondLst>
+                                        </p:cTn>
+                                        <p:tgtEl>
+                                          <p:spTgt spid="3">
+                                            <p:txEl>
+                                              <p:pRg st="4" end="4"/>
+                                            </p:txEl>
+                                          </p:spTgt>
+                                        </p:tgtEl>
+                                        <p:attrNameLst>
+                                          <p:attrName>style.visibility</p:attrName>
+                                        </p:attrNameLst>
+                                      </p:cBhvr>
+                                      <p:to>
+                                        <p:strVal val="visible"/>
+                                      </p:to>
+                                    </p:set>
+                                  </p:childTnLst>
+                                </p:cTn>
+                              </p:par>
+                              <p:par>
+                                <p:cTn id="17" presetID="1" presetClass="entr" presetSubtype="0" fill="hold" grpId="0" nodeType="withEffect">
+                                  <p:stCondLst>
+                                    <p:cond delay="0"/>
+                                  </p:stCondLst>
+                                  <p:childTnLst>
+                                    <p:set>
+                                      <p:cBhvr>
+                                        <p:cTn id="18" dur="1" fill="hold">
+                                          <p:stCondLst>
+                                            <p:cond delay="0"/>
+                                          </p:stCondLst>
+                                        </p:cTn>
+                                        <p:tgtEl>
+                                          <p:spTgt spid="3">
+                                            <p:txEl>
+                                              <p:pRg st="5" end="5"/>
+                                            </p:txEl>
+                                          </p:spTgt>
+                                        </p:tgtEl>
+                                        <p:attrNameLst>
+                                          <p:attrName>style.visibility</p:attrName>
+                                        </p:attrNameLst>
+                                      </p:cBhvr>
+                                      <p:to>
+                                        <p:strVal val="visible"/>
+                                      </p:to>
+                                    </p:set>
+                                  </p:childTnLst>
+                                </p:cTn>
+                              </p:par>
+                            </p:childTnLst>
+                          </p:cTn>
+                        </p:par>
+                      </p:childTnLst>
+                    </p:cTn>
+                  </p:par>
+                </p:childTnLst>
+              </p:cTn>
+              <p:prevCondLst>
+                <p:cond evt="onPrev" delay="0">
+                  <p:tgtEl>
+                    <p:sldTgt/>
+                  </p:tgtEl>
+                </p:cond>
+              </p:prevCondLst>
+              <p:nextCondLst>
+                <p:cond evt="onNext" delay="0">
+                  <p:tgtEl>
+                    <p:sldTgt/>
+                  </p:tgtEl>
+                </p:cond>
+              </p:nextCondLst>
+            </p:seq>
+          </p:childTnLst>
+        </p:cTn>
+      </p:par>
+    </p:tnLst>
+    <p:bldLst>
+      <p:bldP spid="3" grpId="0" uiExpand="1" build="p"/>
+    </p:bldLst>
+  </p:timing>
+</p:sld>
+</file>
+
+<file path=ppt/slides/slide21.xml><?xml version="1.0" encoding="utf-8"?>
+<p:sld xmlns:a="http://schemas.openxmlformats.org/drawingml/2006/main" xmlns:r="http://schemas.openxmlformats.org/officeDocument/2006/relationships" xmlns:p="http://schemas.openxmlformats.org/presentationml/2006/main">
+  <p:cSld>
+    <p:spTree>
+      <p:nvGrpSpPr>
+        <p:cNvPr id="1" name=""/>
+        <p:cNvGrpSpPr/>
+        <p:nvPr/>
+      </p:nvGrpSpPr>
+      <p:grpSpPr>
+        <a:xfrm>
+          <a:off x="0" y="0"/>
+          <a:ext cx="0" cy="0"/>
+          <a:chOff x="0" y="0"/>
+          <a:chExt cx="0" cy="0"/>
+        </a:xfrm>
+      </p:grpSpPr>
+      <p:sp>
+        <p:nvSpPr>
+          <p:cNvPr id="2" name="Title 1"/>
+          <p:cNvSpPr>
+            <a:spLocks noGrp="1"/>
+          </p:cNvSpPr>
+          <p:nvPr>
+            <p:ph type="title"/>
+          </p:nvPr>
+        </p:nvSpPr>
+        <p:spPr/>
+        <p:txBody>
+          <a:bodyPr>
+            <a:normAutofit/>
+          </a:bodyPr>
+          <a:lstStyle/>
+          <a:p>
+            <a:r>
+              <a:rPr lang="en-US" dirty="0" smtClean="0"/>
+              <a:t>Seven rules</a:t>
+            </a:r>
+            <a:endParaRPr lang="en-US" dirty="0"/>
+          </a:p>
+        </p:txBody>
+      </p:sp>
+      <p:sp>
+        <p:nvSpPr>
+          <p:cNvPr id="3" name="Content Placeholder 2"/>
+          <p:cNvSpPr>
+            <a:spLocks noGrp="1"/>
+          </p:cNvSpPr>
+          <p:nvPr>
+            <p:ph idx="1"/>
+          </p:nvPr>
+        </p:nvSpPr>
+        <p:spPr/>
+        <p:txBody>
+          <a:bodyPr>
+            <a:normAutofit/>
+          </a:bodyPr>
+          <a:lstStyle/>
+          <a:p>
+            <a:r>
+              <a:rPr lang="en-US" dirty="0" smtClean="0"/>
+              <a:t>Seven rules for commit messages</a:t>
+            </a:r>
+            <a:br>
+              <a:rPr lang="en-US" dirty="0" smtClean="0"/>
+            </a:br>
+            <a:r>
+              <a:rPr lang="en-US" sz="2000" dirty="0">
+                <a:hlinkClick r:id="rId2"/>
+              </a:rPr>
+              <a:t>https://chris.beams.io/posts/git-commit</a:t>
+            </a:r>
+            <a:r>
+              <a:rPr lang="en-US" sz="2000" dirty="0" smtClean="0">
+                <a:hlinkClick r:id="rId2"/>
+              </a:rPr>
+              <a:t>/</a:t>
+            </a:r>
+            <a:endParaRPr lang="en-US" dirty="0" smtClean="0"/>
+          </a:p>
+          <a:p>
+            <a:pPr marL="971550" lvl="1" indent="-514350">
+              <a:buFont typeface="+mj-lt"/>
+              <a:buAutoNum type="arabicPeriod"/>
+            </a:pPr>
+            <a:r>
+              <a:rPr lang="en-US" dirty="0" smtClean="0"/>
+              <a:t>separate subject from body with blank line</a:t>
+            </a:r>
+          </a:p>
+          <a:p>
+            <a:pPr marL="971550" lvl="1" indent="-514350">
+              <a:buFont typeface="+mj-lt"/>
+              <a:buAutoNum type="arabicPeriod"/>
+            </a:pPr>
+            <a:r>
+              <a:rPr lang="en-US" dirty="0" smtClean="0"/>
+              <a:t>limit subject to 50 characters</a:t>
+            </a:r>
+          </a:p>
+          <a:p>
+            <a:pPr marL="971550" lvl="1" indent="-514350">
+              <a:buFont typeface="+mj-lt"/>
+              <a:buAutoNum type="arabicPeriod"/>
+            </a:pPr>
+            <a:r>
+              <a:rPr lang="en-US" dirty="0" smtClean="0"/>
+              <a:t>capitalize subject line</a:t>
+            </a:r>
+          </a:p>
+          <a:p>
+            <a:pPr marL="971550" lvl="1" indent="-514350">
+              <a:buFont typeface="+mj-lt"/>
+              <a:buAutoNum type="arabicPeriod"/>
+            </a:pPr>
+            <a:r>
+              <a:rPr lang="en-US" dirty="0" smtClean="0"/>
+              <a:t>do not end subject line with period</a:t>
+            </a:r>
+          </a:p>
+          <a:p>
+            <a:pPr marL="971550" lvl="1" indent="-514350">
+              <a:buFont typeface="+mj-lt"/>
+              <a:buAutoNum type="arabicPeriod"/>
+            </a:pPr>
+            <a:r>
+              <a:rPr lang="en-US" dirty="0" smtClean="0"/>
+              <a:t>use  imperative mood in subject line</a:t>
+            </a:r>
+          </a:p>
+          <a:p>
+            <a:pPr marL="971550" lvl="1" indent="-514350">
+              <a:buFont typeface="+mj-lt"/>
+              <a:buAutoNum type="arabicPeriod"/>
+            </a:pPr>
+            <a:r>
+              <a:rPr lang="en-US" dirty="0" smtClean="0"/>
+              <a:t>wrap body at 72 characters</a:t>
+            </a:r>
+          </a:p>
+          <a:p>
+            <a:pPr marL="971550" lvl="1" indent="-514350">
+              <a:buFont typeface="+mj-lt"/>
+              <a:buAutoNum type="arabicPeriod"/>
+            </a:pPr>
+            <a:r>
+              <a:rPr lang="en-US" dirty="0" smtClean="0"/>
+              <a:t>use body to explain </a:t>
+            </a:r>
+            <a:r>
+              <a:rPr lang="en-US" i="1" dirty="0" smtClean="0"/>
+              <a:t>what</a:t>
+            </a:r>
+            <a:r>
+              <a:rPr lang="en-US" dirty="0" smtClean="0"/>
+              <a:t> &amp; </a:t>
+            </a:r>
+            <a:r>
+              <a:rPr lang="en-US" i="1" dirty="0" smtClean="0"/>
+              <a:t>why</a:t>
+            </a:r>
+            <a:r>
+              <a:rPr lang="en-US" dirty="0" smtClean="0"/>
+              <a:t> rather than </a:t>
+            </a:r>
+            <a:r>
+              <a:rPr lang="en-US" i="1" dirty="0" smtClean="0"/>
+              <a:t>how</a:t>
+            </a:r>
+          </a:p>
+          <a:p>
+            <a:pPr lvl="1"/>
+            <a:endParaRPr lang="en-US" dirty="0"/>
+          </a:p>
+        </p:txBody>
+      </p:sp>
+      <p:sp>
+        <p:nvSpPr>
+          <p:cNvPr id="4" name="Slide Number Placeholder 3"/>
+          <p:cNvSpPr>
+            <a:spLocks noGrp="1"/>
+          </p:cNvSpPr>
+          <p:nvPr>
+            <p:ph type="sldNum" sz="quarter" idx="12"/>
+          </p:nvPr>
+        </p:nvSpPr>
+        <p:spPr/>
+        <p:txBody>
+          <a:bodyPr/>
+          <a:lstStyle/>
+          <a:p>
+            <a:fld id="{BB52A05A-A776-4391-ACD7-D6BC34D3145C}" type="slidenum">
+              <a:rPr lang="nl-BE" smtClean="0"/>
+              <a:t>21</a:t>
+            </a:fld>
+            <a:endParaRPr lang="nl-BE"/>
+          </a:p>
+        </p:txBody>
+      </p:sp>
+    </p:spTree>
+    <p:extLst>
+      <p:ext uri="{BB962C8B-B14F-4D97-AF65-F5344CB8AC3E}">
+        <p14:creationId xmlns:p14="http://schemas.microsoft.com/office/powerpoint/2010/main" val="492693782"/>
+      </p:ext>
+    </p:extLst>
+  </p:cSld>
+  <p:clrMapOvr>
+    <a:masterClrMapping/>
+  </p:clrMapOvr>
+  <p:timing>
+    <p:tnLst>
+      <p:par>
+        <p:cTn id="1" dur="indefinite" restart="never" nodeType="tmRoot"/>
+      </p:par>
+    </p:tnLst>
   </p:timing>
 </p:sld>
 </file>

</xml_diff>

<commit_message>
Add slide on good pull requests
</commit_message>
<xml_diff>
--- a/LinuxTools/VersionControl/version_control_git.pptx
+++ b/LinuxTools/VersionControl/version_control_git.pptx
@@ -5,7 +5,7 @@
     <p:sldMasterId id="2147483648" r:id="rId1"/>
   </p:sldMasterIdLst>
   <p:notesMasterIdLst>
-    <p:notesMasterId r:id="rId63"/>
+    <p:notesMasterId r:id="rId64"/>
   </p:notesMasterIdLst>
   <p:sldIdLst>
     <p:sldId id="256" r:id="rId2"/>
@@ -63,12 +63,13 @@
     <p:sldId id="309" r:id="rId54"/>
     <p:sldId id="314" r:id="rId55"/>
     <p:sldId id="315" r:id="rId56"/>
-    <p:sldId id="316" r:id="rId57"/>
-    <p:sldId id="300" r:id="rId58"/>
-    <p:sldId id="301" r:id="rId59"/>
-    <p:sldId id="299" r:id="rId60"/>
-    <p:sldId id="310" r:id="rId61"/>
-    <p:sldId id="313" r:id="rId62"/>
+    <p:sldId id="320" r:id="rId57"/>
+    <p:sldId id="316" r:id="rId58"/>
+    <p:sldId id="300" r:id="rId59"/>
+    <p:sldId id="301" r:id="rId60"/>
+    <p:sldId id="299" r:id="rId61"/>
+    <p:sldId id="310" r:id="rId62"/>
+    <p:sldId id="313" r:id="rId63"/>
   </p:sldIdLst>
   <p:sldSz cx="9144000" cy="6858000" type="screen4x3"/>
   <p:notesSz cx="6858000" cy="9144000"/>
@@ -239,6 +240,7 @@
             <p14:sldId id="309"/>
             <p14:sldId id="314"/>
             <p14:sldId id="315"/>
+            <p14:sldId id="320"/>
             <p14:sldId id="316"/>
           </p14:sldIdLst>
         </p14:section>
@@ -701,7 +703,7 @@
           <a:p>
             <a:fld id="{1A571F42-F258-455F-A3F1-D2E86FDFEB4C}" type="slidenum">
               <a:rPr lang="nl-BE" smtClean="0"/>
-              <a:t>60</a:t>
+              <a:t>61</a:t>
             </a:fld>
             <a:endParaRPr lang="nl-BE"/>
           </a:p>
@@ -38798,9 +38800,9 @@
           <a:p>
             <a:r>
               <a:rPr lang="en-US" dirty="0" smtClean="0"/>
-              <a:t>Receiving contribution</a:t>
-            </a:r>
-            <a:endParaRPr lang="nl-BE" dirty="0"/>
+              <a:t>Pull request</a:t>
+            </a:r>
+            <a:endParaRPr lang="en-US" dirty="0"/>
           </a:p>
         </p:txBody>
       </p:sp>
@@ -38821,53 +38823,79 @@
           <a:p>
             <a:r>
               <a:rPr lang="en-US" dirty="0" smtClean="0"/>
-              <a:t>Someone forked your repository to contribute</a:t>
+              <a:t>Many repositories have </a:t>
+            </a:r>
+            <a:r>
+              <a:rPr lang="en-US" dirty="0" smtClean="0">
+                <a:latin typeface="Courier New" panose="02070309020205020404" pitchFamily="49" charset="0"/>
+                <a:cs typeface="Courier New" panose="02070309020205020404" pitchFamily="49" charset="0"/>
+              </a:rPr>
+              <a:t>CONTRIBUTING.md</a:t>
             </a:r>
           </a:p>
           <a:p>
             <a:r>
               <a:rPr lang="en-US" dirty="0" smtClean="0"/>
-              <a:t>You receive pull request</a:t>
+              <a:t>Good pull requests</a:t>
             </a:r>
           </a:p>
           <a:p>
             <a:pPr lvl="1"/>
             <a:r>
               <a:rPr lang="en-US" dirty="0" smtClean="0"/>
-              <a:t>Evaluate contribution</a:t>
-            </a:r>
-          </a:p>
-          <a:p>
-            <a:pPr lvl="2"/>
+              <a:t>informative subject</a:t>
+            </a:r>
+          </a:p>
+          <a:p>
+            <a:pPr lvl="1"/>
             <a:r>
               <a:rPr lang="en-US" dirty="0" smtClean="0"/>
-              <a:t>Code review</a:t>
-            </a:r>
-          </a:p>
-          <a:p>
-            <a:pPr lvl="2"/>
+              <a:t>motivation for change</a:t>
+            </a:r>
+          </a:p>
+          <a:p>
+            <a:pPr lvl="1"/>
             <a:r>
               <a:rPr lang="en-US" dirty="0" smtClean="0"/>
-              <a:t>Extensive tests</a:t>
+              <a:t>atomic commits, with informative messages</a:t>
             </a:r>
           </a:p>
           <a:p>
             <a:pPr lvl="1"/>
             <a:r>
               <a:rPr lang="en-US" dirty="0" smtClean="0"/>
-              <a:t>If okay, merge remote branch into, e.g., master or development</a:t>
-            </a:r>
-          </a:p>
-          <a:p>
-            <a:pPr lvl="1"/>
+              <a:t>typically based on </a:t>
+            </a:r>
+            <a:r>
+              <a:rPr lang="en-US" dirty="0" smtClean="0">
+                <a:latin typeface="Courier New" panose="02070309020205020404" pitchFamily="49" charset="0"/>
+                <a:cs typeface="Courier New" panose="02070309020205020404" pitchFamily="49" charset="0"/>
+              </a:rPr>
+              <a:t>development</a:t>
+            </a:r>
             <a:r>
               <a:rPr lang="en-US" dirty="0" smtClean="0"/>
-              <a:t>If not okay, provide feedback, delete pull request</a:t>
-            </a:r>
-          </a:p>
-          <a:p>
-            <a:pPr lvl="1"/>
-            <a:endParaRPr lang="nl-BE" dirty="0"/>
+              <a:t> branch, </a:t>
+            </a:r>
+            <a:r>
+              <a:rPr lang="en-US" i="1" dirty="0" smtClean="0"/>
+              <a:t>not</a:t>
+            </a:r>
+            <a:r>
+              <a:rPr lang="en-US" dirty="0" smtClean="0"/>
+              <a:t> </a:t>
+            </a:r>
+            <a:r>
+              <a:rPr lang="en-US" dirty="0" smtClean="0">
+                <a:latin typeface="Courier New" panose="02070309020205020404" pitchFamily="49" charset="0"/>
+                <a:cs typeface="Courier New" panose="02070309020205020404" pitchFamily="49" charset="0"/>
+              </a:rPr>
+              <a:t>master</a:t>
+            </a:r>
+            <a:endParaRPr lang="en-US" dirty="0">
+              <a:latin typeface="Courier New" panose="02070309020205020404" pitchFamily="49" charset="0"/>
+              <a:cs typeface="Courier New" panose="02070309020205020404" pitchFamily="49" charset="0"/>
+            </a:endParaRPr>
           </a:p>
         </p:txBody>
       </p:sp>
@@ -38889,6 +38917,156 @@
             <a:fld id="{BB52A05A-A776-4391-ACD7-D6BC34D3145C}" type="slidenum">
               <a:rPr lang="nl-BE" smtClean="0"/>
               <a:t>56</a:t>
+            </a:fld>
+            <a:endParaRPr lang="nl-BE"/>
+          </a:p>
+        </p:txBody>
+      </p:sp>
+    </p:spTree>
+    <p:extLst>
+      <p:ext uri="{BB962C8B-B14F-4D97-AF65-F5344CB8AC3E}">
+        <p14:creationId xmlns:p14="http://schemas.microsoft.com/office/powerpoint/2010/main" val="1370890305"/>
+      </p:ext>
+    </p:extLst>
+  </p:cSld>
+  <p:clrMapOvr>
+    <a:masterClrMapping/>
+  </p:clrMapOvr>
+  <p:timing>
+    <p:tnLst>
+      <p:par>
+        <p:cTn id="1" dur="indefinite" restart="never" nodeType="tmRoot"/>
+      </p:par>
+    </p:tnLst>
+  </p:timing>
+</p:sld>
+</file>
+
+<file path=ppt/slides/slide57.xml><?xml version="1.0" encoding="utf-8"?>
+<p:sld xmlns:a="http://schemas.openxmlformats.org/drawingml/2006/main" xmlns:r="http://schemas.openxmlformats.org/officeDocument/2006/relationships" xmlns:p="http://schemas.openxmlformats.org/presentationml/2006/main">
+  <p:cSld>
+    <p:spTree>
+      <p:nvGrpSpPr>
+        <p:cNvPr id="1" name=""/>
+        <p:cNvGrpSpPr/>
+        <p:nvPr/>
+      </p:nvGrpSpPr>
+      <p:grpSpPr>
+        <a:xfrm>
+          <a:off x="0" y="0"/>
+          <a:ext cx="0" cy="0"/>
+          <a:chOff x="0" y="0"/>
+          <a:chExt cx="0" cy="0"/>
+        </a:xfrm>
+      </p:grpSpPr>
+      <p:sp>
+        <p:nvSpPr>
+          <p:cNvPr id="2" name="Title 1"/>
+          <p:cNvSpPr>
+            <a:spLocks noGrp="1"/>
+          </p:cNvSpPr>
+          <p:nvPr>
+            <p:ph type="title"/>
+          </p:nvPr>
+        </p:nvSpPr>
+        <p:spPr/>
+        <p:txBody>
+          <a:bodyPr/>
+          <a:lstStyle/>
+          <a:p>
+            <a:r>
+              <a:rPr lang="en-US" dirty="0" smtClean="0"/>
+              <a:t>Receiving contribution</a:t>
+            </a:r>
+            <a:endParaRPr lang="nl-BE" dirty="0"/>
+          </a:p>
+        </p:txBody>
+      </p:sp>
+      <p:sp>
+        <p:nvSpPr>
+          <p:cNvPr id="3" name="Content Placeholder 2"/>
+          <p:cNvSpPr>
+            <a:spLocks noGrp="1"/>
+          </p:cNvSpPr>
+          <p:nvPr>
+            <p:ph idx="1"/>
+          </p:nvPr>
+        </p:nvSpPr>
+        <p:spPr/>
+        <p:txBody>
+          <a:bodyPr/>
+          <a:lstStyle/>
+          <a:p>
+            <a:r>
+              <a:rPr lang="en-US" dirty="0" smtClean="0"/>
+              <a:t>Someone forked your repository to contribute</a:t>
+            </a:r>
+          </a:p>
+          <a:p>
+            <a:r>
+              <a:rPr lang="en-US" dirty="0" smtClean="0"/>
+              <a:t>You receive pull request</a:t>
+            </a:r>
+          </a:p>
+          <a:p>
+            <a:pPr lvl="1"/>
+            <a:r>
+              <a:rPr lang="en-US" dirty="0" smtClean="0"/>
+              <a:t>Evaluate contribution</a:t>
+            </a:r>
+          </a:p>
+          <a:p>
+            <a:pPr lvl="2"/>
+            <a:r>
+              <a:rPr lang="en-US" dirty="0" smtClean="0"/>
+              <a:t>Code review</a:t>
+            </a:r>
+          </a:p>
+          <a:p>
+            <a:pPr lvl="2"/>
+            <a:r>
+              <a:rPr lang="en-US" dirty="0" smtClean="0"/>
+              <a:t>Extensive tests</a:t>
+            </a:r>
+          </a:p>
+          <a:p>
+            <a:pPr lvl="1"/>
+            <a:r>
+              <a:rPr lang="en-US" dirty="0" smtClean="0"/>
+              <a:t>If okay, merge remote branch into, e.g., master or development</a:t>
+            </a:r>
+          </a:p>
+          <a:p>
+            <a:pPr lvl="1"/>
+            <a:r>
+              <a:rPr lang="en-US" dirty="0" smtClean="0"/>
+              <a:t>If not okay, provide feedback, delete pull request</a:t>
+            </a:r>
+          </a:p>
+          <a:p>
+            <a:pPr lvl="1"/>
+            <a:endParaRPr lang="nl-BE" dirty="0"/>
+          </a:p>
+        </p:txBody>
+      </p:sp>
+      <p:sp>
+        <p:nvSpPr>
+          <p:cNvPr id="4" name="Slide Number Placeholder 3"/>
+          <p:cNvSpPr>
+            <a:spLocks noGrp="1"/>
+          </p:cNvSpPr>
+          <p:nvPr>
+            <p:ph type="sldNum" sz="quarter" idx="12"/>
+          </p:nvPr>
+        </p:nvSpPr>
+        <p:spPr/>
+        <p:txBody>
+          <a:bodyPr/>
+          <a:lstStyle/>
+          <a:p>
+            <a:fld id="{BB52A05A-A776-4391-ACD7-D6BC34D3145C}" type="slidenum">
+              <a:rPr lang="nl-BE" smtClean="0"/>
+              <a:t>57</a:t>
             </a:fld>
             <a:endParaRPr lang="nl-BE"/>
           </a:p>
@@ -39331,108 +39509,6 @@
 </p:sld>
 </file>
 
-<file path=ppt/slides/slide57.xml><?xml version="1.0" encoding="utf-8"?>
-<p:sld xmlns:a="http://schemas.openxmlformats.org/drawingml/2006/main" xmlns:r="http://schemas.openxmlformats.org/officeDocument/2006/relationships" xmlns:p="http://schemas.openxmlformats.org/presentationml/2006/main">
-  <p:cSld>
-    <p:spTree>
-      <p:nvGrpSpPr>
-        <p:cNvPr id="1" name=""/>
-        <p:cNvGrpSpPr/>
-        <p:nvPr/>
-      </p:nvGrpSpPr>
-      <p:grpSpPr>
-        <a:xfrm>
-          <a:off x="0" y="0"/>
-          <a:ext cx="0" cy="0"/>
-          <a:chOff x="0" y="0"/>
-          <a:chExt cx="0" cy="0"/>
-        </a:xfrm>
-      </p:grpSpPr>
-      <p:sp>
-        <p:nvSpPr>
-          <p:cNvPr id="2" name="Title 1"/>
-          <p:cNvSpPr>
-            <a:spLocks noGrp="1"/>
-          </p:cNvSpPr>
-          <p:nvPr>
-            <p:ph type="title"/>
-          </p:nvPr>
-        </p:nvSpPr>
-        <p:spPr/>
-        <p:txBody>
-          <a:bodyPr/>
-          <a:lstStyle/>
-          <a:p>
-            <a:r>
-              <a:rPr lang="en-US" dirty="0" smtClean="0"/>
-              <a:t>Conclusions</a:t>
-            </a:r>
-            <a:endParaRPr lang="nl-BE" dirty="0"/>
-          </a:p>
-        </p:txBody>
-      </p:sp>
-      <p:sp>
-        <p:nvSpPr>
-          <p:cNvPr id="3" name="Text Placeholder 2"/>
-          <p:cNvSpPr>
-            <a:spLocks noGrp="1"/>
-          </p:cNvSpPr>
-          <p:nvPr>
-            <p:ph type="body" idx="1"/>
-          </p:nvPr>
-        </p:nvSpPr>
-        <p:spPr/>
-        <p:txBody>
-          <a:bodyPr/>
-          <a:lstStyle/>
-          <a:p>
-            <a:endParaRPr lang="nl-BE"/>
-          </a:p>
-        </p:txBody>
-      </p:sp>
-      <p:sp>
-        <p:nvSpPr>
-          <p:cNvPr id="4" name="Slide Number Placeholder 3"/>
-          <p:cNvSpPr>
-            <a:spLocks noGrp="1"/>
-          </p:cNvSpPr>
-          <p:nvPr>
-            <p:ph type="sldNum" sz="quarter" idx="12"/>
-          </p:nvPr>
-        </p:nvSpPr>
-        <p:spPr/>
-        <p:txBody>
-          <a:bodyPr/>
-          <a:lstStyle/>
-          <a:p>
-            <a:fld id="{BB52A05A-A776-4391-ACD7-D6BC34D3145C}" type="slidenum">
-              <a:rPr lang="nl-BE" smtClean="0"/>
-              <a:t>57</a:t>
-            </a:fld>
-            <a:endParaRPr lang="nl-BE"/>
-          </a:p>
-        </p:txBody>
-      </p:sp>
-    </p:spTree>
-    <p:extLst>
-      <p:ext uri="{BB962C8B-B14F-4D97-AF65-F5344CB8AC3E}">
-        <p14:creationId xmlns:p14="http://schemas.microsoft.com/office/powerpoint/2010/main" val="2763237186"/>
-      </p:ext>
-    </p:extLst>
-  </p:cSld>
-  <p:clrMapOvr>
-    <a:masterClrMapping/>
-  </p:clrMapOvr>
-  <p:timing>
-    <p:tnLst>
-      <p:par>
-        <p:cTn id="1" dur="indefinite" restart="never" nodeType="tmRoot"/>
-      </p:par>
-    </p:tnLst>
-  </p:timing>
-</p:sld>
-</file>
-
 <file path=ppt/slides/slide58.xml><?xml version="1.0" encoding="utf-8"?>
 <p:sld xmlns:a="http://schemas.openxmlformats.org/drawingml/2006/main" xmlns:r="http://schemas.openxmlformats.org/officeDocument/2006/relationships" xmlns:p="http://schemas.openxmlformats.org/presentationml/2006/main">
   <p:cSld>
@@ -39475,12 +39551,12 @@
       </p:sp>
       <p:sp>
         <p:nvSpPr>
-          <p:cNvPr id="3" name="Content Placeholder 2"/>
+          <p:cNvPr id="3" name="Text Placeholder 2"/>
           <p:cNvSpPr>
             <a:spLocks noGrp="1"/>
           </p:cNvSpPr>
           <p:nvPr>
-            <p:ph idx="1"/>
+            <p:ph type="body" idx="1"/>
           </p:nvPr>
         </p:nvSpPr>
         <p:spPr/>
@@ -39488,52 +39564,7 @@
           <a:bodyPr/>
           <a:lstStyle/>
           <a:p>
-            <a:r>
-              <a:rPr lang="en-US" dirty="0" smtClean="0"/>
-              <a:t>Contributes to the scientific method</a:t>
-            </a:r>
-          </a:p>
-          <a:p>
-            <a:pPr lvl="1"/>
-            <a:r>
-              <a:rPr lang="en-US" dirty="0" smtClean="0"/>
-              <a:t>Helps ensure reproducibility</a:t>
-            </a:r>
-          </a:p>
-          <a:p>
-            <a:r>
-              <a:rPr lang="en-US" dirty="0" smtClean="0"/>
-              <a:t>Record of change</a:t>
-            </a:r>
-          </a:p>
-          <a:p>
-            <a:pPr lvl="1"/>
-            <a:r>
-              <a:rPr lang="en-US" dirty="0" smtClean="0"/>
-              <a:t>What was changed?</a:t>
-            </a:r>
-          </a:p>
-          <a:p>
-            <a:pPr lvl="1"/>
-            <a:r>
-              <a:rPr lang="en-US" dirty="0" smtClean="0"/>
-              <a:t>When was it changed?</a:t>
-            </a:r>
-          </a:p>
-          <a:p>
-            <a:pPr lvl="1"/>
-            <a:r>
-              <a:rPr lang="en-US" dirty="0" smtClean="0"/>
-              <a:t>Who changed it?</a:t>
-            </a:r>
-          </a:p>
-          <a:p>
-            <a:pPr lvl="1"/>
-            <a:r>
-              <a:rPr lang="en-US" dirty="0" smtClean="0"/>
-              <a:t>Why was it changed?</a:t>
-            </a:r>
-            <a:endParaRPr lang="nl-BE" dirty="0"/>
+            <a:endParaRPr lang="nl-BE"/>
           </a:p>
         </p:txBody>
       </p:sp>
@@ -39555,6 +39586,153 @@
             <a:fld id="{BB52A05A-A776-4391-ACD7-D6BC34D3145C}" type="slidenum">
               <a:rPr lang="nl-BE" smtClean="0"/>
               <a:t>58</a:t>
+            </a:fld>
+            <a:endParaRPr lang="nl-BE"/>
+          </a:p>
+        </p:txBody>
+      </p:sp>
+    </p:spTree>
+    <p:extLst>
+      <p:ext uri="{BB962C8B-B14F-4D97-AF65-F5344CB8AC3E}">
+        <p14:creationId xmlns:p14="http://schemas.microsoft.com/office/powerpoint/2010/main" val="2763237186"/>
+      </p:ext>
+    </p:extLst>
+  </p:cSld>
+  <p:clrMapOvr>
+    <a:masterClrMapping/>
+  </p:clrMapOvr>
+  <p:timing>
+    <p:tnLst>
+      <p:par>
+        <p:cTn id="1" dur="indefinite" restart="never" nodeType="tmRoot"/>
+      </p:par>
+    </p:tnLst>
+  </p:timing>
+</p:sld>
+</file>
+
+<file path=ppt/slides/slide59.xml><?xml version="1.0" encoding="utf-8"?>
+<p:sld xmlns:a="http://schemas.openxmlformats.org/drawingml/2006/main" xmlns:r="http://schemas.openxmlformats.org/officeDocument/2006/relationships" xmlns:p="http://schemas.openxmlformats.org/presentationml/2006/main">
+  <p:cSld>
+    <p:spTree>
+      <p:nvGrpSpPr>
+        <p:cNvPr id="1" name=""/>
+        <p:cNvGrpSpPr/>
+        <p:nvPr/>
+      </p:nvGrpSpPr>
+      <p:grpSpPr>
+        <a:xfrm>
+          <a:off x="0" y="0"/>
+          <a:ext cx="0" cy="0"/>
+          <a:chOff x="0" y="0"/>
+          <a:chExt cx="0" cy="0"/>
+        </a:xfrm>
+      </p:grpSpPr>
+      <p:sp>
+        <p:nvSpPr>
+          <p:cNvPr id="2" name="Title 1"/>
+          <p:cNvSpPr>
+            <a:spLocks noGrp="1"/>
+          </p:cNvSpPr>
+          <p:nvPr>
+            <p:ph type="title"/>
+          </p:nvPr>
+        </p:nvSpPr>
+        <p:spPr/>
+        <p:txBody>
+          <a:bodyPr/>
+          <a:lstStyle/>
+          <a:p>
+            <a:r>
+              <a:rPr lang="en-US" dirty="0" smtClean="0"/>
+              <a:t>Conclusions</a:t>
+            </a:r>
+            <a:endParaRPr lang="nl-BE" dirty="0"/>
+          </a:p>
+        </p:txBody>
+      </p:sp>
+      <p:sp>
+        <p:nvSpPr>
+          <p:cNvPr id="3" name="Content Placeholder 2"/>
+          <p:cNvSpPr>
+            <a:spLocks noGrp="1"/>
+          </p:cNvSpPr>
+          <p:nvPr>
+            <p:ph idx="1"/>
+          </p:nvPr>
+        </p:nvSpPr>
+        <p:spPr/>
+        <p:txBody>
+          <a:bodyPr/>
+          <a:lstStyle/>
+          <a:p>
+            <a:r>
+              <a:rPr lang="en-US" dirty="0" smtClean="0"/>
+              <a:t>Contributes to the scientific method</a:t>
+            </a:r>
+          </a:p>
+          <a:p>
+            <a:pPr lvl="1"/>
+            <a:r>
+              <a:rPr lang="en-US" dirty="0" smtClean="0"/>
+              <a:t>Helps ensure reproducibility</a:t>
+            </a:r>
+          </a:p>
+          <a:p>
+            <a:r>
+              <a:rPr lang="en-US" dirty="0" smtClean="0"/>
+              <a:t>Record of change</a:t>
+            </a:r>
+          </a:p>
+          <a:p>
+            <a:pPr lvl="1"/>
+            <a:r>
+              <a:rPr lang="en-US" dirty="0" smtClean="0"/>
+              <a:t>What was changed?</a:t>
+            </a:r>
+          </a:p>
+          <a:p>
+            <a:pPr lvl="1"/>
+            <a:r>
+              <a:rPr lang="en-US" dirty="0" smtClean="0"/>
+              <a:t>When was it changed?</a:t>
+            </a:r>
+          </a:p>
+          <a:p>
+            <a:pPr lvl="1"/>
+            <a:r>
+              <a:rPr lang="en-US" dirty="0" smtClean="0"/>
+              <a:t>Who changed it?</a:t>
+            </a:r>
+          </a:p>
+          <a:p>
+            <a:pPr lvl="1"/>
+            <a:r>
+              <a:rPr lang="en-US" dirty="0" smtClean="0"/>
+              <a:t>Why was it changed?</a:t>
+            </a:r>
+            <a:endParaRPr lang="nl-BE" dirty="0"/>
+          </a:p>
+        </p:txBody>
+      </p:sp>
+      <p:sp>
+        <p:nvSpPr>
+          <p:cNvPr id="4" name="Slide Number Placeholder 3"/>
+          <p:cNvSpPr>
+            <a:spLocks noGrp="1"/>
+          </p:cNvSpPr>
+          <p:nvPr>
+            <p:ph type="sldNum" sz="quarter" idx="12"/>
+          </p:nvPr>
+        </p:nvSpPr>
+        <p:spPr/>
+        <p:txBody>
+          <a:bodyPr/>
+          <a:lstStyle/>
+          <a:p>
+            <a:fld id="{BB52A05A-A776-4391-ACD7-D6BC34D3145C}" type="slidenum">
+              <a:rPr lang="nl-BE" smtClean="0"/>
+              <a:t>59</a:t>
             </a:fld>
             <a:endParaRPr lang="nl-BE"/>
           </a:p>
@@ -39858,301 +40036,6 @@
     <p:bldLst>
       <p:bldP spid="3" grpId="0" uiExpand="1" build="p"/>
     </p:bldLst>
-  </p:timing>
-</p:sld>
-</file>
-
-<file path=ppt/slides/slide59.xml><?xml version="1.0" encoding="utf-8"?>
-<p:sld xmlns:a="http://schemas.openxmlformats.org/drawingml/2006/main" xmlns:r="http://schemas.openxmlformats.org/officeDocument/2006/relationships" xmlns:p="http://schemas.openxmlformats.org/presentationml/2006/main">
-  <p:cSld>
-    <p:spTree>
-      <p:nvGrpSpPr>
-        <p:cNvPr id="1" name=""/>
-        <p:cNvGrpSpPr/>
-        <p:nvPr/>
-      </p:nvGrpSpPr>
-      <p:grpSpPr>
-        <a:xfrm>
-          <a:off x="0" y="0"/>
-          <a:ext cx="0" cy="0"/>
-          <a:chOff x="0" y="0"/>
-          <a:chExt cx="0" cy="0"/>
-        </a:xfrm>
-      </p:grpSpPr>
-      <p:sp>
-        <p:nvSpPr>
-          <p:cNvPr id="2" name="Title 1"/>
-          <p:cNvSpPr>
-            <a:spLocks noGrp="1"/>
-          </p:cNvSpPr>
-          <p:nvPr>
-            <p:ph type="title"/>
-          </p:nvPr>
-        </p:nvSpPr>
-        <p:spPr/>
-        <p:txBody>
-          <a:bodyPr/>
-          <a:lstStyle/>
-          <a:p>
-            <a:r>
-              <a:rPr lang="en-US" dirty="0" smtClean="0"/>
-              <a:t>References</a:t>
-            </a:r>
-            <a:endParaRPr lang="nl-BE" dirty="0"/>
-          </a:p>
-        </p:txBody>
-      </p:sp>
-      <p:sp>
-        <p:nvSpPr>
-          <p:cNvPr id="3" name="Content Placeholder 2"/>
-          <p:cNvSpPr>
-            <a:spLocks noGrp="1"/>
-          </p:cNvSpPr>
-          <p:nvPr>
-            <p:ph idx="1"/>
-          </p:nvPr>
-        </p:nvSpPr>
-        <p:spPr/>
-        <p:txBody>
-          <a:bodyPr>
-            <a:normAutofit fontScale="85000" lnSpcReduction="20000"/>
-          </a:bodyPr>
-          <a:lstStyle/>
-          <a:p>
-            <a:r>
-              <a:rPr lang="en-US" dirty="0" smtClean="0"/>
-              <a:t>Online documentation (including </a:t>
-            </a:r>
-            <a:r>
-              <a:rPr lang="en-US" dirty="0" smtClean="0"/>
-              <a:t>movies)</a:t>
-            </a:r>
-            <a:br>
-              <a:rPr lang="en-US" dirty="0" smtClean="0"/>
-            </a:br>
-            <a:r>
-              <a:rPr lang="nl-BE" sz="2300" dirty="0" smtClean="0">
-                <a:hlinkClick r:id="rId2"/>
-              </a:rPr>
-              <a:t>http</a:t>
-            </a:r>
-            <a:r>
-              <a:rPr lang="nl-BE" sz="2300" dirty="0" smtClean="0">
-                <a:hlinkClick r:id="rId2"/>
-              </a:rPr>
-              <a:t>://git-scm.com/documentation</a:t>
-            </a:r>
-            <a:endParaRPr lang="nl-BE" dirty="0" smtClean="0"/>
-          </a:p>
-          <a:p>
-            <a:r>
-              <a:rPr lang="en-US" dirty="0" err="1"/>
-              <a:t>g</a:t>
-            </a:r>
-            <a:r>
-              <a:rPr lang="en-US" dirty="0" err="1" smtClean="0"/>
-              <a:t>it</a:t>
-            </a:r>
-            <a:r>
-              <a:rPr lang="en-US" dirty="0" smtClean="0"/>
-              <a:t> web </a:t>
-            </a:r>
-            <a:r>
-              <a:rPr lang="en-US" dirty="0" smtClean="0"/>
-              <a:t>site</a:t>
-            </a:r>
-            <a:br>
-              <a:rPr lang="en-US" dirty="0" smtClean="0"/>
-            </a:br>
-            <a:r>
-              <a:rPr lang="nl-BE" sz="2400" dirty="0" smtClean="0">
-                <a:hlinkClick r:id="rId3"/>
-              </a:rPr>
-              <a:t>http</a:t>
-            </a:r>
-            <a:r>
-              <a:rPr lang="nl-BE" sz="2400" dirty="0" smtClean="0">
-                <a:hlinkClick r:id="rId3"/>
-              </a:rPr>
-              <a:t>://git-scm.com</a:t>
-            </a:r>
-            <a:r>
-              <a:rPr lang="nl-BE" sz="2400" dirty="0" smtClean="0">
-                <a:hlinkClick r:id="rId3"/>
-              </a:rPr>
-              <a:t>/</a:t>
-            </a:r>
-            <a:endParaRPr lang="nl-BE" dirty="0" smtClean="0"/>
-          </a:p>
-          <a:p>
-            <a:r>
-              <a:rPr lang="nl-BE" dirty="0" smtClean="0"/>
-              <a:t>Pro git </a:t>
-            </a:r>
-            <a:r>
-              <a:rPr lang="nl-BE" dirty="0"/>
-              <a:t>online book</a:t>
-            </a:r>
-            <a:br>
-              <a:rPr lang="nl-BE" dirty="0"/>
-            </a:br>
-            <a:r>
-              <a:rPr lang="nl-BE" sz="2100" dirty="0">
-                <a:hlinkClick r:id="rId4"/>
-              </a:rPr>
-              <a:t>https://git-scm.com/book/en/v2</a:t>
-            </a:r>
-            <a:r>
-              <a:rPr lang="nl-BE" sz="2100" dirty="0" smtClean="0">
-                <a:hlinkClick r:id="rId4"/>
-              </a:rPr>
-              <a:t>/</a:t>
-            </a:r>
-            <a:r>
-              <a:rPr lang="nl-BE" sz="2100" dirty="0" smtClean="0"/>
-              <a:t> </a:t>
-            </a:r>
-            <a:endParaRPr lang="nl-BE" dirty="0" smtClean="0"/>
-          </a:p>
-          <a:p>
-            <a:r>
-              <a:rPr lang="en-US" dirty="0" smtClean="0"/>
-              <a:t>Why (the author thinks) you should switch to </a:t>
-            </a:r>
-            <a:r>
-              <a:rPr lang="en-US" dirty="0" err="1" smtClean="0"/>
-              <a:t>git</a:t>
-            </a:r>
-            <a:r>
-              <a:rPr lang="en-US" dirty="0" smtClean="0"/>
-              <a:t/>
-            </a:r>
-            <a:br>
-              <a:rPr lang="en-US" dirty="0" smtClean="0"/>
-            </a:br>
-            <a:r>
-              <a:rPr lang="nl-BE" sz="2300" dirty="0" smtClean="0">
-                <a:hlinkClick r:id="rId5"/>
-              </a:rPr>
-              <a:t>http</a:t>
-            </a:r>
-            <a:r>
-              <a:rPr lang="nl-BE" sz="2300" dirty="0" smtClean="0">
-                <a:hlinkClick r:id="rId5"/>
-              </a:rPr>
-              <a:t>://blog.teamtreehouse.com/why-you-should-switch-from-subversion-to-git</a:t>
-            </a:r>
-            <a:endParaRPr lang="nl-BE" dirty="0" smtClean="0"/>
-          </a:p>
-          <a:p>
-            <a:r>
-              <a:rPr lang="nl-BE" dirty="0" smtClean="0"/>
-              <a:t>Overview of frequently used git </a:t>
-            </a:r>
-            <a:r>
-              <a:rPr lang="nl-BE" dirty="0" smtClean="0"/>
-              <a:t>workflows</a:t>
-            </a:r>
-            <a:br>
-              <a:rPr lang="nl-BE" dirty="0" smtClean="0"/>
-            </a:br>
-            <a:r>
-              <a:rPr lang="en-US" sz="2100" dirty="0" smtClean="0">
-                <a:hlinkClick r:id="rId6"/>
-              </a:rPr>
-              <a:t>https</a:t>
-            </a:r>
-            <a:r>
-              <a:rPr lang="en-US" sz="2100" dirty="0">
-                <a:hlinkClick r:id="rId6"/>
-              </a:rPr>
-              <a:t>://</a:t>
-            </a:r>
-            <a:r>
-              <a:rPr lang="en-US" sz="2100" dirty="0" smtClean="0">
-                <a:hlinkClick r:id="rId6"/>
-              </a:rPr>
-              <a:t>www.atlassian.com/git/workflows</a:t>
-            </a:r>
-            <a:endParaRPr lang="en-US" dirty="0" smtClean="0"/>
-          </a:p>
-          <a:p>
-            <a:r>
-              <a:rPr lang="nl-BE" dirty="0" smtClean="0"/>
-              <a:t>Blog post on "good" commit </a:t>
-            </a:r>
-            <a:r>
-              <a:rPr lang="nl-BE" dirty="0" smtClean="0"/>
-              <a:t>messages</a:t>
-            </a:r>
-            <a:br>
-              <a:rPr lang="nl-BE" dirty="0" smtClean="0"/>
-            </a:br>
-            <a:r>
-              <a:rPr lang="nl-BE" sz="2100" dirty="0" smtClean="0">
-                <a:hlinkClick r:id="rId7"/>
-              </a:rPr>
-              <a:t>https</a:t>
-            </a:r>
-            <a:r>
-              <a:rPr lang="nl-BE" sz="2100" dirty="0">
-                <a:hlinkClick r:id="rId7"/>
-              </a:rPr>
-              <a:t>://chris.beams.io/posts/git-commit</a:t>
-            </a:r>
-            <a:r>
-              <a:rPr lang="nl-BE" sz="2100" dirty="0" smtClean="0">
-                <a:hlinkClick r:id="rId7"/>
-              </a:rPr>
-              <a:t>/</a:t>
-            </a:r>
-            <a:r>
-              <a:rPr lang="nl-BE" sz="2100" dirty="0" smtClean="0"/>
-              <a:t> </a:t>
-            </a:r>
-            <a:endParaRPr lang="nl-BE" dirty="0" smtClean="0"/>
-          </a:p>
-        </p:txBody>
-      </p:sp>
-      <p:sp>
-        <p:nvSpPr>
-          <p:cNvPr id="4" name="Slide Number Placeholder 3"/>
-          <p:cNvSpPr>
-            <a:spLocks noGrp="1"/>
-          </p:cNvSpPr>
-          <p:nvPr>
-            <p:ph type="sldNum" sz="quarter" idx="12"/>
-          </p:nvPr>
-        </p:nvSpPr>
-        <p:spPr/>
-        <p:txBody>
-          <a:bodyPr/>
-          <a:lstStyle/>
-          <a:p>
-            <a:fld id="{BB52A05A-A776-4391-ACD7-D6BC34D3145C}" type="slidenum">
-              <a:rPr lang="nl-BE" smtClean="0"/>
-              <a:t>59</a:t>
-            </a:fld>
-            <a:endParaRPr lang="nl-BE"/>
-          </a:p>
-        </p:txBody>
-      </p:sp>
-    </p:spTree>
-    <p:extLst>
-      <p:ext uri="{BB962C8B-B14F-4D97-AF65-F5344CB8AC3E}">
-        <p14:creationId xmlns:p14="http://schemas.microsoft.com/office/powerpoint/2010/main" val="2976133738"/>
-      </p:ext>
-    </p:extLst>
-  </p:cSld>
-  <p:clrMapOvr>
-    <a:masterClrMapping/>
-  </p:clrMapOvr>
-  <p:timing>
-    <p:tnLst>
-      <p:par>
-        <p:cTn id="1" dur="indefinite" restart="never" nodeType="tmRoot"/>
-      </p:par>
-    </p:tnLst>
   </p:timing>
 </p:sld>
 </file>
@@ -40720,7 +40603,7 @@
           <a:p>
             <a:r>
               <a:rPr lang="en-US" dirty="0" smtClean="0"/>
-              <a:t>Software &amp; tools</a:t>
+              <a:t>References</a:t>
             </a:r>
             <a:endParaRPr lang="nl-BE" dirty="0"/>
           </a:p>
@@ -40736,222 +40619,205 @@
             <p:ph idx="1"/>
           </p:nvPr>
         </p:nvSpPr>
-        <p:spPr>
-          <a:xfrm>
-            <a:off x="457200" y="1600201"/>
-            <a:ext cx="8229600" cy="5069159"/>
-          </a:xfrm>
-        </p:spPr>
+        <p:spPr/>
         <p:txBody>
           <a:bodyPr>
-            <a:normAutofit fontScale="92500" lnSpcReduction="20000"/>
+            <a:normAutofit fontScale="85000" lnSpcReduction="20000"/>
           </a:bodyPr>
           <a:lstStyle/>
           <a:p>
             <a:r>
+              <a:rPr lang="en-US" dirty="0" smtClean="0"/>
+              <a:t>Online documentation (including </a:t>
+            </a:r>
+            <a:r>
+              <a:rPr lang="en-US" dirty="0" smtClean="0"/>
+              <a:t>movies)</a:t>
+            </a:r>
+            <a:br>
+              <a:rPr lang="en-US" dirty="0" smtClean="0"/>
+            </a:br>
+            <a:r>
+              <a:rPr lang="nl-BE" sz="2300" dirty="0" smtClean="0">
+                <a:hlinkClick r:id="rId2"/>
+              </a:rPr>
+              <a:t>http</a:t>
+            </a:r>
+            <a:r>
+              <a:rPr lang="nl-BE" sz="2300" dirty="0" smtClean="0">
+                <a:hlinkClick r:id="rId2"/>
+              </a:rPr>
+              <a:t>://git-scm.com/documentation</a:t>
+            </a:r>
+            <a:endParaRPr lang="nl-BE" dirty="0" smtClean="0"/>
+          </a:p>
+          <a:p>
+            <a:r>
+              <a:rPr lang="en-US" dirty="0" err="1"/>
+              <a:t>g</a:t>
+            </a:r>
+            <a:r>
+              <a:rPr lang="en-US" dirty="0" err="1" smtClean="0"/>
+              <a:t>it</a:t>
+            </a:r>
+            <a:r>
+              <a:rPr lang="en-US" dirty="0" smtClean="0"/>
+              <a:t> web </a:t>
+            </a:r>
+            <a:r>
+              <a:rPr lang="en-US" dirty="0" smtClean="0"/>
+              <a:t>site</a:t>
+            </a:r>
+            <a:br>
+              <a:rPr lang="en-US" dirty="0" smtClean="0"/>
+            </a:br>
+            <a:r>
+              <a:rPr lang="nl-BE" sz="2400" dirty="0" smtClean="0">
+                <a:hlinkClick r:id="rId3"/>
+              </a:rPr>
+              <a:t>http</a:t>
+            </a:r>
+            <a:r>
+              <a:rPr lang="nl-BE" sz="2400" dirty="0" smtClean="0">
+                <a:hlinkClick r:id="rId3"/>
+              </a:rPr>
+              <a:t>://git-scm.com</a:t>
+            </a:r>
+            <a:r>
+              <a:rPr lang="nl-BE" sz="2400" dirty="0" smtClean="0">
+                <a:hlinkClick r:id="rId3"/>
+              </a:rPr>
+              <a:t>/</a:t>
+            </a:r>
+            <a:endParaRPr lang="nl-BE" dirty="0" smtClean="0"/>
+          </a:p>
+          <a:p>
+            <a:r>
+              <a:rPr lang="nl-BE" dirty="0" smtClean="0"/>
+              <a:t>Pro git </a:t>
+            </a:r>
+            <a:r>
+              <a:rPr lang="nl-BE" dirty="0"/>
+              <a:t>online book</a:t>
+            </a:r>
+            <a:br>
+              <a:rPr lang="nl-BE" dirty="0"/>
+            </a:br>
+            <a:r>
+              <a:rPr lang="nl-BE" sz="2100" dirty="0">
+                <a:hlinkClick r:id="rId4"/>
+              </a:rPr>
+              <a:t>https://git-scm.com/book/en/v2</a:t>
+            </a:r>
+            <a:r>
+              <a:rPr lang="nl-BE" sz="2100" dirty="0" smtClean="0">
+                <a:hlinkClick r:id="rId4"/>
+              </a:rPr>
+              <a:t>/</a:t>
+            </a:r>
+            <a:r>
+              <a:rPr lang="nl-BE" sz="2100" dirty="0" smtClean="0"/>
+              <a:t> </a:t>
+            </a:r>
+            <a:endParaRPr lang="nl-BE" dirty="0" smtClean="0"/>
+          </a:p>
+          <a:p>
+            <a:r>
+              <a:rPr lang="en-US" dirty="0" smtClean="0"/>
+              <a:t>Why (the author thinks) you should switch to </a:t>
+            </a:r>
+            <a:r>
               <a:rPr lang="en-US" dirty="0" err="1" smtClean="0"/>
               <a:t>git</a:t>
             </a:r>
             <a:r>
               <a:rPr lang="en-US" dirty="0" smtClean="0"/>
-              <a:t> comes with most Linux distributions</a:t>
-            </a:r>
-          </a:p>
-          <a:p>
-            <a:r>
+              <a:t/>
+            </a:r>
+            <a:br>
               <a:rPr lang="en-US" dirty="0" smtClean="0"/>
-              <a:t>Website &amp; downloads: </a:t>
-            </a:r>
-            <a:r>
-              <a:rPr lang="en-US" dirty="0">
-                <a:hlinkClick r:id="rId3"/>
-              </a:rPr>
-              <a:t>https://git-scm.com</a:t>
-            </a:r>
-            <a:r>
-              <a:rPr lang="en-US" dirty="0" smtClean="0">
-                <a:hlinkClick r:id="rId3"/>
+            </a:br>
+            <a:r>
+              <a:rPr lang="nl-BE" sz="2300" dirty="0" smtClean="0">
+                <a:hlinkClick r:id="rId5"/>
+              </a:rPr>
+              <a:t>http</a:t>
+            </a:r>
+            <a:r>
+              <a:rPr lang="nl-BE" sz="2300" dirty="0" smtClean="0">
+                <a:hlinkClick r:id="rId5"/>
+              </a:rPr>
+              <a:t>://blog.teamtreehouse.com/why-you-should-switch-from-subversion-to-git</a:t>
+            </a:r>
+            <a:endParaRPr lang="nl-BE" dirty="0" smtClean="0"/>
+          </a:p>
+          <a:p>
+            <a:r>
+              <a:rPr lang="nl-BE" dirty="0" smtClean="0"/>
+              <a:t>Overview of frequently used git </a:t>
+            </a:r>
+            <a:r>
+              <a:rPr lang="nl-BE" dirty="0" smtClean="0"/>
+              <a:t>workflows</a:t>
+            </a:r>
+            <a:br>
+              <a:rPr lang="nl-BE" dirty="0" smtClean="0"/>
+            </a:br>
+            <a:r>
+              <a:rPr lang="en-US" sz="2100" dirty="0" smtClean="0">
+                <a:hlinkClick r:id="rId6"/>
+              </a:rPr>
+              <a:t>https</a:t>
+            </a:r>
+            <a:r>
+              <a:rPr lang="en-US" sz="2100" dirty="0">
+                <a:hlinkClick r:id="rId6"/>
+              </a:rPr>
+              <a:t>://</a:t>
+            </a:r>
+            <a:r>
+              <a:rPr lang="en-US" sz="2100" dirty="0" smtClean="0">
+                <a:hlinkClick r:id="rId6"/>
+              </a:rPr>
+              <a:t>www.atlassian.com/git/workflows</a:t>
+            </a:r>
+            <a:endParaRPr lang="en-US" dirty="0" smtClean="0"/>
+          </a:p>
+          <a:p>
+            <a:r>
+              <a:rPr lang="nl-BE" dirty="0" smtClean="0"/>
+              <a:t>Blog post on "good" commit </a:t>
+            </a:r>
+            <a:r>
+              <a:rPr lang="nl-BE" dirty="0" smtClean="0"/>
+              <a:t>messages</a:t>
+            </a:r>
+            <a:br>
+              <a:rPr lang="nl-BE" dirty="0" smtClean="0"/>
+            </a:br>
+            <a:r>
+              <a:rPr lang="nl-BE" sz="2100" dirty="0" smtClean="0">
+                <a:hlinkClick r:id="rId7"/>
+              </a:rPr>
+              <a:t>https</a:t>
+            </a:r>
+            <a:r>
+              <a:rPr lang="nl-BE" sz="2100" dirty="0">
+                <a:hlinkClick r:id="rId7"/>
+              </a:rPr>
+              <a:t>://chris.beams.io/posts/git-commit</a:t>
+            </a:r>
+            <a:r>
+              <a:rPr lang="nl-BE" sz="2100" dirty="0" smtClean="0">
+                <a:hlinkClick r:id="rId7"/>
               </a:rPr>
               <a:t>/</a:t>
             </a:r>
             <a:r>
-              <a:rPr lang="en-US" dirty="0" smtClean="0"/>
+              <a:rPr lang="nl-BE" sz="2100" dirty="0" smtClean="0"/>
               <a:t> </a:t>
             </a:r>
-          </a:p>
-          <a:p>
-            <a:r>
-              <a:rPr lang="en-US" dirty="0" smtClean="0"/>
-              <a:t>Desktop clients</a:t>
-            </a:r>
-          </a:p>
-          <a:p>
-            <a:pPr lvl="1"/>
-            <a:r>
-              <a:rPr lang="nl-BE" dirty="0"/>
-              <a:t>GitHub Desktop: </a:t>
-            </a:r>
-            <a:r>
-              <a:rPr lang="nl-BE" dirty="0">
-                <a:hlinkClick r:id="rId4"/>
-              </a:rPr>
-              <a:t>https://desktop.github.com</a:t>
-            </a:r>
-            <a:r>
-              <a:rPr lang="nl-BE" dirty="0" smtClean="0">
-                <a:hlinkClick r:id="rId4"/>
-              </a:rPr>
-              <a:t>/</a:t>
-            </a:r>
-            <a:r>
-              <a:rPr lang="nl-BE" dirty="0" smtClean="0"/>
-              <a:t> (Windows/</a:t>
-            </a:r>
-            <a:r>
-              <a:rPr lang="nl-BE" dirty="0" err="1" smtClean="0"/>
-              <a:t>MacOS</a:t>
-            </a:r>
-            <a:r>
-              <a:rPr lang="nl-BE" dirty="0" smtClean="0"/>
-              <a:t> X)</a:t>
-            </a:r>
-          </a:p>
-          <a:p>
-            <a:pPr lvl="1"/>
-            <a:r>
-              <a:rPr lang="en-US" dirty="0" err="1" smtClean="0"/>
-              <a:t>TortoiseGit</a:t>
-            </a:r>
-            <a:r>
-              <a:rPr lang="en-US" dirty="0"/>
-              <a:t>: </a:t>
-            </a:r>
-            <a:r>
-              <a:rPr lang="en-US" dirty="0">
-                <a:hlinkClick r:id="rId5"/>
-              </a:rPr>
-              <a:t>https://tortoisegit.org</a:t>
-            </a:r>
-            <a:r>
-              <a:rPr lang="en-US" dirty="0" smtClean="0">
-                <a:hlinkClick r:id="rId5"/>
-              </a:rPr>
-              <a:t>/</a:t>
-            </a:r>
-            <a:r>
-              <a:rPr lang="en-US" dirty="0" smtClean="0"/>
-              <a:t> (Windows)</a:t>
-            </a:r>
-          </a:p>
-          <a:p>
-            <a:pPr lvl="1"/>
-            <a:r>
-              <a:rPr lang="en-US" dirty="0" err="1"/>
-              <a:t>g</a:t>
-            </a:r>
-            <a:r>
-              <a:rPr lang="en-US" dirty="0" err="1" smtClean="0"/>
-              <a:t>it</a:t>
-            </a:r>
-            <a:r>
-              <a:rPr lang="en-US" dirty="0" smtClean="0"/>
-              <a:t>-cola</a:t>
-            </a:r>
-            <a:r>
-              <a:rPr lang="en-US" dirty="0"/>
-              <a:t>: </a:t>
-            </a:r>
-            <a:r>
-              <a:rPr lang="en-US" dirty="0">
-                <a:hlinkClick r:id="rId6"/>
-              </a:rPr>
-              <a:t>http://git-cola.github.io</a:t>
-            </a:r>
-            <a:r>
-              <a:rPr lang="en-US" dirty="0" smtClean="0">
-                <a:hlinkClick r:id="rId6"/>
-              </a:rPr>
-              <a:t>/</a:t>
-            </a:r>
-            <a:r>
-              <a:rPr lang="en-US" dirty="0" smtClean="0"/>
-              <a:t> (Linux/Windows/</a:t>
-            </a:r>
-            <a:r>
-              <a:rPr lang="en-US" dirty="0" err="1" smtClean="0"/>
-              <a:t>MacOS</a:t>
-            </a:r>
-            <a:r>
-              <a:rPr lang="en-US" dirty="0" smtClean="0"/>
-              <a:t> X)</a:t>
-            </a:r>
-          </a:p>
-          <a:p>
-            <a:r>
-              <a:rPr lang="en-US" dirty="0" err="1" smtClean="0"/>
-              <a:t>vcsh</a:t>
-            </a:r>
-            <a:r>
-              <a:rPr lang="en-US" dirty="0" smtClean="0"/>
-              <a:t>, </a:t>
-            </a:r>
-            <a:r>
-              <a:rPr lang="en-US" dirty="0"/>
-              <a:t>version control for configuration </a:t>
-            </a:r>
-            <a:r>
-              <a:rPr lang="en-US" dirty="0" smtClean="0"/>
-              <a:t>files: </a:t>
-            </a:r>
-            <a:r>
-              <a:rPr lang="en-US" dirty="0">
-                <a:hlinkClick r:id="rId7"/>
-              </a:rPr>
-              <a:t>https://</a:t>
-            </a:r>
-            <a:r>
-              <a:rPr lang="en-US" dirty="0" smtClean="0">
-                <a:hlinkClick r:id="rId7"/>
-              </a:rPr>
-              <a:t>github.com/RichiH/vcsh</a:t>
-            </a:r>
-            <a:r>
-              <a:rPr lang="en-US" dirty="0" smtClean="0"/>
-              <a:t> (Linux)</a:t>
-            </a:r>
-          </a:p>
-          <a:p>
-            <a:r>
-              <a:rPr lang="en-US" dirty="0" smtClean="0"/>
-              <a:t>git-prompt.sh, show </a:t>
-            </a:r>
-            <a:r>
-              <a:rPr lang="en-US" dirty="0" err="1" smtClean="0"/>
-              <a:t>git</a:t>
-            </a:r>
-            <a:r>
-              <a:rPr lang="en-US" dirty="0" smtClean="0"/>
-              <a:t> info in command line prompt: </a:t>
-            </a:r>
-            <a:r>
-              <a:rPr lang="en-US" dirty="0">
-                <a:hlinkClick r:id="rId8"/>
-              </a:rPr>
-              <a:t>http://git-prompt.sh</a:t>
-            </a:r>
-            <a:r>
-              <a:rPr lang="en-US" dirty="0" smtClean="0">
-                <a:hlinkClick r:id="rId8"/>
-              </a:rPr>
-              <a:t>/</a:t>
-            </a:r>
-            <a:r>
-              <a:rPr lang="en-US" dirty="0" smtClean="0"/>
-              <a:t> (Linux)</a:t>
-            </a:r>
-          </a:p>
-          <a:p>
-            <a:endParaRPr lang="nl-BE" dirty="0"/>
+            <a:endParaRPr lang="nl-BE" dirty="0" smtClean="0"/>
           </a:p>
         </p:txBody>
       </p:sp>
@@ -40981,7 +40847,7 @@
     </p:spTree>
     <p:extLst>
       <p:ext uri="{BB962C8B-B14F-4D97-AF65-F5344CB8AC3E}">
-        <p14:creationId xmlns:p14="http://schemas.microsoft.com/office/powerpoint/2010/main" val="3855217261"/>
+        <p14:creationId xmlns:p14="http://schemas.microsoft.com/office/powerpoint/2010/main" val="2976133738"/>
       </p:ext>
     </p:extLst>
   </p:cSld>
@@ -41032,6 +40898,318 @@
           <a:p>
             <a:r>
               <a:rPr lang="en-US" dirty="0" smtClean="0"/>
+              <a:t>Software &amp; tools</a:t>
+            </a:r>
+            <a:endParaRPr lang="nl-BE" dirty="0"/>
+          </a:p>
+        </p:txBody>
+      </p:sp>
+      <p:sp>
+        <p:nvSpPr>
+          <p:cNvPr id="3" name="Content Placeholder 2"/>
+          <p:cNvSpPr>
+            <a:spLocks noGrp="1"/>
+          </p:cNvSpPr>
+          <p:nvPr>
+            <p:ph idx="1"/>
+          </p:nvPr>
+        </p:nvSpPr>
+        <p:spPr>
+          <a:xfrm>
+            <a:off x="457200" y="1600201"/>
+            <a:ext cx="8229600" cy="5069159"/>
+          </a:xfrm>
+        </p:spPr>
+        <p:txBody>
+          <a:bodyPr>
+            <a:normAutofit fontScale="92500" lnSpcReduction="20000"/>
+          </a:bodyPr>
+          <a:lstStyle/>
+          <a:p>
+            <a:r>
+              <a:rPr lang="en-US" dirty="0" err="1" smtClean="0"/>
+              <a:t>git</a:t>
+            </a:r>
+            <a:r>
+              <a:rPr lang="en-US" dirty="0" smtClean="0"/>
+              <a:t> comes with most Linux distributions</a:t>
+            </a:r>
+          </a:p>
+          <a:p>
+            <a:r>
+              <a:rPr lang="en-US" dirty="0" smtClean="0"/>
+              <a:t>Website &amp; downloads: </a:t>
+            </a:r>
+            <a:r>
+              <a:rPr lang="en-US" dirty="0">
+                <a:hlinkClick r:id="rId3"/>
+              </a:rPr>
+              <a:t>https://git-scm.com</a:t>
+            </a:r>
+            <a:r>
+              <a:rPr lang="en-US" dirty="0" smtClean="0">
+                <a:hlinkClick r:id="rId3"/>
+              </a:rPr>
+              <a:t>/</a:t>
+            </a:r>
+            <a:r>
+              <a:rPr lang="en-US" dirty="0" smtClean="0"/>
+              <a:t> </a:t>
+            </a:r>
+          </a:p>
+          <a:p>
+            <a:r>
+              <a:rPr lang="en-US" dirty="0" smtClean="0"/>
+              <a:t>Desktop clients</a:t>
+            </a:r>
+          </a:p>
+          <a:p>
+            <a:pPr lvl="1"/>
+            <a:r>
+              <a:rPr lang="nl-BE" dirty="0"/>
+              <a:t>GitHub Desktop: </a:t>
+            </a:r>
+            <a:r>
+              <a:rPr lang="nl-BE" dirty="0">
+                <a:hlinkClick r:id="rId4"/>
+              </a:rPr>
+              <a:t>https://desktop.github.com</a:t>
+            </a:r>
+            <a:r>
+              <a:rPr lang="nl-BE" dirty="0" smtClean="0">
+                <a:hlinkClick r:id="rId4"/>
+              </a:rPr>
+              <a:t>/</a:t>
+            </a:r>
+            <a:r>
+              <a:rPr lang="nl-BE" dirty="0" smtClean="0"/>
+              <a:t> (Windows/</a:t>
+            </a:r>
+            <a:r>
+              <a:rPr lang="nl-BE" dirty="0" err="1" smtClean="0"/>
+              <a:t>MacOS</a:t>
+            </a:r>
+            <a:r>
+              <a:rPr lang="nl-BE" dirty="0" smtClean="0"/>
+              <a:t> X)</a:t>
+            </a:r>
+          </a:p>
+          <a:p>
+            <a:pPr lvl="1"/>
+            <a:r>
+              <a:rPr lang="en-US" dirty="0" err="1" smtClean="0"/>
+              <a:t>TortoiseGit</a:t>
+            </a:r>
+            <a:r>
+              <a:rPr lang="en-US" dirty="0"/>
+              <a:t>: </a:t>
+            </a:r>
+            <a:r>
+              <a:rPr lang="en-US" dirty="0">
+                <a:hlinkClick r:id="rId5"/>
+              </a:rPr>
+              <a:t>https://tortoisegit.org</a:t>
+            </a:r>
+            <a:r>
+              <a:rPr lang="en-US" dirty="0" smtClean="0">
+                <a:hlinkClick r:id="rId5"/>
+              </a:rPr>
+              <a:t>/</a:t>
+            </a:r>
+            <a:r>
+              <a:rPr lang="en-US" dirty="0" smtClean="0"/>
+              <a:t> (Windows)</a:t>
+            </a:r>
+          </a:p>
+          <a:p>
+            <a:pPr lvl="1"/>
+            <a:r>
+              <a:rPr lang="en-US" dirty="0" err="1"/>
+              <a:t>g</a:t>
+            </a:r>
+            <a:r>
+              <a:rPr lang="en-US" dirty="0" err="1" smtClean="0"/>
+              <a:t>it</a:t>
+            </a:r>
+            <a:r>
+              <a:rPr lang="en-US" dirty="0" smtClean="0"/>
+              <a:t>-cola</a:t>
+            </a:r>
+            <a:r>
+              <a:rPr lang="en-US" dirty="0"/>
+              <a:t>: </a:t>
+            </a:r>
+            <a:r>
+              <a:rPr lang="en-US" dirty="0">
+                <a:hlinkClick r:id="rId6"/>
+              </a:rPr>
+              <a:t>http://git-cola.github.io</a:t>
+            </a:r>
+            <a:r>
+              <a:rPr lang="en-US" dirty="0" smtClean="0">
+                <a:hlinkClick r:id="rId6"/>
+              </a:rPr>
+              <a:t>/</a:t>
+            </a:r>
+            <a:r>
+              <a:rPr lang="en-US" dirty="0" smtClean="0"/>
+              <a:t> (Linux/Windows/</a:t>
+            </a:r>
+            <a:r>
+              <a:rPr lang="en-US" dirty="0" err="1" smtClean="0"/>
+              <a:t>MacOS</a:t>
+            </a:r>
+            <a:r>
+              <a:rPr lang="en-US" dirty="0" smtClean="0"/>
+              <a:t> X)</a:t>
+            </a:r>
+          </a:p>
+          <a:p>
+            <a:r>
+              <a:rPr lang="en-US" dirty="0" err="1" smtClean="0"/>
+              <a:t>vcsh</a:t>
+            </a:r>
+            <a:r>
+              <a:rPr lang="en-US" dirty="0" smtClean="0"/>
+              <a:t>, </a:t>
+            </a:r>
+            <a:r>
+              <a:rPr lang="en-US" dirty="0"/>
+              <a:t>version control for configuration </a:t>
+            </a:r>
+            <a:r>
+              <a:rPr lang="en-US" dirty="0" smtClean="0"/>
+              <a:t>files: </a:t>
+            </a:r>
+            <a:r>
+              <a:rPr lang="en-US" dirty="0">
+                <a:hlinkClick r:id="rId7"/>
+              </a:rPr>
+              <a:t>https://</a:t>
+            </a:r>
+            <a:r>
+              <a:rPr lang="en-US" dirty="0" smtClean="0">
+                <a:hlinkClick r:id="rId7"/>
+              </a:rPr>
+              <a:t>github.com/RichiH/vcsh</a:t>
+            </a:r>
+            <a:r>
+              <a:rPr lang="en-US" dirty="0" smtClean="0"/>
+              <a:t> (Linux)</a:t>
+            </a:r>
+          </a:p>
+          <a:p>
+            <a:r>
+              <a:rPr lang="en-US" dirty="0" smtClean="0"/>
+              <a:t>git-prompt.sh, show </a:t>
+            </a:r>
+            <a:r>
+              <a:rPr lang="en-US" dirty="0" err="1" smtClean="0"/>
+              <a:t>git</a:t>
+            </a:r>
+            <a:r>
+              <a:rPr lang="en-US" dirty="0" smtClean="0"/>
+              <a:t> info in command line prompt: </a:t>
+            </a:r>
+            <a:r>
+              <a:rPr lang="en-US" dirty="0">
+                <a:hlinkClick r:id="rId8"/>
+              </a:rPr>
+              <a:t>http://git-prompt.sh</a:t>
+            </a:r>
+            <a:r>
+              <a:rPr lang="en-US" dirty="0" smtClean="0">
+                <a:hlinkClick r:id="rId8"/>
+              </a:rPr>
+              <a:t>/</a:t>
+            </a:r>
+            <a:r>
+              <a:rPr lang="en-US" dirty="0" smtClean="0"/>
+              <a:t> (Linux)</a:t>
+            </a:r>
+          </a:p>
+          <a:p>
+            <a:endParaRPr lang="nl-BE" dirty="0"/>
+          </a:p>
+        </p:txBody>
+      </p:sp>
+      <p:sp>
+        <p:nvSpPr>
+          <p:cNvPr id="4" name="Slide Number Placeholder 3"/>
+          <p:cNvSpPr>
+            <a:spLocks noGrp="1"/>
+          </p:cNvSpPr>
+          <p:nvPr>
+            <p:ph type="sldNum" sz="quarter" idx="12"/>
+          </p:nvPr>
+        </p:nvSpPr>
+        <p:spPr/>
+        <p:txBody>
+          <a:bodyPr/>
+          <a:lstStyle/>
+          <a:p>
+            <a:fld id="{BB52A05A-A776-4391-ACD7-D6BC34D3145C}" type="slidenum">
+              <a:rPr lang="nl-BE" smtClean="0"/>
+              <a:t>61</a:t>
+            </a:fld>
+            <a:endParaRPr lang="nl-BE"/>
+          </a:p>
+        </p:txBody>
+      </p:sp>
+    </p:spTree>
+    <p:extLst>
+      <p:ext uri="{BB962C8B-B14F-4D97-AF65-F5344CB8AC3E}">
+        <p14:creationId xmlns:p14="http://schemas.microsoft.com/office/powerpoint/2010/main" val="3855217261"/>
+      </p:ext>
+    </p:extLst>
+  </p:cSld>
+  <p:clrMapOvr>
+    <a:masterClrMapping/>
+  </p:clrMapOvr>
+  <p:timing>
+    <p:tnLst>
+      <p:par>
+        <p:cTn id="1" dur="indefinite" restart="never" nodeType="tmRoot"/>
+      </p:par>
+    </p:tnLst>
+  </p:timing>
+</p:sld>
+</file>
+
+<file path=ppt/slides/slide62.xml><?xml version="1.0" encoding="utf-8"?>
+<p:sld xmlns:a="http://schemas.openxmlformats.org/drawingml/2006/main" xmlns:r="http://schemas.openxmlformats.org/officeDocument/2006/relationships" xmlns:p="http://schemas.openxmlformats.org/presentationml/2006/main">
+  <p:cSld>
+    <p:spTree>
+      <p:nvGrpSpPr>
+        <p:cNvPr id="1" name=""/>
+        <p:cNvGrpSpPr/>
+        <p:nvPr/>
+      </p:nvGrpSpPr>
+      <p:grpSpPr>
+        <a:xfrm>
+          <a:off x="0" y="0"/>
+          <a:ext cx="0" cy="0"/>
+          <a:chOff x="0" y="0"/>
+          <a:chExt cx="0" cy="0"/>
+        </a:xfrm>
+      </p:grpSpPr>
+      <p:sp>
+        <p:nvSpPr>
+          <p:cNvPr id="2" name="Title 1"/>
+          <p:cNvSpPr>
+            <a:spLocks noGrp="1"/>
+          </p:cNvSpPr>
+          <p:nvPr>
+            <p:ph type="title"/>
+          </p:nvPr>
+        </p:nvSpPr>
+        <p:spPr/>
+        <p:txBody>
+          <a:bodyPr/>
+          <a:lstStyle/>
+          <a:p>
+            <a:r>
+              <a:rPr lang="en-US" dirty="0" smtClean="0"/>
               <a:t>Services</a:t>
             </a:r>
             <a:endParaRPr lang="nl-BE" dirty="0"/>
@@ -41157,7 +41335,7 @@
           <a:p>
             <a:fld id="{BB52A05A-A776-4391-ACD7-D6BC34D3145C}" type="slidenum">
               <a:rPr lang="nl-BE" smtClean="0"/>
-              <a:t>61</a:t>
+              <a:t>62</a:t>
             </a:fld>
             <a:endParaRPr lang="nl-BE"/>
           </a:p>

</xml_diff>

<commit_message>
Add animation to pull request slide
</commit_message>
<xml_diff>
--- a/LinuxTools/VersionControl/version_control_git.pptx
+++ b/LinuxTools/VersionControl/version_control_git.pptx
@@ -7021,7 +7021,7 @@
           <a:p>
             <a:r>
               <a:rPr lang="en-US" dirty="0" smtClean="0"/>
-              <a:t>Configuration</a:t>
+              <a:t>Configuration (only once)</a:t>
             </a:r>
           </a:p>
           <a:p>
@@ -39516,6 +39516,15 @@
             </a:r>
           </a:p>
           <a:p>
+            <a:pPr lvl="1"/>
+            <a:r>
+              <a:rPr lang="en-US" dirty="0" smtClean="0">
+                <a:cs typeface="Courier New" panose="02070309020205020404" pitchFamily="49" charset="0"/>
+              </a:rPr>
+              <a:t>abide by its rules/recommendations</a:t>
+            </a:r>
+          </a:p>
+          <a:p>
             <a:r>
               <a:rPr lang="en-US" dirty="0" smtClean="0"/>
               <a:t>Good pull requests</a:t>
@@ -39617,9 +39626,363 @@
   <p:timing>
     <p:tnLst>
       <p:par>
-        <p:cTn id="1" dur="indefinite" restart="never" nodeType="tmRoot"/>
+        <p:cTn id="1" dur="indefinite" restart="never" nodeType="tmRoot">
+          <p:childTnLst>
+            <p:seq concurrent="1" nextAc="seek">
+              <p:cTn id="2" dur="indefinite" nodeType="mainSeq">
+                <p:childTnLst>
+                  <p:par>
+                    <p:cTn id="3" fill="hold">
+                      <p:stCondLst>
+                        <p:cond delay="indefinite"/>
+                        <p:cond evt="onBegin" delay="0">
+                          <p:tn val="2"/>
+                        </p:cond>
+                      </p:stCondLst>
+                      <p:childTnLst>
+                        <p:par>
+                          <p:cTn id="4" fill="hold">
+                            <p:stCondLst>
+                              <p:cond delay="0"/>
+                            </p:stCondLst>
+                            <p:childTnLst>
+                              <p:par>
+                                <p:cTn id="5" presetID="1" presetClass="entr" presetSubtype="0" fill="hold" grpId="0" nodeType="withEffect">
+                                  <p:stCondLst>
+                                    <p:cond delay="0"/>
+                                  </p:stCondLst>
+                                  <p:childTnLst>
+                                    <p:set>
+                                      <p:cBhvr>
+                                        <p:cTn id="6" dur="1" fill="hold">
+                                          <p:stCondLst>
+                                            <p:cond delay="0"/>
+                                          </p:stCondLst>
+                                        </p:cTn>
+                                        <p:tgtEl>
+                                          <p:spTgt spid="3">
+                                            <p:txEl>
+                                              <p:pRg st="0" end="0"/>
+                                            </p:txEl>
+                                          </p:spTgt>
+                                        </p:tgtEl>
+                                        <p:attrNameLst>
+                                          <p:attrName>style.visibility</p:attrName>
+                                        </p:attrNameLst>
+                                      </p:cBhvr>
+                                      <p:to>
+                                        <p:strVal val="visible"/>
+                                      </p:to>
+                                    </p:set>
+                                  </p:childTnLst>
+                                </p:cTn>
+                              </p:par>
+                            </p:childTnLst>
+                          </p:cTn>
+                        </p:par>
+                      </p:childTnLst>
+                    </p:cTn>
+                  </p:par>
+                  <p:par>
+                    <p:cTn id="7" fill="hold">
+                      <p:stCondLst>
+                        <p:cond delay="indefinite"/>
+                      </p:stCondLst>
+                      <p:childTnLst>
+                        <p:par>
+                          <p:cTn id="8" fill="hold">
+                            <p:stCondLst>
+                              <p:cond delay="0"/>
+                            </p:stCondLst>
+                            <p:childTnLst>
+                              <p:par>
+                                <p:cTn id="9" presetID="1" presetClass="entr" presetSubtype="0" fill="hold" grpId="0" nodeType="clickEffect">
+                                  <p:stCondLst>
+                                    <p:cond delay="0"/>
+                                  </p:stCondLst>
+                                  <p:childTnLst>
+                                    <p:set>
+                                      <p:cBhvr>
+                                        <p:cTn id="10" dur="1" fill="hold">
+                                          <p:stCondLst>
+                                            <p:cond delay="0"/>
+                                          </p:stCondLst>
+                                        </p:cTn>
+                                        <p:tgtEl>
+                                          <p:spTgt spid="3">
+                                            <p:txEl>
+                                              <p:pRg st="1" end="1"/>
+                                            </p:txEl>
+                                          </p:spTgt>
+                                        </p:tgtEl>
+                                        <p:attrNameLst>
+                                          <p:attrName>style.visibility</p:attrName>
+                                        </p:attrNameLst>
+                                      </p:cBhvr>
+                                      <p:to>
+                                        <p:strVal val="visible"/>
+                                      </p:to>
+                                    </p:set>
+                                  </p:childTnLst>
+                                </p:cTn>
+                              </p:par>
+                            </p:childTnLst>
+                          </p:cTn>
+                        </p:par>
+                      </p:childTnLst>
+                    </p:cTn>
+                  </p:par>
+                  <p:par>
+                    <p:cTn id="11" fill="hold">
+                      <p:stCondLst>
+                        <p:cond delay="indefinite"/>
+                      </p:stCondLst>
+                      <p:childTnLst>
+                        <p:par>
+                          <p:cTn id="12" fill="hold">
+                            <p:stCondLst>
+                              <p:cond delay="0"/>
+                            </p:stCondLst>
+                            <p:childTnLst>
+                              <p:par>
+                                <p:cTn id="13" presetID="1" presetClass="entr" presetSubtype="0" fill="hold" grpId="0" nodeType="clickEffect">
+                                  <p:stCondLst>
+                                    <p:cond delay="0"/>
+                                  </p:stCondLst>
+                                  <p:childTnLst>
+                                    <p:set>
+                                      <p:cBhvr>
+                                        <p:cTn id="14" dur="1" fill="hold">
+                                          <p:stCondLst>
+                                            <p:cond delay="0"/>
+                                          </p:stCondLst>
+                                        </p:cTn>
+                                        <p:tgtEl>
+                                          <p:spTgt spid="3">
+                                            <p:txEl>
+                                              <p:pRg st="2" end="2"/>
+                                            </p:txEl>
+                                          </p:spTgt>
+                                        </p:tgtEl>
+                                        <p:attrNameLst>
+                                          <p:attrName>style.visibility</p:attrName>
+                                        </p:attrNameLst>
+                                      </p:cBhvr>
+                                      <p:to>
+                                        <p:strVal val="visible"/>
+                                      </p:to>
+                                    </p:set>
+                                  </p:childTnLst>
+                                </p:cTn>
+                              </p:par>
+                              <p:par>
+                                <p:cTn id="15" presetID="1" presetClass="entr" presetSubtype="0" fill="hold" grpId="0" nodeType="withEffect">
+                                  <p:stCondLst>
+                                    <p:cond delay="0"/>
+                                  </p:stCondLst>
+                                  <p:childTnLst>
+                                    <p:set>
+                                      <p:cBhvr>
+                                        <p:cTn id="16" dur="1" fill="hold">
+                                          <p:stCondLst>
+                                            <p:cond delay="0"/>
+                                          </p:stCondLst>
+                                        </p:cTn>
+                                        <p:tgtEl>
+                                          <p:spTgt spid="3">
+                                            <p:txEl>
+                                              <p:pRg st="3" end="3"/>
+                                            </p:txEl>
+                                          </p:spTgt>
+                                        </p:tgtEl>
+                                        <p:attrNameLst>
+                                          <p:attrName>style.visibility</p:attrName>
+                                        </p:attrNameLst>
+                                      </p:cBhvr>
+                                      <p:to>
+                                        <p:strVal val="visible"/>
+                                      </p:to>
+                                    </p:set>
+                                  </p:childTnLst>
+                                </p:cTn>
+                              </p:par>
+                            </p:childTnLst>
+                          </p:cTn>
+                        </p:par>
+                      </p:childTnLst>
+                    </p:cTn>
+                  </p:par>
+                  <p:par>
+                    <p:cTn id="17" fill="hold">
+                      <p:stCondLst>
+                        <p:cond delay="indefinite"/>
+                      </p:stCondLst>
+                      <p:childTnLst>
+                        <p:par>
+                          <p:cTn id="18" fill="hold">
+                            <p:stCondLst>
+                              <p:cond delay="0"/>
+                            </p:stCondLst>
+                            <p:childTnLst>
+                              <p:par>
+                                <p:cTn id="19" presetID="1" presetClass="entr" presetSubtype="0" fill="hold" grpId="0" nodeType="clickEffect">
+                                  <p:stCondLst>
+                                    <p:cond delay="0"/>
+                                  </p:stCondLst>
+                                  <p:childTnLst>
+                                    <p:set>
+                                      <p:cBhvr>
+                                        <p:cTn id="20" dur="1" fill="hold">
+                                          <p:stCondLst>
+                                            <p:cond delay="0"/>
+                                          </p:stCondLst>
+                                        </p:cTn>
+                                        <p:tgtEl>
+                                          <p:spTgt spid="3">
+                                            <p:txEl>
+                                              <p:pRg st="4" end="4"/>
+                                            </p:txEl>
+                                          </p:spTgt>
+                                        </p:tgtEl>
+                                        <p:attrNameLst>
+                                          <p:attrName>style.visibility</p:attrName>
+                                        </p:attrNameLst>
+                                      </p:cBhvr>
+                                      <p:to>
+                                        <p:strVal val="visible"/>
+                                      </p:to>
+                                    </p:set>
+                                  </p:childTnLst>
+                                </p:cTn>
+                              </p:par>
+                            </p:childTnLst>
+                          </p:cTn>
+                        </p:par>
+                      </p:childTnLst>
+                    </p:cTn>
+                  </p:par>
+                  <p:par>
+                    <p:cTn id="21" fill="hold">
+                      <p:stCondLst>
+                        <p:cond delay="indefinite"/>
+                      </p:stCondLst>
+                      <p:childTnLst>
+                        <p:par>
+                          <p:cTn id="22" fill="hold">
+                            <p:stCondLst>
+                              <p:cond delay="0"/>
+                            </p:stCondLst>
+                            <p:childTnLst>
+                              <p:par>
+                                <p:cTn id="23" presetID="1" presetClass="entr" presetSubtype="0" fill="hold" grpId="0" nodeType="clickEffect">
+                                  <p:stCondLst>
+                                    <p:cond delay="0"/>
+                                  </p:stCondLst>
+                                  <p:childTnLst>
+                                    <p:set>
+                                      <p:cBhvr>
+                                        <p:cTn id="24" dur="1" fill="hold">
+                                          <p:stCondLst>
+                                            <p:cond delay="0"/>
+                                          </p:stCondLst>
+                                        </p:cTn>
+                                        <p:tgtEl>
+                                          <p:spTgt spid="3">
+                                            <p:txEl>
+                                              <p:pRg st="5" end="5"/>
+                                            </p:txEl>
+                                          </p:spTgt>
+                                        </p:tgtEl>
+                                        <p:attrNameLst>
+                                          <p:attrName>style.visibility</p:attrName>
+                                        </p:attrNameLst>
+                                      </p:cBhvr>
+                                      <p:to>
+                                        <p:strVal val="visible"/>
+                                      </p:to>
+                                    </p:set>
+                                  </p:childTnLst>
+                                </p:cTn>
+                              </p:par>
+                            </p:childTnLst>
+                          </p:cTn>
+                        </p:par>
+                      </p:childTnLst>
+                    </p:cTn>
+                  </p:par>
+                  <p:par>
+                    <p:cTn id="25" fill="hold">
+                      <p:stCondLst>
+                        <p:cond delay="indefinite"/>
+                      </p:stCondLst>
+                      <p:childTnLst>
+                        <p:par>
+                          <p:cTn id="26" fill="hold">
+                            <p:stCondLst>
+                              <p:cond delay="0"/>
+                            </p:stCondLst>
+                            <p:childTnLst>
+                              <p:par>
+                                <p:cTn id="27" presetID="1" presetClass="entr" presetSubtype="0" fill="hold" grpId="0" nodeType="clickEffect">
+                                  <p:stCondLst>
+                                    <p:cond delay="0"/>
+                                  </p:stCondLst>
+                                  <p:childTnLst>
+                                    <p:set>
+                                      <p:cBhvr>
+                                        <p:cTn id="28" dur="1" fill="hold">
+                                          <p:stCondLst>
+                                            <p:cond delay="0"/>
+                                          </p:stCondLst>
+                                        </p:cTn>
+                                        <p:tgtEl>
+                                          <p:spTgt spid="3">
+                                            <p:txEl>
+                                              <p:pRg st="6" end="6"/>
+                                            </p:txEl>
+                                          </p:spTgt>
+                                        </p:tgtEl>
+                                        <p:attrNameLst>
+                                          <p:attrName>style.visibility</p:attrName>
+                                        </p:attrNameLst>
+                                      </p:cBhvr>
+                                      <p:to>
+                                        <p:strVal val="visible"/>
+                                      </p:to>
+                                    </p:set>
+                                  </p:childTnLst>
+                                </p:cTn>
+                              </p:par>
+                            </p:childTnLst>
+                          </p:cTn>
+                        </p:par>
+                      </p:childTnLst>
+                    </p:cTn>
+                  </p:par>
+                </p:childTnLst>
+              </p:cTn>
+              <p:prevCondLst>
+                <p:cond evt="onPrev" delay="0">
+                  <p:tgtEl>
+                    <p:sldTgt/>
+                  </p:tgtEl>
+                </p:cond>
+              </p:prevCondLst>
+              <p:nextCondLst>
+                <p:cond evt="onNext" delay="0">
+                  <p:tgtEl>
+                    <p:sldTgt/>
+                  </p:tgtEl>
+                </p:cond>
+              </p:nextCondLst>
+            </p:seq>
+          </p:childTnLst>
+        </p:cTn>
       </p:par>
     </p:tnLst>
+    <p:bldLst>
+      <p:bldP spid="3" grpId="0" uiExpand="1" build="p" bldLvl="2"/>
+    </p:bldLst>
   </p:timing>
 </p:sld>
 </file>

</xml_diff>

<commit_message>
Fix typo; add mergetool
</commit_message>
<xml_diff>
--- a/LinuxTools/VersionControl/version_control_git.pptx
+++ b/LinuxTools/VersionControl/version_control_git.pptx
@@ -15773,7 +15773,9 @@
         </p:nvSpPr>
         <p:spPr/>
         <p:txBody>
-          <a:bodyPr/>
+          <a:bodyPr>
+            <a:normAutofit lnSpcReduction="10000"/>
+          </a:bodyPr>
           <a:lstStyle/>
           <a:p>
             <a:r>
@@ -15830,9 +15832,17 @@
           </a:p>
           <a:p>
             <a:pPr lvl="1"/>
+            <a:endParaRPr lang="en-BE" dirty="0" smtClean="0"/>
+          </a:p>
+          <a:p>
+            <a:pPr lvl="1"/>
             <a:r>
               <a:rPr lang="en-BE" dirty="0" smtClean="0"/>
-              <a:t>get visual diff</a:t>
+              <a:t>get </a:t>
+            </a:r>
+            <a:r>
+              <a:rPr lang="en-BE" dirty="0" smtClean="0"/>
+              <a:t>visual diff</a:t>
             </a:r>
             <a:endParaRPr lang="en-US" dirty="0"/>
           </a:p>
@@ -15869,8 +15879,8 @@
         </p:nvSpPr>
         <p:spPr>
           <a:xfrm>
-            <a:off x="611560" y="4150821"/>
-            <a:ext cx="6408713" cy="646331"/>
+            <a:off x="611560" y="3933056"/>
+            <a:ext cx="6696744" cy="1200329"/>
           </a:xfrm>
           <a:prstGeom prst="rect">
             <a:avLst/>
@@ -15900,8 +15910,12 @@
                 <a:latin typeface="Courier New" pitchFamily="49" charset="0"/>
                 <a:cs typeface="Courier New" pitchFamily="49" charset="0"/>
               </a:rPr>
-              <a:t>diff.tool=meld</a:t>
-            </a:r>
+              <a:t>diff.tool meld</a:t>
+            </a:r>
+            <a:endParaRPr lang="en-BE" dirty="0" smtClean="0">
+              <a:latin typeface="Courier New" pitchFamily="49" charset="0"/>
+              <a:cs typeface="Courier New" pitchFamily="49" charset="0"/>
+            </a:endParaRPr>
           </a:p>
           <a:p>
             <a:r>
@@ -15916,7 +15930,46 @@
                 <a:latin typeface="Courier New" pitchFamily="49" charset="0"/>
                 <a:cs typeface="Courier New" pitchFamily="49" charset="0"/>
               </a:rPr>
-              <a:t>difftool.prompt=false</a:t>
+              <a:t>difftool.prompt false</a:t>
+            </a:r>
+          </a:p>
+          <a:p>
+            <a:r>
+              <a:rPr lang="nl-BE" dirty="0">
+                <a:latin typeface="Courier New" pitchFamily="49" charset="0"/>
+                <a:cs typeface="Courier New" pitchFamily="49" charset="0"/>
+              </a:rPr>
+              <a:t>$ git config  --global  </a:t>
+            </a:r>
+            <a:r>
+              <a:rPr lang="en-BE" dirty="0" smtClean="0">
+                <a:latin typeface="Courier New" pitchFamily="49" charset="0"/>
+                <a:cs typeface="Courier New" pitchFamily="49" charset="0"/>
+              </a:rPr>
+              <a:t>merge.tool </a:t>
+            </a:r>
+            <a:r>
+              <a:rPr lang="en-BE" dirty="0">
+                <a:latin typeface="Courier New" pitchFamily="49" charset="0"/>
+                <a:cs typeface="Courier New" pitchFamily="49" charset="0"/>
+              </a:rPr>
+              <a:t>meld</a:t>
+            </a:r>
+          </a:p>
+          <a:p>
+            <a:r>
+              <a:rPr lang="nl-BE" dirty="0">
+                <a:latin typeface="Courier New" pitchFamily="49" charset="0"/>
+                <a:cs typeface="Courier New" pitchFamily="49" charset="0"/>
+              </a:rPr>
+              <a:t>$ git config  --global  </a:t>
+            </a:r>
+            <a:r>
+              <a:rPr lang="en-BE" dirty="0" smtClean="0">
+                <a:latin typeface="Courier New" pitchFamily="49" charset="0"/>
+                <a:cs typeface="Courier New" pitchFamily="49" charset="0"/>
+              </a:rPr>
+              <a:t>mergetool.prompt false</a:t>
             </a:r>
             <a:endParaRPr lang="nl-BE" dirty="0">
               <a:latin typeface="Courier New" pitchFamily="49" charset="0"/>
@@ -15933,8 +15986,8 @@
         </p:nvSpPr>
         <p:spPr>
           <a:xfrm>
-            <a:off x="611560" y="5677123"/>
-            <a:ext cx="6408713" cy="369332"/>
+            <a:off x="611560" y="5795972"/>
+            <a:ext cx="6696744" cy="369332"/>
           </a:xfrm>
           <a:prstGeom prst="rect">
             <a:avLst/>
@@ -15957,14 +16010,7 @@
                 <a:latin typeface="Courier New" pitchFamily="49" charset="0"/>
                 <a:cs typeface="Courier New" pitchFamily="49" charset="0"/>
               </a:rPr>
-              <a:t>$ git </a:t>
-            </a:r>
-            <a:r>
-              <a:rPr lang="nl-BE" dirty="0" smtClean="0">
-                <a:latin typeface="Courier New" pitchFamily="49" charset="0"/>
-                <a:cs typeface="Courier New" pitchFamily="49" charset="0"/>
-              </a:rPr>
-              <a:t>diff</a:t>
+              <a:t>$ git diff</a:t>
             </a:r>
             <a:r>
               <a:rPr lang="en-BE" dirty="0" smtClean="0">

</xml_diff>

<commit_message>
Add reference to blog post on git features for Python developers
</commit_message>
<xml_diff>
--- a/LinuxTools/VersionControl/version_control_git.pptx
+++ b/LinuxTools/VersionControl/version_control_git.pptx
@@ -15838,11 +15838,7 @@
             <a:pPr lvl="1"/>
             <a:r>
               <a:rPr lang="en-BE" dirty="0" smtClean="0"/>
-              <a:t>get </a:t>
-            </a:r>
-            <a:r>
-              <a:rPr lang="en-BE" dirty="0" smtClean="0"/>
-              <a:t>visual diff</a:t>
+              <a:t>get visual diff</a:t>
             </a:r>
             <a:endParaRPr lang="en-US" dirty="0"/>
           </a:p>
@@ -15912,10 +15908,6 @@
               </a:rPr>
               <a:t>diff.tool meld</a:t>
             </a:r>
-            <a:endParaRPr lang="en-BE" dirty="0" smtClean="0">
-              <a:latin typeface="Courier New" pitchFamily="49" charset="0"/>
-              <a:cs typeface="Courier New" pitchFamily="49" charset="0"/>
-            </a:endParaRPr>
           </a:p>
           <a:p>
             <a:r>
@@ -43737,7 +43729,7 @@
         <p:spPr/>
         <p:txBody>
           <a:bodyPr>
-            <a:normAutofit fontScale="85000" lnSpcReduction="20000"/>
+            <a:normAutofit fontScale="77500" lnSpcReduction="20000"/>
           </a:bodyPr>
           <a:lstStyle/>
           <a:p>
@@ -43890,6 +43882,32 @@
             </a:r>
             <a:r>
               <a:rPr lang="nl-BE" sz="2100" dirty="0" smtClean="0"/>
+              <a:t> </a:t>
+            </a:r>
+            <a:endParaRPr lang="en-BE" sz="2100" dirty="0" smtClean="0"/>
+          </a:p>
+          <a:p>
+            <a:r>
+              <a:rPr lang="en-BE" dirty="0" smtClean="0"/>
+              <a:t>Nice article on some git features &amp; techniques</a:t>
+            </a:r>
+            <a:br>
+              <a:rPr lang="en-BE" dirty="0" smtClean="0"/>
+            </a:br>
+            <a:r>
+              <a:rPr lang="en-US" sz="2100" dirty="0">
+                <a:hlinkClick r:id="rId8"/>
+              </a:rPr>
+              <a:t>https://</a:t>
+            </a:r>
+            <a:r>
+              <a:rPr lang="en-US" sz="2100" dirty="0" smtClean="0">
+                <a:hlinkClick r:id="rId8"/>
+              </a:rPr>
+              <a:t>realpython.com/advanced-git-for-pythonistas/</a:t>
+            </a:r>
+            <a:r>
+              <a:rPr lang="en-BE" sz="2100" dirty="0" smtClean="0"/>
               <a:t> </a:t>
             </a:r>
             <a:endParaRPr lang="nl-BE" dirty="0" smtClean="0"/>

</xml_diff>

<commit_message>
Add reference to blog post on good commit messages
</commit_message>
<xml_diff>
--- a/LinuxTools/VersionControl/version_control_git.pptx
+++ b/LinuxTools/VersionControl/version_control_git.pptx
@@ -44756,7 +44756,15 @@
           <a:p>
             <a:r>
               <a:rPr lang="nl-BE" dirty="0" smtClean="0"/>
-              <a:t>Blog post on "good" commit messages</a:t>
+              <a:t>Blog </a:t>
+            </a:r>
+            <a:r>
+              <a:rPr lang="nl-BE" dirty="0" smtClean="0"/>
+              <a:t>posts </a:t>
+            </a:r>
+            <a:r>
+              <a:rPr lang="nl-BE" dirty="0" smtClean="0"/>
+              <a:t>on "good" commit messages</a:t>
             </a:r>
             <a:br>
               <a:rPr lang="nl-BE" dirty="0" smtClean="0"/>
@@ -44783,6 +44791,29 @@
               <a:rPr lang="nl-BE" sz="2100" dirty="0" smtClean="0"/>
               <a:t> </a:t>
             </a:r>
+            <a:r>
+              <a:rPr lang="nl-BE" sz="2100" dirty="0"/>
+              <a:t/>
+            </a:r>
+            <a:br>
+              <a:rPr lang="nl-BE" sz="2100" dirty="0"/>
+            </a:br>
+            <a:r>
+              <a:rPr lang="nl-BE" sz="2100" dirty="0">
+                <a:hlinkClick r:id="rId8"/>
+              </a:rPr>
+              <a:t>https://</a:t>
+            </a:r>
+            <a:r>
+              <a:rPr lang="nl-BE" sz="2100" dirty="0" smtClean="0">
+                <a:hlinkClick r:id="rId8"/>
+              </a:rPr>
+              <a:t>thoughtbot.com/blog/5-useful-tips-for-a-better-commit-message</a:t>
+            </a:r>
+            <a:r>
+              <a:rPr lang="nl-BE" sz="2100" dirty="0" smtClean="0"/>
+              <a:t> </a:t>
+            </a:r>
             <a:endParaRPr lang="en-BE" sz="2100" dirty="0" smtClean="0"/>
           </a:p>
           <a:p>
@@ -44795,13 +44826,13 @@
             </a:br>
             <a:r>
               <a:rPr lang="en-US" sz="2100" dirty="0">
-                <a:hlinkClick r:id="rId8"/>
+                <a:hlinkClick r:id="rId9"/>
               </a:rPr>
               <a:t>https://</a:t>
             </a:r>
             <a:r>
               <a:rPr lang="en-US" sz="2100" dirty="0" smtClean="0">
-                <a:hlinkClick r:id="rId8"/>
+                <a:hlinkClick r:id="rId9"/>
               </a:rPr>
               <a:t>realpython.com/advanced-git-for-pythonistas/</a:t>
             </a:r>

</xml_diff>

<commit_message>
Fix order of slides
</commit_message>
<xml_diff>
--- a/LinuxTools/VersionControl/version_control_git.pptx
+++ b/LinuxTools/VersionControl/version_control_git.pptx
@@ -56,16 +56,16 @@
     <p:sldId id="288" r:id="rId47"/>
     <p:sldId id="289" r:id="rId48"/>
     <p:sldId id="290" r:id="rId49"/>
-    <p:sldId id="329" r:id="rId50"/>
-    <p:sldId id="291" r:id="rId51"/>
-    <p:sldId id="292" r:id="rId52"/>
-    <p:sldId id="311" r:id="rId53"/>
-    <p:sldId id="294" r:id="rId54"/>
-    <p:sldId id="297" r:id="rId55"/>
-    <p:sldId id="304" r:id="rId56"/>
-    <p:sldId id="326" r:id="rId57"/>
-    <p:sldId id="327" r:id="rId58"/>
-    <p:sldId id="328" r:id="rId59"/>
+    <p:sldId id="291" r:id="rId50"/>
+    <p:sldId id="292" r:id="rId51"/>
+    <p:sldId id="311" r:id="rId52"/>
+    <p:sldId id="294" r:id="rId53"/>
+    <p:sldId id="297" r:id="rId54"/>
+    <p:sldId id="304" r:id="rId55"/>
+    <p:sldId id="326" r:id="rId56"/>
+    <p:sldId id="327" r:id="rId57"/>
+    <p:sldId id="328" r:id="rId58"/>
+    <p:sldId id="329" r:id="rId59"/>
     <p:sldId id="305" r:id="rId60"/>
     <p:sldId id="312" r:id="rId61"/>
     <p:sldId id="307" r:id="rId62"/>
@@ -242,7 +242,6 @@
             <p14:sldId id="288"/>
             <p14:sldId id="289"/>
             <p14:sldId id="290"/>
-            <p14:sldId id="329"/>
             <p14:sldId id="291"/>
             <p14:sldId id="292"/>
             <p14:sldId id="311"/>
@@ -252,6 +251,7 @@
             <p14:sldId id="326"/>
             <p14:sldId id="327"/>
             <p14:sldId id="328"/>
+            <p14:sldId id="329"/>
             <p14:sldId id="305"/>
             <p14:sldId id="312"/>
             <p14:sldId id="307"/>
@@ -721,7 +721,7 @@
           <a:p>
             <a:fld id="{1A571F42-F258-455F-A3F1-D2E86FDFEB4C}" type="slidenum">
               <a:rPr lang="nl-BE" smtClean="0"/>
-              <a:t>57</a:t>
+              <a:t>56</a:t>
             </a:fld>
             <a:endParaRPr lang="nl-BE"/>
           </a:p>
@@ -33824,846 +33824,6 @@
           <a:p>
             <a:r>
               <a:rPr lang="en-US" dirty="0" smtClean="0"/>
-              <a:t>Commit message</a:t>
-            </a:r>
-            <a:endParaRPr lang="en-US" dirty="0"/>
-          </a:p>
-        </p:txBody>
-      </p:sp>
-      <p:sp>
-        <p:nvSpPr>
-          <p:cNvPr id="3" name="Slide Number Placeholder 2"/>
-          <p:cNvSpPr>
-            <a:spLocks noGrp="1"/>
-          </p:cNvSpPr>
-          <p:nvPr>
-            <p:ph type="sldNum" sz="quarter" idx="12"/>
-          </p:nvPr>
-        </p:nvSpPr>
-        <p:spPr/>
-        <p:txBody>
-          <a:bodyPr/>
-          <a:lstStyle/>
-          <a:p>
-            <a:fld id="{BB52A05A-A776-4391-ACD7-D6BC34D3145C}" type="slidenum">
-              <a:rPr lang="nl-BE" smtClean="0"/>
-              <a:t>49</a:t>
-            </a:fld>
-            <a:endParaRPr lang="nl-BE"/>
-          </a:p>
-        </p:txBody>
-      </p:sp>
-      <p:sp>
-        <p:nvSpPr>
-          <p:cNvPr id="4" name="TextBox 3"/>
-          <p:cNvSpPr txBox="1"/>
-          <p:nvPr/>
-        </p:nvSpPr>
-        <p:spPr>
-          <a:xfrm>
-            <a:off x="323528" y="1380832"/>
-            <a:ext cx="7992888" cy="2862322"/>
-          </a:xfrm>
-          <a:prstGeom prst="rect">
-            <a:avLst/>
-          </a:prstGeom>
-          <a:noFill/>
-          <a:ln>
-            <a:solidFill>
-              <a:schemeClr val="tx1"/>
-            </a:solidFill>
-          </a:ln>
-        </p:spPr>
-        <p:txBody>
-          <a:bodyPr wrap="square" rtlCol="0">
-            <a:spAutoFit/>
-          </a:bodyPr>
-          <a:lstStyle/>
-          <a:p>
-            <a:r>
-              <a:rPr lang="en-GB" dirty="0" smtClean="0">
-                <a:latin typeface="Courier New" panose="02070309020205020404" pitchFamily="49" charset="0"/>
-                <a:cs typeface="Courier New" panose="02070309020205020404" pitchFamily="49" charset="0"/>
-              </a:rPr>
-              <a:t># </a:t>
-            </a:r>
-            <a:r>
-              <a:rPr lang="en-GB" dirty="0">
-                <a:latin typeface="Courier New" panose="02070309020205020404" pitchFamily="49" charset="0"/>
-                <a:cs typeface="Courier New" panose="02070309020205020404" pitchFamily="49" charset="0"/>
-              </a:rPr>
-              <a:t>This is a combination of 3 commits</a:t>
-            </a:r>
-            <a:r>
-              <a:rPr lang="en-GB" dirty="0" smtClean="0">
-                <a:latin typeface="Courier New" panose="02070309020205020404" pitchFamily="49" charset="0"/>
-                <a:cs typeface="Courier New" panose="02070309020205020404" pitchFamily="49" charset="0"/>
-              </a:rPr>
-              <a:t>. </a:t>
-            </a:r>
-            <a:endParaRPr lang="en-GB" dirty="0">
-              <a:latin typeface="Courier New" panose="02070309020205020404" pitchFamily="49" charset="0"/>
-              <a:cs typeface="Courier New" panose="02070309020205020404" pitchFamily="49" charset="0"/>
-            </a:endParaRPr>
-          </a:p>
-          <a:p>
-            <a:r>
-              <a:rPr lang="en-GB" dirty="0" smtClean="0">
-                <a:latin typeface="Courier New" panose="02070309020205020404" pitchFamily="49" charset="0"/>
-                <a:cs typeface="Courier New" panose="02070309020205020404" pitchFamily="49" charset="0"/>
-              </a:rPr>
-              <a:t># </a:t>
-            </a:r>
-            <a:r>
-              <a:rPr lang="en-GB" dirty="0">
-                <a:latin typeface="Courier New" panose="02070309020205020404" pitchFamily="49" charset="0"/>
-                <a:cs typeface="Courier New" panose="02070309020205020404" pitchFamily="49" charset="0"/>
-              </a:rPr>
-              <a:t>This is the 1st commit message:</a:t>
-            </a:r>
-          </a:p>
-          <a:p>
-            <a:r>
-              <a:rPr lang="en-GB" dirty="0" smtClean="0">
-                <a:latin typeface="Courier New" panose="02070309020205020404" pitchFamily="49" charset="0"/>
-                <a:cs typeface="Courier New" panose="02070309020205020404" pitchFamily="49" charset="0"/>
-              </a:rPr>
-              <a:t>Add </a:t>
-            </a:r>
-            <a:r>
-              <a:rPr lang="en-GB" dirty="0">
-                <a:latin typeface="Courier New" panose="02070309020205020404" pitchFamily="49" charset="0"/>
-                <a:cs typeface="Courier New" panose="02070309020205020404" pitchFamily="49" charset="0"/>
-              </a:rPr>
-              <a:t>command line argument to hello</a:t>
-            </a:r>
-          </a:p>
-          <a:p>
-            <a:r>
-              <a:rPr lang="en-GB" dirty="0" smtClean="0">
-                <a:latin typeface="Courier New" panose="02070309020205020404" pitchFamily="49" charset="0"/>
-                <a:cs typeface="Courier New" panose="02070309020205020404" pitchFamily="49" charset="0"/>
-              </a:rPr>
-              <a:t> </a:t>
-            </a:r>
-            <a:endParaRPr lang="en-GB" dirty="0">
-              <a:latin typeface="Courier New" panose="02070309020205020404" pitchFamily="49" charset="0"/>
-              <a:cs typeface="Courier New" panose="02070309020205020404" pitchFamily="49" charset="0"/>
-            </a:endParaRPr>
-          </a:p>
-          <a:p>
-            <a:r>
-              <a:rPr lang="en-GB" dirty="0" smtClean="0">
-                <a:latin typeface="Courier New" panose="02070309020205020404" pitchFamily="49" charset="0"/>
-                <a:cs typeface="Courier New" panose="02070309020205020404" pitchFamily="49" charset="0"/>
-              </a:rPr>
-              <a:t># </a:t>
-            </a:r>
-            <a:r>
-              <a:rPr lang="en-GB" dirty="0">
-                <a:latin typeface="Courier New" panose="02070309020205020404" pitchFamily="49" charset="0"/>
-                <a:cs typeface="Courier New" panose="02070309020205020404" pitchFamily="49" charset="0"/>
-              </a:rPr>
-              <a:t>This is the commit message #2:</a:t>
-            </a:r>
-          </a:p>
-          <a:p>
-            <a:r>
-              <a:rPr lang="en-GB" dirty="0" smtClean="0">
-                <a:latin typeface="Courier New" panose="02070309020205020404" pitchFamily="49" charset="0"/>
-                <a:cs typeface="Courier New" panose="02070309020205020404" pitchFamily="49" charset="0"/>
-              </a:rPr>
-              <a:t>Add </a:t>
-            </a:r>
-            <a:r>
-              <a:rPr lang="en-GB" dirty="0">
-                <a:latin typeface="Courier New" panose="02070309020205020404" pitchFamily="49" charset="0"/>
-                <a:cs typeface="Courier New" panose="02070309020205020404" pitchFamily="49" charset="0"/>
-              </a:rPr>
-              <a:t>command line argument to bye</a:t>
-            </a:r>
-          </a:p>
-          <a:p>
-            <a:r>
-              <a:rPr lang="en-GB" dirty="0" smtClean="0">
-                <a:latin typeface="Courier New" panose="02070309020205020404" pitchFamily="49" charset="0"/>
-                <a:cs typeface="Courier New" panose="02070309020205020404" pitchFamily="49" charset="0"/>
-              </a:rPr>
-              <a:t> </a:t>
-            </a:r>
-            <a:endParaRPr lang="en-GB" dirty="0">
-              <a:latin typeface="Courier New" panose="02070309020205020404" pitchFamily="49" charset="0"/>
-              <a:cs typeface="Courier New" panose="02070309020205020404" pitchFamily="49" charset="0"/>
-            </a:endParaRPr>
-          </a:p>
-          <a:p>
-            <a:r>
-              <a:rPr lang="en-GB" dirty="0" smtClean="0">
-                <a:latin typeface="Courier New" panose="02070309020205020404" pitchFamily="49" charset="0"/>
-                <a:cs typeface="Courier New" panose="02070309020205020404" pitchFamily="49" charset="0"/>
-              </a:rPr>
-              <a:t># </a:t>
-            </a:r>
-            <a:r>
-              <a:rPr lang="en-GB" dirty="0">
-                <a:latin typeface="Courier New" panose="02070309020205020404" pitchFamily="49" charset="0"/>
-                <a:cs typeface="Courier New" panose="02070309020205020404" pitchFamily="49" charset="0"/>
-              </a:rPr>
-              <a:t>This is the commit message #3:</a:t>
-            </a:r>
-          </a:p>
-          <a:p>
-            <a:r>
-              <a:rPr lang="en-GB" dirty="0" smtClean="0">
-                <a:latin typeface="Courier New" panose="02070309020205020404" pitchFamily="49" charset="0"/>
-                <a:cs typeface="Courier New" panose="02070309020205020404" pitchFamily="49" charset="0"/>
-              </a:rPr>
-              <a:t>Add </a:t>
-            </a:r>
-            <a:r>
-              <a:rPr lang="en-GB" dirty="0">
-                <a:latin typeface="Courier New" panose="02070309020205020404" pitchFamily="49" charset="0"/>
-                <a:cs typeface="Courier New" panose="02070309020205020404" pitchFamily="49" charset="0"/>
-              </a:rPr>
-              <a:t>clean </a:t>
-            </a:r>
-            <a:r>
-              <a:rPr lang="en-GB" dirty="0" smtClean="0">
-                <a:latin typeface="Courier New" panose="02070309020205020404" pitchFamily="49" charset="0"/>
-                <a:cs typeface="Courier New" panose="02070309020205020404" pitchFamily="49" charset="0"/>
-              </a:rPr>
-              <a:t>rule</a:t>
-            </a:r>
-          </a:p>
-          <a:p>
-            <a:r>
-              <a:rPr lang="en-GB" dirty="0" smtClean="0">
-                <a:latin typeface="Courier New" panose="02070309020205020404" pitchFamily="49" charset="0"/>
-                <a:cs typeface="Courier New" panose="02070309020205020404" pitchFamily="49" charset="0"/>
-              </a:rPr>
-              <a:t>…</a:t>
-            </a:r>
-            <a:endParaRPr lang="en-GB" dirty="0">
-              <a:latin typeface="Courier New" panose="02070309020205020404" pitchFamily="49" charset="0"/>
-              <a:cs typeface="Courier New" panose="02070309020205020404" pitchFamily="49" charset="0"/>
-            </a:endParaRPr>
-          </a:p>
-        </p:txBody>
-      </p:sp>
-      <p:grpSp>
-        <p:nvGrpSpPr>
-          <p:cNvPr id="7" name="Group 6"/>
-          <p:cNvGrpSpPr/>
-          <p:nvPr/>
-        </p:nvGrpSpPr>
-        <p:grpSpPr>
-          <a:xfrm>
-            <a:off x="323528" y="3645024"/>
-            <a:ext cx="8352928" cy="2618422"/>
-            <a:chOff x="323528" y="3645024"/>
-            <a:chExt cx="8352928" cy="2618422"/>
-          </a:xfrm>
-        </p:grpSpPr>
-        <p:sp>
-          <p:nvSpPr>
-            <p:cNvPr id="5" name="TextBox 4"/>
-            <p:cNvSpPr txBox="1"/>
-            <p:nvPr/>
-          </p:nvSpPr>
-          <p:spPr>
-            <a:xfrm>
-              <a:off x="323528" y="4509120"/>
-              <a:ext cx="7992888" cy="1754326"/>
-            </a:xfrm>
-            <a:prstGeom prst="rect">
-              <a:avLst/>
-            </a:prstGeom>
-            <a:noFill/>
-            <a:ln>
-              <a:solidFill>
-                <a:schemeClr val="tx1"/>
-              </a:solidFill>
-            </a:ln>
-          </p:spPr>
-          <p:txBody>
-            <a:bodyPr wrap="square" rtlCol="0">
-              <a:spAutoFit/>
-            </a:bodyPr>
-            <a:lstStyle/>
-            <a:p>
-              <a:r>
-                <a:rPr lang="en-GB" b="1" dirty="0" smtClean="0">
-                  <a:solidFill>
-                    <a:srgbClr val="C00000"/>
-                  </a:solidFill>
-                  <a:latin typeface="Courier New" panose="02070309020205020404" pitchFamily="49" charset="0"/>
-                  <a:cs typeface="Courier New" panose="02070309020205020404" pitchFamily="49" charset="0"/>
-                </a:rPr>
-                <a:t>Add command line arguments to message applications</a:t>
-              </a:r>
-            </a:p>
-            <a:p>
-              <a:endParaRPr lang="en-GB" dirty="0">
-                <a:latin typeface="Courier New" panose="02070309020205020404" pitchFamily="49" charset="0"/>
-                <a:cs typeface="Courier New" panose="02070309020205020404" pitchFamily="49" charset="0"/>
-              </a:endParaRPr>
-            </a:p>
-            <a:p>
-              <a:r>
-                <a:rPr lang="en-GB" dirty="0" smtClean="0">
-                  <a:latin typeface="Courier New" panose="02070309020205020404" pitchFamily="49" charset="0"/>
-                  <a:cs typeface="Courier New" panose="02070309020205020404" pitchFamily="49" charset="0"/>
-                </a:rPr>
-                <a:t># </a:t>
-              </a:r>
-              <a:r>
-                <a:rPr lang="en-GB" dirty="0">
-                  <a:latin typeface="Courier New" panose="02070309020205020404" pitchFamily="49" charset="0"/>
-                  <a:cs typeface="Courier New" panose="02070309020205020404" pitchFamily="49" charset="0"/>
-                </a:rPr>
-                <a:t>This is a combination of 3 commits</a:t>
-              </a:r>
-              <a:r>
-                <a:rPr lang="en-GB" dirty="0" smtClean="0">
-                  <a:latin typeface="Courier New" panose="02070309020205020404" pitchFamily="49" charset="0"/>
-                  <a:cs typeface="Courier New" panose="02070309020205020404" pitchFamily="49" charset="0"/>
-                </a:rPr>
-                <a:t>. </a:t>
-              </a:r>
-              <a:endParaRPr lang="en-GB" dirty="0">
-                <a:latin typeface="Courier New" panose="02070309020205020404" pitchFamily="49" charset="0"/>
-                <a:cs typeface="Courier New" panose="02070309020205020404" pitchFamily="49" charset="0"/>
-              </a:endParaRPr>
-            </a:p>
-            <a:p>
-              <a:r>
-                <a:rPr lang="en-GB" dirty="0" smtClean="0">
-                  <a:latin typeface="Courier New" panose="02070309020205020404" pitchFamily="49" charset="0"/>
-                  <a:cs typeface="Courier New" panose="02070309020205020404" pitchFamily="49" charset="0"/>
-                </a:rPr>
-                <a:t># </a:t>
-              </a:r>
-              <a:r>
-                <a:rPr lang="en-GB" dirty="0">
-                  <a:latin typeface="Courier New" panose="02070309020205020404" pitchFamily="49" charset="0"/>
-                  <a:cs typeface="Courier New" panose="02070309020205020404" pitchFamily="49" charset="0"/>
-                </a:rPr>
-                <a:t>This is the 1st commit message:</a:t>
-              </a:r>
-            </a:p>
-            <a:p>
-              <a:r>
-                <a:rPr lang="en-GB" dirty="0" smtClean="0">
-                  <a:latin typeface="Courier New" panose="02070309020205020404" pitchFamily="49" charset="0"/>
-                  <a:cs typeface="Courier New" panose="02070309020205020404" pitchFamily="49" charset="0"/>
-                </a:rPr>
-                <a:t>Add </a:t>
-              </a:r>
-              <a:r>
-                <a:rPr lang="en-GB" dirty="0">
-                  <a:latin typeface="Courier New" panose="02070309020205020404" pitchFamily="49" charset="0"/>
-                  <a:cs typeface="Courier New" panose="02070309020205020404" pitchFamily="49" charset="0"/>
-                </a:rPr>
-                <a:t>command line argument to hello</a:t>
-              </a:r>
-            </a:p>
-            <a:p>
-              <a:r>
-                <a:rPr lang="en-GB" dirty="0" smtClean="0">
-                  <a:latin typeface="Courier New" panose="02070309020205020404" pitchFamily="49" charset="0"/>
-                  <a:cs typeface="Courier New" panose="02070309020205020404" pitchFamily="49" charset="0"/>
-                </a:rPr>
-                <a:t>…</a:t>
-              </a:r>
-              <a:endParaRPr lang="en-GB" dirty="0">
-                <a:latin typeface="Courier New" panose="02070309020205020404" pitchFamily="49" charset="0"/>
-                <a:cs typeface="Courier New" panose="02070309020205020404" pitchFamily="49" charset="0"/>
-              </a:endParaRPr>
-            </a:p>
-          </p:txBody>
-        </p:sp>
-        <p:sp>
-          <p:nvSpPr>
-            <p:cNvPr id="6" name="Curved Left Arrow 5"/>
-            <p:cNvSpPr/>
-            <p:nvPr/>
-          </p:nvSpPr>
-          <p:spPr>
-            <a:xfrm>
-              <a:off x="8018040" y="3645024"/>
-              <a:ext cx="658416" cy="1512168"/>
-            </a:xfrm>
-            <a:prstGeom prst="curvedLeftArrow">
-              <a:avLst/>
-            </a:prstGeom>
-            <a:solidFill>
-              <a:srgbClr val="C00000"/>
-            </a:solidFill>
-            <a:ln>
-              <a:solidFill>
-                <a:srgbClr val="C00000"/>
-              </a:solidFill>
-            </a:ln>
-          </p:spPr>
-          <p:style>
-            <a:lnRef idx="2">
-              <a:schemeClr val="accent1">
-                <a:shade val="50000"/>
-              </a:schemeClr>
-            </a:lnRef>
-            <a:fillRef idx="1">
-              <a:schemeClr val="accent1"/>
-            </a:fillRef>
-            <a:effectRef idx="0">
-              <a:schemeClr val="accent1"/>
-            </a:effectRef>
-            <a:fontRef idx="minor">
-              <a:schemeClr val="lt1"/>
-            </a:fontRef>
-          </p:style>
-          <p:txBody>
-            <a:bodyPr rtlCol="0" anchor="ctr"/>
-            <a:lstStyle/>
-            <a:p>
-              <a:pPr algn="ctr"/>
-              <a:endParaRPr lang="en-US">
-                <a:solidFill>
-                  <a:schemeClr val="tx1"/>
-                </a:solidFill>
-              </a:endParaRPr>
-            </a:p>
-          </p:txBody>
-        </p:sp>
-      </p:grpSp>
-      <p:sp>
-        <p:nvSpPr>
-          <p:cNvPr id="8" name="TextBox 7"/>
-          <p:cNvSpPr txBox="1"/>
-          <p:nvPr/>
-        </p:nvSpPr>
-        <p:spPr>
-          <a:xfrm>
-            <a:off x="3851920" y="6048288"/>
-            <a:ext cx="3979423" cy="523220"/>
-          </a:xfrm>
-          <a:prstGeom prst="rect">
-            <a:avLst/>
-          </a:prstGeom>
-          <a:solidFill>
-            <a:schemeClr val="bg1"/>
-          </a:solidFill>
-          <a:ln>
-            <a:solidFill>
-              <a:schemeClr val="tx1"/>
-            </a:solidFill>
-          </a:ln>
-        </p:spPr>
-        <p:txBody>
-          <a:bodyPr wrap="none" rtlCol="0">
-            <a:spAutoFit/>
-          </a:bodyPr>
-          <a:lstStyle/>
-          <a:p>
-            <a:r>
-              <a:rPr lang="en-US" sz="2800" dirty="0" smtClean="0"/>
-              <a:t>Now merge or cherry-pick</a:t>
-            </a:r>
-            <a:endParaRPr lang="en-US" sz="2800" dirty="0"/>
-          </a:p>
-        </p:txBody>
-      </p:sp>
-    </p:spTree>
-    <p:extLst>
-      <p:ext uri="{BB962C8B-B14F-4D97-AF65-F5344CB8AC3E}">
-        <p14:creationId xmlns:p14="http://schemas.microsoft.com/office/powerpoint/2010/main" val="1739016906"/>
-      </p:ext>
-    </p:extLst>
-  </p:cSld>
-  <p:clrMapOvr>
-    <a:masterClrMapping/>
-  </p:clrMapOvr>
-  <p:timing>
-    <p:tnLst>
-      <p:par>
-        <p:cTn id="1" dur="indefinite" restart="never" nodeType="tmRoot">
-          <p:childTnLst>
-            <p:seq concurrent="1" nextAc="seek">
-              <p:cTn id="2" dur="indefinite" nodeType="mainSeq">
-                <p:childTnLst>
-                  <p:par>
-                    <p:cTn id="3" fill="hold">
-                      <p:stCondLst>
-                        <p:cond delay="indefinite"/>
-                      </p:stCondLst>
-                      <p:childTnLst>
-                        <p:par>
-                          <p:cTn id="4" fill="hold">
-                            <p:stCondLst>
-                              <p:cond delay="0"/>
-                            </p:stCondLst>
-                            <p:childTnLst>
-                              <p:par>
-                                <p:cTn id="5" presetID="1" presetClass="entr" presetSubtype="0" fill="hold" nodeType="clickEffect">
-                                  <p:stCondLst>
-                                    <p:cond delay="0"/>
-                                  </p:stCondLst>
-                                  <p:childTnLst>
-                                    <p:set>
-                                      <p:cBhvr>
-                                        <p:cTn id="6" dur="1" fill="hold">
-                                          <p:stCondLst>
-                                            <p:cond delay="0"/>
-                                          </p:stCondLst>
-                                        </p:cTn>
-                                        <p:tgtEl>
-                                          <p:spTgt spid="7"/>
-                                        </p:tgtEl>
-                                        <p:attrNameLst>
-                                          <p:attrName>style.visibility</p:attrName>
-                                        </p:attrNameLst>
-                                      </p:cBhvr>
-                                      <p:to>
-                                        <p:strVal val="visible"/>
-                                      </p:to>
-                                    </p:set>
-                                  </p:childTnLst>
-                                </p:cTn>
-                              </p:par>
-                            </p:childTnLst>
-                          </p:cTn>
-                        </p:par>
-                      </p:childTnLst>
-                    </p:cTn>
-                  </p:par>
-                  <p:par>
-                    <p:cTn id="7" fill="hold">
-                      <p:stCondLst>
-                        <p:cond delay="indefinite"/>
-                      </p:stCondLst>
-                      <p:childTnLst>
-                        <p:par>
-                          <p:cTn id="8" fill="hold">
-                            <p:stCondLst>
-                              <p:cond delay="0"/>
-                            </p:stCondLst>
-                            <p:childTnLst>
-                              <p:par>
-                                <p:cTn id="9" presetID="1" presetClass="entr" presetSubtype="0" fill="hold" grpId="0" nodeType="clickEffect">
-                                  <p:stCondLst>
-                                    <p:cond delay="0"/>
-                                  </p:stCondLst>
-                                  <p:childTnLst>
-                                    <p:set>
-                                      <p:cBhvr>
-                                        <p:cTn id="10" dur="1" fill="hold">
-                                          <p:stCondLst>
-                                            <p:cond delay="0"/>
-                                          </p:stCondLst>
-                                        </p:cTn>
-                                        <p:tgtEl>
-                                          <p:spTgt spid="8"/>
-                                        </p:tgtEl>
-                                        <p:attrNameLst>
-                                          <p:attrName>style.visibility</p:attrName>
-                                        </p:attrNameLst>
-                                      </p:cBhvr>
-                                      <p:to>
-                                        <p:strVal val="visible"/>
-                                      </p:to>
-                                    </p:set>
-                                  </p:childTnLst>
-                                </p:cTn>
-                              </p:par>
-                            </p:childTnLst>
-                          </p:cTn>
-                        </p:par>
-                      </p:childTnLst>
-                    </p:cTn>
-                  </p:par>
-                </p:childTnLst>
-              </p:cTn>
-              <p:prevCondLst>
-                <p:cond evt="onPrev" delay="0">
-                  <p:tgtEl>
-                    <p:sldTgt/>
-                  </p:tgtEl>
-                </p:cond>
-              </p:prevCondLst>
-              <p:nextCondLst>
-                <p:cond evt="onNext" delay="0">
-                  <p:tgtEl>
-                    <p:sldTgt/>
-                  </p:tgtEl>
-                </p:cond>
-              </p:nextCondLst>
-            </p:seq>
-          </p:childTnLst>
-        </p:cTn>
-      </p:par>
-    </p:tnLst>
-    <p:bldLst>
-      <p:bldP spid="8" grpId="0" animBg="1"/>
-    </p:bldLst>
-  </p:timing>
-</p:sld>
-</file>
-
-<file path=ppt/slides/slide5.xml><?xml version="1.0" encoding="utf-8"?>
-<p:sld xmlns:a="http://schemas.openxmlformats.org/drawingml/2006/main" xmlns:r="http://schemas.openxmlformats.org/officeDocument/2006/relationships" xmlns:p="http://schemas.openxmlformats.org/presentationml/2006/main">
-  <p:cSld>
-    <p:spTree>
-      <p:nvGrpSpPr>
-        <p:cNvPr id="1" name=""/>
-        <p:cNvGrpSpPr/>
-        <p:nvPr/>
-      </p:nvGrpSpPr>
-      <p:grpSpPr>
-        <a:xfrm>
-          <a:off x="0" y="0"/>
-          <a:ext cx="0" cy="0"/>
-          <a:chOff x="0" y="0"/>
-          <a:chExt cx="0" cy="0"/>
-        </a:xfrm>
-      </p:grpSpPr>
-      <p:sp>
-        <p:nvSpPr>
-          <p:cNvPr id="2" name="Slide Number Placeholder 1"/>
-          <p:cNvSpPr>
-            <a:spLocks noGrp="1"/>
-          </p:cNvSpPr>
-          <p:nvPr>
-            <p:ph type="sldNum" sz="quarter" idx="12"/>
-          </p:nvPr>
-        </p:nvSpPr>
-        <p:spPr/>
-        <p:txBody>
-          <a:bodyPr/>
-          <a:lstStyle/>
-          <a:p>
-            <a:fld id="{BB52A05A-A776-4391-ACD7-D6BC34D3145C}" type="slidenum">
-              <a:rPr lang="nl-BE" smtClean="0"/>
-              <a:t>5</a:t>
-            </a:fld>
-            <a:endParaRPr lang="nl-BE"/>
-          </a:p>
-        </p:txBody>
-      </p:sp>
-      <p:pic>
-        <p:nvPicPr>
-          <p:cNvPr id="3" name="Picture 2"/>
-          <p:cNvPicPr>
-            <a:picLocks noChangeAspect="1"/>
-          </p:cNvPicPr>
-          <p:nvPr/>
-        </p:nvPicPr>
-        <p:blipFill>
-          <a:blip r:embed="rId2"/>
-          <a:stretch>
-            <a:fillRect/>
-          </a:stretch>
-        </p:blipFill>
-        <p:spPr>
-          <a:xfrm>
-            <a:off x="201044" y="620688"/>
-            <a:ext cx="8741912" cy="5616623"/>
-          </a:xfrm>
-          <a:prstGeom prst="rect">
-            <a:avLst/>
-          </a:prstGeom>
-        </p:spPr>
-      </p:pic>
-      <p:sp>
-        <p:nvSpPr>
-          <p:cNvPr id="4" name="Rounded Rectangle 3"/>
-          <p:cNvSpPr/>
-          <p:nvPr/>
-        </p:nvSpPr>
-        <p:spPr>
-          <a:xfrm>
-            <a:off x="1331640" y="1196752"/>
-            <a:ext cx="936104" cy="216024"/>
-          </a:xfrm>
-          <a:prstGeom prst="roundRect">
-            <a:avLst/>
-          </a:prstGeom>
-          <a:solidFill>
-            <a:schemeClr val="tx1"/>
-          </a:solidFill>
-          <a:ln>
-            <a:noFill/>
-          </a:ln>
-        </p:spPr>
-        <p:style>
-          <a:lnRef idx="2">
-            <a:schemeClr val="accent1">
-              <a:shade val="50000"/>
-            </a:schemeClr>
-          </a:lnRef>
-          <a:fillRef idx="1">
-            <a:schemeClr val="accent1"/>
-          </a:fillRef>
-          <a:effectRef idx="0">
-            <a:schemeClr val="accent1"/>
-          </a:effectRef>
-          <a:fontRef idx="minor">
-            <a:schemeClr val="lt1"/>
-          </a:fontRef>
-        </p:style>
-        <p:txBody>
-          <a:bodyPr rtlCol="0" anchor="ctr"/>
-          <a:lstStyle/>
-          <a:p>
-            <a:pPr algn="ctr"/>
-            <a:endParaRPr lang="en-US"/>
-          </a:p>
-        </p:txBody>
-      </p:sp>
-      <p:sp>
-        <p:nvSpPr>
-          <p:cNvPr id="5" name="Rounded Rectangle 4"/>
-          <p:cNvSpPr/>
-          <p:nvPr/>
-        </p:nvSpPr>
-        <p:spPr>
-          <a:xfrm>
-            <a:off x="1198015" y="2020013"/>
-            <a:ext cx="936104" cy="216024"/>
-          </a:xfrm>
-          <a:prstGeom prst="roundRect">
-            <a:avLst/>
-          </a:prstGeom>
-          <a:solidFill>
-            <a:schemeClr val="tx1"/>
-          </a:solidFill>
-          <a:ln>
-            <a:noFill/>
-          </a:ln>
-        </p:spPr>
-        <p:style>
-          <a:lnRef idx="2">
-            <a:schemeClr val="accent1">
-              <a:shade val="50000"/>
-            </a:schemeClr>
-          </a:lnRef>
-          <a:fillRef idx="1">
-            <a:schemeClr val="accent1"/>
-          </a:fillRef>
-          <a:effectRef idx="0">
-            <a:schemeClr val="accent1"/>
-          </a:effectRef>
-          <a:fontRef idx="minor">
-            <a:schemeClr val="lt1"/>
-          </a:fontRef>
-        </p:style>
-        <p:txBody>
-          <a:bodyPr rtlCol="0" anchor="ctr"/>
-          <a:lstStyle/>
-          <a:p>
-            <a:pPr algn="ctr"/>
-            <a:endParaRPr lang="en-US"/>
-          </a:p>
-        </p:txBody>
-      </p:sp>
-      <p:sp>
-        <p:nvSpPr>
-          <p:cNvPr id="6" name="Rounded Rectangle 5"/>
-          <p:cNvSpPr/>
-          <p:nvPr/>
-        </p:nvSpPr>
-        <p:spPr>
-          <a:xfrm>
-            <a:off x="411498" y="1963591"/>
-            <a:ext cx="288032" cy="112843"/>
-          </a:xfrm>
-          <a:prstGeom prst="roundRect">
-            <a:avLst/>
-          </a:prstGeom>
-          <a:solidFill>
-            <a:schemeClr val="tx1"/>
-          </a:solidFill>
-          <a:ln>
-            <a:noFill/>
-          </a:ln>
-        </p:spPr>
-        <p:style>
-          <a:lnRef idx="2">
-            <a:schemeClr val="accent1">
-              <a:shade val="50000"/>
-            </a:schemeClr>
-          </a:lnRef>
-          <a:fillRef idx="1">
-            <a:schemeClr val="accent1"/>
-          </a:fillRef>
-          <a:effectRef idx="0">
-            <a:schemeClr val="accent1"/>
-          </a:effectRef>
-          <a:fontRef idx="minor">
-            <a:schemeClr val="lt1"/>
-          </a:fontRef>
-        </p:style>
-        <p:txBody>
-          <a:bodyPr rtlCol="0" anchor="ctr"/>
-          <a:lstStyle/>
-          <a:p>
-            <a:pPr algn="ctr"/>
-            <a:endParaRPr lang="en-US"/>
-          </a:p>
-        </p:txBody>
-      </p:sp>
-    </p:spTree>
-    <p:extLst>
-      <p:ext uri="{BB962C8B-B14F-4D97-AF65-F5344CB8AC3E}">
-        <p14:creationId xmlns:p14="http://schemas.microsoft.com/office/powerpoint/2010/main" val="1645612856"/>
-      </p:ext>
-    </p:extLst>
-  </p:cSld>
-  <p:clrMapOvr>
-    <a:masterClrMapping/>
-  </p:clrMapOvr>
-  <p:timing>
-    <p:tnLst>
-      <p:par>
-        <p:cTn id="1" dur="indefinite" restart="never" nodeType="tmRoot"/>
-      </p:par>
-    </p:tnLst>
-  </p:timing>
-</p:sld>
-</file>
-
-<file path=ppt/slides/slide50.xml><?xml version="1.0" encoding="utf-8"?>
-<p:sld xmlns:a="http://schemas.openxmlformats.org/drawingml/2006/main" xmlns:r="http://schemas.openxmlformats.org/officeDocument/2006/relationships" xmlns:p="http://schemas.openxmlformats.org/presentationml/2006/main">
-  <p:cSld>
-    <p:spTree>
-      <p:nvGrpSpPr>
-        <p:cNvPr id="1" name=""/>
-        <p:cNvGrpSpPr/>
-        <p:nvPr/>
-      </p:nvGrpSpPr>
-      <p:grpSpPr>
-        <a:xfrm>
-          <a:off x="0" y="0"/>
-          <a:ext cx="0" cy="0"/>
-          <a:chOff x="0" y="0"/>
-          <a:chExt cx="0" cy="0"/>
-        </a:xfrm>
-      </p:grpSpPr>
-      <p:sp>
-        <p:nvSpPr>
-          <p:cNvPr id="2" name="Title 1"/>
-          <p:cNvSpPr>
-            <a:spLocks noGrp="1"/>
-          </p:cNvSpPr>
-          <p:nvPr>
-            <p:ph type="title"/>
-          </p:nvPr>
-        </p:nvSpPr>
-        <p:spPr/>
-        <p:txBody>
-          <a:bodyPr/>
-          <a:lstStyle/>
-          <a:p>
-            <a:r>
-              <a:rPr lang="en-US" dirty="0" smtClean="0"/>
               <a:t>Creating &amp; working with a branch</a:t>
             </a:r>
             <a:endParaRPr lang="en-US" dirty="0"/>
@@ -34920,7 +34080,7 @@
           <a:p>
             <a:fld id="{BB52A05A-A776-4391-ACD7-D6BC34D3145C}" type="slidenum">
               <a:rPr lang="nl-BE" smtClean="0"/>
-              <a:t>50</a:t>
+              <a:t>49</a:t>
             </a:fld>
             <a:endParaRPr lang="nl-BE"/>
           </a:p>
@@ -35224,7 +34384,229 @@
 </p:sld>
 </file>
 
-<file path=ppt/slides/slide51.xml><?xml version="1.0" encoding="utf-8"?>
+<file path=ppt/slides/slide5.xml><?xml version="1.0" encoding="utf-8"?>
+<p:sld xmlns:a="http://schemas.openxmlformats.org/drawingml/2006/main" xmlns:r="http://schemas.openxmlformats.org/officeDocument/2006/relationships" xmlns:p="http://schemas.openxmlformats.org/presentationml/2006/main">
+  <p:cSld>
+    <p:spTree>
+      <p:nvGrpSpPr>
+        <p:cNvPr id="1" name=""/>
+        <p:cNvGrpSpPr/>
+        <p:nvPr/>
+      </p:nvGrpSpPr>
+      <p:grpSpPr>
+        <a:xfrm>
+          <a:off x="0" y="0"/>
+          <a:ext cx="0" cy="0"/>
+          <a:chOff x="0" y="0"/>
+          <a:chExt cx="0" cy="0"/>
+        </a:xfrm>
+      </p:grpSpPr>
+      <p:sp>
+        <p:nvSpPr>
+          <p:cNvPr id="2" name="Slide Number Placeholder 1"/>
+          <p:cNvSpPr>
+            <a:spLocks noGrp="1"/>
+          </p:cNvSpPr>
+          <p:nvPr>
+            <p:ph type="sldNum" sz="quarter" idx="12"/>
+          </p:nvPr>
+        </p:nvSpPr>
+        <p:spPr/>
+        <p:txBody>
+          <a:bodyPr/>
+          <a:lstStyle/>
+          <a:p>
+            <a:fld id="{BB52A05A-A776-4391-ACD7-D6BC34D3145C}" type="slidenum">
+              <a:rPr lang="nl-BE" smtClean="0"/>
+              <a:t>5</a:t>
+            </a:fld>
+            <a:endParaRPr lang="nl-BE"/>
+          </a:p>
+        </p:txBody>
+      </p:sp>
+      <p:pic>
+        <p:nvPicPr>
+          <p:cNvPr id="3" name="Picture 2"/>
+          <p:cNvPicPr>
+            <a:picLocks noChangeAspect="1"/>
+          </p:cNvPicPr>
+          <p:nvPr/>
+        </p:nvPicPr>
+        <p:blipFill>
+          <a:blip r:embed="rId2"/>
+          <a:stretch>
+            <a:fillRect/>
+          </a:stretch>
+        </p:blipFill>
+        <p:spPr>
+          <a:xfrm>
+            <a:off x="201044" y="620688"/>
+            <a:ext cx="8741912" cy="5616623"/>
+          </a:xfrm>
+          <a:prstGeom prst="rect">
+            <a:avLst/>
+          </a:prstGeom>
+        </p:spPr>
+      </p:pic>
+      <p:sp>
+        <p:nvSpPr>
+          <p:cNvPr id="4" name="Rounded Rectangle 3"/>
+          <p:cNvSpPr/>
+          <p:nvPr/>
+        </p:nvSpPr>
+        <p:spPr>
+          <a:xfrm>
+            <a:off x="1331640" y="1196752"/>
+            <a:ext cx="936104" cy="216024"/>
+          </a:xfrm>
+          <a:prstGeom prst="roundRect">
+            <a:avLst/>
+          </a:prstGeom>
+          <a:solidFill>
+            <a:schemeClr val="tx1"/>
+          </a:solidFill>
+          <a:ln>
+            <a:noFill/>
+          </a:ln>
+        </p:spPr>
+        <p:style>
+          <a:lnRef idx="2">
+            <a:schemeClr val="accent1">
+              <a:shade val="50000"/>
+            </a:schemeClr>
+          </a:lnRef>
+          <a:fillRef idx="1">
+            <a:schemeClr val="accent1"/>
+          </a:fillRef>
+          <a:effectRef idx="0">
+            <a:schemeClr val="accent1"/>
+          </a:effectRef>
+          <a:fontRef idx="minor">
+            <a:schemeClr val="lt1"/>
+          </a:fontRef>
+        </p:style>
+        <p:txBody>
+          <a:bodyPr rtlCol="0" anchor="ctr"/>
+          <a:lstStyle/>
+          <a:p>
+            <a:pPr algn="ctr"/>
+            <a:endParaRPr lang="en-US"/>
+          </a:p>
+        </p:txBody>
+      </p:sp>
+      <p:sp>
+        <p:nvSpPr>
+          <p:cNvPr id="5" name="Rounded Rectangle 4"/>
+          <p:cNvSpPr/>
+          <p:nvPr/>
+        </p:nvSpPr>
+        <p:spPr>
+          <a:xfrm>
+            <a:off x="1198015" y="2020013"/>
+            <a:ext cx="936104" cy="216024"/>
+          </a:xfrm>
+          <a:prstGeom prst="roundRect">
+            <a:avLst/>
+          </a:prstGeom>
+          <a:solidFill>
+            <a:schemeClr val="tx1"/>
+          </a:solidFill>
+          <a:ln>
+            <a:noFill/>
+          </a:ln>
+        </p:spPr>
+        <p:style>
+          <a:lnRef idx="2">
+            <a:schemeClr val="accent1">
+              <a:shade val="50000"/>
+            </a:schemeClr>
+          </a:lnRef>
+          <a:fillRef idx="1">
+            <a:schemeClr val="accent1"/>
+          </a:fillRef>
+          <a:effectRef idx="0">
+            <a:schemeClr val="accent1"/>
+          </a:effectRef>
+          <a:fontRef idx="minor">
+            <a:schemeClr val="lt1"/>
+          </a:fontRef>
+        </p:style>
+        <p:txBody>
+          <a:bodyPr rtlCol="0" anchor="ctr"/>
+          <a:lstStyle/>
+          <a:p>
+            <a:pPr algn="ctr"/>
+            <a:endParaRPr lang="en-US"/>
+          </a:p>
+        </p:txBody>
+      </p:sp>
+      <p:sp>
+        <p:nvSpPr>
+          <p:cNvPr id="6" name="Rounded Rectangle 5"/>
+          <p:cNvSpPr/>
+          <p:nvPr/>
+        </p:nvSpPr>
+        <p:spPr>
+          <a:xfrm>
+            <a:off x="411498" y="1963591"/>
+            <a:ext cx="288032" cy="112843"/>
+          </a:xfrm>
+          <a:prstGeom prst="roundRect">
+            <a:avLst/>
+          </a:prstGeom>
+          <a:solidFill>
+            <a:schemeClr val="tx1"/>
+          </a:solidFill>
+          <a:ln>
+            <a:noFill/>
+          </a:ln>
+        </p:spPr>
+        <p:style>
+          <a:lnRef idx="2">
+            <a:schemeClr val="accent1">
+              <a:shade val="50000"/>
+            </a:schemeClr>
+          </a:lnRef>
+          <a:fillRef idx="1">
+            <a:schemeClr val="accent1"/>
+          </a:fillRef>
+          <a:effectRef idx="0">
+            <a:schemeClr val="accent1"/>
+          </a:effectRef>
+          <a:fontRef idx="minor">
+            <a:schemeClr val="lt1"/>
+          </a:fontRef>
+        </p:style>
+        <p:txBody>
+          <a:bodyPr rtlCol="0" anchor="ctr"/>
+          <a:lstStyle/>
+          <a:p>
+            <a:pPr algn="ctr"/>
+            <a:endParaRPr lang="en-US"/>
+          </a:p>
+        </p:txBody>
+      </p:sp>
+    </p:spTree>
+    <p:extLst>
+      <p:ext uri="{BB962C8B-B14F-4D97-AF65-F5344CB8AC3E}">
+        <p14:creationId xmlns:p14="http://schemas.microsoft.com/office/powerpoint/2010/main" val="1645612856"/>
+      </p:ext>
+    </p:extLst>
+  </p:cSld>
+  <p:clrMapOvr>
+    <a:masterClrMapping/>
+  </p:clrMapOvr>
+  <p:timing>
+    <p:tnLst>
+      <p:par>
+        <p:cTn id="1" dur="indefinite" restart="never" nodeType="tmRoot"/>
+      </p:par>
+    </p:tnLst>
+  </p:timing>
+</p:sld>
+</file>
+
+<file path=ppt/slides/slide50.xml><?xml version="1.0" encoding="utf-8"?>
 <p:sld xmlns:a="http://schemas.openxmlformats.org/drawingml/2006/main" xmlns:r="http://schemas.openxmlformats.org/officeDocument/2006/relationships" xmlns:p="http://schemas.openxmlformats.org/presentationml/2006/main">
   <p:cSld>
     <p:spTree>
@@ -35504,7 +34886,7 @@
           <a:p>
             <a:fld id="{BB52A05A-A776-4391-ACD7-D6BC34D3145C}" type="slidenum">
               <a:rPr lang="nl-BE" smtClean="0"/>
-              <a:t>51</a:t>
+              <a:t>50</a:t>
             </a:fld>
             <a:endParaRPr lang="nl-BE"/>
           </a:p>
@@ -35839,7 +35221,7 @@
 </p:sld>
 </file>
 
-<file path=ppt/slides/slide52.xml><?xml version="1.0" encoding="utf-8"?>
+<file path=ppt/slides/slide51.xml><?xml version="1.0" encoding="utf-8"?>
 <p:sld xmlns:a="http://schemas.openxmlformats.org/drawingml/2006/main" xmlns:r="http://schemas.openxmlformats.org/officeDocument/2006/relationships" xmlns:p="http://schemas.openxmlformats.org/presentationml/2006/main">
   <p:cSld>
     <p:spTree>
@@ -35942,7 +35324,7 @@
           <a:p>
             <a:fld id="{BB52A05A-A776-4391-ACD7-D6BC34D3145C}" type="slidenum">
               <a:rPr lang="nl-BE" smtClean="0"/>
-              <a:t>52</a:t>
+              <a:t>51</a:t>
             </a:fld>
             <a:endParaRPr lang="nl-BE"/>
           </a:p>
@@ -36480,7 +35862,7 @@
 </p:sld>
 </file>
 
-<file path=ppt/slides/slide53.xml><?xml version="1.0" encoding="utf-8"?>
+<file path=ppt/slides/slide52.xml><?xml version="1.0" encoding="utf-8"?>
 <p:sld xmlns:a="http://schemas.openxmlformats.org/drawingml/2006/main" xmlns:r="http://schemas.openxmlformats.org/officeDocument/2006/relationships" xmlns:p="http://schemas.openxmlformats.org/presentationml/2006/main">
   <p:cSld>
     <p:spTree>
@@ -37551,7 +36933,7 @@
           <a:p>
             <a:fld id="{BB52A05A-A776-4391-ACD7-D6BC34D3145C}" type="slidenum">
               <a:rPr lang="nl-BE" smtClean="0"/>
-              <a:t>53</a:t>
+              <a:t>52</a:t>
             </a:fld>
             <a:endParaRPr lang="nl-BE"/>
           </a:p>
@@ -38313,7 +37695,7 @@
 </p:sld>
 </file>
 
-<file path=ppt/slides/slide54.xml><?xml version="1.0" encoding="utf-8"?>
+<file path=ppt/slides/slide53.xml><?xml version="1.0" encoding="utf-8"?>
 <p:sld xmlns:a="http://schemas.openxmlformats.org/drawingml/2006/main" xmlns:r="http://schemas.openxmlformats.org/officeDocument/2006/relationships" xmlns:p="http://schemas.openxmlformats.org/presentationml/2006/main">
   <p:cSld>
     <p:spTree>
@@ -38761,7 +38143,7 @@
           <a:p>
             <a:fld id="{BB52A05A-A776-4391-ACD7-D6BC34D3145C}" type="slidenum">
               <a:rPr lang="nl-BE" smtClean="0"/>
-              <a:t>54</a:t>
+              <a:t>53</a:t>
             </a:fld>
             <a:endParaRPr lang="nl-BE"/>
           </a:p>
@@ -39286,7 +38668,7 @@
 </p:sld>
 </file>
 
-<file path=ppt/slides/slide55.xml><?xml version="1.0" encoding="utf-8"?>
+<file path=ppt/slides/slide54.xml><?xml version="1.0" encoding="utf-8"?>
 <p:sld xmlns:a="http://schemas.openxmlformats.org/drawingml/2006/main" xmlns:r="http://schemas.openxmlformats.org/officeDocument/2006/relationships" xmlns:p="http://schemas.openxmlformats.org/presentationml/2006/main">
   <p:cSld>
     <p:spTree>
@@ -39451,7 +38833,7 @@
           <a:p>
             <a:fld id="{BB52A05A-A776-4391-ACD7-D6BC34D3145C}" type="slidenum">
               <a:rPr lang="nl-BE" smtClean="0"/>
-              <a:t>55</a:t>
+              <a:t>54</a:t>
             </a:fld>
             <a:endParaRPr lang="nl-BE"/>
           </a:p>
@@ -39660,7 +39042,7 @@
 </p:sld>
 </file>
 
-<file path=ppt/slides/slide56.xml><?xml version="1.0" encoding="utf-8"?>
+<file path=ppt/slides/slide55.xml><?xml version="1.0" encoding="utf-8"?>
 <p:sld xmlns:a="http://schemas.openxmlformats.org/drawingml/2006/main" xmlns:r="http://schemas.openxmlformats.org/officeDocument/2006/relationships" xmlns:p="http://schemas.openxmlformats.org/presentationml/2006/main">
   <p:cSld>
     <p:spTree>
@@ -39747,7 +39129,7 @@
           <a:p>
             <a:fld id="{BB52A05A-A776-4391-ACD7-D6BC34D3145C}" type="slidenum">
               <a:rPr lang="nl-BE" smtClean="0"/>
-              <a:t>56</a:t>
+              <a:t>55</a:t>
             </a:fld>
             <a:endParaRPr lang="nl-BE"/>
           </a:p>
@@ -40482,7 +39864,7 @@
 </p:sld>
 </file>
 
-<file path=ppt/slides/slide57.xml><?xml version="1.0" encoding="utf-8"?>
+<file path=ppt/slides/slide56.xml><?xml version="1.0" encoding="utf-8"?>
 <p:sld xmlns:a="http://schemas.openxmlformats.org/drawingml/2006/main" xmlns:r="http://schemas.openxmlformats.org/officeDocument/2006/relationships" xmlns:p="http://schemas.openxmlformats.org/presentationml/2006/main">
   <p:cSld>
     <p:spTree>
@@ -40579,7 +39961,7 @@
           <a:p>
             <a:fld id="{BB52A05A-A776-4391-ACD7-D6BC34D3145C}" type="slidenum">
               <a:rPr lang="nl-BE" smtClean="0"/>
-              <a:t>57</a:t>
+              <a:t>56</a:t>
             </a:fld>
             <a:endParaRPr lang="nl-BE"/>
           </a:p>
@@ -41257,7 +40639,7 @@
 </p:sld>
 </file>
 
-<file path=ppt/slides/slide58.xml><?xml version="1.0" encoding="utf-8"?>
+<file path=ppt/slides/slide57.xml><?xml version="1.0" encoding="utf-8"?>
 <p:sld xmlns:a="http://schemas.openxmlformats.org/drawingml/2006/main" xmlns:r="http://schemas.openxmlformats.org/officeDocument/2006/relationships" xmlns:p="http://schemas.openxmlformats.org/presentationml/2006/main">
   <p:cSld>
     <p:spTree>
@@ -41314,7 +40696,7 @@
           <a:p>
             <a:fld id="{BB52A05A-A776-4391-ACD7-D6BC34D3145C}" type="slidenum">
               <a:rPr lang="nl-BE" smtClean="0"/>
-              <a:t>58</a:t>
+              <a:t>57</a:t>
             </a:fld>
             <a:endParaRPr lang="nl-BE"/>
           </a:p>
@@ -41975,6 +41357,624 @@
     </p:tnLst>
     <p:bldLst>
       <p:bldP spid="6" grpId="0" animBg="1"/>
+    </p:bldLst>
+  </p:timing>
+</p:sld>
+</file>
+
+<file path=ppt/slides/slide58.xml><?xml version="1.0" encoding="utf-8"?>
+<p:sld xmlns:a="http://schemas.openxmlformats.org/drawingml/2006/main" xmlns:r="http://schemas.openxmlformats.org/officeDocument/2006/relationships" xmlns:p="http://schemas.openxmlformats.org/presentationml/2006/main">
+  <p:cSld>
+    <p:spTree>
+      <p:nvGrpSpPr>
+        <p:cNvPr id="1" name=""/>
+        <p:cNvGrpSpPr/>
+        <p:nvPr/>
+      </p:nvGrpSpPr>
+      <p:grpSpPr>
+        <a:xfrm>
+          <a:off x="0" y="0"/>
+          <a:ext cx="0" cy="0"/>
+          <a:chOff x="0" y="0"/>
+          <a:chExt cx="0" cy="0"/>
+        </a:xfrm>
+      </p:grpSpPr>
+      <p:sp>
+        <p:nvSpPr>
+          <p:cNvPr id="2" name="Title 1"/>
+          <p:cNvSpPr>
+            <a:spLocks noGrp="1"/>
+          </p:cNvSpPr>
+          <p:nvPr>
+            <p:ph type="title"/>
+          </p:nvPr>
+        </p:nvSpPr>
+        <p:spPr/>
+        <p:txBody>
+          <a:bodyPr/>
+          <a:lstStyle/>
+          <a:p>
+            <a:r>
+              <a:rPr lang="en-US" dirty="0" smtClean="0"/>
+              <a:t>Commit message</a:t>
+            </a:r>
+            <a:endParaRPr lang="en-US" dirty="0"/>
+          </a:p>
+        </p:txBody>
+      </p:sp>
+      <p:sp>
+        <p:nvSpPr>
+          <p:cNvPr id="3" name="Slide Number Placeholder 2"/>
+          <p:cNvSpPr>
+            <a:spLocks noGrp="1"/>
+          </p:cNvSpPr>
+          <p:nvPr>
+            <p:ph type="sldNum" sz="quarter" idx="12"/>
+          </p:nvPr>
+        </p:nvSpPr>
+        <p:spPr/>
+        <p:txBody>
+          <a:bodyPr/>
+          <a:lstStyle/>
+          <a:p>
+            <a:fld id="{BB52A05A-A776-4391-ACD7-D6BC34D3145C}" type="slidenum">
+              <a:rPr lang="nl-BE" smtClean="0"/>
+              <a:t>58</a:t>
+            </a:fld>
+            <a:endParaRPr lang="nl-BE"/>
+          </a:p>
+        </p:txBody>
+      </p:sp>
+      <p:sp>
+        <p:nvSpPr>
+          <p:cNvPr id="4" name="TextBox 3"/>
+          <p:cNvSpPr txBox="1"/>
+          <p:nvPr/>
+        </p:nvSpPr>
+        <p:spPr>
+          <a:xfrm>
+            <a:off x="323528" y="1380832"/>
+            <a:ext cx="7992888" cy="2862322"/>
+          </a:xfrm>
+          <a:prstGeom prst="rect">
+            <a:avLst/>
+          </a:prstGeom>
+          <a:noFill/>
+          <a:ln>
+            <a:solidFill>
+              <a:schemeClr val="tx1"/>
+            </a:solidFill>
+          </a:ln>
+        </p:spPr>
+        <p:txBody>
+          <a:bodyPr wrap="square" rtlCol="0">
+            <a:spAutoFit/>
+          </a:bodyPr>
+          <a:lstStyle/>
+          <a:p>
+            <a:r>
+              <a:rPr lang="en-GB" dirty="0" smtClean="0">
+                <a:latin typeface="Courier New" panose="02070309020205020404" pitchFamily="49" charset="0"/>
+                <a:cs typeface="Courier New" panose="02070309020205020404" pitchFamily="49" charset="0"/>
+              </a:rPr>
+              <a:t># </a:t>
+            </a:r>
+            <a:r>
+              <a:rPr lang="en-GB" dirty="0">
+                <a:latin typeface="Courier New" panose="02070309020205020404" pitchFamily="49" charset="0"/>
+                <a:cs typeface="Courier New" panose="02070309020205020404" pitchFamily="49" charset="0"/>
+              </a:rPr>
+              <a:t>This is a combination of 3 commits</a:t>
+            </a:r>
+            <a:r>
+              <a:rPr lang="en-GB" dirty="0" smtClean="0">
+                <a:latin typeface="Courier New" panose="02070309020205020404" pitchFamily="49" charset="0"/>
+                <a:cs typeface="Courier New" panose="02070309020205020404" pitchFamily="49" charset="0"/>
+              </a:rPr>
+              <a:t>. </a:t>
+            </a:r>
+            <a:endParaRPr lang="en-GB" dirty="0">
+              <a:latin typeface="Courier New" panose="02070309020205020404" pitchFamily="49" charset="0"/>
+              <a:cs typeface="Courier New" panose="02070309020205020404" pitchFamily="49" charset="0"/>
+            </a:endParaRPr>
+          </a:p>
+          <a:p>
+            <a:r>
+              <a:rPr lang="en-GB" dirty="0" smtClean="0">
+                <a:latin typeface="Courier New" panose="02070309020205020404" pitchFamily="49" charset="0"/>
+                <a:cs typeface="Courier New" panose="02070309020205020404" pitchFamily="49" charset="0"/>
+              </a:rPr>
+              <a:t># </a:t>
+            </a:r>
+            <a:r>
+              <a:rPr lang="en-GB" dirty="0">
+                <a:latin typeface="Courier New" panose="02070309020205020404" pitchFamily="49" charset="0"/>
+                <a:cs typeface="Courier New" panose="02070309020205020404" pitchFamily="49" charset="0"/>
+              </a:rPr>
+              <a:t>This is the 1st commit message:</a:t>
+            </a:r>
+          </a:p>
+          <a:p>
+            <a:r>
+              <a:rPr lang="en-GB" dirty="0" smtClean="0">
+                <a:latin typeface="Courier New" panose="02070309020205020404" pitchFamily="49" charset="0"/>
+                <a:cs typeface="Courier New" panose="02070309020205020404" pitchFamily="49" charset="0"/>
+              </a:rPr>
+              <a:t>Add </a:t>
+            </a:r>
+            <a:r>
+              <a:rPr lang="en-GB" dirty="0">
+                <a:latin typeface="Courier New" panose="02070309020205020404" pitchFamily="49" charset="0"/>
+                <a:cs typeface="Courier New" panose="02070309020205020404" pitchFamily="49" charset="0"/>
+              </a:rPr>
+              <a:t>command line argument to hello</a:t>
+            </a:r>
+          </a:p>
+          <a:p>
+            <a:r>
+              <a:rPr lang="en-GB" dirty="0" smtClean="0">
+                <a:latin typeface="Courier New" panose="02070309020205020404" pitchFamily="49" charset="0"/>
+                <a:cs typeface="Courier New" panose="02070309020205020404" pitchFamily="49" charset="0"/>
+              </a:rPr>
+              <a:t> </a:t>
+            </a:r>
+            <a:endParaRPr lang="en-GB" dirty="0">
+              <a:latin typeface="Courier New" panose="02070309020205020404" pitchFamily="49" charset="0"/>
+              <a:cs typeface="Courier New" panose="02070309020205020404" pitchFamily="49" charset="0"/>
+            </a:endParaRPr>
+          </a:p>
+          <a:p>
+            <a:r>
+              <a:rPr lang="en-GB" dirty="0" smtClean="0">
+                <a:latin typeface="Courier New" panose="02070309020205020404" pitchFamily="49" charset="0"/>
+                <a:cs typeface="Courier New" panose="02070309020205020404" pitchFamily="49" charset="0"/>
+              </a:rPr>
+              <a:t># </a:t>
+            </a:r>
+            <a:r>
+              <a:rPr lang="en-GB" dirty="0">
+                <a:latin typeface="Courier New" panose="02070309020205020404" pitchFamily="49" charset="0"/>
+                <a:cs typeface="Courier New" panose="02070309020205020404" pitchFamily="49" charset="0"/>
+              </a:rPr>
+              <a:t>This is the commit message #2:</a:t>
+            </a:r>
+          </a:p>
+          <a:p>
+            <a:r>
+              <a:rPr lang="en-GB" dirty="0" smtClean="0">
+                <a:latin typeface="Courier New" panose="02070309020205020404" pitchFamily="49" charset="0"/>
+                <a:cs typeface="Courier New" panose="02070309020205020404" pitchFamily="49" charset="0"/>
+              </a:rPr>
+              <a:t>Add </a:t>
+            </a:r>
+            <a:r>
+              <a:rPr lang="en-GB" dirty="0">
+                <a:latin typeface="Courier New" panose="02070309020205020404" pitchFamily="49" charset="0"/>
+                <a:cs typeface="Courier New" panose="02070309020205020404" pitchFamily="49" charset="0"/>
+              </a:rPr>
+              <a:t>command line argument to bye</a:t>
+            </a:r>
+          </a:p>
+          <a:p>
+            <a:r>
+              <a:rPr lang="en-GB" dirty="0" smtClean="0">
+                <a:latin typeface="Courier New" panose="02070309020205020404" pitchFamily="49" charset="0"/>
+                <a:cs typeface="Courier New" panose="02070309020205020404" pitchFamily="49" charset="0"/>
+              </a:rPr>
+              <a:t> </a:t>
+            </a:r>
+            <a:endParaRPr lang="en-GB" dirty="0">
+              <a:latin typeface="Courier New" panose="02070309020205020404" pitchFamily="49" charset="0"/>
+              <a:cs typeface="Courier New" panose="02070309020205020404" pitchFamily="49" charset="0"/>
+            </a:endParaRPr>
+          </a:p>
+          <a:p>
+            <a:r>
+              <a:rPr lang="en-GB" dirty="0" smtClean="0">
+                <a:latin typeface="Courier New" panose="02070309020205020404" pitchFamily="49" charset="0"/>
+                <a:cs typeface="Courier New" panose="02070309020205020404" pitchFamily="49" charset="0"/>
+              </a:rPr>
+              <a:t># </a:t>
+            </a:r>
+            <a:r>
+              <a:rPr lang="en-GB" dirty="0">
+                <a:latin typeface="Courier New" panose="02070309020205020404" pitchFamily="49" charset="0"/>
+                <a:cs typeface="Courier New" panose="02070309020205020404" pitchFamily="49" charset="0"/>
+              </a:rPr>
+              <a:t>This is the commit message #3:</a:t>
+            </a:r>
+          </a:p>
+          <a:p>
+            <a:r>
+              <a:rPr lang="en-GB" dirty="0" smtClean="0">
+                <a:latin typeface="Courier New" panose="02070309020205020404" pitchFamily="49" charset="0"/>
+                <a:cs typeface="Courier New" panose="02070309020205020404" pitchFamily="49" charset="0"/>
+              </a:rPr>
+              <a:t>Add </a:t>
+            </a:r>
+            <a:r>
+              <a:rPr lang="en-GB" dirty="0">
+                <a:latin typeface="Courier New" panose="02070309020205020404" pitchFamily="49" charset="0"/>
+                <a:cs typeface="Courier New" panose="02070309020205020404" pitchFamily="49" charset="0"/>
+              </a:rPr>
+              <a:t>clean </a:t>
+            </a:r>
+            <a:r>
+              <a:rPr lang="en-GB" dirty="0" smtClean="0">
+                <a:latin typeface="Courier New" panose="02070309020205020404" pitchFamily="49" charset="0"/>
+                <a:cs typeface="Courier New" panose="02070309020205020404" pitchFamily="49" charset="0"/>
+              </a:rPr>
+              <a:t>rule</a:t>
+            </a:r>
+          </a:p>
+          <a:p>
+            <a:r>
+              <a:rPr lang="en-GB" dirty="0" smtClean="0">
+                <a:latin typeface="Courier New" panose="02070309020205020404" pitchFamily="49" charset="0"/>
+                <a:cs typeface="Courier New" panose="02070309020205020404" pitchFamily="49" charset="0"/>
+              </a:rPr>
+              <a:t>…</a:t>
+            </a:r>
+            <a:endParaRPr lang="en-GB" dirty="0">
+              <a:latin typeface="Courier New" panose="02070309020205020404" pitchFamily="49" charset="0"/>
+              <a:cs typeface="Courier New" panose="02070309020205020404" pitchFamily="49" charset="0"/>
+            </a:endParaRPr>
+          </a:p>
+        </p:txBody>
+      </p:sp>
+      <p:grpSp>
+        <p:nvGrpSpPr>
+          <p:cNvPr id="7" name="Group 6"/>
+          <p:cNvGrpSpPr/>
+          <p:nvPr/>
+        </p:nvGrpSpPr>
+        <p:grpSpPr>
+          <a:xfrm>
+            <a:off x="323528" y="3645024"/>
+            <a:ext cx="8352928" cy="2618422"/>
+            <a:chOff x="323528" y="3645024"/>
+            <a:chExt cx="8352928" cy="2618422"/>
+          </a:xfrm>
+        </p:grpSpPr>
+        <p:sp>
+          <p:nvSpPr>
+            <p:cNvPr id="5" name="TextBox 4"/>
+            <p:cNvSpPr txBox="1"/>
+            <p:nvPr/>
+          </p:nvSpPr>
+          <p:spPr>
+            <a:xfrm>
+              <a:off x="323528" y="4509120"/>
+              <a:ext cx="7992888" cy="1754326"/>
+            </a:xfrm>
+            <a:prstGeom prst="rect">
+              <a:avLst/>
+            </a:prstGeom>
+            <a:noFill/>
+            <a:ln>
+              <a:solidFill>
+                <a:schemeClr val="tx1"/>
+              </a:solidFill>
+            </a:ln>
+          </p:spPr>
+          <p:txBody>
+            <a:bodyPr wrap="square" rtlCol="0">
+              <a:spAutoFit/>
+            </a:bodyPr>
+            <a:lstStyle/>
+            <a:p>
+              <a:r>
+                <a:rPr lang="en-GB" b="1" dirty="0" smtClean="0">
+                  <a:solidFill>
+                    <a:srgbClr val="C00000"/>
+                  </a:solidFill>
+                  <a:latin typeface="Courier New" panose="02070309020205020404" pitchFamily="49" charset="0"/>
+                  <a:cs typeface="Courier New" panose="02070309020205020404" pitchFamily="49" charset="0"/>
+                </a:rPr>
+                <a:t>Add command line arguments to message applications</a:t>
+              </a:r>
+            </a:p>
+            <a:p>
+              <a:endParaRPr lang="en-GB" dirty="0">
+                <a:latin typeface="Courier New" panose="02070309020205020404" pitchFamily="49" charset="0"/>
+                <a:cs typeface="Courier New" panose="02070309020205020404" pitchFamily="49" charset="0"/>
+              </a:endParaRPr>
+            </a:p>
+            <a:p>
+              <a:r>
+                <a:rPr lang="en-GB" dirty="0" smtClean="0">
+                  <a:latin typeface="Courier New" panose="02070309020205020404" pitchFamily="49" charset="0"/>
+                  <a:cs typeface="Courier New" panose="02070309020205020404" pitchFamily="49" charset="0"/>
+                </a:rPr>
+                <a:t># </a:t>
+              </a:r>
+              <a:r>
+                <a:rPr lang="en-GB" dirty="0">
+                  <a:latin typeface="Courier New" panose="02070309020205020404" pitchFamily="49" charset="0"/>
+                  <a:cs typeface="Courier New" panose="02070309020205020404" pitchFamily="49" charset="0"/>
+                </a:rPr>
+                <a:t>This is a combination of 3 commits</a:t>
+              </a:r>
+              <a:r>
+                <a:rPr lang="en-GB" dirty="0" smtClean="0">
+                  <a:latin typeface="Courier New" panose="02070309020205020404" pitchFamily="49" charset="0"/>
+                  <a:cs typeface="Courier New" panose="02070309020205020404" pitchFamily="49" charset="0"/>
+                </a:rPr>
+                <a:t>. </a:t>
+              </a:r>
+              <a:endParaRPr lang="en-GB" dirty="0">
+                <a:latin typeface="Courier New" panose="02070309020205020404" pitchFamily="49" charset="0"/>
+                <a:cs typeface="Courier New" panose="02070309020205020404" pitchFamily="49" charset="0"/>
+              </a:endParaRPr>
+            </a:p>
+            <a:p>
+              <a:r>
+                <a:rPr lang="en-GB" dirty="0" smtClean="0">
+                  <a:latin typeface="Courier New" panose="02070309020205020404" pitchFamily="49" charset="0"/>
+                  <a:cs typeface="Courier New" panose="02070309020205020404" pitchFamily="49" charset="0"/>
+                </a:rPr>
+                <a:t># </a:t>
+              </a:r>
+              <a:r>
+                <a:rPr lang="en-GB" dirty="0">
+                  <a:latin typeface="Courier New" panose="02070309020205020404" pitchFamily="49" charset="0"/>
+                  <a:cs typeface="Courier New" panose="02070309020205020404" pitchFamily="49" charset="0"/>
+                </a:rPr>
+                <a:t>This is the 1st commit message:</a:t>
+              </a:r>
+            </a:p>
+            <a:p>
+              <a:r>
+                <a:rPr lang="en-GB" dirty="0" smtClean="0">
+                  <a:latin typeface="Courier New" panose="02070309020205020404" pitchFamily="49" charset="0"/>
+                  <a:cs typeface="Courier New" panose="02070309020205020404" pitchFamily="49" charset="0"/>
+                </a:rPr>
+                <a:t>Add </a:t>
+              </a:r>
+              <a:r>
+                <a:rPr lang="en-GB" dirty="0">
+                  <a:latin typeface="Courier New" panose="02070309020205020404" pitchFamily="49" charset="0"/>
+                  <a:cs typeface="Courier New" panose="02070309020205020404" pitchFamily="49" charset="0"/>
+                </a:rPr>
+                <a:t>command line argument to hello</a:t>
+              </a:r>
+            </a:p>
+            <a:p>
+              <a:r>
+                <a:rPr lang="en-GB" dirty="0" smtClean="0">
+                  <a:latin typeface="Courier New" panose="02070309020205020404" pitchFamily="49" charset="0"/>
+                  <a:cs typeface="Courier New" panose="02070309020205020404" pitchFamily="49" charset="0"/>
+                </a:rPr>
+                <a:t>…</a:t>
+              </a:r>
+              <a:endParaRPr lang="en-GB" dirty="0">
+                <a:latin typeface="Courier New" panose="02070309020205020404" pitchFamily="49" charset="0"/>
+                <a:cs typeface="Courier New" panose="02070309020205020404" pitchFamily="49" charset="0"/>
+              </a:endParaRPr>
+            </a:p>
+          </p:txBody>
+        </p:sp>
+        <p:sp>
+          <p:nvSpPr>
+            <p:cNvPr id="6" name="Curved Left Arrow 5"/>
+            <p:cNvSpPr/>
+            <p:nvPr/>
+          </p:nvSpPr>
+          <p:spPr>
+            <a:xfrm>
+              <a:off x="8018040" y="3645024"/>
+              <a:ext cx="658416" cy="1512168"/>
+            </a:xfrm>
+            <a:prstGeom prst="curvedLeftArrow">
+              <a:avLst/>
+            </a:prstGeom>
+            <a:solidFill>
+              <a:srgbClr val="C00000"/>
+            </a:solidFill>
+            <a:ln>
+              <a:solidFill>
+                <a:srgbClr val="C00000"/>
+              </a:solidFill>
+            </a:ln>
+          </p:spPr>
+          <p:style>
+            <a:lnRef idx="2">
+              <a:schemeClr val="accent1">
+                <a:shade val="50000"/>
+              </a:schemeClr>
+            </a:lnRef>
+            <a:fillRef idx="1">
+              <a:schemeClr val="accent1"/>
+            </a:fillRef>
+            <a:effectRef idx="0">
+              <a:schemeClr val="accent1"/>
+            </a:effectRef>
+            <a:fontRef idx="minor">
+              <a:schemeClr val="lt1"/>
+            </a:fontRef>
+          </p:style>
+          <p:txBody>
+            <a:bodyPr rtlCol="0" anchor="ctr"/>
+            <a:lstStyle/>
+            <a:p>
+              <a:pPr algn="ctr"/>
+              <a:endParaRPr lang="en-US">
+                <a:solidFill>
+                  <a:schemeClr val="tx1"/>
+                </a:solidFill>
+              </a:endParaRPr>
+            </a:p>
+          </p:txBody>
+        </p:sp>
+      </p:grpSp>
+      <p:sp>
+        <p:nvSpPr>
+          <p:cNvPr id="8" name="TextBox 7"/>
+          <p:cNvSpPr txBox="1"/>
+          <p:nvPr/>
+        </p:nvSpPr>
+        <p:spPr>
+          <a:xfrm>
+            <a:off x="3851920" y="6048288"/>
+            <a:ext cx="3979423" cy="523220"/>
+          </a:xfrm>
+          <a:prstGeom prst="rect">
+            <a:avLst/>
+          </a:prstGeom>
+          <a:solidFill>
+            <a:schemeClr val="bg1"/>
+          </a:solidFill>
+          <a:ln>
+            <a:solidFill>
+              <a:schemeClr val="tx1"/>
+            </a:solidFill>
+          </a:ln>
+        </p:spPr>
+        <p:txBody>
+          <a:bodyPr wrap="none" rtlCol="0">
+            <a:spAutoFit/>
+          </a:bodyPr>
+          <a:lstStyle/>
+          <a:p>
+            <a:r>
+              <a:rPr lang="en-US" sz="2800" dirty="0" smtClean="0"/>
+              <a:t>Now merge or cherry-pick</a:t>
+            </a:r>
+            <a:endParaRPr lang="en-US" sz="2800" dirty="0"/>
+          </a:p>
+        </p:txBody>
+      </p:sp>
+    </p:spTree>
+    <p:extLst>
+      <p:ext uri="{BB962C8B-B14F-4D97-AF65-F5344CB8AC3E}">
+        <p14:creationId xmlns:p14="http://schemas.microsoft.com/office/powerpoint/2010/main" val="1739016906"/>
+      </p:ext>
+    </p:extLst>
+  </p:cSld>
+  <p:clrMapOvr>
+    <a:masterClrMapping/>
+  </p:clrMapOvr>
+  <p:timing>
+    <p:tnLst>
+      <p:par>
+        <p:cTn id="1" dur="indefinite" restart="never" nodeType="tmRoot">
+          <p:childTnLst>
+            <p:seq concurrent="1" nextAc="seek">
+              <p:cTn id="2" dur="indefinite" nodeType="mainSeq">
+                <p:childTnLst>
+                  <p:par>
+                    <p:cTn id="3" fill="hold">
+                      <p:stCondLst>
+                        <p:cond delay="indefinite"/>
+                      </p:stCondLst>
+                      <p:childTnLst>
+                        <p:par>
+                          <p:cTn id="4" fill="hold">
+                            <p:stCondLst>
+                              <p:cond delay="0"/>
+                            </p:stCondLst>
+                            <p:childTnLst>
+                              <p:par>
+                                <p:cTn id="5" presetID="1" presetClass="entr" presetSubtype="0" fill="hold" nodeType="clickEffect">
+                                  <p:stCondLst>
+                                    <p:cond delay="0"/>
+                                  </p:stCondLst>
+                                  <p:childTnLst>
+                                    <p:set>
+                                      <p:cBhvr>
+                                        <p:cTn id="6" dur="1" fill="hold">
+                                          <p:stCondLst>
+                                            <p:cond delay="0"/>
+                                          </p:stCondLst>
+                                        </p:cTn>
+                                        <p:tgtEl>
+                                          <p:spTgt spid="7"/>
+                                        </p:tgtEl>
+                                        <p:attrNameLst>
+                                          <p:attrName>style.visibility</p:attrName>
+                                        </p:attrNameLst>
+                                      </p:cBhvr>
+                                      <p:to>
+                                        <p:strVal val="visible"/>
+                                      </p:to>
+                                    </p:set>
+                                  </p:childTnLst>
+                                </p:cTn>
+                              </p:par>
+                            </p:childTnLst>
+                          </p:cTn>
+                        </p:par>
+                      </p:childTnLst>
+                    </p:cTn>
+                  </p:par>
+                  <p:par>
+                    <p:cTn id="7" fill="hold">
+                      <p:stCondLst>
+                        <p:cond delay="indefinite"/>
+                      </p:stCondLst>
+                      <p:childTnLst>
+                        <p:par>
+                          <p:cTn id="8" fill="hold">
+                            <p:stCondLst>
+                              <p:cond delay="0"/>
+                            </p:stCondLst>
+                            <p:childTnLst>
+                              <p:par>
+                                <p:cTn id="9" presetID="1" presetClass="entr" presetSubtype="0" fill="hold" grpId="0" nodeType="clickEffect">
+                                  <p:stCondLst>
+                                    <p:cond delay="0"/>
+                                  </p:stCondLst>
+                                  <p:childTnLst>
+                                    <p:set>
+                                      <p:cBhvr>
+                                        <p:cTn id="10" dur="1" fill="hold">
+                                          <p:stCondLst>
+                                            <p:cond delay="0"/>
+                                          </p:stCondLst>
+                                        </p:cTn>
+                                        <p:tgtEl>
+                                          <p:spTgt spid="8"/>
+                                        </p:tgtEl>
+                                        <p:attrNameLst>
+                                          <p:attrName>style.visibility</p:attrName>
+                                        </p:attrNameLst>
+                                      </p:cBhvr>
+                                      <p:to>
+                                        <p:strVal val="visible"/>
+                                      </p:to>
+                                    </p:set>
+                                  </p:childTnLst>
+                                </p:cTn>
+                              </p:par>
+                            </p:childTnLst>
+                          </p:cTn>
+                        </p:par>
+                      </p:childTnLst>
+                    </p:cTn>
+                  </p:par>
+                </p:childTnLst>
+              </p:cTn>
+              <p:prevCondLst>
+                <p:cond evt="onPrev" delay="0">
+                  <p:tgtEl>
+                    <p:sldTgt/>
+                  </p:tgtEl>
+                </p:cond>
+              </p:prevCondLst>
+              <p:nextCondLst>
+                <p:cond evt="onNext" delay="0">
+                  <p:tgtEl>
+                    <p:sldTgt/>
+                  </p:tgtEl>
+                </p:cond>
+              </p:nextCondLst>
+            </p:seq>
+          </p:childTnLst>
+        </p:cTn>
+      </p:par>
+    </p:tnLst>
+    <p:bldLst>
+      <p:bldP spid="8" grpId="0" animBg="1"/>
     </p:bldLst>
   </p:timing>
 </p:sld>

</xml_diff>

<commit_message>
Add more on history search
* Add git blame
* Add time and author options for log
</commit_message>
<xml_diff>
--- a/LinuxTools/VersionControl/version_control_git.pptx
+++ b/LinuxTools/VersionControl/version_control_git.pptx
@@ -5,7 +5,7 @@
     <p:sldMasterId id="2147483648" r:id="rId1"/>
   </p:sldMasterIdLst>
   <p:notesMasterIdLst>
-    <p:notesMasterId r:id="rId73"/>
+    <p:notesMasterId r:id="rId74"/>
   </p:notesMasterIdLst>
   <p:sldIdLst>
     <p:sldId id="256" r:id="rId2"/>
@@ -68,17 +68,18 @@
     <p:sldId id="329" r:id="rId59"/>
     <p:sldId id="305" r:id="rId60"/>
     <p:sldId id="312" r:id="rId61"/>
-    <p:sldId id="307" r:id="rId62"/>
+    <p:sldId id="330" r:id="rId62"/>
     <p:sldId id="309" r:id="rId63"/>
-    <p:sldId id="314" r:id="rId64"/>
-    <p:sldId id="315" r:id="rId65"/>
-    <p:sldId id="320" r:id="rId66"/>
-    <p:sldId id="316" r:id="rId67"/>
-    <p:sldId id="300" r:id="rId68"/>
-    <p:sldId id="301" r:id="rId69"/>
-    <p:sldId id="299" r:id="rId70"/>
-    <p:sldId id="310" r:id="rId71"/>
-    <p:sldId id="313" r:id="rId72"/>
+    <p:sldId id="307" r:id="rId64"/>
+    <p:sldId id="314" r:id="rId65"/>
+    <p:sldId id="315" r:id="rId66"/>
+    <p:sldId id="320" r:id="rId67"/>
+    <p:sldId id="316" r:id="rId68"/>
+    <p:sldId id="300" r:id="rId69"/>
+    <p:sldId id="301" r:id="rId70"/>
+    <p:sldId id="299" r:id="rId71"/>
+    <p:sldId id="310" r:id="rId72"/>
+    <p:sldId id="313" r:id="rId73"/>
   </p:sldIdLst>
   <p:sldSz cx="9144000" cy="6858000" type="screen4x3"/>
   <p:notesSz cx="6858000" cy="9144000"/>
@@ -254,8 +255,9 @@
             <p14:sldId id="329"/>
             <p14:sldId id="305"/>
             <p14:sldId id="312"/>
+            <p14:sldId id="330"/>
+            <p14:sldId id="309"/>
             <p14:sldId id="307"/>
-            <p14:sldId id="309"/>
             <p14:sldId id="314"/>
             <p14:sldId id="315"/>
             <p14:sldId id="320"/>
@@ -805,7 +807,7 @@
           <a:p>
             <a:fld id="{1A571F42-F258-455F-A3F1-D2E86FDFEB4C}" type="slidenum">
               <a:rPr lang="nl-BE" smtClean="0"/>
-              <a:t>70</a:t>
+              <a:t>71</a:t>
             </a:fld>
             <a:endParaRPr lang="nl-BE"/>
           </a:p>
@@ -43902,10 +43904,10 @@
           <a:lstStyle/>
           <a:p>
             <a:r>
-              <a:rPr lang="en-US" dirty="0" smtClean="0"/>
-              <a:t>And even more…</a:t>
-            </a:r>
-            <a:endParaRPr lang="nl-BE" dirty="0"/>
+              <a:rPr lang="en-BE" dirty="0" smtClean="0"/>
+              <a:t>Examine history</a:t>
+            </a:r>
+            <a:endParaRPr lang="en-US" dirty="0"/>
           </a:p>
         </p:txBody>
       </p:sp>
@@ -43922,62 +43924,131 @@
         <p:spPr/>
         <p:txBody>
           <a:bodyPr>
-            <a:normAutofit lnSpcReduction="10000"/>
+            <a:normAutofit fontScale="92500" lnSpcReduction="10000"/>
           </a:bodyPr>
           <a:lstStyle/>
           <a:p>
             <a:r>
+              <a:rPr lang="en-BE" dirty="0" smtClean="0"/>
+              <a:t>View the commit for each line of a file</a:t>
+            </a:r>
+          </a:p>
+          <a:p>
+            <a:endParaRPr lang="en-BE" dirty="0"/>
+          </a:p>
+          <a:p>
+            <a:pPr lvl="1"/>
+            <a:r>
+              <a:rPr lang="en-BE" dirty="0" smtClean="0"/>
+              <a:t>displays who did the commit </a:t>
+            </a:r>
+            <a:r>
+              <a:rPr lang="en-BE" dirty="0" smtClean="0">
+                <a:sym typeface="Symbol" panose="05050102010706020507" pitchFamily="18" charset="2"/>
+              </a:rPr>
+              <a:t></a:t>
+            </a:r>
+            <a:r>
+              <a:rPr lang="en-BE" dirty="0" smtClean="0"/>
+              <a:t> blame</a:t>
+            </a:r>
+          </a:p>
+          <a:p>
+            <a:r>
               <a:rPr lang="en-US" dirty="0" smtClean="0"/>
-              <a:t>Searching for revision that introduced line of code</a:t>
-            </a:r>
-          </a:p>
-          <a:p>
-            <a:endParaRPr lang="en-US" dirty="0" smtClean="0"/>
-          </a:p>
-          <a:p>
+              <a:t>Search </a:t>
+            </a:r>
+            <a:r>
+              <a:rPr lang="en-US" dirty="0"/>
+              <a:t>for revision that introduced </a:t>
+            </a:r>
+            <a:r>
+              <a:rPr lang="en-BE" dirty="0" smtClean="0"/>
+              <a:t>a </a:t>
+            </a:r>
             <a:r>
               <a:rPr lang="en-US" dirty="0" smtClean="0"/>
-              <a:t>Searching through history, methodically</a:t>
-            </a:r>
-          </a:p>
-          <a:p>
-            <a:endParaRPr lang="en-US" dirty="0"/>
-          </a:p>
-          <a:p>
-            <a:r>
-              <a:rPr lang="en-US" dirty="0" smtClean="0"/>
-              <a:t>Micro-managing commits/merges</a:t>
-            </a:r>
-          </a:p>
-          <a:p>
-            <a:endParaRPr lang="en-US" dirty="0"/>
-          </a:p>
-          <a:p>
-            <a:r>
-              <a:rPr lang="en-US" dirty="0" smtClean="0"/>
-              <a:t>Adding description to branch</a:t>
-            </a:r>
-          </a:p>
-          <a:p>
-            <a:endParaRPr lang="en-US" dirty="0"/>
-          </a:p>
-          <a:p>
-            <a:endParaRPr lang="en-US" dirty="0" smtClean="0"/>
-          </a:p>
-          <a:p>
-            <a:endParaRPr lang="en-US" dirty="0" smtClean="0"/>
+              <a:t>line</a:t>
+            </a:r>
+            <a:endParaRPr lang="en-BE" dirty="0" smtClean="0"/>
+          </a:p>
+          <a:p>
+            <a:endParaRPr lang="en-BE" dirty="0"/>
+          </a:p>
+          <a:p>
+            <a:r>
+              <a:rPr lang="en-BE" dirty="0" smtClean="0"/>
+              <a:t>Display log messages</a:t>
+            </a:r>
+          </a:p>
+          <a:p>
+            <a:pPr lvl="1"/>
+            <a:r>
+              <a:rPr lang="en-BE" dirty="0" smtClean="0">
+                <a:latin typeface="Courier New" panose="02070309020205020404" pitchFamily="49" charset="0"/>
+                <a:cs typeface="Courier New" panose="02070309020205020404" pitchFamily="49" charset="0"/>
+              </a:rPr>
+              <a:t>--after 2019-08-15</a:t>
+            </a:r>
+          </a:p>
+          <a:p>
+            <a:pPr lvl="1"/>
+            <a:r>
+              <a:rPr lang="en-BE" dirty="0" smtClean="0">
+                <a:latin typeface="Courier New" panose="02070309020205020404" pitchFamily="49" charset="0"/>
+                <a:cs typeface="Courier New" panose="02070309020205020404" pitchFamily="49" charset="0"/>
+              </a:rPr>
+              <a:t>--before '2019-08-15 13:55:00'</a:t>
+            </a:r>
+          </a:p>
+          <a:p>
+            <a:pPr lvl="1"/>
+            <a:r>
+              <a:rPr lang="en-BE" dirty="0" smtClean="0">
+                <a:latin typeface="Courier New" panose="02070309020205020404" pitchFamily="49" charset="0"/>
+                <a:cs typeface="Courier New" panose="02070309020205020404" pitchFamily="49" charset="0"/>
+              </a:rPr>
+              <a:t>--author gjbex</a:t>
+            </a:r>
+            <a:endParaRPr lang="en-US" dirty="0">
+              <a:latin typeface="Courier New" panose="02070309020205020404" pitchFamily="49" charset="0"/>
+              <a:cs typeface="Courier New" panose="02070309020205020404" pitchFamily="49" charset="0"/>
+            </a:endParaRPr>
           </a:p>
         </p:txBody>
       </p:sp>
       <p:sp>
         <p:nvSpPr>
-          <p:cNvPr id="4" name="TextBox 3"/>
+          <p:cNvPr id="4" name="Slide Number Placeholder 3"/>
+          <p:cNvSpPr>
+            <a:spLocks noGrp="1"/>
+          </p:cNvSpPr>
+          <p:nvPr>
+            <p:ph type="sldNum" sz="quarter" idx="12"/>
+          </p:nvPr>
+        </p:nvSpPr>
+        <p:spPr/>
+        <p:txBody>
+          <a:bodyPr/>
+          <a:lstStyle/>
+          <a:p>
+            <a:fld id="{BB52A05A-A776-4391-ACD7-D6BC34D3145C}" type="slidenum">
+              <a:rPr lang="nl-BE" smtClean="0"/>
+              <a:t>61</a:t>
+            </a:fld>
+            <a:endParaRPr lang="nl-BE"/>
+          </a:p>
+        </p:txBody>
+      </p:sp>
+      <p:sp>
+        <p:nvSpPr>
+          <p:cNvPr id="5" name="TextBox 4"/>
           <p:cNvSpPr txBox="1"/>
           <p:nvPr/>
         </p:nvSpPr>
         <p:spPr>
           <a:xfrm>
-            <a:off x="683568" y="3645024"/>
+            <a:off x="1259632" y="2123564"/>
             <a:ext cx="4032448" cy="369332"/>
           </a:xfrm>
           <a:prstGeom prst="rect">
@@ -44004,19 +44075,16 @@
               <a:t>$ git </a:t>
             </a:r>
             <a:r>
-              <a:rPr lang="nl-BE" dirty="0" err="1" smtClean="0">
+              <a:rPr lang="en-BE" dirty="0" smtClean="0">
                 <a:latin typeface="Courier New" pitchFamily="49" charset="0"/>
                 <a:cs typeface="Courier New" pitchFamily="49" charset="0"/>
               </a:rPr>
-              <a:t>bisect</a:t>
-            </a:r>
-            <a:r>
-              <a:rPr lang="nl-BE" dirty="0" smtClean="0">
-                <a:latin typeface="Courier New" pitchFamily="49" charset="0"/>
-                <a:cs typeface="Courier New" pitchFamily="49" charset="0"/>
-              </a:rPr>
-              <a:t>  …</a:t>
-            </a:r>
+              <a:t>blame eq.c</a:t>
+            </a:r>
+            <a:endParaRPr lang="nl-BE" dirty="0" smtClean="0">
+              <a:latin typeface="Courier New" pitchFamily="49" charset="0"/>
+              <a:cs typeface="Courier New" pitchFamily="49" charset="0"/>
+            </a:endParaRPr>
           </a:p>
         </p:txBody>
       </p:sp>
@@ -44028,314 +44096,7 @@
         </p:nvSpPr>
         <p:spPr>
           <a:xfrm>
-            <a:off x="687597" y="4725144"/>
-            <a:ext cx="3600400" cy="369332"/>
-          </a:xfrm>
-          <a:prstGeom prst="rect">
-            <a:avLst/>
-          </a:prstGeom>
-          <a:noFill/>
-          <a:ln>
-            <a:solidFill>
-              <a:schemeClr val="tx1"/>
-            </a:solidFill>
-          </a:ln>
-        </p:spPr>
-        <p:txBody>
-          <a:bodyPr wrap="square" rtlCol="0">
-            <a:spAutoFit/>
-          </a:bodyPr>
-          <a:lstStyle/>
-          <a:p>
-            <a:r>
-              <a:rPr lang="nl-BE" dirty="0" smtClean="0">
-                <a:latin typeface="Courier New" pitchFamily="49" charset="0"/>
-                <a:cs typeface="Courier New" pitchFamily="49" charset="0"/>
-              </a:rPr>
-              <a:t>$ git </a:t>
-            </a:r>
-            <a:r>
-              <a:rPr lang="nl-BE" dirty="0" err="1" smtClean="0">
-                <a:latin typeface="Courier New" pitchFamily="49" charset="0"/>
-                <a:cs typeface="Courier New" pitchFamily="49" charset="0"/>
-              </a:rPr>
-              <a:t>add</a:t>
-            </a:r>
-            <a:r>
-              <a:rPr lang="nl-BE" dirty="0" smtClean="0">
-                <a:latin typeface="Courier New" pitchFamily="49" charset="0"/>
-                <a:cs typeface="Courier New" pitchFamily="49" charset="0"/>
-              </a:rPr>
-              <a:t>  -p  …</a:t>
-            </a:r>
-          </a:p>
-        </p:txBody>
-      </p:sp>
-      <p:sp>
-        <p:nvSpPr>
-          <p:cNvPr id="7" name="TextBox 6"/>
-          <p:cNvSpPr txBox="1"/>
-          <p:nvPr/>
-        </p:nvSpPr>
-        <p:spPr>
-          <a:xfrm>
-            <a:off x="683568" y="5805264"/>
-            <a:ext cx="6552728" cy="369332"/>
-          </a:xfrm>
-          <a:prstGeom prst="rect">
-            <a:avLst/>
-          </a:prstGeom>
-          <a:noFill/>
-          <a:ln>
-            <a:solidFill>
-              <a:schemeClr val="tx1"/>
-            </a:solidFill>
-          </a:ln>
-        </p:spPr>
-        <p:txBody>
-          <a:bodyPr wrap="square" rtlCol="0">
-            <a:spAutoFit/>
-          </a:bodyPr>
-          <a:lstStyle/>
-          <a:p>
-            <a:r>
-              <a:rPr lang="nl-BE" dirty="0" smtClean="0">
-                <a:latin typeface="Courier New" pitchFamily="49" charset="0"/>
-                <a:cs typeface="Courier New" pitchFamily="49" charset="0"/>
-              </a:rPr>
-              <a:t>$ git </a:t>
-            </a:r>
-            <a:r>
-              <a:rPr lang="nl-BE" dirty="0" err="1" smtClean="0">
-                <a:latin typeface="Courier New" pitchFamily="49" charset="0"/>
-                <a:cs typeface="Courier New" pitchFamily="49" charset="0"/>
-              </a:rPr>
-              <a:t>branch</a:t>
-            </a:r>
-            <a:r>
-              <a:rPr lang="nl-BE" dirty="0" smtClean="0">
-                <a:latin typeface="Courier New" pitchFamily="49" charset="0"/>
-                <a:cs typeface="Courier New" pitchFamily="49" charset="0"/>
-              </a:rPr>
-              <a:t>  --</a:t>
-            </a:r>
-            <a:r>
-              <a:rPr lang="nl-BE" dirty="0" err="1" smtClean="0">
-                <a:latin typeface="Courier New" pitchFamily="49" charset="0"/>
-                <a:cs typeface="Courier New" pitchFamily="49" charset="0"/>
-              </a:rPr>
-              <a:t>edit-description</a:t>
-            </a:r>
-            <a:endParaRPr lang="nl-BE" dirty="0" smtClean="0">
-              <a:latin typeface="Courier New" pitchFamily="49" charset="0"/>
-              <a:cs typeface="Courier New" pitchFamily="49" charset="0"/>
-            </a:endParaRPr>
-          </a:p>
-        </p:txBody>
-      </p:sp>
-      <p:sp>
-        <p:nvSpPr>
-          <p:cNvPr id="8" name="TextBox 7"/>
-          <p:cNvSpPr txBox="1"/>
-          <p:nvPr/>
-        </p:nvSpPr>
-        <p:spPr>
-          <a:xfrm>
-            <a:off x="683568" y="6364076"/>
-            <a:ext cx="6552728" cy="369332"/>
-          </a:xfrm>
-          <a:prstGeom prst="rect">
-            <a:avLst/>
-          </a:prstGeom>
-          <a:noFill/>
-          <a:ln>
-            <a:solidFill>
-              <a:schemeClr val="tx1"/>
-            </a:solidFill>
-          </a:ln>
-        </p:spPr>
-        <p:txBody>
-          <a:bodyPr wrap="square" rtlCol="0">
-            <a:spAutoFit/>
-          </a:bodyPr>
-          <a:lstStyle/>
-          <a:p>
-            <a:r>
-              <a:rPr lang="nl-BE" dirty="0" smtClean="0">
-                <a:latin typeface="Courier New" pitchFamily="49" charset="0"/>
-                <a:cs typeface="Courier New" pitchFamily="49" charset="0"/>
-              </a:rPr>
-              <a:t>$ git </a:t>
-            </a:r>
-            <a:r>
-              <a:rPr lang="nl-BE" dirty="0" err="1" smtClean="0">
-                <a:latin typeface="Courier New" pitchFamily="49" charset="0"/>
-                <a:cs typeface="Courier New" pitchFamily="49" charset="0"/>
-              </a:rPr>
-              <a:t>config</a:t>
-            </a:r>
-            <a:r>
-              <a:rPr lang="nl-BE" dirty="0" smtClean="0">
-                <a:latin typeface="Courier New" pitchFamily="49" charset="0"/>
-                <a:cs typeface="Courier New" pitchFamily="49" charset="0"/>
-              </a:rPr>
-              <a:t>  </a:t>
-            </a:r>
-            <a:r>
-              <a:rPr lang="nl-BE" dirty="0" err="1" smtClean="0">
-                <a:latin typeface="Courier New" pitchFamily="49" charset="0"/>
-                <a:cs typeface="Courier New" pitchFamily="49" charset="0"/>
-              </a:rPr>
-              <a:t>branch</a:t>
-            </a:r>
-            <a:r>
-              <a:rPr lang="nl-BE" dirty="0" smtClean="0">
-                <a:latin typeface="Courier New" pitchFamily="49" charset="0"/>
-                <a:cs typeface="Courier New" pitchFamily="49" charset="0"/>
-              </a:rPr>
-              <a:t>.&lt;</a:t>
-            </a:r>
-            <a:r>
-              <a:rPr lang="nl-BE" dirty="0" err="1" smtClean="0">
-                <a:latin typeface="Courier New" pitchFamily="49" charset="0"/>
-                <a:cs typeface="Courier New" pitchFamily="49" charset="0"/>
-              </a:rPr>
-              <a:t>branch-name.description</a:t>
-            </a:r>
-            <a:endParaRPr lang="nl-BE" dirty="0" smtClean="0">
-              <a:latin typeface="Courier New" pitchFamily="49" charset="0"/>
-              <a:cs typeface="Courier New" pitchFamily="49" charset="0"/>
-            </a:endParaRPr>
-          </a:p>
-        </p:txBody>
-      </p:sp>
-      <p:sp>
-        <p:nvSpPr>
-          <p:cNvPr id="9" name="TextBox 8"/>
-          <p:cNvSpPr txBox="1"/>
-          <p:nvPr/>
-        </p:nvSpPr>
-        <p:spPr>
-          <a:xfrm>
-            <a:off x="6962867" y="6026664"/>
-            <a:ext cx="1723933" cy="369332"/>
-          </a:xfrm>
-          <a:prstGeom prst="rect">
-            <a:avLst/>
-          </a:prstGeom>
-          <a:solidFill>
-            <a:schemeClr val="bg1"/>
-          </a:solidFill>
-          <a:ln>
-            <a:solidFill>
-              <a:schemeClr val="tx1"/>
-            </a:solidFill>
-          </a:ln>
-        </p:spPr>
-        <p:txBody>
-          <a:bodyPr wrap="none" rtlCol="0">
-            <a:spAutoFit/>
-          </a:bodyPr>
-          <a:lstStyle/>
-          <a:p>
-            <a:r>
-              <a:rPr lang="en-US" dirty="0" smtClean="0"/>
-              <a:t>Note: only local!</a:t>
-            </a:r>
-            <a:endParaRPr lang="nl-BE" dirty="0"/>
-          </a:p>
-        </p:txBody>
-      </p:sp>
-      <p:sp>
-        <p:nvSpPr>
-          <p:cNvPr id="10" name="TextBox 9"/>
-          <p:cNvSpPr txBox="1"/>
-          <p:nvPr/>
-        </p:nvSpPr>
-        <p:spPr>
-          <a:xfrm>
-            <a:off x="4360005" y="4725144"/>
-            <a:ext cx="4557192" cy="369332"/>
-          </a:xfrm>
-          <a:prstGeom prst="rect">
-            <a:avLst/>
-          </a:prstGeom>
-          <a:noFill/>
-          <a:ln>
-            <a:solidFill>
-              <a:schemeClr val="tx1"/>
-            </a:solidFill>
-          </a:ln>
-        </p:spPr>
-        <p:txBody>
-          <a:bodyPr wrap="square" rtlCol="0">
-            <a:spAutoFit/>
-          </a:bodyPr>
-          <a:lstStyle/>
-          <a:p>
-            <a:r>
-              <a:rPr lang="nl-BE" dirty="0" smtClean="0">
-                <a:latin typeface="Courier New" pitchFamily="49" charset="0"/>
-                <a:cs typeface="Courier New" pitchFamily="49" charset="0"/>
-              </a:rPr>
-              <a:t>$ git </a:t>
-            </a:r>
-            <a:r>
-              <a:rPr lang="nl-BE" dirty="0" err="1" smtClean="0">
-                <a:latin typeface="Courier New" pitchFamily="49" charset="0"/>
-                <a:cs typeface="Courier New" pitchFamily="49" charset="0"/>
-              </a:rPr>
-              <a:t>cherry-pick</a:t>
-            </a:r>
-            <a:r>
-              <a:rPr lang="nl-BE" dirty="0">
-                <a:latin typeface="Courier New" pitchFamily="49" charset="0"/>
-                <a:cs typeface="Courier New" pitchFamily="49" charset="0"/>
-              </a:rPr>
-              <a:t> </a:t>
-            </a:r>
-            <a:r>
-              <a:rPr lang="nl-BE" dirty="0" smtClean="0">
-                <a:latin typeface="Courier New" pitchFamily="49" charset="0"/>
-                <a:cs typeface="Courier New" pitchFamily="49" charset="0"/>
-              </a:rPr>
-              <a:t> 0ba188919fec</a:t>
-            </a:r>
-          </a:p>
-        </p:txBody>
-      </p:sp>
-      <p:sp>
-        <p:nvSpPr>
-          <p:cNvPr id="11" name="Slide Number Placeholder 10"/>
-          <p:cNvSpPr>
-            <a:spLocks noGrp="1"/>
-          </p:cNvSpPr>
-          <p:nvPr>
-            <p:ph type="sldNum" sz="quarter" idx="12"/>
-          </p:nvPr>
-        </p:nvSpPr>
-        <p:spPr/>
-        <p:txBody>
-          <a:bodyPr/>
-          <a:lstStyle/>
-          <a:p>
-            <a:fld id="{BB52A05A-A776-4391-ACD7-D6BC34D3145C}" type="slidenum">
-              <a:rPr lang="nl-BE" smtClean="0"/>
-              <a:t>61</a:t>
-            </a:fld>
-            <a:endParaRPr lang="nl-BE"/>
-          </a:p>
-        </p:txBody>
-      </p:sp>
-      <p:sp>
-        <p:nvSpPr>
-          <p:cNvPr id="12" name="TextBox 11"/>
-          <p:cNvSpPr txBox="1"/>
-          <p:nvPr/>
-        </p:nvSpPr>
-        <p:spPr>
-          <a:xfrm>
-            <a:off x="683568" y="2616613"/>
+            <a:off x="1259632" y="3563724"/>
             <a:ext cx="4032448" cy="369332"/>
           </a:xfrm>
           <a:prstGeom prst="rect">
@@ -44364,10 +44125,45 @@
           </a:p>
         </p:txBody>
       </p:sp>
+      <p:sp>
+        <p:nvSpPr>
+          <p:cNvPr id="7" name="TextBox 6"/>
+          <p:cNvSpPr txBox="1"/>
+          <p:nvPr/>
+        </p:nvSpPr>
+        <p:spPr>
+          <a:xfrm>
+            <a:off x="5266973" y="5554643"/>
+            <a:ext cx="2355773" cy="461665"/>
+          </a:xfrm>
+          <a:prstGeom prst="rect">
+            <a:avLst/>
+          </a:prstGeom>
+          <a:noFill/>
+          <a:ln>
+            <a:solidFill>
+              <a:schemeClr val="tx1"/>
+            </a:solidFill>
+          </a:ln>
+        </p:spPr>
+        <p:txBody>
+          <a:bodyPr wrap="none" rtlCol="0">
+            <a:spAutoFit/>
+          </a:bodyPr>
+          <a:lstStyle/>
+          <a:p>
+            <a:r>
+              <a:rPr lang="en-BE" sz="2400" dirty="0" smtClean="0"/>
+              <a:t>Can be combined</a:t>
+            </a:r>
+            <a:endParaRPr lang="en-US" sz="2400" dirty="0"/>
+          </a:p>
+        </p:txBody>
+      </p:sp>
     </p:spTree>
     <p:extLst>
       <p:ext uri="{BB962C8B-B14F-4D97-AF65-F5344CB8AC3E}">
-        <p14:creationId xmlns:p14="http://schemas.microsoft.com/office/powerpoint/2010/main" val="3877190761"/>
+        <p14:creationId xmlns:p14="http://schemas.microsoft.com/office/powerpoint/2010/main" val="1051776501"/>
       </p:ext>
     </p:extLst>
   </p:cSld>
@@ -44411,11 +44207,7 @@
                                           </p:stCondLst>
                                         </p:cTn>
                                         <p:tgtEl>
-                                          <p:spTgt spid="3">
-                                            <p:txEl>
-                                              <p:pRg st="0" end="0"/>
-                                            </p:txEl>
-                                          </p:spTgt>
+                                          <p:spTgt spid="5"/>
                                         </p:tgtEl>
                                         <p:attrNameLst>
                                           <p:attrName>style.visibility</p:attrName>
@@ -44442,334 +44234,7 @@
                                           </p:stCondLst>
                                         </p:cTn>
                                         <p:tgtEl>
-                                          <p:spTgt spid="12"/>
-                                        </p:tgtEl>
-                                        <p:attrNameLst>
-                                          <p:attrName>style.visibility</p:attrName>
-                                        </p:attrNameLst>
-                                      </p:cBhvr>
-                                      <p:to>
-                                        <p:strVal val="visible"/>
-                                      </p:to>
-                                    </p:set>
-                                  </p:childTnLst>
-                                </p:cTn>
-                              </p:par>
-                            </p:childTnLst>
-                          </p:cTn>
-                        </p:par>
-                      </p:childTnLst>
-                    </p:cTn>
-                  </p:par>
-                  <p:par>
-                    <p:cTn id="9" fill="hold">
-                      <p:stCondLst>
-                        <p:cond delay="indefinite"/>
-                      </p:stCondLst>
-                      <p:childTnLst>
-                        <p:par>
-                          <p:cTn id="10" fill="hold">
-                            <p:stCondLst>
-                              <p:cond delay="0"/>
-                            </p:stCondLst>
-                            <p:childTnLst>
-                              <p:par>
-                                <p:cTn id="11" presetID="1" presetClass="entr" presetSubtype="0" fill="hold" grpId="0" nodeType="clickEffect">
-                                  <p:stCondLst>
-                                    <p:cond delay="0"/>
-                                  </p:stCondLst>
-                                  <p:childTnLst>
-                                    <p:set>
-                                      <p:cBhvr>
-                                        <p:cTn id="12" dur="1" fill="hold">
-                                          <p:stCondLst>
-                                            <p:cond delay="0"/>
-                                          </p:stCondLst>
-                                        </p:cTn>
-                                        <p:tgtEl>
-                                          <p:spTgt spid="3">
-                                            <p:txEl>
-                                              <p:pRg st="2" end="2"/>
-                                            </p:txEl>
-                                          </p:spTgt>
-                                        </p:tgtEl>
-                                        <p:attrNameLst>
-                                          <p:attrName>style.visibility</p:attrName>
-                                        </p:attrNameLst>
-                                      </p:cBhvr>
-                                      <p:to>
-                                        <p:strVal val="visible"/>
-                                      </p:to>
-                                    </p:set>
-                                  </p:childTnLst>
-                                </p:cTn>
-                              </p:par>
-                              <p:par>
-                                <p:cTn id="13" presetID="1" presetClass="entr" presetSubtype="0" fill="hold" grpId="0" nodeType="withEffect">
-                                  <p:stCondLst>
-                                    <p:cond delay="0"/>
-                                  </p:stCondLst>
-                                  <p:childTnLst>
-                                    <p:set>
-                                      <p:cBhvr>
-                                        <p:cTn id="14" dur="1" fill="hold">
-                                          <p:stCondLst>
-                                            <p:cond delay="0"/>
-                                          </p:stCondLst>
-                                        </p:cTn>
-                                        <p:tgtEl>
-                                          <p:spTgt spid="4"/>
-                                        </p:tgtEl>
-                                        <p:attrNameLst>
-                                          <p:attrName>style.visibility</p:attrName>
-                                        </p:attrNameLst>
-                                      </p:cBhvr>
-                                      <p:to>
-                                        <p:strVal val="visible"/>
-                                      </p:to>
-                                    </p:set>
-                                  </p:childTnLst>
-                                </p:cTn>
-                              </p:par>
-                            </p:childTnLst>
-                          </p:cTn>
-                        </p:par>
-                      </p:childTnLst>
-                    </p:cTn>
-                  </p:par>
-                  <p:par>
-                    <p:cTn id="15" fill="hold">
-                      <p:stCondLst>
-                        <p:cond delay="indefinite"/>
-                      </p:stCondLst>
-                      <p:childTnLst>
-                        <p:par>
-                          <p:cTn id="16" fill="hold">
-                            <p:stCondLst>
-                              <p:cond delay="0"/>
-                            </p:stCondLst>
-                            <p:childTnLst>
-                              <p:par>
-                                <p:cTn id="17" presetID="1" presetClass="entr" presetSubtype="0" fill="hold" grpId="0" nodeType="clickEffect">
-                                  <p:stCondLst>
-                                    <p:cond delay="0"/>
-                                  </p:stCondLst>
-                                  <p:childTnLst>
-                                    <p:set>
-                                      <p:cBhvr>
-                                        <p:cTn id="18" dur="1" fill="hold">
-                                          <p:stCondLst>
-                                            <p:cond delay="0"/>
-                                          </p:stCondLst>
-                                        </p:cTn>
-                                        <p:tgtEl>
-                                          <p:spTgt spid="3">
-                                            <p:txEl>
-                                              <p:pRg st="4" end="4"/>
-                                            </p:txEl>
-                                          </p:spTgt>
-                                        </p:tgtEl>
-                                        <p:attrNameLst>
-                                          <p:attrName>style.visibility</p:attrName>
-                                        </p:attrNameLst>
-                                      </p:cBhvr>
-                                      <p:to>
-                                        <p:strVal val="visible"/>
-                                      </p:to>
-                                    </p:set>
-                                  </p:childTnLst>
-                                </p:cTn>
-                              </p:par>
-                              <p:par>
-                                <p:cTn id="19" presetID="1" presetClass="entr" presetSubtype="0" fill="hold" grpId="0" nodeType="withEffect">
-                                  <p:stCondLst>
-                                    <p:cond delay="0"/>
-                                  </p:stCondLst>
-                                  <p:childTnLst>
-                                    <p:set>
-                                      <p:cBhvr>
-                                        <p:cTn id="20" dur="1" fill="hold">
-                                          <p:stCondLst>
-                                            <p:cond delay="0"/>
-                                          </p:stCondLst>
-                                        </p:cTn>
-                                        <p:tgtEl>
                                           <p:spTgt spid="6"/>
-                                        </p:tgtEl>
-                                        <p:attrNameLst>
-                                          <p:attrName>style.visibility</p:attrName>
-                                        </p:attrNameLst>
-                                      </p:cBhvr>
-                                      <p:to>
-                                        <p:strVal val="visible"/>
-                                      </p:to>
-                                    </p:set>
-                                  </p:childTnLst>
-                                </p:cTn>
-                              </p:par>
-                              <p:par>
-                                <p:cTn id="21" presetID="1" presetClass="entr" presetSubtype="0" fill="hold" grpId="0" nodeType="withEffect">
-                                  <p:stCondLst>
-                                    <p:cond delay="0"/>
-                                  </p:stCondLst>
-                                  <p:childTnLst>
-                                    <p:set>
-                                      <p:cBhvr>
-                                        <p:cTn id="22" dur="1" fill="hold">
-                                          <p:stCondLst>
-                                            <p:cond delay="0"/>
-                                          </p:stCondLst>
-                                        </p:cTn>
-                                        <p:tgtEl>
-                                          <p:spTgt spid="10"/>
-                                        </p:tgtEl>
-                                        <p:attrNameLst>
-                                          <p:attrName>style.visibility</p:attrName>
-                                        </p:attrNameLst>
-                                      </p:cBhvr>
-                                      <p:to>
-                                        <p:strVal val="visible"/>
-                                      </p:to>
-                                    </p:set>
-                                  </p:childTnLst>
-                                </p:cTn>
-                              </p:par>
-                            </p:childTnLst>
-                          </p:cTn>
-                        </p:par>
-                      </p:childTnLst>
-                    </p:cTn>
-                  </p:par>
-                  <p:par>
-                    <p:cTn id="23" fill="hold">
-                      <p:stCondLst>
-                        <p:cond delay="indefinite"/>
-                      </p:stCondLst>
-                      <p:childTnLst>
-                        <p:par>
-                          <p:cTn id="24" fill="hold">
-                            <p:stCondLst>
-                              <p:cond delay="0"/>
-                            </p:stCondLst>
-                            <p:childTnLst>
-                              <p:par>
-                                <p:cTn id="25" presetID="1" presetClass="entr" presetSubtype="0" fill="hold" grpId="0" nodeType="clickEffect">
-                                  <p:stCondLst>
-                                    <p:cond delay="0"/>
-                                  </p:stCondLst>
-                                  <p:childTnLst>
-                                    <p:set>
-                                      <p:cBhvr>
-                                        <p:cTn id="26" dur="1" fill="hold">
-                                          <p:stCondLst>
-                                            <p:cond delay="0"/>
-                                          </p:stCondLst>
-                                        </p:cTn>
-                                        <p:tgtEl>
-                                          <p:spTgt spid="3">
-                                            <p:txEl>
-                                              <p:pRg st="6" end="6"/>
-                                            </p:txEl>
-                                          </p:spTgt>
-                                        </p:tgtEl>
-                                        <p:attrNameLst>
-                                          <p:attrName>style.visibility</p:attrName>
-                                        </p:attrNameLst>
-                                      </p:cBhvr>
-                                      <p:to>
-                                        <p:strVal val="visible"/>
-                                      </p:to>
-                                    </p:set>
-                                  </p:childTnLst>
-                                </p:cTn>
-                              </p:par>
-                              <p:par>
-                                <p:cTn id="27" presetID="1" presetClass="entr" presetSubtype="0" fill="hold" grpId="0" nodeType="withEffect">
-                                  <p:stCondLst>
-                                    <p:cond delay="0"/>
-                                  </p:stCondLst>
-                                  <p:childTnLst>
-                                    <p:set>
-                                      <p:cBhvr>
-                                        <p:cTn id="28" dur="1" fill="hold">
-                                          <p:stCondLst>
-                                            <p:cond delay="0"/>
-                                          </p:stCondLst>
-                                        </p:cTn>
-                                        <p:tgtEl>
-                                          <p:spTgt spid="7"/>
-                                        </p:tgtEl>
-                                        <p:attrNameLst>
-                                          <p:attrName>style.visibility</p:attrName>
-                                        </p:attrNameLst>
-                                      </p:cBhvr>
-                                      <p:to>
-                                        <p:strVal val="visible"/>
-                                      </p:to>
-                                    </p:set>
-                                  </p:childTnLst>
-                                </p:cTn>
-                              </p:par>
-                              <p:par>
-                                <p:cTn id="29" presetID="1" presetClass="entr" presetSubtype="0" fill="hold" grpId="0" nodeType="withEffect">
-                                  <p:stCondLst>
-                                    <p:cond delay="0"/>
-                                  </p:stCondLst>
-                                  <p:childTnLst>
-                                    <p:set>
-                                      <p:cBhvr>
-                                        <p:cTn id="30" dur="1" fill="hold">
-                                          <p:stCondLst>
-                                            <p:cond delay="0"/>
-                                          </p:stCondLst>
-                                        </p:cTn>
-                                        <p:tgtEl>
-                                          <p:spTgt spid="8"/>
-                                        </p:tgtEl>
-                                        <p:attrNameLst>
-                                          <p:attrName>style.visibility</p:attrName>
-                                        </p:attrNameLst>
-                                      </p:cBhvr>
-                                      <p:to>
-                                        <p:strVal val="visible"/>
-                                      </p:to>
-                                    </p:set>
-                                  </p:childTnLst>
-                                </p:cTn>
-                              </p:par>
-                            </p:childTnLst>
-                          </p:cTn>
-                        </p:par>
-                      </p:childTnLst>
-                    </p:cTn>
-                  </p:par>
-                  <p:par>
-                    <p:cTn id="31" fill="hold">
-                      <p:stCondLst>
-                        <p:cond delay="indefinite"/>
-                      </p:stCondLst>
-                      <p:childTnLst>
-                        <p:par>
-                          <p:cTn id="32" fill="hold">
-                            <p:stCondLst>
-                              <p:cond delay="0"/>
-                            </p:stCondLst>
-                            <p:childTnLst>
-                              <p:par>
-                                <p:cTn id="33" presetID="1" presetClass="entr" presetSubtype="0" fill="hold" grpId="0" nodeType="clickEffect">
-                                  <p:stCondLst>
-                                    <p:cond delay="0"/>
-                                  </p:stCondLst>
-                                  <p:childTnLst>
-                                    <p:set>
-                                      <p:cBhvr>
-                                        <p:cTn id="34" dur="1" fill="hold">
-                                          <p:stCondLst>
-                                            <p:cond delay="0"/>
-                                          </p:stCondLst>
-                                        </p:cTn>
-                                        <p:tgtEl>
-                                          <p:spTgt spid="9"/>
                                         </p:tgtEl>
                                         <p:attrNameLst>
                                           <p:attrName>style.visibility</p:attrName>
@@ -44810,14 +44275,8 @@
       </p:par>
     </p:tnLst>
     <p:bldLst>
-      <p:bldP spid="3" grpId="0" uiExpand="1" build="p"/>
-      <p:bldP spid="4" grpId="0" animBg="1"/>
+      <p:bldP spid="5" grpId="0" animBg="1"/>
       <p:bldP spid="6" grpId="0" animBg="1"/>
-      <p:bldP spid="7" grpId="0" animBg="1"/>
-      <p:bldP spid="8" grpId="0" animBg="1"/>
-      <p:bldP spid="9" grpId="0" animBg="1"/>
-      <p:bldP spid="10" grpId="0" animBg="1"/>
-      <p:bldP spid="12" grpId="0" animBg="1"/>
     </p:bldLst>
   </p:timing>
 </p:sld>
@@ -45416,7 +44875,7 @@
           <a:p>
             <a:r>
               <a:rPr lang="en-US" dirty="0" smtClean="0"/>
-              <a:t>Contributing</a:t>
+              <a:t>And even more…</a:t>
             </a:r>
             <a:endParaRPr lang="nl-BE" dirty="0"/>
           </a:p>
@@ -45424,26 +44883,412 @@
       </p:sp>
       <p:sp>
         <p:nvSpPr>
-          <p:cNvPr id="3" name="Text Placeholder 2"/>
+          <p:cNvPr id="3" name="Content Placeholder 2"/>
           <p:cNvSpPr>
             <a:spLocks noGrp="1"/>
           </p:cNvSpPr>
           <p:nvPr>
-            <p:ph type="body" idx="1"/>
+            <p:ph idx="1"/>
           </p:nvPr>
         </p:nvSpPr>
         <p:spPr/>
         <p:txBody>
-          <a:bodyPr/>
+          <a:bodyPr>
+            <a:normAutofit/>
+          </a:bodyPr>
           <a:lstStyle/>
           <a:p>
-            <a:endParaRPr lang="nl-BE"/>
+            <a:r>
+              <a:rPr lang="en-US" dirty="0" smtClean="0"/>
+              <a:t>Searching </a:t>
+            </a:r>
+            <a:r>
+              <a:rPr lang="en-US" dirty="0" smtClean="0"/>
+              <a:t>through history, methodically</a:t>
+            </a:r>
+          </a:p>
+          <a:p>
+            <a:endParaRPr lang="en-US" dirty="0"/>
+          </a:p>
+          <a:p>
+            <a:r>
+              <a:rPr lang="en-US" dirty="0" smtClean="0"/>
+              <a:t>Micro-managing </a:t>
+            </a:r>
+            <a:r>
+              <a:rPr lang="en-US" dirty="0" smtClean="0"/>
+              <a:t>commits</a:t>
+            </a:r>
+            <a:endParaRPr lang="en-US" dirty="0" smtClean="0"/>
+          </a:p>
+          <a:p>
+            <a:endParaRPr lang="en-US" dirty="0"/>
+          </a:p>
+          <a:p>
+            <a:r>
+              <a:rPr lang="en-BE" dirty="0" smtClean="0"/>
+              <a:t>Merge in single commit</a:t>
+            </a:r>
+          </a:p>
+          <a:p>
+            <a:endParaRPr lang="en-BE" dirty="0"/>
+          </a:p>
+          <a:p>
+            <a:r>
+              <a:rPr lang="en-US" dirty="0" smtClean="0"/>
+              <a:t>Adding description to branch</a:t>
+            </a:r>
+            <a:endParaRPr lang="en-US" dirty="0" smtClean="0"/>
+          </a:p>
+          <a:p>
+            <a:endParaRPr lang="en-US" dirty="0"/>
+          </a:p>
+          <a:p>
+            <a:endParaRPr lang="en-US" dirty="0" smtClean="0"/>
+          </a:p>
+          <a:p>
+            <a:endParaRPr lang="en-US" dirty="0" smtClean="0"/>
           </a:p>
         </p:txBody>
       </p:sp>
       <p:sp>
         <p:nvSpPr>
-          <p:cNvPr id="4" name="Slide Number Placeholder 3"/>
+          <p:cNvPr id="4" name="TextBox 3"/>
+          <p:cNvSpPr txBox="1"/>
+          <p:nvPr/>
+        </p:nvSpPr>
+        <p:spPr>
+          <a:xfrm>
+            <a:off x="683568" y="2195572"/>
+            <a:ext cx="4562148" cy="369332"/>
+          </a:xfrm>
+          <a:prstGeom prst="rect">
+            <a:avLst/>
+          </a:prstGeom>
+          <a:noFill/>
+          <a:ln>
+            <a:solidFill>
+              <a:schemeClr val="tx1"/>
+            </a:solidFill>
+          </a:ln>
+        </p:spPr>
+        <p:txBody>
+          <a:bodyPr wrap="square" rtlCol="0">
+            <a:spAutoFit/>
+          </a:bodyPr>
+          <a:lstStyle/>
+          <a:p>
+            <a:r>
+              <a:rPr lang="nl-BE" dirty="0" smtClean="0">
+                <a:latin typeface="Courier New" pitchFamily="49" charset="0"/>
+                <a:cs typeface="Courier New" pitchFamily="49" charset="0"/>
+              </a:rPr>
+              <a:t>$ git </a:t>
+            </a:r>
+            <a:r>
+              <a:rPr lang="nl-BE" dirty="0" err="1" smtClean="0">
+                <a:latin typeface="Courier New" pitchFamily="49" charset="0"/>
+                <a:cs typeface="Courier New" pitchFamily="49" charset="0"/>
+              </a:rPr>
+              <a:t>bisect</a:t>
+            </a:r>
+            <a:r>
+              <a:rPr lang="nl-BE" dirty="0" smtClean="0">
+                <a:latin typeface="Courier New" pitchFamily="49" charset="0"/>
+                <a:cs typeface="Courier New" pitchFamily="49" charset="0"/>
+              </a:rPr>
+              <a:t>  …</a:t>
+            </a:r>
+          </a:p>
+        </p:txBody>
+      </p:sp>
+      <p:sp>
+        <p:nvSpPr>
+          <p:cNvPr id="6" name="TextBox 5"/>
+          <p:cNvSpPr txBox="1"/>
+          <p:nvPr/>
+        </p:nvSpPr>
+        <p:spPr>
+          <a:xfrm>
+            <a:off x="683568" y="3356992"/>
+            <a:ext cx="4562148" cy="369332"/>
+          </a:xfrm>
+          <a:prstGeom prst="rect">
+            <a:avLst/>
+          </a:prstGeom>
+          <a:noFill/>
+          <a:ln>
+            <a:solidFill>
+              <a:schemeClr val="tx1"/>
+            </a:solidFill>
+          </a:ln>
+        </p:spPr>
+        <p:txBody>
+          <a:bodyPr wrap="square" rtlCol="0">
+            <a:spAutoFit/>
+          </a:bodyPr>
+          <a:lstStyle/>
+          <a:p>
+            <a:r>
+              <a:rPr lang="nl-BE" dirty="0" smtClean="0">
+                <a:latin typeface="Courier New" pitchFamily="49" charset="0"/>
+                <a:cs typeface="Courier New" pitchFamily="49" charset="0"/>
+              </a:rPr>
+              <a:t>$ git </a:t>
+            </a:r>
+            <a:r>
+              <a:rPr lang="nl-BE" dirty="0" err="1" smtClean="0">
+                <a:latin typeface="Courier New" pitchFamily="49" charset="0"/>
+                <a:cs typeface="Courier New" pitchFamily="49" charset="0"/>
+              </a:rPr>
+              <a:t>add</a:t>
+            </a:r>
+            <a:r>
+              <a:rPr lang="nl-BE" dirty="0" smtClean="0">
+                <a:latin typeface="Courier New" pitchFamily="49" charset="0"/>
+                <a:cs typeface="Courier New" pitchFamily="49" charset="0"/>
+              </a:rPr>
+              <a:t>  -p  …</a:t>
+            </a:r>
+          </a:p>
+        </p:txBody>
+      </p:sp>
+      <p:sp>
+        <p:nvSpPr>
+          <p:cNvPr id="7" name="TextBox 6"/>
+          <p:cNvSpPr txBox="1"/>
+          <p:nvPr/>
+        </p:nvSpPr>
+        <p:spPr>
+          <a:xfrm>
+            <a:off x="683568" y="5805264"/>
+            <a:ext cx="6552728" cy="369332"/>
+          </a:xfrm>
+          <a:prstGeom prst="rect">
+            <a:avLst/>
+          </a:prstGeom>
+          <a:noFill/>
+          <a:ln>
+            <a:solidFill>
+              <a:schemeClr val="tx1"/>
+            </a:solidFill>
+          </a:ln>
+        </p:spPr>
+        <p:txBody>
+          <a:bodyPr wrap="square" rtlCol="0">
+            <a:spAutoFit/>
+          </a:bodyPr>
+          <a:lstStyle/>
+          <a:p>
+            <a:r>
+              <a:rPr lang="nl-BE" dirty="0" smtClean="0">
+                <a:latin typeface="Courier New" pitchFamily="49" charset="0"/>
+                <a:cs typeface="Courier New" pitchFamily="49" charset="0"/>
+              </a:rPr>
+              <a:t>$ git </a:t>
+            </a:r>
+            <a:r>
+              <a:rPr lang="nl-BE" dirty="0" err="1" smtClean="0">
+                <a:latin typeface="Courier New" pitchFamily="49" charset="0"/>
+                <a:cs typeface="Courier New" pitchFamily="49" charset="0"/>
+              </a:rPr>
+              <a:t>branch</a:t>
+            </a:r>
+            <a:r>
+              <a:rPr lang="nl-BE" dirty="0" smtClean="0">
+                <a:latin typeface="Courier New" pitchFamily="49" charset="0"/>
+                <a:cs typeface="Courier New" pitchFamily="49" charset="0"/>
+              </a:rPr>
+              <a:t>  --</a:t>
+            </a:r>
+            <a:r>
+              <a:rPr lang="nl-BE" dirty="0" err="1" smtClean="0">
+                <a:latin typeface="Courier New" pitchFamily="49" charset="0"/>
+                <a:cs typeface="Courier New" pitchFamily="49" charset="0"/>
+              </a:rPr>
+              <a:t>edit-description</a:t>
+            </a:r>
+            <a:endParaRPr lang="nl-BE" dirty="0" smtClean="0">
+              <a:latin typeface="Courier New" pitchFamily="49" charset="0"/>
+              <a:cs typeface="Courier New" pitchFamily="49" charset="0"/>
+            </a:endParaRPr>
+          </a:p>
+        </p:txBody>
+      </p:sp>
+      <p:sp>
+        <p:nvSpPr>
+          <p:cNvPr id="8" name="TextBox 7"/>
+          <p:cNvSpPr txBox="1"/>
+          <p:nvPr/>
+        </p:nvSpPr>
+        <p:spPr>
+          <a:xfrm>
+            <a:off x="683568" y="6364076"/>
+            <a:ext cx="6552728" cy="369332"/>
+          </a:xfrm>
+          <a:prstGeom prst="rect">
+            <a:avLst/>
+          </a:prstGeom>
+          <a:noFill/>
+          <a:ln>
+            <a:solidFill>
+              <a:schemeClr val="tx1"/>
+            </a:solidFill>
+          </a:ln>
+        </p:spPr>
+        <p:txBody>
+          <a:bodyPr wrap="square" rtlCol="0">
+            <a:spAutoFit/>
+          </a:bodyPr>
+          <a:lstStyle/>
+          <a:p>
+            <a:r>
+              <a:rPr lang="nl-BE" dirty="0" smtClean="0">
+                <a:latin typeface="Courier New" pitchFamily="49" charset="0"/>
+                <a:cs typeface="Courier New" pitchFamily="49" charset="0"/>
+              </a:rPr>
+              <a:t>$ git </a:t>
+            </a:r>
+            <a:r>
+              <a:rPr lang="nl-BE" dirty="0" err="1" smtClean="0">
+                <a:latin typeface="Courier New" pitchFamily="49" charset="0"/>
+                <a:cs typeface="Courier New" pitchFamily="49" charset="0"/>
+              </a:rPr>
+              <a:t>config</a:t>
+            </a:r>
+            <a:r>
+              <a:rPr lang="nl-BE" dirty="0" smtClean="0">
+                <a:latin typeface="Courier New" pitchFamily="49" charset="0"/>
+                <a:cs typeface="Courier New" pitchFamily="49" charset="0"/>
+              </a:rPr>
+              <a:t>  </a:t>
+            </a:r>
+            <a:r>
+              <a:rPr lang="nl-BE" dirty="0" err="1" smtClean="0">
+                <a:latin typeface="Courier New" pitchFamily="49" charset="0"/>
+                <a:cs typeface="Courier New" pitchFamily="49" charset="0"/>
+              </a:rPr>
+              <a:t>branch</a:t>
+            </a:r>
+            <a:r>
+              <a:rPr lang="nl-BE" dirty="0" smtClean="0">
+                <a:latin typeface="Courier New" pitchFamily="49" charset="0"/>
+                <a:cs typeface="Courier New" pitchFamily="49" charset="0"/>
+              </a:rPr>
+              <a:t>.&lt;</a:t>
+            </a:r>
+            <a:r>
+              <a:rPr lang="nl-BE" dirty="0" err="1" smtClean="0">
+                <a:latin typeface="Courier New" pitchFamily="49" charset="0"/>
+                <a:cs typeface="Courier New" pitchFamily="49" charset="0"/>
+              </a:rPr>
+              <a:t>branch-name.description</a:t>
+            </a:r>
+            <a:endParaRPr lang="nl-BE" dirty="0" smtClean="0">
+              <a:latin typeface="Courier New" pitchFamily="49" charset="0"/>
+              <a:cs typeface="Courier New" pitchFamily="49" charset="0"/>
+            </a:endParaRPr>
+          </a:p>
+        </p:txBody>
+      </p:sp>
+      <p:sp>
+        <p:nvSpPr>
+          <p:cNvPr id="9" name="TextBox 8"/>
+          <p:cNvSpPr txBox="1"/>
+          <p:nvPr/>
+        </p:nvSpPr>
+        <p:spPr>
+          <a:xfrm>
+            <a:off x="6962867" y="6026664"/>
+            <a:ext cx="1723933" cy="369332"/>
+          </a:xfrm>
+          <a:prstGeom prst="rect">
+            <a:avLst/>
+          </a:prstGeom>
+          <a:solidFill>
+            <a:schemeClr val="bg1"/>
+          </a:solidFill>
+          <a:ln>
+            <a:solidFill>
+              <a:schemeClr val="tx1"/>
+            </a:solidFill>
+          </a:ln>
+        </p:spPr>
+        <p:txBody>
+          <a:bodyPr wrap="none" rtlCol="0">
+            <a:spAutoFit/>
+          </a:bodyPr>
+          <a:lstStyle/>
+          <a:p>
+            <a:r>
+              <a:rPr lang="en-US" dirty="0" smtClean="0"/>
+              <a:t>Note: only local!</a:t>
+            </a:r>
+            <a:endParaRPr lang="nl-BE" dirty="0"/>
+          </a:p>
+        </p:txBody>
+      </p:sp>
+      <p:sp>
+        <p:nvSpPr>
+          <p:cNvPr id="10" name="TextBox 9"/>
+          <p:cNvSpPr txBox="1"/>
+          <p:nvPr/>
+        </p:nvSpPr>
+        <p:spPr>
+          <a:xfrm>
+            <a:off x="688524" y="4509120"/>
+            <a:ext cx="4557192" cy="369332"/>
+          </a:xfrm>
+          <a:prstGeom prst="rect">
+            <a:avLst/>
+          </a:prstGeom>
+          <a:noFill/>
+          <a:ln>
+            <a:solidFill>
+              <a:schemeClr val="tx1"/>
+            </a:solidFill>
+          </a:ln>
+        </p:spPr>
+        <p:txBody>
+          <a:bodyPr wrap="square" rtlCol="0">
+            <a:spAutoFit/>
+          </a:bodyPr>
+          <a:lstStyle/>
+          <a:p>
+            <a:r>
+              <a:rPr lang="nl-BE" dirty="0" smtClean="0">
+                <a:latin typeface="Courier New" pitchFamily="49" charset="0"/>
+                <a:cs typeface="Courier New" pitchFamily="49" charset="0"/>
+              </a:rPr>
+              <a:t>$ git </a:t>
+            </a:r>
+            <a:r>
+              <a:rPr lang="nl-BE" dirty="0" err="1" smtClean="0">
+                <a:latin typeface="Courier New" pitchFamily="49" charset="0"/>
+                <a:cs typeface="Courier New" pitchFamily="49" charset="0"/>
+              </a:rPr>
+              <a:t>cherry-pick</a:t>
+            </a:r>
+            <a:r>
+              <a:rPr lang="nl-BE" dirty="0">
+                <a:latin typeface="Courier New" pitchFamily="49" charset="0"/>
+                <a:cs typeface="Courier New" pitchFamily="49" charset="0"/>
+              </a:rPr>
+              <a:t> </a:t>
+            </a:r>
+            <a:r>
+              <a:rPr lang="nl-BE" dirty="0" smtClean="0">
+                <a:latin typeface="Courier New" pitchFamily="49" charset="0"/>
+                <a:cs typeface="Courier New" pitchFamily="49" charset="0"/>
+              </a:rPr>
+              <a:t> 0ba188919fec</a:t>
+            </a:r>
+          </a:p>
+        </p:txBody>
+      </p:sp>
+      <p:sp>
+        <p:nvSpPr>
+          <p:cNvPr id="11" name="Slide Number Placeholder 10"/>
           <p:cNvSpPr>
             <a:spLocks noGrp="1"/>
           </p:cNvSpPr>
@@ -45467,7 +45312,7 @@
     </p:spTree>
     <p:extLst>
       <p:ext uri="{BB962C8B-B14F-4D97-AF65-F5344CB8AC3E}">
-        <p14:creationId xmlns:p14="http://schemas.microsoft.com/office/powerpoint/2010/main" val="2575227797"/>
+        <p14:creationId xmlns:p14="http://schemas.microsoft.com/office/powerpoint/2010/main" val="3877190761"/>
       </p:ext>
     </p:extLst>
   </p:cSld>
@@ -45477,9 +45322,420 @@
   <p:timing>
     <p:tnLst>
       <p:par>
-        <p:cTn id="1" dur="indefinite" restart="never" nodeType="tmRoot"/>
+        <p:cTn id="1" dur="indefinite" restart="never" nodeType="tmRoot">
+          <p:childTnLst>
+            <p:seq concurrent="1" nextAc="seek">
+              <p:cTn id="2" dur="indefinite" nodeType="mainSeq">
+                <p:childTnLst>
+                  <p:par>
+                    <p:cTn id="3" fill="hold">
+                      <p:stCondLst>
+                        <p:cond delay="indefinite"/>
+                        <p:cond evt="onBegin" delay="0">
+                          <p:tn val="2"/>
+                        </p:cond>
+                      </p:stCondLst>
+                      <p:childTnLst>
+                        <p:par>
+                          <p:cTn id="4" fill="hold">
+                            <p:stCondLst>
+                              <p:cond delay="0"/>
+                            </p:stCondLst>
+                            <p:childTnLst>
+                              <p:par>
+                                <p:cTn id="5" presetID="1" presetClass="entr" presetSubtype="0" fill="hold" grpId="0" nodeType="withEffect">
+                                  <p:stCondLst>
+                                    <p:cond delay="0"/>
+                                  </p:stCondLst>
+                                  <p:childTnLst>
+                                    <p:set>
+                                      <p:cBhvr>
+                                        <p:cTn id="6" dur="1" fill="hold">
+                                          <p:stCondLst>
+                                            <p:cond delay="0"/>
+                                          </p:stCondLst>
+                                        </p:cTn>
+                                        <p:tgtEl>
+                                          <p:spTgt spid="3">
+                                            <p:txEl>
+                                              <p:pRg st="0" end="0"/>
+                                            </p:txEl>
+                                          </p:spTgt>
+                                        </p:tgtEl>
+                                        <p:attrNameLst>
+                                          <p:attrName>style.visibility</p:attrName>
+                                        </p:attrNameLst>
+                                      </p:cBhvr>
+                                      <p:to>
+                                        <p:strVal val="visible"/>
+                                      </p:to>
+                                    </p:set>
+                                  </p:childTnLst>
+                                </p:cTn>
+                              </p:par>
+                              <p:par>
+                                <p:cTn id="7" presetID="1" presetClass="entr" presetSubtype="0" fill="hold" grpId="0" nodeType="withEffect">
+                                  <p:stCondLst>
+                                    <p:cond delay="0"/>
+                                  </p:stCondLst>
+                                  <p:childTnLst>
+                                    <p:set>
+                                      <p:cBhvr>
+                                        <p:cTn id="8" dur="1" fill="hold">
+                                          <p:stCondLst>
+                                            <p:cond delay="0"/>
+                                          </p:stCondLst>
+                                        </p:cTn>
+                                        <p:tgtEl>
+                                          <p:spTgt spid="4"/>
+                                        </p:tgtEl>
+                                        <p:attrNameLst>
+                                          <p:attrName>style.visibility</p:attrName>
+                                        </p:attrNameLst>
+                                      </p:cBhvr>
+                                      <p:to>
+                                        <p:strVal val="visible"/>
+                                      </p:to>
+                                    </p:set>
+                                  </p:childTnLst>
+                                </p:cTn>
+                              </p:par>
+                            </p:childTnLst>
+                          </p:cTn>
+                        </p:par>
+                      </p:childTnLst>
+                    </p:cTn>
+                  </p:par>
+                  <p:par>
+                    <p:cTn id="9" fill="hold">
+                      <p:stCondLst>
+                        <p:cond delay="indefinite"/>
+                      </p:stCondLst>
+                      <p:childTnLst>
+                        <p:par>
+                          <p:cTn id="10" fill="hold">
+                            <p:stCondLst>
+                              <p:cond delay="0"/>
+                            </p:stCondLst>
+                            <p:childTnLst>
+                              <p:par>
+                                <p:cTn id="11" presetID="1" presetClass="entr" presetSubtype="0" fill="hold" grpId="0" nodeType="clickEffect">
+                                  <p:stCondLst>
+                                    <p:cond delay="0"/>
+                                  </p:stCondLst>
+                                  <p:childTnLst>
+                                    <p:set>
+                                      <p:cBhvr>
+                                        <p:cTn id="12" dur="1" fill="hold">
+                                          <p:stCondLst>
+                                            <p:cond delay="0"/>
+                                          </p:stCondLst>
+                                        </p:cTn>
+                                        <p:tgtEl>
+                                          <p:spTgt spid="3">
+                                            <p:txEl>
+                                              <p:pRg st="2" end="2"/>
+                                            </p:txEl>
+                                          </p:spTgt>
+                                        </p:tgtEl>
+                                        <p:attrNameLst>
+                                          <p:attrName>style.visibility</p:attrName>
+                                        </p:attrNameLst>
+                                      </p:cBhvr>
+                                      <p:to>
+                                        <p:strVal val="visible"/>
+                                      </p:to>
+                                    </p:set>
+                                  </p:childTnLst>
+                                </p:cTn>
+                              </p:par>
+                            </p:childTnLst>
+                          </p:cTn>
+                        </p:par>
+                      </p:childTnLst>
+                    </p:cTn>
+                  </p:par>
+                  <p:par>
+                    <p:cTn id="13" fill="hold">
+                      <p:stCondLst>
+                        <p:cond delay="indefinite"/>
+                      </p:stCondLst>
+                      <p:childTnLst>
+                        <p:par>
+                          <p:cTn id="14" fill="hold">
+                            <p:stCondLst>
+                              <p:cond delay="0"/>
+                            </p:stCondLst>
+                            <p:childTnLst>
+                              <p:par>
+                                <p:cTn id="15" presetID="1" presetClass="entr" presetSubtype="0" fill="hold" grpId="0" nodeType="clickEffect">
+                                  <p:stCondLst>
+                                    <p:cond delay="0"/>
+                                  </p:stCondLst>
+                                  <p:childTnLst>
+                                    <p:set>
+                                      <p:cBhvr>
+                                        <p:cTn id="16" dur="1" fill="hold">
+                                          <p:stCondLst>
+                                            <p:cond delay="0"/>
+                                          </p:stCondLst>
+                                        </p:cTn>
+                                        <p:tgtEl>
+                                          <p:spTgt spid="3">
+                                            <p:txEl>
+                                              <p:pRg st="4" end="4"/>
+                                            </p:txEl>
+                                          </p:spTgt>
+                                        </p:tgtEl>
+                                        <p:attrNameLst>
+                                          <p:attrName>style.visibility</p:attrName>
+                                        </p:attrNameLst>
+                                      </p:cBhvr>
+                                      <p:to>
+                                        <p:strVal val="visible"/>
+                                      </p:to>
+                                    </p:set>
+                                  </p:childTnLst>
+                                </p:cTn>
+                              </p:par>
+                              <p:par>
+                                <p:cTn id="17" presetID="1" presetClass="entr" presetSubtype="0" fill="hold" grpId="0" nodeType="withEffect">
+                                  <p:stCondLst>
+                                    <p:cond delay="0"/>
+                                  </p:stCondLst>
+                                  <p:childTnLst>
+                                    <p:set>
+                                      <p:cBhvr>
+                                        <p:cTn id="18" dur="1" fill="hold">
+                                          <p:stCondLst>
+                                            <p:cond delay="0"/>
+                                          </p:stCondLst>
+                                        </p:cTn>
+                                        <p:tgtEl>
+                                          <p:spTgt spid="6"/>
+                                        </p:tgtEl>
+                                        <p:attrNameLst>
+                                          <p:attrName>style.visibility</p:attrName>
+                                        </p:attrNameLst>
+                                      </p:cBhvr>
+                                      <p:to>
+                                        <p:strVal val="visible"/>
+                                      </p:to>
+                                    </p:set>
+                                  </p:childTnLst>
+                                </p:cTn>
+                              </p:par>
+                              <p:par>
+                                <p:cTn id="19" presetID="1" presetClass="entr" presetSubtype="0" fill="hold" grpId="0" nodeType="withEffect">
+                                  <p:stCondLst>
+                                    <p:cond delay="0"/>
+                                  </p:stCondLst>
+                                  <p:childTnLst>
+                                    <p:set>
+                                      <p:cBhvr>
+                                        <p:cTn id="20" dur="1" fill="hold">
+                                          <p:stCondLst>
+                                            <p:cond delay="0"/>
+                                          </p:stCondLst>
+                                        </p:cTn>
+                                        <p:tgtEl>
+                                          <p:spTgt spid="10"/>
+                                        </p:tgtEl>
+                                        <p:attrNameLst>
+                                          <p:attrName>style.visibility</p:attrName>
+                                        </p:attrNameLst>
+                                      </p:cBhvr>
+                                      <p:to>
+                                        <p:strVal val="visible"/>
+                                      </p:to>
+                                    </p:set>
+                                  </p:childTnLst>
+                                </p:cTn>
+                              </p:par>
+                            </p:childTnLst>
+                          </p:cTn>
+                        </p:par>
+                      </p:childTnLst>
+                    </p:cTn>
+                  </p:par>
+                  <p:par>
+                    <p:cTn id="21" fill="hold">
+                      <p:stCondLst>
+                        <p:cond delay="indefinite"/>
+                      </p:stCondLst>
+                      <p:childTnLst>
+                        <p:par>
+                          <p:cTn id="22" fill="hold">
+                            <p:stCondLst>
+                              <p:cond delay="0"/>
+                            </p:stCondLst>
+                            <p:childTnLst>
+                              <p:par>
+                                <p:cTn id="23" presetID="1" presetClass="entr" presetSubtype="0" fill="hold" grpId="0" nodeType="clickEffect">
+                                  <p:stCondLst>
+                                    <p:cond delay="0"/>
+                                  </p:stCondLst>
+                                  <p:childTnLst>
+                                    <p:set>
+                                      <p:cBhvr>
+                                        <p:cTn id="24" dur="1" fill="hold">
+                                          <p:stCondLst>
+                                            <p:cond delay="0"/>
+                                          </p:stCondLst>
+                                        </p:cTn>
+                                        <p:tgtEl>
+                                          <p:spTgt spid="3">
+                                            <p:txEl>
+                                              <p:pRg st="6" end="6"/>
+                                            </p:txEl>
+                                          </p:spTgt>
+                                        </p:tgtEl>
+                                        <p:attrNameLst>
+                                          <p:attrName>style.visibility</p:attrName>
+                                        </p:attrNameLst>
+                                      </p:cBhvr>
+                                      <p:to>
+                                        <p:strVal val="visible"/>
+                                      </p:to>
+                                    </p:set>
+                                  </p:childTnLst>
+                                </p:cTn>
+                              </p:par>
+                              <p:par>
+                                <p:cTn id="25" presetID="1" presetClass="entr" presetSubtype="0" fill="hold" grpId="0" nodeType="withEffect">
+                                  <p:stCondLst>
+                                    <p:cond delay="0"/>
+                                  </p:stCondLst>
+                                  <p:childTnLst>
+                                    <p:set>
+                                      <p:cBhvr>
+                                        <p:cTn id="26" dur="1" fill="hold">
+                                          <p:stCondLst>
+                                            <p:cond delay="0"/>
+                                          </p:stCondLst>
+                                        </p:cTn>
+                                        <p:tgtEl>
+                                          <p:spTgt spid="7"/>
+                                        </p:tgtEl>
+                                        <p:attrNameLst>
+                                          <p:attrName>style.visibility</p:attrName>
+                                        </p:attrNameLst>
+                                      </p:cBhvr>
+                                      <p:to>
+                                        <p:strVal val="visible"/>
+                                      </p:to>
+                                    </p:set>
+                                  </p:childTnLst>
+                                </p:cTn>
+                              </p:par>
+                              <p:par>
+                                <p:cTn id="27" presetID="1" presetClass="entr" presetSubtype="0" fill="hold" grpId="0" nodeType="withEffect">
+                                  <p:stCondLst>
+                                    <p:cond delay="0"/>
+                                  </p:stCondLst>
+                                  <p:childTnLst>
+                                    <p:set>
+                                      <p:cBhvr>
+                                        <p:cTn id="28" dur="1" fill="hold">
+                                          <p:stCondLst>
+                                            <p:cond delay="0"/>
+                                          </p:stCondLst>
+                                        </p:cTn>
+                                        <p:tgtEl>
+                                          <p:spTgt spid="8"/>
+                                        </p:tgtEl>
+                                        <p:attrNameLst>
+                                          <p:attrName>style.visibility</p:attrName>
+                                        </p:attrNameLst>
+                                      </p:cBhvr>
+                                      <p:to>
+                                        <p:strVal val="visible"/>
+                                      </p:to>
+                                    </p:set>
+                                  </p:childTnLst>
+                                </p:cTn>
+                              </p:par>
+                            </p:childTnLst>
+                          </p:cTn>
+                        </p:par>
+                      </p:childTnLst>
+                    </p:cTn>
+                  </p:par>
+                  <p:par>
+                    <p:cTn id="29" fill="hold">
+                      <p:stCondLst>
+                        <p:cond delay="indefinite"/>
+                      </p:stCondLst>
+                      <p:childTnLst>
+                        <p:par>
+                          <p:cTn id="30" fill="hold">
+                            <p:stCondLst>
+                              <p:cond delay="0"/>
+                            </p:stCondLst>
+                            <p:childTnLst>
+                              <p:par>
+                                <p:cTn id="31" presetID="1" presetClass="entr" presetSubtype="0" fill="hold" grpId="0" nodeType="clickEffect">
+                                  <p:stCondLst>
+                                    <p:cond delay="0"/>
+                                  </p:stCondLst>
+                                  <p:childTnLst>
+                                    <p:set>
+                                      <p:cBhvr>
+                                        <p:cTn id="32" dur="1" fill="hold">
+                                          <p:stCondLst>
+                                            <p:cond delay="0"/>
+                                          </p:stCondLst>
+                                        </p:cTn>
+                                        <p:tgtEl>
+                                          <p:spTgt spid="9"/>
+                                        </p:tgtEl>
+                                        <p:attrNameLst>
+                                          <p:attrName>style.visibility</p:attrName>
+                                        </p:attrNameLst>
+                                      </p:cBhvr>
+                                      <p:to>
+                                        <p:strVal val="visible"/>
+                                      </p:to>
+                                    </p:set>
+                                  </p:childTnLst>
+                                </p:cTn>
+                              </p:par>
+                            </p:childTnLst>
+                          </p:cTn>
+                        </p:par>
+                      </p:childTnLst>
+                    </p:cTn>
+                  </p:par>
+                </p:childTnLst>
+              </p:cTn>
+              <p:prevCondLst>
+                <p:cond evt="onPrev" delay="0">
+                  <p:tgtEl>
+                    <p:sldTgt/>
+                  </p:tgtEl>
+                </p:cond>
+              </p:prevCondLst>
+              <p:nextCondLst>
+                <p:cond evt="onNext" delay="0">
+                  <p:tgtEl>
+                    <p:sldTgt/>
+                  </p:tgtEl>
+                </p:cond>
+              </p:nextCondLst>
+            </p:seq>
+          </p:childTnLst>
+        </p:cTn>
       </p:par>
     </p:tnLst>
+    <p:bldLst>
+      <p:bldP spid="3" grpId="0" uiExpand="1" build="p"/>
+      <p:bldP spid="4" grpId="0" animBg="1"/>
+      <p:bldP spid="6" grpId="0" animBg="1"/>
+      <p:bldP spid="7" grpId="0" animBg="1"/>
+      <p:bldP spid="8" grpId="0" animBg="1"/>
+      <p:bldP spid="9" grpId="0" animBg="1"/>
+      <p:bldP spid="10" grpId="0" animBg="1"/>
+    </p:bldLst>
   </p:timing>
 </p:sld>
 </file>
@@ -45526,74 +45782,20 @@
       </p:sp>
       <p:sp>
         <p:nvSpPr>
-          <p:cNvPr id="3" name="Content Placeholder 2"/>
+          <p:cNvPr id="3" name="Text Placeholder 2"/>
           <p:cNvSpPr>
             <a:spLocks noGrp="1"/>
           </p:cNvSpPr>
           <p:nvPr>
-            <p:ph idx="1"/>
+            <p:ph type="body" idx="1"/>
           </p:nvPr>
         </p:nvSpPr>
         <p:spPr/>
         <p:txBody>
-          <a:bodyPr>
-            <a:normAutofit lnSpcReduction="10000"/>
-          </a:bodyPr>
+          <a:bodyPr/>
           <a:lstStyle/>
           <a:p>
-            <a:r>
-              <a:rPr lang="en-US" dirty="0" smtClean="0"/>
-              <a:t>Contribute to someone else's project, e.g.,</a:t>
-            </a:r>
-          </a:p>
-          <a:p>
-            <a:pPr lvl="1"/>
-            <a:r>
-              <a:rPr lang="en-US" dirty="0" smtClean="0"/>
-              <a:t>Open source project</a:t>
-            </a:r>
-          </a:p>
-          <a:p>
-            <a:pPr lvl="1"/>
-            <a:r>
-              <a:rPr lang="en-US" dirty="0" smtClean="0"/>
-              <a:t>Research project you're involved in</a:t>
-            </a:r>
-          </a:p>
-          <a:p>
-            <a:r>
-              <a:rPr lang="en-US" dirty="0" smtClean="0"/>
-              <a:t>Can be done without write access to project</a:t>
-            </a:r>
-          </a:p>
-          <a:p>
-            <a:pPr lvl="1"/>
-            <a:r>
-              <a:rPr lang="en-US" dirty="0" smtClean="0"/>
-              <a:t>Create your own copy by forking</a:t>
-            </a:r>
-          </a:p>
-          <a:p>
-            <a:pPr lvl="1"/>
-            <a:r>
-              <a:rPr lang="en-US" dirty="0" smtClean="0"/>
-              <a:t>Create a branch for implementation</a:t>
-            </a:r>
-          </a:p>
-          <a:p>
-            <a:pPr lvl="1"/>
-            <a:r>
-              <a:rPr lang="en-US" dirty="0" smtClean="0"/>
-              <a:t>Implement, test</a:t>
-            </a:r>
-          </a:p>
-          <a:p>
-            <a:pPr lvl="1"/>
-            <a:r>
-              <a:rPr lang="en-US" dirty="0" smtClean="0"/>
-              <a:t>Create a pull request for your branch against original repository</a:t>
-            </a:r>
-            <a:endParaRPr lang="nl-BE" dirty="0"/>
+            <a:endParaRPr lang="nl-BE"/>
           </a:p>
         </p:txBody>
       </p:sp>
@@ -45615,6 +45817,162 @@
             <a:fld id="{BB52A05A-A776-4391-ACD7-D6BC34D3145C}" type="slidenum">
               <a:rPr lang="nl-BE" smtClean="0"/>
               <a:t>64</a:t>
+            </a:fld>
+            <a:endParaRPr lang="nl-BE"/>
+          </a:p>
+        </p:txBody>
+      </p:sp>
+    </p:spTree>
+    <p:extLst>
+      <p:ext uri="{BB962C8B-B14F-4D97-AF65-F5344CB8AC3E}">
+        <p14:creationId xmlns:p14="http://schemas.microsoft.com/office/powerpoint/2010/main" val="2575227797"/>
+      </p:ext>
+    </p:extLst>
+  </p:cSld>
+  <p:clrMapOvr>
+    <a:masterClrMapping/>
+  </p:clrMapOvr>
+  <p:timing>
+    <p:tnLst>
+      <p:par>
+        <p:cTn id="1" dur="indefinite" restart="never" nodeType="tmRoot"/>
+      </p:par>
+    </p:tnLst>
+  </p:timing>
+</p:sld>
+</file>
+
+<file path=ppt/slides/slide65.xml><?xml version="1.0" encoding="utf-8"?>
+<p:sld xmlns:a="http://schemas.openxmlformats.org/drawingml/2006/main" xmlns:r="http://schemas.openxmlformats.org/officeDocument/2006/relationships" xmlns:p="http://schemas.openxmlformats.org/presentationml/2006/main">
+  <p:cSld>
+    <p:spTree>
+      <p:nvGrpSpPr>
+        <p:cNvPr id="1" name=""/>
+        <p:cNvGrpSpPr/>
+        <p:nvPr/>
+      </p:nvGrpSpPr>
+      <p:grpSpPr>
+        <a:xfrm>
+          <a:off x="0" y="0"/>
+          <a:ext cx="0" cy="0"/>
+          <a:chOff x="0" y="0"/>
+          <a:chExt cx="0" cy="0"/>
+        </a:xfrm>
+      </p:grpSpPr>
+      <p:sp>
+        <p:nvSpPr>
+          <p:cNvPr id="2" name="Title 1"/>
+          <p:cNvSpPr>
+            <a:spLocks noGrp="1"/>
+          </p:cNvSpPr>
+          <p:nvPr>
+            <p:ph type="title"/>
+          </p:nvPr>
+        </p:nvSpPr>
+        <p:spPr/>
+        <p:txBody>
+          <a:bodyPr/>
+          <a:lstStyle/>
+          <a:p>
+            <a:r>
+              <a:rPr lang="en-US" dirty="0" smtClean="0"/>
+              <a:t>Contributing</a:t>
+            </a:r>
+            <a:endParaRPr lang="nl-BE" dirty="0"/>
+          </a:p>
+        </p:txBody>
+      </p:sp>
+      <p:sp>
+        <p:nvSpPr>
+          <p:cNvPr id="3" name="Content Placeholder 2"/>
+          <p:cNvSpPr>
+            <a:spLocks noGrp="1"/>
+          </p:cNvSpPr>
+          <p:nvPr>
+            <p:ph idx="1"/>
+          </p:nvPr>
+        </p:nvSpPr>
+        <p:spPr/>
+        <p:txBody>
+          <a:bodyPr>
+            <a:normAutofit lnSpcReduction="10000"/>
+          </a:bodyPr>
+          <a:lstStyle/>
+          <a:p>
+            <a:r>
+              <a:rPr lang="en-US" dirty="0" smtClean="0"/>
+              <a:t>Contribute to someone else's project, e.g.,</a:t>
+            </a:r>
+          </a:p>
+          <a:p>
+            <a:pPr lvl="1"/>
+            <a:r>
+              <a:rPr lang="en-US" dirty="0" smtClean="0"/>
+              <a:t>Open source project</a:t>
+            </a:r>
+          </a:p>
+          <a:p>
+            <a:pPr lvl="1"/>
+            <a:r>
+              <a:rPr lang="en-US" dirty="0" smtClean="0"/>
+              <a:t>Research project you're involved in</a:t>
+            </a:r>
+          </a:p>
+          <a:p>
+            <a:r>
+              <a:rPr lang="en-US" dirty="0" smtClean="0"/>
+              <a:t>Can be done without write access to project</a:t>
+            </a:r>
+          </a:p>
+          <a:p>
+            <a:pPr lvl="1"/>
+            <a:r>
+              <a:rPr lang="en-US" dirty="0" smtClean="0"/>
+              <a:t>Create your own copy by forking</a:t>
+            </a:r>
+          </a:p>
+          <a:p>
+            <a:pPr lvl="1"/>
+            <a:r>
+              <a:rPr lang="en-US" dirty="0" smtClean="0"/>
+              <a:t>Create a branch for implementation</a:t>
+            </a:r>
+          </a:p>
+          <a:p>
+            <a:pPr lvl="1"/>
+            <a:r>
+              <a:rPr lang="en-US" dirty="0" smtClean="0"/>
+              <a:t>Implement, test</a:t>
+            </a:r>
+          </a:p>
+          <a:p>
+            <a:pPr lvl="1"/>
+            <a:r>
+              <a:rPr lang="en-US" dirty="0" smtClean="0"/>
+              <a:t>Create a pull request for your branch against original repository</a:t>
+            </a:r>
+            <a:endParaRPr lang="nl-BE" dirty="0"/>
+          </a:p>
+        </p:txBody>
+      </p:sp>
+      <p:sp>
+        <p:nvSpPr>
+          <p:cNvPr id="4" name="Slide Number Placeholder 3"/>
+          <p:cNvSpPr>
+            <a:spLocks noGrp="1"/>
+          </p:cNvSpPr>
+          <p:nvPr>
+            <p:ph type="sldNum" sz="quarter" idx="12"/>
+          </p:nvPr>
+        </p:nvSpPr>
+        <p:spPr/>
+        <p:txBody>
+          <a:bodyPr/>
+          <a:lstStyle/>
+          <a:p>
+            <a:fld id="{BB52A05A-A776-4391-ACD7-D6BC34D3145C}" type="slidenum">
+              <a:rPr lang="nl-BE" smtClean="0"/>
+              <a:t>65</a:t>
             </a:fld>
             <a:endParaRPr lang="nl-BE"/>
           </a:p>
@@ -46106,7 +46464,7 @@
 </p:sld>
 </file>
 
-<file path=ppt/slides/slide65.xml><?xml version="1.0" encoding="utf-8"?>
+<file path=ppt/slides/slide66.xml><?xml version="1.0" encoding="utf-8"?>
 <p:sld xmlns:a="http://schemas.openxmlformats.org/drawingml/2006/main" xmlns:r="http://schemas.openxmlformats.org/officeDocument/2006/relationships" xmlns:p="http://schemas.openxmlformats.org/presentationml/2006/main">
   <p:cSld>
     <p:spTree>
@@ -46265,7 +46623,7 @@
           <a:p>
             <a:fld id="{BB52A05A-A776-4391-ACD7-D6BC34D3145C}" type="slidenum">
               <a:rPr lang="nl-BE" smtClean="0"/>
-              <a:t>65</a:t>
+              <a:t>66</a:t>
             </a:fld>
             <a:endParaRPr lang="nl-BE"/>
           </a:p>
@@ -46645,7 +47003,7 @@
 </p:sld>
 </file>
 
-<file path=ppt/slides/slide66.xml><?xml version="1.0" encoding="utf-8"?>
+<file path=ppt/slides/slide67.xml><?xml version="1.0" encoding="utf-8"?>
 <p:sld xmlns:a="http://schemas.openxmlformats.org/drawingml/2006/main" xmlns:r="http://schemas.openxmlformats.org/officeDocument/2006/relationships" xmlns:p="http://schemas.openxmlformats.org/presentationml/2006/main">
   <p:cSld>
     <p:spTree>
@@ -46769,7 +47127,7 @@
           <a:p>
             <a:fld id="{BB52A05A-A776-4391-ACD7-D6BC34D3145C}" type="slidenum">
               <a:rPr lang="nl-BE" smtClean="0"/>
-              <a:t>66</a:t>
+              <a:t>67</a:t>
             </a:fld>
             <a:endParaRPr lang="nl-BE"/>
           </a:p>
@@ -47212,108 +47570,6 @@
 </p:sld>
 </file>
 
-<file path=ppt/slides/slide67.xml><?xml version="1.0" encoding="utf-8"?>
-<p:sld xmlns:a="http://schemas.openxmlformats.org/drawingml/2006/main" xmlns:r="http://schemas.openxmlformats.org/officeDocument/2006/relationships" xmlns:p="http://schemas.openxmlformats.org/presentationml/2006/main">
-  <p:cSld>
-    <p:spTree>
-      <p:nvGrpSpPr>
-        <p:cNvPr id="1" name=""/>
-        <p:cNvGrpSpPr/>
-        <p:nvPr/>
-      </p:nvGrpSpPr>
-      <p:grpSpPr>
-        <a:xfrm>
-          <a:off x="0" y="0"/>
-          <a:ext cx="0" cy="0"/>
-          <a:chOff x="0" y="0"/>
-          <a:chExt cx="0" cy="0"/>
-        </a:xfrm>
-      </p:grpSpPr>
-      <p:sp>
-        <p:nvSpPr>
-          <p:cNvPr id="2" name="Title 1"/>
-          <p:cNvSpPr>
-            <a:spLocks noGrp="1"/>
-          </p:cNvSpPr>
-          <p:nvPr>
-            <p:ph type="title"/>
-          </p:nvPr>
-        </p:nvSpPr>
-        <p:spPr/>
-        <p:txBody>
-          <a:bodyPr/>
-          <a:lstStyle/>
-          <a:p>
-            <a:r>
-              <a:rPr lang="en-US" dirty="0" smtClean="0"/>
-              <a:t>Conclusions</a:t>
-            </a:r>
-            <a:endParaRPr lang="nl-BE" dirty="0"/>
-          </a:p>
-        </p:txBody>
-      </p:sp>
-      <p:sp>
-        <p:nvSpPr>
-          <p:cNvPr id="3" name="Text Placeholder 2"/>
-          <p:cNvSpPr>
-            <a:spLocks noGrp="1"/>
-          </p:cNvSpPr>
-          <p:nvPr>
-            <p:ph type="body" idx="1"/>
-          </p:nvPr>
-        </p:nvSpPr>
-        <p:spPr/>
-        <p:txBody>
-          <a:bodyPr/>
-          <a:lstStyle/>
-          <a:p>
-            <a:endParaRPr lang="nl-BE"/>
-          </a:p>
-        </p:txBody>
-      </p:sp>
-      <p:sp>
-        <p:nvSpPr>
-          <p:cNvPr id="4" name="Slide Number Placeholder 3"/>
-          <p:cNvSpPr>
-            <a:spLocks noGrp="1"/>
-          </p:cNvSpPr>
-          <p:nvPr>
-            <p:ph type="sldNum" sz="quarter" idx="12"/>
-          </p:nvPr>
-        </p:nvSpPr>
-        <p:spPr/>
-        <p:txBody>
-          <a:bodyPr/>
-          <a:lstStyle/>
-          <a:p>
-            <a:fld id="{BB52A05A-A776-4391-ACD7-D6BC34D3145C}" type="slidenum">
-              <a:rPr lang="nl-BE" smtClean="0"/>
-              <a:t>67</a:t>
-            </a:fld>
-            <a:endParaRPr lang="nl-BE"/>
-          </a:p>
-        </p:txBody>
-      </p:sp>
-    </p:spTree>
-    <p:extLst>
-      <p:ext uri="{BB962C8B-B14F-4D97-AF65-F5344CB8AC3E}">
-        <p14:creationId xmlns:p14="http://schemas.microsoft.com/office/powerpoint/2010/main" val="2763237186"/>
-      </p:ext>
-    </p:extLst>
-  </p:cSld>
-  <p:clrMapOvr>
-    <a:masterClrMapping/>
-  </p:clrMapOvr>
-  <p:timing>
-    <p:tnLst>
-      <p:par>
-        <p:cTn id="1" dur="indefinite" restart="never" nodeType="tmRoot"/>
-      </p:par>
-    </p:tnLst>
-  </p:timing>
-</p:sld>
-</file>
-
 <file path=ppt/slides/slide68.xml><?xml version="1.0" encoding="utf-8"?>
 <p:sld xmlns:a="http://schemas.openxmlformats.org/drawingml/2006/main" xmlns:r="http://schemas.openxmlformats.org/officeDocument/2006/relationships" xmlns:p="http://schemas.openxmlformats.org/presentationml/2006/main">
   <p:cSld>
@@ -47356,12 +47612,12 @@
       </p:sp>
       <p:sp>
         <p:nvSpPr>
-          <p:cNvPr id="3" name="Content Placeholder 2"/>
+          <p:cNvPr id="3" name="Text Placeholder 2"/>
           <p:cNvSpPr>
             <a:spLocks noGrp="1"/>
           </p:cNvSpPr>
           <p:nvPr>
-            <p:ph idx="1"/>
+            <p:ph type="body" idx="1"/>
           </p:nvPr>
         </p:nvSpPr>
         <p:spPr/>
@@ -47369,52 +47625,7 @@
           <a:bodyPr/>
           <a:lstStyle/>
           <a:p>
-            <a:r>
-              <a:rPr lang="en-US" dirty="0" smtClean="0"/>
-              <a:t>Contributes to the scientific method</a:t>
-            </a:r>
-          </a:p>
-          <a:p>
-            <a:pPr lvl="1"/>
-            <a:r>
-              <a:rPr lang="en-US" dirty="0" smtClean="0"/>
-              <a:t>Helps ensure reproducibility</a:t>
-            </a:r>
-          </a:p>
-          <a:p>
-            <a:r>
-              <a:rPr lang="en-US" dirty="0" smtClean="0"/>
-              <a:t>Record of change</a:t>
-            </a:r>
-          </a:p>
-          <a:p>
-            <a:pPr lvl="1"/>
-            <a:r>
-              <a:rPr lang="en-US" dirty="0" smtClean="0"/>
-              <a:t>What was changed?</a:t>
-            </a:r>
-          </a:p>
-          <a:p>
-            <a:pPr lvl="1"/>
-            <a:r>
-              <a:rPr lang="en-US" dirty="0" smtClean="0"/>
-              <a:t>When was it changed?</a:t>
-            </a:r>
-          </a:p>
-          <a:p>
-            <a:pPr lvl="1"/>
-            <a:r>
-              <a:rPr lang="en-US" dirty="0" smtClean="0"/>
-              <a:t>Who changed it?</a:t>
-            </a:r>
-          </a:p>
-          <a:p>
-            <a:pPr lvl="1"/>
-            <a:r>
-              <a:rPr lang="en-US" dirty="0" smtClean="0"/>
-              <a:t>Why was it changed?</a:t>
-            </a:r>
-            <a:endParaRPr lang="nl-BE" dirty="0"/>
+            <a:endParaRPr lang="nl-BE"/>
           </a:p>
         </p:txBody>
       </p:sp>
@@ -47436,6 +47647,153 @@
             <a:fld id="{BB52A05A-A776-4391-ACD7-D6BC34D3145C}" type="slidenum">
               <a:rPr lang="nl-BE" smtClean="0"/>
               <a:t>68</a:t>
+            </a:fld>
+            <a:endParaRPr lang="nl-BE"/>
+          </a:p>
+        </p:txBody>
+      </p:sp>
+    </p:spTree>
+    <p:extLst>
+      <p:ext uri="{BB962C8B-B14F-4D97-AF65-F5344CB8AC3E}">
+        <p14:creationId xmlns:p14="http://schemas.microsoft.com/office/powerpoint/2010/main" val="2763237186"/>
+      </p:ext>
+    </p:extLst>
+  </p:cSld>
+  <p:clrMapOvr>
+    <a:masterClrMapping/>
+  </p:clrMapOvr>
+  <p:timing>
+    <p:tnLst>
+      <p:par>
+        <p:cTn id="1" dur="indefinite" restart="never" nodeType="tmRoot"/>
+      </p:par>
+    </p:tnLst>
+  </p:timing>
+</p:sld>
+</file>
+
+<file path=ppt/slides/slide69.xml><?xml version="1.0" encoding="utf-8"?>
+<p:sld xmlns:a="http://schemas.openxmlformats.org/drawingml/2006/main" xmlns:r="http://schemas.openxmlformats.org/officeDocument/2006/relationships" xmlns:p="http://schemas.openxmlformats.org/presentationml/2006/main">
+  <p:cSld>
+    <p:spTree>
+      <p:nvGrpSpPr>
+        <p:cNvPr id="1" name=""/>
+        <p:cNvGrpSpPr/>
+        <p:nvPr/>
+      </p:nvGrpSpPr>
+      <p:grpSpPr>
+        <a:xfrm>
+          <a:off x="0" y="0"/>
+          <a:ext cx="0" cy="0"/>
+          <a:chOff x="0" y="0"/>
+          <a:chExt cx="0" cy="0"/>
+        </a:xfrm>
+      </p:grpSpPr>
+      <p:sp>
+        <p:nvSpPr>
+          <p:cNvPr id="2" name="Title 1"/>
+          <p:cNvSpPr>
+            <a:spLocks noGrp="1"/>
+          </p:cNvSpPr>
+          <p:nvPr>
+            <p:ph type="title"/>
+          </p:nvPr>
+        </p:nvSpPr>
+        <p:spPr/>
+        <p:txBody>
+          <a:bodyPr/>
+          <a:lstStyle/>
+          <a:p>
+            <a:r>
+              <a:rPr lang="en-US" dirty="0" smtClean="0"/>
+              <a:t>Conclusions</a:t>
+            </a:r>
+            <a:endParaRPr lang="nl-BE" dirty="0"/>
+          </a:p>
+        </p:txBody>
+      </p:sp>
+      <p:sp>
+        <p:nvSpPr>
+          <p:cNvPr id="3" name="Content Placeholder 2"/>
+          <p:cNvSpPr>
+            <a:spLocks noGrp="1"/>
+          </p:cNvSpPr>
+          <p:nvPr>
+            <p:ph idx="1"/>
+          </p:nvPr>
+        </p:nvSpPr>
+        <p:spPr/>
+        <p:txBody>
+          <a:bodyPr/>
+          <a:lstStyle/>
+          <a:p>
+            <a:r>
+              <a:rPr lang="en-US" dirty="0" smtClean="0"/>
+              <a:t>Contributes to the scientific method</a:t>
+            </a:r>
+          </a:p>
+          <a:p>
+            <a:pPr lvl="1"/>
+            <a:r>
+              <a:rPr lang="en-US" dirty="0" smtClean="0"/>
+              <a:t>Helps ensure reproducibility</a:t>
+            </a:r>
+          </a:p>
+          <a:p>
+            <a:r>
+              <a:rPr lang="en-US" dirty="0" smtClean="0"/>
+              <a:t>Record of change</a:t>
+            </a:r>
+          </a:p>
+          <a:p>
+            <a:pPr lvl="1"/>
+            <a:r>
+              <a:rPr lang="en-US" dirty="0" smtClean="0"/>
+              <a:t>What was changed?</a:t>
+            </a:r>
+          </a:p>
+          <a:p>
+            <a:pPr lvl="1"/>
+            <a:r>
+              <a:rPr lang="en-US" dirty="0" smtClean="0"/>
+              <a:t>When was it changed?</a:t>
+            </a:r>
+          </a:p>
+          <a:p>
+            <a:pPr lvl="1"/>
+            <a:r>
+              <a:rPr lang="en-US" dirty="0" smtClean="0"/>
+              <a:t>Who changed it?</a:t>
+            </a:r>
+          </a:p>
+          <a:p>
+            <a:pPr lvl="1"/>
+            <a:r>
+              <a:rPr lang="en-US" dirty="0" smtClean="0"/>
+              <a:t>Why was it changed?</a:t>
+            </a:r>
+            <a:endParaRPr lang="nl-BE" dirty="0"/>
+          </a:p>
+        </p:txBody>
+      </p:sp>
+      <p:sp>
+        <p:nvSpPr>
+          <p:cNvPr id="4" name="Slide Number Placeholder 3"/>
+          <p:cNvSpPr>
+            <a:spLocks noGrp="1"/>
+          </p:cNvSpPr>
+          <p:nvPr>
+            <p:ph type="sldNum" sz="quarter" idx="12"/>
+          </p:nvPr>
+        </p:nvSpPr>
+        <p:spPr/>
+        <p:txBody>
+          <a:bodyPr/>
+          <a:lstStyle/>
+          <a:p>
+            <a:fld id="{BB52A05A-A776-4391-ACD7-D6BC34D3145C}" type="slidenum">
+              <a:rPr lang="nl-BE" smtClean="0"/>
+              <a:t>69</a:t>
             </a:fld>
             <a:endParaRPr lang="nl-BE"/>
           </a:p>
@@ -47739,310 +48097,6 @@
     <p:bldLst>
       <p:bldP spid="3" grpId="0" uiExpand="1" build="p"/>
     </p:bldLst>
-  </p:timing>
-</p:sld>
-</file>
-
-<file path=ppt/slides/slide69.xml><?xml version="1.0" encoding="utf-8"?>
-<p:sld xmlns:a="http://schemas.openxmlformats.org/drawingml/2006/main" xmlns:r="http://schemas.openxmlformats.org/officeDocument/2006/relationships" xmlns:p="http://schemas.openxmlformats.org/presentationml/2006/main">
-  <p:cSld>
-    <p:spTree>
-      <p:nvGrpSpPr>
-        <p:cNvPr id="1" name=""/>
-        <p:cNvGrpSpPr/>
-        <p:nvPr/>
-      </p:nvGrpSpPr>
-      <p:grpSpPr>
-        <a:xfrm>
-          <a:off x="0" y="0"/>
-          <a:ext cx="0" cy="0"/>
-          <a:chOff x="0" y="0"/>
-          <a:chExt cx="0" cy="0"/>
-        </a:xfrm>
-      </p:grpSpPr>
-      <p:sp>
-        <p:nvSpPr>
-          <p:cNvPr id="2" name="Title 1"/>
-          <p:cNvSpPr>
-            <a:spLocks noGrp="1"/>
-          </p:cNvSpPr>
-          <p:nvPr>
-            <p:ph type="title"/>
-          </p:nvPr>
-        </p:nvSpPr>
-        <p:spPr/>
-        <p:txBody>
-          <a:bodyPr/>
-          <a:lstStyle/>
-          <a:p>
-            <a:r>
-              <a:rPr lang="en-US" dirty="0" smtClean="0"/>
-              <a:t>References</a:t>
-            </a:r>
-            <a:endParaRPr lang="nl-BE" dirty="0"/>
-          </a:p>
-        </p:txBody>
-      </p:sp>
-      <p:sp>
-        <p:nvSpPr>
-          <p:cNvPr id="3" name="Content Placeholder 2"/>
-          <p:cNvSpPr>
-            <a:spLocks noGrp="1"/>
-          </p:cNvSpPr>
-          <p:nvPr>
-            <p:ph idx="1"/>
-          </p:nvPr>
-        </p:nvSpPr>
-        <p:spPr/>
-        <p:txBody>
-          <a:bodyPr>
-            <a:normAutofit fontScale="77500" lnSpcReduction="20000"/>
-          </a:bodyPr>
-          <a:lstStyle/>
-          <a:p>
-            <a:r>
-              <a:rPr lang="en-US" dirty="0" smtClean="0"/>
-              <a:t>Online documentation (including movies)</a:t>
-            </a:r>
-            <a:br>
-              <a:rPr lang="en-US" dirty="0" smtClean="0"/>
-            </a:br>
-            <a:r>
-              <a:rPr lang="nl-BE" sz="2300" dirty="0" smtClean="0">
-                <a:hlinkClick r:id="rId2"/>
-              </a:rPr>
-              <a:t>http://git-scm.com/documentation</a:t>
-            </a:r>
-            <a:endParaRPr lang="nl-BE" dirty="0" smtClean="0"/>
-          </a:p>
-          <a:p>
-            <a:r>
-              <a:rPr lang="en-US" dirty="0" err="1"/>
-              <a:t>g</a:t>
-            </a:r>
-            <a:r>
-              <a:rPr lang="en-US" dirty="0" err="1" smtClean="0"/>
-              <a:t>it</a:t>
-            </a:r>
-            <a:r>
-              <a:rPr lang="en-US" dirty="0" smtClean="0"/>
-              <a:t> web site</a:t>
-            </a:r>
-            <a:br>
-              <a:rPr lang="en-US" dirty="0" smtClean="0"/>
-            </a:br>
-            <a:r>
-              <a:rPr lang="nl-BE" sz="2400" dirty="0" smtClean="0">
-                <a:hlinkClick r:id="rId3"/>
-              </a:rPr>
-              <a:t>http://git-scm.com/</a:t>
-            </a:r>
-            <a:endParaRPr lang="nl-BE" dirty="0" smtClean="0"/>
-          </a:p>
-          <a:p>
-            <a:r>
-              <a:rPr lang="nl-BE" dirty="0" smtClean="0"/>
-              <a:t>Pro git </a:t>
-            </a:r>
-            <a:r>
-              <a:rPr lang="nl-BE" dirty="0"/>
-              <a:t>online book</a:t>
-            </a:r>
-            <a:br>
-              <a:rPr lang="nl-BE" dirty="0"/>
-            </a:br>
-            <a:r>
-              <a:rPr lang="nl-BE" sz="2100" dirty="0">
-                <a:hlinkClick r:id="rId4"/>
-              </a:rPr>
-              <a:t>https://git-scm.com/book/en/v2</a:t>
-            </a:r>
-            <a:r>
-              <a:rPr lang="nl-BE" sz="2100" dirty="0" smtClean="0">
-                <a:hlinkClick r:id="rId4"/>
-              </a:rPr>
-              <a:t>/</a:t>
-            </a:r>
-            <a:r>
-              <a:rPr lang="nl-BE" sz="2100" dirty="0" smtClean="0"/>
-              <a:t> </a:t>
-            </a:r>
-            <a:endParaRPr lang="nl-BE" dirty="0" smtClean="0"/>
-          </a:p>
-          <a:p>
-            <a:r>
-              <a:rPr lang="en-US" dirty="0" smtClean="0"/>
-              <a:t>Why (the author thinks) you should switch to </a:t>
-            </a:r>
-            <a:r>
-              <a:rPr lang="en-US" dirty="0" err="1" smtClean="0"/>
-              <a:t>git</a:t>
-            </a:r>
-            <a:r>
-              <a:rPr lang="en-US" dirty="0" smtClean="0"/>
-              <a:t/>
-            </a:r>
-            <a:br>
-              <a:rPr lang="en-US" dirty="0" smtClean="0"/>
-            </a:br>
-            <a:r>
-              <a:rPr lang="nl-BE" sz="2300" dirty="0" smtClean="0">
-                <a:hlinkClick r:id="rId5"/>
-              </a:rPr>
-              <a:t>http://blog.teamtreehouse.com/why-you-should-switch-from-subversion-to-git</a:t>
-            </a:r>
-            <a:endParaRPr lang="nl-BE" dirty="0" smtClean="0"/>
-          </a:p>
-          <a:p>
-            <a:r>
-              <a:rPr lang="nl-BE" dirty="0" smtClean="0"/>
-              <a:t>Overview of frequently used git workflows</a:t>
-            </a:r>
-            <a:br>
-              <a:rPr lang="nl-BE" dirty="0" smtClean="0"/>
-            </a:br>
-            <a:r>
-              <a:rPr lang="en-US" sz="2100" dirty="0" smtClean="0">
-                <a:hlinkClick r:id="rId6"/>
-              </a:rPr>
-              <a:t>https</a:t>
-            </a:r>
-            <a:r>
-              <a:rPr lang="en-US" sz="2100" dirty="0">
-                <a:hlinkClick r:id="rId6"/>
-              </a:rPr>
-              <a:t>://</a:t>
-            </a:r>
-            <a:r>
-              <a:rPr lang="en-US" sz="2100" dirty="0" smtClean="0">
-                <a:hlinkClick r:id="rId6"/>
-              </a:rPr>
-              <a:t>www.atlassian.com/git/workflows</a:t>
-            </a:r>
-            <a:endParaRPr lang="en-US" dirty="0" smtClean="0"/>
-          </a:p>
-          <a:p>
-            <a:r>
-              <a:rPr lang="nl-BE" dirty="0" smtClean="0"/>
-              <a:t>Blog posts on "good" commit messages</a:t>
-            </a:r>
-            <a:br>
-              <a:rPr lang="nl-BE" dirty="0" smtClean="0"/>
-            </a:br>
-            <a:r>
-              <a:rPr lang="nl-BE" sz="2100" dirty="0" smtClean="0">
-                <a:hlinkClick r:id="rId7"/>
-              </a:rPr>
-              <a:t>https</a:t>
-            </a:r>
-            <a:r>
-              <a:rPr lang="nl-BE" sz="2100" dirty="0">
-                <a:hlinkClick r:id="rId7"/>
-              </a:rPr>
-              <a:t>://chris.beams.io/posts/git-commit</a:t>
-            </a:r>
-            <a:r>
-              <a:rPr lang="nl-BE" sz="2100" dirty="0" smtClean="0">
-                <a:hlinkClick r:id="rId7"/>
-              </a:rPr>
-              <a:t>/</a:t>
-            </a:r>
-            <a:r>
-              <a:rPr lang="nl-BE" sz="2100" dirty="0" smtClean="0"/>
-              <a:t> </a:t>
-            </a:r>
-            <a:r>
-              <a:rPr lang="nl-BE" sz="2100" dirty="0"/>
-              <a:t/>
-            </a:r>
-            <a:br>
-              <a:rPr lang="nl-BE" sz="2100" dirty="0"/>
-            </a:br>
-            <a:r>
-              <a:rPr lang="nl-BE" sz="2100" dirty="0">
-                <a:hlinkClick r:id="rId8"/>
-              </a:rPr>
-              <a:t>https://</a:t>
-            </a:r>
-            <a:r>
-              <a:rPr lang="nl-BE" sz="2100" dirty="0" smtClean="0">
-                <a:hlinkClick r:id="rId8"/>
-              </a:rPr>
-              <a:t>thoughtbot.com/blog/5-useful-tips-for-a-better-commit-message</a:t>
-            </a:r>
-            <a:r>
-              <a:rPr lang="nl-BE" sz="2100" dirty="0" smtClean="0"/>
-              <a:t> </a:t>
-            </a:r>
-            <a:endParaRPr lang="en-BE" sz="2100" dirty="0" smtClean="0"/>
-          </a:p>
-          <a:p>
-            <a:r>
-              <a:rPr lang="en-BE" dirty="0" smtClean="0"/>
-              <a:t>Nice article on some git features &amp; techniques</a:t>
-            </a:r>
-            <a:br>
-              <a:rPr lang="en-BE" dirty="0" smtClean="0"/>
-            </a:br>
-            <a:r>
-              <a:rPr lang="en-US" sz="2100" dirty="0">
-                <a:hlinkClick r:id="rId9"/>
-              </a:rPr>
-              <a:t>https://</a:t>
-            </a:r>
-            <a:r>
-              <a:rPr lang="en-US" sz="2100" dirty="0" smtClean="0">
-                <a:hlinkClick r:id="rId9"/>
-              </a:rPr>
-              <a:t>realpython.com/advanced-git-for-pythonistas/</a:t>
-            </a:r>
-            <a:r>
-              <a:rPr lang="en-BE" sz="2100" dirty="0" smtClean="0"/>
-              <a:t> </a:t>
-            </a:r>
-            <a:endParaRPr lang="nl-BE" dirty="0" smtClean="0"/>
-          </a:p>
-        </p:txBody>
-      </p:sp>
-      <p:sp>
-        <p:nvSpPr>
-          <p:cNvPr id="4" name="Slide Number Placeholder 3"/>
-          <p:cNvSpPr>
-            <a:spLocks noGrp="1"/>
-          </p:cNvSpPr>
-          <p:nvPr>
-            <p:ph type="sldNum" sz="quarter" idx="12"/>
-          </p:nvPr>
-        </p:nvSpPr>
-        <p:spPr/>
-        <p:txBody>
-          <a:bodyPr/>
-          <a:lstStyle/>
-          <a:p>
-            <a:fld id="{BB52A05A-A776-4391-ACD7-D6BC34D3145C}" type="slidenum">
-              <a:rPr lang="nl-BE" smtClean="0"/>
-              <a:t>69</a:t>
-            </a:fld>
-            <a:endParaRPr lang="nl-BE"/>
-          </a:p>
-        </p:txBody>
-      </p:sp>
-    </p:spTree>
-    <p:extLst>
-      <p:ext uri="{BB962C8B-B14F-4D97-AF65-F5344CB8AC3E}">
-        <p14:creationId xmlns:p14="http://schemas.microsoft.com/office/powerpoint/2010/main" val="2976133738"/>
-      </p:ext>
-    </p:extLst>
-  </p:cSld>
-  <p:clrMapOvr>
-    <a:masterClrMapping/>
-  </p:clrMapOvr>
-  <p:timing>
-    <p:tnLst>
-      <p:par>
-        <p:cTn id="1" dur="indefinite" restart="never" nodeType="tmRoot"/>
-      </p:par>
-    </p:tnLst>
   </p:timing>
 </p:sld>
 </file>
@@ -48610,7 +48664,7 @@
           <a:p>
             <a:r>
               <a:rPr lang="en-US" dirty="0" smtClean="0"/>
-              <a:t>Software &amp; tools</a:t>
+              <a:t>References</a:t>
             </a:r>
             <a:endParaRPr lang="nl-BE" dirty="0"/>
           </a:p>
@@ -48626,222 +48680,214 @@
             <p:ph idx="1"/>
           </p:nvPr>
         </p:nvSpPr>
-        <p:spPr>
-          <a:xfrm>
-            <a:off x="457200" y="1600201"/>
-            <a:ext cx="8229600" cy="5069159"/>
-          </a:xfrm>
-        </p:spPr>
+        <p:spPr/>
         <p:txBody>
           <a:bodyPr>
-            <a:normAutofit fontScale="92500" lnSpcReduction="20000"/>
+            <a:normAutofit fontScale="77500" lnSpcReduction="20000"/>
           </a:bodyPr>
           <a:lstStyle/>
           <a:p>
             <a:r>
+              <a:rPr lang="en-US" dirty="0" smtClean="0"/>
+              <a:t>Online documentation (including movies)</a:t>
+            </a:r>
+            <a:br>
+              <a:rPr lang="en-US" dirty="0" smtClean="0"/>
+            </a:br>
+            <a:r>
+              <a:rPr lang="nl-BE" sz="2300" dirty="0" smtClean="0">
+                <a:hlinkClick r:id="rId2"/>
+              </a:rPr>
+              <a:t>http://git-scm.com/documentation</a:t>
+            </a:r>
+            <a:endParaRPr lang="nl-BE" dirty="0" smtClean="0"/>
+          </a:p>
+          <a:p>
+            <a:r>
+              <a:rPr lang="en-US" dirty="0" err="1"/>
+              <a:t>g</a:t>
+            </a:r>
+            <a:r>
+              <a:rPr lang="en-US" dirty="0" err="1" smtClean="0"/>
+              <a:t>it</a:t>
+            </a:r>
+            <a:r>
+              <a:rPr lang="en-US" dirty="0" smtClean="0"/>
+              <a:t> web site</a:t>
+            </a:r>
+            <a:br>
+              <a:rPr lang="en-US" dirty="0" smtClean="0"/>
+            </a:br>
+            <a:r>
+              <a:rPr lang="nl-BE" sz="2400" dirty="0" smtClean="0">
+                <a:hlinkClick r:id="rId3"/>
+              </a:rPr>
+              <a:t>http://git-scm.com/</a:t>
+            </a:r>
+            <a:endParaRPr lang="nl-BE" dirty="0" smtClean="0"/>
+          </a:p>
+          <a:p>
+            <a:r>
+              <a:rPr lang="nl-BE" dirty="0" smtClean="0"/>
+              <a:t>Pro git </a:t>
+            </a:r>
+            <a:r>
+              <a:rPr lang="nl-BE" dirty="0"/>
+              <a:t>online book</a:t>
+            </a:r>
+            <a:br>
+              <a:rPr lang="nl-BE" dirty="0"/>
+            </a:br>
+            <a:r>
+              <a:rPr lang="nl-BE" sz="2100" dirty="0">
+                <a:hlinkClick r:id="rId4"/>
+              </a:rPr>
+              <a:t>https://git-scm.com/book/en/v2</a:t>
+            </a:r>
+            <a:r>
+              <a:rPr lang="nl-BE" sz="2100" dirty="0" smtClean="0">
+                <a:hlinkClick r:id="rId4"/>
+              </a:rPr>
+              <a:t>/</a:t>
+            </a:r>
+            <a:r>
+              <a:rPr lang="nl-BE" sz="2100" dirty="0" smtClean="0"/>
+              <a:t> </a:t>
+            </a:r>
+            <a:endParaRPr lang="nl-BE" dirty="0" smtClean="0"/>
+          </a:p>
+          <a:p>
+            <a:r>
+              <a:rPr lang="en-US" dirty="0" smtClean="0"/>
+              <a:t>Why (the author thinks) you should switch to </a:t>
+            </a:r>
+            <a:r>
               <a:rPr lang="en-US" dirty="0" err="1" smtClean="0"/>
               <a:t>git</a:t>
             </a:r>
             <a:r>
               <a:rPr lang="en-US" dirty="0" smtClean="0"/>
-              <a:t> comes with most Linux distributions</a:t>
-            </a:r>
-          </a:p>
-          <a:p>
-            <a:r>
+              <a:t/>
+            </a:r>
+            <a:br>
               <a:rPr lang="en-US" dirty="0" smtClean="0"/>
-              <a:t>Website &amp; downloads: </a:t>
-            </a:r>
-            <a:r>
-              <a:rPr lang="en-US" dirty="0">
-                <a:hlinkClick r:id="rId3"/>
-              </a:rPr>
-              <a:t>https://git-scm.com</a:t>
-            </a:r>
-            <a:r>
-              <a:rPr lang="en-US" dirty="0" smtClean="0">
-                <a:hlinkClick r:id="rId3"/>
+            </a:br>
+            <a:r>
+              <a:rPr lang="nl-BE" sz="2300" dirty="0" smtClean="0">
+                <a:hlinkClick r:id="rId5"/>
+              </a:rPr>
+              <a:t>http://blog.teamtreehouse.com/why-you-should-switch-from-subversion-to-git</a:t>
+            </a:r>
+            <a:endParaRPr lang="nl-BE" dirty="0" smtClean="0"/>
+          </a:p>
+          <a:p>
+            <a:r>
+              <a:rPr lang="nl-BE" dirty="0" smtClean="0"/>
+              <a:t>Overview of frequently used git workflows</a:t>
+            </a:r>
+            <a:br>
+              <a:rPr lang="nl-BE" dirty="0" smtClean="0"/>
+            </a:br>
+            <a:r>
+              <a:rPr lang="en-US" sz="2100" dirty="0" smtClean="0">
+                <a:hlinkClick r:id="rId6"/>
+              </a:rPr>
+              <a:t>https</a:t>
+            </a:r>
+            <a:r>
+              <a:rPr lang="en-US" sz="2100" dirty="0">
+                <a:hlinkClick r:id="rId6"/>
+              </a:rPr>
+              <a:t>://</a:t>
+            </a:r>
+            <a:r>
+              <a:rPr lang="en-US" sz="2100" dirty="0" smtClean="0">
+                <a:hlinkClick r:id="rId6"/>
+              </a:rPr>
+              <a:t>www.atlassian.com/git/workflows</a:t>
+            </a:r>
+            <a:endParaRPr lang="en-US" dirty="0" smtClean="0"/>
+          </a:p>
+          <a:p>
+            <a:r>
+              <a:rPr lang="nl-BE" dirty="0" smtClean="0"/>
+              <a:t>Blog posts on "good" commit messages</a:t>
+            </a:r>
+            <a:br>
+              <a:rPr lang="nl-BE" dirty="0" smtClean="0"/>
+            </a:br>
+            <a:r>
+              <a:rPr lang="nl-BE" sz="2100" dirty="0" smtClean="0">
+                <a:hlinkClick r:id="rId7"/>
+              </a:rPr>
+              <a:t>https</a:t>
+            </a:r>
+            <a:r>
+              <a:rPr lang="nl-BE" sz="2100" dirty="0">
+                <a:hlinkClick r:id="rId7"/>
+              </a:rPr>
+              <a:t>://chris.beams.io/posts/git-commit</a:t>
+            </a:r>
+            <a:r>
+              <a:rPr lang="nl-BE" sz="2100" dirty="0" smtClean="0">
+                <a:hlinkClick r:id="rId7"/>
               </a:rPr>
               <a:t>/</a:t>
             </a:r>
             <a:r>
-              <a:rPr lang="en-US" dirty="0" smtClean="0"/>
+              <a:rPr lang="nl-BE" sz="2100" dirty="0" smtClean="0"/>
               <a:t> </a:t>
             </a:r>
-          </a:p>
-          <a:p>
-            <a:r>
-              <a:rPr lang="en-US" dirty="0" smtClean="0"/>
-              <a:t>Desktop clients</a:t>
-            </a:r>
-          </a:p>
-          <a:p>
-            <a:pPr lvl="1"/>
-            <a:r>
-              <a:rPr lang="nl-BE" dirty="0"/>
-              <a:t>GitHub Desktop: </a:t>
-            </a:r>
-            <a:r>
-              <a:rPr lang="nl-BE" dirty="0">
-                <a:hlinkClick r:id="rId4"/>
-              </a:rPr>
-              <a:t>https://desktop.github.com</a:t>
-            </a:r>
-            <a:r>
-              <a:rPr lang="nl-BE" dirty="0" smtClean="0">
-                <a:hlinkClick r:id="rId4"/>
-              </a:rPr>
-              <a:t>/</a:t>
-            </a:r>
-            <a:r>
-              <a:rPr lang="nl-BE" dirty="0" smtClean="0"/>
-              <a:t> (Windows/</a:t>
-            </a:r>
-            <a:r>
-              <a:rPr lang="nl-BE" dirty="0" err="1" smtClean="0"/>
-              <a:t>MacOS</a:t>
-            </a:r>
-            <a:r>
-              <a:rPr lang="nl-BE" dirty="0" smtClean="0"/>
-              <a:t> X)</a:t>
-            </a:r>
-          </a:p>
-          <a:p>
-            <a:pPr lvl="1"/>
-            <a:r>
-              <a:rPr lang="en-US" dirty="0" err="1" smtClean="0"/>
-              <a:t>TortoiseGit</a:t>
-            </a:r>
-            <a:r>
-              <a:rPr lang="en-US" dirty="0"/>
-              <a:t>: </a:t>
-            </a:r>
-            <a:r>
-              <a:rPr lang="en-US" dirty="0">
-                <a:hlinkClick r:id="rId5"/>
-              </a:rPr>
-              <a:t>https://tortoisegit.org</a:t>
-            </a:r>
-            <a:r>
-              <a:rPr lang="en-US" dirty="0" smtClean="0">
-                <a:hlinkClick r:id="rId5"/>
-              </a:rPr>
-              <a:t>/</a:t>
-            </a:r>
-            <a:r>
-              <a:rPr lang="en-US" dirty="0" smtClean="0"/>
-              <a:t> (Windows)</a:t>
-            </a:r>
-          </a:p>
-          <a:p>
-            <a:pPr lvl="1"/>
-            <a:r>
-              <a:rPr lang="en-US" dirty="0" err="1"/>
-              <a:t>g</a:t>
-            </a:r>
-            <a:r>
-              <a:rPr lang="en-US" dirty="0" err="1" smtClean="0"/>
-              <a:t>it</a:t>
-            </a:r>
-            <a:r>
-              <a:rPr lang="en-US" dirty="0" smtClean="0"/>
-              <a:t>-cola</a:t>
-            </a:r>
-            <a:r>
-              <a:rPr lang="en-US" dirty="0"/>
-              <a:t>: </a:t>
-            </a:r>
-            <a:r>
-              <a:rPr lang="en-US" dirty="0">
-                <a:hlinkClick r:id="rId6"/>
-              </a:rPr>
-              <a:t>http://git-cola.github.io</a:t>
-            </a:r>
-            <a:r>
-              <a:rPr lang="en-US" dirty="0" smtClean="0">
-                <a:hlinkClick r:id="rId6"/>
-              </a:rPr>
-              <a:t>/</a:t>
-            </a:r>
-            <a:r>
-              <a:rPr lang="en-US" dirty="0" smtClean="0"/>
-              <a:t> (Linux/Windows/</a:t>
-            </a:r>
-            <a:r>
-              <a:rPr lang="en-US" dirty="0" err="1" smtClean="0"/>
-              <a:t>MacOS</a:t>
-            </a:r>
-            <a:r>
-              <a:rPr lang="en-US" dirty="0" smtClean="0"/>
-              <a:t> X)</a:t>
-            </a:r>
-          </a:p>
-          <a:p>
-            <a:r>
-              <a:rPr lang="en-US" dirty="0" err="1" smtClean="0"/>
-              <a:t>vcsh</a:t>
-            </a:r>
-            <a:r>
-              <a:rPr lang="en-US" dirty="0" smtClean="0"/>
-              <a:t>, </a:t>
-            </a:r>
-            <a:r>
-              <a:rPr lang="en-US" dirty="0"/>
-              <a:t>version control for configuration </a:t>
-            </a:r>
-            <a:r>
-              <a:rPr lang="en-US" dirty="0" smtClean="0"/>
-              <a:t>files: </a:t>
-            </a:r>
-            <a:r>
-              <a:rPr lang="en-US" dirty="0">
-                <a:hlinkClick r:id="rId7"/>
+            <a:r>
+              <a:rPr lang="nl-BE" sz="2100" dirty="0"/>
+              <a:t/>
+            </a:r>
+            <a:br>
+              <a:rPr lang="nl-BE" sz="2100" dirty="0"/>
+            </a:br>
+            <a:r>
+              <a:rPr lang="nl-BE" sz="2100" dirty="0">
+                <a:hlinkClick r:id="rId8"/>
               </a:rPr>
               <a:t>https://</a:t>
             </a:r>
             <a:r>
-              <a:rPr lang="en-US" dirty="0" smtClean="0">
-                <a:hlinkClick r:id="rId7"/>
-              </a:rPr>
-              <a:t>github.com/RichiH/vcsh</a:t>
-            </a:r>
-            <a:r>
-              <a:rPr lang="en-US" dirty="0" smtClean="0"/>
-              <a:t> (Linux)</a:t>
-            </a:r>
-          </a:p>
-          <a:p>
-            <a:r>
-              <a:rPr lang="en-US" dirty="0" smtClean="0"/>
-              <a:t>git-prompt.sh, show </a:t>
-            </a:r>
-            <a:r>
-              <a:rPr lang="en-US" dirty="0" err="1" smtClean="0"/>
-              <a:t>git</a:t>
-            </a:r>
-            <a:r>
-              <a:rPr lang="en-US" dirty="0" smtClean="0"/>
-              <a:t> info in command line prompt: </a:t>
-            </a:r>
-            <a:r>
-              <a:rPr lang="en-US" dirty="0">
+              <a:rPr lang="nl-BE" sz="2100" dirty="0" smtClean="0">
                 <a:hlinkClick r:id="rId8"/>
               </a:rPr>
-              <a:t>http://git-prompt.sh</a:t>
-            </a:r>
-            <a:r>
-              <a:rPr lang="en-US" dirty="0" smtClean="0">
-                <a:hlinkClick r:id="rId8"/>
-              </a:rPr>
-              <a:t>/</a:t>
-            </a:r>
-            <a:r>
-              <a:rPr lang="en-US" dirty="0" smtClean="0"/>
-              <a:t> (Linux)</a:t>
-            </a:r>
-          </a:p>
-          <a:p>
-            <a:endParaRPr lang="nl-BE" dirty="0"/>
+              <a:t>thoughtbot.com/blog/5-useful-tips-for-a-better-commit-message</a:t>
+            </a:r>
+            <a:r>
+              <a:rPr lang="nl-BE" sz="2100" dirty="0" smtClean="0"/>
+              <a:t> </a:t>
+            </a:r>
+            <a:endParaRPr lang="en-BE" sz="2100" dirty="0" smtClean="0"/>
+          </a:p>
+          <a:p>
+            <a:r>
+              <a:rPr lang="en-BE" dirty="0" smtClean="0"/>
+              <a:t>Nice article on some git features &amp; techniques</a:t>
+            </a:r>
+            <a:br>
+              <a:rPr lang="en-BE" dirty="0" smtClean="0"/>
+            </a:br>
+            <a:r>
+              <a:rPr lang="en-US" sz="2100" dirty="0">
+                <a:hlinkClick r:id="rId9"/>
+              </a:rPr>
+              <a:t>https://</a:t>
+            </a:r>
+            <a:r>
+              <a:rPr lang="en-US" sz="2100" dirty="0" smtClean="0">
+                <a:hlinkClick r:id="rId9"/>
+              </a:rPr>
+              <a:t>realpython.com/advanced-git-for-pythonistas/</a:t>
+            </a:r>
+            <a:r>
+              <a:rPr lang="en-BE" sz="2100" dirty="0" smtClean="0"/>
+              <a:t> </a:t>
+            </a:r>
+            <a:endParaRPr lang="nl-BE" dirty="0" smtClean="0"/>
           </a:p>
         </p:txBody>
       </p:sp>
@@ -48871,7 +48917,7 @@
     </p:spTree>
     <p:extLst>
       <p:ext uri="{BB962C8B-B14F-4D97-AF65-F5344CB8AC3E}">
-        <p14:creationId xmlns:p14="http://schemas.microsoft.com/office/powerpoint/2010/main" val="3855217261"/>
+        <p14:creationId xmlns:p14="http://schemas.microsoft.com/office/powerpoint/2010/main" val="2976133738"/>
       </p:ext>
     </p:extLst>
   </p:cSld>
@@ -48922,6 +48968,318 @@
           <a:p>
             <a:r>
               <a:rPr lang="en-US" dirty="0" smtClean="0"/>
+              <a:t>Software &amp; tools</a:t>
+            </a:r>
+            <a:endParaRPr lang="nl-BE" dirty="0"/>
+          </a:p>
+        </p:txBody>
+      </p:sp>
+      <p:sp>
+        <p:nvSpPr>
+          <p:cNvPr id="3" name="Content Placeholder 2"/>
+          <p:cNvSpPr>
+            <a:spLocks noGrp="1"/>
+          </p:cNvSpPr>
+          <p:nvPr>
+            <p:ph idx="1"/>
+          </p:nvPr>
+        </p:nvSpPr>
+        <p:spPr>
+          <a:xfrm>
+            <a:off x="457200" y="1600201"/>
+            <a:ext cx="8229600" cy="5069159"/>
+          </a:xfrm>
+        </p:spPr>
+        <p:txBody>
+          <a:bodyPr>
+            <a:normAutofit fontScale="92500" lnSpcReduction="20000"/>
+          </a:bodyPr>
+          <a:lstStyle/>
+          <a:p>
+            <a:r>
+              <a:rPr lang="en-US" dirty="0" err="1" smtClean="0"/>
+              <a:t>git</a:t>
+            </a:r>
+            <a:r>
+              <a:rPr lang="en-US" dirty="0" smtClean="0"/>
+              <a:t> comes with most Linux distributions</a:t>
+            </a:r>
+          </a:p>
+          <a:p>
+            <a:r>
+              <a:rPr lang="en-US" dirty="0" smtClean="0"/>
+              <a:t>Website &amp; downloads: </a:t>
+            </a:r>
+            <a:r>
+              <a:rPr lang="en-US" dirty="0">
+                <a:hlinkClick r:id="rId3"/>
+              </a:rPr>
+              <a:t>https://git-scm.com</a:t>
+            </a:r>
+            <a:r>
+              <a:rPr lang="en-US" dirty="0" smtClean="0">
+                <a:hlinkClick r:id="rId3"/>
+              </a:rPr>
+              <a:t>/</a:t>
+            </a:r>
+            <a:r>
+              <a:rPr lang="en-US" dirty="0" smtClean="0"/>
+              <a:t> </a:t>
+            </a:r>
+          </a:p>
+          <a:p>
+            <a:r>
+              <a:rPr lang="en-US" dirty="0" smtClean="0"/>
+              <a:t>Desktop clients</a:t>
+            </a:r>
+          </a:p>
+          <a:p>
+            <a:pPr lvl="1"/>
+            <a:r>
+              <a:rPr lang="nl-BE" dirty="0"/>
+              <a:t>GitHub Desktop: </a:t>
+            </a:r>
+            <a:r>
+              <a:rPr lang="nl-BE" dirty="0">
+                <a:hlinkClick r:id="rId4"/>
+              </a:rPr>
+              <a:t>https://desktop.github.com</a:t>
+            </a:r>
+            <a:r>
+              <a:rPr lang="nl-BE" dirty="0" smtClean="0">
+                <a:hlinkClick r:id="rId4"/>
+              </a:rPr>
+              <a:t>/</a:t>
+            </a:r>
+            <a:r>
+              <a:rPr lang="nl-BE" dirty="0" smtClean="0"/>
+              <a:t> (Windows/</a:t>
+            </a:r>
+            <a:r>
+              <a:rPr lang="nl-BE" dirty="0" err="1" smtClean="0"/>
+              <a:t>MacOS</a:t>
+            </a:r>
+            <a:r>
+              <a:rPr lang="nl-BE" dirty="0" smtClean="0"/>
+              <a:t> X)</a:t>
+            </a:r>
+          </a:p>
+          <a:p>
+            <a:pPr lvl="1"/>
+            <a:r>
+              <a:rPr lang="en-US" dirty="0" err="1" smtClean="0"/>
+              <a:t>TortoiseGit</a:t>
+            </a:r>
+            <a:r>
+              <a:rPr lang="en-US" dirty="0"/>
+              <a:t>: </a:t>
+            </a:r>
+            <a:r>
+              <a:rPr lang="en-US" dirty="0">
+                <a:hlinkClick r:id="rId5"/>
+              </a:rPr>
+              <a:t>https://tortoisegit.org</a:t>
+            </a:r>
+            <a:r>
+              <a:rPr lang="en-US" dirty="0" smtClean="0">
+                <a:hlinkClick r:id="rId5"/>
+              </a:rPr>
+              <a:t>/</a:t>
+            </a:r>
+            <a:r>
+              <a:rPr lang="en-US" dirty="0" smtClean="0"/>
+              <a:t> (Windows)</a:t>
+            </a:r>
+          </a:p>
+          <a:p>
+            <a:pPr lvl="1"/>
+            <a:r>
+              <a:rPr lang="en-US" dirty="0" err="1"/>
+              <a:t>g</a:t>
+            </a:r>
+            <a:r>
+              <a:rPr lang="en-US" dirty="0" err="1" smtClean="0"/>
+              <a:t>it</a:t>
+            </a:r>
+            <a:r>
+              <a:rPr lang="en-US" dirty="0" smtClean="0"/>
+              <a:t>-cola</a:t>
+            </a:r>
+            <a:r>
+              <a:rPr lang="en-US" dirty="0"/>
+              <a:t>: </a:t>
+            </a:r>
+            <a:r>
+              <a:rPr lang="en-US" dirty="0">
+                <a:hlinkClick r:id="rId6"/>
+              </a:rPr>
+              <a:t>http://git-cola.github.io</a:t>
+            </a:r>
+            <a:r>
+              <a:rPr lang="en-US" dirty="0" smtClean="0">
+                <a:hlinkClick r:id="rId6"/>
+              </a:rPr>
+              <a:t>/</a:t>
+            </a:r>
+            <a:r>
+              <a:rPr lang="en-US" dirty="0" smtClean="0"/>
+              <a:t> (Linux/Windows/</a:t>
+            </a:r>
+            <a:r>
+              <a:rPr lang="en-US" dirty="0" err="1" smtClean="0"/>
+              <a:t>MacOS</a:t>
+            </a:r>
+            <a:r>
+              <a:rPr lang="en-US" dirty="0" smtClean="0"/>
+              <a:t> X)</a:t>
+            </a:r>
+          </a:p>
+          <a:p>
+            <a:r>
+              <a:rPr lang="en-US" dirty="0" err="1" smtClean="0"/>
+              <a:t>vcsh</a:t>
+            </a:r>
+            <a:r>
+              <a:rPr lang="en-US" dirty="0" smtClean="0"/>
+              <a:t>, </a:t>
+            </a:r>
+            <a:r>
+              <a:rPr lang="en-US" dirty="0"/>
+              <a:t>version control for configuration </a:t>
+            </a:r>
+            <a:r>
+              <a:rPr lang="en-US" dirty="0" smtClean="0"/>
+              <a:t>files: </a:t>
+            </a:r>
+            <a:r>
+              <a:rPr lang="en-US" dirty="0">
+                <a:hlinkClick r:id="rId7"/>
+              </a:rPr>
+              <a:t>https://</a:t>
+            </a:r>
+            <a:r>
+              <a:rPr lang="en-US" dirty="0" smtClean="0">
+                <a:hlinkClick r:id="rId7"/>
+              </a:rPr>
+              <a:t>github.com/RichiH/vcsh</a:t>
+            </a:r>
+            <a:r>
+              <a:rPr lang="en-US" dirty="0" smtClean="0"/>
+              <a:t> (Linux)</a:t>
+            </a:r>
+          </a:p>
+          <a:p>
+            <a:r>
+              <a:rPr lang="en-US" dirty="0" smtClean="0"/>
+              <a:t>git-prompt.sh, show </a:t>
+            </a:r>
+            <a:r>
+              <a:rPr lang="en-US" dirty="0" err="1" smtClean="0"/>
+              <a:t>git</a:t>
+            </a:r>
+            <a:r>
+              <a:rPr lang="en-US" dirty="0" smtClean="0"/>
+              <a:t> info in command line prompt: </a:t>
+            </a:r>
+            <a:r>
+              <a:rPr lang="en-US" dirty="0">
+                <a:hlinkClick r:id="rId8"/>
+              </a:rPr>
+              <a:t>http://git-prompt.sh</a:t>
+            </a:r>
+            <a:r>
+              <a:rPr lang="en-US" dirty="0" smtClean="0">
+                <a:hlinkClick r:id="rId8"/>
+              </a:rPr>
+              <a:t>/</a:t>
+            </a:r>
+            <a:r>
+              <a:rPr lang="en-US" dirty="0" smtClean="0"/>
+              <a:t> (Linux)</a:t>
+            </a:r>
+          </a:p>
+          <a:p>
+            <a:endParaRPr lang="nl-BE" dirty="0"/>
+          </a:p>
+        </p:txBody>
+      </p:sp>
+      <p:sp>
+        <p:nvSpPr>
+          <p:cNvPr id="4" name="Slide Number Placeholder 3"/>
+          <p:cNvSpPr>
+            <a:spLocks noGrp="1"/>
+          </p:cNvSpPr>
+          <p:nvPr>
+            <p:ph type="sldNum" sz="quarter" idx="12"/>
+          </p:nvPr>
+        </p:nvSpPr>
+        <p:spPr/>
+        <p:txBody>
+          <a:bodyPr/>
+          <a:lstStyle/>
+          <a:p>
+            <a:fld id="{BB52A05A-A776-4391-ACD7-D6BC34D3145C}" type="slidenum">
+              <a:rPr lang="nl-BE" smtClean="0"/>
+              <a:t>71</a:t>
+            </a:fld>
+            <a:endParaRPr lang="nl-BE"/>
+          </a:p>
+        </p:txBody>
+      </p:sp>
+    </p:spTree>
+    <p:extLst>
+      <p:ext uri="{BB962C8B-B14F-4D97-AF65-F5344CB8AC3E}">
+        <p14:creationId xmlns:p14="http://schemas.microsoft.com/office/powerpoint/2010/main" val="3855217261"/>
+      </p:ext>
+    </p:extLst>
+  </p:cSld>
+  <p:clrMapOvr>
+    <a:masterClrMapping/>
+  </p:clrMapOvr>
+  <p:timing>
+    <p:tnLst>
+      <p:par>
+        <p:cTn id="1" dur="indefinite" restart="never" nodeType="tmRoot"/>
+      </p:par>
+    </p:tnLst>
+  </p:timing>
+</p:sld>
+</file>
+
+<file path=ppt/slides/slide72.xml><?xml version="1.0" encoding="utf-8"?>
+<p:sld xmlns:a="http://schemas.openxmlformats.org/drawingml/2006/main" xmlns:r="http://schemas.openxmlformats.org/officeDocument/2006/relationships" xmlns:p="http://schemas.openxmlformats.org/presentationml/2006/main">
+  <p:cSld>
+    <p:spTree>
+      <p:nvGrpSpPr>
+        <p:cNvPr id="1" name=""/>
+        <p:cNvGrpSpPr/>
+        <p:nvPr/>
+      </p:nvGrpSpPr>
+      <p:grpSpPr>
+        <a:xfrm>
+          <a:off x="0" y="0"/>
+          <a:ext cx="0" cy="0"/>
+          <a:chOff x="0" y="0"/>
+          <a:chExt cx="0" cy="0"/>
+        </a:xfrm>
+      </p:grpSpPr>
+      <p:sp>
+        <p:nvSpPr>
+          <p:cNvPr id="2" name="Title 1"/>
+          <p:cNvSpPr>
+            <a:spLocks noGrp="1"/>
+          </p:cNvSpPr>
+          <p:nvPr>
+            <p:ph type="title"/>
+          </p:nvPr>
+        </p:nvSpPr>
+        <p:spPr/>
+        <p:txBody>
+          <a:bodyPr/>
+          <a:lstStyle/>
+          <a:p>
+            <a:r>
+              <a:rPr lang="en-US" dirty="0" smtClean="0"/>
               <a:t>Services</a:t>
             </a:r>
             <a:endParaRPr lang="nl-BE" dirty="0"/>
@@ -49047,7 +49405,7 @@
           <a:p>
             <a:fld id="{BB52A05A-A776-4391-ACD7-D6BC34D3145C}" type="slidenum">
               <a:rPr lang="nl-BE" smtClean="0"/>
-              <a:t>71</a:t>
+              <a:t>72</a:t>
             </a:fld>
             <a:endParaRPr lang="nl-BE"/>
           </a:p>

</xml_diff>

<commit_message>
Add comparison between branches; new section title slide
</commit_message>
<xml_diff>
--- a/LinuxTools/VersionControl/version_control_git.pptx
+++ b/LinuxTools/VersionControl/version_control_git.pptx
@@ -5,7 +5,7 @@
     <p:sldMasterId id="2147483648" r:id="rId1"/>
   </p:sldMasterIdLst>
   <p:notesMasterIdLst>
-    <p:notesMasterId r:id="rId74"/>
+    <p:notesMasterId r:id="rId76"/>
   </p:notesMasterIdLst>
   <p:sldIdLst>
     <p:sldId id="256" r:id="rId2"/>
@@ -66,20 +66,22 @@
     <p:sldId id="327" r:id="rId57"/>
     <p:sldId id="328" r:id="rId58"/>
     <p:sldId id="329" r:id="rId59"/>
-    <p:sldId id="305" r:id="rId60"/>
-    <p:sldId id="312" r:id="rId61"/>
-    <p:sldId id="330" r:id="rId62"/>
-    <p:sldId id="309" r:id="rId63"/>
-    <p:sldId id="307" r:id="rId64"/>
-    <p:sldId id="314" r:id="rId65"/>
-    <p:sldId id="315" r:id="rId66"/>
-    <p:sldId id="320" r:id="rId67"/>
-    <p:sldId id="316" r:id="rId68"/>
-    <p:sldId id="300" r:id="rId69"/>
-    <p:sldId id="301" r:id="rId70"/>
-    <p:sldId id="299" r:id="rId71"/>
-    <p:sldId id="310" r:id="rId72"/>
-    <p:sldId id="313" r:id="rId73"/>
+    <p:sldId id="332" r:id="rId60"/>
+    <p:sldId id="331" r:id="rId61"/>
+    <p:sldId id="305" r:id="rId62"/>
+    <p:sldId id="312" r:id="rId63"/>
+    <p:sldId id="330" r:id="rId64"/>
+    <p:sldId id="309" r:id="rId65"/>
+    <p:sldId id="307" r:id="rId66"/>
+    <p:sldId id="314" r:id="rId67"/>
+    <p:sldId id="315" r:id="rId68"/>
+    <p:sldId id="320" r:id="rId69"/>
+    <p:sldId id="316" r:id="rId70"/>
+    <p:sldId id="300" r:id="rId71"/>
+    <p:sldId id="301" r:id="rId72"/>
+    <p:sldId id="299" r:id="rId73"/>
+    <p:sldId id="310" r:id="rId74"/>
+    <p:sldId id="313" r:id="rId75"/>
   </p:sldIdLst>
   <p:sldSz cx="9144000" cy="6858000" type="screen4x3"/>
   <p:notesSz cx="6858000" cy="9144000"/>
@@ -253,6 +255,8 @@
             <p14:sldId id="327"/>
             <p14:sldId id="328"/>
             <p14:sldId id="329"/>
+            <p14:sldId id="332"/>
+            <p14:sldId id="331"/>
             <p14:sldId id="305"/>
             <p14:sldId id="312"/>
             <p14:sldId id="330"/>
@@ -390,7 +394,7 @@
           <a:p>
             <a:fld id="{11D3E7B2-0861-45F0-B59E-BA867D5C805D}" type="datetimeFigureOut">
               <a:rPr lang="nl-BE" smtClean="0"/>
-              <a:t>28/08/2019</a:t>
+              <a:t>30/09/2019</a:t>
             </a:fld>
             <a:endParaRPr lang="nl-BE"/>
           </a:p>
@@ -807,7 +811,7 @@
           <a:p>
             <a:fld id="{1A571F42-F258-455F-A3F1-D2E86FDFEB4C}" type="slidenum">
               <a:rPr lang="nl-BE" smtClean="0"/>
-              <a:t>71</a:t>
+              <a:t>73</a:t>
             </a:fld>
             <a:endParaRPr lang="nl-BE"/>
           </a:p>
@@ -1007,7 +1011,7 @@
           <a:p>
             <a:fld id="{208C4982-2142-4DAC-808C-52C1A6ABA40A}" type="datetime1">
               <a:rPr lang="nl-BE" smtClean="0"/>
-              <a:t>28/08/2019</a:t>
+              <a:t>30/09/2019</a:t>
             </a:fld>
             <a:endParaRPr lang="nl-BE"/>
           </a:p>
@@ -1177,7 +1181,7 @@
           <a:p>
             <a:fld id="{596A4774-AA95-4CEA-9215-BE91EC5FD3A2}" type="datetime1">
               <a:rPr lang="nl-BE" smtClean="0"/>
-              <a:t>28/08/2019</a:t>
+              <a:t>30/09/2019</a:t>
             </a:fld>
             <a:endParaRPr lang="nl-BE"/>
           </a:p>
@@ -1357,7 +1361,7 @@
           <a:p>
             <a:fld id="{E3C938DE-9D5A-4A9D-B2A9-9053FBBA636A}" type="datetime1">
               <a:rPr lang="nl-BE" smtClean="0"/>
-              <a:t>28/08/2019</a:t>
+              <a:t>30/09/2019</a:t>
             </a:fld>
             <a:endParaRPr lang="nl-BE"/>
           </a:p>
@@ -1527,7 +1531,7 @@
           <a:p>
             <a:fld id="{70B73439-F632-4142-A813-39A8890A9414}" type="datetime1">
               <a:rPr lang="nl-BE" smtClean="0"/>
-              <a:t>28/08/2019</a:t>
+              <a:t>30/09/2019</a:t>
             </a:fld>
             <a:endParaRPr lang="nl-BE"/>
           </a:p>
@@ -1773,7 +1777,7 @@
           <a:p>
             <a:fld id="{2DA105E3-7574-4472-893A-A0C7A919BAE6}" type="datetime1">
               <a:rPr lang="nl-BE" smtClean="0"/>
-              <a:t>28/08/2019</a:t>
+              <a:t>30/09/2019</a:t>
             </a:fld>
             <a:endParaRPr lang="nl-BE"/>
           </a:p>
@@ -2061,7 +2065,7 @@
           <a:p>
             <a:fld id="{184B200F-AF61-4171-AE34-7A4B12E0FBA3}" type="datetime1">
               <a:rPr lang="nl-BE" smtClean="0"/>
-              <a:t>28/08/2019</a:t>
+              <a:t>30/09/2019</a:t>
             </a:fld>
             <a:endParaRPr lang="nl-BE"/>
           </a:p>
@@ -2483,7 +2487,7 @@
           <a:p>
             <a:fld id="{4DDD3743-DAF8-4465-AEC2-93735E02B3D0}" type="datetime1">
               <a:rPr lang="nl-BE" smtClean="0"/>
-              <a:t>28/08/2019</a:t>
+              <a:t>30/09/2019</a:t>
             </a:fld>
             <a:endParaRPr lang="nl-BE"/>
           </a:p>
@@ -2601,7 +2605,7 @@
           <a:p>
             <a:fld id="{0E48E2E9-C147-459B-ACCB-D6DDC51735D3}" type="datetime1">
               <a:rPr lang="nl-BE" smtClean="0"/>
-              <a:t>28/08/2019</a:t>
+              <a:t>30/09/2019</a:t>
             </a:fld>
             <a:endParaRPr lang="nl-BE"/>
           </a:p>
@@ -2696,7 +2700,7 @@
           <a:p>
             <a:fld id="{C92A24F5-0967-4B11-849A-0009476290B5}" type="datetime1">
               <a:rPr lang="nl-BE" smtClean="0"/>
-              <a:t>28/08/2019</a:t>
+              <a:t>30/09/2019</a:t>
             </a:fld>
             <a:endParaRPr lang="nl-BE"/>
           </a:p>
@@ -2973,7 +2977,7 @@
           <a:p>
             <a:fld id="{CAAB6B0C-E333-4316-A6EC-161EFC5CB4BD}" type="datetime1">
               <a:rPr lang="nl-BE" smtClean="0"/>
-              <a:t>28/08/2019</a:t>
+              <a:t>30/09/2019</a:t>
             </a:fld>
             <a:endParaRPr lang="nl-BE"/>
           </a:p>
@@ -3226,7 +3230,7 @@
           <a:p>
             <a:fld id="{5AC2428B-24E8-4004-8AB4-EA69DDAD1475}" type="datetime1">
               <a:rPr lang="nl-BE" smtClean="0"/>
-              <a:t>28/08/2019</a:t>
+              <a:t>30/09/2019</a:t>
             </a:fld>
             <a:endParaRPr lang="nl-BE"/>
           </a:p>
@@ -3439,7 +3443,7 @@
           <a:p>
             <a:fld id="{063E4CA3-87AF-44C9-B256-93720A95DFC3}" type="datetime1">
               <a:rPr lang="nl-BE" smtClean="0"/>
-              <a:t>28/08/2019</a:t>
+              <a:t>30/09/2019</a:t>
             </a:fld>
             <a:endParaRPr lang="nl-BE"/>
           </a:p>
@@ -42001,7 +42005,7 @@
       </p:grpSpPr>
       <p:sp>
         <p:nvSpPr>
-          <p:cNvPr id="2" name="Title 1"/>
+          <p:cNvPr id="4" name="Title 3"/>
           <p:cNvSpPr>
             <a:spLocks noGrp="1"/>
           </p:cNvSpPr>
@@ -42016,15 +42020,15 @@
           <a:p>
             <a:r>
               <a:rPr lang="en-US" dirty="0" smtClean="0"/>
-              <a:t>A few shortcuts</a:t>
-            </a:r>
-            <a:endParaRPr lang="nl-BE" dirty="0"/>
+              <a:t>Diff with another branch</a:t>
+            </a:r>
+            <a:endParaRPr lang="en-US" dirty="0"/>
           </a:p>
         </p:txBody>
       </p:sp>
       <p:sp>
         <p:nvSpPr>
-          <p:cNvPr id="3" name="Content Placeholder 2"/>
+          <p:cNvPr id="5" name="Content Placeholder 4"/>
           <p:cNvSpPr>
             <a:spLocks noGrp="1"/>
           </p:cNvSpPr>
@@ -42039,53 +42043,85 @@
           <a:p>
             <a:r>
               <a:rPr lang="en-US" dirty="0" smtClean="0"/>
-              <a:t>Commit all modified files</a:t>
-            </a:r>
-          </a:p>
-          <a:p>
-            <a:pPr lvl="1"/>
-            <a:endParaRPr lang="en-US" dirty="0"/>
-          </a:p>
-          <a:p>
-            <a:pPr lvl="1"/>
-            <a:r>
-              <a:rPr lang="en-US" dirty="0" smtClean="0"/>
-              <a:t>Will commit only modified, tracked files</a:t>
-            </a:r>
-          </a:p>
-          <a:p>
-            <a:r>
-              <a:rPr lang="en-US" dirty="0" smtClean="0"/>
-              <a:t>Create new branch and switch to </a:t>
-            </a:r>
-            <a:r>
-              <a:rPr lang="en-US" dirty="0" smtClean="0"/>
-              <a:t>it</a:t>
-            </a:r>
-            <a:endParaRPr lang="en-BE" dirty="0" smtClean="0"/>
-          </a:p>
-          <a:p>
-            <a:endParaRPr lang="en-BE" dirty="0"/>
-          </a:p>
-          <a:p>
-            <a:r>
-              <a:rPr lang="en-BE" dirty="0" smtClean="0"/>
-              <a:t>Switch back to previous branch</a:t>
-            </a:r>
-            <a:endParaRPr lang="nl-BE" dirty="0"/>
+              <a:t>To see all differences with, e.g., </a:t>
+            </a:r>
+            <a:r>
+              <a:rPr lang="en-US" dirty="0" smtClean="0">
+                <a:latin typeface="Courier New" panose="02070309020205020404" pitchFamily="49" charset="0"/>
+                <a:cs typeface="Courier New" panose="02070309020205020404" pitchFamily="49" charset="0"/>
+              </a:rPr>
+              <a:t>master</a:t>
+            </a:r>
+          </a:p>
+          <a:p>
+            <a:endParaRPr lang="en-US" dirty="0">
+              <a:latin typeface="Courier New" panose="02070309020205020404" pitchFamily="49" charset="0"/>
+              <a:cs typeface="Courier New" panose="02070309020205020404" pitchFamily="49" charset="0"/>
+            </a:endParaRPr>
+          </a:p>
+          <a:p>
+            <a:r>
+              <a:rPr lang="en-US" dirty="0" smtClean="0">
+                <a:latin typeface="+mj-lt"/>
+                <a:cs typeface="Courier New" panose="02070309020205020404" pitchFamily="49" charset="0"/>
+              </a:rPr>
+              <a:t>To see only file names</a:t>
+            </a:r>
+          </a:p>
+          <a:p>
+            <a:endParaRPr lang="en-US" dirty="0">
+              <a:latin typeface="+mj-lt"/>
+              <a:cs typeface="Courier New" panose="02070309020205020404" pitchFamily="49" charset="0"/>
+            </a:endParaRPr>
+          </a:p>
+          <a:p>
+            <a:r>
+              <a:rPr lang="en-US" dirty="0" smtClean="0">
+                <a:latin typeface="+mj-lt"/>
+                <a:cs typeface="Courier New" panose="02070309020205020404" pitchFamily="49" charset="0"/>
+              </a:rPr>
+              <a:t>Comparing as specific file</a:t>
+            </a:r>
+            <a:endParaRPr lang="en-US" dirty="0">
+              <a:latin typeface="+mj-lt"/>
+              <a:cs typeface="Courier New" panose="02070309020205020404" pitchFamily="49" charset="0"/>
+            </a:endParaRPr>
           </a:p>
         </p:txBody>
       </p:sp>
       <p:sp>
         <p:nvSpPr>
-          <p:cNvPr id="4" name="TextBox 3"/>
+          <p:cNvPr id="3" name="Slide Number Placeholder 2"/>
+          <p:cNvSpPr>
+            <a:spLocks noGrp="1"/>
+          </p:cNvSpPr>
+          <p:nvPr>
+            <p:ph type="sldNum" sz="quarter" idx="12"/>
+          </p:nvPr>
+        </p:nvSpPr>
+        <p:spPr/>
+        <p:txBody>
+          <a:bodyPr/>
+          <a:lstStyle/>
+          <a:p>
+            <a:fld id="{BB52A05A-A776-4391-ACD7-D6BC34D3145C}" type="slidenum">
+              <a:rPr lang="nl-BE" smtClean="0"/>
+              <a:t>59</a:t>
+            </a:fld>
+            <a:endParaRPr lang="nl-BE"/>
+          </a:p>
+        </p:txBody>
+      </p:sp>
+      <p:sp>
+        <p:nvSpPr>
+          <p:cNvPr id="6" name="TextBox 5"/>
           <p:cNvSpPr txBox="1"/>
           <p:nvPr/>
         </p:nvSpPr>
         <p:spPr>
           <a:xfrm>
-            <a:off x="1259632" y="2204864"/>
-            <a:ext cx="6192688" cy="369332"/>
+            <a:off x="879388" y="2267580"/>
+            <a:ext cx="7128792" cy="369332"/>
           </a:xfrm>
           <a:prstGeom prst="rect">
             <a:avLst/>
@@ -42108,21 +42144,35 @@
                 <a:latin typeface="Courier New" pitchFamily="49" charset="0"/>
                 <a:cs typeface="Courier New" pitchFamily="49" charset="0"/>
               </a:rPr>
-              <a:t>$ git commit  -a  -m 'Fix divide by 0 bug'</a:t>
-            </a:r>
+              <a:t>$ git </a:t>
+            </a:r>
+            <a:r>
+              <a:rPr lang="nl-BE" dirty="0" smtClean="0">
+                <a:latin typeface="Courier New" pitchFamily="49" charset="0"/>
+                <a:cs typeface="Courier New" pitchFamily="49" charset="0"/>
+              </a:rPr>
+              <a:t>diff  master</a:t>
+            </a:r>
+            <a:endParaRPr lang="nl-BE" b="1" dirty="0">
+              <a:solidFill>
+                <a:srgbClr val="C00000"/>
+              </a:solidFill>
+              <a:latin typeface="Courier New" pitchFamily="49" charset="0"/>
+              <a:cs typeface="Courier New" pitchFamily="49" charset="0"/>
+            </a:endParaRPr>
           </a:p>
         </p:txBody>
       </p:sp>
       <p:sp>
         <p:nvSpPr>
-          <p:cNvPr id="5" name="TextBox 4"/>
+          <p:cNvPr id="7" name="TextBox 6"/>
           <p:cNvSpPr txBox="1"/>
           <p:nvPr/>
         </p:nvSpPr>
         <p:spPr>
           <a:xfrm>
-            <a:off x="1259632" y="3789040"/>
-            <a:ext cx="6192688" cy="369332"/>
+            <a:off x="827584" y="3491716"/>
+            <a:ext cx="7128792" cy="369332"/>
           </a:xfrm>
           <a:prstGeom prst="rect">
             <a:avLst/>
@@ -42148,27 +42198,16 @@
               <a:t>$ git </a:t>
             </a:r>
             <a:r>
-              <a:rPr lang="nl-BE" dirty="0" err="1" smtClean="0">
-                <a:latin typeface="Courier New" pitchFamily="49" charset="0"/>
-                <a:cs typeface="Courier New" pitchFamily="49" charset="0"/>
-              </a:rPr>
-              <a:t>checkout</a:t>
-            </a:r>
-            <a:r>
               <a:rPr lang="nl-BE" dirty="0" smtClean="0">
                 <a:latin typeface="Courier New" pitchFamily="49" charset="0"/>
                 <a:cs typeface="Courier New" pitchFamily="49" charset="0"/>
               </a:rPr>
-              <a:t>  -b  feature/</a:t>
-            </a:r>
-            <a:r>
-              <a:rPr lang="nl-BE" dirty="0" err="1" smtClean="0">
-                <a:latin typeface="Courier New" pitchFamily="49" charset="0"/>
-                <a:cs typeface="Courier New" pitchFamily="49" charset="0"/>
-              </a:rPr>
-              <a:t>optimization</a:t>
-            </a:r>
-            <a:endParaRPr lang="nl-BE" dirty="0" smtClean="0">
+              <a:t>diff  -name-only  master</a:t>
+            </a:r>
+            <a:endParaRPr lang="nl-BE" b="1" dirty="0">
+              <a:solidFill>
+                <a:srgbClr val="C00000"/>
+              </a:solidFill>
               <a:latin typeface="Courier New" pitchFamily="49" charset="0"/>
               <a:cs typeface="Courier New" pitchFamily="49" charset="0"/>
             </a:endParaRPr>
@@ -42177,37 +42216,14 @@
       </p:sp>
       <p:sp>
         <p:nvSpPr>
-          <p:cNvPr id="6" name="Slide Number Placeholder 5"/>
-          <p:cNvSpPr>
-            <a:spLocks noGrp="1"/>
-          </p:cNvSpPr>
-          <p:nvPr>
-            <p:ph type="sldNum" sz="quarter" idx="12"/>
-          </p:nvPr>
-        </p:nvSpPr>
-        <p:spPr/>
-        <p:txBody>
-          <a:bodyPr/>
-          <a:lstStyle/>
-          <a:p>
-            <a:fld id="{BB52A05A-A776-4391-ACD7-D6BC34D3145C}" type="slidenum">
-              <a:rPr lang="nl-BE" smtClean="0"/>
-              <a:t>59</a:t>
-            </a:fld>
-            <a:endParaRPr lang="nl-BE"/>
-          </a:p>
-        </p:txBody>
-      </p:sp>
-      <p:sp>
-        <p:nvSpPr>
-          <p:cNvPr id="7" name="TextBox 6"/>
+          <p:cNvPr id="8" name="TextBox 7"/>
           <p:cNvSpPr txBox="1"/>
           <p:nvPr/>
         </p:nvSpPr>
         <p:spPr>
           <a:xfrm>
-            <a:off x="1259632" y="5001817"/>
-            <a:ext cx="6192688" cy="369332"/>
+            <a:off x="827584" y="4624273"/>
+            <a:ext cx="7128792" cy="369332"/>
           </a:xfrm>
           <a:prstGeom prst="rect">
             <a:avLst/>
@@ -42230,16 +42246,19 @@
                 <a:latin typeface="Courier New" pitchFamily="49" charset="0"/>
                 <a:cs typeface="Courier New" pitchFamily="49" charset="0"/>
               </a:rPr>
-              <a:t>$ git checkout  </a:t>
+              <a:t>$ git </a:t>
             </a:r>
             <a:r>
               <a:rPr lang="nl-BE" dirty="0" smtClean="0">
                 <a:latin typeface="Courier New" pitchFamily="49" charset="0"/>
                 <a:cs typeface="Courier New" pitchFamily="49" charset="0"/>
               </a:rPr>
-              <a:t>-</a:t>
-            </a:r>
-            <a:endParaRPr lang="nl-BE" dirty="0" smtClean="0">
+              <a:t>diff  -name-only  --  eq.c  master:eq.c</a:t>
+            </a:r>
+            <a:endParaRPr lang="nl-BE" b="1" dirty="0">
+              <a:solidFill>
+                <a:srgbClr val="C00000"/>
+              </a:solidFill>
               <a:latin typeface="Courier New" pitchFamily="49" charset="0"/>
               <a:cs typeface="Courier New" pitchFamily="49" charset="0"/>
             </a:endParaRPr>
@@ -42249,7 +42268,7 @@
     </p:spTree>
     <p:extLst>
       <p:ext uri="{BB962C8B-B14F-4D97-AF65-F5344CB8AC3E}">
-        <p14:creationId xmlns:p14="http://schemas.microsoft.com/office/powerpoint/2010/main" val="3459632536"/>
+        <p14:creationId xmlns:p14="http://schemas.microsoft.com/office/powerpoint/2010/main" val="684438728"/>
       </p:ext>
     </p:extLst>
   </p:cSld>
@@ -42293,7 +42312,7 @@
                                           </p:stCondLst>
                                         </p:cTn>
                                         <p:tgtEl>
-                                          <p:spTgt spid="3">
+                                          <p:spTgt spid="5">
                                             <p:txEl>
                                               <p:pRg st="0" end="0"/>
                                             </p:txEl>
@@ -42324,38 +42343,7 @@
                                           </p:stCondLst>
                                         </p:cTn>
                                         <p:tgtEl>
-                                          <p:spTgt spid="4"/>
-                                        </p:tgtEl>
-                                        <p:attrNameLst>
-                                          <p:attrName>style.visibility</p:attrName>
-                                        </p:attrNameLst>
-                                      </p:cBhvr>
-                                      <p:to>
-                                        <p:strVal val="visible"/>
-                                      </p:to>
-                                    </p:set>
-                                  </p:childTnLst>
-                                </p:cTn>
-                              </p:par>
-                              <p:par>
-                                <p:cTn id="9" presetID="1" presetClass="entr" presetSubtype="0" fill="hold" grpId="0" nodeType="withEffect">
-                                  <p:stCondLst>
-                                    <p:cond delay="0"/>
-                                  </p:stCondLst>
-                                  <p:childTnLst>
-                                    <p:set>
-                                      <p:cBhvr>
-                                        <p:cTn id="10" dur="1" fill="hold">
-                                          <p:stCondLst>
-                                            <p:cond delay="0"/>
-                                          </p:stCondLst>
-                                        </p:cTn>
-                                        <p:tgtEl>
-                                          <p:spTgt spid="3">
-                                            <p:txEl>
-                                              <p:pRg st="2" end="2"/>
-                                            </p:txEl>
-                                          </p:spTgt>
+                                          <p:spTgt spid="6"/>
                                         </p:tgtEl>
                                         <p:attrNameLst>
                                           <p:attrName>style.visibility</p:attrName>
@@ -42375,19 +42363,50 @@
                     </p:cTn>
                   </p:par>
                   <p:par>
-                    <p:cTn id="11" fill="hold">
+                    <p:cTn id="9" fill="hold">
                       <p:stCondLst>
                         <p:cond delay="indefinite"/>
                       </p:stCondLst>
                       <p:childTnLst>
                         <p:par>
-                          <p:cTn id="12" fill="hold">
+                          <p:cTn id="10" fill="hold">
                             <p:stCondLst>
                               <p:cond delay="0"/>
                             </p:stCondLst>
                             <p:childTnLst>
                               <p:par>
-                                <p:cTn id="13" presetID="1" presetClass="entr" presetSubtype="0" fill="hold" grpId="0" nodeType="clickEffect">
+                                <p:cTn id="11" presetID="1" presetClass="entr" presetSubtype="0" fill="hold" grpId="0" nodeType="clickEffect">
+                                  <p:stCondLst>
+                                    <p:cond delay="0"/>
+                                  </p:stCondLst>
+                                  <p:childTnLst>
+                                    <p:set>
+                                      <p:cBhvr>
+                                        <p:cTn id="12" dur="1" fill="hold">
+                                          <p:stCondLst>
+                                            <p:cond delay="0"/>
+                                          </p:stCondLst>
+                                        </p:cTn>
+                                        <p:tgtEl>
+                                          <p:spTgt spid="5">
+                                            <p:txEl>
+                                              <p:pRg st="2" end="2"/>
+                                            </p:txEl>
+                                          </p:spTgt>
+                                        </p:tgtEl>
+                                        <p:attrNameLst>
+                                          <p:attrName>style.visibility</p:attrName>
+                                        </p:attrNameLst>
+                                      </p:cBhvr>
+                                      <p:to>
+                                        <p:strVal val="visible"/>
+                                      </p:to>
+                                    </p:set>
+                                  </p:childTnLst>
+                                </p:cTn>
+                              </p:par>
+                              <p:par>
+                                <p:cTn id="13" presetID="1" presetClass="entr" presetSubtype="0" fill="hold" grpId="0" nodeType="withEffect">
                                   <p:stCondLst>
                                     <p:cond delay="0"/>
                                   </p:stCondLst>
@@ -42400,11 +42419,7 @@
                                           </p:stCondLst>
                                         </p:cTn>
                                         <p:tgtEl>
-                                          <p:spTgt spid="3">
-                                            <p:txEl>
-                                              <p:pRg st="3" end="3"/>
-                                            </p:txEl>
-                                          </p:spTgt>
+                                          <p:spTgt spid="7"/>
                                         </p:tgtEl>
                                         <p:attrNameLst>
                                           <p:attrName>style.visibility</p:attrName>
@@ -42449,9 +42464,9 @@
                                           </p:stCondLst>
                                         </p:cTn>
                                         <p:tgtEl>
-                                          <p:spTgt spid="3">
+                                          <p:spTgt spid="5">
                                             <p:txEl>
-                                              <p:pRg st="5" end="5"/>
+                                              <p:pRg st="4" end="4"/>
                                             </p:txEl>
                                           </p:spTgt>
                                         </p:tgtEl>
@@ -42480,34 +42495,7 @@
                                           </p:stCondLst>
                                         </p:cTn>
                                         <p:tgtEl>
-                                          <p:spTgt spid="5"/>
-                                        </p:tgtEl>
-                                        <p:attrNameLst>
-                                          <p:attrName>style.visibility</p:attrName>
-                                        </p:attrNameLst>
-                                      </p:cBhvr>
-                                      <p:to>
-                                        <p:strVal val="visible"/>
-                                      </p:to>
-                                    </p:set>
-                                  </p:childTnLst>
-                                </p:cTn>
-                              </p:par>
-                              <p:par>
-                                <p:cTn id="21" presetID="1" presetClass="entr" presetSubtype="0" fill="hold" grpId="0" nodeType="withEffect">
-                                  <p:stCondLst>
-                                    <p:cond delay="0"/>
-                                  </p:stCondLst>
-                                  <p:childTnLst>
-                                    <p:set>
-                                      <p:cBhvr>
-                                        <p:cTn id="22" dur="1" fill="hold">
-                                          <p:stCondLst>
-                                            <p:cond delay="0"/>
-                                          </p:stCondLst>
-                                        </p:cTn>
-                                        <p:tgtEl>
-                                          <p:spTgt spid="7"/>
+                                          <p:spTgt spid="8"/>
                                         </p:tgtEl>
                                         <p:attrNameLst>
                                           <p:attrName>style.visibility</p:attrName>
@@ -42548,10 +42536,10 @@
       </p:par>
     </p:tnLst>
     <p:bldLst>
-      <p:bldP spid="3" grpId="0" uiExpand="1" build="p"/>
-      <p:bldP spid="4" grpId="0" animBg="1"/>
-      <p:bldP spid="5" grpId="0" animBg="1"/>
+      <p:bldP spid="5" grpId="0" uiExpand="1" build="p"/>
+      <p:bldP spid="6" grpId="0" animBg="1"/>
       <p:bldP spid="7" grpId="0" animBg="1"/>
+      <p:bldP spid="8" grpId="0" animBg="1"/>
     </p:bldLst>
   </p:timing>
 </p:sld>
@@ -43096,6 +43084,668 @@
           <a:p>
             <a:r>
               <a:rPr lang="en-US" dirty="0" smtClean="0"/>
+              <a:t>Details, details, details…</a:t>
+            </a:r>
+            <a:endParaRPr lang="en-US" dirty="0"/>
+          </a:p>
+        </p:txBody>
+      </p:sp>
+      <p:sp>
+        <p:nvSpPr>
+          <p:cNvPr id="3" name="Text Placeholder 2"/>
+          <p:cNvSpPr>
+            <a:spLocks noGrp="1"/>
+          </p:cNvSpPr>
+          <p:nvPr>
+            <p:ph type="body" idx="1"/>
+          </p:nvPr>
+        </p:nvSpPr>
+        <p:spPr/>
+        <p:txBody>
+          <a:bodyPr/>
+          <a:lstStyle/>
+          <a:p>
+            <a:endParaRPr lang="en-US"/>
+          </a:p>
+        </p:txBody>
+      </p:sp>
+      <p:sp>
+        <p:nvSpPr>
+          <p:cNvPr id="4" name="Slide Number Placeholder 3"/>
+          <p:cNvSpPr>
+            <a:spLocks noGrp="1"/>
+          </p:cNvSpPr>
+          <p:nvPr>
+            <p:ph type="sldNum" sz="quarter" idx="12"/>
+          </p:nvPr>
+        </p:nvSpPr>
+        <p:spPr/>
+        <p:txBody>
+          <a:bodyPr/>
+          <a:lstStyle/>
+          <a:p>
+            <a:fld id="{BB52A05A-A776-4391-ACD7-D6BC34D3145C}" type="slidenum">
+              <a:rPr lang="nl-BE" smtClean="0"/>
+              <a:t>60</a:t>
+            </a:fld>
+            <a:endParaRPr lang="nl-BE"/>
+          </a:p>
+        </p:txBody>
+      </p:sp>
+    </p:spTree>
+    <p:extLst>
+      <p:ext uri="{BB962C8B-B14F-4D97-AF65-F5344CB8AC3E}">
+        <p14:creationId xmlns:p14="http://schemas.microsoft.com/office/powerpoint/2010/main" val="1774941147"/>
+      </p:ext>
+    </p:extLst>
+  </p:cSld>
+  <p:clrMapOvr>
+    <a:masterClrMapping/>
+  </p:clrMapOvr>
+  <p:timing>
+    <p:tnLst>
+      <p:par>
+        <p:cTn id="1" dur="indefinite" restart="never" nodeType="tmRoot"/>
+      </p:par>
+    </p:tnLst>
+  </p:timing>
+</p:sld>
+</file>
+
+<file path=ppt/slides/slide61.xml><?xml version="1.0" encoding="utf-8"?>
+<p:sld xmlns:a="http://schemas.openxmlformats.org/drawingml/2006/main" xmlns:r="http://schemas.openxmlformats.org/officeDocument/2006/relationships" xmlns:p="http://schemas.openxmlformats.org/presentationml/2006/main">
+  <p:cSld>
+    <p:spTree>
+      <p:nvGrpSpPr>
+        <p:cNvPr id="1" name=""/>
+        <p:cNvGrpSpPr/>
+        <p:nvPr/>
+      </p:nvGrpSpPr>
+      <p:grpSpPr>
+        <a:xfrm>
+          <a:off x="0" y="0"/>
+          <a:ext cx="0" cy="0"/>
+          <a:chOff x="0" y="0"/>
+          <a:chExt cx="0" cy="0"/>
+        </a:xfrm>
+      </p:grpSpPr>
+      <p:sp>
+        <p:nvSpPr>
+          <p:cNvPr id="2" name="Title 1"/>
+          <p:cNvSpPr>
+            <a:spLocks noGrp="1"/>
+          </p:cNvSpPr>
+          <p:nvPr>
+            <p:ph type="title"/>
+          </p:nvPr>
+        </p:nvSpPr>
+        <p:spPr/>
+        <p:txBody>
+          <a:bodyPr/>
+          <a:lstStyle/>
+          <a:p>
+            <a:r>
+              <a:rPr lang="en-US" dirty="0" smtClean="0"/>
+              <a:t>A few shortcuts</a:t>
+            </a:r>
+            <a:endParaRPr lang="nl-BE" dirty="0"/>
+          </a:p>
+        </p:txBody>
+      </p:sp>
+      <p:sp>
+        <p:nvSpPr>
+          <p:cNvPr id="3" name="Content Placeholder 2"/>
+          <p:cNvSpPr>
+            <a:spLocks noGrp="1"/>
+          </p:cNvSpPr>
+          <p:nvPr>
+            <p:ph idx="1"/>
+          </p:nvPr>
+        </p:nvSpPr>
+        <p:spPr/>
+        <p:txBody>
+          <a:bodyPr/>
+          <a:lstStyle/>
+          <a:p>
+            <a:r>
+              <a:rPr lang="en-US" dirty="0" smtClean="0"/>
+              <a:t>Commit all modified files</a:t>
+            </a:r>
+          </a:p>
+          <a:p>
+            <a:pPr lvl="1"/>
+            <a:endParaRPr lang="en-US" dirty="0"/>
+          </a:p>
+          <a:p>
+            <a:pPr lvl="1"/>
+            <a:r>
+              <a:rPr lang="en-US" dirty="0" smtClean="0"/>
+              <a:t>Will commit only modified, tracked files</a:t>
+            </a:r>
+          </a:p>
+          <a:p>
+            <a:r>
+              <a:rPr lang="en-US" dirty="0" smtClean="0"/>
+              <a:t>Create new branch and switch to it</a:t>
+            </a:r>
+            <a:endParaRPr lang="en-BE" dirty="0" smtClean="0"/>
+          </a:p>
+          <a:p>
+            <a:endParaRPr lang="en-BE" dirty="0"/>
+          </a:p>
+          <a:p>
+            <a:r>
+              <a:rPr lang="en-BE" dirty="0" smtClean="0"/>
+              <a:t>Switch back to previous branch</a:t>
+            </a:r>
+            <a:endParaRPr lang="nl-BE" dirty="0"/>
+          </a:p>
+        </p:txBody>
+      </p:sp>
+      <p:sp>
+        <p:nvSpPr>
+          <p:cNvPr id="4" name="TextBox 3"/>
+          <p:cNvSpPr txBox="1"/>
+          <p:nvPr/>
+        </p:nvSpPr>
+        <p:spPr>
+          <a:xfrm>
+            <a:off x="1259632" y="2204864"/>
+            <a:ext cx="6192688" cy="369332"/>
+          </a:xfrm>
+          <a:prstGeom prst="rect">
+            <a:avLst/>
+          </a:prstGeom>
+          <a:noFill/>
+          <a:ln>
+            <a:solidFill>
+              <a:schemeClr val="tx1"/>
+            </a:solidFill>
+          </a:ln>
+        </p:spPr>
+        <p:txBody>
+          <a:bodyPr wrap="square" rtlCol="0">
+            <a:spAutoFit/>
+          </a:bodyPr>
+          <a:lstStyle/>
+          <a:p>
+            <a:r>
+              <a:rPr lang="nl-BE" dirty="0" smtClean="0">
+                <a:latin typeface="Courier New" pitchFamily="49" charset="0"/>
+                <a:cs typeface="Courier New" pitchFamily="49" charset="0"/>
+              </a:rPr>
+              <a:t>$ git commit  -a  -m 'Fix divide by 0 bug'</a:t>
+            </a:r>
+          </a:p>
+        </p:txBody>
+      </p:sp>
+      <p:sp>
+        <p:nvSpPr>
+          <p:cNvPr id="5" name="TextBox 4"/>
+          <p:cNvSpPr txBox="1"/>
+          <p:nvPr/>
+        </p:nvSpPr>
+        <p:spPr>
+          <a:xfrm>
+            <a:off x="1259632" y="3789040"/>
+            <a:ext cx="6192688" cy="369332"/>
+          </a:xfrm>
+          <a:prstGeom prst="rect">
+            <a:avLst/>
+          </a:prstGeom>
+          <a:noFill/>
+          <a:ln>
+            <a:solidFill>
+              <a:schemeClr val="tx1"/>
+            </a:solidFill>
+          </a:ln>
+        </p:spPr>
+        <p:txBody>
+          <a:bodyPr wrap="square" rtlCol="0">
+            <a:spAutoFit/>
+          </a:bodyPr>
+          <a:lstStyle/>
+          <a:p>
+            <a:r>
+              <a:rPr lang="nl-BE" dirty="0" smtClean="0">
+                <a:latin typeface="Courier New" pitchFamily="49" charset="0"/>
+                <a:cs typeface="Courier New" pitchFamily="49" charset="0"/>
+              </a:rPr>
+              <a:t>$ git </a:t>
+            </a:r>
+            <a:r>
+              <a:rPr lang="nl-BE" dirty="0" err="1" smtClean="0">
+                <a:latin typeface="Courier New" pitchFamily="49" charset="0"/>
+                <a:cs typeface="Courier New" pitchFamily="49" charset="0"/>
+              </a:rPr>
+              <a:t>checkout</a:t>
+            </a:r>
+            <a:r>
+              <a:rPr lang="nl-BE" dirty="0" smtClean="0">
+                <a:latin typeface="Courier New" pitchFamily="49" charset="0"/>
+                <a:cs typeface="Courier New" pitchFamily="49" charset="0"/>
+              </a:rPr>
+              <a:t>  -b  feature/</a:t>
+            </a:r>
+            <a:r>
+              <a:rPr lang="nl-BE" dirty="0" err="1" smtClean="0">
+                <a:latin typeface="Courier New" pitchFamily="49" charset="0"/>
+                <a:cs typeface="Courier New" pitchFamily="49" charset="0"/>
+              </a:rPr>
+              <a:t>optimization</a:t>
+            </a:r>
+            <a:endParaRPr lang="nl-BE" dirty="0" smtClean="0">
+              <a:latin typeface="Courier New" pitchFamily="49" charset="0"/>
+              <a:cs typeface="Courier New" pitchFamily="49" charset="0"/>
+            </a:endParaRPr>
+          </a:p>
+        </p:txBody>
+      </p:sp>
+      <p:sp>
+        <p:nvSpPr>
+          <p:cNvPr id="6" name="Slide Number Placeholder 5"/>
+          <p:cNvSpPr>
+            <a:spLocks noGrp="1"/>
+          </p:cNvSpPr>
+          <p:nvPr>
+            <p:ph type="sldNum" sz="quarter" idx="12"/>
+          </p:nvPr>
+        </p:nvSpPr>
+        <p:spPr/>
+        <p:txBody>
+          <a:bodyPr/>
+          <a:lstStyle/>
+          <a:p>
+            <a:fld id="{BB52A05A-A776-4391-ACD7-D6BC34D3145C}" type="slidenum">
+              <a:rPr lang="nl-BE" smtClean="0"/>
+              <a:t>61</a:t>
+            </a:fld>
+            <a:endParaRPr lang="nl-BE"/>
+          </a:p>
+        </p:txBody>
+      </p:sp>
+      <p:sp>
+        <p:nvSpPr>
+          <p:cNvPr id="7" name="TextBox 6"/>
+          <p:cNvSpPr txBox="1"/>
+          <p:nvPr/>
+        </p:nvSpPr>
+        <p:spPr>
+          <a:xfrm>
+            <a:off x="1259632" y="5001817"/>
+            <a:ext cx="6192688" cy="369332"/>
+          </a:xfrm>
+          <a:prstGeom prst="rect">
+            <a:avLst/>
+          </a:prstGeom>
+          <a:noFill/>
+          <a:ln>
+            <a:solidFill>
+              <a:schemeClr val="tx1"/>
+            </a:solidFill>
+          </a:ln>
+        </p:spPr>
+        <p:txBody>
+          <a:bodyPr wrap="square" rtlCol="0">
+            <a:spAutoFit/>
+          </a:bodyPr>
+          <a:lstStyle/>
+          <a:p>
+            <a:r>
+              <a:rPr lang="nl-BE" dirty="0" smtClean="0">
+                <a:latin typeface="Courier New" pitchFamily="49" charset="0"/>
+                <a:cs typeface="Courier New" pitchFamily="49" charset="0"/>
+              </a:rPr>
+              <a:t>$ git checkout  -</a:t>
+            </a:r>
+          </a:p>
+        </p:txBody>
+      </p:sp>
+    </p:spTree>
+    <p:extLst>
+      <p:ext uri="{BB962C8B-B14F-4D97-AF65-F5344CB8AC3E}">
+        <p14:creationId xmlns:p14="http://schemas.microsoft.com/office/powerpoint/2010/main" val="3459632536"/>
+      </p:ext>
+    </p:extLst>
+  </p:cSld>
+  <p:clrMapOvr>
+    <a:masterClrMapping/>
+  </p:clrMapOvr>
+  <p:timing>
+    <p:tnLst>
+      <p:par>
+        <p:cTn id="1" dur="indefinite" restart="never" nodeType="tmRoot">
+          <p:childTnLst>
+            <p:seq concurrent="1" nextAc="seek">
+              <p:cTn id="2" dur="indefinite" nodeType="mainSeq">
+                <p:childTnLst>
+                  <p:par>
+                    <p:cTn id="3" fill="hold">
+                      <p:stCondLst>
+                        <p:cond delay="indefinite"/>
+                        <p:cond evt="onBegin" delay="0">
+                          <p:tn val="2"/>
+                        </p:cond>
+                      </p:stCondLst>
+                      <p:childTnLst>
+                        <p:par>
+                          <p:cTn id="4" fill="hold">
+                            <p:stCondLst>
+                              <p:cond delay="0"/>
+                            </p:stCondLst>
+                            <p:childTnLst>
+                              <p:par>
+                                <p:cTn id="5" presetID="1" presetClass="entr" presetSubtype="0" fill="hold" grpId="0" nodeType="withEffect">
+                                  <p:stCondLst>
+                                    <p:cond delay="0"/>
+                                  </p:stCondLst>
+                                  <p:childTnLst>
+                                    <p:set>
+                                      <p:cBhvr>
+                                        <p:cTn id="6" dur="1" fill="hold">
+                                          <p:stCondLst>
+                                            <p:cond delay="0"/>
+                                          </p:stCondLst>
+                                        </p:cTn>
+                                        <p:tgtEl>
+                                          <p:spTgt spid="3">
+                                            <p:txEl>
+                                              <p:pRg st="0" end="0"/>
+                                            </p:txEl>
+                                          </p:spTgt>
+                                        </p:tgtEl>
+                                        <p:attrNameLst>
+                                          <p:attrName>style.visibility</p:attrName>
+                                        </p:attrNameLst>
+                                      </p:cBhvr>
+                                      <p:to>
+                                        <p:strVal val="visible"/>
+                                      </p:to>
+                                    </p:set>
+                                  </p:childTnLst>
+                                </p:cTn>
+                              </p:par>
+                              <p:par>
+                                <p:cTn id="7" presetID="1" presetClass="entr" presetSubtype="0" fill="hold" grpId="0" nodeType="withEffect">
+                                  <p:stCondLst>
+                                    <p:cond delay="0"/>
+                                  </p:stCondLst>
+                                  <p:childTnLst>
+                                    <p:set>
+                                      <p:cBhvr>
+                                        <p:cTn id="8" dur="1" fill="hold">
+                                          <p:stCondLst>
+                                            <p:cond delay="0"/>
+                                          </p:stCondLst>
+                                        </p:cTn>
+                                        <p:tgtEl>
+                                          <p:spTgt spid="4"/>
+                                        </p:tgtEl>
+                                        <p:attrNameLst>
+                                          <p:attrName>style.visibility</p:attrName>
+                                        </p:attrNameLst>
+                                      </p:cBhvr>
+                                      <p:to>
+                                        <p:strVal val="visible"/>
+                                      </p:to>
+                                    </p:set>
+                                  </p:childTnLst>
+                                </p:cTn>
+                              </p:par>
+                              <p:par>
+                                <p:cTn id="9" presetID="1" presetClass="entr" presetSubtype="0" fill="hold" grpId="0" nodeType="withEffect">
+                                  <p:stCondLst>
+                                    <p:cond delay="0"/>
+                                  </p:stCondLst>
+                                  <p:childTnLst>
+                                    <p:set>
+                                      <p:cBhvr>
+                                        <p:cTn id="10" dur="1" fill="hold">
+                                          <p:stCondLst>
+                                            <p:cond delay="0"/>
+                                          </p:stCondLst>
+                                        </p:cTn>
+                                        <p:tgtEl>
+                                          <p:spTgt spid="3">
+                                            <p:txEl>
+                                              <p:pRg st="2" end="2"/>
+                                            </p:txEl>
+                                          </p:spTgt>
+                                        </p:tgtEl>
+                                        <p:attrNameLst>
+                                          <p:attrName>style.visibility</p:attrName>
+                                        </p:attrNameLst>
+                                      </p:cBhvr>
+                                      <p:to>
+                                        <p:strVal val="visible"/>
+                                      </p:to>
+                                    </p:set>
+                                  </p:childTnLst>
+                                </p:cTn>
+                              </p:par>
+                            </p:childTnLst>
+                          </p:cTn>
+                        </p:par>
+                      </p:childTnLst>
+                    </p:cTn>
+                  </p:par>
+                  <p:par>
+                    <p:cTn id="11" fill="hold">
+                      <p:stCondLst>
+                        <p:cond delay="indefinite"/>
+                      </p:stCondLst>
+                      <p:childTnLst>
+                        <p:par>
+                          <p:cTn id="12" fill="hold">
+                            <p:stCondLst>
+                              <p:cond delay="0"/>
+                            </p:stCondLst>
+                            <p:childTnLst>
+                              <p:par>
+                                <p:cTn id="13" presetID="1" presetClass="entr" presetSubtype="0" fill="hold" grpId="0" nodeType="clickEffect">
+                                  <p:stCondLst>
+                                    <p:cond delay="0"/>
+                                  </p:stCondLst>
+                                  <p:childTnLst>
+                                    <p:set>
+                                      <p:cBhvr>
+                                        <p:cTn id="14" dur="1" fill="hold">
+                                          <p:stCondLst>
+                                            <p:cond delay="0"/>
+                                          </p:stCondLst>
+                                        </p:cTn>
+                                        <p:tgtEl>
+                                          <p:spTgt spid="3">
+                                            <p:txEl>
+                                              <p:pRg st="3" end="3"/>
+                                            </p:txEl>
+                                          </p:spTgt>
+                                        </p:tgtEl>
+                                        <p:attrNameLst>
+                                          <p:attrName>style.visibility</p:attrName>
+                                        </p:attrNameLst>
+                                      </p:cBhvr>
+                                      <p:to>
+                                        <p:strVal val="visible"/>
+                                      </p:to>
+                                    </p:set>
+                                  </p:childTnLst>
+                                </p:cTn>
+                              </p:par>
+                            </p:childTnLst>
+                          </p:cTn>
+                        </p:par>
+                      </p:childTnLst>
+                    </p:cTn>
+                  </p:par>
+                  <p:par>
+                    <p:cTn id="15" fill="hold">
+                      <p:stCondLst>
+                        <p:cond delay="indefinite"/>
+                      </p:stCondLst>
+                      <p:childTnLst>
+                        <p:par>
+                          <p:cTn id="16" fill="hold">
+                            <p:stCondLst>
+                              <p:cond delay="0"/>
+                            </p:stCondLst>
+                            <p:childTnLst>
+                              <p:par>
+                                <p:cTn id="17" presetID="1" presetClass="entr" presetSubtype="0" fill="hold" grpId="0" nodeType="clickEffect">
+                                  <p:stCondLst>
+                                    <p:cond delay="0"/>
+                                  </p:stCondLst>
+                                  <p:childTnLst>
+                                    <p:set>
+                                      <p:cBhvr>
+                                        <p:cTn id="18" dur="1" fill="hold">
+                                          <p:stCondLst>
+                                            <p:cond delay="0"/>
+                                          </p:stCondLst>
+                                        </p:cTn>
+                                        <p:tgtEl>
+                                          <p:spTgt spid="3">
+                                            <p:txEl>
+                                              <p:pRg st="5" end="5"/>
+                                            </p:txEl>
+                                          </p:spTgt>
+                                        </p:tgtEl>
+                                        <p:attrNameLst>
+                                          <p:attrName>style.visibility</p:attrName>
+                                        </p:attrNameLst>
+                                      </p:cBhvr>
+                                      <p:to>
+                                        <p:strVal val="visible"/>
+                                      </p:to>
+                                    </p:set>
+                                  </p:childTnLst>
+                                </p:cTn>
+                              </p:par>
+                              <p:par>
+                                <p:cTn id="19" presetID="1" presetClass="entr" presetSubtype="0" fill="hold" grpId="0" nodeType="withEffect">
+                                  <p:stCondLst>
+                                    <p:cond delay="0"/>
+                                  </p:stCondLst>
+                                  <p:childTnLst>
+                                    <p:set>
+                                      <p:cBhvr>
+                                        <p:cTn id="20" dur="1" fill="hold">
+                                          <p:stCondLst>
+                                            <p:cond delay="0"/>
+                                          </p:stCondLst>
+                                        </p:cTn>
+                                        <p:tgtEl>
+                                          <p:spTgt spid="5"/>
+                                        </p:tgtEl>
+                                        <p:attrNameLst>
+                                          <p:attrName>style.visibility</p:attrName>
+                                        </p:attrNameLst>
+                                      </p:cBhvr>
+                                      <p:to>
+                                        <p:strVal val="visible"/>
+                                      </p:to>
+                                    </p:set>
+                                  </p:childTnLst>
+                                </p:cTn>
+                              </p:par>
+                              <p:par>
+                                <p:cTn id="21" presetID="1" presetClass="entr" presetSubtype="0" fill="hold" grpId="0" nodeType="withEffect">
+                                  <p:stCondLst>
+                                    <p:cond delay="0"/>
+                                  </p:stCondLst>
+                                  <p:childTnLst>
+                                    <p:set>
+                                      <p:cBhvr>
+                                        <p:cTn id="22" dur="1" fill="hold">
+                                          <p:stCondLst>
+                                            <p:cond delay="0"/>
+                                          </p:stCondLst>
+                                        </p:cTn>
+                                        <p:tgtEl>
+                                          <p:spTgt spid="7"/>
+                                        </p:tgtEl>
+                                        <p:attrNameLst>
+                                          <p:attrName>style.visibility</p:attrName>
+                                        </p:attrNameLst>
+                                      </p:cBhvr>
+                                      <p:to>
+                                        <p:strVal val="visible"/>
+                                      </p:to>
+                                    </p:set>
+                                  </p:childTnLst>
+                                </p:cTn>
+                              </p:par>
+                            </p:childTnLst>
+                          </p:cTn>
+                        </p:par>
+                      </p:childTnLst>
+                    </p:cTn>
+                  </p:par>
+                </p:childTnLst>
+              </p:cTn>
+              <p:prevCondLst>
+                <p:cond evt="onPrev" delay="0">
+                  <p:tgtEl>
+                    <p:sldTgt/>
+                  </p:tgtEl>
+                </p:cond>
+              </p:prevCondLst>
+              <p:nextCondLst>
+                <p:cond evt="onNext" delay="0">
+                  <p:tgtEl>
+                    <p:sldTgt/>
+                  </p:tgtEl>
+                </p:cond>
+              </p:nextCondLst>
+            </p:seq>
+          </p:childTnLst>
+        </p:cTn>
+      </p:par>
+    </p:tnLst>
+    <p:bldLst>
+      <p:bldP spid="3" grpId="0" uiExpand="1" build="p"/>
+      <p:bldP spid="4" grpId="0" animBg="1"/>
+      <p:bldP spid="5" grpId="0" animBg="1"/>
+      <p:bldP spid="7" grpId="0" animBg="1"/>
+    </p:bldLst>
+  </p:timing>
+</p:sld>
+</file>
+
+<file path=ppt/slides/slide62.xml><?xml version="1.0" encoding="utf-8"?>
+<p:sld xmlns:a="http://schemas.openxmlformats.org/drawingml/2006/main" xmlns:r="http://schemas.openxmlformats.org/officeDocument/2006/relationships" xmlns:p="http://schemas.openxmlformats.org/presentationml/2006/main">
+  <p:cSld>
+    <p:spTree>
+      <p:nvGrpSpPr>
+        <p:cNvPr id="1" name=""/>
+        <p:cNvGrpSpPr/>
+        <p:nvPr/>
+      </p:nvGrpSpPr>
+      <p:grpSpPr>
+        <a:xfrm>
+          <a:off x="0" y="0"/>
+          <a:ext cx="0" cy="0"/>
+          <a:chOff x="0" y="0"/>
+          <a:chExt cx="0" cy="0"/>
+        </a:xfrm>
+      </p:grpSpPr>
+      <p:sp>
+        <p:nvSpPr>
+          <p:cNvPr id="2" name="Title 1"/>
+          <p:cNvSpPr>
+            <a:spLocks noGrp="1"/>
+          </p:cNvSpPr>
+          <p:nvPr>
+            <p:ph type="title"/>
+          </p:nvPr>
+        </p:nvSpPr>
+        <p:spPr/>
+        <p:txBody>
+          <a:bodyPr/>
+          <a:lstStyle/>
+          <a:p>
+            <a:r>
+              <a:rPr lang="en-US" dirty="0" smtClean="0"/>
               <a:t>Stashing</a:t>
             </a:r>
             <a:endParaRPr lang="en-US" dirty="0"/>
@@ -43121,11 +43771,7 @@
           <a:p>
             <a:r>
               <a:rPr lang="en-US" dirty="0" smtClean="0"/>
-              <a:t>Problem: branch contains modified, tracked </a:t>
-            </a:r>
-            <a:r>
-              <a:rPr lang="en-US" dirty="0" smtClean="0"/>
-              <a:t>files</a:t>
+              <a:t>Problem: branch contains modified, tracked files</a:t>
             </a:r>
             <a:r>
               <a:rPr lang="en-BE" dirty="0" smtClean="0"/>
@@ -43133,11 +43779,7 @@
             </a:r>
             <a:r>
               <a:rPr lang="en-US" dirty="0" smtClean="0"/>
-              <a:t> </a:t>
-            </a:r>
-            <a:r>
-              <a:rPr lang="en-US" dirty="0" smtClean="0"/>
-              <a:t>can't checkout other branch</a:t>
+              <a:t> can't checkout other branch</a:t>
             </a:r>
           </a:p>
           <a:p>
@@ -43213,7 +43855,7 @@
           <a:p>
             <a:fld id="{BB52A05A-A776-4391-ACD7-D6BC34D3145C}" type="slidenum">
               <a:rPr lang="nl-BE" smtClean="0"/>
-              <a:t>60</a:t>
+              <a:t>62</a:t>
             </a:fld>
             <a:endParaRPr lang="nl-BE"/>
           </a:p>
@@ -43871,7 +44513,7 @@
 </p:sld>
 </file>
 
-<file path=ppt/slides/slide61.xml><?xml version="1.0" encoding="utf-8"?>
+<file path=ppt/slides/slide63.xml><?xml version="1.0" encoding="utf-8"?>
 <p:sld xmlns:a="http://schemas.openxmlformats.org/drawingml/2006/main" xmlns:r="http://schemas.openxmlformats.org/officeDocument/2006/relationships" xmlns:p="http://schemas.openxmlformats.org/presentationml/2006/main">
   <p:cSld>
     <p:spTree>
@@ -44034,7 +44676,7 @@
           <a:p>
             <a:fld id="{BB52A05A-A776-4391-ACD7-D6BC34D3145C}" type="slidenum">
               <a:rPr lang="nl-BE" smtClean="0"/>
-              <a:t>61</a:t>
+              <a:t>63</a:t>
             </a:fld>
             <a:endParaRPr lang="nl-BE"/>
           </a:p>
@@ -44282,7 +44924,7 @@
 </p:sld>
 </file>
 
-<file path=ppt/slides/slide62.xml><?xml version="1.0" encoding="utf-8"?>
+<file path=ppt/slides/slide64.xml><?xml version="1.0" encoding="utf-8"?>
 <p:sld xmlns:a="http://schemas.openxmlformats.org/drawingml/2006/main" xmlns:r="http://schemas.openxmlformats.org/officeDocument/2006/relationships" xmlns:p="http://schemas.openxmlformats.org/presentationml/2006/main">
   <p:cSld>
     <p:spTree>
@@ -44537,7 +45179,7 @@
           <a:p>
             <a:fld id="{BB52A05A-A776-4391-ACD7-D6BC34D3145C}" type="slidenum">
               <a:rPr lang="nl-BE" smtClean="0"/>
-              <a:t>62</a:t>
+              <a:t>64</a:t>
             </a:fld>
             <a:endParaRPr lang="nl-BE"/>
           </a:p>
@@ -44841,7 +45483,7 @@
 </p:sld>
 </file>
 
-<file path=ppt/slides/slide63.xml><?xml version="1.0" encoding="utf-8"?>
+<file path=ppt/slides/slide65.xml><?xml version="1.0" encoding="utf-8"?>
 <p:sld xmlns:a="http://schemas.openxmlformats.org/drawingml/2006/main" xmlns:r="http://schemas.openxmlformats.org/officeDocument/2006/relationships" xmlns:p="http://schemas.openxmlformats.org/presentationml/2006/main">
   <p:cSld>
     <p:spTree>
@@ -44900,26 +45542,17 @@
           <a:p>
             <a:r>
               <a:rPr lang="en-US" dirty="0" smtClean="0"/>
-              <a:t>Searching </a:t>
-            </a:r>
+              <a:t>Searching through history, methodically</a:t>
+            </a:r>
+          </a:p>
+          <a:p>
+            <a:endParaRPr lang="en-US" dirty="0"/>
+          </a:p>
+          <a:p>
             <a:r>
               <a:rPr lang="en-US" dirty="0" smtClean="0"/>
-              <a:t>through history, methodically</a:t>
-            </a:r>
-          </a:p>
-          <a:p>
-            <a:endParaRPr lang="en-US" dirty="0"/>
-          </a:p>
-          <a:p>
-            <a:r>
-              <a:rPr lang="en-US" dirty="0" smtClean="0"/>
-              <a:t>Micro-managing </a:t>
-            </a:r>
-            <a:r>
-              <a:rPr lang="en-US" dirty="0" smtClean="0"/>
-              <a:t>commits</a:t>
-            </a:r>
-            <a:endParaRPr lang="en-US" dirty="0" smtClean="0"/>
+              <a:t>Micro-managing commits</a:t>
+            </a:r>
           </a:p>
           <a:p>
             <a:endParaRPr lang="en-US" dirty="0"/>
@@ -44938,7 +45571,6 @@
               <a:rPr lang="en-US" dirty="0" smtClean="0"/>
               <a:t>Adding description to branch</a:t>
             </a:r>
-            <a:endParaRPr lang="en-US" dirty="0" smtClean="0"/>
           </a:p>
           <a:p>
             <a:endParaRPr lang="en-US" dirty="0"/>
@@ -45303,7 +45935,7 @@
           <a:p>
             <a:fld id="{BB52A05A-A776-4391-ACD7-D6BC34D3145C}" type="slidenum">
               <a:rPr lang="nl-BE" smtClean="0"/>
-              <a:t>63</a:t>
+              <a:t>65</a:t>
             </a:fld>
             <a:endParaRPr lang="nl-BE"/>
           </a:p>
@@ -45740,7 +46372,7 @@
 </p:sld>
 </file>
 
-<file path=ppt/slides/slide64.xml><?xml version="1.0" encoding="utf-8"?>
+<file path=ppt/slides/slide66.xml><?xml version="1.0" encoding="utf-8"?>
 <p:sld xmlns:a="http://schemas.openxmlformats.org/drawingml/2006/main" xmlns:r="http://schemas.openxmlformats.org/officeDocument/2006/relationships" xmlns:p="http://schemas.openxmlformats.org/presentationml/2006/main">
   <p:cSld>
     <p:spTree>
@@ -45816,7 +46448,7 @@
           <a:p>
             <a:fld id="{BB52A05A-A776-4391-ACD7-D6BC34D3145C}" type="slidenum">
               <a:rPr lang="nl-BE" smtClean="0"/>
-              <a:t>64</a:t>
+              <a:t>66</a:t>
             </a:fld>
             <a:endParaRPr lang="nl-BE"/>
           </a:p>
@@ -45842,7 +46474,7 @@
 </p:sld>
 </file>
 
-<file path=ppt/slides/slide65.xml><?xml version="1.0" encoding="utf-8"?>
+<file path=ppt/slides/slide67.xml><?xml version="1.0" encoding="utf-8"?>
 <p:sld xmlns:a="http://schemas.openxmlformats.org/drawingml/2006/main" xmlns:r="http://schemas.openxmlformats.org/officeDocument/2006/relationships" xmlns:p="http://schemas.openxmlformats.org/presentationml/2006/main">
   <p:cSld>
     <p:spTree>
@@ -45972,7 +46604,7 @@
           <a:p>
             <a:fld id="{BB52A05A-A776-4391-ACD7-D6BC34D3145C}" type="slidenum">
               <a:rPr lang="nl-BE" smtClean="0"/>
-              <a:t>65</a:t>
+              <a:t>67</a:t>
             </a:fld>
             <a:endParaRPr lang="nl-BE"/>
           </a:p>
@@ -46464,7 +47096,7 @@
 </p:sld>
 </file>
 
-<file path=ppt/slides/slide66.xml><?xml version="1.0" encoding="utf-8"?>
+<file path=ppt/slides/slide68.xml><?xml version="1.0" encoding="utf-8"?>
 <p:sld xmlns:a="http://schemas.openxmlformats.org/drawingml/2006/main" xmlns:r="http://schemas.openxmlformats.org/officeDocument/2006/relationships" xmlns:p="http://schemas.openxmlformats.org/presentationml/2006/main">
   <p:cSld>
     <p:spTree>
@@ -46623,7 +47255,7 @@
           <a:p>
             <a:fld id="{BB52A05A-A776-4391-ACD7-D6BC34D3145C}" type="slidenum">
               <a:rPr lang="nl-BE" smtClean="0"/>
-              <a:t>66</a:t>
+              <a:t>68</a:t>
             </a:fld>
             <a:endParaRPr lang="nl-BE"/>
           </a:p>
@@ -47003,7 +47635,7 @@
 </p:sld>
 </file>
 
-<file path=ppt/slides/slide67.xml><?xml version="1.0" encoding="utf-8"?>
+<file path=ppt/slides/slide69.xml><?xml version="1.0" encoding="utf-8"?>
 <p:sld xmlns:a="http://schemas.openxmlformats.org/drawingml/2006/main" xmlns:r="http://schemas.openxmlformats.org/officeDocument/2006/relationships" xmlns:p="http://schemas.openxmlformats.org/presentationml/2006/main">
   <p:cSld>
     <p:spTree>
@@ -47127,7 +47759,7 @@
           <a:p>
             <a:fld id="{BB52A05A-A776-4391-ACD7-D6BC34D3145C}" type="slidenum">
               <a:rPr lang="nl-BE" smtClean="0"/>
-              <a:t>67</a:t>
+              <a:t>69</a:t>
             </a:fld>
             <a:endParaRPr lang="nl-BE"/>
           </a:p>
@@ -47565,537 +48197,6 @@
     <p:bldLst>
       <p:bldP spid="3" grpId="0" uiExpand="1" build="p" bldLvl="2"/>
       <p:bldP spid="5" grpId="0" animBg="1"/>
-    </p:bldLst>
-  </p:timing>
-</p:sld>
-</file>
-
-<file path=ppt/slides/slide68.xml><?xml version="1.0" encoding="utf-8"?>
-<p:sld xmlns:a="http://schemas.openxmlformats.org/drawingml/2006/main" xmlns:r="http://schemas.openxmlformats.org/officeDocument/2006/relationships" xmlns:p="http://schemas.openxmlformats.org/presentationml/2006/main">
-  <p:cSld>
-    <p:spTree>
-      <p:nvGrpSpPr>
-        <p:cNvPr id="1" name=""/>
-        <p:cNvGrpSpPr/>
-        <p:nvPr/>
-      </p:nvGrpSpPr>
-      <p:grpSpPr>
-        <a:xfrm>
-          <a:off x="0" y="0"/>
-          <a:ext cx="0" cy="0"/>
-          <a:chOff x="0" y="0"/>
-          <a:chExt cx="0" cy="0"/>
-        </a:xfrm>
-      </p:grpSpPr>
-      <p:sp>
-        <p:nvSpPr>
-          <p:cNvPr id="2" name="Title 1"/>
-          <p:cNvSpPr>
-            <a:spLocks noGrp="1"/>
-          </p:cNvSpPr>
-          <p:nvPr>
-            <p:ph type="title"/>
-          </p:nvPr>
-        </p:nvSpPr>
-        <p:spPr/>
-        <p:txBody>
-          <a:bodyPr/>
-          <a:lstStyle/>
-          <a:p>
-            <a:r>
-              <a:rPr lang="en-US" dirty="0" smtClean="0"/>
-              <a:t>Conclusions</a:t>
-            </a:r>
-            <a:endParaRPr lang="nl-BE" dirty="0"/>
-          </a:p>
-        </p:txBody>
-      </p:sp>
-      <p:sp>
-        <p:nvSpPr>
-          <p:cNvPr id="3" name="Text Placeholder 2"/>
-          <p:cNvSpPr>
-            <a:spLocks noGrp="1"/>
-          </p:cNvSpPr>
-          <p:nvPr>
-            <p:ph type="body" idx="1"/>
-          </p:nvPr>
-        </p:nvSpPr>
-        <p:spPr/>
-        <p:txBody>
-          <a:bodyPr/>
-          <a:lstStyle/>
-          <a:p>
-            <a:endParaRPr lang="nl-BE"/>
-          </a:p>
-        </p:txBody>
-      </p:sp>
-      <p:sp>
-        <p:nvSpPr>
-          <p:cNvPr id="4" name="Slide Number Placeholder 3"/>
-          <p:cNvSpPr>
-            <a:spLocks noGrp="1"/>
-          </p:cNvSpPr>
-          <p:nvPr>
-            <p:ph type="sldNum" sz="quarter" idx="12"/>
-          </p:nvPr>
-        </p:nvSpPr>
-        <p:spPr/>
-        <p:txBody>
-          <a:bodyPr/>
-          <a:lstStyle/>
-          <a:p>
-            <a:fld id="{BB52A05A-A776-4391-ACD7-D6BC34D3145C}" type="slidenum">
-              <a:rPr lang="nl-BE" smtClean="0"/>
-              <a:t>68</a:t>
-            </a:fld>
-            <a:endParaRPr lang="nl-BE"/>
-          </a:p>
-        </p:txBody>
-      </p:sp>
-    </p:spTree>
-    <p:extLst>
-      <p:ext uri="{BB962C8B-B14F-4D97-AF65-F5344CB8AC3E}">
-        <p14:creationId xmlns:p14="http://schemas.microsoft.com/office/powerpoint/2010/main" val="2763237186"/>
-      </p:ext>
-    </p:extLst>
-  </p:cSld>
-  <p:clrMapOvr>
-    <a:masterClrMapping/>
-  </p:clrMapOvr>
-  <p:timing>
-    <p:tnLst>
-      <p:par>
-        <p:cTn id="1" dur="indefinite" restart="never" nodeType="tmRoot"/>
-      </p:par>
-    </p:tnLst>
-  </p:timing>
-</p:sld>
-</file>
-
-<file path=ppt/slides/slide69.xml><?xml version="1.0" encoding="utf-8"?>
-<p:sld xmlns:a="http://schemas.openxmlformats.org/drawingml/2006/main" xmlns:r="http://schemas.openxmlformats.org/officeDocument/2006/relationships" xmlns:p="http://schemas.openxmlformats.org/presentationml/2006/main">
-  <p:cSld>
-    <p:spTree>
-      <p:nvGrpSpPr>
-        <p:cNvPr id="1" name=""/>
-        <p:cNvGrpSpPr/>
-        <p:nvPr/>
-      </p:nvGrpSpPr>
-      <p:grpSpPr>
-        <a:xfrm>
-          <a:off x="0" y="0"/>
-          <a:ext cx="0" cy="0"/>
-          <a:chOff x="0" y="0"/>
-          <a:chExt cx="0" cy="0"/>
-        </a:xfrm>
-      </p:grpSpPr>
-      <p:sp>
-        <p:nvSpPr>
-          <p:cNvPr id="2" name="Title 1"/>
-          <p:cNvSpPr>
-            <a:spLocks noGrp="1"/>
-          </p:cNvSpPr>
-          <p:nvPr>
-            <p:ph type="title"/>
-          </p:nvPr>
-        </p:nvSpPr>
-        <p:spPr/>
-        <p:txBody>
-          <a:bodyPr/>
-          <a:lstStyle/>
-          <a:p>
-            <a:r>
-              <a:rPr lang="en-US" dirty="0" smtClean="0"/>
-              <a:t>Conclusions</a:t>
-            </a:r>
-            <a:endParaRPr lang="nl-BE" dirty="0"/>
-          </a:p>
-        </p:txBody>
-      </p:sp>
-      <p:sp>
-        <p:nvSpPr>
-          <p:cNvPr id="3" name="Content Placeholder 2"/>
-          <p:cNvSpPr>
-            <a:spLocks noGrp="1"/>
-          </p:cNvSpPr>
-          <p:nvPr>
-            <p:ph idx="1"/>
-          </p:nvPr>
-        </p:nvSpPr>
-        <p:spPr/>
-        <p:txBody>
-          <a:bodyPr/>
-          <a:lstStyle/>
-          <a:p>
-            <a:r>
-              <a:rPr lang="en-US" dirty="0" smtClean="0"/>
-              <a:t>Contributes to the scientific method</a:t>
-            </a:r>
-          </a:p>
-          <a:p>
-            <a:pPr lvl="1"/>
-            <a:r>
-              <a:rPr lang="en-US" dirty="0" smtClean="0"/>
-              <a:t>Helps ensure reproducibility</a:t>
-            </a:r>
-          </a:p>
-          <a:p>
-            <a:r>
-              <a:rPr lang="en-US" dirty="0" smtClean="0"/>
-              <a:t>Record of change</a:t>
-            </a:r>
-          </a:p>
-          <a:p>
-            <a:pPr lvl="1"/>
-            <a:r>
-              <a:rPr lang="en-US" dirty="0" smtClean="0"/>
-              <a:t>What was changed?</a:t>
-            </a:r>
-          </a:p>
-          <a:p>
-            <a:pPr lvl="1"/>
-            <a:r>
-              <a:rPr lang="en-US" dirty="0" smtClean="0"/>
-              <a:t>When was it changed?</a:t>
-            </a:r>
-          </a:p>
-          <a:p>
-            <a:pPr lvl="1"/>
-            <a:r>
-              <a:rPr lang="en-US" dirty="0" smtClean="0"/>
-              <a:t>Who changed it?</a:t>
-            </a:r>
-          </a:p>
-          <a:p>
-            <a:pPr lvl="1"/>
-            <a:r>
-              <a:rPr lang="en-US" dirty="0" smtClean="0"/>
-              <a:t>Why was it changed?</a:t>
-            </a:r>
-            <a:endParaRPr lang="nl-BE" dirty="0"/>
-          </a:p>
-        </p:txBody>
-      </p:sp>
-      <p:sp>
-        <p:nvSpPr>
-          <p:cNvPr id="4" name="Slide Number Placeholder 3"/>
-          <p:cNvSpPr>
-            <a:spLocks noGrp="1"/>
-          </p:cNvSpPr>
-          <p:nvPr>
-            <p:ph type="sldNum" sz="quarter" idx="12"/>
-          </p:nvPr>
-        </p:nvSpPr>
-        <p:spPr/>
-        <p:txBody>
-          <a:bodyPr/>
-          <a:lstStyle/>
-          <a:p>
-            <a:fld id="{BB52A05A-A776-4391-ACD7-D6BC34D3145C}" type="slidenum">
-              <a:rPr lang="nl-BE" smtClean="0"/>
-              <a:t>69</a:t>
-            </a:fld>
-            <a:endParaRPr lang="nl-BE"/>
-          </a:p>
-        </p:txBody>
-      </p:sp>
-    </p:spTree>
-    <p:extLst>
-      <p:ext uri="{BB962C8B-B14F-4D97-AF65-F5344CB8AC3E}">
-        <p14:creationId xmlns:p14="http://schemas.microsoft.com/office/powerpoint/2010/main" val="2241158897"/>
-      </p:ext>
-    </p:extLst>
-  </p:cSld>
-  <p:clrMapOvr>
-    <a:masterClrMapping/>
-  </p:clrMapOvr>
-  <p:timing>
-    <p:tnLst>
-      <p:par>
-        <p:cTn id="1" dur="indefinite" restart="never" nodeType="tmRoot">
-          <p:childTnLst>
-            <p:seq concurrent="1" nextAc="seek">
-              <p:cTn id="2" dur="indefinite" nodeType="mainSeq">
-                <p:childTnLst>
-                  <p:par>
-                    <p:cTn id="3" fill="hold">
-                      <p:stCondLst>
-                        <p:cond delay="indefinite"/>
-                        <p:cond evt="onBegin" delay="0">
-                          <p:tn val="2"/>
-                        </p:cond>
-                      </p:stCondLst>
-                      <p:childTnLst>
-                        <p:par>
-                          <p:cTn id="4" fill="hold">
-                            <p:stCondLst>
-                              <p:cond delay="0"/>
-                            </p:stCondLst>
-                            <p:childTnLst>
-                              <p:par>
-                                <p:cTn id="5" presetID="1" presetClass="entr" presetSubtype="0" fill="hold" grpId="0" nodeType="withEffect">
-                                  <p:stCondLst>
-                                    <p:cond delay="0"/>
-                                  </p:stCondLst>
-                                  <p:childTnLst>
-                                    <p:set>
-                                      <p:cBhvr>
-                                        <p:cTn id="6" dur="1" fill="hold">
-                                          <p:stCondLst>
-                                            <p:cond delay="0"/>
-                                          </p:stCondLst>
-                                        </p:cTn>
-                                        <p:tgtEl>
-                                          <p:spTgt spid="3">
-                                            <p:txEl>
-                                              <p:pRg st="0" end="0"/>
-                                            </p:txEl>
-                                          </p:spTgt>
-                                        </p:tgtEl>
-                                        <p:attrNameLst>
-                                          <p:attrName>style.visibility</p:attrName>
-                                        </p:attrNameLst>
-                                      </p:cBhvr>
-                                      <p:to>
-                                        <p:strVal val="visible"/>
-                                      </p:to>
-                                    </p:set>
-                                  </p:childTnLst>
-                                </p:cTn>
-                              </p:par>
-                              <p:par>
-                                <p:cTn id="7" presetID="1" presetClass="entr" presetSubtype="0" fill="hold" grpId="0" nodeType="withEffect">
-                                  <p:stCondLst>
-                                    <p:cond delay="0"/>
-                                  </p:stCondLst>
-                                  <p:childTnLst>
-                                    <p:set>
-                                      <p:cBhvr>
-                                        <p:cTn id="8" dur="1" fill="hold">
-                                          <p:stCondLst>
-                                            <p:cond delay="0"/>
-                                          </p:stCondLst>
-                                        </p:cTn>
-                                        <p:tgtEl>
-                                          <p:spTgt spid="3">
-                                            <p:txEl>
-                                              <p:pRg st="1" end="1"/>
-                                            </p:txEl>
-                                          </p:spTgt>
-                                        </p:tgtEl>
-                                        <p:attrNameLst>
-                                          <p:attrName>style.visibility</p:attrName>
-                                        </p:attrNameLst>
-                                      </p:cBhvr>
-                                      <p:to>
-                                        <p:strVal val="visible"/>
-                                      </p:to>
-                                    </p:set>
-                                  </p:childTnLst>
-                                </p:cTn>
-                              </p:par>
-                            </p:childTnLst>
-                          </p:cTn>
-                        </p:par>
-                      </p:childTnLst>
-                    </p:cTn>
-                  </p:par>
-                  <p:par>
-                    <p:cTn id="9" fill="hold">
-                      <p:stCondLst>
-                        <p:cond delay="indefinite"/>
-                      </p:stCondLst>
-                      <p:childTnLst>
-                        <p:par>
-                          <p:cTn id="10" fill="hold">
-                            <p:stCondLst>
-                              <p:cond delay="0"/>
-                            </p:stCondLst>
-                            <p:childTnLst>
-                              <p:par>
-                                <p:cTn id="11" presetID="1" presetClass="entr" presetSubtype="0" fill="hold" grpId="0" nodeType="clickEffect">
-                                  <p:stCondLst>
-                                    <p:cond delay="0"/>
-                                  </p:stCondLst>
-                                  <p:childTnLst>
-                                    <p:set>
-                                      <p:cBhvr>
-                                        <p:cTn id="12" dur="1" fill="hold">
-                                          <p:stCondLst>
-                                            <p:cond delay="0"/>
-                                          </p:stCondLst>
-                                        </p:cTn>
-                                        <p:tgtEl>
-                                          <p:spTgt spid="3">
-                                            <p:txEl>
-                                              <p:pRg st="2" end="2"/>
-                                            </p:txEl>
-                                          </p:spTgt>
-                                        </p:tgtEl>
-                                        <p:attrNameLst>
-                                          <p:attrName>style.visibility</p:attrName>
-                                        </p:attrNameLst>
-                                      </p:cBhvr>
-                                      <p:to>
-                                        <p:strVal val="visible"/>
-                                      </p:to>
-                                    </p:set>
-                                  </p:childTnLst>
-                                </p:cTn>
-                              </p:par>
-                              <p:par>
-                                <p:cTn id="13" presetID="1" presetClass="entr" presetSubtype="0" fill="hold" grpId="0" nodeType="withEffect">
-                                  <p:stCondLst>
-                                    <p:cond delay="0"/>
-                                  </p:stCondLst>
-                                  <p:childTnLst>
-                                    <p:set>
-                                      <p:cBhvr>
-                                        <p:cTn id="14" dur="1" fill="hold">
-                                          <p:stCondLst>
-                                            <p:cond delay="0"/>
-                                          </p:stCondLst>
-                                        </p:cTn>
-                                        <p:tgtEl>
-                                          <p:spTgt spid="3">
-                                            <p:txEl>
-                                              <p:pRg st="3" end="3"/>
-                                            </p:txEl>
-                                          </p:spTgt>
-                                        </p:tgtEl>
-                                        <p:attrNameLst>
-                                          <p:attrName>style.visibility</p:attrName>
-                                        </p:attrNameLst>
-                                      </p:cBhvr>
-                                      <p:to>
-                                        <p:strVal val="visible"/>
-                                      </p:to>
-                                    </p:set>
-                                  </p:childTnLst>
-                                </p:cTn>
-                              </p:par>
-                              <p:par>
-                                <p:cTn id="15" presetID="1" presetClass="entr" presetSubtype="0" fill="hold" grpId="0" nodeType="withEffect">
-                                  <p:stCondLst>
-                                    <p:cond delay="0"/>
-                                  </p:stCondLst>
-                                  <p:childTnLst>
-                                    <p:set>
-                                      <p:cBhvr>
-                                        <p:cTn id="16" dur="1" fill="hold">
-                                          <p:stCondLst>
-                                            <p:cond delay="0"/>
-                                          </p:stCondLst>
-                                        </p:cTn>
-                                        <p:tgtEl>
-                                          <p:spTgt spid="3">
-                                            <p:txEl>
-                                              <p:pRg st="4" end="4"/>
-                                            </p:txEl>
-                                          </p:spTgt>
-                                        </p:tgtEl>
-                                        <p:attrNameLst>
-                                          <p:attrName>style.visibility</p:attrName>
-                                        </p:attrNameLst>
-                                      </p:cBhvr>
-                                      <p:to>
-                                        <p:strVal val="visible"/>
-                                      </p:to>
-                                    </p:set>
-                                  </p:childTnLst>
-                                </p:cTn>
-                              </p:par>
-                              <p:par>
-                                <p:cTn id="17" presetID="1" presetClass="entr" presetSubtype="0" fill="hold" grpId="0" nodeType="withEffect">
-                                  <p:stCondLst>
-                                    <p:cond delay="0"/>
-                                  </p:stCondLst>
-                                  <p:childTnLst>
-                                    <p:set>
-                                      <p:cBhvr>
-                                        <p:cTn id="18" dur="1" fill="hold">
-                                          <p:stCondLst>
-                                            <p:cond delay="0"/>
-                                          </p:stCondLst>
-                                        </p:cTn>
-                                        <p:tgtEl>
-                                          <p:spTgt spid="3">
-                                            <p:txEl>
-                                              <p:pRg st="5" end="5"/>
-                                            </p:txEl>
-                                          </p:spTgt>
-                                        </p:tgtEl>
-                                        <p:attrNameLst>
-                                          <p:attrName>style.visibility</p:attrName>
-                                        </p:attrNameLst>
-                                      </p:cBhvr>
-                                      <p:to>
-                                        <p:strVal val="visible"/>
-                                      </p:to>
-                                    </p:set>
-                                  </p:childTnLst>
-                                </p:cTn>
-                              </p:par>
-                              <p:par>
-                                <p:cTn id="19" presetID="1" presetClass="entr" presetSubtype="0" fill="hold" grpId="0" nodeType="withEffect">
-                                  <p:stCondLst>
-                                    <p:cond delay="0"/>
-                                  </p:stCondLst>
-                                  <p:childTnLst>
-                                    <p:set>
-                                      <p:cBhvr>
-                                        <p:cTn id="20" dur="1" fill="hold">
-                                          <p:stCondLst>
-                                            <p:cond delay="0"/>
-                                          </p:stCondLst>
-                                        </p:cTn>
-                                        <p:tgtEl>
-                                          <p:spTgt spid="3">
-                                            <p:txEl>
-                                              <p:pRg st="6" end="6"/>
-                                            </p:txEl>
-                                          </p:spTgt>
-                                        </p:tgtEl>
-                                        <p:attrNameLst>
-                                          <p:attrName>style.visibility</p:attrName>
-                                        </p:attrNameLst>
-                                      </p:cBhvr>
-                                      <p:to>
-                                        <p:strVal val="visible"/>
-                                      </p:to>
-                                    </p:set>
-                                  </p:childTnLst>
-                                </p:cTn>
-                              </p:par>
-                            </p:childTnLst>
-                          </p:cTn>
-                        </p:par>
-                      </p:childTnLst>
-                    </p:cTn>
-                  </p:par>
-                </p:childTnLst>
-              </p:cTn>
-              <p:prevCondLst>
-                <p:cond evt="onPrev" delay="0">
-                  <p:tgtEl>
-                    <p:sldTgt/>
-                  </p:tgtEl>
-                </p:cond>
-              </p:prevCondLst>
-              <p:nextCondLst>
-                <p:cond evt="onNext" delay="0">
-                  <p:tgtEl>
-                    <p:sldTgt/>
-                  </p:tgtEl>
-                </p:cond>
-              </p:nextCondLst>
-            </p:seq>
-          </p:childTnLst>
-        </p:cTn>
-      </p:par>
-    </p:tnLst>
-    <p:bldLst>
-      <p:bldP spid="3" grpId="0" uiExpand="1" build="p"/>
     </p:bldLst>
   </p:timing>
 </p:sld>
@@ -48664,7 +48765,7 @@
           <a:p>
             <a:r>
               <a:rPr lang="en-US" dirty="0" smtClean="0"/>
-              <a:t>References</a:t>
+              <a:t>Conclusions</a:t>
             </a:r>
             <a:endParaRPr lang="nl-BE" dirty="0"/>
           </a:p>
@@ -48672,222 +48773,20 @@
       </p:sp>
       <p:sp>
         <p:nvSpPr>
-          <p:cNvPr id="3" name="Content Placeholder 2"/>
+          <p:cNvPr id="3" name="Text Placeholder 2"/>
           <p:cNvSpPr>
             <a:spLocks noGrp="1"/>
           </p:cNvSpPr>
           <p:nvPr>
-            <p:ph idx="1"/>
+            <p:ph type="body" idx="1"/>
           </p:nvPr>
         </p:nvSpPr>
         <p:spPr/>
         <p:txBody>
-          <a:bodyPr>
-            <a:normAutofit fontScale="77500" lnSpcReduction="20000"/>
-          </a:bodyPr>
+          <a:bodyPr/>
           <a:lstStyle/>
           <a:p>
-            <a:r>
-              <a:rPr lang="en-US" dirty="0" smtClean="0"/>
-              <a:t>Online documentation (including movies)</a:t>
-            </a:r>
-            <a:br>
-              <a:rPr lang="en-US" dirty="0" smtClean="0"/>
-            </a:br>
-            <a:r>
-              <a:rPr lang="nl-BE" sz="2300" dirty="0" smtClean="0">
-                <a:hlinkClick r:id="rId2"/>
-              </a:rPr>
-              <a:t>http://git-scm.com/documentation</a:t>
-            </a:r>
-            <a:endParaRPr lang="nl-BE" dirty="0" smtClean="0"/>
-          </a:p>
-          <a:p>
-            <a:r>
-              <a:rPr lang="en-US" dirty="0" err="1"/>
-              <a:t>g</a:t>
-            </a:r>
-            <a:r>
-              <a:rPr lang="en-US" dirty="0" err="1" smtClean="0"/>
-              <a:t>it</a:t>
-            </a:r>
-            <a:r>
-              <a:rPr lang="en-US" dirty="0" smtClean="0"/>
-              <a:t> web site</a:t>
-            </a:r>
-            <a:br>
-              <a:rPr lang="en-US" dirty="0" smtClean="0"/>
-            </a:br>
-            <a:r>
-              <a:rPr lang="nl-BE" sz="2400" dirty="0" smtClean="0">
-                <a:hlinkClick r:id="rId3"/>
-              </a:rPr>
-              <a:t>http://git-scm.com/</a:t>
-            </a:r>
-            <a:endParaRPr lang="nl-BE" dirty="0" smtClean="0"/>
-          </a:p>
-          <a:p>
-            <a:r>
-              <a:rPr lang="nl-BE" dirty="0" smtClean="0"/>
-              <a:t>Pro git </a:t>
-            </a:r>
-            <a:r>
-              <a:rPr lang="nl-BE" dirty="0"/>
-              <a:t>online book</a:t>
-            </a:r>
-            <a:br>
-              <a:rPr lang="nl-BE" dirty="0"/>
-            </a:br>
-            <a:r>
-              <a:rPr lang="nl-BE" sz="2100" dirty="0">
-                <a:hlinkClick r:id="rId4"/>
-              </a:rPr>
-              <a:t>https://git-scm.com/book/en/v2</a:t>
-            </a:r>
-            <a:r>
-              <a:rPr lang="nl-BE" sz="2100" dirty="0" smtClean="0">
-                <a:hlinkClick r:id="rId4"/>
-              </a:rPr>
-              <a:t>/</a:t>
-            </a:r>
-            <a:r>
-              <a:rPr lang="nl-BE" sz="2100" dirty="0" smtClean="0"/>
-              <a:t> </a:t>
-            </a:r>
-            <a:endParaRPr lang="nl-BE" dirty="0" smtClean="0"/>
-          </a:p>
-          <a:p>
-            <a:r>
-              <a:rPr lang="en-US" dirty="0" smtClean="0"/>
-              <a:t>Why (the author thinks) you should switch to </a:t>
-            </a:r>
-            <a:r>
-              <a:rPr lang="en-US" dirty="0" err="1" smtClean="0"/>
-              <a:t>git</a:t>
-            </a:r>
-            <a:r>
-              <a:rPr lang="en-US" dirty="0" smtClean="0"/>
-              <a:t/>
-            </a:r>
-            <a:br>
-              <a:rPr lang="en-US" dirty="0" smtClean="0"/>
-            </a:br>
-            <a:r>
-              <a:rPr lang="nl-BE" sz="2300" dirty="0" smtClean="0">
-                <a:hlinkClick r:id="rId5"/>
-              </a:rPr>
-              <a:t>http://blog.teamtreehouse.com/why-you-should-switch-from-subversion-to-git</a:t>
-            </a:r>
-            <a:endParaRPr lang="nl-BE" dirty="0" smtClean="0"/>
-          </a:p>
-          <a:p>
-            <a:r>
-              <a:rPr lang="nl-BE" dirty="0" smtClean="0"/>
-              <a:t>Overview of frequently used git workflows</a:t>
-            </a:r>
-            <a:br>
-              <a:rPr lang="nl-BE" dirty="0" smtClean="0"/>
-            </a:br>
-            <a:r>
-              <a:rPr lang="en-US" sz="2100" dirty="0" smtClean="0">
-                <a:hlinkClick r:id="rId6"/>
-              </a:rPr>
-              <a:t>https</a:t>
-            </a:r>
-            <a:r>
-              <a:rPr lang="en-US" sz="2100" dirty="0">
-                <a:hlinkClick r:id="rId6"/>
-              </a:rPr>
-              <a:t>://</a:t>
-            </a:r>
-            <a:r>
-              <a:rPr lang="en-US" sz="2100" dirty="0" smtClean="0">
-                <a:hlinkClick r:id="rId6"/>
-              </a:rPr>
-              <a:t>www.atlassian.com/git/workflows</a:t>
-            </a:r>
-            <a:endParaRPr lang="en-US" dirty="0" smtClean="0"/>
-          </a:p>
-          <a:p>
-            <a:r>
-              <a:rPr lang="nl-BE" dirty="0" smtClean="0"/>
-              <a:t>Blog posts on "good" commit messages</a:t>
-            </a:r>
-            <a:br>
-              <a:rPr lang="nl-BE" dirty="0" smtClean="0"/>
-            </a:br>
-            <a:r>
-              <a:rPr lang="nl-BE" sz="2100" dirty="0" smtClean="0">
-                <a:hlinkClick r:id="rId7"/>
-              </a:rPr>
-              <a:t>https</a:t>
-            </a:r>
-            <a:r>
-              <a:rPr lang="nl-BE" sz="2100" dirty="0">
-                <a:hlinkClick r:id="rId7"/>
-              </a:rPr>
-              <a:t>://chris.beams.io/posts/git-commit</a:t>
-            </a:r>
-            <a:r>
-              <a:rPr lang="nl-BE" sz="2100" dirty="0" smtClean="0">
-                <a:hlinkClick r:id="rId7"/>
-              </a:rPr>
-              <a:t>/</a:t>
-            </a:r>
-            <a:r>
-              <a:rPr lang="nl-BE" sz="2100" dirty="0" smtClean="0"/>
-              <a:t> </a:t>
-            </a:r>
-            <a:r>
-              <a:rPr lang="nl-BE" sz="2100" dirty="0"/>
-              <a:t/>
-            </a:r>
-            <a:br>
-              <a:rPr lang="nl-BE" sz="2100" dirty="0"/>
-            </a:br>
-            <a:r>
-              <a:rPr lang="nl-BE" sz="2100" dirty="0">
-                <a:hlinkClick r:id="rId8"/>
-              </a:rPr>
-              <a:t>https://</a:t>
-            </a:r>
-            <a:r>
-              <a:rPr lang="nl-BE" sz="2100" dirty="0" smtClean="0">
-                <a:hlinkClick r:id="rId8"/>
-              </a:rPr>
-              <a:t>thoughtbot.com/blog/5-useful-tips-for-a-better-commit-message</a:t>
-            </a:r>
-            <a:r>
-              <a:rPr lang="nl-BE" sz="2100" dirty="0" smtClean="0"/>
-              <a:t> </a:t>
-            </a:r>
-            <a:endParaRPr lang="en-BE" sz="2100" dirty="0" smtClean="0"/>
-          </a:p>
-          <a:p>
-            <a:r>
-              <a:rPr lang="en-BE" dirty="0" smtClean="0"/>
-              <a:t>Nice article on some git features &amp; techniques</a:t>
-            </a:r>
-            <a:br>
-              <a:rPr lang="en-BE" dirty="0" smtClean="0"/>
-            </a:br>
-            <a:r>
-              <a:rPr lang="en-US" sz="2100" dirty="0">
-                <a:hlinkClick r:id="rId9"/>
-              </a:rPr>
-              <a:t>https://</a:t>
-            </a:r>
-            <a:r>
-              <a:rPr lang="en-US" sz="2100" dirty="0" smtClean="0">
-                <a:hlinkClick r:id="rId9"/>
-              </a:rPr>
-              <a:t>realpython.com/advanced-git-for-pythonistas/</a:t>
-            </a:r>
-            <a:r>
-              <a:rPr lang="en-BE" sz="2100" dirty="0" smtClean="0"/>
-              <a:t> </a:t>
-            </a:r>
-            <a:endParaRPr lang="nl-BE" dirty="0" smtClean="0"/>
+            <a:endParaRPr lang="nl-BE"/>
           </a:p>
         </p:txBody>
       </p:sp>
@@ -48917,7 +48816,7 @@
     </p:spTree>
     <p:extLst>
       <p:ext uri="{BB962C8B-B14F-4D97-AF65-F5344CB8AC3E}">
-        <p14:creationId xmlns:p14="http://schemas.microsoft.com/office/powerpoint/2010/main" val="2976133738"/>
+        <p14:creationId xmlns:p14="http://schemas.microsoft.com/office/powerpoint/2010/main" val="2763237186"/>
       </p:ext>
     </p:extLst>
   </p:cSld>
@@ -48968,7 +48867,7 @@
           <a:p>
             <a:r>
               <a:rPr lang="en-US" dirty="0" smtClean="0"/>
-              <a:t>Software &amp; tools</a:t>
+              <a:t>Conclusions</a:t>
             </a:r>
             <a:endParaRPr lang="nl-BE" dirty="0"/>
           </a:p>
@@ -48984,221 +48883,56 @@
             <p:ph idx="1"/>
           </p:nvPr>
         </p:nvSpPr>
-        <p:spPr>
-          <a:xfrm>
-            <a:off x="457200" y="1600201"/>
-            <a:ext cx="8229600" cy="5069159"/>
-          </a:xfrm>
-        </p:spPr>
+        <p:spPr/>
         <p:txBody>
-          <a:bodyPr>
-            <a:normAutofit fontScale="92500" lnSpcReduction="20000"/>
-          </a:bodyPr>
+          <a:bodyPr/>
           <a:lstStyle/>
           <a:p>
             <a:r>
-              <a:rPr lang="en-US" dirty="0" err="1" smtClean="0"/>
-              <a:t>git</a:t>
-            </a:r>
-            <a:r>
               <a:rPr lang="en-US" dirty="0" smtClean="0"/>
-              <a:t> comes with most Linux distributions</a:t>
-            </a:r>
-          </a:p>
-          <a:p>
+              <a:t>Contributes to the scientific method</a:t>
+            </a:r>
+          </a:p>
+          <a:p>
+            <a:pPr lvl="1"/>
             <a:r>
               <a:rPr lang="en-US" dirty="0" smtClean="0"/>
-              <a:t>Website &amp; downloads: </a:t>
-            </a:r>
-            <a:r>
-              <a:rPr lang="en-US" dirty="0">
-                <a:hlinkClick r:id="rId3"/>
-              </a:rPr>
-              <a:t>https://git-scm.com</a:t>
-            </a:r>
-            <a:r>
-              <a:rPr lang="en-US" dirty="0" smtClean="0">
-                <a:hlinkClick r:id="rId3"/>
-              </a:rPr>
-              <a:t>/</a:t>
-            </a:r>
+              <a:t>Helps ensure reproducibility</a:t>
+            </a:r>
+          </a:p>
+          <a:p>
             <a:r>
               <a:rPr lang="en-US" dirty="0" smtClean="0"/>
-              <a:t> </a:t>
-            </a:r>
-          </a:p>
-          <a:p>
+              <a:t>Record of change</a:t>
+            </a:r>
+          </a:p>
+          <a:p>
+            <a:pPr lvl="1"/>
             <a:r>
               <a:rPr lang="en-US" dirty="0" smtClean="0"/>
-              <a:t>Desktop clients</a:t>
+              <a:t>What was changed?</a:t>
             </a:r>
           </a:p>
           <a:p>
             <a:pPr lvl="1"/>
             <a:r>
-              <a:rPr lang="nl-BE" dirty="0"/>
-              <a:t>GitHub Desktop: </a:t>
-            </a:r>
-            <a:r>
-              <a:rPr lang="nl-BE" dirty="0">
-                <a:hlinkClick r:id="rId4"/>
-              </a:rPr>
-              <a:t>https://desktop.github.com</a:t>
-            </a:r>
-            <a:r>
-              <a:rPr lang="nl-BE" dirty="0" smtClean="0">
-                <a:hlinkClick r:id="rId4"/>
-              </a:rPr>
-              <a:t>/</a:t>
-            </a:r>
-            <a:r>
-              <a:rPr lang="nl-BE" dirty="0" smtClean="0"/>
-              <a:t> (Windows/</a:t>
-            </a:r>
-            <a:r>
-              <a:rPr lang="nl-BE" dirty="0" err="1" smtClean="0"/>
-              <a:t>MacOS</a:t>
-            </a:r>
-            <a:r>
-              <a:rPr lang="nl-BE" dirty="0" smtClean="0"/>
-              <a:t> X)</a:t>
+              <a:rPr lang="en-US" dirty="0" smtClean="0"/>
+              <a:t>When was it changed?</a:t>
             </a:r>
           </a:p>
           <a:p>
             <a:pPr lvl="1"/>
             <a:r>
-              <a:rPr lang="en-US" dirty="0" err="1" smtClean="0"/>
-              <a:t>TortoiseGit</a:t>
-            </a:r>
-            <a:r>
-              <a:rPr lang="en-US" dirty="0"/>
-              <a:t>: </a:t>
-            </a:r>
-            <a:r>
-              <a:rPr lang="en-US" dirty="0">
-                <a:hlinkClick r:id="rId5"/>
-              </a:rPr>
-              <a:t>https://tortoisegit.org</a:t>
-            </a:r>
-            <a:r>
-              <a:rPr lang="en-US" dirty="0" smtClean="0">
-                <a:hlinkClick r:id="rId5"/>
-              </a:rPr>
-              <a:t>/</a:t>
-            </a:r>
-            <a:r>
               <a:rPr lang="en-US" dirty="0" smtClean="0"/>
-              <a:t> (Windows)</a:t>
+              <a:t>Who changed it?</a:t>
             </a:r>
           </a:p>
           <a:p>
             <a:pPr lvl="1"/>
             <a:r>
-              <a:rPr lang="en-US" dirty="0" err="1"/>
-              <a:t>g</a:t>
-            </a:r>
-            <a:r>
-              <a:rPr lang="en-US" dirty="0" err="1" smtClean="0"/>
-              <a:t>it</a:t>
-            </a:r>
-            <a:r>
               <a:rPr lang="en-US" dirty="0" smtClean="0"/>
-              <a:t>-cola</a:t>
-            </a:r>
-            <a:r>
-              <a:rPr lang="en-US" dirty="0"/>
-              <a:t>: </a:t>
-            </a:r>
-            <a:r>
-              <a:rPr lang="en-US" dirty="0">
-                <a:hlinkClick r:id="rId6"/>
-              </a:rPr>
-              <a:t>http://git-cola.github.io</a:t>
-            </a:r>
-            <a:r>
-              <a:rPr lang="en-US" dirty="0" smtClean="0">
-                <a:hlinkClick r:id="rId6"/>
-              </a:rPr>
-              <a:t>/</a:t>
-            </a:r>
-            <a:r>
-              <a:rPr lang="en-US" dirty="0" smtClean="0"/>
-              <a:t> (Linux/Windows/</a:t>
-            </a:r>
-            <a:r>
-              <a:rPr lang="en-US" dirty="0" err="1" smtClean="0"/>
-              <a:t>MacOS</a:t>
-            </a:r>
-            <a:r>
-              <a:rPr lang="en-US" dirty="0" smtClean="0"/>
-              <a:t> X)</a:t>
-            </a:r>
-          </a:p>
-          <a:p>
-            <a:r>
-              <a:rPr lang="en-US" dirty="0" err="1" smtClean="0"/>
-              <a:t>vcsh</a:t>
-            </a:r>
-            <a:r>
-              <a:rPr lang="en-US" dirty="0" smtClean="0"/>
-              <a:t>, </a:t>
-            </a:r>
-            <a:r>
-              <a:rPr lang="en-US" dirty="0"/>
-              <a:t>version control for configuration </a:t>
-            </a:r>
-            <a:r>
-              <a:rPr lang="en-US" dirty="0" smtClean="0"/>
-              <a:t>files: </a:t>
-            </a:r>
-            <a:r>
-              <a:rPr lang="en-US" dirty="0">
-                <a:hlinkClick r:id="rId7"/>
-              </a:rPr>
-              <a:t>https://</a:t>
-            </a:r>
-            <a:r>
-              <a:rPr lang="en-US" dirty="0" smtClean="0">
-                <a:hlinkClick r:id="rId7"/>
-              </a:rPr>
-              <a:t>github.com/RichiH/vcsh</a:t>
-            </a:r>
-            <a:r>
-              <a:rPr lang="en-US" dirty="0" smtClean="0"/>
-              <a:t> (Linux)</a:t>
-            </a:r>
-          </a:p>
-          <a:p>
-            <a:r>
-              <a:rPr lang="en-US" dirty="0" smtClean="0"/>
-              <a:t>git-prompt.sh, show </a:t>
-            </a:r>
-            <a:r>
-              <a:rPr lang="en-US" dirty="0" err="1" smtClean="0"/>
-              <a:t>git</a:t>
-            </a:r>
-            <a:r>
-              <a:rPr lang="en-US" dirty="0" smtClean="0"/>
-              <a:t> info in command line prompt: </a:t>
-            </a:r>
-            <a:r>
-              <a:rPr lang="en-US" dirty="0">
-                <a:hlinkClick r:id="rId8"/>
-              </a:rPr>
-              <a:t>http://git-prompt.sh</a:t>
-            </a:r>
-            <a:r>
-              <a:rPr lang="en-US" dirty="0" smtClean="0">
-                <a:hlinkClick r:id="rId8"/>
-              </a:rPr>
-              <a:t>/</a:t>
-            </a:r>
-            <a:r>
-              <a:rPr lang="en-US" dirty="0" smtClean="0"/>
-              <a:t> (Linux)</a:t>
-            </a:r>
-          </a:p>
-          <a:p>
+              <a:t>Why was it changed?</a:t>
+            </a:r>
             <a:endParaRPr lang="nl-BE" dirty="0"/>
           </a:p>
         </p:txBody>
@@ -49229,7 +48963,7 @@
     </p:spTree>
     <p:extLst>
       <p:ext uri="{BB962C8B-B14F-4D97-AF65-F5344CB8AC3E}">
-        <p14:creationId xmlns:p14="http://schemas.microsoft.com/office/powerpoint/2010/main" val="3855217261"/>
+        <p14:creationId xmlns:p14="http://schemas.microsoft.com/office/powerpoint/2010/main" val="2241158897"/>
       </p:ext>
     </p:extLst>
   </p:cSld>
@@ -49239,9 +48973,291 @@
   <p:timing>
     <p:tnLst>
       <p:par>
-        <p:cTn id="1" dur="indefinite" restart="never" nodeType="tmRoot"/>
+        <p:cTn id="1" dur="indefinite" restart="never" nodeType="tmRoot">
+          <p:childTnLst>
+            <p:seq concurrent="1" nextAc="seek">
+              <p:cTn id="2" dur="indefinite" nodeType="mainSeq">
+                <p:childTnLst>
+                  <p:par>
+                    <p:cTn id="3" fill="hold">
+                      <p:stCondLst>
+                        <p:cond delay="indefinite"/>
+                        <p:cond evt="onBegin" delay="0">
+                          <p:tn val="2"/>
+                        </p:cond>
+                      </p:stCondLst>
+                      <p:childTnLst>
+                        <p:par>
+                          <p:cTn id="4" fill="hold">
+                            <p:stCondLst>
+                              <p:cond delay="0"/>
+                            </p:stCondLst>
+                            <p:childTnLst>
+                              <p:par>
+                                <p:cTn id="5" presetID="1" presetClass="entr" presetSubtype="0" fill="hold" grpId="0" nodeType="withEffect">
+                                  <p:stCondLst>
+                                    <p:cond delay="0"/>
+                                  </p:stCondLst>
+                                  <p:childTnLst>
+                                    <p:set>
+                                      <p:cBhvr>
+                                        <p:cTn id="6" dur="1" fill="hold">
+                                          <p:stCondLst>
+                                            <p:cond delay="0"/>
+                                          </p:stCondLst>
+                                        </p:cTn>
+                                        <p:tgtEl>
+                                          <p:spTgt spid="3">
+                                            <p:txEl>
+                                              <p:pRg st="0" end="0"/>
+                                            </p:txEl>
+                                          </p:spTgt>
+                                        </p:tgtEl>
+                                        <p:attrNameLst>
+                                          <p:attrName>style.visibility</p:attrName>
+                                        </p:attrNameLst>
+                                      </p:cBhvr>
+                                      <p:to>
+                                        <p:strVal val="visible"/>
+                                      </p:to>
+                                    </p:set>
+                                  </p:childTnLst>
+                                </p:cTn>
+                              </p:par>
+                              <p:par>
+                                <p:cTn id="7" presetID="1" presetClass="entr" presetSubtype="0" fill="hold" grpId="0" nodeType="withEffect">
+                                  <p:stCondLst>
+                                    <p:cond delay="0"/>
+                                  </p:stCondLst>
+                                  <p:childTnLst>
+                                    <p:set>
+                                      <p:cBhvr>
+                                        <p:cTn id="8" dur="1" fill="hold">
+                                          <p:stCondLst>
+                                            <p:cond delay="0"/>
+                                          </p:stCondLst>
+                                        </p:cTn>
+                                        <p:tgtEl>
+                                          <p:spTgt spid="3">
+                                            <p:txEl>
+                                              <p:pRg st="1" end="1"/>
+                                            </p:txEl>
+                                          </p:spTgt>
+                                        </p:tgtEl>
+                                        <p:attrNameLst>
+                                          <p:attrName>style.visibility</p:attrName>
+                                        </p:attrNameLst>
+                                      </p:cBhvr>
+                                      <p:to>
+                                        <p:strVal val="visible"/>
+                                      </p:to>
+                                    </p:set>
+                                  </p:childTnLst>
+                                </p:cTn>
+                              </p:par>
+                            </p:childTnLst>
+                          </p:cTn>
+                        </p:par>
+                      </p:childTnLst>
+                    </p:cTn>
+                  </p:par>
+                  <p:par>
+                    <p:cTn id="9" fill="hold">
+                      <p:stCondLst>
+                        <p:cond delay="indefinite"/>
+                      </p:stCondLst>
+                      <p:childTnLst>
+                        <p:par>
+                          <p:cTn id="10" fill="hold">
+                            <p:stCondLst>
+                              <p:cond delay="0"/>
+                            </p:stCondLst>
+                            <p:childTnLst>
+                              <p:par>
+                                <p:cTn id="11" presetID="1" presetClass="entr" presetSubtype="0" fill="hold" grpId="0" nodeType="clickEffect">
+                                  <p:stCondLst>
+                                    <p:cond delay="0"/>
+                                  </p:stCondLst>
+                                  <p:childTnLst>
+                                    <p:set>
+                                      <p:cBhvr>
+                                        <p:cTn id="12" dur="1" fill="hold">
+                                          <p:stCondLst>
+                                            <p:cond delay="0"/>
+                                          </p:stCondLst>
+                                        </p:cTn>
+                                        <p:tgtEl>
+                                          <p:spTgt spid="3">
+                                            <p:txEl>
+                                              <p:pRg st="2" end="2"/>
+                                            </p:txEl>
+                                          </p:spTgt>
+                                        </p:tgtEl>
+                                        <p:attrNameLst>
+                                          <p:attrName>style.visibility</p:attrName>
+                                        </p:attrNameLst>
+                                      </p:cBhvr>
+                                      <p:to>
+                                        <p:strVal val="visible"/>
+                                      </p:to>
+                                    </p:set>
+                                  </p:childTnLst>
+                                </p:cTn>
+                              </p:par>
+                              <p:par>
+                                <p:cTn id="13" presetID="1" presetClass="entr" presetSubtype="0" fill="hold" grpId="0" nodeType="withEffect">
+                                  <p:stCondLst>
+                                    <p:cond delay="0"/>
+                                  </p:stCondLst>
+                                  <p:childTnLst>
+                                    <p:set>
+                                      <p:cBhvr>
+                                        <p:cTn id="14" dur="1" fill="hold">
+                                          <p:stCondLst>
+                                            <p:cond delay="0"/>
+                                          </p:stCondLst>
+                                        </p:cTn>
+                                        <p:tgtEl>
+                                          <p:spTgt spid="3">
+                                            <p:txEl>
+                                              <p:pRg st="3" end="3"/>
+                                            </p:txEl>
+                                          </p:spTgt>
+                                        </p:tgtEl>
+                                        <p:attrNameLst>
+                                          <p:attrName>style.visibility</p:attrName>
+                                        </p:attrNameLst>
+                                      </p:cBhvr>
+                                      <p:to>
+                                        <p:strVal val="visible"/>
+                                      </p:to>
+                                    </p:set>
+                                  </p:childTnLst>
+                                </p:cTn>
+                              </p:par>
+                              <p:par>
+                                <p:cTn id="15" presetID="1" presetClass="entr" presetSubtype="0" fill="hold" grpId="0" nodeType="withEffect">
+                                  <p:stCondLst>
+                                    <p:cond delay="0"/>
+                                  </p:stCondLst>
+                                  <p:childTnLst>
+                                    <p:set>
+                                      <p:cBhvr>
+                                        <p:cTn id="16" dur="1" fill="hold">
+                                          <p:stCondLst>
+                                            <p:cond delay="0"/>
+                                          </p:stCondLst>
+                                        </p:cTn>
+                                        <p:tgtEl>
+                                          <p:spTgt spid="3">
+                                            <p:txEl>
+                                              <p:pRg st="4" end="4"/>
+                                            </p:txEl>
+                                          </p:spTgt>
+                                        </p:tgtEl>
+                                        <p:attrNameLst>
+                                          <p:attrName>style.visibility</p:attrName>
+                                        </p:attrNameLst>
+                                      </p:cBhvr>
+                                      <p:to>
+                                        <p:strVal val="visible"/>
+                                      </p:to>
+                                    </p:set>
+                                  </p:childTnLst>
+                                </p:cTn>
+                              </p:par>
+                              <p:par>
+                                <p:cTn id="17" presetID="1" presetClass="entr" presetSubtype="0" fill="hold" grpId="0" nodeType="withEffect">
+                                  <p:stCondLst>
+                                    <p:cond delay="0"/>
+                                  </p:stCondLst>
+                                  <p:childTnLst>
+                                    <p:set>
+                                      <p:cBhvr>
+                                        <p:cTn id="18" dur="1" fill="hold">
+                                          <p:stCondLst>
+                                            <p:cond delay="0"/>
+                                          </p:stCondLst>
+                                        </p:cTn>
+                                        <p:tgtEl>
+                                          <p:spTgt spid="3">
+                                            <p:txEl>
+                                              <p:pRg st="5" end="5"/>
+                                            </p:txEl>
+                                          </p:spTgt>
+                                        </p:tgtEl>
+                                        <p:attrNameLst>
+                                          <p:attrName>style.visibility</p:attrName>
+                                        </p:attrNameLst>
+                                      </p:cBhvr>
+                                      <p:to>
+                                        <p:strVal val="visible"/>
+                                      </p:to>
+                                    </p:set>
+                                  </p:childTnLst>
+                                </p:cTn>
+                              </p:par>
+                              <p:par>
+                                <p:cTn id="19" presetID="1" presetClass="entr" presetSubtype="0" fill="hold" grpId="0" nodeType="withEffect">
+                                  <p:stCondLst>
+                                    <p:cond delay="0"/>
+                                  </p:stCondLst>
+                                  <p:childTnLst>
+                                    <p:set>
+                                      <p:cBhvr>
+                                        <p:cTn id="20" dur="1" fill="hold">
+                                          <p:stCondLst>
+                                            <p:cond delay="0"/>
+                                          </p:stCondLst>
+                                        </p:cTn>
+                                        <p:tgtEl>
+                                          <p:spTgt spid="3">
+                                            <p:txEl>
+                                              <p:pRg st="6" end="6"/>
+                                            </p:txEl>
+                                          </p:spTgt>
+                                        </p:tgtEl>
+                                        <p:attrNameLst>
+                                          <p:attrName>style.visibility</p:attrName>
+                                        </p:attrNameLst>
+                                      </p:cBhvr>
+                                      <p:to>
+                                        <p:strVal val="visible"/>
+                                      </p:to>
+                                    </p:set>
+                                  </p:childTnLst>
+                                </p:cTn>
+                              </p:par>
+                            </p:childTnLst>
+                          </p:cTn>
+                        </p:par>
+                      </p:childTnLst>
+                    </p:cTn>
+                  </p:par>
+                </p:childTnLst>
+              </p:cTn>
+              <p:prevCondLst>
+                <p:cond evt="onPrev" delay="0">
+                  <p:tgtEl>
+                    <p:sldTgt/>
+                  </p:tgtEl>
+                </p:cond>
+              </p:prevCondLst>
+              <p:nextCondLst>
+                <p:cond evt="onNext" delay="0">
+                  <p:tgtEl>
+                    <p:sldTgt/>
+                  </p:tgtEl>
+                </p:cond>
+              </p:nextCondLst>
+            </p:seq>
+          </p:childTnLst>
+        </p:cTn>
       </p:par>
     </p:tnLst>
+    <p:bldLst>
+      <p:bldP spid="3" grpId="0" uiExpand="1" build="p"/>
+    </p:bldLst>
   </p:timing>
 </p:sld>
 </file>
@@ -49280,6 +49296,622 @@
           <a:p>
             <a:r>
               <a:rPr lang="en-US" dirty="0" smtClean="0"/>
+              <a:t>References</a:t>
+            </a:r>
+            <a:endParaRPr lang="nl-BE" dirty="0"/>
+          </a:p>
+        </p:txBody>
+      </p:sp>
+      <p:sp>
+        <p:nvSpPr>
+          <p:cNvPr id="3" name="Content Placeholder 2"/>
+          <p:cNvSpPr>
+            <a:spLocks noGrp="1"/>
+          </p:cNvSpPr>
+          <p:nvPr>
+            <p:ph idx="1"/>
+          </p:nvPr>
+        </p:nvSpPr>
+        <p:spPr/>
+        <p:txBody>
+          <a:bodyPr>
+            <a:normAutofit fontScale="77500" lnSpcReduction="20000"/>
+          </a:bodyPr>
+          <a:lstStyle/>
+          <a:p>
+            <a:r>
+              <a:rPr lang="en-US" dirty="0" smtClean="0"/>
+              <a:t>Online documentation (including movies)</a:t>
+            </a:r>
+            <a:br>
+              <a:rPr lang="en-US" dirty="0" smtClean="0"/>
+            </a:br>
+            <a:r>
+              <a:rPr lang="nl-BE" sz="2300" dirty="0" smtClean="0">
+                <a:hlinkClick r:id="rId2"/>
+              </a:rPr>
+              <a:t>http://git-scm.com/documentation</a:t>
+            </a:r>
+            <a:endParaRPr lang="nl-BE" dirty="0" smtClean="0"/>
+          </a:p>
+          <a:p>
+            <a:r>
+              <a:rPr lang="en-US" dirty="0" err="1"/>
+              <a:t>g</a:t>
+            </a:r>
+            <a:r>
+              <a:rPr lang="en-US" dirty="0" err="1" smtClean="0"/>
+              <a:t>it</a:t>
+            </a:r>
+            <a:r>
+              <a:rPr lang="en-US" dirty="0" smtClean="0"/>
+              <a:t> web site</a:t>
+            </a:r>
+            <a:br>
+              <a:rPr lang="en-US" dirty="0" smtClean="0"/>
+            </a:br>
+            <a:r>
+              <a:rPr lang="nl-BE" sz="2400" dirty="0" smtClean="0">
+                <a:hlinkClick r:id="rId3"/>
+              </a:rPr>
+              <a:t>http://git-scm.com/</a:t>
+            </a:r>
+            <a:endParaRPr lang="nl-BE" dirty="0" smtClean="0"/>
+          </a:p>
+          <a:p>
+            <a:r>
+              <a:rPr lang="nl-BE" dirty="0" smtClean="0"/>
+              <a:t>Pro git </a:t>
+            </a:r>
+            <a:r>
+              <a:rPr lang="nl-BE" dirty="0"/>
+              <a:t>online book</a:t>
+            </a:r>
+            <a:br>
+              <a:rPr lang="nl-BE" dirty="0"/>
+            </a:br>
+            <a:r>
+              <a:rPr lang="nl-BE" sz="2100" dirty="0">
+                <a:hlinkClick r:id="rId4"/>
+              </a:rPr>
+              <a:t>https://git-scm.com/book/en/v2</a:t>
+            </a:r>
+            <a:r>
+              <a:rPr lang="nl-BE" sz="2100" dirty="0" smtClean="0">
+                <a:hlinkClick r:id="rId4"/>
+              </a:rPr>
+              <a:t>/</a:t>
+            </a:r>
+            <a:r>
+              <a:rPr lang="nl-BE" sz="2100" dirty="0" smtClean="0"/>
+              <a:t> </a:t>
+            </a:r>
+            <a:endParaRPr lang="nl-BE" dirty="0" smtClean="0"/>
+          </a:p>
+          <a:p>
+            <a:r>
+              <a:rPr lang="en-US" dirty="0" smtClean="0"/>
+              <a:t>Why (the author thinks) you should switch to </a:t>
+            </a:r>
+            <a:r>
+              <a:rPr lang="en-US" dirty="0" err="1" smtClean="0"/>
+              <a:t>git</a:t>
+            </a:r>
+            <a:r>
+              <a:rPr lang="en-US" dirty="0" smtClean="0"/>
+              <a:t/>
+            </a:r>
+            <a:br>
+              <a:rPr lang="en-US" dirty="0" smtClean="0"/>
+            </a:br>
+            <a:r>
+              <a:rPr lang="nl-BE" sz="2300" dirty="0" smtClean="0">
+                <a:hlinkClick r:id="rId5"/>
+              </a:rPr>
+              <a:t>http://blog.teamtreehouse.com/why-you-should-switch-from-subversion-to-git</a:t>
+            </a:r>
+            <a:endParaRPr lang="nl-BE" dirty="0" smtClean="0"/>
+          </a:p>
+          <a:p>
+            <a:r>
+              <a:rPr lang="nl-BE" dirty="0" smtClean="0"/>
+              <a:t>Overview of frequently used git workflows</a:t>
+            </a:r>
+            <a:br>
+              <a:rPr lang="nl-BE" dirty="0" smtClean="0"/>
+            </a:br>
+            <a:r>
+              <a:rPr lang="en-US" sz="2100" dirty="0" smtClean="0">
+                <a:hlinkClick r:id="rId6"/>
+              </a:rPr>
+              <a:t>https</a:t>
+            </a:r>
+            <a:r>
+              <a:rPr lang="en-US" sz="2100" dirty="0">
+                <a:hlinkClick r:id="rId6"/>
+              </a:rPr>
+              <a:t>://</a:t>
+            </a:r>
+            <a:r>
+              <a:rPr lang="en-US" sz="2100" dirty="0" smtClean="0">
+                <a:hlinkClick r:id="rId6"/>
+              </a:rPr>
+              <a:t>www.atlassian.com/git/workflows</a:t>
+            </a:r>
+            <a:endParaRPr lang="en-US" dirty="0" smtClean="0"/>
+          </a:p>
+          <a:p>
+            <a:r>
+              <a:rPr lang="nl-BE" dirty="0" smtClean="0"/>
+              <a:t>Blog posts on "good" commit messages</a:t>
+            </a:r>
+            <a:br>
+              <a:rPr lang="nl-BE" dirty="0" smtClean="0"/>
+            </a:br>
+            <a:r>
+              <a:rPr lang="nl-BE" sz="2100" dirty="0" smtClean="0">
+                <a:hlinkClick r:id="rId7"/>
+              </a:rPr>
+              <a:t>https</a:t>
+            </a:r>
+            <a:r>
+              <a:rPr lang="nl-BE" sz="2100" dirty="0">
+                <a:hlinkClick r:id="rId7"/>
+              </a:rPr>
+              <a:t>://chris.beams.io/posts/git-commit</a:t>
+            </a:r>
+            <a:r>
+              <a:rPr lang="nl-BE" sz="2100" dirty="0" smtClean="0">
+                <a:hlinkClick r:id="rId7"/>
+              </a:rPr>
+              <a:t>/</a:t>
+            </a:r>
+            <a:r>
+              <a:rPr lang="nl-BE" sz="2100" dirty="0" smtClean="0"/>
+              <a:t> </a:t>
+            </a:r>
+            <a:r>
+              <a:rPr lang="nl-BE" sz="2100" dirty="0"/>
+              <a:t/>
+            </a:r>
+            <a:br>
+              <a:rPr lang="nl-BE" sz="2100" dirty="0"/>
+            </a:br>
+            <a:r>
+              <a:rPr lang="nl-BE" sz="2100" dirty="0">
+                <a:hlinkClick r:id="rId8"/>
+              </a:rPr>
+              <a:t>https://</a:t>
+            </a:r>
+            <a:r>
+              <a:rPr lang="nl-BE" sz="2100" dirty="0" smtClean="0">
+                <a:hlinkClick r:id="rId8"/>
+              </a:rPr>
+              <a:t>thoughtbot.com/blog/5-useful-tips-for-a-better-commit-message</a:t>
+            </a:r>
+            <a:r>
+              <a:rPr lang="nl-BE" sz="2100" dirty="0" smtClean="0"/>
+              <a:t> </a:t>
+            </a:r>
+            <a:endParaRPr lang="en-BE" sz="2100" dirty="0" smtClean="0"/>
+          </a:p>
+          <a:p>
+            <a:r>
+              <a:rPr lang="en-BE" dirty="0" smtClean="0"/>
+              <a:t>Nice article on some git features &amp; techniques</a:t>
+            </a:r>
+            <a:br>
+              <a:rPr lang="en-BE" dirty="0" smtClean="0"/>
+            </a:br>
+            <a:r>
+              <a:rPr lang="en-US" sz="2100" dirty="0">
+                <a:hlinkClick r:id="rId9"/>
+              </a:rPr>
+              <a:t>https://</a:t>
+            </a:r>
+            <a:r>
+              <a:rPr lang="en-US" sz="2100" dirty="0" smtClean="0">
+                <a:hlinkClick r:id="rId9"/>
+              </a:rPr>
+              <a:t>realpython.com/advanced-git-for-pythonistas/</a:t>
+            </a:r>
+            <a:r>
+              <a:rPr lang="en-BE" sz="2100" dirty="0" smtClean="0"/>
+              <a:t> </a:t>
+            </a:r>
+            <a:endParaRPr lang="nl-BE" dirty="0" smtClean="0"/>
+          </a:p>
+        </p:txBody>
+      </p:sp>
+      <p:sp>
+        <p:nvSpPr>
+          <p:cNvPr id="4" name="Slide Number Placeholder 3"/>
+          <p:cNvSpPr>
+            <a:spLocks noGrp="1"/>
+          </p:cNvSpPr>
+          <p:nvPr>
+            <p:ph type="sldNum" sz="quarter" idx="12"/>
+          </p:nvPr>
+        </p:nvSpPr>
+        <p:spPr/>
+        <p:txBody>
+          <a:bodyPr/>
+          <a:lstStyle/>
+          <a:p>
+            <a:fld id="{BB52A05A-A776-4391-ACD7-D6BC34D3145C}" type="slidenum">
+              <a:rPr lang="nl-BE" smtClean="0"/>
+              <a:t>72</a:t>
+            </a:fld>
+            <a:endParaRPr lang="nl-BE"/>
+          </a:p>
+        </p:txBody>
+      </p:sp>
+    </p:spTree>
+    <p:extLst>
+      <p:ext uri="{BB962C8B-B14F-4D97-AF65-F5344CB8AC3E}">
+        <p14:creationId xmlns:p14="http://schemas.microsoft.com/office/powerpoint/2010/main" val="2976133738"/>
+      </p:ext>
+    </p:extLst>
+  </p:cSld>
+  <p:clrMapOvr>
+    <a:masterClrMapping/>
+  </p:clrMapOvr>
+  <p:timing>
+    <p:tnLst>
+      <p:par>
+        <p:cTn id="1" dur="indefinite" restart="never" nodeType="tmRoot"/>
+      </p:par>
+    </p:tnLst>
+  </p:timing>
+</p:sld>
+</file>
+
+<file path=ppt/slides/slide73.xml><?xml version="1.0" encoding="utf-8"?>
+<p:sld xmlns:a="http://schemas.openxmlformats.org/drawingml/2006/main" xmlns:r="http://schemas.openxmlformats.org/officeDocument/2006/relationships" xmlns:p="http://schemas.openxmlformats.org/presentationml/2006/main">
+  <p:cSld>
+    <p:spTree>
+      <p:nvGrpSpPr>
+        <p:cNvPr id="1" name=""/>
+        <p:cNvGrpSpPr/>
+        <p:nvPr/>
+      </p:nvGrpSpPr>
+      <p:grpSpPr>
+        <a:xfrm>
+          <a:off x="0" y="0"/>
+          <a:ext cx="0" cy="0"/>
+          <a:chOff x="0" y="0"/>
+          <a:chExt cx="0" cy="0"/>
+        </a:xfrm>
+      </p:grpSpPr>
+      <p:sp>
+        <p:nvSpPr>
+          <p:cNvPr id="2" name="Title 1"/>
+          <p:cNvSpPr>
+            <a:spLocks noGrp="1"/>
+          </p:cNvSpPr>
+          <p:nvPr>
+            <p:ph type="title"/>
+          </p:nvPr>
+        </p:nvSpPr>
+        <p:spPr/>
+        <p:txBody>
+          <a:bodyPr/>
+          <a:lstStyle/>
+          <a:p>
+            <a:r>
+              <a:rPr lang="en-US" dirty="0" smtClean="0"/>
+              <a:t>Software &amp; tools</a:t>
+            </a:r>
+            <a:endParaRPr lang="nl-BE" dirty="0"/>
+          </a:p>
+        </p:txBody>
+      </p:sp>
+      <p:sp>
+        <p:nvSpPr>
+          <p:cNvPr id="3" name="Content Placeholder 2"/>
+          <p:cNvSpPr>
+            <a:spLocks noGrp="1"/>
+          </p:cNvSpPr>
+          <p:nvPr>
+            <p:ph idx="1"/>
+          </p:nvPr>
+        </p:nvSpPr>
+        <p:spPr>
+          <a:xfrm>
+            <a:off x="457200" y="1600201"/>
+            <a:ext cx="8229600" cy="5069159"/>
+          </a:xfrm>
+        </p:spPr>
+        <p:txBody>
+          <a:bodyPr>
+            <a:normAutofit fontScale="92500" lnSpcReduction="20000"/>
+          </a:bodyPr>
+          <a:lstStyle/>
+          <a:p>
+            <a:r>
+              <a:rPr lang="en-US" dirty="0" err="1" smtClean="0"/>
+              <a:t>git</a:t>
+            </a:r>
+            <a:r>
+              <a:rPr lang="en-US" dirty="0" smtClean="0"/>
+              <a:t> comes with most Linux distributions</a:t>
+            </a:r>
+          </a:p>
+          <a:p>
+            <a:r>
+              <a:rPr lang="en-US" dirty="0" smtClean="0"/>
+              <a:t>Website &amp; downloads: </a:t>
+            </a:r>
+            <a:r>
+              <a:rPr lang="en-US" dirty="0">
+                <a:hlinkClick r:id="rId3"/>
+              </a:rPr>
+              <a:t>https://git-scm.com</a:t>
+            </a:r>
+            <a:r>
+              <a:rPr lang="en-US" dirty="0" smtClean="0">
+                <a:hlinkClick r:id="rId3"/>
+              </a:rPr>
+              <a:t>/</a:t>
+            </a:r>
+            <a:r>
+              <a:rPr lang="en-US" dirty="0" smtClean="0"/>
+              <a:t> </a:t>
+            </a:r>
+          </a:p>
+          <a:p>
+            <a:r>
+              <a:rPr lang="en-US" dirty="0" smtClean="0"/>
+              <a:t>Desktop clients</a:t>
+            </a:r>
+          </a:p>
+          <a:p>
+            <a:pPr lvl="1"/>
+            <a:r>
+              <a:rPr lang="nl-BE" dirty="0"/>
+              <a:t>GitHub Desktop: </a:t>
+            </a:r>
+            <a:r>
+              <a:rPr lang="nl-BE" dirty="0">
+                <a:hlinkClick r:id="rId4"/>
+              </a:rPr>
+              <a:t>https://desktop.github.com</a:t>
+            </a:r>
+            <a:r>
+              <a:rPr lang="nl-BE" dirty="0" smtClean="0">
+                <a:hlinkClick r:id="rId4"/>
+              </a:rPr>
+              <a:t>/</a:t>
+            </a:r>
+            <a:r>
+              <a:rPr lang="nl-BE" dirty="0" smtClean="0"/>
+              <a:t> (Windows/</a:t>
+            </a:r>
+            <a:r>
+              <a:rPr lang="nl-BE" dirty="0" err="1" smtClean="0"/>
+              <a:t>MacOS</a:t>
+            </a:r>
+            <a:r>
+              <a:rPr lang="nl-BE" dirty="0" smtClean="0"/>
+              <a:t> X)</a:t>
+            </a:r>
+          </a:p>
+          <a:p>
+            <a:pPr lvl="1"/>
+            <a:r>
+              <a:rPr lang="en-US" dirty="0" err="1" smtClean="0"/>
+              <a:t>TortoiseGit</a:t>
+            </a:r>
+            <a:r>
+              <a:rPr lang="en-US" dirty="0"/>
+              <a:t>: </a:t>
+            </a:r>
+            <a:r>
+              <a:rPr lang="en-US" dirty="0">
+                <a:hlinkClick r:id="rId5"/>
+              </a:rPr>
+              <a:t>https://tortoisegit.org</a:t>
+            </a:r>
+            <a:r>
+              <a:rPr lang="en-US" dirty="0" smtClean="0">
+                <a:hlinkClick r:id="rId5"/>
+              </a:rPr>
+              <a:t>/</a:t>
+            </a:r>
+            <a:r>
+              <a:rPr lang="en-US" dirty="0" smtClean="0"/>
+              <a:t> (Windows)</a:t>
+            </a:r>
+          </a:p>
+          <a:p>
+            <a:pPr lvl="1"/>
+            <a:r>
+              <a:rPr lang="en-US" dirty="0" err="1"/>
+              <a:t>g</a:t>
+            </a:r>
+            <a:r>
+              <a:rPr lang="en-US" dirty="0" err="1" smtClean="0"/>
+              <a:t>it</a:t>
+            </a:r>
+            <a:r>
+              <a:rPr lang="en-US" dirty="0" smtClean="0"/>
+              <a:t>-cola</a:t>
+            </a:r>
+            <a:r>
+              <a:rPr lang="en-US" dirty="0"/>
+              <a:t>: </a:t>
+            </a:r>
+            <a:r>
+              <a:rPr lang="en-US" dirty="0">
+                <a:hlinkClick r:id="rId6"/>
+              </a:rPr>
+              <a:t>http://git-cola.github.io</a:t>
+            </a:r>
+            <a:r>
+              <a:rPr lang="en-US" dirty="0" smtClean="0">
+                <a:hlinkClick r:id="rId6"/>
+              </a:rPr>
+              <a:t>/</a:t>
+            </a:r>
+            <a:r>
+              <a:rPr lang="en-US" dirty="0" smtClean="0"/>
+              <a:t> (Linux/Windows/</a:t>
+            </a:r>
+            <a:r>
+              <a:rPr lang="en-US" dirty="0" err="1" smtClean="0"/>
+              <a:t>MacOS</a:t>
+            </a:r>
+            <a:r>
+              <a:rPr lang="en-US" dirty="0" smtClean="0"/>
+              <a:t> X)</a:t>
+            </a:r>
+          </a:p>
+          <a:p>
+            <a:r>
+              <a:rPr lang="en-US" dirty="0" err="1" smtClean="0"/>
+              <a:t>vcsh</a:t>
+            </a:r>
+            <a:r>
+              <a:rPr lang="en-US" dirty="0" smtClean="0"/>
+              <a:t>, </a:t>
+            </a:r>
+            <a:r>
+              <a:rPr lang="en-US" dirty="0"/>
+              <a:t>version control for configuration </a:t>
+            </a:r>
+            <a:r>
+              <a:rPr lang="en-US" dirty="0" smtClean="0"/>
+              <a:t>files: </a:t>
+            </a:r>
+            <a:r>
+              <a:rPr lang="en-US" dirty="0">
+                <a:hlinkClick r:id="rId7"/>
+              </a:rPr>
+              <a:t>https://</a:t>
+            </a:r>
+            <a:r>
+              <a:rPr lang="en-US" dirty="0" smtClean="0">
+                <a:hlinkClick r:id="rId7"/>
+              </a:rPr>
+              <a:t>github.com/RichiH/vcsh</a:t>
+            </a:r>
+            <a:r>
+              <a:rPr lang="en-US" dirty="0" smtClean="0"/>
+              <a:t> (Linux)</a:t>
+            </a:r>
+          </a:p>
+          <a:p>
+            <a:r>
+              <a:rPr lang="en-US" dirty="0" smtClean="0"/>
+              <a:t>git-prompt.sh, show </a:t>
+            </a:r>
+            <a:r>
+              <a:rPr lang="en-US" dirty="0" err="1" smtClean="0"/>
+              <a:t>git</a:t>
+            </a:r>
+            <a:r>
+              <a:rPr lang="en-US" dirty="0" smtClean="0"/>
+              <a:t> info in command line prompt: </a:t>
+            </a:r>
+            <a:r>
+              <a:rPr lang="en-US" dirty="0">
+                <a:hlinkClick r:id="rId8"/>
+              </a:rPr>
+              <a:t>http://git-prompt.sh</a:t>
+            </a:r>
+            <a:r>
+              <a:rPr lang="en-US" dirty="0" smtClean="0">
+                <a:hlinkClick r:id="rId8"/>
+              </a:rPr>
+              <a:t>/</a:t>
+            </a:r>
+            <a:r>
+              <a:rPr lang="en-US" dirty="0" smtClean="0"/>
+              <a:t> (Linux)</a:t>
+            </a:r>
+          </a:p>
+          <a:p>
+            <a:endParaRPr lang="nl-BE" dirty="0"/>
+          </a:p>
+        </p:txBody>
+      </p:sp>
+      <p:sp>
+        <p:nvSpPr>
+          <p:cNvPr id="4" name="Slide Number Placeholder 3"/>
+          <p:cNvSpPr>
+            <a:spLocks noGrp="1"/>
+          </p:cNvSpPr>
+          <p:nvPr>
+            <p:ph type="sldNum" sz="quarter" idx="12"/>
+          </p:nvPr>
+        </p:nvSpPr>
+        <p:spPr/>
+        <p:txBody>
+          <a:bodyPr/>
+          <a:lstStyle/>
+          <a:p>
+            <a:fld id="{BB52A05A-A776-4391-ACD7-D6BC34D3145C}" type="slidenum">
+              <a:rPr lang="nl-BE" smtClean="0"/>
+              <a:t>73</a:t>
+            </a:fld>
+            <a:endParaRPr lang="nl-BE"/>
+          </a:p>
+        </p:txBody>
+      </p:sp>
+    </p:spTree>
+    <p:extLst>
+      <p:ext uri="{BB962C8B-B14F-4D97-AF65-F5344CB8AC3E}">
+        <p14:creationId xmlns:p14="http://schemas.microsoft.com/office/powerpoint/2010/main" val="3855217261"/>
+      </p:ext>
+    </p:extLst>
+  </p:cSld>
+  <p:clrMapOvr>
+    <a:masterClrMapping/>
+  </p:clrMapOvr>
+  <p:timing>
+    <p:tnLst>
+      <p:par>
+        <p:cTn id="1" dur="indefinite" restart="never" nodeType="tmRoot"/>
+      </p:par>
+    </p:tnLst>
+  </p:timing>
+</p:sld>
+</file>
+
+<file path=ppt/slides/slide74.xml><?xml version="1.0" encoding="utf-8"?>
+<p:sld xmlns:a="http://schemas.openxmlformats.org/drawingml/2006/main" xmlns:r="http://schemas.openxmlformats.org/officeDocument/2006/relationships" xmlns:p="http://schemas.openxmlformats.org/presentationml/2006/main">
+  <p:cSld>
+    <p:spTree>
+      <p:nvGrpSpPr>
+        <p:cNvPr id="1" name=""/>
+        <p:cNvGrpSpPr/>
+        <p:nvPr/>
+      </p:nvGrpSpPr>
+      <p:grpSpPr>
+        <a:xfrm>
+          <a:off x="0" y="0"/>
+          <a:ext cx="0" cy="0"/>
+          <a:chOff x="0" y="0"/>
+          <a:chExt cx="0" cy="0"/>
+        </a:xfrm>
+      </p:grpSpPr>
+      <p:sp>
+        <p:nvSpPr>
+          <p:cNvPr id="2" name="Title 1"/>
+          <p:cNvSpPr>
+            <a:spLocks noGrp="1"/>
+          </p:cNvSpPr>
+          <p:nvPr>
+            <p:ph type="title"/>
+          </p:nvPr>
+        </p:nvSpPr>
+        <p:spPr/>
+        <p:txBody>
+          <a:bodyPr/>
+          <a:lstStyle/>
+          <a:p>
+            <a:r>
+              <a:rPr lang="en-US" dirty="0" smtClean="0"/>
               <a:t>Services</a:t>
             </a:r>
             <a:endParaRPr lang="nl-BE" dirty="0"/>
@@ -49405,7 +50037,7 @@
           <a:p>
             <a:fld id="{BB52A05A-A776-4391-ACD7-D6BC34D3145C}" type="slidenum">
               <a:rPr lang="nl-BE" smtClean="0"/>
-              <a:t>72</a:t>
+              <a:t>74</a:t>
             </a:fld>
             <a:endParaRPr lang="nl-BE"/>
           </a:p>

</xml_diff>